<commit_message>
added upgradeFunction & maxlevel
</commit_message>
<xml_diff>
--- a/documentation/database/ER-Diagram.pptx
+++ b/documentation/database/ER-Diagram.pptx
@@ -353,7 +353,7 @@
             <a:pPr indent="0" algn="r">
               <a:buNone/>
             </a:pPr>
-            <a:fld id="{35341DD4-D777-4BE5-A33D-8DD1B44B9B0C}" type="slidenum">
+            <a:fld id="{05756549-01E1-468C-8AB8-7718A5AA4EC2}" type="slidenum">
               <a:rPr b="0" lang="en-US" sz="1400" spc="-1" strike="noStrike">
                 <a:solidFill>
                   <a:srgbClr val="000000"/>
@@ -396,7 +396,7 @@
       </p:grpSpPr>
       <p:sp>
         <p:nvSpPr>
-          <p:cNvPr id="369" name="PlaceHolder 1"/>
+          <p:cNvPr id="371" name="PlaceHolder 1"/>
           <p:cNvSpPr>
             <a:spLocks noGrp="1"/>
           </p:cNvSpPr>
@@ -407,7 +407,7 @@
         <p:spPr>
           <a:xfrm>
             <a:off x="685800" y="1143000"/>
-            <a:ext cx="5480640" cy="3080520"/>
+            <a:ext cx="5480280" cy="3080160"/>
           </a:xfrm>
           <a:prstGeom prst="rect">
             <a:avLst/>
@@ -419,7 +419,7 @@
       </p:sp>
       <p:sp>
         <p:nvSpPr>
-          <p:cNvPr id="370" name="PlaceHolder 2"/>
+          <p:cNvPr id="372" name="PlaceHolder 2"/>
           <p:cNvSpPr>
             <a:spLocks noGrp="1"/>
           </p:cNvSpPr>
@@ -430,7 +430,7 @@
         <p:spPr>
           <a:xfrm>
             <a:off x="685800" y="4400640"/>
-            <a:ext cx="5480640" cy="3594600"/>
+            <a:ext cx="5480280" cy="3594240"/>
           </a:xfrm>
           <a:prstGeom prst="rect">
             <a:avLst/>
@@ -459,7 +459,7 @@
       </p:sp>
       <p:sp>
         <p:nvSpPr>
-          <p:cNvPr id="371" name="PlaceHolder 3"/>
+          <p:cNvPr id="373" name="PlaceHolder 3"/>
           <p:cNvSpPr>
             <a:spLocks noGrp="1"/>
           </p:cNvSpPr>
@@ -470,7 +470,7 @@
         <p:spPr>
           <a:xfrm>
             <a:off x="3884760" y="8685360"/>
-            <a:ext cx="2966040" cy="452880"/>
+            <a:ext cx="2965680" cy="452520"/>
           </a:xfrm>
           <a:prstGeom prst="rect">
             <a:avLst/>
@@ -512,7 +512,7 @@
                 <a:tab algn="l" pos="0"/>
               </a:tabLst>
             </a:pPr>
-            <a:fld id="{CA25C9D6-16D0-4657-80F8-DE9263C137F2}" type="slidenum">
+            <a:fld id="{473FA8B8-F463-472F-9922-B136FE6550D7}" type="slidenum">
               <a:rPr b="0" lang="en-US" sz="1200" spc="-1" strike="noStrike">
                 <a:solidFill>
                   <a:schemeClr val="dk1"/>
@@ -555,7 +555,7 @@
       </p:grpSpPr>
       <p:sp>
         <p:nvSpPr>
-          <p:cNvPr id="372" name="PlaceHolder 1"/>
+          <p:cNvPr id="374" name="PlaceHolder 1"/>
           <p:cNvSpPr>
             <a:spLocks noGrp="1"/>
           </p:cNvSpPr>
@@ -566,7 +566,7 @@
         <p:spPr>
           <a:xfrm>
             <a:off x="685800" y="1143000"/>
-            <a:ext cx="5480640" cy="3080520"/>
+            <a:ext cx="5480280" cy="3080160"/>
           </a:xfrm>
           <a:prstGeom prst="rect">
             <a:avLst/>
@@ -578,7 +578,7 @@
       </p:sp>
       <p:sp>
         <p:nvSpPr>
-          <p:cNvPr id="373" name="PlaceHolder 2"/>
+          <p:cNvPr id="375" name="PlaceHolder 2"/>
           <p:cNvSpPr>
             <a:spLocks noGrp="1"/>
           </p:cNvSpPr>
@@ -589,7 +589,7 @@
         <p:spPr>
           <a:xfrm>
             <a:off x="685800" y="4400640"/>
-            <a:ext cx="5480640" cy="3594600"/>
+            <a:ext cx="5480280" cy="3594240"/>
           </a:xfrm>
           <a:prstGeom prst="rect">
             <a:avLst/>
@@ -618,7 +618,7 @@
       </p:sp>
       <p:sp>
         <p:nvSpPr>
-          <p:cNvPr id="374" name="PlaceHolder 3"/>
+          <p:cNvPr id="376" name="PlaceHolder 3"/>
           <p:cNvSpPr>
             <a:spLocks noGrp="1"/>
           </p:cNvSpPr>
@@ -629,7 +629,7 @@
         <p:spPr>
           <a:xfrm>
             <a:off x="3884760" y="8685360"/>
-            <a:ext cx="2966040" cy="452880"/>
+            <a:ext cx="2965680" cy="452520"/>
           </a:xfrm>
           <a:prstGeom prst="rect">
             <a:avLst/>
@@ -671,7 +671,7 @@
                 <a:tab algn="l" pos="0"/>
               </a:tabLst>
             </a:pPr>
-            <a:fld id="{C282F6D8-0716-4896-8510-D91F63DA57C9}" type="slidenum">
+            <a:fld id="{19A095F4-CCA7-4346-9698-984C474DEDBF}" type="slidenum">
               <a:rPr b="0" lang="en-US" sz="1200" spc="-1" strike="noStrike">
                 <a:solidFill>
                   <a:schemeClr val="dk1"/>
@@ -714,7 +714,7 @@
       </p:grpSpPr>
       <p:sp>
         <p:nvSpPr>
-          <p:cNvPr id="375" name="PlaceHolder 1"/>
+          <p:cNvPr id="377" name="PlaceHolder 1"/>
           <p:cNvSpPr>
             <a:spLocks noGrp="1"/>
           </p:cNvSpPr>
@@ -725,7 +725,7 @@
         <p:spPr>
           <a:xfrm>
             <a:off x="685800" y="1143000"/>
-            <a:ext cx="5480640" cy="3080520"/>
+            <a:ext cx="5480280" cy="3080160"/>
           </a:xfrm>
           <a:prstGeom prst="rect">
             <a:avLst/>
@@ -737,7 +737,7 @@
       </p:sp>
       <p:sp>
         <p:nvSpPr>
-          <p:cNvPr id="376" name="PlaceHolder 2"/>
+          <p:cNvPr id="378" name="PlaceHolder 2"/>
           <p:cNvSpPr>
             <a:spLocks noGrp="1"/>
           </p:cNvSpPr>
@@ -748,7 +748,7 @@
         <p:spPr>
           <a:xfrm>
             <a:off x="685800" y="4400640"/>
-            <a:ext cx="5480640" cy="3594600"/>
+            <a:ext cx="5480280" cy="3594240"/>
           </a:xfrm>
           <a:prstGeom prst="rect">
             <a:avLst/>
@@ -777,7 +777,7 @@
       </p:sp>
       <p:sp>
         <p:nvSpPr>
-          <p:cNvPr id="377" name="PlaceHolder 3"/>
+          <p:cNvPr id="379" name="PlaceHolder 3"/>
           <p:cNvSpPr>
             <a:spLocks noGrp="1"/>
           </p:cNvSpPr>
@@ -788,7 +788,7 @@
         <p:spPr>
           <a:xfrm>
             <a:off x="3884760" y="8685360"/>
-            <a:ext cx="2966040" cy="452880"/>
+            <a:ext cx="2965680" cy="452520"/>
           </a:xfrm>
           <a:prstGeom prst="rect">
             <a:avLst/>
@@ -830,7 +830,7 @@
                 <a:tab algn="l" pos="0"/>
               </a:tabLst>
             </a:pPr>
-            <a:fld id="{E0F1D271-18E2-436A-843A-05030E02C885}" type="slidenum">
+            <a:fld id="{2AAE7C41-C7DA-47E5-A715-BB6DC3547953}" type="slidenum">
               <a:rPr b="0" lang="en-US" sz="1200" spc="-1" strike="noStrike">
                 <a:solidFill>
                   <a:schemeClr val="dk1"/>
@@ -873,7 +873,7 @@
       </p:grpSpPr>
       <p:sp>
         <p:nvSpPr>
-          <p:cNvPr id="378" name="PlaceHolder 1"/>
+          <p:cNvPr id="380" name="PlaceHolder 1"/>
           <p:cNvSpPr>
             <a:spLocks noGrp="1"/>
           </p:cNvSpPr>
@@ -884,7 +884,7 @@
         <p:spPr>
           <a:xfrm>
             <a:off x="685800" y="1143000"/>
-            <a:ext cx="5480640" cy="3080520"/>
+            <a:ext cx="5480280" cy="3080160"/>
           </a:xfrm>
           <a:prstGeom prst="rect">
             <a:avLst/>
@@ -896,7 +896,7 @@
       </p:sp>
       <p:sp>
         <p:nvSpPr>
-          <p:cNvPr id="379" name="PlaceHolder 2"/>
+          <p:cNvPr id="381" name="PlaceHolder 2"/>
           <p:cNvSpPr>
             <a:spLocks noGrp="1"/>
           </p:cNvSpPr>
@@ -907,7 +907,7 @@
         <p:spPr>
           <a:xfrm>
             <a:off x="685800" y="4400640"/>
-            <a:ext cx="5480640" cy="3594600"/>
+            <a:ext cx="5480280" cy="3594240"/>
           </a:xfrm>
           <a:prstGeom prst="rect">
             <a:avLst/>
@@ -936,7 +936,7 @@
       </p:sp>
       <p:sp>
         <p:nvSpPr>
-          <p:cNvPr id="380" name="PlaceHolder 3"/>
+          <p:cNvPr id="382" name="PlaceHolder 3"/>
           <p:cNvSpPr>
             <a:spLocks noGrp="1"/>
           </p:cNvSpPr>
@@ -947,7 +947,7 @@
         <p:spPr>
           <a:xfrm>
             <a:off x="3884760" y="8685360"/>
-            <a:ext cx="2966040" cy="452880"/>
+            <a:ext cx="2965680" cy="452520"/>
           </a:xfrm>
           <a:prstGeom prst="rect">
             <a:avLst/>
@@ -989,7 +989,7 @@
                 <a:tab algn="l" pos="0"/>
               </a:tabLst>
             </a:pPr>
-            <a:fld id="{98EBB5AF-31BF-48E2-9BB2-191F8669B587}" type="slidenum">
+            <a:fld id="{F644509B-C0C9-4324-958F-2ACEC52F018B}" type="slidenum">
               <a:rPr b="0" lang="en-US" sz="1200" spc="-1" strike="noStrike">
                 <a:solidFill>
                   <a:schemeClr val="dk1"/>
@@ -1233,7 +1233,7 @@
         <p:txBody>
           <a:bodyPr/>
           <a:p>
-            <a:fld id="{4271D7C4-2EDD-428B-A84A-5BCA735A9B53}" type="slidenum">
+            <a:fld id="{37AA2C8D-7A5C-4B73-8992-9EEC68847F09}" type="slidenum">
               <a:t>&lt;#&gt;</a:t>
             </a:fld>
           </a:p>
@@ -1442,7 +1442,7 @@
         <p:txBody>
           <a:bodyPr/>
           <a:p>
-            <a:fld id="{75C2A82D-F67B-43AE-951B-53547A102D1A}" type="slidenum">
+            <a:fld id="{B5E3226B-C354-42DF-A7D3-49AE0EBCBC59}" type="slidenum">
               <a:t>&lt;#&gt;</a:t>
             </a:fld>
           </a:p>
@@ -1565,7 +1565,7 @@
         <p:txBody>
           <a:bodyPr/>
           <a:p>
-            <a:fld id="{0B22D69B-9C36-4314-8870-06B67FA8C635}" type="slidenum">
+            <a:fld id="{EF3DD822-712C-4905-AB4E-D7D1F53D1FC5}" type="slidenum">
               <a:t>&lt;#&gt;</a:t>
             </a:fld>
           </a:p>
@@ -1648,7 +1648,7 @@
         <p:txBody>
           <a:bodyPr/>
           <a:p>
-            <a:fld id="{4C85A174-6AFD-41F1-B204-55B1D10AF700}" type="slidenum">
+            <a:fld id="{910CE0C1-15B4-450B-9754-4EE58301CA7D}" type="slidenum">
               <a:t>&lt;#&gt;</a:t>
             </a:fld>
           </a:p>
@@ -1900,7 +1900,7 @@
         <p:txBody>
           <a:bodyPr/>
           <a:p>
-            <a:fld id="{5E70D0AF-047A-48C6-BDE4-1E73CA055D34}" type="slidenum">
+            <a:fld id="{0CB1CBF1-D8E6-4338-AFA8-F19A5D0E3401}" type="slidenum">
               <a:t>&lt;#&gt;</a:t>
             </a:fld>
           </a:p>
@@ -2152,7 +2152,7 @@
         <p:txBody>
           <a:bodyPr/>
           <a:p>
-            <a:fld id="{B36C2409-53F0-4C79-8BE1-7D03E7B2C8DB}" type="slidenum">
+            <a:fld id="{2737893F-EC71-4620-9C20-6978EC7C6077}" type="slidenum">
               <a:t>&lt;#&gt;</a:t>
             </a:fld>
           </a:p>
@@ -2361,7 +2361,7 @@
         <p:txBody>
           <a:bodyPr/>
           <a:p>
-            <a:fld id="{114E470F-9CD2-4270-B826-FD918F0A099D}" type="slidenum">
+            <a:fld id="{97C74E6C-D3B2-46E3-A5E7-6A49BD657A5D}" type="slidenum">
               <a:t>&lt;#&gt;</a:t>
             </a:fld>
           </a:p>
@@ -2656,7 +2656,7 @@
         <p:txBody>
           <a:bodyPr/>
           <a:p>
-            <a:fld id="{72027EDC-BBDB-4B89-A397-DAED3B99F706}" type="slidenum">
+            <a:fld id="{EFF97007-C681-4C28-AA88-A4F319460008}" type="slidenum">
               <a:t>&lt;#&gt;</a:t>
             </a:fld>
           </a:p>
@@ -2739,7 +2739,7 @@
         <p:txBody>
           <a:bodyPr/>
           <a:p>
-            <a:fld id="{C6ABA3FD-F908-42A0-8A20-0F548322E958}" type="slidenum">
+            <a:fld id="{B46D69CE-ECFB-420F-B50E-7B6F49AA8D55}" type="slidenum">
               <a:t>&lt;#&gt;</a:t>
             </a:fld>
           </a:p>
@@ -2822,7 +2822,7 @@
         <p:txBody>
           <a:bodyPr/>
           <a:p>
-            <a:fld id="{007A184D-36FE-4881-AC7B-3FBE9B6CD6AF}" type="slidenum">
+            <a:fld id="{F3E41EB3-58C0-451E-83B8-FD853D3AD4DE}" type="slidenum">
               <a:t>&lt;#&gt;</a:t>
             </a:fld>
           </a:p>
@@ -2988,7 +2988,7 @@
         <p:txBody>
           <a:bodyPr/>
           <a:p>
-            <a:fld id="{FB90BA6A-2C98-492B-9ADA-3F73981F823F}" type="slidenum">
+            <a:fld id="{1BAC23AA-21C7-44B3-90D1-897A6080F0E2}" type="slidenum">
               <a:t>&lt;#&gt;</a:t>
             </a:fld>
           </a:p>
@@ -3154,7 +3154,7 @@
         <p:txBody>
           <a:bodyPr/>
           <a:p>
-            <a:fld id="{5362D8C5-A16C-47AE-AB13-7AB7542C1A90}" type="slidenum">
+            <a:fld id="{4CDC61AB-9BDC-4F09-8426-951FB0F21684}" type="slidenum">
               <a:t>&lt;#&gt;</a:t>
             </a:fld>
           </a:p>
@@ -3219,9 +3219,9 @@
         <p:grpSpPr>
           <a:xfrm>
             <a:off x="6199200" y="6162840"/>
-            <a:ext cx="5987160" cy="689400"/>
+            <a:ext cx="5986800" cy="689040"/>
             <a:chOff x="6199200" y="6162840"/>
-            <a:chExt cx="5987160" cy="689400"/>
+            <a:chExt cx="5986800" cy="689040"/>
           </a:xfrm>
         </p:grpSpPr>
         <p:pic>
@@ -3237,7 +3237,7 @@
           <p:spPr>
             <a:xfrm>
               <a:off x="6199200" y="6162840"/>
-              <a:ext cx="4050720" cy="689400"/>
+              <a:ext cx="4050360" cy="689040"/>
             </a:xfrm>
             <a:prstGeom prst="rect">
               <a:avLst/>
@@ -3260,7 +3260,7 @@
           <p:spPr>
             <a:xfrm>
               <a:off x="10270080" y="6162840"/>
-              <a:ext cx="1916280" cy="605880"/>
+              <a:ext cx="1915920" cy="605520"/>
             </a:xfrm>
             <a:prstGeom prst="rect">
               <a:avLst/>
@@ -4008,7 +4008,7 @@
         <p:spPr>
           <a:xfrm>
             <a:off x="4038480" y="6356520"/>
-            <a:ext cx="4109040" cy="359280"/>
+            <a:ext cx="4108680" cy="358920"/>
           </a:xfrm>
           <a:prstGeom prst="rect">
             <a:avLst/>
@@ -4080,7 +4080,7 @@
         <p:spPr>
           <a:xfrm>
             <a:off x="8610480" y="6356520"/>
-            <a:ext cx="2737440" cy="359280"/>
+            <a:ext cx="2737080" cy="358920"/>
           </a:xfrm>
           <a:prstGeom prst="rect">
             <a:avLst/>
@@ -4123,7 +4123,7 @@
                 <a:tab algn="l" pos="0"/>
               </a:tabLst>
             </a:pPr>
-            <a:fld id="{EF6640D3-B3F1-4078-89D2-8D1D2AB55749}" type="slidenum">
+            <a:fld id="{54211198-91CF-4F18-AC7B-8A26124D3265}" type="slidenum">
               <a:rPr b="0" lang="en-US" sz="1200" spc="-1" strike="noStrike">
                 <a:solidFill>
                   <a:schemeClr val="dk1">
@@ -4156,7 +4156,7 @@
         <p:spPr>
           <a:xfrm>
             <a:off x="838080" y="6356520"/>
-            <a:ext cx="2737440" cy="359280"/>
+            <a:ext cx="2737080" cy="358920"/>
           </a:xfrm>
           <a:prstGeom prst="rect">
             <a:avLst/>
@@ -4245,9 +4245,9 @@
         <p:grpSpPr>
           <a:xfrm>
             <a:off x="6199200" y="6162840"/>
-            <a:ext cx="5987160" cy="689400"/>
+            <a:ext cx="5986800" cy="689040"/>
             <a:chOff x="6199200" y="6162840"/>
-            <a:chExt cx="5987160" cy="689400"/>
+            <a:chExt cx="5986800" cy="689040"/>
           </a:xfrm>
         </p:grpSpPr>
         <p:pic>
@@ -4263,7 +4263,7 @@
           <p:spPr>
             <a:xfrm>
               <a:off x="6199200" y="6162840"/>
-              <a:ext cx="4050720" cy="689400"/>
+              <a:ext cx="4050360" cy="689040"/>
             </a:xfrm>
             <a:prstGeom prst="rect">
               <a:avLst/>
@@ -4286,7 +4286,7 @@
           <p:spPr>
             <a:xfrm>
               <a:off x="10270080" y="6162840"/>
-              <a:ext cx="1916280" cy="605880"/>
+              <a:ext cx="1915920" cy="605520"/>
             </a:xfrm>
             <a:prstGeom prst="rect">
               <a:avLst/>
@@ -4809,7 +4809,7 @@
         <p:spPr>
           <a:xfrm>
             <a:off x="4038480" y="6356520"/>
-            <a:ext cx="4109040" cy="359280"/>
+            <a:ext cx="4108680" cy="358920"/>
           </a:xfrm>
           <a:prstGeom prst="rect">
             <a:avLst/>
@@ -4881,7 +4881,7 @@
         <p:spPr>
           <a:xfrm>
             <a:off x="8610480" y="6356520"/>
-            <a:ext cx="2737440" cy="359280"/>
+            <a:ext cx="2737080" cy="358920"/>
           </a:xfrm>
           <a:prstGeom prst="rect">
             <a:avLst/>
@@ -4924,7 +4924,7 @@
                 <a:tab algn="l" pos="0"/>
               </a:tabLst>
             </a:pPr>
-            <a:fld id="{EF8ABD1E-B5BD-4655-922A-BAEDB1181125}" type="slidenum">
+            <a:fld id="{2657FEB7-12D4-424E-A9C3-E1774BE704A4}" type="slidenum">
               <a:rPr b="0" lang="en-US" sz="1200" spc="-1" strike="noStrike">
                 <a:solidFill>
                   <a:schemeClr val="dk1">
@@ -4957,7 +4957,7 @@
         <p:spPr>
           <a:xfrm>
             <a:off x="838080" y="6356520"/>
-            <a:ext cx="2737440" cy="359280"/>
+            <a:ext cx="2737080" cy="358920"/>
           </a:xfrm>
           <a:prstGeom prst="rect">
             <a:avLst/>
@@ -5046,9 +5046,9 @@
         <p:grpSpPr>
           <a:xfrm>
             <a:off x="6199200" y="6162840"/>
-            <a:ext cx="5987160" cy="689400"/>
+            <a:ext cx="5986800" cy="689040"/>
             <a:chOff x="6199200" y="6162840"/>
-            <a:chExt cx="5987160" cy="689400"/>
+            <a:chExt cx="5986800" cy="689040"/>
           </a:xfrm>
         </p:grpSpPr>
         <p:pic>
@@ -5064,7 +5064,7 @@
           <p:spPr>
             <a:xfrm>
               <a:off x="6199200" y="6162840"/>
-              <a:ext cx="4050720" cy="689400"/>
+              <a:ext cx="4050360" cy="689040"/>
             </a:xfrm>
             <a:prstGeom prst="rect">
               <a:avLst/>
@@ -5087,7 +5087,7 @@
           <p:spPr>
             <a:xfrm>
               <a:off x="10270080" y="6162840"/>
-              <a:ext cx="1916280" cy="605880"/>
+              <a:ext cx="1915920" cy="605520"/>
             </a:xfrm>
             <a:prstGeom prst="rect">
               <a:avLst/>
@@ -5160,7 +5160,7 @@
         <p:spPr>
           <a:xfrm>
             <a:off x="4038480" y="6356520"/>
-            <a:ext cx="4109040" cy="359280"/>
+            <a:ext cx="4108680" cy="358920"/>
           </a:xfrm>
           <a:prstGeom prst="rect">
             <a:avLst/>
@@ -5232,7 +5232,7 @@
         <p:spPr>
           <a:xfrm>
             <a:off x="8610480" y="6356520"/>
-            <a:ext cx="2737440" cy="359280"/>
+            <a:ext cx="2737080" cy="358920"/>
           </a:xfrm>
           <a:prstGeom prst="rect">
             <a:avLst/>
@@ -5275,7 +5275,7 @@
                 <a:tab algn="l" pos="0"/>
               </a:tabLst>
             </a:pPr>
-            <a:fld id="{5C83FCDA-1282-47AD-8747-DCC6D9B7A471}" type="slidenum">
+            <a:fld id="{D6FE46CF-183F-4F64-9A51-D551AA33A7D9}" type="slidenum">
               <a:rPr b="0" lang="en-US" sz="1200" spc="-1" strike="noStrike">
                 <a:solidFill>
                   <a:schemeClr val="dk1">
@@ -5308,7 +5308,7 @@
         <p:spPr>
           <a:xfrm>
             <a:off x="838080" y="6356520"/>
-            <a:ext cx="2737440" cy="359280"/>
+            <a:ext cx="2737080" cy="358920"/>
           </a:xfrm>
           <a:prstGeom prst="rect">
             <a:avLst/>
@@ -5397,9 +5397,9 @@
         <p:grpSpPr>
           <a:xfrm>
             <a:off x="6199200" y="6162840"/>
-            <a:ext cx="5987160" cy="689400"/>
+            <a:ext cx="5986800" cy="689040"/>
             <a:chOff x="6199200" y="6162840"/>
-            <a:chExt cx="5987160" cy="689400"/>
+            <a:chExt cx="5986800" cy="689040"/>
           </a:xfrm>
         </p:grpSpPr>
         <p:pic>
@@ -5415,7 +5415,7 @@
           <p:spPr>
             <a:xfrm>
               <a:off x="6199200" y="6162840"/>
-              <a:ext cx="4050720" cy="689400"/>
+              <a:ext cx="4050360" cy="689040"/>
             </a:xfrm>
             <a:prstGeom prst="rect">
               <a:avLst/>
@@ -5438,7 +5438,7 @@
           <p:spPr>
             <a:xfrm>
               <a:off x="10270080" y="6162840"/>
-              <a:ext cx="1916280" cy="605880"/>
+              <a:ext cx="1915920" cy="605520"/>
             </a:xfrm>
             <a:prstGeom prst="rect">
               <a:avLst/>
@@ -5462,7 +5462,7 @@
         <p:spPr>
           <a:xfrm>
             <a:off x="4038480" y="6356520"/>
-            <a:ext cx="4109040" cy="359280"/>
+            <a:ext cx="4108680" cy="358920"/>
           </a:xfrm>
           <a:prstGeom prst="rect">
             <a:avLst/>
@@ -5534,7 +5534,7 @@
         <p:spPr>
           <a:xfrm>
             <a:off x="8610480" y="6356520"/>
-            <a:ext cx="2737440" cy="359280"/>
+            <a:ext cx="2737080" cy="358920"/>
           </a:xfrm>
           <a:prstGeom prst="rect">
             <a:avLst/>
@@ -5577,7 +5577,7 @@
                 <a:tab algn="l" pos="0"/>
               </a:tabLst>
             </a:pPr>
-            <a:fld id="{32F563C9-F38A-4015-B2FF-0ADA90F5D121}" type="slidenum">
+            <a:fld id="{208891D8-BC18-43A1-9C89-025251E02EB5}" type="slidenum">
               <a:rPr b="0" lang="en-US" sz="1200" spc="-1" strike="noStrike">
                 <a:solidFill>
                   <a:schemeClr val="dk1">
@@ -5610,7 +5610,7 @@
         <p:spPr>
           <a:xfrm>
             <a:off x="838080" y="6356520"/>
-            <a:ext cx="2737440" cy="359280"/>
+            <a:ext cx="2737080" cy="358920"/>
           </a:xfrm>
           <a:prstGeom prst="rect">
             <a:avLst/>
@@ -5699,9 +5699,9 @@
         <p:grpSpPr>
           <a:xfrm>
             <a:off x="6199200" y="6162840"/>
-            <a:ext cx="5987160" cy="689400"/>
+            <a:ext cx="5986800" cy="689040"/>
             <a:chOff x="6199200" y="6162840"/>
-            <a:chExt cx="5987160" cy="689400"/>
+            <a:chExt cx="5986800" cy="689040"/>
           </a:xfrm>
         </p:grpSpPr>
         <p:pic>
@@ -5717,7 +5717,7 @@
           <p:spPr>
             <a:xfrm>
               <a:off x="6199200" y="6162840"/>
-              <a:ext cx="4050720" cy="689400"/>
+              <a:ext cx="4050360" cy="689040"/>
             </a:xfrm>
             <a:prstGeom prst="rect">
               <a:avLst/>
@@ -5740,7 +5740,7 @@
           <p:spPr>
             <a:xfrm>
               <a:off x="10270080" y="6162840"/>
-              <a:ext cx="1916280" cy="605880"/>
+              <a:ext cx="1915920" cy="605520"/>
             </a:xfrm>
             <a:prstGeom prst="rect">
               <a:avLst/>
@@ -6488,7 +6488,7 @@
         <p:spPr>
           <a:xfrm>
             <a:off x="4038480" y="6356520"/>
-            <a:ext cx="4109040" cy="359280"/>
+            <a:ext cx="4108680" cy="358920"/>
           </a:xfrm>
           <a:prstGeom prst="rect">
             <a:avLst/>
@@ -6560,7 +6560,7 @@
         <p:spPr>
           <a:xfrm>
             <a:off x="8610480" y="6356520"/>
-            <a:ext cx="2737440" cy="359280"/>
+            <a:ext cx="2737080" cy="358920"/>
           </a:xfrm>
           <a:prstGeom prst="rect">
             <a:avLst/>
@@ -6603,7 +6603,7 @@
                 <a:tab algn="l" pos="0"/>
               </a:tabLst>
             </a:pPr>
-            <a:fld id="{7817CF47-9A8F-463A-A36C-DF623A67FA7E}" type="slidenum">
+            <a:fld id="{645BEFF8-B125-486D-9EF6-EC43BA457958}" type="slidenum">
               <a:rPr b="0" lang="en-US" sz="1200" spc="-1" strike="noStrike">
                 <a:solidFill>
                   <a:schemeClr val="dk1">
@@ -6636,7 +6636,7 @@
         <p:spPr>
           <a:xfrm>
             <a:off x="838080" y="6356520"/>
-            <a:ext cx="2737440" cy="359280"/>
+            <a:ext cx="2737080" cy="358920"/>
           </a:xfrm>
           <a:prstGeom prst="rect">
             <a:avLst/>
@@ -6725,9 +6725,9 @@
         <p:grpSpPr>
           <a:xfrm>
             <a:off x="6199200" y="6162840"/>
-            <a:ext cx="5987160" cy="689400"/>
+            <a:ext cx="5986800" cy="689040"/>
             <a:chOff x="6199200" y="6162840"/>
-            <a:chExt cx="5987160" cy="689400"/>
+            <a:chExt cx="5986800" cy="689040"/>
           </a:xfrm>
         </p:grpSpPr>
         <p:pic>
@@ -6743,7 +6743,7 @@
           <p:spPr>
             <a:xfrm>
               <a:off x="6199200" y="6162840"/>
-              <a:ext cx="4050720" cy="689400"/>
+              <a:ext cx="4050360" cy="689040"/>
             </a:xfrm>
             <a:prstGeom prst="rect">
               <a:avLst/>
@@ -6766,7 +6766,7 @@
           <p:spPr>
             <a:xfrm>
               <a:off x="10270080" y="6162840"/>
-              <a:ext cx="1916280" cy="605880"/>
+              <a:ext cx="1915920" cy="605520"/>
             </a:xfrm>
             <a:prstGeom prst="rect">
               <a:avLst/>
@@ -7514,7 +7514,7 @@
         <p:spPr>
           <a:xfrm>
             <a:off x="4038480" y="6356520"/>
-            <a:ext cx="4109040" cy="359280"/>
+            <a:ext cx="4108680" cy="358920"/>
           </a:xfrm>
           <a:prstGeom prst="rect">
             <a:avLst/>
@@ -7586,7 +7586,7 @@
         <p:spPr>
           <a:xfrm>
             <a:off x="8610480" y="6356520"/>
-            <a:ext cx="2737440" cy="359280"/>
+            <a:ext cx="2737080" cy="358920"/>
           </a:xfrm>
           <a:prstGeom prst="rect">
             <a:avLst/>
@@ -7629,7 +7629,7 @@
                 <a:tab algn="l" pos="0"/>
               </a:tabLst>
             </a:pPr>
-            <a:fld id="{F6BD3FB9-5DA6-4100-9B9A-37D472CFEBE6}" type="slidenum">
+            <a:fld id="{7FCA420C-E898-4DBE-B94F-72D609D56B39}" type="slidenum">
               <a:rPr b="0" lang="en-US" sz="1200" spc="-1" strike="noStrike">
                 <a:solidFill>
                   <a:schemeClr val="dk1">
@@ -7662,7 +7662,7 @@
         <p:spPr>
           <a:xfrm>
             <a:off x="838080" y="6356520"/>
-            <a:ext cx="2737440" cy="359280"/>
+            <a:ext cx="2737080" cy="358920"/>
           </a:xfrm>
           <a:prstGeom prst="rect">
             <a:avLst/>
@@ -7751,9 +7751,9 @@
         <p:grpSpPr>
           <a:xfrm>
             <a:off x="6199200" y="6162840"/>
-            <a:ext cx="5987160" cy="689400"/>
+            <a:ext cx="5986800" cy="689040"/>
             <a:chOff x="6199200" y="6162840"/>
-            <a:chExt cx="5987160" cy="689400"/>
+            <a:chExt cx="5986800" cy="689040"/>
           </a:xfrm>
         </p:grpSpPr>
         <p:pic>
@@ -7769,7 +7769,7 @@
           <p:spPr>
             <a:xfrm>
               <a:off x="6199200" y="6162840"/>
-              <a:ext cx="4050720" cy="689400"/>
+              <a:ext cx="4050360" cy="689040"/>
             </a:xfrm>
             <a:prstGeom prst="rect">
               <a:avLst/>
@@ -7792,7 +7792,7 @@
           <p:spPr>
             <a:xfrm>
               <a:off x="10270080" y="6162840"/>
-              <a:ext cx="1916280" cy="605880"/>
+              <a:ext cx="1915920" cy="605520"/>
             </a:xfrm>
             <a:prstGeom prst="rect">
               <a:avLst/>
@@ -8315,7 +8315,7 @@
         <p:spPr>
           <a:xfrm>
             <a:off x="4038480" y="6356520"/>
-            <a:ext cx="4109040" cy="359280"/>
+            <a:ext cx="4108680" cy="358920"/>
           </a:xfrm>
           <a:prstGeom prst="rect">
             <a:avLst/>
@@ -8387,7 +8387,7 @@
         <p:spPr>
           <a:xfrm>
             <a:off x="8610480" y="6356520"/>
-            <a:ext cx="2737440" cy="359280"/>
+            <a:ext cx="2737080" cy="358920"/>
           </a:xfrm>
           <a:prstGeom prst="rect">
             <a:avLst/>
@@ -8430,7 +8430,7 @@
                 <a:tab algn="l" pos="0"/>
               </a:tabLst>
             </a:pPr>
-            <a:fld id="{81CF6319-6743-4EAF-A440-8DAE454A9E31}" type="slidenum">
+            <a:fld id="{180A4D0E-B8C2-4E3D-857E-515F7EE2344D}" type="slidenum">
               <a:rPr b="0" lang="en-US" sz="1200" spc="-1" strike="noStrike">
                 <a:solidFill>
                   <a:schemeClr val="dk1">
@@ -8463,7 +8463,7 @@
         <p:spPr>
           <a:xfrm>
             <a:off x="838080" y="6356520"/>
-            <a:ext cx="2737440" cy="359280"/>
+            <a:ext cx="2737080" cy="358920"/>
           </a:xfrm>
           <a:prstGeom prst="rect">
             <a:avLst/>
@@ -8552,9 +8552,9 @@
         <p:grpSpPr>
           <a:xfrm>
             <a:off x="6199200" y="6162840"/>
-            <a:ext cx="5987160" cy="689400"/>
+            <a:ext cx="5986800" cy="689040"/>
             <a:chOff x="6199200" y="6162840"/>
-            <a:chExt cx="5987160" cy="689400"/>
+            <a:chExt cx="5986800" cy="689040"/>
           </a:xfrm>
         </p:grpSpPr>
         <p:pic>
@@ -8570,7 +8570,7 @@
           <p:spPr>
             <a:xfrm>
               <a:off x="6199200" y="6162840"/>
-              <a:ext cx="4050720" cy="689400"/>
+              <a:ext cx="4050360" cy="689040"/>
             </a:xfrm>
             <a:prstGeom prst="rect">
               <a:avLst/>
@@ -8593,7 +8593,7 @@
           <p:spPr>
             <a:xfrm>
               <a:off x="10270080" y="6162840"/>
-              <a:ext cx="1916280" cy="605880"/>
+              <a:ext cx="1915920" cy="605520"/>
             </a:xfrm>
             <a:prstGeom prst="rect">
               <a:avLst/>
@@ -9566,7 +9566,7 @@
         <p:spPr>
           <a:xfrm>
             <a:off x="4038480" y="6356520"/>
-            <a:ext cx="4109040" cy="359280"/>
+            <a:ext cx="4108680" cy="358920"/>
           </a:xfrm>
           <a:prstGeom prst="rect">
             <a:avLst/>
@@ -9638,7 +9638,7 @@
         <p:spPr>
           <a:xfrm>
             <a:off x="8610480" y="6356520"/>
-            <a:ext cx="2737440" cy="359280"/>
+            <a:ext cx="2737080" cy="358920"/>
           </a:xfrm>
           <a:prstGeom prst="rect">
             <a:avLst/>
@@ -9681,7 +9681,7 @@
                 <a:tab algn="l" pos="0"/>
               </a:tabLst>
             </a:pPr>
-            <a:fld id="{2651874F-B1CD-43C0-8605-F4B79470769B}" type="slidenum">
+            <a:fld id="{C073F474-53DC-4A37-BED2-6B3B1593689E}" type="slidenum">
               <a:rPr b="0" lang="en-US" sz="1200" spc="-1" strike="noStrike">
                 <a:solidFill>
                   <a:schemeClr val="dk1">
@@ -9714,7 +9714,7 @@
         <p:spPr>
           <a:xfrm>
             <a:off x="838080" y="6356520"/>
-            <a:ext cx="2737440" cy="359280"/>
+            <a:ext cx="2737080" cy="358920"/>
           </a:xfrm>
           <a:prstGeom prst="rect">
             <a:avLst/>
@@ -9803,9 +9803,9 @@
         <p:grpSpPr>
           <a:xfrm>
             <a:off x="6199200" y="6162840"/>
-            <a:ext cx="5987160" cy="689400"/>
+            <a:ext cx="5986800" cy="689040"/>
             <a:chOff x="6199200" y="6162840"/>
-            <a:chExt cx="5987160" cy="689400"/>
+            <a:chExt cx="5986800" cy="689040"/>
           </a:xfrm>
         </p:grpSpPr>
         <p:pic>
@@ -9821,7 +9821,7 @@
           <p:spPr>
             <a:xfrm>
               <a:off x="6199200" y="6162840"/>
-              <a:ext cx="4050720" cy="689400"/>
+              <a:ext cx="4050360" cy="689040"/>
             </a:xfrm>
             <a:prstGeom prst="rect">
               <a:avLst/>
@@ -9844,7 +9844,7 @@
           <p:spPr>
             <a:xfrm>
               <a:off x="10270080" y="6162840"/>
-              <a:ext cx="1916280" cy="605880"/>
+              <a:ext cx="1915920" cy="605520"/>
             </a:xfrm>
             <a:prstGeom prst="rect">
               <a:avLst/>
@@ -9868,7 +9868,7 @@
         <p:spPr>
           <a:xfrm>
             <a:off x="4038480" y="6356520"/>
-            <a:ext cx="4109040" cy="359280"/>
+            <a:ext cx="4108680" cy="358920"/>
           </a:xfrm>
           <a:prstGeom prst="rect">
             <a:avLst/>
@@ -9940,7 +9940,7 @@
         <p:spPr>
           <a:xfrm>
             <a:off x="8610480" y="6356520"/>
-            <a:ext cx="2737440" cy="359280"/>
+            <a:ext cx="2737080" cy="358920"/>
           </a:xfrm>
           <a:prstGeom prst="rect">
             <a:avLst/>
@@ -9983,7 +9983,7 @@
                 <a:tab algn="l" pos="0"/>
               </a:tabLst>
             </a:pPr>
-            <a:fld id="{AEC6C37B-E4FC-4563-BE38-9AADCE8B9669}" type="slidenum">
+            <a:fld id="{B4C28A07-D611-45B1-B920-03C55F62641E}" type="slidenum">
               <a:rPr b="0" lang="en-US" sz="1200" spc="-1" strike="noStrike">
                 <a:solidFill>
                   <a:schemeClr val="dk1">
@@ -10016,7 +10016,7 @@
         <p:spPr>
           <a:xfrm>
             <a:off x="838080" y="6356520"/>
-            <a:ext cx="2737440" cy="359280"/>
+            <a:ext cx="2737080" cy="358920"/>
           </a:xfrm>
           <a:prstGeom prst="rect">
             <a:avLst/>
@@ -10105,9 +10105,9 @@
         <p:grpSpPr>
           <a:xfrm>
             <a:off x="6199200" y="6162840"/>
-            <a:ext cx="5987160" cy="689400"/>
+            <a:ext cx="5986800" cy="689040"/>
             <a:chOff x="6199200" y="6162840"/>
-            <a:chExt cx="5987160" cy="689400"/>
+            <a:chExt cx="5986800" cy="689040"/>
           </a:xfrm>
         </p:grpSpPr>
         <p:pic>
@@ -10123,7 +10123,7 @@
           <p:spPr>
             <a:xfrm>
               <a:off x="6199200" y="6162840"/>
-              <a:ext cx="4050720" cy="689400"/>
+              <a:ext cx="4050360" cy="689040"/>
             </a:xfrm>
             <a:prstGeom prst="rect">
               <a:avLst/>
@@ -10146,7 +10146,7 @@
           <p:spPr>
             <a:xfrm>
               <a:off x="10270080" y="6162840"/>
-              <a:ext cx="1916280" cy="605880"/>
+              <a:ext cx="1915920" cy="605520"/>
             </a:xfrm>
             <a:prstGeom prst="rect">
               <a:avLst/>
@@ -10170,7 +10170,7 @@
         <p:spPr>
           <a:xfrm>
             <a:off x="4038480" y="6356520"/>
-            <a:ext cx="4109040" cy="359280"/>
+            <a:ext cx="4108680" cy="358920"/>
           </a:xfrm>
           <a:prstGeom prst="rect">
             <a:avLst/>
@@ -10242,7 +10242,7 @@
         <p:spPr>
           <a:xfrm>
             <a:off x="8610480" y="6356520"/>
-            <a:ext cx="2737440" cy="359280"/>
+            <a:ext cx="2737080" cy="358920"/>
           </a:xfrm>
           <a:prstGeom prst="rect">
             <a:avLst/>
@@ -10285,7 +10285,7 @@
                 <a:tab algn="l" pos="0"/>
               </a:tabLst>
             </a:pPr>
-            <a:fld id="{4A083E96-C025-4B20-B6AF-577C954C66B6}" type="slidenum">
+            <a:fld id="{F46DBDBE-0A22-4C95-8EE6-815FE2336A84}" type="slidenum">
               <a:rPr b="0" lang="en-US" sz="1200" spc="-1" strike="noStrike">
                 <a:solidFill>
                   <a:schemeClr val="dk1">
@@ -10318,7 +10318,7 @@
         <p:spPr>
           <a:xfrm>
             <a:off x="838080" y="6356520"/>
-            <a:ext cx="2737440" cy="359280"/>
+            <a:ext cx="2737080" cy="358920"/>
           </a:xfrm>
           <a:prstGeom prst="rect">
             <a:avLst/>
@@ -10681,9 +10681,9 @@
         <p:grpSpPr>
           <a:xfrm>
             <a:off x="6199200" y="6162840"/>
-            <a:ext cx="5987160" cy="689400"/>
+            <a:ext cx="5986800" cy="689040"/>
             <a:chOff x="6199200" y="6162840"/>
-            <a:chExt cx="5987160" cy="689400"/>
+            <a:chExt cx="5986800" cy="689040"/>
           </a:xfrm>
         </p:grpSpPr>
         <p:pic>
@@ -10699,7 +10699,7 @@
           <p:spPr>
             <a:xfrm>
               <a:off x="6199200" y="6162840"/>
-              <a:ext cx="4050720" cy="689400"/>
+              <a:ext cx="4050360" cy="689040"/>
             </a:xfrm>
             <a:prstGeom prst="rect">
               <a:avLst/>
@@ -10722,7 +10722,7 @@
           <p:spPr>
             <a:xfrm>
               <a:off x="10270080" y="6162840"/>
-              <a:ext cx="1916280" cy="605880"/>
+              <a:ext cx="1915920" cy="605520"/>
             </a:xfrm>
             <a:prstGeom prst="rect">
               <a:avLst/>
@@ -11020,7 +11020,7 @@
         <p:spPr>
           <a:xfrm>
             <a:off x="4038480" y="6356520"/>
-            <a:ext cx="4109040" cy="359280"/>
+            <a:ext cx="4108680" cy="358920"/>
           </a:xfrm>
           <a:prstGeom prst="rect">
             <a:avLst/>
@@ -11092,7 +11092,7 @@
         <p:spPr>
           <a:xfrm>
             <a:off x="8610480" y="6356520"/>
-            <a:ext cx="2737440" cy="359280"/>
+            <a:ext cx="2737080" cy="358920"/>
           </a:xfrm>
           <a:prstGeom prst="rect">
             <a:avLst/>
@@ -11135,7 +11135,7 @@
                 <a:tab algn="l" pos="0"/>
               </a:tabLst>
             </a:pPr>
-            <a:fld id="{93C6E08A-DABB-4FC5-954E-50C565F4994A}" type="slidenum">
+            <a:fld id="{E6FC36CE-285E-4AE9-A19B-3EC247C32DD9}" type="slidenum">
               <a:rPr b="0" lang="en-US" sz="1200" spc="-1" strike="noStrike">
                 <a:solidFill>
                   <a:schemeClr val="dk1">
@@ -11168,7 +11168,7 @@
         <p:spPr>
           <a:xfrm>
             <a:off x="838080" y="6356520"/>
-            <a:ext cx="2737440" cy="359280"/>
+            <a:ext cx="2737080" cy="358920"/>
           </a:xfrm>
           <a:prstGeom prst="rect">
             <a:avLst/>
@@ -11257,9 +11257,9 @@
         <p:grpSpPr>
           <a:xfrm>
             <a:off x="6199200" y="6162840"/>
-            <a:ext cx="5987160" cy="689400"/>
+            <a:ext cx="5986800" cy="689040"/>
             <a:chOff x="6199200" y="6162840"/>
-            <a:chExt cx="5987160" cy="689400"/>
+            <a:chExt cx="5986800" cy="689040"/>
           </a:xfrm>
         </p:grpSpPr>
         <p:pic>
@@ -11275,7 +11275,7 @@
           <p:spPr>
             <a:xfrm>
               <a:off x="6199200" y="6162840"/>
-              <a:ext cx="4050720" cy="689400"/>
+              <a:ext cx="4050360" cy="689040"/>
             </a:xfrm>
             <a:prstGeom prst="rect">
               <a:avLst/>
@@ -11298,7 +11298,7 @@
           <p:spPr>
             <a:xfrm>
               <a:off x="10270080" y="6162840"/>
-              <a:ext cx="1916280" cy="605880"/>
+              <a:ext cx="1915920" cy="605520"/>
             </a:xfrm>
             <a:prstGeom prst="rect">
               <a:avLst/>
@@ -11596,7 +11596,7 @@
         <p:spPr>
           <a:xfrm>
             <a:off x="4038480" y="6356520"/>
-            <a:ext cx="4109040" cy="359280"/>
+            <a:ext cx="4108680" cy="358920"/>
           </a:xfrm>
           <a:prstGeom prst="rect">
             <a:avLst/>
@@ -11668,7 +11668,7 @@
         <p:spPr>
           <a:xfrm>
             <a:off x="8610480" y="6356520"/>
-            <a:ext cx="2737440" cy="359280"/>
+            <a:ext cx="2737080" cy="358920"/>
           </a:xfrm>
           <a:prstGeom prst="rect">
             <a:avLst/>
@@ -11711,7 +11711,7 @@
                 <a:tab algn="l" pos="0"/>
               </a:tabLst>
             </a:pPr>
-            <a:fld id="{93130F2B-830E-4B1A-B099-2CFB7A38C8C3}" type="slidenum">
+            <a:fld id="{9095C1BA-25BD-4702-BB63-EE0D45D34770}" type="slidenum">
               <a:rPr b="0" lang="en-US" sz="1200" spc="-1" strike="noStrike">
                 <a:solidFill>
                   <a:schemeClr val="dk1">
@@ -11744,7 +11744,7 @@
         <p:spPr>
           <a:xfrm>
             <a:off x="838080" y="6356520"/>
-            <a:ext cx="2737440" cy="359280"/>
+            <a:ext cx="2737080" cy="358920"/>
           </a:xfrm>
           <a:prstGeom prst="rect">
             <a:avLst/>
@@ -11826,7 +11826,7 @@
         <p:spPr>
           <a:xfrm flipH="1">
             <a:off x="0" y="3073320"/>
-            <a:ext cx="1834560" cy="5760"/>
+            <a:ext cx="1834920" cy="6120"/>
           </a:xfrm>
           <a:prstGeom prst="straightConnector1">
             <a:avLst/>
@@ -11849,7 +11849,7 @@
         <p:spPr>
           <a:xfrm>
             <a:off x="0" y="2489400"/>
-            <a:ext cx="1834560" cy="5760"/>
+            <a:ext cx="1834920" cy="6120"/>
           </a:xfrm>
           <a:prstGeom prst="straightConnector1">
             <a:avLst/>
@@ -11872,7 +11872,7 @@
         <p:spPr>
           <a:xfrm>
             <a:off x="0" y="2781360"/>
-            <a:ext cx="1834560" cy="5760"/>
+            <a:ext cx="1834920" cy="6120"/>
           </a:xfrm>
           <a:prstGeom prst="straightConnector1">
             <a:avLst/>
@@ -11895,7 +11895,7 @@
         <p:spPr>
           <a:xfrm flipH="1">
             <a:off x="0" y="3657600"/>
-            <a:ext cx="1834560" cy="5760"/>
+            <a:ext cx="1834920" cy="6120"/>
           </a:xfrm>
           <a:prstGeom prst="straightConnector1">
             <a:avLst/>
@@ -11917,7 +11917,7 @@
         <p:spPr>
           <a:xfrm>
             <a:off x="128520" y="6134040"/>
-            <a:ext cx="1566000" cy="381960"/>
+            <a:ext cx="1565640" cy="381600"/>
           </a:xfrm>
           <a:prstGeom prst="diamond">
             <a:avLst/>
@@ -11982,7 +11982,7 @@
         <p:spPr>
           <a:xfrm>
             <a:off x="302760" y="5454000"/>
-            <a:ext cx="1217520" cy="381960"/>
+            <a:ext cx="1217160" cy="381600"/>
           </a:xfrm>
           <a:prstGeom prst="ellipse">
             <a:avLst/>
@@ -12045,7 +12045,7 @@
         <p:spPr>
           <a:xfrm>
             <a:off x="101160" y="336240"/>
-            <a:ext cx="1620720" cy="303120"/>
+            <a:ext cx="1620360" cy="303120"/>
           </a:xfrm>
           <a:prstGeom prst="rect">
             <a:avLst/>
@@ -12102,7 +12102,7 @@
         <p:spPr>
           <a:xfrm>
             <a:off x="101160" y="597600"/>
-            <a:ext cx="1620720" cy="516600"/>
+            <a:ext cx="1620360" cy="516600"/>
           </a:xfrm>
           <a:prstGeom prst="rect">
             <a:avLst/>
@@ -12192,7 +12192,7 @@
         <p:spPr>
           <a:xfrm>
             <a:off x="101160" y="336240"/>
-            <a:ext cx="1620720" cy="303120"/>
+            <a:ext cx="1620360" cy="303120"/>
           </a:xfrm>
           <a:prstGeom prst="rect">
             <a:avLst/>
@@ -12249,7 +12249,7 @@
         <p:spPr>
           <a:xfrm>
             <a:off x="101160" y="597600"/>
-            <a:ext cx="1620720" cy="516600"/>
+            <a:ext cx="1620360" cy="516600"/>
           </a:xfrm>
           <a:prstGeom prst="rect">
             <a:avLst/>
@@ -12339,7 +12339,7 @@
         <p:spPr>
           <a:xfrm>
             <a:off x="2541600" y="228600"/>
-            <a:ext cx="1620720" cy="303120"/>
+            <a:ext cx="1620360" cy="303120"/>
           </a:xfrm>
           <a:prstGeom prst="rect">
             <a:avLst/>
@@ -12396,7 +12396,7 @@
         <p:spPr>
           <a:xfrm>
             <a:off x="2541600" y="489960"/>
-            <a:ext cx="1620720" cy="1584000"/>
+            <a:ext cx="1620360" cy="1584000"/>
           </a:xfrm>
           <a:prstGeom prst="rect">
             <a:avLst/>
@@ -12621,7 +12621,7 @@
         <p:spPr>
           <a:xfrm>
             <a:off x="6656400" y="228600"/>
-            <a:ext cx="1620720" cy="303120"/>
+            <a:ext cx="1620360" cy="303120"/>
           </a:xfrm>
           <a:prstGeom prst="rect">
             <a:avLst/>
@@ -12678,7 +12678,7 @@
         <p:spPr>
           <a:xfrm>
             <a:off x="6656400" y="489960"/>
-            <a:ext cx="1620720" cy="516600"/>
+            <a:ext cx="1620360" cy="516600"/>
           </a:xfrm>
           <a:prstGeom prst="rect">
             <a:avLst/>
@@ -12768,7 +12768,7 @@
         <p:spPr>
           <a:xfrm>
             <a:off x="6656400" y="228600"/>
-            <a:ext cx="1620720" cy="303120"/>
+            <a:ext cx="1620360" cy="303120"/>
           </a:xfrm>
           <a:prstGeom prst="rect">
             <a:avLst/>
@@ -12825,7 +12825,7 @@
         <p:spPr>
           <a:xfrm>
             <a:off x="6656400" y="489960"/>
-            <a:ext cx="1620720" cy="730080"/>
+            <a:ext cx="1620360" cy="730080"/>
           </a:xfrm>
           <a:prstGeom prst="rect">
             <a:avLst/>
@@ -12942,7 +12942,7 @@
         <p:spPr>
           <a:xfrm>
             <a:off x="128520" y="4629600"/>
-            <a:ext cx="1566000" cy="526680"/>
+            <a:ext cx="1565640" cy="526320"/>
           </a:xfrm>
           <a:prstGeom prst="diamond">
             <a:avLst/>
@@ -13030,7 +13030,7 @@
         <p:spPr>
           <a:xfrm>
             <a:off x="0" y="3365640"/>
-            <a:ext cx="1834560" cy="5760"/>
+            <a:ext cx="1834920" cy="6120"/>
           </a:xfrm>
           <a:prstGeom prst="straightConnector1">
             <a:avLst/>
@@ -13052,7 +13052,7 @@
         <p:spPr>
           <a:xfrm>
             <a:off x="673200" y="3949920"/>
-            <a:ext cx="477000" cy="381960"/>
+            <a:ext cx="476640" cy="381600"/>
           </a:xfrm>
           <a:prstGeom prst="triangle">
             <a:avLst>
@@ -13119,9 +13119,9 @@
         <p:grpSpPr>
           <a:xfrm>
             <a:off x="101160" y="1413000"/>
-            <a:ext cx="1620720" cy="777960"/>
+            <a:ext cx="1620360" cy="777960"/>
             <a:chOff x="101160" y="1413000"/>
-            <a:chExt cx="1620720" cy="777960"/>
+            <a:chExt cx="1620360" cy="777960"/>
           </a:xfrm>
         </p:grpSpPr>
         <p:sp>
@@ -13133,7 +13133,7 @@
           <p:spPr>
             <a:xfrm>
               <a:off x="101160" y="1413000"/>
-              <a:ext cx="1620720" cy="303120"/>
+              <a:ext cx="1620360" cy="303120"/>
             </a:xfrm>
             <a:prstGeom prst="rect">
               <a:avLst/>
@@ -13191,7 +13191,7 @@
           <p:spPr>
             <a:xfrm>
               <a:off x="101160" y="1674360"/>
-              <a:ext cx="1620720" cy="516600"/>
+              <a:ext cx="1620360" cy="516600"/>
             </a:xfrm>
             <a:prstGeom prst="rect">
               <a:avLst/>
@@ -13283,7 +13283,7 @@
         <p:spPr>
           <a:xfrm>
             <a:off x="4426920" y="914400"/>
-            <a:ext cx="1566000" cy="381960"/>
+            <a:ext cx="1565640" cy="381600"/>
           </a:xfrm>
           <a:prstGeom prst="diamond">
             <a:avLst/>
@@ -13350,8 +13350,8 @@
         </p:nvCxnSpPr>
         <p:spPr>
           <a:xfrm flipH="1">
-            <a:off x="5992920" y="855000"/>
-            <a:ext cx="663840" cy="250920"/>
+            <a:off x="5992560" y="855000"/>
+            <a:ext cx="664200" cy="250560"/>
           </a:xfrm>
           <a:prstGeom prst="straightConnector1">
             <a:avLst/>
@@ -13374,7 +13374,7 @@
         <p:spPr>
           <a:xfrm>
             <a:off x="6255720" y="1828800"/>
-            <a:ext cx="1794600" cy="381960"/>
+            <a:ext cx="1794240" cy="381600"/>
           </a:xfrm>
           <a:prstGeom prst="diamond">
             <a:avLst/>
@@ -13441,7 +13441,7 @@
         </p:nvCxnSpPr>
         <p:spPr>
           <a:xfrm flipV="1">
-            <a:off x="7153200" y="1220040"/>
+            <a:off x="7152840" y="1220040"/>
             <a:ext cx="313920" cy="609120"/>
           </a:xfrm>
           <a:prstGeom prst="straightConnector1">
@@ -13465,8 +13465,8 @@
         </p:nvCxnSpPr>
         <p:spPr>
           <a:xfrm flipH="1" flipV="1">
-            <a:off x="7153200" y="2210760"/>
-            <a:ext cx="458640" cy="536040"/>
+            <a:off x="7152840" y="2210400"/>
+            <a:ext cx="459360" cy="536760"/>
           </a:xfrm>
           <a:prstGeom prst="straightConnector1">
             <a:avLst/>
@@ -13489,7 +13489,7 @@
         <p:spPr>
           <a:xfrm>
             <a:off x="128520" y="6134400"/>
-            <a:ext cx="1566000" cy="381960"/>
+            <a:ext cx="1565640" cy="381600"/>
           </a:xfrm>
           <a:prstGeom prst="diamond">
             <a:avLst/>
@@ -13554,9 +13554,9 @@
         <p:grpSpPr>
           <a:xfrm>
             <a:off x="6681960" y="2743200"/>
-            <a:ext cx="1849320" cy="1216440"/>
+            <a:ext cx="1848960" cy="1216440"/>
             <a:chOff x="6681960" y="2743200"/>
-            <a:chExt cx="1849320" cy="1216440"/>
+            <a:chExt cx="1848960" cy="1216440"/>
           </a:xfrm>
         </p:grpSpPr>
         <p:sp>
@@ -13568,7 +13568,7 @@
           <p:spPr>
             <a:xfrm>
               <a:off x="6681960" y="2743200"/>
-              <a:ext cx="1849320" cy="303120"/>
+              <a:ext cx="1848960" cy="303120"/>
             </a:xfrm>
             <a:prstGeom prst="rect">
               <a:avLst/>
@@ -13625,7 +13625,7 @@
           <p:spPr>
             <a:xfrm>
               <a:off x="6681960" y="3016080"/>
-              <a:ext cx="1849320" cy="943560"/>
+              <a:ext cx="1848960" cy="943560"/>
             </a:xfrm>
             <a:prstGeom prst="rect">
               <a:avLst/>
@@ -13772,7 +13772,7 @@
         <p:spPr>
           <a:xfrm>
             <a:off x="9173520" y="3501000"/>
-            <a:ext cx="477000" cy="381960"/>
+            <a:ext cx="476640" cy="381600"/>
           </a:xfrm>
           <a:prstGeom prst="triangle">
             <a:avLst>
@@ -13838,8 +13838,8 @@
         </p:nvSpPr>
         <p:spPr>
           <a:xfrm>
-            <a:off x="10569600" y="3126240"/>
-            <a:ext cx="1620720" cy="303120"/>
+            <a:off x="10287000" y="3126240"/>
+            <a:ext cx="1902960" cy="303120"/>
           </a:xfrm>
           <a:prstGeom prst="rect">
             <a:avLst/>
@@ -13895,8 +13895,8 @@
         </p:nvSpPr>
         <p:spPr>
           <a:xfrm>
-            <a:off x="10569600" y="3429360"/>
-            <a:ext cx="1620720" cy="1370520"/>
+            <a:off x="10287000" y="3429360"/>
+            <a:ext cx="1902960" cy="1371240"/>
           </a:xfrm>
           <a:prstGeom prst="rect">
             <a:avLst/>
@@ -14033,6 +14033,33 @@
                 <a:latin typeface="Calibri"/>
               </a:rPr>
               <a:t>Storage</a:t>
+            </a:r>
+            <a:endParaRPr b="0" lang="en-US" sz="1400" spc="-1" strike="noStrike">
+              <a:solidFill>
+                <a:srgbClr val="000000"/>
+              </a:solidFill>
+              <a:latin typeface="Arial"/>
+            </a:endParaRPr>
+          </a:p>
+          <a:p>
+            <a:pPr marL="304920" indent="-304920" defTabSz="914400">
+              <a:lnSpc>
+                <a:spcPct val="100000"/>
+              </a:lnSpc>
+              <a:buClr>
+                <a:srgbClr val="000000"/>
+              </a:buClr>
+              <a:buFont typeface="OpenSymbol"/>
+              <a:buChar char="-"/>
+            </a:pPr>
+            <a:r>
+              <a:rPr b="0" lang="en-US" sz="1400" spc="-1" strike="noStrike">
+                <a:solidFill>
+                  <a:schemeClr val="dk1"/>
+                </a:solidFill>
+                <a:latin typeface="Calibri"/>
+              </a:rPr>
+              <a:t>upgradeFunction</a:t>
             </a:r>
             <a:endParaRPr b="0" lang="en-US" sz="1400" spc="-1" strike="noStrike">
               <a:solidFill>
@@ -14054,8 +14081,8 @@
         </p:nvCxnSpPr>
         <p:spPr>
           <a:xfrm>
-            <a:off x="9531360" y="3692160"/>
-            <a:ext cx="1038600" cy="422640"/>
+            <a:off x="9531000" y="3691800"/>
+            <a:ext cx="756360" cy="423360"/>
           </a:xfrm>
           <a:prstGeom prst="straightConnector1">
             <a:avLst/>
@@ -14079,8 +14106,8 @@
         </p:nvCxnSpPr>
         <p:spPr>
           <a:xfrm flipH="1" flipV="1">
-            <a:off x="8531280" y="3351240"/>
-            <a:ext cx="761760" cy="341280"/>
+            <a:off x="8530920" y="3351240"/>
+            <a:ext cx="762120" cy="340920"/>
           </a:xfrm>
           <a:prstGeom prst="straightConnector1">
             <a:avLst/>
@@ -14102,7 +14129,7 @@
         <p:spPr>
           <a:xfrm>
             <a:off x="2086200" y="3336840"/>
-            <a:ext cx="1620720" cy="303120"/>
+            <a:ext cx="1620360" cy="303120"/>
           </a:xfrm>
           <a:prstGeom prst="rect">
             <a:avLst/>
@@ -14159,7 +14186,7 @@
         <p:spPr>
           <a:xfrm>
             <a:off x="2086200" y="3598200"/>
-            <a:ext cx="1620720" cy="516600"/>
+            <a:ext cx="1620360" cy="516600"/>
           </a:xfrm>
           <a:prstGeom prst="rect">
             <a:avLst/>
@@ -14249,7 +14276,7 @@
         <p:spPr>
           <a:xfrm>
             <a:off x="2086200" y="3336840"/>
-            <a:ext cx="1620720" cy="303120"/>
+            <a:ext cx="1620360" cy="303120"/>
           </a:xfrm>
           <a:prstGeom prst="rect">
             <a:avLst/>
@@ -14306,7 +14333,7 @@
         <p:spPr>
           <a:xfrm>
             <a:off x="2086200" y="3598200"/>
-            <a:ext cx="1620720" cy="516600"/>
+            <a:ext cx="1620360" cy="516600"/>
           </a:xfrm>
           <a:prstGeom prst="rect">
             <a:avLst/>
@@ -14396,7 +14423,7 @@
         <p:spPr>
           <a:xfrm>
             <a:off x="1883160" y="2514600"/>
-            <a:ext cx="1823760" cy="381960"/>
+            <a:ext cx="1823400" cy="381600"/>
           </a:xfrm>
           <a:prstGeom prst="diamond">
             <a:avLst/>
@@ -14461,7 +14488,7 @@
         <p:spPr>
           <a:xfrm>
             <a:off x="3481560" y="2899800"/>
-            <a:ext cx="1595160" cy="381960"/>
+            <a:ext cx="1594800" cy="381600"/>
           </a:xfrm>
           <a:prstGeom prst="ellipse">
             <a:avLst/>
@@ -14526,8 +14553,8 @@
         </p:nvCxnSpPr>
         <p:spPr>
           <a:xfrm>
-            <a:off x="3706920" y="2705760"/>
-            <a:ext cx="572760" cy="194400"/>
+            <a:off x="3706560" y="2705400"/>
+            <a:ext cx="572760" cy="194760"/>
           </a:xfrm>
           <a:prstGeom prst="straightConnector1">
             <a:avLst/>
@@ -14551,8 +14578,8 @@
         </p:nvCxnSpPr>
         <p:spPr>
           <a:xfrm flipH="1" flipV="1">
-            <a:off x="2795040" y="2896560"/>
-            <a:ext cx="101880" cy="440640"/>
+            <a:off x="2795040" y="2896200"/>
+            <a:ext cx="101520" cy="441000"/>
           </a:xfrm>
           <a:prstGeom prst="straightConnector1">
             <a:avLst/>
@@ -14577,7 +14604,7 @@
         <p:spPr>
           <a:xfrm flipV="1">
             <a:off x="2795040" y="2073960"/>
-            <a:ext cx="557280" cy="441000"/>
+            <a:ext cx="556920" cy="441000"/>
           </a:xfrm>
           <a:prstGeom prst="straightConnector1">
             <a:avLst/>
@@ -14599,7 +14626,7 @@
         <p:spPr>
           <a:xfrm>
             <a:off x="10543680" y="457200"/>
-            <a:ext cx="1620720" cy="303120"/>
+            <a:ext cx="1620360" cy="303120"/>
           </a:xfrm>
           <a:prstGeom prst="rect">
             <a:avLst/>
@@ -14656,7 +14683,7 @@
         <p:spPr>
           <a:xfrm>
             <a:off x="10543680" y="718560"/>
-            <a:ext cx="1620720" cy="516600"/>
+            <a:ext cx="1620360" cy="516600"/>
           </a:xfrm>
           <a:prstGeom prst="rect">
             <a:avLst/>
@@ -14746,7 +14773,7 @@
         <p:spPr>
           <a:xfrm>
             <a:off x="10543680" y="457200"/>
-            <a:ext cx="1620720" cy="303120"/>
+            <a:ext cx="1620360" cy="303120"/>
           </a:xfrm>
           <a:prstGeom prst="rect">
             <a:avLst/>
@@ -14803,7 +14830,7 @@
         <p:spPr>
           <a:xfrm>
             <a:off x="10543680" y="718560"/>
-            <a:ext cx="1620720" cy="2224440"/>
+            <a:ext cx="1620360" cy="2224440"/>
           </a:xfrm>
           <a:prstGeom prst="rect">
             <a:avLst/>
@@ -15055,7 +15082,7 @@
         <p:spPr>
           <a:xfrm>
             <a:off x="8282160" y="1443600"/>
-            <a:ext cx="2052720" cy="381960"/>
+            <a:ext cx="2052360" cy="381600"/>
           </a:xfrm>
           <a:prstGeom prst="diamond">
             <a:avLst/>
@@ -15122,8 +15149,8 @@
         </p:nvCxnSpPr>
         <p:spPr>
           <a:xfrm>
-            <a:off x="9308520" y="1825560"/>
-            <a:ext cx="1261440" cy="2289240"/>
+            <a:off x="9308520" y="1825200"/>
+            <a:ext cx="978840" cy="2289960"/>
           </a:xfrm>
           <a:prstGeom prst="straightConnector1">
             <a:avLst/>
@@ -15147,8 +15174,8 @@
         </p:nvCxnSpPr>
         <p:spPr>
           <a:xfrm flipH="1" flipV="1">
-            <a:off x="10334880" y="1634760"/>
-            <a:ext cx="209160" cy="196200"/>
+            <a:off x="10334520" y="1634400"/>
+            <a:ext cx="209520" cy="196560"/>
           </a:xfrm>
           <a:prstGeom prst="straightConnector1">
             <a:avLst/>
@@ -15172,8 +15199,8 @@
         </p:nvCxnSpPr>
         <p:spPr>
           <a:xfrm flipH="1" flipV="1">
-            <a:off x="7466760" y="1220040"/>
-            <a:ext cx="1842120" cy="223920"/>
+            <a:off x="7466400" y="1220040"/>
+            <a:ext cx="1842480" cy="223920"/>
           </a:xfrm>
           <a:prstGeom prst="straightConnector1">
             <a:avLst/>
@@ -15195,7 +15222,7 @@
         <p:spPr>
           <a:xfrm>
             <a:off x="5412240" y="5029200"/>
-            <a:ext cx="1620720" cy="303120"/>
+            <a:ext cx="1620360" cy="303120"/>
           </a:xfrm>
           <a:prstGeom prst="rect">
             <a:avLst/>
@@ -15252,7 +15279,7 @@
         <p:spPr>
           <a:xfrm>
             <a:off x="3710160" y="4343400"/>
-            <a:ext cx="1824120" cy="381960"/>
+            <a:ext cx="1823760" cy="381600"/>
           </a:xfrm>
           <a:prstGeom prst="diamond">
             <a:avLst/>
@@ -15319,8 +15346,8 @@
         </p:nvCxnSpPr>
         <p:spPr>
           <a:xfrm>
-            <a:off x="2896560" y="4114800"/>
-            <a:ext cx="813960" cy="420120"/>
+            <a:off x="2896200" y="4114800"/>
+            <a:ext cx="814320" cy="419760"/>
           </a:xfrm>
           <a:prstGeom prst="straightConnector1">
             <a:avLst/>
@@ -15345,8 +15372,8 @@
         </p:nvCxnSpPr>
         <p:spPr>
           <a:xfrm>
-            <a:off x="4622400" y="4725360"/>
-            <a:ext cx="790200" cy="455760"/>
+            <a:off x="4622040" y="4725000"/>
+            <a:ext cx="790560" cy="456120"/>
           </a:xfrm>
           <a:prstGeom prst="straightConnector1">
             <a:avLst/>
@@ -15370,7 +15397,7 @@
         </p:nvCxnSpPr>
         <p:spPr>
           <a:xfrm flipH="1" flipV="1">
-            <a:off x="3351960" y="2073960"/>
+            <a:off x="3351600" y="2073960"/>
             <a:ext cx="2187000" cy="1126800"/>
           </a:xfrm>
           <a:prstGeom prst="straightConnector1">
@@ -15393,7 +15420,7 @@
         <p:spPr>
           <a:xfrm>
             <a:off x="4626720" y="3200400"/>
-            <a:ext cx="1823400" cy="681120"/>
+            <a:ext cx="1823040" cy="680760"/>
           </a:xfrm>
           <a:prstGeom prst="diamond">
             <a:avLst/>
@@ -15460,8 +15487,8 @@
         </p:nvCxnSpPr>
         <p:spPr>
           <a:xfrm flipH="1" flipV="1">
-            <a:off x="5538600" y="3881520"/>
-            <a:ext cx="684360" cy="1148040"/>
+            <a:off x="5538240" y="3881160"/>
+            <a:ext cx="684360" cy="1148400"/>
           </a:xfrm>
           <a:prstGeom prst="straightConnector1">
             <a:avLst/>
@@ -15483,7 +15510,7 @@
         <p:spPr>
           <a:xfrm>
             <a:off x="2693880" y="4415400"/>
-            <a:ext cx="477000" cy="381960"/>
+            <a:ext cx="476640" cy="381600"/>
           </a:xfrm>
           <a:prstGeom prst="triangle">
             <a:avLst>
@@ -15552,7 +15579,7 @@
         </p:nvCxnSpPr>
         <p:spPr>
           <a:xfrm flipH="1" flipV="1">
-            <a:off x="2896560" y="4114800"/>
+            <a:off x="2896200" y="4114800"/>
             <a:ext cx="36360" cy="300960"/>
           </a:xfrm>
           <a:prstGeom prst="straightConnector1">
@@ -15575,7 +15602,7 @@
         <p:spPr>
           <a:xfrm>
             <a:off x="2109960" y="5163480"/>
-            <a:ext cx="1620720" cy="303120"/>
+            <a:ext cx="1620360" cy="303120"/>
           </a:xfrm>
           <a:prstGeom prst="rect">
             <a:avLst/>
@@ -15632,7 +15659,7 @@
         <p:spPr>
           <a:xfrm>
             <a:off x="2109960" y="5163480"/>
-            <a:ext cx="1620720" cy="303120"/>
+            <a:ext cx="1620360" cy="303120"/>
           </a:xfrm>
           <a:prstGeom prst="rect">
             <a:avLst/>
@@ -15689,7 +15716,7 @@
         <p:spPr>
           <a:xfrm>
             <a:off x="2109960" y="5424840"/>
-            <a:ext cx="1620720" cy="363960"/>
+            <a:ext cx="1620360" cy="363960"/>
           </a:xfrm>
           <a:prstGeom prst="rect">
             <a:avLst/>
@@ -15757,8 +15784,8 @@
         </p:nvCxnSpPr>
         <p:spPr>
           <a:xfrm flipH="1">
-            <a:off x="2920320" y="4797360"/>
-            <a:ext cx="12600" cy="366480"/>
+            <a:off x="2919960" y="4797000"/>
+            <a:ext cx="12600" cy="366840"/>
           </a:xfrm>
           <a:prstGeom prst="straightConnector1">
             <a:avLst/>
@@ -15780,7 +15807,7 @@
         <p:spPr>
           <a:xfrm>
             <a:off x="7627320" y="4800600"/>
-            <a:ext cx="1566000" cy="381960"/>
+            <a:ext cx="1565640" cy="381600"/>
           </a:xfrm>
           <a:prstGeom prst="diamond">
             <a:avLst/>
@@ -15845,7 +15872,7 @@
         <p:spPr>
           <a:xfrm>
             <a:off x="7627320" y="5329800"/>
-            <a:ext cx="1794600" cy="381960"/>
+            <a:ext cx="1794240" cy="381600"/>
           </a:xfrm>
           <a:prstGeom prst="diamond">
             <a:avLst/>
@@ -15912,8 +15939,8 @@
         </p:nvCxnSpPr>
         <p:spPr>
           <a:xfrm flipH="1">
-            <a:off x="9193320" y="4114440"/>
-            <a:ext cx="1376640" cy="877680"/>
+            <a:off x="9192960" y="4114800"/>
+            <a:ext cx="1094400" cy="876960"/>
           </a:xfrm>
           <a:prstGeom prst="straightConnector1">
             <a:avLst/>
@@ -15938,8 +15965,8 @@
         </p:nvCxnSpPr>
         <p:spPr>
           <a:xfrm flipH="1">
-            <a:off x="7032960" y="4991760"/>
-            <a:ext cx="594720" cy="189360"/>
+            <a:off x="7032600" y="4991400"/>
+            <a:ext cx="595080" cy="189720"/>
           </a:xfrm>
           <a:prstGeom prst="straightConnector1">
             <a:avLst/>
@@ -15963,8 +15990,8 @@
         </p:nvCxnSpPr>
         <p:spPr>
           <a:xfrm flipH="1" flipV="1">
-            <a:off x="7032960" y="5180760"/>
-            <a:ext cx="594720" cy="340560"/>
+            <a:off x="7032600" y="5180760"/>
+            <a:ext cx="595080" cy="340200"/>
           </a:xfrm>
           <a:prstGeom prst="straightConnector1">
             <a:avLst/>
@@ -15988,8 +16015,8 @@
         </p:nvCxnSpPr>
         <p:spPr>
           <a:xfrm flipH="1">
-            <a:off x="9421920" y="4114440"/>
-            <a:ext cx="1148040" cy="1406880"/>
+            <a:off x="9421560" y="4114800"/>
+            <a:ext cx="865800" cy="1406160"/>
           </a:xfrm>
           <a:prstGeom prst="straightConnector1">
             <a:avLst/>
@@ -16014,8 +16041,8 @@
         </p:nvCxnSpPr>
         <p:spPr>
           <a:xfrm flipH="1">
-            <a:off x="4162320" y="1105560"/>
-            <a:ext cx="264960" cy="176760"/>
+            <a:off x="4161960" y="1105200"/>
+            <a:ext cx="265320" cy="177120"/>
           </a:xfrm>
           <a:prstGeom prst="straightConnector1">
             <a:avLst/>
@@ -16037,7 +16064,7 @@
         <p:spPr>
           <a:xfrm>
             <a:off x="8053560" y="2057400"/>
-            <a:ext cx="1217520" cy="381960"/>
+            <a:ext cx="1217160" cy="381600"/>
           </a:xfrm>
           <a:prstGeom prst="ellipse">
             <a:avLst/>
@@ -16102,8 +16129,8 @@
         </p:nvCxnSpPr>
         <p:spPr>
           <a:xfrm flipV="1">
-            <a:off x="8662320" y="1825560"/>
-            <a:ext cx="646560" cy="232200"/>
+            <a:off x="8662320" y="1825200"/>
+            <a:ext cx="646560" cy="232560"/>
           </a:xfrm>
           <a:prstGeom prst="straightConnector1">
             <a:avLst/>
@@ -16125,7 +16152,95 @@
         <p:spPr>
           <a:xfrm flipH="1">
             <a:off x="0" y="3657600"/>
-            <a:ext cx="1834560" cy="5760"/>
+            <a:ext cx="1834920" cy="6120"/>
+          </a:xfrm>
+          <a:prstGeom prst="straightConnector1">
+            <a:avLst/>
+          </a:prstGeom>
+          <a:ln w="25400">
+            <a:solidFill>
+              <a:srgbClr val="000000"/>
+            </a:solidFill>
+            <a:round/>
+          </a:ln>
+        </p:spPr>
+      </p:cxnSp>
+      <p:sp>
+        <p:nvSpPr>
+          <p:cNvPr id="212" name="Oval 10"/>
+          <p:cNvSpPr/>
+          <p:nvPr/>
+        </p:nvSpPr>
+        <p:spPr>
+          <a:xfrm>
+            <a:off x="8686800" y="532800"/>
+            <a:ext cx="1371600" cy="381600"/>
+          </a:xfrm>
+          <a:prstGeom prst="ellipse">
+            <a:avLst/>
+          </a:prstGeom>
+          <a:noFill/>
+          <a:ln>
+            <a:solidFill>
+              <a:srgbClr val="000000"/>
+            </a:solidFill>
+          </a:ln>
+        </p:spPr>
+        <p:style>
+          <a:lnRef idx="2">
+            <a:schemeClr val="accent1">
+              <a:shade val="50000"/>
+            </a:schemeClr>
+          </a:lnRef>
+          <a:fillRef idx="1">
+            <a:schemeClr val="accent1"/>
+          </a:fillRef>
+          <a:effectRef idx="0">
+            <a:schemeClr val="accent1"/>
+          </a:effectRef>
+          <a:fontRef idx="minor"/>
+        </p:style>
+        <p:txBody>
+          <a:bodyPr lIns="90000" rIns="90000" tIns="45000" bIns="45000" anchor="ctr">
+            <a:noAutofit/>
+          </a:bodyPr>
+          <a:p>
+            <a:pPr algn="ctr" defTabSz="914400">
+              <a:lnSpc>
+                <a:spcPct val="100000"/>
+              </a:lnSpc>
+            </a:pPr>
+            <a:r>
+              <a:rPr b="0" lang="en-US" sz="1410" spc="-1" strike="noStrike">
+                <a:solidFill>
+                  <a:schemeClr val="dk1"/>
+                </a:solidFill>
+                <a:latin typeface="Calibri"/>
+              </a:rPr>
+              <a:t>Max Number</a:t>
+            </a:r>
+            <a:endParaRPr b="0" lang="en-US" sz="1410" spc="-1" strike="noStrike">
+              <a:solidFill>
+                <a:srgbClr val="000000"/>
+              </a:solidFill>
+              <a:latin typeface="Arial"/>
+            </a:endParaRPr>
+          </a:p>
+        </p:txBody>
+      </p:sp>
+      <p:cxnSp>
+        <p:nvCxnSpPr>
+          <p:cNvPr id="213" name="Straight Arrow Connector 88"/>
+          <p:cNvCxnSpPr>
+            <a:stCxn id="212" idx="4"/>
+            <a:endCxn id="185" idx="0"/>
+          </p:cNvCxnSpPr>
+          <p:nvPr/>
+        </p:nvCxnSpPr>
+        <p:spPr>
+          <a:xfrm flipH="1">
+            <a:off x="9308520" y="914400"/>
+            <a:ext cx="64440" cy="529560"/>
           </a:xfrm>
           <a:prstGeom prst="straightConnector1">
             <a:avLst/>
@@ -16170,14 +16285,14 @@
       </p:grpSpPr>
       <p:cxnSp>
         <p:nvCxnSpPr>
-          <p:cNvPr id="212" name="Straight Arrow Connector 1"/>
+          <p:cNvPr id="214" name="Straight Arrow Connector 1"/>
           <p:cNvCxnSpPr/>
           <p:nvPr/>
         </p:nvCxnSpPr>
         <p:spPr>
           <a:xfrm flipH="1">
             <a:off x="0" y="3073320"/>
-            <a:ext cx="1834560" cy="5760"/>
+            <a:ext cx="1834920" cy="6120"/>
           </a:xfrm>
           <a:prstGeom prst="straightConnector1">
             <a:avLst/>
@@ -16193,14 +16308,14 @@
       </p:cxnSp>
       <p:cxnSp>
         <p:nvCxnSpPr>
-          <p:cNvPr id="213" name="Straight Arrow Connector 2"/>
+          <p:cNvPr id="215" name="Straight Arrow Connector 2"/>
           <p:cNvCxnSpPr/>
           <p:nvPr/>
         </p:nvCxnSpPr>
         <p:spPr>
           <a:xfrm>
             <a:off x="0" y="2489400"/>
-            <a:ext cx="1834560" cy="5760"/>
+            <a:ext cx="1834920" cy="6120"/>
           </a:xfrm>
           <a:prstGeom prst="straightConnector1">
             <a:avLst/>
@@ -16216,14 +16331,14 @@
       </p:cxnSp>
       <p:cxnSp>
         <p:nvCxnSpPr>
-          <p:cNvPr id="214" name="Straight Arrow Connector 3"/>
+          <p:cNvPr id="216" name="Straight Arrow Connector 3"/>
           <p:cNvCxnSpPr/>
           <p:nvPr/>
         </p:nvCxnSpPr>
         <p:spPr>
           <a:xfrm>
             <a:off x="0" y="2781360"/>
-            <a:ext cx="1834560" cy="5760"/>
+            <a:ext cx="1834920" cy="6120"/>
           </a:xfrm>
           <a:prstGeom prst="straightConnector1">
             <a:avLst/>
@@ -16239,14 +16354,14 @@
       </p:cxnSp>
       <p:cxnSp>
         <p:nvCxnSpPr>
-          <p:cNvPr id="215" name="Straight Arrow Connector 4"/>
+          <p:cNvPr id="217" name="Straight Arrow Connector 4"/>
           <p:cNvCxnSpPr/>
           <p:nvPr/>
         </p:nvCxnSpPr>
         <p:spPr>
           <a:xfrm flipH="1">
             <a:off x="0" y="3657600"/>
-            <a:ext cx="1834560" cy="5760"/>
+            <a:ext cx="1834920" cy="6120"/>
           </a:xfrm>
           <a:prstGeom prst="straightConnector1">
             <a:avLst/>
@@ -16261,14 +16376,14 @@
       </p:cxnSp>
       <p:sp>
         <p:nvSpPr>
-          <p:cNvPr id="216" name="Diamond 1"/>
+          <p:cNvPr id="218" name="Diamond 1"/>
           <p:cNvSpPr/>
           <p:nvPr/>
         </p:nvSpPr>
         <p:spPr>
           <a:xfrm>
             <a:off x="128520" y="6134040"/>
-            <a:ext cx="1566000" cy="381960"/>
+            <a:ext cx="1565640" cy="381600"/>
           </a:xfrm>
           <a:prstGeom prst="diamond">
             <a:avLst/>
@@ -16326,14 +16441,14 @@
       </p:sp>
       <p:sp>
         <p:nvSpPr>
-          <p:cNvPr id="217" name="Oval 1"/>
+          <p:cNvPr id="219" name="Oval 1"/>
           <p:cNvSpPr/>
           <p:nvPr/>
         </p:nvSpPr>
         <p:spPr>
           <a:xfrm>
             <a:off x="302760" y="5454000"/>
-            <a:ext cx="1217520" cy="381960"/>
+            <a:ext cx="1217160" cy="381600"/>
           </a:xfrm>
           <a:prstGeom prst="ellipse">
             <a:avLst/>
@@ -16389,28 +16504,28 @@
       </p:sp>
       <p:grpSp>
         <p:nvGrpSpPr>
-          <p:cNvPr id="218" name="Group 1"/>
+          <p:cNvPr id="220" name="Group 1"/>
           <p:cNvGrpSpPr/>
           <p:nvPr/>
         </p:nvGrpSpPr>
         <p:grpSpPr>
           <a:xfrm>
             <a:off x="101160" y="336240"/>
-            <a:ext cx="1620720" cy="777960"/>
+            <a:ext cx="1620360" cy="777960"/>
             <a:chOff x="101160" y="336240"/>
-            <a:chExt cx="1620720" cy="777960"/>
+            <a:chExt cx="1620360" cy="777960"/>
           </a:xfrm>
         </p:grpSpPr>
         <p:sp>
           <p:nvSpPr>
-            <p:cNvPr id="219" name="TextBox 1"/>
+            <p:cNvPr id="221" name="TextBox 1"/>
             <p:cNvSpPr/>
             <p:nvPr/>
           </p:nvSpPr>
           <p:spPr>
             <a:xfrm>
               <a:off x="101160" y="336240"/>
-              <a:ext cx="1620720" cy="303120"/>
+              <a:ext cx="1620360" cy="303120"/>
             </a:xfrm>
             <a:prstGeom prst="rect">
               <a:avLst/>
@@ -16460,14 +16575,14 @@
         </p:sp>
         <p:sp>
           <p:nvSpPr>
-            <p:cNvPr id="220" name="TextBox 2"/>
+            <p:cNvPr id="222" name="TextBox 2"/>
             <p:cNvSpPr/>
             <p:nvPr/>
           </p:nvSpPr>
           <p:spPr>
             <a:xfrm>
               <a:off x="101160" y="597600"/>
-              <a:ext cx="1620720" cy="516600"/>
+              <a:ext cx="1620360" cy="516600"/>
             </a:xfrm>
             <a:prstGeom prst="rect">
               <a:avLst/>
@@ -16551,14 +16666,14 @@
       </p:grpSp>
       <p:sp>
         <p:nvSpPr>
-          <p:cNvPr id="221" name="Diamond 2"/>
+          <p:cNvPr id="223" name="Diamond 2"/>
           <p:cNvSpPr/>
           <p:nvPr/>
         </p:nvSpPr>
         <p:spPr>
           <a:xfrm>
             <a:off x="128520" y="4629600"/>
-            <a:ext cx="1566000" cy="526680"/>
+            <a:ext cx="1565640" cy="526320"/>
           </a:xfrm>
           <a:prstGeom prst="diamond">
             <a:avLst/>
@@ -16639,14 +16754,14 @@
       </p:sp>
       <p:cxnSp>
         <p:nvCxnSpPr>
-          <p:cNvPr id="222" name="Straight Arrow Connector 5"/>
+          <p:cNvPr id="224" name="Straight Arrow Connector 5"/>
           <p:cNvCxnSpPr/>
           <p:nvPr/>
         </p:nvCxnSpPr>
         <p:spPr>
           <a:xfrm>
             <a:off x="0" y="3365640"/>
-            <a:ext cx="1834560" cy="5760"/>
+            <a:ext cx="1834920" cy="6120"/>
           </a:xfrm>
           <a:prstGeom prst="straightConnector1">
             <a:avLst/>
@@ -16661,14 +16776,14 @@
       </p:cxnSp>
       <p:sp>
         <p:nvSpPr>
-          <p:cNvPr id="223" name="Isosceles Triangle 1"/>
+          <p:cNvPr id="225" name="Isosceles Triangle 1"/>
           <p:cNvSpPr/>
           <p:nvPr/>
         </p:nvSpPr>
         <p:spPr>
           <a:xfrm>
             <a:off x="673200" y="3949920"/>
-            <a:ext cx="477000" cy="381960"/>
+            <a:ext cx="476640" cy="381600"/>
           </a:xfrm>
           <a:prstGeom prst="triangle">
             <a:avLst>
@@ -16728,28 +16843,28 @@
       </p:sp>
       <p:grpSp>
         <p:nvGrpSpPr>
-          <p:cNvPr id="224" name="Group 2"/>
+          <p:cNvPr id="226" name="Group 2"/>
           <p:cNvGrpSpPr/>
           <p:nvPr/>
         </p:nvGrpSpPr>
         <p:grpSpPr>
           <a:xfrm>
             <a:off x="101160" y="1413000"/>
-            <a:ext cx="1620720" cy="777960"/>
+            <a:ext cx="1620360" cy="777960"/>
             <a:chOff x="101160" y="1413000"/>
-            <a:chExt cx="1620720" cy="777960"/>
+            <a:chExt cx="1620360" cy="777960"/>
           </a:xfrm>
         </p:grpSpPr>
         <p:sp>
           <p:nvSpPr>
-            <p:cNvPr id="225" name="TextBox 3"/>
+            <p:cNvPr id="227" name="TextBox 3"/>
             <p:cNvSpPr/>
             <p:nvPr/>
           </p:nvSpPr>
           <p:spPr>
             <a:xfrm>
               <a:off x="101160" y="1413000"/>
-              <a:ext cx="1620720" cy="303120"/>
+              <a:ext cx="1620360" cy="303120"/>
             </a:xfrm>
             <a:prstGeom prst="rect">
               <a:avLst/>
@@ -16800,14 +16915,14 @@
         </p:sp>
         <p:sp>
           <p:nvSpPr>
-            <p:cNvPr id="226" name="TextBox 4"/>
+            <p:cNvPr id="228" name="TextBox 4"/>
             <p:cNvSpPr/>
             <p:nvPr/>
           </p:nvSpPr>
           <p:spPr>
             <a:xfrm>
               <a:off x="101160" y="1674360"/>
-              <a:ext cx="1620720" cy="516600"/>
+              <a:ext cx="1620360" cy="516600"/>
             </a:xfrm>
             <a:prstGeom prst="rect">
               <a:avLst/>
@@ -16892,14 +17007,14 @@
       </p:grpSp>
       <p:sp>
         <p:nvSpPr>
-          <p:cNvPr id="227" name="TextBox 19"/>
+          <p:cNvPr id="229" name="TextBox 19"/>
           <p:cNvSpPr/>
           <p:nvPr/>
         </p:nvSpPr>
         <p:spPr>
           <a:xfrm>
             <a:off x="4775040" y="457200"/>
-            <a:ext cx="1620720" cy="303120"/>
+            <a:ext cx="1620360" cy="303120"/>
           </a:xfrm>
           <a:prstGeom prst="rect">
             <a:avLst/>
@@ -16949,14 +17064,14 @@
       </p:sp>
       <p:sp>
         <p:nvSpPr>
-          <p:cNvPr id="228" name="TextBox 20"/>
+          <p:cNvPr id="230" name="TextBox 20"/>
           <p:cNvSpPr/>
           <p:nvPr/>
         </p:nvSpPr>
         <p:spPr>
           <a:xfrm>
             <a:off x="4775040" y="718560"/>
-            <a:ext cx="1620720" cy="730080"/>
+            <a:ext cx="1620360" cy="730080"/>
           </a:xfrm>
           <a:prstGeom prst="rect">
             <a:avLst/>
@@ -17066,28 +17181,28 @@
       </p:sp>
       <p:grpSp>
         <p:nvGrpSpPr>
-          <p:cNvPr id="229" name="Group 6"/>
+          <p:cNvPr id="231" name="Group 6"/>
           <p:cNvGrpSpPr/>
           <p:nvPr/>
         </p:nvGrpSpPr>
         <p:grpSpPr>
           <a:xfrm>
             <a:off x="4572000" y="4274280"/>
-            <a:ext cx="1620720" cy="991440"/>
+            <a:ext cx="1620360" cy="991440"/>
             <a:chOff x="4572000" y="4274280"/>
-            <a:chExt cx="1620720" cy="991440"/>
+            <a:chExt cx="1620360" cy="991440"/>
           </a:xfrm>
         </p:grpSpPr>
         <p:sp>
           <p:nvSpPr>
-            <p:cNvPr id="230" name="TextBox 21"/>
+            <p:cNvPr id="232" name="TextBox 21"/>
             <p:cNvSpPr/>
             <p:nvPr/>
           </p:nvSpPr>
           <p:spPr>
             <a:xfrm>
               <a:off x="4572000" y="4274280"/>
-              <a:ext cx="1620720" cy="303120"/>
+              <a:ext cx="1620360" cy="303120"/>
             </a:xfrm>
             <a:prstGeom prst="rect">
               <a:avLst/>
@@ -17137,14 +17252,14 @@
         </p:sp>
         <p:sp>
           <p:nvSpPr>
-            <p:cNvPr id="231" name="TextBox 30"/>
+            <p:cNvPr id="233" name="TextBox 30"/>
             <p:cNvSpPr/>
             <p:nvPr/>
           </p:nvSpPr>
           <p:spPr>
             <a:xfrm>
               <a:off x="4572000" y="4535640"/>
-              <a:ext cx="1620720" cy="730080"/>
+              <a:ext cx="1620360" cy="730080"/>
             </a:xfrm>
             <a:prstGeom prst="rect">
               <a:avLst/>
@@ -17255,14 +17370,14 @@
       </p:grpSp>
       <p:sp>
         <p:nvSpPr>
-          <p:cNvPr id="232" name="Diamond 9"/>
+          <p:cNvPr id="234" name="Diamond 9"/>
           <p:cNvSpPr/>
           <p:nvPr/>
         </p:nvSpPr>
         <p:spPr>
           <a:xfrm>
             <a:off x="3231360" y="2899800"/>
-            <a:ext cx="1566000" cy="381960"/>
+            <a:ext cx="1565640" cy="381600"/>
           </a:xfrm>
           <a:prstGeom prst="diamond">
             <a:avLst/>
@@ -17320,14 +17435,14 @@
       </p:sp>
       <p:sp>
         <p:nvSpPr>
-          <p:cNvPr id="233" name="Diamond 10"/>
+          <p:cNvPr id="235" name="Diamond 10"/>
           <p:cNvSpPr/>
           <p:nvPr/>
         </p:nvSpPr>
         <p:spPr>
           <a:xfrm>
             <a:off x="4602960" y="2585160"/>
-            <a:ext cx="1794600" cy="383400"/>
+            <a:ext cx="1794240" cy="383040"/>
           </a:xfrm>
           <a:prstGeom prst="diamond">
             <a:avLst/>
@@ -17385,17 +17500,17 @@
       </p:sp>
       <p:cxnSp>
         <p:nvCxnSpPr>
-          <p:cNvPr id="234" name="Straight Arrow Connector 24"/>
+          <p:cNvPr id="236" name="Straight Arrow Connector 24"/>
           <p:cNvCxnSpPr>
-            <a:stCxn id="229" idx="0"/>
-            <a:endCxn id="232" idx="2"/>
+            <a:stCxn id="231" idx="0"/>
+            <a:endCxn id="234" idx="2"/>
           </p:cNvCxnSpPr>
           <p:nvPr/>
         </p:nvCxnSpPr>
         <p:spPr>
           <a:xfrm flipH="1" flipV="1">
-            <a:off x="4014360" y="3281760"/>
-            <a:ext cx="1368360" cy="992880"/>
+            <a:off x="4014360" y="3281400"/>
+            <a:ext cx="1368000" cy="993240"/>
           </a:xfrm>
           <a:prstGeom prst="straightConnector1">
             <a:avLst/>
@@ -17411,16 +17526,16 @@
       </p:cxnSp>
       <p:cxnSp>
         <p:nvCxnSpPr>
-          <p:cNvPr id="235" name="Straight Arrow Connector 18"/>
+          <p:cNvPr id="237" name="Straight Arrow Connector 18"/>
           <p:cNvCxnSpPr>
-            <a:stCxn id="233" idx="0"/>
-            <a:endCxn id="228" idx="2"/>
+            <a:stCxn id="235" idx="0"/>
+            <a:endCxn id="230" idx="2"/>
           </p:cNvCxnSpPr>
           <p:nvPr/>
         </p:nvCxnSpPr>
         <p:spPr>
           <a:xfrm flipV="1">
-            <a:off x="5500440" y="1448640"/>
+            <a:off x="5500080" y="1448640"/>
             <a:ext cx="85320" cy="1136880"/>
           </a:xfrm>
           <a:prstGeom prst="straightConnector1">
@@ -17436,17 +17551,17 @@
       </p:cxnSp>
       <p:cxnSp>
         <p:nvCxnSpPr>
-          <p:cNvPr id="236" name="Straight Arrow Connector 17"/>
+          <p:cNvPr id="238" name="Straight Arrow Connector 17"/>
           <p:cNvCxnSpPr>
-            <a:stCxn id="229" idx="0"/>
-            <a:endCxn id="233" idx="2"/>
+            <a:stCxn id="231" idx="0"/>
+            <a:endCxn id="235" idx="2"/>
           </p:cNvCxnSpPr>
           <p:nvPr/>
         </p:nvCxnSpPr>
         <p:spPr>
           <a:xfrm flipV="1">
-            <a:off x="5382360" y="2968560"/>
-            <a:ext cx="118440" cy="1306080"/>
+            <a:off x="5382000" y="2968200"/>
+            <a:ext cx="118440" cy="1306440"/>
           </a:xfrm>
           <a:prstGeom prst="straightConnector1">
             <a:avLst/>
@@ -17461,17 +17576,17 @@
       </p:cxnSp>
       <p:cxnSp>
         <p:nvCxnSpPr>
-          <p:cNvPr id="237" name="Straight Arrow Connector 23"/>
+          <p:cNvPr id="239" name="Straight Arrow Connector 23"/>
           <p:cNvCxnSpPr>
-            <a:stCxn id="228" idx="2"/>
-            <a:endCxn id="232" idx="0"/>
+            <a:stCxn id="230" idx="2"/>
+            <a:endCxn id="234" idx="0"/>
           </p:cNvCxnSpPr>
           <p:nvPr/>
         </p:nvCxnSpPr>
         <p:spPr>
           <a:xfrm flipH="1">
             <a:off x="4014360" y="1448640"/>
-            <a:ext cx="1571400" cy="1451520"/>
+            <a:ext cx="1571040" cy="1451520"/>
           </a:xfrm>
           <a:prstGeom prst="straightConnector1">
             <a:avLst/>
@@ -17486,14 +17601,14 @@
       </p:cxnSp>
       <p:sp>
         <p:nvSpPr>
-          <p:cNvPr id="238" name="Diamond 11"/>
+          <p:cNvPr id="240" name="Diamond 11"/>
           <p:cNvSpPr/>
           <p:nvPr/>
         </p:nvSpPr>
         <p:spPr>
           <a:xfrm>
             <a:off x="2743200" y="457200"/>
-            <a:ext cx="1566000" cy="381960"/>
+            <a:ext cx="1565640" cy="381600"/>
           </a:xfrm>
           <a:prstGeom prst="diamond">
             <a:avLst/>
@@ -17551,17 +17666,17 @@
       </p:sp>
       <p:cxnSp>
         <p:nvCxnSpPr>
-          <p:cNvPr id="239" name="Straight Arrow Connector 25"/>
+          <p:cNvPr id="241" name="Straight Arrow Connector 25"/>
           <p:cNvCxnSpPr>
-            <a:stCxn id="228" idx="1"/>
-            <a:endCxn id="238" idx="3"/>
+            <a:stCxn id="230" idx="1"/>
+            <a:endCxn id="240" idx="3"/>
           </p:cNvCxnSpPr>
           <p:nvPr/>
         </p:nvCxnSpPr>
         <p:spPr>
           <a:xfrm flipH="1" flipV="1">
-            <a:off x="4309200" y="648360"/>
-            <a:ext cx="466200" cy="435600"/>
+            <a:off x="4308840" y="648000"/>
+            <a:ext cx="466560" cy="435960"/>
           </a:xfrm>
           <a:prstGeom prst="straightConnector1">
             <a:avLst/>
@@ -17576,17 +17691,17 @@
       </p:cxnSp>
       <p:cxnSp>
         <p:nvCxnSpPr>
-          <p:cNvPr id="240" name="Straight Arrow Connector 26"/>
+          <p:cNvPr id="242" name="Straight Arrow Connector 26"/>
           <p:cNvCxnSpPr>
-            <a:stCxn id="228" idx="1"/>
-            <a:endCxn id="238" idx="2"/>
+            <a:stCxn id="230" idx="1"/>
+            <a:endCxn id="240" idx="2"/>
           </p:cNvCxnSpPr>
           <p:nvPr/>
         </p:nvCxnSpPr>
         <p:spPr>
           <a:xfrm flipH="1" flipV="1">
-            <a:off x="3526200" y="839160"/>
-            <a:ext cx="1249200" cy="244800"/>
+            <a:off x="3526200" y="838800"/>
+            <a:ext cx="1249200" cy="245160"/>
           </a:xfrm>
           <a:prstGeom prst="straightConnector1">
             <a:avLst/>
@@ -17601,28 +17716,28 @@
       </p:cxnSp>
       <p:grpSp>
         <p:nvGrpSpPr>
-          <p:cNvPr id="241" name="Group 7"/>
+          <p:cNvPr id="243" name="Group 7"/>
           <p:cNvGrpSpPr/>
           <p:nvPr/>
         </p:nvGrpSpPr>
         <p:grpSpPr>
           <a:xfrm>
             <a:off x="8686800" y="837360"/>
-            <a:ext cx="1620720" cy="991440"/>
+            <a:ext cx="1620360" cy="991440"/>
             <a:chOff x="8686800" y="837360"/>
-            <a:chExt cx="1620720" cy="991440"/>
+            <a:chExt cx="1620360" cy="991440"/>
           </a:xfrm>
         </p:grpSpPr>
         <p:sp>
           <p:nvSpPr>
-            <p:cNvPr id="242" name="TextBox 31"/>
+            <p:cNvPr id="244" name="TextBox 31"/>
             <p:cNvSpPr/>
             <p:nvPr/>
           </p:nvSpPr>
           <p:spPr>
             <a:xfrm>
               <a:off x="8686800" y="837360"/>
-              <a:ext cx="1620720" cy="303120"/>
+              <a:ext cx="1620360" cy="303120"/>
             </a:xfrm>
             <a:prstGeom prst="rect">
               <a:avLst/>
@@ -17672,14 +17787,14 @@
         </p:sp>
         <p:sp>
           <p:nvSpPr>
-            <p:cNvPr id="243" name="TextBox 32"/>
+            <p:cNvPr id="245" name="TextBox 32"/>
             <p:cNvSpPr/>
             <p:nvPr/>
           </p:nvSpPr>
           <p:spPr>
             <a:xfrm>
               <a:off x="8686800" y="1098720"/>
-              <a:ext cx="1620720" cy="730080"/>
+              <a:ext cx="1620360" cy="730080"/>
             </a:xfrm>
             <a:prstGeom prst="rect">
               <a:avLst/>
@@ -17790,14 +17905,14 @@
       </p:grpSp>
       <p:sp>
         <p:nvSpPr>
-          <p:cNvPr id="244" name="Diamond 12"/>
+          <p:cNvPr id="246" name="Diamond 12"/>
           <p:cNvSpPr/>
           <p:nvPr/>
         </p:nvSpPr>
         <p:spPr>
           <a:xfrm>
             <a:off x="128880" y="6134040"/>
-            <a:ext cx="1566000" cy="381960"/>
+            <a:ext cx="1565640" cy="381600"/>
           </a:xfrm>
           <a:prstGeom prst="diamond">
             <a:avLst/>
@@ -17855,14 +17970,14 @@
       </p:sp>
       <p:sp>
         <p:nvSpPr>
-          <p:cNvPr id="245" name="Diamond 13"/>
+          <p:cNvPr id="247" name="Diamond 13"/>
           <p:cNvSpPr/>
           <p:nvPr/>
         </p:nvSpPr>
         <p:spPr>
           <a:xfrm>
             <a:off x="7315200" y="228600"/>
-            <a:ext cx="1566000" cy="381960"/>
+            <a:ext cx="1565640" cy="381600"/>
           </a:xfrm>
           <a:prstGeom prst="diamond">
             <a:avLst/>
@@ -17920,14 +18035,14 @@
       </p:sp>
       <p:cxnSp>
         <p:nvCxnSpPr>
-          <p:cNvPr id="246" name="Straight Arrow Connector 27"/>
+          <p:cNvPr id="248" name="Straight Arrow Connector 27"/>
           <p:cNvCxnSpPr/>
           <p:nvPr/>
         </p:nvCxnSpPr>
         <p:spPr>
           <a:xfrm>
             <a:off x="360" y="3366000"/>
-            <a:ext cx="1834560" cy="5760"/>
+            <a:ext cx="1834920" cy="6120"/>
           </a:xfrm>
           <a:prstGeom prst="straightConnector1">
             <a:avLst/>
@@ -17942,17 +18057,17 @@
       </p:cxnSp>
       <p:cxnSp>
         <p:nvCxnSpPr>
-          <p:cNvPr id="247" name="Straight Arrow Connector 28"/>
+          <p:cNvPr id="249" name="Straight Arrow Connector 28"/>
           <p:cNvCxnSpPr>
-            <a:stCxn id="245" idx="1"/>
-            <a:endCxn id="228" idx="3"/>
+            <a:stCxn id="247" idx="1"/>
+            <a:endCxn id="230" idx="3"/>
           </p:cNvCxnSpPr>
           <p:nvPr/>
         </p:nvCxnSpPr>
         <p:spPr>
           <a:xfrm flipH="1">
-            <a:off x="6395760" y="419760"/>
-            <a:ext cx="919800" cy="664200"/>
+            <a:off x="6395400" y="419400"/>
+            <a:ext cx="920160" cy="664560"/>
           </a:xfrm>
           <a:prstGeom prst="straightConnector1">
             <a:avLst/>
@@ -17967,14 +18082,14 @@
       </p:cxnSp>
       <p:sp>
         <p:nvSpPr>
-          <p:cNvPr id="248" name="Diamond 14"/>
+          <p:cNvPr id="250" name="Diamond 14"/>
           <p:cNvSpPr/>
           <p:nvPr/>
         </p:nvSpPr>
         <p:spPr>
           <a:xfrm>
             <a:off x="6629400" y="1442160"/>
-            <a:ext cx="1825200" cy="611640"/>
+            <a:ext cx="1824840" cy="611280"/>
           </a:xfrm>
           <a:prstGeom prst="diamond">
             <a:avLst/>
@@ -18032,17 +18147,17 @@
       </p:sp>
       <p:cxnSp>
         <p:nvCxnSpPr>
-          <p:cNvPr id="249" name="Straight Arrow Connector 30"/>
+          <p:cNvPr id="251" name="Straight Arrow Connector 30"/>
           <p:cNvCxnSpPr>
-            <a:stCxn id="241" idx="0"/>
-            <a:endCxn id="245" idx="3"/>
+            <a:stCxn id="243" idx="0"/>
+            <a:endCxn id="247" idx="3"/>
           </p:cNvCxnSpPr>
           <p:nvPr/>
         </p:nvCxnSpPr>
         <p:spPr>
           <a:xfrm flipH="1" flipV="1">
-            <a:off x="8881200" y="419760"/>
-            <a:ext cx="616320" cy="417960"/>
+            <a:off x="8880840" y="419400"/>
+            <a:ext cx="616320" cy="418320"/>
           </a:xfrm>
           <a:prstGeom prst="straightConnector1">
             <a:avLst/>
@@ -18058,14 +18173,14 @@
       </p:cxnSp>
       <p:sp>
         <p:nvSpPr>
-          <p:cNvPr id="250" name="Diamond 15"/>
+          <p:cNvPr id="252" name="Diamond 15"/>
           <p:cNvSpPr/>
           <p:nvPr/>
         </p:nvSpPr>
         <p:spPr>
           <a:xfrm>
             <a:off x="6629400" y="2514600"/>
-            <a:ext cx="1566000" cy="381960"/>
+            <a:ext cx="1565640" cy="381600"/>
           </a:xfrm>
           <a:prstGeom prst="diamond">
             <a:avLst/>
@@ -18123,17 +18238,17 @@
       </p:sp>
       <p:cxnSp>
         <p:nvCxnSpPr>
-          <p:cNvPr id="251" name="Straight Arrow Connector 32"/>
+          <p:cNvPr id="253" name="Straight Arrow Connector 32"/>
           <p:cNvCxnSpPr>
-            <a:stCxn id="241" idx="2"/>
-            <a:endCxn id="250" idx="3"/>
+            <a:stCxn id="243" idx="2"/>
+            <a:endCxn id="252" idx="3"/>
           </p:cNvCxnSpPr>
           <p:nvPr/>
         </p:nvCxnSpPr>
         <p:spPr>
           <a:xfrm flipH="1">
-            <a:off x="8195400" y="1828800"/>
-            <a:ext cx="1302120" cy="877320"/>
+            <a:off x="8195040" y="1828800"/>
+            <a:ext cx="1302120" cy="876960"/>
           </a:xfrm>
           <a:prstGeom prst="straightConnector1">
             <a:avLst/>
@@ -18148,17 +18263,17 @@
       </p:cxnSp>
       <p:cxnSp>
         <p:nvCxnSpPr>
-          <p:cNvPr id="252" name="Straight Arrow Connector 33"/>
+          <p:cNvPr id="254" name="Straight Arrow Connector 33"/>
           <p:cNvCxnSpPr>
-            <a:stCxn id="250" idx="1"/>
-            <a:endCxn id="229" idx="3"/>
+            <a:stCxn id="252" idx="1"/>
+            <a:endCxn id="231" idx="3"/>
           </p:cNvCxnSpPr>
           <p:nvPr/>
         </p:nvCxnSpPr>
         <p:spPr>
           <a:xfrm flipH="1">
-            <a:off x="6192720" y="2705760"/>
-            <a:ext cx="437040" cy="2064600"/>
+            <a:off x="6192360" y="2705400"/>
+            <a:ext cx="437400" cy="2064960"/>
           </a:xfrm>
           <a:prstGeom prst="straightConnector1">
             <a:avLst/>
@@ -18173,17 +18288,17 @@
       </p:cxnSp>
       <p:cxnSp>
         <p:nvCxnSpPr>
-          <p:cNvPr id="253" name="Straight Arrow Connector 34"/>
+          <p:cNvPr id="255" name="Straight Arrow Connector 34"/>
           <p:cNvCxnSpPr>
-            <a:stCxn id="241" idx="1"/>
-            <a:endCxn id="248" idx="3"/>
+            <a:stCxn id="243" idx="1"/>
+            <a:endCxn id="250" idx="3"/>
           </p:cNvCxnSpPr>
           <p:nvPr/>
         </p:nvCxnSpPr>
         <p:spPr>
           <a:xfrm flipH="1">
-            <a:off x="8454600" y="1333080"/>
-            <a:ext cx="232560" cy="415440"/>
+            <a:off x="8454240" y="1333080"/>
+            <a:ext cx="232920" cy="415080"/>
           </a:xfrm>
           <a:prstGeom prst="straightConnector1">
             <a:avLst/>
@@ -18198,17 +18313,17 @@
       </p:cxnSp>
       <p:cxnSp>
         <p:nvCxnSpPr>
-          <p:cNvPr id="254" name="Straight Arrow Connector 31"/>
+          <p:cNvPr id="256" name="Straight Arrow Connector 31"/>
           <p:cNvCxnSpPr>
-            <a:stCxn id="248" idx="1"/>
-            <a:endCxn id="228" idx="2"/>
+            <a:stCxn id="250" idx="1"/>
+            <a:endCxn id="230" idx="2"/>
           </p:cNvCxnSpPr>
           <p:nvPr/>
         </p:nvCxnSpPr>
         <p:spPr>
           <a:xfrm flipH="1" flipV="1">
-            <a:off x="5585400" y="1448640"/>
-            <a:ext cx="1044360" cy="299880"/>
+            <a:off x="5585040" y="1448640"/>
+            <a:ext cx="1044720" cy="299520"/>
           </a:xfrm>
           <a:prstGeom prst="straightConnector1">
             <a:avLst/>
@@ -18223,28 +18338,28 @@
       </p:cxnSp>
       <p:grpSp>
         <p:nvGrpSpPr>
-          <p:cNvPr id="255" name="Group 11"/>
+          <p:cNvPr id="257" name="Group 11"/>
           <p:cNvGrpSpPr/>
           <p:nvPr/>
         </p:nvGrpSpPr>
         <p:grpSpPr>
           <a:xfrm>
             <a:off x="101160" y="336240"/>
-            <a:ext cx="1620720" cy="777960"/>
+            <a:ext cx="1620360" cy="777960"/>
             <a:chOff x="101160" y="336240"/>
-            <a:chExt cx="1620720" cy="777960"/>
+            <a:chExt cx="1620360" cy="777960"/>
           </a:xfrm>
         </p:grpSpPr>
         <p:sp>
           <p:nvSpPr>
-            <p:cNvPr id="256" name="TextBox 51"/>
+            <p:cNvPr id="258" name="TextBox 51"/>
             <p:cNvSpPr/>
             <p:nvPr/>
           </p:nvSpPr>
           <p:spPr>
             <a:xfrm>
               <a:off x="101160" y="336240"/>
-              <a:ext cx="1620720" cy="303120"/>
+              <a:ext cx="1620360" cy="303120"/>
             </a:xfrm>
             <a:prstGeom prst="rect">
               <a:avLst/>
@@ -18294,14 +18409,14 @@
         </p:sp>
         <p:sp>
           <p:nvSpPr>
-            <p:cNvPr id="257" name="TextBox 52"/>
+            <p:cNvPr id="259" name="TextBox 52"/>
             <p:cNvSpPr/>
             <p:nvPr/>
           </p:nvSpPr>
           <p:spPr>
             <a:xfrm>
               <a:off x="101160" y="597600"/>
-              <a:ext cx="1620720" cy="516600"/>
+              <a:ext cx="1620360" cy="516600"/>
             </a:xfrm>
             <a:prstGeom prst="rect">
               <a:avLst/>
@@ -18385,28 +18500,28 @@
       </p:grpSp>
       <p:grpSp>
         <p:nvGrpSpPr>
-          <p:cNvPr id="258" name="Group 14"/>
+          <p:cNvPr id="260" name="Group 14"/>
           <p:cNvGrpSpPr/>
           <p:nvPr/>
         </p:nvGrpSpPr>
         <p:grpSpPr>
           <a:xfrm>
             <a:off x="6760440" y="4359960"/>
-            <a:ext cx="1620720" cy="560880"/>
+            <a:ext cx="1620360" cy="560520"/>
             <a:chOff x="6760440" y="4359960"/>
-            <a:chExt cx="1620720" cy="560880"/>
+            <a:chExt cx="1620360" cy="560520"/>
           </a:xfrm>
         </p:grpSpPr>
         <p:sp>
           <p:nvSpPr>
-            <p:cNvPr id="259" name="TextBox 55"/>
+            <p:cNvPr id="261" name="TextBox 55"/>
             <p:cNvSpPr/>
             <p:nvPr/>
           </p:nvSpPr>
           <p:spPr>
             <a:xfrm>
               <a:off x="6760440" y="4359960"/>
-              <a:ext cx="1620720" cy="303120"/>
+              <a:ext cx="1620360" cy="303120"/>
             </a:xfrm>
             <a:prstGeom prst="rect">
               <a:avLst/>
@@ -18456,14 +18571,14 @@
         </p:sp>
         <p:sp>
           <p:nvSpPr>
-            <p:cNvPr id="260" name="TextBox 56"/>
+            <p:cNvPr id="262" name="TextBox 56"/>
             <p:cNvSpPr/>
             <p:nvPr/>
           </p:nvSpPr>
           <p:spPr>
             <a:xfrm>
               <a:off x="6760440" y="4621320"/>
-              <a:ext cx="1620720" cy="299520"/>
+              <a:ext cx="1620360" cy="299160"/>
             </a:xfrm>
             <a:prstGeom prst="rect">
               <a:avLst/>
@@ -18505,14 +18620,14 @@
       </p:grpSp>
       <p:sp>
         <p:nvSpPr>
-          <p:cNvPr id="261" name="Isosceles Triangle 6"/>
+          <p:cNvPr id="263" name="Isosceles Triangle 6"/>
           <p:cNvSpPr/>
           <p:nvPr/>
         </p:nvSpPr>
         <p:spPr>
           <a:xfrm>
             <a:off x="9144000" y="2057400"/>
-            <a:ext cx="477000" cy="381960"/>
+            <a:ext cx="476640" cy="381600"/>
           </a:xfrm>
           <a:prstGeom prst="triangle">
             <a:avLst>
@@ -18572,7 +18687,55 @@
       </p:sp>
       <p:cxnSp>
         <p:nvCxnSpPr>
-          <p:cNvPr id="262" name="Straight Arrow Connector 51"/>
+          <p:cNvPr id="264" name="Straight Arrow Connector 51"/>
+          <p:cNvCxnSpPr>
+            <a:stCxn id="265" idx="3"/>
+          </p:cNvCxnSpPr>
+          <p:nvPr/>
+        </p:nvCxnSpPr>
+        <p:spPr>
+          <a:xfrm flipH="1">
+            <a:off x="8026200" y="4110840"/>
+            <a:ext cx="1433880" cy="253080"/>
+          </a:xfrm>
+          <a:prstGeom prst="straightConnector1">
+            <a:avLst/>
+          </a:prstGeom>
+          <a:ln w="25400">
+            <a:solidFill>
+              <a:srgbClr val="000000"/>
+            </a:solidFill>
+            <a:round/>
+          </a:ln>
+        </p:spPr>
+      </p:cxnSp>
+      <p:cxnSp>
+        <p:nvCxnSpPr>
+          <p:cNvPr id="266" name="Straight Arrow Connector 53"/>
+          <p:cNvCxnSpPr>
+            <a:endCxn id="265" idx="3"/>
+          </p:cNvCxnSpPr>
+          <p:nvPr/>
+        </p:nvCxnSpPr>
+        <p:spPr>
+          <a:xfrm flipH="1" flipV="1">
+            <a:off x="9459720" y="4110840"/>
+            <a:ext cx="475560" cy="234720"/>
+          </a:xfrm>
+          <a:prstGeom prst="straightConnector1">
+            <a:avLst/>
+          </a:prstGeom>
+          <a:ln w="25400">
+            <a:solidFill>
+              <a:srgbClr val="000000"/>
+            </a:solidFill>
+            <a:round/>
+          </a:ln>
+        </p:spPr>
+      </p:cxnSp>
+      <p:cxnSp>
+        <p:nvCxnSpPr>
+          <p:cNvPr id="267" name="Straight Arrow Connector 54"/>
           <p:cNvCxnSpPr>
             <a:stCxn id="263" idx="3"/>
           </p:cNvCxnSpPr>
@@ -18580,8 +18743,8 @@
         </p:nvCxnSpPr>
         <p:spPr>
           <a:xfrm flipH="1">
-            <a:off x="8026200" y="4111200"/>
-            <a:ext cx="1434240" cy="252360"/>
+            <a:off x="9346320" y="2439000"/>
+            <a:ext cx="36360" cy="444600"/>
           </a:xfrm>
           <a:prstGeom prst="straightConnector1">
             <a:avLst/>
@@ -18596,16 +18759,17 @@
       </p:cxnSp>
       <p:cxnSp>
         <p:nvCxnSpPr>
-          <p:cNvPr id="264" name="Straight Arrow Connector 53"/>
+          <p:cNvPr id="268" name="Straight Arrow Connector 55"/>
           <p:cNvCxnSpPr>
-            <a:endCxn id="263" idx="3"/>
+            <a:stCxn id="243" idx="2"/>
+            <a:endCxn id="263" idx="0"/>
           </p:cNvCxnSpPr>
           <p:nvPr/>
         </p:nvCxnSpPr>
         <p:spPr>
-          <a:xfrm flipH="1" flipV="1">
-            <a:off x="9460080" y="4111200"/>
-            <a:ext cx="474840" cy="234000"/>
+          <a:xfrm flipH="1">
+            <a:off x="9382320" y="1828800"/>
+            <a:ext cx="114840" cy="228960"/>
           </a:xfrm>
           <a:prstGeom prst="straightConnector1">
             <a:avLst/>
@@ -18618,65 +18782,16 @@
           </a:ln>
         </p:spPr>
       </p:cxnSp>
-      <p:cxnSp>
-        <p:nvCxnSpPr>
-          <p:cNvPr id="265" name="Straight Arrow Connector 54"/>
-          <p:cNvCxnSpPr>
-            <a:stCxn id="261" idx="3"/>
-          </p:cNvCxnSpPr>
-          <p:nvPr/>
-        </p:nvCxnSpPr>
-        <p:spPr>
-          <a:xfrm flipH="1">
-            <a:off x="9346320" y="2439360"/>
-            <a:ext cx="36720" cy="443880"/>
-          </a:xfrm>
-          <a:prstGeom prst="straightConnector1">
-            <a:avLst/>
-          </a:prstGeom>
-          <a:ln w="25400">
-            <a:solidFill>
-              <a:srgbClr val="000000"/>
-            </a:solidFill>
-            <a:round/>
-          </a:ln>
-        </p:spPr>
-      </p:cxnSp>
-      <p:cxnSp>
-        <p:nvCxnSpPr>
-          <p:cNvPr id="266" name="Straight Arrow Connector 55"/>
-          <p:cNvCxnSpPr>
-            <a:stCxn id="241" idx="2"/>
-            <a:endCxn id="261" idx="0"/>
-          </p:cNvCxnSpPr>
-          <p:nvPr/>
-        </p:nvCxnSpPr>
-        <p:spPr>
-          <a:xfrm flipH="1">
-            <a:off x="9382680" y="1828800"/>
-            <a:ext cx="114840" cy="228960"/>
-          </a:xfrm>
-          <a:prstGeom prst="straightConnector1">
-            <a:avLst/>
-          </a:prstGeom>
-          <a:ln w="25400">
-            <a:solidFill>
-              <a:srgbClr val="000000"/>
-            </a:solidFill>
-            <a:round/>
-          </a:ln>
-        </p:spPr>
-      </p:cxnSp>
       <p:sp>
         <p:nvSpPr>
-          <p:cNvPr id="267" name="TextBox 73"/>
+          <p:cNvPr id="269" name="TextBox 73"/>
           <p:cNvSpPr/>
           <p:nvPr/>
         </p:nvSpPr>
         <p:spPr>
           <a:xfrm>
             <a:off x="7089840" y="5715000"/>
-            <a:ext cx="1620720" cy="303120"/>
+            <a:ext cx="1620360" cy="303120"/>
           </a:xfrm>
           <a:prstGeom prst="rect">
             <a:avLst/>
@@ -18726,14 +18841,14 @@
       </p:sp>
       <p:sp>
         <p:nvSpPr>
-          <p:cNvPr id="268" name="Diamond 21"/>
+          <p:cNvPr id="270" name="Diamond 21"/>
           <p:cNvSpPr/>
           <p:nvPr/>
         </p:nvSpPr>
         <p:spPr>
           <a:xfrm>
             <a:off x="6760440" y="5183280"/>
-            <a:ext cx="1824120" cy="381960"/>
+            <a:ext cx="1823760" cy="381600"/>
           </a:xfrm>
           <a:prstGeom prst="diamond">
             <a:avLst/>
@@ -18791,14 +18906,14 @@
       </p:sp>
       <p:cxnSp>
         <p:nvCxnSpPr>
-          <p:cNvPr id="269" name="Straight Arrow Connector 56"/>
+          <p:cNvPr id="271" name="Straight Arrow Connector 56"/>
           <p:cNvCxnSpPr/>
           <p:nvPr/>
         </p:nvCxnSpPr>
         <p:spPr>
           <a:xfrm flipH="1">
             <a:off x="0" y="3657600"/>
-            <a:ext cx="1834560" cy="5760"/>
+            <a:ext cx="1834920" cy="6120"/>
           </a:xfrm>
           <a:prstGeom prst="straightConnector1">
             <a:avLst/>
@@ -18813,28 +18928,28 @@
       </p:cxnSp>
       <p:grpSp>
         <p:nvGrpSpPr>
-          <p:cNvPr id="270" name="Group 12"/>
+          <p:cNvPr id="272" name="Group 12"/>
           <p:cNvGrpSpPr/>
           <p:nvPr/>
         </p:nvGrpSpPr>
         <p:grpSpPr>
           <a:xfrm>
             <a:off x="8534520" y="2879640"/>
-            <a:ext cx="1620720" cy="561600"/>
+            <a:ext cx="1620360" cy="561240"/>
             <a:chOff x="8534520" y="2879640"/>
-            <a:chExt cx="1620720" cy="561600"/>
+            <a:chExt cx="1620360" cy="561240"/>
           </a:xfrm>
         </p:grpSpPr>
         <p:sp>
           <p:nvSpPr>
-            <p:cNvPr id="271" name="TextBox 23"/>
+            <p:cNvPr id="273" name="TextBox 23"/>
             <p:cNvSpPr/>
             <p:nvPr/>
           </p:nvSpPr>
           <p:spPr>
             <a:xfrm>
               <a:off x="8534520" y="2879640"/>
-              <a:ext cx="1620720" cy="303120"/>
+              <a:ext cx="1620360" cy="303120"/>
             </a:xfrm>
             <a:prstGeom prst="rect">
               <a:avLst/>
@@ -18884,14 +18999,14 @@
         </p:sp>
         <p:sp>
           <p:nvSpPr>
-            <p:cNvPr id="272" name="TextBox 24"/>
+            <p:cNvPr id="274" name="TextBox 24"/>
             <p:cNvSpPr/>
             <p:nvPr/>
           </p:nvSpPr>
           <p:spPr>
             <a:xfrm>
               <a:off x="8534520" y="3141000"/>
-              <a:ext cx="1620720" cy="300240"/>
+              <a:ext cx="1620360" cy="299880"/>
             </a:xfrm>
             <a:prstGeom prst="rect">
               <a:avLst/>
@@ -18933,28 +19048,28 @@
       </p:grpSp>
       <p:grpSp>
         <p:nvGrpSpPr>
-          <p:cNvPr id="273" name="Group 16"/>
+          <p:cNvPr id="275" name="Group 16"/>
           <p:cNvGrpSpPr/>
           <p:nvPr/>
         </p:nvGrpSpPr>
         <p:grpSpPr>
           <a:xfrm>
             <a:off x="8534520" y="2879640"/>
-            <a:ext cx="1620720" cy="564480"/>
+            <a:ext cx="1620360" cy="564480"/>
             <a:chOff x="8534520" y="2879640"/>
-            <a:chExt cx="1620720" cy="564480"/>
+            <a:chExt cx="1620360" cy="564480"/>
           </a:xfrm>
         </p:grpSpPr>
         <p:sp>
           <p:nvSpPr>
-            <p:cNvPr id="274" name="TextBox 40"/>
+            <p:cNvPr id="276" name="TextBox 40"/>
             <p:cNvSpPr/>
             <p:nvPr/>
           </p:nvSpPr>
           <p:spPr>
             <a:xfrm>
               <a:off x="8534520" y="2879640"/>
-              <a:ext cx="1620720" cy="303120"/>
+              <a:ext cx="1620360" cy="303120"/>
             </a:xfrm>
             <a:prstGeom prst="rect">
               <a:avLst/>
@@ -19004,14 +19119,14 @@
         </p:sp>
         <p:sp>
           <p:nvSpPr>
-            <p:cNvPr id="275" name="TextBox 59"/>
+            <p:cNvPr id="277" name="TextBox 59"/>
             <p:cNvSpPr/>
             <p:nvPr/>
           </p:nvSpPr>
           <p:spPr>
             <a:xfrm>
               <a:off x="8534520" y="3141000"/>
-              <a:ext cx="1620720" cy="303120"/>
+              <a:ext cx="1620360" cy="303120"/>
             </a:xfrm>
             <a:prstGeom prst="rect">
               <a:avLst/>
@@ -19067,14 +19182,14 @@
       </p:grpSp>
       <p:sp>
         <p:nvSpPr>
-          <p:cNvPr id="263" name="Isosceles Triangle 7"/>
+          <p:cNvPr id="265" name="Isosceles Triangle 7"/>
           <p:cNvSpPr/>
           <p:nvPr/>
         </p:nvSpPr>
         <p:spPr>
           <a:xfrm>
             <a:off x="9221400" y="3729240"/>
-            <a:ext cx="477000" cy="381960"/>
+            <a:ext cx="476640" cy="381600"/>
           </a:xfrm>
           <a:prstGeom prst="triangle">
             <a:avLst>
@@ -19134,16 +19249,16 @@
       </p:sp>
       <p:cxnSp>
         <p:nvCxnSpPr>
-          <p:cNvPr id="276" name="Straight Arrow Connector 80"/>
+          <p:cNvPr id="278" name="Straight Arrow Connector 80"/>
           <p:cNvCxnSpPr>
-            <a:stCxn id="273" idx="2"/>
-            <a:endCxn id="263" idx="0"/>
+            <a:stCxn id="275" idx="2"/>
+            <a:endCxn id="265" idx="0"/>
           </p:cNvCxnSpPr>
           <p:nvPr/>
         </p:nvCxnSpPr>
         <p:spPr>
           <a:xfrm>
-            <a:off x="9344880" y="3444120"/>
+            <a:off x="9344520" y="3444120"/>
             <a:ext cx="115560" cy="285480"/>
           </a:xfrm>
           <a:prstGeom prst="straightConnector1">
@@ -19159,14 +19274,14 @@
       </p:cxnSp>
       <p:cxnSp>
         <p:nvCxnSpPr>
-          <p:cNvPr id="277" name="Straight Arrow Connector 52"/>
+          <p:cNvPr id="279" name="Straight Arrow Connector 52"/>
           <p:cNvCxnSpPr/>
           <p:nvPr/>
         </p:nvCxnSpPr>
         <p:spPr>
           <a:xfrm>
             <a:off x="8556840" y="3657600"/>
-            <a:ext cx="1834560" cy="5760"/>
+            <a:ext cx="1834920" cy="6120"/>
           </a:xfrm>
           <a:prstGeom prst="straightConnector1">
             <a:avLst/>
@@ -19182,14 +19297,14 @@
       </p:cxnSp>
       <p:sp>
         <p:nvSpPr>
-          <p:cNvPr id="278" name=""/>
+          <p:cNvPr id="280" name=""/>
           <p:cNvSpPr/>
           <p:nvPr/>
         </p:nvSpPr>
         <p:spPr>
           <a:xfrm>
             <a:off x="9601200" y="3382920"/>
-            <a:ext cx="910800" cy="342720"/>
+            <a:ext cx="910440" cy="342360"/>
           </a:xfrm>
           <a:prstGeom prst="rect">
             <a:avLst/>
@@ -19235,14 +19350,14 @@
       </p:sp>
       <p:sp>
         <p:nvSpPr>
-          <p:cNvPr id="279" name="TextBox 49"/>
+          <p:cNvPr id="281" name="TextBox 49"/>
           <p:cNvSpPr/>
           <p:nvPr/>
         </p:nvSpPr>
         <p:spPr>
           <a:xfrm>
             <a:off x="2057400" y="2132280"/>
-            <a:ext cx="1620720" cy="303120"/>
+            <a:ext cx="1620360" cy="303120"/>
           </a:xfrm>
           <a:prstGeom prst="rect">
             <a:avLst/>
@@ -19292,14 +19407,14 @@
       </p:sp>
       <p:sp>
         <p:nvSpPr>
-          <p:cNvPr id="280" name="TextBox 50"/>
+          <p:cNvPr id="282" name="TextBox 50"/>
           <p:cNvSpPr/>
           <p:nvPr/>
         </p:nvSpPr>
         <p:spPr>
           <a:xfrm>
             <a:off x="2057400" y="2393640"/>
-            <a:ext cx="1620720" cy="192240"/>
+            <a:ext cx="1620360" cy="191880"/>
           </a:xfrm>
           <a:prstGeom prst="rect">
             <a:avLst/>
@@ -19340,14 +19455,14 @@
       </p:sp>
       <p:sp>
         <p:nvSpPr>
-          <p:cNvPr id="281" name="Isosceles Triangle 8"/>
+          <p:cNvPr id="283" name="Isosceles Triangle 8"/>
           <p:cNvSpPr/>
           <p:nvPr/>
         </p:nvSpPr>
         <p:spPr>
           <a:xfrm>
             <a:off x="2613960" y="1217880"/>
-            <a:ext cx="477000" cy="381960"/>
+            <a:ext cx="476640" cy="381600"/>
           </a:xfrm>
           <a:prstGeom prst="triangle">
             <a:avLst>
@@ -19407,17 +19522,17 @@
       </p:sp>
       <p:cxnSp>
         <p:nvCxnSpPr>
-          <p:cNvPr id="282" name="Straight Arrow Connector 81"/>
+          <p:cNvPr id="284" name="Straight Arrow Connector 81"/>
           <p:cNvCxnSpPr>
-            <a:stCxn id="281" idx="3"/>
-            <a:endCxn id="279" idx="0"/>
+            <a:stCxn id="283" idx="3"/>
+            <a:endCxn id="281" idx="0"/>
           </p:cNvCxnSpPr>
           <p:nvPr/>
         </p:nvCxnSpPr>
         <p:spPr>
           <a:xfrm>
-            <a:off x="2852640" y="1599840"/>
-            <a:ext cx="15480" cy="532800"/>
+            <a:off x="2852280" y="1599480"/>
+            <a:ext cx="15480" cy="533160"/>
           </a:xfrm>
           <a:prstGeom prst="straightConnector1">
             <a:avLst/>
@@ -19432,17 +19547,17 @@
       </p:cxnSp>
       <p:cxnSp>
         <p:nvCxnSpPr>
-          <p:cNvPr id="283" name="Straight Arrow Connector 82"/>
+          <p:cNvPr id="285" name="Straight Arrow Connector 82"/>
           <p:cNvCxnSpPr>
-            <a:stCxn id="281" idx="0"/>
-            <a:endCxn id="228" idx="1"/>
+            <a:stCxn id="283" idx="0"/>
+            <a:endCxn id="230" idx="1"/>
           </p:cNvCxnSpPr>
           <p:nvPr/>
         </p:nvCxnSpPr>
         <p:spPr>
           <a:xfrm flipV="1">
-            <a:off x="2852640" y="1083600"/>
-            <a:ext cx="1922760" cy="134640"/>
+            <a:off x="2852280" y="1083600"/>
+            <a:ext cx="1923120" cy="134640"/>
           </a:xfrm>
           <a:prstGeom prst="straightConnector1">
             <a:avLst/>
@@ -19457,17 +19572,17 @@
       </p:cxnSp>
       <p:cxnSp>
         <p:nvCxnSpPr>
-          <p:cNvPr id="284" name="Straight Arrow Connector 83"/>
+          <p:cNvPr id="286" name="Straight Arrow Connector 83"/>
           <p:cNvCxnSpPr>
-            <a:stCxn id="258" idx="2"/>
-            <a:endCxn id="268" idx="0"/>
+            <a:stCxn id="260" idx="2"/>
+            <a:endCxn id="270" idx="0"/>
           </p:cNvCxnSpPr>
           <p:nvPr/>
         </p:nvCxnSpPr>
         <p:spPr>
           <a:xfrm>
-            <a:off x="7570800" y="4920840"/>
-            <a:ext cx="102240" cy="262800"/>
+            <a:off x="7570440" y="4920480"/>
+            <a:ext cx="102240" cy="263160"/>
           </a:xfrm>
           <a:prstGeom prst="straightConnector1">
             <a:avLst/>
@@ -19483,17 +19598,17 @@
       </p:cxnSp>
       <p:cxnSp>
         <p:nvCxnSpPr>
-          <p:cNvPr id="285" name="Straight Arrow Connector 57"/>
+          <p:cNvPr id="287" name="Straight Arrow Connector 57"/>
           <p:cNvCxnSpPr>
-            <a:stCxn id="268" idx="2"/>
-            <a:endCxn id="267" idx="0"/>
+            <a:stCxn id="270" idx="2"/>
+            <a:endCxn id="269" idx="0"/>
           </p:cNvCxnSpPr>
           <p:nvPr/>
         </p:nvCxnSpPr>
         <p:spPr>
           <a:xfrm>
-            <a:off x="7672680" y="5565240"/>
-            <a:ext cx="227880" cy="150120"/>
+            <a:off x="7672320" y="5564880"/>
+            <a:ext cx="227880" cy="150480"/>
           </a:xfrm>
           <a:prstGeom prst="straightConnector1">
             <a:avLst/>
@@ -19508,28 +19623,28 @@
       </p:cxnSp>
       <p:grpSp>
         <p:nvGrpSpPr>
-          <p:cNvPr id="286" name="Group 5"/>
+          <p:cNvPr id="288" name="Group 5"/>
           <p:cNvGrpSpPr/>
           <p:nvPr/>
         </p:nvGrpSpPr>
         <p:grpSpPr>
           <a:xfrm>
             <a:off x="10265040" y="5029200"/>
-            <a:ext cx="1620720" cy="561240"/>
+            <a:ext cx="1620360" cy="560880"/>
             <a:chOff x="10265040" y="5029200"/>
-            <a:chExt cx="1620720" cy="561240"/>
+            <a:chExt cx="1620360" cy="560880"/>
           </a:xfrm>
         </p:grpSpPr>
         <p:sp>
           <p:nvSpPr>
-            <p:cNvPr id="287" name="TextBox 22"/>
+            <p:cNvPr id="289" name="TextBox 22"/>
             <p:cNvSpPr/>
             <p:nvPr/>
           </p:nvSpPr>
           <p:spPr>
             <a:xfrm>
               <a:off x="10265040" y="5029200"/>
-              <a:ext cx="1620720" cy="303120"/>
+              <a:ext cx="1620360" cy="303120"/>
             </a:xfrm>
             <a:prstGeom prst="rect">
               <a:avLst/>
@@ -19579,14 +19694,14 @@
         </p:sp>
         <p:sp>
           <p:nvSpPr>
-            <p:cNvPr id="288" name="TextBox 29"/>
+            <p:cNvPr id="290" name="TextBox 29"/>
             <p:cNvSpPr/>
             <p:nvPr/>
           </p:nvSpPr>
           <p:spPr>
             <a:xfrm>
               <a:off x="10265040" y="5290560"/>
-              <a:ext cx="1620720" cy="299880"/>
+              <a:ext cx="1620360" cy="299520"/>
             </a:xfrm>
             <a:prstGeom prst="rect">
               <a:avLst/>
@@ -19628,17 +19743,17 @@
       </p:grpSp>
       <p:cxnSp>
         <p:nvCxnSpPr>
-          <p:cNvPr id="289" name="Straight Arrow Connector 84"/>
+          <p:cNvPr id="291" name="Straight Arrow Connector 84"/>
           <p:cNvCxnSpPr>
-            <a:stCxn id="286" idx="0"/>
-            <a:endCxn id="263" idx="4"/>
+            <a:stCxn id="288" idx="0"/>
+            <a:endCxn id="265" idx="4"/>
           </p:cNvCxnSpPr>
           <p:nvPr/>
         </p:nvCxnSpPr>
         <p:spPr>
           <a:xfrm flipH="1" flipV="1">
-            <a:off x="9698400" y="4111200"/>
-            <a:ext cx="1377360" cy="918360"/>
+            <a:off x="9698040" y="4110840"/>
+            <a:ext cx="1377360" cy="918720"/>
           </a:xfrm>
           <a:prstGeom prst="straightConnector1">
             <a:avLst/>
@@ -19653,28 +19768,28 @@
       </p:cxnSp>
       <p:grpSp>
         <p:nvGrpSpPr>
-          <p:cNvPr id="290" name="Group 9"/>
+          <p:cNvPr id="292" name="Group 9"/>
           <p:cNvGrpSpPr/>
           <p:nvPr/>
         </p:nvGrpSpPr>
         <p:grpSpPr>
           <a:xfrm>
             <a:off x="9122040" y="4343400"/>
-            <a:ext cx="1620720" cy="561240"/>
+            <a:ext cx="1620360" cy="560880"/>
             <a:chOff x="9122040" y="4343400"/>
-            <a:chExt cx="1620720" cy="561240"/>
+            <a:chExt cx="1620360" cy="560880"/>
           </a:xfrm>
         </p:grpSpPr>
         <p:sp>
           <p:nvSpPr>
-            <p:cNvPr id="291" name="TextBox 47"/>
+            <p:cNvPr id="293" name="TextBox 47"/>
             <p:cNvSpPr/>
             <p:nvPr/>
           </p:nvSpPr>
           <p:spPr>
             <a:xfrm>
               <a:off x="9122040" y="4343400"/>
-              <a:ext cx="1620720" cy="303120"/>
+              <a:ext cx="1620360" cy="303120"/>
             </a:xfrm>
             <a:prstGeom prst="rect">
               <a:avLst/>
@@ -19724,14 +19839,14 @@
         </p:sp>
         <p:sp>
           <p:nvSpPr>
-            <p:cNvPr id="292" name="TextBox 48"/>
+            <p:cNvPr id="294" name="TextBox 48"/>
             <p:cNvSpPr/>
             <p:nvPr/>
           </p:nvSpPr>
           <p:spPr>
             <a:xfrm>
               <a:off x="9122040" y="4604760"/>
-              <a:ext cx="1620720" cy="299880"/>
+              <a:ext cx="1620360" cy="299520"/>
             </a:xfrm>
             <a:prstGeom prst="rect">
               <a:avLst/>
@@ -19773,14 +19888,14 @@
       </p:grpSp>
       <p:sp>
         <p:nvSpPr>
-          <p:cNvPr id="293" name="Isosceles Triangle 9"/>
+          <p:cNvPr id="295" name="Isosceles Triangle 9"/>
           <p:cNvSpPr/>
           <p:nvPr/>
         </p:nvSpPr>
         <p:spPr>
           <a:xfrm>
             <a:off x="10037520" y="2131560"/>
-            <a:ext cx="477000" cy="381960"/>
+            <a:ext cx="476640" cy="381600"/>
           </a:xfrm>
           <a:prstGeom prst="triangle">
             <a:avLst>
@@ -19840,16 +19955,16 @@
       </p:sp>
       <p:cxnSp>
         <p:nvCxnSpPr>
-          <p:cNvPr id="294" name="Straight Arrow Connector 85"/>
+          <p:cNvPr id="296" name="Straight Arrow Connector 85"/>
           <p:cNvCxnSpPr>
-            <a:stCxn id="241" idx="2"/>
-            <a:endCxn id="293" idx="0"/>
+            <a:stCxn id="243" idx="2"/>
+            <a:endCxn id="295" idx="0"/>
           </p:cNvCxnSpPr>
           <p:nvPr/>
         </p:nvCxnSpPr>
         <p:spPr>
           <a:xfrm>
-            <a:off x="9497160" y="1828800"/>
+            <a:off x="9496800" y="1828800"/>
             <a:ext cx="779400" cy="303120"/>
           </a:xfrm>
           <a:prstGeom prst="straightConnector1">
@@ -19865,28 +19980,28 @@
       </p:cxnSp>
       <p:grpSp>
         <p:nvGrpSpPr>
-          <p:cNvPr id="295" name="Group 10"/>
+          <p:cNvPr id="297" name="Group 10"/>
           <p:cNvGrpSpPr/>
           <p:nvPr/>
         </p:nvGrpSpPr>
         <p:grpSpPr>
           <a:xfrm>
             <a:off x="10494000" y="2866680"/>
-            <a:ext cx="1620720" cy="561240"/>
+            <a:ext cx="1620360" cy="560880"/>
             <a:chOff x="10494000" y="2866680"/>
-            <a:chExt cx="1620720" cy="561240"/>
+            <a:chExt cx="1620360" cy="560880"/>
           </a:xfrm>
         </p:grpSpPr>
         <p:sp>
           <p:nvSpPr>
-            <p:cNvPr id="296" name="TextBox 60"/>
+            <p:cNvPr id="298" name="TextBox 60"/>
             <p:cNvSpPr/>
             <p:nvPr/>
           </p:nvSpPr>
           <p:spPr>
             <a:xfrm>
               <a:off x="10494000" y="2866680"/>
-              <a:ext cx="1620720" cy="303120"/>
+              <a:ext cx="1620360" cy="303120"/>
             </a:xfrm>
             <a:prstGeom prst="rect">
               <a:avLst/>
@@ -19936,14 +20051,14 @@
         </p:sp>
         <p:sp>
           <p:nvSpPr>
-            <p:cNvPr id="297" name="TextBox 71"/>
+            <p:cNvPr id="299" name="TextBox 71"/>
             <p:cNvSpPr/>
             <p:nvPr/>
           </p:nvSpPr>
           <p:spPr>
             <a:xfrm>
               <a:off x="10494000" y="3128040"/>
-              <a:ext cx="1620720" cy="299880"/>
+              <a:ext cx="1620360" cy="299520"/>
             </a:xfrm>
             <a:prstGeom prst="rect">
               <a:avLst/>
@@ -19985,17 +20100,17 @@
       </p:grpSp>
       <p:cxnSp>
         <p:nvCxnSpPr>
-          <p:cNvPr id="298" name="Straight Arrow Connector 86"/>
+          <p:cNvPr id="300" name="Straight Arrow Connector 86"/>
           <p:cNvCxnSpPr>
-            <a:stCxn id="293" idx="3"/>
-            <a:endCxn id="295" idx="0"/>
+            <a:stCxn id="295" idx="3"/>
+            <a:endCxn id="297" idx="0"/>
           </p:cNvCxnSpPr>
           <p:nvPr/>
         </p:nvCxnSpPr>
         <p:spPr>
           <a:xfrm>
-            <a:off x="10276200" y="2513520"/>
-            <a:ext cx="1028520" cy="353520"/>
+            <a:off x="10275840" y="2513160"/>
+            <a:ext cx="1028520" cy="353880"/>
           </a:xfrm>
           <a:prstGeom prst="straightConnector1">
             <a:avLst/>
@@ -20040,14 +20155,14 @@
       </p:grpSpPr>
       <p:cxnSp>
         <p:nvCxnSpPr>
-          <p:cNvPr id="299" name="Straight Arrow Connector 44"/>
+          <p:cNvPr id="301" name="Straight Arrow Connector 44"/>
           <p:cNvCxnSpPr/>
           <p:nvPr/>
         </p:nvCxnSpPr>
         <p:spPr>
           <a:xfrm flipH="1">
             <a:off x="0" y="3073320"/>
-            <a:ext cx="1834560" cy="5760"/>
+            <a:ext cx="1834920" cy="6120"/>
           </a:xfrm>
           <a:prstGeom prst="straightConnector1">
             <a:avLst/>
@@ -20063,14 +20178,14 @@
       </p:cxnSp>
       <p:cxnSp>
         <p:nvCxnSpPr>
-          <p:cNvPr id="300" name="Straight Arrow Connector 45"/>
+          <p:cNvPr id="302" name="Straight Arrow Connector 45"/>
           <p:cNvCxnSpPr/>
           <p:nvPr/>
         </p:nvCxnSpPr>
         <p:spPr>
           <a:xfrm>
             <a:off x="0" y="2489400"/>
-            <a:ext cx="1834560" cy="5760"/>
+            <a:ext cx="1834920" cy="6120"/>
           </a:xfrm>
           <a:prstGeom prst="straightConnector1">
             <a:avLst/>
@@ -20086,14 +20201,14 @@
       </p:cxnSp>
       <p:cxnSp>
         <p:nvCxnSpPr>
-          <p:cNvPr id="301" name="Straight Arrow Connector 46"/>
+          <p:cNvPr id="303" name="Straight Arrow Connector 46"/>
           <p:cNvCxnSpPr/>
           <p:nvPr/>
         </p:nvCxnSpPr>
         <p:spPr>
           <a:xfrm>
             <a:off x="0" y="2781360"/>
-            <a:ext cx="1834560" cy="5760"/>
+            <a:ext cx="1834920" cy="6120"/>
           </a:xfrm>
           <a:prstGeom prst="straightConnector1">
             <a:avLst/>
@@ -20109,14 +20224,14 @@
       </p:cxnSp>
       <p:cxnSp>
         <p:nvCxnSpPr>
-          <p:cNvPr id="302" name="Straight Arrow Connector 47"/>
+          <p:cNvPr id="304" name="Straight Arrow Connector 47"/>
           <p:cNvCxnSpPr/>
           <p:nvPr/>
         </p:nvCxnSpPr>
         <p:spPr>
           <a:xfrm flipH="1">
             <a:off x="0" y="3657600"/>
-            <a:ext cx="1834560" cy="5760"/>
+            <a:ext cx="1834920" cy="6120"/>
           </a:xfrm>
           <a:prstGeom prst="straightConnector1">
             <a:avLst/>
@@ -20131,14 +20246,14 @@
       </p:cxnSp>
       <p:sp>
         <p:nvSpPr>
-          <p:cNvPr id="303" name="Diamond 17"/>
+          <p:cNvPr id="305" name="Diamond 17"/>
           <p:cNvSpPr/>
           <p:nvPr/>
         </p:nvSpPr>
         <p:spPr>
           <a:xfrm>
             <a:off x="128520" y="6134040"/>
-            <a:ext cx="1566000" cy="381960"/>
+            <a:ext cx="1565640" cy="381600"/>
           </a:xfrm>
           <a:prstGeom prst="diamond">
             <a:avLst/>
@@ -20196,14 +20311,14 @@
       </p:sp>
       <p:sp>
         <p:nvSpPr>
-          <p:cNvPr id="304" name="Oval 4"/>
+          <p:cNvPr id="306" name="Oval 4"/>
           <p:cNvSpPr/>
           <p:nvPr/>
         </p:nvSpPr>
         <p:spPr>
           <a:xfrm>
             <a:off x="302760" y="5454000"/>
-            <a:ext cx="1217520" cy="381960"/>
+            <a:ext cx="1217160" cy="381600"/>
           </a:xfrm>
           <a:prstGeom prst="ellipse">
             <a:avLst/>
@@ -20259,14 +20374,14 @@
       </p:sp>
       <p:sp>
         <p:nvSpPr>
-          <p:cNvPr id="305" name="TextBox 53"/>
+          <p:cNvPr id="307" name="TextBox 53"/>
           <p:cNvSpPr/>
           <p:nvPr/>
         </p:nvSpPr>
         <p:spPr>
           <a:xfrm>
             <a:off x="101160" y="336240"/>
-            <a:ext cx="1620720" cy="303120"/>
+            <a:ext cx="1620360" cy="303120"/>
           </a:xfrm>
           <a:prstGeom prst="rect">
             <a:avLst/>
@@ -20316,14 +20431,14 @@
       </p:sp>
       <p:sp>
         <p:nvSpPr>
-          <p:cNvPr id="306" name="TextBox 54"/>
+          <p:cNvPr id="308" name="TextBox 54"/>
           <p:cNvSpPr/>
           <p:nvPr/>
         </p:nvSpPr>
         <p:spPr>
           <a:xfrm>
             <a:off x="101160" y="597600"/>
-            <a:ext cx="1620720" cy="516600"/>
+            <a:ext cx="1620360" cy="516600"/>
           </a:xfrm>
           <a:prstGeom prst="rect">
             <a:avLst/>
@@ -20406,14 +20521,14 @@
       </p:sp>
       <p:sp>
         <p:nvSpPr>
-          <p:cNvPr id="307" name="TextBox 72"/>
+          <p:cNvPr id="309" name="TextBox 72"/>
           <p:cNvSpPr/>
           <p:nvPr/>
         </p:nvSpPr>
         <p:spPr>
           <a:xfrm>
             <a:off x="8458200" y="5486400"/>
-            <a:ext cx="1620720" cy="303120"/>
+            <a:ext cx="1620360" cy="303120"/>
           </a:xfrm>
           <a:prstGeom prst="rect">
             <a:avLst/>
@@ -20463,14 +20578,14 @@
       </p:sp>
       <p:sp>
         <p:nvSpPr>
-          <p:cNvPr id="308" name="Diamond 18"/>
+          <p:cNvPr id="310" name="Diamond 18"/>
           <p:cNvSpPr/>
           <p:nvPr/>
         </p:nvSpPr>
         <p:spPr>
           <a:xfrm>
             <a:off x="128520" y="4629600"/>
-            <a:ext cx="1566000" cy="526680"/>
+            <a:ext cx="1565640" cy="526320"/>
           </a:xfrm>
           <a:prstGeom prst="diamond">
             <a:avLst/>
@@ -20551,14 +20666,14 @@
       </p:sp>
       <p:cxnSp>
         <p:nvCxnSpPr>
-          <p:cNvPr id="309" name="Straight Arrow Connector 48"/>
+          <p:cNvPr id="311" name="Straight Arrow Connector 48"/>
           <p:cNvCxnSpPr/>
           <p:nvPr/>
         </p:nvCxnSpPr>
         <p:spPr>
           <a:xfrm>
             <a:off x="0" y="3365640"/>
-            <a:ext cx="1834560" cy="5760"/>
+            <a:ext cx="1834920" cy="6120"/>
           </a:xfrm>
           <a:prstGeom prst="straightConnector1">
             <a:avLst/>
@@ -20573,14 +20688,14 @@
       </p:cxnSp>
       <p:sp>
         <p:nvSpPr>
-          <p:cNvPr id="310" name="Isosceles Triangle 5"/>
+          <p:cNvPr id="312" name="Isosceles Triangle 5"/>
           <p:cNvSpPr/>
           <p:nvPr/>
         </p:nvSpPr>
         <p:spPr>
           <a:xfrm>
             <a:off x="673200" y="3949920"/>
-            <a:ext cx="477000" cy="381960"/>
+            <a:ext cx="476640" cy="381600"/>
           </a:xfrm>
           <a:prstGeom prst="triangle">
             <a:avLst>
@@ -20640,28 +20755,28 @@
       </p:sp>
       <p:grpSp>
         <p:nvGrpSpPr>
-          <p:cNvPr id="311" name="Group 15"/>
+          <p:cNvPr id="313" name="Group 15"/>
           <p:cNvGrpSpPr/>
           <p:nvPr/>
         </p:nvGrpSpPr>
         <p:grpSpPr>
           <a:xfrm>
             <a:off x="101160" y="1413000"/>
-            <a:ext cx="1620720" cy="777960"/>
+            <a:ext cx="1620360" cy="777960"/>
             <a:chOff x="101160" y="1413000"/>
-            <a:chExt cx="1620720" cy="777960"/>
+            <a:chExt cx="1620360" cy="777960"/>
           </a:xfrm>
         </p:grpSpPr>
         <p:sp>
           <p:nvSpPr>
-            <p:cNvPr id="312" name="TextBox 57"/>
+            <p:cNvPr id="314" name="TextBox 57"/>
             <p:cNvSpPr/>
             <p:nvPr/>
           </p:nvSpPr>
           <p:spPr>
             <a:xfrm>
               <a:off x="101160" y="1413000"/>
-              <a:ext cx="1620720" cy="303120"/>
+              <a:ext cx="1620360" cy="303120"/>
             </a:xfrm>
             <a:prstGeom prst="rect">
               <a:avLst/>
@@ -20712,14 +20827,14 @@
         </p:sp>
         <p:sp>
           <p:nvSpPr>
-            <p:cNvPr id="313" name="TextBox 58"/>
+            <p:cNvPr id="315" name="TextBox 58"/>
             <p:cNvSpPr/>
             <p:nvPr/>
           </p:nvSpPr>
           <p:spPr>
             <a:xfrm>
               <a:off x="101160" y="1674360"/>
-              <a:ext cx="1620720" cy="516600"/>
+              <a:ext cx="1620360" cy="516600"/>
             </a:xfrm>
             <a:prstGeom prst="rect">
               <a:avLst/>
@@ -20804,14 +20919,14 @@
       </p:grpSp>
       <p:sp>
         <p:nvSpPr>
-          <p:cNvPr id="314" name="TextBox 62"/>
+          <p:cNvPr id="316" name="TextBox 62"/>
           <p:cNvSpPr/>
           <p:nvPr/>
         </p:nvSpPr>
         <p:spPr>
           <a:xfrm>
             <a:off x="5463360" y="2131920"/>
-            <a:ext cx="1620720" cy="303120"/>
+            <a:ext cx="1620360" cy="303120"/>
           </a:xfrm>
           <a:prstGeom prst="rect">
             <a:avLst/>
@@ -20867,14 +20982,14 @@
       </p:sp>
       <p:sp>
         <p:nvSpPr>
-          <p:cNvPr id="315" name="TextBox 65"/>
+          <p:cNvPr id="317" name="TextBox 65"/>
           <p:cNvSpPr/>
           <p:nvPr/>
         </p:nvSpPr>
         <p:spPr>
           <a:xfrm>
             <a:off x="5463360" y="1828800"/>
-            <a:ext cx="1620720" cy="303120"/>
+            <a:ext cx="1620360" cy="303120"/>
           </a:xfrm>
           <a:prstGeom prst="rect">
             <a:avLst/>
@@ -20924,28 +21039,28 @@
       </p:sp>
       <p:grpSp>
         <p:nvGrpSpPr>
-          <p:cNvPr id="316" name="Group 17"/>
+          <p:cNvPr id="318" name="Group 17"/>
           <p:cNvGrpSpPr/>
           <p:nvPr/>
         </p:nvGrpSpPr>
         <p:grpSpPr>
           <a:xfrm>
             <a:off x="4296600" y="4022640"/>
-            <a:ext cx="1620720" cy="777960"/>
+            <a:ext cx="1620360" cy="777960"/>
             <a:chOff x="4296600" y="4022640"/>
-            <a:chExt cx="1620720" cy="777960"/>
+            <a:chExt cx="1620360" cy="777960"/>
           </a:xfrm>
         </p:grpSpPr>
         <p:sp>
           <p:nvSpPr>
-            <p:cNvPr id="317" name="TextBox 61"/>
+            <p:cNvPr id="319" name="TextBox 61"/>
             <p:cNvSpPr/>
             <p:nvPr/>
           </p:nvSpPr>
           <p:spPr>
             <a:xfrm>
               <a:off x="4296600" y="4022640"/>
-              <a:ext cx="1620720" cy="303120"/>
+              <a:ext cx="1620360" cy="303120"/>
             </a:xfrm>
             <a:prstGeom prst="rect">
               <a:avLst/>
@@ -20995,14 +21110,14 @@
         </p:sp>
         <p:sp>
           <p:nvSpPr>
-            <p:cNvPr id="318" name="TextBox 63"/>
+            <p:cNvPr id="320" name="TextBox 63"/>
             <p:cNvSpPr/>
             <p:nvPr/>
           </p:nvSpPr>
           <p:spPr>
             <a:xfrm>
               <a:off x="4296600" y="4284000"/>
-              <a:ext cx="1620720" cy="516600"/>
+              <a:ext cx="1620360" cy="516600"/>
             </a:xfrm>
             <a:prstGeom prst="rect">
               <a:avLst/>
@@ -21086,28 +21201,28 @@
       </p:grpSp>
       <p:grpSp>
         <p:nvGrpSpPr>
-          <p:cNvPr id="319" name="Group 18"/>
+          <p:cNvPr id="321" name="Group 18"/>
           <p:cNvGrpSpPr/>
           <p:nvPr/>
         </p:nvGrpSpPr>
         <p:grpSpPr>
           <a:xfrm>
             <a:off x="9348840" y="2254320"/>
-            <a:ext cx="1620720" cy="1631880"/>
+            <a:ext cx="1620360" cy="1631880"/>
             <a:chOff x="9348840" y="2254320"/>
-            <a:chExt cx="1620720" cy="1631880"/>
+            <a:chExt cx="1620360" cy="1631880"/>
           </a:xfrm>
         </p:grpSpPr>
         <p:sp>
           <p:nvSpPr>
-            <p:cNvPr id="320" name="TextBox 64"/>
+            <p:cNvPr id="322" name="TextBox 64"/>
             <p:cNvSpPr/>
             <p:nvPr/>
           </p:nvSpPr>
           <p:spPr>
             <a:xfrm>
               <a:off x="9348840" y="2254320"/>
-              <a:ext cx="1620720" cy="303120"/>
+              <a:ext cx="1620360" cy="303120"/>
             </a:xfrm>
             <a:prstGeom prst="rect">
               <a:avLst/>
@@ -21157,14 +21272,14 @@
         </p:sp>
         <p:sp>
           <p:nvSpPr>
-            <p:cNvPr id="321" name="TextBox 66"/>
+            <p:cNvPr id="323" name="TextBox 66"/>
             <p:cNvSpPr/>
             <p:nvPr/>
           </p:nvSpPr>
           <p:spPr>
             <a:xfrm>
               <a:off x="9348840" y="2515680"/>
-              <a:ext cx="1620720" cy="1370520"/>
+              <a:ext cx="1620360" cy="1370520"/>
             </a:xfrm>
             <a:prstGeom prst="rect">
               <a:avLst/>
@@ -21356,14 +21471,14 @@
       </p:grpSp>
       <p:sp>
         <p:nvSpPr>
-          <p:cNvPr id="322" name="Diamond 19"/>
+          <p:cNvPr id="324" name="Diamond 19"/>
           <p:cNvSpPr/>
           <p:nvPr/>
         </p:nvSpPr>
         <p:spPr>
           <a:xfrm>
             <a:off x="9402120" y="4572000"/>
-            <a:ext cx="1566000" cy="381960"/>
+            <a:ext cx="1565640" cy="381600"/>
           </a:xfrm>
           <a:prstGeom prst="diamond">
             <a:avLst/>
@@ -21421,14 +21536,14 @@
       </p:sp>
       <p:sp>
         <p:nvSpPr>
-          <p:cNvPr id="323" name="Oval 5"/>
+          <p:cNvPr id="325" name="Oval 5"/>
           <p:cNvSpPr/>
           <p:nvPr/>
         </p:nvSpPr>
         <p:spPr>
           <a:xfrm>
             <a:off x="7007400" y="4572000"/>
-            <a:ext cx="1674720" cy="381960"/>
+            <a:ext cx="1674360" cy="381600"/>
           </a:xfrm>
           <a:prstGeom prst="ellipse">
             <a:avLst/>
@@ -21484,28 +21599,28 @@
       </p:sp>
       <p:grpSp>
         <p:nvGrpSpPr>
-          <p:cNvPr id="324" name="Group 19"/>
+          <p:cNvPr id="326" name="Group 19"/>
           <p:cNvGrpSpPr/>
           <p:nvPr/>
         </p:nvGrpSpPr>
         <p:grpSpPr>
           <a:xfrm>
             <a:off x="9348840" y="2254320"/>
-            <a:ext cx="1620720" cy="1631880"/>
+            <a:ext cx="1620360" cy="1631880"/>
             <a:chOff x="9348840" y="2254320"/>
-            <a:chExt cx="1620720" cy="1631880"/>
+            <a:chExt cx="1620360" cy="1631880"/>
           </a:xfrm>
         </p:grpSpPr>
         <p:sp>
           <p:nvSpPr>
-            <p:cNvPr id="325" name="TextBox 67"/>
+            <p:cNvPr id="327" name="TextBox 67"/>
             <p:cNvSpPr/>
             <p:nvPr/>
           </p:nvSpPr>
           <p:spPr>
             <a:xfrm>
               <a:off x="9348840" y="2254320"/>
-              <a:ext cx="1620720" cy="303120"/>
+              <a:ext cx="1620360" cy="303120"/>
             </a:xfrm>
             <a:prstGeom prst="rect">
               <a:avLst/>
@@ -21555,14 +21670,14 @@
         </p:sp>
         <p:sp>
           <p:nvSpPr>
-            <p:cNvPr id="326" name="TextBox 68"/>
+            <p:cNvPr id="328" name="TextBox 68"/>
             <p:cNvSpPr/>
             <p:nvPr/>
           </p:nvSpPr>
           <p:spPr>
             <a:xfrm>
               <a:off x="9348840" y="2515680"/>
-              <a:ext cx="1620720" cy="1370520"/>
+              <a:ext cx="1620360" cy="1370520"/>
             </a:xfrm>
             <a:prstGeom prst="rect">
               <a:avLst/>
@@ -21754,28 +21869,28 @@
       </p:grpSp>
       <p:grpSp>
         <p:nvGrpSpPr>
-          <p:cNvPr id="327" name="Group 20"/>
+          <p:cNvPr id="329" name="Group 20"/>
           <p:cNvGrpSpPr/>
           <p:nvPr/>
         </p:nvGrpSpPr>
         <p:grpSpPr>
           <a:xfrm>
             <a:off x="9348840" y="2254320"/>
-            <a:ext cx="1620720" cy="1845360"/>
+            <a:ext cx="1620360" cy="1845360"/>
             <a:chOff x="9348840" y="2254320"/>
-            <a:chExt cx="1620720" cy="1845360"/>
+            <a:chExt cx="1620360" cy="1845360"/>
           </a:xfrm>
         </p:grpSpPr>
         <p:sp>
           <p:nvSpPr>
-            <p:cNvPr id="328" name="TextBox 69"/>
+            <p:cNvPr id="330" name="TextBox 69"/>
             <p:cNvSpPr/>
             <p:nvPr/>
           </p:nvSpPr>
           <p:spPr>
             <a:xfrm>
               <a:off x="9348840" y="2254320"/>
-              <a:ext cx="1620720" cy="303120"/>
+              <a:ext cx="1620360" cy="303120"/>
             </a:xfrm>
             <a:prstGeom prst="rect">
               <a:avLst/>
@@ -21825,14 +21940,14 @@
         </p:sp>
         <p:sp>
           <p:nvSpPr>
-            <p:cNvPr id="329" name="TextBox 70"/>
+            <p:cNvPr id="331" name="TextBox 70"/>
             <p:cNvSpPr/>
             <p:nvPr/>
           </p:nvSpPr>
           <p:spPr>
             <a:xfrm>
               <a:off x="9348840" y="2515680"/>
-              <a:ext cx="1620720" cy="1584000"/>
+              <a:ext cx="1620360" cy="1584000"/>
             </a:xfrm>
             <a:prstGeom prst="rect">
               <a:avLst/>
@@ -22051,14 +22166,14 @@
       </p:grpSp>
       <p:sp>
         <p:nvSpPr>
-          <p:cNvPr id="330" name="Diamond 25"/>
+          <p:cNvPr id="332" name="Diamond 25"/>
           <p:cNvSpPr/>
           <p:nvPr/>
         </p:nvSpPr>
         <p:spPr>
           <a:xfrm>
             <a:off x="7086600" y="3501720"/>
-            <a:ext cx="1824120" cy="381960"/>
+            <a:ext cx="1823760" cy="381600"/>
           </a:xfrm>
           <a:prstGeom prst="diamond">
             <a:avLst/>
@@ -22116,14 +22231,14 @@
       </p:sp>
       <p:sp>
         <p:nvSpPr>
-          <p:cNvPr id="331" name="Diamond 16"/>
+          <p:cNvPr id="333" name="Diamond 16"/>
           <p:cNvSpPr/>
           <p:nvPr/>
         </p:nvSpPr>
         <p:spPr>
           <a:xfrm>
             <a:off x="7543800" y="1869840"/>
-            <a:ext cx="1794600" cy="381960"/>
+            <a:ext cx="1794240" cy="381600"/>
           </a:xfrm>
           <a:prstGeom prst="diamond">
             <a:avLst/>
@@ -22181,17 +22296,17 @@
       </p:sp>
       <p:cxnSp>
         <p:nvCxnSpPr>
-          <p:cNvPr id="332" name="Straight Arrow Connector 65"/>
+          <p:cNvPr id="334" name="Straight Arrow Connector 65"/>
           <p:cNvCxnSpPr>
-            <a:stCxn id="314" idx="3"/>
-            <a:endCxn id="331" idx="1"/>
+            <a:stCxn id="316" idx="3"/>
+            <a:endCxn id="333" idx="1"/>
           </p:cNvCxnSpPr>
           <p:nvPr/>
         </p:nvCxnSpPr>
         <p:spPr>
           <a:xfrm flipV="1">
-            <a:off x="7084080" y="2061000"/>
-            <a:ext cx="460080" cy="222840"/>
+            <a:off x="7083720" y="2060640"/>
+            <a:ext cx="460440" cy="223200"/>
           </a:xfrm>
           <a:prstGeom prst="straightConnector1">
             <a:avLst/>
@@ -22207,17 +22322,17 @@
       </p:cxnSp>
       <p:cxnSp>
         <p:nvCxnSpPr>
-          <p:cNvPr id="333" name="Straight Arrow Connector 40"/>
+          <p:cNvPr id="335" name="Straight Arrow Connector 40"/>
           <p:cNvCxnSpPr>
-            <a:stCxn id="322" idx="2"/>
-            <a:endCxn id="307" idx="0"/>
+            <a:stCxn id="324" idx="2"/>
+            <a:endCxn id="309" idx="0"/>
           </p:cNvCxnSpPr>
           <p:nvPr/>
         </p:nvCxnSpPr>
         <p:spPr>
           <a:xfrm flipH="1">
-            <a:off x="9268560" y="4953960"/>
-            <a:ext cx="916920" cy="532800"/>
+            <a:off x="9268200" y="4953600"/>
+            <a:ext cx="917280" cy="533160"/>
           </a:xfrm>
           <a:prstGeom prst="straightConnector1">
             <a:avLst/>
@@ -22232,17 +22347,17 @@
       </p:cxnSp>
       <p:cxnSp>
         <p:nvCxnSpPr>
-          <p:cNvPr id="334" name="Straight Arrow Connector 41"/>
+          <p:cNvPr id="336" name="Straight Arrow Connector 41"/>
           <p:cNvCxnSpPr>
-            <a:stCxn id="327" idx="2"/>
-            <a:endCxn id="322" idx="0"/>
+            <a:stCxn id="329" idx="2"/>
+            <a:endCxn id="324" idx="0"/>
           </p:cNvCxnSpPr>
           <p:nvPr/>
         </p:nvCxnSpPr>
         <p:spPr>
           <a:xfrm>
-            <a:off x="10159200" y="4099680"/>
-            <a:ext cx="26280" cy="472680"/>
+            <a:off x="10158840" y="4099680"/>
+            <a:ext cx="26640" cy="472680"/>
           </a:xfrm>
           <a:prstGeom prst="straightConnector1">
             <a:avLst/>
@@ -22257,17 +22372,17 @@
       </p:cxnSp>
       <p:cxnSp>
         <p:nvCxnSpPr>
-          <p:cNvPr id="335" name="Straight Arrow Connector 42"/>
+          <p:cNvPr id="337" name="Straight Arrow Connector 42"/>
           <p:cNvCxnSpPr>
-            <a:stCxn id="322" idx="1"/>
-            <a:endCxn id="323" idx="6"/>
+            <a:stCxn id="324" idx="1"/>
+            <a:endCxn id="325" idx="6"/>
           </p:cNvCxnSpPr>
           <p:nvPr/>
         </p:nvCxnSpPr>
         <p:spPr>
           <a:xfrm flipH="1">
-            <a:off x="8682120" y="4763160"/>
-            <a:ext cx="720360" cy="360"/>
+            <a:off x="8681760" y="4762800"/>
+            <a:ext cx="720720" cy="360"/>
           </a:xfrm>
           <a:prstGeom prst="straightConnector1">
             <a:avLst/>
@@ -22282,14 +22397,14 @@
       </p:cxnSp>
       <p:sp>
         <p:nvSpPr>
-          <p:cNvPr id="336" name="Oval 7"/>
+          <p:cNvPr id="338" name="Oval 7"/>
           <p:cNvSpPr/>
           <p:nvPr/>
         </p:nvSpPr>
         <p:spPr>
           <a:xfrm>
             <a:off x="6629400" y="5099760"/>
-            <a:ext cx="1595520" cy="381960"/>
+            <a:ext cx="1595160" cy="381600"/>
           </a:xfrm>
           <a:prstGeom prst="ellipse">
             <a:avLst/>
@@ -22345,17 +22460,17 @@
       </p:sp>
       <p:cxnSp>
         <p:nvCxnSpPr>
-          <p:cNvPr id="337" name="Straight Arrow Connector 66"/>
+          <p:cNvPr id="339" name="Straight Arrow Connector 66"/>
           <p:cNvCxnSpPr>
-            <a:stCxn id="322" idx="1"/>
-            <a:endCxn id="336" idx="6"/>
+            <a:stCxn id="324" idx="1"/>
+            <a:endCxn id="338" idx="6"/>
           </p:cNvCxnSpPr>
           <p:nvPr/>
         </p:nvCxnSpPr>
         <p:spPr>
           <a:xfrm flipH="1">
-            <a:off x="8224920" y="4763160"/>
-            <a:ext cx="1177560" cy="528120"/>
+            <a:off x="8224560" y="4762800"/>
+            <a:ext cx="1177920" cy="528120"/>
           </a:xfrm>
           <a:prstGeom prst="straightConnector1">
             <a:avLst/>
@@ -22370,17 +22485,17 @@
       </p:cxnSp>
       <p:cxnSp>
         <p:nvCxnSpPr>
-          <p:cNvPr id="338" name="Straight Arrow Connector 67"/>
+          <p:cNvPr id="340" name="Straight Arrow Connector 67"/>
           <p:cNvCxnSpPr>
-            <a:stCxn id="339" idx="1"/>
-            <a:endCxn id="340" idx="6"/>
+            <a:stCxn id="341" idx="1"/>
+            <a:endCxn id="342" idx="6"/>
           </p:cNvCxnSpPr>
           <p:nvPr/>
         </p:nvCxnSpPr>
         <p:spPr>
           <a:xfrm flipH="1">
-            <a:off x="3629880" y="2549160"/>
-            <a:ext cx="5040" cy="457560"/>
+            <a:off x="3629520" y="2548800"/>
+            <a:ext cx="5400" cy="457560"/>
           </a:xfrm>
           <a:prstGeom prst="straightConnector1">
             <a:avLst/>
@@ -22395,14 +22510,14 @@
       </p:cxnSp>
       <p:sp>
         <p:nvSpPr>
-          <p:cNvPr id="341" name="Diamond 26"/>
+          <p:cNvPr id="343" name="Diamond 26"/>
           <p:cNvSpPr/>
           <p:nvPr/>
         </p:nvSpPr>
         <p:spPr>
           <a:xfrm>
             <a:off x="5234760" y="2815200"/>
-            <a:ext cx="1566000" cy="381960"/>
+            <a:ext cx="1565640" cy="381600"/>
           </a:xfrm>
           <a:prstGeom prst="diamond">
             <a:avLst/>
@@ -22460,14 +22575,14 @@
       </p:sp>
       <p:sp>
         <p:nvSpPr>
-          <p:cNvPr id="339" name="Diamond 27"/>
+          <p:cNvPr id="341" name="Diamond 27"/>
           <p:cNvSpPr/>
           <p:nvPr/>
         </p:nvSpPr>
         <p:spPr>
           <a:xfrm>
             <a:off x="3634560" y="2358000"/>
-            <a:ext cx="1566000" cy="381960"/>
+            <a:ext cx="1565640" cy="381600"/>
           </a:xfrm>
           <a:prstGeom prst="diamond">
             <a:avLst/>
@@ -22525,14 +22640,14 @@
       </p:sp>
       <p:sp>
         <p:nvSpPr>
-          <p:cNvPr id="340" name="Oval 8"/>
+          <p:cNvPr id="342" name="Oval 8"/>
           <p:cNvSpPr/>
           <p:nvPr/>
         </p:nvSpPr>
         <p:spPr>
           <a:xfrm>
             <a:off x="2034360" y="2815200"/>
-            <a:ext cx="1595520" cy="381960"/>
+            <a:ext cx="1595160" cy="381600"/>
           </a:xfrm>
           <a:prstGeom prst="ellipse">
             <a:avLst/>
@@ -22588,17 +22703,17 @@
       </p:sp>
       <p:cxnSp>
         <p:nvCxnSpPr>
-          <p:cNvPr id="342" name="Straight Arrow Connector 68"/>
+          <p:cNvPr id="344" name="Straight Arrow Connector 68"/>
           <p:cNvCxnSpPr>
-            <a:stCxn id="316" idx="0"/>
-            <a:endCxn id="339" idx="2"/>
+            <a:stCxn id="318" idx="0"/>
+            <a:endCxn id="341" idx="2"/>
           </p:cNvCxnSpPr>
           <p:nvPr/>
         </p:nvCxnSpPr>
         <p:spPr>
           <a:xfrm flipH="1" flipV="1">
-            <a:off x="4417560" y="2739960"/>
-            <a:ext cx="689760" cy="1283040"/>
+            <a:off x="4417560" y="2739600"/>
+            <a:ext cx="689400" cy="1283400"/>
           </a:xfrm>
           <a:prstGeom prst="straightConnector1">
             <a:avLst/>
@@ -22614,10 +22729,10 @@
       </p:cxnSp>
       <p:cxnSp>
         <p:nvCxnSpPr>
-          <p:cNvPr id="343" name="Straight Arrow Connector 69"/>
+          <p:cNvPr id="345" name="Straight Arrow Connector 69"/>
           <p:cNvCxnSpPr>
-            <a:stCxn id="315" idx="1"/>
-            <a:endCxn id="339" idx="0"/>
+            <a:stCxn id="317" idx="1"/>
+            <a:endCxn id="341" idx="0"/>
           </p:cNvCxnSpPr>
           <p:nvPr/>
         </p:nvCxnSpPr>
@@ -22639,17 +22754,17 @@
       </p:cxnSp>
       <p:cxnSp>
         <p:nvCxnSpPr>
-          <p:cNvPr id="344" name="Straight Arrow Connector 70"/>
+          <p:cNvPr id="346" name="Straight Arrow Connector 70"/>
           <p:cNvCxnSpPr>
-            <a:stCxn id="316" idx="0"/>
-            <a:endCxn id="341" idx="2"/>
+            <a:stCxn id="318" idx="0"/>
+            <a:endCxn id="343" idx="2"/>
           </p:cNvCxnSpPr>
           <p:nvPr/>
         </p:nvCxnSpPr>
         <p:spPr>
           <a:xfrm flipV="1">
-            <a:off x="5106960" y="3197160"/>
-            <a:ext cx="911160" cy="825840"/>
+            <a:off x="5106600" y="3196800"/>
+            <a:ext cx="911520" cy="826200"/>
           </a:xfrm>
           <a:prstGeom prst="straightConnector1">
             <a:avLst/>
@@ -22665,17 +22780,17 @@
       </p:cxnSp>
       <p:cxnSp>
         <p:nvCxnSpPr>
-          <p:cNvPr id="345" name="Straight Arrow Connector 71"/>
+          <p:cNvPr id="347" name="Straight Arrow Connector 71"/>
           <p:cNvCxnSpPr>
-            <a:stCxn id="341" idx="0"/>
-            <a:endCxn id="314" idx="2"/>
+            <a:stCxn id="343" idx="0"/>
+            <a:endCxn id="316" idx="2"/>
           </p:cNvCxnSpPr>
           <p:nvPr/>
         </p:nvCxnSpPr>
         <p:spPr>
           <a:xfrm flipV="1">
             <a:off x="6017760" y="2435040"/>
-            <a:ext cx="256320" cy="380520"/>
+            <a:ext cx="255960" cy="380520"/>
           </a:xfrm>
           <a:prstGeom prst="straightConnector1">
             <a:avLst/>
@@ -22690,17 +22805,17 @@
       </p:cxnSp>
       <p:cxnSp>
         <p:nvCxnSpPr>
-          <p:cNvPr id="346" name="Straight Arrow Connector 64"/>
+          <p:cNvPr id="348" name="Straight Arrow Connector 64"/>
           <p:cNvCxnSpPr>
-            <a:stCxn id="316" idx="3"/>
-            <a:endCxn id="330" idx="1"/>
+            <a:stCxn id="318" idx="3"/>
+            <a:endCxn id="332" idx="1"/>
           </p:cNvCxnSpPr>
           <p:nvPr/>
         </p:nvCxnSpPr>
         <p:spPr>
           <a:xfrm flipV="1">
-            <a:off x="5917320" y="3692880"/>
-            <a:ext cx="1169640" cy="718920"/>
+            <a:off x="5916960" y="3692520"/>
+            <a:ext cx="1170000" cy="719280"/>
           </a:xfrm>
           <a:prstGeom prst="straightConnector1">
             <a:avLst/>
@@ -22716,17 +22831,17 @@
       </p:cxnSp>
       <p:cxnSp>
         <p:nvCxnSpPr>
-          <p:cNvPr id="347" name="Straight Arrow Connector 63"/>
+          <p:cNvPr id="349" name="Straight Arrow Connector 63"/>
           <p:cNvCxnSpPr>
-            <a:stCxn id="327" idx="1"/>
-            <a:endCxn id="330" idx="3"/>
+            <a:stCxn id="329" idx="1"/>
+            <a:endCxn id="332" idx="3"/>
           </p:cNvCxnSpPr>
           <p:nvPr/>
         </p:nvCxnSpPr>
         <p:spPr>
           <a:xfrm flipH="1">
-            <a:off x="8910720" y="3177000"/>
-            <a:ext cx="438480" cy="516240"/>
+            <a:off x="8910360" y="3177000"/>
+            <a:ext cx="438840" cy="515880"/>
           </a:xfrm>
           <a:prstGeom prst="straightConnector1">
             <a:avLst/>
@@ -22741,17 +22856,17 @@
       </p:cxnSp>
       <p:cxnSp>
         <p:nvCxnSpPr>
-          <p:cNvPr id="348" name="Straight Arrow Connector 39"/>
+          <p:cNvPr id="350" name="Straight Arrow Connector 39"/>
           <p:cNvCxnSpPr>
-            <a:stCxn id="327" idx="0"/>
-            <a:endCxn id="331" idx="3"/>
+            <a:stCxn id="329" idx="0"/>
+            <a:endCxn id="333" idx="3"/>
           </p:cNvCxnSpPr>
           <p:nvPr/>
         </p:nvCxnSpPr>
         <p:spPr>
           <a:xfrm flipH="1" flipV="1">
-            <a:off x="9338400" y="2061000"/>
-            <a:ext cx="821160" cy="193680"/>
+            <a:off x="9338040" y="2060640"/>
+            <a:ext cx="821160" cy="194040"/>
           </a:xfrm>
           <a:prstGeom prst="straightConnector1">
             <a:avLst/>
@@ -22766,14 +22881,14 @@
       </p:cxnSp>
       <p:sp>
         <p:nvSpPr>
-          <p:cNvPr id="349" name="Diamond 29"/>
+          <p:cNvPr id="351" name="Diamond 29"/>
           <p:cNvSpPr/>
           <p:nvPr/>
         </p:nvSpPr>
         <p:spPr>
           <a:xfrm>
             <a:off x="2722320" y="5330520"/>
-            <a:ext cx="1824120" cy="381960"/>
+            <a:ext cx="1823760" cy="381600"/>
           </a:xfrm>
           <a:prstGeom prst="diamond">
             <a:avLst/>
@@ -22831,17 +22946,17 @@
       </p:sp>
       <p:cxnSp>
         <p:nvCxnSpPr>
-          <p:cNvPr id="350" name="Straight Arrow Connector 72"/>
+          <p:cNvPr id="352" name="Straight Arrow Connector 72"/>
           <p:cNvCxnSpPr>
-            <a:stCxn id="316" idx="1"/>
-            <a:endCxn id="349" idx="0"/>
+            <a:stCxn id="318" idx="1"/>
+            <a:endCxn id="351" idx="0"/>
           </p:cNvCxnSpPr>
           <p:nvPr/>
         </p:nvCxnSpPr>
         <p:spPr>
           <a:xfrm flipH="1">
-            <a:off x="3634560" y="4411440"/>
-            <a:ext cx="662400" cy="919440"/>
+            <a:off x="3634200" y="4411440"/>
+            <a:ext cx="662760" cy="919440"/>
           </a:xfrm>
           <a:prstGeom prst="straightConnector1">
             <a:avLst/>
@@ -22856,17 +22971,17 @@
       </p:cxnSp>
       <p:cxnSp>
         <p:nvCxnSpPr>
-          <p:cNvPr id="351" name="Straight Arrow Connector 73"/>
+          <p:cNvPr id="353" name="Straight Arrow Connector 73"/>
           <p:cNvCxnSpPr>
-            <a:stCxn id="316" idx="2"/>
-            <a:endCxn id="349" idx="3"/>
+            <a:stCxn id="318" idx="2"/>
+            <a:endCxn id="351" idx="3"/>
           </p:cNvCxnSpPr>
           <p:nvPr/>
         </p:nvCxnSpPr>
         <p:spPr>
           <a:xfrm flipH="1">
-            <a:off x="4546440" y="4800600"/>
-            <a:ext cx="560880" cy="721440"/>
+            <a:off x="4546080" y="4800600"/>
+            <a:ext cx="560880" cy="721080"/>
           </a:xfrm>
           <a:prstGeom prst="straightConnector1">
             <a:avLst/>
@@ -22881,14 +22996,14 @@
       </p:cxnSp>
       <p:sp>
         <p:nvSpPr>
-          <p:cNvPr id="352" name="Oval 9"/>
+          <p:cNvPr id="354" name="Oval 9"/>
           <p:cNvSpPr/>
           <p:nvPr/>
         </p:nvSpPr>
         <p:spPr>
           <a:xfrm>
             <a:off x="7315200" y="4114800"/>
-            <a:ext cx="1674720" cy="381960"/>
+            <a:ext cx="1674360" cy="381600"/>
           </a:xfrm>
           <a:prstGeom prst="ellipse">
             <a:avLst/>
@@ -22944,17 +23059,17 @@
       </p:sp>
       <p:cxnSp>
         <p:nvCxnSpPr>
-          <p:cNvPr id="353" name="Straight Arrow Connector 58"/>
+          <p:cNvPr id="355" name="Straight Arrow Connector 58"/>
           <p:cNvCxnSpPr>
-            <a:stCxn id="322" idx="1"/>
-            <a:endCxn id="352" idx="6"/>
+            <a:stCxn id="324" idx="1"/>
+            <a:endCxn id="354" idx="6"/>
           </p:cNvCxnSpPr>
           <p:nvPr/>
         </p:nvCxnSpPr>
         <p:spPr>
           <a:xfrm flipH="1" flipV="1">
-            <a:off x="8989920" y="4305960"/>
-            <a:ext cx="412560" cy="457560"/>
+            <a:off x="8989560" y="4305600"/>
+            <a:ext cx="412920" cy="457560"/>
           </a:xfrm>
           <a:prstGeom prst="straightConnector1">
             <a:avLst/>
@@ -22999,14 +23114,14 @@
       </p:grpSpPr>
       <p:cxnSp>
         <p:nvCxnSpPr>
-          <p:cNvPr id="354" name="Straight Arrow Connector 6"/>
+          <p:cNvPr id="356" name="Straight Arrow Connector 6"/>
           <p:cNvCxnSpPr/>
           <p:nvPr/>
         </p:nvCxnSpPr>
         <p:spPr>
           <a:xfrm flipH="1">
             <a:off x="0" y="3073320"/>
-            <a:ext cx="1834560" cy="5760"/>
+            <a:ext cx="1834920" cy="6120"/>
           </a:xfrm>
           <a:prstGeom prst="straightConnector1">
             <a:avLst/>
@@ -23022,14 +23137,14 @@
       </p:cxnSp>
       <p:cxnSp>
         <p:nvCxnSpPr>
-          <p:cNvPr id="355" name="Straight Arrow Connector 7"/>
+          <p:cNvPr id="357" name="Straight Arrow Connector 7"/>
           <p:cNvCxnSpPr/>
           <p:nvPr/>
         </p:nvCxnSpPr>
         <p:spPr>
           <a:xfrm>
             <a:off x="0" y="2489400"/>
-            <a:ext cx="1834560" cy="5760"/>
+            <a:ext cx="1834920" cy="6120"/>
           </a:xfrm>
           <a:prstGeom prst="straightConnector1">
             <a:avLst/>
@@ -23045,14 +23160,14 @@
       </p:cxnSp>
       <p:cxnSp>
         <p:nvCxnSpPr>
-          <p:cNvPr id="356" name="Straight Arrow Connector 8"/>
+          <p:cNvPr id="358" name="Straight Arrow Connector 8"/>
           <p:cNvCxnSpPr/>
           <p:nvPr/>
         </p:nvCxnSpPr>
         <p:spPr>
           <a:xfrm>
             <a:off x="0" y="2781360"/>
-            <a:ext cx="1834560" cy="5760"/>
+            <a:ext cx="1834920" cy="6120"/>
           </a:xfrm>
           <a:prstGeom prst="straightConnector1">
             <a:avLst/>
@@ -23068,14 +23183,14 @@
       </p:cxnSp>
       <p:cxnSp>
         <p:nvCxnSpPr>
-          <p:cNvPr id="357" name="Straight Arrow Connector 9"/>
+          <p:cNvPr id="359" name="Straight Arrow Connector 9"/>
           <p:cNvCxnSpPr/>
           <p:nvPr/>
         </p:nvCxnSpPr>
         <p:spPr>
           <a:xfrm flipH="1">
             <a:off x="0" y="3657600"/>
-            <a:ext cx="1834560" cy="5760"/>
+            <a:ext cx="1834920" cy="6120"/>
           </a:xfrm>
           <a:prstGeom prst="straightConnector1">
             <a:avLst/>
@@ -23090,14 +23205,14 @@
       </p:cxnSp>
       <p:sp>
         <p:nvSpPr>
-          <p:cNvPr id="358" name="Diamond 3"/>
+          <p:cNvPr id="360" name="Diamond 3"/>
           <p:cNvSpPr/>
           <p:nvPr/>
         </p:nvSpPr>
         <p:spPr>
           <a:xfrm>
             <a:off x="128520" y="6134040"/>
-            <a:ext cx="1566000" cy="381960"/>
+            <a:ext cx="1565640" cy="381600"/>
           </a:xfrm>
           <a:prstGeom prst="diamond">
             <a:avLst/>
@@ -23155,14 +23270,14 @@
       </p:sp>
       <p:sp>
         <p:nvSpPr>
-          <p:cNvPr id="359" name="Oval 2"/>
+          <p:cNvPr id="361" name="Oval 2"/>
           <p:cNvSpPr/>
           <p:nvPr/>
         </p:nvSpPr>
         <p:spPr>
           <a:xfrm>
             <a:off x="302760" y="5454000"/>
-            <a:ext cx="1217520" cy="381960"/>
+            <a:ext cx="1217160" cy="381600"/>
           </a:xfrm>
           <a:prstGeom prst="ellipse">
             <a:avLst/>
@@ -23218,28 +23333,28 @@
       </p:sp>
       <p:grpSp>
         <p:nvGrpSpPr>
-          <p:cNvPr id="360" name="Group 3"/>
+          <p:cNvPr id="362" name="Group 3"/>
           <p:cNvGrpSpPr/>
           <p:nvPr/>
         </p:nvGrpSpPr>
         <p:grpSpPr>
           <a:xfrm>
             <a:off x="101160" y="336240"/>
-            <a:ext cx="1620720" cy="777960"/>
+            <a:ext cx="1620360" cy="777960"/>
             <a:chOff x="101160" y="336240"/>
-            <a:chExt cx="1620720" cy="777960"/>
+            <a:chExt cx="1620360" cy="777960"/>
           </a:xfrm>
         </p:grpSpPr>
         <p:sp>
           <p:nvSpPr>
-            <p:cNvPr id="361" name="TextBox 5"/>
+            <p:cNvPr id="363" name="TextBox 5"/>
             <p:cNvSpPr/>
             <p:nvPr/>
           </p:nvSpPr>
           <p:spPr>
             <a:xfrm>
               <a:off x="101160" y="336240"/>
-              <a:ext cx="1620720" cy="303120"/>
+              <a:ext cx="1620360" cy="303120"/>
             </a:xfrm>
             <a:prstGeom prst="rect">
               <a:avLst/>
@@ -23289,14 +23404,14 @@
         </p:sp>
         <p:sp>
           <p:nvSpPr>
-            <p:cNvPr id="362" name="TextBox 6"/>
+            <p:cNvPr id="364" name="TextBox 6"/>
             <p:cNvSpPr/>
             <p:nvPr/>
           </p:nvSpPr>
           <p:spPr>
             <a:xfrm>
               <a:off x="101160" y="597600"/>
-              <a:ext cx="1620720" cy="516600"/>
+              <a:ext cx="1620360" cy="516600"/>
             </a:xfrm>
             <a:prstGeom prst="rect">
               <a:avLst/>
@@ -23380,14 +23495,14 @@
       </p:grpSp>
       <p:sp>
         <p:nvSpPr>
-          <p:cNvPr id="363" name="Diamond 4"/>
+          <p:cNvPr id="365" name="Diamond 4"/>
           <p:cNvSpPr/>
           <p:nvPr/>
         </p:nvSpPr>
         <p:spPr>
           <a:xfrm>
             <a:off x="128520" y="4629600"/>
-            <a:ext cx="1566000" cy="526680"/>
+            <a:ext cx="1565640" cy="526320"/>
           </a:xfrm>
           <a:prstGeom prst="diamond">
             <a:avLst/>
@@ -23468,14 +23583,14 @@
       </p:sp>
       <p:cxnSp>
         <p:nvCxnSpPr>
-          <p:cNvPr id="364" name="Straight Arrow Connector 10"/>
+          <p:cNvPr id="366" name="Straight Arrow Connector 10"/>
           <p:cNvCxnSpPr/>
           <p:nvPr/>
         </p:nvCxnSpPr>
         <p:spPr>
           <a:xfrm>
             <a:off x="0" y="3365640"/>
-            <a:ext cx="1834560" cy="5760"/>
+            <a:ext cx="1834920" cy="6120"/>
           </a:xfrm>
           <a:prstGeom prst="straightConnector1">
             <a:avLst/>
@@ -23490,14 +23605,14 @@
       </p:cxnSp>
       <p:sp>
         <p:nvSpPr>
-          <p:cNvPr id="365" name="Isosceles Triangle 2"/>
+          <p:cNvPr id="367" name="Isosceles Triangle 2"/>
           <p:cNvSpPr/>
           <p:nvPr/>
         </p:nvSpPr>
         <p:spPr>
           <a:xfrm>
             <a:off x="673200" y="3949920"/>
-            <a:ext cx="477000" cy="381960"/>
+            <a:ext cx="476640" cy="381600"/>
           </a:xfrm>
           <a:prstGeom prst="triangle">
             <a:avLst>
@@ -23557,28 +23672,28 @@
       </p:sp>
       <p:grpSp>
         <p:nvGrpSpPr>
-          <p:cNvPr id="366" name="Group 4"/>
+          <p:cNvPr id="368" name="Group 4"/>
           <p:cNvGrpSpPr/>
           <p:nvPr/>
         </p:nvGrpSpPr>
         <p:grpSpPr>
           <a:xfrm>
             <a:off x="101160" y="1413000"/>
-            <a:ext cx="1620720" cy="777960"/>
+            <a:ext cx="1620360" cy="777960"/>
             <a:chOff x="101160" y="1413000"/>
-            <a:chExt cx="1620720" cy="777960"/>
+            <a:chExt cx="1620360" cy="777960"/>
           </a:xfrm>
         </p:grpSpPr>
         <p:sp>
           <p:nvSpPr>
-            <p:cNvPr id="367" name="TextBox 7"/>
+            <p:cNvPr id="369" name="TextBox 7"/>
             <p:cNvSpPr/>
             <p:nvPr/>
           </p:nvSpPr>
           <p:spPr>
             <a:xfrm>
               <a:off x="101160" y="1413000"/>
-              <a:ext cx="1620720" cy="303120"/>
+              <a:ext cx="1620360" cy="303120"/>
             </a:xfrm>
             <a:prstGeom prst="rect">
               <a:avLst/>
@@ -23629,14 +23744,14 @@
         </p:sp>
         <p:sp>
           <p:nvSpPr>
-            <p:cNvPr id="368" name="TextBox 8"/>
+            <p:cNvPr id="370" name="TextBox 8"/>
             <p:cNvSpPr/>
             <p:nvPr/>
           </p:nvSpPr>
           <p:spPr>
             <a:xfrm>
               <a:off x="101160" y="1674360"/>
-              <a:ext cx="1620720" cy="516600"/>
+              <a:ext cx="1620360" cy="516600"/>
             </a:xfrm>
             <a:prstGeom prst="rect">
               <a:avLst/>

</xml_diff>

<commit_message>
added support for new way of using functions, made a startup for grid backend API's and made sure the user settlement initialising is complete
</commit_message>
<xml_diff>
--- a/documentation/database/ER-Diagram.pptx
+++ b/documentation/database/ER-Diagram.pptx
@@ -353,7 +353,7 @@
             <a:pPr indent="0" algn="r">
               <a:buNone/>
             </a:pPr>
-            <a:fld id="{746F01FA-A6D4-442E-8D63-703C49455FAC}" type="slidenum">
+            <a:fld id="{E08CE10A-F586-4296-93EE-A276D98B0F8F}" type="slidenum">
               <a:rPr b="0" lang="en-US" sz="1400" spc="-1" strike="noStrike">
                 <a:solidFill>
                   <a:srgbClr val="000000"/>
@@ -396,7 +396,7 @@
       </p:grpSpPr>
       <p:sp>
         <p:nvSpPr>
-          <p:cNvPr id="365" name="PlaceHolder 1"/>
+          <p:cNvPr id="363" name="PlaceHolder 1"/>
           <p:cNvSpPr>
             <a:spLocks noGrp="1"/>
           </p:cNvSpPr>
@@ -407,7 +407,7 @@
         <p:spPr>
           <a:xfrm>
             <a:off x="685800" y="1143000"/>
-            <a:ext cx="5478840" cy="3078720"/>
+            <a:ext cx="5478120" cy="3078000"/>
           </a:xfrm>
           <a:prstGeom prst="rect">
             <a:avLst/>
@@ -419,7 +419,7 @@
       </p:sp>
       <p:sp>
         <p:nvSpPr>
-          <p:cNvPr id="366" name="PlaceHolder 2"/>
+          <p:cNvPr id="364" name="PlaceHolder 2"/>
           <p:cNvSpPr>
             <a:spLocks noGrp="1"/>
           </p:cNvSpPr>
@@ -430,7 +430,7 @@
         <p:spPr>
           <a:xfrm>
             <a:off x="685800" y="4400640"/>
-            <a:ext cx="5478840" cy="3592800"/>
+            <a:ext cx="5478120" cy="3592080"/>
           </a:xfrm>
           <a:prstGeom prst="rect">
             <a:avLst/>
@@ -459,7 +459,7 @@
       </p:sp>
       <p:sp>
         <p:nvSpPr>
-          <p:cNvPr id="367" name="PlaceHolder 3"/>
+          <p:cNvPr id="365" name="PlaceHolder 3"/>
           <p:cNvSpPr>
             <a:spLocks noGrp="1"/>
           </p:cNvSpPr>
@@ -470,7 +470,7 @@
         <p:spPr>
           <a:xfrm>
             <a:off x="3884760" y="8685360"/>
-            <a:ext cx="2964240" cy="451080"/>
+            <a:ext cx="2963520" cy="450360"/>
           </a:xfrm>
           <a:prstGeom prst="rect">
             <a:avLst/>
@@ -512,7 +512,7 @@
                 <a:tab algn="l" pos="0"/>
               </a:tabLst>
             </a:pPr>
-            <a:fld id="{307282AC-CCB5-4C8A-B556-13486A0ABF64}" type="slidenum">
+            <a:fld id="{2FC0BD7A-4534-4A9F-B473-745CF9A6B003}" type="slidenum">
               <a:rPr b="0" lang="en-US" sz="1200" spc="-1" strike="noStrike">
                 <a:solidFill>
                   <a:schemeClr val="dk1"/>
@@ -555,7 +555,7 @@
       </p:grpSpPr>
       <p:sp>
         <p:nvSpPr>
-          <p:cNvPr id="368" name="PlaceHolder 1"/>
+          <p:cNvPr id="366" name="PlaceHolder 1"/>
           <p:cNvSpPr>
             <a:spLocks noGrp="1"/>
           </p:cNvSpPr>
@@ -566,7 +566,7 @@
         <p:spPr>
           <a:xfrm>
             <a:off x="685800" y="1143000"/>
-            <a:ext cx="5478840" cy="3078720"/>
+            <a:ext cx="5478120" cy="3078000"/>
           </a:xfrm>
           <a:prstGeom prst="rect">
             <a:avLst/>
@@ -578,7 +578,7 @@
       </p:sp>
       <p:sp>
         <p:nvSpPr>
-          <p:cNvPr id="369" name="PlaceHolder 2"/>
+          <p:cNvPr id="367" name="PlaceHolder 2"/>
           <p:cNvSpPr>
             <a:spLocks noGrp="1"/>
           </p:cNvSpPr>
@@ -589,7 +589,7 @@
         <p:spPr>
           <a:xfrm>
             <a:off x="685800" y="4400640"/>
-            <a:ext cx="5478840" cy="3592800"/>
+            <a:ext cx="5478120" cy="3592080"/>
           </a:xfrm>
           <a:prstGeom prst="rect">
             <a:avLst/>
@@ -618,7 +618,7 @@
       </p:sp>
       <p:sp>
         <p:nvSpPr>
-          <p:cNvPr id="370" name="PlaceHolder 3"/>
+          <p:cNvPr id="368" name="PlaceHolder 3"/>
           <p:cNvSpPr>
             <a:spLocks noGrp="1"/>
           </p:cNvSpPr>
@@ -629,7 +629,7 @@
         <p:spPr>
           <a:xfrm>
             <a:off x="3884760" y="8685360"/>
-            <a:ext cx="2964240" cy="451080"/>
+            <a:ext cx="2963520" cy="450360"/>
           </a:xfrm>
           <a:prstGeom prst="rect">
             <a:avLst/>
@@ -671,7 +671,7 @@
                 <a:tab algn="l" pos="0"/>
               </a:tabLst>
             </a:pPr>
-            <a:fld id="{BF2DCD6D-731A-46F6-8683-64717A2FCDDE}" type="slidenum">
+            <a:fld id="{69C20BD0-B0DB-491A-A971-8272EFAC3032}" type="slidenum">
               <a:rPr b="0" lang="en-US" sz="1200" spc="-1" strike="noStrike">
                 <a:solidFill>
                   <a:schemeClr val="dk1"/>
@@ -714,7 +714,7 @@
       </p:grpSpPr>
       <p:sp>
         <p:nvSpPr>
-          <p:cNvPr id="371" name="PlaceHolder 1"/>
+          <p:cNvPr id="369" name="PlaceHolder 1"/>
           <p:cNvSpPr>
             <a:spLocks noGrp="1"/>
           </p:cNvSpPr>
@@ -725,7 +725,7 @@
         <p:spPr>
           <a:xfrm>
             <a:off x="685800" y="1143000"/>
-            <a:ext cx="5478840" cy="3078720"/>
+            <a:ext cx="5478120" cy="3078000"/>
           </a:xfrm>
           <a:prstGeom prst="rect">
             <a:avLst/>
@@ -737,7 +737,7 @@
       </p:sp>
       <p:sp>
         <p:nvSpPr>
-          <p:cNvPr id="372" name="PlaceHolder 2"/>
+          <p:cNvPr id="370" name="PlaceHolder 2"/>
           <p:cNvSpPr>
             <a:spLocks noGrp="1"/>
           </p:cNvSpPr>
@@ -748,7 +748,7 @@
         <p:spPr>
           <a:xfrm>
             <a:off x="685800" y="4400640"/>
-            <a:ext cx="5478840" cy="3592800"/>
+            <a:ext cx="5478120" cy="3592080"/>
           </a:xfrm>
           <a:prstGeom prst="rect">
             <a:avLst/>
@@ -777,7 +777,7 @@
       </p:sp>
       <p:sp>
         <p:nvSpPr>
-          <p:cNvPr id="373" name="PlaceHolder 3"/>
+          <p:cNvPr id="371" name="PlaceHolder 3"/>
           <p:cNvSpPr>
             <a:spLocks noGrp="1"/>
           </p:cNvSpPr>
@@ -788,7 +788,7 @@
         <p:spPr>
           <a:xfrm>
             <a:off x="3884760" y="8685360"/>
-            <a:ext cx="2964240" cy="451080"/>
+            <a:ext cx="2963520" cy="450360"/>
           </a:xfrm>
           <a:prstGeom prst="rect">
             <a:avLst/>
@@ -830,7 +830,7 @@
                 <a:tab algn="l" pos="0"/>
               </a:tabLst>
             </a:pPr>
-            <a:fld id="{A5D8D8D2-D2B3-473A-9ACF-8774DCEE0167}" type="slidenum">
+            <a:fld id="{000AD0E2-8672-4536-A756-181079327C60}" type="slidenum">
               <a:rPr b="0" lang="en-US" sz="1200" spc="-1" strike="noStrike">
                 <a:solidFill>
                   <a:schemeClr val="dk1"/>
@@ -873,7 +873,7 @@
       </p:grpSpPr>
       <p:sp>
         <p:nvSpPr>
-          <p:cNvPr id="374" name="PlaceHolder 1"/>
+          <p:cNvPr id="372" name="PlaceHolder 1"/>
           <p:cNvSpPr>
             <a:spLocks noGrp="1"/>
           </p:cNvSpPr>
@@ -884,7 +884,7 @@
         <p:spPr>
           <a:xfrm>
             <a:off x="685800" y="1143000"/>
-            <a:ext cx="5478840" cy="3078720"/>
+            <a:ext cx="5478120" cy="3078000"/>
           </a:xfrm>
           <a:prstGeom prst="rect">
             <a:avLst/>
@@ -896,7 +896,7 @@
       </p:sp>
       <p:sp>
         <p:nvSpPr>
-          <p:cNvPr id="375" name="PlaceHolder 2"/>
+          <p:cNvPr id="373" name="PlaceHolder 2"/>
           <p:cNvSpPr>
             <a:spLocks noGrp="1"/>
           </p:cNvSpPr>
@@ -907,7 +907,7 @@
         <p:spPr>
           <a:xfrm>
             <a:off x="685800" y="4400640"/>
-            <a:ext cx="5478840" cy="3592800"/>
+            <a:ext cx="5478120" cy="3592080"/>
           </a:xfrm>
           <a:prstGeom prst="rect">
             <a:avLst/>
@@ -936,7 +936,7 @@
       </p:sp>
       <p:sp>
         <p:nvSpPr>
-          <p:cNvPr id="376" name="PlaceHolder 3"/>
+          <p:cNvPr id="374" name="PlaceHolder 3"/>
           <p:cNvSpPr>
             <a:spLocks noGrp="1"/>
           </p:cNvSpPr>
@@ -947,7 +947,7 @@
         <p:spPr>
           <a:xfrm>
             <a:off x="3884760" y="8685360"/>
-            <a:ext cx="2964240" cy="451080"/>
+            <a:ext cx="2963520" cy="450360"/>
           </a:xfrm>
           <a:prstGeom prst="rect">
             <a:avLst/>
@@ -989,7 +989,7 @@
                 <a:tab algn="l" pos="0"/>
               </a:tabLst>
             </a:pPr>
-            <a:fld id="{71D8AE64-19DF-4700-B9C3-450A62503919}" type="slidenum">
+            <a:fld id="{8B19AA62-26EA-4234-9A29-7A022B57CBF5}" type="slidenum">
               <a:rPr b="0" lang="en-US" sz="1200" spc="-1" strike="noStrike">
                 <a:solidFill>
                   <a:schemeClr val="dk1"/>
@@ -1233,7 +1233,7 @@
         <p:txBody>
           <a:bodyPr/>
           <a:p>
-            <a:fld id="{8F533918-C1B8-4035-9227-835713DFD4D8}" type="slidenum">
+            <a:fld id="{36EC6FBA-ED42-47B0-811F-8C2694A47B15}" type="slidenum">
               <a:t>&lt;#&gt;</a:t>
             </a:fld>
           </a:p>
@@ -1442,7 +1442,7 @@
         <p:txBody>
           <a:bodyPr/>
           <a:p>
-            <a:fld id="{CD756F0B-E77E-42B6-9E22-E04EEFCE9DF9}" type="slidenum">
+            <a:fld id="{6B666937-31E8-4BA8-A26C-9DB6A9B911AC}" type="slidenum">
               <a:t>&lt;#&gt;</a:t>
             </a:fld>
           </a:p>
@@ -1565,7 +1565,7 @@
         <p:txBody>
           <a:bodyPr/>
           <a:p>
-            <a:fld id="{A03B1FD1-B1C1-440F-B58F-233C65E5D720}" type="slidenum">
+            <a:fld id="{074300D2-A40B-4A3F-AE1D-BF865045115D}" type="slidenum">
               <a:t>&lt;#&gt;</a:t>
             </a:fld>
           </a:p>
@@ -1648,7 +1648,7 @@
         <p:txBody>
           <a:bodyPr/>
           <a:p>
-            <a:fld id="{9A4725A9-9BDD-4707-BA70-879255C2C0F9}" type="slidenum">
+            <a:fld id="{837387EE-7285-423B-B016-D3D879CF2A5D}" type="slidenum">
               <a:t>&lt;#&gt;</a:t>
             </a:fld>
           </a:p>
@@ -1900,7 +1900,7 @@
         <p:txBody>
           <a:bodyPr/>
           <a:p>
-            <a:fld id="{4799F634-EA8E-4583-A506-FC2E3DB14B03}" type="slidenum">
+            <a:fld id="{AEAECADB-7ECD-49DA-8BF6-D604C1F2E85B}" type="slidenum">
               <a:t>&lt;#&gt;</a:t>
             </a:fld>
           </a:p>
@@ -2152,7 +2152,7 @@
         <p:txBody>
           <a:bodyPr/>
           <a:p>
-            <a:fld id="{7C8CD486-2E4B-44F1-A3A3-F9B0E8EDFEF1}" type="slidenum">
+            <a:fld id="{38E93B40-B973-41CD-ACBA-D61514450757}" type="slidenum">
               <a:t>&lt;#&gt;</a:t>
             </a:fld>
           </a:p>
@@ -2361,7 +2361,7 @@
         <p:txBody>
           <a:bodyPr/>
           <a:p>
-            <a:fld id="{7E31B666-4493-416C-9DBF-31EAF6E29F8F}" type="slidenum">
+            <a:fld id="{3E0D4492-0867-4C5F-B704-7901BF20B906}" type="slidenum">
               <a:t>&lt;#&gt;</a:t>
             </a:fld>
           </a:p>
@@ -2656,7 +2656,7 @@
         <p:txBody>
           <a:bodyPr/>
           <a:p>
-            <a:fld id="{BEC66C6E-2068-41F7-85F1-32448F66DDE4}" type="slidenum">
+            <a:fld id="{C481363B-C1F6-41AB-ADE0-B73D881FB7E0}" type="slidenum">
               <a:t>&lt;#&gt;</a:t>
             </a:fld>
           </a:p>
@@ -2739,7 +2739,7 @@
         <p:txBody>
           <a:bodyPr/>
           <a:p>
-            <a:fld id="{0729DF53-4C81-40E1-8F3D-92302D9AC5AF}" type="slidenum">
+            <a:fld id="{70B8E68D-933A-412B-82BD-93D4B71BD92E}" type="slidenum">
               <a:t>&lt;#&gt;</a:t>
             </a:fld>
           </a:p>
@@ -2822,7 +2822,7 @@
         <p:txBody>
           <a:bodyPr/>
           <a:p>
-            <a:fld id="{68F4DC1F-02A7-41FD-9ED5-1769B2B7655E}" type="slidenum">
+            <a:fld id="{5CEEADCE-427B-4B2B-9ABB-8288D8D58BD7}" type="slidenum">
               <a:t>&lt;#&gt;</a:t>
             </a:fld>
           </a:p>
@@ -2988,7 +2988,7 @@
         <p:txBody>
           <a:bodyPr/>
           <a:p>
-            <a:fld id="{6EBB24B4-DF1F-49FE-8961-3B210ECCE795}" type="slidenum">
+            <a:fld id="{99931F16-7992-4C40-8849-1D974DA850BD}" type="slidenum">
               <a:t>&lt;#&gt;</a:t>
             </a:fld>
           </a:p>
@@ -3154,7 +3154,7 @@
         <p:txBody>
           <a:bodyPr/>
           <a:p>
-            <a:fld id="{D7D7782E-557B-4A96-8AC2-002F63D101EC}" type="slidenum">
+            <a:fld id="{118946C0-8B79-48DD-B67C-22B26488627B}" type="slidenum">
               <a:t>&lt;#&gt;</a:t>
             </a:fld>
           </a:p>
@@ -3219,9 +3219,9 @@
         <p:grpSpPr>
           <a:xfrm>
             <a:off x="6199200" y="6162840"/>
-            <a:ext cx="5985360" cy="687600"/>
+            <a:ext cx="5984640" cy="686880"/>
             <a:chOff x="6199200" y="6162840"/>
-            <a:chExt cx="5985360" cy="687600"/>
+            <a:chExt cx="5984640" cy="686880"/>
           </a:xfrm>
         </p:grpSpPr>
         <p:pic>
@@ -3237,7 +3237,7 @@
           <p:spPr>
             <a:xfrm>
               <a:off x="6199200" y="6162840"/>
-              <a:ext cx="4048920" cy="687600"/>
+              <a:ext cx="4048200" cy="686880"/>
             </a:xfrm>
             <a:prstGeom prst="rect">
               <a:avLst/>
@@ -3260,7 +3260,7 @@
           <p:spPr>
             <a:xfrm>
               <a:off x="10270080" y="6162840"/>
-              <a:ext cx="1914480" cy="604080"/>
+              <a:ext cx="1913760" cy="603360"/>
             </a:xfrm>
             <a:prstGeom prst="rect">
               <a:avLst/>
@@ -4008,7 +4008,7 @@
         <p:spPr>
           <a:xfrm>
             <a:off x="4038480" y="6356520"/>
-            <a:ext cx="4107240" cy="357480"/>
+            <a:ext cx="4106520" cy="356760"/>
           </a:xfrm>
           <a:prstGeom prst="rect">
             <a:avLst/>
@@ -4080,7 +4080,7 @@
         <p:spPr>
           <a:xfrm>
             <a:off x="8610480" y="6356520"/>
-            <a:ext cx="2735640" cy="357480"/>
+            <a:ext cx="2734920" cy="356760"/>
           </a:xfrm>
           <a:prstGeom prst="rect">
             <a:avLst/>
@@ -4123,7 +4123,7 @@
                 <a:tab algn="l" pos="0"/>
               </a:tabLst>
             </a:pPr>
-            <a:fld id="{B479A865-5148-4C06-8081-8960F8B0E6D3}" type="slidenum">
+            <a:fld id="{F66F4DAA-1265-4ECA-8846-2552786087FE}" type="slidenum">
               <a:rPr b="0" lang="en-US" sz="1200" spc="-1" strike="noStrike">
                 <a:solidFill>
                   <a:schemeClr val="dk1">
@@ -4156,7 +4156,7 @@
         <p:spPr>
           <a:xfrm>
             <a:off x="838080" y="6356520"/>
-            <a:ext cx="2735640" cy="357480"/>
+            <a:ext cx="2734920" cy="356760"/>
           </a:xfrm>
           <a:prstGeom prst="rect">
             <a:avLst/>
@@ -4245,9 +4245,9 @@
         <p:grpSpPr>
           <a:xfrm>
             <a:off x="6199200" y="6162840"/>
-            <a:ext cx="5985360" cy="687600"/>
+            <a:ext cx="5984640" cy="686880"/>
             <a:chOff x="6199200" y="6162840"/>
-            <a:chExt cx="5985360" cy="687600"/>
+            <a:chExt cx="5984640" cy="686880"/>
           </a:xfrm>
         </p:grpSpPr>
         <p:pic>
@@ -4263,7 +4263,7 @@
           <p:spPr>
             <a:xfrm>
               <a:off x="6199200" y="6162840"/>
-              <a:ext cx="4048920" cy="687600"/>
+              <a:ext cx="4048200" cy="686880"/>
             </a:xfrm>
             <a:prstGeom prst="rect">
               <a:avLst/>
@@ -4286,7 +4286,7 @@
           <p:spPr>
             <a:xfrm>
               <a:off x="10270080" y="6162840"/>
-              <a:ext cx="1914480" cy="604080"/>
+              <a:ext cx="1913760" cy="603360"/>
             </a:xfrm>
             <a:prstGeom prst="rect">
               <a:avLst/>
@@ -4809,7 +4809,7 @@
         <p:spPr>
           <a:xfrm>
             <a:off x="4038480" y="6356520"/>
-            <a:ext cx="4107240" cy="357480"/>
+            <a:ext cx="4106520" cy="356760"/>
           </a:xfrm>
           <a:prstGeom prst="rect">
             <a:avLst/>
@@ -4881,7 +4881,7 @@
         <p:spPr>
           <a:xfrm>
             <a:off x="8610480" y="6356520"/>
-            <a:ext cx="2735640" cy="357480"/>
+            <a:ext cx="2734920" cy="356760"/>
           </a:xfrm>
           <a:prstGeom prst="rect">
             <a:avLst/>
@@ -4924,7 +4924,7 @@
                 <a:tab algn="l" pos="0"/>
               </a:tabLst>
             </a:pPr>
-            <a:fld id="{914F99D7-387E-4118-A911-0B5DF64B50A3}" type="slidenum">
+            <a:fld id="{0F9C020B-8F38-4E25-80FE-857111AB8651}" type="slidenum">
               <a:rPr b="0" lang="en-US" sz="1200" spc="-1" strike="noStrike">
                 <a:solidFill>
                   <a:schemeClr val="dk1">
@@ -4957,7 +4957,7 @@
         <p:spPr>
           <a:xfrm>
             <a:off x="838080" y="6356520"/>
-            <a:ext cx="2735640" cy="357480"/>
+            <a:ext cx="2734920" cy="356760"/>
           </a:xfrm>
           <a:prstGeom prst="rect">
             <a:avLst/>
@@ -5046,9 +5046,9 @@
         <p:grpSpPr>
           <a:xfrm>
             <a:off x="6199200" y="6162840"/>
-            <a:ext cx="5985360" cy="687600"/>
+            <a:ext cx="5984640" cy="686880"/>
             <a:chOff x="6199200" y="6162840"/>
-            <a:chExt cx="5985360" cy="687600"/>
+            <a:chExt cx="5984640" cy="686880"/>
           </a:xfrm>
         </p:grpSpPr>
         <p:pic>
@@ -5064,7 +5064,7 @@
           <p:spPr>
             <a:xfrm>
               <a:off x="6199200" y="6162840"/>
-              <a:ext cx="4048920" cy="687600"/>
+              <a:ext cx="4048200" cy="686880"/>
             </a:xfrm>
             <a:prstGeom prst="rect">
               <a:avLst/>
@@ -5087,7 +5087,7 @@
           <p:spPr>
             <a:xfrm>
               <a:off x="10270080" y="6162840"/>
-              <a:ext cx="1914480" cy="604080"/>
+              <a:ext cx="1913760" cy="603360"/>
             </a:xfrm>
             <a:prstGeom prst="rect">
               <a:avLst/>
@@ -5160,7 +5160,7 @@
         <p:spPr>
           <a:xfrm>
             <a:off x="4038480" y="6356520"/>
-            <a:ext cx="4107240" cy="357480"/>
+            <a:ext cx="4106520" cy="356760"/>
           </a:xfrm>
           <a:prstGeom prst="rect">
             <a:avLst/>
@@ -5232,7 +5232,7 @@
         <p:spPr>
           <a:xfrm>
             <a:off x="8610480" y="6356520"/>
-            <a:ext cx="2735640" cy="357480"/>
+            <a:ext cx="2734920" cy="356760"/>
           </a:xfrm>
           <a:prstGeom prst="rect">
             <a:avLst/>
@@ -5275,7 +5275,7 @@
                 <a:tab algn="l" pos="0"/>
               </a:tabLst>
             </a:pPr>
-            <a:fld id="{74C32D55-21FE-4EAF-BF86-FD622ECFD20E}" type="slidenum">
+            <a:fld id="{383B6534-E2E1-45E5-B8CC-EFFF711570AA}" type="slidenum">
               <a:rPr b="0" lang="en-US" sz="1200" spc="-1" strike="noStrike">
                 <a:solidFill>
                   <a:schemeClr val="dk1">
@@ -5308,7 +5308,7 @@
         <p:spPr>
           <a:xfrm>
             <a:off x="838080" y="6356520"/>
-            <a:ext cx="2735640" cy="357480"/>
+            <a:ext cx="2734920" cy="356760"/>
           </a:xfrm>
           <a:prstGeom prst="rect">
             <a:avLst/>
@@ -5397,9 +5397,9 @@
         <p:grpSpPr>
           <a:xfrm>
             <a:off x="6199200" y="6162840"/>
-            <a:ext cx="5985360" cy="687600"/>
+            <a:ext cx="5984640" cy="686880"/>
             <a:chOff x="6199200" y="6162840"/>
-            <a:chExt cx="5985360" cy="687600"/>
+            <a:chExt cx="5984640" cy="686880"/>
           </a:xfrm>
         </p:grpSpPr>
         <p:pic>
@@ -5415,7 +5415,7 @@
           <p:spPr>
             <a:xfrm>
               <a:off x="6199200" y="6162840"/>
-              <a:ext cx="4048920" cy="687600"/>
+              <a:ext cx="4048200" cy="686880"/>
             </a:xfrm>
             <a:prstGeom prst="rect">
               <a:avLst/>
@@ -5438,7 +5438,7 @@
           <p:spPr>
             <a:xfrm>
               <a:off x="10270080" y="6162840"/>
-              <a:ext cx="1914480" cy="604080"/>
+              <a:ext cx="1913760" cy="603360"/>
             </a:xfrm>
             <a:prstGeom prst="rect">
               <a:avLst/>
@@ -5462,7 +5462,7 @@
         <p:spPr>
           <a:xfrm>
             <a:off x="4038480" y="6356520"/>
-            <a:ext cx="4107240" cy="357480"/>
+            <a:ext cx="4106520" cy="356760"/>
           </a:xfrm>
           <a:prstGeom prst="rect">
             <a:avLst/>
@@ -5534,7 +5534,7 @@
         <p:spPr>
           <a:xfrm>
             <a:off x="8610480" y="6356520"/>
-            <a:ext cx="2735640" cy="357480"/>
+            <a:ext cx="2734920" cy="356760"/>
           </a:xfrm>
           <a:prstGeom prst="rect">
             <a:avLst/>
@@ -5577,7 +5577,7 @@
                 <a:tab algn="l" pos="0"/>
               </a:tabLst>
             </a:pPr>
-            <a:fld id="{7CFF1853-D802-47BB-BD43-28342FF4EAA7}" type="slidenum">
+            <a:fld id="{A4BA7626-4554-41A6-B640-2BAE0CE56420}" type="slidenum">
               <a:rPr b="0" lang="en-US" sz="1200" spc="-1" strike="noStrike">
                 <a:solidFill>
                   <a:schemeClr val="dk1">
@@ -5610,7 +5610,7 @@
         <p:spPr>
           <a:xfrm>
             <a:off x="838080" y="6356520"/>
-            <a:ext cx="2735640" cy="357480"/>
+            <a:ext cx="2734920" cy="356760"/>
           </a:xfrm>
           <a:prstGeom prst="rect">
             <a:avLst/>
@@ -5699,9 +5699,9 @@
         <p:grpSpPr>
           <a:xfrm>
             <a:off x="6199200" y="6162840"/>
-            <a:ext cx="5985360" cy="687600"/>
+            <a:ext cx="5984640" cy="686880"/>
             <a:chOff x="6199200" y="6162840"/>
-            <a:chExt cx="5985360" cy="687600"/>
+            <a:chExt cx="5984640" cy="686880"/>
           </a:xfrm>
         </p:grpSpPr>
         <p:pic>
@@ -5717,7 +5717,7 @@
           <p:spPr>
             <a:xfrm>
               <a:off x="6199200" y="6162840"/>
-              <a:ext cx="4048920" cy="687600"/>
+              <a:ext cx="4048200" cy="686880"/>
             </a:xfrm>
             <a:prstGeom prst="rect">
               <a:avLst/>
@@ -5740,7 +5740,7 @@
           <p:spPr>
             <a:xfrm>
               <a:off x="10270080" y="6162840"/>
-              <a:ext cx="1914480" cy="604080"/>
+              <a:ext cx="1913760" cy="603360"/>
             </a:xfrm>
             <a:prstGeom prst="rect">
               <a:avLst/>
@@ -6488,7 +6488,7 @@
         <p:spPr>
           <a:xfrm>
             <a:off x="4038480" y="6356520"/>
-            <a:ext cx="4107240" cy="357480"/>
+            <a:ext cx="4106520" cy="356760"/>
           </a:xfrm>
           <a:prstGeom prst="rect">
             <a:avLst/>
@@ -6560,7 +6560,7 @@
         <p:spPr>
           <a:xfrm>
             <a:off x="8610480" y="6356520"/>
-            <a:ext cx="2735640" cy="357480"/>
+            <a:ext cx="2734920" cy="356760"/>
           </a:xfrm>
           <a:prstGeom prst="rect">
             <a:avLst/>
@@ -6603,7 +6603,7 @@
                 <a:tab algn="l" pos="0"/>
               </a:tabLst>
             </a:pPr>
-            <a:fld id="{C434E8C9-899D-43EA-B94D-6A51B73BAB0E}" type="slidenum">
+            <a:fld id="{D745661C-2043-4D44-8E81-A8862433590C}" type="slidenum">
               <a:rPr b="0" lang="en-US" sz="1200" spc="-1" strike="noStrike">
                 <a:solidFill>
                   <a:schemeClr val="dk1">
@@ -6636,7 +6636,7 @@
         <p:spPr>
           <a:xfrm>
             <a:off x="838080" y="6356520"/>
-            <a:ext cx="2735640" cy="357480"/>
+            <a:ext cx="2734920" cy="356760"/>
           </a:xfrm>
           <a:prstGeom prst="rect">
             <a:avLst/>
@@ -6725,9 +6725,9 @@
         <p:grpSpPr>
           <a:xfrm>
             <a:off x="6199200" y="6162840"/>
-            <a:ext cx="5985360" cy="687600"/>
+            <a:ext cx="5984640" cy="686880"/>
             <a:chOff x="6199200" y="6162840"/>
-            <a:chExt cx="5985360" cy="687600"/>
+            <a:chExt cx="5984640" cy="686880"/>
           </a:xfrm>
         </p:grpSpPr>
         <p:pic>
@@ -6743,7 +6743,7 @@
           <p:spPr>
             <a:xfrm>
               <a:off x="6199200" y="6162840"/>
-              <a:ext cx="4048920" cy="687600"/>
+              <a:ext cx="4048200" cy="686880"/>
             </a:xfrm>
             <a:prstGeom prst="rect">
               <a:avLst/>
@@ -6766,7 +6766,7 @@
           <p:spPr>
             <a:xfrm>
               <a:off x="10270080" y="6162840"/>
-              <a:ext cx="1914480" cy="604080"/>
+              <a:ext cx="1913760" cy="603360"/>
             </a:xfrm>
             <a:prstGeom prst="rect">
               <a:avLst/>
@@ -7514,7 +7514,7 @@
         <p:spPr>
           <a:xfrm>
             <a:off x="4038480" y="6356520"/>
-            <a:ext cx="4107240" cy="357480"/>
+            <a:ext cx="4106520" cy="356760"/>
           </a:xfrm>
           <a:prstGeom prst="rect">
             <a:avLst/>
@@ -7586,7 +7586,7 @@
         <p:spPr>
           <a:xfrm>
             <a:off x="8610480" y="6356520"/>
-            <a:ext cx="2735640" cy="357480"/>
+            <a:ext cx="2734920" cy="356760"/>
           </a:xfrm>
           <a:prstGeom prst="rect">
             <a:avLst/>
@@ -7629,7 +7629,7 @@
                 <a:tab algn="l" pos="0"/>
               </a:tabLst>
             </a:pPr>
-            <a:fld id="{3ECD6B3D-BAD3-4A63-8EED-FA6EE04973B6}" type="slidenum">
+            <a:fld id="{F2C32DA6-6554-4B2D-A3A2-DC375E459714}" type="slidenum">
               <a:rPr b="0" lang="en-US" sz="1200" spc="-1" strike="noStrike">
                 <a:solidFill>
                   <a:schemeClr val="dk1">
@@ -7662,7 +7662,7 @@
         <p:spPr>
           <a:xfrm>
             <a:off x="838080" y="6356520"/>
-            <a:ext cx="2735640" cy="357480"/>
+            <a:ext cx="2734920" cy="356760"/>
           </a:xfrm>
           <a:prstGeom prst="rect">
             <a:avLst/>
@@ -7751,9 +7751,9 @@
         <p:grpSpPr>
           <a:xfrm>
             <a:off x="6199200" y="6162840"/>
-            <a:ext cx="5985360" cy="687600"/>
+            <a:ext cx="5984640" cy="686880"/>
             <a:chOff x="6199200" y="6162840"/>
-            <a:chExt cx="5985360" cy="687600"/>
+            <a:chExt cx="5984640" cy="686880"/>
           </a:xfrm>
         </p:grpSpPr>
         <p:pic>
@@ -7769,7 +7769,7 @@
           <p:spPr>
             <a:xfrm>
               <a:off x="6199200" y="6162840"/>
-              <a:ext cx="4048920" cy="687600"/>
+              <a:ext cx="4048200" cy="686880"/>
             </a:xfrm>
             <a:prstGeom prst="rect">
               <a:avLst/>
@@ -7792,7 +7792,7 @@
           <p:spPr>
             <a:xfrm>
               <a:off x="10270080" y="6162840"/>
-              <a:ext cx="1914480" cy="604080"/>
+              <a:ext cx="1913760" cy="603360"/>
             </a:xfrm>
             <a:prstGeom prst="rect">
               <a:avLst/>
@@ -8315,7 +8315,7 @@
         <p:spPr>
           <a:xfrm>
             <a:off x="4038480" y="6356520"/>
-            <a:ext cx="4107240" cy="357480"/>
+            <a:ext cx="4106520" cy="356760"/>
           </a:xfrm>
           <a:prstGeom prst="rect">
             <a:avLst/>
@@ -8387,7 +8387,7 @@
         <p:spPr>
           <a:xfrm>
             <a:off x="8610480" y="6356520"/>
-            <a:ext cx="2735640" cy="357480"/>
+            <a:ext cx="2734920" cy="356760"/>
           </a:xfrm>
           <a:prstGeom prst="rect">
             <a:avLst/>
@@ -8430,7 +8430,7 @@
                 <a:tab algn="l" pos="0"/>
               </a:tabLst>
             </a:pPr>
-            <a:fld id="{94899EE5-A5BF-4D81-A804-7A646836CC0F}" type="slidenum">
+            <a:fld id="{288C9B95-A69C-4731-9827-8755EE26DC5F}" type="slidenum">
               <a:rPr b="0" lang="en-US" sz="1200" spc="-1" strike="noStrike">
                 <a:solidFill>
                   <a:schemeClr val="dk1">
@@ -8463,7 +8463,7 @@
         <p:spPr>
           <a:xfrm>
             <a:off x="838080" y="6356520"/>
-            <a:ext cx="2735640" cy="357480"/>
+            <a:ext cx="2734920" cy="356760"/>
           </a:xfrm>
           <a:prstGeom prst="rect">
             <a:avLst/>
@@ -8552,9 +8552,9 @@
         <p:grpSpPr>
           <a:xfrm>
             <a:off x="6199200" y="6162840"/>
-            <a:ext cx="5985360" cy="687600"/>
+            <a:ext cx="5984640" cy="686880"/>
             <a:chOff x="6199200" y="6162840"/>
-            <a:chExt cx="5985360" cy="687600"/>
+            <a:chExt cx="5984640" cy="686880"/>
           </a:xfrm>
         </p:grpSpPr>
         <p:pic>
@@ -8570,7 +8570,7 @@
           <p:spPr>
             <a:xfrm>
               <a:off x="6199200" y="6162840"/>
-              <a:ext cx="4048920" cy="687600"/>
+              <a:ext cx="4048200" cy="686880"/>
             </a:xfrm>
             <a:prstGeom prst="rect">
               <a:avLst/>
@@ -8593,7 +8593,7 @@
           <p:spPr>
             <a:xfrm>
               <a:off x="10270080" y="6162840"/>
-              <a:ext cx="1914480" cy="604080"/>
+              <a:ext cx="1913760" cy="603360"/>
             </a:xfrm>
             <a:prstGeom prst="rect">
               <a:avLst/>
@@ -9566,7 +9566,7 @@
         <p:spPr>
           <a:xfrm>
             <a:off x="4038480" y="6356520"/>
-            <a:ext cx="4107240" cy="357480"/>
+            <a:ext cx="4106520" cy="356760"/>
           </a:xfrm>
           <a:prstGeom prst="rect">
             <a:avLst/>
@@ -9638,7 +9638,7 @@
         <p:spPr>
           <a:xfrm>
             <a:off x="8610480" y="6356520"/>
-            <a:ext cx="2735640" cy="357480"/>
+            <a:ext cx="2734920" cy="356760"/>
           </a:xfrm>
           <a:prstGeom prst="rect">
             <a:avLst/>
@@ -9681,7 +9681,7 @@
                 <a:tab algn="l" pos="0"/>
               </a:tabLst>
             </a:pPr>
-            <a:fld id="{026EA0FA-949F-4AF0-B706-BE7169CD0E1C}" type="slidenum">
+            <a:fld id="{1DA0D0AF-A452-4CAD-A673-DA2022A61D8B}" type="slidenum">
               <a:rPr b="0" lang="en-US" sz="1200" spc="-1" strike="noStrike">
                 <a:solidFill>
                   <a:schemeClr val="dk1">
@@ -9714,7 +9714,7 @@
         <p:spPr>
           <a:xfrm>
             <a:off x="838080" y="6356520"/>
-            <a:ext cx="2735640" cy="357480"/>
+            <a:ext cx="2734920" cy="356760"/>
           </a:xfrm>
           <a:prstGeom prst="rect">
             <a:avLst/>
@@ -9803,9 +9803,9 @@
         <p:grpSpPr>
           <a:xfrm>
             <a:off x="6199200" y="6162840"/>
-            <a:ext cx="5985360" cy="687600"/>
+            <a:ext cx="5984640" cy="686880"/>
             <a:chOff x="6199200" y="6162840"/>
-            <a:chExt cx="5985360" cy="687600"/>
+            <a:chExt cx="5984640" cy="686880"/>
           </a:xfrm>
         </p:grpSpPr>
         <p:pic>
@@ -9821,7 +9821,7 @@
           <p:spPr>
             <a:xfrm>
               <a:off x="6199200" y="6162840"/>
-              <a:ext cx="4048920" cy="687600"/>
+              <a:ext cx="4048200" cy="686880"/>
             </a:xfrm>
             <a:prstGeom prst="rect">
               <a:avLst/>
@@ -9844,7 +9844,7 @@
           <p:spPr>
             <a:xfrm>
               <a:off x="10270080" y="6162840"/>
-              <a:ext cx="1914480" cy="604080"/>
+              <a:ext cx="1913760" cy="603360"/>
             </a:xfrm>
             <a:prstGeom prst="rect">
               <a:avLst/>
@@ -9868,7 +9868,7 @@
         <p:spPr>
           <a:xfrm>
             <a:off x="4038480" y="6356520"/>
-            <a:ext cx="4107240" cy="357480"/>
+            <a:ext cx="4106520" cy="356760"/>
           </a:xfrm>
           <a:prstGeom prst="rect">
             <a:avLst/>
@@ -9940,7 +9940,7 @@
         <p:spPr>
           <a:xfrm>
             <a:off x="8610480" y="6356520"/>
-            <a:ext cx="2735640" cy="357480"/>
+            <a:ext cx="2734920" cy="356760"/>
           </a:xfrm>
           <a:prstGeom prst="rect">
             <a:avLst/>
@@ -9983,7 +9983,7 @@
                 <a:tab algn="l" pos="0"/>
               </a:tabLst>
             </a:pPr>
-            <a:fld id="{AC8DB3F0-BBEF-44D8-A04E-D0744D623130}" type="slidenum">
+            <a:fld id="{3930D17F-67A7-47AF-8887-C7134BD4170C}" type="slidenum">
               <a:rPr b="0" lang="en-US" sz="1200" spc="-1" strike="noStrike">
                 <a:solidFill>
                   <a:schemeClr val="dk1">
@@ -10016,7 +10016,7 @@
         <p:spPr>
           <a:xfrm>
             <a:off x="838080" y="6356520"/>
-            <a:ext cx="2735640" cy="357480"/>
+            <a:ext cx="2734920" cy="356760"/>
           </a:xfrm>
           <a:prstGeom prst="rect">
             <a:avLst/>
@@ -10105,9 +10105,9 @@
         <p:grpSpPr>
           <a:xfrm>
             <a:off x="6199200" y="6162840"/>
-            <a:ext cx="5985360" cy="687600"/>
+            <a:ext cx="5984640" cy="686880"/>
             <a:chOff x="6199200" y="6162840"/>
-            <a:chExt cx="5985360" cy="687600"/>
+            <a:chExt cx="5984640" cy="686880"/>
           </a:xfrm>
         </p:grpSpPr>
         <p:pic>
@@ -10123,7 +10123,7 @@
           <p:spPr>
             <a:xfrm>
               <a:off x="6199200" y="6162840"/>
-              <a:ext cx="4048920" cy="687600"/>
+              <a:ext cx="4048200" cy="686880"/>
             </a:xfrm>
             <a:prstGeom prst="rect">
               <a:avLst/>
@@ -10146,7 +10146,7 @@
           <p:spPr>
             <a:xfrm>
               <a:off x="10270080" y="6162840"/>
-              <a:ext cx="1914480" cy="604080"/>
+              <a:ext cx="1913760" cy="603360"/>
             </a:xfrm>
             <a:prstGeom prst="rect">
               <a:avLst/>
@@ -10170,7 +10170,7 @@
         <p:spPr>
           <a:xfrm>
             <a:off x="4038480" y="6356520"/>
-            <a:ext cx="4107240" cy="357480"/>
+            <a:ext cx="4106520" cy="356760"/>
           </a:xfrm>
           <a:prstGeom prst="rect">
             <a:avLst/>
@@ -10242,7 +10242,7 @@
         <p:spPr>
           <a:xfrm>
             <a:off x="8610480" y="6356520"/>
-            <a:ext cx="2735640" cy="357480"/>
+            <a:ext cx="2734920" cy="356760"/>
           </a:xfrm>
           <a:prstGeom prst="rect">
             <a:avLst/>
@@ -10285,7 +10285,7 @@
                 <a:tab algn="l" pos="0"/>
               </a:tabLst>
             </a:pPr>
-            <a:fld id="{35ECDC86-06C6-4132-86DC-14CC7DB3070E}" type="slidenum">
+            <a:fld id="{51CD65B4-880A-4CB8-B6AD-3444C8F1BD33}" type="slidenum">
               <a:rPr b="0" lang="en-US" sz="1200" spc="-1" strike="noStrike">
                 <a:solidFill>
                   <a:schemeClr val="dk1">
@@ -10318,7 +10318,7 @@
         <p:spPr>
           <a:xfrm>
             <a:off x="838080" y="6356520"/>
-            <a:ext cx="2735640" cy="357480"/>
+            <a:ext cx="2734920" cy="356760"/>
           </a:xfrm>
           <a:prstGeom prst="rect">
             <a:avLst/>
@@ -10681,9 +10681,9 @@
         <p:grpSpPr>
           <a:xfrm>
             <a:off x="6199200" y="6162840"/>
-            <a:ext cx="5985360" cy="687600"/>
+            <a:ext cx="5984640" cy="686880"/>
             <a:chOff x="6199200" y="6162840"/>
-            <a:chExt cx="5985360" cy="687600"/>
+            <a:chExt cx="5984640" cy="686880"/>
           </a:xfrm>
         </p:grpSpPr>
         <p:pic>
@@ -10699,7 +10699,7 @@
           <p:spPr>
             <a:xfrm>
               <a:off x="6199200" y="6162840"/>
-              <a:ext cx="4048920" cy="687600"/>
+              <a:ext cx="4048200" cy="686880"/>
             </a:xfrm>
             <a:prstGeom prst="rect">
               <a:avLst/>
@@ -10722,7 +10722,7 @@
           <p:spPr>
             <a:xfrm>
               <a:off x="10270080" y="6162840"/>
-              <a:ext cx="1914480" cy="604080"/>
+              <a:ext cx="1913760" cy="603360"/>
             </a:xfrm>
             <a:prstGeom prst="rect">
               <a:avLst/>
@@ -11020,7 +11020,7 @@
         <p:spPr>
           <a:xfrm>
             <a:off x="4038480" y="6356520"/>
-            <a:ext cx="4107240" cy="357480"/>
+            <a:ext cx="4106520" cy="356760"/>
           </a:xfrm>
           <a:prstGeom prst="rect">
             <a:avLst/>
@@ -11092,7 +11092,7 @@
         <p:spPr>
           <a:xfrm>
             <a:off x="8610480" y="6356520"/>
-            <a:ext cx="2735640" cy="357480"/>
+            <a:ext cx="2734920" cy="356760"/>
           </a:xfrm>
           <a:prstGeom prst="rect">
             <a:avLst/>
@@ -11135,7 +11135,7 @@
                 <a:tab algn="l" pos="0"/>
               </a:tabLst>
             </a:pPr>
-            <a:fld id="{802A76BD-9313-4940-910A-47A015166143}" type="slidenum">
+            <a:fld id="{7A58E696-5820-4C51-89BB-6ABB24BF9A19}" type="slidenum">
               <a:rPr b="0" lang="en-US" sz="1200" spc="-1" strike="noStrike">
                 <a:solidFill>
                   <a:schemeClr val="dk1">
@@ -11168,7 +11168,7 @@
         <p:spPr>
           <a:xfrm>
             <a:off x="838080" y="6356520"/>
-            <a:ext cx="2735640" cy="357480"/>
+            <a:ext cx="2734920" cy="356760"/>
           </a:xfrm>
           <a:prstGeom prst="rect">
             <a:avLst/>
@@ -11257,9 +11257,9 @@
         <p:grpSpPr>
           <a:xfrm>
             <a:off x="6199200" y="6162840"/>
-            <a:ext cx="5985360" cy="687600"/>
+            <a:ext cx="5984640" cy="686880"/>
             <a:chOff x="6199200" y="6162840"/>
-            <a:chExt cx="5985360" cy="687600"/>
+            <a:chExt cx="5984640" cy="686880"/>
           </a:xfrm>
         </p:grpSpPr>
         <p:pic>
@@ -11275,7 +11275,7 @@
           <p:spPr>
             <a:xfrm>
               <a:off x="6199200" y="6162840"/>
-              <a:ext cx="4048920" cy="687600"/>
+              <a:ext cx="4048200" cy="686880"/>
             </a:xfrm>
             <a:prstGeom prst="rect">
               <a:avLst/>
@@ -11298,7 +11298,7 @@
           <p:spPr>
             <a:xfrm>
               <a:off x="10270080" y="6162840"/>
-              <a:ext cx="1914480" cy="604080"/>
+              <a:ext cx="1913760" cy="603360"/>
             </a:xfrm>
             <a:prstGeom prst="rect">
               <a:avLst/>
@@ -11596,7 +11596,7 @@
         <p:spPr>
           <a:xfrm>
             <a:off x="4038480" y="6356520"/>
-            <a:ext cx="4107240" cy="357480"/>
+            <a:ext cx="4106520" cy="356760"/>
           </a:xfrm>
           <a:prstGeom prst="rect">
             <a:avLst/>
@@ -11668,7 +11668,7 @@
         <p:spPr>
           <a:xfrm>
             <a:off x="8610480" y="6356520"/>
-            <a:ext cx="2735640" cy="357480"/>
+            <a:ext cx="2734920" cy="356760"/>
           </a:xfrm>
           <a:prstGeom prst="rect">
             <a:avLst/>
@@ -11711,7 +11711,7 @@
                 <a:tab algn="l" pos="0"/>
               </a:tabLst>
             </a:pPr>
-            <a:fld id="{21C87BCB-45AC-46AD-953F-60C4EC75CB7D}" type="slidenum">
+            <a:fld id="{35352431-EA3A-43A1-B4DC-F5042B89B0D7}" type="slidenum">
               <a:rPr b="0" lang="en-US" sz="1200" spc="-1" strike="noStrike">
                 <a:solidFill>
                   <a:schemeClr val="dk1">
@@ -11744,7 +11744,7 @@
         <p:spPr>
           <a:xfrm>
             <a:off x="838080" y="6356520"/>
-            <a:ext cx="2735640" cy="357480"/>
+            <a:ext cx="2734920" cy="356760"/>
           </a:xfrm>
           <a:prstGeom prst="rect">
             <a:avLst/>
@@ -11826,7 +11826,7 @@
         <p:spPr>
           <a:xfrm flipH="1">
             <a:off x="0" y="3073320"/>
-            <a:ext cx="1836360" cy="7560"/>
+            <a:ext cx="1837080" cy="8280"/>
           </a:xfrm>
           <a:prstGeom prst="straightConnector1">
             <a:avLst/>
@@ -11849,7 +11849,7 @@
         <p:spPr>
           <a:xfrm>
             <a:off x="0" y="2489400"/>
-            <a:ext cx="1836360" cy="7560"/>
+            <a:ext cx="1837080" cy="8280"/>
           </a:xfrm>
           <a:prstGeom prst="straightConnector1">
             <a:avLst/>
@@ -11872,7 +11872,7 @@
         <p:spPr>
           <a:xfrm>
             <a:off x="0" y="2781360"/>
-            <a:ext cx="1836360" cy="7560"/>
+            <a:ext cx="1837080" cy="8280"/>
           </a:xfrm>
           <a:prstGeom prst="straightConnector1">
             <a:avLst/>
@@ -11895,7 +11895,7 @@
         <p:spPr>
           <a:xfrm flipH="1">
             <a:off x="0" y="3657600"/>
-            <a:ext cx="1836360" cy="7560"/>
+            <a:ext cx="1837080" cy="8280"/>
           </a:xfrm>
           <a:prstGeom prst="straightConnector1">
             <a:avLst/>
@@ -11917,7 +11917,7 @@
         <p:spPr>
           <a:xfrm>
             <a:off x="128520" y="6134040"/>
-            <a:ext cx="1564200" cy="380160"/>
+            <a:ext cx="1563480" cy="379440"/>
           </a:xfrm>
           <a:prstGeom prst="diamond">
             <a:avLst/>
@@ -11982,7 +11982,7 @@
         <p:spPr>
           <a:xfrm>
             <a:off x="302760" y="5454000"/>
-            <a:ext cx="1215720" cy="380160"/>
+            <a:ext cx="1215000" cy="379440"/>
           </a:xfrm>
           <a:prstGeom prst="ellipse">
             <a:avLst/>
@@ -12045,7 +12045,7 @@
         <p:spPr>
           <a:xfrm>
             <a:off x="101160" y="336240"/>
-            <a:ext cx="1618920" cy="303120"/>
+            <a:ext cx="1618200" cy="303120"/>
           </a:xfrm>
           <a:prstGeom prst="rect">
             <a:avLst/>
@@ -12102,7 +12102,7 @@
         <p:spPr>
           <a:xfrm>
             <a:off x="101160" y="597600"/>
-            <a:ext cx="1618920" cy="516600"/>
+            <a:ext cx="1618200" cy="516600"/>
           </a:xfrm>
           <a:prstGeom prst="rect">
             <a:avLst/>
@@ -12192,7 +12192,7 @@
         <p:spPr>
           <a:xfrm>
             <a:off x="101160" y="336240"/>
-            <a:ext cx="1618920" cy="303120"/>
+            <a:ext cx="1618200" cy="303120"/>
           </a:xfrm>
           <a:prstGeom prst="rect">
             <a:avLst/>
@@ -12249,7 +12249,7 @@
         <p:spPr>
           <a:xfrm>
             <a:off x="101160" y="597600"/>
-            <a:ext cx="1618920" cy="516600"/>
+            <a:ext cx="1618200" cy="516600"/>
           </a:xfrm>
           <a:prstGeom prst="rect">
             <a:avLst/>
@@ -12339,7 +12339,7 @@
         <p:spPr>
           <a:xfrm>
             <a:off x="2541600" y="228600"/>
-            <a:ext cx="1618920" cy="303120"/>
+            <a:ext cx="1618200" cy="303120"/>
           </a:xfrm>
           <a:prstGeom prst="rect">
             <a:avLst/>
@@ -12396,7 +12396,7 @@
         <p:spPr>
           <a:xfrm>
             <a:off x="2541600" y="489960"/>
-            <a:ext cx="1618920" cy="1584000"/>
+            <a:ext cx="1618200" cy="1584000"/>
           </a:xfrm>
           <a:prstGeom prst="rect">
             <a:avLst/>
@@ -12621,7 +12621,7 @@
         <p:spPr>
           <a:xfrm>
             <a:off x="6656400" y="228600"/>
-            <a:ext cx="1618920" cy="303120"/>
+            <a:ext cx="1618200" cy="303120"/>
           </a:xfrm>
           <a:prstGeom prst="rect">
             <a:avLst/>
@@ -12678,7 +12678,7 @@
         <p:spPr>
           <a:xfrm>
             <a:off x="6656400" y="489960"/>
-            <a:ext cx="1618920" cy="516600"/>
+            <a:ext cx="1618200" cy="516600"/>
           </a:xfrm>
           <a:prstGeom prst="rect">
             <a:avLst/>
@@ -12768,7 +12768,7 @@
         <p:spPr>
           <a:xfrm>
             <a:off x="6656400" y="228600"/>
-            <a:ext cx="1618920" cy="303120"/>
+            <a:ext cx="1618200" cy="303120"/>
           </a:xfrm>
           <a:prstGeom prst="rect">
             <a:avLst/>
@@ -12825,7 +12825,7 @@
         <p:spPr>
           <a:xfrm>
             <a:off x="6656400" y="489960"/>
-            <a:ext cx="1618920" cy="730080"/>
+            <a:ext cx="1618200" cy="730080"/>
           </a:xfrm>
           <a:prstGeom prst="rect">
             <a:avLst/>
@@ -12942,7 +12942,7 @@
         <p:spPr>
           <a:xfrm>
             <a:off x="128520" y="4629600"/>
-            <a:ext cx="1564200" cy="524880"/>
+            <a:ext cx="1563480" cy="524160"/>
           </a:xfrm>
           <a:prstGeom prst="diamond">
             <a:avLst/>
@@ -13030,7 +13030,7 @@
         <p:spPr>
           <a:xfrm>
             <a:off x="0" y="3365640"/>
-            <a:ext cx="1836360" cy="7560"/>
+            <a:ext cx="1837080" cy="8280"/>
           </a:xfrm>
           <a:prstGeom prst="straightConnector1">
             <a:avLst/>
@@ -13052,7 +13052,7 @@
         <p:spPr>
           <a:xfrm>
             <a:off x="673200" y="3949920"/>
-            <a:ext cx="475200" cy="380160"/>
+            <a:ext cx="474480" cy="379440"/>
           </a:xfrm>
           <a:prstGeom prst="triangle">
             <a:avLst>
@@ -13119,9 +13119,9 @@
         <p:grpSpPr>
           <a:xfrm>
             <a:off x="101160" y="1413000"/>
-            <a:ext cx="1618920" cy="777960"/>
+            <a:ext cx="1618200" cy="777960"/>
             <a:chOff x="101160" y="1413000"/>
-            <a:chExt cx="1618920" cy="777960"/>
+            <a:chExt cx="1618200" cy="777960"/>
           </a:xfrm>
         </p:grpSpPr>
         <p:sp>
@@ -13133,7 +13133,7 @@
           <p:spPr>
             <a:xfrm>
               <a:off x="101160" y="1413000"/>
-              <a:ext cx="1618920" cy="303120"/>
+              <a:ext cx="1618200" cy="303120"/>
             </a:xfrm>
             <a:prstGeom prst="rect">
               <a:avLst/>
@@ -13191,7 +13191,7 @@
           <p:spPr>
             <a:xfrm>
               <a:off x="101160" y="1674360"/>
-              <a:ext cx="1618920" cy="516600"/>
+              <a:ext cx="1618200" cy="516600"/>
             </a:xfrm>
             <a:prstGeom prst="rect">
               <a:avLst/>
@@ -13283,7 +13283,7 @@
         <p:spPr>
           <a:xfrm>
             <a:off x="4426920" y="914400"/>
-            <a:ext cx="1564200" cy="380160"/>
+            <a:ext cx="1563480" cy="379440"/>
           </a:xfrm>
           <a:prstGeom prst="diamond">
             <a:avLst/>
@@ -13350,8 +13350,8 @@
         </p:nvCxnSpPr>
         <p:spPr>
           <a:xfrm flipH="1">
-            <a:off x="5991120" y="855000"/>
-            <a:ext cx="665640" cy="249840"/>
+            <a:off x="5990400" y="855000"/>
+            <a:ext cx="666360" cy="249480"/>
           </a:xfrm>
           <a:prstGeom prst="straightConnector1">
             <a:avLst/>
@@ -13374,7 +13374,7 @@
         <p:spPr>
           <a:xfrm>
             <a:off x="6255720" y="1828800"/>
-            <a:ext cx="1792800" cy="380160"/>
+            <a:ext cx="1792080" cy="379440"/>
           </a:xfrm>
           <a:prstGeom prst="diamond">
             <a:avLst/>
@@ -13441,7 +13441,7 @@
         </p:nvCxnSpPr>
         <p:spPr>
           <a:xfrm flipV="1">
-            <a:off x="7152120" y="1220040"/>
+            <a:off x="7151760" y="1220040"/>
             <a:ext cx="313920" cy="609120"/>
           </a:xfrm>
           <a:prstGeom prst="straightConnector1">
@@ -13465,8 +13465,8 @@
         </p:nvCxnSpPr>
         <p:spPr>
           <a:xfrm flipH="1" flipV="1">
-            <a:off x="7152120" y="2208960"/>
-            <a:ext cx="461520" cy="539640"/>
+            <a:off x="7151760" y="2208240"/>
+            <a:ext cx="462600" cy="541080"/>
           </a:xfrm>
           <a:prstGeom prst="straightConnector1">
             <a:avLst/>
@@ -13489,7 +13489,7 @@
         <p:spPr>
           <a:xfrm>
             <a:off x="128520" y="6134400"/>
-            <a:ext cx="1564200" cy="380160"/>
+            <a:ext cx="1563480" cy="379440"/>
           </a:xfrm>
           <a:prstGeom prst="diamond">
             <a:avLst/>
@@ -13554,9 +13554,9 @@
         <p:grpSpPr>
           <a:xfrm>
             <a:off x="6681960" y="2743200"/>
-            <a:ext cx="1847520" cy="1216440"/>
+            <a:ext cx="1846800" cy="1216440"/>
             <a:chOff x="6681960" y="2743200"/>
-            <a:chExt cx="1847520" cy="1216440"/>
+            <a:chExt cx="1846800" cy="1216440"/>
           </a:xfrm>
         </p:grpSpPr>
         <p:sp>
@@ -13568,7 +13568,7 @@
           <p:spPr>
             <a:xfrm>
               <a:off x="6681960" y="2743200"/>
-              <a:ext cx="1847520" cy="303120"/>
+              <a:ext cx="1846800" cy="303120"/>
             </a:xfrm>
             <a:prstGeom prst="rect">
               <a:avLst/>
@@ -13625,7 +13625,7 @@
           <p:spPr>
             <a:xfrm>
               <a:off x="6681960" y="3016080"/>
-              <a:ext cx="1847520" cy="943560"/>
+              <a:ext cx="1846800" cy="943560"/>
             </a:xfrm>
             <a:prstGeom prst="rect">
               <a:avLst/>
@@ -13772,7 +13772,7 @@
         <p:spPr>
           <a:xfrm>
             <a:off x="9173520" y="3501000"/>
-            <a:ext cx="475200" cy="380160"/>
+            <a:ext cx="474480" cy="379440"/>
           </a:xfrm>
           <a:prstGeom prst="triangle">
             <a:avLst>
@@ -13839,7 +13839,7 @@
         <p:spPr>
           <a:xfrm>
             <a:off x="10287000" y="3126240"/>
-            <a:ext cx="1901520" cy="303120"/>
+            <a:ext cx="1900800" cy="303120"/>
           </a:xfrm>
           <a:prstGeom prst="rect">
             <a:avLst/>
@@ -13896,7 +13896,7 @@
         <p:spPr>
           <a:xfrm>
             <a:off x="10287000" y="3429360"/>
-            <a:ext cx="1901520" cy="1584000"/>
+            <a:ext cx="1900800" cy="1584000"/>
           </a:xfrm>
           <a:prstGeom prst="rect">
             <a:avLst/>
@@ -14104,8 +14104,8 @@
         </p:nvCxnSpPr>
         <p:spPr>
           <a:xfrm>
-            <a:off x="9529920" y="3691080"/>
-            <a:ext cx="757440" cy="530640"/>
+            <a:off x="9529560" y="3690720"/>
+            <a:ext cx="757800" cy="531000"/>
           </a:xfrm>
           <a:prstGeom prst="straightConnector1">
             <a:avLst/>
@@ -14129,8 +14129,8 @@
         </p:nvCxnSpPr>
         <p:spPr>
           <a:xfrm flipH="1" flipV="1">
-            <a:off x="8529480" y="3351240"/>
-            <a:ext cx="763200" cy="340200"/>
+            <a:off x="8528760" y="3351240"/>
+            <a:ext cx="763560" cy="339840"/>
           </a:xfrm>
           <a:prstGeom prst="straightConnector1">
             <a:avLst/>
@@ -14152,7 +14152,7 @@
         <p:spPr>
           <a:xfrm>
             <a:off x="2086200" y="3336840"/>
-            <a:ext cx="1618920" cy="303120"/>
+            <a:ext cx="1618200" cy="303120"/>
           </a:xfrm>
           <a:prstGeom prst="rect">
             <a:avLst/>
@@ -14209,7 +14209,7 @@
         <p:spPr>
           <a:xfrm>
             <a:off x="2086200" y="3598200"/>
-            <a:ext cx="1618920" cy="516600"/>
+            <a:ext cx="1618200" cy="516600"/>
           </a:xfrm>
           <a:prstGeom prst="rect">
             <a:avLst/>
@@ -14299,7 +14299,7 @@
         <p:spPr>
           <a:xfrm>
             <a:off x="2086200" y="3336840"/>
-            <a:ext cx="1618920" cy="303120"/>
+            <a:ext cx="1618200" cy="303120"/>
           </a:xfrm>
           <a:prstGeom prst="rect">
             <a:avLst/>
@@ -14356,7 +14356,7 @@
         <p:spPr>
           <a:xfrm>
             <a:off x="2086200" y="3598200"/>
-            <a:ext cx="1618920" cy="516600"/>
+            <a:ext cx="1618200" cy="516600"/>
           </a:xfrm>
           <a:prstGeom prst="rect">
             <a:avLst/>
@@ -14446,7 +14446,7 @@
         <p:spPr>
           <a:xfrm>
             <a:off x="1883160" y="2514600"/>
-            <a:ext cx="1821960" cy="380160"/>
+            <a:ext cx="1821240" cy="379440"/>
           </a:xfrm>
           <a:prstGeom prst="diamond">
             <a:avLst/>
@@ -14511,7 +14511,7 @@
         <p:spPr>
           <a:xfrm>
             <a:off x="3481560" y="2899800"/>
-            <a:ext cx="1593360" cy="380160"/>
+            <a:ext cx="1592640" cy="379440"/>
           </a:xfrm>
           <a:prstGeom prst="ellipse">
             <a:avLst/>
@@ -14576,8 +14576,8 @@
         </p:nvCxnSpPr>
         <p:spPr>
           <a:xfrm>
-            <a:off x="3705120" y="2704680"/>
-            <a:ext cx="573480" cy="195480"/>
+            <a:off x="3704400" y="2704320"/>
+            <a:ext cx="573840" cy="195840"/>
           </a:xfrm>
           <a:prstGeom prst="straightConnector1">
             <a:avLst/>
@@ -14601,8 +14601,8 @@
         </p:nvCxnSpPr>
         <p:spPr>
           <a:xfrm flipH="1" flipV="1">
-            <a:off x="2794320" y="2894760"/>
-            <a:ext cx="101520" cy="442440"/>
+            <a:off x="2793960" y="2894040"/>
+            <a:ext cx="101520" cy="443160"/>
           </a:xfrm>
           <a:prstGeom prst="straightConnector1">
             <a:avLst/>
@@ -14626,7 +14626,7 @@
         </p:nvCxnSpPr>
         <p:spPr>
           <a:xfrm flipV="1">
-            <a:off x="2794320" y="2073960"/>
+            <a:off x="2793960" y="2073960"/>
             <a:ext cx="556920" cy="441000"/>
           </a:xfrm>
           <a:prstGeom prst="straightConnector1">
@@ -14649,7 +14649,7 @@
         <p:spPr>
           <a:xfrm>
             <a:off x="10543680" y="457200"/>
-            <a:ext cx="1618920" cy="303120"/>
+            <a:ext cx="1618200" cy="303120"/>
           </a:xfrm>
           <a:prstGeom prst="rect">
             <a:avLst/>
@@ -14706,7 +14706,7 @@
         <p:spPr>
           <a:xfrm>
             <a:off x="10543680" y="718560"/>
-            <a:ext cx="1618920" cy="516600"/>
+            <a:ext cx="1618200" cy="516600"/>
           </a:xfrm>
           <a:prstGeom prst="rect">
             <a:avLst/>
@@ -14796,7 +14796,7 @@
         <p:spPr>
           <a:xfrm>
             <a:off x="10287000" y="457200"/>
-            <a:ext cx="1618920" cy="303120"/>
+            <a:ext cx="1618200" cy="303120"/>
           </a:xfrm>
           <a:prstGeom prst="rect">
             <a:avLst/>
@@ -14853,7 +14853,7 @@
         <p:spPr>
           <a:xfrm>
             <a:off x="10287000" y="718560"/>
-            <a:ext cx="1875600" cy="2437920"/>
+            <a:ext cx="1874880" cy="2437920"/>
           </a:xfrm>
           <a:prstGeom prst="rect">
             <a:avLst/>
@@ -15112,7 +15112,7 @@
                 </a:solidFill>
                 <a:latin typeface="Calibri"/>
               </a:rPr>
-              <a:t>upgradeFunction</a:t>
+              <a:t>cost</a:t>
             </a:r>
             <a:endParaRPr b="0" lang="en-US" sz="1400" spc="-1" strike="noStrike">
               <a:solidFill>
@@ -15139,7 +15139,7 @@
                 </a:solidFill>
                 <a:latin typeface="Calibri"/>
               </a:rPr>
-              <a:t>timeFunction</a:t>
+              <a:t>trainingTime</a:t>
             </a:r>
             <a:endParaRPr b="0" lang="en-US" sz="1400" spc="-1" strike="noStrike">
               <a:solidFill>
@@ -15159,7 +15159,7 @@
         <p:spPr>
           <a:xfrm>
             <a:off x="8007120" y="1448280"/>
-            <a:ext cx="2050920" cy="380160"/>
+            <a:ext cx="2050200" cy="379440"/>
           </a:xfrm>
           <a:prstGeom prst="diamond">
             <a:avLst/>
@@ -15226,8 +15226,8 @@
         </p:nvCxnSpPr>
         <p:spPr>
           <a:xfrm>
-            <a:off x="9032760" y="1828440"/>
-            <a:ext cx="1254600" cy="2393280"/>
+            <a:off x="9032400" y="1827720"/>
+            <a:ext cx="1254960" cy="2394000"/>
           </a:xfrm>
           <a:prstGeom prst="straightConnector1">
             <a:avLst/>
@@ -15251,8 +15251,8 @@
         </p:nvCxnSpPr>
         <p:spPr>
           <a:xfrm flipH="1" flipV="1">
-            <a:off x="10058040" y="1638360"/>
-            <a:ext cx="229320" cy="299520"/>
+            <a:off x="10057320" y="1638000"/>
+            <a:ext cx="230040" cy="299880"/>
           </a:xfrm>
           <a:prstGeom prst="straightConnector1">
             <a:avLst/>
@@ -15276,7 +15276,7 @@
         </p:nvCxnSpPr>
         <p:spPr>
           <a:xfrm flipH="1" flipV="1">
-            <a:off x="7465680" y="1220040"/>
+            <a:off x="7465320" y="1220040"/>
             <a:ext cx="1567440" cy="228600"/>
           </a:xfrm>
           <a:prstGeom prst="straightConnector1">
@@ -15299,7 +15299,7 @@
         <p:spPr>
           <a:xfrm>
             <a:off x="5412240" y="5029200"/>
-            <a:ext cx="1618920" cy="303120"/>
+            <a:ext cx="1618200" cy="303120"/>
           </a:xfrm>
           <a:prstGeom prst="rect">
             <a:avLst/>
@@ -15356,7 +15356,7 @@
         <p:spPr>
           <a:xfrm>
             <a:off x="3710160" y="4343400"/>
-            <a:ext cx="1822320" cy="380160"/>
+            <a:ext cx="1821600" cy="379440"/>
           </a:xfrm>
           <a:prstGeom prst="diamond">
             <a:avLst/>
@@ -15423,8 +15423,8 @@
         </p:nvCxnSpPr>
         <p:spPr>
           <a:xfrm>
-            <a:off x="2895480" y="4114800"/>
-            <a:ext cx="815040" cy="419040"/>
+            <a:off x="2895120" y="4114800"/>
+            <a:ext cx="815400" cy="418680"/>
           </a:xfrm>
           <a:prstGeom prst="straightConnector1">
             <a:avLst/>
@@ -15449,8 +15449,8 @@
         </p:nvCxnSpPr>
         <p:spPr>
           <a:xfrm>
-            <a:off x="4621320" y="4723560"/>
-            <a:ext cx="791280" cy="457560"/>
+            <a:off x="4620960" y="4722840"/>
+            <a:ext cx="791640" cy="458280"/>
           </a:xfrm>
           <a:prstGeom prst="straightConnector1">
             <a:avLst/>
@@ -15474,7 +15474,7 @@
         </p:nvCxnSpPr>
         <p:spPr>
           <a:xfrm flipH="1" flipV="1">
-            <a:off x="3350880" y="2073960"/>
+            <a:off x="3350520" y="2073960"/>
             <a:ext cx="2187000" cy="1126800"/>
           </a:xfrm>
           <a:prstGeom prst="straightConnector1">
@@ -15497,7 +15497,7 @@
         <p:spPr>
           <a:xfrm>
             <a:off x="4626720" y="3200400"/>
-            <a:ext cx="1821600" cy="679320"/>
+            <a:ext cx="1820880" cy="678600"/>
           </a:xfrm>
           <a:prstGeom prst="diamond">
             <a:avLst/>
@@ -15564,8 +15564,8 @@
         </p:nvCxnSpPr>
         <p:spPr>
           <a:xfrm flipH="1" flipV="1">
-            <a:off x="5537520" y="3879720"/>
-            <a:ext cx="684360" cy="1149840"/>
+            <a:off x="5537160" y="3879000"/>
+            <a:ext cx="684360" cy="1150560"/>
           </a:xfrm>
           <a:prstGeom prst="straightConnector1">
             <a:avLst/>
@@ -15587,7 +15587,7 @@
         <p:spPr>
           <a:xfrm>
             <a:off x="2693880" y="4415400"/>
-            <a:ext cx="475200" cy="380160"/>
+            <a:ext cx="474480" cy="379440"/>
           </a:xfrm>
           <a:prstGeom prst="triangle">
             <a:avLst>
@@ -15656,7 +15656,7 @@
         </p:nvCxnSpPr>
         <p:spPr>
           <a:xfrm flipH="1" flipV="1">
-            <a:off x="2895480" y="4114800"/>
+            <a:off x="2895120" y="4114800"/>
             <a:ext cx="36360" cy="300960"/>
           </a:xfrm>
           <a:prstGeom prst="straightConnector1">
@@ -15679,7 +15679,7 @@
         <p:spPr>
           <a:xfrm>
             <a:off x="2109960" y="5163480"/>
-            <a:ext cx="1618920" cy="303120"/>
+            <a:ext cx="1618200" cy="303120"/>
           </a:xfrm>
           <a:prstGeom prst="rect">
             <a:avLst/>
@@ -15736,7 +15736,7 @@
         <p:spPr>
           <a:xfrm>
             <a:off x="2109960" y="5163480"/>
-            <a:ext cx="1618920" cy="303120"/>
+            <a:ext cx="1618200" cy="303120"/>
           </a:xfrm>
           <a:prstGeom prst="rect">
             <a:avLst/>
@@ -15793,7 +15793,7 @@
         <p:spPr>
           <a:xfrm>
             <a:off x="2109960" y="5424840"/>
-            <a:ext cx="1618920" cy="363960"/>
+            <a:ext cx="1618200" cy="363960"/>
           </a:xfrm>
           <a:prstGeom prst="rect">
             <a:avLst/>
@@ -15861,8 +15861,8 @@
         </p:nvCxnSpPr>
         <p:spPr>
           <a:xfrm flipH="1">
-            <a:off x="2919240" y="4795560"/>
-            <a:ext cx="12600" cy="368280"/>
+            <a:off x="2918880" y="4794840"/>
+            <a:ext cx="12600" cy="369000"/>
           </a:xfrm>
           <a:prstGeom prst="straightConnector1">
             <a:avLst/>
@@ -15886,8 +15886,8 @@
         </p:nvCxnSpPr>
         <p:spPr>
           <a:xfrm flipH="1">
-            <a:off x="4160520" y="1104480"/>
-            <a:ext cx="266760" cy="177840"/>
+            <a:off x="4159800" y="1104120"/>
+            <a:ext cx="267480" cy="178200"/>
           </a:xfrm>
           <a:prstGeom prst="straightConnector1">
             <a:avLst/>
@@ -15900,16 +15900,38 @@
           </a:ln>
         </p:spPr>
       </p:cxnSp>
+      <p:cxnSp>
+        <p:nvCxnSpPr>
+          <p:cNvPr id="203" name="Straight Arrow Connector 87"/>
+          <p:cNvCxnSpPr/>
+          <p:nvPr/>
+        </p:nvCxnSpPr>
+        <p:spPr>
+          <a:xfrm flipH="1">
+            <a:off x="0" y="3657600"/>
+            <a:ext cx="1837080" cy="8280"/>
+          </a:xfrm>
+          <a:prstGeom prst="straightConnector1">
+            <a:avLst/>
+          </a:prstGeom>
+          <a:ln w="25400">
+            <a:solidFill>
+              <a:srgbClr val="000000"/>
+            </a:solidFill>
+            <a:round/>
+          </a:ln>
+        </p:spPr>
+      </p:cxnSp>
       <p:sp>
         <p:nvSpPr>
-          <p:cNvPr id="203" name="Oval 6"/>
+          <p:cNvPr id="204" name="Oval 10"/>
           <p:cNvSpPr/>
           <p:nvPr/>
         </p:nvSpPr>
         <p:spPr>
           <a:xfrm>
-            <a:off x="8053560" y="2057400"/>
-            <a:ext cx="1215720" cy="380160"/>
+            <a:off x="8686800" y="532800"/>
+            <a:ext cx="1369440" cy="379440"/>
           </a:xfrm>
           <a:prstGeom prst="ellipse">
             <a:avLst/>
@@ -15952,7 +15974,7 @@
                 </a:solidFill>
                 <a:latin typeface="Calibri"/>
               </a:rPr>
-              <a:t>Level</a:t>
+              <a:t>Max Number</a:t>
             </a:r>
             <a:endParaRPr b="0" lang="en-US" sz="1410" spc="-1" strike="noStrike">
               <a:solidFill>
@@ -15965,127 +15987,17 @@
       </p:sp>
       <p:cxnSp>
         <p:nvCxnSpPr>
-          <p:cNvPr id="204" name="Straight Arrow Connector 50"/>
+          <p:cNvPr id="205" name="Straight Arrow Connector 88"/>
           <p:cNvCxnSpPr>
-            <a:stCxn id="203" idx="0"/>
-            <a:endCxn id="185" idx="2"/>
-          </p:cNvCxnSpPr>
-          <p:nvPr/>
-        </p:nvCxnSpPr>
-        <p:spPr>
-          <a:xfrm flipV="1">
-            <a:off x="8661600" y="1828440"/>
-            <a:ext cx="371520" cy="229320"/>
-          </a:xfrm>
-          <a:prstGeom prst="straightConnector1">
-            <a:avLst/>
-          </a:prstGeom>
-          <a:ln w="25400">
-            <a:solidFill>
-              <a:srgbClr val="000000"/>
-            </a:solidFill>
-            <a:round/>
-          </a:ln>
-        </p:spPr>
-      </p:cxnSp>
-      <p:cxnSp>
-        <p:nvCxnSpPr>
-          <p:cNvPr id="205" name="Straight Arrow Connector 87"/>
-          <p:cNvCxnSpPr/>
-          <p:nvPr/>
-        </p:nvCxnSpPr>
-        <p:spPr>
-          <a:xfrm flipH="1">
-            <a:off x="0" y="3657600"/>
-            <a:ext cx="1836360" cy="7560"/>
-          </a:xfrm>
-          <a:prstGeom prst="straightConnector1">
-            <a:avLst/>
-          </a:prstGeom>
-          <a:ln w="25400">
-            <a:solidFill>
-              <a:srgbClr val="000000"/>
-            </a:solidFill>
-            <a:round/>
-          </a:ln>
-        </p:spPr>
-      </p:cxnSp>
-      <p:sp>
-        <p:nvSpPr>
-          <p:cNvPr id="206" name="Oval 10"/>
-          <p:cNvSpPr/>
-          <p:nvPr/>
-        </p:nvSpPr>
-        <p:spPr>
-          <a:xfrm>
-            <a:off x="8686800" y="532800"/>
-            <a:ext cx="1370160" cy="380160"/>
-          </a:xfrm>
-          <a:prstGeom prst="ellipse">
-            <a:avLst/>
-          </a:prstGeom>
-          <a:noFill/>
-          <a:ln>
-            <a:solidFill>
-              <a:srgbClr val="000000"/>
-            </a:solidFill>
-          </a:ln>
-        </p:spPr>
-        <p:style>
-          <a:lnRef idx="2">
-            <a:schemeClr val="accent1">
-              <a:shade val="50000"/>
-            </a:schemeClr>
-          </a:lnRef>
-          <a:fillRef idx="1">
-            <a:schemeClr val="accent1"/>
-          </a:fillRef>
-          <a:effectRef idx="0">
-            <a:schemeClr val="accent1"/>
-          </a:effectRef>
-          <a:fontRef idx="minor"/>
-        </p:style>
-        <p:txBody>
-          <a:bodyPr lIns="90000" rIns="90000" tIns="45000" bIns="45000" anchor="ctr">
-            <a:noAutofit/>
-          </a:bodyPr>
-          <a:p>
-            <a:pPr algn="ctr" defTabSz="914400">
-              <a:lnSpc>
-                <a:spcPct val="100000"/>
-              </a:lnSpc>
-            </a:pPr>
-            <a:r>
-              <a:rPr b="0" lang="en-US" sz="1410" spc="-1" strike="noStrike">
-                <a:solidFill>
-                  <a:schemeClr val="dk1"/>
-                </a:solidFill>
-                <a:latin typeface="Calibri"/>
-              </a:rPr>
-              <a:t>Max Number</a:t>
-            </a:r>
-            <a:endParaRPr b="0" lang="en-US" sz="1410" spc="-1" strike="noStrike">
-              <a:solidFill>
-                <a:srgbClr val="000000"/>
-              </a:solidFill>
-              <a:latin typeface="Arial"/>
-            </a:endParaRPr>
-          </a:p>
-        </p:txBody>
-      </p:sp>
-      <p:cxnSp>
-        <p:nvCxnSpPr>
-          <p:cNvPr id="207" name="Straight Arrow Connector 88"/>
-          <p:cNvCxnSpPr>
-            <a:stCxn id="206" idx="4"/>
+            <a:stCxn id="204" idx="4"/>
             <a:endCxn id="185" idx="0"/>
           </p:cNvCxnSpPr>
           <p:nvPr/>
         </p:nvCxnSpPr>
         <p:spPr>
           <a:xfrm flipH="1">
-            <a:off x="9032760" y="912960"/>
-            <a:ext cx="339480" cy="535680"/>
+            <a:off x="9032400" y="912240"/>
+            <a:ext cx="339480" cy="536400"/>
           </a:xfrm>
           <a:prstGeom prst="straightConnector1">
             <a:avLst/>
@@ -16130,14 +16042,14 @@
       </p:grpSpPr>
       <p:cxnSp>
         <p:nvCxnSpPr>
-          <p:cNvPr id="208" name="Straight Arrow Connector 1"/>
+          <p:cNvPr id="206" name="Straight Arrow Connector 1"/>
           <p:cNvCxnSpPr/>
           <p:nvPr/>
         </p:nvCxnSpPr>
         <p:spPr>
           <a:xfrm flipH="1">
             <a:off x="0" y="3073320"/>
-            <a:ext cx="1836360" cy="7560"/>
+            <a:ext cx="1837080" cy="8280"/>
           </a:xfrm>
           <a:prstGeom prst="straightConnector1">
             <a:avLst/>
@@ -16153,14 +16065,14 @@
       </p:cxnSp>
       <p:cxnSp>
         <p:nvCxnSpPr>
-          <p:cNvPr id="209" name="Straight Arrow Connector 2"/>
+          <p:cNvPr id="207" name="Straight Arrow Connector 2"/>
           <p:cNvCxnSpPr/>
           <p:nvPr/>
         </p:nvCxnSpPr>
         <p:spPr>
           <a:xfrm>
             <a:off x="0" y="2489400"/>
-            <a:ext cx="1836360" cy="7560"/>
+            <a:ext cx="1837080" cy="8280"/>
           </a:xfrm>
           <a:prstGeom prst="straightConnector1">
             <a:avLst/>
@@ -16176,14 +16088,14 @@
       </p:cxnSp>
       <p:cxnSp>
         <p:nvCxnSpPr>
-          <p:cNvPr id="210" name="Straight Arrow Connector 3"/>
+          <p:cNvPr id="208" name="Straight Arrow Connector 3"/>
           <p:cNvCxnSpPr/>
           <p:nvPr/>
         </p:nvCxnSpPr>
         <p:spPr>
           <a:xfrm>
             <a:off x="0" y="2781360"/>
-            <a:ext cx="1836360" cy="7560"/>
+            <a:ext cx="1837080" cy="8280"/>
           </a:xfrm>
           <a:prstGeom prst="straightConnector1">
             <a:avLst/>
@@ -16199,14 +16111,14 @@
       </p:cxnSp>
       <p:cxnSp>
         <p:nvCxnSpPr>
-          <p:cNvPr id="211" name="Straight Arrow Connector 4"/>
+          <p:cNvPr id="209" name="Straight Arrow Connector 4"/>
           <p:cNvCxnSpPr/>
           <p:nvPr/>
         </p:nvCxnSpPr>
         <p:spPr>
           <a:xfrm flipH="1">
             <a:off x="0" y="3657600"/>
-            <a:ext cx="1836360" cy="7560"/>
+            <a:ext cx="1837080" cy="8280"/>
           </a:xfrm>
           <a:prstGeom prst="straightConnector1">
             <a:avLst/>
@@ -16221,14 +16133,14 @@
       </p:cxnSp>
       <p:sp>
         <p:nvSpPr>
-          <p:cNvPr id="212" name="Diamond 1"/>
+          <p:cNvPr id="210" name="Diamond 1"/>
           <p:cNvSpPr/>
           <p:nvPr/>
         </p:nvSpPr>
         <p:spPr>
           <a:xfrm>
             <a:off x="128520" y="6134040"/>
-            <a:ext cx="1564200" cy="380160"/>
+            <a:ext cx="1563480" cy="379440"/>
           </a:xfrm>
           <a:prstGeom prst="diamond">
             <a:avLst/>
@@ -16286,14 +16198,14 @@
       </p:sp>
       <p:sp>
         <p:nvSpPr>
-          <p:cNvPr id="213" name="Oval 1"/>
+          <p:cNvPr id="211" name="Oval 1"/>
           <p:cNvSpPr/>
           <p:nvPr/>
         </p:nvSpPr>
         <p:spPr>
           <a:xfrm>
             <a:off x="302760" y="5454000"/>
-            <a:ext cx="1215720" cy="380160"/>
+            <a:ext cx="1215000" cy="379440"/>
           </a:xfrm>
           <a:prstGeom prst="ellipse">
             <a:avLst/>
@@ -16349,28 +16261,28 @@
       </p:sp>
       <p:grpSp>
         <p:nvGrpSpPr>
-          <p:cNvPr id="214" name="Group 1"/>
+          <p:cNvPr id="212" name="Group 1"/>
           <p:cNvGrpSpPr/>
           <p:nvPr/>
         </p:nvGrpSpPr>
         <p:grpSpPr>
           <a:xfrm>
             <a:off x="101160" y="336240"/>
-            <a:ext cx="1618920" cy="777960"/>
+            <a:ext cx="1618200" cy="777960"/>
             <a:chOff x="101160" y="336240"/>
-            <a:chExt cx="1618920" cy="777960"/>
+            <a:chExt cx="1618200" cy="777960"/>
           </a:xfrm>
         </p:grpSpPr>
         <p:sp>
           <p:nvSpPr>
-            <p:cNvPr id="215" name="TextBox 1"/>
+            <p:cNvPr id="213" name="TextBox 1"/>
             <p:cNvSpPr/>
             <p:nvPr/>
           </p:nvSpPr>
           <p:spPr>
             <a:xfrm>
               <a:off x="101160" y="336240"/>
-              <a:ext cx="1618920" cy="303120"/>
+              <a:ext cx="1618200" cy="303120"/>
             </a:xfrm>
             <a:prstGeom prst="rect">
               <a:avLst/>
@@ -16420,14 +16332,14 @@
         </p:sp>
         <p:sp>
           <p:nvSpPr>
-            <p:cNvPr id="216" name="TextBox 2"/>
+            <p:cNvPr id="214" name="TextBox 2"/>
             <p:cNvSpPr/>
             <p:nvPr/>
           </p:nvSpPr>
           <p:spPr>
             <a:xfrm>
               <a:off x="101160" y="597600"/>
-              <a:ext cx="1618920" cy="516600"/>
+              <a:ext cx="1618200" cy="516600"/>
             </a:xfrm>
             <a:prstGeom prst="rect">
               <a:avLst/>
@@ -16511,14 +16423,14 @@
       </p:grpSp>
       <p:sp>
         <p:nvSpPr>
-          <p:cNvPr id="217" name="Diamond 2"/>
+          <p:cNvPr id="215" name="Diamond 2"/>
           <p:cNvSpPr/>
           <p:nvPr/>
         </p:nvSpPr>
         <p:spPr>
           <a:xfrm>
             <a:off x="128520" y="4629600"/>
-            <a:ext cx="1564200" cy="524880"/>
+            <a:ext cx="1563480" cy="524160"/>
           </a:xfrm>
           <a:prstGeom prst="diamond">
             <a:avLst/>
@@ -16599,14 +16511,14 @@
       </p:sp>
       <p:cxnSp>
         <p:nvCxnSpPr>
-          <p:cNvPr id="218" name="Straight Arrow Connector 5"/>
+          <p:cNvPr id="216" name="Straight Arrow Connector 5"/>
           <p:cNvCxnSpPr/>
           <p:nvPr/>
         </p:nvCxnSpPr>
         <p:spPr>
           <a:xfrm>
             <a:off x="0" y="3365640"/>
-            <a:ext cx="1836360" cy="7560"/>
+            <a:ext cx="1837080" cy="8280"/>
           </a:xfrm>
           <a:prstGeom prst="straightConnector1">
             <a:avLst/>
@@ -16621,14 +16533,14 @@
       </p:cxnSp>
       <p:sp>
         <p:nvSpPr>
-          <p:cNvPr id="219" name="Isosceles Triangle 1"/>
+          <p:cNvPr id="217" name="Isosceles Triangle 1"/>
           <p:cNvSpPr/>
           <p:nvPr/>
         </p:nvSpPr>
         <p:spPr>
           <a:xfrm>
             <a:off x="673200" y="3949920"/>
-            <a:ext cx="475200" cy="380160"/>
+            <a:ext cx="474480" cy="379440"/>
           </a:xfrm>
           <a:prstGeom prst="triangle">
             <a:avLst>
@@ -16688,28 +16600,28 @@
       </p:sp>
       <p:grpSp>
         <p:nvGrpSpPr>
-          <p:cNvPr id="220" name="Group 2"/>
+          <p:cNvPr id="218" name="Group 2"/>
           <p:cNvGrpSpPr/>
           <p:nvPr/>
         </p:nvGrpSpPr>
         <p:grpSpPr>
           <a:xfrm>
             <a:off x="101160" y="1413000"/>
-            <a:ext cx="1618920" cy="777960"/>
+            <a:ext cx="1618200" cy="777960"/>
             <a:chOff x="101160" y="1413000"/>
-            <a:chExt cx="1618920" cy="777960"/>
+            <a:chExt cx="1618200" cy="777960"/>
           </a:xfrm>
         </p:grpSpPr>
         <p:sp>
           <p:nvSpPr>
-            <p:cNvPr id="221" name="TextBox 3"/>
+            <p:cNvPr id="219" name="TextBox 3"/>
             <p:cNvSpPr/>
             <p:nvPr/>
           </p:nvSpPr>
           <p:spPr>
             <a:xfrm>
               <a:off x="101160" y="1413000"/>
-              <a:ext cx="1618920" cy="303120"/>
+              <a:ext cx="1618200" cy="303120"/>
             </a:xfrm>
             <a:prstGeom prst="rect">
               <a:avLst/>
@@ -16760,14 +16672,14 @@
         </p:sp>
         <p:sp>
           <p:nvSpPr>
-            <p:cNvPr id="222" name="TextBox 4"/>
+            <p:cNvPr id="220" name="TextBox 4"/>
             <p:cNvSpPr/>
             <p:nvPr/>
           </p:nvSpPr>
           <p:spPr>
             <a:xfrm>
               <a:off x="101160" y="1674360"/>
-              <a:ext cx="1618920" cy="516600"/>
+              <a:ext cx="1618200" cy="516600"/>
             </a:xfrm>
             <a:prstGeom prst="rect">
               <a:avLst/>
@@ -16852,14 +16764,14 @@
       </p:grpSp>
       <p:sp>
         <p:nvSpPr>
-          <p:cNvPr id="223" name="TextBox 19"/>
+          <p:cNvPr id="221" name="TextBox 19"/>
           <p:cNvSpPr/>
           <p:nvPr/>
         </p:nvSpPr>
         <p:spPr>
           <a:xfrm>
             <a:off x="4775040" y="457200"/>
-            <a:ext cx="1618920" cy="303120"/>
+            <a:ext cx="1618200" cy="303120"/>
           </a:xfrm>
           <a:prstGeom prst="rect">
             <a:avLst/>
@@ -16909,14 +16821,14 @@
       </p:sp>
       <p:sp>
         <p:nvSpPr>
-          <p:cNvPr id="224" name="TextBox 20"/>
+          <p:cNvPr id="222" name="TextBox 20"/>
           <p:cNvSpPr/>
           <p:nvPr/>
         </p:nvSpPr>
         <p:spPr>
           <a:xfrm>
             <a:off x="4775040" y="718560"/>
-            <a:ext cx="1618920" cy="730080"/>
+            <a:ext cx="1618200" cy="730080"/>
           </a:xfrm>
           <a:prstGeom prst="rect">
             <a:avLst/>
@@ -17026,28 +16938,28 @@
       </p:sp>
       <p:grpSp>
         <p:nvGrpSpPr>
-          <p:cNvPr id="225" name="Group 6"/>
+          <p:cNvPr id="223" name="Group 6"/>
           <p:cNvGrpSpPr/>
           <p:nvPr/>
         </p:nvGrpSpPr>
         <p:grpSpPr>
           <a:xfrm>
             <a:off x="4572000" y="4274280"/>
-            <a:ext cx="1618920" cy="991440"/>
+            <a:ext cx="1618200" cy="991440"/>
             <a:chOff x="4572000" y="4274280"/>
-            <a:chExt cx="1618920" cy="991440"/>
+            <a:chExt cx="1618200" cy="991440"/>
           </a:xfrm>
         </p:grpSpPr>
         <p:sp>
           <p:nvSpPr>
-            <p:cNvPr id="226" name="TextBox 21"/>
+            <p:cNvPr id="224" name="TextBox 21"/>
             <p:cNvSpPr/>
             <p:nvPr/>
           </p:nvSpPr>
           <p:spPr>
             <a:xfrm>
               <a:off x="4572000" y="4274280"/>
-              <a:ext cx="1618920" cy="303120"/>
+              <a:ext cx="1618200" cy="303120"/>
             </a:xfrm>
             <a:prstGeom prst="rect">
               <a:avLst/>
@@ -17097,14 +17009,14 @@
         </p:sp>
         <p:sp>
           <p:nvSpPr>
-            <p:cNvPr id="227" name="TextBox 30"/>
+            <p:cNvPr id="225" name="TextBox 30"/>
             <p:cNvSpPr/>
             <p:nvPr/>
           </p:nvSpPr>
           <p:spPr>
             <a:xfrm>
               <a:off x="4572000" y="4535640"/>
-              <a:ext cx="1618920" cy="730080"/>
+              <a:ext cx="1618200" cy="730080"/>
             </a:xfrm>
             <a:prstGeom prst="rect">
               <a:avLst/>
@@ -17215,14 +17127,14 @@
       </p:grpSp>
       <p:sp>
         <p:nvSpPr>
-          <p:cNvPr id="228" name="Diamond 9"/>
+          <p:cNvPr id="226" name="Diamond 9"/>
           <p:cNvSpPr/>
           <p:nvPr/>
         </p:nvSpPr>
         <p:spPr>
           <a:xfrm>
             <a:off x="3231360" y="2899800"/>
-            <a:ext cx="1564200" cy="380160"/>
+            <a:ext cx="1563480" cy="379440"/>
           </a:xfrm>
           <a:prstGeom prst="diamond">
             <a:avLst/>
@@ -17280,14 +17192,14 @@
       </p:sp>
       <p:sp>
         <p:nvSpPr>
-          <p:cNvPr id="229" name="Diamond 10"/>
+          <p:cNvPr id="227" name="Diamond 10"/>
           <p:cNvSpPr/>
           <p:nvPr/>
         </p:nvSpPr>
         <p:spPr>
           <a:xfrm>
             <a:off x="4602960" y="2585160"/>
-            <a:ext cx="1792800" cy="381600"/>
+            <a:ext cx="1792080" cy="380880"/>
           </a:xfrm>
           <a:prstGeom prst="diamond">
             <a:avLst/>
@@ -17345,17 +17257,17 @@
       </p:sp>
       <p:cxnSp>
         <p:nvCxnSpPr>
-          <p:cNvPr id="230" name="Straight Arrow Connector 24"/>
+          <p:cNvPr id="228" name="Straight Arrow Connector 24"/>
           <p:cNvCxnSpPr>
-            <a:stCxn id="225" idx="0"/>
-            <a:endCxn id="228" idx="2"/>
+            <a:stCxn id="223" idx="0"/>
+            <a:endCxn id="226" idx="2"/>
           </p:cNvCxnSpPr>
           <p:nvPr/>
         </p:nvCxnSpPr>
         <p:spPr>
           <a:xfrm flipH="1" flipV="1">
-            <a:off x="4013640" y="3279960"/>
-            <a:ext cx="1368000" cy="994680"/>
+            <a:off x="4013280" y="3279240"/>
+            <a:ext cx="1368000" cy="995400"/>
           </a:xfrm>
           <a:prstGeom prst="straightConnector1">
             <a:avLst/>
@@ -17371,16 +17283,16 @@
       </p:cxnSp>
       <p:cxnSp>
         <p:nvCxnSpPr>
-          <p:cNvPr id="231" name="Straight Arrow Connector 18"/>
+          <p:cNvPr id="229" name="Straight Arrow Connector 18"/>
           <p:cNvCxnSpPr>
-            <a:stCxn id="229" idx="0"/>
-            <a:endCxn id="224" idx="2"/>
+            <a:stCxn id="227" idx="0"/>
+            <a:endCxn id="222" idx="2"/>
           </p:cNvCxnSpPr>
           <p:nvPr/>
         </p:nvCxnSpPr>
         <p:spPr>
           <a:xfrm flipV="1">
-            <a:off x="5499360" y="1448640"/>
+            <a:off x="5499000" y="1448640"/>
             <a:ext cx="85320" cy="1136880"/>
           </a:xfrm>
           <a:prstGeom prst="straightConnector1">
@@ -17396,17 +17308,17 @@
       </p:cxnSp>
       <p:cxnSp>
         <p:nvCxnSpPr>
-          <p:cNvPr id="232" name="Straight Arrow Connector 17"/>
+          <p:cNvPr id="230" name="Straight Arrow Connector 17"/>
           <p:cNvCxnSpPr>
-            <a:stCxn id="225" idx="0"/>
-            <a:endCxn id="229" idx="2"/>
+            <a:stCxn id="223" idx="0"/>
+            <a:endCxn id="227" idx="2"/>
           </p:cNvCxnSpPr>
           <p:nvPr/>
         </p:nvCxnSpPr>
         <p:spPr>
           <a:xfrm flipV="1">
-            <a:off x="5381280" y="2966760"/>
-            <a:ext cx="118440" cy="1307880"/>
+            <a:off x="5380920" y="2966040"/>
+            <a:ext cx="118440" cy="1308600"/>
           </a:xfrm>
           <a:prstGeom prst="straightConnector1">
             <a:avLst/>
@@ -17421,16 +17333,16 @@
       </p:cxnSp>
       <p:cxnSp>
         <p:nvCxnSpPr>
-          <p:cNvPr id="233" name="Straight Arrow Connector 23"/>
+          <p:cNvPr id="231" name="Straight Arrow Connector 23"/>
           <p:cNvCxnSpPr>
-            <a:stCxn id="224" idx="2"/>
-            <a:endCxn id="228" idx="0"/>
+            <a:stCxn id="222" idx="2"/>
+            <a:endCxn id="226" idx="0"/>
           </p:cNvCxnSpPr>
           <p:nvPr/>
         </p:nvCxnSpPr>
         <p:spPr>
           <a:xfrm flipH="1">
-            <a:off x="4013640" y="1448640"/>
+            <a:off x="4013280" y="1448640"/>
             <a:ext cx="1571040" cy="1451520"/>
           </a:xfrm>
           <a:prstGeom prst="straightConnector1">
@@ -17446,14 +17358,14 @@
       </p:cxnSp>
       <p:sp>
         <p:nvSpPr>
-          <p:cNvPr id="234" name="Diamond 11"/>
+          <p:cNvPr id="232" name="Diamond 11"/>
           <p:cNvSpPr/>
           <p:nvPr/>
         </p:nvSpPr>
         <p:spPr>
           <a:xfrm>
             <a:off x="2743200" y="457200"/>
-            <a:ext cx="1564200" cy="380160"/>
+            <a:ext cx="1563480" cy="379440"/>
           </a:xfrm>
           <a:prstGeom prst="diamond">
             <a:avLst/>
@@ -17511,17 +17423,17 @@
       </p:sp>
       <p:cxnSp>
         <p:nvCxnSpPr>
-          <p:cNvPr id="235" name="Straight Arrow Connector 25"/>
+          <p:cNvPr id="233" name="Straight Arrow Connector 25"/>
           <p:cNvCxnSpPr>
-            <a:stCxn id="224" idx="1"/>
-            <a:endCxn id="234" idx="3"/>
+            <a:stCxn id="222" idx="1"/>
+            <a:endCxn id="232" idx="3"/>
           </p:cNvCxnSpPr>
           <p:nvPr/>
         </p:nvCxnSpPr>
         <p:spPr>
           <a:xfrm flipH="1" flipV="1">
-            <a:off x="4307400" y="647280"/>
-            <a:ext cx="468000" cy="436680"/>
+            <a:off x="4306680" y="646920"/>
+            <a:ext cx="468720" cy="437040"/>
           </a:xfrm>
           <a:prstGeom prst="straightConnector1">
             <a:avLst/>
@@ -17536,17 +17448,17 @@
       </p:cxnSp>
       <p:cxnSp>
         <p:nvCxnSpPr>
-          <p:cNvPr id="236" name="Straight Arrow Connector 26"/>
+          <p:cNvPr id="234" name="Straight Arrow Connector 26"/>
           <p:cNvCxnSpPr>
-            <a:stCxn id="224" idx="1"/>
-            <a:endCxn id="234" idx="2"/>
+            <a:stCxn id="222" idx="1"/>
+            <a:endCxn id="232" idx="2"/>
           </p:cNvCxnSpPr>
           <p:nvPr/>
         </p:nvCxnSpPr>
         <p:spPr>
           <a:xfrm flipH="1" flipV="1">
-            <a:off x="3525480" y="837360"/>
-            <a:ext cx="1249920" cy="246600"/>
+            <a:off x="3525120" y="836640"/>
+            <a:ext cx="1250280" cy="247320"/>
           </a:xfrm>
           <a:prstGeom prst="straightConnector1">
             <a:avLst/>
@@ -17561,28 +17473,28 @@
       </p:cxnSp>
       <p:grpSp>
         <p:nvGrpSpPr>
-          <p:cNvPr id="237" name="Group 7"/>
+          <p:cNvPr id="235" name="Group 7"/>
           <p:cNvGrpSpPr/>
           <p:nvPr/>
         </p:nvGrpSpPr>
         <p:grpSpPr>
           <a:xfrm>
             <a:off x="8686800" y="837360"/>
-            <a:ext cx="1618920" cy="991440"/>
+            <a:ext cx="1618200" cy="991440"/>
             <a:chOff x="8686800" y="837360"/>
-            <a:chExt cx="1618920" cy="991440"/>
+            <a:chExt cx="1618200" cy="991440"/>
           </a:xfrm>
         </p:grpSpPr>
         <p:sp>
           <p:nvSpPr>
-            <p:cNvPr id="238" name="TextBox 31"/>
+            <p:cNvPr id="236" name="TextBox 31"/>
             <p:cNvSpPr/>
             <p:nvPr/>
           </p:nvSpPr>
           <p:spPr>
             <a:xfrm>
               <a:off x="8686800" y="837360"/>
-              <a:ext cx="1618920" cy="303120"/>
+              <a:ext cx="1618200" cy="303120"/>
             </a:xfrm>
             <a:prstGeom prst="rect">
               <a:avLst/>
@@ -17632,14 +17544,14 @@
         </p:sp>
         <p:sp>
           <p:nvSpPr>
-            <p:cNvPr id="239" name="TextBox 32"/>
+            <p:cNvPr id="237" name="TextBox 32"/>
             <p:cNvSpPr/>
             <p:nvPr/>
           </p:nvSpPr>
           <p:spPr>
             <a:xfrm>
               <a:off x="8686800" y="1098720"/>
-              <a:ext cx="1618920" cy="730080"/>
+              <a:ext cx="1618200" cy="730080"/>
             </a:xfrm>
             <a:prstGeom prst="rect">
               <a:avLst/>
@@ -17750,14 +17662,14 @@
       </p:grpSp>
       <p:sp>
         <p:nvSpPr>
-          <p:cNvPr id="240" name="Diamond 12"/>
+          <p:cNvPr id="238" name="Diamond 12"/>
           <p:cNvSpPr/>
           <p:nvPr/>
         </p:nvSpPr>
         <p:spPr>
           <a:xfrm>
             <a:off x="128880" y="6134040"/>
-            <a:ext cx="1564200" cy="380160"/>
+            <a:ext cx="1563480" cy="379440"/>
           </a:xfrm>
           <a:prstGeom prst="diamond">
             <a:avLst/>
@@ -17815,14 +17727,14 @@
       </p:sp>
       <p:sp>
         <p:nvSpPr>
-          <p:cNvPr id="241" name="Diamond 13"/>
+          <p:cNvPr id="239" name="Diamond 13"/>
           <p:cNvSpPr/>
           <p:nvPr/>
         </p:nvSpPr>
         <p:spPr>
           <a:xfrm>
             <a:off x="7315200" y="228600"/>
-            <a:ext cx="1564200" cy="380160"/>
+            <a:ext cx="1563480" cy="379440"/>
           </a:xfrm>
           <a:prstGeom prst="diamond">
             <a:avLst/>
@@ -17880,14 +17792,14 @@
       </p:sp>
       <p:cxnSp>
         <p:nvCxnSpPr>
-          <p:cNvPr id="242" name="Straight Arrow Connector 27"/>
+          <p:cNvPr id="240" name="Straight Arrow Connector 27"/>
           <p:cNvCxnSpPr/>
           <p:nvPr/>
         </p:nvCxnSpPr>
         <p:spPr>
           <a:xfrm>
             <a:off x="360" y="3366000"/>
-            <a:ext cx="1836360" cy="7560"/>
+            <a:ext cx="1837080" cy="8280"/>
           </a:xfrm>
           <a:prstGeom prst="straightConnector1">
             <a:avLst/>
@@ -17902,17 +17814,17 @@
       </p:cxnSp>
       <p:cxnSp>
         <p:nvCxnSpPr>
-          <p:cNvPr id="243" name="Straight Arrow Connector 28"/>
+          <p:cNvPr id="241" name="Straight Arrow Connector 28"/>
           <p:cNvCxnSpPr>
-            <a:stCxn id="241" idx="1"/>
-            <a:endCxn id="224" idx="3"/>
+            <a:stCxn id="239" idx="1"/>
+            <a:endCxn id="222" idx="3"/>
           </p:cNvCxnSpPr>
           <p:nvPr/>
         </p:nvCxnSpPr>
         <p:spPr>
           <a:xfrm flipH="1">
-            <a:off x="6393960" y="418680"/>
-            <a:ext cx="921600" cy="665280"/>
+            <a:off x="6393240" y="418320"/>
+            <a:ext cx="922320" cy="665640"/>
           </a:xfrm>
           <a:prstGeom prst="straightConnector1">
             <a:avLst/>
@@ -17927,14 +17839,14 @@
       </p:cxnSp>
       <p:sp>
         <p:nvSpPr>
-          <p:cNvPr id="244" name="Diamond 14"/>
+          <p:cNvPr id="242" name="Diamond 14"/>
           <p:cNvSpPr/>
           <p:nvPr/>
         </p:nvSpPr>
         <p:spPr>
           <a:xfrm>
             <a:off x="6629400" y="1442160"/>
-            <a:ext cx="1823400" cy="609840"/>
+            <a:ext cx="1822680" cy="609120"/>
           </a:xfrm>
           <a:prstGeom prst="diamond">
             <a:avLst/>
@@ -17992,17 +17904,17 @@
       </p:sp>
       <p:cxnSp>
         <p:nvCxnSpPr>
-          <p:cNvPr id="245" name="Straight Arrow Connector 30"/>
+          <p:cNvPr id="243" name="Straight Arrow Connector 30"/>
           <p:cNvCxnSpPr>
-            <a:stCxn id="237" idx="0"/>
-            <a:endCxn id="241" idx="3"/>
+            <a:stCxn id="235" idx="0"/>
+            <a:endCxn id="239" idx="3"/>
           </p:cNvCxnSpPr>
           <p:nvPr/>
         </p:nvCxnSpPr>
         <p:spPr>
           <a:xfrm flipH="1" flipV="1">
-            <a:off x="8879400" y="418680"/>
-            <a:ext cx="617040" cy="419040"/>
+            <a:off x="8878680" y="418320"/>
+            <a:ext cx="617400" cy="419400"/>
           </a:xfrm>
           <a:prstGeom prst="straightConnector1">
             <a:avLst/>
@@ -18018,14 +17930,14 @@
       </p:cxnSp>
       <p:sp>
         <p:nvSpPr>
-          <p:cNvPr id="246" name="Diamond 15"/>
+          <p:cNvPr id="244" name="Diamond 15"/>
           <p:cNvSpPr/>
           <p:nvPr/>
         </p:nvSpPr>
         <p:spPr>
           <a:xfrm>
             <a:off x="6629400" y="2514600"/>
-            <a:ext cx="1564200" cy="380160"/>
+            <a:ext cx="1563480" cy="379440"/>
           </a:xfrm>
           <a:prstGeom prst="diamond">
             <a:avLst/>
@@ -18083,17 +17995,17 @@
       </p:sp>
       <p:cxnSp>
         <p:nvCxnSpPr>
-          <p:cNvPr id="247" name="Straight Arrow Connector 32"/>
+          <p:cNvPr id="245" name="Straight Arrow Connector 32"/>
           <p:cNvCxnSpPr>
-            <a:stCxn id="237" idx="2"/>
-            <a:endCxn id="246" idx="3"/>
+            <a:stCxn id="235" idx="2"/>
+            <a:endCxn id="244" idx="3"/>
           </p:cNvCxnSpPr>
           <p:nvPr/>
         </p:nvCxnSpPr>
         <p:spPr>
           <a:xfrm flipH="1">
-            <a:off x="8193600" y="1828800"/>
-            <a:ext cx="1302840" cy="876240"/>
+            <a:off x="8192880" y="1828800"/>
+            <a:ext cx="1303200" cy="875880"/>
           </a:xfrm>
           <a:prstGeom prst="straightConnector1">
             <a:avLst/>
@@ -18108,17 +18020,17 @@
       </p:cxnSp>
       <p:cxnSp>
         <p:nvCxnSpPr>
-          <p:cNvPr id="248" name="Straight Arrow Connector 33"/>
+          <p:cNvPr id="246" name="Straight Arrow Connector 33"/>
           <p:cNvCxnSpPr>
-            <a:stCxn id="246" idx="1"/>
-            <a:endCxn id="225" idx="3"/>
+            <a:stCxn id="244" idx="1"/>
+            <a:endCxn id="223" idx="3"/>
           </p:cNvCxnSpPr>
           <p:nvPr/>
         </p:nvCxnSpPr>
         <p:spPr>
           <a:xfrm flipH="1">
-            <a:off x="6190920" y="2704680"/>
-            <a:ext cx="438840" cy="2065680"/>
+            <a:off x="6190200" y="2704320"/>
+            <a:ext cx="439560" cy="2066040"/>
           </a:xfrm>
           <a:prstGeom prst="straightConnector1">
             <a:avLst/>
@@ -18133,17 +18045,17 @@
       </p:cxnSp>
       <p:cxnSp>
         <p:nvCxnSpPr>
-          <p:cNvPr id="249" name="Straight Arrow Connector 34"/>
+          <p:cNvPr id="247" name="Straight Arrow Connector 34"/>
           <p:cNvCxnSpPr>
-            <a:stCxn id="237" idx="1"/>
-            <a:endCxn id="244" idx="3"/>
+            <a:stCxn id="235" idx="1"/>
+            <a:endCxn id="242" idx="3"/>
           </p:cNvCxnSpPr>
           <p:nvPr/>
         </p:nvCxnSpPr>
         <p:spPr>
           <a:xfrm flipH="1">
-            <a:off x="8452800" y="1333080"/>
-            <a:ext cx="234360" cy="414360"/>
+            <a:off x="8452080" y="1333080"/>
+            <a:ext cx="235080" cy="414000"/>
           </a:xfrm>
           <a:prstGeom prst="straightConnector1">
             <a:avLst/>
@@ -18158,17 +18070,17 @@
       </p:cxnSp>
       <p:cxnSp>
         <p:nvCxnSpPr>
-          <p:cNvPr id="250" name="Straight Arrow Connector 31"/>
+          <p:cNvPr id="248" name="Straight Arrow Connector 31"/>
           <p:cNvCxnSpPr>
-            <a:stCxn id="244" idx="1"/>
-            <a:endCxn id="224" idx="2"/>
+            <a:stCxn id="242" idx="1"/>
+            <a:endCxn id="222" idx="2"/>
           </p:cNvCxnSpPr>
           <p:nvPr/>
         </p:nvCxnSpPr>
         <p:spPr>
           <a:xfrm flipH="1" flipV="1">
-            <a:off x="5584320" y="1448640"/>
-            <a:ext cx="1045440" cy="298800"/>
+            <a:off x="5583960" y="1448640"/>
+            <a:ext cx="1045800" cy="298440"/>
           </a:xfrm>
           <a:prstGeom prst="straightConnector1">
             <a:avLst/>
@@ -18183,28 +18095,28 @@
       </p:cxnSp>
       <p:grpSp>
         <p:nvGrpSpPr>
-          <p:cNvPr id="251" name="Group 11"/>
+          <p:cNvPr id="249" name="Group 11"/>
           <p:cNvGrpSpPr/>
           <p:nvPr/>
         </p:nvGrpSpPr>
         <p:grpSpPr>
           <a:xfrm>
             <a:off x="101160" y="336240"/>
-            <a:ext cx="1618920" cy="777960"/>
+            <a:ext cx="1618200" cy="777960"/>
             <a:chOff x="101160" y="336240"/>
-            <a:chExt cx="1618920" cy="777960"/>
+            <a:chExt cx="1618200" cy="777960"/>
           </a:xfrm>
         </p:grpSpPr>
         <p:sp>
           <p:nvSpPr>
-            <p:cNvPr id="252" name="TextBox 51"/>
+            <p:cNvPr id="250" name="TextBox 51"/>
             <p:cNvSpPr/>
             <p:nvPr/>
           </p:nvSpPr>
           <p:spPr>
             <a:xfrm>
               <a:off x="101160" y="336240"/>
-              <a:ext cx="1618920" cy="303120"/>
+              <a:ext cx="1618200" cy="303120"/>
             </a:xfrm>
             <a:prstGeom prst="rect">
               <a:avLst/>
@@ -18254,14 +18166,14 @@
         </p:sp>
         <p:sp>
           <p:nvSpPr>
-            <p:cNvPr id="253" name="TextBox 52"/>
+            <p:cNvPr id="251" name="TextBox 52"/>
             <p:cNvSpPr/>
             <p:nvPr/>
           </p:nvSpPr>
           <p:spPr>
             <a:xfrm>
               <a:off x="101160" y="597600"/>
-              <a:ext cx="1618920" cy="516600"/>
+              <a:ext cx="1618200" cy="516600"/>
             </a:xfrm>
             <a:prstGeom prst="rect">
               <a:avLst/>
@@ -18345,28 +18257,28 @@
       </p:grpSp>
       <p:grpSp>
         <p:nvGrpSpPr>
-          <p:cNvPr id="254" name="Group 14"/>
+          <p:cNvPr id="252" name="Group 14"/>
           <p:cNvGrpSpPr/>
           <p:nvPr/>
         </p:nvGrpSpPr>
         <p:grpSpPr>
           <a:xfrm>
             <a:off x="6760440" y="4359960"/>
-            <a:ext cx="1618920" cy="559080"/>
+            <a:ext cx="1618200" cy="558360"/>
             <a:chOff x="6760440" y="4359960"/>
-            <a:chExt cx="1618920" cy="559080"/>
+            <a:chExt cx="1618200" cy="558360"/>
           </a:xfrm>
         </p:grpSpPr>
         <p:sp>
           <p:nvSpPr>
-            <p:cNvPr id="255" name="TextBox 55"/>
+            <p:cNvPr id="253" name="TextBox 55"/>
             <p:cNvSpPr/>
             <p:nvPr/>
           </p:nvSpPr>
           <p:spPr>
             <a:xfrm>
               <a:off x="6760440" y="4359960"/>
-              <a:ext cx="1618920" cy="303120"/>
+              <a:ext cx="1618200" cy="303120"/>
             </a:xfrm>
             <a:prstGeom prst="rect">
               <a:avLst/>
@@ -18416,14 +18328,14 @@
         </p:sp>
         <p:sp>
           <p:nvSpPr>
-            <p:cNvPr id="256" name="TextBox 56"/>
+            <p:cNvPr id="254" name="TextBox 56"/>
             <p:cNvSpPr/>
             <p:nvPr/>
           </p:nvSpPr>
           <p:spPr>
             <a:xfrm>
               <a:off x="6760440" y="4621320"/>
-              <a:ext cx="1618920" cy="297720"/>
+              <a:ext cx="1618200" cy="297000"/>
             </a:xfrm>
             <a:prstGeom prst="rect">
               <a:avLst/>
@@ -18465,14 +18377,14 @@
       </p:grpSp>
       <p:sp>
         <p:nvSpPr>
-          <p:cNvPr id="257" name="Isosceles Triangle 6"/>
+          <p:cNvPr id="255" name="Isosceles Triangle 6"/>
           <p:cNvSpPr/>
           <p:nvPr/>
         </p:nvSpPr>
         <p:spPr>
           <a:xfrm>
             <a:off x="9144000" y="2057400"/>
-            <a:ext cx="475200" cy="380160"/>
+            <a:ext cx="474480" cy="379440"/>
           </a:xfrm>
           <a:prstGeom prst="triangle">
             <a:avLst>
@@ -18532,16 +18444,16 @@
       </p:sp>
       <p:cxnSp>
         <p:nvCxnSpPr>
-          <p:cNvPr id="258" name="Straight Arrow Connector 51"/>
+          <p:cNvPr id="256" name="Straight Arrow Connector 51"/>
           <p:cNvCxnSpPr>
-            <a:stCxn id="259" idx="3"/>
+            <a:stCxn id="257" idx="3"/>
           </p:cNvCxnSpPr>
           <p:nvPr/>
         </p:nvCxnSpPr>
         <p:spPr>
           <a:xfrm flipH="1">
-            <a:off x="8026200" y="4109400"/>
-            <a:ext cx="1433160" cy="255960"/>
+            <a:off x="8026200" y="4108680"/>
+            <a:ext cx="1432800" cy="257400"/>
           </a:xfrm>
           <a:prstGeom prst="straightConnector1">
             <a:avLst/>
@@ -18556,16 +18468,16 @@
       </p:cxnSp>
       <p:cxnSp>
         <p:nvCxnSpPr>
-          <p:cNvPr id="260" name="Straight Arrow Connector 53"/>
+          <p:cNvPr id="258" name="Straight Arrow Connector 53"/>
           <p:cNvCxnSpPr>
-            <a:endCxn id="259" idx="3"/>
+            <a:endCxn id="257" idx="3"/>
           </p:cNvCxnSpPr>
           <p:nvPr/>
         </p:nvCxnSpPr>
         <p:spPr>
           <a:xfrm flipH="1" flipV="1">
-            <a:off x="9459000" y="4109400"/>
-            <a:ext cx="477720" cy="237600"/>
+            <a:off x="9458640" y="4108680"/>
+            <a:ext cx="478800" cy="239040"/>
           </a:xfrm>
           <a:prstGeom prst="straightConnector1">
             <a:avLst/>
@@ -18580,16 +18492,16 @@
       </p:cxnSp>
       <p:cxnSp>
         <p:nvCxnSpPr>
-          <p:cNvPr id="261" name="Straight Arrow Connector 54"/>
+          <p:cNvPr id="259" name="Straight Arrow Connector 54"/>
           <p:cNvCxnSpPr>
-            <a:stCxn id="257" idx="3"/>
+            <a:stCxn id="255" idx="3"/>
           </p:cNvCxnSpPr>
           <p:nvPr/>
         </p:nvCxnSpPr>
         <p:spPr>
           <a:xfrm flipH="1">
-            <a:off x="9346320" y="2437560"/>
-            <a:ext cx="35640" cy="447480"/>
+            <a:off x="9346320" y="2436840"/>
+            <a:ext cx="35280" cy="448920"/>
           </a:xfrm>
           <a:prstGeom prst="straightConnector1">
             <a:avLst/>
@@ -18604,16 +18516,16 @@
       </p:cxnSp>
       <p:cxnSp>
         <p:nvCxnSpPr>
-          <p:cNvPr id="262" name="Straight Arrow Connector 55"/>
+          <p:cNvPr id="260" name="Straight Arrow Connector 55"/>
           <p:cNvCxnSpPr>
-            <a:stCxn id="237" idx="2"/>
-            <a:endCxn id="257" idx="0"/>
+            <a:stCxn id="235" idx="2"/>
+            <a:endCxn id="255" idx="0"/>
           </p:cNvCxnSpPr>
           <p:nvPr/>
         </p:nvCxnSpPr>
         <p:spPr>
           <a:xfrm flipH="1">
-            <a:off x="9381600" y="1828800"/>
+            <a:off x="9381240" y="1828800"/>
             <a:ext cx="114840" cy="228960"/>
           </a:xfrm>
           <a:prstGeom prst="straightConnector1">
@@ -18629,14 +18541,14 @@
       </p:cxnSp>
       <p:sp>
         <p:nvSpPr>
-          <p:cNvPr id="263" name="TextBox 73"/>
+          <p:cNvPr id="261" name="TextBox 73"/>
           <p:cNvSpPr/>
           <p:nvPr/>
         </p:nvSpPr>
         <p:spPr>
           <a:xfrm>
             <a:off x="7089840" y="5715000"/>
-            <a:ext cx="1618920" cy="303120"/>
+            <a:ext cx="1618200" cy="303120"/>
           </a:xfrm>
           <a:prstGeom prst="rect">
             <a:avLst/>
@@ -18686,14 +18598,14 @@
       </p:sp>
       <p:sp>
         <p:nvSpPr>
-          <p:cNvPr id="264" name="Diamond 21"/>
+          <p:cNvPr id="262" name="Diamond 21"/>
           <p:cNvSpPr/>
           <p:nvPr/>
         </p:nvSpPr>
         <p:spPr>
           <a:xfrm>
             <a:off x="6760440" y="5183280"/>
-            <a:ext cx="1822320" cy="380160"/>
+            <a:ext cx="1821600" cy="379440"/>
           </a:xfrm>
           <a:prstGeom prst="diamond">
             <a:avLst/>
@@ -18751,14 +18663,14 @@
       </p:sp>
       <p:cxnSp>
         <p:nvCxnSpPr>
-          <p:cNvPr id="265" name="Straight Arrow Connector 56"/>
+          <p:cNvPr id="263" name="Straight Arrow Connector 56"/>
           <p:cNvCxnSpPr/>
           <p:nvPr/>
         </p:nvCxnSpPr>
         <p:spPr>
           <a:xfrm flipH="1">
             <a:off x="0" y="3657600"/>
-            <a:ext cx="1836360" cy="7560"/>
+            <a:ext cx="1837080" cy="8280"/>
           </a:xfrm>
           <a:prstGeom prst="straightConnector1">
             <a:avLst/>
@@ -18773,28 +18685,28 @@
       </p:cxnSp>
       <p:grpSp>
         <p:nvGrpSpPr>
-          <p:cNvPr id="266" name="Group 12"/>
+          <p:cNvPr id="264" name="Group 12"/>
           <p:cNvGrpSpPr/>
           <p:nvPr/>
         </p:nvGrpSpPr>
         <p:grpSpPr>
           <a:xfrm>
             <a:off x="8534520" y="2879640"/>
-            <a:ext cx="1618920" cy="559800"/>
+            <a:ext cx="1618200" cy="559080"/>
             <a:chOff x="8534520" y="2879640"/>
-            <a:chExt cx="1618920" cy="559800"/>
+            <a:chExt cx="1618200" cy="559080"/>
           </a:xfrm>
         </p:grpSpPr>
         <p:sp>
           <p:nvSpPr>
-            <p:cNvPr id="267" name="TextBox 23"/>
+            <p:cNvPr id="265" name="TextBox 23"/>
             <p:cNvSpPr/>
             <p:nvPr/>
           </p:nvSpPr>
           <p:spPr>
             <a:xfrm>
               <a:off x="8534520" y="2879640"/>
-              <a:ext cx="1618920" cy="303120"/>
+              <a:ext cx="1618200" cy="303120"/>
             </a:xfrm>
             <a:prstGeom prst="rect">
               <a:avLst/>
@@ -18844,14 +18756,14 @@
         </p:sp>
         <p:sp>
           <p:nvSpPr>
-            <p:cNvPr id="268" name="TextBox 24"/>
+            <p:cNvPr id="266" name="TextBox 24"/>
             <p:cNvSpPr/>
             <p:nvPr/>
           </p:nvSpPr>
           <p:spPr>
             <a:xfrm>
               <a:off x="8534520" y="3141000"/>
-              <a:ext cx="1618920" cy="298440"/>
+              <a:ext cx="1618200" cy="297720"/>
             </a:xfrm>
             <a:prstGeom prst="rect">
               <a:avLst/>
@@ -18893,28 +18805,28 @@
       </p:grpSp>
       <p:grpSp>
         <p:nvGrpSpPr>
-          <p:cNvPr id="269" name="Group 16"/>
+          <p:cNvPr id="267" name="Group 16"/>
           <p:cNvGrpSpPr/>
           <p:nvPr/>
         </p:nvGrpSpPr>
         <p:grpSpPr>
           <a:xfrm>
             <a:off x="8534520" y="2879640"/>
-            <a:ext cx="1618920" cy="564480"/>
+            <a:ext cx="1618200" cy="564480"/>
             <a:chOff x="8534520" y="2879640"/>
-            <a:chExt cx="1618920" cy="564480"/>
+            <a:chExt cx="1618200" cy="564480"/>
           </a:xfrm>
         </p:grpSpPr>
         <p:sp>
           <p:nvSpPr>
-            <p:cNvPr id="270" name="TextBox 40"/>
+            <p:cNvPr id="268" name="TextBox 40"/>
             <p:cNvSpPr/>
             <p:nvPr/>
           </p:nvSpPr>
           <p:spPr>
             <a:xfrm>
               <a:off x="8534520" y="2879640"/>
-              <a:ext cx="1618920" cy="303120"/>
+              <a:ext cx="1618200" cy="303120"/>
             </a:xfrm>
             <a:prstGeom prst="rect">
               <a:avLst/>
@@ -18964,14 +18876,14 @@
         </p:sp>
         <p:sp>
           <p:nvSpPr>
-            <p:cNvPr id="271" name="TextBox 59"/>
+            <p:cNvPr id="269" name="TextBox 59"/>
             <p:cNvSpPr/>
             <p:nvPr/>
           </p:nvSpPr>
           <p:spPr>
             <a:xfrm>
               <a:off x="8534520" y="3141000"/>
-              <a:ext cx="1618920" cy="303120"/>
+              <a:ext cx="1618200" cy="303120"/>
             </a:xfrm>
             <a:prstGeom prst="rect">
               <a:avLst/>
@@ -19027,14 +18939,14 @@
       </p:grpSp>
       <p:sp>
         <p:nvSpPr>
-          <p:cNvPr id="259" name="Isosceles Triangle 7"/>
+          <p:cNvPr id="257" name="Isosceles Triangle 7"/>
           <p:cNvSpPr/>
           <p:nvPr/>
         </p:nvSpPr>
         <p:spPr>
           <a:xfrm>
             <a:off x="9221400" y="3729240"/>
-            <a:ext cx="475200" cy="380160"/>
+            <a:ext cx="474480" cy="379440"/>
           </a:xfrm>
           <a:prstGeom prst="triangle">
             <a:avLst>
@@ -19094,16 +19006,16 @@
       </p:sp>
       <p:cxnSp>
         <p:nvCxnSpPr>
-          <p:cNvPr id="272" name="Straight Arrow Connector 80"/>
+          <p:cNvPr id="270" name="Straight Arrow Connector 80"/>
           <p:cNvCxnSpPr>
-            <a:stCxn id="269" idx="2"/>
-            <a:endCxn id="259" idx="0"/>
+            <a:stCxn id="267" idx="2"/>
+            <a:endCxn id="257" idx="0"/>
           </p:cNvCxnSpPr>
           <p:nvPr/>
         </p:nvCxnSpPr>
         <p:spPr>
           <a:xfrm>
-            <a:off x="9343800" y="3444120"/>
+            <a:off x="9343440" y="3444120"/>
             <a:ext cx="115560" cy="285480"/>
           </a:xfrm>
           <a:prstGeom prst="straightConnector1">
@@ -19119,14 +19031,14 @@
       </p:cxnSp>
       <p:cxnSp>
         <p:nvCxnSpPr>
-          <p:cNvPr id="273" name="Straight Arrow Connector 52"/>
+          <p:cNvPr id="271" name="Straight Arrow Connector 52"/>
           <p:cNvCxnSpPr/>
           <p:nvPr/>
         </p:nvCxnSpPr>
         <p:spPr>
           <a:xfrm>
             <a:off x="8556840" y="3657600"/>
-            <a:ext cx="1836360" cy="7560"/>
+            <a:ext cx="1837080" cy="8280"/>
           </a:xfrm>
           <a:prstGeom prst="straightConnector1">
             <a:avLst/>
@@ -19142,14 +19054,14 @@
       </p:cxnSp>
       <p:sp>
         <p:nvSpPr>
-          <p:cNvPr id="274" name=""/>
+          <p:cNvPr id="272" name=""/>
           <p:cNvSpPr/>
           <p:nvPr/>
         </p:nvSpPr>
         <p:spPr>
           <a:xfrm>
             <a:off x="9601200" y="3382920"/>
-            <a:ext cx="909000" cy="340920"/>
+            <a:ext cx="908280" cy="340200"/>
           </a:xfrm>
           <a:prstGeom prst="rect">
             <a:avLst/>
@@ -19195,14 +19107,14 @@
       </p:sp>
       <p:sp>
         <p:nvSpPr>
-          <p:cNvPr id="275" name="TextBox 49"/>
+          <p:cNvPr id="273" name="TextBox 49"/>
           <p:cNvSpPr/>
           <p:nvPr/>
         </p:nvSpPr>
         <p:spPr>
           <a:xfrm>
             <a:off x="2057400" y="2132280"/>
-            <a:ext cx="1618920" cy="303120"/>
+            <a:ext cx="1618200" cy="303120"/>
           </a:xfrm>
           <a:prstGeom prst="rect">
             <a:avLst/>
@@ -19252,14 +19164,14 @@
       </p:sp>
       <p:sp>
         <p:nvSpPr>
-          <p:cNvPr id="276" name="TextBox 50"/>
+          <p:cNvPr id="274" name="TextBox 50"/>
           <p:cNvSpPr/>
           <p:nvPr/>
         </p:nvSpPr>
         <p:spPr>
           <a:xfrm>
             <a:off x="2057400" y="2393640"/>
-            <a:ext cx="1618920" cy="190440"/>
+            <a:ext cx="1618200" cy="189720"/>
           </a:xfrm>
           <a:prstGeom prst="rect">
             <a:avLst/>
@@ -19300,14 +19212,14 @@
       </p:sp>
       <p:sp>
         <p:nvSpPr>
-          <p:cNvPr id="277" name="Isosceles Triangle 8"/>
+          <p:cNvPr id="275" name="Isosceles Triangle 8"/>
           <p:cNvSpPr/>
           <p:nvPr/>
         </p:nvSpPr>
         <p:spPr>
           <a:xfrm>
             <a:off x="2613960" y="1217880"/>
-            <a:ext cx="475200" cy="380160"/>
+            <a:ext cx="474480" cy="379440"/>
           </a:xfrm>
           <a:prstGeom prst="triangle">
             <a:avLst>
@@ -19367,17 +19279,17 @@
       </p:sp>
       <p:cxnSp>
         <p:nvCxnSpPr>
-          <p:cNvPr id="278" name="Straight Arrow Connector 81"/>
+          <p:cNvPr id="276" name="Straight Arrow Connector 81"/>
           <p:cNvCxnSpPr>
-            <a:stCxn id="277" idx="3"/>
-            <a:endCxn id="275" idx="0"/>
+            <a:stCxn id="275" idx="3"/>
+            <a:endCxn id="273" idx="0"/>
           </p:cNvCxnSpPr>
           <p:nvPr/>
         </p:nvCxnSpPr>
         <p:spPr>
           <a:xfrm>
-            <a:off x="2851560" y="1598040"/>
-            <a:ext cx="15480" cy="534600"/>
+            <a:off x="2851200" y="1597320"/>
+            <a:ext cx="15480" cy="535320"/>
           </a:xfrm>
           <a:prstGeom prst="straightConnector1">
             <a:avLst/>
@@ -19392,17 +19304,17 @@
       </p:cxnSp>
       <p:cxnSp>
         <p:nvCxnSpPr>
-          <p:cNvPr id="279" name="Straight Arrow Connector 82"/>
+          <p:cNvPr id="277" name="Straight Arrow Connector 82"/>
           <p:cNvCxnSpPr>
-            <a:stCxn id="277" idx="0"/>
-            <a:endCxn id="224" idx="1"/>
+            <a:stCxn id="275" idx="0"/>
+            <a:endCxn id="222" idx="1"/>
           </p:cNvCxnSpPr>
           <p:nvPr/>
         </p:nvCxnSpPr>
         <p:spPr>
           <a:xfrm flipV="1">
-            <a:off x="2851560" y="1083600"/>
-            <a:ext cx="1923840" cy="134640"/>
+            <a:off x="2851200" y="1083600"/>
+            <a:ext cx="1924200" cy="134640"/>
           </a:xfrm>
           <a:prstGeom prst="straightConnector1">
             <a:avLst/>
@@ -19417,17 +19329,17 @@
       </p:cxnSp>
       <p:cxnSp>
         <p:nvCxnSpPr>
-          <p:cNvPr id="280" name="Straight Arrow Connector 83"/>
+          <p:cNvPr id="278" name="Straight Arrow Connector 83"/>
           <p:cNvCxnSpPr>
-            <a:stCxn id="254" idx="2"/>
-            <a:endCxn id="264" idx="0"/>
+            <a:stCxn id="252" idx="2"/>
+            <a:endCxn id="262" idx="0"/>
           </p:cNvCxnSpPr>
           <p:nvPr/>
         </p:nvCxnSpPr>
         <p:spPr>
           <a:xfrm>
-            <a:off x="7569720" y="4919040"/>
-            <a:ext cx="102240" cy="264600"/>
+            <a:off x="7569360" y="4918320"/>
+            <a:ext cx="102240" cy="265320"/>
           </a:xfrm>
           <a:prstGeom prst="straightConnector1">
             <a:avLst/>
@@ -19443,17 +19355,17 @@
       </p:cxnSp>
       <p:cxnSp>
         <p:nvCxnSpPr>
-          <p:cNvPr id="281" name="Straight Arrow Connector 57"/>
+          <p:cNvPr id="279" name="Straight Arrow Connector 57"/>
           <p:cNvCxnSpPr>
-            <a:stCxn id="264" idx="2"/>
-            <a:endCxn id="263" idx="0"/>
+            <a:stCxn id="262" idx="2"/>
+            <a:endCxn id="261" idx="0"/>
           </p:cNvCxnSpPr>
           <p:nvPr/>
         </p:nvCxnSpPr>
         <p:spPr>
           <a:xfrm>
-            <a:off x="7671600" y="5563440"/>
-            <a:ext cx="227880" cy="151920"/>
+            <a:off x="7671240" y="5562720"/>
+            <a:ext cx="227880" cy="152640"/>
           </a:xfrm>
           <a:prstGeom prst="straightConnector1">
             <a:avLst/>
@@ -19468,28 +19380,28 @@
       </p:cxnSp>
       <p:grpSp>
         <p:nvGrpSpPr>
-          <p:cNvPr id="282" name="Group 5"/>
+          <p:cNvPr id="280" name="Group 5"/>
           <p:cNvGrpSpPr/>
           <p:nvPr/>
         </p:nvGrpSpPr>
         <p:grpSpPr>
           <a:xfrm>
             <a:off x="10265040" y="5029200"/>
-            <a:ext cx="1618920" cy="559440"/>
+            <a:ext cx="1618200" cy="558720"/>
             <a:chOff x="10265040" y="5029200"/>
-            <a:chExt cx="1618920" cy="559440"/>
+            <a:chExt cx="1618200" cy="558720"/>
           </a:xfrm>
         </p:grpSpPr>
         <p:sp>
           <p:nvSpPr>
-            <p:cNvPr id="283" name="TextBox 22"/>
+            <p:cNvPr id="281" name="TextBox 22"/>
             <p:cNvSpPr/>
             <p:nvPr/>
           </p:nvSpPr>
           <p:spPr>
             <a:xfrm>
               <a:off x="10265040" y="5029200"/>
-              <a:ext cx="1618920" cy="303120"/>
+              <a:ext cx="1618200" cy="303120"/>
             </a:xfrm>
             <a:prstGeom prst="rect">
               <a:avLst/>
@@ -19539,14 +19451,14 @@
         </p:sp>
         <p:sp>
           <p:nvSpPr>
-            <p:cNvPr id="284" name="TextBox 29"/>
+            <p:cNvPr id="282" name="TextBox 29"/>
             <p:cNvSpPr/>
             <p:nvPr/>
           </p:nvSpPr>
           <p:spPr>
             <a:xfrm>
               <a:off x="10265040" y="5290560"/>
-              <a:ext cx="1618920" cy="298080"/>
+              <a:ext cx="1618200" cy="297360"/>
             </a:xfrm>
             <a:prstGeom prst="rect">
               <a:avLst/>
@@ -19588,17 +19500,17 @@
       </p:grpSp>
       <p:cxnSp>
         <p:nvCxnSpPr>
-          <p:cNvPr id="285" name="Straight Arrow Connector 84"/>
+          <p:cNvPr id="283" name="Straight Arrow Connector 84"/>
           <p:cNvCxnSpPr>
-            <a:stCxn id="282" idx="0"/>
-            <a:endCxn id="259" idx="4"/>
+            <a:stCxn id="280" idx="0"/>
+            <a:endCxn id="257" idx="4"/>
           </p:cNvCxnSpPr>
           <p:nvPr/>
         </p:nvCxnSpPr>
         <p:spPr>
           <a:xfrm flipH="1" flipV="1">
-            <a:off x="9696600" y="4109400"/>
-            <a:ext cx="1378080" cy="920160"/>
+            <a:off x="9695880" y="4108680"/>
+            <a:ext cx="1378440" cy="920880"/>
           </a:xfrm>
           <a:prstGeom prst="straightConnector1">
             <a:avLst/>
@@ -19613,28 +19525,28 @@
       </p:cxnSp>
       <p:grpSp>
         <p:nvGrpSpPr>
-          <p:cNvPr id="286" name="Group 9"/>
+          <p:cNvPr id="284" name="Group 9"/>
           <p:cNvGrpSpPr/>
           <p:nvPr/>
         </p:nvGrpSpPr>
         <p:grpSpPr>
           <a:xfrm>
             <a:off x="9122040" y="4343400"/>
-            <a:ext cx="1618920" cy="559440"/>
+            <a:ext cx="1618200" cy="558720"/>
             <a:chOff x="9122040" y="4343400"/>
-            <a:chExt cx="1618920" cy="559440"/>
+            <a:chExt cx="1618200" cy="558720"/>
           </a:xfrm>
         </p:grpSpPr>
         <p:sp>
           <p:nvSpPr>
-            <p:cNvPr id="287" name="TextBox 47"/>
+            <p:cNvPr id="285" name="TextBox 47"/>
             <p:cNvSpPr/>
             <p:nvPr/>
           </p:nvSpPr>
           <p:spPr>
             <a:xfrm>
               <a:off x="9122040" y="4343400"/>
-              <a:ext cx="1618920" cy="303120"/>
+              <a:ext cx="1618200" cy="303120"/>
             </a:xfrm>
             <a:prstGeom prst="rect">
               <a:avLst/>
@@ -19684,14 +19596,14 @@
         </p:sp>
         <p:sp>
           <p:nvSpPr>
-            <p:cNvPr id="288" name="TextBox 48"/>
+            <p:cNvPr id="286" name="TextBox 48"/>
             <p:cNvSpPr/>
             <p:nvPr/>
           </p:nvSpPr>
           <p:spPr>
             <a:xfrm>
               <a:off x="9122040" y="4604760"/>
-              <a:ext cx="1618920" cy="298080"/>
+              <a:ext cx="1618200" cy="297360"/>
             </a:xfrm>
             <a:prstGeom prst="rect">
               <a:avLst/>
@@ -19733,14 +19645,14 @@
       </p:grpSp>
       <p:sp>
         <p:nvSpPr>
-          <p:cNvPr id="289" name="Isosceles Triangle 9"/>
+          <p:cNvPr id="287" name="Isosceles Triangle 9"/>
           <p:cNvSpPr/>
           <p:nvPr/>
         </p:nvSpPr>
         <p:spPr>
           <a:xfrm>
             <a:off x="10037520" y="2131560"/>
-            <a:ext cx="475200" cy="380160"/>
+            <a:ext cx="474480" cy="379440"/>
           </a:xfrm>
           <a:prstGeom prst="triangle">
             <a:avLst>
@@ -19800,16 +19712,16 @@
       </p:sp>
       <p:cxnSp>
         <p:nvCxnSpPr>
-          <p:cNvPr id="290" name="Straight Arrow Connector 85"/>
+          <p:cNvPr id="288" name="Straight Arrow Connector 85"/>
           <p:cNvCxnSpPr>
-            <a:stCxn id="237" idx="2"/>
-            <a:endCxn id="289" idx="0"/>
+            <a:stCxn id="235" idx="2"/>
+            <a:endCxn id="287" idx="0"/>
           </p:cNvCxnSpPr>
           <p:nvPr/>
         </p:nvCxnSpPr>
         <p:spPr>
           <a:xfrm>
-            <a:off x="9496080" y="1828800"/>
+            <a:off x="9495720" y="1828800"/>
             <a:ext cx="779400" cy="303120"/>
           </a:xfrm>
           <a:prstGeom prst="straightConnector1">
@@ -19825,28 +19737,28 @@
       </p:cxnSp>
       <p:grpSp>
         <p:nvGrpSpPr>
-          <p:cNvPr id="291" name="Group 10"/>
+          <p:cNvPr id="289" name="Group 10"/>
           <p:cNvGrpSpPr/>
           <p:nvPr/>
         </p:nvGrpSpPr>
         <p:grpSpPr>
           <a:xfrm>
             <a:off x="10494000" y="2866680"/>
-            <a:ext cx="1618920" cy="559440"/>
+            <a:ext cx="1618200" cy="558720"/>
             <a:chOff x="10494000" y="2866680"/>
-            <a:chExt cx="1618920" cy="559440"/>
+            <a:chExt cx="1618200" cy="558720"/>
           </a:xfrm>
         </p:grpSpPr>
         <p:sp>
           <p:nvSpPr>
-            <p:cNvPr id="292" name="TextBox 60"/>
+            <p:cNvPr id="290" name="TextBox 60"/>
             <p:cNvSpPr/>
             <p:nvPr/>
           </p:nvSpPr>
           <p:spPr>
             <a:xfrm>
               <a:off x="10494000" y="2866680"/>
-              <a:ext cx="1618920" cy="303120"/>
+              <a:ext cx="1618200" cy="303120"/>
             </a:xfrm>
             <a:prstGeom prst="rect">
               <a:avLst/>
@@ -19896,14 +19808,14 @@
         </p:sp>
         <p:sp>
           <p:nvSpPr>
-            <p:cNvPr id="293" name="TextBox 71"/>
+            <p:cNvPr id="291" name="TextBox 71"/>
             <p:cNvSpPr/>
             <p:nvPr/>
           </p:nvSpPr>
           <p:spPr>
             <a:xfrm>
               <a:off x="10494000" y="3128040"/>
-              <a:ext cx="1618920" cy="298080"/>
+              <a:ext cx="1618200" cy="297360"/>
             </a:xfrm>
             <a:prstGeom prst="rect">
               <a:avLst/>
@@ -19945,17 +19857,17 @@
       </p:grpSp>
       <p:cxnSp>
         <p:nvCxnSpPr>
-          <p:cNvPr id="294" name="Straight Arrow Connector 86"/>
+          <p:cNvPr id="292" name="Straight Arrow Connector 86"/>
           <p:cNvCxnSpPr>
-            <a:stCxn id="289" idx="3"/>
-            <a:endCxn id="291" idx="0"/>
+            <a:stCxn id="287" idx="3"/>
+            <a:endCxn id="289" idx="0"/>
           </p:cNvCxnSpPr>
           <p:nvPr/>
         </p:nvCxnSpPr>
         <p:spPr>
           <a:xfrm>
-            <a:off x="10275120" y="2511720"/>
-            <a:ext cx="1028520" cy="355320"/>
+            <a:off x="10274760" y="2511000"/>
+            <a:ext cx="1028520" cy="356040"/>
           </a:xfrm>
           <a:prstGeom prst="straightConnector1">
             <a:avLst/>
@@ -20000,14 +19912,14 @@
       </p:grpSpPr>
       <p:cxnSp>
         <p:nvCxnSpPr>
-          <p:cNvPr id="295" name="Straight Arrow Connector 44"/>
+          <p:cNvPr id="293" name="Straight Arrow Connector 44"/>
           <p:cNvCxnSpPr/>
           <p:nvPr/>
         </p:nvCxnSpPr>
         <p:spPr>
           <a:xfrm flipH="1">
             <a:off x="0" y="3073320"/>
-            <a:ext cx="1836360" cy="7560"/>
+            <a:ext cx="1837080" cy="8280"/>
           </a:xfrm>
           <a:prstGeom prst="straightConnector1">
             <a:avLst/>
@@ -20023,14 +19935,14 @@
       </p:cxnSp>
       <p:cxnSp>
         <p:nvCxnSpPr>
-          <p:cNvPr id="296" name="Straight Arrow Connector 45"/>
+          <p:cNvPr id="294" name="Straight Arrow Connector 45"/>
           <p:cNvCxnSpPr/>
           <p:nvPr/>
         </p:nvCxnSpPr>
         <p:spPr>
           <a:xfrm>
             <a:off x="0" y="2489400"/>
-            <a:ext cx="1836360" cy="7560"/>
+            <a:ext cx="1837080" cy="8280"/>
           </a:xfrm>
           <a:prstGeom prst="straightConnector1">
             <a:avLst/>
@@ -20046,14 +19958,14 @@
       </p:cxnSp>
       <p:cxnSp>
         <p:nvCxnSpPr>
-          <p:cNvPr id="297" name="Straight Arrow Connector 46"/>
+          <p:cNvPr id="295" name="Straight Arrow Connector 46"/>
           <p:cNvCxnSpPr/>
           <p:nvPr/>
         </p:nvCxnSpPr>
         <p:spPr>
           <a:xfrm>
             <a:off x="0" y="2781360"/>
-            <a:ext cx="1836360" cy="7560"/>
+            <a:ext cx="1837080" cy="8280"/>
           </a:xfrm>
           <a:prstGeom prst="straightConnector1">
             <a:avLst/>
@@ -20069,14 +19981,14 @@
       </p:cxnSp>
       <p:cxnSp>
         <p:nvCxnSpPr>
-          <p:cNvPr id="298" name="Straight Arrow Connector 47"/>
+          <p:cNvPr id="296" name="Straight Arrow Connector 47"/>
           <p:cNvCxnSpPr/>
           <p:nvPr/>
         </p:nvCxnSpPr>
         <p:spPr>
           <a:xfrm flipH="1">
             <a:off x="0" y="3657600"/>
-            <a:ext cx="1836360" cy="7560"/>
+            <a:ext cx="1837080" cy="8280"/>
           </a:xfrm>
           <a:prstGeom prst="straightConnector1">
             <a:avLst/>
@@ -20091,14 +20003,14 @@
       </p:cxnSp>
       <p:sp>
         <p:nvSpPr>
-          <p:cNvPr id="299" name="Diamond 17"/>
+          <p:cNvPr id="297" name="Diamond 17"/>
           <p:cNvSpPr/>
           <p:nvPr/>
         </p:nvSpPr>
         <p:spPr>
           <a:xfrm>
             <a:off x="128520" y="6134040"/>
-            <a:ext cx="1564200" cy="380160"/>
+            <a:ext cx="1563480" cy="379440"/>
           </a:xfrm>
           <a:prstGeom prst="diamond">
             <a:avLst/>
@@ -20156,14 +20068,14 @@
       </p:sp>
       <p:sp>
         <p:nvSpPr>
-          <p:cNvPr id="300" name="Oval 4"/>
+          <p:cNvPr id="298" name="Oval 4"/>
           <p:cNvSpPr/>
           <p:nvPr/>
         </p:nvSpPr>
         <p:spPr>
           <a:xfrm>
             <a:off x="302760" y="5454000"/>
-            <a:ext cx="1215720" cy="380160"/>
+            <a:ext cx="1215000" cy="379440"/>
           </a:xfrm>
           <a:prstGeom prst="ellipse">
             <a:avLst/>
@@ -20219,14 +20131,14 @@
       </p:sp>
       <p:sp>
         <p:nvSpPr>
-          <p:cNvPr id="301" name="TextBox 53"/>
+          <p:cNvPr id="299" name="TextBox 53"/>
           <p:cNvSpPr/>
           <p:nvPr/>
         </p:nvSpPr>
         <p:spPr>
           <a:xfrm>
             <a:off x="101160" y="336240"/>
-            <a:ext cx="1618920" cy="303120"/>
+            <a:ext cx="1618200" cy="303120"/>
           </a:xfrm>
           <a:prstGeom prst="rect">
             <a:avLst/>
@@ -20276,14 +20188,14 @@
       </p:sp>
       <p:sp>
         <p:nvSpPr>
-          <p:cNvPr id="302" name="TextBox 54"/>
+          <p:cNvPr id="300" name="TextBox 54"/>
           <p:cNvSpPr/>
           <p:nvPr/>
         </p:nvSpPr>
         <p:spPr>
           <a:xfrm>
             <a:off x="101160" y="597600"/>
-            <a:ext cx="1618920" cy="516600"/>
+            <a:ext cx="1618200" cy="516600"/>
           </a:xfrm>
           <a:prstGeom prst="rect">
             <a:avLst/>
@@ -20366,14 +20278,14 @@
       </p:sp>
       <p:sp>
         <p:nvSpPr>
-          <p:cNvPr id="303" name="TextBox 72"/>
+          <p:cNvPr id="301" name="TextBox 72"/>
           <p:cNvSpPr/>
           <p:nvPr/>
         </p:nvSpPr>
         <p:spPr>
           <a:xfrm>
             <a:off x="8458200" y="5486400"/>
-            <a:ext cx="1618920" cy="303120"/>
+            <a:ext cx="1618200" cy="303120"/>
           </a:xfrm>
           <a:prstGeom prst="rect">
             <a:avLst/>
@@ -20423,14 +20335,14 @@
       </p:sp>
       <p:sp>
         <p:nvSpPr>
-          <p:cNvPr id="304" name="Diamond 18"/>
+          <p:cNvPr id="302" name="Diamond 18"/>
           <p:cNvSpPr/>
           <p:nvPr/>
         </p:nvSpPr>
         <p:spPr>
           <a:xfrm>
             <a:off x="128520" y="4629600"/>
-            <a:ext cx="1564200" cy="524880"/>
+            <a:ext cx="1563480" cy="524160"/>
           </a:xfrm>
           <a:prstGeom prst="diamond">
             <a:avLst/>
@@ -20511,14 +20423,14 @@
       </p:sp>
       <p:cxnSp>
         <p:nvCxnSpPr>
-          <p:cNvPr id="305" name="Straight Arrow Connector 48"/>
+          <p:cNvPr id="303" name="Straight Arrow Connector 48"/>
           <p:cNvCxnSpPr/>
           <p:nvPr/>
         </p:nvCxnSpPr>
         <p:spPr>
           <a:xfrm>
             <a:off x="0" y="3365640"/>
-            <a:ext cx="1836360" cy="7560"/>
+            <a:ext cx="1837080" cy="8280"/>
           </a:xfrm>
           <a:prstGeom prst="straightConnector1">
             <a:avLst/>
@@ -20533,14 +20445,14 @@
       </p:cxnSp>
       <p:sp>
         <p:nvSpPr>
-          <p:cNvPr id="306" name="Isosceles Triangle 5"/>
+          <p:cNvPr id="304" name="Isosceles Triangle 5"/>
           <p:cNvSpPr/>
           <p:nvPr/>
         </p:nvSpPr>
         <p:spPr>
           <a:xfrm>
             <a:off x="673200" y="3949920"/>
-            <a:ext cx="475200" cy="380160"/>
+            <a:ext cx="474480" cy="379440"/>
           </a:xfrm>
           <a:prstGeom prst="triangle">
             <a:avLst>
@@ -20600,28 +20512,28 @@
       </p:sp>
       <p:grpSp>
         <p:nvGrpSpPr>
-          <p:cNvPr id="307" name="Group 15"/>
+          <p:cNvPr id="305" name="Group 15"/>
           <p:cNvGrpSpPr/>
           <p:nvPr/>
         </p:nvGrpSpPr>
         <p:grpSpPr>
           <a:xfrm>
             <a:off x="101160" y="1413000"/>
-            <a:ext cx="1618920" cy="777960"/>
+            <a:ext cx="1618200" cy="777960"/>
             <a:chOff x="101160" y="1413000"/>
-            <a:chExt cx="1618920" cy="777960"/>
+            <a:chExt cx="1618200" cy="777960"/>
           </a:xfrm>
         </p:grpSpPr>
         <p:sp>
           <p:nvSpPr>
-            <p:cNvPr id="308" name="TextBox 57"/>
+            <p:cNvPr id="306" name="TextBox 57"/>
             <p:cNvSpPr/>
             <p:nvPr/>
           </p:nvSpPr>
           <p:spPr>
             <a:xfrm>
               <a:off x="101160" y="1413000"/>
-              <a:ext cx="1618920" cy="303120"/>
+              <a:ext cx="1618200" cy="303120"/>
             </a:xfrm>
             <a:prstGeom prst="rect">
               <a:avLst/>
@@ -20672,14 +20584,14 @@
         </p:sp>
         <p:sp>
           <p:nvSpPr>
-            <p:cNvPr id="309" name="TextBox 58"/>
+            <p:cNvPr id="307" name="TextBox 58"/>
             <p:cNvSpPr/>
             <p:nvPr/>
           </p:nvSpPr>
           <p:spPr>
             <a:xfrm>
               <a:off x="101160" y="1674360"/>
-              <a:ext cx="1618920" cy="516600"/>
+              <a:ext cx="1618200" cy="516600"/>
             </a:xfrm>
             <a:prstGeom prst="rect">
               <a:avLst/>
@@ -20764,14 +20676,14 @@
       </p:grpSp>
       <p:sp>
         <p:nvSpPr>
-          <p:cNvPr id="310" name="TextBox 62"/>
+          <p:cNvPr id="308" name="TextBox 62"/>
           <p:cNvSpPr/>
           <p:nvPr/>
         </p:nvSpPr>
         <p:spPr>
           <a:xfrm>
             <a:off x="5463360" y="2131920"/>
-            <a:ext cx="1618920" cy="303120"/>
+            <a:ext cx="1618200" cy="303120"/>
           </a:xfrm>
           <a:prstGeom prst="rect">
             <a:avLst/>
@@ -20827,14 +20739,14 @@
       </p:sp>
       <p:sp>
         <p:nvSpPr>
-          <p:cNvPr id="311" name="TextBox 65"/>
+          <p:cNvPr id="309" name="TextBox 65"/>
           <p:cNvSpPr/>
           <p:nvPr/>
         </p:nvSpPr>
         <p:spPr>
           <a:xfrm>
             <a:off x="5463360" y="1828800"/>
-            <a:ext cx="1618920" cy="303120"/>
+            <a:ext cx="1618200" cy="303120"/>
           </a:xfrm>
           <a:prstGeom prst="rect">
             <a:avLst/>
@@ -20884,28 +20796,28 @@
       </p:sp>
       <p:grpSp>
         <p:nvGrpSpPr>
-          <p:cNvPr id="312" name="Group 17"/>
+          <p:cNvPr id="310" name="Group 17"/>
           <p:cNvGrpSpPr/>
           <p:nvPr/>
         </p:nvGrpSpPr>
         <p:grpSpPr>
           <a:xfrm>
             <a:off x="4296600" y="4022640"/>
-            <a:ext cx="1618920" cy="777960"/>
+            <a:ext cx="1618200" cy="777960"/>
             <a:chOff x="4296600" y="4022640"/>
-            <a:chExt cx="1618920" cy="777960"/>
+            <a:chExt cx="1618200" cy="777960"/>
           </a:xfrm>
         </p:grpSpPr>
         <p:sp>
           <p:nvSpPr>
-            <p:cNvPr id="313" name="TextBox 61"/>
+            <p:cNvPr id="311" name="TextBox 61"/>
             <p:cNvSpPr/>
             <p:nvPr/>
           </p:nvSpPr>
           <p:spPr>
             <a:xfrm>
               <a:off x="4296600" y="4022640"/>
-              <a:ext cx="1618920" cy="303120"/>
+              <a:ext cx="1618200" cy="303120"/>
             </a:xfrm>
             <a:prstGeom prst="rect">
               <a:avLst/>
@@ -20955,14 +20867,14 @@
         </p:sp>
         <p:sp>
           <p:nvSpPr>
-            <p:cNvPr id="314" name="TextBox 63"/>
+            <p:cNvPr id="312" name="TextBox 63"/>
             <p:cNvSpPr/>
             <p:nvPr/>
           </p:nvSpPr>
           <p:spPr>
             <a:xfrm>
               <a:off x="4296600" y="4284000"/>
-              <a:ext cx="1618920" cy="516600"/>
+              <a:ext cx="1618200" cy="516600"/>
             </a:xfrm>
             <a:prstGeom prst="rect">
               <a:avLst/>
@@ -21046,28 +20958,28 @@
       </p:grpSp>
       <p:grpSp>
         <p:nvGrpSpPr>
-          <p:cNvPr id="315" name="Group 18"/>
+          <p:cNvPr id="313" name="Group 18"/>
           <p:cNvGrpSpPr/>
           <p:nvPr/>
         </p:nvGrpSpPr>
         <p:grpSpPr>
           <a:xfrm>
             <a:off x="9348840" y="2254320"/>
-            <a:ext cx="1618920" cy="1631880"/>
+            <a:ext cx="1618200" cy="1631880"/>
             <a:chOff x="9348840" y="2254320"/>
-            <a:chExt cx="1618920" cy="1631880"/>
+            <a:chExt cx="1618200" cy="1631880"/>
           </a:xfrm>
         </p:grpSpPr>
         <p:sp>
           <p:nvSpPr>
-            <p:cNvPr id="316" name="TextBox 64"/>
+            <p:cNvPr id="314" name="TextBox 64"/>
             <p:cNvSpPr/>
             <p:nvPr/>
           </p:nvSpPr>
           <p:spPr>
             <a:xfrm>
               <a:off x="9348840" y="2254320"/>
-              <a:ext cx="1618920" cy="303120"/>
+              <a:ext cx="1618200" cy="303120"/>
             </a:xfrm>
             <a:prstGeom prst="rect">
               <a:avLst/>
@@ -21117,14 +21029,14 @@
         </p:sp>
         <p:sp>
           <p:nvSpPr>
-            <p:cNvPr id="317" name="TextBox 66"/>
+            <p:cNvPr id="315" name="TextBox 66"/>
             <p:cNvSpPr/>
             <p:nvPr/>
           </p:nvSpPr>
           <p:spPr>
             <a:xfrm>
               <a:off x="9348840" y="2515680"/>
-              <a:ext cx="1618920" cy="1370520"/>
+              <a:ext cx="1618200" cy="1370520"/>
             </a:xfrm>
             <a:prstGeom prst="rect">
               <a:avLst/>
@@ -21316,14 +21228,14 @@
       </p:grpSp>
       <p:sp>
         <p:nvSpPr>
-          <p:cNvPr id="318" name="Diamond 19"/>
+          <p:cNvPr id="316" name="Diamond 19"/>
           <p:cNvSpPr/>
           <p:nvPr/>
         </p:nvSpPr>
         <p:spPr>
           <a:xfrm>
             <a:off x="9402120" y="4572000"/>
-            <a:ext cx="1564200" cy="380160"/>
+            <a:ext cx="1563480" cy="379440"/>
           </a:xfrm>
           <a:prstGeom prst="diamond">
             <a:avLst/>
@@ -21381,14 +21293,14 @@
       </p:sp>
       <p:sp>
         <p:nvSpPr>
-          <p:cNvPr id="319" name="Oval 5"/>
+          <p:cNvPr id="317" name="Oval 5"/>
           <p:cNvSpPr/>
           <p:nvPr/>
         </p:nvSpPr>
         <p:spPr>
           <a:xfrm>
             <a:off x="7007400" y="4572000"/>
-            <a:ext cx="1672920" cy="380160"/>
+            <a:ext cx="1672200" cy="379440"/>
           </a:xfrm>
           <a:prstGeom prst="ellipse">
             <a:avLst/>
@@ -21444,28 +21356,28 @@
       </p:sp>
       <p:grpSp>
         <p:nvGrpSpPr>
-          <p:cNvPr id="320" name="Group 19"/>
+          <p:cNvPr id="318" name="Group 19"/>
           <p:cNvGrpSpPr/>
           <p:nvPr/>
         </p:nvGrpSpPr>
         <p:grpSpPr>
           <a:xfrm>
             <a:off x="9348840" y="2254320"/>
-            <a:ext cx="1618920" cy="1631880"/>
+            <a:ext cx="1618200" cy="1631880"/>
             <a:chOff x="9348840" y="2254320"/>
-            <a:chExt cx="1618920" cy="1631880"/>
+            <a:chExt cx="1618200" cy="1631880"/>
           </a:xfrm>
         </p:grpSpPr>
         <p:sp>
           <p:nvSpPr>
-            <p:cNvPr id="321" name="TextBox 67"/>
+            <p:cNvPr id="319" name="TextBox 67"/>
             <p:cNvSpPr/>
             <p:nvPr/>
           </p:nvSpPr>
           <p:spPr>
             <a:xfrm>
               <a:off x="9348840" y="2254320"/>
-              <a:ext cx="1618920" cy="303120"/>
+              <a:ext cx="1618200" cy="303120"/>
             </a:xfrm>
             <a:prstGeom prst="rect">
               <a:avLst/>
@@ -21515,14 +21427,14 @@
         </p:sp>
         <p:sp>
           <p:nvSpPr>
-            <p:cNvPr id="322" name="TextBox 68"/>
+            <p:cNvPr id="320" name="TextBox 68"/>
             <p:cNvSpPr/>
             <p:nvPr/>
           </p:nvSpPr>
           <p:spPr>
             <a:xfrm>
               <a:off x="9348840" y="2515680"/>
-              <a:ext cx="1618920" cy="1370520"/>
+              <a:ext cx="1618200" cy="1370520"/>
             </a:xfrm>
             <a:prstGeom prst="rect">
               <a:avLst/>
@@ -21714,28 +21626,28 @@
       </p:grpSp>
       <p:grpSp>
         <p:nvGrpSpPr>
-          <p:cNvPr id="323" name="Group 20"/>
+          <p:cNvPr id="321" name="Group 20"/>
           <p:cNvGrpSpPr/>
           <p:nvPr/>
         </p:nvGrpSpPr>
         <p:grpSpPr>
           <a:xfrm>
             <a:off x="9348840" y="2254320"/>
-            <a:ext cx="1618920" cy="1845360"/>
+            <a:ext cx="1618200" cy="1845360"/>
             <a:chOff x="9348840" y="2254320"/>
-            <a:chExt cx="1618920" cy="1845360"/>
+            <a:chExt cx="1618200" cy="1845360"/>
           </a:xfrm>
         </p:grpSpPr>
         <p:sp>
           <p:nvSpPr>
-            <p:cNvPr id="324" name="TextBox 69"/>
+            <p:cNvPr id="322" name="TextBox 69"/>
             <p:cNvSpPr/>
             <p:nvPr/>
           </p:nvSpPr>
           <p:spPr>
             <a:xfrm>
               <a:off x="9348840" y="2254320"/>
-              <a:ext cx="1618920" cy="303120"/>
+              <a:ext cx="1618200" cy="303120"/>
             </a:xfrm>
             <a:prstGeom prst="rect">
               <a:avLst/>
@@ -21785,14 +21697,14 @@
         </p:sp>
         <p:sp>
           <p:nvSpPr>
-            <p:cNvPr id="325" name="TextBox 70"/>
+            <p:cNvPr id="323" name="TextBox 70"/>
             <p:cNvSpPr/>
             <p:nvPr/>
           </p:nvSpPr>
           <p:spPr>
             <a:xfrm>
               <a:off x="9348840" y="2515680"/>
-              <a:ext cx="1618920" cy="1584000"/>
+              <a:ext cx="1618200" cy="1584000"/>
             </a:xfrm>
             <a:prstGeom prst="rect">
               <a:avLst/>
@@ -22011,14 +21923,14 @@
       </p:grpSp>
       <p:sp>
         <p:nvSpPr>
-          <p:cNvPr id="326" name="Diamond 25"/>
+          <p:cNvPr id="324" name="Diamond 25"/>
           <p:cNvSpPr/>
           <p:nvPr/>
         </p:nvSpPr>
         <p:spPr>
           <a:xfrm>
             <a:off x="7086600" y="3501720"/>
-            <a:ext cx="1822320" cy="380160"/>
+            <a:ext cx="1821600" cy="379440"/>
           </a:xfrm>
           <a:prstGeom prst="diamond">
             <a:avLst/>
@@ -22076,14 +21988,14 @@
       </p:sp>
       <p:sp>
         <p:nvSpPr>
-          <p:cNvPr id="327" name="Diamond 16"/>
+          <p:cNvPr id="325" name="Diamond 16"/>
           <p:cNvSpPr/>
           <p:nvPr/>
         </p:nvSpPr>
         <p:spPr>
           <a:xfrm>
             <a:off x="7543800" y="1869840"/>
-            <a:ext cx="1792800" cy="380160"/>
+            <a:ext cx="1792080" cy="379440"/>
           </a:xfrm>
           <a:prstGeom prst="diamond">
             <a:avLst/>
@@ -22141,17 +22053,17 @@
       </p:sp>
       <p:cxnSp>
         <p:nvCxnSpPr>
-          <p:cNvPr id="328" name="Straight Arrow Connector 65"/>
+          <p:cNvPr id="326" name="Straight Arrow Connector 65"/>
           <p:cNvCxnSpPr>
-            <a:stCxn id="310" idx="3"/>
-            <a:endCxn id="327" idx="1"/>
+            <a:stCxn id="308" idx="3"/>
+            <a:endCxn id="325" idx="1"/>
           </p:cNvCxnSpPr>
           <p:nvPr/>
         </p:nvCxnSpPr>
         <p:spPr>
           <a:xfrm flipV="1">
-            <a:off x="7082280" y="2059920"/>
-            <a:ext cx="461880" cy="223920"/>
+            <a:off x="7081560" y="2059560"/>
+            <a:ext cx="462600" cy="224280"/>
           </a:xfrm>
           <a:prstGeom prst="straightConnector1">
             <a:avLst/>
@@ -22167,17 +22079,17 @@
       </p:cxnSp>
       <p:cxnSp>
         <p:nvCxnSpPr>
-          <p:cNvPr id="329" name="Straight Arrow Connector 40"/>
+          <p:cNvPr id="327" name="Straight Arrow Connector 40"/>
           <p:cNvCxnSpPr>
-            <a:stCxn id="318" idx="2"/>
-            <a:endCxn id="303" idx="0"/>
+            <a:stCxn id="316" idx="2"/>
+            <a:endCxn id="301" idx="0"/>
           </p:cNvCxnSpPr>
           <p:nvPr/>
         </p:nvCxnSpPr>
         <p:spPr>
           <a:xfrm flipH="1">
-            <a:off x="9267480" y="4952160"/>
-            <a:ext cx="917280" cy="534600"/>
+            <a:off x="9267120" y="4951440"/>
+            <a:ext cx="917280" cy="535320"/>
           </a:xfrm>
           <a:prstGeom prst="straightConnector1">
             <a:avLst/>
@@ -22192,16 +22104,16 @@
       </p:cxnSp>
       <p:cxnSp>
         <p:nvCxnSpPr>
-          <p:cNvPr id="330" name="Straight Arrow Connector 41"/>
+          <p:cNvPr id="328" name="Straight Arrow Connector 41"/>
           <p:cNvCxnSpPr>
-            <a:stCxn id="323" idx="2"/>
-            <a:endCxn id="318" idx="0"/>
+            <a:stCxn id="321" idx="2"/>
+            <a:endCxn id="316" idx="0"/>
           </p:cNvCxnSpPr>
           <p:nvPr/>
         </p:nvCxnSpPr>
         <p:spPr>
           <a:xfrm>
-            <a:off x="10158120" y="4099680"/>
+            <a:off x="10157760" y="4099680"/>
             <a:ext cx="26640" cy="472680"/>
           </a:xfrm>
           <a:prstGeom prst="straightConnector1">
@@ -22217,17 +22129,17 @@
       </p:cxnSp>
       <p:cxnSp>
         <p:nvCxnSpPr>
-          <p:cNvPr id="331" name="Straight Arrow Connector 42"/>
+          <p:cNvPr id="329" name="Straight Arrow Connector 42"/>
           <p:cNvCxnSpPr>
-            <a:stCxn id="318" idx="1"/>
-            <a:endCxn id="319" idx="6"/>
+            <a:stCxn id="316" idx="1"/>
+            <a:endCxn id="317" idx="6"/>
           </p:cNvCxnSpPr>
           <p:nvPr/>
         </p:nvCxnSpPr>
         <p:spPr>
           <a:xfrm flipH="1">
-            <a:off x="8680320" y="4762080"/>
-            <a:ext cx="722160" cy="360"/>
+            <a:off x="8679600" y="4761720"/>
+            <a:ext cx="722880" cy="360"/>
           </a:xfrm>
           <a:prstGeom prst="straightConnector1">
             <a:avLst/>
@@ -22242,14 +22154,14 @@
       </p:cxnSp>
       <p:sp>
         <p:nvSpPr>
-          <p:cNvPr id="332" name="Oval 7"/>
+          <p:cNvPr id="330" name="Oval 7"/>
           <p:cNvSpPr/>
           <p:nvPr/>
         </p:nvSpPr>
         <p:spPr>
           <a:xfrm>
             <a:off x="6629400" y="5099760"/>
-            <a:ext cx="1593720" cy="380160"/>
+            <a:ext cx="1593000" cy="379440"/>
           </a:xfrm>
           <a:prstGeom prst="ellipse">
             <a:avLst/>
@@ -22305,17 +22217,17 @@
       </p:sp>
       <p:cxnSp>
         <p:nvCxnSpPr>
-          <p:cNvPr id="333" name="Straight Arrow Connector 66"/>
+          <p:cNvPr id="331" name="Straight Arrow Connector 66"/>
           <p:cNvCxnSpPr>
-            <a:stCxn id="318" idx="1"/>
-            <a:endCxn id="332" idx="6"/>
+            <a:stCxn id="316" idx="1"/>
+            <a:endCxn id="330" idx="6"/>
           </p:cNvCxnSpPr>
           <p:nvPr/>
         </p:nvCxnSpPr>
         <p:spPr>
           <a:xfrm flipH="1">
-            <a:off x="8223120" y="4762080"/>
-            <a:ext cx="1179360" cy="528120"/>
+            <a:off x="8222400" y="4761720"/>
+            <a:ext cx="1180080" cy="528120"/>
           </a:xfrm>
           <a:prstGeom prst="straightConnector1">
             <a:avLst/>
@@ -22330,17 +22242,17 @@
       </p:cxnSp>
       <p:cxnSp>
         <p:nvCxnSpPr>
-          <p:cNvPr id="334" name="Straight Arrow Connector 67"/>
+          <p:cNvPr id="332" name="Straight Arrow Connector 67"/>
           <p:cNvCxnSpPr>
-            <a:stCxn id="335" idx="1"/>
-            <a:endCxn id="336" idx="6"/>
+            <a:stCxn id="333" idx="1"/>
+            <a:endCxn id="334" idx="6"/>
           </p:cNvCxnSpPr>
           <p:nvPr/>
         </p:nvCxnSpPr>
         <p:spPr>
           <a:xfrm flipH="1">
-            <a:off x="3628080" y="2548080"/>
-            <a:ext cx="6840" cy="457560"/>
+            <a:off x="3627360" y="2547720"/>
+            <a:ext cx="7560" cy="457560"/>
           </a:xfrm>
           <a:prstGeom prst="straightConnector1">
             <a:avLst/>
@@ -22355,14 +22267,14 @@
       </p:cxnSp>
       <p:sp>
         <p:nvSpPr>
-          <p:cNvPr id="337" name="Diamond 26"/>
+          <p:cNvPr id="335" name="Diamond 26"/>
           <p:cNvSpPr/>
           <p:nvPr/>
         </p:nvSpPr>
         <p:spPr>
           <a:xfrm>
             <a:off x="5234760" y="2815200"/>
-            <a:ext cx="1564200" cy="380160"/>
+            <a:ext cx="1563480" cy="379440"/>
           </a:xfrm>
           <a:prstGeom prst="diamond">
             <a:avLst/>
@@ -22420,14 +22332,14 @@
       </p:sp>
       <p:sp>
         <p:nvSpPr>
-          <p:cNvPr id="335" name="Diamond 27"/>
+          <p:cNvPr id="333" name="Diamond 27"/>
           <p:cNvSpPr/>
           <p:nvPr/>
         </p:nvSpPr>
         <p:spPr>
           <a:xfrm>
             <a:off x="3634560" y="2358000"/>
-            <a:ext cx="1564200" cy="380160"/>
+            <a:ext cx="1563480" cy="379440"/>
           </a:xfrm>
           <a:prstGeom prst="diamond">
             <a:avLst/>
@@ -22485,14 +22397,14 @@
       </p:sp>
       <p:sp>
         <p:nvSpPr>
-          <p:cNvPr id="336" name="Oval 8"/>
+          <p:cNvPr id="334" name="Oval 8"/>
           <p:cNvSpPr/>
           <p:nvPr/>
         </p:nvSpPr>
         <p:spPr>
           <a:xfrm>
             <a:off x="2034360" y="2815200"/>
-            <a:ext cx="1593720" cy="380160"/>
+            <a:ext cx="1593000" cy="379440"/>
           </a:xfrm>
           <a:prstGeom prst="ellipse">
             <a:avLst/>
@@ -22548,17 +22460,17 @@
       </p:sp>
       <p:cxnSp>
         <p:nvCxnSpPr>
-          <p:cNvPr id="338" name="Straight Arrow Connector 68"/>
+          <p:cNvPr id="336" name="Straight Arrow Connector 68"/>
           <p:cNvCxnSpPr>
-            <a:stCxn id="312" idx="0"/>
-            <a:endCxn id="335" idx="2"/>
+            <a:stCxn id="310" idx="0"/>
+            <a:endCxn id="333" idx="2"/>
           </p:cNvCxnSpPr>
           <p:nvPr/>
         </p:nvCxnSpPr>
         <p:spPr>
           <a:xfrm flipH="1" flipV="1">
-            <a:off x="4416840" y="2738160"/>
-            <a:ext cx="689400" cy="1284840"/>
+            <a:off x="4416480" y="2737440"/>
+            <a:ext cx="689400" cy="1285560"/>
           </a:xfrm>
           <a:prstGeom prst="straightConnector1">
             <a:avLst/>
@@ -22574,17 +22486,17 @@
       </p:cxnSp>
       <p:cxnSp>
         <p:nvCxnSpPr>
-          <p:cNvPr id="339" name="Straight Arrow Connector 69"/>
+          <p:cNvPr id="337" name="Straight Arrow Connector 69"/>
           <p:cNvCxnSpPr>
-            <a:stCxn id="311" idx="1"/>
-            <a:endCxn id="335" idx="0"/>
+            <a:stCxn id="309" idx="1"/>
+            <a:endCxn id="333" idx="0"/>
           </p:cNvCxnSpPr>
           <p:nvPr/>
         </p:nvCxnSpPr>
         <p:spPr>
           <a:xfrm flipH="1">
-            <a:off x="4416840" y="1980360"/>
-            <a:ext cx="1046880" cy="378000"/>
+            <a:off x="4416480" y="1980360"/>
+            <a:ext cx="1047240" cy="378000"/>
           </a:xfrm>
           <a:prstGeom prst="straightConnector1">
             <a:avLst/>
@@ -22599,17 +22511,17 @@
       </p:cxnSp>
       <p:cxnSp>
         <p:nvCxnSpPr>
-          <p:cNvPr id="340" name="Straight Arrow Connector 70"/>
+          <p:cNvPr id="338" name="Straight Arrow Connector 70"/>
           <p:cNvCxnSpPr>
-            <a:stCxn id="312" idx="0"/>
-            <a:endCxn id="337" idx="2"/>
+            <a:stCxn id="310" idx="0"/>
+            <a:endCxn id="335" idx="2"/>
           </p:cNvCxnSpPr>
           <p:nvPr/>
         </p:nvCxnSpPr>
         <p:spPr>
           <a:xfrm flipV="1">
-            <a:off x="5105880" y="3195360"/>
-            <a:ext cx="911520" cy="827640"/>
+            <a:off x="5105520" y="3194640"/>
+            <a:ext cx="911520" cy="828360"/>
           </a:xfrm>
           <a:prstGeom prst="straightConnector1">
             <a:avLst/>
@@ -22625,16 +22537,16 @@
       </p:cxnSp>
       <p:cxnSp>
         <p:nvCxnSpPr>
-          <p:cNvPr id="341" name="Straight Arrow Connector 71"/>
+          <p:cNvPr id="339" name="Straight Arrow Connector 71"/>
           <p:cNvCxnSpPr>
-            <a:stCxn id="337" idx="0"/>
-            <a:endCxn id="310" idx="2"/>
+            <a:stCxn id="335" idx="0"/>
+            <a:endCxn id="308" idx="2"/>
           </p:cNvCxnSpPr>
           <p:nvPr/>
         </p:nvCxnSpPr>
         <p:spPr>
           <a:xfrm flipV="1">
-            <a:off x="6017040" y="2435040"/>
+            <a:off x="6016680" y="2435040"/>
             <a:ext cx="255960" cy="380520"/>
           </a:xfrm>
           <a:prstGeom prst="straightConnector1">
@@ -22650,17 +22562,17 @@
       </p:cxnSp>
       <p:cxnSp>
         <p:nvCxnSpPr>
-          <p:cNvPr id="342" name="Straight Arrow Connector 64"/>
+          <p:cNvPr id="340" name="Straight Arrow Connector 64"/>
           <p:cNvCxnSpPr>
-            <a:stCxn id="312" idx="3"/>
-            <a:endCxn id="326" idx="1"/>
+            <a:stCxn id="310" idx="3"/>
+            <a:endCxn id="324" idx="1"/>
           </p:cNvCxnSpPr>
           <p:nvPr/>
         </p:nvCxnSpPr>
         <p:spPr>
           <a:xfrm flipV="1">
-            <a:off x="5915520" y="3691800"/>
-            <a:ext cx="1171440" cy="720000"/>
+            <a:off x="5914800" y="3691440"/>
+            <a:ext cx="1172160" cy="720360"/>
           </a:xfrm>
           <a:prstGeom prst="straightConnector1">
             <a:avLst/>
@@ -22676,17 +22588,17 @@
       </p:cxnSp>
       <p:cxnSp>
         <p:nvCxnSpPr>
-          <p:cNvPr id="343" name="Straight Arrow Connector 63"/>
+          <p:cNvPr id="341" name="Straight Arrow Connector 63"/>
           <p:cNvCxnSpPr>
-            <a:stCxn id="323" idx="1"/>
-            <a:endCxn id="326" idx="3"/>
+            <a:stCxn id="321" idx="1"/>
+            <a:endCxn id="324" idx="3"/>
           </p:cNvCxnSpPr>
           <p:nvPr/>
         </p:nvCxnSpPr>
         <p:spPr>
           <a:xfrm flipH="1">
-            <a:off x="8908920" y="3177000"/>
-            <a:ext cx="440280" cy="515160"/>
+            <a:off x="8908200" y="3177000"/>
+            <a:ext cx="441000" cy="514800"/>
           </a:xfrm>
           <a:prstGeom prst="straightConnector1">
             <a:avLst/>
@@ -22701,17 +22613,17 @@
       </p:cxnSp>
       <p:cxnSp>
         <p:nvCxnSpPr>
-          <p:cNvPr id="344" name="Straight Arrow Connector 39"/>
+          <p:cNvPr id="342" name="Straight Arrow Connector 39"/>
           <p:cNvCxnSpPr>
-            <a:stCxn id="323" idx="0"/>
-            <a:endCxn id="327" idx="3"/>
+            <a:stCxn id="321" idx="0"/>
+            <a:endCxn id="325" idx="3"/>
           </p:cNvCxnSpPr>
           <p:nvPr/>
         </p:nvCxnSpPr>
         <p:spPr>
           <a:xfrm flipH="1" flipV="1">
-            <a:off x="9336600" y="2059920"/>
-            <a:ext cx="821880" cy="194760"/>
+            <a:off x="9335880" y="2059560"/>
+            <a:ext cx="822240" cy="195120"/>
           </a:xfrm>
           <a:prstGeom prst="straightConnector1">
             <a:avLst/>
@@ -22726,14 +22638,14 @@
       </p:cxnSp>
       <p:sp>
         <p:nvSpPr>
-          <p:cNvPr id="345" name="Diamond 29"/>
+          <p:cNvPr id="343" name="Diamond 29"/>
           <p:cNvSpPr/>
           <p:nvPr/>
         </p:nvSpPr>
         <p:spPr>
           <a:xfrm>
             <a:off x="2722320" y="5330520"/>
-            <a:ext cx="1822320" cy="380160"/>
+            <a:ext cx="1821600" cy="379440"/>
           </a:xfrm>
           <a:prstGeom prst="diamond">
             <a:avLst/>
@@ -22791,17 +22703,17 @@
       </p:sp>
       <p:cxnSp>
         <p:nvCxnSpPr>
-          <p:cNvPr id="346" name="Straight Arrow Connector 72"/>
+          <p:cNvPr id="344" name="Straight Arrow Connector 72"/>
           <p:cNvCxnSpPr>
-            <a:stCxn id="312" idx="1"/>
-            <a:endCxn id="345" idx="0"/>
+            <a:stCxn id="310" idx="1"/>
+            <a:endCxn id="343" idx="0"/>
           </p:cNvCxnSpPr>
           <p:nvPr/>
         </p:nvCxnSpPr>
         <p:spPr>
           <a:xfrm flipH="1">
-            <a:off x="3633480" y="4411440"/>
-            <a:ext cx="663480" cy="919440"/>
+            <a:off x="3633120" y="4411440"/>
+            <a:ext cx="663840" cy="919440"/>
           </a:xfrm>
           <a:prstGeom prst="straightConnector1">
             <a:avLst/>
@@ -22816,17 +22728,17 @@
       </p:cxnSp>
       <p:cxnSp>
         <p:nvCxnSpPr>
-          <p:cNvPr id="347" name="Straight Arrow Connector 73"/>
+          <p:cNvPr id="345" name="Straight Arrow Connector 73"/>
           <p:cNvCxnSpPr>
-            <a:stCxn id="312" idx="2"/>
-            <a:endCxn id="345" idx="3"/>
+            <a:stCxn id="310" idx="2"/>
+            <a:endCxn id="343" idx="3"/>
           </p:cNvCxnSpPr>
           <p:nvPr/>
         </p:nvCxnSpPr>
         <p:spPr>
           <a:xfrm flipH="1">
-            <a:off x="4544640" y="4800600"/>
-            <a:ext cx="561600" cy="720360"/>
+            <a:off x="4543920" y="4800600"/>
+            <a:ext cx="561960" cy="720000"/>
           </a:xfrm>
           <a:prstGeom prst="straightConnector1">
             <a:avLst/>
@@ -22841,14 +22753,14 @@
       </p:cxnSp>
       <p:sp>
         <p:nvSpPr>
-          <p:cNvPr id="348" name="Oval 9"/>
+          <p:cNvPr id="346" name="Oval 9"/>
           <p:cNvSpPr/>
           <p:nvPr/>
         </p:nvSpPr>
         <p:spPr>
           <a:xfrm>
             <a:off x="7315200" y="4114800"/>
-            <a:ext cx="1672920" cy="380160"/>
+            <a:ext cx="1672200" cy="379440"/>
           </a:xfrm>
           <a:prstGeom prst="ellipse">
             <a:avLst/>
@@ -22904,17 +22816,17 @@
       </p:sp>
       <p:cxnSp>
         <p:nvCxnSpPr>
-          <p:cNvPr id="349" name="Straight Arrow Connector 58"/>
+          <p:cNvPr id="347" name="Straight Arrow Connector 58"/>
           <p:cNvCxnSpPr>
-            <a:stCxn id="318" idx="1"/>
-            <a:endCxn id="348" idx="6"/>
+            <a:stCxn id="316" idx="1"/>
+            <a:endCxn id="346" idx="6"/>
           </p:cNvCxnSpPr>
           <p:nvPr/>
         </p:nvCxnSpPr>
         <p:spPr>
           <a:xfrm flipH="1" flipV="1">
-            <a:off x="8988120" y="4304880"/>
-            <a:ext cx="414360" cy="457560"/>
+            <a:off x="8987400" y="4304520"/>
+            <a:ext cx="415080" cy="457560"/>
           </a:xfrm>
           <a:prstGeom prst="straightConnector1">
             <a:avLst/>
@@ -22959,14 +22871,14 @@
       </p:grpSpPr>
       <p:cxnSp>
         <p:nvCxnSpPr>
-          <p:cNvPr id="350" name="Straight Arrow Connector 6"/>
+          <p:cNvPr id="348" name="Straight Arrow Connector 6"/>
           <p:cNvCxnSpPr/>
           <p:nvPr/>
         </p:nvCxnSpPr>
         <p:spPr>
           <a:xfrm flipH="1">
             <a:off x="0" y="3073320"/>
-            <a:ext cx="1836360" cy="7560"/>
+            <a:ext cx="1837080" cy="8280"/>
           </a:xfrm>
           <a:prstGeom prst="straightConnector1">
             <a:avLst/>
@@ -22982,14 +22894,14 @@
       </p:cxnSp>
       <p:cxnSp>
         <p:nvCxnSpPr>
-          <p:cNvPr id="351" name="Straight Arrow Connector 7"/>
+          <p:cNvPr id="349" name="Straight Arrow Connector 7"/>
           <p:cNvCxnSpPr/>
           <p:nvPr/>
         </p:nvCxnSpPr>
         <p:spPr>
           <a:xfrm>
             <a:off x="0" y="2489400"/>
-            <a:ext cx="1836360" cy="7560"/>
+            <a:ext cx="1837080" cy="8280"/>
           </a:xfrm>
           <a:prstGeom prst="straightConnector1">
             <a:avLst/>
@@ -23005,14 +22917,14 @@
       </p:cxnSp>
       <p:cxnSp>
         <p:nvCxnSpPr>
-          <p:cNvPr id="352" name="Straight Arrow Connector 8"/>
+          <p:cNvPr id="350" name="Straight Arrow Connector 8"/>
           <p:cNvCxnSpPr/>
           <p:nvPr/>
         </p:nvCxnSpPr>
         <p:spPr>
           <a:xfrm>
             <a:off x="0" y="2781360"/>
-            <a:ext cx="1836360" cy="7560"/>
+            <a:ext cx="1837080" cy="8280"/>
           </a:xfrm>
           <a:prstGeom prst="straightConnector1">
             <a:avLst/>
@@ -23028,14 +22940,14 @@
       </p:cxnSp>
       <p:cxnSp>
         <p:nvCxnSpPr>
-          <p:cNvPr id="353" name="Straight Arrow Connector 9"/>
+          <p:cNvPr id="351" name="Straight Arrow Connector 9"/>
           <p:cNvCxnSpPr/>
           <p:nvPr/>
         </p:nvCxnSpPr>
         <p:spPr>
           <a:xfrm flipH="1">
             <a:off x="0" y="3657600"/>
-            <a:ext cx="1836360" cy="7560"/>
+            <a:ext cx="1837080" cy="8280"/>
           </a:xfrm>
           <a:prstGeom prst="straightConnector1">
             <a:avLst/>
@@ -23050,14 +22962,14 @@
       </p:cxnSp>
       <p:sp>
         <p:nvSpPr>
-          <p:cNvPr id="354" name="Diamond 3"/>
+          <p:cNvPr id="352" name="Diamond 3"/>
           <p:cNvSpPr/>
           <p:nvPr/>
         </p:nvSpPr>
         <p:spPr>
           <a:xfrm>
             <a:off x="128520" y="6134040"/>
-            <a:ext cx="1564200" cy="380160"/>
+            <a:ext cx="1563480" cy="379440"/>
           </a:xfrm>
           <a:prstGeom prst="diamond">
             <a:avLst/>
@@ -23115,14 +23027,14 @@
       </p:sp>
       <p:sp>
         <p:nvSpPr>
-          <p:cNvPr id="355" name="Oval 2"/>
+          <p:cNvPr id="353" name="Oval 2"/>
           <p:cNvSpPr/>
           <p:nvPr/>
         </p:nvSpPr>
         <p:spPr>
           <a:xfrm>
             <a:off x="302760" y="5454000"/>
-            <a:ext cx="1215720" cy="380160"/>
+            <a:ext cx="1215000" cy="379440"/>
           </a:xfrm>
           <a:prstGeom prst="ellipse">
             <a:avLst/>
@@ -23178,28 +23090,28 @@
       </p:sp>
       <p:grpSp>
         <p:nvGrpSpPr>
-          <p:cNvPr id="356" name="Group 3"/>
+          <p:cNvPr id="354" name="Group 3"/>
           <p:cNvGrpSpPr/>
           <p:nvPr/>
         </p:nvGrpSpPr>
         <p:grpSpPr>
           <a:xfrm>
             <a:off x="101160" y="336240"/>
-            <a:ext cx="1618920" cy="777960"/>
+            <a:ext cx="1618200" cy="777960"/>
             <a:chOff x="101160" y="336240"/>
-            <a:chExt cx="1618920" cy="777960"/>
+            <a:chExt cx="1618200" cy="777960"/>
           </a:xfrm>
         </p:grpSpPr>
         <p:sp>
           <p:nvSpPr>
-            <p:cNvPr id="357" name="TextBox 5"/>
+            <p:cNvPr id="355" name="TextBox 5"/>
             <p:cNvSpPr/>
             <p:nvPr/>
           </p:nvSpPr>
           <p:spPr>
             <a:xfrm>
               <a:off x="101160" y="336240"/>
-              <a:ext cx="1618920" cy="303120"/>
+              <a:ext cx="1618200" cy="303120"/>
             </a:xfrm>
             <a:prstGeom prst="rect">
               <a:avLst/>
@@ -23249,14 +23161,14 @@
         </p:sp>
         <p:sp>
           <p:nvSpPr>
-            <p:cNvPr id="358" name="TextBox 6"/>
+            <p:cNvPr id="356" name="TextBox 6"/>
             <p:cNvSpPr/>
             <p:nvPr/>
           </p:nvSpPr>
           <p:spPr>
             <a:xfrm>
               <a:off x="101160" y="597600"/>
-              <a:ext cx="1618920" cy="516600"/>
+              <a:ext cx="1618200" cy="516600"/>
             </a:xfrm>
             <a:prstGeom prst="rect">
               <a:avLst/>
@@ -23340,14 +23252,14 @@
       </p:grpSp>
       <p:sp>
         <p:nvSpPr>
-          <p:cNvPr id="359" name="Diamond 4"/>
+          <p:cNvPr id="357" name="Diamond 4"/>
           <p:cNvSpPr/>
           <p:nvPr/>
         </p:nvSpPr>
         <p:spPr>
           <a:xfrm>
             <a:off x="128520" y="4629600"/>
-            <a:ext cx="1564200" cy="524880"/>
+            <a:ext cx="1563480" cy="524160"/>
           </a:xfrm>
           <a:prstGeom prst="diamond">
             <a:avLst/>
@@ -23428,14 +23340,14 @@
       </p:sp>
       <p:cxnSp>
         <p:nvCxnSpPr>
-          <p:cNvPr id="360" name="Straight Arrow Connector 10"/>
+          <p:cNvPr id="358" name="Straight Arrow Connector 10"/>
           <p:cNvCxnSpPr/>
           <p:nvPr/>
         </p:nvCxnSpPr>
         <p:spPr>
           <a:xfrm>
             <a:off x="0" y="3365640"/>
-            <a:ext cx="1836360" cy="7560"/>
+            <a:ext cx="1837080" cy="8280"/>
           </a:xfrm>
           <a:prstGeom prst="straightConnector1">
             <a:avLst/>
@@ -23450,14 +23362,14 @@
       </p:cxnSp>
       <p:sp>
         <p:nvSpPr>
-          <p:cNvPr id="361" name="Isosceles Triangle 2"/>
+          <p:cNvPr id="359" name="Isosceles Triangle 2"/>
           <p:cNvSpPr/>
           <p:nvPr/>
         </p:nvSpPr>
         <p:spPr>
           <a:xfrm>
             <a:off x="673200" y="3949920"/>
-            <a:ext cx="475200" cy="380160"/>
+            <a:ext cx="474480" cy="379440"/>
           </a:xfrm>
           <a:prstGeom prst="triangle">
             <a:avLst>
@@ -23517,28 +23429,28 @@
       </p:sp>
       <p:grpSp>
         <p:nvGrpSpPr>
-          <p:cNvPr id="362" name="Group 4"/>
+          <p:cNvPr id="360" name="Group 4"/>
           <p:cNvGrpSpPr/>
           <p:nvPr/>
         </p:nvGrpSpPr>
         <p:grpSpPr>
           <a:xfrm>
             <a:off x="101160" y="1413000"/>
-            <a:ext cx="1618920" cy="777960"/>
+            <a:ext cx="1618200" cy="777960"/>
             <a:chOff x="101160" y="1413000"/>
-            <a:chExt cx="1618920" cy="777960"/>
+            <a:chExt cx="1618200" cy="777960"/>
           </a:xfrm>
         </p:grpSpPr>
         <p:sp>
           <p:nvSpPr>
-            <p:cNvPr id="363" name="TextBox 7"/>
+            <p:cNvPr id="361" name="TextBox 7"/>
             <p:cNvSpPr/>
             <p:nvPr/>
           </p:nvSpPr>
           <p:spPr>
             <a:xfrm>
               <a:off x="101160" y="1413000"/>
-              <a:ext cx="1618920" cy="303120"/>
+              <a:ext cx="1618200" cy="303120"/>
             </a:xfrm>
             <a:prstGeom prst="rect">
               <a:avLst/>
@@ -23589,14 +23501,14 @@
         </p:sp>
         <p:sp>
           <p:nvSpPr>
-            <p:cNvPr id="364" name="TextBox 8"/>
+            <p:cNvPr id="362" name="TextBox 8"/>
             <p:cNvSpPr/>
             <p:nvPr/>
           </p:nvSpPr>
           <p:spPr>
             <a:xfrm>
               <a:off x="101160" y="1674360"/>
-              <a:ext cx="1618920" cy="516600"/>
+              <a:ext cx="1618200" cy="516600"/>
             </a:xfrm>
             <a:prstGeom prst="rect">
               <a:avLst/>

</xml_diff>

<commit_message>
small database update & created first files about timers
</commit_message>
<xml_diff>
--- a/documentation/database/ER-Diagram.pptx
+++ b/documentation/database/ER-Diagram.pptx
@@ -353,7 +353,7 @@
             <a:pPr indent="0" algn="r">
               <a:buNone/>
             </a:pPr>
-            <a:fld id="{E08CE10A-F586-4296-93EE-A276D98B0F8F}" type="slidenum">
+            <a:fld id="{F8CFC5D6-715F-4C5B-9CEC-BA41E398D1B1}" type="slidenum">
               <a:rPr b="0" lang="en-US" sz="1400" spc="-1" strike="noStrike">
                 <a:solidFill>
                   <a:srgbClr val="000000"/>
@@ -407,7 +407,7 @@
         <p:spPr>
           <a:xfrm>
             <a:off x="685800" y="1143000"/>
-            <a:ext cx="5478120" cy="3078000"/>
+            <a:ext cx="5477760" cy="3077640"/>
           </a:xfrm>
           <a:prstGeom prst="rect">
             <a:avLst/>
@@ -430,7 +430,7 @@
         <p:spPr>
           <a:xfrm>
             <a:off x="685800" y="4400640"/>
-            <a:ext cx="5478120" cy="3592080"/>
+            <a:ext cx="5477760" cy="3591720"/>
           </a:xfrm>
           <a:prstGeom prst="rect">
             <a:avLst/>
@@ -470,7 +470,7 @@
         <p:spPr>
           <a:xfrm>
             <a:off x="3884760" y="8685360"/>
-            <a:ext cx="2963520" cy="450360"/>
+            <a:ext cx="2963160" cy="450000"/>
           </a:xfrm>
           <a:prstGeom prst="rect">
             <a:avLst/>
@@ -512,7 +512,7 @@
                 <a:tab algn="l" pos="0"/>
               </a:tabLst>
             </a:pPr>
-            <a:fld id="{2FC0BD7A-4534-4A9F-B473-745CF9A6B003}" type="slidenum">
+            <a:fld id="{E2AB284A-5271-4EF4-B1B9-2550174FDC6F}" type="slidenum">
               <a:rPr b="0" lang="en-US" sz="1200" spc="-1" strike="noStrike">
                 <a:solidFill>
                   <a:schemeClr val="dk1"/>
@@ -566,7 +566,7 @@
         <p:spPr>
           <a:xfrm>
             <a:off x="685800" y="1143000"/>
-            <a:ext cx="5478120" cy="3078000"/>
+            <a:ext cx="5477760" cy="3077640"/>
           </a:xfrm>
           <a:prstGeom prst="rect">
             <a:avLst/>
@@ -589,7 +589,7 @@
         <p:spPr>
           <a:xfrm>
             <a:off x="685800" y="4400640"/>
-            <a:ext cx="5478120" cy="3592080"/>
+            <a:ext cx="5477760" cy="3591720"/>
           </a:xfrm>
           <a:prstGeom prst="rect">
             <a:avLst/>
@@ -629,7 +629,7 @@
         <p:spPr>
           <a:xfrm>
             <a:off x="3884760" y="8685360"/>
-            <a:ext cx="2963520" cy="450360"/>
+            <a:ext cx="2963160" cy="450000"/>
           </a:xfrm>
           <a:prstGeom prst="rect">
             <a:avLst/>
@@ -671,7 +671,7 @@
                 <a:tab algn="l" pos="0"/>
               </a:tabLst>
             </a:pPr>
-            <a:fld id="{69C20BD0-B0DB-491A-A971-8272EFAC3032}" type="slidenum">
+            <a:fld id="{4E26DC15-619F-4BB3-91A9-542AEA944C7A}" type="slidenum">
               <a:rPr b="0" lang="en-US" sz="1200" spc="-1" strike="noStrike">
                 <a:solidFill>
                   <a:schemeClr val="dk1"/>
@@ -725,7 +725,7 @@
         <p:spPr>
           <a:xfrm>
             <a:off x="685800" y="1143000"/>
-            <a:ext cx="5478120" cy="3078000"/>
+            <a:ext cx="5477760" cy="3077640"/>
           </a:xfrm>
           <a:prstGeom prst="rect">
             <a:avLst/>
@@ -748,7 +748,7 @@
         <p:spPr>
           <a:xfrm>
             <a:off x="685800" y="4400640"/>
-            <a:ext cx="5478120" cy="3592080"/>
+            <a:ext cx="5477760" cy="3591720"/>
           </a:xfrm>
           <a:prstGeom prst="rect">
             <a:avLst/>
@@ -788,7 +788,7 @@
         <p:spPr>
           <a:xfrm>
             <a:off x="3884760" y="8685360"/>
-            <a:ext cx="2963520" cy="450360"/>
+            <a:ext cx="2963160" cy="450000"/>
           </a:xfrm>
           <a:prstGeom prst="rect">
             <a:avLst/>
@@ -830,7 +830,7 @@
                 <a:tab algn="l" pos="0"/>
               </a:tabLst>
             </a:pPr>
-            <a:fld id="{000AD0E2-8672-4536-A756-181079327C60}" type="slidenum">
+            <a:fld id="{40BCCCC9-5E6E-4060-8A74-40BF80ED7FC9}" type="slidenum">
               <a:rPr b="0" lang="en-US" sz="1200" spc="-1" strike="noStrike">
                 <a:solidFill>
                   <a:schemeClr val="dk1"/>
@@ -884,7 +884,7 @@
         <p:spPr>
           <a:xfrm>
             <a:off x="685800" y="1143000"/>
-            <a:ext cx="5478120" cy="3078000"/>
+            <a:ext cx="5477760" cy="3077640"/>
           </a:xfrm>
           <a:prstGeom prst="rect">
             <a:avLst/>
@@ -907,7 +907,7 @@
         <p:spPr>
           <a:xfrm>
             <a:off x="685800" y="4400640"/>
-            <a:ext cx="5478120" cy="3592080"/>
+            <a:ext cx="5477760" cy="3591720"/>
           </a:xfrm>
           <a:prstGeom prst="rect">
             <a:avLst/>
@@ -947,7 +947,7 @@
         <p:spPr>
           <a:xfrm>
             <a:off x="3884760" y="8685360"/>
-            <a:ext cx="2963520" cy="450360"/>
+            <a:ext cx="2963160" cy="450000"/>
           </a:xfrm>
           <a:prstGeom prst="rect">
             <a:avLst/>
@@ -989,7 +989,7 @@
                 <a:tab algn="l" pos="0"/>
               </a:tabLst>
             </a:pPr>
-            <a:fld id="{8B19AA62-26EA-4234-9A29-7A022B57CBF5}" type="slidenum">
+            <a:fld id="{44D7259F-6ED4-4297-91AA-49759901043A}" type="slidenum">
               <a:rPr b="0" lang="en-US" sz="1200" spc="-1" strike="noStrike">
                 <a:solidFill>
                   <a:schemeClr val="dk1"/>
@@ -1233,7 +1233,7 @@
         <p:txBody>
           <a:bodyPr/>
           <a:p>
-            <a:fld id="{36EC6FBA-ED42-47B0-811F-8C2694A47B15}" type="slidenum">
+            <a:fld id="{1BC4476F-6C42-4ED9-8522-BB0DBBB25E1E}" type="slidenum">
               <a:t>&lt;#&gt;</a:t>
             </a:fld>
           </a:p>
@@ -1442,7 +1442,7 @@
         <p:txBody>
           <a:bodyPr/>
           <a:p>
-            <a:fld id="{6B666937-31E8-4BA8-A26C-9DB6A9B911AC}" type="slidenum">
+            <a:fld id="{3A7202B3-C5FE-4F95-A8FF-F0FA34A6DB82}" type="slidenum">
               <a:t>&lt;#&gt;</a:t>
             </a:fld>
           </a:p>
@@ -1565,7 +1565,7 @@
         <p:txBody>
           <a:bodyPr/>
           <a:p>
-            <a:fld id="{074300D2-A40B-4A3F-AE1D-BF865045115D}" type="slidenum">
+            <a:fld id="{FA7A3DCC-D6CD-40A7-9A4E-025B1E6F4331}" type="slidenum">
               <a:t>&lt;#&gt;</a:t>
             </a:fld>
           </a:p>
@@ -1648,7 +1648,7 @@
         <p:txBody>
           <a:bodyPr/>
           <a:p>
-            <a:fld id="{837387EE-7285-423B-B016-D3D879CF2A5D}" type="slidenum">
+            <a:fld id="{2B8E7FBD-C70A-4E92-9464-C130EA48F933}" type="slidenum">
               <a:t>&lt;#&gt;</a:t>
             </a:fld>
           </a:p>
@@ -1900,7 +1900,7 @@
         <p:txBody>
           <a:bodyPr/>
           <a:p>
-            <a:fld id="{AEAECADB-7ECD-49DA-8BF6-D604C1F2E85B}" type="slidenum">
+            <a:fld id="{C939B095-10F8-41AE-BE5C-27BCCF9C6901}" type="slidenum">
               <a:t>&lt;#&gt;</a:t>
             </a:fld>
           </a:p>
@@ -2152,7 +2152,7 @@
         <p:txBody>
           <a:bodyPr/>
           <a:p>
-            <a:fld id="{38E93B40-B973-41CD-ACBA-D61514450757}" type="slidenum">
+            <a:fld id="{E9FC2CCD-87C9-462D-8A93-E26627EC6C43}" type="slidenum">
               <a:t>&lt;#&gt;</a:t>
             </a:fld>
           </a:p>
@@ -2361,7 +2361,7 @@
         <p:txBody>
           <a:bodyPr/>
           <a:p>
-            <a:fld id="{3E0D4492-0867-4C5F-B704-7901BF20B906}" type="slidenum">
+            <a:fld id="{EAD51C75-6F70-4E3E-A6EA-B65737DF3AFD}" type="slidenum">
               <a:t>&lt;#&gt;</a:t>
             </a:fld>
           </a:p>
@@ -2656,7 +2656,7 @@
         <p:txBody>
           <a:bodyPr/>
           <a:p>
-            <a:fld id="{C481363B-C1F6-41AB-ADE0-B73D881FB7E0}" type="slidenum">
+            <a:fld id="{ED8059B1-9DD2-48C5-ABFB-0802A28C2095}" type="slidenum">
               <a:t>&lt;#&gt;</a:t>
             </a:fld>
           </a:p>
@@ -2739,7 +2739,7 @@
         <p:txBody>
           <a:bodyPr/>
           <a:p>
-            <a:fld id="{70B8E68D-933A-412B-82BD-93D4B71BD92E}" type="slidenum">
+            <a:fld id="{03393273-B200-4828-B51B-E1E4F351C0A3}" type="slidenum">
               <a:t>&lt;#&gt;</a:t>
             </a:fld>
           </a:p>
@@ -2822,7 +2822,7 @@
         <p:txBody>
           <a:bodyPr/>
           <a:p>
-            <a:fld id="{5CEEADCE-427B-4B2B-9ABB-8288D8D58BD7}" type="slidenum">
+            <a:fld id="{C46A126B-A6E5-471B-BF44-93AE8231553D}" type="slidenum">
               <a:t>&lt;#&gt;</a:t>
             </a:fld>
           </a:p>
@@ -2988,7 +2988,7 @@
         <p:txBody>
           <a:bodyPr/>
           <a:p>
-            <a:fld id="{99931F16-7992-4C40-8849-1D974DA850BD}" type="slidenum">
+            <a:fld id="{3A3CF038-5824-4AC7-82A4-CEE987CC573B}" type="slidenum">
               <a:t>&lt;#&gt;</a:t>
             </a:fld>
           </a:p>
@@ -3154,7 +3154,7 @@
         <p:txBody>
           <a:bodyPr/>
           <a:p>
-            <a:fld id="{118946C0-8B79-48DD-B67C-22B26488627B}" type="slidenum">
+            <a:fld id="{53872CF4-2B93-47ED-B7E9-9D9C9CE1DAED}" type="slidenum">
               <a:t>&lt;#&gt;</a:t>
             </a:fld>
           </a:p>
@@ -3219,9 +3219,9 @@
         <p:grpSpPr>
           <a:xfrm>
             <a:off x="6199200" y="6162840"/>
-            <a:ext cx="5984640" cy="686880"/>
+            <a:ext cx="5984280" cy="686520"/>
             <a:chOff x="6199200" y="6162840"/>
-            <a:chExt cx="5984640" cy="686880"/>
+            <a:chExt cx="5984280" cy="686520"/>
           </a:xfrm>
         </p:grpSpPr>
         <p:pic>
@@ -3237,7 +3237,7 @@
           <p:spPr>
             <a:xfrm>
               <a:off x="6199200" y="6162840"/>
-              <a:ext cx="4048200" cy="686880"/>
+              <a:ext cx="4047840" cy="686520"/>
             </a:xfrm>
             <a:prstGeom prst="rect">
               <a:avLst/>
@@ -3260,7 +3260,7 @@
           <p:spPr>
             <a:xfrm>
               <a:off x="10270080" y="6162840"/>
-              <a:ext cx="1913760" cy="603360"/>
+              <a:ext cx="1913400" cy="603000"/>
             </a:xfrm>
             <a:prstGeom prst="rect">
               <a:avLst/>
@@ -4008,7 +4008,7 @@
         <p:spPr>
           <a:xfrm>
             <a:off x="4038480" y="6356520"/>
-            <a:ext cx="4106520" cy="356760"/>
+            <a:ext cx="4106160" cy="356400"/>
           </a:xfrm>
           <a:prstGeom prst="rect">
             <a:avLst/>
@@ -4080,7 +4080,7 @@
         <p:spPr>
           <a:xfrm>
             <a:off x="8610480" y="6356520"/>
-            <a:ext cx="2734920" cy="356760"/>
+            <a:ext cx="2734560" cy="356400"/>
           </a:xfrm>
           <a:prstGeom prst="rect">
             <a:avLst/>
@@ -4123,7 +4123,7 @@
                 <a:tab algn="l" pos="0"/>
               </a:tabLst>
             </a:pPr>
-            <a:fld id="{F66F4DAA-1265-4ECA-8846-2552786087FE}" type="slidenum">
+            <a:fld id="{010E202D-3803-40AD-A91E-66C082B40E03}" type="slidenum">
               <a:rPr b="0" lang="en-US" sz="1200" spc="-1" strike="noStrike">
                 <a:solidFill>
                   <a:schemeClr val="dk1">
@@ -4156,7 +4156,7 @@
         <p:spPr>
           <a:xfrm>
             <a:off x="838080" y="6356520"/>
-            <a:ext cx="2734920" cy="356760"/>
+            <a:ext cx="2734560" cy="356400"/>
           </a:xfrm>
           <a:prstGeom prst="rect">
             <a:avLst/>
@@ -4245,9 +4245,9 @@
         <p:grpSpPr>
           <a:xfrm>
             <a:off x="6199200" y="6162840"/>
-            <a:ext cx="5984640" cy="686880"/>
+            <a:ext cx="5984280" cy="686520"/>
             <a:chOff x="6199200" y="6162840"/>
-            <a:chExt cx="5984640" cy="686880"/>
+            <a:chExt cx="5984280" cy="686520"/>
           </a:xfrm>
         </p:grpSpPr>
         <p:pic>
@@ -4263,7 +4263,7 @@
           <p:spPr>
             <a:xfrm>
               <a:off x="6199200" y="6162840"/>
-              <a:ext cx="4048200" cy="686880"/>
+              <a:ext cx="4047840" cy="686520"/>
             </a:xfrm>
             <a:prstGeom prst="rect">
               <a:avLst/>
@@ -4286,7 +4286,7 @@
           <p:spPr>
             <a:xfrm>
               <a:off x="10270080" y="6162840"/>
-              <a:ext cx="1913760" cy="603360"/>
+              <a:ext cx="1913400" cy="603000"/>
             </a:xfrm>
             <a:prstGeom prst="rect">
               <a:avLst/>
@@ -4809,7 +4809,7 @@
         <p:spPr>
           <a:xfrm>
             <a:off x="4038480" y="6356520"/>
-            <a:ext cx="4106520" cy="356760"/>
+            <a:ext cx="4106160" cy="356400"/>
           </a:xfrm>
           <a:prstGeom prst="rect">
             <a:avLst/>
@@ -4881,7 +4881,7 @@
         <p:spPr>
           <a:xfrm>
             <a:off x="8610480" y="6356520"/>
-            <a:ext cx="2734920" cy="356760"/>
+            <a:ext cx="2734560" cy="356400"/>
           </a:xfrm>
           <a:prstGeom prst="rect">
             <a:avLst/>
@@ -4924,7 +4924,7 @@
                 <a:tab algn="l" pos="0"/>
               </a:tabLst>
             </a:pPr>
-            <a:fld id="{0F9C020B-8F38-4E25-80FE-857111AB8651}" type="slidenum">
+            <a:fld id="{589B30A0-A859-4B77-8D8F-90B8C096DAE0}" type="slidenum">
               <a:rPr b="0" lang="en-US" sz="1200" spc="-1" strike="noStrike">
                 <a:solidFill>
                   <a:schemeClr val="dk1">
@@ -4957,7 +4957,7 @@
         <p:spPr>
           <a:xfrm>
             <a:off x="838080" y="6356520"/>
-            <a:ext cx="2734920" cy="356760"/>
+            <a:ext cx="2734560" cy="356400"/>
           </a:xfrm>
           <a:prstGeom prst="rect">
             <a:avLst/>
@@ -5046,9 +5046,9 @@
         <p:grpSpPr>
           <a:xfrm>
             <a:off x="6199200" y="6162840"/>
-            <a:ext cx="5984640" cy="686880"/>
+            <a:ext cx="5984280" cy="686520"/>
             <a:chOff x="6199200" y="6162840"/>
-            <a:chExt cx="5984640" cy="686880"/>
+            <a:chExt cx="5984280" cy="686520"/>
           </a:xfrm>
         </p:grpSpPr>
         <p:pic>
@@ -5064,7 +5064,7 @@
           <p:spPr>
             <a:xfrm>
               <a:off x="6199200" y="6162840"/>
-              <a:ext cx="4048200" cy="686880"/>
+              <a:ext cx="4047840" cy="686520"/>
             </a:xfrm>
             <a:prstGeom prst="rect">
               <a:avLst/>
@@ -5087,7 +5087,7 @@
           <p:spPr>
             <a:xfrm>
               <a:off x="10270080" y="6162840"/>
-              <a:ext cx="1913760" cy="603360"/>
+              <a:ext cx="1913400" cy="603000"/>
             </a:xfrm>
             <a:prstGeom prst="rect">
               <a:avLst/>
@@ -5160,7 +5160,7 @@
         <p:spPr>
           <a:xfrm>
             <a:off x="4038480" y="6356520"/>
-            <a:ext cx="4106520" cy="356760"/>
+            <a:ext cx="4106160" cy="356400"/>
           </a:xfrm>
           <a:prstGeom prst="rect">
             <a:avLst/>
@@ -5232,7 +5232,7 @@
         <p:spPr>
           <a:xfrm>
             <a:off x="8610480" y="6356520"/>
-            <a:ext cx="2734920" cy="356760"/>
+            <a:ext cx="2734560" cy="356400"/>
           </a:xfrm>
           <a:prstGeom prst="rect">
             <a:avLst/>
@@ -5275,7 +5275,7 @@
                 <a:tab algn="l" pos="0"/>
               </a:tabLst>
             </a:pPr>
-            <a:fld id="{383B6534-E2E1-45E5-B8CC-EFFF711570AA}" type="slidenum">
+            <a:fld id="{4D0505AE-33FF-40C8-8B5B-701D64DBC5C8}" type="slidenum">
               <a:rPr b="0" lang="en-US" sz="1200" spc="-1" strike="noStrike">
                 <a:solidFill>
                   <a:schemeClr val="dk1">
@@ -5308,7 +5308,7 @@
         <p:spPr>
           <a:xfrm>
             <a:off x="838080" y="6356520"/>
-            <a:ext cx="2734920" cy="356760"/>
+            <a:ext cx="2734560" cy="356400"/>
           </a:xfrm>
           <a:prstGeom prst="rect">
             <a:avLst/>
@@ -5397,9 +5397,9 @@
         <p:grpSpPr>
           <a:xfrm>
             <a:off x="6199200" y="6162840"/>
-            <a:ext cx="5984640" cy="686880"/>
+            <a:ext cx="5984280" cy="686520"/>
             <a:chOff x="6199200" y="6162840"/>
-            <a:chExt cx="5984640" cy="686880"/>
+            <a:chExt cx="5984280" cy="686520"/>
           </a:xfrm>
         </p:grpSpPr>
         <p:pic>
@@ -5415,7 +5415,7 @@
           <p:spPr>
             <a:xfrm>
               <a:off x="6199200" y="6162840"/>
-              <a:ext cx="4048200" cy="686880"/>
+              <a:ext cx="4047840" cy="686520"/>
             </a:xfrm>
             <a:prstGeom prst="rect">
               <a:avLst/>
@@ -5438,7 +5438,7 @@
           <p:spPr>
             <a:xfrm>
               <a:off x="10270080" y="6162840"/>
-              <a:ext cx="1913760" cy="603360"/>
+              <a:ext cx="1913400" cy="603000"/>
             </a:xfrm>
             <a:prstGeom prst="rect">
               <a:avLst/>
@@ -5462,7 +5462,7 @@
         <p:spPr>
           <a:xfrm>
             <a:off x="4038480" y="6356520"/>
-            <a:ext cx="4106520" cy="356760"/>
+            <a:ext cx="4106160" cy="356400"/>
           </a:xfrm>
           <a:prstGeom prst="rect">
             <a:avLst/>
@@ -5534,7 +5534,7 @@
         <p:spPr>
           <a:xfrm>
             <a:off x="8610480" y="6356520"/>
-            <a:ext cx="2734920" cy="356760"/>
+            <a:ext cx="2734560" cy="356400"/>
           </a:xfrm>
           <a:prstGeom prst="rect">
             <a:avLst/>
@@ -5577,7 +5577,7 @@
                 <a:tab algn="l" pos="0"/>
               </a:tabLst>
             </a:pPr>
-            <a:fld id="{A4BA7626-4554-41A6-B640-2BAE0CE56420}" type="slidenum">
+            <a:fld id="{9FB3144E-1098-4784-BD92-C57B939B6B9E}" type="slidenum">
               <a:rPr b="0" lang="en-US" sz="1200" spc="-1" strike="noStrike">
                 <a:solidFill>
                   <a:schemeClr val="dk1">
@@ -5610,7 +5610,7 @@
         <p:spPr>
           <a:xfrm>
             <a:off x="838080" y="6356520"/>
-            <a:ext cx="2734920" cy="356760"/>
+            <a:ext cx="2734560" cy="356400"/>
           </a:xfrm>
           <a:prstGeom prst="rect">
             <a:avLst/>
@@ -5699,9 +5699,9 @@
         <p:grpSpPr>
           <a:xfrm>
             <a:off x="6199200" y="6162840"/>
-            <a:ext cx="5984640" cy="686880"/>
+            <a:ext cx="5984280" cy="686520"/>
             <a:chOff x="6199200" y="6162840"/>
-            <a:chExt cx="5984640" cy="686880"/>
+            <a:chExt cx="5984280" cy="686520"/>
           </a:xfrm>
         </p:grpSpPr>
         <p:pic>
@@ -5717,7 +5717,7 @@
           <p:spPr>
             <a:xfrm>
               <a:off x="6199200" y="6162840"/>
-              <a:ext cx="4048200" cy="686880"/>
+              <a:ext cx="4047840" cy="686520"/>
             </a:xfrm>
             <a:prstGeom prst="rect">
               <a:avLst/>
@@ -5740,7 +5740,7 @@
           <p:spPr>
             <a:xfrm>
               <a:off x="10270080" y="6162840"/>
-              <a:ext cx="1913760" cy="603360"/>
+              <a:ext cx="1913400" cy="603000"/>
             </a:xfrm>
             <a:prstGeom prst="rect">
               <a:avLst/>
@@ -6488,7 +6488,7 @@
         <p:spPr>
           <a:xfrm>
             <a:off x="4038480" y="6356520"/>
-            <a:ext cx="4106520" cy="356760"/>
+            <a:ext cx="4106160" cy="356400"/>
           </a:xfrm>
           <a:prstGeom prst="rect">
             <a:avLst/>
@@ -6560,7 +6560,7 @@
         <p:spPr>
           <a:xfrm>
             <a:off x="8610480" y="6356520"/>
-            <a:ext cx="2734920" cy="356760"/>
+            <a:ext cx="2734560" cy="356400"/>
           </a:xfrm>
           <a:prstGeom prst="rect">
             <a:avLst/>
@@ -6603,7 +6603,7 @@
                 <a:tab algn="l" pos="0"/>
               </a:tabLst>
             </a:pPr>
-            <a:fld id="{D745661C-2043-4D44-8E81-A8862433590C}" type="slidenum">
+            <a:fld id="{654158D6-E7D9-4E9D-AAE0-F636167B1924}" type="slidenum">
               <a:rPr b="0" lang="en-US" sz="1200" spc="-1" strike="noStrike">
                 <a:solidFill>
                   <a:schemeClr val="dk1">
@@ -6636,7 +6636,7 @@
         <p:spPr>
           <a:xfrm>
             <a:off x="838080" y="6356520"/>
-            <a:ext cx="2734920" cy="356760"/>
+            <a:ext cx="2734560" cy="356400"/>
           </a:xfrm>
           <a:prstGeom prst="rect">
             <a:avLst/>
@@ -6725,9 +6725,9 @@
         <p:grpSpPr>
           <a:xfrm>
             <a:off x="6199200" y="6162840"/>
-            <a:ext cx="5984640" cy="686880"/>
+            <a:ext cx="5984280" cy="686520"/>
             <a:chOff x="6199200" y="6162840"/>
-            <a:chExt cx="5984640" cy="686880"/>
+            <a:chExt cx="5984280" cy="686520"/>
           </a:xfrm>
         </p:grpSpPr>
         <p:pic>
@@ -6743,7 +6743,7 @@
           <p:spPr>
             <a:xfrm>
               <a:off x="6199200" y="6162840"/>
-              <a:ext cx="4048200" cy="686880"/>
+              <a:ext cx="4047840" cy="686520"/>
             </a:xfrm>
             <a:prstGeom prst="rect">
               <a:avLst/>
@@ -6766,7 +6766,7 @@
           <p:spPr>
             <a:xfrm>
               <a:off x="10270080" y="6162840"/>
-              <a:ext cx="1913760" cy="603360"/>
+              <a:ext cx="1913400" cy="603000"/>
             </a:xfrm>
             <a:prstGeom prst="rect">
               <a:avLst/>
@@ -7514,7 +7514,7 @@
         <p:spPr>
           <a:xfrm>
             <a:off x="4038480" y="6356520"/>
-            <a:ext cx="4106520" cy="356760"/>
+            <a:ext cx="4106160" cy="356400"/>
           </a:xfrm>
           <a:prstGeom prst="rect">
             <a:avLst/>
@@ -7586,7 +7586,7 @@
         <p:spPr>
           <a:xfrm>
             <a:off x="8610480" y="6356520"/>
-            <a:ext cx="2734920" cy="356760"/>
+            <a:ext cx="2734560" cy="356400"/>
           </a:xfrm>
           <a:prstGeom prst="rect">
             <a:avLst/>
@@ -7629,7 +7629,7 @@
                 <a:tab algn="l" pos="0"/>
               </a:tabLst>
             </a:pPr>
-            <a:fld id="{F2C32DA6-6554-4B2D-A3A2-DC375E459714}" type="slidenum">
+            <a:fld id="{87186CC9-9BD2-42C1-8958-A9139890FFD7}" type="slidenum">
               <a:rPr b="0" lang="en-US" sz="1200" spc="-1" strike="noStrike">
                 <a:solidFill>
                   <a:schemeClr val="dk1">
@@ -7662,7 +7662,7 @@
         <p:spPr>
           <a:xfrm>
             <a:off x="838080" y="6356520"/>
-            <a:ext cx="2734920" cy="356760"/>
+            <a:ext cx="2734560" cy="356400"/>
           </a:xfrm>
           <a:prstGeom prst="rect">
             <a:avLst/>
@@ -7751,9 +7751,9 @@
         <p:grpSpPr>
           <a:xfrm>
             <a:off x="6199200" y="6162840"/>
-            <a:ext cx="5984640" cy="686880"/>
+            <a:ext cx="5984280" cy="686520"/>
             <a:chOff x="6199200" y="6162840"/>
-            <a:chExt cx="5984640" cy="686880"/>
+            <a:chExt cx="5984280" cy="686520"/>
           </a:xfrm>
         </p:grpSpPr>
         <p:pic>
@@ -7769,7 +7769,7 @@
           <p:spPr>
             <a:xfrm>
               <a:off x="6199200" y="6162840"/>
-              <a:ext cx="4048200" cy="686880"/>
+              <a:ext cx="4047840" cy="686520"/>
             </a:xfrm>
             <a:prstGeom prst="rect">
               <a:avLst/>
@@ -7792,7 +7792,7 @@
           <p:spPr>
             <a:xfrm>
               <a:off x="10270080" y="6162840"/>
-              <a:ext cx="1913760" cy="603360"/>
+              <a:ext cx="1913400" cy="603000"/>
             </a:xfrm>
             <a:prstGeom prst="rect">
               <a:avLst/>
@@ -8315,7 +8315,7 @@
         <p:spPr>
           <a:xfrm>
             <a:off x="4038480" y="6356520"/>
-            <a:ext cx="4106520" cy="356760"/>
+            <a:ext cx="4106160" cy="356400"/>
           </a:xfrm>
           <a:prstGeom prst="rect">
             <a:avLst/>
@@ -8387,7 +8387,7 @@
         <p:spPr>
           <a:xfrm>
             <a:off x="8610480" y="6356520"/>
-            <a:ext cx="2734920" cy="356760"/>
+            <a:ext cx="2734560" cy="356400"/>
           </a:xfrm>
           <a:prstGeom prst="rect">
             <a:avLst/>
@@ -8430,7 +8430,7 @@
                 <a:tab algn="l" pos="0"/>
               </a:tabLst>
             </a:pPr>
-            <a:fld id="{288C9B95-A69C-4731-9827-8755EE26DC5F}" type="slidenum">
+            <a:fld id="{ED300FE1-812A-4DA3-B783-F0A249B4C753}" type="slidenum">
               <a:rPr b="0" lang="en-US" sz="1200" spc="-1" strike="noStrike">
                 <a:solidFill>
                   <a:schemeClr val="dk1">
@@ -8463,7 +8463,7 @@
         <p:spPr>
           <a:xfrm>
             <a:off x="838080" y="6356520"/>
-            <a:ext cx="2734920" cy="356760"/>
+            <a:ext cx="2734560" cy="356400"/>
           </a:xfrm>
           <a:prstGeom prst="rect">
             <a:avLst/>
@@ -8552,9 +8552,9 @@
         <p:grpSpPr>
           <a:xfrm>
             <a:off x="6199200" y="6162840"/>
-            <a:ext cx="5984640" cy="686880"/>
+            <a:ext cx="5984280" cy="686520"/>
             <a:chOff x="6199200" y="6162840"/>
-            <a:chExt cx="5984640" cy="686880"/>
+            <a:chExt cx="5984280" cy="686520"/>
           </a:xfrm>
         </p:grpSpPr>
         <p:pic>
@@ -8570,7 +8570,7 @@
           <p:spPr>
             <a:xfrm>
               <a:off x="6199200" y="6162840"/>
-              <a:ext cx="4048200" cy="686880"/>
+              <a:ext cx="4047840" cy="686520"/>
             </a:xfrm>
             <a:prstGeom prst="rect">
               <a:avLst/>
@@ -8593,7 +8593,7 @@
           <p:spPr>
             <a:xfrm>
               <a:off x="10270080" y="6162840"/>
-              <a:ext cx="1913760" cy="603360"/>
+              <a:ext cx="1913400" cy="603000"/>
             </a:xfrm>
             <a:prstGeom prst="rect">
               <a:avLst/>
@@ -9566,7 +9566,7 @@
         <p:spPr>
           <a:xfrm>
             <a:off x="4038480" y="6356520"/>
-            <a:ext cx="4106520" cy="356760"/>
+            <a:ext cx="4106160" cy="356400"/>
           </a:xfrm>
           <a:prstGeom prst="rect">
             <a:avLst/>
@@ -9638,7 +9638,7 @@
         <p:spPr>
           <a:xfrm>
             <a:off x="8610480" y="6356520"/>
-            <a:ext cx="2734920" cy="356760"/>
+            <a:ext cx="2734560" cy="356400"/>
           </a:xfrm>
           <a:prstGeom prst="rect">
             <a:avLst/>
@@ -9681,7 +9681,7 @@
                 <a:tab algn="l" pos="0"/>
               </a:tabLst>
             </a:pPr>
-            <a:fld id="{1DA0D0AF-A452-4CAD-A673-DA2022A61D8B}" type="slidenum">
+            <a:fld id="{A457CBB9-E8A8-4EBD-ABFA-D9F5BC715AA4}" type="slidenum">
               <a:rPr b="0" lang="en-US" sz="1200" spc="-1" strike="noStrike">
                 <a:solidFill>
                   <a:schemeClr val="dk1">
@@ -9714,7 +9714,7 @@
         <p:spPr>
           <a:xfrm>
             <a:off x="838080" y="6356520"/>
-            <a:ext cx="2734920" cy="356760"/>
+            <a:ext cx="2734560" cy="356400"/>
           </a:xfrm>
           <a:prstGeom prst="rect">
             <a:avLst/>
@@ -9803,9 +9803,9 @@
         <p:grpSpPr>
           <a:xfrm>
             <a:off x="6199200" y="6162840"/>
-            <a:ext cx="5984640" cy="686880"/>
+            <a:ext cx="5984280" cy="686520"/>
             <a:chOff x="6199200" y="6162840"/>
-            <a:chExt cx="5984640" cy="686880"/>
+            <a:chExt cx="5984280" cy="686520"/>
           </a:xfrm>
         </p:grpSpPr>
         <p:pic>
@@ -9821,7 +9821,7 @@
           <p:spPr>
             <a:xfrm>
               <a:off x="6199200" y="6162840"/>
-              <a:ext cx="4048200" cy="686880"/>
+              <a:ext cx="4047840" cy="686520"/>
             </a:xfrm>
             <a:prstGeom prst="rect">
               <a:avLst/>
@@ -9844,7 +9844,7 @@
           <p:spPr>
             <a:xfrm>
               <a:off x="10270080" y="6162840"/>
-              <a:ext cx="1913760" cy="603360"/>
+              <a:ext cx="1913400" cy="603000"/>
             </a:xfrm>
             <a:prstGeom prst="rect">
               <a:avLst/>
@@ -9868,7 +9868,7 @@
         <p:spPr>
           <a:xfrm>
             <a:off x="4038480" y="6356520"/>
-            <a:ext cx="4106520" cy="356760"/>
+            <a:ext cx="4106160" cy="356400"/>
           </a:xfrm>
           <a:prstGeom prst="rect">
             <a:avLst/>
@@ -9940,7 +9940,7 @@
         <p:spPr>
           <a:xfrm>
             <a:off x="8610480" y="6356520"/>
-            <a:ext cx="2734920" cy="356760"/>
+            <a:ext cx="2734560" cy="356400"/>
           </a:xfrm>
           <a:prstGeom prst="rect">
             <a:avLst/>
@@ -9983,7 +9983,7 @@
                 <a:tab algn="l" pos="0"/>
               </a:tabLst>
             </a:pPr>
-            <a:fld id="{3930D17F-67A7-47AF-8887-C7134BD4170C}" type="slidenum">
+            <a:fld id="{B16D9814-A32C-4D29-885A-73C56B62E222}" type="slidenum">
               <a:rPr b="0" lang="en-US" sz="1200" spc="-1" strike="noStrike">
                 <a:solidFill>
                   <a:schemeClr val="dk1">
@@ -10016,7 +10016,7 @@
         <p:spPr>
           <a:xfrm>
             <a:off x="838080" y="6356520"/>
-            <a:ext cx="2734920" cy="356760"/>
+            <a:ext cx="2734560" cy="356400"/>
           </a:xfrm>
           <a:prstGeom prst="rect">
             <a:avLst/>
@@ -10105,9 +10105,9 @@
         <p:grpSpPr>
           <a:xfrm>
             <a:off x="6199200" y="6162840"/>
-            <a:ext cx="5984640" cy="686880"/>
+            <a:ext cx="5984280" cy="686520"/>
             <a:chOff x="6199200" y="6162840"/>
-            <a:chExt cx="5984640" cy="686880"/>
+            <a:chExt cx="5984280" cy="686520"/>
           </a:xfrm>
         </p:grpSpPr>
         <p:pic>
@@ -10123,7 +10123,7 @@
           <p:spPr>
             <a:xfrm>
               <a:off x="6199200" y="6162840"/>
-              <a:ext cx="4048200" cy="686880"/>
+              <a:ext cx="4047840" cy="686520"/>
             </a:xfrm>
             <a:prstGeom prst="rect">
               <a:avLst/>
@@ -10146,7 +10146,7 @@
           <p:spPr>
             <a:xfrm>
               <a:off x="10270080" y="6162840"/>
-              <a:ext cx="1913760" cy="603360"/>
+              <a:ext cx="1913400" cy="603000"/>
             </a:xfrm>
             <a:prstGeom prst="rect">
               <a:avLst/>
@@ -10170,7 +10170,7 @@
         <p:spPr>
           <a:xfrm>
             <a:off x="4038480" y="6356520"/>
-            <a:ext cx="4106520" cy="356760"/>
+            <a:ext cx="4106160" cy="356400"/>
           </a:xfrm>
           <a:prstGeom prst="rect">
             <a:avLst/>
@@ -10242,7 +10242,7 @@
         <p:spPr>
           <a:xfrm>
             <a:off x="8610480" y="6356520"/>
-            <a:ext cx="2734920" cy="356760"/>
+            <a:ext cx="2734560" cy="356400"/>
           </a:xfrm>
           <a:prstGeom prst="rect">
             <a:avLst/>
@@ -10285,7 +10285,7 @@
                 <a:tab algn="l" pos="0"/>
               </a:tabLst>
             </a:pPr>
-            <a:fld id="{51CD65B4-880A-4CB8-B6AD-3444C8F1BD33}" type="slidenum">
+            <a:fld id="{1D8D38F8-6456-4C5B-8E0C-230141B7A2F1}" type="slidenum">
               <a:rPr b="0" lang="en-US" sz="1200" spc="-1" strike="noStrike">
                 <a:solidFill>
                   <a:schemeClr val="dk1">
@@ -10318,7 +10318,7 @@
         <p:spPr>
           <a:xfrm>
             <a:off x="838080" y="6356520"/>
-            <a:ext cx="2734920" cy="356760"/>
+            <a:ext cx="2734560" cy="356400"/>
           </a:xfrm>
           <a:prstGeom prst="rect">
             <a:avLst/>
@@ -10681,9 +10681,9 @@
         <p:grpSpPr>
           <a:xfrm>
             <a:off x="6199200" y="6162840"/>
-            <a:ext cx="5984640" cy="686880"/>
+            <a:ext cx="5984280" cy="686520"/>
             <a:chOff x="6199200" y="6162840"/>
-            <a:chExt cx="5984640" cy="686880"/>
+            <a:chExt cx="5984280" cy="686520"/>
           </a:xfrm>
         </p:grpSpPr>
         <p:pic>
@@ -10699,7 +10699,7 @@
           <p:spPr>
             <a:xfrm>
               <a:off x="6199200" y="6162840"/>
-              <a:ext cx="4048200" cy="686880"/>
+              <a:ext cx="4047840" cy="686520"/>
             </a:xfrm>
             <a:prstGeom prst="rect">
               <a:avLst/>
@@ -10722,7 +10722,7 @@
           <p:spPr>
             <a:xfrm>
               <a:off x="10270080" y="6162840"/>
-              <a:ext cx="1913760" cy="603360"/>
+              <a:ext cx="1913400" cy="603000"/>
             </a:xfrm>
             <a:prstGeom prst="rect">
               <a:avLst/>
@@ -11020,7 +11020,7 @@
         <p:spPr>
           <a:xfrm>
             <a:off x="4038480" y="6356520"/>
-            <a:ext cx="4106520" cy="356760"/>
+            <a:ext cx="4106160" cy="356400"/>
           </a:xfrm>
           <a:prstGeom prst="rect">
             <a:avLst/>
@@ -11092,7 +11092,7 @@
         <p:spPr>
           <a:xfrm>
             <a:off x="8610480" y="6356520"/>
-            <a:ext cx="2734920" cy="356760"/>
+            <a:ext cx="2734560" cy="356400"/>
           </a:xfrm>
           <a:prstGeom prst="rect">
             <a:avLst/>
@@ -11135,7 +11135,7 @@
                 <a:tab algn="l" pos="0"/>
               </a:tabLst>
             </a:pPr>
-            <a:fld id="{7A58E696-5820-4C51-89BB-6ABB24BF9A19}" type="slidenum">
+            <a:fld id="{9C803785-6CD3-4AC6-871B-0FCCA9054646}" type="slidenum">
               <a:rPr b="0" lang="en-US" sz="1200" spc="-1" strike="noStrike">
                 <a:solidFill>
                   <a:schemeClr val="dk1">
@@ -11168,7 +11168,7 @@
         <p:spPr>
           <a:xfrm>
             <a:off x="838080" y="6356520"/>
-            <a:ext cx="2734920" cy="356760"/>
+            <a:ext cx="2734560" cy="356400"/>
           </a:xfrm>
           <a:prstGeom prst="rect">
             <a:avLst/>
@@ -11257,9 +11257,9 @@
         <p:grpSpPr>
           <a:xfrm>
             <a:off x="6199200" y="6162840"/>
-            <a:ext cx="5984640" cy="686880"/>
+            <a:ext cx="5984280" cy="686520"/>
             <a:chOff x="6199200" y="6162840"/>
-            <a:chExt cx="5984640" cy="686880"/>
+            <a:chExt cx="5984280" cy="686520"/>
           </a:xfrm>
         </p:grpSpPr>
         <p:pic>
@@ -11275,7 +11275,7 @@
           <p:spPr>
             <a:xfrm>
               <a:off x="6199200" y="6162840"/>
-              <a:ext cx="4048200" cy="686880"/>
+              <a:ext cx="4047840" cy="686520"/>
             </a:xfrm>
             <a:prstGeom prst="rect">
               <a:avLst/>
@@ -11298,7 +11298,7 @@
           <p:spPr>
             <a:xfrm>
               <a:off x="10270080" y="6162840"/>
-              <a:ext cx="1913760" cy="603360"/>
+              <a:ext cx="1913400" cy="603000"/>
             </a:xfrm>
             <a:prstGeom prst="rect">
               <a:avLst/>
@@ -11596,7 +11596,7 @@
         <p:spPr>
           <a:xfrm>
             <a:off x="4038480" y="6356520"/>
-            <a:ext cx="4106520" cy="356760"/>
+            <a:ext cx="4106160" cy="356400"/>
           </a:xfrm>
           <a:prstGeom prst="rect">
             <a:avLst/>
@@ -11668,7 +11668,7 @@
         <p:spPr>
           <a:xfrm>
             <a:off x="8610480" y="6356520"/>
-            <a:ext cx="2734920" cy="356760"/>
+            <a:ext cx="2734560" cy="356400"/>
           </a:xfrm>
           <a:prstGeom prst="rect">
             <a:avLst/>
@@ -11711,7 +11711,7 @@
                 <a:tab algn="l" pos="0"/>
               </a:tabLst>
             </a:pPr>
-            <a:fld id="{35352431-EA3A-43A1-B4DC-F5042B89B0D7}" type="slidenum">
+            <a:fld id="{F8C78A24-CD90-4C3C-8A09-6E2966C31737}" type="slidenum">
               <a:rPr b="0" lang="en-US" sz="1200" spc="-1" strike="noStrike">
                 <a:solidFill>
                   <a:schemeClr val="dk1">
@@ -11744,7 +11744,7 @@
         <p:spPr>
           <a:xfrm>
             <a:off x="838080" y="6356520"/>
-            <a:ext cx="2734920" cy="356760"/>
+            <a:ext cx="2734560" cy="356400"/>
           </a:xfrm>
           <a:prstGeom prst="rect">
             <a:avLst/>
@@ -11826,7 +11826,7 @@
         <p:spPr>
           <a:xfrm flipH="1">
             <a:off x="0" y="3073320"/>
-            <a:ext cx="1837080" cy="8280"/>
+            <a:ext cx="1837440" cy="8640"/>
           </a:xfrm>
           <a:prstGeom prst="straightConnector1">
             <a:avLst/>
@@ -11849,7 +11849,7 @@
         <p:spPr>
           <a:xfrm>
             <a:off x="0" y="2489400"/>
-            <a:ext cx="1837080" cy="8280"/>
+            <a:ext cx="1837440" cy="8640"/>
           </a:xfrm>
           <a:prstGeom prst="straightConnector1">
             <a:avLst/>
@@ -11872,7 +11872,7 @@
         <p:spPr>
           <a:xfrm>
             <a:off x="0" y="2781360"/>
-            <a:ext cx="1837080" cy="8280"/>
+            <a:ext cx="1837440" cy="8640"/>
           </a:xfrm>
           <a:prstGeom prst="straightConnector1">
             <a:avLst/>
@@ -11895,7 +11895,7 @@
         <p:spPr>
           <a:xfrm flipH="1">
             <a:off x="0" y="3657600"/>
-            <a:ext cx="1837080" cy="8280"/>
+            <a:ext cx="1837440" cy="8640"/>
           </a:xfrm>
           <a:prstGeom prst="straightConnector1">
             <a:avLst/>
@@ -11917,7 +11917,7 @@
         <p:spPr>
           <a:xfrm>
             <a:off x="128520" y="6134040"/>
-            <a:ext cx="1563480" cy="379440"/>
+            <a:ext cx="1563120" cy="379080"/>
           </a:xfrm>
           <a:prstGeom prst="diamond">
             <a:avLst/>
@@ -11982,7 +11982,7 @@
         <p:spPr>
           <a:xfrm>
             <a:off x="302760" y="5454000"/>
-            <a:ext cx="1215000" cy="379440"/>
+            <a:ext cx="1214640" cy="379080"/>
           </a:xfrm>
           <a:prstGeom prst="ellipse">
             <a:avLst/>
@@ -12045,7 +12045,7 @@
         <p:spPr>
           <a:xfrm>
             <a:off x="101160" y="336240"/>
-            <a:ext cx="1618200" cy="303120"/>
+            <a:ext cx="1617840" cy="303120"/>
           </a:xfrm>
           <a:prstGeom prst="rect">
             <a:avLst/>
@@ -12102,7 +12102,7 @@
         <p:spPr>
           <a:xfrm>
             <a:off x="101160" y="597600"/>
-            <a:ext cx="1618200" cy="516600"/>
+            <a:ext cx="1617840" cy="516600"/>
           </a:xfrm>
           <a:prstGeom prst="rect">
             <a:avLst/>
@@ -12192,7 +12192,7 @@
         <p:spPr>
           <a:xfrm>
             <a:off x="101160" y="336240"/>
-            <a:ext cx="1618200" cy="303120"/>
+            <a:ext cx="1617840" cy="303120"/>
           </a:xfrm>
           <a:prstGeom prst="rect">
             <a:avLst/>
@@ -12249,7 +12249,7 @@
         <p:spPr>
           <a:xfrm>
             <a:off x="101160" y="597600"/>
-            <a:ext cx="1618200" cy="516600"/>
+            <a:ext cx="1617840" cy="516600"/>
           </a:xfrm>
           <a:prstGeom prst="rect">
             <a:avLst/>
@@ -12339,7 +12339,7 @@
         <p:spPr>
           <a:xfrm>
             <a:off x="2541600" y="228600"/>
-            <a:ext cx="1618200" cy="303120"/>
+            <a:ext cx="1617840" cy="303120"/>
           </a:xfrm>
           <a:prstGeom prst="rect">
             <a:avLst/>
@@ -12396,7 +12396,7 @@
         <p:spPr>
           <a:xfrm>
             <a:off x="2541600" y="489960"/>
-            <a:ext cx="1618200" cy="1584000"/>
+            <a:ext cx="1617840" cy="1584000"/>
           </a:xfrm>
           <a:prstGeom prst="rect">
             <a:avLst/>
@@ -12621,7 +12621,7 @@
         <p:spPr>
           <a:xfrm>
             <a:off x="6656400" y="228600"/>
-            <a:ext cx="1618200" cy="303120"/>
+            <a:ext cx="1617840" cy="303120"/>
           </a:xfrm>
           <a:prstGeom prst="rect">
             <a:avLst/>
@@ -12678,7 +12678,7 @@
         <p:spPr>
           <a:xfrm>
             <a:off x="6656400" y="489960"/>
-            <a:ext cx="1618200" cy="516600"/>
+            <a:ext cx="1617840" cy="516600"/>
           </a:xfrm>
           <a:prstGeom prst="rect">
             <a:avLst/>
@@ -12768,7 +12768,7 @@
         <p:spPr>
           <a:xfrm>
             <a:off x="6656400" y="228600"/>
-            <a:ext cx="1618200" cy="303120"/>
+            <a:ext cx="1617840" cy="303120"/>
           </a:xfrm>
           <a:prstGeom prst="rect">
             <a:avLst/>
@@ -12825,7 +12825,7 @@
         <p:spPr>
           <a:xfrm>
             <a:off x="6656400" y="489960"/>
-            <a:ext cx="1618200" cy="730080"/>
+            <a:ext cx="1617840" cy="730080"/>
           </a:xfrm>
           <a:prstGeom prst="rect">
             <a:avLst/>
@@ -12942,7 +12942,7 @@
         <p:spPr>
           <a:xfrm>
             <a:off x="128520" y="4629600"/>
-            <a:ext cx="1563480" cy="524160"/>
+            <a:ext cx="1563120" cy="523800"/>
           </a:xfrm>
           <a:prstGeom prst="diamond">
             <a:avLst/>
@@ -13030,7 +13030,7 @@
         <p:spPr>
           <a:xfrm>
             <a:off x="0" y="3365640"/>
-            <a:ext cx="1837080" cy="8280"/>
+            <a:ext cx="1837440" cy="8640"/>
           </a:xfrm>
           <a:prstGeom prst="straightConnector1">
             <a:avLst/>
@@ -13052,7 +13052,7 @@
         <p:spPr>
           <a:xfrm>
             <a:off x="673200" y="3949920"/>
-            <a:ext cx="474480" cy="379440"/>
+            <a:ext cx="474120" cy="379080"/>
           </a:xfrm>
           <a:prstGeom prst="triangle">
             <a:avLst>
@@ -13119,9 +13119,9 @@
         <p:grpSpPr>
           <a:xfrm>
             <a:off x="101160" y="1413000"/>
-            <a:ext cx="1618200" cy="777960"/>
+            <a:ext cx="1617840" cy="777960"/>
             <a:chOff x="101160" y="1413000"/>
-            <a:chExt cx="1618200" cy="777960"/>
+            <a:chExt cx="1617840" cy="777960"/>
           </a:xfrm>
         </p:grpSpPr>
         <p:sp>
@@ -13133,7 +13133,7 @@
           <p:spPr>
             <a:xfrm>
               <a:off x="101160" y="1413000"/>
-              <a:ext cx="1618200" cy="303120"/>
+              <a:ext cx="1617840" cy="303120"/>
             </a:xfrm>
             <a:prstGeom prst="rect">
               <a:avLst/>
@@ -13191,7 +13191,7 @@
           <p:spPr>
             <a:xfrm>
               <a:off x="101160" y="1674360"/>
-              <a:ext cx="1618200" cy="516600"/>
+              <a:ext cx="1617840" cy="516600"/>
             </a:xfrm>
             <a:prstGeom prst="rect">
               <a:avLst/>
@@ -13283,7 +13283,7 @@
         <p:spPr>
           <a:xfrm>
             <a:off x="4426920" y="914400"/>
-            <a:ext cx="1563480" cy="379440"/>
+            <a:ext cx="1563120" cy="379080"/>
           </a:xfrm>
           <a:prstGeom prst="diamond">
             <a:avLst/>
@@ -13350,8 +13350,8 @@
         </p:nvCxnSpPr>
         <p:spPr>
           <a:xfrm flipH="1">
-            <a:off x="5990400" y="855000"/>
-            <a:ext cx="666360" cy="249480"/>
+            <a:off x="5990040" y="855000"/>
+            <a:ext cx="666720" cy="249480"/>
           </a:xfrm>
           <a:prstGeom prst="straightConnector1">
             <a:avLst/>
@@ -13374,7 +13374,7 @@
         <p:spPr>
           <a:xfrm>
             <a:off x="6255720" y="1828800"/>
-            <a:ext cx="1792080" cy="379440"/>
+            <a:ext cx="1791720" cy="379080"/>
           </a:xfrm>
           <a:prstGeom prst="diamond">
             <a:avLst/>
@@ -13465,8 +13465,8 @@
         </p:nvCxnSpPr>
         <p:spPr>
           <a:xfrm flipH="1" flipV="1">
-            <a:off x="7151760" y="2208240"/>
-            <a:ext cx="462600" cy="541080"/>
+            <a:off x="7151760" y="2207880"/>
+            <a:ext cx="462960" cy="541800"/>
           </a:xfrm>
           <a:prstGeom prst="straightConnector1">
             <a:avLst/>
@@ -13489,7 +13489,7 @@
         <p:spPr>
           <a:xfrm>
             <a:off x="128520" y="6134400"/>
-            <a:ext cx="1563480" cy="379440"/>
+            <a:ext cx="1563120" cy="379080"/>
           </a:xfrm>
           <a:prstGeom prst="diamond">
             <a:avLst/>
@@ -13554,9 +13554,9 @@
         <p:grpSpPr>
           <a:xfrm>
             <a:off x="6681960" y="2743200"/>
-            <a:ext cx="1846800" cy="1216440"/>
+            <a:ext cx="1846440" cy="1216440"/>
             <a:chOff x="6681960" y="2743200"/>
-            <a:chExt cx="1846800" cy="1216440"/>
+            <a:chExt cx="1846440" cy="1216440"/>
           </a:xfrm>
         </p:grpSpPr>
         <p:sp>
@@ -13568,7 +13568,7 @@
           <p:spPr>
             <a:xfrm>
               <a:off x="6681960" y="2743200"/>
-              <a:ext cx="1846800" cy="303120"/>
+              <a:ext cx="1846440" cy="303120"/>
             </a:xfrm>
             <a:prstGeom prst="rect">
               <a:avLst/>
@@ -13625,7 +13625,7 @@
           <p:spPr>
             <a:xfrm>
               <a:off x="6681960" y="3016080"/>
-              <a:ext cx="1846800" cy="943560"/>
+              <a:ext cx="1846440" cy="943560"/>
             </a:xfrm>
             <a:prstGeom prst="rect">
               <a:avLst/>
@@ -13772,7 +13772,7 @@
         <p:spPr>
           <a:xfrm>
             <a:off x="9173520" y="3501000"/>
-            <a:ext cx="474480" cy="379440"/>
+            <a:ext cx="474120" cy="379080"/>
           </a:xfrm>
           <a:prstGeom prst="triangle">
             <a:avLst>
@@ -13839,7 +13839,7 @@
         <p:spPr>
           <a:xfrm>
             <a:off x="10287000" y="3126240"/>
-            <a:ext cx="1900800" cy="303120"/>
+            <a:ext cx="1900440" cy="303120"/>
           </a:xfrm>
           <a:prstGeom prst="rect">
             <a:avLst/>
@@ -13896,7 +13896,7 @@
         <p:spPr>
           <a:xfrm>
             <a:off x="10287000" y="3429360"/>
-            <a:ext cx="1900800" cy="1584000"/>
+            <a:ext cx="1900440" cy="1584000"/>
           </a:xfrm>
           <a:prstGeom prst="rect">
             <a:avLst/>
@@ -14104,8 +14104,8 @@
         </p:nvCxnSpPr>
         <p:spPr>
           <a:xfrm>
-            <a:off x="9529560" y="3690720"/>
-            <a:ext cx="757800" cy="531000"/>
+            <a:off x="9529200" y="3690720"/>
+            <a:ext cx="758160" cy="531000"/>
           </a:xfrm>
           <a:prstGeom prst="straightConnector1">
             <a:avLst/>
@@ -14129,8 +14129,8 @@
         </p:nvCxnSpPr>
         <p:spPr>
           <a:xfrm flipH="1" flipV="1">
-            <a:off x="8528760" y="3351240"/>
-            <a:ext cx="763560" cy="339840"/>
+            <a:off x="8528400" y="3351240"/>
+            <a:ext cx="763920" cy="339840"/>
           </a:xfrm>
           <a:prstGeom prst="straightConnector1">
             <a:avLst/>
@@ -14152,7 +14152,7 @@
         <p:spPr>
           <a:xfrm>
             <a:off x="2086200" y="3336840"/>
-            <a:ext cx="1618200" cy="303120"/>
+            <a:ext cx="1617840" cy="303120"/>
           </a:xfrm>
           <a:prstGeom prst="rect">
             <a:avLst/>
@@ -14209,7 +14209,7 @@
         <p:spPr>
           <a:xfrm>
             <a:off x="2086200" y="3598200"/>
-            <a:ext cx="1618200" cy="516600"/>
+            <a:ext cx="1617840" cy="516600"/>
           </a:xfrm>
           <a:prstGeom prst="rect">
             <a:avLst/>
@@ -14299,7 +14299,7 @@
         <p:spPr>
           <a:xfrm>
             <a:off x="2086200" y="3336840"/>
-            <a:ext cx="1618200" cy="303120"/>
+            <a:ext cx="1617840" cy="303120"/>
           </a:xfrm>
           <a:prstGeom prst="rect">
             <a:avLst/>
@@ -14356,7 +14356,7 @@
         <p:spPr>
           <a:xfrm>
             <a:off x="2086200" y="3598200"/>
-            <a:ext cx="1618200" cy="516600"/>
+            <a:ext cx="1617840" cy="516600"/>
           </a:xfrm>
           <a:prstGeom prst="rect">
             <a:avLst/>
@@ -14446,7 +14446,7 @@
         <p:spPr>
           <a:xfrm>
             <a:off x="1883160" y="2514600"/>
-            <a:ext cx="1821240" cy="379440"/>
+            <a:ext cx="1820880" cy="379080"/>
           </a:xfrm>
           <a:prstGeom prst="diamond">
             <a:avLst/>
@@ -14511,7 +14511,7 @@
         <p:spPr>
           <a:xfrm>
             <a:off x="3481560" y="2899800"/>
-            <a:ext cx="1592640" cy="379440"/>
+            <a:ext cx="1592280" cy="379080"/>
           </a:xfrm>
           <a:prstGeom prst="ellipse">
             <a:avLst/>
@@ -14576,8 +14576,8 @@
         </p:nvCxnSpPr>
         <p:spPr>
           <a:xfrm>
-            <a:off x="3704400" y="2704320"/>
-            <a:ext cx="573840" cy="195840"/>
+            <a:off x="3704040" y="2704320"/>
+            <a:ext cx="574200" cy="195840"/>
           </a:xfrm>
           <a:prstGeom prst="straightConnector1">
             <a:avLst/>
@@ -14601,8 +14601,8 @@
         </p:nvCxnSpPr>
         <p:spPr>
           <a:xfrm flipH="1" flipV="1">
-            <a:off x="2793960" y="2894040"/>
-            <a:ext cx="101520" cy="443160"/>
+            <a:off x="2793600" y="2893680"/>
+            <a:ext cx="101880" cy="443520"/>
           </a:xfrm>
           <a:prstGeom prst="straightConnector1">
             <a:avLst/>
@@ -14626,8 +14626,8 @@
         </p:nvCxnSpPr>
         <p:spPr>
           <a:xfrm flipV="1">
-            <a:off x="2793960" y="2073960"/>
-            <a:ext cx="556920" cy="441000"/>
+            <a:off x="2793600" y="2073960"/>
+            <a:ext cx="557280" cy="441000"/>
           </a:xfrm>
           <a:prstGeom prst="straightConnector1">
             <a:avLst/>
@@ -14649,7 +14649,7 @@
         <p:spPr>
           <a:xfrm>
             <a:off x="10543680" y="457200"/>
-            <a:ext cx="1618200" cy="303120"/>
+            <a:ext cx="1617840" cy="303120"/>
           </a:xfrm>
           <a:prstGeom prst="rect">
             <a:avLst/>
@@ -14706,7 +14706,7 @@
         <p:spPr>
           <a:xfrm>
             <a:off x="10543680" y="718560"/>
-            <a:ext cx="1618200" cy="516600"/>
+            <a:ext cx="1617840" cy="516600"/>
           </a:xfrm>
           <a:prstGeom prst="rect">
             <a:avLst/>
@@ -14796,7 +14796,7 @@
         <p:spPr>
           <a:xfrm>
             <a:off x="10287000" y="457200"/>
-            <a:ext cx="1618200" cy="303120"/>
+            <a:ext cx="1617840" cy="303120"/>
           </a:xfrm>
           <a:prstGeom prst="rect">
             <a:avLst/>
@@ -14853,7 +14853,7 @@
         <p:spPr>
           <a:xfrm>
             <a:off x="10287000" y="718560"/>
-            <a:ext cx="1874880" cy="2437920"/>
+            <a:ext cx="1874520" cy="2651400"/>
           </a:xfrm>
           <a:prstGeom prst="rect">
             <a:avLst/>
@@ -14917,6 +14917,34 @@
               <a:buChar char="-"/>
             </a:pPr>
             <a:r>
+              <a:rPr b="0" lang="en-US" sz="1400" spc="-1" strike="noStrike" u="sng">
+                <a:solidFill>
+                  <a:schemeClr val="dk1"/>
+                </a:solidFill>
+                <a:uFillTx/>
+                <a:latin typeface="Calibri"/>
+              </a:rPr>
+              <a:t>ID</a:t>
+            </a:r>
+            <a:endParaRPr b="0" lang="en-US" sz="1400" spc="-1" strike="noStrike">
+              <a:solidFill>
+                <a:srgbClr val="000000"/>
+              </a:solidFill>
+              <a:latin typeface="Arial"/>
+            </a:endParaRPr>
+          </a:p>
+          <a:p>
+            <a:pPr marL="304920" indent="-304920" defTabSz="914400">
+              <a:lnSpc>
+                <a:spcPct val="100000"/>
+              </a:lnSpc>
+              <a:buClr>
+                <a:srgbClr val="000000"/>
+              </a:buClr>
+              <a:buFont typeface="OpenSymbol"/>
+              <a:buChar char="-"/>
+            </a:pPr>
+            <a:r>
               <a:rPr b="0" lang="en-US" sz="1400" spc="-1" strike="noStrike">
                 <a:solidFill>
                   <a:schemeClr val="dk1"/>
@@ -15159,7 +15187,7 @@
         <p:spPr>
           <a:xfrm>
             <a:off x="8007120" y="1448280"/>
-            <a:ext cx="2050200" cy="379440"/>
+            <a:ext cx="2049840" cy="379080"/>
           </a:xfrm>
           <a:prstGeom prst="diamond">
             <a:avLst/>
@@ -15226,8 +15254,8 @@
         </p:nvCxnSpPr>
         <p:spPr>
           <a:xfrm>
-            <a:off x="9032400" y="1827720"/>
-            <a:ext cx="1254960" cy="2394000"/>
+            <a:off x="9032040" y="1827360"/>
+            <a:ext cx="1255320" cy="2394360"/>
           </a:xfrm>
           <a:prstGeom prst="straightConnector1">
             <a:avLst/>
@@ -15251,8 +15279,8 @@
         </p:nvCxnSpPr>
         <p:spPr>
           <a:xfrm flipH="1" flipV="1">
-            <a:off x="10057320" y="1638000"/>
-            <a:ext cx="230040" cy="299880"/>
+            <a:off x="10056960" y="1638000"/>
+            <a:ext cx="230400" cy="406440"/>
           </a:xfrm>
           <a:prstGeom prst="straightConnector1">
             <a:avLst/>
@@ -15277,7 +15305,7 @@
         <p:spPr>
           <a:xfrm flipH="1" flipV="1">
             <a:off x="7465320" y="1220040"/>
-            <a:ext cx="1567440" cy="228600"/>
+            <a:ext cx="1567080" cy="228600"/>
           </a:xfrm>
           <a:prstGeom prst="straightConnector1">
             <a:avLst/>
@@ -15299,7 +15327,7 @@
         <p:spPr>
           <a:xfrm>
             <a:off x="5412240" y="5029200"/>
-            <a:ext cx="1618200" cy="303120"/>
+            <a:ext cx="1617840" cy="303120"/>
           </a:xfrm>
           <a:prstGeom prst="rect">
             <a:avLst/>
@@ -15356,7 +15384,7 @@
         <p:spPr>
           <a:xfrm>
             <a:off x="3710160" y="4343400"/>
-            <a:ext cx="1821600" cy="379440"/>
+            <a:ext cx="1821240" cy="379080"/>
           </a:xfrm>
           <a:prstGeom prst="diamond">
             <a:avLst/>
@@ -15449,8 +15477,8 @@
         </p:nvCxnSpPr>
         <p:spPr>
           <a:xfrm>
-            <a:off x="4620960" y="4722840"/>
-            <a:ext cx="791640" cy="458280"/>
+            <a:off x="4620960" y="4722480"/>
+            <a:ext cx="791640" cy="458640"/>
           </a:xfrm>
           <a:prstGeom prst="straightConnector1">
             <a:avLst/>
@@ -15497,7 +15525,7 @@
         <p:spPr>
           <a:xfrm>
             <a:off x="4626720" y="3200400"/>
-            <a:ext cx="1820880" cy="678600"/>
+            <a:ext cx="1820520" cy="678240"/>
           </a:xfrm>
           <a:prstGeom prst="diamond">
             <a:avLst/>
@@ -15564,8 +15592,8 @@
         </p:nvCxnSpPr>
         <p:spPr>
           <a:xfrm flipH="1" flipV="1">
-            <a:off x="5537160" y="3879000"/>
-            <a:ext cx="684360" cy="1150560"/>
+            <a:off x="5537160" y="3878640"/>
+            <a:ext cx="684360" cy="1150920"/>
           </a:xfrm>
           <a:prstGeom prst="straightConnector1">
             <a:avLst/>
@@ -15587,7 +15615,7 @@
         <p:spPr>
           <a:xfrm>
             <a:off x="2693880" y="4415400"/>
-            <a:ext cx="474480" cy="379440"/>
+            <a:ext cx="474120" cy="379080"/>
           </a:xfrm>
           <a:prstGeom prst="triangle">
             <a:avLst>
@@ -15679,7 +15707,7 @@
         <p:spPr>
           <a:xfrm>
             <a:off x="2109960" y="5163480"/>
-            <a:ext cx="1618200" cy="303120"/>
+            <a:ext cx="1617840" cy="303120"/>
           </a:xfrm>
           <a:prstGeom prst="rect">
             <a:avLst/>
@@ -15736,7 +15764,7 @@
         <p:spPr>
           <a:xfrm>
             <a:off x="2109960" y="5163480"/>
-            <a:ext cx="1618200" cy="303120"/>
+            <a:ext cx="1617840" cy="303120"/>
           </a:xfrm>
           <a:prstGeom prst="rect">
             <a:avLst/>
@@ -15793,7 +15821,7 @@
         <p:spPr>
           <a:xfrm>
             <a:off x="2109960" y="5424840"/>
-            <a:ext cx="1618200" cy="363960"/>
+            <a:ext cx="1617840" cy="363960"/>
           </a:xfrm>
           <a:prstGeom prst="rect">
             <a:avLst/>
@@ -15861,8 +15889,8 @@
         </p:nvCxnSpPr>
         <p:spPr>
           <a:xfrm flipH="1">
-            <a:off x="2918880" y="4794840"/>
-            <a:ext cx="12600" cy="369000"/>
+            <a:off x="2918880" y="4794480"/>
+            <a:ext cx="12600" cy="369360"/>
           </a:xfrm>
           <a:prstGeom prst="straightConnector1">
             <a:avLst/>
@@ -15886,8 +15914,8 @@
         </p:nvCxnSpPr>
         <p:spPr>
           <a:xfrm flipH="1">
-            <a:off x="4159800" y="1104120"/>
-            <a:ext cx="267480" cy="178200"/>
+            <a:off x="4159440" y="1104120"/>
+            <a:ext cx="267840" cy="178200"/>
           </a:xfrm>
           <a:prstGeom prst="straightConnector1">
             <a:avLst/>
@@ -15909,7 +15937,7 @@
         <p:spPr>
           <a:xfrm flipH="1">
             <a:off x="0" y="3657600"/>
-            <a:ext cx="1837080" cy="8280"/>
+            <a:ext cx="1837440" cy="8640"/>
           </a:xfrm>
           <a:prstGeom prst="straightConnector1">
             <a:avLst/>
@@ -15931,7 +15959,7 @@
         <p:spPr>
           <a:xfrm>
             <a:off x="8686800" y="532800"/>
-            <a:ext cx="1369440" cy="379440"/>
+            <a:ext cx="1369080" cy="379080"/>
           </a:xfrm>
           <a:prstGeom prst="ellipse">
             <a:avLst/>
@@ -15996,8 +16024,8 @@
         </p:nvCxnSpPr>
         <p:spPr>
           <a:xfrm flipH="1">
-            <a:off x="9032400" y="912240"/>
-            <a:ext cx="339480" cy="536400"/>
+            <a:off x="9032040" y="911880"/>
+            <a:ext cx="339840" cy="536760"/>
           </a:xfrm>
           <a:prstGeom prst="straightConnector1">
             <a:avLst/>
@@ -16049,7 +16077,7 @@
         <p:spPr>
           <a:xfrm flipH="1">
             <a:off x="0" y="3073320"/>
-            <a:ext cx="1837080" cy="8280"/>
+            <a:ext cx="1837440" cy="8640"/>
           </a:xfrm>
           <a:prstGeom prst="straightConnector1">
             <a:avLst/>
@@ -16072,7 +16100,7 @@
         <p:spPr>
           <a:xfrm>
             <a:off x="0" y="2489400"/>
-            <a:ext cx="1837080" cy="8280"/>
+            <a:ext cx="1837440" cy="8640"/>
           </a:xfrm>
           <a:prstGeom prst="straightConnector1">
             <a:avLst/>
@@ -16095,7 +16123,7 @@
         <p:spPr>
           <a:xfrm>
             <a:off x="0" y="2781360"/>
-            <a:ext cx="1837080" cy="8280"/>
+            <a:ext cx="1837440" cy="8640"/>
           </a:xfrm>
           <a:prstGeom prst="straightConnector1">
             <a:avLst/>
@@ -16118,7 +16146,7 @@
         <p:spPr>
           <a:xfrm flipH="1">
             <a:off x="0" y="3657600"/>
-            <a:ext cx="1837080" cy="8280"/>
+            <a:ext cx="1837440" cy="8640"/>
           </a:xfrm>
           <a:prstGeom prst="straightConnector1">
             <a:avLst/>
@@ -16140,7 +16168,7 @@
         <p:spPr>
           <a:xfrm>
             <a:off x="128520" y="6134040"/>
-            <a:ext cx="1563480" cy="379440"/>
+            <a:ext cx="1563120" cy="379080"/>
           </a:xfrm>
           <a:prstGeom prst="diamond">
             <a:avLst/>
@@ -16205,7 +16233,7 @@
         <p:spPr>
           <a:xfrm>
             <a:off x="302760" y="5454000"/>
-            <a:ext cx="1215000" cy="379440"/>
+            <a:ext cx="1214640" cy="379080"/>
           </a:xfrm>
           <a:prstGeom prst="ellipse">
             <a:avLst/>
@@ -16268,9 +16296,9 @@
         <p:grpSpPr>
           <a:xfrm>
             <a:off x="101160" y="336240"/>
-            <a:ext cx="1618200" cy="777960"/>
+            <a:ext cx="1617840" cy="777960"/>
             <a:chOff x="101160" y="336240"/>
-            <a:chExt cx="1618200" cy="777960"/>
+            <a:chExt cx="1617840" cy="777960"/>
           </a:xfrm>
         </p:grpSpPr>
         <p:sp>
@@ -16282,7 +16310,7 @@
           <p:spPr>
             <a:xfrm>
               <a:off x="101160" y="336240"/>
-              <a:ext cx="1618200" cy="303120"/>
+              <a:ext cx="1617840" cy="303120"/>
             </a:xfrm>
             <a:prstGeom prst="rect">
               <a:avLst/>
@@ -16339,7 +16367,7 @@
           <p:spPr>
             <a:xfrm>
               <a:off x="101160" y="597600"/>
-              <a:ext cx="1618200" cy="516600"/>
+              <a:ext cx="1617840" cy="516600"/>
             </a:xfrm>
             <a:prstGeom prst="rect">
               <a:avLst/>
@@ -16430,7 +16458,7 @@
         <p:spPr>
           <a:xfrm>
             <a:off x="128520" y="4629600"/>
-            <a:ext cx="1563480" cy="524160"/>
+            <a:ext cx="1563120" cy="523800"/>
           </a:xfrm>
           <a:prstGeom prst="diamond">
             <a:avLst/>
@@ -16518,7 +16546,7 @@
         <p:spPr>
           <a:xfrm>
             <a:off x="0" y="3365640"/>
-            <a:ext cx="1837080" cy="8280"/>
+            <a:ext cx="1837440" cy="8640"/>
           </a:xfrm>
           <a:prstGeom prst="straightConnector1">
             <a:avLst/>
@@ -16540,7 +16568,7 @@
         <p:spPr>
           <a:xfrm>
             <a:off x="673200" y="3949920"/>
-            <a:ext cx="474480" cy="379440"/>
+            <a:ext cx="474120" cy="379080"/>
           </a:xfrm>
           <a:prstGeom prst="triangle">
             <a:avLst>
@@ -16607,9 +16635,9 @@
         <p:grpSpPr>
           <a:xfrm>
             <a:off x="101160" y="1413000"/>
-            <a:ext cx="1618200" cy="777960"/>
+            <a:ext cx="1617840" cy="777960"/>
             <a:chOff x="101160" y="1413000"/>
-            <a:chExt cx="1618200" cy="777960"/>
+            <a:chExt cx="1617840" cy="777960"/>
           </a:xfrm>
         </p:grpSpPr>
         <p:sp>
@@ -16621,7 +16649,7 @@
           <p:spPr>
             <a:xfrm>
               <a:off x="101160" y="1413000"/>
-              <a:ext cx="1618200" cy="303120"/>
+              <a:ext cx="1617840" cy="303120"/>
             </a:xfrm>
             <a:prstGeom prst="rect">
               <a:avLst/>
@@ -16679,7 +16707,7 @@
           <p:spPr>
             <a:xfrm>
               <a:off x="101160" y="1674360"/>
-              <a:ext cx="1618200" cy="516600"/>
+              <a:ext cx="1617840" cy="516600"/>
             </a:xfrm>
             <a:prstGeom prst="rect">
               <a:avLst/>
@@ -16771,7 +16799,7 @@
         <p:spPr>
           <a:xfrm>
             <a:off x="4775040" y="457200"/>
-            <a:ext cx="1618200" cy="303120"/>
+            <a:ext cx="1617840" cy="303120"/>
           </a:xfrm>
           <a:prstGeom prst="rect">
             <a:avLst/>
@@ -16828,7 +16856,7 @@
         <p:spPr>
           <a:xfrm>
             <a:off x="4775040" y="718560"/>
-            <a:ext cx="1618200" cy="730080"/>
+            <a:ext cx="1617840" cy="730080"/>
           </a:xfrm>
           <a:prstGeom prst="rect">
             <a:avLst/>
@@ -16945,9 +16973,9 @@
         <p:grpSpPr>
           <a:xfrm>
             <a:off x="4572000" y="4274280"/>
-            <a:ext cx="1618200" cy="991440"/>
+            <a:ext cx="1617840" cy="991440"/>
             <a:chOff x="4572000" y="4274280"/>
-            <a:chExt cx="1618200" cy="991440"/>
+            <a:chExt cx="1617840" cy="991440"/>
           </a:xfrm>
         </p:grpSpPr>
         <p:sp>
@@ -16959,7 +16987,7 @@
           <p:spPr>
             <a:xfrm>
               <a:off x="4572000" y="4274280"/>
-              <a:ext cx="1618200" cy="303120"/>
+              <a:ext cx="1617840" cy="303120"/>
             </a:xfrm>
             <a:prstGeom prst="rect">
               <a:avLst/>
@@ -17016,7 +17044,7 @@
           <p:spPr>
             <a:xfrm>
               <a:off x="4572000" y="4535640"/>
-              <a:ext cx="1618200" cy="730080"/>
+              <a:ext cx="1617840" cy="730080"/>
             </a:xfrm>
             <a:prstGeom prst="rect">
               <a:avLst/>
@@ -17134,7 +17162,7 @@
         <p:spPr>
           <a:xfrm>
             <a:off x="3231360" y="2899800"/>
-            <a:ext cx="1563480" cy="379440"/>
+            <a:ext cx="1563120" cy="379080"/>
           </a:xfrm>
           <a:prstGeom prst="diamond">
             <a:avLst/>
@@ -17199,7 +17227,7 @@
         <p:spPr>
           <a:xfrm>
             <a:off x="4602960" y="2585160"/>
-            <a:ext cx="1792080" cy="380880"/>
+            <a:ext cx="1791720" cy="380520"/>
           </a:xfrm>
           <a:prstGeom prst="diamond">
             <a:avLst/>
@@ -17266,8 +17294,8 @@
         </p:nvCxnSpPr>
         <p:spPr>
           <a:xfrm flipH="1" flipV="1">
-            <a:off x="4013280" y="3279240"/>
-            <a:ext cx="1368000" cy="995400"/>
+            <a:off x="4012920" y="3278880"/>
+            <a:ext cx="1368360" cy="995760"/>
           </a:xfrm>
           <a:prstGeom prst="straightConnector1">
             <a:avLst/>
@@ -17317,8 +17345,8 @@
         </p:nvCxnSpPr>
         <p:spPr>
           <a:xfrm flipV="1">
-            <a:off x="5380920" y="2966040"/>
-            <a:ext cx="118440" cy="1308600"/>
+            <a:off x="5380920" y="2965680"/>
+            <a:ext cx="118440" cy="1308960"/>
           </a:xfrm>
           <a:prstGeom prst="straightConnector1">
             <a:avLst/>
@@ -17342,8 +17370,8 @@
         </p:nvCxnSpPr>
         <p:spPr>
           <a:xfrm flipH="1">
-            <a:off x="4013280" y="1448640"/>
-            <a:ext cx="1571040" cy="1451520"/>
+            <a:off x="4012920" y="1448640"/>
+            <a:ext cx="1571400" cy="1451520"/>
           </a:xfrm>
           <a:prstGeom prst="straightConnector1">
             <a:avLst/>
@@ -17365,7 +17393,7 @@
         <p:spPr>
           <a:xfrm>
             <a:off x="2743200" y="457200"/>
-            <a:ext cx="1563480" cy="379440"/>
+            <a:ext cx="1563120" cy="379080"/>
           </a:xfrm>
           <a:prstGeom prst="diamond">
             <a:avLst/>
@@ -17432,8 +17460,8 @@
         </p:nvCxnSpPr>
         <p:spPr>
           <a:xfrm flipH="1" flipV="1">
-            <a:off x="4306680" y="646920"/>
-            <a:ext cx="468720" cy="437040"/>
+            <a:off x="4306320" y="646920"/>
+            <a:ext cx="469080" cy="437040"/>
           </a:xfrm>
           <a:prstGeom prst="straightConnector1">
             <a:avLst/>
@@ -17457,8 +17485,8 @@
         </p:nvCxnSpPr>
         <p:spPr>
           <a:xfrm flipH="1" flipV="1">
-            <a:off x="3525120" y="836640"/>
-            <a:ext cx="1250280" cy="247320"/>
+            <a:off x="3524760" y="836280"/>
+            <a:ext cx="1250640" cy="247680"/>
           </a:xfrm>
           <a:prstGeom prst="straightConnector1">
             <a:avLst/>
@@ -17480,9 +17508,9 @@
         <p:grpSpPr>
           <a:xfrm>
             <a:off x="8686800" y="837360"/>
-            <a:ext cx="1618200" cy="991440"/>
+            <a:ext cx="1617840" cy="991440"/>
             <a:chOff x="8686800" y="837360"/>
-            <a:chExt cx="1618200" cy="991440"/>
+            <a:chExt cx="1617840" cy="991440"/>
           </a:xfrm>
         </p:grpSpPr>
         <p:sp>
@@ -17494,7 +17522,7 @@
           <p:spPr>
             <a:xfrm>
               <a:off x="8686800" y="837360"/>
-              <a:ext cx="1618200" cy="303120"/>
+              <a:ext cx="1617840" cy="303120"/>
             </a:xfrm>
             <a:prstGeom prst="rect">
               <a:avLst/>
@@ -17551,7 +17579,7 @@
           <p:spPr>
             <a:xfrm>
               <a:off x="8686800" y="1098720"/>
-              <a:ext cx="1618200" cy="730080"/>
+              <a:ext cx="1617840" cy="730080"/>
             </a:xfrm>
             <a:prstGeom prst="rect">
               <a:avLst/>
@@ -17669,7 +17697,7 @@
         <p:spPr>
           <a:xfrm>
             <a:off x="128880" y="6134040"/>
-            <a:ext cx="1563480" cy="379440"/>
+            <a:ext cx="1563120" cy="379080"/>
           </a:xfrm>
           <a:prstGeom prst="diamond">
             <a:avLst/>
@@ -17734,7 +17762,7 @@
         <p:spPr>
           <a:xfrm>
             <a:off x="7315200" y="228600"/>
-            <a:ext cx="1563480" cy="379440"/>
+            <a:ext cx="1563120" cy="379080"/>
           </a:xfrm>
           <a:prstGeom prst="diamond">
             <a:avLst/>
@@ -17799,7 +17827,7 @@
         <p:spPr>
           <a:xfrm>
             <a:off x="360" y="3366000"/>
-            <a:ext cx="1837080" cy="8280"/>
+            <a:ext cx="1837440" cy="8640"/>
           </a:xfrm>
           <a:prstGeom prst="straightConnector1">
             <a:avLst/>
@@ -17823,8 +17851,8 @@
         </p:nvCxnSpPr>
         <p:spPr>
           <a:xfrm flipH="1">
-            <a:off x="6393240" y="418320"/>
-            <a:ext cx="922320" cy="665640"/>
+            <a:off x="6392880" y="418320"/>
+            <a:ext cx="922680" cy="665640"/>
           </a:xfrm>
           <a:prstGeom prst="straightConnector1">
             <a:avLst/>
@@ -17846,7 +17874,7 @@
         <p:spPr>
           <a:xfrm>
             <a:off x="6629400" y="1442160"/>
-            <a:ext cx="1822680" cy="609120"/>
+            <a:ext cx="1822320" cy="608760"/>
           </a:xfrm>
           <a:prstGeom prst="diamond">
             <a:avLst/>
@@ -17913,8 +17941,8 @@
         </p:nvCxnSpPr>
         <p:spPr>
           <a:xfrm flipH="1" flipV="1">
-            <a:off x="8878680" y="418320"/>
-            <a:ext cx="617400" cy="419400"/>
+            <a:off x="8878320" y="418320"/>
+            <a:ext cx="617760" cy="419400"/>
           </a:xfrm>
           <a:prstGeom prst="straightConnector1">
             <a:avLst/>
@@ -17937,7 +17965,7 @@
         <p:spPr>
           <a:xfrm>
             <a:off x="6629400" y="2514600"/>
-            <a:ext cx="1563480" cy="379440"/>
+            <a:ext cx="1563120" cy="379080"/>
           </a:xfrm>
           <a:prstGeom prst="diamond">
             <a:avLst/>
@@ -18004,8 +18032,8 @@
         </p:nvCxnSpPr>
         <p:spPr>
           <a:xfrm flipH="1">
-            <a:off x="8192880" y="1828800"/>
-            <a:ext cx="1303200" cy="875880"/>
+            <a:off x="8192520" y="1828800"/>
+            <a:ext cx="1303560" cy="875880"/>
           </a:xfrm>
           <a:prstGeom prst="straightConnector1">
             <a:avLst/>
@@ -18029,8 +18057,8 @@
         </p:nvCxnSpPr>
         <p:spPr>
           <a:xfrm flipH="1">
-            <a:off x="6190200" y="2704320"/>
-            <a:ext cx="439560" cy="2066040"/>
+            <a:off x="6189840" y="2704320"/>
+            <a:ext cx="439920" cy="2066040"/>
           </a:xfrm>
           <a:prstGeom prst="straightConnector1">
             <a:avLst/>
@@ -18054,8 +18082,8 @@
         </p:nvCxnSpPr>
         <p:spPr>
           <a:xfrm flipH="1">
-            <a:off x="8452080" y="1333080"/>
-            <a:ext cx="235080" cy="414000"/>
+            <a:off x="8451720" y="1333080"/>
+            <a:ext cx="235440" cy="414000"/>
           </a:xfrm>
           <a:prstGeom prst="straightConnector1">
             <a:avLst/>
@@ -18102,9 +18130,9 @@
         <p:grpSpPr>
           <a:xfrm>
             <a:off x="101160" y="336240"/>
-            <a:ext cx="1618200" cy="777960"/>
+            <a:ext cx="1617840" cy="777960"/>
             <a:chOff x="101160" y="336240"/>
-            <a:chExt cx="1618200" cy="777960"/>
+            <a:chExt cx="1617840" cy="777960"/>
           </a:xfrm>
         </p:grpSpPr>
         <p:sp>
@@ -18116,7 +18144,7 @@
           <p:spPr>
             <a:xfrm>
               <a:off x="101160" y="336240"/>
-              <a:ext cx="1618200" cy="303120"/>
+              <a:ext cx="1617840" cy="303120"/>
             </a:xfrm>
             <a:prstGeom prst="rect">
               <a:avLst/>
@@ -18173,7 +18201,7 @@
           <p:spPr>
             <a:xfrm>
               <a:off x="101160" y="597600"/>
-              <a:ext cx="1618200" cy="516600"/>
+              <a:ext cx="1617840" cy="516600"/>
             </a:xfrm>
             <a:prstGeom prst="rect">
               <a:avLst/>
@@ -18264,9 +18292,9 @@
         <p:grpSpPr>
           <a:xfrm>
             <a:off x="6760440" y="4359960"/>
-            <a:ext cx="1618200" cy="558360"/>
+            <a:ext cx="1617840" cy="558000"/>
             <a:chOff x="6760440" y="4359960"/>
-            <a:chExt cx="1618200" cy="558360"/>
+            <a:chExt cx="1617840" cy="558000"/>
           </a:xfrm>
         </p:grpSpPr>
         <p:sp>
@@ -18278,7 +18306,7 @@
           <p:spPr>
             <a:xfrm>
               <a:off x="6760440" y="4359960"/>
-              <a:ext cx="1618200" cy="303120"/>
+              <a:ext cx="1617840" cy="303120"/>
             </a:xfrm>
             <a:prstGeom prst="rect">
               <a:avLst/>
@@ -18335,7 +18363,7 @@
           <p:spPr>
             <a:xfrm>
               <a:off x="6760440" y="4621320"/>
-              <a:ext cx="1618200" cy="297000"/>
+              <a:ext cx="1617840" cy="296640"/>
             </a:xfrm>
             <a:prstGeom prst="rect">
               <a:avLst/>
@@ -18384,7 +18412,7 @@
         <p:spPr>
           <a:xfrm>
             <a:off x="9144000" y="2057400"/>
-            <a:ext cx="474480" cy="379440"/>
+            <a:ext cx="474120" cy="379080"/>
           </a:xfrm>
           <a:prstGeom prst="triangle">
             <a:avLst>
@@ -18452,8 +18480,8 @@
         </p:nvCxnSpPr>
         <p:spPr>
           <a:xfrm flipH="1">
-            <a:off x="8026200" y="4108680"/>
-            <a:ext cx="1432800" cy="257400"/>
+            <a:off x="8026200" y="4108320"/>
+            <a:ext cx="1432800" cy="258120"/>
           </a:xfrm>
           <a:prstGeom prst="straightConnector1">
             <a:avLst/>
@@ -18476,8 +18504,8 @@
         </p:nvCxnSpPr>
         <p:spPr>
           <a:xfrm flipH="1" flipV="1">
-            <a:off x="9458640" y="4108680"/>
-            <a:ext cx="478800" cy="239040"/>
+            <a:off x="9458640" y="4108320"/>
+            <a:ext cx="479160" cy="239760"/>
           </a:xfrm>
           <a:prstGeom prst="straightConnector1">
             <a:avLst/>
@@ -18500,8 +18528,8 @@
         </p:nvCxnSpPr>
         <p:spPr>
           <a:xfrm flipH="1">
-            <a:off x="9346320" y="2436840"/>
-            <a:ext cx="35280" cy="448920"/>
+            <a:off x="9346320" y="2436480"/>
+            <a:ext cx="35280" cy="449640"/>
           </a:xfrm>
           <a:prstGeom prst="straightConnector1">
             <a:avLst/>
@@ -18548,7 +18576,7 @@
         <p:spPr>
           <a:xfrm>
             <a:off x="7089840" y="5715000"/>
-            <a:ext cx="1618200" cy="303120"/>
+            <a:ext cx="1617840" cy="303120"/>
           </a:xfrm>
           <a:prstGeom prst="rect">
             <a:avLst/>
@@ -18605,7 +18633,7 @@
         <p:spPr>
           <a:xfrm>
             <a:off x="6760440" y="5183280"/>
-            <a:ext cx="1821600" cy="379440"/>
+            <a:ext cx="1821240" cy="379080"/>
           </a:xfrm>
           <a:prstGeom prst="diamond">
             <a:avLst/>
@@ -18670,7 +18698,7 @@
         <p:spPr>
           <a:xfrm flipH="1">
             <a:off x="0" y="3657600"/>
-            <a:ext cx="1837080" cy="8280"/>
+            <a:ext cx="1837440" cy="8640"/>
           </a:xfrm>
           <a:prstGeom prst="straightConnector1">
             <a:avLst/>
@@ -18692,9 +18720,9 @@
         <p:grpSpPr>
           <a:xfrm>
             <a:off x="8534520" y="2879640"/>
-            <a:ext cx="1618200" cy="559080"/>
+            <a:ext cx="1617840" cy="558720"/>
             <a:chOff x="8534520" y="2879640"/>
-            <a:chExt cx="1618200" cy="559080"/>
+            <a:chExt cx="1617840" cy="558720"/>
           </a:xfrm>
         </p:grpSpPr>
         <p:sp>
@@ -18706,7 +18734,7 @@
           <p:spPr>
             <a:xfrm>
               <a:off x="8534520" y="2879640"/>
-              <a:ext cx="1618200" cy="303120"/>
+              <a:ext cx="1617840" cy="303120"/>
             </a:xfrm>
             <a:prstGeom prst="rect">
               <a:avLst/>
@@ -18763,7 +18791,7 @@
           <p:spPr>
             <a:xfrm>
               <a:off x="8534520" y="3141000"/>
-              <a:ext cx="1618200" cy="297720"/>
+              <a:ext cx="1617840" cy="297360"/>
             </a:xfrm>
             <a:prstGeom prst="rect">
               <a:avLst/>
@@ -18812,9 +18840,9 @@
         <p:grpSpPr>
           <a:xfrm>
             <a:off x="8534520" y="2879640"/>
-            <a:ext cx="1618200" cy="564480"/>
+            <a:ext cx="1617840" cy="564480"/>
             <a:chOff x="8534520" y="2879640"/>
-            <a:chExt cx="1618200" cy="564480"/>
+            <a:chExt cx="1617840" cy="564480"/>
           </a:xfrm>
         </p:grpSpPr>
         <p:sp>
@@ -18826,7 +18854,7 @@
           <p:spPr>
             <a:xfrm>
               <a:off x="8534520" y="2879640"/>
-              <a:ext cx="1618200" cy="303120"/>
+              <a:ext cx="1617840" cy="303120"/>
             </a:xfrm>
             <a:prstGeom prst="rect">
               <a:avLst/>
@@ -18883,7 +18911,7 @@
           <p:spPr>
             <a:xfrm>
               <a:off x="8534520" y="3141000"/>
-              <a:ext cx="1618200" cy="303120"/>
+              <a:ext cx="1617840" cy="303120"/>
             </a:xfrm>
             <a:prstGeom prst="rect">
               <a:avLst/>
@@ -18946,7 +18974,7 @@
         <p:spPr>
           <a:xfrm>
             <a:off x="9221400" y="3729240"/>
-            <a:ext cx="474480" cy="379440"/>
+            <a:ext cx="474120" cy="379080"/>
           </a:xfrm>
           <a:prstGeom prst="triangle">
             <a:avLst>
@@ -19038,7 +19066,7 @@
         <p:spPr>
           <a:xfrm>
             <a:off x="8556840" y="3657600"/>
-            <a:ext cx="1837080" cy="8280"/>
+            <a:ext cx="1837440" cy="8640"/>
           </a:xfrm>
           <a:prstGeom prst="straightConnector1">
             <a:avLst/>
@@ -19061,7 +19089,7 @@
         <p:spPr>
           <a:xfrm>
             <a:off x="9601200" y="3382920"/>
-            <a:ext cx="908280" cy="340200"/>
+            <a:ext cx="907920" cy="339840"/>
           </a:xfrm>
           <a:prstGeom prst="rect">
             <a:avLst/>
@@ -19114,7 +19142,7 @@
         <p:spPr>
           <a:xfrm>
             <a:off x="2057400" y="2132280"/>
-            <a:ext cx="1618200" cy="303120"/>
+            <a:ext cx="1617840" cy="303120"/>
           </a:xfrm>
           <a:prstGeom prst="rect">
             <a:avLst/>
@@ -19171,7 +19199,7 @@
         <p:spPr>
           <a:xfrm>
             <a:off x="2057400" y="2393640"/>
-            <a:ext cx="1618200" cy="189720"/>
+            <a:ext cx="1617840" cy="189360"/>
           </a:xfrm>
           <a:prstGeom prst="rect">
             <a:avLst/>
@@ -19219,7 +19247,7 @@
         <p:spPr>
           <a:xfrm>
             <a:off x="2613960" y="1217880"/>
-            <a:ext cx="474480" cy="379440"/>
+            <a:ext cx="474120" cy="379080"/>
           </a:xfrm>
           <a:prstGeom prst="triangle">
             <a:avLst>
@@ -19288,8 +19316,8 @@
         </p:nvCxnSpPr>
         <p:spPr>
           <a:xfrm>
-            <a:off x="2851200" y="1597320"/>
-            <a:ext cx="15480" cy="535320"/>
+            <a:off x="2851200" y="1596960"/>
+            <a:ext cx="15480" cy="535680"/>
           </a:xfrm>
           <a:prstGeom prst="straightConnector1">
             <a:avLst/>
@@ -19338,8 +19366,8 @@
         </p:nvCxnSpPr>
         <p:spPr>
           <a:xfrm>
-            <a:off x="7569360" y="4918320"/>
-            <a:ext cx="102240" cy="265320"/>
+            <a:off x="7569360" y="4917960"/>
+            <a:ext cx="102240" cy="265680"/>
           </a:xfrm>
           <a:prstGeom prst="straightConnector1">
             <a:avLst/>
@@ -19364,8 +19392,8 @@
         </p:nvCxnSpPr>
         <p:spPr>
           <a:xfrm>
-            <a:off x="7671240" y="5562720"/>
-            <a:ext cx="227880" cy="152640"/>
+            <a:off x="7671240" y="5562360"/>
+            <a:ext cx="227880" cy="153000"/>
           </a:xfrm>
           <a:prstGeom prst="straightConnector1">
             <a:avLst/>
@@ -19387,9 +19415,9 @@
         <p:grpSpPr>
           <a:xfrm>
             <a:off x="10265040" y="5029200"/>
-            <a:ext cx="1618200" cy="558720"/>
+            <a:ext cx="1617840" cy="558360"/>
             <a:chOff x="10265040" y="5029200"/>
-            <a:chExt cx="1618200" cy="558720"/>
+            <a:chExt cx="1617840" cy="558360"/>
           </a:xfrm>
         </p:grpSpPr>
         <p:sp>
@@ -19401,7 +19429,7 @@
           <p:spPr>
             <a:xfrm>
               <a:off x="10265040" y="5029200"/>
-              <a:ext cx="1618200" cy="303120"/>
+              <a:ext cx="1617840" cy="303120"/>
             </a:xfrm>
             <a:prstGeom prst="rect">
               <a:avLst/>
@@ -19458,7 +19486,7 @@
           <p:spPr>
             <a:xfrm>
               <a:off x="10265040" y="5290560"/>
-              <a:ext cx="1618200" cy="297360"/>
+              <a:ext cx="1617840" cy="297000"/>
             </a:xfrm>
             <a:prstGeom prst="rect">
               <a:avLst/>
@@ -19509,8 +19537,8 @@
         </p:nvCxnSpPr>
         <p:spPr>
           <a:xfrm flipH="1" flipV="1">
-            <a:off x="9695880" y="4108680"/>
-            <a:ext cx="1378440" cy="920880"/>
+            <a:off x="9695520" y="4108320"/>
+            <a:ext cx="1378800" cy="921240"/>
           </a:xfrm>
           <a:prstGeom prst="straightConnector1">
             <a:avLst/>
@@ -19532,9 +19560,9 @@
         <p:grpSpPr>
           <a:xfrm>
             <a:off x="9122040" y="4343400"/>
-            <a:ext cx="1618200" cy="558720"/>
+            <a:ext cx="1617840" cy="558360"/>
             <a:chOff x="9122040" y="4343400"/>
-            <a:chExt cx="1618200" cy="558720"/>
+            <a:chExt cx="1617840" cy="558360"/>
           </a:xfrm>
         </p:grpSpPr>
         <p:sp>
@@ -19546,7 +19574,7 @@
           <p:spPr>
             <a:xfrm>
               <a:off x="9122040" y="4343400"/>
-              <a:ext cx="1618200" cy="303120"/>
+              <a:ext cx="1617840" cy="303120"/>
             </a:xfrm>
             <a:prstGeom prst="rect">
               <a:avLst/>
@@ -19603,7 +19631,7 @@
           <p:spPr>
             <a:xfrm>
               <a:off x="9122040" y="4604760"/>
-              <a:ext cx="1618200" cy="297360"/>
+              <a:ext cx="1617840" cy="297000"/>
             </a:xfrm>
             <a:prstGeom prst="rect">
               <a:avLst/>
@@ -19652,7 +19680,7 @@
         <p:spPr>
           <a:xfrm>
             <a:off x="10037520" y="2131560"/>
-            <a:ext cx="474480" cy="379440"/>
+            <a:ext cx="474120" cy="379080"/>
           </a:xfrm>
           <a:prstGeom prst="triangle">
             <a:avLst>
@@ -19744,9 +19772,9 @@
         <p:grpSpPr>
           <a:xfrm>
             <a:off x="10494000" y="2866680"/>
-            <a:ext cx="1618200" cy="558720"/>
+            <a:ext cx="1617840" cy="558360"/>
             <a:chOff x="10494000" y="2866680"/>
-            <a:chExt cx="1618200" cy="558720"/>
+            <a:chExt cx="1617840" cy="558360"/>
           </a:xfrm>
         </p:grpSpPr>
         <p:sp>
@@ -19758,7 +19786,7 @@
           <p:spPr>
             <a:xfrm>
               <a:off x="10494000" y="2866680"/>
-              <a:ext cx="1618200" cy="303120"/>
+              <a:ext cx="1617840" cy="303120"/>
             </a:xfrm>
             <a:prstGeom prst="rect">
               <a:avLst/>
@@ -19815,7 +19843,7 @@
           <p:spPr>
             <a:xfrm>
               <a:off x="10494000" y="3128040"/>
-              <a:ext cx="1618200" cy="297360"/>
+              <a:ext cx="1617840" cy="297000"/>
             </a:xfrm>
             <a:prstGeom prst="rect">
               <a:avLst/>
@@ -19866,8 +19894,8 @@
         </p:nvCxnSpPr>
         <p:spPr>
           <a:xfrm>
-            <a:off x="10274760" y="2511000"/>
-            <a:ext cx="1028520" cy="356040"/>
+            <a:off x="10274760" y="2510640"/>
+            <a:ext cx="1028520" cy="356400"/>
           </a:xfrm>
           <a:prstGeom prst="straightConnector1">
             <a:avLst/>
@@ -19919,7 +19947,7 @@
         <p:spPr>
           <a:xfrm flipH="1">
             <a:off x="0" y="3073320"/>
-            <a:ext cx="1837080" cy="8280"/>
+            <a:ext cx="1837440" cy="8640"/>
           </a:xfrm>
           <a:prstGeom prst="straightConnector1">
             <a:avLst/>
@@ -19942,7 +19970,7 @@
         <p:spPr>
           <a:xfrm>
             <a:off x="0" y="2489400"/>
-            <a:ext cx="1837080" cy="8280"/>
+            <a:ext cx="1837440" cy="8640"/>
           </a:xfrm>
           <a:prstGeom prst="straightConnector1">
             <a:avLst/>
@@ -19965,7 +19993,7 @@
         <p:spPr>
           <a:xfrm>
             <a:off x="0" y="2781360"/>
-            <a:ext cx="1837080" cy="8280"/>
+            <a:ext cx="1837440" cy="8640"/>
           </a:xfrm>
           <a:prstGeom prst="straightConnector1">
             <a:avLst/>
@@ -19988,7 +20016,7 @@
         <p:spPr>
           <a:xfrm flipH="1">
             <a:off x="0" y="3657600"/>
-            <a:ext cx="1837080" cy="8280"/>
+            <a:ext cx="1837440" cy="8640"/>
           </a:xfrm>
           <a:prstGeom prst="straightConnector1">
             <a:avLst/>
@@ -20010,7 +20038,7 @@
         <p:spPr>
           <a:xfrm>
             <a:off x="128520" y="6134040"/>
-            <a:ext cx="1563480" cy="379440"/>
+            <a:ext cx="1563120" cy="379080"/>
           </a:xfrm>
           <a:prstGeom prst="diamond">
             <a:avLst/>
@@ -20075,7 +20103,7 @@
         <p:spPr>
           <a:xfrm>
             <a:off x="302760" y="5454000"/>
-            <a:ext cx="1215000" cy="379440"/>
+            <a:ext cx="1214640" cy="379080"/>
           </a:xfrm>
           <a:prstGeom prst="ellipse">
             <a:avLst/>
@@ -20138,7 +20166,7 @@
         <p:spPr>
           <a:xfrm>
             <a:off x="101160" y="336240"/>
-            <a:ext cx="1618200" cy="303120"/>
+            <a:ext cx="1617840" cy="303120"/>
           </a:xfrm>
           <a:prstGeom prst="rect">
             <a:avLst/>
@@ -20195,7 +20223,7 @@
         <p:spPr>
           <a:xfrm>
             <a:off x="101160" y="597600"/>
-            <a:ext cx="1618200" cy="516600"/>
+            <a:ext cx="1617840" cy="516600"/>
           </a:xfrm>
           <a:prstGeom prst="rect">
             <a:avLst/>
@@ -20285,7 +20313,7 @@
         <p:spPr>
           <a:xfrm>
             <a:off x="8458200" y="5486400"/>
-            <a:ext cx="1618200" cy="303120"/>
+            <a:ext cx="1617840" cy="303120"/>
           </a:xfrm>
           <a:prstGeom prst="rect">
             <a:avLst/>
@@ -20342,7 +20370,7 @@
         <p:spPr>
           <a:xfrm>
             <a:off x="128520" y="4629600"/>
-            <a:ext cx="1563480" cy="524160"/>
+            <a:ext cx="1563120" cy="523800"/>
           </a:xfrm>
           <a:prstGeom prst="diamond">
             <a:avLst/>
@@ -20430,7 +20458,7 @@
         <p:spPr>
           <a:xfrm>
             <a:off x="0" y="3365640"/>
-            <a:ext cx="1837080" cy="8280"/>
+            <a:ext cx="1837440" cy="8640"/>
           </a:xfrm>
           <a:prstGeom prst="straightConnector1">
             <a:avLst/>
@@ -20452,7 +20480,7 @@
         <p:spPr>
           <a:xfrm>
             <a:off x="673200" y="3949920"/>
-            <a:ext cx="474480" cy="379440"/>
+            <a:ext cx="474120" cy="379080"/>
           </a:xfrm>
           <a:prstGeom prst="triangle">
             <a:avLst>
@@ -20519,9 +20547,9 @@
         <p:grpSpPr>
           <a:xfrm>
             <a:off x="101160" y="1413000"/>
-            <a:ext cx="1618200" cy="777960"/>
+            <a:ext cx="1617840" cy="777960"/>
             <a:chOff x="101160" y="1413000"/>
-            <a:chExt cx="1618200" cy="777960"/>
+            <a:chExt cx="1617840" cy="777960"/>
           </a:xfrm>
         </p:grpSpPr>
         <p:sp>
@@ -20533,7 +20561,7 @@
           <p:spPr>
             <a:xfrm>
               <a:off x="101160" y="1413000"/>
-              <a:ext cx="1618200" cy="303120"/>
+              <a:ext cx="1617840" cy="303120"/>
             </a:xfrm>
             <a:prstGeom prst="rect">
               <a:avLst/>
@@ -20591,7 +20619,7 @@
           <p:spPr>
             <a:xfrm>
               <a:off x="101160" y="1674360"/>
-              <a:ext cx="1618200" cy="516600"/>
+              <a:ext cx="1617840" cy="516600"/>
             </a:xfrm>
             <a:prstGeom prst="rect">
               <a:avLst/>
@@ -20683,7 +20711,7 @@
         <p:spPr>
           <a:xfrm>
             <a:off x="5463360" y="2131920"/>
-            <a:ext cx="1618200" cy="303120"/>
+            <a:ext cx="1617840" cy="303120"/>
           </a:xfrm>
           <a:prstGeom prst="rect">
             <a:avLst/>
@@ -20746,7 +20774,7 @@
         <p:spPr>
           <a:xfrm>
             <a:off x="5463360" y="1828800"/>
-            <a:ext cx="1618200" cy="303120"/>
+            <a:ext cx="1617840" cy="303120"/>
           </a:xfrm>
           <a:prstGeom prst="rect">
             <a:avLst/>
@@ -20803,9 +20831,9 @@
         <p:grpSpPr>
           <a:xfrm>
             <a:off x="4296600" y="4022640"/>
-            <a:ext cx="1618200" cy="777960"/>
+            <a:ext cx="1617840" cy="777960"/>
             <a:chOff x="4296600" y="4022640"/>
-            <a:chExt cx="1618200" cy="777960"/>
+            <a:chExt cx="1617840" cy="777960"/>
           </a:xfrm>
         </p:grpSpPr>
         <p:sp>
@@ -20817,7 +20845,7 @@
           <p:spPr>
             <a:xfrm>
               <a:off x="4296600" y="4022640"/>
-              <a:ext cx="1618200" cy="303120"/>
+              <a:ext cx="1617840" cy="303120"/>
             </a:xfrm>
             <a:prstGeom prst="rect">
               <a:avLst/>
@@ -20874,7 +20902,7 @@
           <p:spPr>
             <a:xfrm>
               <a:off x="4296600" y="4284000"/>
-              <a:ext cx="1618200" cy="516600"/>
+              <a:ext cx="1617840" cy="516600"/>
             </a:xfrm>
             <a:prstGeom prst="rect">
               <a:avLst/>
@@ -20965,9 +20993,9 @@
         <p:grpSpPr>
           <a:xfrm>
             <a:off x="9348840" y="2254320"/>
-            <a:ext cx="1618200" cy="1631880"/>
+            <a:ext cx="1617840" cy="1631880"/>
             <a:chOff x="9348840" y="2254320"/>
-            <a:chExt cx="1618200" cy="1631880"/>
+            <a:chExt cx="1617840" cy="1631880"/>
           </a:xfrm>
         </p:grpSpPr>
         <p:sp>
@@ -20979,7 +21007,7 @@
           <p:spPr>
             <a:xfrm>
               <a:off x="9348840" y="2254320"/>
-              <a:ext cx="1618200" cy="303120"/>
+              <a:ext cx="1617840" cy="303120"/>
             </a:xfrm>
             <a:prstGeom prst="rect">
               <a:avLst/>
@@ -21036,7 +21064,7 @@
           <p:spPr>
             <a:xfrm>
               <a:off x="9348840" y="2515680"/>
-              <a:ext cx="1618200" cy="1370520"/>
+              <a:ext cx="1617840" cy="1370520"/>
             </a:xfrm>
             <a:prstGeom prst="rect">
               <a:avLst/>
@@ -21235,7 +21263,7 @@
         <p:spPr>
           <a:xfrm>
             <a:off x="9402120" y="4572000"/>
-            <a:ext cx="1563480" cy="379440"/>
+            <a:ext cx="1563120" cy="379080"/>
           </a:xfrm>
           <a:prstGeom prst="diamond">
             <a:avLst/>
@@ -21300,7 +21328,7 @@
         <p:spPr>
           <a:xfrm>
             <a:off x="7007400" y="4572000"/>
-            <a:ext cx="1672200" cy="379440"/>
+            <a:ext cx="1671840" cy="379080"/>
           </a:xfrm>
           <a:prstGeom prst="ellipse">
             <a:avLst/>
@@ -21363,9 +21391,9 @@
         <p:grpSpPr>
           <a:xfrm>
             <a:off x="9348840" y="2254320"/>
-            <a:ext cx="1618200" cy="1631880"/>
+            <a:ext cx="1617840" cy="1631880"/>
             <a:chOff x="9348840" y="2254320"/>
-            <a:chExt cx="1618200" cy="1631880"/>
+            <a:chExt cx="1617840" cy="1631880"/>
           </a:xfrm>
         </p:grpSpPr>
         <p:sp>
@@ -21377,7 +21405,7 @@
           <p:spPr>
             <a:xfrm>
               <a:off x="9348840" y="2254320"/>
-              <a:ext cx="1618200" cy="303120"/>
+              <a:ext cx="1617840" cy="303120"/>
             </a:xfrm>
             <a:prstGeom prst="rect">
               <a:avLst/>
@@ -21434,7 +21462,7 @@
           <p:spPr>
             <a:xfrm>
               <a:off x="9348840" y="2515680"/>
-              <a:ext cx="1618200" cy="1370520"/>
+              <a:ext cx="1617840" cy="1370520"/>
             </a:xfrm>
             <a:prstGeom prst="rect">
               <a:avLst/>
@@ -21633,9 +21661,9 @@
         <p:grpSpPr>
           <a:xfrm>
             <a:off x="9348840" y="2254320"/>
-            <a:ext cx="1618200" cy="1845360"/>
+            <a:ext cx="1617840" cy="1845360"/>
             <a:chOff x="9348840" y="2254320"/>
-            <a:chExt cx="1618200" cy="1845360"/>
+            <a:chExt cx="1617840" cy="1845360"/>
           </a:xfrm>
         </p:grpSpPr>
         <p:sp>
@@ -21647,7 +21675,7 @@
           <p:spPr>
             <a:xfrm>
               <a:off x="9348840" y="2254320"/>
-              <a:ext cx="1618200" cy="303120"/>
+              <a:ext cx="1617840" cy="303120"/>
             </a:xfrm>
             <a:prstGeom prst="rect">
               <a:avLst/>
@@ -21704,7 +21732,7 @@
           <p:spPr>
             <a:xfrm>
               <a:off x="9348840" y="2515680"/>
-              <a:ext cx="1618200" cy="1584000"/>
+              <a:ext cx="1617840" cy="1584000"/>
             </a:xfrm>
             <a:prstGeom prst="rect">
               <a:avLst/>
@@ -21930,7 +21958,7 @@
         <p:spPr>
           <a:xfrm>
             <a:off x="7086600" y="3501720"/>
-            <a:ext cx="1821600" cy="379440"/>
+            <a:ext cx="1821240" cy="379080"/>
           </a:xfrm>
           <a:prstGeom prst="diamond">
             <a:avLst/>
@@ -21995,7 +22023,7 @@
         <p:spPr>
           <a:xfrm>
             <a:off x="7543800" y="1869840"/>
-            <a:ext cx="1792080" cy="379440"/>
+            <a:ext cx="1791720" cy="379080"/>
           </a:xfrm>
           <a:prstGeom prst="diamond">
             <a:avLst/>
@@ -22062,8 +22090,8 @@
         </p:nvCxnSpPr>
         <p:spPr>
           <a:xfrm flipV="1">
-            <a:off x="7081560" y="2059560"/>
-            <a:ext cx="462600" cy="224280"/>
+            <a:off x="7081200" y="2059560"/>
+            <a:ext cx="462960" cy="224280"/>
           </a:xfrm>
           <a:prstGeom prst="straightConnector1">
             <a:avLst/>
@@ -22088,8 +22116,8 @@
         </p:nvCxnSpPr>
         <p:spPr>
           <a:xfrm flipH="1">
-            <a:off x="9267120" y="4951440"/>
-            <a:ext cx="917280" cy="535320"/>
+            <a:off x="9267120" y="4951080"/>
+            <a:ext cx="916920" cy="535680"/>
           </a:xfrm>
           <a:prstGeom prst="straightConnector1">
             <a:avLst/>
@@ -22114,7 +22142,7 @@
         <p:spPr>
           <a:xfrm>
             <a:off x="10157760" y="4099680"/>
-            <a:ext cx="26640" cy="472680"/>
+            <a:ext cx="26280" cy="472680"/>
           </a:xfrm>
           <a:prstGeom prst="straightConnector1">
             <a:avLst/>
@@ -22138,8 +22166,8 @@
         </p:nvCxnSpPr>
         <p:spPr>
           <a:xfrm flipH="1">
-            <a:off x="8679600" y="4761720"/>
-            <a:ext cx="722880" cy="360"/>
+            <a:off x="8679240" y="4761720"/>
+            <a:ext cx="723240" cy="360"/>
           </a:xfrm>
           <a:prstGeom prst="straightConnector1">
             <a:avLst/>
@@ -22161,7 +22189,7 @@
         <p:spPr>
           <a:xfrm>
             <a:off x="6629400" y="5099760"/>
-            <a:ext cx="1593000" cy="379440"/>
+            <a:ext cx="1592640" cy="379080"/>
           </a:xfrm>
           <a:prstGeom prst="ellipse">
             <a:avLst/>
@@ -22226,8 +22254,8 @@
         </p:nvCxnSpPr>
         <p:spPr>
           <a:xfrm flipH="1">
-            <a:off x="8222400" y="4761720"/>
-            <a:ext cx="1180080" cy="528120"/>
+            <a:off x="8222040" y="4761720"/>
+            <a:ext cx="1180440" cy="528120"/>
           </a:xfrm>
           <a:prstGeom prst="straightConnector1">
             <a:avLst/>
@@ -22251,8 +22279,8 @@
         </p:nvCxnSpPr>
         <p:spPr>
           <a:xfrm flipH="1">
-            <a:off x="3627360" y="2547720"/>
-            <a:ext cx="7560" cy="457560"/>
+            <a:off x="3627000" y="2547720"/>
+            <a:ext cx="7920" cy="457560"/>
           </a:xfrm>
           <a:prstGeom prst="straightConnector1">
             <a:avLst/>
@@ -22274,7 +22302,7 @@
         <p:spPr>
           <a:xfrm>
             <a:off x="5234760" y="2815200"/>
-            <a:ext cx="1563480" cy="379440"/>
+            <a:ext cx="1563120" cy="379080"/>
           </a:xfrm>
           <a:prstGeom prst="diamond">
             <a:avLst/>
@@ -22339,7 +22367,7 @@
         <p:spPr>
           <a:xfrm>
             <a:off x="3634560" y="2358000"/>
-            <a:ext cx="1563480" cy="379440"/>
+            <a:ext cx="1563120" cy="379080"/>
           </a:xfrm>
           <a:prstGeom prst="diamond">
             <a:avLst/>
@@ -22404,7 +22432,7 @@
         <p:spPr>
           <a:xfrm>
             <a:off x="2034360" y="2815200"/>
-            <a:ext cx="1593000" cy="379440"/>
+            <a:ext cx="1592640" cy="379080"/>
           </a:xfrm>
           <a:prstGeom prst="ellipse">
             <a:avLst/>
@@ -22469,8 +22497,8 @@
         </p:nvCxnSpPr>
         <p:spPr>
           <a:xfrm flipH="1" flipV="1">
-            <a:off x="4416480" y="2737440"/>
-            <a:ext cx="689400" cy="1285560"/>
+            <a:off x="4416120" y="2737080"/>
+            <a:ext cx="689760" cy="1285920"/>
           </a:xfrm>
           <a:prstGeom prst="straightConnector1">
             <a:avLst/>
@@ -22495,8 +22523,8 @@
         </p:nvCxnSpPr>
         <p:spPr>
           <a:xfrm flipH="1">
-            <a:off x="4416480" y="1980360"/>
-            <a:ext cx="1047240" cy="378000"/>
+            <a:off x="4416120" y="1980360"/>
+            <a:ext cx="1047600" cy="378000"/>
           </a:xfrm>
           <a:prstGeom prst="straightConnector1">
             <a:avLst/>
@@ -22520,8 +22548,8 @@
         </p:nvCxnSpPr>
         <p:spPr>
           <a:xfrm flipV="1">
-            <a:off x="5105520" y="3194640"/>
-            <a:ext cx="911520" cy="828360"/>
+            <a:off x="5105520" y="3194280"/>
+            <a:ext cx="911160" cy="828720"/>
           </a:xfrm>
           <a:prstGeom prst="straightConnector1">
             <a:avLst/>
@@ -22546,8 +22574,8 @@
         </p:nvCxnSpPr>
         <p:spPr>
           <a:xfrm flipV="1">
-            <a:off x="6016680" y="2435040"/>
-            <a:ext cx="255960" cy="380520"/>
+            <a:off x="6016320" y="2435040"/>
+            <a:ext cx="256320" cy="380520"/>
           </a:xfrm>
           <a:prstGeom prst="straightConnector1">
             <a:avLst/>
@@ -22571,8 +22599,8 @@
         </p:nvCxnSpPr>
         <p:spPr>
           <a:xfrm flipV="1">
-            <a:off x="5914800" y="3691440"/>
-            <a:ext cx="1172160" cy="720360"/>
+            <a:off x="5914440" y="3691440"/>
+            <a:ext cx="1172520" cy="720360"/>
           </a:xfrm>
           <a:prstGeom prst="straightConnector1">
             <a:avLst/>
@@ -22597,8 +22625,8 @@
         </p:nvCxnSpPr>
         <p:spPr>
           <a:xfrm flipH="1">
-            <a:off x="8908200" y="3177000"/>
-            <a:ext cx="441000" cy="514800"/>
+            <a:off x="8907840" y="3177000"/>
+            <a:ext cx="441360" cy="514800"/>
           </a:xfrm>
           <a:prstGeom prst="straightConnector1">
             <a:avLst/>
@@ -22622,8 +22650,8 @@
         </p:nvCxnSpPr>
         <p:spPr>
           <a:xfrm flipH="1" flipV="1">
-            <a:off x="9335880" y="2059560"/>
-            <a:ext cx="822240" cy="195120"/>
+            <a:off x="9335520" y="2059560"/>
+            <a:ext cx="822600" cy="195120"/>
           </a:xfrm>
           <a:prstGeom prst="straightConnector1">
             <a:avLst/>
@@ -22645,7 +22673,7 @@
         <p:spPr>
           <a:xfrm>
             <a:off x="2722320" y="5330520"/>
-            <a:ext cx="1821600" cy="379440"/>
+            <a:ext cx="1821240" cy="379080"/>
           </a:xfrm>
           <a:prstGeom prst="diamond">
             <a:avLst/>
@@ -22737,8 +22765,8 @@
         </p:nvCxnSpPr>
         <p:spPr>
           <a:xfrm flipH="1">
-            <a:off x="4543920" y="4800600"/>
-            <a:ext cx="561960" cy="720000"/>
+            <a:off x="4543560" y="4800600"/>
+            <a:ext cx="562320" cy="720000"/>
           </a:xfrm>
           <a:prstGeom prst="straightConnector1">
             <a:avLst/>
@@ -22760,7 +22788,7 @@
         <p:spPr>
           <a:xfrm>
             <a:off x="7315200" y="4114800"/>
-            <a:ext cx="1672200" cy="379440"/>
+            <a:ext cx="1671840" cy="379080"/>
           </a:xfrm>
           <a:prstGeom prst="ellipse">
             <a:avLst/>
@@ -22825,8 +22853,8 @@
         </p:nvCxnSpPr>
         <p:spPr>
           <a:xfrm flipH="1" flipV="1">
-            <a:off x="8987400" y="4304520"/>
-            <a:ext cx="415080" cy="457560"/>
+            <a:off x="8987040" y="4304520"/>
+            <a:ext cx="415440" cy="457560"/>
           </a:xfrm>
           <a:prstGeom prst="straightConnector1">
             <a:avLst/>
@@ -22878,7 +22906,7 @@
         <p:spPr>
           <a:xfrm flipH="1">
             <a:off x="0" y="3073320"/>
-            <a:ext cx="1837080" cy="8280"/>
+            <a:ext cx="1837440" cy="8640"/>
           </a:xfrm>
           <a:prstGeom prst="straightConnector1">
             <a:avLst/>
@@ -22901,7 +22929,7 @@
         <p:spPr>
           <a:xfrm>
             <a:off x="0" y="2489400"/>
-            <a:ext cx="1837080" cy="8280"/>
+            <a:ext cx="1837440" cy="8640"/>
           </a:xfrm>
           <a:prstGeom prst="straightConnector1">
             <a:avLst/>
@@ -22924,7 +22952,7 @@
         <p:spPr>
           <a:xfrm>
             <a:off x="0" y="2781360"/>
-            <a:ext cx="1837080" cy="8280"/>
+            <a:ext cx="1837440" cy="8640"/>
           </a:xfrm>
           <a:prstGeom prst="straightConnector1">
             <a:avLst/>
@@ -22947,7 +22975,7 @@
         <p:spPr>
           <a:xfrm flipH="1">
             <a:off x="0" y="3657600"/>
-            <a:ext cx="1837080" cy="8280"/>
+            <a:ext cx="1837440" cy="8640"/>
           </a:xfrm>
           <a:prstGeom prst="straightConnector1">
             <a:avLst/>
@@ -22969,7 +22997,7 @@
         <p:spPr>
           <a:xfrm>
             <a:off x="128520" y="6134040"/>
-            <a:ext cx="1563480" cy="379440"/>
+            <a:ext cx="1563120" cy="379080"/>
           </a:xfrm>
           <a:prstGeom prst="diamond">
             <a:avLst/>
@@ -23034,7 +23062,7 @@
         <p:spPr>
           <a:xfrm>
             <a:off x="302760" y="5454000"/>
-            <a:ext cx="1215000" cy="379440"/>
+            <a:ext cx="1214640" cy="379080"/>
           </a:xfrm>
           <a:prstGeom prst="ellipse">
             <a:avLst/>
@@ -23097,9 +23125,9 @@
         <p:grpSpPr>
           <a:xfrm>
             <a:off x="101160" y="336240"/>
-            <a:ext cx="1618200" cy="777960"/>
+            <a:ext cx="1617840" cy="777960"/>
             <a:chOff x="101160" y="336240"/>
-            <a:chExt cx="1618200" cy="777960"/>
+            <a:chExt cx="1617840" cy="777960"/>
           </a:xfrm>
         </p:grpSpPr>
         <p:sp>
@@ -23111,7 +23139,7 @@
           <p:spPr>
             <a:xfrm>
               <a:off x="101160" y="336240"/>
-              <a:ext cx="1618200" cy="303120"/>
+              <a:ext cx="1617840" cy="303120"/>
             </a:xfrm>
             <a:prstGeom prst="rect">
               <a:avLst/>
@@ -23168,7 +23196,7 @@
           <p:spPr>
             <a:xfrm>
               <a:off x="101160" y="597600"/>
-              <a:ext cx="1618200" cy="516600"/>
+              <a:ext cx="1617840" cy="516600"/>
             </a:xfrm>
             <a:prstGeom prst="rect">
               <a:avLst/>
@@ -23259,7 +23287,7 @@
         <p:spPr>
           <a:xfrm>
             <a:off x="128520" y="4629600"/>
-            <a:ext cx="1563480" cy="524160"/>
+            <a:ext cx="1563120" cy="523800"/>
           </a:xfrm>
           <a:prstGeom prst="diamond">
             <a:avLst/>
@@ -23347,7 +23375,7 @@
         <p:spPr>
           <a:xfrm>
             <a:off x="0" y="3365640"/>
-            <a:ext cx="1837080" cy="8280"/>
+            <a:ext cx="1837440" cy="8640"/>
           </a:xfrm>
           <a:prstGeom prst="straightConnector1">
             <a:avLst/>
@@ -23369,7 +23397,7 @@
         <p:spPr>
           <a:xfrm>
             <a:off x="673200" y="3949920"/>
-            <a:ext cx="474480" cy="379440"/>
+            <a:ext cx="474120" cy="379080"/>
           </a:xfrm>
           <a:prstGeom prst="triangle">
             <a:avLst>
@@ -23436,9 +23464,9 @@
         <p:grpSpPr>
           <a:xfrm>
             <a:off x="101160" y="1413000"/>
-            <a:ext cx="1618200" cy="777960"/>
+            <a:ext cx="1617840" cy="777960"/>
             <a:chOff x="101160" y="1413000"/>
-            <a:chExt cx="1618200" cy="777960"/>
+            <a:chExt cx="1617840" cy="777960"/>
           </a:xfrm>
         </p:grpSpPr>
         <p:sp>
@@ -23450,7 +23478,7 @@
           <p:spPr>
             <a:xfrm>
               <a:off x="101160" y="1413000"/>
-              <a:ext cx="1618200" cy="303120"/>
+              <a:ext cx="1617840" cy="303120"/>
             </a:xfrm>
             <a:prstGeom prst="rect">
               <a:avLst/>
@@ -23508,7 +23536,7 @@
           <p:spPr>
             <a:xfrm>
               <a:off x="101160" y="1674360"/>
-              <a:ext cx="1618200" cy="516600"/>
+              <a:ext cx="1617840" cy="516600"/>
             </a:xfrm>
             <a:prstGeom prst="rect">
               <a:avLst/>

</xml_diff>

<commit_message>
implemented placeBuilding & started working on other features
</commit_message>
<xml_diff>
--- a/documentation/database/ER-Diagram.pptx
+++ b/documentation/database/ER-Diagram.pptx
@@ -353,7 +353,7 @@
             <a:pPr indent="0" algn="r">
               <a:buNone/>
             </a:pPr>
-            <a:fld id="{F8CFC5D6-715F-4C5B-9CEC-BA41E398D1B1}" type="slidenum">
+            <a:fld id="{57229D11-BDAA-4016-85BD-28BAB6CF3145}" type="slidenum">
               <a:rPr b="0" lang="en-US" sz="1400" spc="-1" strike="noStrike">
                 <a:solidFill>
                   <a:srgbClr val="000000"/>
@@ -396,7 +396,7 @@
       </p:grpSpPr>
       <p:sp>
         <p:nvSpPr>
-          <p:cNvPr id="363" name="PlaceHolder 1"/>
+          <p:cNvPr id="370" name="PlaceHolder 1"/>
           <p:cNvSpPr>
             <a:spLocks noGrp="1"/>
           </p:cNvSpPr>
@@ -407,7 +407,7 @@
         <p:spPr>
           <a:xfrm>
             <a:off x="685800" y="1143000"/>
-            <a:ext cx="5477760" cy="3077640"/>
+            <a:ext cx="5477040" cy="3076920"/>
           </a:xfrm>
           <a:prstGeom prst="rect">
             <a:avLst/>
@@ -419,7 +419,7 @@
       </p:sp>
       <p:sp>
         <p:nvSpPr>
-          <p:cNvPr id="364" name="PlaceHolder 2"/>
+          <p:cNvPr id="371" name="PlaceHolder 2"/>
           <p:cNvSpPr>
             <a:spLocks noGrp="1"/>
           </p:cNvSpPr>
@@ -430,7 +430,7 @@
         <p:spPr>
           <a:xfrm>
             <a:off x="685800" y="4400640"/>
-            <a:ext cx="5477760" cy="3591720"/>
+            <a:ext cx="5477040" cy="3591000"/>
           </a:xfrm>
           <a:prstGeom prst="rect">
             <a:avLst/>
@@ -459,7 +459,7 @@
       </p:sp>
       <p:sp>
         <p:nvSpPr>
-          <p:cNvPr id="365" name="PlaceHolder 3"/>
+          <p:cNvPr id="372" name="PlaceHolder 3"/>
           <p:cNvSpPr>
             <a:spLocks noGrp="1"/>
           </p:cNvSpPr>
@@ -470,7 +470,7 @@
         <p:spPr>
           <a:xfrm>
             <a:off x="3884760" y="8685360"/>
-            <a:ext cx="2963160" cy="450000"/>
+            <a:ext cx="2962440" cy="449280"/>
           </a:xfrm>
           <a:prstGeom prst="rect">
             <a:avLst/>
@@ -512,7 +512,7 @@
                 <a:tab algn="l" pos="0"/>
               </a:tabLst>
             </a:pPr>
-            <a:fld id="{E2AB284A-5271-4EF4-B1B9-2550174FDC6F}" type="slidenum">
+            <a:fld id="{E301C199-FA6F-4360-9B0F-D6B1CFF74AF4}" type="slidenum">
               <a:rPr b="0" lang="en-US" sz="1200" spc="-1" strike="noStrike">
                 <a:solidFill>
                   <a:schemeClr val="dk1"/>
@@ -555,7 +555,7 @@
       </p:grpSpPr>
       <p:sp>
         <p:nvSpPr>
-          <p:cNvPr id="366" name="PlaceHolder 1"/>
+          <p:cNvPr id="373" name="PlaceHolder 1"/>
           <p:cNvSpPr>
             <a:spLocks noGrp="1"/>
           </p:cNvSpPr>
@@ -566,7 +566,7 @@
         <p:spPr>
           <a:xfrm>
             <a:off x="685800" y="1143000"/>
-            <a:ext cx="5477760" cy="3077640"/>
+            <a:ext cx="5477040" cy="3076920"/>
           </a:xfrm>
           <a:prstGeom prst="rect">
             <a:avLst/>
@@ -578,7 +578,7 @@
       </p:sp>
       <p:sp>
         <p:nvSpPr>
-          <p:cNvPr id="367" name="PlaceHolder 2"/>
+          <p:cNvPr id="374" name="PlaceHolder 2"/>
           <p:cNvSpPr>
             <a:spLocks noGrp="1"/>
           </p:cNvSpPr>
@@ -589,7 +589,7 @@
         <p:spPr>
           <a:xfrm>
             <a:off x="685800" y="4400640"/>
-            <a:ext cx="5477760" cy="3591720"/>
+            <a:ext cx="5477040" cy="3591000"/>
           </a:xfrm>
           <a:prstGeom prst="rect">
             <a:avLst/>
@@ -618,7 +618,7 @@
       </p:sp>
       <p:sp>
         <p:nvSpPr>
-          <p:cNvPr id="368" name="PlaceHolder 3"/>
+          <p:cNvPr id="375" name="PlaceHolder 3"/>
           <p:cNvSpPr>
             <a:spLocks noGrp="1"/>
           </p:cNvSpPr>
@@ -629,7 +629,7 @@
         <p:spPr>
           <a:xfrm>
             <a:off x="3884760" y="8685360"/>
-            <a:ext cx="2963160" cy="450000"/>
+            <a:ext cx="2962440" cy="449280"/>
           </a:xfrm>
           <a:prstGeom prst="rect">
             <a:avLst/>
@@ -671,7 +671,7 @@
                 <a:tab algn="l" pos="0"/>
               </a:tabLst>
             </a:pPr>
-            <a:fld id="{4E26DC15-619F-4BB3-91A9-542AEA944C7A}" type="slidenum">
+            <a:fld id="{27FB8F77-2785-466A-9E16-387A3AD9E635}" type="slidenum">
               <a:rPr b="0" lang="en-US" sz="1200" spc="-1" strike="noStrike">
                 <a:solidFill>
                   <a:schemeClr val="dk1"/>
@@ -714,7 +714,7 @@
       </p:grpSpPr>
       <p:sp>
         <p:nvSpPr>
-          <p:cNvPr id="369" name="PlaceHolder 1"/>
+          <p:cNvPr id="376" name="PlaceHolder 1"/>
           <p:cNvSpPr>
             <a:spLocks noGrp="1"/>
           </p:cNvSpPr>
@@ -725,7 +725,7 @@
         <p:spPr>
           <a:xfrm>
             <a:off x="685800" y="1143000"/>
-            <a:ext cx="5477760" cy="3077640"/>
+            <a:ext cx="5477040" cy="3076920"/>
           </a:xfrm>
           <a:prstGeom prst="rect">
             <a:avLst/>
@@ -737,7 +737,7 @@
       </p:sp>
       <p:sp>
         <p:nvSpPr>
-          <p:cNvPr id="370" name="PlaceHolder 2"/>
+          <p:cNvPr id="377" name="PlaceHolder 2"/>
           <p:cNvSpPr>
             <a:spLocks noGrp="1"/>
           </p:cNvSpPr>
@@ -748,7 +748,7 @@
         <p:spPr>
           <a:xfrm>
             <a:off x="685800" y="4400640"/>
-            <a:ext cx="5477760" cy="3591720"/>
+            <a:ext cx="5477040" cy="3591000"/>
           </a:xfrm>
           <a:prstGeom prst="rect">
             <a:avLst/>
@@ -777,7 +777,7 @@
       </p:sp>
       <p:sp>
         <p:nvSpPr>
-          <p:cNvPr id="371" name="PlaceHolder 3"/>
+          <p:cNvPr id="378" name="PlaceHolder 3"/>
           <p:cNvSpPr>
             <a:spLocks noGrp="1"/>
           </p:cNvSpPr>
@@ -788,7 +788,7 @@
         <p:spPr>
           <a:xfrm>
             <a:off x="3884760" y="8685360"/>
-            <a:ext cx="2963160" cy="450000"/>
+            <a:ext cx="2962440" cy="449280"/>
           </a:xfrm>
           <a:prstGeom prst="rect">
             <a:avLst/>
@@ -830,7 +830,7 @@
                 <a:tab algn="l" pos="0"/>
               </a:tabLst>
             </a:pPr>
-            <a:fld id="{40BCCCC9-5E6E-4060-8A74-40BF80ED7FC9}" type="slidenum">
+            <a:fld id="{F30E8691-D0DA-430B-8B53-34C0450F63C6}" type="slidenum">
               <a:rPr b="0" lang="en-US" sz="1200" spc="-1" strike="noStrike">
                 <a:solidFill>
                   <a:schemeClr val="dk1"/>
@@ -873,7 +873,7 @@
       </p:grpSpPr>
       <p:sp>
         <p:nvSpPr>
-          <p:cNvPr id="372" name="PlaceHolder 1"/>
+          <p:cNvPr id="379" name="PlaceHolder 1"/>
           <p:cNvSpPr>
             <a:spLocks noGrp="1"/>
           </p:cNvSpPr>
@@ -884,7 +884,7 @@
         <p:spPr>
           <a:xfrm>
             <a:off x="685800" y="1143000"/>
-            <a:ext cx="5477760" cy="3077640"/>
+            <a:ext cx="5477040" cy="3076920"/>
           </a:xfrm>
           <a:prstGeom prst="rect">
             <a:avLst/>
@@ -896,7 +896,7 @@
       </p:sp>
       <p:sp>
         <p:nvSpPr>
-          <p:cNvPr id="373" name="PlaceHolder 2"/>
+          <p:cNvPr id="380" name="PlaceHolder 2"/>
           <p:cNvSpPr>
             <a:spLocks noGrp="1"/>
           </p:cNvSpPr>
@@ -907,7 +907,7 @@
         <p:spPr>
           <a:xfrm>
             <a:off x="685800" y="4400640"/>
-            <a:ext cx="5477760" cy="3591720"/>
+            <a:ext cx="5477040" cy="3591000"/>
           </a:xfrm>
           <a:prstGeom prst="rect">
             <a:avLst/>
@@ -936,7 +936,7 @@
       </p:sp>
       <p:sp>
         <p:nvSpPr>
-          <p:cNvPr id="374" name="PlaceHolder 3"/>
+          <p:cNvPr id="381" name="PlaceHolder 3"/>
           <p:cNvSpPr>
             <a:spLocks noGrp="1"/>
           </p:cNvSpPr>
@@ -947,7 +947,7 @@
         <p:spPr>
           <a:xfrm>
             <a:off x="3884760" y="8685360"/>
-            <a:ext cx="2963160" cy="450000"/>
+            <a:ext cx="2962440" cy="449280"/>
           </a:xfrm>
           <a:prstGeom prst="rect">
             <a:avLst/>
@@ -989,7 +989,7 @@
                 <a:tab algn="l" pos="0"/>
               </a:tabLst>
             </a:pPr>
-            <a:fld id="{44D7259F-6ED4-4297-91AA-49759901043A}" type="slidenum">
+            <a:fld id="{4467FD2A-2E18-49E8-A577-DFA9F0875736}" type="slidenum">
               <a:rPr b="0" lang="en-US" sz="1200" spc="-1" strike="noStrike">
                 <a:solidFill>
                   <a:schemeClr val="dk1"/>
@@ -1233,7 +1233,7 @@
         <p:txBody>
           <a:bodyPr/>
           <a:p>
-            <a:fld id="{1BC4476F-6C42-4ED9-8522-BB0DBBB25E1E}" type="slidenum">
+            <a:fld id="{B3E8FFDD-231B-4A6E-89CA-531F52B1F3EC}" type="slidenum">
               <a:t>&lt;#&gt;</a:t>
             </a:fld>
           </a:p>
@@ -1442,7 +1442,7 @@
         <p:txBody>
           <a:bodyPr/>
           <a:p>
-            <a:fld id="{3A7202B3-C5FE-4F95-A8FF-F0FA34A6DB82}" type="slidenum">
+            <a:fld id="{7EBD316E-475D-4053-9B61-70B8261E7E9B}" type="slidenum">
               <a:t>&lt;#&gt;</a:t>
             </a:fld>
           </a:p>
@@ -1565,7 +1565,7 @@
         <p:txBody>
           <a:bodyPr/>
           <a:p>
-            <a:fld id="{FA7A3DCC-D6CD-40A7-9A4E-025B1E6F4331}" type="slidenum">
+            <a:fld id="{21F1AC4A-8F6A-4380-AEFF-B81B58589E2E}" type="slidenum">
               <a:t>&lt;#&gt;</a:t>
             </a:fld>
           </a:p>
@@ -1648,7 +1648,7 @@
         <p:txBody>
           <a:bodyPr/>
           <a:p>
-            <a:fld id="{2B8E7FBD-C70A-4E92-9464-C130EA48F933}" type="slidenum">
+            <a:fld id="{82D0C1F7-4208-4AE0-AFFF-77A3261DADC4}" type="slidenum">
               <a:t>&lt;#&gt;</a:t>
             </a:fld>
           </a:p>
@@ -1900,7 +1900,7 @@
         <p:txBody>
           <a:bodyPr/>
           <a:p>
-            <a:fld id="{C939B095-10F8-41AE-BE5C-27BCCF9C6901}" type="slidenum">
+            <a:fld id="{99132F7B-01C5-43B2-B820-BC51AFFDB119}" type="slidenum">
               <a:t>&lt;#&gt;</a:t>
             </a:fld>
           </a:p>
@@ -2152,7 +2152,7 @@
         <p:txBody>
           <a:bodyPr/>
           <a:p>
-            <a:fld id="{E9FC2CCD-87C9-462D-8A93-E26627EC6C43}" type="slidenum">
+            <a:fld id="{8683F332-CAE9-4D1C-B1EF-679983B0FE41}" type="slidenum">
               <a:t>&lt;#&gt;</a:t>
             </a:fld>
           </a:p>
@@ -2361,7 +2361,7 @@
         <p:txBody>
           <a:bodyPr/>
           <a:p>
-            <a:fld id="{EAD51C75-6F70-4E3E-A6EA-B65737DF3AFD}" type="slidenum">
+            <a:fld id="{B0D61EAE-87D7-42F5-9450-ED032142804F}" type="slidenum">
               <a:t>&lt;#&gt;</a:t>
             </a:fld>
           </a:p>
@@ -2656,7 +2656,7 @@
         <p:txBody>
           <a:bodyPr/>
           <a:p>
-            <a:fld id="{ED8059B1-9DD2-48C5-ABFB-0802A28C2095}" type="slidenum">
+            <a:fld id="{EB3FA5E5-BC41-4A0B-9009-C60C9AC6496A}" type="slidenum">
               <a:t>&lt;#&gt;</a:t>
             </a:fld>
           </a:p>
@@ -2739,7 +2739,7 @@
         <p:txBody>
           <a:bodyPr/>
           <a:p>
-            <a:fld id="{03393273-B200-4828-B51B-E1E4F351C0A3}" type="slidenum">
+            <a:fld id="{0D8378C4-C55F-49D2-8911-6E4890A1495D}" type="slidenum">
               <a:t>&lt;#&gt;</a:t>
             </a:fld>
           </a:p>
@@ -2822,7 +2822,7 @@
         <p:txBody>
           <a:bodyPr/>
           <a:p>
-            <a:fld id="{C46A126B-A6E5-471B-BF44-93AE8231553D}" type="slidenum">
+            <a:fld id="{CC2BF099-4BEE-46B5-8EC7-FC3F1915D826}" type="slidenum">
               <a:t>&lt;#&gt;</a:t>
             </a:fld>
           </a:p>
@@ -2988,7 +2988,7 @@
         <p:txBody>
           <a:bodyPr/>
           <a:p>
-            <a:fld id="{3A3CF038-5824-4AC7-82A4-CEE987CC573B}" type="slidenum">
+            <a:fld id="{99B91320-895E-4C15-BBB2-E2F30E807CCE}" type="slidenum">
               <a:t>&lt;#&gt;</a:t>
             </a:fld>
           </a:p>
@@ -3154,7 +3154,7 @@
         <p:txBody>
           <a:bodyPr/>
           <a:p>
-            <a:fld id="{53872CF4-2B93-47ED-B7E9-9D9C9CE1DAED}" type="slidenum">
+            <a:fld id="{326900FE-F18B-4F0D-BC0B-CCE954E45D80}" type="slidenum">
               <a:t>&lt;#&gt;</a:t>
             </a:fld>
           </a:p>
@@ -3219,9 +3219,9 @@
         <p:grpSpPr>
           <a:xfrm>
             <a:off x="6199200" y="6162840"/>
-            <a:ext cx="5984280" cy="686520"/>
+            <a:ext cx="5983560" cy="685800"/>
             <a:chOff x="6199200" y="6162840"/>
-            <a:chExt cx="5984280" cy="686520"/>
+            <a:chExt cx="5983560" cy="685800"/>
           </a:xfrm>
         </p:grpSpPr>
         <p:pic>
@@ -3237,7 +3237,7 @@
           <p:spPr>
             <a:xfrm>
               <a:off x="6199200" y="6162840"/>
-              <a:ext cx="4047840" cy="686520"/>
+              <a:ext cx="4047120" cy="685800"/>
             </a:xfrm>
             <a:prstGeom prst="rect">
               <a:avLst/>
@@ -3260,7 +3260,7 @@
           <p:spPr>
             <a:xfrm>
               <a:off x="10270080" y="6162840"/>
-              <a:ext cx="1913400" cy="603000"/>
+              <a:ext cx="1912680" cy="602280"/>
             </a:xfrm>
             <a:prstGeom prst="rect">
               <a:avLst/>
@@ -3309,7 +3309,25 @@
                 </a:solidFill>
                 <a:latin typeface="Arial"/>
               </a:rPr>
-              <a:t>Click to edit the title text format</a:t>
+              <a:t>Click to edit </a:t>
+            </a:r>
+            <a:r>
+              <a:rPr b="0" lang="en-US" sz="1800" spc="-1" strike="noStrike">
+                <a:solidFill>
+                  <a:srgbClr val="000000"/>
+                </a:solidFill>
+                <a:latin typeface="Arial"/>
+              </a:rPr>
+              <a:t>the title text </a:t>
+            </a:r>
+            <a:r>
+              <a:rPr b="0" lang="en-US" sz="1800" spc="-1" strike="noStrike">
+                <a:solidFill>
+                  <a:srgbClr val="000000"/>
+                </a:solidFill>
+                <a:latin typeface="Arial"/>
+              </a:rPr>
+              <a:t>format</a:t>
             </a:r>
             <a:endParaRPr b="0" lang="en-US" sz="1800" spc="-1" strike="noStrike">
               <a:solidFill>
@@ -4008,7 +4026,7 @@
         <p:spPr>
           <a:xfrm>
             <a:off x="4038480" y="6356520"/>
-            <a:ext cx="4106160" cy="356400"/>
+            <a:ext cx="4105440" cy="355680"/>
           </a:xfrm>
           <a:prstGeom prst="rect">
             <a:avLst/>
@@ -4080,7 +4098,7 @@
         <p:spPr>
           <a:xfrm>
             <a:off x="8610480" y="6356520"/>
-            <a:ext cx="2734560" cy="356400"/>
+            <a:ext cx="2733840" cy="355680"/>
           </a:xfrm>
           <a:prstGeom prst="rect">
             <a:avLst/>
@@ -4123,7 +4141,7 @@
                 <a:tab algn="l" pos="0"/>
               </a:tabLst>
             </a:pPr>
-            <a:fld id="{010E202D-3803-40AD-A91E-66C082B40E03}" type="slidenum">
+            <a:fld id="{EF7CE9E3-D7C9-4430-BCEE-F7B3A360FA23}" type="slidenum">
               <a:rPr b="0" lang="en-US" sz="1200" spc="-1" strike="noStrike">
                 <a:solidFill>
                   <a:schemeClr val="dk1">
@@ -4156,7 +4174,7 @@
         <p:spPr>
           <a:xfrm>
             <a:off x="838080" y="6356520"/>
-            <a:ext cx="2734560" cy="356400"/>
+            <a:ext cx="2733840" cy="355680"/>
           </a:xfrm>
           <a:prstGeom prst="rect">
             <a:avLst/>
@@ -4245,9 +4263,9 @@
         <p:grpSpPr>
           <a:xfrm>
             <a:off x="6199200" y="6162840"/>
-            <a:ext cx="5984280" cy="686520"/>
+            <a:ext cx="5983560" cy="685800"/>
             <a:chOff x="6199200" y="6162840"/>
-            <a:chExt cx="5984280" cy="686520"/>
+            <a:chExt cx="5983560" cy="685800"/>
           </a:xfrm>
         </p:grpSpPr>
         <p:pic>
@@ -4263,7 +4281,7 @@
           <p:spPr>
             <a:xfrm>
               <a:off x="6199200" y="6162840"/>
-              <a:ext cx="4047840" cy="686520"/>
+              <a:ext cx="4047120" cy="685800"/>
             </a:xfrm>
             <a:prstGeom prst="rect">
               <a:avLst/>
@@ -4286,7 +4304,7 @@
           <p:spPr>
             <a:xfrm>
               <a:off x="10270080" y="6162840"/>
-              <a:ext cx="1913400" cy="603000"/>
+              <a:ext cx="1912680" cy="602280"/>
             </a:xfrm>
             <a:prstGeom prst="rect">
               <a:avLst/>
@@ -4809,7 +4827,7 @@
         <p:spPr>
           <a:xfrm>
             <a:off x="4038480" y="6356520"/>
-            <a:ext cx="4106160" cy="356400"/>
+            <a:ext cx="4105440" cy="355680"/>
           </a:xfrm>
           <a:prstGeom prst="rect">
             <a:avLst/>
@@ -4881,7 +4899,7 @@
         <p:spPr>
           <a:xfrm>
             <a:off x="8610480" y="6356520"/>
-            <a:ext cx="2734560" cy="356400"/>
+            <a:ext cx="2733840" cy="355680"/>
           </a:xfrm>
           <a:prstGeom prst="rect">
             <a:avLst/>
@@ -4924,7 +4942,7 @@
                 <a:tab algn="l" pos="0"/>
               </a:tabLst>
             </a:pPr>
-            <a:fld id="{589B30A0-A859-4B77-8D8F-90B8C096DAE0}" type="slidenum">
+            <a:fld id="{94D78E71-1CFB-432D-80A3-CDB9BC749B4B}" type="slidenum">
               <a:rPr b="0" lang="en-US" sz="1200" spc="-1" strike="noStrike">
                 <a:solidFill>
                   <a:schemeClr val="dk1">
@@ -4957,7 +4975,7 @@
         <p:spPr>
           <a:xfrm>
             <a:off x="838080" y="6356520"/>
-            <a:ext cx="2734560" cy="356400"/>
+            <a:ext cx="2733840" cy="355680"/>
           </a:xfrm>
           <a:prstGeom prst="rect">
             <a:avLst/>
@@ -5046,9 +5064,9 @@
         <p:grpSpPr>
           <a:xfrm>
             <a:off x="6199200" y="6162840"/>
-            <a:ext cx="5984280" cy="686520"/>
+            <a:ext cx="5983560" cy="685800"/>
             <a:chOff x="6199200" y="6162840"/>
-            <a:chExt cx="5984280" cy="686520"/>
+            <a:chExt cx="5983560" cy="685800"/>
           </a:xfrm>
         </p:grpSpPr>
         <p:pic>
@@ -5064,7 +5082,7 @@
           <p:spPr>
             <a:xfrm>
               <a:off x="6199200" y="6162840"/>
-              <a:ext cx="4047840" cy="686520"/>
+              <a:ext cx="4047120" cy="685800"/>
             </a:xfrm>
             <a:prstGeom prst="rect">
               <a:avLst/>
@@ -5087,7 +5105,7 @@
           <p:spPr>
             <a:xfrm>
               <a:off x="10270080" y="6162840"/>
-              <a:ext cx="1913400" cy="603000"/>
+              <a:ext cx="1912680" cy="602280"/>
             </a:xfrm>
             <a:prstGeom prst="rect">
               <a:avLst/>
@@ -5160,7 +5178,7 @@
         <p:spPr>
           <a:xfrm>
             <a:off x="4038480" y="6356520"/>
-            <a:ext cx="4106160" cy="356400"/>
+            <a:ext cx="4105440" cy="355680"/>
           </a:xfrm>
           <a:prstGeom prst="rect">
             <a:avLst/>
@@ -5232,7 +5250,7 @@
         <p:spPr>
           <a:xfrm>
             <a:off x="8610480" y="6356520"/>
-            <a:ext cx="2734560" cy="356400"/>
+            <a:ext cx="2733840" cy="355680"/>
           </a:xfrm>
           <a:prstGeom prst="rect">
             <a:avLst/>
@@ -5275,7 +5293,7 @@
                 <a:tab algn="l" pos="0"/>
               </a:tabLst>
             </a:pPr>
-            <a:fld id="{4D0505AE-33FF-40C8-8B5B-701D64DBC5C8}" type="slidenum">
+            <a:fld id="{48DF9E17-C252-478A-9457-76A5F6DDA4E9}" type="slidenum">
               <a:rPr b="0" lang="en-US" sz="1200" spc="-1" strike="noStrike">
                 <a:solidFill>
                   <a:schemeClr val="dk1">
@@ -5308,7 +5326,7 @@
         <p:spPr>
           <a:xfrm>
             <a:off x="838080" y="6356520"/>
-            <a:ext cx="2734560" cy="356400"/>
+            <a:ext cx="2733840" cy="355680"/>
           </a:xfrm>
           <a:prstGeom prst="rect">
             <a:avLst/>
@@ -5397,9 +5415,9 @@
         <p:grpSpPr>
           <a:xfrm>
             <a:off x="6199200" y="6162840"/>
-            <a:ext cx="5984280" cy="686520"/>
+            <a:ext cx="5983560" cy="685800"/>
             <a:chOff x="6199200" y="6162840"/>
-            <a:chExt cx="5984280" cy="686520"/>
+            <a:chExt cx="5983560" cy="685800"/>
           </a:xfrm>
         </p:grpSpPr>
         <p:pic>
@@ -5415,7 +5433,7 @@
           <p:spPr>
             <a:xfrm>
               <a:off x="6199200" y="6162840"/>
-              <a:ext cx="4047840" cy="686520"/>
+              <a:ext cx="4047120" cy="685800"/>
             </a:xfrm>
             <a:prstGeom prst="rect">
               <a:avLst/>
@@ -5438,7 +5456,7 @@
           <p:spPr>
             <a:xfrm>
               <a:off x="10270080" y="6162840"/>
-              <a:ext cx="1913400" cy="603000"/>
+              <a:ext cx="1912680" cy="602280"/>
             </a:xfrm>
             <a:prstGeom prst="rect">
               <a:avLst/>
@@ -5462,7 +5480,7 @@
         <p:spPr>
           <a:xfrm>
             <a:off x="4038480" y="6356520"/>
-            <a:ext cx="4106160" cy="356400"/>
+            <a:ext cx="4105440" cy="355680"/>
           </a:xfrm>
           <a:prstGeom prst="rect">
             <a:avLst/>
@@ -5534,7 +5552,7 @@
         <p:spPr>
           <a:xfrm>
             <a:off x="8610480" y="6356520"/>
-            <a:ext cx="2734560" cy="356400"/>
+            <a:ext cx="2733840" cy="355680"/>
           </a:xfrm>
           <a:prstGeom prst="rect">
             <a:avLst/>
@@ -5577,7 +5595,7 @@
                 <a:tab algn="l" pos="0"/>
               </a:tabLst>
             </a:pPr>
-            <a:fld id="{9FB3144E-1098-4784-BD92-C57B939B6B9E}" type="slidenum">
+            <a:fld id="{5953867D-A2C8-4349-8DAC-A14AD673942C}" type="slidenum">
               <a:rPr b="0" lang="en-US" sz="1200" spc="-1" strike="noStrike">
                 <a:solidFill>
                   <a:schemeClr val="dk1">
@@ -5610,7 +5628,7 @@
         <p:spPr>
           <a:xfrm>
             <a:off x="838080" y="6356520"/>
-            <a:ext cx="2734560" cy="356400"/>
+            <a:ext cx="2733840" cy="355680"/>
           </a:xfrm>
           <a:prstGeom prst="rect">
             <a:avLst/>
@@ -5699,9 +5717,9 @@
         <p:grpSpPr>
           <a:xfrm>
             <a:off x="6199200" y="6162840"/>
-            <a:ext cx="5984280" cy="686520"/>
+            <a:ext cx="5983560" cy="685800"/>
             <a:chOff x="6199200" y="6162840"/>
-            <a:chExt cx="5984280" cy="686520"/>
+            <a:chExt cx="5983560" cy="685800"/>
           </a:xfrm>
         </p:grpSpPr>
         <p:pic>
@@ -5717,7 +5735,7 @@
           <p:spPr>
             <a:xfrm>
               <a:off x="6199200" y="6162840"/>
-              <a:ext cx="4047840" cy="686520"/>
+              <a:ext cx="4047120" cy="685800"/>
             </a:xfrm>
             <a:prstGeom prst="rect">
               <a:avLst/>
@@ -5740,7 +5758,7 @@
           <p:spPr>
             <a:xfrm>
               <a:off x="10270080" y="6162840"/>
-              <a:ext cx="1913400" cy="603000"/>
+              <a:ext cx="1912680" cy="602280"/>
             </a:xfrm>
             <a:prstGeom prst="rect">
               <a:avLst/>
@@ -5789,7 +5807,25 @@
                 </a:solidFill>
                 <a:latin typeface="Arial"/>
               </a:rPr>
-              <a:t>Click to edit the title text format</a:t>
+              <a:t>Click to edit </a:t>
+            </a:r>
+            <a:r>
+              <a:rPr b="0" lang="en-US" sz="1800" spc="-1" strike="noStrike">
+                <a:solidFill>
+                  <a:srgbClr val="000000"/>
+                </a:solidFill>
+                <a:latin typeface="Arial"/>
+              </a:rPr>
+              <a:t>the title text </a:t>
+            </a:r>
+            <a:r>
+              <a:rPr b="0" lang="en-US" sz="1800" spc="-1" strike="noStrike">
+                <a:solidFill>
+                  <a:srgbClr val="000000"/>
+                </a:solidFill>
+                <a:latin typeface="Arial"/>
+              </a:rPr>
+              <a:t>format</a:t>
             </a:r>
             <a:endParaRPr b="0" lang="en-US" sz="1800" spc="-1" strike="noStrike">
               <a:solidFill>
@@ -6488,7 +6524,7 @@
         <p:spPr>
           <a:xfrm>
             <a:off x="4038480" y="6356520"/>
-            <a:ext cx="4106160" cy="356400"/>
+            <a:ext cx="4105440" cy="355680"/>
           </a:xfrm>
           <a:prstGeom prst="rect">
             <a:avLst/>
@@ -6560,7 +6596,7 @@
         <p:spPr>
           <a:xfrm>
             <a:off x="8610480" y="6356520"/>
-            <a:ext cx="2734560" cy="356400"/>
+            <a:ext cx="2733840" cy="355680"/>
           </a:xfrm>
           <a:prstGeom prst="rect">
             <a:avLst/>
@@ -6603,7 +6639,7 @@
                 <a:tab algn="l" pos="0"/>
               </a:tabLst>
             </a:pPr>
-            <a:fld id="{654158D6-E7D9-4E9D-AAE0-F636167B1924}" type="slidenum">
+            <a:fld id="{547B0E2D-4069-4B63-8CC6-442416772129}" type="slidenum">
               <a:rPr b="0" lang="en-US" sz="1200" spc="-1" strike="noStrike">
                 <a:solidFill>
                   <a:schemeClr val="dk1">
@@ -6636,7 +6672,7 @@
         <p:spPr>
           <a:xfrm>
             <a:off x="838080" y="6356520"/>
-            <a:ext cx="2734560" cy="356400"/>
+            <a:ext cx="2733840" cy="355680"/>
           </a:xfrm>
           <a:prstGeom prst="rect">
             <a:avLst/>
@@ -6725,9 +6761,9 @@
         <p:grpSpPr>
           <a:xfrm>
             <a:off x="6199200" y="6162840"/>
-            <a:ext cx="5984280" cy="686520"/>
+            <a:ext cx="5983560" cy="685800"/>
             <a:chOff x="6199200" y="6162840"/>
-            <a:chExt cx="5984280" cy="686520"/>
+            <a:chExt cx="5983560" cy="685800"/>
           </a:xfrm>
         </p:grpSpPr>
         <p:pic>
@@ -6743,7 +6779,7 @@
           <p:spPr>
             <a:xfrm>
               <a:off x="6199200" y="6162840"/>
-              <a:ext cx="4047840" cy="686520"/>
+              <a:ext cx="4047120" cy="685800"/>
             </a:xfrm>
             <a:prstGeom prst="rect">
               <a:avLst/>
@@ -6766,7 +6802,7 @@
           <p:spPr>
             <a:xfrm>
               <a:off x="10270080" y="6162840"/>
-              <a:ext cx="1913400" cy="603000"/>
+              <a:ext cx="1912680" cy="602280"/>
             </a:xfrm>
             <a:prstGeom prst="rect">
               <a:avLst/>
@@ -6815,7 +6851,70 @@
                 </a:solidFill>
                 <a:latin typeface="Arial"/>
               </a:rPr>
-              <a:t>Click to edit the title text format</a:t>
+              <a:t>Click </a:t>
+            </a:r>
+            <a:r>
+              <a:rPr b="0" lang="en-US" sz="1800" spc="-1" strike="noStrike">
+                <a:solidFill>
+                  <a:srgbClr val="000000"/>
+                </a:solidFill>
+                <a:latin typeface="Arial"/>
+              </a:rPr>
+              <a:t>to </a:t>
+            </a:r>
+            <a:r>
+              <a:rPr b="0" lang="en-US" sz="1800" spc="-1" strike="noStrike">
+                <a:solidFill>
+                  <a:srgbClr val="000000"/>
+                </a:solidFill>
+                <a:latin typeface="Arial"/>
+              </a:rPr>
+              <a:t>edit </a:t>
+            </a:r>
+            <a:r>
+              <a:rPr b="0" lang="en-US" sz="1800" spc="-1" strike="noStrike">
+                <a:solidFill>
+                  <a:srgbClr val="000000"/>
+                </a:solidFill>
+                <a:latin typeface="Arial"/>
+              </a:rPr>
+              <a:t>the </a:t>
+            </a:r>
+            <a:r>
+              <a:rPr b="0" lang="en-US" sz="1800" spc="-1" strike="noStrike">
+                <a:solidFill>
+                  <a:srgbClr val="000000"/>
+                </a:solidFill>
+                <a:latin typeface="Arial"/>
+              </a:rPr>
+              <a:t>title </a:t>
+            </a:r>
+            <a:r>
+              <a:rPr b="0" lang="en-US" sz="1800" spc="-1" strike="noStrike">
+                <a:solidFill>
+                  <a:srgbClr val="000000"/>
+                </a:solidFill>
+                <a:latin typeface="Arial"/>
+              </a:rPr>
+              <a:t>text </a:t>
+            </a:r>
+            <a:r>
+              <a:rPr b="0" lang="en-US" sz="1800" spc="-1" strike="noStrike">
+                <a:solidFill>
+                  <a:srgbClr val="000000"/>
+                </a:solidFill>
+                <a:latin typeface="Arial"/>
+              </a:rPr>
+              <a:t>forma</a:t>
+            </a:r>
+            <a:r>
+              <a:rPr b="0" lang="en-US" sz="1800" spc="-1" strike="noStrike">
+                <a:solidFill>
+                  <a:srgbClr val="000000"/>
+                </a:solidFill>
+                <a:latin typeface="Arial"/>
+              </a:rPr>
+              <a:t>t</a:t>
             </a:r>
             <a:endParaRPr b="0" lang="en-US" sz="1800" spc="-1" strike="noStrike">
               <a:solidFill>
@@ -7514,7 +7613,7 @@
         <p:spPr>
           <a:xfrm>
             <a:off x="4038480" y="6356520"/>
-            <a:ext cx="4106160" cy="356400"/>
+            <a:ext cx="4105440" cy="355680"/>
           </a:xfrm>
           <a:prstGeom prst="rect">
             <a:avLst/>
@@ -7586,7 +7685,7 @@
         <p:spPr>
           <a:xfrm>
             <a:off x="8610480" y="6356520"/>
-            <a:ext cx="2734560" cy="356400"/>
+            <a:ext cx="2733840" cy="355680"/>
           </a:xfrm>
           <a:prstGeom prst="rect">
             <a:avLst/>
@@ -7629,7 +7728,7 @@
                 <a:tab algn="l" pos="0"/>
               </a:tabLst>
             </a:pPr>
-            <a:fld id="{87186CC9-9BD2-42C1-8958-A9139890FFD7}" type="slidenum">
+            <a:fld id="{BA041AD5-445A-4E7C-8F03-09F2375ED0D8}" type="slidenum">
               <a:rPr b="0" lang="en-US" sz="1200" spc="-1" strike="noStrike">
                 <a:solidFill>
                   <a:schemeClr val="dk1">
@@ -7662,7 +7761,7 @@
         <p:spPr>
           <a:xfrm>
             <a:off x="838080" y="6356520"/>
-            <a:ext cx="2734560" cy="356400"/>
+            <a:ext cx="2733840" cy="355680"/>
           </a:xfrm>
           <a:prstGeom prst="rect">
             <a:avLst/>
@@ -7751,9 +7850,9 @@
         <p:grpSpPr>
           <a:xfrm>
             <a:off x="6199200" y="6162840"/>
-            <a:ext cx="5984280" cy="686520"/>
+            <a:ext cx="5983560" cy="685800"/>
             <a:chOff x="6199200" y="6162840"/>
-            <a:chExt cx="5984280" cy="686520"/>
+            <a:chExt cx="5983560" cy="685800"/>
           </a:xfrm>
         </p:grpSpPr>
         <p:pic>
@@ -7769,7 +7868,7 @@
           <p:spPr>
             <a:xfrm>
               <a:off x="6199200" y="6162840"/>
-              <a:ext cx="4047840" cy="686520"/>
+              <a:ext cx="4047120" cy="685800"/>
             </a:xfrm>
             <a:prstGeom prst="rect">
               <a:avLst/>
@@ -7792,7 +7891,7 @@
           <p:spPr>
             <a:xfrm>
               <a:off x="10270080" y="6162840"/>
-              <a:ext cx="1913400" cy="603000"/>
+              <a:ext cx="1912680" cy="602280"/>
             </a:xfrm>
             <a:prstGeom prst="rect">
               <a:avLst/>
@@ -7841,7 +7940,25 @@
                 </a:solidFill>
                 <a:latin typeface="Arial"/>
               </a:rPr>
-              <a:t>Click to edit the title text format</a:t>
+              <a:t>Click to edit </a:t>
+            </a:r>
+            <a:r>
+              <a:rPr b="0" lang="en-US" sz="1800" spc="-1" strike="noStrike">
+                <a:solidFill>
+                  <a:srgbClr val="000000"/>
+                </a:solidFill>
+                <a:latin typeface="Arial"/>
+              </a:rPr>
+              <a:t>the title text </a:t>
+            </a:r>
+            <a:r>
+              <a:rPr b="0" lang="en-US" sz="1800" spc="-1" strike="noStrike">
+                <a:solidFill>
+                  <a:srgbClr val="000000"/>
+                </a:solidFill>
+                <a:latin typeface="Arial"/>
+              </a:rPr>
+              <a:t>format</a:t>
             </a:r>
             <a:endParaRPr b="0" lang="en-US" sz="1800" spc="-1" strike="noStrike">
               <a:solidFill>
@@ -8315,7 +8432,7 @@
         <p:spPr>
           <a:xfrm>
             <a:off x="4038480" y="6356520"/>
-            <a:ext cx="4106160" cy="356400"/>
+            <a:ext cx="4105440" cy="355680"/>
           </a:xfrm>
           <a:prstGeom prst="rect">
             <a:avLst/>
@@ -8387,7 +8504,7 @@
         <p:spPr>
           <a:xfrm>
             <a:off x="8610480" y="6356520"/>
-            <a:ext cx="2734560" cy="356400"/>
+            <a:ext cx="2733840" cy="355680"/>
           </a:xfrm>
           <a:prstGeom prst="rect">
             <a:avLst/>
@@ -8430,7 +8547,7 @@
                 <a:tab algn="l" pos="0"/>
               </a:tabLst>
             </a:pPr>
-            <a:fld id="{ED300FE1-812A-4DA3-B783-F0A249B4C753}" type="slidenum">
+            <a:fld id="{916D257C-6981-44A4-B744-F6B58165A0F3}" type="slidenum">
               <a:rPr b="0" lang="en-US" sz="1200" spc="-1" strike="noStrike">
                 <a:solidFill>
                   <a:schemeClr val="dk1">
@@ -8463,7 +8580,7 @@
         <p:spPr>
           <a:xfrm>
             <a:off x="838080" y="6356520"/>
-            <a:ext cx="2734560" cy="356400"/>
+            <a:ext cx="2733840" cy="355680"/>
           </a:xfrm>
           <a:prstGeom prst="rect">
             <a:avLst/>
@@ -8552,9 +8669,9 @@
         <p:grpSpPr>
           <a:xfrm>
             <a:off x="6199200" y="6162840"/>
-            <a:ext cx="5984280" cy="686520"/>
+            <a:ext cx="5983560" cy="685800"/>
             <a:chOff x="6199200" y="6162840"/>
-            <a:chExt cx="5984280" cy="686520"/>
+            <a:chExt cx="5983560" cy="685800"/>
           </a:xfrm>
         </p:grpSpPr>
         <p:pic>
@@ -8570,7 +8687,7 @@
           <p:spPr>
             <a:xfrm>
               <a:off x="6199200" y="6162840"/>
-              <a:ext cx="4047840" cy="686520"/>
+              <a:ext cx="4047120" cy="685800"/>
             </a:xfrm>
             <a:prstGeom prst="rect">
               <a:avLst/>
@@ -8593,7 +8710,7 @@
           <p:spPr>
             <a:xfrm>
               <a:off x="10270080" y="6162840"/>
-              <a:ext cx="1913400" cy="603000"/>
+              <a:ext cx="1912680" cy="602280"/>
             </a:xfrm>
             <a:prstGeom prst="rect">
               <a:avLst/>
@@ -8642,7 +8759,70 @@
                 </a:solidFill>
                 <a:latin typeface="Arial"/>
               </a:rPr>
-              <a:t>Click to edit the title text format</a:t>
+              <a:t>Click </a:t>
+            </a:r>
+            <a:r>
+              <a:rPr b="0" lang="en-US" sz="1800" spc="-1" strike="noStrike">
+                <a:solidFill>
+                  <a:srgbClr val="000000"/>
+                </a:solidFill>
+                <a:latin typeface="Arial"/>
+              </a:rPr>
+              <a:t>to </a:t>
+            </a:r>
+            <a:r>
+              <a:rPr b="0" lang="en-US" sz="1800" spc="-1" strike="noStrike">
+                <a:solidFill>
+                  <a:srgbClr val="000000"/>
+                </a:solidFill>
+                <a:latin typeface="Arial"/>
+              </a:rPr>
+              <a:t>edit </a:t>
+            </a:r>
+            <a:r>
+              <a:rPr b="0" lang="en-US" sz="1800" spc="-1" strike="noStrike">
+                <a:solidFill>
+                  <a:srgbClr val="000000"/>
+                </a:solidFill>
+                <a:latin typeface="Arial"/>
+              </a:rPr>
+              <a:t>the </a:t>
+            </a:r>
+            <a:r>
+              <a:rPr b="0" lang="en-US" sz="1800" spc="-1" strike="noStrike">
+                <a:solidFill>
+                  <a:srgbClr val="000000"/>
+                </a:solidFill>
+                <a:latin typeface="Arial"/>
+              </a:rPr>
+              <a:t>title </a:t>
+            </a:r>
+            <a:r>
+              <a:rPr b="0" lang="en-US" sz="1800" spc="-1" strike="noStrike">
+                <a:solidFill>
+                  <a:srgbClr val="000000"/>
+                </a:solidFill>
+                <a:latin typeface="Arial"/>
+              </a:rPr>
+              <a:t>text </a:t>
+            </a:r>
+            <a:r>
+              <a:rPr b="0" lang="en-US" sz="1800" spc="-1" strike="noStrike">
+                <a:solidFill>
+                  <a:srgbClr val="000000"/>
+                </a:solidFill>
+                <a:latin typeface="Arial"/>
+              </a:rPr>
+              <a:t>forma</a:t>
+            </a:r>
+            <a:r>
+              <a:rPr b="0" lang="en-US" sz="1800" spc="-1" strike="noStrike">
+                <a:solidFill>
+                  <a:srgbClr val="000000"/>
+                </a:solidFill>
+                <a:latin typeface="Arial"/>
+              </a:rPr>
+              <a:t>t</a:t>
             </a:r>
             <a:endParaRPr b="0" lang="en-US" sz="1800" spc="-1" strike="noStrike">
               <a:solidFill>
@@ -9566,7 +9746,7 @@
         <p:spPr>
           <a:xfrm>
             <a:off x="4038480" y="6356520"/>
-            <a:ext cx="4106160" cy="356400"/>
+            <a:ext cx="4105440" cy="355680"/>
           </a:xfrm>
           <a:prstGeom prst="rect">
             <a:avLst/>
@@ -9638,7 +9818,7 @@
         <p:spPr>
           <a:xfrm>
             <a:off x="8610480" y="6356520"/>
-            <a:ext cx="2734560" cy="356400"/>
+            <a:ext cx="2733840" cy="355680"/>
           </a:xfrm>
           <a:prstGeom prst="rect">
             <a:avLst/>
@@ -9681,7 +9861,7 @@
                 <a:tab algn="l" pos="0"/>
               </a:tabLst>
             </a:pPr>
-            <a:fld id="{A457CBB9-E8A8-4EBD-ABFA-D9F5BC715AA4}" type="slidenum">
+            <a:fld id="{3A43645C-2369-4B23-9DEF-63CFFCA182A5}" type="slidenum">
               <a:rPr b="0" lang="en-US" sz="1200" spc="-1" strike="noStrike">
                 <a:solidFill>
                   <a:schemeClr val="dk1">
@@ -9714,7 +9894,7 @@
         <p:spPr>
           <a:xfrm>
             <a:off x="838080" y="6356520"/>
-            <a:ext cx="2734560" cy="356400"/>
+            <a:ext cx="2733840" cy="355680"/>
           </a:xfrm>
           <a:prstGeom prst="rect">
             <a:avLst/>
@@ -9803,9 +9983,9 @@
         <p:grpSpPr>
           <a:xfrm>
             <a:off x="6199200" y="6162840"/>
-            <a:ext cx="5984280" cy="686520"/>
+            <a:ext cx="5983560" cy="685800"/>
             <a:chOff x="6199200" y="6162840"/>
-            <a:chExt cx="5984280" cy="686520"/>
+            <a:chExt cx="5983560" cy="685800"/>
           </a:xfrm>
         </p:grpSpPr>
         <p:pic>
@@ -9821,7 +10001,7 @@
           <p:spPr>
             <a:xfrm>
               <a:off x="6199200" y="6162840"/>
-              <a:ext cx="4047840" cy="686520"/>
+              <a:ext cx="4047120" cy="685800"/>
             </a:xfrm>
             <a:prstGeom prst="rect">
               <a:avLst/>
@@ -9844,7 +10024,7 @@
           <p:spPr>
             <a:xfrm>
               <a:off x="10270080" y="6162840"/>
-              <a:ext cx="1913400" cy="603000"/>
+              <a:ext cx="1912680" cy="602280"/>
             </a:xfrm>
             <a:prstGeom prst="rect">
               <a:avLst/>
@@ -9868,7 +10048,7 @@
         <p:spPr>
           <a:xfrm>
             <a:off x="4038480" y="6356520"/>
-            <a:ext cx="4106160" cy="356400"/>
+            <a:ext cx="4105440" cy="355680"/>
           </a:xfrm>
           <a:prstGeom prst="rect">
             <a:avLst/>
@@ -9940,7 +10120,7 @@
         <p:spPr>
           <a:xfrm>
             <a:off x="8610480" y="6356520"/>
-            <a:ext cx="2734560" cy="356400"/>
+            <a:ext cx="2733840" cy="355680"/>
           </a:xfrm>
           <a:prstGeom prst="rect">
             <a:avLst/>
@@ -9983,7 +10163,7 @@
                 <a:tab algn="l" pos="0"/>
               </a:tabLst>
             </a:pPr>
-            <a:fld id="{B16D9814-A32C-4D29-885A-73C56B62E222}" type="slidenum">
+            <a:fld id="{FE93C859-8FFC-4EEE-A157-2C16D6A0F25A}" type="slidenum">
               <a:rPr b="0" lang="en-US" sz="1200" spc="-1" strike="noStrike">
                 <a:solidFill>
                   <a:schemeClr val="dk1">
@@ -10016,7 +10196,7 @@
         <p:spPr>
           <a:xfrm>
             <a:off x="838080" y="6356520"/>
-            <a:ext cx="2734560" cy="356400"/>
+            <a:ext cx="2733840" cy="355680"/>
           </a:xfrm>
           <a:prstGeom prst="rect">
             <a:avLst/>
@@ -10105,9 +10285,9 @@
         <p:grpSpPr>
           <a:xfrm>
             <a:off x="6199200" y="6162840"/>
-            <a:ext cx="5984280" cy="686520"/>
+            <a:ext cx="5983560" cy="685800"/>
             <a:chOff x="6199200" y="6162840"/>
-            <a:chExt cx="5984280" cy="686520"/>
+            <a:chExt cx="5983560" cy="685800"/>
           </a:xfrm>
         </p:grpSpPr>
         <p:pic>
@@ -10123,7 +10303,7 @@
           <p:spPr>
             <a:xfrm>
               <a:off x="6199200" y="6162840"/>
-              <a:ext cx="4047840" cy="686520"/>
+              <a:ext cx="4047120" cy="685800"/>
             </a:xfrm>
             <a:prstGeom prst="rect">
               <a:avLst/>
@@ -10146,7 +10326,7 @@
           <p:spPr>
             <a:xfrm>
               <a:off x="10270080" y="6162840"/>
-              <a:ext cx="1913400" cy="603000"/>
+              <a:ext cx="1912680" cy="602280"/>
             </a:xfrm>
             <a:prstGeom prst="rect">
               <a:avLst/>
@@ -10170,7 +10350,7 @@
         <p:spPr>
           <a:xfrm>
             <a:off x="4038480" y="6356520"/>
-            <a:ext cx="4106160" cy="356400"/>
+            <a:ext cx="4105440" cy="355680"/>
           </a:xfrm>
           <a:prstGeom prst="rect">
             <a:avLst/>
@@ -10242,7 +10422,7 @@
         <p:spPr>
           <a:xfrm>
             <a:off x="8610480" y="6356520"/>
-            <a:ext cx="2734560" cy="356400"/>
+            <a:ext cx="2733840" cy="355680"/>
           </a:xfrm>
           <a:prstGeom prst="rect">
             <a:avLst/>
@@ -10285,7 +10465,7 @@
                 <a:tab algn="l" pos="0"/>
               </a:tabLst>
             </a:pPr>
-            <a:fld id="{1D8D38F8-6456-4C5B-8E0C-230141B7A2F1}" type="slidenum">
+            <a:fld id="{85BC06D0-ED03-4BD5-A7B9-808F8F353BAD}" type="slidenum">
               <a:rPr b="0" lang="en-US" sz="1200" spc="-1" strike="noStrike">
                 <a:solidFill>
                   <a:schemeClr val="dk1">
@@ -10318,7 +10498,7 @@
         <p:spPr>
           <a:xfrm>
             <a:off x="838080" y="6356520"/>
-            <a:ext cx="2734560" cy="356400"/>
+            <a:ext cx="2733840" cy="355680"/>
           </a:xfrm>
           <a:prstGeom prst="rect">
             <a:avLst/>
@@ -10681,9 +10861,9 @@
         <p:grpSpPr>
           <a:xfrm>
             <a:off x="6199200" y="6162840"/>
-            <a:ext cx="5984280" cy="686520"/>
+            <a:ext cx="5983560" cy="685800"/>
             <a:chOff x="6199200" y="6162840"/>
-            <a:chExt cx="5984280" cy="686520"/>
+            <a:chExt cx="5983560" cy="685800"/>
           </a:xfrm>
         </p:grpSpPr>
         <p:pic>
@@ -10699,7 +10879,7 @@
           <p:spPr>
             <a:xfrm>
               <a:off x="6199200" y="6162840"/>
-              <a:ext cx="4047840" cy="686520"/>
+              <a:ext cx="4047120" cy="685800"/>
             </a:xfrm>
             <a:prstGeom prst="rect">
               <a:avLst/>
@@ -10722,7 +10902,7 @@
           <p:spPr>
             <a:xfrm>
               <a:off x="10270080" y="6162840"/>
-              <a:ext cx="1913400" cy="603000"/>
+              <a:ext cx="1912680" cy="602280"/>
             </a:xfrm>
             <a:prstGeom prst="rect">
               <a:avLst/>
@@ -11020,7 +11200,7 @@
         <p:spPr>
           <a:xfrm>
             <a:off x="4038480" y="6356520"/>
-            <a:ext cx="4106160" cy="356400"/>
+            <a:ext cx="4105440" cy="355680"/>
           </a:xfrm>
           <a:prstGeom prst="rect">
             <a:avLst/>
@@ -11092,7 +11272,7 @@
         <p:spPr>
           <a:xfrm>
             <a:off x="8610480" y="6356520"/>
-            <a:ext cx="2734560" cy="356400"/>
+            <a:ext cx="2733840" cy="355680"/>
           </a:xfrm>
           <a:prstGeom prst="rect">
             <a:avLst/>
@@ -11135,7 +11315,7 @@
                 <a:tab algn="l" pos="0"/>
               </a:tabLst>
             </a:pPr>
-            <a:fld id="{9C803785-6CD3-4AC6-871B-0FCCA9054646}" type="slidenum">
+            <a:fld id="{A49EAFC4-5B0E-45F3-8ABB-B3D2783EF7AA}" type="slidenum">
               <a:rPr b="0" lang="en-US" sz="1200" spc="-1" strike="noStrike">
                 <a:solidFill>
                   <a:schemeClr val="dk1">
@@ -11168,7 +11348,7 @@
         <p:spPr>
           <a:xfrm>
             <a:off x="838080" y="6356520"/>
-            <a:ext cx="2734560" cy="356400"/>
+            <a:ext cx="2733840" cy="355680"/>
           </a:xfrm>
           <a:prstGeom prst="rect">
             <a:avLst/>
@@ -11257,9 +11437,9 @@
         <p:grpSpPr>
           <a:xfrm>
             <a:off x="6199200" y="6162840"/>
-            <a:ext cx="5984280" cy="686520"/>
+            <a:ext cx="5983560" cy="685800"/>
             <a:chOff x="6199200" y="6162840"/>
-            <a:chExt cx="5984280" cy="686520"/>
+            <a:chExt cx="5983560" cy="685800"/>
           </a:xfrm>
         </p:grpSpPr>
         <p:pic>
@@ -11275,7 +11455,7 @@
           <p:spPr>
             <a:xfrm>
               <a:off x="6199200" y="6162840"/>
-              <a:ext cx="4047840" cy="686520"/>
+              <a:ext cx="4047120" cy="685800"/>
             </a:xfrm>
             <a:prstGeom prst="rect">
               <a:avLst/>
@@ -11298,7 +11478,7 @@
           <p:spPr>
             <a:xfrm>
               <a:off x="10270080" y="6162840"/>
-              <a:ext cx="1913400" cy="603000"/>
+              <a:ext cx="1912680" cy="602280"/>
             </a:xfrm>
             <a:prstGeom prst="rect">
               <a:avLst/>
@@ -11596,7 +11776,7 @@
         <p:spPr>
           <a:xfrm>
             <a:off x="4038480" y="6356520"/>
-            <a:ext cx="4106160" cy="356400"/>
+            <a:ext cx="4105440" cy="355680"/>
           </a:xfrm>
           <a:prstGeom prst="rect">
             <a:avLst/>
@@ -11668,7 +11848,7 @@
         <p:spPr>
           <a:xfrm>
             <a:off x="8610480" y="6356520"/>
-            <a:ext cx="2734560" cy="356400"/>
+            <a:ext cx="2733840" cy="355680"/>
           </a:xfrm>
           <a:prstGeom prst="rect">
             <a:avLst/>
@@ -11711,7 +11891,7 @@
                 <a:tab algn="l" pos="0"/>
               </a:tabLst>
             </a:pPr>
-            <a:fld id="{F8C78A24-CD90-4C3C-8A09-6E2966C31737}" type="slidenum">
+            <a:fld id="{0E052741-4C85-40A0-9662-B8D590E2D82A}" type="slidenum">
               <a:rPr b="0" lang="en-US" sz="1200" spc="-1" strike="noStrike">
                 <a:solidFill>
                   <a:schemeClr val="dk1">
@@ -11744,7 +11924,7 @@
         <p:spPr>
           <a:xfrm>
             <a:off x="838080" y="6356520"/>
-            <a:ext cx="2734560" cy="356400"/>
+            <a:ext cx="2733840" cy="355680"/>
           </a:xfrm>
           <a:prstGeom prst="rect">
             <a:avLst/>
@@ -11826,7 +12006,7 @@
         <p:spPr>
           <a:xfrm flipH="1">
             <a:off x="0" y="3073320"/>
-            <a:ext cx="1837440" cy="8640"/>
+            <a:ext cx="1838160" cy="9360"/>
           </a:xfrm>
           <a:prstGeom prst="straightConnector1">
             <a:avLst/>
@@ -11849,7 +12029,7 @@
         <p:spPr>
           <a:xfrm>
             <a:off x="0" y="2489400"/>
-            <a:ext cx="1837440" cy="8640"/>
+            <a:ext cx="1838160" cy="9360"/>
           </a:xfrm>
           <a:prstGeom prst="straightConnector1">
             <a:avLst/>
@@ -11872,7 +12052,7 @@
         <p:spPr>
           <a:xfrm>
             <a:off x="0" y="2781360"/>
-            <a:ext cx="1837440" cy="8640"/>
+            <a:ext cx="1838160" cy="9360"/>
           </a:xfrm>
           <a:prstGeom prst="straightConnector1">
             <a:avLst/>
@@ -11895,7 +12075,7 @@
         <p:spPr>
           <a:xfrm flipH="1">
             <a:off x="0" y="3657600"/>
-            <a:ext cx="1837440" cy="8640"/>
+            <a:ext cx="1838160" cy="9360"/>
           </a:xfrm>
           <a:prstGeom prst="straightConnector1">
             <a:avLst/>
@@ -11917,7 +12097,7 @@
         <p:spPr>
           <a:xfrm>
             <a:off x="128520" y="6134040"/>
-            <a:ext cx="1563120" cy="379080"/>
+            <a:ext cx="1562400" cy="378360"/>
           </a:xfrm>
           <a:prstGeom prst="diamond">
             <a:avLst/>
@@ -11982,7 +12162,7 @@
         <p:spPr>
           <a:xfrm>
             <a:off x="302760" y="5454000"/>
-            <a:ext cx="1214640" cy="379080"/>
+            <a:ext cx="1213920" cy="378360"/>
           </a:xfrm>
           <a:prstGeom prst="ellipse">
             <a:avLst/>
@@ -12045,7 +12225,7 @@
         <p:spPr>
           <a:xfrm>
             <a:off x="101160" y="336240"/>
-            <a:ext cx="1617840" cy="303120"/>
+            <a:ext cx="1617120" cy="303120"/>
           </a:xfrm>
           <a:prstGeom prst="rect">
             <a:avLst/>
@@ -12102,7 +12282,7 @@
         <p:spPr>
           <a:xfrm>
             <a:off x="101160" y="597600"/>
-            <a:ext cx="1617840" cy="516600"/>
+            <a:ext cx="1617120" cy="516600"/>
           </a:xfrm>
           <a:prstGeom prst="rect">
             <a:avLst/>
@@ -12192,7 +12372,7 @@
         <p:spPr>
           <a:xfrm>
             <a:off x="101160" y="336240"/>
-            <a:ext cx="1617840" cy="303120"/>
+            <a:ext cx="1617120" cy="303120"/>
           </a:xfrm>
           <a:prstGeom prst="rect">
             <a:avLst/>
@@ -12249,7 +12429,7 @@
         <p:spPr>
           <a:xfrm>
             <a:off x="101160" y="597600"/>
-            <a:ext cx="1617840" cy="516600"/>
+            <a:ext cx="1617120" cy="516600"/>
           </a:xfrm>
           <a:prstGeom prst="rect">
             <a:avLst/>
@@ -12339,7 +12519,7 @@
         <p:spPr>
           <a:xfrm>
             <a:off x="2541600" y="228600"/>
-            <a:ext cx="1617840" cy="303120"/>
+            <a:ext cx="1617120" cy="303120"/>
           </a:xfrm>
           <a:prstGeom prst="rect">
             <a:avLst/>
@@ -12396,7 +12576,7 @@
         <p:spPr>
           <a:xfrm>
             <a:off x="2541600" y="489960"/>
-            <a:ext cx="1617840" cy="1584000"/>
+            <a:ext cx="1617120" cy="1584000"/>
           </a:xfrm>
           <a:prstGeom prst="rect">
             <a:avLst/>
@@ -12621,7 +12801,7 @@
         <p:spPr>
           <a:xfrm>
             <a:off x="6656400" y="228600"/>
-            <a:ext cx="1617840" cy="303120"/>
+            <a:ext cx="1617120" cy="303120"/>
           </a:xfrm>
           <a:prstGeom prst="rect">
             <a:avLst/>
@@ -12678,7 +12858,7 @@
         <p:spPr>
           <a:xfrm>
             <a:off x="6656400" y="489960"/>
-            <a:ext cx="1617840" cy="516600"/>
+            <a:ext cx="1617120" cy="516600"/>
           </a:xfrm>
           <a:prstGeom prst="rect">
             <a:avLst/>
@@ -12768,7 +12948,7 @@
         <p:spPr>
           <a:xfrm>
             <a:off x="6656400" y="228600"/>
-            <a:ext cx="1617840" cy="303120"/>
+            <a:ext cx="1617120" cy="303120"/>
           </a:xfrm>
           <a:prstGeom prst="rect">
             <a:avLst/>
@@ -12825,7 +13005,7 @@
         <p:spPr>
           <a:xfrm>
             <a:off x="6656400" y="489960"/>
-            <a:ext cx="1617840" cy="730080"/>
+            <a:ext cx="1617120" cy="730080"/>
           </a:xfrm>
           <a:prstGeom prst="rect">
             <a:avLst/>
@@ -12942,7 +13122,7 @@
         <p:spPr>
           <a:xfrm>
             <a:off x="128520" y="4629600"/>
-            <a:ext cx="1563120" cy="523800"/>
+            <a:ext cx="1562400" cy="523080"/>
           </a:xfrm>
           <a:prstGeom prst="diamond">
             <a:avLst/>
@@ -13030,7 +13210,7 @@
         <p:spPr>
           <a:xfrm>
             <a:off x="0" y="3365640"/>
-            <a:ext cx="1837440" cy="8640"/>
+            <a:ext cx="1838160" cy="9360"/>
           </a:xfrm>
           <a:prstGeom prst="straightConnector1">
             <a:avLst/>
@@ -13052,7 +13232,7 @@
         <p:spPr>
           <a:xfrm>
             <a:off x="673200" y="3949920"/>
-            <a:ext cx="474120" cy="379080"/>
+            <a:ext cx="473400" cy="378360"/>
           </a:xfrm>
           <a:prstGeom prst="triangle">
             <a:avLst>
@@ -13119,9 +13299,9 @@
         <p:grpSpPr>
           <a:xfrm>
             <a:off x="101160" y="1413000"/>
-            <a:ext cx="1617840" cy="777960"/>
+            <a:ext cx="1617120" cy="777960"/>
             <a:chOff x="101160" y="1413000"/>
-            <a:chExt cx="1617840" cy="777960"/>
+            <a:chExt cx="1617120" cy="777960"/>
           </a:xfrm>
         </p:grpSpPr>
         <p:sp>
@@ -13133,7 +13313,7 @@
           <p:spPr>
             <a:xfrm>
               <a:off x="101160" y="1413000"/>
-              <a:ext cx="1617840" cy="303120"/>
+              <a:ext cx="1617120" cy="303120"/>
             </a:xfrm>
             <a:prstGeom prst="rect">
               <a:avLst/>
@@ -13191,7 +13371,7 @@
           <p:spPr>
             <a:xfrm>
               <a:off x="101160" y="1674360"/>
-              <a:ext cx="1617840" cy="516600"/>
+              <a:ext cx="1617120" cy="516600"/>
             </a:xfrm>
             <a:prstGeom prst="rect">
               <a:avLst/>
@@ -13283,7 +13463,7 @@
         <p:spPr>
           <a:xfrm>
             <a:off x="4426920" y="914400"/>
-            <a:ext cx="1563120" cy="379080"/>
+            <a:ext cx="1562400" cy="378360"/>
           </a:xfrm>
           <a:prstGeom prst="diamond">
             <a:avLst/>
@@ -13350,8 +13530,8 @@
         </p:nvCxnSpPr>
         <p:spPr>
           <a:xfrm flipH="1">
-            <a:off x="5990040" y="855000"/>
-            <a:ext cx="666720" cy="249480"/>
+            <a:off x="5989320" y="855000"/>
+            <a:ext cx="667440" cy="249120"/>
           </a:xfrm>
           <a:prstGeom prst="straightConnector1">
             <a:avLst/>
@@ -13374,7 +13554,7 @@
         <p:spPr>
           <a:xfrm>
             <a:off x="6255720" y="1828800"/>
-            <a:ext cx="1791720" cy="379080"/>
+            <a:ext cx="1791000" cy="378360"/>
           </a:xfrm>
           <a:prstGeom prst="diamond">
             <a:avLst/>
@@ -13441,7 +13621,7 @@
         </p:nvCxnSpPr>
         <p:spPr>
           <a:xfrm flipV="1">
-            <a:off x="7151760" y="1220040"/>
+            <a:off x="7151400" y="1220040"/>
             <a:ext cx="313920" cy="609120"/>
           </a:xfrm>
           <a:prstGeom prst="straightConnector1">
@@ -13465,8 +13645,8 @@
         </p:nvCxnSpPr>
         <p:spPr>
           <a:xfrm flipH="1" flipV="1">
-            <a:off x="7151760" y="2207880"/>
-            <a:ext cx="462960" cy="541800"/>
+            <a:off x="7151400" y="2207160"/>
+            <a:ext cx="464040" cy="543240"/>
           </a:xfrm>
           <a:prstGeom prst="straightConnector1">
             <a:avLst/>
@@ -13489,7 +13669,7 @@
         <p:spPr>
           <a:xfrm>
             <a:off x="128520" y="6134400"/>
-            <a:ext cx="1563120" cy="379080"/>
+            <a:ext cx="1562400" cy="378360"/>
           </a:xfrm>
           <a:prstGeom prst="diamond">
             <a:avLst/>
@@ -13554,9 +13734,9 @@
         <p:grpSpPr>
           <a:xfrm>
             <a:off x="6681960" y="2743200"/>
-            <a:ext cx="1846440" cy="1216440"/>
+            <a:ext cx="1845720" cy="1216440"/>
             <a:chOff x="6681960" y="2743200"/>
-            <a:chExt cx="1846440" cy="1216440"/>
+            <a:chExt cx="1845720" cy="1216440"/>
           </a:xfrm>
         </p:grpSpPr>
         <p:sp>
@@ -13568,7 +13748,7 @@
           <p:spPr>
             <a:xfrm>
               <a:off x="6681960" y="2743200"/>
-              <a:ext cx="1846440" cy="303120"/>
+              <a:ext cx="1845720" cy="303120"/>
             </a:xfrm>
             <a:prstGeom prst="rect">
               <a:avLst/>
@@ -13625,7 +13805,7 @@
           <p:spPr>
             <a:xfrm>
               <a:off x="6681960" y="3016080"/>
-              <a:ext cx="1846440" cy="943560"/>
+              <a:ext cx="1845720" cy="943560"/>
             </a:xfrm>
             <a:prstGeom prst="rect">
               <a:avLst/>
@@ -13772,7 +13952,7 @@
         <p:spPr>
           <a:xfrm>
             <a:off x="9173520" y="3501000"/>
-            <a:ext cx="474120" cy="379080"/>
+            <a:ext cx="473400" cy="378360"/>
           </a:xfrm>
           <a:prstGeom prst="triangle">
             <a:avLst>
@@ -13839,7 +14019,7 @@
         <p:spPr>
           <a:xfrm>
             <a:off x="10287000" y="3126240"/>
-            <a:ext cx="1900440" cy="303120"/>
+            <a:ext cx="1899720" cy="303120"/>
           </a:xfrm>
           <a:prstGeom prst="rect">
             <a:avLst/>
@@ -13896,7 +14076,7 @@
         <p:spPr>
           <a:xfrm>
             <a:off x="10287000" y="3429360"/>
-            <a:ext cx="1900440" cy="1584000"/>
+            <a:ext cx="1899720" cy="1584000"/>
           </a:xfrm>
           <a:prstGeom prst="rect">
             <a:avLst/>
@@ -14104,8 +14284,8 @@
         </p:nvCxnSpPr>
         <p:spPr>
           <a:xfrm>
-            <a:off x="9529200" y="3690720"/>
-            <a:ext cx="758160" cy="531000"/>
+            <a:off x="9528840" y="3690360"/>
+            <a:ext cx="758520" cy="531360"/>
           </a:xfrm>
           <a:prstGeom prst="straightConnector1">
             <a:avLst/>
@@ -14129,8 +14309,8 @@
         </p:nvCxnSpPr>
         <p:spPr>
           <a:xfrm flipH="1" flipV="1">
-            <a:off x="8528400" y="3351240"/>
-            <a:ext cx="763920" cy="339840"/>
+            <a:off x="8527680" y="3351240"/>
+            <a:ext cx="764640" cy="339480"/>
           </a:xfrm>
           <a:prstGeom prst="straightConnector1">
             <a:avLst/>
@@ -14152,7 +14332,7 @@
         <p:spPr>
           <a:xfrm>
             <a:off x="2086200" y="3336840"/>
-            <a:ext cx="1617840" cy="303120"/>
+            <a:ext cx="1617120" cy="303120"/>
           </a:xfrm>
           <a:prstGeom prst="rect">
             <a:avLst/>
@@ -14209,7 +14389,7 @@
         <p:spPr>
           <a:xfrm>
             <a:off x="2086200" y="3598200"/>
-            <a:ext cx="1617840" cy="516600"/>
+            <a:ext cx="1617120" cy="516600"/>
           </a:xfrm>
           <a:prstGeom prst="rect">
             <a:avLst/>
@@ -14299,7 +14479,7 @@
         <p:spPr>
           <a:xfrm>
             <a:off x="2086200" y="3336840"/>
-            <a:ext cx="1617840" cy="303120"/>
+            <a:ext cx="1617120" cy="303120"/>
           </a:xfrm>
           <a:prstGeom prst="rect">
             <a:avLst/>
@@ -14356,7 +14536,7 @@
         <p:spPr>
           <a:xfrm>
             <a:off x="2086200" y="3598200"/>
-            <a:ext cx="1617840" cy="516600"/>
+            <a:ext cx="1617120" cy="516600"/>
           </a:xfrm>
           <a:prstGeom prst="rect">
             <a:avLst/>
@@ -14446,7 +14626,7 @@
         <p:spPr>
           <a:xfrm>
             <a:off x="1883160" y="2514600"/>
-            <a:ext cx="1820880" cy="379080"/>
+            <a:ext cx="1820160" cy="378360"/>
           </a:xfrm>
           <a:prstGeom prst="diamond">
             <a:avLst/>
@@ -14511,7 +14691,7 @@
         <p:spPr>
           <a:xfrm>
             <a:off x="3481560" y="2899800"/>
-            <a:ext cx="1592280" cy="379080"/>
+            <a:ext cx="1591560" cy="378360"/>
           </a:xfrm>
           <a:prstGeom prst="ellipse">
             <a:avLst/>
@@ -14576,8 +14756,8 @@
         </p:nvCxnSpPr>
         <p:spPr>
           <a:xfrm>
-            <a:off x="3704040" y="2704320"/>
-            <a:ext cx="574200" cy="195840"/>
+            <a:off x="3703320" y="2703960"/>
+            <a:ext cx="574560" cy="196200"/>
           </a:xfrm>
           <a:prstGeom prst="straightConnector1">
             <a:avLst/>
@@ -14601,8 +14781,8 @@
         </p:nvCxnSpPr>
         <p:spPr>
           <a:xfrm flipH="1" flipV="1">
-            <a:off x="2793600" y="2893680"/>
-            <a:ext cx="101880" cy="443520"/>
+            <a:off x="2793240" y="2892960"/>
+            <a:ext cx="101880" cy="444240"/>
           </a:xfrm>
           <a:prstGeom prst="straightConnector1">
             <a:avLst/>
@@ -14626,7 +14806,7 @@
         </p:nvCxnSpPr>
         <p:spPr>
           <a:xfrm flipV="1">
-            <a:off x="2793600" y="2073960"/>
+            <a:off x="2793240" y="2073960"/>
             <a:ext cx="557280" cy="441000"/>
           </a:xfrm>
           <a:prstGeom prst="straightConnector1">
@@ -14649,7 +14829,7 @@
         <p:spPr>
           <a:xfrm>
             <a:off x="10543680" y="457200"/>
-            <a:ext cx="1617840" cy="303120"/>
+            <a:ext cx="1617120" cy="303120"/>
           </a:xfrm>
           <a:prstGeom prst="rect">
             <a:avLst/>
@@ -14706,7 +14886,7 @@
         <p:spPr>
           <a:xfrm>
             <a:off x="10543680" y="718560"/>
-            <a:ext cx="1617840" cy="516600"/>
+            <a:ext cx="1617120" cy="516600"/>
           </a:xfrm>
           <a:prstGeom prst="rect">
             <a:avLst/>
@@ -14796,7 +14976,7 @@
         <p:spPr>
           <a:xfrm>
             <a:off x="10287000" y="457200"/>
-            <a:ext cx="1617840" cy="303120"/>
+            <a:ext cx="1617120" cy="303120"/>
           </a:xfrm>
           <a:prstGeom prst="rect">
             <a:avLst/>
@@ -14853,7 +15033,7 @@
         <p:spPr>
           <a:xfrm>
             <a:off x="10287000" y="718560"/>
-            <a:ext cx="1874520" cy="2651400"/>
+            <a:ext cx="1873800" cy="2651400"/>
           </a:xfrm>
           <a:prstGeom prst="rect">
             <a:avLst/>
@@ -15187,7 +15367,7 @@
         <p:spPr>
           <a:xfrm>
             <a:off x="8007120" y="1448280"/>
-            <a:ext cx="2049840" cy="379080"/>
+            <a:ext cx="2049120" cy="378360"/>
           </a:xfrm>
           <a:prstGeom prst="diamond">
             <a:avLst/>
@@ -15254,8 +15434,8 @@
         </p:nvCxnSpPr>
         <p:spPr>
           <a:xfrm>
-            <a:off x="9032040" y="1827360"/>
-            <a:ext cx="1255320" cy="2394360"/>
+            <a:off x="9031680" y="1826640"/>
+            <a:ext cx="1255680" cy="2395080"/>
           </a:xfrm>
           <a:prstGeom prst="straightConnector1">
             <a:avLst/>
@@ -15279,8 +15459,8 @@
         </p:nvCxnSpPr>
         <p:spPr>
           <a:xfrm flipH="1" flipV="1">
-            <a:off x="10056960" y="1638000"/>
-            <a:ext cx="230400" cy="406440"/>
+            <a:off x="10056240" y="1637640"/>
+            <a:ext cx="231120" cy="406800"/>
           </a:xfrm>
           <a:prstGeom prst="straightConnector1">
             <a:avLst/>
@@ -15304,7 +15484,7 @@
         </p:nvCxnSpPr>
         <p:spPr>
           <a:xfrm flipH="1" flipV="1">
-            <a:off x="7465320" y="1220040"/>
+            <a:off x="7464960" y="1220040"/>
             <a:ext cx="1567080" cy="228600"/>
           </a:xfrm>
           <a:prstGeom prst="straightConnector1">
@@ -15327,7 +15507,7 @@
         <p:spPr>
           <a:xfrm>
             <a:off x="5412240" y="5029200"/>
-            <a:ext cx="1617840" cy="303120"/>
+            <a:ext cx="1617120" cy="303120"/>
           </a:xfrm>
           <a:prstGeom prst="rect">
             <a:avLst/>
@@ -15384,7 +15564,7 @@
         <p:spPr>
           <a:xfrm>
             <a:off x="3710160" y="4343400"/>
-            <a:ext cx="1821240" cy="379080"/>
+            <a:ext cx="1820520" cy="378360"/>
           </a:xfrm>
           <a:prstGeom prst="diamond">
             <a:avLst/>
@@ -15451,8 +15631,8 @@
         </p:nvCxnSpPr>
         <p:spPr>
           <a:xfrm>
-            <a:off x="2895120" y="4114800"/>
-            <a:ext cx="815400" cy="418680"/>
+            <a:off x="2894760" y="4114800"/>
+            <a:ext cx="815760" cy="418320"/>
           </a:xfrm>
           <a:prstGeom prst="straightConnector1">
             <a:avLst/>
@@ -15477,8 +15657,8 @@
         </p:nvCxnSpPr>
         <p:spPr>
           <a:xfrm>
-            <a:off x="4620960" y="4722480"/>
-            <a:ext cx="791640" cy="458640"/>
+            <a:off x="4620600" y="4721760"/>
+            <a:ext cx="792000" cy="459360"/>
           </a:xfrm>
           <a:prstGeom prst="straightConnector1">
             <a:avLst/>
@@ -15502,7 +15682,7 @@
         </p:nvCxnSpPr>
         <p:spPr>
           <a:xfrm flipH="1" flipV="1">
-            <a:off x="3350520" y="2073960"/>
+            <a:off x="3350160" y="2073960"/>
             <a:ext cx="2187000" cy="1126800"/>
           </a:xfrm>
           <a:prstGeom prst="straightConnector1">
@@ -15525,7 +15705,7 @@
         <p:spPr>
           <a:xfrm>
             <a:off x="4626720" y="3200400"/>
-            <a:ext cx="1820520" cy="678240"/>
+            <a:ext cx="1819800" cy="677520"/>
           </a:xfrm>
           <a:prstGeom prst="diamond">
             <a:avLst/>
@@ -15592,8 +15772,8 @@
         </p:nvCxnSpPr>
         <p:spPr>
           <a:xfrm flipH="1" flipV="1">
-            <a:off x="5537160" y="3878640"/>
-            <a:ext cx="684360" cy="1150920"/>
+            <a:off x="5536800" y="3877920"/>
+            <a:ext cx="684360" cy="1151640"/>
           </a:xfrm>
           <a:prstGeom prst="straightConnector1">
             <a:avLst/>
@@ -15615,7 +15795,7 @@
         <p:spPr>
           <a:xfrm>
             <a:off x="2693880" y="4415400"/>
-            <a:ext cx="474120" cy="379080"/>
+            <a:ext cx="473400" cy="378360"/>
           </a:xfrm>
           <a:prstGeom prst="triangle">
             <a:avLst>
@@ -15684,7 +15864,7 @@
         </p:nvCxnSpPr>
         <p:spPr>
           <a:xfrm flipH="1" flipV="1">
-            <a:off x="2895120" y="4114800"/>
+            <a:off x="2894760" y="4114800"/>
             <a:ext cx="36360" cy="300960"/>
           </a:xfrm>
           <a:prstGeom prst="straightConnector1">
@@ -15707,7 +15887,7 @@
         <p:spPr>
           <a:xfrm>
             <a:off x="2109960" y="5163480"/>
-            <a:ext cx="1617840" cy="303120"/>
+            <a:ext cx="1617120" cy="303120"/>
           </a:xfrm>
           <a:prstGeom prst="rect">
             <a:avLst/>
@@ -15764,7 +15944,7 @@
         <p:spPr>
           <a:xfrm>
             <a:off x="2109960" y="5163480"/>
-            <a:ext cx="1617840" cy="303120"/>
+            <a:ext cx="1617120" cy="303120"/>
           </a:xfrm>
           <a:prstGeom prst="rect">
             <a:avLst/>
@@ -15821,7 +16001,7 @@
         <p:spPr>
           <a:xfrm>
             <a:off x="2109960" y="5424840"/>
-            <a:ext cx="1617840" cy="363960"/>
+            <a:ext cx="1617120" cy="363960"/>
           </a:xfrm>
           <a:prstGeom prst="rect">
             <a:avLst/>
@@ -15889,8 +16069,8 @@
         </p:nvCxnSpPr>
         <p:spPr>
           <a:xfrm flipH="1">
-            <a:off x="2918880" y="4794480"/>
-            <a:ext cx="12600" cy="369360"/>
+            <a:off x="2918520" y="4793760"/>
+            <a:ext cx="12600" cy="370080"/>
           </a:xfrm>
           <a:prstGeom prst="straightConnector1">
             <a:avLst/>
@@ -15914,8 +16094,8 @@
         </p:nvCxnSpPr>
         <p:spPr>
           <a:xfrm flipH="1">
-            <a:off x="4159440" y="1104120"/>
-            <a:ext cx="267840" cy="178200"/>
+            <a:off x="4158720" y="1103760"/>
+            <a:ext cx="268560" cy="178560"/>
           </a:xfrm>
           <a:prstGeom prst="straightConnector1">
             <a:avLst/>
@@ -15937,7 +16117,7 @@
         <p:spPr>
           <a:xfrm flipH="1">
             <a:off x="0" y="3657600"/>
-            <a:ext cx="1837440" cy="8640"/>
+            <a:ext cx="1838160" cy="9360"/>
           </a:xfrm>
           <a:prstGeom prst="straightConnector1">
             <a:avLst/>
@@ -15959,7 +16139,7 @@
         <p:spPr>
           <a:xfrm>
             <a:off x="8686800" y="532800"/>
-            <a:ext cx="1369080" cy="379080"/>
+            <a:ext cx="1368360" cy="378360"/>
           </a:xfrm>
           <a:prstGeom prst="ellipse">
             <a:avLst/>
@@ -16024,8 +16204,8 @@
         </p:nvCxnSpPr>
         <p:spPr>
           <a:xfrm flipH="1">
-            <a:off x="9032040" y="911880"/>
-            <a:ext cx="339840" cy="536760"/>
+            <a:off x="9031680" y="911160"/>
+            <a:ext cx="339840" cy="537480"/>
           </a:xfrm>
           <a:prstGeom prst="straightConnector1">
             <a:avLst/>
@@ -16077,7 +16257,7 @@
         <p:spPr>
           <a:xfrm flipH="1">
             <a:off x="0" y="3073320"/>
-            <a:ext cx="1837440" cy="8640"/>
+            <a:ext cx="1838160" cy="9360"/>
           </a:xfrm>
           <a:prstGeom prst="straightConnector1">
             <a:avLst/>
@@ -16100,7 +16280,7 @@
         <p:spPr>
           <a:xfrm>
             <a:off x="0" y="2489400"/>
-            <a:ext cx="1837440" cy="8640"/>
+            <a:ext cx="1838160" cy="9360"/>
           </a:xfrm>
           <a:prstGeom prst="straightConnector1">
             <a:avLst/>
@@ -16123,7 +16303,7 @@
         <p:spPr>
           <a:xfrm>
             <a:off x="0" y="2781360"/>
-            <a:ext cx="1837440" cy="8640"/>
+            <a:ext cx="1838160" cy="9360"/>
           </a:xfrm>
           <a:prstGeom prst="straightConnector1">
             <a:avLst/>
@@ -16146,7 +16326,7 @@
         <p:spPr>
           <a:xfrm flipH="1">
             <a:off x="0" y="3657600"/>
-            <a:ext cx="1837440" cy="8640"/>
+            <a:ext cx="1838160" cy="9360"/>
           </a:xfrm>
           <a:prstGeom prst="straightConnector1">
             <a:avLst/>
@@ -16168,7 +16348,7 @@
         <p:spPr>
           <a:xfrm>
             <a:off x="128520" y="6134040"/>
-            <a:ext cx="1563120" cy="379080"/>
+            <a:ext cx="1562400" cy="378360"/>
           </a:xfrm>
           <a:prstGeom prst="diamond">
             <a:avLst/>
@@ -16233,7 +16413,7 @@
         <p:spPr>
           <a:xfrm>
             <a:off x="302760" y="5454000"/>
-            <a:ext cx="1214640" cy="379080"/>
+            <a:ext cx="1213920" cy="378360"/>
           </a:xfrm>
           <a:prstGeom prst="ellipse">
             <a:avLst/>
@@ -16296,9 +16476,9 @@
         <p:grpSpPr>
           <a:xfrm>
             <a:off x="101160" y="336240"/>
-            <a:ext cx="1617840" cy="777960"/>
+            <a:ext cx="1617120" cy="777960"/>
             <a:chOff x="101160" y="336240"/>
-            <a:chExt cx="1617840" cy="777960"/>
+            <a:chExt cx="1617120" cy="777960"/>
           </a:xfrm>
         </p:grpSpPr>
         <p:sp>
@@ -16310,7 +16490,7 @@
           <p:spPr>
             <a:xfrm>
               <a:off x="101160" y="336240"/>
-              <a:ext cx="1617840" cy="303120"/>
+              <a:ext cx="1617120" cy="303120"/>
             </a:xfrm>
             <a:prstGeom prst="rect">
               <a:avLst/>
@@ -16367,7 +16547,7 @@
           <p:spPr>
             <a:xfrm>
               <a:off x="101160" y="597600"/>
-              <a:ext cx="1617840" cy="516600"/>
+              <a:ext cx="1617120" cy="516600"/>
             </a:xfrm>
             <a:prstGeom prst="rect">
               <a:avLst/>
@@ -16458,7 +16638,7 @@
         <p:spPr>
           <a:xfrm>
             <a:off x="128520" y="4629600"/>
-            <a:ext cx="1563120" cy="523800"/>
+            <a:ext cx="1562400" cy="523080"/>
           </a:xfrm>
           <a:prstGeom prst="diamond">
             <a:avLst/>
@@ -16546,7 +16726,7 @@
         <p:spPr>
           <a:xfrm>
             <a:off x="0" y="3365640"/>
-            <a:ext cx="1837440" cy="8640"/>
+            <a:ext cx="1838160" cy="9360"/>
           </a:xfrm>
           <a:prstGeom prst="straightConnector1">
             <a:avLst/>
@@ -16568,7 +16748,7 @@
         <p:spPr>
           <a:xfrm>
             <a:off x="673200" y="3949920"/>
-            <a:ext cx="474120" cy="379080"/>
+            <a:ext cx="473400" cy="378360"/>
           </a:xfrm>
           <a:prstGeom prst="triangle">
             <a:avLst>
@@ -16635,9 +16815,9 @@
         <p:grpSpPr>
           <a:xfrm>
             <a:off x="101160" y="1413000"/>
-            <a:ext cx="1617840" cy="777960"/>
+            <a:ext cx="1617120" cy="777960"/>
             <a:chOff x="101160" y="1413000"/>
-            <a:chExt cx="1617840" cy="777960"/>
+            <a:chExt cx="1617120" cy="777960"/>
           </a:xfrm>
         </p:grpSpPr>
         <p:sp>
@@ -16649,7 +16829,7 @@
           <p:spPr>
             <a:xfrm>
               <a:off x="101160" y="1413000"/>
-              <a:ext cx="1617840" cy="303120"/>
+              <a:ext cx="1617120" cy="303120"/>
             </a:xfrm>
             <a:prstGeom prst="rect">
               <a:avLst/>
@@ -16707,7 +16887,7 @@
           <p:spPr>
             <a:xfrm>
               <a:off x="101160" y="1674360"/>
-              <a:ext cx="1617840" cy="516600"/>
+              <a:ext cx="1617120" cy="516600"/>
             </a:xfrm>
             <a:prstGeom prst="rect">
               <a:avLst/>
@@ -16799,7 +16979,7 @@
         <p:spPr>
           <a:xfrm>
             <a:off x="4775040" y="457200"/>
-            <a:ext cx="1617840" cy="303120"/>
+            <a:ext cx="1617120" cy="303120"/>
           </a:xfrm>
           <a:prstGeom prst="rect">
             <a:avLst/>
@@ -16856,7 +17036,7 @@
         <p:spPr>
           <a:xfrm>
             <a:off x="4775040" y="718560"/>
-            <a:ext cx="1617840" cy="730080"/>
+            <a:ext cx="1617120" cy="730080"/>
           </a:xfrm>
           <a:prstGeom prst="rect">
             <a:avLst/>
@@ -16973,9 +17153,9 @@
         <p:grpSpPr>
           <a:xfrm>
             <a:off x="4572000" y="4274280"/>
-            <a:ext cx="1617840" cy="991440"/>
+            <a:ext cx="1617120" cy="991440"/>
             <a:chOff x="4572000" y="4274280"/>
-            <a:chExt cx="1617840" cy="991440"/>
+            <a:chExt cx="1617120" cy="991440"/>
           </a:xfrm>
         </p:grpSpPr>
         <p:sp>
@@ -16987,7 +17167,7 @@
           <p:spPr>
             <a:xfrm>
               <a:off x="4572000" y="4274280"/>
-              <a:ext cx="1617840" cy="303120"/>
+              <a:ext cx="1617120" cy="303120"/>
             </a:xfrm>
             <a:prstGeom prst="rect">
               <a:avLst/>
@@ -17044,7 +17224,7 @@
           <p:spPr>
             <a:xfrm>
               <a:off x="4572000" y="4535640"/>
-              <a:ext cx="1617840" cy="730080"/>
+              <a:ext cx="1617120" cy="730080"/>
             </a:xfrm>
             <a:prstGeom prst="rect">
               <a:avLst/>
@@ -17162,7 +17342,7 @@
         <p:spPr>
           <a:xfrm>
             <a:off x="3231360" y="2899800"/>
-            <a:ext cx="1563120" cy="379080"/>
+            <a:ext cx="1562400" cy="378360"/>
           </a:xfrm>
           <a:prstGeom prst="diamond">
             <a:avLst/>
@@ -17227,7 +17407,7 @@
         <p:spPr>
           <a:xfrm>
             <a:off x="4602960" y="2585160"/>
-            <a:ext cx="1791720" cy="380520"/>
+            <a:ext cx="1791000" cy="379800"/>
           </a:xfrm>
           <a:prstGeom prst="diamond">
             <a:avLst/>
@@ -17294,8 +17474,8 @@
         </p:nvCxnSpPr>
         <p:spPr>
           <a:xfrm flipH="1" flipV="1">
-            <a:off x="4012920" y="3278880"/>
-            <a:ext cx="1368360" cy="995760"/>
+            <a:off x="4012560" y="3278160"/>
+            <a:ext cx="1368360" cy="996480"/>
           </a:xfrm>
           <a:prstGeom prst="straightConnector1">
             <a:avLst/>
@@ -17320,7 +17500,7 @@
         </p:nvCxnSpPr>
         <p:spPr>
           <a:xfrm flipV="1">
-            <a:off x="5499000" y="1448640"/>
+            <a:off x="5498640" y="1448640"/>
             <a:ext cx="85320" cy="1136880"/>
           </a:xfrm>
           <a:prstGeom prst="straightConnector1">
@@ -17345,8 +17525,8 @@
         </p:nvCxnSpPr>
         <p:spPr>
           <a:xfrm flipV="1">
-            <a:off x="5380920" y="2965680"/>
-            <a:ext cx="118440" cy="1308960"/>
+            <a:off x="5380560" y="2964960"/>
+            <a:ext cx="118440" cy="1309680"/>
           </a:xfrm>
           <a:prstGeom prst="straightConnector1">
             <a:avLst/>
@@ -17370,7 +17550,7 @@
         </p:nvCxnSpPr>
         <p:spPr>
           <a:xfrm flipH="1">
-            <a:off x="4012920" y="1448640"/>
+            <a:off x="4012560" y="1448640"/>
             <a:ext cx="1571400" cy="1451520"/>
           </a:xfrm>
           <a:prstGeom prst="straightConnector1">
@@ -17393,7 +17573,7 @@
         <p:spPr>
           <a:xfrm>
             <a:off x="2743200" y="457200"/>
-            <a:ext cx="1563120" cy="379080"/>
+            <a:ext cx="1562400" cy="378360"/>
           </a:xfrm>
           <a:prstGeom prst="diamond">
             <a:avLst/>
@@ -17460,8 +17640,8 @@
         </p:nvCxnSpPr>
         <p:spPr>
           <a:xfrm flipH="1" flipV="1">
-            <a:off x="4306320" y="646920"/>
-            <a:ext cx="469080" cy="437040"/>
+            <a:off x="4305600" y="646560"/>
+            <a:ext cx="469800" cy="437400"/>
           </a:xfrm>
           <a:prstGeom prst="straightConnector1">
             <a:avLst/>
@@ -17485,8 +17665,8 @@
         </p:nvCxnSpPr>
         <p:spPr>
           <a:xfrm flipH="1" flipV="1">
-            <a:off x="3524760" y="836280"/>
-            <a:ext cx="1250640" cy="247680"/>
+            <a:off x="3524400" y="835560"/>
+            <a:ext cx="1251000" cy="248400"/>
           </a:xfrm>
           <a:prstGeom prst="straightConnector1">
             <a:avLst/>
@@ -17508,9 +17688,9 @@
         <p:grpSpPr>
           <a:xfrm>
             <a:off x="8686800" y="837360"/>
-            <a:ext cx="1617840" cy="991440"/>
+            <a:ext cx="1617120" cy="991440"/>
             <a:chOff x="8686800" y="837360"/>
-            <a:chExt cx="1617840" cy="991440"/>
+            <a:chExt cx="1617120" cy="991440"/>
           </a:xfrm>
         </p:grpSpPr>
         <p:sp>
@@ -17522,7 +17702,7 @@
           <p:spPr>
             <a:xfrm>
               <a:off x="8686800" y="837360"/>
-              <a:ext cx="1617840" cy="303120"/>
+              <a:ext cx="1617120" cy="303120"/>
             </a:xfrm>
             <a:prstGeom prst="rect">
               <a:avLst/>
@@ -17579,7 +17759,7 @@
           <p:spPr>
             <a:xfrm>
               <a:off x="8686800" y="1098720"/>
-              <a:ext cx="1617840" cy="730080"/>
+              <a:ext cx="1617120" cy="730080"/>
             </a:xfrm>
             <a:prstGeom prst="rect">
               <a:avLst/>
@@ -17697,7 +17877,7 @@
         <p:spPr>
           <a:xfrm>
             <a:off x="128880" y="6134040"/>
-            <a:ext cx="1563120" cy="379080"/>
+            <a:ext cx="1562400" cy="378360"/>
           </a:xfrm>
           <a:prstGeom prst="diamond">
             <a:avLst/>
@@ -17762,7 +17942,7 @@
         <p:spPr>
           <a:xfrm>
             <a:off x="7315200" y="228600"/>
-            <a:ext cx="1563120" cy="379080"/>
+            <a:ext cx="1562400" cy="378360"/>
           </a:xfrm>
           <a:prstGeom prst="diamond">
             <a:avLst/>
@@ -17827,7 +18007,7 @@
         <p:spPr>
           <a:xfrm>
             <a:off x="360" y="3366000"/>
-            <a:ext cx="1837440" cy="8640"/>
+            <a:ext cx="1838160" cy="9360"/>
           </a:xfrm>
           <a:prstGeom prst="straightConnector1">
             <a:avLst/>
@@ -17851,8 +18031,8 @@
         </p:nvCxnSpPr>
         <p:spPr>
           <a:xfrm flipH="1">
-            <a:off x="6392880" y="418320"/>
-            <a:ext cx="922680" cy="665640"/>
+            <a:off x="6392160" y="417960"/>
+            <a:ext cx="923400" cy="666000"/>
           </a:xfrm>
           <a:prstGeom prst="straightConnector1">
             <a:avLst/>
@@ -17874,7 +18054,7 @@
         <p:spPr>
           <a:xfrm>
             <a:off x="6629400" y="1442160"/>
-            <a:ext cx="1822320" cy="608760"/>
+            <a:ext cx="1821600" cy="608040"/>
           </a:xfrm>
           <a:prstGeom prst="diamond">
             <a:avLst/>
@@ -17941,8 +18121,8 @@
         </p:nvCxnSpPr>
         <p:spPr>
           <a:xfrm flipH="1" flipV="1">
-            <a:off x="8878320" y="418320"/>
-            <a:ext cx="617760" cy="419400"/>
+            <a:off x="8877600" y="417960"/>
+            <a:ext cx="618120" cy="419760"/>
           </a:xfrm>
           <a:prstGeom prst="straightConnector1">
             <a:avLst/>
@@ -17965,7 +18145,7 @@
         <p:spPr>
           <a:xfrm>
             <a:off x="6629400" y="2514600"/>
-            <a:ext cx="1563120" cy="379080"/>
+            <a:ext cx="1562400" cy="378360"/>
           </a:xfrm>
           <a:prstGeom prst="diamond">
             <a:avLst/>
@@ -18032,8 +18212,8 @@
         </p:nvCxnSpPr>
         <p:spPr>
           <a:xfrm flipH="1">
-            <a:off x="8192520" y="1828800"/>
-            <a:ext cx="1303560" cy="875880"/>
+            <a:off x="8191800" y="1828800"/>
+            <a:ext cx="1303920" cy="875520"/>
           </a:xfrm>
           <a:prstGeom prst="straightConnector1">
             <a:avLst/>
@@ -18057,8 +18237,8 @@
         </p:nvCxnSpPr>
         <p:spPr>
           <a:xfrm flipH="1">
-            <a:off x="6189840" y="2704320"/>
-            <a:ext cx="439920" cy="2066040"/>
+            <a:off x="6189120" y="2703960"/>
+            <a:ext cx="440640" cy="2066400"/>
           </a:xfrm>
           <a:prstGeom prst="straightConnector1">
             <a:avLst/>
@@ -18082,8 +18262,8 @@
         </p:nvCxnSpPr>
         <p:spPr>
           <a:xfrm flipH="1">
-            <a:off x="8451720" y="1333080"/>
-            <a:ext cx="235440" cy="414000"/>
+            <a:off x="8451000" y="1333080"/>
+            <a:ext cx="236160" cy="413640"/>
           </a:xfrm>
           <a:prstGeom prst="straightConnector1">
             <a:avLst/>
@@ -18107,8 +18287,8 @@
         </p:nvCxnSpPr>
         <p:spPr>
           <a:xfrm flipH="1" flipV="1">
-            <a:off x="5583960" y="1448640"/>
-            <a:ext cx="1045800" cy="298440"/>
+            <a:off x="5583600" y="1448640"/>
+            <a:ext cx="1046160" cy="298080"/>
           </a:xfrm>
           <a:prstGeom prst="straightConnector1">
             <a:avLst/>
@@ -18130,9 +18310,9 @@
         <p:grpSpPr>
           <a:xfrm>
             <a:off x="101160" y="336240"/>
-            <a:ext cx="1617840" cy="777960"/>
+            <a:ext cx="1617120" cy="777960"/>
             <a:chOff x="101160" y="336240"/>
-            <a:chExt cx="1617840" cy="777960"/>
+            <a:chExt cx="1617120" cy="777960"/>
           </a:xfrm>
         </p:grpSpPr>
         <p:sp>
@@ -18144,7 +18324,7 @@
           <p:spPr>
             <a:xfrm>
               <a:off x="101160" y="336240"/>
-              <a:ext cx="1617840" cy="303120"/>
+              <a:ext cx="1617120" cy="303120"/>
             </a:xfrm>
             <a:prstGeom prst="rect">
               <a:avLst/>
@@ -18201,7 +18381,7 @@
           <p:spPr>
             <a:xfrm>
               <a:off x="101160" y="597600"/>
-              <a:ext cx="1617840" cy="516600"/>
+              <a:ext cx="1617120" cy="516600"/>
             </a:xfrm>
             <a:prstGeom prst="rect">
               <a:avLst/>
@@ -18292,9 +18472,9 @@
         <p:grpSpPr>
           <a:xfrm>
             <a:off x="6760440" y="4359960"/>
-            <a:ext cx="1617840" cy="558000"/>
+            <a:ext cx="1617120" cy="557280"/>
             <a:chOff x="6760440" y="4359960"/>
-            <a:chExt cx="1617840" cy="558000"/>
+            <a:chExt cx="1617120" cy="557280"/>
           </a:xfrm>
         </p:grpSpPr>
         <p:sp>
@@ -18306,7 +18486,7 @@
           <p:spPr>
             <a:xfrm>
               <a:off x="6760440" y="4359960"/>
-              <a:ext cx="1617840" cy="303120"/>
+              <a:ext cx="1617120" cy="303120"/>
             </a:xfrm>
             <a:prstGeom prst="rect">
               <a:avLst/>
@@ -18363,7 +18543,7 @@
           <p:spPr>
             <a:xfrm>
               <a:off x="6760440" y="4621320"/>
-              <a:ext cx="1617840" cy="296640"/>
+              <a:ext cx="1617120" cy="295920"/>
             </a:xfrm>
             <a:prstGeom prst="rect">
               <a:avLst/>
@@ -18412,7 +18592,7 @@
         <p:spPr>
           <a:xfrm>
             <a:off x="9144000" y="2057400"/>
-            <a:ext cx="474120" cy="379080"/>
+            <a:ext cx="473400" cy="378360"/>
           </a:xfrm>
           <a:prstGeom prst="triangle">
             <a:avLst>
@@ -18480,8 +18660,8 @@
         </p:nvCxnSpPr>
         <p:spPr>
           <a:xfrm flipH="1">
-            <a:off x="8026200" y="4108320"/>
-            <a:ext cx="1432800" cy="258120"/>
+            <a:off x="8026200" y="4107600"/>
+            <a:ext cx="1432440" cy="259560"/>
           </a:xfrm>
           <a:prstGeom prst="straightConnector1">
             <a:avLst/>
@@ -18504,8 +18684,8 @@
         </p:nvCxnSpPr>
         <p:spPr>
           <a:xfrm flipH="1" flipV="1">
-            <a:off x="9458640" y="4108320"/>
-            <a:ext cx="479160" cy="239760"/>
+            <a:off x="9458280" y="4107600"/>
+            <a:ext cx="480240" cy="241200"/>
           </a:xfrm>
           <a:prstGeom prst="straightConnector1">
             <a:avLst/>
@@ -18528,8 +18708,8 @@
         </p:nvCxnSpPr>
         <p:spPr>
           <a:xfrm flipH="1">
-            <a:off x="9346320" y="2436480"/>
-            <a:ext cx="35280" cy="449640"/>
+            <a:off x="9346320" y="2435760"/>
+            <a:ext cx="34920" cy="451080"/>
           </a:xfrm>
           <a:prstGeom prst="straightConnector1">
             <a:avLst/>
@@ -18553,7 +18733,7 @@
         </p:nvCxnSpPr>
         <p:spPr>
           <a:xfrm flipH="1">
-            <a:off x="9381240" y="1828800"/>
+            <a:off x="9380880" y="1828800"/>
             <a:ext cx="114840" cy="228960"/>
           </a:xfrm>
           <a:prstGeom prst="straightConnector1">
@@ -18576,7 +18756,7 @@
         <p:spPr>
           <a:xfrm>
             <a:off x="7089840" y="5715000"/>
-            <a:ext cx="1617840" cy="303120"/>
+            <a:ext cx="1617120" cy="303120"/>
           </a:xfrm>
           <a:prstGeom prst="rect">
             <a:avLst/>
@@ -18633,7 +18813,7 @@
         <p:spPr>
           <a:xfrm>
             <a:off x="6760440" y="5183280"/>
-            <a:ext cx="1821240" cy="379080"/>
+            <a:ext cx="1820520" cy="378360"/>
           </a:xfrm>
           <a:prstGeom prst="diamond">
             <a:avLst/>
@@ -18698,7 +18878,7 @@
         <p:spPr>
           <a:xfrm flipH="1">
             <a:off x="0" y="3657600"/>
-            <a:ext cx="1837440" cy="8640"/>
+            <a:ext cx="1838160" cy="9360"/>
           </a:xfrm>
           <a:prstGeom prst="straightConnector1">
             <a:avLst/>
@@ -18720,9 +18900,9 @@
         <p:grpSpPr>
           <a:xfrm>
             <a:off x="8534520" y="2879640"/>
-            <a:ext cx="1617840" cy="558720"/>
+            <a:ext cx="1617120" cy="558000"/>
             <a:chOff x="8534520" y="2879640"/>
-            <a:chExt cx="1617840" cy="558720"/>
+            <a:chExt cx="1617120" cy="558000"/>
           </a:xfrm>
         </p:grpSpPr>
         <p:sp>
@@ -18734,7 +18914,7 @@
           <p:spPr>
             <a:xfrm>
               <a:off x="8534520" y="2879640"/>
-              <a:ext cx="1617840" cy="303120"/>
+              <a:ext cx="1617120" cy="303120"/>
             </a:xfrm>
             <a:prstGeom prst="rect">
               <a:avLst/>
@@ -18791,7 +18971,7 @@
           <p:spPr>
             <a:xfrm>
               <a:off x="8534520" y="3141000"/>
-              <a:ext cx="1617840" cy="297360"/>
+              <a:ext cx="1617120" cy="296640"/>
             </a:xfrm>
             <a:prstGeom prst="rect">
               <a:avLst/>
@@ -18840,9 +19020,9 @@
         <p:grpSpPr>
           <a:xfrm>
             <a:off x="8534520" y="2879640"/>
-            <a:ext cx="1617840" cy="564480"/>
+            <a:ext cx="1617120" cy="564480"/>
             <a:chOff x="8534520" y="2879640"/>
-            <a:chExt cx="1617840" cy="564480"/>
+            <a:chExt cx="1617120" cy="564480"/>
           </a:xfrm>
         </p:grpSpPr>
         <p:sp>
@@ -18854,7 +19034,7 @@
           <p:spPr>
             <a:xfrm>
               <a:off x="8534520" y="2879640"/>
-              <a:ext cx="1617840" cy="303120"/>
+              <a:ext cx="1617120" cy="303120"/>
             </a:xfrm>
             <a:prstGeom prst="rect">
               <a:avLst/>
@@ -18911,7 +19091,7 @@
           <p:spPr>
             <a:xfrm>
               <a:off x="8534520" y="3141000"/>
-              <a:ext cx="1617840" cy="303120"/>
+              <a:ext cx="1617120" cy="303120"/>
             </a:xfrm>
             <a:prstGeom prst="rect">
               <a:avLst/>
@@ -18974,7 +19154,7 @@
         <p:spPr>
           <a:xfrm>
             <a:off x="9221400" y="3729240"/>
-            <a:ext cx="474120" cy="379080"/>
+            <a:ext cx="473400" cy="378360"/>
           </a:xfrm>
           <a:prstGeom prst="triangle">
             <a:avLst>
@@ -19043,7 +19223,7 @@
         </p:nvCxnSpPr>
         <p:spPr>
           <a:xfrm>
-            <a:off x="9343440" y="3444120"/>
+            <a:off x="9343080" y="3444120"/>
             <a:ext cx="115560" cy="285480"/>
           </a:xfrm>
           <a:prstGeom prst="straightConnector1">
@@ -19066,7 +19246,7 @@
         <p:spPr>
           <a:xfrm>
             <a:off x="8556840" y="3657600"/>
-            <a:ext cx="1837440" cy="8640"/>
+            <a:ext cx="1838160" cy="9360"/>
           </a:xfrm>
           <a:prstGeom prst="straightConnector1">
             <a:avLst/>
@@ -19089,7 +19269,7 @@
         <p:spPr>
           <a:xfrm>
             <a:off x="9601200" y="3382920"/>
-            <a:ext cx="907920" cy="339840"/>
+            <a:ext cx="907200" cy="339120"/>
           </a:xfrm>
           <a:prstGeom prst="rect">
             <a:avLst/>
@@ -19142,7 +19322,7 @@
         <p:spPr>
           <a:xfrm>
             <a:off x="2057400" y="2132280"/>
-            <a:ext cx="1617840" cy="303120"/>
+            <a:ext cx="1617120" cy="303120"/>
           </a:xfrm>
           <a:prstGeom prst="rect">
             <a:avLst/>
@@ -19199,7 +19379,7 @@
         <p:spPr>
           <a:xfrm>
             <a:off x="2057400" y="2393640"/>
-            <a:ext cx="1617840" cy="189360"/>
+            <a:ext cx="1617120" cy="188640"/>
           </a:xfrm>
           <a:prstGeom prst="rect">
             <a:avLst/>
@@ -19247,7 +19427,7 @@
         <p:spPr>
           <a:xfrm>
             <a:off x="2613960" y="1217880"/>
-            <a:ext cx="474120" cy="379080"/>
+            <a:ext cx="473400" cy="378360"/>
           </a:xfrm>
           <a:prstGeom prst="triangle">
             <a:avLst>
@@ -19316,8 +19496,8 @@
         </p:nvCxnSpPr>
         <p:spPr>
           <a:xfrm>
-            <a:off x="2851200" y="1596960"/>
-            <a:ext cx="15480" cy="535680"/>
+            <a:off x="2850840" y="1596240"/>
+            <a:ext cx="15480" cy="536400"/>
           </a:xfrm>
           <a:prstGeom prst="straightConnector1">
             <a:avLst/>
@@ -19341,8 +19521,8 @@
         </p:nvCxnSpPr>
         <p:spPr>
           <a:xfrm flipV="1">
-            <a:off x="2851200" y="1083600"/>
-            <a:ext cx="1924200" cy="134640"/>
+            <a:off x="2850840" y="1083600"/>
+            <a:ext cx="1924560" cy="134640"/>
           </a:xfrm>
           <a:prstGeom prst="straightConnector1">
             <a:avLst/>
@@ -19366,8 +19546,8 @@
         </p:nvCxnSpPr>
         <p:spPr>
           <a:xfrm>
-            <a:off x="7569360" y="4917960"/>
-            <a:ext cx="102240" cy="265680"/>
+            <a:off x="7569000" y="4917240"/>
+            <a:ext cx="102240" cy="266400"/>
           </a:xfrm>
           <a:prstGeom prst="straightConnector1">
             <a:avLst/>
@@ -19392,8 +19572,8 @@
         </p:nvCxnSpPr>
         <p:spPr>
           <a:xfrm>
-            <a:off x="7671240" y="5562360"/>
-            <a:ext cx="227880" cy="153000"/>
+            <a:off x="7670880" y="5561640"/>
+            <a:ext cx="227880" cy="153720"/>
           </a:xfrm>
           <a:prstGeom prst="straightConnector1">
             <a:avLst/>
@@ -19415,9 +19595,9 @@
         <p:grpSpPr>
           <a:xfrm>
             <a:off x="10265040" y="5029200"/>
-            <a:ext cx="1617840" cy="558360"/>
+            <a:ext cx="1617120" cy="557640"/>
             <a:chOff x="10265040" y="5029200"/>
-            <a:chExt cx="1617840" cy="558360"/>
+            <a:chExt cx="1617120" cy="557640"/>
           </a:xfrm>
         </p:grpSpPr>
         <p:sp>
@@ -19429,7 +19609,7 @@
           <p:spPr>
             <a:xfrm>
               <a:off x="10265040" y="5029200"/>
-              <a:ext cx="1617840" cy="303120"/>
+              <a:ext cx="1617120" cy="303120"/>
             </a:xfrm>
             <a:prstGeom prst="rect">
               <a:avLst/>
@@ -19486,7 +19666,7 @@
           <p:spPr>
             <a:xfrm>
               <a:off x="10265040" y="5290560"/>
-              <a:ext cx="1617840" cy="297000"/>
+              <a:ext cx="1617120" cy="296280"/>
             </a:xfrm>
             <a:prstGeom prst="rect">
               <a:avLst/>
@@ -19537,8 +19717,8 @@
         </p:nvCxnSpPr>
         <p:spPr>
           <a:xfrm flipH="1" flipV="1">
-            <a:off x="9695520" y="4108320"/>
-            <a:ext cx="1378800" cy="921240"/>
+            <a:off x="9694800" y="4107600"/>
+            <a:ext cx="1379160" cy="921960"/>
           </a:xfrm>
           <a:prstGeom prst="straightConnector1">
             <a:avLst/>
@@ -19560,9 +19740,9 @@
         <p:grpSpPr>
           <a:xfrm>
             <a:off x="9122040" y="4343400"/>
-            <a:ext cx="1617840" cy="558360"/>
+            <a:ext cx="1617120" cy="557640"/>
             <a:chOff x="9122040" y="4343400"/>
-            <a:chExt cx="1617840" cy="558360"/>
+            <a:chExt cx="1617120" cy="557640"/>
           </a:xfrm>
         </p:grpSpPr>
         <p:sp>
@@ -19574,7 +19754,7 @@
           <p:spPr>
             <a:xfrm>
               <a:off x="9122040" y="4343400"/>
-              <a:ext cx="1617840" cy="303120"/>
+              <a:ext cx="1617120" cy="303120"/>
             </a:xfrm>
             <a:prstGeom prst="rect">
               <a:avLst/>
@@ -19631,7 +19811,7 @@
           <p:spPr>
             <a:xfrm>
               <a:off x="9122040" y="4604760"/>
-              <a:ext cx="1617840" cy="297000"/>
+              <a:ext cx="1617120" cy="296280"/>
             </a:xfrm>
             <a:prstGeom prst="rect">
               <a:avLst/>
@@ -19680,7 +19860,7 @@
         <p:spPr>
           <a:xfrm>
             <a:off x="10037520" y="2131560"/>
-            <a:ext cx="474120" cy="379080"/>
+            <a:ext cx="473400" cy="378360"/>
           </a:xfrm>
           <a:prstGeom prst="triangle">
             <a:avLst>
@@ -19749,7 +19929,7 @@
         </p:nvCxnSpPr>
         <p:spPr>
           <a:xfrm>
-            <a:off x="9495720" y="1828800"/>
+            <a:off x="9495360" y="1828800"/>
             <a:ext cx="779400" cy="303120"/>
           </a:xfrm>
           <a:prstGeom prst="straightConnector1">
@@ -19772,9 +19952,9 @@
         <p:grpSpPr>
           <a:xfrm>
             <a:off x="10494000" y="2866680"/>
-            <a:ext cx="1617840" cy="558360"/>
+            <a:ext cx="1617120" cy="557640"/>
             <a:chOff x="10494000" y="2866680"/>
-            <a:chExt cx="1617840" cy="558360"/>
+            <a:chExt cx="1617120" cy="557640"/>
           </a:xfrm>
         </p:grpSpPr>
         <p:sp>
@@ -19786,7 +19966,7 @@
           <p:spPr>
             <a:xfrm>
               <a:off x="10494000" y="2866680"/>
-              <a:ext cx="1617840" cy="303120"/>
+              <a:ext cx="1617120" cy="303120"/>
             </a:xfrm>
             <a:prstGeom prst="rect">
               <a:avLst/>
@@ -19843,7 +20023,7 @@
           <p:spPr>
             <a:xfrm>
               <a:off x="10494000" y="3128040"/>
-              <a:ext cx="1617840" cy="297000"/>
+              <a:ext cx="1617120" cy="296280"/>
             </a:xfrm>
             <a:prstGeom prst="rect">
               <a:avLst/>
@@ -19894,8 +20074,8 @@
         </p:nvCxnSpPr>
         <p:spPr>
           <a:xfrm>
-            <a:off x="10274760" y="2510640"/>
-            <a:ext cx="1028520" cy="356400"/>
+            <a:off x="10274400" y="2509920"/>
+            <a:ext cx="1028520" cy="357120"/>
           </a:xfrm>
           <a:prstGeom prst="straightConnector1">
             <a:avLst/>
@@ -19947,7 +20127,7 @@
         <p:spPr>
           <a:xfrm flipH="1">
             <a:off x="0" y="3073320"/>
-            <a:ext cx="1837440" cy="8640"/>
+            <a:ext cx="1838160" cy="9360"/>
           </a:xfrm>
           <a:prstGeom prst="straightConnector1">
             <a:avLst/>
@@ -19970,7 +20150,7 @@
         <p:spPr>
           <a:xfrm>
             <a:off x="0" y="2489400"/>
-            <a:ext cx="1837440" cy="8640"/>
+            <a:ext cx="1838160" cy="9360"/>
           </a:xfrm>
           <a:prstGeom prst="straightConnector1">
             <a:avLst/>
@@ -19993,7 +20173,7 @@
         <p:spPr>
           <a:xfrm>
             <a:off x="0" y="2781360"/>
-            <a:ext cx="1837440" cy="8640"/>
+            <a:ext cx="1838160" cy="9360"/>
           </a:xfrm>
           <a:prstGeom prst="straightConnector1">
             <a:avLst/>
@@ -20016,7 +20196,7 @@
         <p:spPr>
           <a:xfrm flipH="1">
             <a:off x="0" y="3657600"/>
-            <a:ext cx="1837440" cy="8640"/>
+            <a:ext cx="1838160" cy="9360"/>
           </a:xfrm>
           <a:prstGeom prst="straightConnector1">
             <a:avLst/>
@@ -20038,7 +20218,7 @@
         <p:spPr>
           <a:xfrm>
             <a:off x="128520" y="6134040"/>
-            <a:ext cx="1563120" cy="379080"/>
+            <a:ext cx="1562400" cy="378360"/>
           </a:xfrm>
           <a:prstGeom prst="diamond">
             <a:avLst/>
@@ -20103,7 +20283,7 @@
         <p:spPr>
           <a:xfrm>
             <a:off x="302760" y="5454000"/>
-            <a:ext cx="1214640" cy="379080"/>
+            <a:ext cx="1213920" cy="378360"/>
           </a:xfrm>
           <a:prstGeom prst="ellipse">
             <a:avLst/>
@@ -20166,7 +20346,7 @@
         <p:spPr>
           <a:xfrm>
             <a:off x="101160" y="336240"/>
-            <a:ext cx="1617840" cy="303120"/>
+            <a:ext cx="1617120" cy="303120"/>
           </a:xfrm>
           <a:prstGeom prst="rect">
             <a:avLst/>
@@ -20223,7 +20403,7 @@
         <p:spPr>
           <a:xfrm>
             <a:off x="101160" y="597600"/>
-            <a:ext cx="1617840" cy="516600"/>
+            <a:ext cx="1617120" cy="516600"/>
           </a:xfrm>
           <a:prstGeom prst="rect">
             <a:avLst/>
@@ -20313,7 +20493,7 @@
         <p:spPr>
           <a:xfrm>
             <a:off x="8458200" y="5486400"/>
-            <a:ext cx="1617840" cy="303120"/>
+            <a:ext cx="1617120" cy="303120"/>
           </a:xfrm>
           <a:prstGeom prst="rect">
             <a:avLst/>
@@ -20370,7 +20550,7 @@
         <p:spPr>
           <a:xfrm>
             <a:off x="128520" y="4629600"/>
-            <a:ext cx="1563120" cy="523800"/>
+            <a:ext cx="1562400" cy="523080"/>
           </a:xfrm>
           <a:prstGeom prst="diamond">
             <a:avLst/>
@@ -20458,7 +20638,7 @@
         <p:spPr>
           <a:xfrm>
             <a:off x="0" y="3365640"/>
-            <a:ext cx="1837440" cy="8640"/>
+            <a:ext cx="1838160" cy="9360"/>
           </a:xfrm>
           <a:prstGeom prst="straightConnector1">
             <a:avLst/>
@@ -20480,7 +20660,7 @@
         <p:spPr>
           <a:xfrm>
             <a:off x="673200" y="3949920"/>
-            <a:ext cx="474120" cy="379080"/>
+            <a:ext cx="473400" cy="378360"/>
           </a:xfrm>
           <a:prstGeom prst="triangle">
             <a:avLst>
@@ -20547,9 +20727,9 @@
         <p:grpSpPr>
           <a:xfrm>
             <a:off x="101160" y="1413000"/>
-            <a:ext cx="1617840" cy="777960"/>
+            <a:ext cx="1617120" cy="777960"/>
             <a:chOff x="101160" y="1413000"/>
-            <a:chExt cx="1617840" cy="777960"/>
+            <a:chExt cx="1617120" cy="777960"/>
           </a:xfrm>
         </p:grpSpPr>
         <p:sp>
@@ -20561,7 +20741,7 @@
           <p:spPr>
             <a:xfrm>
               <a:off x="101160" y="1413000"/>
-              <a:ext cx="1617840" cy="303120"/>
+              <a:ext cx="1617120" cy="303120"/>
             </a:xfrm>
             <a:prstGeom prst="rect">
               <a:avLst/>
@@ -20619,7 +20799,7 @@
           <p:spPr>
             <a:xfrm>
               <a:off x="101160" y="1674360"/>
-              <a:ext cx="1617840" cy="516600"/>
+              <a:ext cx="1617120" cy="516600"/>
             </a:xfrm>
             <a:prstGeom prst="rect">
               <a:avLst/>
@@ -20711,7 +20891,7 @@
         <p:spPr>
           <a:xfrm>
             <a:off x="5463360" y="2131920"/>
-            <a:ext cx="1617840" cy="303120"/>
+            <a:ext cx="1617120" cy="303120"/>
           </a:xfrm>
           <a:prstGeom prst="rect">
             <a:avLst/>
@@ -20774,7 +20954,7 @@
         <p:spPr>
           <a:xfrm>
             <a:off x="5463360" y="1828800"/>
-            <a:ext cx="1617840" cy="303120"/>
+            <a:ext cx="1617120" cy="303120"/>
           </a:xfrm>
           <a:prstGeom prst="rect">
             <a:avLst/>
@@ -20831,9 +21011,9 @@
         <p:grpSpPr>
           <a:xfrm>
             <a:off x="4296600" y="4022640"/>
-            <a:ext cx="1617840" cy="777960"/>
+            <a:ext cx="1617120" cy="777960"/>
             <a:chOff x="4296600" y="4022640"/>
-            <a:chExt cx="1617840" cy="777960"/>
+            <a:chExt cx="1617120" cy="777960"/>
           </a:xfrm>
         </p:grpSpPr>
         <p:sp>
@@ -20845,7 +21025,7 @@
           <p:spPr>
             <a:xfrm>
               <a:off x="4296600" y="4022640"/>
-              <a:ext cx="1617840" cy="303120"/>
+              <a:ext cx="1617120" cy="303120"/>
             </a:xfrm>
             <a:prstGeom prst="rect">
               <a:avLst/>
@@ -20902,7 +21082,7 @@
           <p:spPr>
             <a:xfrm>
               <a:off x="4296600" y="4284000"/>
-              <a:ext cx="1617840" cy="516600"/>
+              <a:ext cx="1617120" cy="516600"/>
             </a:xfrm>
             <a:prstGeom prst="rect">
               <a:avLst/>
@@ -20993,9 +21173,9 @@
         <p:grpSpPr>
           <a:xfrm>
             <a:off x="9348840" y="2254320"/>
-            <a:ext cx="1617840" cy="1631880"/>
+            <a:ext cx="1617120" cy="1631880"/>
             <a:chOff x="9348840" y="2254320"/>
-            <a:chExt cx="1617840" cy="1631880"/>
+            <a:chExt cx="1617120" cy="1631880"/>
           </a:xfrm>
         </p:grpSpPr>
         <p:sp>
@@ -21007,7 +21187,7 @@
           <p:spPr>
             <a:xfrm>
               <a:off x="9348840" y="2254320"/>
-              <a:ext cx="1617840" cy="303120"/>
+              <a:ext cx="1617120" cy="303120"/>
             </a:xfrm>
             <a:prstGeom prst="rect">
               <a:avLst/>
@@ -21064,7 +21244,7 @@
           <p:spPr>
             <a:xfrm>
               <a:off x="9348840" y="2515680"/>
-              <a:ext cx="1617840" cy="1370520"/>
+              <a:ext cx="1617120" cy="1370520"/>
             </a:xfrm>
             <a:prstGeom prst="rect">
               <a:avLst/>
@@ -21263,7 +21443,7 @@
         <p:spPr>
           <a:xfrm>
             <a:off x="9402120" y="4572000"/>
-            <a:ext cx="1563120" cy="379080"/>
+            <a:ext cx="1562400" cy="378360"/>
           </a:xfrm>
           <a:prstGeom prst="diamond">
             <a:avLst/>
@@ -21328,7 +21508,7 @@
         <p:spPr>
           <a:xfrm>
             <a:off x="7007400" y="4572000"/>
-            <a:ext cx="1671840" cy="379080"/>
+            <a:ext cx="1671120" cy="378360"/>
           </a:xfrm>
           <a:prstGeom prst="ellipse">
             <a:avLst/>
@@ -21391,9 +21571,9 @@
         <p:grpSpPr>
           <a:xfrm>
             <a:off x="9348840" y="2254320"/>
-            <a:ext cx="1617840" cy="1631880"/>
+            <a:ext cx="1617120" cy="1631880"/>
             <a:chOff x="9348840" y="2254320"/>
-            <a:chExt cx="1617840" cy="1631880"/>
+            <a:chExt cx="1617120" cy="1631880"/>
           </a:xfrm>
         </p:grpSpPr>
         <p:sp>
@@ -21405,7 +21585,7 @@
           <p:spPr>
             <a:xfrm>
               <a:off x="9348840" y="2254320"/>
-              <a:ext cx="1617840" cy="303120"/>
+              <a:ext cx="1617120" cy="303120"/>
             </a:xfrm>
             <a:prstGeom prst="rect">
               <a:avLst/>
@@ -21462,7 +21642,7 @@
           <p:spPr>
             <a:xfrm>
               <a:off x="9348840" y="2515680"/>
-              <a:ext cx="1617840" cy="1370520"/>
+              <a:ext cx="1617120" cy="1370520"/>
             </a:xfrm>
             <a:prstGeom prst="rect">
               <a:avLst/>
@@ -21661,9 +21841,9 @@
         <p:grpSpPr>
           <a:xfrm>
             <a:off x="9348840" y="2254320"/>
-            <a:ext cx="1617840" cy="1845360"/>
+            <a:ext cx="1617120" cy="1845360"/>
             <a:chOff x="9348840" y="2254320"/>
-            <a:chExt cx="1617840" cy="1845360"/>
+            <a:chExt cx="1617120" cy="1845360"/>
           </a:xfrm>
         </p:grpSpPr>
         <p:sp>
@@ -21675,7 +21855,7 @@
           <p:spPr>
             <a:xfrm>
               <a:off x="9348840" y="2254320"/>
-              <a:ext cx="1617840" cy="303120"/>
+              <a:ext cx="1617120" cy="303120"/>
             </a:xfrm>
             <a:prstGeom prst="rect">
               <a:avLst/>
@@ -21732,7 +21912,7 @@
           <p:spPr>
             <a:xfrm>
               <a:off x="9348840" y="2515680"/>
-              <a:ext cx="1617840" cy="1584000"/>
+              <a:ext cx="1617120" cy="1584000"/>
             </a:xfrm>
             <a:prstGeom prst="rect">
               <a:avLst/>
@@ -21958,7 +22138,7 @@
         <p:spPr>
           <a:xfrm>
             <a:off x="7086600" y="3501720"/>
-            <a:ext cx="1821240" cy="379080"/>
+            <a:ext cx="1820520" cy="378360"/>
           </a:xfrm>
           <a:prstGeom prst="diamond">
             <a:avLst/>
@@ -22023,7 +22203,7 @@
         <p:spPr>
           <a:xfrm>
             <a:off x="7543800" y="1869840"/>
-            <a:ext cx="1791720" cy="379080"/>
+            <a:ext cx="1791000" cy="378360"/>
           </a:xfrm>
           <a:prstGeom prst="diamond">
             <a:avLst/>
@@ -22090,8 +22270,8 @@
         </p:nvCxnSpPr>
         <p:spPr>
           <a:xfrm flipV="1">
-            <a:off x="7081200" y="2059560"/>
-            <a:ext cx="462960" cy="224280"/>
+            <a:off x="7080480" y="2059200"/>
+            <a:ext cx="463680" cy="224640"/>
           </a:xfrm>
           <a:prstGeom prst="straightConnector1">
             <a:avLst/>
@@ -22116,8 +22296,8 @@
         </p:nvCxnSpPr>
         <p:spPr>
           <a:xfrm flipH="1">
-            <a:off x="9267120" y="4951080"/>
-            <a:ext cx="916920" cy="535680"/>
+            <a:off x="9266760" y="4950360"/>
+            <a:ext cx="916920" cy="536400"/>
           </a:xfrm>
           <a:prstGeom prst="straightConnector1">
             <a:avLst/>
@@ -22141,7 +22321,7 @@
         </p:nvCxnSpPr>
         <p:spPr>
           <a:xfrm>
-            <a:off x="10157760" y="4099680"/>
+            <a:off x="10157400" y="4099680"/>
             <a:ext cx="26280" cy="472680"/>
           </a:xfrm>
           <a:prstGeom prst="straightConnector1">
@@ -22166,8 +22346,8 @@
         </p:nvCxnSpPr>
         <p:spPr>
           <a:xfrm flipH="1">
-            <a:off x="8679240" y="4761720"/>
-            <a:ext cx="723240" cy="360"/>
+            <a:off x="8678520" y="4761360"/>
+            <a:ext cx="723960" cy="360"/>
           </a:xfrm>
           <a:prstGeom prst="straightConnector1">
             <a:avLst/>
@@ -22189,7 +22369,7 @@
         <p:spPr>
           <a:xfrm>
             <a:off x="6629400" y="5099760"/>
-            <a:ext cx="1592640" cy="379080"/>
+            <a:ext cx="1591920" cy="378360"/>
           </a:xfrm>
           <a:prstGeom prst="ellipse">
             <a:avLst/>
@@ -22254,8 +22434,8 @@
         </p:nvCxnSpPr>
         <p:spPr>
           <a:xfrm flipH="1">
-            <a:off x="8222040" y="4761720"/>
-            <a:ext cx="1180440" cy="528120"/>
+            <a:off x="8221320" y="4761360"/>
+            <a:ext cx="1181160" cy="528120"/>
           </a:xfrm>
           <a:prstGeom prst="straightConnector1">
             <a:avLst/>
@@ -22279,8 +22459,8 @@
         </p:nvCxnSpPr>
         <p:spPr>
           <a:xfrm flipH="1">
-            <a:off x="3627000" y="2547720"/>
-            <a:ext cx="7920" cy="457560"/>
+            <a:off x="3626280" y="2547360"/>
+            <a:ext cx="8640" cy="457560"/>
           </a:xfrm>
           <a:prstGeom prst="straightConnector1">
             <a:avLst/>
@@ -22302,7 +22482,7 @@
         <p:spPr>
           <a:xfrm>
             <a:off x="5234760" y="2815200"/>
-            <a:ext cx="1563120" cy="379080"/>
+            <a:ext cx="1562400" cy="378360"/>
           </a:xfrm>
           <a:prstGeom prst="diamond">
             <a:avLst/>
@@ -22367,7 +22547,7 @@
         <p:spPr>
           <a:xfrm>
             <a:off x="3634560" y="2358000"/>
-            <a:ext cx="1563120" cy="379080"/>
+            <a:ext cx="1562400" cy="378360"/>
           </a:xfrm>
           <a:prstGeom prst="diamond">
             <a:avLst/>
@@ -22432,7 +22612,7 @@
         <p:spPr>
           <a:xfrm>
             <a:off x="2034360" y="2815200"/>
-            <a:ext cx="1592640" cy="379080"/>
+            <a:ext cx="1591920" cy="378360"/>
           </a:xfrm>
           <a:prstGeom prst="ellipse">
             <a:avLst/>
@@ -22497,8 +22677,8 @@
         </p:nvCxnSpPr>
         <p:spPr>
           <a:xfrm flipH="1" flipV="1">
-            <a:off x="4416120" y="2737080"/>
-            <a:ext cx="689760" cy="1285920"/>
+            <a:off x="4415760" y="2736360"/>
+            <a:ext cx="689760" cy="1286640"/>
           </a:xfrm>
           <a:prstGeom prst="straightConnector1">
             <a:avLst/>
@@ -22523,8 +22703,8 @@
         </p:nvCxnSpPr>
         <p:spPr>
           <a:xfrm flipH="1">
-            <a:off x="4416120" y="1980360"/>
-            <a:ext cx="1047600" cy="378000"/>
+            <a:off x="4415760" y="1980360"/>
+            <a:ext cx="1047960" cy="378000"/>
           </a:xfrm>
           <a:prstGeom prst="straightConnector1">
             <a:avLst/>
@@ -22548,8 +22728,8 @@
         </p:nvCxnSpPr>
         <p:spPr>
           <a:xfrm flipV="1">
-            <a:off x="5105520" y="3194280"/>
-            <a:ext cx="911160" cy="828720"/>
+            <a:off x="5105160" y="3193560"/>
+            <a:ext cx="911160" cy="829440"/>
           </a:xfrm>
           <a:prstGeom prst="straightConnector1">
             <a:avLst/>
@@ -22574,7 +22754,7 @@
         </p:nvCxnSpPr>
         <p:spPr>
           <a:xfrm flipV="1">
-            <a:off x="6016320" y="2435040"/>
+            <a:off x="6015960" y="2435040"/>
             <a:ext cx="256320" cy="380520"/>
           </a:xfrm>
           <a:prstGeom prst="straightConnector1">
@@ -22599,8 +22779,8 @@
         </p:nvCxnSpPr>
         <p:spPr>
           <a:xfrm flipV="1">
-            <a:off x="5914440" y="3691440"/>
-            <a:ext cx="1172520" cy="720360"/>
+            <a:off x="5913720" y="3691080"/>
+            <a:ext cx="1173240" cy="720720"/>
           </a:xfrm>
           <a:prstGeom prst="straightConnector1">
             <a:avLst/>
@@ -22625,8 +22805,8 @@
         </p:nvCxnSpPr>
         <p:spPr>
           <a:xfrm flipH="1">
-            <a:off x="8907840" y="3177000"/>
-            <a:ext cx="441360" cy="514800"/>
+            <a:off x="8907120" y="3177000"/>
+            <a:ext cx="442080" cy="514440"/>
           </a:xfrm>
           <a:prstGeom prst="straightConnector1">
             <a:avLst/>
@@ -22650,8 +22830,8 @@
         </p:nvCxnSpPr>
         <p:spPr>
           <a:xfrm flipH="1" flipV="1">
-            <a:off x="9335520" y="2059560"/>
-            <a:ext cx="822600" cy="195120"/>
+            <a:off x="9334800" y="2059200"/>
+            <a:ext cx="822960" cy="195480"/>
           </a:xfrm>
           <a:prstGeom prst="straightConnector1">
             <a:avLst/>
@@ -22673,7 +22853,7 @@
         <p:spPr>
           <a:xfrm>
             <a:off x="2722320" y="5330520"/>
-            <a:ext cx="1821240" cy="379080"/>
+            <a:ext cx="1820520" cy="378360"/>
           </a:xfrm>
           <a:prstGeom prst="diamond">
             <a:avLst/>
@@ -22740,8 +22920,8 @@
         </p:nvCxnSpPr>
         <p:spPr>
           <a:xfrm flipH="1">
-            <a:off x="3633120" y="4411440"/>
-            <a:ext cx="663840" cy="919440"/>
+            <a:off x="3632760" y="4411440"/>
+            <a:ext cx="664200" cy="919440"/>
           </a:xfrm>
           <a:prstGeom prst="straightConnector1">
             <a:avLst/>
@@ -22765,8 +22945,8 @@
         </p:nvCxnSpPr>
         <p:spPr>
           <a:xfrm flipH="1">
-            <a:off x="4543560" y="4800600"/>
-            <a:ext cx="562320" cy="720000"/>
+            <a:off x="4542840" y="4800600"/>
+            <a:ext cx="562680" cy="719640"/>
           </a:xfrm>
           <a:prstGeom prst="straightConnector1">
             <a:avLst/>
@@ -22788,7 +22968,7 @@
         <p:spPr>
           <a:xfrm>
             <a:off x="7315200" y="4114800"/>
-            <a:ext cx="1671840" cy="379080"/>
+            <a:ext cx="1671120" cy="378360"/>
           </a:xfrm>
           <a:prstGeom prst="ellipse">
             <a:avLst/>
@@ -22853,8 +23033,8 @@
         </p:nvCxnSpPr>
         <p:spPr>
           <a:xfrm flipH="1" flipV="1">
-            <a:off x="8987040" y="4304520"/>
-            <a:ext cx="415440" cy="457560"/>
+            <a:off x="8986320" y="4304160"/>
+            <a:ext cx="416160" cy="457560"/>
           </a:xfrm>
           <a:prstGeom prst="straightConnector1">
             <a:avLst/>
@@ -22906,7 +23086,7 @@
         <p:spPr>
           <a:xfrm flipH="1">
             <a:off x="0" y="3073320"/>
-            <a:ext cx="1837440" cy="8640"/>
+            <a:ext cx="1838160" cy="9360"/>
           </a:xfrm>
           <a:prstGeom prst="straightConnector1">
             <a:avLst/>
@@ -22929,7 +23109,7 @@
         <p:spPr>
           <a:xfrm>
             <a:off x="0" y="2489400"/>
-            <a:ext cx="1837440" cy="8640"/>
+            <a:ext cx="1838160" cy="9360"/>
           </a:xfrm>
           <a:prstGeom prst="straightConnector1">
             <a:avLst/>
@@ -22952,7 +23132,7 @@
         <p:spPr>
           <a:xfrm>
             <a:off x="0" y="2781360"/>
-            <a:ext cx="1837440" cy="8640"/>
+            <a:ext cx="1838160" cy="9360"/>
           </a:xfrm>
           <a:prstGeom prst="straightConnector1">
             <a:avLst/>
@@ -22975,7 +23155,7 @@
         <p:spPr>
           <a:xfrm flipH="1">
             <a:off x="0" y="3657600"/>
-            <a:ext cx="1837440" cy="8640"/>
+            <a:ext cx="1838160" cy="9360"/>
           </a:xfrm>
           <a:prstGeom prst="straightConnector1">
             <a:avLst/>
@@ -22997,7 +23177,7 @@
         <p:spPr>
           <a:xfrm>
             <a:off x="128520" y="6134040"/>
-            <a:ext cx="1563120" cy="379080"/>
+            <a:ext cx="1562400" cy="378360"/>
           </a:xfrm>
           <a:prstGeom prst="diamond">
             <a:avLst/>
@@ -23062,7 +23242,7 @@
         <p:spPr>
           <a:xfrm>
             <a:off x="302760" y="5454000"/>
-            <a:ext cx="1214640" cy="379080"/>
+            <a:ext cx="1213920" cy="378360"/>
           </a:xfrm>
           <a:prstGeom prst="ellipse">
             <a:avLst/>
@@ -23125,9 +23305,9 @@
         <p:grpSpPr>
           <a:xfrm>
             <a:off x="101160" y="336240"/>
-            <a:ext cx="1617840" cy="777960"/>
+            <a:ext cx="1617120" cy="777960"/>
             <a:chOff x="101160" y="336240"/>
-            <a:chExt cx="1617840" cy="777960"/>
+            <a:chExt cx="1617120" cy="777960"/>
           </a:xfrm>
         </p:grpSpPr>
         <p:sp>
@@ -23139,7 +23319,7 @@
           <p:spPr>
             <a:xfrm>
               <a:off x="101160" y="336240"/>
-              <a:ext cx="1617840" cy="303120"/>
+              <a:ext cx="1617120" cy="303120"/>
             </a:xfrm>
             <a:prstGeom prst="rect">
               <a:avLst/>
@@ -23196,7 +23376,7 @@
           <p:spPr>
             <a:xfrm>
               <a:off x="101160" y="597600"/>
-              <a:ext cx="1617840" cy="516600"/>
+              <a:ext cx="1617120" cy="516600"/>
             </a:xfrm>
             <a:prstGeom prst="rect">
               <a:avLst/>
@@ -23287,7 +23467,7 @@
         <p:spPr>
           <a:xfrm>
             <a:off x="128520" y="4629600"/>
-            <a:ext cx="1563120" cy="523800"/>
+            <a:ext cx="1562400" cy="523080"/>
           </a:xfrm>
           <a:prstGeom prst="diamond">
             <a:avLst/>
@@ -23375,7 +23555,7 @@
         <p:spPr>
           <a:xfrm>
             <a:off x="0" y="3365640"/>
-            <a:ext cx="1837440" cy="8640"/>
+            <a:ext cx="1838160" cy="9360"/>
           </a:xfrm>
           <a:prstGeom prst="straightConnector1">
             <a:avLst/>
@@ -23397,7 +23577,7 @@
         <p:spPr>
           <a:xfrm>
             <a:off x="673200" y="3949920"/>
-            <a:ext cx="474120" cy="379080"/>
+            <a:ext cx="473400" cy="378360"/>
           </a:xfrm>
           <a:prstGeom prst="triangle">
             <a:avLst>
@@ -23464,9 +23644,9 @@
         <p:grpSpPr>
           <a:xfrm>
             <a:off x="101160" y="1413000"/>
-            <a:ext cx="1617840" cy="777960"/>
+            <a:ext cx="1617120" cy="777960"/>
             <a:chOff x="101160" y="1413000"/>
-            <a:chExt cx="1617840" cy="777960"/>
+            <a:chExt cx="1617120" cy="777960"/>
           </a:xfrm>
         </p:grpSpPr>
         <p:sp>
@@ -23478,7 +23658,7 @@
           <p:spPr>
             <a:xfrm>
               <a:off x="101160" y="1413000"/>
-              <a:ext cx="1617840" cy="303120"/>
+              <a:ext cx="1617120" cy="303120"/>
             </a:xfrm>
             <a:prstGeom prst="rect">
               <a:avLst/>
@@ -23536,7 +23716,7 @@
           <p:spPr>
             <a:xfrm>
               <a:off x="101160" y="1674360"/>
-              <a:ext cx="1617840" cy="516600"/>
+              <a:ext cx="1617120" cy="516600"/>
             </a:xfrm>
             <a:prstGeom prst="rect">
               <a:avLst/>
@@ -23619,6 +23799,423 @@
           </p:txBody>
         </p:sp>
       </p:grpSp>
+      <p:grpSp>
+        <p:nvGrpSpPr>
+          <p:cNvPr id="363" name="Group 21"/>
+          <p:cNvGrpSpPr/>
+          <p:nvPr/>
+        </p:nvGrpSpPr>
+        <p:grpSpPr>
+          <a:xfrm>
+            <a:off x="3886200" y="2286000"/>
+            <a:ext cx="1617120" cy="1418400"/>
+            <a:chOff x="3886200" y="2286000"/>
+            <a:chExt cx="1617120" cy="1418400"/>
+          </a:xfrm>
+        </p:grpSpPr>
+        <p:sp>
+          <p:nvSpPr>
+            <p:cNvPr id="364" name="TextBox 75"/>
+            <p:cNvSpPr/>
+            <p:nvPr/>
+          </p:nvSpPr>
+          <p:spPr>
+            <a:xfrm>
+              <a:off x="3886200" y="2286000"/>
+              <a:ext cx="1617120" cy="303120"/>
+            </a:xfrm>
+            <a:prstGeom prst="rect">
+              <a:avLst/>
+            </a:prstGeom>
+            <a:solidFill>
+              <a:schemeClr val="bg1"/>
+            </a:solidFill>
+            <a:ln w="0">
+              <a:solidFill>
+                <a:srgbClr val="000000"/>
+              </a:solidFill>
+            </a:ln>
+          </p:spPr>
+          <p:style>
+            <a:lnRef idx="0"/>
+            <a:fillRef idx="0"/>
+            <a:effectRef idx="0"/>
+            <a:fontRef idx="minor"/>
+          </p:style>
+          <p:txBody>
+            <a:bodyPr lIns="90000" rIns="90000" tIns="45000" bIns="45000" anchor="t">
+              <a:spAutoFit/>
+            </a:bodyPr>
+            <a:p>
+              <a:pPr algn="ctr" defTabSz="914400">
+                <a:lnSpc>
+                  <a:spcPct val="100000"/>
+                </a:lnSpc>
+              </a:pPr>
+              <a:r>
+                <a:rPr b="0" lang="en-US" sz="1400" spc="-1" strike="noStrike">
+                  <a:solidFill>
+                    <a:schemeClr val="dk1"/>
+                  </a:solidFill>
+                  <a:latin typeface="Calibri"/>
+                </a:rPr>
+                <a:t>Timer</a:t>
+              </a:r>
+              <a:endParaRPr b="0" lang="en-US" sz="1400" spc="-1" strike="noStrike">
+                <a:solidFill>
+                  <a:srgbClr val="000000"/>
+                </a:solidFill>
+                <a:latin typeface="Arial"/>
+              </a:endParaRPr>
+            </a:p>
+          </p:txBody>
+        </p:sp>
+        <p:sp>
+          <p:nvSpPr>
+            <p:cNvPr id="365" name="TextBox 76"/>
+            <p:cNvSpPr/>
+            <p:nvPr/>
+          </p:nvSpPr>
+          <p:spPr>
+            <a:xfrm>
+              <a:off x="3886200" y="2547360"/>
+              <a:ext cx="1617120" cy="1157040"/>
+            </a:xfrm>
+            <a:prstGeom prst="rect">
+              <a:avLst/>
+            </a:prstGeom>
+            <a:solidFill>
+              <a:schemeClr val="bg1"/>
+            </a:solidFill>
+            <a:ln w="0">
+              <a:solidFill>
+                <a:srgbClr val="000000"/>
+              </a:solidFill>
+            </a:ln>
+          </p:spPr>
+          <p:style>
+            <a:lnRef idx="0"/>
+            <a:fillRef idx="0"/>
+            <a:effectRef idx="0"/>
+            <a:fontRef idx="minor"/>
+          </p:style>
+          <p:txBody>
+            <a:bodyPr lIns="90000" rIns="90000" tIns="45000" bIns="45000" anchor="t">
+              <a:spAutoFit/>
+            </a:bodyPr>
+            <a:p>
+              <a:pPr marL="304920" indent="-304920" defTabSz="914400">
+                <a:lnSpc>
+                  <a:spcPct val="100000"/>
+                </a:lnSpc>
+                <a:buClr>
+                  <a:srgbClr val="000000"/>
+                </a:buClr>
+                <a:buFont typeface="OpenSymbol"/>
+                <a:buChar char="-"/>
+              </a:pPr>
+              <a:r>
+                <a:rPr b="0" lang="en-US" sz="1400" spc="-1" strike="noStrike" u="sng">
+                  <a:solidFill>
+                    <a:schemeClr val="dk1"/>
+                  </a:solidFill>
+                  <a:uFillTx/>
+                  <a:latin typeface="Calibri"/>
+                </a:rPr>
+                <a:t>ID</a:t>
+              </a:r>
+              <a:endParaRPr b="0" lang="en-US" sz="1400" spc="-1" strike="noStrike">
+                <a:solidFill>
+                  <a:srgbClr val="000000"/>
+                </a:solidFill>
+                <a:latin typeface="Arial"/>
+              </a:endParaRPr>
+            </a:p>
+            <a:p>
+              <a:pPr marL="304920" indent="-304920" defTabSz="914400">
+                <a:lnSpc>
+                  <a:spcPct val="100000"/>
+                </a:lnSpc>
+                <a:buClr>
+                  <a:srgbClr val="000000"/>
+                </a:buClr>
+                <a:buFont typeface="OpenSymbol"/>
+                <a:buChar char="-"/>
+              </a:pPr>
+              <a:r>
+                <a:rPr b="0" lang="en-US" sz="1400" spc="-1" strike="noStrike" u="sng">
+                  <a:solidFill>
+                    <a:schemeClr val="dk1"/>
+                  </a:solidFill>
+                  <a:uFillTx/>
+                  <a:latin typeface="Calibri"/>
+                </a:rPr>
+                <a:t>Type</a:t>
+              </a:r>
+              <a:endParaRPr b="0" lang="en-US" sz="1400" spc="-1" strike="noStrike">
+                <a:solidFill>
+                  <a:srgbClr val="000000"/>
+                </a:solidFill>
+                <a:latin typeface="Arial"/>
+              </a:endParaRPr>
+            </a:p>
+            <a:p>
+              <a:pPr marL="304920" indent="-304920" defTabSz="914400">
+                <a:lnSpc>
+                  <a:spcPct val="100000"/>
+                </a:lnSpc>
+                <a:buClr>
+                  <a:srgbClr val="000000"/>
+                </a:buClr>
+                <a:buFont typeface="OpenSymbol"/>
+                <a:buChar char="-"/>
+              </a:pPr>
+              <a:r>
+                <a:rPr b="0" lang="en-US" sz="1400" spc="-1" strike="noStrike">
+                  <a:solidFill>
+                    <a:schemeClr val="dk1"/>
+                  </a:solidFill>
+                  <a:latin typeface="Calibri"/>
+                </a:rPr>
+                <a:t>Start</a:t>
+              </a:r>
+              <a:endParaRPr b="0" lang="en-US" sz="1400" spc="-1" strike="noStrike">
+                <a:solidFill>
+                  <a:srgbClr val="000000"/>
+                </a:solidFill>
+                <a:latin typeface="Arial"/>
+              </a:endParaRPr>
+            </a:p>
+            <a:p>
+              <a:pPr marL="304920" indent="-304920" defTabSz="914400">
+                <a:lnSpc>
+                  <a:spcPct val="100000"/>
+                </a:lnSpc>
+                <a:buClr>
+                  <a:srgbClr val="000000"/>
+                </a:buClr>
+                <a:buFont typeface="OpenSymbol"/>
+                <a:buChar char="-"/>
+              </a:pPr>
+              <a:r>
+                <a:rPr b="0" lang="en-US" sz="1400" spc="-1" strike="noStrike">
+                  <a:solidFill>
+                    <a:schemeClr val="dk1"/>
+                  </a:solidFill>
+                  <a:latin typeface="Calibri"/>
+                </a:rPr>
+                <a:t>Done</a:t>
+              </a:r>
+              <a:endParaRPr b="0" lang="en-US" sz="1400" spc="-1" strike="noStrike">
+                <a:solidFill>
+                  <a:srgbClr val="000000"/>
+                </a:solidFill>
+                <a:latin typeface="Arial"/>
+              </a:endParaRPr>
+            </a:p>
+            <a:p>
+              <a:pPr marL="304920" indent="-304920" defTabSz="914400">
+                <a:lnSpc>
+                  <a:spcPct val="100000"/>
+                </a:lnSpc>
+                <a:buClr>
+                  <a:srgbClr val="000000"/>
+                </a:buClr>
+                <a:buFont typeface="OpenSymbol"/>
+                <a:buChar char="-"/>
+              </a:pPr>
+              <a:r>
+                <a:rPr b="0" lang="en-US" sz="1400" spc="-1" strike="noStrike">
+                  <a:solidFill>
+                    <a:schemeClr val="dk1"/>
+                  </a:solidFill>
+                  <a:latin typeface="Calibri"/>
+                </a:rPr>
+                <a:t>Duration</a:t>
+              </a:r>
+              <a:endParaRPr b="0" lang="en-US" sz="1400" spc="-1" strike="noStrike">
+                <a:solidFill>
+                  <a:srgbClr val="000000"/>
+                </a:solidFill>
+                <a:latin typeface="Arial"/>
+              </a:endParaRPr>
+            </a:p>
+          </p:txBody>
+        </p:sp>
+      </p:grpSp>
+      <p:sp>
+        <p:nvSpPr>
+          <p:cNvPr id="366" name="TextBox 77"/>
+          <p:cNvSpPr/>
+          <p:nvPr/>
+        </p:nvSpPr>
+        <p:spPr>
+          <a:xfrm>
+            <a:off x="6400800" y="228600"/>
+            <a:ext cx="1617120" cy="303120"/>
+          </a:xfrm>
+          <a:prstGeom prst="rect">
+            <a:avLst/>
+          </a:prstGeom>
+          <a:solidFill>
+            <a:schemeClr val="bg1"/>
+          </a:solidFill>
+          <a:ln w="0">
+            <a:solidFill>
+              <a:srgbClr val="000000"/>
+            </a:solidFill>
+          </a:ln>
+        </p:spPr>
+        <p:style>
+          <a:lnRef idx="0"/>
+          <a:fillRef idx="0"/>
+          <a:effectRef idx="0"/>
+          <a:fontRef idx="minor"/>
+        </p:style>
+        <p:txBody>
+          <a:bodyPr lIns="90000" rIns="90000" tIns="45000" bIns="45000" anchor="t">
+            <a:spAutoFit/>
+          </a:bodyPr>
+          <a:p>
+            <a:pPr algn="ctr" defTabSz="914400">
+              <a:lnSpc>
+                <a:spcPct val="100000"/>
+              </a:lnSpc>
+            </a:pPr>
+            <a:r>
+              <a:rPr b="0" lang="en-US" sz="1400" spc="-1" strike="noStrike">
+                <a:solidFill>
+                  <a:schemeClr val="dk1"/>
+                </a:solidFill>
+                <a:latin typeface="Calibri"/>
+              </a:rPr>
+              <a:t>Settlement</a:t>
+            </a:r>
+            <a:endParaRPr b="0" lang="en-US" sz="1400" spc="-1" strike="noStrike">
+              <a:solidFill>
+                <a:srgbClr val="000000"/>
+              </a:solidFill>
+              <a:latin typeface="Arial"/>
+            </a:endParaRPr>
+          </a:p>
+        </p:txBody>
+      </p:sp>
+      <p:sp>
+        <p:nvSpPr>
+          <p:cNvPr id="367" name="Diamond 30"/>
+          <p:cNvSpPr/>
+          <p:nvPr/>
+        </p:nvSpPr>
+        <p:spPr>
+          <a:xfrm>
+            <a:off x="4381200" y="914400"/>
+            <a:ext cx="2019600" cy="378360"/>
+          </a:xfrm>
+          <a:prstGeom prst="diamond">
+            <a:avLst/>
+          </a:prstGeom>
+          <a:solidFill>
+            <a:schemeClr val="bg1"/>
+          </a:solidFill>
+          <a:ln>
+            <a:solidFill>
+              <a:srgbClr val="000000"/>
+            </a:solidFill>
+          </a:ln>
+        </p:spPr>
+        <p:style>
+          <a:lnRef idx="2">
+            <a:schemeClr val="accent1">
+              <a:shade val="50000"/>
+            </a:schemeClr>
+          </a:lnRef>
+          <a:fillRef idx="1">
+            <a:schemeClr val="accent1"/>
+          </a:fillRef>
+          <a:effectRef idx="0">
+            <a:schemeClr val="accent1"/>
+          </a:effectRef>
+          <a:fontRef idx="minor"/>
+        </p:style>
+        <p:txBody>
+          <a:bodyPr lIns="90000" rIns="90000" tIns="45000" bIns="45000" anchor="ctr">
+            <a:noAutofit/>
+          </a:bodyPr>
+          <a:p>
+            <a:pPr algn="ctr" defTabSz="914400">
+              <a:lnSpc>
+                <a:spcPct val="100000"/>
+              </a:lnSpc>
+            </a:pPr>
+            <a:r>
+              <a:rPr b="0" lang="en-US" sz="1400" spc="-1" strike="noStrike">
+                <a:solidFill>
+                  <a:schemeClr val="dk1"/>
+                </a:solidFill>
+                <a:latin typeface="Calibri"/>
+              </a:rPr>
+              <a:t>belongsTo</a:t>
+            </a:r>
+            <a:endParaRPr b="0" lang="en-US" sz="1400" spc="-1" strike="noStrike">
+              <a:solidFill>
+                <a:srgbClr val="000000"/>
+              </a:solidFill>
+              <a:latin typeface="Arial"/>
+            </a:endParaRPr>
+          </a:p>
+        </p:txBody>
+      </p:sp>
+      <p:cxnSp>
+        <p:nvCxnSpPr>
+          <p:cNvPr id="368" name="Straight Arrow Connector 50"/>
+          <p:cNvCxnSpPr>
+            <a:stCxn id="363" idx="0"/>
+            <a:endCxn id="367" idx="2"/>
+          </p:cNvCxnSpPr>
+          <p:nvPr/>
+        </p:nvCxnSpPr>
+        <p:spPr>
+          <a:xfrm flipV="1">
+            <a:off x="4694760" y="1292760"/>
+            <a:ext cx="696600" cy="993600"/>
+          </a:xfrm>
+          <a:prstGeom prst="straightConnector1">
+            <a:avLst/>
+          </a:prstGeom>
+          <a:ln cap="sq" w="76200">
+            <a:solidFill>
+              <a:srgbClr val="000000"/>
+            </a:solidFill>
+            <a:round/>
+            <a:tailEnd len="sm" type="triangle" w="sm"/>
+          </a:ln>
+        </p:spPr>
+      </p:cxnSp>
+      <p:cxnSp>
+        <p:nvCxnSpPr>
+          <p:cNvPr id="369" name="Straight Arrow Connector 76"/>
+          <p:cNvCxnSpPr>
+            <a:stCxn id="367" idx="0"/>
+            <a:endCxn id="366" idx="1"/>
+          </p:cNvCxnSpPr>
+          <p:nvPr/>
+        </p:nvCxnSpPr>
+        <p:spPr>
+          <a:xfrm flipV="1">
+            <a:off x="5391000" y="380160"/>
+            <a:ext cx="1010160" cy="534600"/>
+          </a:xfrm>
+          <a:prstGeom prst="straightConnector1">
+            <a:avLst/>
+          </a:prstGeom>
+          <a:ln w="25400">
+            <a:solidFill>
+              <a:srgbClr val="000000"/>
+            </a:solidFill>
+            <a:round/>
+          </a:ln>
+        </p:spPr>
+      </p:cxnSp>
     </p:spTree>
   </p:cSld>
   <mc:AlternateContent>

</xml_diff>

<commit_message>
changed timer database to support multiple timers of the same thing
</commit_message>
<xml_diff>
--- a/documentation/database/ER-Diagram.pptx
+++ b/documentation/database/ER-Diagram.pptx
@@ -353,7 +353,7 @@
             <a:pPr indent="0" algn="r">
               <a:buNone/>
             </a:pPr>
-            <a:fld id="{57229D11-BDAA-4016-85BD-28BAB6CF3145}" type="slidenum">
+            <a:fld id="{89D071E3-AB1A-4926-84D3-42DE81DAB11C}" type="slidenum">
               <a:rPr b="0" lang="en-US" sz="1400" spc="-1" strike="noStrike">
                 <a:solidFill>
                   <a:srgbClr val="000000"/>
@@ -407,7 +407,7 @@
         <p:spPr>
           <a:xfrm>
             <a:off x="685800" y="1143000"/>
-            <a:ext cx="5477040" cy="3076920"/>
+            <a:ext cx="5476680" cy="3076560"/>
           </a:xfrm>
           <a:prstGeom prst="rect">
             <a:avLst/>
@@ -430,7 +430,7 @@
         <p:spPr>
           <a:xfrm>
             <a:off x="685800" y="4400640"/>
-            <a:ext cx="5477040" cy="3591000"/>
+            <a:ext cx="5476680" cy="3590640"/>
           </a:xfrm>
           <a:prstGeom prst="rect">
             <a:avLst/>
@@ -470,7 +470,7 @@
         <p:spPr>
           <a:xfrm>
             <a:off x="3884760" y="8685360"/>
-            <a:ext cx="2962440" cy="449280"/>
+            <a:ext cx="2962080" cy="448920"/>
           </a:xfrm>
           <a:prstGeom prst="rect">
             <a:avLst/>
@@ -512,7 +512,7 @@
                 <a:tab algn="l" pos="0"/>
               </a:tabLst>
             </a:pPr>
-            <a:fld id="{E301C199-FA6F-4360-9B0F-D6B1CFF74AF4}" type="slidenum">
+            <a:fld id="{FBA6920A-D71C-45D9-B2D9-0BF3D655507E}" type="slidenum">
               <a:rPr b="0" lang="en-US" sz="1200" spc="-1" strike="noStrike">
                 <a:solidFill>
                   <a:schemeClr val="dk1"/>
@@ -566,7 +566,7 @@
         <p:spPr>
           <a:xfrm>
             <a:off x="685800" y="1143000"/>
-            <a:ext cx="5477040" cy="3076920"/>
+            <a:ext cx="5476680" cy="3076560"/>
           </a:xfrm>
           <a:prstGeom prst="rect">
             <a:avLst/>
@@ -589,7 +589,7 @@
         <p:spPr>
           <a:xfrm>
             <a:off x="685800" y="4400640"/>
-            <a:ext cx="5477040" cy="3591000"/>
+            <a:ext cx="5476680" cy="3590640"/>
           </a:xfrm>
           <a:prstGeom prst="rect">
             <a:avLst/>
@@ -629,7 +629,7 @@
         <p:spPr>
           <a:xfrm>
             <a:off x="3884760" y="8685360"/>
-            <a:ext cx="2962440" cy="449280"/>
+            <a:ext cx="2962080" cy="448920"/>
           </a:xfrm>
           <a:prstGeom prst="rect">
             <a:avLst/>
@@ -671,7 +671,7 @@
                 <a:tab algn="l" pos="0"/>
               </a:tabLst>
             </a:pPr>
-            <a:fld id="{27FB8F77-2785-466A-9E16-387A3AD9E635}" type="slidenum">
+            <a:fld id="{9D683BD9-EE53-44E0-BE88-6CBE7BDBC2E0}" type="slidenum">
               <a:rPr b="0" lang="en-US" sz="1200" spc="-1" strike="noStrike">
                 <a:solidFill>
                   <a:schemeClr val="dk1"/>
@@ -725,7 +725,7 @@
         <p:spPr>
           <a:xfrm>
             <a:off x="685800" y="1143000"/>
-            <a:ext cx="5477040" cy="3076920"/>
+            <a:ext cx="5476680" cy="3076560"/>
           </a:xfrm>
           <a:prstGeom prst="rect">
             <a:avLst/>
@@ -748,7 +748,7 @@
         <p:spPr>
           <a:xfrm>
             <a:off x="685800" y="4400640"/>
-            <a:ext cx="5477040" cy="3591000"/>
+            <a:ext cx="5476680" cy="3590640"/>
           </a:xfrm>
           <a:prstGeom prst="rect">
             <a:avLst/>
@@ -788,7 +788,7 @@
         <p:spPr>
           <a:xfrm>
             <a:off x="3884760" y="8685360"/>
-            <a:ext cx="2962440" cy="449280"/>
+            <a:ext cx="2962080" cy="448920"/>
           </a:xfrm>
           <a:prstGeom prst="rect">
             <a:avLst/>
@@ -830,7 +830,7 @@
                 <a:tab algn="l" pos="0"/>
               </a:tabLst>
             </a:pPr>
-            <a:fld id="{F30E8691-D0DA-430B-8B53-34C0450F63C6}" type="slidenum">
+            <a:fld id="{9708E284-0C76-4FC7-B389-4E83CBA6BE5D}" type="slidenum">
               <a:rPr b="0" lang="en-US" sz="1200" spc="-1" strike="noStrike">
                 <a:solidFill>
                   <a:schemeClr val="dk1"/>
@@ -884,7 +884,7 @@
         <p:spPr>
           <a:xfrm>
             <a:off x="685800" y="1143000"/>
-            <a:ext cx="5477040" cy="3076920"/>
+            <a:ext cx="5476680" cy="3076560"/>
           </a:xfrm>
           <a:prstGeom prst="rect">
             <a:avLst/>
@@ -907,7 +907,7 @@
         <p:spPr>
           <a:xfrm>
             <a:off x="685800" y="4400640"/>
-            <a:ext cx="5477040" cy="3591000"/>
+            <a:ext cx="5476680" cy="3590640"/>
           </a:xfrm>
           <a:prstGeom prst="rect">
             <a:avLst/>
@@ -947,7 +947,7 @@
         <p:spPr>
           <a:xfrm>
             <a:off x="3884760" y="8685360"/>
-            <a:ext cx="2962440" cy="449280"/>
+            <a:ext cx="2962080" cy="448920"/>
           </a:xfrm>
           <a:prstGeom prst="rect">
             <a:avLst/>
@@ -989,7 +989,7 @@
                 <a:tab algn="l" pos="0"/>
               </a:tabLst>
             </a:pPr>
-            <a:fld id="{4467FD2A-2E18-49E8-A577-DFA9F0875736}" type="slidenum">
+            <a:fld id="{4F821FA5-06A7-4EE3-B36E-A1403C593BF0}" type="slidenum">
               <a:rPr b="0" lang="en-US" sz="1200" spc="-1" strike="noStrike">
                 <a:solidFill>
                   <a:schemeClr val="dk1"/>
@@ -1233,7 +1233,7 @@
         <p:txBody>
           <a:bodyPr/>
           <a:p>
-            <a:fld id="{B3E8FFDD-231B-4A6E-89CA-531F52B1F3EC}" type="slidenum">
+            <a:fld id="{88E3BC21-ED12-4334-8746-0B998E7A74ED}" type="slidenum">
               <a:t>&lt;#&gt;</a:t>
             </a:fld>
           </a:p>
@@ -1442,7 +1442,7 @@
         <p:txBody>
           <a:bodyPr/>
           <a:p>
-            <a:fld id="{7EBD316E-475D-4053-9B61-70B8261E7E9B}" type="slidenum">
+            <a:fld id="{9499798E-0834-47EF-9EB0-42DAA6EB0270}" type="slidenum">
               <a:t>&lt;#&gt;</a:t>
             </a:fld>
           </a:p>
@@ -1565,7 +1565,7 @@
         <p:txBody>
           <a:bodyPr/>
           <a:p>
-            <a:fld id="{21F1AC4A-8F6A-4380-AEFF-B81B58589E2E}" type="slidenum">
+            <a:fld id="{DFAF1C40-1B2F-4A77-A882-A86DB808B4E6}" type="slidenum">
               <a:t>&lt;#&gt;</a:t>
             </a:fld>
           </a:p>
@@ -1648,7 +1648,7 @@
         <p:txBody>
           <a:bodyPr/>
           <a:p>
-            <a:fld id="{82D0C1F7-4208-4AE0-AFFF-77A3261DADC4}" type="slidenum">
+            <a:fld id="{B366114B-FD64-49AF-A4F1-B00241A11F53}" type="slidenum">
               <a:t>&lt;#&gt;</a:t>
             </a:fld>
           </a:p>
@@ -1900,7 +1900,7 @@
         <p:txBody>
           <a:bodyPr/>
           <a:p>
-            <a:fld id="{99132F7B-01C5-43B2-B820-BC51AFFDB119}" type="slidenum">
+            <a:fld id="{CE640D2D-0E0C-4B16-A1BA-07DE286A2C6D}" type="slidenum">
               <a:t>&lt;#&gt;</a:t>
             </a:fld>
           </a:p>
@@ -2152,7 +2152,7 @@
         <p:txBody>
           <a:bodyPr/>
           <a:p>
-            <a:fld id="{8683F332-CAE9-4D1C-B1EF-679983B0FE41}" type="slidenum">
+            <a:fld id="{AC22A12E-1E73-4265-A637-37B24195F35D}" type="slidenum">
               <a:t>&lt;#&gt;</a:t>
             </a:fld>
           </a:p>
@@ -2361,7 +2361,7 @@
         <p:txBody>
           <a:bodyPr/>
           <a:p>
-            <a:fld id="{B0D61EAE-87D7-42F5-9450-ED032142804F}" type="slidenum">
+            <a:fld id="{38B38650-DC8E-4928-9E38-4B6F5961CB53}" type="slidenum">
               <a:t>&lt;#&gt;</a:t>
             </a:fld>
           </a:p>
@@ -2656,7 +2656,7 @@
         <p:txBody>
           <a:bodyPr/>
           <a:p>
-            <a:fld id="{EB3FA5E5-BC41-4A0B-9009-C60C9AC6496A}" type="slidenum">
+            <a:fld id="{463A04B5-3D28-43F2-A884-CB4F233165A4}" type="slidenum">
               <a:t>&lt;#&gt;</a:t>
             </a:fld>
           </a:p>
@@ -2739,7 +2739,7 @@
         <p:txBody>
           <a:bodyPr/>
           <a:p>
-            <a:fld id="{0D8378C4-C55F-49D2-8911-6E4890A1495D}" type="slidenum">
+            <a:fld id="{7572CA26-5637-4058-9479-227B9B34B663}" type="slidenum">
               <a:t>&lt;#&gt;</a:t>
             </a:fld>
           </a:p>
@@ -2822,7 +2822,7 @@
         <p:txBody>
           <a:bodyPr/>
           <a:p>
-            <a:fld id="{CC2BF099-4BEE-46B5-8EC7-FC3F1915D826}" type="slidenum">
+            <a:fld id="{EB782888-BC49-4B2E-9226-12A5C622A457}" type="slidenum">
               <a:t>&lt;#&gt;</a:t>
             </a:fld>
           </a:p>
@@ -2988,7 +2988,7 @@
         <p:txBody>
           <a:bodyPr/>
           <a:p>
-            <a:fld id="{99B91320-895E-4C15-BBB2-E2F30E807CCE}" type="slidenum">
+            <a:fld id="{22D46E88-600B-4BC3-8867-F4A6E07B1A76}" type="slidenum">
               <a:t>&lt;#&gt;</a:t>
             </a:fld>
           </a:p>
@@ -3154,7 +3154,7 @@
         <p:txBody>
           <a:bodyPr/>
           <a:p>
-            <a:fld id="{326900FE-F18B-4F0D-BC0B-CCE954E45D80}" type="slidenum">
+            <a:fld id="{4B90E507-032B-47B6-BB2E-58F3CD655D12}" type="slidenum">
               <a:t>&lt;#&gt;</a:t>
             </a:fld>
           </a:p>
@@ -3219,9 +3219,9 @@
         <p:grpSpPr>
           <a:xfrm>
             <a:off x="6199200" y="6162840"/>
-            <a:ext cx="5983560" cy="685800"/>
+            <a:ext cx="5983200" cy="685440"/>
             <a:chOff x="6199200" y="6162840"/>
-            <a:chExt cx="5983560" cy="685800"/>
+            <a:chExt cx="5983200" cy="685440"/>
           </a:xfrm>
         </p:grpSpPr>
         <p:pic>
@@ -3237,7 +3237,7 @@
           <p:spPr>
             <a:xfrm>
               <a:off x="6199200" y="6162840"/>
-              <a:ext cx="4047120" cy="685800"/>
+              <a:ext cx="4046760" cy="685440"/>
             </a:xfrm>
             <a:prstGeom prst="rect">
               <a:avLst/>
@@ -3260,7 +3260,7 @@
           <p:spPr>
             <a:xfrm>
               <a:off x="10270080" y="6162840"/>
-              <a:ext cx="1912680" cy="602280"/>
+              <a:ext cx="1912320" cy="601920"/>
             </a:xfrm>
             <a:prstGeom prst="rect">
               <a:avLst/>
@@ -4026,7 +4026,7 @@
         <p:spPr>
           <a:xfrm>
             <a:off x="4038480" y="6356520"/>
-            <a:ext cx="4105440" cy="355680"/>
+            <a:ext cx="4105080" cy="355320"/>
           </a:xfrm>
           <a:prstGeom prst="rect">
             <a:avLst/>
@@ -4098,7 +4098,7 @@
         <p:spPr>
           <a:xfrm>
             <a:off x="8610480" y="6356520"/>
-            <a:ext cx="2733840" cy="355680"/>
+            <a:ext cx="2733480" cy="355320"/>
           </a:xfrm>
           <a:prstGeom prst="rect">
             <a:avLst/>
@@ -4141,7 +4141,7 @@
                 <a:tab algn="l" pos="0"/>
               </a:tabLst>
             </a:pPr>
-            <a:fld id="{EF7CE9E3-D7C9-4430-BCEE-F7B3A360FA23}" type="slidenum">
+            <a:fld id="{4E379E05-C7FE-46F6-BC41-6C323B016E2E}" type="slidenum">
               <a:rPr b="0" lang="en-US" sz="1200" spc="-1" strike="noStrike">
                 <a:solidFill>
                   <a:schemeClr val="dk1">
@@ -4174,7 +4174,7 @@
         <p:spPr>
           <a:xfrm>
             <a:off x="838080" y="6356520"/>
-            <a:ext cx="2733840" cy="355680"/>
+            <a:ext cx="2733480" cy="355320"/>
           </a:xfrm>
           <a:prstGeom prst="rect">
             <a:avLst/>
@@ -4263,9 +4263,9 @@
         <p:grpSpPr>
           <a:xfrm>
             <a:off x="6199200" y="6162840"/>
-            <a:ext cx="5983560" cy="685800"/>
+            <a:ext cx="5983200" cy="685440"/>
             <a:chOff x="6199200" y="6162840"/>
-            <a:chExt cx="5983560" cy="685800"/>
+            <a:chExt cx="5983200" cy="685440"/>
           </a:xfrm>
         </p:grpSpPr>
         <p:pic>
@@ -4281,7 +4281,7 @@
           <p:spPr>
             <a:xfrm>
               <a:off x="6199200" y="6162840"/>
-              <a:ext cx="4047120" cy="685800"/>
+              <a:ext cx="4046760" cy="685440"/>
             </a:xfrm>
             <a:prstGeom prst="rect">
               <a:avLst/>
@@ -4304,7 +4304,7 @@
           <p:spPr>
             <a:xfrm>
               <a:off x="10270080" y="6162840"/>
-              <a:ext cx="1912680" cy="602280"/>
+              <a:ext cx="1912320" cy="601920"/>
             </a:xfrm>
             <a:prstGeom prst="rect">
               <a:avLst/>
@@ -4827,7 +4827,7 @@
         <p:spPr>
           <a:xfrm>
             <a:off x="4038480" y="6356520"/>
-            <a:ext cx="4105440" cy="355680"/>
+            <a:ext cx="4105080" cy="355320"/>
           </a:xfrm>
           <a:prstGeom prst="rect">
             <a:avLst/>
@@ -4899,7 +4899,7 @@
         <p:spPr>
           <a:xfrm>
             <a:off x="8610480" y="6356520"/>
-            <a:ext cx="2733840" cy="355680"/>
+            <a:ext cx="2733480" cy="355320"/>
           </a:xfrm>
           <a:prstGeom prst="rect">
             <a:avLst/>
@@ -4942,7 +4942,7 @@
                 <a:tab algn="l" pos="0"/>
               </a:tabLst>
             </a:pPr>
-            <a:fld id="{94D78E71-1CFB-432D-80A3-CDB9BC749B4B}" type="slidenum">
+            <a:fld id="{344489B5-002F-4A6D-A295-21846810AC14}" type="slidenum">
               <a:rPr b="0" lang="en-US" sz="1200" spc="-1" strike="noStrike">
                 <a:solidFill>
                   <a:schemeClr val="dk1">
@@ -4975,7 +4975,7 @@
         <p:spPr>
           <a:xfrm>
             <a:off x="838080" y="6356520"/>
-            <a:ext cx="2733840" cy="355680"/>
+            <a:ext cx="2733480" cy="355320"/>
           </a:xfrm>
           <a:prstGeom prst="rect">
             <a:avLst/>
@@ -5064,9 +5064,9 @@
         <p:grpSpPr>
           <a:xfrm>
             <a:off x="6199200" y="6162840"/>
-            <a:ext cx="5983560" cy="685800"/>
+            <a:ext cx="5983200" cy="685440"/>
             <a:chOff x="6199200" y="6162840"/>
-            <a:chExt cx="5983560" cy="685800"/>
+            <a:chExt cx="5983200" cy="685440"/>
           </a:xfrm>
         </p:grpSpPr>
         <p:pic>
@@ -5082,7 +5082,7 @@
           <p:spPr>
             <a:xfrm>
               <a:off x="6199200" y="6162840"/>
-              <a:ext cx="4047120" cy="685800"/>
+              <a:ext cx="4046760" cy="685440"/>
             </a:xfrm>
             <a:prstGeom prst="rect">
               <a:avLst/>
@@ -5105,7 +5105,7 @@
           <p:spPr>
             <a:xfrm>
               <a:off x="10270080" y="6162840"/>
-              <a:ext cx="1912680" cy="602280"/>
+              <a:ext cx="1912320" cy="601920"/>
             </a:xfrm>
             <a:prstGeom prst="rect">
               <a:avLst/>
@@ -5178,7 +5178,7 @@
         <p:spPr>
           <a:xfrm>
             <a:off x="4038480" y="6356520"/>
-            <a:ext cx="4105440" cy="355680"/>
+            <a:ext cx="4105080" cy="355320"/>
           </a:xfrm>
           <a:prstGeom prst="rect">
             <a:avLst/>
@@ -5250,7 +5250,7 @@
         <p:spPr>
           <a:xfrm>
             <a:off x="8610480" y="6356520"/>
-            <a:ext cx="2733840" cy="355680"/>
+            <a:ext cx="2733480" cy="355320"/>
           </a:xfrm>
           <a:prstGeom prst="rect">
             <a:avLst/>
@@ -5293,7 +5293,7 @@
                 <a:tab algn="l" pos="0"/>
               </a:tabLst>
             </a:pPr>
-            <a:fld id="{48DF9E17-C252-478A-9457-76A5F6DDA4E9}" type="slidenum">
+            <a:fld id="{4E031B1D-AF9C-475D-8CD3-5C56D64458D9}" type="slidenum">
               <a:rPr b="0" lang="en-US" sz="1200" spc="-1" strike="noStrike">
                 <a:solidFill>
                   <a:schemeClr val="dk1">
@@ -5326,7 +5326,7 @@
         <p:spPr>
           <a:xfrm>
             <a:off x="838080" y="6356520"/>
-            <a:ext cx="2733840" cy="355680"/>
+            <a:ext cx="2733480" cy="355320"/>
           </a:xfrm>
           <a:prstGeom prst="rect">
             <a:avLst/>
@@ -5415,9 +5415,9 @@
         <p:grpSpPr>
           <a:xfrm>
             <a:off x="6199200" y="6162840"/>
-            <a:ext cx="5983560" cy="685800"/>
+            <a:ext cx="5983200" cy="685440"/>
             <a:chOff x="6199200" y="6162840"/>
-            <a:chExt cx="5983560" cy="685800"/>
+            <a:chExt cx="5983200" cy="685440"/>
           </a:xfrm>
         </p:grpSpPr>
         <p:pic>
@@ -5433,7 +5433,7 @@
           <p:spPr>
             <a:xfrm>
               <a:off x="6199200" y="6162840"/>
-              <a:ext cx="4047120" cy="685800"/>
+              <a:ext cx="4046760" cy="685440"/>
             </a:xfrm>
             <a:prstGeom prst="rect">
               <a:avLst/>
@@ -5456,7 +5456,7 @@
           <p:spPr>
             <a:xfrm>
               <a:off x="10270080" y="6162840"/>
-              <a:ext cx="1912680" cy="602280"/>
+              <a:ext cx="1912320" cy="601920"/>
             </a:xfrm>
             <a:prstGeom prst="rect">
               <a:avLst/>
@@ -5480,7 +5480,7 @@
         <p:spPr>
           <a:xfrm>
             <a:off x="4038480" y="6356520"/>
-            <a:ext cx="4105440" cy="355680"/>
+            <a:ext cx="4105080" cy="355320"/>
           </a:xfrm>
           <a:prstGeom prst="rect">
             <a:avLst/>
@@ -5552,7 +5552,7 @@
         <p:spPr>
           <a:xfrm>
             <a:off x="8610480" y="6356520"/>
-            <a:ext cx="2733840" cy="355680"/>
+            <a:ext cx="2733480" cy="355320"/>
           </a:xfrm>
           <a:prstGeom prst="rect">
             <a:avLst/>
@@ -5595,7 +5595,7 @@
                 <a:tab algn="l" pos="0"/>
               </a:tabLst>
             </a:pPr>
-            <a:fld id="{5953867D-A2C8-4349-8DAC-A14AD673942C}" type="slidenum">
+            <a:fld id="{35A6C5AA-0A1C-421B-B8FC-48D11AA13098}" type="slidenum">
               <a:rPr b="0" lang="en-US" sz="1200" spc="-1" strike="noStrike">
                 <a:solidFill>
                   <a:schemeClr val="dk1">
@@ -5628,7 +5628,7 @@
         <p:spPr>
           <a:xfrm>
             <a:off x="838080" y="6356520"/>
-            <a:ext cx="2733840" cy="355680"/>
+            <a:ext cx="2733480" cy="355320"/>
           </a:xfrm>
           <a:prstGeom prst="rect">
             <a:avLst/>
@@ -5717,9 +5717,9 @@
         <p:grpSpPr>
           <a:xfrm>
             <a:off x="6199200" y="6162840"/>
-            <a:ext cx="5983560" cy="685800"/>
+            <a:ext cx="5983200" cy="685440"/>
             <a:chOff x="6199200" y="6162840"/>
-            <a:chExt cx="5983560" cy="685800"/>
+            <a:chExt cx="5983200" cy="685440"/>
           </a:xfrm>
         </p:grpSpPr>
         <p:pic>
@@ -5735,7 +5735,7 @@
           <p:spPr>
             <a:xfrm>
               <a:off x="6199200" y="6162840"/>
-              <a:ext cx="4047120" cy="685800"/>
+              <a:ext cx="4046760" cy="685440"/>
             </a:xfrm>
             <a:prstGeom prst="rect">
               <a:avLst/>
@@ -5758,7 +5758,7 @@
           <p:spPr>
             <a:xfrm>
               <a:off x="10270080" y="6162840"/>
-              <a:ext cx="1912680" cy="602280"/>
+              <a:ext cx="1912320" cy="601920"/>
             </a:xfrm>
             <a:prstGeom prst="rect">
               <a:avLst/>
@@ -5807,7 +5807,7 @@
                 </a:solidFill>
                 <a:latin typeface="Arial"/>
               </a:rPr>
-              <a:t>Click to edit </a:t>
+              <a:t>Click to edit the </a:t>
             </a:r>
             <a:r>
               <a:rPr b="0" lang="en-US" sz="1800" spc="-1" strike="noStrike">
@@ -5816,16 +5816,7 @@
                 </a:solidFill>
                 <a:latin typeface="Arial"/>
               </a:rPr>
-              <a:t>the title text </a:t>
-            </a:r>
-            <a:r>
-              <a:rPr b="0" lang="en-US" sz="1800" spc="-1" strike="noStrike">
-                <a:solidFill>
-                  <a:srgbClr val="000000"/>
-                </a:solidFill>
-                <a:latin typeface="Arial"/>
-              </a:rPr>
-              <a:t>format</a:t>
+              <a:t>title text format</a:t>
             </a:r>
             <a:endParaRPr b="0" lang="en-US" sz="1800" spc="-1" strike="noStrike">
               <a:solidFill>
@@ -6524,7 +6515,7 @@
         <p:spPr>
           <a:xfrm>
             <a:off x="4038480" y="6356520"/>
-            <a:ext cx="4105440" cy="355680"/>
+            <a:ext cx="4105080" cy="355320"/>
           </a:xfrm>
           <a:prstGeom prst="rect">
             <a:avLst/>
@@ -6596,7 +6587,7 @@
         <p:spPr>
           <a:xfrm>
             <a:off x="8610480" y="6356520"/>
-            <a:ext cx="2733840" cy="355680"/>
+            <a:ext cx="2733480" cy="355320"/>
           </a:xfrm>
           <a:prstGeom prst="rect">
             <a:avLst/>
@@ -6639,7 +6630,7 @@
                 <a:tab algn="l" pos="0"/>
               </a:tabLst>
             </a:pPr>
-            <a:fld id="{547B0E2D-4069-4B63-8CC6-442416772129}" type="slidenum">
+            <a:fld id="{59D4116A-2DD4-4A15-B8CE-E6172B48AFA2}" type="slidenum">
               <a:rPr b="0" lang="en-US" sz="1200" spc="-1" strike="noStrike">
                 <a:solidFill>
                   <a:schemeClr val="dk1">
@@ -6672,7 +6663,7 @@
         <p:spPr>
           <a:xfrm>
             <a:off x="838080" y="6356520"/>
-            <a:ext cx="2733840" cy="355680"/>
+            <a:ext cx="2733480" cy="355320"/>
           </a:xfrm>
           <a:prstGeom prst="rect">
             <a:avLst/>
@@ -6761,9 +6752,9 @@
         <p:grpSpPr>
           <a:xfrm>
             <a:off x="6199200" y="6162840"/>
-            <a:ext cx="5983560" cy="685800"/>
+            <a:ext cx="5983200" cy="685440"/>
             <a:chOff x="6199200" y="6162840"/>
-            <a:chExt cx="5983560" cy="685800"/>
+            <a:chExt cx="5983200" cy="685440"/>
           </a:xfrm>
         </p:grpSpPr>
         <p:pic>
@@ -6779,7 +6770,7 @@
           <p:spPr>
             <a:xfrm>
               <a:off x="6199200" y="6162840"/>
-              <a:ext cx="4047120" cy="685800"/>
+              <a:ext cx="4046760" cy="685440"/>
             </a:xfrm>
             <a:prstGeom prst="rect">
               <a:avLst/>
@@ -6802,7 +6793,7 @@
           <p:spPr>
             <a:xfrm>
               <a:off x="10270080" y="6162840"/>
-              <a:ext cx="1912680" cy="602280"/>
+              <a:ext cx="1912320" cy="601920"/>
             </a:xfrm>
             <a:prstGeom prst="rect">
               <a:avLst/>
@@ -7613,7 +7604,7 @@
         <p:spPr>
           <a:xfrm>
             <a:off x="4038480" y="6356520"/>
-            <a:ext cx="4105440" cy="355680"/>
+            <a:ext cx="4105080" cy="355320"/>
           </a:xfrm>
           <a:prstGeom prst="rect">
             <a:avLst/>
@@ -7685,7 +7676,7 @@
         <p:spPr>
           <a:xfrm>
             <a:off x="8610480" y="6356520"/>
-            <a:ext cx="2733840" cy="355680"/>
+            <a:ext cx="2733480" cy="355320"/>
           </a:xfrm>
           <a:prstGeom prst="rect">
             <a:avLst/>
@@ -7728,7 +7719,7 @@
                 <a:tab algn="l" pos="0"/>
               </a:tabLst>
             </a:pPr>
-            <a:fld id="{BA041AD5-445A-4E7C-8F03-09F2375ED0D8}" type="slidenum">
+            <a:fld id="{6DD8444D-8B80-4D62-A7DA-234F835260CB}" type="slidenum">
               <a:rPr b="0" lang="en-US" sz="1200" spc="-1" strike="noStrike">
                 <a:solidFill>
                   <a:schemeClr val="dk1">
@@ -7761,7 +7752,7 @@
         <p:spPr>
           <a:xfrm>
             <a:off x="838080" y="6356520"/>
-            <a:ext cx="2733840" cy="355680"/>
+            <a:ext cx="2733480" cy="355320"/>
           </a:xfrm>
           <a:prstGeom prst="rect">
             <a:avLst/>
@@ -7850,9 +7841,9 @@
         <p:grpSpPr>
           <a:xfrm>
             <a:off x="6199200" y="6162840"/>
-            <a:ext cx="5983560" cy="685800"/>
+            <a:ext cx="5983200" cy="685440"/>
             <a:chOff x="6199200" y="6162840"/>
-            <a:chExt cx="5983560" cy="685800"/>
+            <a:chExt cx="5983200" cy="685440"/>
           </a:xfrm>
         </p:grpSpPr>
         <p:pic>
@@ -7868,7 +7859,7 @@
           <p:spPr>
             <a:xfrm>
               <a:off x="6199200" y="6162840"/>
-              <a:ext cx="4047120" cy="685800"/>
+              <a:ext cx="4046760" cy="685440"/>
             </a:xfrm>
             <a:prstGeom prst="rect">
               <a:avLst/>
@@ -7891,7 +7882,7 @@
           <p:spPr>
             <a:xfrm>
               <a:off x="10270080" y="6162840"/>
-              <a:ext cx="1912680" cy="602280"/>
+              <a:ext cx="1912320" cy="601920"/>
             </a:xfrm>
             <a:prstGeom prst="rect">
               <a:avLst/>
@@ -8432,7 +8423,7 @@
         <p:spPr>
           <a:xfrm>
             <a:off x="4038480" y="6356520"/>
-            <a:ext cx="4105440" cy="355680"/>
+            <a:ext cx="4105080" cy="355320"/>
           </a:xfrm>
           <a:prstGeom prst="rect">
             <a:avLst/>
@@ -8504,7 +8495,7 @@
         <p:spPr>
           <a:xfrm>
             <a:off x="8610480" y="6356520"/>
-            <a:ext cx="2733840" cy="355680"/>
+            <a:ext cx="2733480" cy="355320"/>
           </a:xfrm>
           <a:prstGeom prst="rect">
             <a:avLst/>
@@ -8547,7 +8538,7 @@
                 <a:tab algn="l" pos="0"/>
               </a:tabLst>
             </a:pPr>
-            <a:fld id="{916D257C-6981-44A4-B744-F6B58165A0F3}" type="slidenum">
+            <a:fld id="{A971DD6F-FD89-4AC8-B63F-A9A74EAF776C}" type="slidenum">
               <a:rPr b="0" lang="en-US" sz="1200" spc="-1" strike="noStrike">
                 <a:solidFill>
                   <a:schemeClr val="dk1">
@@ -8580,7 +8571,7 @@
         <p:spPr>
           <a:xfrm>
             <a:off x="838080" y="6356520"/>
-            <a:ext cx="2733840" cy="355680"/>
+            <a:ext cx="2733480" cy="355320"/>
           </a:xfrm>
           <a:prstGeom prst="rect">
             <a:avLst/>
@@ -8669,9 +8660,9 @@
         <p:grpSpPr>
           <a:xfrm>
             <a:off x="6199200" y="6162840"/>
-            <a:ext cx="5983560" cy="685800"/>
+            <a:ext cx="5983200" cy="685440"/>
             <a:chOff x="6199200" y="6162840"/>
-            <a:chExt cx="5983560" cy="685800"/>
+            <a:chExt cx="5983200" cy="685440"/>
           </a:xfrm>
         </p:grpSpPr>
         <p:pic>
@@ -8687,7 +8678,7 @@
           <p:spPr>
             <a:xfrm>
               <a:off x="6199200" y="6162840"/>
-              <a:ext cx="4047120" cy="685800"/>
+              <a:ext cx="4046760" cy="685440"/>
             </a:xfrm>
             <a:prstGeom prst="rect">
               <a:avLst/>
@@ -8710,7 +8701,7 @@
           <p:spPr>
             <a:xfrm>
               <a:off x="10270080" y="6162840"/>
-              <a:ext cx="1912680" cy="602280"/>
+              <a:ext cx="1912320" cy="601920"/>
             </a:xfrm>
             <a:prstGeom prst="rect">
               <a:avLst/>
@@ -8759,70 +8750,7 @@
                 </a:solidFill>
                 <a:latin typeface="Arial"/>
               </a:rPr>
-              <a:t>Click </a:t>
-            </a:r>
-            <a:r>
-              <a:rPr b="0" lang="en-US" sz="1800" spc="-1" strike="noStrike">
-                <a:solidFill>
-                  <a:srgbClr val="000000"/>
-                </a:solidFill>
-                <a:latin typeface="Arial"/>
-              </a:rPr>
-              <a:t>to </a:t>
-            </a:r>
-            <a:r>
-              <a:rPr b="0" lang="en-US" sz="1800" spc="-1" strike="noStrike">
-                <a:solidFill>
-                  <a:srgbClr val="000000"/>
-                </a:solidFill>
-                <a:latin typeface="Arial"/>
-              </a:rPr>
-              <a:t>edit </a:t>
-            </a:r>
-            <a:r>
-              <a:rPr b="0" lang="en-US" sz="1800" spc="-1" strike="noStrike">
-                <a:solidFill>
-                  <a:srgbClr val="000000"/>
-                </a:solidFill>
-                <a:latin typeface="Arial"/>
-              </a:rPr>
-              <a:t>the </a:t>
-            </a:r>
-            <a:r>
-              <a:rPr b="0" lang="en-US" sz="1800" spc="-1" strike="noStrike">
-                <a:solidFill>
-                  <a:srgbClr val="000000"/>
-                </a:solidFill>
-                <a:latin typeface="Arial"/>
-              </a:rPr>
-              <a:t>title </a:t>
-            </a:r>
-            <a:r>
-              <a:rPr b="0" lang="en-US" sz="1800" spc="-1" strike="noStrike">
-                <a:solidFill>
-                  <a:srgbClr val="000000"/>
-                </a:solidFill>
-                <a:latin typeface="Arial"/>
-              </a:rPr>
-              <a:t>text </a:t>
-            </a:r>
-            <a:r>
-              <a:rPr b="0" lang="en-US" sz="1800" spc="-1" strike="noStrike">
-                <a:solidFill>
-                  <a:srgbClr val="000000"/>
-                </a:solidFill>
-                <a:latin typeface="Arial"/>
-              </a:rPr>
-              <a:t>forma</a:t>
-            </a:r>
-            <a:r>
-              <a:rPr b="0" lang="en-US" sz="1800" spc="-1" strike="noStrike">
-                <a:solidFill>
-                  <a:srgbClr val="000000"/>
-                </a:solidFill>
-                <a:latin typeface="Arial"/>
-              </a:rPr>
-              <a:t>t</a:t>
+              <a:t>Click to edit the title text format</a:t>
             </a:r>
             <a:endParaRPr b="0" lang="en-US" sz="1800" spc="-1" strike="noStrike">
               <a:solidFill>
@@ -9746,7 +9674,7 @@
         <p:spPr>
           <a:xfrm>
             <a:off x="4038480" y="6356520"/>
-            <a:ext cx="4105440" cy="355680"/>
+            <a:ext cx="4105080" cy="355320"/>
           </a:xfrm>
           <a:prstGeom prst="rect">
             <a:avLst/>
@@ -9818,7 +9746,7 @@
         <p:spPr>
           <a:xfrm>
             <a:off x="8610480" y="6356520"/>
-            <a:ext cx="2733840" cy="355680"/>
+            <a:ext cx="2733480" cy="355320"/>
           </a:xfrm>
           <a:prstGeom prst="rect">
             <a:avLst/>
@@ -9861,7 +9789,7 @@
                 <a:tab algn="l" pos="0"/>
               </a:tabLst>
             </a:pPr>
-            <a:fld id="{3A43645C-2369-4B23-9DEF-63CFFCA182A5}" type="slidenum">
+            <a:fld id="{6099D9B1-DC3C-45A6-821F-79B311410703}" type="slidenum">
               <a:rPr b="0" lang="en-US" sz="1200" spc="-1" strike="noStrike">
                 <a:solidFill>
                   <a:schemeClr val="dk1">
@@ -9894,7 +9822,7 @@
         <p:spPr>
           <a:xfrm>
             <a:off x="838080" y="6356520"/>
-            <a:ext cx="2733840" cy="355680"/>
+            <a:ext cx="2733480" cy="355320"/>
           </a:xfrm>
           <a:prstGeom prst="rect">
             <a:avLst/>
@@ -9983,9 +9911,9 @@
         <p:grpSpPr>
           <a:xfrm>
             <a:off x="6199200" y="6162840"/>
-            <a:ext cx="5983560" cy="685800"/>
+            <a:ext cx="5983200" cy="685440"/>
             <a:chOff x="6199200" y="6162840"/>
-            <a:chExt cx="5983560" cy="685800"/>
+            <a:chExt cx="5983200" cy="685440"/>
           </a:xfrm>
         </p:grpSpPr>
         <p:pic>
@@ -10001,7 +9929,7 @@
           <p:spPr>
             <a:xfrm>
               <a:off x="6199200" y="6162840"/>
-              <a:ext cx="4047120" cy="685800"/>
+              <a:ext cx="4046760" cy="685440"/>
             </a:xfrm>
             <a:prstGeom prst="rect">
               <a:avLst/>
@@ -10024,7 +9952,7 @@
           <p:spPr>
             <a:xfrm>
               <a:off x="10270080" y="6162840"/>
-              <a:ext cx="1912680" cy="602280"/>
+              <a:ext cx="1912320" cy="601920"/>
             </a:xfrm>
             <a:prstGeom prst="rect">
               <a:avLst/>
@@ -10048,7 +9976,7 @@
         <p:spPr>
           <a:xfrm>
             <a:off x="4038480" y="6356520"/>
-            <a:ext cx="4105440" cy="355680"/>
+            <a:ext cx="4105080" cy="355320"/>
           </a:xfrm>
           <a:prstGeom prst="rect">
             <a:avLst/>
@@ -10120,7 +10048,7 @@
         <p:spPr>
           <a:xfrm>
             <a:off x="8610480" y="6356520"/>
-            <a:ext cx="2733840" cy="355680"/>
+            <a:ext cx="2733480" cy="355320"/>
           </a:xfrm>
           <a:prstGeom prst="rect">
             <a:avLst/>
@@ -10163,7 +10091,7 @@
                 <a:tab algn="l" pos="0"/>
               </a:tabLst>
             </a:pPr>
-            <a:fld id="{FE93C859-8FFC-4EEE-A157-2C16D6A0F25A}" type="slidenum">
+            <a:fld id="{057BD7B9-9026-4E1D-B0E1-5F38CA5DBD75}" type="slidenum">
               <a:rPr b="0" lang="en-US" sz="1200" spc="-1" strike="noStrike">
                 <a:solidFill>
                   <a:schemeClr val="dk1">
@@ -10196,7 +10124,7 @@
         <p:spPr>
           <a:xfrm>
             <a:off x="838080" y="6356520"/>
-            <a:ext cx="2733840" cy="355680"/>
+            <a:ext cx="2733480" cy="355320"/>
           </a:xfrm>
           <a:prstGeom prst="rect">
             <a:avLst/>
@@ -10285,9 +10213,9 @@
         <p:grpSpPr>
           <a:xfrm>
             <a:off x="6199200" y="6162840"/>
-            <a:ext cx="5983560" cy="685800"/>
+            <a:ext cx="5983200" cy="685440"/>
             <a:chOff x="6199200" y="6162840"/>
-            <a:chExt cx="5983560" cy="685800"/>
+            <a:chExt cx="5983200" cy="685440"/>
           </a:xfrm>
         </p:grpSpPr>
         <p:pic>
@@ -10303,7 +10231,7 @@
           <p:spPr>
             <a:xfrm>
               <a:off x="6199200" y="6162840"/>
-              <a:ext cx="4047120" cy="685800"/>
+              <a:ext cx="4046760" cy="685440"/>
             </a:xfrm>
             <a:prstGeom prst="rect">
               <a:avLst/>
@@ -10326,7 +10254,7 @@
           <p:spPr>
             <a:xfrm>
               <a:off x="10270080" y="6162840"/>
-              <a:ext cx="1912680" cy="602280"/>
+              <a:ext cx="1912320" cy="601920"/>
             </a:xfrm>
             <a:prstGeom prst="rect">
               <a:avLst/>
@@ -10350,7 +10278,7 @@
         <p:spPr>
           <a:xfrm>
             <a:off x="4038480" y="6356520"/>
-            <a:ext cx="4105440" cy="355680"/>
+            <a:ext cx="4105080" cy="355320"/>
           </a:xfrm>
           <a:prstGeom prst="rect">
             <a:avLst/>
@@ -10422,7 +10350,7 @@
         <p:spPr>
           <a:xfrm>
             <a:off x="8610480" y="6356520"/>
-            <a:ext cx="2733840" cy="355680"/>
+            <a:ext cx="2733480" cy="355320"/>
           </a:xfrm>
           <a:prstGeom prst="rect">
             <a:avLst/>
@@ -10465,7 +10393,7 @@
                 <a:tab algn="l" pos="0"/>
               </a:tabLst>
             </a:pPr>
-            <a:fld id="{85BC06D0-ED03-4BD5-A7B9-808F8F353BAD}" type="slidenum">
+            <a:fld id="{6A8AC39E-9006-4F3E-8E38-640A417DC461}" type="slidenum">
               <a:rPr b="0" lang="en-US" sz="1200" spc="-1" strike="noStrike">
                 <a:solidFill>
                   <a:schemeClr val="dk1">
@@ -10498,7 +10426,7 @@
         <p:spPr>
           <a:xfrm>
             <a:off x="838080" y="6356520"/>
-            <a:ext cx="2733840" cy="355680"/>
+            <a:ext cx="2733480" cy="355320"/>
           </a:xfrm>
           <a:prstGeom prst="rect">
             <a:avLst/>
@@ -10861,9 +10789,9 @@
         <p:grpSpPr>
           <a:xfrm>
             <a:off x="6199200" y="6162840"/>
-            <a:ext cx="5983560" cy="685800"/>
+            <a:ext cx="5983200" cy="685440"/>
             <a:chOff x="6199200" y="6162840"/>
-            <a:chExt cx="5983560" cy="685800"/>
+            <a:chExt cx="5983200" cy="685440"/>
           </a:xfrm>
         </p:grpSpPr>
         <p:pic>
@@ -10879,7 +10807,7 @@
           <p:spPr>
             <a:xfrm>
               <a:off x="6199200" y="6162840"/>
-              <a:ext cx="4047120" cy="685800"/>
+              <a:ext cx="4046760" cy="685440"/>
             </a:xfrm>
             <a:prstGeom prst="rect">
               <a:avLst/>
@@ -10902,7 +10830,7 @@
           <p:spPr>
             <a:xfrm>
               <a:off x="10270080" y="6162840"/>
-              <a:ext cx="1912680" cy="602280"/>
+              <a:ext cx="1912320" cy="601920"/>
             </a:xfrm>
             <a:prstGeom prst="rect">
               <a:avLst/>
@@ -11200,7 +11128,7 @@
         <p:spPr>
           <a:xfrm>
             <a:off x="4038480" y="6356520"/>
-            <a:ext cx="4105440" cy="355680"/>
+            <a:ext cx="4105080" cy="355320"/>
           </a:xfrm>
           <a:prstGeom prst="rect">
             <a:avLst/>
@@ -11272,7 +11200,7 @@
         <p:spPr>
           <a:xfrm>
             <a:off x="8610480" y="6356520"/>
-            <a:ext cx="2733840" cy="355680"/>
+            <a:ext cx="2733480" cy="355320"/>
           </a:xfrm>
           <a:prstGeom prst="rect">
             <a:avLst/>
@@ -11315,7 +11243,7 @@
                 <a:tab algn="l" pos="0"/>
               </a:tabLst>
             </a:pPr>
-            <a:fld id="{A49EAFC4-5B0E-45F3-8ABB-B3D2783EF7AA}" type="slidenum">
+            <a:fld id="{7E8C9F21-2EBD-4D91-98EB-9C849B3AE824}" type="slidenum">
               <a:rPr b="0" lang="en-US" sz="1200" spc="-1" strike="noStrike">
                 <a:solidFill>
                   <a:schemeClr val="dk1">
@@ -11348,7 +11276,7 @@
         <p:spPr>
           <a:xfrm>
             <a:off x="838080" y="6356520"/>
-            <a:ext cx="2733840" cy="355680"/>
+            <a:ext cx="2733480" cy="355320"/>
           </a:xfrm>
           <a:prstGeom prst="rect">
             <a:avLst/>
@@ -11437,9 +11365,9 @@
         <p:grpSpPr>
           <a:xfrm>
             <a:off x="6199200" y="6162840"/>
-            <a:ext cx="5983560" cy="685800"/>
+            <a:ext cx="5983200" cy="685440"/>
             <a:chOff x="6199200" y="6162840"/>
-            <a:chExt cx="5983560" cy="685800"/>
+            <a:chExt cx="5983200" cy="685440"/>
           </a:xfrm>
         </p:grpSpPr>
         <p:pic>
@@ -11455,7 +11383,7 @@
           <p:spPr>
             <a:xfrm>
               <a:off x="6199200" y="6162840"/>
-              <a:ext cx="4047120" cy="685800"/>
+              <a:ext cx="4046760" cy="685440"/>
             </a:xfrm>
             <a:prstGeom prst="rect">
               <a:avLst/>
@@ -11478,7 +11406,7 @@
           <p:spPr>
             <a:xfrm>
               <a:off x="10270080" y="6162840"/>
-              <a:ext cx="1912680" cy="602280"/>
+              <a:ext cx="1912320" cy="601920"/>
             </a:xfrm>
             <a:prstGeom prst="rect">
               <a:avLst/>
@@ -11776,7 +11704,7 @@
         <p:spPr>
           <a:xfrm>
             <a:off x="4038480" y="6356520"/>
-            <a:ext cx="4105440" cy="355680"/>
+            <a:ext cx="4105080" cy="355320"/>
           </a:xfrm>
           <a:prstGeom prst="rect">
             <a:avLst/>
@@ -11848,7 +11776,7 @@
         <p:spPr>
           <a:xfrm>
             <a:off x="8610480" y="6356520"/>
-            <a:ext cx="2733840" cy="355680"/>
+            <a:ext cx="2733480" cy="355320"/>
           </a:xfrm>
           <a:prstGeom prst="rect">
             <a:avLst/>
@@ -11891,7 +11819,7 @@
                 <a:tab algn="l" pos="0"/>
               </a:tabLst>
             </a:pPr>
-            <a:fld id="{0E052741-4C85-40A0-9662-B8D590E2D82A}" type="slidenum">
+            <a:fld id="{0D9DDAB9-4DB2-405C-BBF8-7B4472F72843}" type="slidenum">
               <a:rPr b="0" lang="en-US" sz="1200" spc="-1" strike="noStrike">
                 <a:solidFill>
                   <a:schemeClr val="dk1">
@@ -11924,7 +11852,7 @@
         <p:spPr>
           <a:xfrm>
             <a:off x="838080" y="6356520"/>
-            <a:ext cx="2733840" cy="355680"/>
+            <a:ext cx="2733480" cy="355320"/>
           </a:xfrm>
           <a:prstGeom prst="rect">
             <a:avLst/>
@@ -12006,7 +11934,7 @@
         <p:spPr>
           <a:xfrm flipH="1">
             <a:off x="0" y="3073320"/>
-            <a:ext cx="1838160" cy="9360"/>
+            <a:ext cx="1838520" cy="9720"/>
           </a:xfrm>
           <a:prstGeom prst="straightConnector1">
             <a:avLst/>
@@ -12029,7 +11957,7 @@
         <p:spPr>
           <a:xfrm>
             <a:off x="0" y="2489400"/>
-            <a:ext cx="1838160" cy="9360"/>
+            <a:ext cx="1838520" cy="9720"/>
           </a:xfrm>
           <a:prstGeom prst="straightConnector1">
             <a:avLst/>
@@ -12052,7 +11980,7 @@
         <p:spPr>
           <a:xfrm>
             <a:off x="0" y="2781360"/>
-            <a:ext cx="1838160" cy="9360"/>
+            <a:ext cx="1838520" cy="9720"/>
           </a:xfrm>
           <a:prstGeom prst="straightConnector1">
             <a:avLst/>
@@ -12075,7 +12003,7 @@
         <p:spPr>
           <a:xfrm flipH="1">
             <a:off x="0" y="3657600"/>
-            <a:ext cx="1838160" cy="9360"/>
+            <a:ext cx="1838520" cy="9720"/>
           </a:xfrm>
           <a:prstGeom prst="straightConnector1">
             <a:avLst/>
@@ -12097,7 +12025,7 @@
         <p:spPr>
           <a:xfrm>
             <a:off x="128520" y="6134040"/>
-            <a:ext cx="1562400" cy="378360"/>
+            <a:ext cx="1562040" cy="378000"/>
           </a:xfrm>
           <a:prstGeom prst="diamond">
             <a:avLst/>
@@ -12162,7 +12090,7 @@
         <p:spPr>
           <a:xfrm>
             <a:off x="302760" y="5454000"/>
-            <a:ext cx="1213920" cy="378360"/>
+            <a:ext cx="1213560" cy="378000"/>
           </a:xfrm>
           <a:prstGeom prst="ellipse">
             <a:avLst/>
@@ -12225,7 +12153,7 @@
         <p:spPr>
           <a:xfrm>
             <a:off x="101160" y="336240"/>
-            <a:ext cx="1617120" cy="303120"/>
+            <a:ext cx="1616760" cy="303120"/>
           </a:xfrm>
           <a:prstGeom prst="rect">
             <a:avLst/>
@@ -12282,7 +12210,7 @@
         <p:spPr>
           <a:xfrm>
             <a:off x="101160" y="597600"/>
-            <a:ext cx="1617120" cy="516600"/>
+            <a:ext cx="1616760" cy="516600"/>
           </a:xfrm>
           <a:prstGeom prst="rect">
             <a:avLst/>
@@ -12372,7 +12300,7 @@
         <p:spPr>
           <a:xfrm>
             <a:off x="101160" y="336240"/>
-            <a:ext cx="1617120" cy="303120"/>
+            <a:ext cx="1616760" cy="303120"/>
           </a:xfrm>
           <a:prstGeom prst="rect">
             <a:avLst/>
@@ -12429,7 +12357,7 @@
         <p:spPr>
           <a:xfrm>
             <a:off x="101160" y="597600"/>
-            <a:ext cx="1617120" cy="516600"/>
+            <a:ext cx="1616760" cy="516600"/>
           </a:xfrm>
           <a:prstGeom prst="rect">
             <a:avLst/>
@@ -12519,7 +12447,7 @@
         <p:spPr>
           <a:xfrm>
             <a:off x="2541600" y="228600"/>
-            <a:ext cx="1617120" cy="303120"/>
+            <a:ext cx="1616760" cy="303120"/>
           </a:xfrm>
           <a:prstGeom prst="rect">
             <a:avLst/>
@@ -12576,7 +12504,7 @@
         <p:spPr>
           <a:xfrm>
             <a:off x="2541600" y="489960"/>
-            <a:ext cx="1617120" cy="1584000"/>
+            <a:ext cx="1616760" cy="1584000"/>
           </a:xfrm>
           <a:prstGeom prst="rect">
             <a:avLst/>
@@ -12801,7 +12729,7 @@
         <p:spPr>
           <a:xfrm>
             <a:off x="6656400" y="228600"/>
-            <a:ext cx="1617120" cy="303120"/>
+            <a:ext cx="1616760" cy="303120"/>
           </a:xfrm>
           <a:prstGeom prst="rect">
             <a:avLst/>
@@ -12858,7 +12786,7 @@
         <p:spPr>
           <a:xfrm>
             <a:off x="6656400" y="489960"/>
-            <a:ext cx="1617120" cy="516600"/>
+            <a:ext cx="1616760" cy="516600"/>
           </a:xfrm>
           <a:prstGeom prst="rect">
             <a:avLst/>
@@ -12948,7 +12876,7 @@
         <p:spPr>
           <a:xfrm>
             <a:off x="6656400" y="228600"/>
-            <a:ext cx="1617120" cy="303120"/>
+            <a:ext cx="1616760" cy="303120"/>
           </a:xfrm>
           <a:prstGeom prst="rect">
             <a:avLst/>
@@ -13005,7 +12933,7 @@
         <p:spPr>
           <a:xfrm>
             <a:off x="6656400" y="489960"/>
-            <a:ext cx="1617120" cy="730080"/>
+            <a:ext cx="1616760" cy="730080"/>
           </a:xfrm>
           <a:prstGeom prst="rect">
             <a:avLst/>
@@ -13122,7 +13050,7 @@
         <p:spPr>
           <a:xfrm>
             <a:off x="128520" y="4629600"/>
-            <a:ext cx="1562400" cy="523080"/>
+            <a:ext cx="1562040" cy="522720"/>
           </a:xfrm>
           <a:prstGeom prst="diamond">
             <a:avLst/>
@@ -13210,7 +13138,7 @@
         <p:spPr>
           <a:xfrm>
             <a:off x="0" y="3365640"/>
-            <a:ext cx="1838160" cy="9360"/>
+            <a:ext cx="1838520" cy="9720"/>
           </a:xfrm>
           <a:prstGeom prst="straightConnector1">
             <a:avLst/>
@@ -13232,7 +13160,7 @@
         <p:spPr>
           <a:xfrm>
             <a:off x="673200" y="3949920"/>
-            <a:ext cx="473400" cy="378360"/>
+            <a:ext cx="473040" cy="378000"/>
           </a:xfrm>
           <a:prstGeom prst="triangle">
             <a:avLst>
@@ -13299,9 +13227,9 @@
         <p:grpSpPr>
           <a:xfrm>
             <a:off x="101160" y="1413000"/>
-            <a:ext cx="1617120" cy="777960"/>
+            <a:ext cx="1616760" cy="777960"/>
             <a:chOff x="101160" y="1413000"/>
-            <a:chExt cx="1617120" cy="777960"/>
+            <a:chExt cx="1616760" cy="777960"/>
           </a:xfrm>
         </p:grpSpPr>
         <p:sp>
@@ -13313,7 +13241,7 @@
           <p:spPr>
             <a:xfrm>
               <a:off x="101160" y="1413000"/>
-              <a:ext cx="1617120" cy="303120"/>
+              <a:ext cx="1616760" cy="303120"/>
             </a:xfrm>
             <a:prstGeom prst="rect">
               <a:avLst/>
@@ -13371,7 +13299,7 @@
           <p:spPr>
             <a:xfrm>
               <a:off x="101160" y="1674360"/>
-              <a:ext cx="1617120" cy="516600"/>
+              <a:ext cx="1616760" cy="516600"/>
             </a:xfrm>
             <a:prstGeom prst="rect">
               <a:avLst/>
@@ -13463,7 +13391,7 @@
         <p:spPr>
           <a:xfrm>
             <a:off x="4426920" y="914400"/>
-            <a:ext cx="1562400" cy="378360"/>
+            <a:ext cx="1562040" cy="378000"/>
           </a:xfrm>
           <a:prstGeom prst="diamond">
             <a:avLst/>
@@ -13530,8 +13458,8 @@
         </p:nvCxnSpPr>
         <p:spPr>
           <a:xfrm flipH="1">
-            <a:off x="5989320" y="855000"/>
-            <a:ext cx="667440" cy="249120"/>
+            <a:off x="5988960" y="855000"/>
+            <a:ext cx="667800" cy="248760"/>
           </a:xfrm>
           <a:prstGeom prst="straightConnector1">
             <a:avLst/>
@@ -13554,7 +13482,7 @@
         <p:spPr>
           <a:xfrm>
             <a:off x="6255720" y="1828800"/>
-            <a:ext cx="1791000" cy="378360"/>
+            <a:ext cx="1790640" cy="378000"/>
           </a:xfrm>
           <a:prstGeom prst="diamond">
             <a:avLst/>
@@ -13621,7 +13549,7 @@
         </p:nvCxnSpPr>
         <p:spPr>
           <a:xfrm flipV="1">
-            <a:off x="7151400" y="1220040"/>
+            <a:off x="7151040" y="1220040"/>
             <a:ext cx="313920" cy="609120"/>
           </a:xfrm>
           <a:prstGeom prst="straightConnector1">
@@ -13645,8 +13573,8 @@
         </p:nvCxnSpPr>
         <p:spPr>
           <a:xfrm flipH="1" flipV="1">
-            <a:off x="7151400" y="2207160"/>
-            <a:ext cx="464040" cy="543240"/>
+            <a:off x="7151040" y="2206800"/>
+            <a:ext cx="464760" cy="543960"/>
           </a:xfrm>
           <a:prstGeom prst="straightConnector1">
             <a:avLst/>
@@ -13669,7 +13597,7 @@
         <p:spPr>
           <a:xfrm>
             <a:off x="128520" y="6134400"/>
-            <a:ext cx="1562400" cy="378360"/>
+            <a:ext cx="1562040" cy="378000"/>
           </a:xfrm>
           <a:prstGeom prst="diamond">
             <a:avLst/>
@@ -13734,9 +13662,9 @@
         <p:grpSpPr>
           <a:xfrm>
             <a:off x="6681960" y="2743200"/>
-            <a:ext cx="1845720" cy="1216440"/>
+            <a:ext cx="1845360" cy="1216440"/>
             <a:chOff x="6681960" y="2743200"/>
-            <a:chExt cx="1845720" cy="1216440"/>
+            <a:chExt cx="1845360" cy="1216440"/>
           </a:xfrm>
         </p:grpSpPr>
         <p:sp>
@@ -13748,7 +13676,7 @@
           <p:spPr>
             <a:xfrm>
               <a:off x="6681960" y="2743200"/>
-              <a:ext cx="1845720" cy="303120"/>
+              <a:ext cx="1845360" cy="303120"/>
             </a:xfrm>
             <a:prstGeom prst="rect">
               <a:avLst/>
@@ -13805,7 +13733,7 @@
           <p:spPr>
             <a:xfrm>
               <a:off x="6681960" y="3016080"/>
-              <a:ext cx="1845720" cy="943560"/>
+              <a:ext cx="1845360" cy="943560"/>
             </a:xfrm>
             <a:prstGeom prst="rect">
               <a:avLst/>
@@ -13952,7 +13880,7 @@
         <p:spPr>
           <a:xfrm>
             <a:off x="9173520" y="3501000"/>
-            <a:ext cx="473400" cy="378360"/>
+            <a:ext cx="473040" cy="378000"/>
           </a:xfrm>
           <a:prstGeom prst="triangle">
             <a:avLst>
@@ -14019,7 +13947,7 @@
         <p:spPr>
           <a:xfrm>
             <a:off x="10287000" y="3126240"/>
-            <a:ext cx="1899720" cy="303120"/>
+            <a:ext cx="1899360" cy="303120"/>
           </a:xfrm>
           <a:prstGeom prst="rect">
             <a:avLst/>
@@ -14076,7 +14004,7 @@
         <p:spPr>
           <a:xfrm>
             <a:off x="10287000" y="3429360"/>
-            <a:ext cx="1899720" cy="1584000"/>
+            <a:ext cx="1899360" cy="1584000"/>
           </a:xfrm>
           <a:prstGeom prst="rect">
             <a:avLst/>
@@ -14284,8 +14212,8 @@
         </p:nvCxnSpPr>
         <p:spPr>
           <a:xfrm>
-            <a:off x="9528840" y="3690360"/>
-            <a:ext cx="758520" cy="531360"/>
+            <a:off x="9528480" y="3690000"/>
+            <a:ext cx="758880" cy="531720"/>
           </a:xfrm>
           <a:prstGeom prst="straightConnector1">
             <a:avLst/>
@@ -14309,8 +14237,8 @@
         </p:nvCxnSpPr>
         <p:spPr>
           <a:xfrm flipH="1" flipV="1">
-            <a:off x="8527680" y="3351240"/>
-            <a:ext cx="764640" cy="339480"/>
+            <a:off x="8527320" y="3351240"/>
+            <a:ext cx="764640" cy="339120"/>
           </a:xfrm>
           <a:prstGeom prst="straightConnector1">
             <a:avLst/>
@@ -14332,7 +14260,7 @@
         <p:spPr>
           <a:xfrm>
             <a:off x="2086200" y="3336840"/>
-            <a:ext cx="1617120" cy="303120"/>
+            <a:ext cx="1616760" cy="303120"/>
           </a:xfrm>
           <a:prstGeom prst="rect">
             <a:avLst/>
@@ -14389,7 +14317,7 @@
         <p:spPr>
           <a:xfrm>
             <a:off x="2086200" y="3598200"/>
-            <a:ext cx="1617120" cy="516600"/>
+            <a:ext cx="1616760" cy="516600"/>
           </a:xfrm>
           <a:prstGeom prst="rect">
             <a:avLst/>
@@ -14479,7 +14407,7 @@
         <p:spPr>
           <a:xfrm>
             <a:off x="2086200" y="3336840"/>
-            <a:ext cx="1617120" cy="303120"/>
+            <a:ext cx="1616760" cy="303120"/>
           </a:xfrm>
           <a:prstGeom prst="rect">
             <a:avLst/>
@@ -14536,7 +14464,7 @@
         <p:spPr>
           <a:xfrm>
             <a:off x="2086200" y="3598200"/>
-            <a:ext cx="1617120" cy="516600"/>
+            <a:ext cx="1616760" cy="516600"/>
           </a:xfrm>
           <a:prstGeom prst="rect">
             <a:avLst/>
@@ -14626,7 +14554,7 @@
         <p:spPr>
           <a:xfrm>
             <a:off x="1883160" y="2514600"/>
-            <a:ext cx="1820160" cy="378360"/>
+            <a:ext cx="1819800" cy="378000"/>
           </a:xfrm>
           <a:prstGeom prst="diamond">
             <a:avLst/>
@@ -14691,7 +14619,7 @@
         <p:spPr>
           <a:xfrm>
             <a:off x="3481560" y="2899800"/>
-            <a:ext cx="1591560" cy="378360"/>
+            <a:ext cx="1591200" cy="378000"/>
           </a:xfrm>
           <a:prstGeom prst="ellipse">
             <a:avLst/>
@@ -14756,8 +14684,8 @@
         </p:nvCxnSpPr>
         <p:spPr>
           <a:xfrm>
-            <a:off x="3703320" y="2703960"/>
-            <a:ext cx="574560" cy="196200"/>
+            <a:off x="3702960" y="2703600"/>
+            <a:ext cx="574560" cy="196560"/>
           </a:xfrm>
           <a:prstGeom prst="straightConnector1">
             <a:avLst/>
@@ -14781,8 +14709,8 @@
         </p:nvCxnSpPr>
         <p:spPr>
           <a:xfrm flipH="1" flipV="1">
-            <a:off x="2793240" y="2892960"/>
-            <a:ext cx="101880" cy="444240"/>
+            <a:off x="2793240" y="2892600"/>
+            <a:ext cx="101520" cy="444600"/>
           </a:xfrm>
           <a:prstGeom prst="straightConnector1">
             <a:avLst/>
@@ -14807,7 +14735,7 @@
         <p:spPr>
           <a:xfrm flipV="1">
             <a:off x="2793240" y="2073960"/>
-            <a:ext cx="557280" cy="441000"/>
+            <a:ext cx="556920" cy="441000"/>
           </a:xfrm>
           <a:prstGeom prst="straightConnector1">
             <a:avLst/>
@@ -14829,7 +14757,7 @@
         <p:spPr>
           <a:xfrm>
             <a:off x="10543680" y="457200"/>
-            <a:ext cx="1617120" cy="303120"/>
+            <a:ext cx="1616760" cy="303120"/>
           </a:xfrm>
           <a:prstGeom prst="rect">
             <a:avLst/>
@@ -14886,7 +14814,7 @@
         <p:spPr>
           <a:xfrm>
             <a:off x="10543680" y="718560"/>
-            <a:ext cx="1617120" cy="516600"/>
+            <a:ext cx="1616760" cy="516600"/>
           </a:xfrm>
           <a:prstGeom prst="rect">
             <a:avLst/>
@@ -14976,7 +14904,7 @@
         <p:spPr>
           <a:xfrm>
             <a:off x="10287000" y="457200"/>
-            <a:ext cx="1617120" cy="303120"/>
+            <a:ext cx="1616760" cy="303120"/>
           </a:xfrm>
           <a:prstGeom prst="rect">
             <a:avLst/>
@@ -15033,7 +14961,7 @@
         <p:spPr>
           <a:xfrm>
             <a:off x="10287000" y="718560"/>
-            <a:ext cx="1873800" cy="2651400"/>
+            <a:ext cx="1873440" cy="2651400"/>
           </a:xfrm>
           <a:prstGeom prst="rect">
             <a:avLst/>
@@ -15367,7 +15295,7 @@
         <p:spPr>
           <a:xfrm>
             <a:off x="8007120" y="1448280"/>
-            <a:ext cx="2049120" cy="378360"/>
+            <a:ext cx="2048760" cy="378000"/>
           </a:xfrm>
           <a:prstGeom prst="diamond">
             <a:avLst/>
@@ -15434,8 +15362,8 @@
         </p:nvCxnSpPr>
         <p:spPr>
           <a:xfrm>
-            <a:off x="9031680" y="1826640"/>
-            <a:ext cx="1255680" cy="2395080"/>
+            <a:off x="9031680" y="1826280"/>
+            <a:ext cx="1255680" cy="2395440"/>
           </a:xfrm>
           <a:prstGeom prst="straightConnector1">
             <a:avLst/>
@@ -15459,8 +15387,8 @@
         </p:nvCxnSpPr>
         <p:spPr>
           <a:xfrm flipH="1" flipV="1">
-            <a:off x="10056240" y="1637640"/>
-            <a:ext cx="231120" cy="406800"/>
+            <a:off x="10055880" y="1637280"/>
+            <a:ext cx="231480" cy="407160"/>
           </a:xfrm>
           <a:prstGeom prst="straightConnector1">
             <a:avLst/>
@@ -15484,8 +15412,8 @@
         </p:nvCxnSpPr>
         <p:spPr>
           <a:xfrm flipH="1" flipV="1">
-            <a:off x="7464960" y="1220040"/>
-            <a:ext cx="1567080" cy="228600"/>
+            <a:off x="7464600" y="1220040"/>
+            <a:ext cx="1567440" cy="228600"/>
           </a:xfrm>
           <a:prstGeom prst="straightConnector1">
             <a:avLst/>
@@ -15507,7 +15435,7 @@
         <p:spPr>
           <a:xfrm>
             <a:off x="5412240" y="5029200"/>
-            <a:ext cx="1617120" cy="303120"/>
+            <a:ext cx="1616760" cy="303120"/>
           </a:xfrm>
           <a:prstGeom prst="rect">
             <a:avLst/>
@@ -15564,7 +15492,7 @@
         <p:spPr>
           <a:xfrm>
             <a:off x="3710160" y="4343400"/>
-            <a:ext cx="1820520" cy="378360"/>
+            <a:ext cx="1820160" cy="378000"/>
           </a:xfrm>
           <a:prstGeom prst="diamond">
             <a:avLst/>
@@ -15631,8 +15559,8 @@
         </p:nvCxnSpPr>
         <p:spPr>
           <a:xfrm>
-            <a:off x="2894760" y="4114800"/>
-            <a:ext cx="815760" cy="418320"/>
+            <a:off x="2894400" y="4114800"/>
+            <a:ext cx="816120" cy="417960"/>
           </a:xfrm>
           <a:prstGeom prst="straightConnector1">
             <a:avLst/>
@@ -15657,8 +15585,8 @@
         </p:nvCxnSpPr>
         <p:spPr>
           <a:xfrm>
-            <a:off x="4620600" y="4721760"/>
-            <a:ext cx="792000" cy="459360"/>
+            <a:off x="4620240" y="4721400"/>
+            <a:ext cx="792360" cy="459720"/>
           </a:xfrm>
           <a:prstGeom prst="straightConnector1">
             <a:avLst/>
@@ -15682,7 +15610,7 @@
         </p:nvCxnSpPr>
         <p:spPr>
           <a:xfrm flipH="1" flipV="1">
-            <a:off x="3350160" y="2073960"/>
+            <a:off x="3349800" y="2073960"/>
             <a:ext cx="2187000" cy="1126800"/>
           </a:xfrm>
           <a:prstGeom prst="straightConnector1">
@@ -15705,7 +15633,7 @@
         <p:spPr>
           <a:xfrm>
             <a:off x="4626720" y="3200400"/>
-            <a:ext cx="1819800" cy="677520"/>
+            <a:ext cx="1819440" cy="677160"/>
           </a:xfrm>
           <a:prstGeom prst="diamond">
             <a:avLst/>
@@ -15772,8 +15700,8 @@
         </p:nvCxnSpPr>
         <p:spPr>
           <a:xfrm flipH="1" flipV="1">
-            <a:off x="5536800" y="3877920"/>
-            <a:ext cx="684360" cy="1151640"/>
+            <a:off x="5536440" y="3877560"/>
+            <a:ext cx="684360" cy="1152000"/>
           </a:xfrm>
           <a:prstGeom prst="straightConnector1">
             <a:avLst/>
@@ -15795,7 +15723,7 @@
         <p:spPr>
           <a:xfrm>
             <a:off x="2693880" y="4415400"/>
-            <a:ext cx="473400" cy="378360"/>
+            <a:ext cx="473040" cy="378000"/>
           </a:xfrm>
           <a:prstGeom prst="triangle">
             <a:avLst>
@@ -15864,7 +15792,7 @@
         </p:nvCxnSpPr>
         <p:spPr>
           <a:xfrm flipH="1" flipV="1">
-            <a:off x="2894760" y="4114800"/>
+            <a:off x="2894400" y="4114800"/>
             <a:ext cx="36360" cy="300960"/>
           </a:xfrm>
           <a:prstGeom prst="straightConnector1">
@@ -15887,7 +15815,7 @@
         <p:spPr>
           <a:xfrm>
             <a:off x="2109960" y="5163480"/>
-            <a:ext cx="1617120" cy="303120"/>
+            <a:ext cx="1616760" cy="303120"/>
           </a:xfrm>
           <a:prstGeom prst="rect">
             <a:avLst/>
@@ -15944,7 +15872,7 @@
         <p:spPr>
           <a:xfrm>
             <a:off x="2109960" y="5163480"/>
-            <a:ext cx="1617120" cy="303120"/>
+            <a:ext cx="1616760" cy="303120"/>
           </a:xfrm>
           <a:prstGeom prst="rect">
             <a:avLst/>
@@ -16001,7 +15929,7 @@
         <p:spPr>
           <a:xfrm>
             <a:off x="2109960" y="5424840"/>
-            <a:ext cx="1617120" cy="363960"/>
+            <a:ext cx="1616760" cy="363960"/>
           </a:xfrm>
           <a:prstGeom prst="rect">
             <a:avLst/>
@@ -16069,8 +15997,8 @@
         </p:nvCxnSpPr>
         <p:spPr>
           <a:xfrm flipH="1">
-            <a:off x="2918520" y="4793760"/>
-            <a:ext cx="12600" cy="370080"/>
+            <a:off x="2918160" y="4793400"/>
+            <a:ext cx="12600" cy="370440"/>
           </a:xfrm>
           <a:prstGeom prst="straightConnector1">
             <a:avLst/>
@@ -16094,8 +16022,8 @@
         </p:nvCxnSpPr>
         <p:spPr>
           <a:xfrm flipH="1">
-            <a:off x="4158720" y="1103760"/>
-            <a:ext cx="268560" cy="178560"/>
+            <a:off x="4158360" y="1103400"/>
+            <a:ext cx="268920" cy="178920"/>
           </a:xfrm>
           <a:prstGeom prst="straightConnector1">
             <a:avLst/>
@@ -16117,7 +16045,7 @@
         <p:spPr>
           <a:xfrm flipH="1">
             <a:off x="0" y="3657600"/>
-            <a:ext cx="1838160" cy="9360"/>
+            <a:ext cx="1838520" cy="9720"/>
           </a:xfrm>
           <a:prstGeom prst="straightConnector1">
             <a:avLst/>
@@ -16139,7 +16067,7 @@
         <p:spPr>
           <a:xfrm>
             <a:off x="8686800" y="532800"/>
-            <a:ext cx="1368360" cy="378360"/>
+            <a:ext cx="1368000" cy="378000"/>
           </a:xfrm>
           <a:prstGeom prst="ellipse">
             <a:avLst/>
@@ -16204,8 +16132,8 @@
         </p:nvCxnSpPr>
         <p:spPr>
           <a:xfrm flipH="1">
-            <a:off x="9031680" y="911160"/>
-            <a:ext cx="339840" cy="537480"/>
+            <a:off x="9031680" y="910800"/>
+            <a:ext cx="339480" cy="537840"/>
           </a:xfrm>
           <a:prstGeom prst="straightConnector1">
             <a:avLst/>
@@ -16257,7 +16185,7 @@
         <p:spPr>
           <a:xfrm flipH="1">
             <a:off x="0" y="3073320"/>
-            <a:ext cx="1838160" cy="9360"/>
+            <a:ext cx="1838520" cy="9720"/>
           </a:xfrm>
           <a:prstGeom prst="straightConnector1">
             <a:avLst/>
@@ -16280,7 +16208,7 @@
         <p:spPr>
           <a:xfrm>
             <a:off x="0" y="2489400"/>
-            <a:ext cx="1838160" cy="9360"/>
+            <a:ext cx="1838520" cy="9720"/>
           </a:xfrm>
           <a:prstGeom prst="straightConnector1">
             <a:avLst/>
@@ -16303,7 +16231,7 @@
         <p:spPr>
           <a:xfrm>
             <a:off x="0" y="2781360"/>
-            <a:ext cx="1838160" cy="9360"/>
+            <a:ext cx="1838520" cy="9720"/>
           </a:xfrm>
           <a:prstGeom prst="straightConnector1">
             <a:avLst/>
@@ -16326,7 +16254,7 @@
         <p:spPr>
           <a:xfrm flipH="1">
             <a:off x="0" y="3657600"/>
-            <a:ext cx="1838160" cy="9360"/>
+            <a:ext cx="1838520" cy="9720"/>
           </a:xfrm>
           <a:prstGeom prst="straightConnector1">
             <a:avLst/>
@@ -16348,7 +16276,7 @@
         <p:spPr>
           <a:xfrm>
             <a:off x="128520" y="6134040"/>
-            <a:ext cx="1562400" cy="378360"/>
+            <a:ext cx="1562040" cy="378000"/>
           </a:xfrm>
           <a:prstGeom prst="diamond">
             <a:avLst/>
@@ -16413,7 +16341,7 @@
         <p:spPr>
           <a:xfrm>
             <a:off x="302760" y="5454000"/>
-            <a:ext cx="1213920" cy="378360"/>
+            <a:ext cx="1213560" cy="378000"/>
           </a:xfrm>
           <a:prstGeom prst="ellipse">
             <a:avLst/>
@@ -16476,9 +16404,9 @@
         <p:grpSpPr>
           <a:xfrm>
             <a:off x="101160" y="336240"/>
-            <a:ext cx="1617120" cy="777960"/>
+            <a:ext cx="1616760" cy="777960"/>
             <a:chOff x="101160" y="336240"/>
-            <a:chExt cx="1617120" cy="777960"/>
+            <a:chExt cx="1616760" cy="777960"/>
           </a:xfrm>
         </p:grpSpPr>
         <p:sp>
@@ -16490,7 +16418,7 @@
           <p:spPr>
             <a:xfrm>
               <a:off x="101160" y="336240"/>
-              <a:ext cx="1617120" cy="303120"/>
+              <a:ext cx="1616760" cy="303120"/>
             </a:xfrm>
             <a:prstGeom prst="rect">
               <a:avLst/>
@@ -16547,7 +16475,7 @@
           <p:spPr>
             <a:xfrm>
               <a:off x="101160" y="597600"/>
-              <a:ext cx="1617120" cy="516600"/>
+              <a:ext cx="1616760" cy="516600"/>
             </a:xfrm>
             <a:prstGeom prst="rect">
               <a:avLst/>
@@ -16638,7 +16566,7 @@
         <p:spPr>
           <a:xfrm>
             <a:off x="128520" y="4629600"/>
-            <a:ext cx="1562400" cy="523080"/>
+            <a:ext cx="1562040" cy="522720"/>
           </a:xfrm>
           <a:prstGeom prst="diamond">
             <a:avLst/>
@@ -16726,7 +16654,7 @@
         <p:spPr>
           <a:xfrm>
             <a:off x="0" y="3365640"/>
-            <a:ext cx="1838160" cy="9360"/>
+            <a:ext cx="1838520" cy="9720"/>
           </a:xfrm>
           <a:prstGeom prst="straightConnector1">
             <a:avLst/>
@@ -16748,7 +16676,7 @@
         <p:spPr>
           <a:xfrm>
             <a:off x="673200" y="3949920"/>
-            <a:ext cx="473400" cy="378360"/>
+            <a:ext cx="473040" cy="378000"/>
           </a:xfrm>
           <a:prstGeom prst="triangle">
             <a:avLst>
@@ -16815,9 +16743,9 @@
         <p:grpSpPr>
           <a:xfrm>
             <a:off x="101160" y="1413000"/>
-            <a:ext cx="1617120" cy="777960"/>
+            <a:ext cx="1616760" cy="777960"/>
             <a:chOff x="101160" y="1413000"/>
-            <a:chExt cx="1617120" cy="777960"/>
+            <a:chExt cx="1616760" cy="777960"/>
           </a:xfrm>
         </p:grpSpPr>
         <p:sp>
@@ -16829,7 +16757,7 @@
           <p:spPr>
             <a:xfrm>
               <a:off x="101160" y="1413000"/>
-              <a:ext cx="1617120" cy="303120"/>
+              <a:ext cx="1616760" cy="303120"/>
             </a:xfrm>
             <a:prstGeom prst="rect">
               <a:avLst/>
@@ -16887,7 +16815,7 @@
           <p:spPr>
             <a:xfrm>
               <a:off x="101160" y="1674360"/>
-              <a:ext cx="1617120" cy="516600"/>
+              <a:ext cx="1616760" cy="516600"/>
             </a:xfrm>
             <a:prstGeom prst="rect">
               <a:avLst/>
@@ -16979,7 +16907,7 @@
         <p:spPr>
           <a:xfrm>
             <a:off x="4775040" y="457200"/>
-            <a:ext cx="1617120" cy="303120"/>
+            <a:ext cx="1616760" cy="303120"/>
           </a:xfrm>
           <a:prstGeom prst="rect">
             <a:avLst/>
@@ -17036,7 +16964,7 @@
         <p:spPr>
           <a:xfrm>
             <a:off x="4775040" y="718560"/>
-            <a:ext cx="1617120" cy="730080"/>
+            <a:ext cx="1616760" cy="730080"/>
           </a:xfrm>
           <a:prstGeom prst="rect">
             <a:avLst/>
@@ -17153,9 +17081,9 @@
         <p:grpSpPr>
           <a:xfrm>
             <a:off x="4572000" y="4274280"/>
-            <a:ext cx="1617120" cy="991440"/>
+            <a:ext cx="1616760" cy="991440"/>
             <a:chOff x="4572000" y="4274280"/>
-            <a:chExt cx="1617120" cy="991440"/>
+            <a:chExt cx="1616760" cy="991440"/>
           </a:xfrm>
         </p:grpSpPr>
         <p:sp>
@@ -17167,7 +17095,7 @@
           <p:spPr>
             <a:xfrm>
               <a:off x="4572000" y="4274280"/>
-              <a:ext cx="1617120" cy="303120"/>
+              <a:ext cx="1616760" cy="303120"/>
             </a:xfrm>
             <a:prstGeom prst="rect">
               <a:avLst/>
@@ -17224,7 +17152,7 @@
           <p:spPr>
             <a:xfrm>
               <a:off x="4572000" y="4535640"/>
-              <a:ext cx="1617120" cy="730080"/>
+              <a:ext cx="1616760" cy="730080"/>
             </a:xfrm>
             <a:prstGeom prst="rect">
               <a:avLst/>
@@ -17342,7 +17270,7 @@
         <p:spPr>
           <a:xfrm>
             <a:off x="3231360" y="2899800"/>
-            <a:ext cx="1562400" cy="378360"/>
+            <a:ext cx="1562040" cy="378000"/>
           </a:xfrm>
           <a:prstGeom prst="diamond">
             <a:avLst/>
@@ -17407,7 +17335,7 @@
         <p:spPr>
           <a:xfrm>
             <a:off x="4602960" y="2585160"/>
-            <a:ext cx="1791000" cy="379800"/>
+            <a:ext cx="1790640" cy="379440"/>
           </a:xfrm>
           <a:prstGeom prst="diamond">
             <a:avLst/>
@@ -17474,8 +17402,8 @@
         </p:nvCxnSpPr>
         <p:spPr>
           <a:xfrm flipH="1" flipV="1">
-            <a:off x="4012560" y="3278160"/>
-            <a:ext cx="1368360" cy="996480"/>
+            <a:off x="4012560" y="3277800"/>
+            <a:ext cx="1368000" cy="996840"/>
           </a:xfrm>
           <a:prstGeom prst="straightConnector1">
             <a:avLst/>
@@ -17500,7 +17428,7 @@
         </p:nvCxnSpPr>
         <p:spPr>
           <a:xfrm flipV="1">
-            <a:off x="5498640" y="1448640"/>
+            <a:off x="5498280" y="1448640"/>
             <a:ext cx="85320" cy="1136880"/>
           </a:xfrm>
           <a:prstGeom prst="straightConnector1">
@@ -17525,8 +17453,8 @@
         </p:nvCxnSpPr>
         <p:spPr>
           <a:xfrm flipV="1">
-            <a:off x="5380560" y="2964960"/>
-            <a:ext cx="118440" cy="1309680"/>
+            <a:off x="5380200" y="2964600"/>
+            <a:ext cx="118440" cy="1310040"/>
           </a:xfrm>
           <a:prstGeom prst="straightConnector1">
             <a:avLst/>
@@ -17551,7 +17479,7 @@
         <p:spPr>
           <a:xfrm flipH="1">
             <a:off x="4012560" y="1448640"/>
-            <a:ext cx="1571400" cy="1451520"/>
+            <a:ext cx="1571040" cy="1451520"/>
           </a:xfrm>
           <a:prstGeom prst="straightConnector1">
             <a:avLst/>
@@ -17573,7 +17501,7 @@
         <p:spPr>
           <a:xfrm>
             <a:off x="2743200" y="457200"/>
-            <a:ext cx="1562400" cy="378360"/>
+            <a:ext cx="1562040" cy="378000"/>
           </a:xfrm>
           <a:prstGeom prst="diamond">
             <a:avLst/>
@@ -17640,8 +17568,8 @@
         </p:nvCxnSpPr>
         <p:spPr>
           <a:xfrm flipH="1" flipV="1">
-            <a:off x="4305600" y="646560"/>
-            <a:ext cx="469800" cy="437400"/>
+            <a:off x="4305240" y="646200"/>
+            <a:ext cx="470160" cy="437760"/>
           </a:xfrm>
           <a:prstGeom prst="straightConnector1">
             <a:avLst/>
@@ -17665,8 +17593,8 @@
         </p:nvCxnSpPr>
         <p:spPr>
           <a:xfrm flipH="1" flipV="1">
-            <a:off x="3524400" y="835560"/>
-            <a:ext cx="1251000" cy="248400"/>
+            <a:off x="3524400" y="835200"/>
+            <a:ext cx="1251000" cy="248760"/>
           </a:xfrm>
           <a:prstGeom prst="straightConnector1">
             <a:avLst/>
@@ -17688,9 +17616,9 @@
         <p:grpSpPr>
           <a:xfrm>
             <a:off x="8686800" y="837360"/>
-            <a:ext cx="1617120" cy="991440"/>
+            <a:ext cx="1616760" cy="991440"/>
             <a:chOff x="8686800" y="837360"/>
-            <a:chExt cx="1617120" cy="991440"/>
+            <a:chExt cx="1616760" cy="991440"/>
           </a:xfrm>
         </p:grpSpPr>
         <p:sp>
@@ -17702,7 +17630,7 @@
           <p:spPr>
             <a:xfrm>
               <a:off x="8686800" y="837360"/>
-              <a:ext cx="1617120" cy="303120"/>
+              <a:ext cx="1616760" cy="303120"/>
             </a:xfrm>
             <a:prstGeom prst="rect">
               <a:avLst/>
@@ -17759,7 +17687,7 @@
           <p:spPr>
             <a:xfrm>
               <a:off x="8686800" y="1098720"/>
-              <a:ext cx="1617120" cy="730080"/>
+              <a:ext cx="1616760" cy="730080"/>
             </a:xfrm>
             <a:prstGeom prst="rect">
               <a:avLst/>
@@ -17877,7 +17805,7 @@
         <p:spPr>
           <a:xfrm>
             <a:off x="128880" y="6134040"/>
-            <a:ext cx="1562400" cy="378360"/>
+            <a:ext cx="1562040" cy="378000"/>
           </a:xfrm>
           <a:prstGeom prst="diamond">
             <a:avLst/>
@@ -17942,7 +17870,7 @@
         <p:spPr>
           <a:xfrm>
             <a:off x="7315200" y="228600"/>
-            <a:ext cx="1562400" cy="378360"/>
+            <a:ext cx="1562040" cy="378000"/>
           </a:xfrm>
           <a:prstGeom prst="diamond">
             <a:avLst/>
@@ -18007,7 +17935,7 @@
         <p:spPr>
           <a:xfrm>
             <a:off x="360" y="3366000"/>
-            <a:ext cx="1838160" cy="9360"/>
+            <a:ext cx="1838520" cy="9720"/>
           </a:xfrm>
           <a:prstGeom prst="straightConnector1">
             <a:avLst/>
@@ -18031,8 +17959,8 @@
         </p:nvCxnSpPr>
         <p:spPr>
           <a:xfrm flipH="1">
-            <a:off x="6392160" y="417960"/>
-            <a:ext cx="923400" cy="666000"/>
+            <a:off x="6391800" y="417600"/>
+            <a:ext cx="923760" cy="666360"/>
           </a:xfrm>
           <a:prstGeom prst="straightConnector1">
             <a:avLst/>
@@ -18054,7 +17982,7 @@
         <p:spPr>
           <a:xfrm>
             <a:off x="6629400" y="1442160"/>
-            <a:ext cx="1821600" cy="608040"/>
+            <a:ext cx="1821240" cy="607680"/>
           </a:xfrm>
           <a:prstGeom prst="diamond">
             <a:avLst/>
@@ -18121,8 +18049,8 @@
         </p:nvCxnSpPr>
         <p:spPr>
           <a:xfrm flipH="1" flipV="1">
-            <a:off x="8877600" y="417960"/>
-            <a:ext cx="618120" cy="419760"/>
+            <a:off x="8877240" y="417600"/>
+            <a:ext cx="618120" cy="420120"/>
           </a:xfrm>
           <a:prstGeom prst="straightConnector1">
             <a:avLst/>
@@ -18145,7 +18073,7 @@
         <p:spPr>
           <a:xfrm>
             <a:off x="6629400" y="2514600"/>
-            <a:ext cx="1562400" cy="378360"/>
+            <a:ext cx="1562040" cy="378000"/>
           </a:xfrm>
           <a:prstGeom prst="diamond">
             <a:avLst/>
@@ -18212,8 +18140,8 @@
         </p:nvCxnSpPr>
         <p:spPr>
           <a:xfrm flipH="1">
-            <a:off x="8191800" y="1828800"/>
-            <a:ext cx="1303920" cy="875520"/>
+            <a:off x="8191440" y="1828800"/>
+            <a:ext cx="1303920" cy="875160"/>
           </a:xfrm>
           <a:prstGeom prst="straightConnector1">
             <a:avLst/>
@@ -18237,8 +18165,8 @@
         </p:nvCxnSpPr>
         <p:spPr>
           <a:xfrm flipH="1">
-            <a:off x="6189120" y="2703960"/>
-            <a:ext cx="440640" cy="2066400"/>
+            <a:off x="6188760" y="2703600"/>
+            <a:ext cx="441000" cy="2066760"/>
           </a:xfrm>
           <a:prstGeom prst="straightConnector1">
             <a:avLst/>
@@ -18262,8 +18190,8 @@
         </p:nvCxnSpPr>
         <p:spPr>
           <a:xfrm flipH="1">
-            <a:off x="8451000" y="1333080"/>
-            <a:ext cx="236160" cy="413640"/>
+            <a:off x="8450640" y="1333080"/>
+            <a:ext cx="236520" cy="413280"/>
           </a:xfrm>
           <a:prstGeom prst="straightConnector1">
             <a:avLst/>
@@ -18287,8 +18215,8 @@
         </p:nvCxnSpPr>
         <p:spPr>
           <a:xfrm flipH="1" flipV="1">
-            <a:off x="5583600" y="1448640"/>
-            <a:ext cx="1046160" cy="298080"/>
+            <a:off x="5583240" y="1448640"/>
+            <a:ext cx="1046520" cy="297720"/>
           </a:xfrm>
           <a:prstGeom prst="straightConnector1">
             <a:avLst/>
@@ -18310,9 +18238,9 @@
         <p:grpSpPr>
           <a:xfrm>
             <a:off x="101160" y="336240"/>
-            <a:ext cx="1617120" cy="777960"/>
+            <a:ext cx="1616760" cy="777960"/>
             <a:chOff x="101160" y="336240"/>
-            <a:chExt cx="1617120" cy="777960"/>
+            <a:chExt cx="1616760" cy="777960"/>
           </a:xfrm>
         </p:grpSpPr>
         <p:sp>
@@ -18324,7 +18252,7 @@
           <p:spPr>
             <a:xfrm>
               <a:off x="101160" y="336240"/>
-              <a:ext cx="1617120" cy="303120"/>
+              <a:ext cx="1616760" cy="303120"/>
             </a:xfrm>
             <a:prstGeom prst="rect">
               <a:avLst/>
@@ -18381,7 +18309,7 @@
           <p:spPr>
             <a:xfrm>
               <a:off x="101160" y="597600"/>
-              <a:ext cx="1617120" cy="516600"/>
+              <a:ext cx="1616760" cy="516600"/>
             </a:xfrm>
             <a:prstGeom prst="rect">
               <a:avLst/>
@@ -18472,9 +18400,9 @@
         <p:grpSpPr>
           <a:xfrm>
             <a:off x="6760440" y="4359960"/>
-            <a:ext cx="1617120" cy="557280"/>
+            <a:ext cx="1616760" cy="556920"/>
             <a:chOff x="6760440" y="4359960"/>
-            <a:chExt cx="1617120" cy="557280"/>
+            <a:chExt cx="1616760" cy="556920"/>
           </a:xfrm>
         </p:grpSpPr>
         <p:sp>
@@ -18486,7 +18414,7 @@
           <p:spPr>
             <a:xfrm>
               <a:off x="6760440" y="4359960"/>
-              <a:ext cx="1617120" cy="303120"/>
+              <a:ext cx="1616760" cy="303120"/>
             </a:xfrm>
             <a:prstGeom prst="rect">
               <a:avLst/>
@@ -18543,7 +18471,7 @@
           <p:spPr>
             <a:xfrm>
               <a:off x="6760440" y="4621320"/>
-              <a:ext cx="1617120" cy="295920"/>
+              <a:ext cx="1616760" cy="295560"/>
             </a:xfrm>
             <a:prstGeom prst="rect">
               <a:avLst/>
@@ -18592,7 +18520,7 @@
         <p:spPr>
           <a:xfrm>
             <a:off x="9144000" y="2057400"/>
-            <a:ext cx="473400" cy="378360"/>
+            <a:ext cx="473040" cy="378000"/>
           </a:xfrm>
           <a:prstGeom prst="triangle">
             <a:avLst>
@@ -18660,8 +18588,8 @@
         </p:nvCxnSpPr>
         <p:spPr>
           <a:xfrm flipH="1">
-            <a:off x="8026200" y="4107600"/>
-            <a:ext cx="1432440" cy="259560"/>
+            <a:off x="8026200" y="4107240"/>
+            <a:ext cx="1432080" cy="260280"/>
           </a:xfrm>
           <a:prstGeom prst="straightConnector1">
             <a:avLst/>
@@ -18684,8 +18612,8 @@
         </p:nvCxnSpPr>
         <p:spPr>
           <a:xfrm flipH="1" flipV="1">
-            <a:off x="9458280" y="4107600"/>
-            <a:ext cx="480240" cy="241200"/>
+            <a:off x="9457920" y="4107240"/>
+            <a:ext cx="480960" cy="241920"/>
           </a:xfrm>
           <a:prstGeom prst="straightConnector1">
             <a:avLst/>
@@ -18708,8 +18636,8 @@
         </p:nvCxnSpPr>
         <p:spPr>
           <a:xfrm flipH="1">
-            <a:off x="9346320" y="2435760"/>
-            <a:ext cx="34920" cy="451080"/>
+            <a:off x="9346320" y="2435400"/>
+            <a:ext cx="34560" cy="451800"/>
           </a:xfrm>
           <a:prstGeom prst="straightConnector1">
             <a:avLst/>
@@ -18733,7 +18661,7 @@
         </p:nvCxnSpPr>
         <p:spPr>
           <a:xfrm flipH="1">
-            <a:off x="9380880" y="1828800"/>
+            <a:off x="9380520" y="1828800"/>
             <a:ext cx="114840" cy="228960"/>
           </a:xfrm>
           <a:prstGeom prst="straightConnector1">
@@ -18756,7 +18684,7 @@
         <p:spPr>
           <a:xfrm>
             <a:off x="7089840" y="5715000"/>
-            <a:ext cx="1617120" cy="303120"/>
+            <a:ext cx="1616760" cy="303120"/>
           </a:xfrm>
           <a:prstGeom prst="rect">
             <a:avLst/>
@@ -18813,7 +18741,7 @@
         <p:spPr>
           <a:xfrm>
             <a:off x="6760440" y="5183280"/>
-            <a:ext cx="1820520" cy="378360"/>
+            <a:ext cx="1820160" cy="378000"/>
           </a:xfrm>
           <a:prstGeom prst="diamond">
             <a:avLst/>
@@ -18878,7 +18806,7 @@
         <p:spPr>
           <a:xfrm flipH="1">
             <a:off x="0" y="3657600"/>
-            <a:ext cx="1838160" cy="9360"/>
+            <a:ext cx="1838520" cy="9720"/>
           </a:xfrm>
           <a:prstGeom prst="straightConnector1">
             <a:avLst/>
@@ -18900,9 +18828,9 @@
         <p:grpSpPr>
           <a:xfrm>
             <a:off x="8534520" y="2879640"/>
-            <a:ext cx="1617120" cy="558000"/>
+            <a:ext cx="1616760" cy="557640"/>
             <a:chOff x="8534520" y="2879640"/>
-            <a:chExt cx="1617120" cy="558000"/>
+            <a:chExt cx="1616760" cy="557640"/>
           </a:xfrm>
         </p:grpSpPr>
         <p:sp>
@@ -18914,7 +18842,7 @@
           <p:spPr>
             <a:xfrm>
               <a:off x="8534520" y="2879640"/>
-              <a:ext cx="1617120" cy="303120"/>
+              <a:ext cx="1616760" cy="303120"/>
             </a:xfrm>
             <a:prstGeom prst="rect">
               <a:avLst/>
@@ -18971,7 +18899,7 @@
           <p:spPr>
             <a:xfrm>
               <a:off x="8534520" y="3141000"/>
-              <a:ext cx="1617120" cy="296640"/>
+              <a:ext cx="1616760" cy="296280"/>
             </a:xfrm>
             <a:prstGeom prst="rect">
               <a:avLst/>
@@ -19020,9 +18948,9 @@
         <p:grpSpPr>
           <a:xfrm>
             <a:off x="8534520" y="2879640"/>
-            <a:ext cx="1617120" cy="564480"/>
+            <a:ext cx="1616760" cy="564480"/>
             <a:chOff x="8534520" y="2879640"/>
-            <a:chExt cx="1617120" cy="564480"/>
+            <a:chExt cx="1616760" cy="564480"/>
           </a:xfrm>
         </p:grpSpPr>
         <p:sp>
@@ -19034,7 +18962,7 @@
           <p:spPr>
             <a:xfrm>
               <a:off x="8534520" y="2879640"/>
-              <a:ext cx="1617120" cy="303120"/>
+              <a:ext cx="1616760" cy="303120"/>
             </a:xfrm>
             <a:prstGeom prst="rect">
               <a:avLst/>
@@ -19091,7 +19019,7 @@
           <p:spPr>
             <a:xfrm>
               <a:off x="8534520" y="3141000"/>
-              <a:ext cx="1617120" cy="303120"/>
+              <a:ext cx="1616760" cy="303120"/>
             </a:xfrm>
             <a:prstGeom prst="rect">
               <a:avLst/>
@@ -19154,7 +19082,7 @@
         <p:spPr>
           <a:xfrm>
             <a:off x="9221400" y="3729240"/>
-            <a:ext cx="473400" cy="378360"/>
+            <a:ext cx="473040" cy="378000"/>
           </a:xfrm>
           <a:prstGeom prst="triangle">
             <a:avLst>
@@ -19223,7 +19151,7 @@
         </p:nvCxnSpPr>
         <p:spPr>
           <a:xfrm>
-            <a:off x="9343080" y="3444120"/>
+            <a:off x="9342720" y="3444120"/>
             <a:ext cx="115560" cy="285480"/>
           </a:xfrm>
           <a:prstGeom prst="straightConnector1">
@@ -19246,7 +19174,7 @@
         <p:spPr>
           <a:xfrm>
             <a:off x="8556840" y="3657600"/>
-            <a:ext cx="1838160" cy="9360"/>
+            <a:ext cx="1838520" cy="9720"/>
           </a:xfrm>
           <a:prstGeom prst="straightConnector1">
             <a:avLst/>
@@ -19269,7 +19197,7 @@
         <p:spPr>
           <a:xfrm>
             <a:off x="9601200" y="3382920"/>
-            <a:ext cx="907200" cy="339120"/>
+            <a:ext cx="906840" cy="338760"/>
           </a:xfrm>
           <a:prstGeom prst="rect">
             <a:avLst/>
@@ -19322,7 +19250,7 @@
         <p:spPr>
           <a:xfrm>
             <a:off x="2057400" y="2132280"/>
-            <a:ext cx="1617120" cy="303120"/>
+            <a:ext cx="1616760" cy="303120"/>
           </a:xfrm>
           <a:prstGeom prst="rect">
             <a:avLst/>
@@ -19379,7 +19307,7 @@
         <p:spPr>
           <a:xfrm>
             <a:off x="2057400" y="2393640"/>
-            <a:ext cx="1617120" cy="188640"/>
+            <a:ext cx="1616760" cy="188280"/>
           </a:xfrm>
           <a:prstGeom prst="rect">
             <a:avLst/>
@@ -19427,7 +19355,7 @@
         <p:spPr>
           <a:xfrm>
             <a:off x="2613960" y="1217880"/>
-            <a:ext cx="473400" cy="378360"/>
+            <a:ext cx="473040" cy="378000"/>
           </a:xfrm>
           <a:prstGeom prst="triangle">
             <a:avLst>
@@ -19496,8 +19424,8 @@
         </p:nvCxnSpPr>
         <p:spPr>
           <a:xfrm>
-            <a:off x="2850840" y="1596240"/>
-            <a:ext cx="15480" cy="536400"/>
+            <a:off x="2850480" y="1595880"/>
+            <a:ext cx="15480" cy="536760"/>
           </a:xfrm>
           <a:prstGeom prst="straightConnector1">
             <a:avLst/>
@@ -19521,8 +19449,8 @@
         </p:nvCxnSpPr>
         <p:spPr>
           <a:xfrm flipV="1">
-            <a:off x="2850840" y="1083600"/>
-            <a:ext cx="1924560" cy="134640"/>
+            <a:off x="2850480" y="1083600"/>
+            <a:ext cx="1924920" cy="134640"/>
           </a:xfrm>
           <a:prstGeom prst="straightConnector1">
             <a:avLst/>
@@ -19546,8 +19474,8 @@
         </p:nvCxnSpPr>
         <p:spPr>
           <a:xfrm>
-            <a:off x="7569000" y="4917240"/>
-            <a:ext cx="102240" cy="266400"/>
+            <a:off x="7568640" y="4916880"/>
+            <a:ext cx="102240" cy="266760"/>
           </a:xfrm>
           <a:prstGeom prst="straightConnector1">
             <a:avLst/>
@@ -19572,8 +19500,8 @@
         </p:nvCxnSpPr>
         <p:spPr>
           <a:xfrm>
-            <a:off x="7670880" y="5561640"/>
-            <a:ext cx="227880" cy="153720"/>
+            <a:off x="7670520" y="5561280"/>
+            <a:ext cx="227880" cy="154080"/>
           </a:xfrm>
           <a:prstGeom prst="straightConnector1">
             <a:avLst/>
@@ -19595,9 +19523,9 @@
         <p:grpSpPr>
           <a:xfrm>
             <a:off x="10265040" y="5029200"/>
-            <a:ext cx="1617120" cy="557640"/>
+            <a:ext cx="1616760" cy="557280"/>
             <a:chOff x="10265040" y="5029200"/>
-            <a:chExt cx="1617120" cy="557640"/>
+            <a:chExt cx="1616760" cy="557280"/>
           </a:xfrm>
         </p:grpSpPr>
         <p:sp>
@@ -19609,7 +19537,7 @@
           <p:spPr>
             <a:xfrm>
               <a:off x="10265040" y="5029200"/>
-              <a:ext cx="1617120" cy="303120"/>
+              <a:ext cx="1616760" cy="303120"/>
             </a:xfrm>
             <a:prstGeom prst="rect">
               <a:avLst/>
@@ -19666,7 +19594,7 @@
           <p:spPr>
             <a:xfrm>
               <a:off x="10265040" y="5290560"/>
-              <a:ext cx="1617120" cy="296280"/>
+              <a:ext cx="1616760" cy="295920"/>
             </a:xfrm>
             <a:prstGeom prst="rect">
               <a:avLst/>
@@ -19717,8 +19645,8 @@
         </p:nvCxnSpPr>
         <p:spPr>
           <a:xfrm flipH="1" flipV="1">
-            <a:off x="9694800" y="4107600"/>
-            <a:ext cx="1379160" cy="921960"/>
+            <a:off x="9694440" y="4107240"/>
+            <a:ext cx="1379160" cy="922320"/>
           </a:xfrm>
           <a:prstGeom prst="straightConnector1">
             <a:avLst/>
@@ -19740,9 +19668,9 @@
         <p:grpSpPr>
           <a:xfrm>
             <a:off x="9122040" y="4343400"/>
-            <a:ext cx="1617120" cy="557640"/>
+            <a:ext cx="1616760" cy="557280"/>
             <a:chOff x="9122040" y="4343400"/>
-            <a:chExt cx="1617120" cy="557640"/>
+            <a:chExt cx="1616760" cy="557280"/>
           </a:xfrm>
         </p:grpSpPr>
         <p:sp>
@@ -19754,7 +19682,7 @@
           <p:spPr>
             <a:xfrm>
               <a:off x="9122040" y="4343400"/>
-              <a:ext cx="1617120" cy="303120"/>
+              <a:ext cx="1616760" cy="303120"/>
             </a:xfrm>
             <a:prstGeom prst="rect">
               <a:avLst/>
@@ -19811,7 +19739,7 @@
           <p:spPr>
             <a:xfrm>
               <a:off x="9122040" y="4604760"/>
-              <a:ext cx="1617120" cy="296280"/>
+              <a:ext cx="1616760" cy="295920"/>
             </a:xfrm>
             <a:prstGeom prst="rect">
               <a:avLst/>
@@ -19860,7 +19788,7 @@
         <p:spPr>
           <a:xfrm>
             <a:off x="10037520" y="2131560"/>
-            <a:ext cx="473400" cy="378360"/>
+            <a:ext cx="473040" cy="378000"/>
           </a:xfrm>
           <a:prstGeom prst="triangle">
             <a:avLst>
@@ -19929,7 +19857,7 @@
         </p:nvCxnSpPr>
         <p:spPr>
           <a:xfrm>
-            <a:off x="9495360" y="1828800"/>
+            <a:off x="9495000" y="1828800"/>
             <a:ext cx="779400" cy="303120"/>
           </a:xfrm>
           <a:prstGeom prst="straightConnector1">
@@ -19952,9 +19880,9 @@
         <p:grpSpPr>
           <a:xfrm>
             <a:off x="10494000" y="2866680"/>
-            <a:ext cx="1617120" cy="557640"/>
+            <a:ext cx="1616760" cy="557280"/>
             <a:chOff x="10494000" y="2866680"/>
-            <a:chExt cx="1617120" cy="557640"/>
+            <a:chExt cx="1616760" cy="557280"/>
           </a:xfrm>
         </p:grpSpPr>
         <p:sp>
@@ -19966,7 +19894,7 @@
           <p:spPr>
             <a:xfrm>
               <a:off x="10494000" y="2866680"/>
-              <a:ext cx="1617120" cy="303120"/>
+              <a:ext cx="1616760" cy="303120"/>
             </a:xfrm>
             <a:prstGeom prst="rect">
               <a:avLst/>
@@ -20023,7 +19951,7 @@
           <p:spPr>
             <a:xfrm>
               <a:off x="10494000" y="3128040"/>
-              <a:ext cx="1617120" cy="296280"/>
+              <a:ext cx="1616760" cy="295920"/>
             </a:xfrm>
             <a:prstGeom prst="rect">
               <a:avLst/>
@@ -20074,8 +20002,8 @@
         </p:nvCxnSpPr>
         <p:spPr>
           <a:xfrm>
-            <a:off x="10274400" y="2509920"/>
-            <a:ext cx="1028520" cy="357120"/>
+            <a:off x="10274040" y="2509560"/>
+            <a:ext cx="1028520" cy="357480"/>
           </a:xfrm>
           <a:prstGeom prst="straightConnector1">
             <a:avLst/>
@@ -20127,7 +20055,7 @@
         <p:spPr>
           <a:xfrm flipH="1">
             <a:off x="0" y="3073320"/>
-            <a:ext cx="1838160" cy="9360"/>
+            <a:ext cx="1838520" cy="9720"/>
           </a:xfrm>
           <a:prstGeom prst="straightConnector1">
             <a:avLst/>
@@ -20150,7 +20078,7 @@
         <p:spPr>
           <a:xfrm>
             <a:off x="0" y="2489400"/>
-            <a:ext cx="1838160" cy="9360"/>
+            <a:ext cx="1838520" cy="9720"/>
           </a:xfrm>
           <a:prstGeom prst="straightConnector1">
             <a:avLst/>
@@ -20173,7 +20101,7 @@
         <p:spPr>
           <a:xfrm>
             <a:off x="0" y="2781360"/>
-            <a:ext cx="1838160" cy="9360"/>
+            <a:ext cx="1838520" cy="9720"/>
           </a:xfrm>
           <a:prstGeom prst="straightConnector1">
             <a:avLst/>
@@ -20196,7 +20124,7 @@
         <p:spPr>
           <a:xfrm flipH="1">
             <a:off x="0" y="3657600"/>
-            <a:ext cx="1838160" cy="9360"/>
+            <a:ext cx="1838520" cy="9720"/>
           </a:xfrm>
           <a:prstGeom prst="straightConnector1">
             <a:avLst/>
@@ -20218,7 +20146,7 @@
         <p:spPr>
           <a:xfrm>
             <a:off x="128520" y="6134040"/>
-            <a:ext cx="1562400" cy="378360"/>
+            <a:ext cx="1562040" cy="378000"/>
           </a:xfrm>
           <a:prstGeom prst="diamond">
             <a:avLst/>
@@ -20283,7 +20211,7 @@
         <p:spPr>
           <a:xfrm>
             <a:off x="302760" y="5454000"/>
-            <a:ext cx="1213920" cy="378360"/>
+            <a:ext cx="1213560" cy="378000"/>
           </a:xfrm>
           <a:prstGeom prst="ellipse">
             <a:avLst/>
@@ -20346,7 +20274,7 @@
         <p:spPr>
           <a:xfrm>
             <a:off x="101160" y="336240"/>
-            <a:ext cx="1617120" cy="303120"/>
+            <a:ext cx="1616760" cy="303120"/>
           </a:xfrm>
           <a:prstGeom prst="rect">
             <a:avLst/>
@@ -20403,7 +20331,7 @@
         <p:spPr>
           <a:xfrm>
             <a:off x="101160" y="597600"/>
-            <a:ext cx="1617120" cy="516600"/>
+            <a:ext cx="1616760" cy="516600"/>
           </a:xfrm>
           <a:prstGeom prst="rect">
             <a:avLst/>
@@ -20493,7 +20421,7 @@
         <p:spPr>
           <a:xfrm>
             <a:off x="8458200" y="5486400"/>
-            <a:ext cx="1617120" cy="303120"/>
+            <a:ext cx="1616760" cy="303120"/>
           </a:xfrm>
           <a:prstGeom prst="rect">
             <a:avLst/>
@@ -20550,7 +20478,7 @@
         <p:spPr>
           <a:xfrm>
             <a:off x="128520" y="4629600"/>
-            <a:ext cx="1562400" cy="523080"/>
+            <a:ext cx="1562040" cy="522720"/>
           </a:xfrm>
           <a:prstGeom prst="diamond">
             <a:avLst/>
@@ -20638,7 +20566,7 @@
         <p:spPr>
           <a:xfrm>
             <a:off x="0" y="3365640"/>
-            <a:ext cx="1838160" cy="9360"/>
+            <a:ext cx="1838520" cy="9720"/>
           </a:xfrm>
           <a:prstGeom prst="straightConnector1">
             <a:avLst/>
@@ -20660,7 +20588,7 @@
         <p:spPr>
           <a:xfrm>
             <a:off x="673200" y="3949920"/>
-            <a:ext cx="473400" cy="378360"/>
+            <a:ext cx="473040" cy="378000"/>
           </a:xfrm>
           <a:prstGeom prst="triangle">
             <a:avLst>
@@ -20727,9 +20655,9 @@
         <p:grpSpPr>
           <a:xfrm>
             <a:off x="101160" y="1413000"/>
-            <a:ext cx="1617120" cy="777960"/>
+            <a:ext cx="1616760" cy="777960"/>
             <a:chOff x="101160" y="1413000"/>
-            <a:chExt cx="1617120" cy="777960"/>
+            <a:chExt cx="1616760" cy="777960"/>
           </a:xfrm>
         </p:grpSpPr>
         <p:sp>
@@ -20741,7 +20669,7 @@
           <p:spPr>
             <a:xfrm>
               <a:off x="101160" y="1413000"/>
-              <a:ext cx="1617120" cy="303120"/>
+              <a:ext cx="1616760" cy="303120"/>
             </a:xfrm>
             <a:prstGeom prst="rect">
               <a:avLst/>
@@ -20799,7 +20727,7 @@
           <p:spPr>
             <a:xfrm>
               <a:off x="101160" y="1674360"/>
-              <a:ext cx="1617120" cy="516600"/>
+              <a:ext cx="1616760" cy="516600"/>
             </a:xfrm>
             <a:prstGeom prst="rect">
               <a:avLst/>
@@ -20891,7 +20819,7 @@
         <p:spPr>
           <a:xfrm>
             <a:off x="5463360" y="2131920"/>
-            <a:ext cx="1617120" cy="303120"/>
+            <a:ext cx="1616760" cy="303120"/>
           </a:xfrm>
           <a:prstGeom prst="rect">
             <a:avLst/>
@@ -20954,7 +20882,7 @@
         <p:spPr>
           <a:xfrm>
             <a:off x="5463360" y="1828800"/>
-            <a:ext cx="1617120" cy="303120"/>
+            <a:ext cx="1616760" cy="303120"/>
           </a:xfrm>
           <a:prstGeom prst="rect">
             <a:avLst/>
@@ -21011,9 +20939,9 @@
         <p:grpSpPr>
           <a:xfrm>
             <a:off x="4296600" y="4022640"/>
-            <a:ext cx="1617120" cy="777960"/>
+            <a:ext cx="1616760" cy="777960"/>
             <a:chOff x="4296600" y="4022640"/>
-            <a:chExt cx="1617120" cy="777960"/>
+            <a:chExt cx="1616760" cy="777960"/>
           </a:xfrm>
         </p:grpSpPr>
         <p:sp>
@@ -21025,7 +20953,7 @@
           <p:spPr>
             <a:xfrm>
               <a:off x="4296600" y="4022640"/>
-              <a:ext cx="1617120" cy="303120"/>
+              <a:ext cx="1616760" cy="303120"/>
             </a:xfrm>
             <a:prstGeom prst="rect">
               <a:avLst/>
@@ -21082,7 +21010,7 @@
           <p:spPr>
             <a:xfrm>
               <a:off x="4296600" y="4284000"/>
-              <a:ext cx="1617120" cy="516600"/>
+              <a:ext cx="1616760" cy="516600"/>
             </a:xfrm>
             <a:prstGeom prst="rect">
               <a:avLst/>
@@ -21173,9 +21101,9 @@
         <p:grpSpPr>
           <a:xfrm>
             <a:off x="9348840" y="2254320"/>
-            <a:ext cx="1617120" cy="1631880"/>
+            <a:ext cx="1616760" cy="1631880"/>
             <a:chOff x="9348840" y="2254320"/>
-            <a:chExt cx="1617120" cy="1631880"/>
+            <a:chExt cx="1616760" cy="1631880"/>
           </a:xfrm>
         </p:grpSpPr>
         <p:sp>
@@ -21187,7 +21115,7 @@
           <p:spPr>
             <a:xfrm>
               <a:off x="9348840" y="2254320"/>
-              <a:ext cx="1617120" cy="303120"/>
+              <a:ext cx="1616760" cy="303120"/>
             </a:xfrm>
             <a:prstGeom prst="rect">
               <a:avLst/>
@@ -21244,7 +21172,7 @@
           <p:spPr>
             <a:xfrm>
               <a:off x="9348840" y="2515680"/>
-              <a:ext cx="1617120" cy="1370520"/>
+              <a:ext cx="1616760" cy="1370520"/>
             </a:xfrm>
             <a:prstGeom prst="rect">
               <a:avLst/>
@@ -21443,7 +21371,7 @@
         <p:spPr>
           <a:xfrm>
             <a:off x="9402120" y="4572000"/>
-            <a:ext cx="1562400" cy="378360"/>
+            <a:ext cx="1562040" cy="378000"/>
           </a:xfrm>
           <a:prstGeom prst="diamond">
             <a:avLst/>
@@ -21508,7 +21436,7 @@
         <p:spPr>
           <a:xfrm>
             <a:off x="7007400" y="4572000"/>
-            <a:ext cx="1671120" cy="378360"/>
+            <a:ext cx="1670760" cy="378000"/>
           </a:xfrm>
           <a:prstGeom prst="ellipse">
             <a:avLst/>
@@ -21571,9 +21499,9 @@
         <p:grpSpPr>
           <a:xfrm>
             <a:off x="9348840" y="2254320"/>
-            <a:ext cx="1617120" cy="1631880"/>
+            <a:ext cx="1616760" cy="1631880"/>
             <a:chOff x="9348840" y="2254320"/>
-            <a:chExt cx="1617120" cy="1631880"/>
+            <a:chExt cx="1616760" cy="1631880"/>
           </a:xfrm>
         </p:grpSpPr>
         <p:sp>
@@ -21585,7 +21513,7 @@
           <p:spPr>
             <a:xfrm>
               <a:off x="9348840" y="2254320"/>
-              <a:ext cx="1617120" cy="303120"/>
+              <a:ext cx="1616760" cy="303120"/>
             </a:xfrm>
             <a:prstGeom prst="rect">
               <a:avLst/>
@@ -21642,7 +21570,7 @@
           <p:spPr>
             <a:xfrm>
               <a:off x="9348840" y="2515680"/>
-              <a:ext cx="1617120" cy="1370520"/>
+              <a:ext cx="1616760" cy="1370520"/>
             </a:xfrm>
             <a:prstGeom prst="rect">
               <a:avLst/>
@@ -21841,9 +21769,9 @@
         <p:grpSpPr>
           <a:xfrm>
             <a:off x="9348840" y="2254320"/>
-            <a:ext cx="1617120" cy="1845360"/>
+            <a:ext cx="1616760" cy="1845360"/>
             <a:chOff x="9348840" y="2254320"/>
-            <a:chExt cx="1617120" cy="1845360"/>
+            <a:chExt cx="1616760" cy="1845360"/>
           </a:xfrm>
         </p:grpSpPr>
         <p:sp>
@@ -21855,7 +21783,7 @@
           <p:spPr>
             <a:xfrm>
               <a:off x="9348840" y="2254320"/>
-              <a:ext cx="1617120" cy="303120"/>
+              <a:ext cx="1616760" cy="303120"/>
             </a:xfrm>
             <a:prstGeom prst="rect">
               <a:avLst/>
@@ -21912,7 +21840,7 @@
           <p:spPr>
             <a:xfrm>
               <a:off x="9348840" y="2515680"/>
-              <a:ext cx="1617120" cy="1584000"/>
+              <a:ext cx="1616760" cy="1584000"/>
             </a:xfrm>
             <a:prstGeom prst="rect">
               <a:avLst/>
@@ -22138,7 +22066,7 @@
         <p:spPr>
           <a:xfrm>
             <a:off x="7086600" y="3501720"/>
-            <a:ext cx="1820520" cy="378360"/>
+            <a:ext cx="1820160" cy="378000"/>
           </a:xfrm>
           <a:prstGeom prst="diamond">
             <a:avLst/>
@@ -22203,7 +22131,7 @@
         <p:spPr>
           <a:xfrm>
             <a:off x="7543800" y="1869840"/>
-            <a:ext cx="1791000" cy="378360"/>
+            <a:ext cx="1790640" cy="378000"/>
           </a:xfrm>
           <a:prstGeom prst="diamond">
             <a:avLst/>
@@ -22270,8 +22198,8 @@
         </p:nvCxnSpPr>
         <p:spPr>
           <a:xfrm flipV="1">
-            <a:off x="7080480" y="2059200"/>
-            <a:ext cx="463680" cy="224640"/>
+            <a:off x="7080120" y="2058840"/>
+            <a:ext cx="464040" cy="225000"/>
           </a:xfrm>
           <a:prstGeom prst="straightConnector1">
             <a:avLst/>
@@ -22296,8 +22224,8 @@
         </p:nvCxnSpPr>
         <p:spPr>
           <a:xfrm flipH="1">
-            <a:off x="9266760" y="4950360"/>
-            <a:ext cx="916920" cy="536400"/>
+            <a:off x="9266400" y="4950000"/>
+            <a:ext cx="917280" cy="536760"/>
           </a:xfrm>
           <a:prstGeom prst="straightConnector1">
             <a:avLst/>
@@ -22321,8 +22249,8 @@
         </p:nvCxnSpPr>
         <p:spPr>
           <a:xfrm>
-            <a:off x="10157400" y="4099680"/>
-            <a:ext cx="26280" cy="472680"/>
+            <a:off x="10157040" y="4099680"/>
+            <a:ext cx="26640" cy="472680"/>
           </a:xfrm>
           <a:prstGeom prst="straightConnector1">
             <a:avLst/>
@@ -22346,8 +22274,8 @@
         </p:nvCxnSpPr>
         <p:spPr>
           <a:xfrm flipH="1">
-            <a:off x="8678520" y="4761360"/>
-            <a:ext cx="723960" cy="360"/>
+            <a:off x="8678160" y="4761000"/>
+            <a:ext cx="724320" cy="360"/>
           </a:xfrm>
           <a:prstGeom prst="straightConnector1">
             <a:avLst/>
@@ -22369,7 +22297,7 @@
         <p:spPr>
           <a:xfrm>
             <a:off x="6629400" y="5099760"/>
-            <a:ext cx="1591920" cy="378360"/>
+            <a:ext cx="1591560" cy="378000"/>
           </a:xfrm>
           <a:prstGeom prst="ellipse">
             <a:avLst/>
@@ -22434,8 +22362,8 @@
         </p:nvCxnSpPr>
         <p:spPr>
           <a:xfrm flipH="1">
-            <a:off x="8221320" y="4761360"/>
-            <a:ext cx="1181160" cy="528120"/>
+            <a:off x="8220960" y="4761000"/>
+            <a:ext cx="1181520" cy="528120"/>
           </a:xfrm>
           <a:prstGeom prst="straightConnector1">
             <a:avLst/>
@@ -22459,8 +22387,8 @@
         </p:nvCxnSpPr>
         <p:spPr>
           <a:xfrm flipH="1">
-            <a:off x="3626280" y="2547360"/>
-            <a:ext cx="8640" cy="457560"/>
+            <a:off x="3625920" y="2547000"/>
+            <a:ext cx="9000" cy="457560"/>
           </a:xfrm>
           <a:prstGeom prst="straightConnector1">
             <a:avLst/>
@@ -22482,7 +22410,7 @@
         <p:spPr>
           <a:xfrm>
             <a:off x="5234760" y="2815200"/>
-            <a:ext cx="1562400" cy="378360"/>
+            <a:ext cx="1562040" cy="378000"/>
           </a:xfrm>
           <a:prstGeom prst="diamond">
             <a:avLst/>
@@ -22547,7 +22475,7 @@
         <p:spPr>
           <a:xfrm>
             <a:off x="3634560" y="2358000"/>
-            <a:ext cx="1562400" cy="378360"/>
+            <a:ext cx="1562040" cy="378000"/>
           </a:xfrm>
           <a:prstGeom prst="diamond">
             <a:avLst/>
@@ -22612,7 +22540,7 @@
         <p:spPr>
           <a:xfrm>
             <a:off x="2034360" y="2815200"/>
-            <a:ext cx="1591920" cy="378360"/>
+            <a:ext cx="1591560" cy="378000"/>
           </a:xfrm>
           <a:prstGeom prst="ellipse">
             <a:avLst/>
@@ -22677,8 +22605,8 @@
         </p:nvCxnSpPr>
         <p:spPr>
           <a:xfrm flipH="1" flipV="1">
-            <a:off x="4415760" y="2736360"/>
-            <a:ext cx="689760" cy="1286640"/>
+            <a:off x="4415760" y="2736000"/>
+            <a:ext cx="689400" cy="1287000"/>
           </a:xfrm>
           <a:prstGeom prst="straightConnector1">
             <a:avLst/>
@@ -22728,8 +22656,8 @@
         </p:nvCxnSpPr>
         <p:spPr>
           <a:xfrm flipV="1">
-            <a:off x="5105160" y="3193560"/>
-            <a:ext cx="911160" cy="829440"/>
+            <a:off x="5104800" y="3193200"/>
+            <a:ext cx="911520" cy="829800"/>
           </a:xfrm>
           <a:prstGeom prst="straightConnector1">
             <a:avLst/>
@@ -22755,7 +22683,7 @@
         <p:spPr>
           <a:xfrm flipV="1">
             <a:off x="6015960" y="2435040"/>
-            <a:ext cx="256320" cy="380520"/>
+            <a:ext cx="255960" cy="380520"/>
           </a:xfrm>
           <a:prstGeom prst="straightConnector1">
             <a:avLst/>
@@ -22779,8 +22707,8 @@
         </p:nvCxnSpPr>
         <p:spPr>
           <a:xfrm flipV="1">
-            <a:off x="5913720" y="3691080"/>
-            <a:ext cx="1173240" cy="720720"/>
+            <a:off x="5913360" y="3690720"/>
+            <a:ext cx="1173600" cy="721080"/>
           </a:xfrm>
           <a:prstGeom prst="straightConnector1">
             <a:avLst/>
@@ -22805,8 +22733,8 @@
         </p:nvCxnSpPr>
         <p:spPr>
           <a:xfrm flipH="1">
-            <a:off x="8907120" y="3177000"/>
-            <a:ext cx="442080" cy="514440"/>
+            <a:off x="8906760" y="3177000"/>
+            <a:ext cx="442440" cy="514080"/>
           </a:xfrm>
           <a:prstGeom prst="straightConnector1">
             <a:avLst/>
@@ -22830,8 +22758,8 @@
         </p:nvCxnSpPr>
         <p:spPr>
           <a:xfrm flipH="1" flipV="1">
-            <a:off x="9334800" y="2059200"/>
-            <a:ext cx="822960" cy="195480"/>
+            <a:off x="9334440" y="2058840"/>
+            <a:ext cx="822960" cy="195840"/>
           </a:xfrm>
           <a:prstGeom prst="straightConnector1">
             <a:avLst/>
@@ -22853,7 +22781,7 @@
         <p:spPr>
           <a:xfrm>
             <a:off x="2722320" y="5330520"/>
-            <a:ext cx="1820520" cy="378360"/>
+            <a:ext cx="1820160" cy="378000"/>
           </a:xfrm>
           <a:prstGeom prst="diamond">
             <a:avLst/>
@@ -22920,8 +22848,8 @@
         </p:nvCxnSpPr>
         <p:spPr>
           <a:xfrm flipH="1">
-            <a:off x="3632760" y="4411440"/>
-            <a:ext cx="664200" cy="919440"/>
+            <a:off x="3632400" y="4411440"/>
+            <a:ext cx="664560" cy="919440"/>
           </a:xfrm>
           <a:prstGeom prst="straightConnector1">
             <a:avLst/>
@@ -22945,8 +22873,8 @@
         </p:nvCxnSpPr>
         <p:spPr>
           <a:xfrm flipH="1">
-            <a:off x="4542840" y="4800600"/>
-            <a:ext cx="562680" cy="719640"/>
+            <a:off x="4542480" y="4800600"/>
+            <a:ext cx="562680" cy="719280"/>
           </a:xfrm>
           <a:prstGeom prst="straightConnector1">
             <a:avLst/>
@@ -22968,7 +22896,7 @@
         <p:spPr>
           <a:xfrm>
             <a:off x="7315200" y="4114800"/>
-            <a:ext cx="1671120" cy="378360"/>
+            <a:ext cx="1670760" cy="378000"/>
           </a:xfrm>
           <a:prstGeom prst="ellipse">
             <a:avLst/>
@@ -23033,8 +22961,8 @@
         </p:nvCxnSpPr>
         <p:spPr>
           <a:xfrm flipH="1" flipV="1">
-            <a:off x="8986320" y="4304160"/>
-            <a:ext cx="416160" cy="457560"/>
+            <a:off x="8985960" y="4303800"/>
+            <a:ext cx="416520" cy="457560"/>
           </a:xfrm>
           <a:prstGeom prst="straightConnector1">
             <a:avLst/>
@@ -23086,7 +23014,7 @@
         <p:spPr>
           <a:xfrm flipH="1">
             <a:off x="0" y="3073320"/>
-            <a:ext cx="1838160" cy="9360"/>
+            <a:ext cx="1838520" cy="9720"/>
           </a:xfrm>
           <a:prstGeom prst="straightConnector1">
             <a:avLst/>
@@ -23109,7 +23037,7 @@
         <p:spPr>
           <a:xfrm>
             <a:off x="0" y="2489400"/>
-            <a:ext cx="1838160" cy="9360"/>
+            <a:ext cx="1838520" cy="9720"/>
           </a:xfrm>
           <a:prstGeom prst="straightConnector1">
             <a:avLst/>
@@ -23132,7 +23060,7 @@
         <p:spPr>
           <a:xfrm>
             <a:off x="0" y="2781360"/>
-            <a:ext cx="1838160" cy="9360"/>
+            <a:ext cx="1838520" cy="9720"/>
           </a:xfrm>
           <a:prstGeom prst="straightConnector1">
             <a:avLst/>
@@ -23155,7 +23083,7 @@
         <p:spPr>
           <a:xfrm flipH="1">
             <a:off x="0" y="3657600"/>
-            <a:ext cx="1838160" cy="9360"/>
+            <a:ext cx="1838520" cy="9720"/>
           </a:xfrm>
           <a:prstGeom prst="straightConnector1">
             <a:avLst/>
@@ -23177,7 +23105,7 @@
         <p:spPr>
           <a:xfrm>
             <a:off x="128520" y="6134040"/>
-            <a:ext cx="1562400" cy="378360"/>
+            <a:ext cx="1562040" cy="378000"/>
           </a:xfrm>
           <a:prstGeom prst="diamond">
             <a:avLst/>
@@ -23242,7 +23170,7 @@
         <p:spPr>
           <a:xfrm>
             <a:off x="302760" y="5454000"/>
-            <a:ext cx="1213920" cy="378360"/>
+            <a:ext cx="1213560" cy="378000"/>
           </a:xfrm>
           <a:prstGeom prst="ellipse">
             <a:avLst/>
@@ -23305,9 +23233,9 @@
         <p:grpSpPr>
           <a:xfrm>
             <a:off x="101160" y="336240"/>
-            <a:ext cx="1617120" cy="777960"/>
+            <a:ext cx="1616760" cy="777960"/>
             <a:chOff x="101160" y="336240"/>
-            <a:chExt cx="1617120" cy="777960"/>
+            <a:chExt cx="1616760" cy="777960"/>
           </a:xfrm>
         </p:grpSpPr>
         <p:sp>
@@ -23319,7 +23247,7 @@
           <p:spPr>
             <a:xfrm>
               <a:off x="101160" y="336240"/>
-              <a:ext cx="1617120" cy="303120"/>
+              <a:ext cx="1616760" cy="303120"/>
             </a:xfrm>
             <a:prstGeom prst="rect">
               <a:avLst/>
@@ -23376,7 +23304,7 @@
           <p:spPr>
             <a:xfrm>
               <a:off x="101160" y="597600"/>
-              <a:ext cx="1617120" cy="516600"/>
+              <a:ext cx="1616760" cy="516600"/>
             </a:xfrm>
             <a:prstGeom prst="rect">
               <a:avLst/>
@@ -23467,7 +23395,7 @@
         <p:spPr>
           <a:xfrm>
             <a:off x="128520" y="4629600"/>
-            <a:ext cx="1562400" cy="523080"/>
+            <a:ext cx="1562040" cy="522720"/>
           </a:xfrm>
           <a:prstGeom prst="diamond">
             <a:avLst/>
@@ -23555,7 +23483,7 @@
         <p:spPr>
           <a:xfrm>
             <a:off x="0" y="3365640"/>
-            <a:ext cx="1838160" cy="9360"/>
+            <a:ext cx="1838520" cy="9720"/>
           </a:xfrm>
           <a:prstGeom prst="straightConnector1">
             <a:avLst/>
@@ -23577,7 +23505,7 @@
         <p:spPr>
           <a:xfrm>
             <a:off x="673200" y="3949920"/>
-            <a:ext cx="473400" cy="378360"/>
+            <a:ext cx="473040" cy="378000"/>
           </a:xfrm>
           <a:prstGeom prst="triangle">
             <a:avLst>
@@ -23644,9 +23572,9 @@
         <p:grpSpPr>
           <a:xfrm>
             <a:off x="101160" y="1413000"/>
-            <a:ext cx="1617120" cy="777960"/>
+            <a:ext cx="1616760" cy="777960"/>
             <a:chOff x="101160" y="1413000"/>
-            <a:chExt cx="1617120" cy="777960"/>
+            <a:chExt cx="1616760" cy="777960"/>
           </a:xfrm>
         </p:grpSpPr>
         <p:sp>
@@ -23658,7 +23586,7 @@
           <p:spPr>
             <a:xfrm>
               <a:off x="101160" y="1413000"/>
-              <a:ext cx="1617120" cy="303120"/>
+              <a:ext cx="1616760" cy="303120"/>
             </a:xfrm>
             <a:prstGeom prst="rect">
               <a:avLst/>
@@ -23716,7 +23644,7 @@
           <p:spPr>
             <a:xfrm>
               <a:off x="101160" y="1674360"/>
-              <a:ext cx="1617120" cy="516600"/>
+              <a:ext cx="1616760" cy="516600"/>
             </a:xfrm>
             <a:prstGeom prst="rect">
               <a:avLst/>
@@ -23808,9 +23736,9 @@
         <p:grpSpPr>
           <a:xfrm>
             <a:off x="3886200" y="2286000"/>
-            <a:ext cx="1617120" cy="1418400"/>
+            <a:ext cx="1616760" cy="1631880"/>
             <a:chOff x="3886200" y="2286000"/>
-            <a:chExt cx="1617120" cy="1418400"/>
+            <a:chExt cx="1616760" cy="1631880"/>
           </a:xfrm>
         </p:grpSpPr>
         <p:sp>
@@ -23822,7 +23750,7 @@
           <p:spPr>
             <a:xfrm>
               <a:off x="3886200" y="2286000"/>
-              <a:ext cx="1617120" cy="303120"/>
+              <a:ext cx="1616760" cy="303120"/>
             </a:xfrm>
             <a:prstGeom prst="rect">
               <a:avLst/>
@@ -23879,7 +23807,7 @@
           <p:spPr>
             <a:xfrm>
               <a:off x="3886200" y="2547360"/>
-              <a:ext cx="1617120" cy="1157040"/>
+              <a:ext cx="1616760" cy="1370520"/>
             </a:xfrm>
             <a:prstGeom prst="rect">
               <a:avLst/>
@@ -23943,11 +23871,37 @@
                 <a:buChar char="-"/>
               </a:pPr>
               <a:r>
-                <a:rPr b="0" lang="en-US" sz="1400" spc="-1" strike="noStrike" u="sng">
+                <a:rPr b="0" lang="en-US" sz="1400" spc="-1" strike="noStrike">
                   <a:solidFill>
                     <a:schemeClr val="dk1"/>
                   </a:solidFill>
-                  <a:uFillTx/>
+                  <a:latin typeface="Calibri"/>
+                </a:rPr>
+                <a:t>OID</a:t>
+              </a:r>
+              <a:endParaRPr b="0" lang="en-US" sz="1400" spc="-1" strike="noStrike">
+                <a:solidFill>
+                  <a:srgbClr val="000000"/>
+                </a:solidFill>
+                <a:latin typeface="Arial"/>
+              </a:endParaRPr>
+            </a:p>
+            <a:p>
+              <a:pPr marL="304920" indent="-304920" defTabSz="914400">
+                <a:lnSpc>
+                  <a:spcPct val="100000"/>
+                </a:lnSpc>
+                <a:buClr>
+                  <a:srgbClr val="000000"/>
+                </a:buClr>
+                <a:buFont typeface="OpenSymbol"/>
+                <a:buChar char="-"/>
+              </a:pPr>
+              <a:r>
+                <a:rPr b="0" lang="en-US" sz="1400" spc="-1" strike="noStrike">
+                  <a:solidFill>
+                    <a:schemeClr val="dk1"/>
+                  </a:solidFill>
                   <a:latin typeface="Calibri"/>
                 </a:rPr>
                 <a:t>Type</a:t>
@@ -24052,7 +24006,7 @@
         <p:spPr>
           <a:xfrm>
             <a:off x="6400800" y="228600"/>
-            <a:ext cx="1617120" cy="303120"/>
+            <a:ext cx="1616760" cy="303120"/>
           </a:xfrm>
           <a:prstGeom prst="rect">
             <a:avLst/>
@@ -24109,7 +24063,7 @@
         <p:spPr>
           <a:xfrm>
             <a:off x="4381200" y="914400"/>
-            <a:ext cx="2019600" cy="378360"/>
+            <a:ext cx="2019240" cy="378000"/>
           </a:xfrm>
           <a:prstGeom prst="diamond">
             <a:avLst/>
@@ -24176,8 +24130,8 @@
         </p:nvCxnSpPr>
         <p:spPr>
           <a:xfrm flipV="1">
-            <a:off x="4694760" y="1292760"/>
-            <a:ext cx="696600" cy="993600"/>
+            <a:off x="4694400" y="1292400"/>
+            <a:ext cx="696960" cy="993960"/>
           </a:xfrm>
           <a:prstGeom prst="straightConnector1">
             <a:avLst/>

</xml_diff>

<commit_message>
more work on transfers
</commit_message>
<xml_diff>
--- a/documentation/database/ER-Diagram.pptx
+++ b/documentation/database/ER-Diagram.pptx
@@ -353,7 +353,7 @@
             <a:pPr indent="0" algn="r">
               <a:buNone/>
             </a:pPr>
-            <a:fld id="{89D071E3-AB1A-4926-84D3-42DE81DAB11C}" type="slidenum">
+            <a:fld id="{F39426BF-05FA-4C75-94D6-4923370345BE}" type="slidenum">
               <a:rPr b="0" lang="en-US" sz="1400" spc="-1" strike="noStrike">
                 <a:solidFill>
                   <a:srgbClr val="000000"/>
@@ -407,7 +407,7 @@
         <p:spPr>
           <a:xfrm>
             <a:off x="685800" y="1143000"/>
-            <a:ext cx="5476680" cy="3076560"/>
+            <a:ext cx="5476320" cy="3076200"/>
           </a:xfrm>
           <a:prstGeom prst="rect">
             <a:avLst/>
@@ -430,7 +430,7 @@
         <p:spPr>
           <a:xfrm>
             <a:off x="685800" y="4400640"/>
-            <a:ext cx="5476680" cy="3590640"/>
+            <a:ext cx="5476320" cy="3590280"/>
           </a:xfrm>
           <a:prstGeom prst="rect">
             <a:avLst/>
@@ -470,7 +470,7 @@
         <p:spPr>
           <a:xfrm>
             <a:off x="3884760" y="8685360"/>
-            <a:ext cx="2962080" cy="448920"/>
+            <a:ext cx="2961720" cy="448560"/>
           </a:xfrm>
           <a:prstGeom prst="rect">
             <a:avLst/>
@@ -512,7 +512,7 @@
                 <a:tab algn="l" pos="0"/>
               </a:tabLst>
             </a:pPr>
-            <a:fld id="{FBA6920A-D71C-45D9-B2D9-0BF3D655507E}" type="slidenum">
+            <a:fld id="{7915459C-AB75-4791-80C5-31FDF740BBDD}" type="slidenum">
               <a:rPr b="0" lang="en-US" sz="1200" spc="-1" strike="noStrike">
                 <a:solidFill>
                   <a:schemeClr val="dk1"/>
@@ -566,7 +566,7 @@
         <p:spPr>
           <a:xfrm>
             <a:off x="685800" y="1143000"/>
-            <a:ext cx="5476680" cy="3076560"/>
+            <a:ext cx="5476320" cy="3076200"/>
           </a:xfrm>
           <a:prstGeom prst="rect">
             <a:avLst/>
@@ -589,7 +589,7 @@
         <p:spPr>
           <a:xfrm>
             <a:off x="685800" y="4400640"/>
-            <a:ext cx="5476680" cy="3590640"/>
+            <a:ext cx="5476320" cy="3590280"/>
           </a:xfrm>
           <a:prstGeom prst="rect">
             <a:avLst/>
@@ -629,7 +629,7 @@
         <p:spPr>
           <a:xfrm>
             <a:off x="3884760" y="8685360"/>
-            <a:ext cx="2962080" cy="448920"/>
+            <a:ext cx="2961720" cy="448560"/>
           </a:xfrm>
           <a:prstGeom prst="rect">
             <a:avLst/>
@@ -671,7 +671,7 @@
                 <a:tab algn="l" pos="0"/>
               </a:tabLst>
             </a:pPr>
-            <a:fld id="{9D683BD9-EE53-44E0-BE88-6CBE7BDBC2E0}" type="slidenum">
+            <a:fld id="{DFF7CE90-538E-496C-A0A9-603FF255E493}" type="slidenum">
               <a:rPr b="0" lang="en-US" sz="1200" spc="-1" strike="noStrike">
                 <a:solidFill>
                   <a:schemeClr val="dk1"/>
@@ -725,7 +725,7 @@
         <p:spPr>
           <a:xfrm>
             <a:off x="685800" y="1143000"/>
-            <a:ext cx="5476680" cy="3076560"/>
+            <a:ext cx="5476320" cy="3076200"/>
           </a:xfrm>
           <a:prstGeom prst="rect">
             <a:avLst/>
@@ -748,7 +748,7 @@
         <p:spPr>
           <a:xfrm>
             <a:off x="685800" y="4400640"/>
-            <a:ext cx="5476680" cy="3590640"/>
+            <a:ext cx="5476320" cy="3590280"/>
           </a:xfrm>
           <a:prstGeom prst="rect">
             <a:avLst/>
@@ -788,7 +788,7 @@
         <p:spPr>
           <a:xfrm>
             <a:off x="3884760" y="8685360"/>
-            <a:ext cx="2962080" cy="448920"/>
+            <a:ext cx="2961720" cy="448560"/>
           </a:xfrm>
           <a:prstGeom prst="rect">
             <a:avLst/>
@@ -830,7 +830,7 @@
                 <a:tab algn="l" pos="0"/>
               </a:tabLst>
             </a:pPr>
-            <a:fld id="{9708E284-0C76-4FC7-B389-4E83CBA6BE5D}" type="slidenum">
+            <a:fld id="{6C6A07F0-894D-497E-A139-EEC2405B43FB}" type="slidenum">
               <a:rPr b="0" lang="en-US" sz="1200" spc="-1" strike="noStrike">
                 <a:solidFill>
                   <a:schemeClr val="dk1"/>
@@ -884,7 +884,7 @@
         <p:spPr>
           <a:xfrm>
             <a:off x="685800" y="1143000"/>
-            <a:ext cx="5476680" cy="3076560"/>
+            <a:ext cx="5476320" cy="3076200"/>
           </a:xfrm>
           <a:prstGeom prst="rect">
             <a:avLst/>
@@ -907,7 +907,7 @@
         <p:spPr>
           <a:xfrm>
             <a:off x="685800" y="4400640"/>
-            <a:ext cx="5476680" cy="3590640"/>
+            <a:ext cx="5476320" cy="3590280"/>
           </a:xfrm>
           <a:prstGeom prst="rect">
             <a:avLst/>
@@ -947,7 +947,7 @@
         <p:spPr>
           <a:xfrm>
             <a:off x="3884760" y="8685360"/>
-            <a:ext cx="2962080" cy="448920"/>
+            <a:ext cx="2961720" cy="448560"/>
           </a:xfrm>
           <a:prstGeom prst="rect">
             <a:avLst/>
@@ -989,7 +989,7 @@
                 <a:tab algn="l" pos="0"/>
               </a:tabLst>
             </a:pPr>
-            <a:fld id="{4F821FA5-06A7-4EE3-B36E-A1403C593BF0}" type="slidenum">
+            <a:fld id="{72D0145A-A87B-448C-9A73-408FB5F75AE1}" type="slidenum">
               <a:rPr b="0" lang="en-US" sz="1200" spc="-1" strike="noStrike">
                 <a:solidFill>
                   <a:schemeClr val="dk1"/>
@@ -1233,7 +1233,7 @@
         <p:txBody>
           <a:bodyPr/>
           <a:p>
-            <a:fld id="{88E3BC21-ED12-4334-8746-0B998E7A74ED}" type="slidenum">
+            <a:fld id="{FCB38804-BA83-46CB-9517-7C8972FCA09F}" type="slidenum">
               <a:t>&lt;#&gt;</a:t>
             </a:fld>
           </a:p>
@@ -1442,7 +1442,7 @@
         <p:txBody>
           <a:bodyPr/>
           <a:p>
-            <a:fld id="{9499798E-0834-47EF-9EB0-42DAA6EB0270}" type="slidenum">
+            <a:fld id="{EC9D731A-7DA9-4083-A7AD-A436D703F76F}" type="slidenum">
               <a:t>&lt;#&gt;</a:t>
             </a:fld>
           </a:p>
@@ -1565,7 +1565,7 @@
         <p:txBody>
           <a:bodyPr/>
           <a:p>
-            <a:fld id="{DFAF1C40-1B2F-4A77-A882-A86DB808B4E6}" type="slidenum">
+            <a:fld id="{574BD7B3-0624-452B-ABE6-37719C86BE89}" type="slidenum">
               <a:t>&lt;#&gt;</a:t>
             </a:fld>
           </a:p>
@@ -1648,7 +1648,7 @@
         <p:txBody>
           <a:bodyPr/>
           <a:p>
-            <a:fld id="{B366114B-FD64-49AF-A4F1-B00241A11F53}" type="slidenum">
+            <a:fld id="{0C1298B7-F670-4DDA-8206-B293E8C3C894}" type="slidenum">
               <a:t>&lt;#&gt;</a:t>
             </a:fld>
           </a:p>
@@ -1900,7 +1900,7 @@
         <p:txBody>
           <a:bodyPr/>
           <a:p>
-            <a:fld id="{CE640D2D-0E0C-4B16-A1BA-07DE286A2C6D}" type="slidenum">
+            <a:fld id="{6D5F3087-04B9-4018-87F8-4C73B716D7BB}" type="slidenum">
               <a:t>&lt;#&gt;</a:t>
             </a:fld>
           </a:p>
@@ -2152,7 +2152,7 @@
         <p:txBody>
           <a:bodyPr/>
           <a:p>
-            <a:fld id="{AC22A12E-1E73-4265-A637-37B24195F35D}" type="slidenum">
+            <a:fld id="{E8E6A792-9721-4C86-9048-4388BB6B0015}" type="slidenum">
               <a:t>&lt;#&gt;</a:t>
             </a:fld>
           </a:p>
@@ -2361,7 +2361,7 @@
         <p:txBody>
           <a:bodyPr/>
           <a:p>
-            <a:fld id="{38B38650-DC8E-4928-9E38-4B6F5961CB53}" type="slidenum">
+            <a:fld id="{8C508144-1AB5-471A-8A33-3EED7E36EC1B}" type="slidenum">
               <a:t>&lt;#&gt;</a:t>
             </a:fld>
           </a:p>
@@ -2656,7 +2656,7 @@
         <p:txBody>
           <a:bodyPr/>
           <a:p>
-            <a:fld id="{463A04B5-3D28-43F2-A884-CB4F233165A4}" type="slidenum">
+            <a:fld id="{0339984D-B17A-4E35-8510-C6C081BDB7FC}" type="slidenum">
               <a:t>&lt;#&gt;</a:t>
             </a:fld>
           </a:p>
@@ -2739,7 +2739,7 @@
         <p:txBody>
           <a:bodyPr/>
           <a:p>
-            <a:fld id="{7572CA26-5637-4058-9479-227B9B34B663}" type="slidenum">
+            <a:fld id="{5752B2C0-CCFC-427E-A2AD-8F72FA0B257B}" type="slidenum">
               <a:t>&lt;#&gt;</a:t>
             </a:fld>
           </a:p>
@@ -2822,7 +2822,7 @@
         <p:txBody>
           <a:bodyPr/>
           <a:p>
-            <a:fld id="{EB782888-BC49-4B2E-9226-12A5C622A457}" type="slidenum">
+            <a:fld id="{C18189A3-7006-4CF5-8358-CF5A2390CBE7}" type="slidenum">
               <a:t>&lt;#&gt;</a:t>
             </a:fld>
           </a:p>
@@ -2988,7 +2988,7 @@
         <p:txBody>
           <a:bodyPr/>
           <a:p>
-            <a:fld id="{22D46E88-600B-4BC3-8867-F4A6E07B1A76}" type="slidenum">
+            <a:fld id="{2CFC5DE6-BBC4-4CF6-B1EA-ACEBAD3A74F6}" type="slidenum">
               <a:t>&lt;#&gt;</a:t>
             </a:fld>
           </a:p>
@@ -3154,7 +3154,7 @@
         <p:txBody>
           <a:bodyPr/>
           <a:p>
-            <a:fld id="{4B90E507-032B-47B6-BB2E-58F3CD655D12}" type="slidenum">
+            <a:fld id="{B9BBB4A7-8982-4A69-8407-BCD324EE80AA}" type="slidenum">
               <a:t>&lt;#&gt;</a:t>
             </a:fld>
           </a:p>
@@ -3219,9 +3219,9 @@
         <p:grpSpPr>
           <a:xfrm>
             <a:off x="6199200" y="6162840"/>
-            <a:ext cx="5983200" cy="685440"/>
+            <a:ext cx="5982840" cy="685080"/>
             <a:chOff x="6199200" y="6162840"/>
-            <a:chExt cx="5983200" cy="685440"/>
+            <a:chExt cx="5982840" cy="685080"/>
           </a:xfrm>
         </p:grpSpPr>
         <p:pic>
@@ -3237,7 +3237,7 @@
           <p:spPr>
             <a:xfrm>
               <a:off x="6199200" y="6162840"/>
-              <a:ext cx="4046760" cy="685440"/>
+              <a:ext cx="4046400" cy="685080"/>
             </a:xfrm>
             <a:prstGeom prst="rect">
               <a:avLst/>
@@ -3260,7 +3260,7 @@
           <p:spPr>
             <a:xfrm>
               <a:off x="10270080" y="6162840"/>
-              <a:ext cx="1912320" cy="601920"/>
+              <a:ext cx="1911960" cy="601560"/>
             </a:xfrm>
             <a:prstGeom prst="rect">
               <a:avLst/>
@@ -3309,25 +3309,7 @@
                 </a:solidFill>
                 <a:latin typeface="Arial"/>
               </a:rPr>
-              <a:t>Click to edit </a:t>
-            </a:r>
-            <a:r>
-              <a:rPr b="0" lang="en-US" sz="1800" spc="-1" strike="noStrike">
-                <a:solidFill>
-                  <a:srgbClr val="000000"/>
-                </a:solidFill>
-                <a:latin typeface="Arial"/>
-              </a:rPr>
-              <a:t>the title text </a:t>
-            </a:r>
-            <a:r>
-              <a:rPr b="0" lang="en-US" sz="1800" spc="-1" strike="noStrike">
-                <a:solidFill>
-                  <a:srgbClr val="000000"/>
-                </a:solidFill>
-                <a:latin typeface="Arial"/>
-              </a:rPr>
-              <a:t>format</a:t>
+              <a:t>Click to edit the title text format</a:t>
             </a:r>
             <a:endParaRPr b="0" lang="en-US" sz="1800" spc="-1" strike="noStrike">
               <a:solidFill>
@@ -4026,7 +4008,7 @@
         <p:spPr>
           <a:xfrm>
             <a:off x="4038480" y="6356520"/>
-            <a:ext cx="4105080" cy="355320"/>
+            <a:ext cx="4104720" cy="354960"/>
           </a:xfrm>
           <a:prstGeom prst="rect">
             <a:avLst/>
@@ -4098,7 +4080,7 @@
         <p:spPr>
           <a:xfrm>
             <a:off x="8610480" y="6356520"/>
-            <a:ext cx="2733480" cy="355320"/>
+            <a:ext cx="2733120" cy="354960"/>
           </a:xfrm>
           <a:prstGeom prst="rect">
             <a:avLst/>
@@ -4141,7 +4123,7 @@
                 <a:tab algn="l" pos="0"/>
               </a:tabLst>
             </a:pPr>
-            <a:fld id="{4E379E05-C7FE-46F6-BC41-6C323B016E2E}" type="slidenum">
+            <a:fld id="{3F6F510D-DD2E-48CC-BF68-999D61DE21B6}" type="slidenum">
               <a:rPr b="0" lang="en-US" sz="1200" spc="-1" strike="noStrike">
                 <a:solidFill>
                   <a:schemeClr val="dk1">
@@ -4174,7 +4156,7 @@
         <p:spPr>
           <a:xfrm>
             <a:off x="838080" y="6356520"/>
-            <a:ext cx="2733480" cy="355320"/>
+            <a:ext cx="2733120" cy="354960"/>
           </a:xfrm>
           <a:prstGeom prst="rect">
             <a:avLst/>
@@ -4263,9 +4245,9 @@
         <p:grpSpPr>
           <a:xfrm>
             <a:off x="6199200" y="6162840"/>
-            <a:ext cx="5983200" cy="685440"/>
+            <a:ext cx="5982840" cy="685080"/>
             <a:chOff x="6199200" y="6162840"/>
-            <a:chExt cx="5983200" cy="685440"/>
+            <a:chExt cx="5982840" cy="685080"/>
           </a:xfrm>
         </p:grpSpPr>
         <p:pic>
@@ -4281,7 +4263,7 @@
           <p:spPr>
             <a:xfrm>
               <a:off x="6199200" y="6162840"/>
-              <a:ext cx="4046760" cy="685440"/>
+              <a:ext cx="4046400" cy="685080"/>
             </a:xfrm>
             <a:prstGeom prst="rect">
               <a:avLst/>
@@ -4304,7 +4286,7 @@
           <p:spPr>
             <a:xfrm>
               <a:off x="10270080" y="6162840"/>
-              <a:ext cx="1912320" cy="601920"/>
+              <a:ext cx="1911960" cy="601560"/>
             </a:xfrm>
             <a:prstGeom prst="rect">
               <a:avLst/>
@@ -4827,7 +4809,7 @@
         <p:spPr>
           <a:xfrm>
             <a:off x="4038480" y="6356520"/>
-            <a:ext cx="4105080" cy="355320"/>
+            <a:ext cx="4104720" cy="354960"/>
           </a:xfrm>
           <a:prstGeom prst="rect">
             <a:avLst/>
@@ -4899,7 +4881,7 @@
         <p:spPr>
           <a:xfrm>
             <a:off x="8610480" y="6356520"/>
-            <a:ext cx="2733480" cy="355320"/>
+            <a:ext cx="2733120" cy="354960"/>
           </a:xfrm>
           <a:prstGeom prst="rect">
             <a:avLst/>
@@ -4942,7 +4924,7 @@
                 <a:tab algn="l" pos="0"/>
               </a:tabLst>
             </a:pPr>
-            <a:fld id="{344489B5-002F-4A6D-A295-21846810AC14}" type="slidenum">
+            <a:fld id="{AB9A852C-1B08-4DF8-944F-C318380233B6}" type="slidenum">
               <a:rPr b="0" lang="en-US" sz="1200" spc="-1" strike="noStrike">
                 <a:solidFill>
                   <a:schemeClr val="dk1">
@@ -4975,7 +4957,7 @@
         <p:spPr>
           <a:xfrm>
             <a:off x="838080" y="6356520"/>
-            <a:ext cx="2733480" cy="355320"/>
+            <a:ext cx="2733120" cy="354960"/>
           </a:xfrm>
           <a:prstGeom prst="rect">
             <a:avLst/>
@@ -5064,9 +5046,9 @@
         <p:grpSpPr>
           <a:xfrm>
             <a:off x="6199200" y="6162840"/>
-            <a:ext cx="5983200" cy="685440"/>
+            <a:ext cx="5982840" cy="685080"/>
             <a:chOff x="6199200" y="6162840"/>
-            <a:chExt cx="5983200" cy="685440"/>
+            <a:chExt cx="5982840" cy="685080"/>
           </a:xfrm>
         </p:grpSpPr>
         <p:pic>
@@ -5082,7 +5064,7 @@
           <p:spPr>
             <a:xfrm>
               <a:off x="6199200" y="6162840"/>
-              <a:ext cx="4046760" cy="685440"/>
+              <a:ext cx="4046400" cy="685080"/>
             </a:xfrm>
             <a:prstGeom prst="rect">
               <a:avLst/>
@@ -5105,7 +5087,7 @@
           <p:spPr>
             <a:xfrm>
               <a:off x="10270080" y="6162840"/>
-              <a:ext cx="1912320" cy="601920"/>
+              <a:ext cx="1911960" cy="601560"/>
             </a:xfrm>
             <a:prstGeom prst="rect">
               <a:avLst/>
@@ -5178,7 +5160,7 @@
         <p:spPr>
           <a:xfrm>
             <a:off x="4038480" y="6356520"/>
-            <a:ext cx="4105080" cy="355320"/>
+            <a:ext cx="4104720" cy="354960"/>
           </a:xfrm>
           <a:prstGeom prst="rect">
             <a:avLst/>
@@ -5250,7 +5232,7 @@
         <p:spPr>
           <a:xfrm>
             <a:off x="8610480" y="6356520"/>
-            <a:ext cx="2733480" cy="355320"/>
+            <a:ext cx="2733120" cy="354960"/>
           </a:xfrm>
           <a:prstGeom prst="rect">
             <a:avLst/>
@@ -5293,7 +5275,7 @@
                 <a:tab algn="l" pos="0"/>
               </a:tabLst>
             </a:pPr>
-            <a:fld id="{4E031B1D-AF9C-475D-8CD3-5C56D64458D9}" type="slidenum">
+            <a:fld id="{5A824E17-1954-44E8-8CF5-ADACEF86A25A}" type="slidenum">
               <a:rPr b="0" lang="en-US" sz="1200" spc="-1" strike="noStrike">
                 <a:solidFill>
                   <a:schemeClr val="dk1">
@@ -5326,7 +5308,7 @@
         <p:spPr>
           <a:xfrm>
             <a:off x="838080" y="6356520"/>
-            <a:ext cx="2733480" cy="355320"/>
+            <a:ext cx="2733120" cy="354960"/>
           </a:xfrm>
           <a:prstGeom prst="rect">
             <a:avLst/>
@@ -5415,9 +5397,9 @@
         <p:grpSpPr>
           <a:xfrm>
             <a:off x="6199200" y="6162840"/>
-            <a:ext cx="5983200" cy="685440"/>
+            <a:ext cx="5982840" cy="685080"/>
             <a:chOff x="6199200" y="6162840"/>
-            <a:chExt cx="5983200" cy="685440"/>
+            <a:chExt cx="5982840" cy="685080"/>
           </a:xfrm>
         </p:grpSpPr>
         <p:pic>
@@ -5433,7 +5415,7 @@
           <p:spPr>
             <a:xfrm>
               <a:off x="6199200" y="6162840"/>
-              <a:ext cx="4046760" cy="685440"/>
+              <a:ext cx="4046400" cy="685080"/>
             </a:xfrm>
             <a:prstGeom prst="rect">
               <a:avLst/>
@@ -5456,7 +5438,7 @@
           <p:spPr>
             <a:xfrm>
               <a:off x="10270080" y="6162840"/>
-              <a:ext cx="1912320" cy="601920"/>
+              <a:ext cx="1911960" cy="601560"/>
             </a:xfrm>
             <a:prstGeom prst="rect">
               <a:avLst/>
@@ -5480,7 +5462,7 @@
         <p:spPr>
           <a:xfrm>
             <a:off x="4038480" y="6356520"/>
-            <a:ext cx="4105080" cy="355320"/>
+            <a:ext cx="4104720" cy="354960"/>
           </a:xfrm>
           <a:prstGeom prst="rect">
             <a:avLst/>
@@ -5552,7 +5534,7 @@
         <p:spPr>
           <a:xfrm>
             <a:off x="8610480" y="6356520"/>
-            <a:ext cx="2733480" cy="355320"/>
+            <a:ext cx="2733120" cy="354960"/>
           </a:xfrm>
           <a:prstGeom prst="rect">
             <a:avLst/>
@@ -5595,7 +5577,7 @@
                 <a:tab algn="l" pos="0"/>
               </a:tabLst>
             </a:pPr>
-            <a:fld id="{35A6C5AA-0A1C-421B-B8FC-48D11AA13098}" type="slidenum">
+            <a:fld id="{6521BDD3-9099-4FD4-A929-7C8E3455009A}" type="slidenum">
               <a:rPr b="0" lang="en-US" sz="1200" spc="-1" strike="noStrike">
                 <a:solidFill>
                   <a:schemeClr val="dk1">
@@ -5628,7 +5610,7 @@
         <p:spPr>
           <a:xfrm>
             <a:off x="838080" y="6356520"/>
-            <a:ext cx="2733480" cy="355320"/>
+            <a:ext cx="2733120" cy="354960"/>
           </a:xfrm>
           <a:prstGeom prst="rect">
             <a:avLst/>
@@ -5717,9 +5699,9 @@
         <p:grpSpPr>
           <a:xfrm>
             <a:off x="6199200" y="6162840"/>
-            <a:ext cx="5983200" cy="685440"/>
+            <a:ext cx="5982840" cy="685080"/>
             <a:chOff x="6199200" y="6162840"/>
-            <a:chExt cx="5983200" cy="685440"/>
+            <a:chExt cx="5982840" cy="685080"/>
           </a:xfrm>
         </p:grpSpPr>
         <p:pic>
@@ -5735,7 +5717,7 @@
           <p:spPr>
             <a:xfrm>
               <a:off x="6199200" y="6162840"/>
-              <a:ext cx="4046760" cy="685440"/>
+              <a:ext cx="4046400" cy="685080"/>
             </a:xfrm>
             <a:prstGeom prst="rect">
               <a:avLst/>
@@ -5758,7 +5740,7 @@
           <p:spPr>
             <a:xfrm>
               <a:off x="10270080" y="6162840"/>
-              <a:ext cx="1912320" cy="601920"/>
+              <a:ext cx="1911960" cy="601560"/>
             </a:xfrm>
             <a:prstGeom prst="rect">
               <a:avLst/>
@@ -5807,16 +5789,7 @@
                 </a:solidFill>
                 <a:latin typeface="Arial"/>
               </a:rPr>
-              <a:t>Click to edit the </a:t>
-            </a:r>
-            <a:r>
-              <a:rPr b="0" lang="en-US" sz="1800" spc="-1" strike="noStrike">
-                <a:solidFill>
-                  <a:srgbClr val="000000"/>
-                </a:solidFill>
-                <a:latin typeface="Arial"/>
-              </a:rPr>
-              <a:t>title text format</a:t>
+              <a:t>Click to edit the title text format</a:t>
             </a:r>
             <a:endParaRPr b="0" lang="en-US" sz="1800" spc="-1" strike="noStrike">
               <a:solidFill>
@@ -6515,7 +6488,7 @@
         <p:spPr>
           <a:xfrm>
             <a:off x="4038480" y="6356520"/>
-            <a:ext cx="4105080" cy="355320"/>
+            <a:ext cx="4104720" cy="354960"/>
           </a:xfrm>
           <a:prstGeom prst="rect">
             <a:avLst/>
@@ -6587,7 +6560,7 @@
         <p:spPr>
           <a:xfrm>
             <a:off x="8610480" y="6356520"/>
-            <a:ext cx="2733480" cy="355320"/>
+            <a:ext cx="2733120" cy="354960"/>
           </a:xfrm>
           <a:prstGeom prst="rect">
             <a:avLst/>
@@ -6630,7 +6603,7 @@
                 <a:tab algn="l" pos="0"/>
               </a:tabLst>
             </a:pPr>
-            <a:fld id="{59D4116A-2DD4-4A15-B8CE-E6172B48AFA2}" type="slidenum">
+            <a:fld id="{6A08CA24-036B-4A96-BFBD-3C38DB9F28A5}" type="slidenum">
               <a:rPr b="0" lang="en-US" sz="1200" spc="-1" strike="noStrike">
                 <a:solidFill>
                   <a:schemeClr val="dk1">
@@ -6663,7 +6636,7 @@
         <p:spPr>
           <a:xfrm>
             <a:off x="838080" y="6356520"/>
-            <a:ext cx="2733480" cy="355320"/>
+            <a:ext cx="2733120" cy="354960"/>
           </a:xfrm>
           <a:prstGeom prst="rect">
             <a:avLst/>
@@ -6752,9 +6725,9 @@
         <p:grpSpPr>
           <a:xfrm>
             <a:off x="6199200" y="6162840"/>
-            <a:ext cx="5983200" cy="685440"/>
+            <a:ext cx="5982840" cy="685080"/>
             <a:chOff x="6199200" y="6162840"/>
-            <a:chExt cx="5983200" cy="685440"/>
+            <a:chExt cx="5982840" cy="685080"/>
           </a:xfrm>
         </p:grpSpPr>
         <p:pic>
@@ -6770,7 +6743,7 @@
           <p:spPr>
             <a:xfrm>
               <a:off x="6199200" y="6162840"/>
-              <a:ext cx="4046760" cy="685440"/>
+              <a:ext cx="4046400" cy="685080"/>
             </a:xfrm>
             <a:prstGeom prst="rect">
               <a:avLst/>
@@ -6793,7 +6766,7 @@
           <p:spPr>
             <a:xfrm>
               <a:off x="10270080" y="6162840"/>
-              <a:ext cx="1912320" cy="601920"/>
+              <a:ext cx="1911960" cy="601560"/>
             </a:xfrm>
             <a:prstGeom prst="rect">
               <a:avLst/>
@@ -6842,70 +6815,7 @@
                 </a:solidFill>
                 <a:latin typeface="Arial"/>
               </a:rPr>
-              <a:t>Click </a:t>
-            </a:r>
-            <a:r>
-              <a:rPr b="0" lang="en-US" sz="1800" spc="-1" strike="noStrike">
-                <a:solidFill>
-                  <a:srgbClr val="000000"/>
-                </a:solidFill>
-                <a:latin typeface="Arial"/>
-              </a:rPr>
-              <a:t>to </a:t>
-            </a:r>
-            <a:r>
-              <a:rPr b="0" lang="en-US" sz="1800" spc="-1" strike="noStrike">
-                <a:solidFill>
-                  <a:srgbClr val="000000"/>
-                </a:solidFill>
-                <a:latin typeface="Arial"/>
-              </a:rPr>
-              <a:t>edit </a:t>
-            </a:r>
-            <a:r>
-              <a:rPr b="0" lang="en-US" sz="1800" spc="-1" strike="noStrike">
-                <a:solidFill>
-                  <a:srgbClr val="000000"/>
-                </a:solidFill>
-                <a:latin typeface="Arial"/>
-              </a:rPr>
-              <a:t>the </a:t>
-            </a:r>
-            <a:r>
-              <a:rPr b="0" lang="en-US" sz="1800" spc="-1" strike="noStrike">
-                <a:solidFill>
-                  <a:srgbClr val="000000"/>
-                </a:solidFill>
-                <a:latin typeface="Arial"/>
-              </a:rPr>
-              <a:t>title </a:t>
-            </a:r>
-            <a:r>
-              <a:rPr b="0" lang="en-US" sz="1800" spc="-1" strike="noStrike">
-                <a:solidFill>
-                  <a:srgbClr val="000000"/>
-                </a:solidFill>
-                <a:latin typeface="Arial"/>
-              </a:rPr>
-              <a:t>text </a:t>
-            </a:r>
-            <a:r>
-              <a:rPr b="0" lang="en-US" sz="1800" spc="-1" strike="noStrike">
-                <a:solidFill>
-                  <a:srgbClr val="000000"/>
-                </a:solidFill>
-                <a:latin typeface="Arial"/>
-              </a:rPr>
-              <a:t>forma</a:t>
-            </a:r>
-            <a:r>
-              <a:rPr b="0" lang="en-US" sz="1800" spc="-1" strike="noStrike">
-                <a:solidFill>
-                  <a:srgbClr val="000000"/>
-                </a:solidFill>
-                <a:latin typeface="Arial"/>
-              </a:rPr>
-              <a:t>t</a:t>
+              <a:t>Click to edit the title text format</a:t>
             </a:r>
             <a:endParaRPr b="0" lang="en-US" sz="1800" spc="-1" strike="noStrike">
               <a:solidFill>
@@ -7604,7 +7514,7 @@
         <p:spPr>
           <a:xfrm>
             <a:off x="4038480" y="6356520"/>
-            <a:ext cx="4105080" cy="355320"/>
+            <a:ext cx="4104720" cy="354960"/>
           </a:xfrm>
           <a:prstGeom prst="rect">
             <a:avLst/>
@@ -7676,7 +7586,7 @@
         <p:spPr>
           <a:xfrm>
             <a:off x="8610480" y="6356520"/>
-            <a:ext cx="2733480" cy="355320"/>
+            <a:ext cx="2733120" cy="354960"/>
           </a:xfrm>
           <a:prstGeom prst="rect">
             <a:avLst/>
@@ -7719,7 +7629,7 @@
                 <a:tab algn="l" pos="0"/>
               </a:tabLst>
             </a:pPr>
-            <a:fld id="{6DD8444D-8B80-4D62-A7DA-234F835260CB}" type="slidenum">
+            <a:fld id="{2FE4066F-3489-4926-8462-A76B7E4B5150}" type="slidenum">
               <a:rPr b="0" lang="en-US" sz="1200" spc="-1" strike="noStrike">
                 <a:solidFill>
                   <a:schemeClr val="dk1">
@@ -7752,7 +7662,7 @@
         <p:spPr>
           <a:xfrm>
             <a:off x="838080" y="6356520"/>
-            <a:ext cx="2733480" cy="355320"/>
+            <a:ext cx="2733120" cy="354960"/>
           </a:xfrm>
           <a:prstGeom prst="rect">
             <a:avLst/>
@@ -7841,9 +7751,9 @@
         <p:grpSpPr>
           <a:xfrm>
             <a:off x="6199200" y="6162840"/>
-            <a:ext cx="5983200" cy="685440"/>
+            <a:ext cx="5982840" cy="685080"/>
             <a:chOff x="6199200" y="6162840"/>
-            <a:chExt cx="5983200" cy="685440"/>
+            <a:chExt cx="5982840" cy="685080"/>
           </a:xfrm>
         </p:grpSpPr>
         <p:pic>
@@ -7859,7 +7769,7 @@
           <p:spPr>
             <a:xfrm>
               <a:off x="6199200" y="6162840"/>
-              <a:ext cx="4046760" cy="685440"/>
+              <a:ext cx="4046400" cy="685080"/>
             </a:xfrm>
             <a:prstGeom prst="rect">
               <a:avLst/>
@@ -7882,7 +7792,7 @@
           <p:spPr>
             <a:xfrm>
               <a:off x="10270080" y="6162840"/>
-              <a:ext cx="1912320" cy="601920"/>
+              <a:ext cx="1911960" cy="601560"/>
             </a:xfrm>
             <a:prstGeom prst="rect">
               <a:avLst/>
@@ -7931,25 +7841,7 @@
                 </a:solidFill>
                 <a:latin typeface="Arial"/>
               </a:rPr>
-              <a:t>Click to edit </a:t>
-            </a:r>
-            <a:r>
-              <a:rPr b="0" lang="en-US" sz="1800" spc="-1" strike="noStrike">
-                <a:solidFill>
-                  <a:srgbClr val="000000"/>
-                </a:solidFill>
-                <a:latin typeface="Arial"/>
-              </a:rPr>
-              <a:t>the title text </a:t>
-            </a:r>
-            <a:r>
-              <a:rPr b="0" lang="en-US" sz="1800" spc="-1" strike="noStrike">
-                <a:solidFill>
-                  <a:srgbClr val="000000"/>
-                </a:solidFill>
-                <a:latin typeface="Arial"/>
-              </a:rPr>
-              <a:t>format</a:t>
+              <a:t>Click to edit the title text format</a:t>
             </a:r>
             <a:endParaRPr b="0" lang="en-US" sz="1800" spc="-1" strike="noStrike">
               <a:solidFill>
@@ -8423,7 +8315,7 @@
         <p:spPr>
           <a:xfrm>
             <a:off x="4038480" y="6356520"/>
-            <a:ext cx="4105080" cy="355320"/>
+            <a:ext cx="4104720" cy="354960"/>
           </a:xfrm>
           <a:prstGeom prst="rect">
             <a:avLst/>
@@ -8495,7 +8387,7 @@
         <p:spPr>
           <a:xfrm>
             <a:off x="8610480" y="6356520"/>
-            <a:ext cx="2733480" cy="355320"/>
+            <a:ext cx="2733120" cy="354960"/>
           </a:xfrm>
           <a:prstGeom prst="rect">
             <a:avLst/>
@@ -8538,7 +8430,7 @@
                 <a:tab algn="l" pos="0"/>
               </a:tabLst>
             </a:pPr>
-            <a:fld id="{A971DD6F-FD89-4AC8-B63F-A9A74EAF776C}" type="slidenum">
+            <a:fld id="{3402343F-6D7D-4552-9C94-1A401C51FC52}" type="slidenum">
               <a:rPr b="0" lang="en-US" sz="1200" spc="-1" strike="noStrike">
                 <a:solidFill>
                   <a:schemeClr val="dk1">
@@ -8571,7 +8463,7 @@
         <p:spPr>
           <a:xfrm>
             <a:off x="838080" y="6356520"/>
-            <a:ext cx="2733480" cy="355320"/>
+            <a:ext cx="2733120" cy="354960"/>
           </a:xfrm>
           <a:prstGeom prst="rect">
             <a:avLst/>
@@ -8660,9 +8552,9 @@
         <p:grpSpPr>
           <a:xfrm>
             <a:off x="6199200" y="6162840"/>
-            <a:ext cx="5983200" cy="685440"/>
+            <a:ext cx="5982840" cy="685080"/>
             <a:chOff x="6199200" y="6162840"/>
-            <a:chExt cx="5983200" cy="685440"/>
+            <a:chExt cx="5982840" cy="685080"/>
           </a:xfrm>
         </p:grpSpPr>
         <p:pic>
@@ -8678,7 +8570,7 @@
           <p:spPr>
             <a:xfrm>
               <a:off x="6199200" y="6162840"/>
-              <a:ext cx="4046760" cy="685440"/>
+              <a:ext cx="4046400" cy="685080"/>
             </a:xfrm>
             <a:prstGeom prst="rect">
               <a:avLst/>
@@ -8701,7 +8593,7 @@
           <p:spPr>
             <a:xfrm>
               <a:off x="10270080" y="6162840"/>
-              <a:ext cx="1912320" cy="601920"/>
+              <a:ext cx="1911960" cy="601560"/>
             </a:xfrm>
             <a:prstGeom prst="rect">
               <a:avLst/>
@@ -9674,7 +9566,7 @@
         <p:spPr>
           <a:xfrm>
             <a:off x="4038480" y="6356520"/>
-            <a:ext cx="4105080" cy="355320"/>
+            <a:ext cx="4104720" cy="354960"/>
           </a:xfrm>
           <a:prstGeom prst="rect">
             <a:avLst/>
@@ -9746,7 +9638,7 @@
         <p:spPr>
           <a:xfrm>
             <a:off x="8610480" y="6356520"/>
-            <a:ext cx="2733480" cy="355320"/>
+            <a:ext cx="2733120" cy="354960"/>
           </a:xfrm>
           <a:prstGeom prst="rect">
             <a:avLst/>
@@ -9789,7 +9681,7 @@
                 <a:tab algn="l" pos="0"/>
               </a:tabLst>
             </a:pPr>
-            <a:fld id="{6099D9B1-DC3C-45A6-821F-79B311410703}" type="slidenum">
+            <a:fld id="{B2536010-E372-4149-9A5E-B58907692C55}" type="slidenum">
               <a:rPr b="0" lang="en-US" sz="1200" spc="-1" strike="noStrike">
                 <a:solidFill>
                   <a:schemeClr val="dk1">
@@ -9822,7 +9714,7 @@
         <p:spPr>
           <a:xfrm>
             <a:off x="838080" y="6356520"/>
-            <a:ext cx="2733480" cy="355320"/>
+            <a:ext cx="2733120" cy="354960"/>
           </a:xfrm>
           <a:prstGeom prst="rect">
             <a:avLst/>
@@ -9911,9 +9803,9 @@
         <p:grpSpPr>
           <a:xfrm>
             <a:off x="6199200" y="6162840"/>
-            <a:ext cx="5983200" cy="685440"/>
+            <a:ext cx="5982840" cy="685080"/>
             <a:chOff x="6199200" y="6162840"/>
-            <a:chExt cx="5983200" cy="685440"/>
+            <a:chExt cx="5982840" cy="685080"/>
           </a:xfrm>
         </p:grpSpPr>
         <p:pic>
@@ -9929,7 +9821,7 @@
           <p:spPr>
             <a:xfrm>
               <a:off x="6199200" y="6162840"/>
-              <a:ext cx="4046760" cy="685440"/>
+              <a:ext cx="4046400" cy="685080"/>
             </a:xfrm>
             <a:prstGeom prst="rect">
               <a:avLst/>
@@ -9952,7 +9844,7 @@
           <p:spPr>
             <a:xfrm>
               <a:off x="10270080" y="6162840"/>
-              <a:ext cx="1912320" cy="601920"/>
+              <a:ext cx="1911960" cy="601560"/>
             </a:xfrm>
             <a:prstGeom prst="rect">
               <a:avLst/>
@@ -9976,7 +9868,7 @@
         <p:spPr>
           <a:xfrm>
             <a:off x="4038480" y="6356520"/>
-            <a:ext cx="4105080" cy="355320"/>
+            <a:ext cx="4104720" cy="354960"/>
           </a:xfrm>
           <a:prstGeom prst="rect">
             <a:avLst/>
@@ -10048,7 +9940,7 @@
         <p:spPr>
           <a:xfrm>
             <a:off x="8610480" y="6356520"/>
-            <a:ext cx="2733480" cy="355320"/>
+            <a:ext cx="2733120" cy="354960"/>
           </a:xfrm>
           <a:prstGeom prst="rect">
             <a:avLst/>
@@ -10091,7 +9983,7 @@
                 <a:tab algn="l" pos="0"/>
               </a:tabLst>
             </a:pPr>
-            <a:fld id="{057BD7B9-9026-4E1D-B0E1-5F38CA5DBD75}" type="slidenum">
+            <a:fld id="{04C759C1-22C2-4796-93F9-D08B52C6BD01}" type="slidenum">
               <a:rPr b="0" lang="en-US" sz="1200" spc="-1" strike="noStrike">
                 <a:solidFill>
                   <a:schemeClr val="dk1">
@@ -10124,7 +10016,7 @@
         <p:spPr>
           <a:xfrm>
             <a:off x="838080" y="6356520"/>
-            <a:ext cx="2733480" cy="355320"/>
+            <a:ext cx="2733120" cy="354960"/>
           </a:xfrm>
           <a:prstGeom prst="rect">
             <a:avLst/>
@@ -10213,9 +10105,9 @@
         <p:grpSpPr>
           <a:xfrm>
             <a:off x="6199200" y="6162840"/>
-            <a:ext cx="5983200" cy="685440"/>
+            <a:ext cx="5982840" cy="685080"/>
             <a:chOff x="6199200" y="6162840"/>
-            <a:chExt cx="5983200" cy="685440"/>
+            <a:chExt cx="5982840" cy="685080"/>
           </a:xfrm>
         </p:grpSpPr>
         <p:pic>
@@ -10231,7 +10123,7 @@
           <p:spPr>
             <a:xfrm>
               <a:off x="6199200" y="6162840"/>
-              <a:ext cx="4046760" cy="685440"/>
+              <a:ext cx="4046400" cy="685080"/>
             </a:xfrm>
             <a:prstGeom prst="rect">
               <a:avLst/>
@@ -10254,7 +10146,7 @@
           <p:spPr>
             <a:xfrm>
               <a:off x="10270080" y="6162840"/>
-              <a:ext cx="1912320" cy="601920"/>
+              <a:ext cx="1911960" cy="601560"/>
             </a:xfrm>
             <a:prstGeom prst="rect">
               <a:avLst/>
@@ -10278,7 +10170,7 @@
         <p:spPr>
           <a:xfrm>
             <a:off x="4038480" y="6356520"/>
-            <a:ext cx="4105080" cy="355320"/>
+            <a:ext cx="4104720" cy="354960"/>
           </a:xfrm>
           <a:prstGeom prst="rect">
             <a:avLst/>
@@ -10350,7 +10242,7 @@
         <p:spPr>
           <a:xfrm>
             <a:off x="8610480" y="6356520"/>
-            <a:ext cx="2733480" cy="355320"/>
+            <a:ext cx="2733120" cy="354960"/>
           </a:xfrm>
           <a:prstGeom prst="rect">
             <a:avLst/>
@@ -10393,7 +10285,7 @@
                 <a:tab algn="l" pos="0"/>
               </a:tabLst>
             </a:pPr>
-            <a:fld id="{6A8AC39E-9006-4F3E-8E38-640A417DC461}" type="slidenum">
+            <a:fld id="{D6C0E557-916C-464E-832C-8E11B6349DD4}" type="slidenum">
               <a:rPr b="0" lang="en-US" sz="1200" spc="-1" strike="noStrike">
                 <a:solidFill>
                   <a:schemeClr val="dk1">
@@ -10426,7 +10318,7 @@
         <p:spPr>
           <a:xfrm>
             <a:off x="838080" y="6356520"/>
-            <a:ext cx="2733480" cy="355320"/>
+            <a:ext cx="2733120" cy="354960"/>
           </a:xfrm>
           <a:prstGeom prst="rect">
             <a:avLst/>
@@ -10789,9 +10681,9 @@
         <p:grpSpPr>
           <a:xfrm>
             <a:off x="6199200" y="6162840"/>
-            <a:ext cx="5983200" cy="685440"/>
+            <a:ext cx="5982840" cy="685080"/>
             <a:chOff x="6199200" y="6162840"/>
-            <a:chExt cx="5983200" cy="685440"/>
+            <a:chExt cx="5982840" cy="685080"/>
           </a:xfrm>
         </p:grpSpPr>
         <p:pic>
@@ -10807,7 +10699,7 @@
           <p:spPr>
             <a:xfrm>
               <a:off x="6199200" y="6162840"/>
-              <a:ext cx="4046760" cy="685440"/>
+              <a:ext cx="4046400" cy="685080"/>
             </a:xfrm>
             <a:prstGeom prst="rect">
               <a:avLst/>
@@ -10830,7 +10722,7 @@
           <p:spPr>
             <a:xfrm>
               <a:off x="10270080" y="6162840"/>
-              <a:ext cx="1912320" cy="601920"/>
+              <a:ext cx="1911960" cy="601560"/>
             </a:xfrm>
             <a:prstGeom prst="rect">
               <a:avLst/>
@@ -11128,7 +11020,7 @@
         <p:spPr>
           <a:xfrm>
             <a:off x="4038480" y="6356520"/>
-            <a:ext cx="4105080" cy="355320"/>
+            <a:ext cx="4104720" cy="354960"/>
           </a:xfrm>
           <a:prstGeom prst="rect">
             <a:avLst/>
@@ -11200,7 +11092,7 @@
         <p:spPr>
           <a:xfrm>
             <a:off x="8610480" y="6356520"/>
-            <a:ext cx="2733480" cy="355320"/>
+            <a:ext cx="2733120" cy="354960"/>
           </a:xfrm>
           <a:prstGeom prst="rect">
             <a:avLst/>
@@ -11243,7 +11135,7 @@
                 <a:tab algn="l" pos="0"/>
               </a:tabLst>
             </a:pPr>
-            <a:fld id="{7E8C9F21-2EBD-4D91-98EB-9C849B3AE824}" type="slidenum">
+            <a:fld id="{A038CD16-D181-43B7-AA56-07D3E4630459}" type="slidenum">
               <a:rPr b="0" lang="en-US" sz="1200" spc="-1" strike="noStrike">
                 <a:solidFill>
                   <a:schemeClr val="dk1">
@@ -11276,7 +11168,7 @@
         <p:spPr>
           <a:xfrm>
             <a:off x="838080" y="6356520"/>
-            <a:ext cx="2733480" cy="355320"/>
+            <a:ext cx="2733120" cy="354960"/>
           </a:xfrm>
           <a:prstGeom prst="rect">
             <a:avLst/>
@@ -11365,9 +11257,9 @@
         <p:grpSpPr>
           <a:xfrm>
             <a:off x="6199200" y="6162840"/>
-            <a:ext cx="5983200" cy="685440"/>
+            <a:ext cx="5982840" cy="685080"/>
             <a:chOff x="6199200" y="6162840"/>
-            <a:chExt cx="5983200" cy="685440"/>
+            <a:chExt cx="5982840" cy="685080"/>
           </a:xfrm>
         </p:grpSpPr>
         <p:pic>
@@ -11383,7 +11275,7 @@
           <p:spPr>
             <a:xfrm>
               <a:off x="6199200" y="6162840"/>
-              <a:ext cx="4046760" cy="685440"/>
+              <a:ext cx="4046400" cy="685080"/>
             </a:xfrm>
             <a:prstGeom prst="rect">
               <a:avLst/>
@@ -11406,7 +11298,7 @@
           <p:spPr>
             <a:xfrm>
               <a:off x="10270080" y="6162840"/>
-              <a:ext cx="1912320" cy="601920"/>
+              <a:ext cx="1911960" cy="601560"/>
             </a:xfrm>
             <a:prstGeom prst="rect">
               <a:avLst/>
@@ -11704,7 +11596,7 @@
         <p:spPr>
           <a:xfrm>
             <a:off x="4038480" y="6356520"/>
-            <a:ext cx="4105080" cy="355320"/>
+            <a:ext cx="4104720" cy="354960"/>
           </a:xfrm>
           <a:prstGeom prst="rect">
             <a:avLst/>
@@ -11776,7 +11668,7 @@
         <p:spPr>
           <a:xfrm>
             <a:off x="8610480" y="6356520"/>
-            <a:ext cx="2733480" cy="355320"/>
+            <a:ext cx="2733120" cy="354960"/>
           </a:xfrm>
           <a:prstGeom prst="rect">
             <a:avLst/>
@@ -11819,7 +11711,7 @@
                 <a:tab algn="l" pos="0"/>
               </a:tabLst>
             </a:pPr>
-            <a:fld id="{0D9DDAB9-4DB2-405C-BBF8-7B4472F72843}" type="slidenum">
+            <a:fld id="{1A61E171-FD83-49F5-ABFA-BA9CEDCC71CB}" type="slidenum">
               <a:rPr b="0" lang="en-US" sz="1200" spc="-1" strike="noStrike">
                 <a:solidFill>
                   <a:schemeClr val="dk1">
@@ -11852,7 +11744,7 @@
         <p:spPr>
           <a:xfrm>
             <a:off x="838080" y="6356520"/>
-            <a:ext cx="2733480" cy="355320"/>
+            <a:ext cx="2733120" cy="354960"/>
           </a:xfrm>
           <a:prstGeom prst="rect">
             <a:avLst/>
@@ -11934,7 +11826,7 @@
         <p:spPr>
           <a:xfrm flipH="1">
             <a:off x="0" y="3073320"/>
-            <a:ext cx="1838520" cy="9720"/>
+            <a:ext cx="1838880" cy="10080"/>
           </a:xfrm>
           <a:prstGeom prst="straightConnector1">
             <a:avLst/>
@@ -11957,7 +11849,7 @@
         <p:spPr>
           <a:xfrm>
             <a:off x="0" y="2489400"/>
-            <a:ext cx="1838520" cy="9720"/>
+            <a:ext cx="1838880" cy="10080"/>
           </a:xfrm>
           <a:prstGeom prst="straightConnector1">
             <a:avLst/>
@@ -11980,7 +11872,7 @@
         <p:spPr>
           <a:xfrm>
             <a:off x="0" y="2781360"/>
-            <a:ext cx="1838520" cy="9720"/>
+            <a:ext cx="1838880" cy="10080"/>
           </a:xfrm>
           <a:prstGeom prst="straightConnector1">
             <a:avLst/>
@@ -12003,7 +11895,7 @@
         <p:spPr>
           <a:xfrm flipH="1">
             <a:off x="0" y="3657600"/>
-            <a:ext cx="1838520" cy="9720"/>
+            <a:ext cx="1838880" cy="10080"/>
           </a:xfrm>
           <a:prstGeom prst="straightConnector1">
             <a:avLst/>
@@ -12025,7 +11917,7 @@
         <p:spPr>
           <a:xfrm>
             <a:off x="128520" y="6134040"/>
-            <a:ext cx="1562040" cy="378000"/>
+            <a:ext cx="1561680" cy="377640"/>
           </a:xfrm>
           <a:prstGeom prst="diamond">
             <a:avLst/>
@@ -12090,7 +11982,7 @@
         <p:spPr>
           <a:xfrm>
             <a:off x="302760" y="5454000"/>
-            <a:ext cx="1213560" cy="378000"/>
+            <a:ext cx="1213200" cy="377640"/>
           </a:xfrm>
           <a:prstGeom prst="ellipse">
             <a:avLst/>
@@ -12153,7 +12045,7 @@
         <p:spPr>
           <a:xfrm>
             <a:off x="101160" y="336240"/>
-            <a:ext cx="1616760" cy="303120"/>
+            <a:ext cx="1616400" cy="303120"/>
           </a:xfrm>
           <a:prstGeom prst="rect">
             <a:avLst/>
@@ -12210,7 +12102,7 @@
         <p:spPr>
           <a:xfrm>
             <a:off x="101160" y="597600"/>
-            <a:ext cx="1616760" cy="516600"/>
+            <a:ext cx="1616400" cy="516600"/>
           </a:xfrm>
           <a:prstGeom prst="rect">
             <a:avLst/>
@@ -12300,7 +12192,7 @@
         <p:spPr>
           <a:xfrm>
             <a:off x="101160" y="336240"/>
-            <a:ext cx="1616760" cy="303120"/>
+            <a:ext cx="1616400" cy="303120"/>
           </a:xfrm>
           <a:prstGeom prst="rect">
             <a:avLst/>
@@ -12357,7 +12249,7 @@
         <p:spPr>
           <a:xfrm>
             <a:off x="101160" y="597600"/>
-            <a:ext cx="1616760" cy="516600"/>
+            <a:ext cx="1616400" cy="516600"/>
           </a:xfrm>
           <a:prstGeom prst="rect">
             <a:avLst/>
@@ -12447,7 +12339,7 @@
         <p:spPr>
           <a:xfrm>
             <a:off x="2541600" y="228600"/>
-            <a:ext cx="1616760" cy="303120"/>
+            <a:ext cx="1616400" cy="303120"/>
           </a:xfrm>
           <a:prstGeom prst="rect">
             <a:avLst/>
@@ -12504,7 +12396,7 @@
         <p:spPr>
           <a:xfrm>
             <a:off x="2541600" y="489960"/>
-            <a:ext cx="1616760" cy="1584000"/>
+            <a:ext cx="1616400" cy="1584000"/>
           </a:xfrm>
           <a:prstGeom prst="rect">
             <a:avLst/>
@@ -12729,7 +12621,7 @@
         <p:spPr>
           <a:xfrm>
             <a:off x="6656400" y="228600"/>
-            <a:ext cx="1616760" cy="303120"/>
+            <a:ext cx="1616400" cy="303120"/>
           </a:xfrm>
           <a:prstGeom prst="rect">
             <a:avLst/>
@@ -12786,7 +12678,7 @@
         <p:spPr>
           <a:xfrm>
             <a:off x="6656400" y="489960"/>
-            <a:ext cx="1616760" cy="516600"/>
+            <a:ext cx="1616400" cy="516600"/>
           </a:xfrm>
           <a:prstGeom prst="rect">
             <a:avLst/>
@@ -12876,7 +12768,7 @@
         <p:spPr>
           <a:xfrm>
             <a:off x="6656400" y="228600"/>
-            <a:ext cx="1616760" cy="303120"/>
+            <a:ext cx="1616400" cy="303120"/>
           </a:xfrm>
           <a:prstGeom prst="rect">
             <a:avLst/>
@@ -12933,7 +12825,7 @@
         <p:spPr>
           <a:xfrm>
             <a:off x="6656400" y="489960"/>
-            <a:ext cx="1616760" cy="730080"/>
+            <a:ext cx="1616400" cy="730080"/>
           </a:xfrm>
           <a:prstGeom prst="rect">
             <a:avLst/>
@@ -13050,7 +12942,7 @@
         <p:spPr>
           <a:xfrm>
             <a:off x="128520" y="4629600"/>
-            <a:ext cx="1562040" cy="522720"/>
+            <a:ext cx="1561680" cy="522360"/>
           </a:xfrm>
           <a:prstGeom prst="diamond">
             <a:avLst/>
@@ -13138,7 +13030,7 @@
         <p:spPr>
           <a:xfrm>
             <a:off x="0" y="3365640"/>
-            <a:ext cx="1838520" cy="9720"/>
+            <a:ext cx="1838880" cy="10080"/>
           </a:xfrm>
           <a:prstGeom prst="straightConnector1">
             <a:avLst/>
@@ -13160,7 +13052,7 @@
         <p:spPr>
           <a:xfrm>
             <a:off x="673200" y="3949920"/>
-            <a:ext cx="473040" cy="378000"/>
+            <a:ext cx="472680" cy="377640"/>
           </a:xfrm>
           <a:prstGeom prst="triangle">
             <a:avLst>
@@ -13227,9 +13119,9 @@
         <p:grpSpPr>
           <a:xfrm>
             <a:off x="101160" y="1413000"/>
-            <a:ext cx="1616760" cy="777960"/>
+            <a:ext cx="1616400" cy="777960"/>
             <a:chOff x="101160" y="1413000"/>
-            <a:chExt cx="1616760" cy="777960"/>
+            <a:chExt cx="1616400" cy="777960"/>
           </a:xfrm>
         </p:grpSpPr>
         <p:sp>
@@ -13241,7 +13133,7 @@
           <p:spPr>
             <a:xfrm>
               <a:off x="101160" y="1413000"/>
-              <a:ext cx="1616760" cy="303120"/>
+              <a:ext cx="1616400" cy="303120"/>
             </a:xfrm>
             <a:prstGeom prst="rect">
               <a:avLst/>
@@ -13299,7 +13191,7 @@
           <p:spPr>
             <a:xfrm>
               <a:off x="101160" y="1674360"/>
-              <a:ext cx="1616760" cy="516600"/>
+              <a:ext cx="1616400" cy="516600"/>
             </a:xfrm>
             <a:prstGeom prst="rect">
               <a:avLst/>
@@ -13391,7 +13283,7 @@
         <p:spPr>
           <a:xfrm>
             <a:off x="4426920" y="914400"/>
-            <a:ext cx="1562040" cy="378000"/>
+            <a:ext cx="1561680" cy="377640"/>
           </a:xfrm>
           <a:prstGeom prst="diamond">
             <a:avLst/>
@@ -13458,8 +13350,8 @@
         </p:nvCxnSpPr>
         <p:spPr>
           <a:xfrm flipH="1">
-            <a:off x="5988960" y="855000"/>
-            <a:ext cx="667800" cy="248760"/>
+            <a:off x="5988600" y="855000"/>
+            <a:ext cx="668160" cy="248760"/>
           </a:xfrm>
           <a:prstGeom prst="straightConnector1">
             <a:avLst/>
@@ -13482,7 +13374,7 @@
         <p:spPr>
           <a:xfrm>
             <a:off x="6255720" y="1828800"/>
-            <a:ext cx="1790640" cy="378000"/>
+            <a:ext cx="1790280" cy="377640"/>
           </a:xfrm>
           <a:prstGeom prst="diamond">
             <a:avLst/>
@@ -13573,8 +13465,8 @@
         </p:nvCxnSpPr>
         <p:spPr>
           <a:xfrm flipH="1" flipV="1">
-            <a:off x="7151040" y="2206800"/>
-            <a:ext cx="464760" cy="543960"/>
+            <a:off x="7151040" y="2206440"/>
+            <a:ext cx="465120" cy="544680"/>
           </a:xfrm>
           <a:prstGeom prst="straightConnector1">
             <a:avLst/>
@@ -13597,7 +13489,7 @@
         <p:spPr>
           <a:xfrm>
             <a:off x="128520" y="6134400"/>
-            <a:ext cx="1562040" cy="378000"/>
+            <a:ext cx="1561680" cy="377640"/>
           </a:xfrm>
           <a:prstGeom prst="diamond">
             <a:avLst/>
@@ -13662,9 +13554,9 @@
         <p:grpSpPr>
           <a:xfrm>
             <a:off x="6681960" y="2743200"/>
-            <a:ext cx="1845360" cy="1216440"/>
+            <a:ext cx="1845000" cy="1216440"/>
             <a:chOff x="6681960" y="2743200"/>
-            <a:chExt cx="1845360" cy="1216440"/>
+            <a:chExt cx="1845000" cy="1216440"/>
           </a:xfrm>
         </p:grpSpPr>
         <p:sp>
@@ -13676,7 +13568,7 @@
           <p:spPr>
             <a:xfrm>
               <a:off x="6681960" y="2743200"/>
-              <a:ext cx="1845360" cy="303120"/>
+              <a:ext cx="1845000" cy="303120"/>
             </a:xfrm>
             <a:prstGeom prst="rect">
               <a:avLst/>
@@ -13733,7 +13625,7 @@
           <p:spPr>
             <a:xfrm>
               <a:off x="6681960" y="3016080"/>
-              <a:ext cx="1845360" cy="943560"/>
+              <a:ext cx="1845000" cy="943560"/>
             </a:xfrm>
             <a:prstGeom prst="rect">
               <a:avLst/>
@@ -13880,7 +13772,7 @@
         <p:spPr>
           <a:xfrm>
             <a:off x="9173520" y="3501000"/>
-            <a:ext cx="473040" cy="378000"/>
+            <a:ext cx="472680" cy="377640"/>
           </a:xfrm>
           <a:prstGeom prst="triangle">
             <a:avLst>
@@ -13947,7 +13839,7 @@
         <p:spPr>
           <a:xfrm>
             <a:off x="10287000" y="3126240"/>
-            <a:ext cx="1899360" cy="303120"/>
+            <a:ext cx="1899000" cy="303120"/>
           </a:xfrm>
           <a:prstGeom prst="rect">
             <a:avLst/>
@@ -14004,7 +13896,7 @@
         <p:spPr>
           <a:xfrm>
             <a:off x="10287000" y="3429360"/>
-            <a:ext cx="1899360" cy="1584000"/>
+            <a:ext cx="1899000" cy="1584000"/>
           </a:xfrm>
           <a:prstGeom prst="rect">
             <a:avLst/>
@@ -14212,8 +14104,8 @@
         </p:nvCxnSpPr>
         <p:spPr>
           <a:xfrm>
-            <a:off x="9528480" y="3690000"/>
-            <a:ext cx="758880" cy="531720"/>
+            <a:off x="9528120" y="3690000"/>
+            <a:ext cx="759240" cy="531720"/>
           </a:xfrm>
           <a:prstGeom prst="straightConnector1">
             <a:avLst/>
@@ -14237,8 +14129,8 @@
         </p:nvCxnSpPr>
         <p:spPr>
           <a:xfrm flipH="1" flipV="1">
-            <a:off x="8527320" y="3351240"/>
-            <a:ext cx="764640" cy="339120"/>
+            <a:off x="8526960" y="3351240"/>
+            <a:ext cx="765000" cy="339120"/>
           </a:xfrm>
           <a:prstGeom prst="straightConnector1">
             <a:avLst/>
@@ -14260,7 +14152,7 @@
         <p:spPr>
           <a:xfrm>
             <a:off x="2086200" y="3336840"/>
-            <a:ext cx="1616760" cy="303120"/>
+            <a:ext cx="1616400" cy="303120"/>
           </a:xfrm>
           <a:prstGeom prst="rect">
             <a:avLst/>
@@ -14317,7 +14209,7 @@
         <p:spPr>
           <a:xfrm>
             <a:off x="2086200" y="3598200"/>
-            <a:ext cx="1616760" cy="516600"/>
+            <a:ext cx="1616400" cy="516600"/>
           </a:xfrm>
           <a:prstGeom prst="rect">
             <a:avLst/>
@@ -14407,7 +14299,7 @@
         <p:spPr>
           <a:xfrm>
             <a:off x="2086200" y="3336840"/>
-            <a:ext cx="1616760" cy="303120"/>
+            <a:ext cx="1616400" cy="303120"/>
           </a:xfrm>
           <a:prstGeom prst="rect">
             <a:avLst/>
@@ -14464,7 +14356,7 @@
         <p:spPr>
           <a:xfrm>
             <a:off x="2086200" y="3598200"/>
-            <a:ext cx="1616760" cy="516600"/>
+            <a:ext cx="1616400" cy="516600"/>
           </a:xfrm>
           <a:prstGeom prst="rect">
             <a:avLst/>
@@ -14554,7 +14446,7 @@
         <p:spPr>
           <a:xfrm>
             <a:off x="1883160" y="2514600"/>
-            <a:ext cx="1819800" cy="378000"/>
+            <a:ext cx="1819440" cy="377640"/>
           </a:xfrm>
           <a:prstGeom prst="diamond">
             <a:avLst/>
@@ -14619,7 +14511,7 @@
         <p:spPr>
           <a:xfrm>
             <a:off x="3481560" y="2899800"/>
-            <a:ext cx="1591200" cy="378000"/>
+            <a:ext cx="1590840" cy="377640"/>
           </a:xfrm>
           <a:prstGeom prst="ellipse">
             <a:avLst/>
@@ -14684,8 +14576,8 @@
         </p:nvCxnSpPr>
         <p:spPr>
           <a:xfrm>
-            <a:off x="3702960" y="2703600"/>
-            <a:ext cx="574560" cy="196560"/>
+            <a:off x="3702600" y="2703600"/>
+            <a:ext cx="574920" cy="196560"/>
           </a:xfrm>
           <a:prstGeom prst="straightConnector1">
             <a:avLst/>
@@ -14709,8 +14601,8 @@
         </p:nvCxnSpPr>
         <p:spPr>
           <a:xfrm flipH="1" flipV="1">
-            <a:off x="2793240" y="2892600"/>
-            <a:ext cx="101520" cy="444600"/>
+            <a:off x="2792880" y="2892240"/>
+            <a:ext cx="101880" cy="444960"/>
           </a:xfrm>
           <a:prstGeom prst="straightConnector1">
             <a:avLst/>
@@ -14734,8 +14626,8 @@
         </p:nvCxnSpPr>
         <p:spPr>
           <a:xfrm flipV="1">
-            <a:off x="2793240" y="2073960"/>
-            <a:ext cx="556920" cy="441000"/>
+            <a:off x="2792880" y="2073960"/>
+            <a:ext cx="557280" cy="441000"/>
           </a:xfrm>
           <a:prstGeom prst="straightConnector1">
             <a:avLst/>
@@ -14757,7 +14649,7 @@
         <p:spPr>
           <a:xfrm>
             <a:off x="10543680" y="457200"/>
-            <a:ext cx="1616760" cy="303120"/>
+            <a:ext cx="1616400" cy="303120"/>
           </a:xfrm>
           <a:prstGeom prst="rect">
             <a:avLst/>
@@ -14814,7 +14706,7 @@
         <p:spPr>
           <a:xfrm>
             <a:off x="10543680" y="718560"/>
-            <a:ext cx="1616760" cy="516600"/>
+            <a:ext cx="1616400" cy="516600"/>
           </a:xfrm>
           <a:prstGeom prst="rect">
             <a:avLst/>
@@ -14904,7 +14796,7 @@
         <p:spPr>
           <a:xfrm>
             <a:off x="10287000" y="457200"/>
-            <a:ext cx="1616760" cy="303120"/>
+            <a:ext cx="1616400" cy="303120"/>
           </a:xfrm>
           <a:prstGeom prst="rect">
             <a:avLst/>
@@ -14961,7 +14853,7 @@
         <p:spPr>
           <a:xfrm>
             <a:off x="10287000" y="718560"/>
-            <a:ext cx="1873440" cy="2651400"/>
+            <a:ext cx="1873080" cy="2651400"/>
           </a:xfrm>
           <a:prstGeom prst="rect">
             <a:avLst/>
@@ -15295,7 +15187,7 @@
         <p:spPr>
           <a:xfrm>
             <a:off x="8007120" y="1448280"/>
-            <a:ext cx="2048760" cy="378000"/>
+            <a:ext cx="2048400" cy="377640"/>
           </a:xfrm>
           <a:prstGeom prst="diamond">
             <a:avLst/>
@@ -15362,8 +15254,8 @@
         </p:nvCxnSpPr>
         <p:spPr>
           <a:xfrm>
-            <a:off x="9031680" y="1826280"/>
-            <a:ext cx="1255680" cy="2395440"/>
+            <a:off x="9031320" y="1825920"/>
+            <a:ext cx="1256040" cy="2395800"/>
           </a:xfrm>
           <a:prstGeom prst="straightConnector1">
             <a:avLst/>
@@ -15387,8 +15279,8 @@
         </p:nvCxnSpPr>
         <p:spPr>
           <a:xfrm flipH="1" flipV="1">
-            <a:off x="10055880" y="1637280"/>
-            <a:ext cx="231480" cy="407160"/>
+            <a:off x="10055520" y="1637280"/>
+            <a:ext cx="231840" cy="407160"/>
           </a:xfrm>
           <a:prstGeom prst="straightConnector1">
             <a:avLst/>
@@ -15413,7 +15305,7 @@
         <p:spPr>
           <a:xfrm flipH="1" flipV="1">
             <a:off x="7464600" y="1220040"/>
-            <a:ext cx="1567440" cy="228600"/>
+            <a:ext cx="1567080" cy="228600"/>
           </a:xfrm>
           <a:prstGeom prst="straightConnector1">
             <a:avLst/>
@@ -15435,7 +15327,7 @@
         <p:spPr>
           <a:xfrm>
             <a:off x="5412240" y="5029200"/>
-            <a:ext cx="1616760" cy="303120"/>
+            <a:ext cx="1616400" cy="303120"/>
           </a:xfrm>
           <a:prstGeom prst="rect">
             <a:avLst/>
@@ -15492,7 +15384,7 @@
         <p:spPr>
           <a:xfrm>
             <a:off x="3710160" y="4343400"/>
-            <a:ext cx="1820160" cy="378000"/>
+            <a:ext cx="1819800" cy="377640"/>
           </a:xfrm>
           <a:prstGeom prst="diamond">
             <a:avLst/>
@@ -15585,8 +15477,8 @@
         </p:nvCxnSpPr>
         <p:spPr>
           <a:xfrm>
-            <a:off x="4620240" y="4721400"/>
-            <a:ext cx="792360" cy="459720"/>
+            <a:off x="4620240" y="4721040"/>
+            <a:ext cx="792360" cy="460080"/>
           </a:xfrm>
           <a:prstGeom prst="straightConnector1">
             <a:avLst/>
@@ -15633,7 +15525,7 @@
         <p:spPr>
           <a:xfrm>
             <a:off x="4626720" y="3200400"/>
-            <a:ext cx="1819440" cy="677160"/>
+            <a:ext cx="1819080" cy="676800"/>
           </a:xfrm>
           <a:prstGeom prst="diamond">
             <a:avLst/>
@@ -15700,8 +15592,8 @@
         </p:nvCxnSpPr>
         <p:spPr>
           <a:xfrm flipH="1" flipV="1">
-            <a:off x="5536440" y="3877560"/>
-            <a:ext cx="684360" cy="1152000"/>
+            <a:off x="5536440" y="3877200"/>
+            <a:ext cx="684360" cy="1152360"/>
           </a:xfrm>
           <a:prstGeom prst="straightConnector1">
             <a:avLst/>
@@ -15723,7 +15615,7 @@
         <p:spPr>
           <a:xfrm>
             <a:off x="2693880" y="4415400"/>
-            <a:ext cx="473040" cy="378000"/>
+            <a:ext cx="472680" cy="377640"/>
           </a:xfrm>
           <a:prstGeom prst="triangle">
             <a:avLst>
@@ -15815,7 +15707,7 @@
         <p:spPr>
           <a:xfrm>
             <a:off x="2109960" y="5163480"/>
-            <a:ext cx="1616760" cy="303120"/>
+            <a:ext cx="1616400" cy="303120"/>
           </a:xfrm>
           <a:prstGeom prst="rect">
             <a:avLst/>
@@ -15872,7 +15764,7 @@
         <p:spPr>
           <a:xfrm>
             <a:off x="2109960" y="5163480"/>
-            <a:ext cx="1616760" cy="303120"/>
+            <a:ext cx="1616400" cy="303120"/>
           </a:xfrm>
           <a:prstGeom prst="rect">
             <a:avLst/>
@@ -15929,7 +15821,7 @@
         <p:spPr>
           <a:xfrm>
             <a:off x="2109960" y="5424840"/>
-            <a:ext cx="1616760" cy="363960"/>
+            <a:ext cx="1616400" cy="363960"/>
           </a:xfrm>
           <a:prstGeom prst="rect">
             <a:avLst/>
@@ -15997,8 +15889,8 @@
         </p:nvCxnSpPr>
         <p:spPr>
           <a:xfrm flipH="1">
-            <a:off x="2918160" y="4793400"/>
-            <a:ext cx="12600" cy="370440"/>
+            <a:off x="2918160" y="4793040"/>
+            <a:ext cx="12600" cy="370800"/>
           </a:xfrm>
           <a:prstGeom prst="straightConnector1">
             <a:avLst/>
@@ -16022,8 +15914,8 @@
         </p:nvCxnSpPr>
         <p:spPr>
           <a:xfrm flipH="1">
-            <a:off x="4158360" y="1103400"/>
-            <a:ext cx="268920" cy="178920"/>
+            <a:off x="4158000" y="1103400"/>
+            <a:ext cx="269280" cy="178920"/>
           </a:xfrm>
           <a:prstGeom prst="straightConnector1">
             <a:avLst/>
@@ -16045,7 +15937,7 @@
         <p:spPr>
           <a:xfrm flipH="1">
             <a:off x="0" y="3657600"/>
-            <a:ext cx="1838520" cy="9720"/>
+            <a:ext cx="1838880" cy="10080"/>
           </a:xfrm>
           <a:prstGeom prst="straightConnector1">
             <a:avLst/>
@@ -16067,7 +15959,7 @@
         <p:spPr>
           <a:xfrm>
             <a:off x="8686800" y="532800"/>
-            <a:ext cx="1368000" cy="378000"/>
+            <a:ext cx="1367640" cy="377640"/>
           </a:xfrm>
           <a:prstGeom prst="ellipse">
             <a:avLst/>
@@ -16132,8 +16024,8 @@
         </p:nvCxnSpPr>
         <p:spPr>
           <a:xfrm flipH="1">
-            <a:off x="9031680" y="910800"/>
-            <a:ext cx="339480" cy="537840"/>
+            <a:off x="9031320" y="910440"/>
+            <a:ext cx="339840" cy="538200"/>
           </a:xfrm>
           <a:prstGeom prst="straightConnector1">
             <a:avLst/>
@@ -16185,7 +16077,7 @@
         <p:spPr>
           <a:xfrm flipH="1">
             <a:off x="0" y="3073320"/>
-            <a:ext cx="1838520" cy="9720"/>
+            <a:ext cx="1838880" cy="10080"/>
           </a:xfrm>
           <a:prstGeom prst="straightConnector1">
             <a:avLst/>
@@ -16208,7 +16100,7 @@
         <p:spPr>
           <a:xfrm>
             <a:off x="0" y="2489400"/>
-            <a:ext cx="1838520" cy="9720"/>
+            <a:ext cx="1838880" cy="10080"/>
           </a:xfrm>
           <a:prstGeom prst="straightConnector1">
             <a:avLst/>
@@ -16231,7 +16123,7 @@
         <p:spPr>
           <a:xfrm>
             <a:off x="0" y="2781360"/>
-            <a:ext cx="1838520" cy="9720"/>
+            <a:ext cx="1838880" cy="10080"/>
           </a:xfrm>
           <a:prstGeom prst="straightConnector1">
             <a:avLst/>
@@ -16254,7 +16146,7 @@
         <p:spPr>
           <a:xfrm flipH="1">
             <a:off x="0" y="3657600"/>
-            <a:ext cx="1838520" cy="9720"/>
+            <a:ext cx="1838880" cy="10080"/>
           </a:xfrm>
           <a:prstGeom prst="straightConnector1">
             <a:avLst/>
@@ -16276,7 +16168,7 @@
         <p:spPr>
           <a:xfrm>
             <a:off x="128520" y="6134040"/>
-            <a:ext cx="1562040" cy="378000"/>
+            <a:ext cx="1561680" cy="377640"/>
           </a:xfrm>
           <a:prstGeom prst="diamond">
             <a:avLst/>
@@ -16341,7 +16233,7 @@
         <p:spPr>
           <a:xfrm>
             <a:off x="302760" y="5454000"/>
-            <a:ext cx="1213560" cy="378000"/>
+            <a:ext cx="1213200" cy="377640"/>
           </a:xfrm>
           <a:prstGeom prst="ellipse">
             <a:avLst/>
@@ -16404,9 +16296,9 @@
         <p:grpSpPr>
           <a:xfrm>
             <a:off x="101160" y="336240"/>
-            <a:ext cx="1616760" cy="777960"/>
+            <a:ext cx="1616400" cy="777960"/>
             <a:chOff x="101160" y="336240"/>
-            <a:chExt cx="1616760" cy="777960"/>
+            <a:chExt cx="1616400" cy="777960"/>
           </a:xfrm>
         </p:grpSpPr>
         <p:sp>
@@ -16418,7 +16310,7 @@
           <p:spPr>
             <a:xfrm>
               <a:off x="101160" y="336240"/>
-              <a:ext cx="1616760" cy="303120"/>
+              <a:ext cx="1616400" cy="303120"/>
             </a:xfrm>
             <a:prstGeom prst="rect">
               <a:avLst/>
@@ -16475,7 +16367,7 @@
           <p:spPr>
             <a:xfrm>
               <a:off x="101160" y="597600"/>
-              <a:ext cx="1616760" cy="516600"/>
+              <a:ext cx="1616400" cy="516600"/>
             </a:xfrm>
             <a:prstGeom prst="rect">
               <a:avLst/>
@@ -16566,7 +16458,7 @@
         <p:spPr>
           <a:xfrm>
             <a:off x="128520" y="4629600"/>
-            <a:ext cx="1562040" cy="522720"/>
+            <a:ext cx="1561680" cy="522360"/>
           </a:xfrm>
           <a:prstGeom prst="diamond">
             <a:avLst/>
@@ -16654,7 +16546,7 @@
         <p:spPr>
           <a:xfrm>
             <a:off x="0" y="3365640"/>
-            <a:ext cx="1838520" cy="9720"/>
+            <a:ext cx="1838880" cy="10080"/>
           </a:xfrm>
           <a:prstGeom prst="straightConnector1">
             <a:avLst/>
@@ -16676,7 +16568,7 @@
         <p:spPr>
           <a:xfrm>
             <a:off x="673200" y="3949920"/>
-            <a:ext cx="473040" cy="378000"/>
+            <a:ext cx="472680" cy="377640"/>
           </a:xfrm>
           <a:prstGeom prst="triangle">
             <a:avLst>
@@ -16743,9 +16635,9 @@
         <p:grpSpPr>
           <a:xfrm>
             <a:off x="101160" y="1413000"/>
-            <a:ext cx="1616760" cy="777960"/>
+            <a:ext cx="1616400" cy="777960"/>
             <a:chOff x="101160" y="1413000"/>
-            <a:chExt cx="1616760" cy="777960"/>
+            <a:chExt cx="1616400" cy="777960"/>
           </a:xfrm>
         </p:grpSpPr>
         <p:sp>
@@ -16757,7 +16649,7 @@
           <p:spPr>
             <a:xfrm>
               <a:off x="101160" y="1413000"/>
-              <a:ext cx="1616760" cy="303120"/>
+              <a:ext cx="1616400" cy="303120"/>
             </a:xfrm>
             <a:prstGeom prst="rect">
               <a:avLst/>
@@ -16815,7 +16707,7 @@
           <p:spPr>
             <a:xfrm>
               <a:off x="101160" y="1674360"/>
-              <a:ext cx="1616760" cy="516600"/>
+              <a:ext cx="1616400" cy="516600"/>
             </a:xfrm>
             <a:prstGeom prst="rect">
               <a:avLst/>
@@ -16907,7 +16799,7 @@
         <p:spPr>
           <a:xfrm>
             <a:off x="4775040" y="457200"/>
-            <a:ext cx="1616760" cy="303120"/>
+            <a:ext cx="1616400" cy="303120"/>
           </a:xfrm>
           <a:prstGeom prst="rect">
             <a:avLst/>
@@ -16964,7 +16856,7 @@
         <p:spPr>
           <a:xfrm>
             <a:off x="4775040" y="718560"/>
-            <a:ext cx="1616760" cy="730080"/>
+            <a:ext cx="1616400" cy="730080"/>
           </a:xfrm>
           <a:prstGeom prst="rect">
             <a:avLst/>
@@ -17081,9 +16973,9 @@
         <p:grpSpPr>
           <a:xfrm>
             <a:off x="4572000" y="4274280"/>
-            <a:ext cx="1616760" cy="991440"/>
+            <a:ext cx="1616400" cy="991440"/>
             <a:chOff x="4572000" y="4274280"/>
-            <a:chExt cx="1616760" cy="991440"/>
+            <a:chExt cx="1616400" cy="991440"/>
           </a:xfrm>
         </p:grpSpPr>
         <p:sp>
@@ -17095,7 +16987,7 @@
           <p:spPr>
             <a:xfrm>
               <a:off x="4572000" y="4274280"/>
-              <a:ext cx="1616760" cy="303120"/>
+              <a:ext cx="1616400" cy="303120"/>
             </a:xfrm>
             <a:prstGeom prst="rect">
               <a:avLst/>
@@ -17152,7 +17044,7 @@
           <p:spPr>
             <a:xfrm>
               <a:off x="4572000" y="4535640"/>
-              <a:ext cx="1616760" cy="730080"/>
+              <a:ext cx="1616400" cy="730080"/>
             </a:xfrm>
             <a:prstGeom prst="rect">
               <a:avLst/>
@@ -17270,7 +17162,7 @@
         <p:spPr>
           <a:xfrm>
             <a:off x="3231360" y="2899800"/>
-            <a:ext cx="1562040" cy="378000"/>
+            <a:ext cx="1561680" cy="377640"/>
           </a:xfrm>
           <a:prstGeom prst="diamond">
             <a:avLst/>
@@ -17335,7 +17227,7 @@
         <p:spPr>
           <a:xfrm>
             <a:off x="4602960" y="2585160"/>
-            <a:ext cx="1790640" cy="379440"/>
+            <a:ext cx="1790280" cy="379080"/>
           </a:xfrm>
           <a:prstGeom prst="diamond">
             <a:avLst/>
@@ -17402,8 +17294,8 @@
         </p:nvCxnSpPr>
         <p:spPr>
           <a:xfrm flipH="1" flipV="1">
-            <a:off x="4012560" y="3277800"/>
-            <a:ext cx="1368000" cy="996840"/>
+            <a:off x="4012200" y="3277440"/>
+            <a:ext cx="1368360" cy="997200"/>
           </a:xfrm>
           <a:prstGeom prst="straightConnector1">
             <a:avLst/>
@@ -17453,8 +17345,8 @@
         </p:nvCxnSpPr>
         <p:spPr>
           <a:xfrm flipV="1">
-            <a:off x="5380200" y="2964600"/>
-            <a:ext cx="118440" cy="1310040"/>
+            <a:off x="5380200" y="2964240"/>
+            <a:ext cx="118440" cy="1310400"/>
           </a:xfrm>
           <a:prstGeom prst="straightConnector1">
             <a:avLst/>
@@ -17478,8 +17370,8 @@
         </p:nvCxnSpPr>
         <p:spPr>
           <a:xfrm flipH="1">
-            <a:off x="4012560" y="1448640"/>
-            <a:ext cx="1571040" cy="1451520"/>
+            <a:off x="4012200" y="1448640"/>
+            <a:ext cx="1571400" cy="1451520"/>
           </a:xfrm>
           <a:prstGeom prst="straightConnector1">
             <a:avLst/>
@@ -17501,7 +17393,7 @@
         <p:spPr>
           <a:xfrm>
             <a:off x="2743200" y="457200"/>
-            <a:ext cx="1562040" cy="378000"/>
+            <a:ext cx="1561680" cy="377640"/>
           </a:xfrm>
           <a:prstGeom prst="diamond">
             <a:avLst/>
@@ -17568,8 +17460,8 @@
         </p:nvCxnSpPr>
         <p:spPr>
           <a:xfrm flipH="1" flipV="1">
-            <a:off x="4305240" y="646200"/>
-            <a:ext cx="470160" cy="437760"/>
+            <a:off x="4304880" y="646200"/>
+            <a:ext cx="470520" cy="437760"/>
           </a:xfrm>
           <a:prstGeom prst="straightConnector1">
             <a:avLst/>
@@ -17593,8 +17485,8 @@
         </p:nvCxnSpPr>
         <p:spPr>
           <a:xfrm flipH="1" flipV="1">
-            <a:off x="3524400" y="835200"/>
-            <a:ext cx="1251000" cy="248760"/>
+            <a:off x="3524040" y="834840"/>
+            <a:ext cx="1251360" cy="249120"/>
           </a:xfrm>
           <a:prstGeom prst="straightConnector1">
             <a:avLst/>
@@ -17616,9 +17508,9 @@
         <p:grpSpPr>
           <a:xfrm>
             <a:off x="8686800" y="837360"/>
-            <a:ext cx="1616760" cy="991440"/>
+            <a:ext cx="1616400" cy="991440"/>
             <a:chOff x="8686800" y="837360"/>
-            <a:chExt cx="1616760" cy="991440"/>
+            <a:chExt cx="1616400" cy="991440"/>
           </a:xfrm>
         </p:grpSpPr>
         <p:sp>
@@ -17630,7 +17522,7 @@
           <p:spPr>
             <a:xfrm>
               <a:off x="8686800" y="837360"/>
-              <a:ext cx="1616760" cy="303120"/>
+              <a:ext cx="1616400" cy="303120"/>
             </a:xfrm>
             <a:prstGeom prst="rect">
               <a:avLst/>
@@ -17687,7 +17579,7 @@
           <p:spPr>
             <a:xfrm>
               <a:off x="8686800" y="1098720"/>
-              <a:ext cx="1616760" cy="730080"/>
+              <a:ext cx="1616400" cy="730080"/>
             </a:xfrm>
             <a:prstGeom prst="rect">
               <a:avLst/>
@@ -17805,7 +17697,7 @@
         <p:spPr>
           <a:xfrm>
             <a:off x="128880" y="6134040"/>
-            <a:ext cx="1562040" cy="378000"/>
+            <a:ext cx="1561680" cy="377640"/>
           </a:xfrm>
           <a:prstGeom prst="diamond">
             <a:avLst/>
@@ -17870,7 +17762,7 @@
         <p:spPr>
           <a:xfrm>
             <a:off x="7315200" y="228600"/>
-            <a:ext cx="1562040" cy="378000"/>
+            <a:ext cx="1561680" cy="377640"/>
           </a:xfrm>
           <a:prstGeom prst="diamond">
             <a:avLst/>
@@ -17935,7 +17827,7 @@
         <p:spPr>
           <a:xfrm>
             <a:off x="360" y="3366000"/>
-            <a:ext cx="1838520" cy="9720"/>
+            <a:ext cx="1838880" cy="10080"/>
           </a:xfrm>
           <a:prstGeom prst="straightConnector1">
             <a:avLst/>
@@ -17959,8 +17851,8 @@
         </p:nvCxnSpPr>
         <p:spPr>
           <a:xfrm flipH="1">
-            <a:off x="6391800" y="417600"/>
-            <a:ext cx="923760" cy="666360"/>
+            <a:off x="6391440" y="417600"/>
+            <a:ext cx="924120" cy="666360"/>
           </a:xfrm>
           <a:prstGeom prst="straightConnector1">
             <a:avLst/>
@@ -17982,7 +17874,7 @@
         <p:spPr>
           <a:xfrm>
             <a:off x="6629400" y="1442160"/>
-            <a:ext cx="1821240" cy="607680"/>
+            <a:ext cx="1820880" cy="607320"/>
           </a:xfrm>
           <a:prstGeom prst="diamond">
             <a:avLst/>
@@ -18049,8 +17941,8 @@
         </p:nvCxnSpPr>
         <p:spPr>
           <a:xfrm flipH="1" flipV="1">
-            <a:off x="8877240" y="417600"/>
-            <a:ext cx="618120" cy="420120"/>
+            <a:off x="8876880" y="417600"/>
+            <a:ext cx="618480" cy="420120"/>
           </a:xfrm>
           <a:prstGeom prst="straightConnector1">
             <a:avLst/>
@@ -18073,7 +17965,7 @@
         <p:spPr>
           <a:xfrm>
             <a:off x="6629400" y="2514600"/>
-            <a:ext cx="1562040" cy="378000"/>
+            <a:ext cx="1561680" cy="377640"/>
           </a:xfrm>
           <a:prstGeom prst="diamond">
             <a:avLst/>
@@ -18140,8 +18032,8 @@
         </p:nvCxnSpPr>
         <p:spPr>
           <a:xfrm flipH="1">
-            <a:off x="8191440" y="1828800"/>
-            <a:ext cx="1303920" cy="875160"/>
+            <a:off x="8191080" y="1828800"/>
+            <a:ext cx="1304280" cy="875160"/>
           </a:xfrm>
           <a:prstGeom prst="straightConnector1">
             <a:avLst/>
@@ -18165,8 +18057,8 @@
         </p:nvCxnSpPr>
         <p:spPr>
           <a:xfrm flipH="1">
-            <a:off x="6188760" y="2703600"/>
-            <a:ext cx="441000" cy="2066760"/>
+            <a:off x="6188400" y="2703600"/>
+            <a:ext cx="441360" cy="2066760"/>
           </a:xfrm>
           <a:prstGeom prst="straightConnector1">
             <a:avLst/>
@@ -18190,8 +18082,8 @@
         </p:nvCxnSpPr>
         <p:spPr>
           <a:xfrm flipH="1">
-            <a:off x="8450640" y="1333080"/>
-            <a:ext cx="236520" cy="413280"/>
+            <a:off x="8450280" y="1333080"/>
+            <a:ext cx="236880" cy="413280"/>
           </a:xfrm>
           <a:prstGeom prst="straightConnector1">
             <a:avLst/>
@@ -18238,9 +18130,9 @@
         <p:grpSpPr>
           <a:xfrm>
             <a:off x="101160" y="336240"/>
-            <a:ext cx="1616760" cy="777960"/>
+            <a:ext cx="1616400" cy="777960"/>
             <a:chOff x="101160" y="336240"/>
-            <a:chExt cx="1616760" cy="777960"/>
+            <a:chExt cx="1616400" cy="777960"/>
           </a:xfrm>
         </p:grpSpPr>
         <p:sp>
@@ -18252,7 +18144,7 @@
           <p:spPr>
             <a:xfrm>
               <a:off x="101160" y="336240"/>
-              <a:ext cx="1616760" cy="303120"/>
+              <a:ext cx="1616400" cy="303120"/>
             </a:xfrm>
             <a:prstGeom prst="rect">
               <a:avLst/>
@@ -18309,7 +18201,7 @@
           <p:spPr>
             <a:xfrm>
               <a:off x="101160" y="597600"/>
-              <a:ext cx="1616760" cy="516600"/>
+              <a:ext cx="1616400" cy="516600"/>
             </a:xfrm>
             <a:prstGeom prst="rect">
               <a:avLst/>
@@ -18400,9 +18292,9 @@
         <p:grpSpPr>
           <a:xfrm>
             <a:off x="6760440" y="4359960"/>
-            <a:ext cx="1616760" cy="556920"/>
+            <a:ext cx="1616400" cy="556560"/>
             <a:chOff x="6760440" y="4359960"/>
-            <a:chExt cx="1616760" cy="556920"/>
+            <a:chExt cx="1616400" cy="556560"/>
           </a:xfrm>
         </p:grpSpPr>
         <p:sp>
@@ -18414,7 +18306,7 @@
           <p:spPr>
             <a:xfrm>
               <a:off x="6760440" y="4359960"/>
-              <a:ext cx="1616760" cy="303120"/>
+              <a:ext cx="1616400" cy="303120"/>
             </a:xfrm>
             <a:prstGeom prst="rect">
               <a:avLst/>
@@ -18471,7 +18363,7 @@
           <p:spPr>
             <a:xfrm>
               <a:off x="6760440" y="4621320"/>
-              <a:ext cx="1616760" cy="295560"/>
+              <a:ext cx="1616400" cy="295200"/>
             </a:xfrm>
             <a:prstGeom prst="rect">
               <a:avLst/>
@@ -18520,7 +18412,7 @@
         <p:spPr>
           <a:xfrm>
             <a:off x="9144000" y="2057400"/>
-            <a:ext cx="473040" cy="378000"/>
+            <a:ext cx="472680" cy="377640"/>
           </a:xfrm>
           <a:prstGeom prst="triangle">
             <a:avLst>
@@ -18588,8 +18480,8 @@
         </p:nvCxnSpPr>
         <p:spPr>
           <a:xfrm flipH="1">
-            <a:off x="8026200" y="4107240"/>
-            <a:ext cx="1432080" cy="260280"/>
+            <a:off x="8026200" y="4106880"/>
+            <a:ext cx="1432080" cy="261000"/>
           </a:xfrm>
           <a:prstGeom prst="straightConnector1">
             <a:avLst/>
@@ -18612,8 +18504,8 @@
         </p:nvCxnSpPr>
         <p:spPr>
           <a:xfrm flipH="1" flipV="1">
-            <a:off x="9457920" y="4107240"/>
-            <a:ext cx="480960" cy="241920"/>
+            <a:off x="9457920" y="4106880"/>
+            <a:ext cx="481320" cy="242640"/>
           </a:xfrm>
           <a:prstGeom prst="straightConnector1">
             <a:avLst/>
@@ -18636,8 +18528,8 @@
         </p:nvCxnSpPr>
         <p:spPr>
           <a:xfrm flipH="1">
-            <a:off x="9346320" y="2435400"/>
-            <a:ext cx="34560" cy="451800"/>
+            <a:off x="9346320" y="2435040"/>
+            <a:ext cx="34560" cy="452520"/>
           </a:xfrm>
           <a:prstGeom prst="straightConnector1">
             <a:avLst/>
@@ -18684,7 +18576,7 @@
         <p:spPr>
           <a:xfrm>
             <a:off x="7089840" y="5715000"/>
-            <a:ext cx="1616760" cy="303120"/>
+            <a:ext cx="1616400" cy="303120"/>
           </a:xfrm>
           <a:prstGeom prst="rect">
             <a:avLst/>
@@ -18741,7 +18633,7 @@
         <p:spPr>
           <a:xfrm>
             <a:off x="6760440" y="5183280"/>
-            <a:ext cx="1820160" cy="378000"/>
+            <a:ext cx="1819800" cy="377640"/>
           </a:xfrm>
           <a:prstGeom prst="diamond">
             <a:avLst/>
@@ -18806,7 +18698,7 @@
         <p:spPr>
           <a:xfrm flipH="1">
             <a:off x="0" y="3657600"/>
-            <a:ext cx="1838520" cy="9720"/>
+            <a:ext cx="1838880" cy="10080"/>
           </a:xfrm>
           <a:prstGeom prst="straightConnector1">
             <a:avLst/>
@@ -18828,9 +18720,9 @@
         <p:grpSpPr>
           <a:xfrm>
             <a:off x="8534520" y="2879640"/>
-            <a:ext cx="1616760" cy="557640"/>
+            <a:ext cx="1616400" cy="557280"/>
             <a:chOff x="8534520" y="2879640"/>
-            <a:chExt cx="1616760" cy="557640"/>
+            <a:chExt cx="1616400" cy="557280"/>
           </a:xfrm>
         </p:grpSpPr>
         <p:sp>
@@ -18842,7 +18734,7 @@
           <p:spPr>
             <a:xfrm>
               <a:off x="8534520" y="2879640"/>
-              <a:ext cx="1616760" cy="303120"/>
+              <a:ext cx="1616400" cy="303120"/>
             </a:xfrm>
             <a:prstGeom prst="rect">
               <a:avLst/>
@@ -18899,7 +18791,7 @@
           <p:spPr>
             <a:xfrm>
               <a:off x="8534520" y="3141000"/>
-              <a:ext cx="1616760" cy="296280"/>
+              <a:ext cx="1616400" cy="295920"/>
             </a:xfrm>
             <a:prstGeom prst="rect">
               <a:avLst/>
@@ -18948,9 +18840,9 @@
         <p:grpSpPr>
           <a:xfrm>
             <a:off x="8534520" y="2879640"/>
-            <a:ext cx="1616760" cy="564480"/>
+            <a:ext cx="1616400" cy="564480"/>
             <a:chOff x="8534520" y="2879640"/>
-            <a:chExt cx="1616760" cy="564480"/>
+            <a:chExt cx="1616400" cy="564480"/>
           </a:xfrm>
         </p:grpSpPr>
         <p:sp>
@@ -18962,7 +18854,7 @@
           <p:spPr>
             <a:xfrm>
               <a:off x="8534520" y="2879640"/>
-              <a:ext cx="1616760" cy="303120"/>
+              <a:ext cx="1616400" cy="303120"/>
             </a:xfrm>
             <a:prstGeom prst="rect">
               <a:avLst/>
@@ -19019,7 +18911,7 @@
           <p:spPr>
             <a:xfrm>
               <a:off x="8534520" y="3141000"/>
-              <a:ext cx="1616760" cy="303120"/>
+              <a:ext cx="1616400" cy="303120"/>
             </a:xfrm>
             <a:prstGeom prst="rect">
               <a:avLst/>
@@ -19082,7 +18974,7 @@
         <p:spPr>
           <a:xfrm>
             <a:off x="9221400" y="3729240"/>
-            <a:ext cx="473040" cy="378000"/>
+            <a:ext cx="472680" cy="377640"/>
           </a:xfrm>
           <a:prstGeom prst="triangle">
             <a:avLst>
@@ -19174,7 +19066,7 @@
         <p:spPr>
           <a:xfrm>
             <a:off x="8556840" y="3657600"/>
-            <a:ext cx="1838520" cy="9720"/>
+            <a:ext cx="1838880" cy="10080"/>
           </a:xfrm>
           <a:prstGeom prst="straightConnector1">
             <a:avLst/>
@@ -19197,7 +19089,7 @@
         <p:spPr>
           <a:xfrm>
             <a:off x="9601200" y="3382920"/>
-            <a:ext cx="906840" cy="338760"/>
+            <a:ext cx="906480" cy="338400"/>
           </a:xfrm>
           <a:prstGeom prst="rect">
             <a:avLst/>
@@ -19250,7 +19142,7 @@
         <p:spPr>
           <a:xfrm>
             <a:off x="2057400" y="2132280"/>
-            <a:ext cx="1616760" cy="303120"/>
+            <a:ext cx="1616400" cy="303120"/>
           </a:xfrm>
           <a:prstGeom prst="rect">
             <a:avLst/>
@@ -19307,7 +19199,7 @@
         <p:spPr>
           <a:xfrm>
             <a:off x="2057400" y="2393640"/>
-            <a:ext cx="1616760" cy="188280"/>
+            <a:ext cx="1616400" cy="187920"/>
           </a:xfrm>
           <a:prstGeom prst="rect">
             <a:avLst/>
@@ -19355,7 +19247,7 @@
         <p:spPr>
           <a:xfrm>
             <a:off x="2613960" y="1217880"/>
-            <a:ext cx="473040" cy="378000"/>
+            <a:ext cx="472680" cy="377640"/>
           </a:xfrm>
           <a:prstGeom prst="triangle">
             <a:avLst>
@@ -19424,8 +19316,8 @@
         </p:nvCxnSpPr>
         <p:spPr>
           <a:xfrm>
-            <a:off x="2850480" y="1595880"/>
-            <a:ext cx="15480" cy="536760"/>
+            <a:off x="2850480" y="1595520"/>
+            <a:ext cx="15480" cy="537120"/>
           </a:xfrm>
           <a:prstGeom prst="straightConnector1">
             <a:avLst/>
@@ -19474,8 +19366,8 @@
         </p:nvCxnSpPr>
         <p:spPr>
           <a:xfrm>
-            <a:off x="7568640" y="4916880"/>
-            <a:ext cx="102240" cy="266760"/>
+            <a:off x="7568640" y="4916520"/>
+            <a:ext cx="102240" cy="267120"/>
           </a:xfrm>
           <a:prstGeom prst="straightConnector1">
             <a:avLst/>
@@ -19500,8 +19392,8 @@
         </p:nvCxnSpPr>
         <p:spPr>
           <a:xfrm>
-            <a:off x="7670520" y="5561280"/>
-            <a:ext cx="227880" cy="154080"/>
+            <a:off x="7670520" y="5560920"/>
+            <a:ext cx="227880" cy="154440"/>
           </a:xfrm>
           <a:prstGeom prst="straightConnector1">
             <a:avLst/>
@@ -19523,9 +19415,9 @@
         <p:grpSpPr>
           <a:xfrm>
             <a:off x="10265040" y="5029200"/>
-            <a:ext cx="1616760" cy="557280"/>
+            <a:ext cx="1616400" cy="556920"/>
             <a:chOff x="10265040" y="5029200"/>
-            <a:chExt cx="1616760" cy="557280"/>
+            <a:chExt cx="1616400" cy="556920"/>
           </a:xfrm>
         </p:grpSpPr>
         <p:sp>
@@ -19537,7 +19429,7 @@
           <p:spPr>
             <a:xfrm>
               <a:off x="10265040" y="5029200"/>
-              <a:ext cx="1616760" cy="303120"/>
+              <a:ext cx="1616400" cy="303120"/>
             </a:xfrm>
             <a:prstGeom prst="rect">
               <a:avLst/>
@@ -19594,7 +19486,7 @@
           <p:spPr>
             <a:xfrm>
               <a:off x="10265040" y="5290560"/>
-              <a:ext cx="1616760" cy="295920"/>
+              <a:ext cx="1616400" cy="295560"/>
             </a:xfrm>
             <a:prstGeom prst="rect">
               <a:avLst/>
@@ -19645,8 +19537,8 @@
         </p:nvCxnSpPr>
         <p:spPr>
           <a:xfrm flipH="1" flipV="1">
-            <a:off x="9694440" y="4107240"/>
-            <a:ext cx="1379160" cy="922320"/>
+            <a:off x="9694080" y="4106880"/>
+            <a:ext cx="1379520" cy="922680"/>
           </a:xfrm>
           <a:prstGeom prst="straightConnector1">
             <a:avLst/>
@@ -19668,9 +19560,9 @@
         <p:grpSpPr>
           <a:xfrm>
             <a:off x="9122040" y="4343400"/>
-            <a:ext cx="1616760" cy="557280"/>
+            <a:ext cx="1616400" cy="556920"/>
             <a:chOff x="9122040" y="4343400"/>
-            <a:chExt cx="1616760" cy="557280"/>
+            <a:chExt cx="1616400" cy="556920"/>
           </a:xfrm>
         </p:grpSpPr>
         <p:sp>
@@ -19682,7 +19574,7 @@
           <p:spPr>
             <a:xfrm>
               <a:off x="9122040" y="4343400"/>
-              <a:ext cx="1616760" cy="303120"/>
+              <a:ext cx="1616400" cy="303120"/>
             </a:xfrm>
             <a:prstGeom prst="rect">
               <a:avLst/>
@@ -19739,7 +19631,7 @@
           <p:spPr>
             <a:xfrm>
               <a:off x="9122040" y="4604760"/>
-              <a:ext cx="1616760" cy="295920"/>
+              <a:ext cx="1616400" cy="295560"/>
             </a:xfrm>
             <a:prstGeom prst="rect">
               <a:avLst/>
@@ -19788,7 +19680,7 @@
         <p:spPr>
           <a:xfrm>
             <a:off x="10037520" y="2131560"/>
-            <a:ext cx="473040" cy="378000"/>
+            <a:ext cx="472680" cy="377640"/>
           </a:xfrm>
           <a:prstGeom prst="triangle">
             <a:avLst>
@@ -19880,9 +19772,9 @@
         <p:grpSpPr>
           <a:xfrm>
             <a:off x="10494000" y="2866680"/>
-            <a:ext cx="1616760" cy="557280"/>
+            <a:ext cx="1616400" cy="556920"/>
             <a:chOff x="10494000" y="2866680"/>
-            <a:chExt cx="1616760" cy="557280"/>
+            <a:chExt cx="1616400" cy="556920"/>
           </a:xfrm>
         </p:grpSpPr>
         <p:sp>
@@ -19894,7 +19786,7 @@
           <p:spPr>
             <a:xfrm>
               <a:off x="10494000" y="2866680"/>
-              <a:ext cx="1616760" cy="303120"/>
+              <a:ext cx="1616400" cy="303120"/>
             </a:xfrm>
             <a:prstGeom prst="rect">
               <a:avLst/>
@@ -19951,7 +19843,7 @@
           <p:spPr>
             <a:xfrm>
               <a:off x="10494000" y="3128040"/>
-              <a:ext cx="1616760" cy="295920"/>
+              <a:ext cx="1616400" cy="295560"/>
             </a:xfrm>
             <a:prstGeom prst="rect">
               <a:avLst/>
@@ -20002,8 +19894,8 @@
         </p:nvCxnSpPr>
         <p:spPr>
           <a:xfrm>
-            <a:off x="10274040" y="2509560"/>
-            <a:ext cx="1028520" cy="357480"/>
+            <a:off x="10274040" y="2509200"/>
+            <a:ext cx="1028520" cy="357840"/>
           </a:xfrm>
           <a:prstGeom prst="straightConnector1">
             <a:avLst/>
@@ -20055,7 +19947,7 @@
         <p:spPr>
           <a:xfrm flipH="1">
             <a:off x="0" y="3073320"/>
-            <a:ext cx="1838520" cy="9720"/>
+            <a:ext cx="1838880" cy="10080"/>
           </a:xfrm>
           <a:prstGeom prst="straightConnector1">
             <a:avLst/>
@@ -20078,7 +19970,7 @@
         <p:spPr>
           <a:xfrm>
             <a:off x="0" y="2489400"/>
-            <a:ext cx="1838520" cy="9720"/>
+            <a:ext cx="1838880" cy="10080"/>
           </a:xfrm>
           <a:prstGeom prst="straightConnector1">
             <a:avLst/>
@@ -20101,7 +19993,7 @@
         <p:spPr>
           <a:xfrm>
             <a:off x="0" y="2781360"/>
-            <a:ext cx="1838520" cy="9720"/>
+            <a:ext cx="1838880" cy="10080"/>
           </a:xfrm>
           <a:prstGeom prst="straightConnector1">
             <a:avLst/>
@@ -20124,7 +20016,7 @@
         <p:spPr>
           <a:xfrm flipH="1">
             <a:off x="0" y="3657600"/>
-            <a:ext cx="1838520" cy="9720"/>
+            <a:ext cx="1838880" cy="10080"/>
           </a:xfrm>
           <a:prstGeom prst="straightConnector1">
             <a:avLst/>
@@ -20146,7 +20038,7 @@
         <p:spPr>
           <a:xfrm>
             <a:off x="128520" y="6134040"/>
-            <a:ext cx="1562040" cy="378000"/>
+            <a:ext cx="1561680" cy="377640"/>
           </a:xfrm>
           <a:prstGeom prst="diamond">
             <a:avLst/>
@@ -20211,7 +20103,7 @@
         <p:spPr>
           <a:xfrm>
             <a:off x="302760" y="5454000"/>
-            <a:ext cx="1213560" cy="378000"/>
+            <a:ext cx="1213200" cy="377640"/>
           </a:xfrm>
           <a:prstGeom prst="ellipse">
             <a:avLst/>
@@ -20274,7 +20166,7 @@
         <p:spPr>
           <a:xfrm>
             <a:off x="101160" y="336240"/>
-            <a:ext cx="1616760" cy="303120"/>
+            <a:ext cx="1616400" cy="303120"/>
           </a:xfrm>
           <a:prstGeom prst="rect">
             <a:avLst/>
@@ -20331,7 +20223,7 @@
         <p:spPr>
           <a:xfrm>
             <a:off x="101160" y="597600"/>
-            <a:ext cx="1616760" cy="516600"/>
+            <a:ext cx="1616400" cy="516600"/>
           </a:xfrm>
           <a:prstGeom prst="rect">
             <a:avLst/>
@@ -20421,7 +20313,7 @@
         <p:spPr>
           <a:xfrm>
             <a:off x="8458200" y="5486400"/>
-            <a:ext cx="1616760" cy="303120"/>
+            <a:ext cx="1616400" cy="303120"/>
           </a:xfrm>
           <a:prstGeom prst="rect">
             <a:avLst/>
@@ -20478,7 +20370,7 @@
         <p:spPr>
           <a:xfrm>
             <a:off x="128520" y="4629600"/>
-            <a:ext cx="1562040" cy="522720"/>
+            <a:ext cx="1561680" cy="522360"/>
           </a:xfrm>
           <a:prstGeom prst="diamond">
             <a:avLst/>
@@ -20566,7 +20458,7 @@
         <p:spPr>
           <a:xfrm>
             <a:off x="0" y="3365640"/>
-            <a:ext cx="1838520" cy="9720"/>
+            <a:ext cx="1838880" cy="10080"/>
           </a:xfrm>
           <a:prstGeom prst="straightConnector1">
             <a:avLst/>
@@ -20588,7 +20480,7 @@
         <p:spPr>
           <a:xfrm>
             <a:off x="673200" y="3949920"/>
-            <a:ext cx="473040" cy="378000"/>
+            <a:ext cx="472680" cy="377640"/>
           </a:xfrm>
           <a:prstGeom prst="triangle">
             <a:avLst>
@@ -20655,9 +20547,9 @@
         <p:grpSpPr>
           <a:xfrm>
             <a:off x="101160" y="1413000"/>
-            <a:ext cx="1616760" cy="777960"/>
+            <a:ext cx="1616400" cy="777960"/>
             <a:chOff x="101160" y="1413000"/>
-            <a:chExt cx="1616760" cy="777960"/>
+            <a:chExt cx="1616400" cy="777960"/>
           </a:xfrm>
         </p:grpSpPr>
         <p:sp>
@@ -20669,7 +20561,7 @@
           <p:spPr>
             <a:xfrm>
               <a:off x="101160" y="1413000"/>
-              <a:ext cx="1616760" cy="303120"/>
+              <a:ext cx="1616400" cy="303120"/>
             </a:xfrm>
             <a:prstGeom prst="rect">
               <a:avLst/>
@@ -20727,7 +20619,7 @@
           <p:spPr>
             <a:xfrm>
               <a:off x="101160" y="1674360"/>
-              <a:ext cx="1616760" cy="516600"/>
+              <a:ext cx="1616400" cy="516600"/>
             </a:xfrm>
             <a:prstGeom prst="rect">
               <a:avLst/>
@@ -20819,7 +20711,7 @@
         <p:spPr>
           <a:xfrm>
             <a:off x="5463360" y="2131920"/>
-            <a:ext cx="1616760" cy="303120"/>
+            <a:ext cx="1616400" cy="303120"/>
           </a:xfrm>
           <a:prstGeom prst="rect">
             <a:avLst/>
@@ -20882,7 +20774,7 @@
         <p:spPr>
           <a:xfrm>
             <a:off x="5463360" y="1828800"/>
-            <a:ext cx="1616760" cy="303120"/>
+            <a:ext cx="1616400" cy="303120"/>
           </a:xfrm>
           <a:prstGeom prst="rect">
             <a:avLst/>
@@ -20939,9 +20831,9 @@
         <p:grpSpPr>
           <a:xfrm>
             <a:off x="4296600" y="4022640"/>
-            <a:ext cx="1616760" cy="777960"/>
+            <a:ext cx="1616400" cy="777960"/>
             <a:chOff x="4296600" y="4022640"/>
-            <a:chExt cx="1616760" cy="777960"/>
+            <a:chExt cx="1616400" cy="777960"/>
           </a:xfrm>
         </p:grpSpPr>
         <p:sp>
@@ -20953,7 +20845,7 @@
           <p:spPr>
             <a:xfrm>
               <a:off x="4296600" y="4022640"/>
-              <a:ext cx="1616760" cy="303120"/>
+              <a:ext cx="1616400" cy="303120"/>
             </a:xfrm>
             <a:prstGeom prst="rect">
               <a:avLst/>
@@ -21010,7 +20902,7 @@
           <p:spPr>
             <a:xfrm>
               <a:off x="4296600" y="4284000"/>
-              <a:ext cx="1616760" cy="516600"/>
+              <a:ext cx="1616400" cy="516600"/>
             </a:xfrm>
             <a:prstGeom prst="rect">
               <a:avLst/>
@@ -21080,7 +20972,7 @@
                   </a:solidFill>
                   <a:latin typeface="Calibri"/>
                 </a:rPr>
-                <a:t>Speed</a:t>
+                <a:t> </a:t>
               </a:r>
               <a:endParaRPr b="0" lang="en-US" sz="1400" spc="-1" strike="noStrike">
                 <a:solidFill>
@@ -21101,9 +20993,9 @@
         <p:grpSpPr>
           <a:xfrm>
             <a:off x="9348840" y="2254320"/>
-            <a:ext cx="1616760" cy="1631880"/>
+            <a:ext cx="1616400" cy="1631880"/>
             <a:chOff x="9348840" y="2254320"/>
-            <a:chExt cx="1616760" cy="1631880"/>
+            <a:chExt cx="1616400" cy="1631880"/>
           </a:xfrm>
         </p:grpSpPr>
         <p:sp>
@@ -21115,7 +21007,7 @@
           <p:spPr>
             <a:xfrm>
               <a:off x="9348840" y="2254320"/>
-              <a:ext cx="1616760" cy="303120"/>
+              <a:ext cx="1616400" cy="303120"/>
             </a:xfrm>
             <a:prstGeom prst="rect">
               <a:avLst/>
@@ -21172,7 +21064,7 @@
           <p:spPr>
             <a:xfrm>
               <a:off x="9348840" y="2515680"/>
-              <a:ext cx="1616760" cy="1370520"/>
+              <a:ext cx="1616400" cy="1370520"/>
             </a:xfrm>
             <a:prstGeom prst="rect">
               <a:avLst/>
@@ -21371,7 +21263,7 @@
         <p:spPr>
           <a:xfrm>
             <a:off x="9402120" y="4572000"/>
-            <a:ext cx="1562040" cy="378000"/>
+            <a:ext cx="1561680" cy="377640"/>
           </a:xfrm>
           <a:prstGeom prst="diamond">
             <a:avLst/>
@@ -21436,7 +21328,7 @@
         <p:spPr>
           <a:xfrm>
             <a:off x="7007400" y="4572000"/>
-            <a:ext cx="1670760" cy="378000"/>
+            <a:ext cx="1670400" cy="377640"/>
           </a:xfrm>
           <a:prstGeom prst="ellipse">
             <a:avLst/>
@@ -21499,9 +21391,9 @@
         <p:grpSpPr>
           <a:xfrm>
             <a:off x="9348840" y="2254320"/>
-            <a:ext cx="1616760" cy="1631880"/>
+            <a:ext cx="1616400" cy="1631880"/>
             <a:chOff x="9348840" y="2254320"/>
-            <a:chExt cx="1616760" cy="1631880"/>
+            <a:chExt cx="1616400" cy="1631880"/>
           </a:xfrm>
         </p:grpSpPr>
         <p:sp>
@@ -21513,7 +21405,7 @@
           <p:spPr>
             <a:xfrm>
               <a:off x="9348840" y="2254320"/>
-              <a:ext cx="1616760" cy="303120"/>
+              <a:ext cx="1616400" cy="303120"/>
             </a:xfrm>
             <a:prstGeom prst="rect">
               <a:avLst/>
@@ -21570,7 +21462,7 @@
           <p:spPr>
             <a:xfrm>
               <a:off x="9348840" y="2515680"/>
-              <a:ext cx="1616760" cy="1370520"/>
+              <a:ext cx="1616400" cy="1370520"/>
             </a:xfrm>
             <a:prstGeom prst="rect">
               <a:avLst/>
@@ -21769,9 +21661,9 @@
         <p:grpSpPr>
           <a:xfrm>
             <a:off x="9348840" y="2254320"/>
-            <a:ext cx="1616760" cy="1845360"/>
+            <a:ext cx="1616400" cy="1845360"/>
             <a:chOff x="9348840" y="2254320"/>
-            <a:chExt cx="1616760" cy="1845360"/>
+            <a:chExt cx="1616400" cy="1845360"/>
           </a:xfrm>
         </p:grpSpPr>
         <p:sp>
@@ -21783,7 +21675,7 @@
           <p:spPr>
             <a:xfrm>
               <a:off x="9348840" y="2254320"/>
-              <a:ext cx="1616760" cy="303120"/>
+              <a:ext cx="1616400" cy="303120"/>
             </a:xfrm>
             <a:prstGeom prst="rect">
               <a:avLst/>
@@ -21840,7 +21732,7 @@
           <p:spPr>
             <a:xfrm>
               <a:off x="9348840" y="2515680"/>
-              <a:ext cx="1616760" cy="1584000"/>
+              <a:ext cx="1616400" cy="1584000"/>
             </a:xfrm>
             <a:prstGeom prst="rect">
               <a:avLst/>
@@ -22066,7 +21958,7 @@
         <p:spPr>
           <a:xfrm>
             <a:off x="7086600" y="3501720"/>
-            <a:ext cx="1820160" cy="378000"/>
+            <a:ext cx="1819800" cy="377640"/>
           </a:xfrm>
           <a:prstGeom prst="diamond">
             <a:avLst/>
@@ -22131,7 +22023,7 @@
         <p:spPr>
           <a:xfrm>
             <a:off x="7543800" y="1869840"/>
-            <a:ext cx="1790640" cy="378000"/>
+            <a:ext cx="1790280" cy="377640"/>
           </a:xfrm>
           <a:prstGeom prst="diamond">
             <a:avLst/>
@@ -22198,8 +22090,8 @@
         </p:nvCxnSpPr>
         <p:spPr>
           <a:xfrm flipV="1">
-            <a:off x="7080120" y="2058840"/>
-            <a:ext cx="464040" cy="225000"/>
+            <a:off x="7079760" y="2058840"/>
+            <a:ext cx="464400" cy="225000"/>
           </a:xfrm>
           <a:prstGeom prst="straightConnector1">
             <a:avLst/>
@@ -22224,8 +22116,8 @@
         </p:nvCxnSpPr>
         <p:spPr>
           <a:xfrm flipH="1">
-            <a:off x="9266400" y="4950000"/>
-            <a:ext cx="917280" cy="536760"/>
+            <a:off x="9266400" y="4949640"/>
+            <a:ext cx="916920" cy="537120"/>
           </a:xfrm>
           <a:prstGeom prst="straightConnector1">
             <a:avLst/>
@@ -22250,7 +22142,7 @@
         <p:spPr>
           <a:xfrm>
             <a:off x="10157040" y="4099680"/>
-            <a:ext cx="26640" cy="472680"/>
+            <a:ext cx="26280" cy="472680"/>
           </a:xfrm>
           <a:prstGeom prst="straightConnector1">
             <a:avLst/>
@@ -22274,8 +22166,8 @@
         </p:nvCxnSpPr>
         <p:spPr>
           <a:xfrm flipH="1">
-            <a:off x="8678160" y="4761000"/>
-            <a:ext cx="724320" cy="360"/>
+            <a:off x="8677800" y="4761000"/>
+            <a:ext cx="724680" cy="360"/>
           </a:xfrm>
           <a:prstGeom prst="straightConnector1">
             <a:avLst/>
@@ -22297,7 +22189,7 @@
         <p:spPr>
           <a:xfrm>
             <a:off x="6629400" y="5099760"/>
-            <a:ext cx="1591560" cy="378000"/>
+            <a:ext cx="1591200" cy="377640"/>
           </a:xfrm>
           <a:prstGeom prst="ellipse">
             <a:avLst/>
@@ -22362,8 +22254,8 @@
         </p:nvCxnSpPr>
         <p:spPr>
           <a:xfrm flipH="1">
-            <a:off x="8220960" y="4761000"/>
-            <a:ext cx="1181520" cy="528120"/>
+            <a:off x="8220600" y="4761000"/>
+            <a:ext cx="1181880" cy="528120"/>
           </a:xfrm>
           <a:prstGeom prst="straightConnector1">
             <a:avLst/>
@@ -22387,8 +22279,8 @@
         </p:nvCxnSpPr>
         <p:spPr>
           <a:xfrm flipH="1">
-            <a:off x="3625920" y="2547000"/>
-            <a:ext cx="9000" cy="457560"/>
+            <a:off x="3625560" y="2547000"/>
+            <a:ext cx="9360" cy="457560"/>
           </a:xfrm>
           <a:prstGeom prst="straightConnector1">
             <a:avLst/>
@@ -22410,7 +22302,7 @@
         <p:spPr>
           <a:xfrm>
             <a:off x="5234760" y="2815200"/>
-            <a:ext cx="1562040" cy="378000"/>
+            <a:ext cx="1561680" cy="377640"/>
           </a:xfrm>
           <a:prstGeom prst="diamond">
             <a:avLst/>
@@ -22475,7 +22367,7 @@
         <p:spPr>
           <a:xfrm>
             <a:off x="3634560" y="2358000"/>
-            <a:ext cx="1562040" cy="378000"/>
+            <a:ext cx="1561680" cy="377640"/>
           </a:xfrm>
           <a:prstGeom prst="diamond">
             <a:avLst/>
@@ -22540,7 +22432,7 @@
         <p:spPr>
           <a:xfrm>
             <a:off x="2034360" y="2815200"/>
-            <a:ext cx="1591560" cy="378000"/>
+            <a:ext cx="1591200" cy="377640"/>
           </a:xfrm>
           <a:prstGeom prst="ellipse">
             <a:avLst/>
@@ -22605,8 +22497,8 @@
         </p:nvCxnSpPr>
         <p:spPr>
           <a:xfrm flipH="1" flipV="1">
-            <a:off x="4415760" y="2736000"/>
-            <a:ext cx="689400" cy="1287000"/>
+            <a:off x="4415400" y="2735640"/>
+            <a:ext cx="689760" cy="1287360"/>
           </a:xfrm>
           <a:prstGeom prst="straightConnector1">
             <a:avLst/>
@@ -22631,8 +22523,8 @@
         </p:nvCxnSpPr>
         <p:spPr>
           <a:xfrm flipH="1">
-            <a:off x="4415760" y="1980360"/>
-            <a:ext cx="1047960" cy="378000"/>
+            <a:off x="4415400" y="1980360"/>
+            <a:ext cx="1048320" cy="378000"/>
           </a:xfrm>
           <a:prstGeom prst="straightConnector1">
             <a:avLst/>
@@ -22656,8 +22548,8 @@
         </p:nvCxnSpPr>
         <p:spPr>
           <a:xfrm flipV="1">
-            <a:off x="5104800" y="3193200"/>
-            <a:ext cx="911520" cy="829800"/>
+            <a:off x="5104800" y="3192840"/>
+            <a:ext cx="911160" cy="830160"/>
           </a:xfrm>
           <a:prstGeom prst="straightConnector1">
             <a:avLst/>
@@ -22682,8 +22574,8 @@
         </p:nvCxnSpPr>
         <p:spPr>
           <a:xfrm flipV="1">
-            <a:off x="6015960" y="2435040"/>
-            <a:ext cx="255960" cy="380520"/>
+            <a:off x="6015600" y="2435040"/>
+            <a:ext cx="256320" cy="380520"/>
           </a:xfrm>
           <a:prstGeom prst="straightConnector1">
             <a:avLst/>
@@ -22707,8 +22599,8 @@
         </p:nvCxnSpPr>
         <p:spPr>
           <a:xfrm flipV="1">
-            <a:off x="5913360" y="3690720"/>
-            <a:ext cx="1173600" cy="721080"/>
+            <a:off x="5913000" y="3690720"/>
+            <a:ext cx="1173960" cy="721080"/>
           </a:xfrm>
           <a:prstGeom prst="straightConnector1">
             <a:avLst/>
@@ -22733,8 +22625,8 @@
         </p:nvCxnSpPr>
         <p:spPr>
           <a:xfrm flipH="1">
-            <a:off x="8906760" y="3177000"/>
-            <a:ext cx="442440" cy="514080"/>
+            <a:off x="8906400" y="3177000"/>
+            <a:ext cx="442800" cy="514080"/>
           </a:xfrm>
           <a:prstGeom prst="straightConnector1">
             <a:avLst/>
@@ -22758,8 +22650,8 @@
         </p:nvCxnSpPr>
         <p:spPr>
           <a:xfrm flipH="1" flipV="1">
-            <a:off x="9334440" y="2058840"/>
-            <a:ext cx="822960" cy="195840"/>
+            <a:off x="9334080" y="2058840"/>
+            <a:ext cx="823320" cy="195840"/>
           </a:xfrm>
           <a:prstGeom prst="straightConnector1">
             <a:avLst/>
@@ -22781,7 +22673,7 @@
         <p:spPr>
           <a:xfrm>
             <a:off x="2722320" y="5330520"/>
-            <a:ext cx="1820160" cy="378000"/>
+            <a:ext cx="1819800" cy="377640"/>
           </a:xfrm>
           <a:prstGeom prst="diamond">
             <a:avLst/>
@@ -22873,8 +22765,8 @@
         </p:nvCxnSpPr>
         <p:spPr>
           <a:xfrm flipH="1">
-            <a:off x="4542480" y="4800600"/>
-            <a:ext cx="562680" cy="719280"/>
+            <a:off x="4542120" y="4800600"/>
+            <a:ext cx="563040" cy="719280"/>
           </a:xfrm>
           <a:prstGeom prst="straightConnector1">
             <a:avLst/>
@@ -22896,7 +22788,7 @@
         <p:spPr>
           <a:xfrm>
             <a:off x="7315200" y="4114800"/>
-            <a:ext cx="1670760" cy="378000"/>
+            <a:ext cx="1670400" cy="377640"/>
           </a:xfrm>
           <a:prstGeom prst="ellipse">
             <a:avLst/>
@@ -22961,8 +22853,8 @@
         </p:nvCxnSpPr>
         <p:spPr>
           <a:xfrm flipH="1" flipV="1">
-            <a:off x="8985960" y="4303800"/>
-            <a:ext cx="416520" cy="457560"/>
+            <a:off x="8985600" y="4303800"/>
+            <a:ext cx="416880" cy="457560"/>
           </a:xfrm>
           <a:prstGeom prst="straightConnector1">
             <a:avLst/>
@@ -23014,7 +22906,7 @@
         <p:spPr>
           <a:xfrm flipH="1">
             <a:off x="0" y="3073320"/>
-            <a:ext cx="1838520" cy="9720"/>
+            <a:ext cx="1838880" cy="10080"/>
           </a:xfrm>
           <a:prstGeom prst="straightConnector1">
             <a:avLst/>
@@ -23037,7 +22929,7 @@
         <p:spPr>
           <a:xfrm>
             <a:off x="0" y="2489400"/>
-            <a:ext cx="1838520" cy="9720"/>
+            <a:ext cx="1838880" cy="10080"/>
           </a:xfrm>
           <a:prstGeom prst="straightConnector1">
             <a:avLst/>
@@ -23060,7 +22952,7 @@
         <p:spPr>
           <a:xfrm>
             <a:off x="0" y="2781360"/>
-            <a:ext cx="1838520" cy="9720"/>
+            <a:ext cx="1838880" cy="10080"/>
           </a:xfrm>
           <a:prstGeom prst="straightConnector1">
             <a:avLst/>
@@ -23083,7 +22975,7 @@
         <p:spPr>
           <a:xfrm flipH="1">
             <a:off x="0" y="3657600"/>
-            <a:ext cx="1838520" cy="9720"/>
+            <a:ext cx="1838880" cy="10080"/>
           </a:xfrm>
           <a:prstGeom prst="straightConnector1">
             <a:avLst/>
@@ -23105,7 +22997,7 @@
         <p:spPr>
           <a:xfrm>
             <a:off x="128520" y="6134040"/>
-            <a:ext cx="1562040" cy="378000"/>
+            <a:ext cx="1561680" cy="377640"/>
           </a:xfrm>
           <a:prstGeom prst="diamond">
             <a:avLst/>
@@ -23170,7 +23062,7 @@
         <p:spPr>
           <a:xfrm>
             <a:off x="302760" y="5454000"/>
-            <a:ext cx="1213560" cy="378000"/>
+            <a:ext cx="1213200" cy="377640"/>
           </a:xfrm>
           <a:prstGeom prst="ellipse">
             <a:avLst/>
@@ -23233,9 +23125,9 @@
         <p:grpSpPr>
           <a:xfrm>
             <a:off x="101160" y="336240"/>
-            <a:ext cx="1616760" cy="777960"/>
+            <a:ext cx="1616400" cy="777960"/>
             <a:chOff x="101160" y="336240"/>
-            <a:chExt cx="1616760" cy="777960"/>
+            <a:chExt cx="1616400" cy="777960"/>
           </a:xfrm>
         </p:grpSpPr>
         <p:sp>
@@ -23247,7 +23139,7 @@
           <p:spPr>
             <a:xfrm>
               <a:off x="101160" y="336240"/>
-              <a:ext cx="1616760" cy="303120"/>
+              <a:ext cx="1616400" cy="303120"/>
             </a:xfrm>
             <a:prstGeom prst="rect">
               <a:avLst/>
@@ -23304,7 +23196,7 @@
           <p:spPr>
             <a:xfrm>
               <a:off x="101160" y="597600"/>
-              <a:ext cx="1616760" cy="516600"/>
+              <a:ext cx="1616400" cy="516600"/>
             </a:xfrm>
             <a:prstGeom prst="rect">
               <a:avLst/>
@@ -23395,7 +23287,7 @@
         <p:spPr>
           <a:xfrm>
             <a:off x="128520" y="4629600"/>
-            <a:ext cx="1562040" cy="522720"/>
+            <a:ext cx="1561680" cy="522360"/>
           </a:xfrm>
           <a:prstGeom prst="diamond">
             <a:avLst/>
@@ -23483,7 +23375,7 @@
         <p:spPr>
           <a:xfrm>
             <a:off x="0" y="3365640"/>
-            <a:ext cx="1838520" cy="9720"/>
+            <a:ext cx="1838880" cy="10080"/>
           </a:xfrm>
           <a:prstGeom prst="straightConnector1">
             <a:avLst/>
@@ -23505,7 +23397,7 @@
         <p:spPr>
           <a:xfrm>
             <a:off x="673200" y="3949920"/>
-            <a:ext cx="473040" cy="378000"/>
+            <a:ext cx="472680" cy="377640"/>
           </a:xfrm>
           <a:prstGeom prst="triangle">
             <a:avLst>
@@ -23572,9 +23464,9 @@
         <p:grpSpPr>
           <a:xfrm>
             <a:off x="101160" y="1413000"/>
-            <a:ext cx="1616760" cy="777960"/>
+            <a:ext cx="1616400" cy="777960"/>
             <a:chOff x="101160" y="1413000"/>
-            <a:chExt cx="1616760" cy="777960"/>
+            <a:chExt cx="1616400" cy="777960"/>
           </a:xfrm>
         </p:grpSpPr>
         <p:sp>
@@ -23586,7 +23478,7 @@
           <p:spPr>
             <a:xfrm>
               <a:off x="101160" y="1413000"/>
-              <a:ext cx="1616760" cy="303120"/>
+              <a:ext cx="1616400" cy="303120"/>
             </a:xfrm>
             <a:prstGeom prst="rect">
               <a:avLst/>
@@ -23644,7 +23536,7 @@
           <p:spPr>
             <a:xfrm>
               <a:off x="101160" y="1674360"/>
-              <a:ext cx="1616760" cy="516600"/>
+              <a:ext cx="1616400" cy="516600"/>
             </a:xfrm>
             <a:prstGeom prst="rect">
               <a:avLst/>
@@ -23736,9 +23628,9 @@
         <p:grpSpPr>
           <a:xfrm>
             <a:off x="3886200" y="2286000"/>
-            <a:ext cx="1616760" cy="1631880"/>
+            <a:ext cx="1616400" cy="1631880"/>
             <a:chOff x="3886200" y="2286000"/>
-            <a:chExt cx="1616760" cy="1631880"/>
+            <a:chExt cx="1616400" cy="1631880"/>
           </a:xfrm>
         </p:grpSpPr>
         <p:sp>
@@ -23750,7 +23642,7 @@
           <p:spPr>
             <a:xfrm>
               <a:off x="3886200" y="2286000"/>
-              <a:ext cx="1616760" cy="303120"/>
+              <a:ext cx="1616400" cy="303120"/>
             </a:xfrm>
             <a:prstGeom prst="rect">
               <a:avLst/>
@@ -23807,7 +23699,7 @@
           <p:spPr>
             <a:xfrm>
               <a:off x="3886200" y="2547360"/>
-              <a:ext cx="1616760" cy="1370520"/>
+              <a:ext cx="1616400" cy="1370520"/>
             </a:xfrm>
             <a:prstGeom prst="rect">
               <a:avLst/>
@@ -24006,7 +23898,7 @@
         <p:spPr>
           <a:xfrm>
             <a:off x="6400800" y="228600"/>
-            <a:ext cx="1616760" cy="303120"/>
+            <a:ext cx="1616400" cy="303120"/>
           </a:xfrm>
           <a:prstGeom prst="rect">
             <a:avLst/>
@@ -24063,7 +23955,7 @@
         <p:spPr>
           <a:xfrm>
             <a:off x="4381200" y="914400"/>
-            <a:ext cx="2019240" cy="378000"/>
+            <a:ext cx="2018880" cy="377640"/>
           </a:xfrm>
           <a:prstGeom prst="diamond">
             <a:avLst/>
@@ -24130,8 +24022,8 @@
         </p:nvCxnSpPr>
         <p:spPr>
           <a:xfrm flipV="1">
-            <a:off x="4694400" y="1292400"/>
-            <a:ext cx="696960" cy="993960"/>
+            <a:off x="4694400" y="1292040"/>
+            <a:ext cx="696600" cy="994320"/>
           </a:xfrm>
           <a:prstGeom prst="straightConnector1">
             <a:avLst/>
@@ -24156,8 +24048,8 @@
         </p:nvCxnSpPr>
         <p:spPr>
           <a:xfrm flipV="1">
-            <a:off x="5391000" y="380160"/>
-            <a:ext cx="1010160" cy="534600"/>
+            <a:off x="5390640" y="380160"/>
+            <a:ext cx="1010520" cy="534600"/>
           </a:xfrm>
           <a:prstGeom prst="straightConnector1">
             <a:avLst/>

</xml_diff>

<commit_message>
cleanup, started working on timers
</commit_message>
<xml_diff>
--- a/documentation/database/ER-Diagram.pptx
+++ b/documentation/database/ER-Diagram.pptx
@@ -353,7 +353,7 @@
             <a:pPr indent="0" algn="r">
               <a:buNone/>
             </a:pPr>
-            <a:fld id="{FF7CA890-636A-4F7E-BA34-727266588E69}" type="slidenum">
+            <a:fld id="{16E4B747-F86C-4F0D-83F2-02D73ED36081}" type="slidenum">
               <a:rPr b="0" lang="en-US" sz="1400" spc="-1" strike="noStrike">
                 <a:solidFill>
                   <a:srgbClr val="000000"/>
@@ -396,7 +396,7 @@
       </p:grpSpPr>
       <p:sp>
         <p:nvSpPr>
-          <p:cNvPr id="350" name="PlaceHolder 1"/>
+          <p:cNvPr id="354" name="PlaceHolder 1"/>
           <p:cNvSpPr>
             <a:spLocks noGrp="1"/>
           </p:cNvSpPr>
@@ -407,7 +407,7 @@
         <p:spPr>
           <a:xfrm>
             <a:off x="685800" y="1143000"/>
-            <a:ext cx="5475960" cy="3075840"/>
+            <a:ext cx="5475600" cy="3075480"/>
           </a:xfrm>
           <a:prstGeom prst="rect">
             <a:avLst/>
@@ -419,7 +419,7 @@
       </p:sp>
       <p:sp>
         <p:nvSpPr>
-          <p:cNvPr id="351" name="PlaceHolder 2"/>
+          <p:cNvPr id="355" name="PlaceHolder 2"/>
           <p:cNvSpPr>
             <a:spLocks noGrp="1"/>
           </p:cNvSpPr>
@@ -430,7 +430,7 @@
         <p:spPr>
           <a:xfrm>
             <a:off x="685800" y="4400640"/>
-            <a:ext cx="5475960" cy="3589920"/>
+            <a:ext cx="5475600" cy="3589560"/>
           </a:xfrm>
           <a:prstGeom prst="rect">
             <a:avLst/>
@@ -459,7 +459,7 @@
       </p:sp>
       <p:sp>
         <p:nvSpPr>
-          <p:cNvPr id="352" name="PlaceHolder 3"/>
+          <p:cNvPr id="356" name="PlaceHolder 3"/>
           <p:cNvSpPr>
             <a:spLocks noGrp="1"/>
           </p:cNvSpPr>
@@ -470,7 +470,7 @@
         <p:spPr>
           <a:xfrm>
             <a:off x="3884760" y="8685360"/>
-            <a:ext cx="2961360" cy="448200"/>
+            <a:ext cx="2961000" cy="447840"/>
           </a:xfrm>
           <a:prstGeom prst="rect">
             <a:avLst/>
@@ -512,7 +512,7 @@
                 <a:tab algn="l" pos="0"/>
               </a:tabLst>
             </a:pPr>
-            <a:fld id="{7DA8D29B-ACEE-4ADC-A42B-595D97BEFED4}" type="slidenum">
+            <a:fld id="{980B200D-208E-4626-BB25-C39398B6D96E}" type="slidenum">
               <a:rPr b="0" lang="en-US" sz="1200" spc="-1" strike="noStrike">
                 <a:solidFill>
                   <a:schemeClr val="dk1"/>
@@ -555,7 +555,7 @@
       </p:grpSpPr>
       <p:sp>
         <p:nvSpPr>
-          <p:cNvPr id="353" name="PlaceHolder 1"/>
+          <p:cNvPr id="357" name="PlaceHolder 1"/>
           <p:cNvSpPr>
             <a:spLocks noGrp="1"/>
           </p:cNvSpPr>
@@ -566,7 +566,7 @@
         <p:spPr>
           <a:xfrm>
             <a:off x="685800" y="1143000"/>
-            <a:ext cx="5475960" cy="3075840"/>
+            <a:ext cx="5475600" cy="3075480"/>
           </a:xfrm>
           <a:prstGeom prst="rect">
             <a:avLst/>
@@ -578,7 +578,7 @@
       </p:sp>
       <p:sp>
         <p:nvSpPr>
-          <p:cNvPr id="354" name="PlaceHolder 2"/>
+          <p:cNvPr id="358" name="PlaceHolder 2"/>
           <p:cNvSpPr>
             <a:spLocks noGrp="1"/>
           </p:cNvSpPr>
@@ -589,7 +589,7 @@
         <p:spPr>
           <a:xfrm>
             <a:off x="685800" y="4400640"/>
-            <a:ext cx="5475960" cy="3589920"/>
+            <a:ext cx="5475600" cy="3589560"/>
           </a:xfrm>
           <a:prstGeom prst="rect">
             <a:avLst/>
@@ -618,7 +618,7 @@
       </p:sp>
       <p:sp>
         <p:nvSpPr>
-          <p:cNvPr id="355" name="PlaceHolder 3"/>
+          <p:cNvPr id="359" name="PlaceHolder 3"/>
           <p:cNvSpPr>
             <a:spLocks noGrp="1"/>
           </p:cNvSpPr>
@@ -629,7 +629,7 @@
         <p:spPr>
           <a:xfrm>
             <a:off x="3884760" y="8685360"/>
-            <a:ext cx="2961360" cy="448200"/>
+            <a:ext cx="2961000" cy="447840"/>
           </a:xfrm>
           <a:prstGeom prst="rect">
             <a:avLst/>
@@ -671,7 +671,7 @@
                 <a:tab algn="l" pos="0"/>
               </a:tabLst>
             </a:pPr>
-            <a:fld id="{53C78D05-1D97-4B04-A670-892BCCD8A71F}" type="slidenum">
+            <a:fld id="{8186ECBC-4976-4B74-8D09-29E7A27AA758}" type="slidenum">
               <a:rPr b="0" lang="en-US" sz="1200" spc="-1" strike="noStrike">
                 <a:solidFill>
                   <a:schemeClr val="dk1"/>
@@ -714,7 +714,7 @@
       </p:grpSpPr>
       <p:sp>
         <p:nvSpPr>
-          <p:cNvPr id="356" name="PlaceHolder 1"/>
+          <p:cNvPr id="360" name="PlaceHolder 1"/>
           <p:cNvSpPr>
             <a:spLocks noGrp="1"/>
           </p:cNvSpPr>
@@ -725,7 +725,7 @@
         <p:spPr>
           <a:xfrm>
             <a:off x="685800" y="1143000"/>
-            <a:ext cx="5475960" cy="3075840"/>
+            <a:ext cx="5475600" cy="3075480"/>
           </a:xfrm>
           <a:prstGeom prst="rect">
             <a:avLst/>
@@ -737,7 +737,7 @@
       </p:sp>
       <p:sp>
         <p:nvSpPr>
-          <p:cNvPr id="357" name="PlaceHolder 2"/>
+          <p:cNvPr id="361" name="PlaceHolder 2"/>
           <p:cNvSpPr>
             <a:spLocks noGrp="1"/>
           </p:cNvSpPr>
@@ -748,7 +748,7 @@
         <p:spPr>
           <a:xfrm>
             <a:off x="685800" y="4400640"/>
-            <a:ext cx="5475960" cy="3589920"/>
+            <a:ext cx="5475600" cy="3589560"/>
           </a:xfrm>
           <a:prstGeom prst="rect">
             <a:avLst/>
@@ -777,7 +777,7 @@
       </p:sp>
       <p:sp>
         <p:nvSpPr>
-          <p:cNvPr id="358" name="PlaceHolder 3"/>
+          <p:cNvPr id="362" name="PlaceHolder 3"/>
           <p:cNvSpPr>
             <a:spLocks noGrp="1"/>
           </p:cNvSpPr>
@@ -788,7 +788,7 @@
         <p:spPr>
           <a:xfrm>
             <a:off x="3884760" y="8685360"/>
-            <a:ext cx="2961360" cy="448200"/>
+            <a:ext cx="2961000" cy="447840"/>
           </a:xfrm>
           <a:prstGeom prst="rect">
             <a:avLst/>
@@ -830,7 +830,7 @@
                 <a:tab algn="l" pos="0"/>
               </a:tabLst>
             </a:pPr>
-            <a:fld id="{0A209D97-79DE-41DA-9999-585F65D5E4A9}" type="slidenum">
+            <a:fld id="{D600BE49-D69B-4FBE-8F99-74CEAB1C518B}" type="slidenum">
               <a:rPr b="0" lang="en-US" sz="1200" spc="-1" strike="noStrike">
                 <a:solidFill>
                   <a:schemeClr val="dk1"/>
@@ -873,7 +873,7 @@
       </p:grpSpPr>
       <p:sp>
         <p:nvSpPr>
-          <p:cNvPr id="359" name="PlaceHolder 1"/>
+          <p:cNvPr id="363" name="PlaceHolder 1"/>
           <p:cNvSpPr>
             <a:spLocks noGrp="1"/>
           </p:cNvSpPr>
@@ -884,7 +884,7 @@
         <p:spPr>
           <a:xfrm>
             <a:off x="685800" y="1143000"/>
-            <a:ext cx="5475960" cy="3075840"/>
+            <a:ext cx="5475600" cy="3075480"/>
           </a:xfrm>
           <a:prstGeom prst="rect">
             <a:avLst/>
@@ -896,7 +896,7 @@
       </p:sp>
       <p:sp>
         <p:nvSpPr>
-          <p:cNvPr id="360" name="PlaceHolder 2"/>
+          <p:cNvPr id="364" name="PlaceHolder 2"/>
           <p:cNvSpPr>
             <a:spLocks noGrp="1"/>
           </p:cNvSpPr>
@@ -907,7 +907,7 @@
         <p:spPr>
           <a:xfrm>
             <a:off x="685800" y="4400640"/>
-            <a:ext cx="5475960" cy="3589920"/>
+            <a:ext cx="5475600" cy="3589560"/>
           </a:xfrm>
           <a:prstGeom prst="rect">
             <a:avLst/>
@@ -936,7 +936,7 @@
       </p:sp>
       <p:sp>
         <p:nvSpPr>
-          <p:cNvPr id="361" name="PlaceHolder 3"/>
+          <p:cNvPr id="365" name="PlaceHolder 3"/>
           <p:cNvSpPr>
             <a:spLocks noGrp="1"/>
           </p:cNvSpPr>
@@ -947,7 +947,7 @@
         <p:spPr>
           <a:xfrm>
             <a:off x="3884760" y="8685360"/>
-            <a:ext cx="2961360" cy="448200"/>
+            <a:ext cx="2961000" cy="447840"/>
           </a:xfrm>
           <a:prstGeom prst="rect">
             <a:avLst/>
@@ -989,7 +989,7 @@
                 <a:tab algn="l" pos="0"/>
               </a:tabLst>
             </a:pPr>
-            <a:fld id="{02E6E630-2167-486F-8E44-1D204B022F1E}" type="slidenum">
+            <a:fld id="{2835B3DE-4551-46EE-B0B8-EC244C278139}" type="slidenum">
               <a:rPr b="0" lang="en-US" sz="1200" spc="-1" strike="noStrike">
                 <a:solidFill>
                   <a:schemeClr val="dk1"/>
@@ -1233,7 +1233,7 @@
         <p:txBody>
           <a:bodyPr/>
           <a:p>
-            <a:fld id="{A27C269E-2959-46CC-A77C-B7EC97D33C69}" type="slidenum">
+            <a:fld id="{18A009CC-3B30-428C-BCAB-F33D04FB8526}" type="slidenum">
               <a:t>&lt;#&gt;</a:t>
             </a:fld>
           </a:p>
@@ -1442,7 +1442,7 @@
         <p:txBody>
           <a:bodyPr/>
           <a:p>
-            <a:fld id="{68D838E9-52A5-4E4B-B395-FDCE7BEB001C}" type="slidenum">
+            <a:fld id="{99B0EAB9-09E4-426E-87E1-78179D445DA3}" type="slidenum">
               <a:t>&lt;#&gt;</a:t>
             </a:fld>
           </a:p>
@@ -1565,7 +1565,7 @@
         <p:txBody>
           <a:bodyPr/>
           <a:p>
-            <a:fld id="{0BE0CA67-36AF-43CD-94FC-2C4381E55476}" type="slidenum">
+            <a:fld id="{FB5F5201-4675-4755-A892-757BB00DCB4B}" type="slidenum">
               <a:t>&lt;#&gt;</a:t>
             </a:fld>
           </a:p>
@@ -1648,7 +1648,7 @@
         <p:txBody>
           <a:bodyPr/>
           <a:p>
-            <a:fld id="{9654D05D-9D44-4612-8EC6-A0CE7D0150AD}" type="slidenum">
+            <a:fld id="{6D1730F1-7CC8-4597-A81F-20DE23F89857}" type="slidenum">
               <a:t>&lt;#&gt;</a:t>
             </a:fld>
           </a:p>
@@ -1900,7 +1900,7 @@
         <p:txBody>
           <a:bodyPr/>
           <a:p>
-            <a:fld id="{2CC3D294-E167-4D98-BDC7-FA5C5D3FDB8E}" type="slidenum">
+            <a:fld id="{236BBEAF-752B-4C45-8599-5AFA39501A0A}" type="slidenum">
               <a:t>&lt;#&gt;</a:t>
             </a:fld>
           </a:p>
@@ -2152,7 +2152,7 @@
         <p:txBody>
           <a:bodyPr/>
           <a:p>
-            <a:fld id="{6314F2EB-C24C-44E7-AE97-2896CCEAC308}" type="slidenum">
+            <a:fld id="{FC25DC71-E749-445E-87CA-98FAC38CBB49}" type="slidenum">
               <a:t>&lt;#&gt;</a:t>
             </a:fld>
           </a:p>
@@ -2361,7 +2361,7 @@
         <p:txBody>
           <a:bodyPr/>
           <a:p>
-            <a:fld id="{FE61842B-F382-4F86-83DE-4E565D1CB24F}" type="slidenum">
+            <a:fld id="{216AF266-BB64-47D0-B380-05BA66C3A318}" type="slidenum">
               <a:t>&lt;#&gt;</a:t>
             </a:fld>
           </a:p>
@@ -2656,7 +2656,7 @@
         <p:txBody>
           <a:bodyPr/>
           <a:p>
-            <a:fld id="{21EB0178-013C-4926-AEE5-133BB06CCF72}" type="slidenum">
+            <a:fld id="{1AF4685A-ED2F-4FC7-9DA7-AE416D5F203C}" type="slidenum">
               <a:t>&lt;#&gt;</a:t>
             </a:fld>
           </a:p>
@@ -2739,7 +2739,7 @@
         <p:txBody>
           <a:bodyPr/>
           <a:p>
-            <a:fld id="{2B19C156-8793-4158-AAED-08844F0B7C99}" type="slidenum">
+            <a:fld id="{2A022F35-790F-4AD7-9AB9-C81E7E070A1A}" type="slidenum">
               <a:t>&lt;#&gt;</a:t>
             </a:fld>
           </a:p>
@@ -2822,7 +2822,7 @@
         <p:txBody>
           <a:bodyPr/>
           <a:p>
-            <a:fld id="{BE13C52C-E8F2-4D00-97C3-A05912836173}" type="slidenum">
+            <a:fld id="{05F1F192-47F0-4D7F-9D59-14E7A251C2BD}" type="slidenum">
               <a:t>&lt;#&gt;</a:t>
             </a:fld>
           </a:p>
@@ -2988,7 +2988,7 @@
         <p:txBody>
           <a:bodyPr/>
           <a:p>
-            <a:fld id="{0D295F62-9E8D-48DD-8765-85FBAA8627A3}" type="slidenum">
+            <a:fld id="{79211384-0DF0-4F4E-8397-908F90A0521F}" type="slidenum">
               <a:t>&lt;#&gt;</a:t>
             </a:fld>
           </a:p>
@@ -3154,7 +3154,7 @@
         <p:txBody>
           <a:bodyPr/>
           <a:p>
-            <a:fld id="{B0D06E59-6F7B-4BCD-8F40-72545051ED14}" type="slidenum">
+            <a:fld id="{25A76693-7F3A-46F5-ACF9-4924F3A01E4F}" type="slidenum">
               <a:t>&lt;#&gt;</a:t>
             </a:fld>
           </a:p>
@@ -3219,9 +3219,9 @@
         <p:grpSpPr>
           <a:xfrm>
             <a:off x="6199200" y="6162840"/>
-            <a:ext cx="5982480" cy="684720"/>
+            <a:ext cx="5982120" cy="684360"/>
             <a:chOff x="6199200" y="6162840"/>
-            <a:chExt cx="5982480" cy="684720"/>
+            <a:chExt cx="5982120" cy="684360"/>
           </a:xfrm>
         </p:grpSpPr>
         <p:pic>
@@ -3237,7 +3237,7 @@
           <p:spPr>
             <a:xfrm>
               <a:off x="6199200" y="6162840"/>
-              <a:ext cx="4046040" cy="684720"/>
+              <a:ext cx="4045680" cy="684360"/>
             </a:xfrm>
             <a:prstGeom prst="rect">
               <a:avLst/>
@@ -3260,7 +3260,7 @@
           <p:spPr>
             <a:xfrm>
               <a:off x="10270080" y="6162840"/>
-              <a:ext cx="1911600" cy="601200"/>
+              <a:ext cx="1911240" cy="600840"/>
             </a:xfrm>
             <a:prstGeom prst="rect">
               <a:avLst/>
@@ -3309,7 +3309,7 @@
                 </a:solidFill>
                 <a:latin typeface="Arial"/>
               </a:rPr>
-              <a:t>Click to edit </a:t>
+              <a:t>Click </a:t>
             </a:r>
             <a:r>
               <a:rPr b="0" lang="en-US" sz="1800" spc="-1" strike="noStrike">
@@ -3318,7 +3318,7 @@
                 </a:solidFill>
                 <a:latin typeface="Arial"/>
               </a:rPr>
-              <a:t>the title text </a:t>
+              <a:t>to </a:t>
             </a:r>
             <a:r>
               <a:rPr b="0" lang="en-US" sz="1800" spc="-1" strike="noStrike">
@@ -3327,7 +3327,52 @@
                 </a:solidFill>
                 <a:latin typeface="Arial"/>
               </a:rPr>
-              <a:t>format</a:t>
+              <a:t>edit </a:t>
+            </a:r>
+            <a:r>
+              <a:rPr b="0" lang="en-US" sz="1800" spc="-1" strike="noStrike">
+                <a:solidFill>
+                  <a:srgbClr val="000000"/>
+                </a:solidFill>
+                <a:latin typeface="Arial"/>
+              </a:rPr>
+              <a:t>the </a:t>
+            </a:r>
+            <a:r>
+              <a:rPr b="0" lang="en-US" sz="1800" spc="-1" strike="noStrike">
+                <a:solidFill>
+                  <a:srgbClr val="000000"/>
+                </a:solidFill>
+                <a:latin typeface="Arial"/>
+              </a:rPr>
+              <a:t>title </a:t>
+            </a:r>
+            <a:r>
+              <a:rPr b="0" lang="en-US" sz="1800" spc="-1" strike="noStrike">
+                <a:solidFill>
+                  <a:srgbClr val="000000"/>
+                </a:solidFill>
+                <a:latin typeface="Arial"/>
+              </a:rPr>
+              <a:t>text </a:t>
+            </a:r>
+            <a:r>
+              <a:rPr b="0" lang="en-US" sz="1800" spc="-1" strike="noStrike">
+                <a:solidFill>
+                  <a:srgbClr val="000000"/>
+                </a:solidFill>
+                <a:latin typeface="Arial"/>
+              </a:rPr>
+              <a:t>forma</a:t>
+            </a:r>
+            <a:r>
+              <a:rPr b="0" lang="en-US" sz="1800" spc="-1" strike="noStrike">
+                <a:solidFill>
+                  <a:srgbClr val="000000"/>
+                </a:solidFill>
+                <a:latin typeface="Arial"/>
+              </a:rPr>
+              <a:t>t</a:t>
             </a:r>
             <a:endParaRPr b="0" lang="en-US" sz="1800" spc="-1" strike="noStrike">
               <a:solidFill>
@@ -4026,7 +4071,7 @@
         <p:spPr>
           <a:xfrm>
             <a:off x="4038480" y="6356520"/>
-            <a:ext cx="4104360" cy="354600"/>
+            <a:ext cx="4104000" cy="354240"/>
           </a:xfrm>
           <a:prstGeom prst="rect">
             <a:avLst/>
@@ -4098,7 +4143,7 @@
         <p:spPr>
           <a:xfrm>
             <a:off x="8610480" y="6356520"/>
-            <a:ext cx="2732760" cy="354600"/>
+            <a:ext cx="2732400" cy="354240"/>
           </a:xfrm>
           <a:prstGeom prst="rect">
             <a:avLst/>
@@ -4141,7 +4186,7 @@
                 <a:tab algn="l" pos="0"/>
               </a:tabLst>
             </a:pPr>
-            <a:fld id="{0567310F-D138-4786-8F34-A6E40405B801}" type="slidenum">
+            <a:fld id="{BA4AFB97-B380-4866-8213-1D6EE1E1C07B}" type="slidenum">
               <a:rPr b="0" lang="en-US" sz="1200" spc="-1" strike="noStrike">
                 <a:solidFill>
                   <a:schemeClr val="dk1">
@@ -4174,7 +4219,7 @@
         <p:spPr>
           <a:xfrm>
             <a:off x="838080" y="6356520"/>
-            <a:ext cx="2732760" cy="354600"/>
+            <a:ext cx="2732400" cy="354240"/>
           </a:xfrm>
           <a:prstGeom prst="rect">
             <a:avLst/>
@@ -4263,9 +4308,9 @@
         <p:grpSpPr>
           <a:xfrm>
             <a:off x="6199200" y="6162840"/>
-            <a:ext cx="5982480" cy="684720"/>
+            <a:ext cx="5982120" cy="684360"/>
             <a:chOff x="6199200" y="6162840"/>
-            <a:chExt cx="5982480" cy="684720"/>
+            <a:chExt cx="5982120" cy="684360"/>
           </a:xfrm>
         </p:grpSpPr>
         <p:pic>
@@ -4281,7 +4326,7 @@
           <p:spPr>
             <a:xfrm>
               <a:off x="6199200" y="6162840"/>
-              <a:ext cx="4046040" cy="684720"/>
+              <a:ext cx="4045680" cy="684360"/>
             </a:xfrm>
             <a:prstGeom prst="rect">
               <a:avLst/>
@@ -4304,7 +4349,7 @@
           <p:spPr>
             <a:xfrm>
               <a:off x="10270080" y="6162840"/>
-              <a:ext cx="1911600" cy="601200"/>
+              <a:ext cx="1911240" cy="600840"/>
             </a:xfrm>
             <a:prstGeom prst="rect">
               <a:avLst/>
@@ -4827,7 +4872,7 @@
         <p:spPr>
           <a:xfrm>
             <a:off x="4038480" y="6356520"/>
-            <a:ext cx="4104360" cy="354600"/>
+            <a:ext cx="4104000" cy="354240"/>
           </a:xfrm>
           <a:prstGeom prst="rect">
             <a:avLst/>
@@ -4899,7 +4944,7 @@
         <p:spPr>
           <a:xfrm>
             <a:off x="8610480" y="6356520"/>
-            <a:ext cx="2732760" cy="354600"/>
+            <a:ext cx="2732400" cy="354240"/>
           </a:xfrm>
           <a:prstGeom prst="rect">
             <a:avLst/>
@@ -4942,7 +4987,7 @@
                 <a:tab algn="l" pos="0"/>
               </a:tabLst>
             </a:pPr>
-            <a:fld id="{78CC2B38-E6D5-4636-89AA-7D09838F530C}" type="slidenum">
+            <a:fld id="{0F54D2A4-CEA1-42F6-800B-673F31FA7E33}" type="slidenum">
               <a:rPr b="0" lang="en-US" sz="1200" spc="-1" strike="noStrike">
                 <a:solidFill>
                   <a:schemeClr val="dk1">
@@ -4975,7 +5020,7 @@
         <p:spPr>
           <a:xfrm>
             <a:off x="838080" y="6356520"/>
-            <a:ext cx="2732760" cy="354600"/>
+            <a:ext cx="2732400" cy="354240"/>
           </a:xfrm>
           <a:prstGeom prst="rect">
             <a:avLst/>
@@ -5064,9 +5109,9 @@
         <p:grpSpPr>
           <a:xfrm>
             <a:off x="6199200" y="6162840"/>
-            <a:ext cx="5982480" cy="684720"/>
+            <a:ext cx="5982120" cy="684360"/>
             <a:chOff x="6199200" y="6162840"/>
-            <a:chExt cx="5982480" cy="684720"/>
+            <a:chExt cx="5982120" cy="684360"/>
           </a:xfrm>
         </p:grpSpPr>
         <p:pic>
@@ -5082,7 +5127,7 @@
           <p:spPr>
             <a:xfrm>
               <a:off x="6199200" y="6162840"/>
-              <a:ext cx="4046040" cy="684720"/>
+              <a:ext cx="4045680" cy="684360"/>
             </a:xfrm>
             <a:prstGeom prst="rect">
               <a:avLst/>
@@ -5105,7 +5150,7 @@
           <p:spPr>
             <a:xfrm>
               <a:off x="10270080" y="6162840"/>
-              <a:ext cx="1911600" cy="601200"/>
+              <a:ext cx="1911240" cy="600840"/>
             </a:xfrm>
             <a:prstGeom prst="rect">
               <a:avLst/>
@@ -5178,7 +5223,7 @@
         <p:spPr>
           <a:xfrm>
             <a:off x="4038480" y="6356520"/>
-            <a:ext cx="4104360" cy="354600"/>
+            <a:ext cx="4104000" cy="354240"/>
           </a:xfrm>
           <a:prstGeom prst="rect">
             <a:avLst/>
@@ -5250,7 +5295,7 @@
         <p:spPr>
           <a:xfrm>
             <a:off x="8610480" y="6356520"/>
-            <a:ext cx="2732760" cy="354600"/>
+            <a:ext cx="2732400" cy="354240"/>
           </a:xfrm>
           <a:prstGeom prst="rect">
             <a:avLst/>
@@ -5293,7 +5338,7 @@
                 <a:tab algn="l" pos="0"/>
               </a:tabLst>
             </a:pPr>
-            <a:fld id="{F92DB136-C82A-43B8-B98B-9C11C750B2A7}" type="slidenum">
+            <a:fld id="{2158C1F1-77BA-4DD7-84D3-463F97C5C114}" type="slidenum">
               <a:rPr b="0" lang="en-US" sz="1200" spc="-1" strike="noStrike">
                 <a:solidFill>
                   <a:schemeClr val="dk1">
@@ -5326,7 +5371,7 @@
         <p:spPr>
           <a:xfrm>
             <a:off x="838080" y="6356520"/>
-            <a:ext cx="2732760" cy="354600"/>
+            <a:ext cx="2732400" cy="354240"/>
           </a:xfrm>
           <a:prstGeom prst="rect">
             <a:avLst/>
@@ -5415,9 +5460,9 @@
         <p:grpSpPr>
           <a:xfrm>
             <a:off x="6199200" y="6162840"/>
-            <a:ext cx="5982480" cy="684720"/>
+            <a:ext cx="5982120" cy="684360"/>
             <a:chOff x="6199200" y="6162840"/>
-            <a:chExt cx="5982480" cy="684720"/>
+            <a:chExt cx="5982120" cy="684360"/>
           </a:xfrm>
         </p:grpSpPr>
         <p:pic>
@@ -5433,7 +5478,7 @@
           <p:spPr>
             <a:xfrm>
               <a:off x="6199200" y="6162840"/>
-              <a:ext cx="4046040" cy="684720"/>
+              <a:ext cx="4045680" cy="684360"/>
             </a:xfrm>
             <a:prstGeom prst="rect">
               <a:avLst/>
@@ -5456,7 +5501,7 @@
           <p:spPr>
             <a:xfrm>
               <a:off x="10270080" y="6162840"/>
-              <a:ext cx="1911600" cy="601200"/>
+              <a:ext cx="1911240" cy="600840"/>
             </a:xfrm>
             <a:prstGeom prst="rect">
               <a:avLst/>
@@ -5480,7 +5525,7 @@
         <p:spPr>
           <a:xfrm>
             <a:off x="4038480" y="6356520"/>
-            <a:ext cx="4104360" cy="354600"/>
+            <a:ext cx="4104000" cy="354240"/>
           </a:xfrm>
           <a:prstGeom prst="rect">
             <a:avLst/>
@@ -5552,7 +5597,7 @@
         <p:spPr>
           <a:xfrm>
             <a:off x="8610480" y="6356520"/>
-            <a:ext cx="2732760" cy="354600"/>
+            <a:ext cx="2732400" cy="354240"/>
           </a:xfrm>
           <a:prstGeom prst="rect">
             <a:avLst/>
@@ -5595,7 +5640,7 @@
                 <a:tab algn="l" pos="0"/>
               </a:tabLst>
             </a:pPr>
-            <a:fld id="{0AFBF4E7-0DC2-443F-A5A3-B53DFD3072D6}" type="slidenum">
+            <a:fld id="{EECD90A9-1DFD-4435-8C19-8EBD382D7608}" type="slidenum">
               <a:rPr b="0" lang="en-US" sz="1200" spc="-1" strike="noStrike">
                 <a:solidFill>
                   <a:schemeClr val="dk1">
@@ -5628,7 +5673,7 @@
         <p:spPr>
           <a:xfrm>
             <a:off x="838080" y="6356520"/>
-            <a:ext cx="2732760" cy="354600"/>
+            <a:ext cx="2732400" cy="354240"/>
           </a:xfrm>
           <a:prstGeom prst="rect">
             <a:avLst/>
@@ -5717,9 +5762,9 @@
         <p:grpSpPr>
           <a:xfrm>
             <a:off x="6199200" y="6162840"/>
-            <a:ext cx="5982480" cy="684720"/>
+            <a:ext cx="5982120" cy="684360"/>
             <a:chOff x="6199200" y="6162840"/>
-            <a:chExt cx="5982480" cy="684720"/>
+            <a:chExt cx="5982120" cy="684360"/>
           </a:xfrm>
         </p:grpSpPr>
         <p:pic>
@@ -5735,7 +5780,7 @@
           <p:spPr>
             <a:xfrm>
               <a:off x="6199200" y="6162840"/>
-              <a:ext cx="4046040" cy="684720"/>
+              <a:ext cx="4045680" cy="684360"/>
             </a:xfrm>
             <a:prstGeom prst="rect">
               <a:avLst/>
@@ -5758,7 +5803,7 @@
           <p:spPr>
             <a:xfrm>
               <a:off x="10270080" y="6162840"/>
-              <a:ext cx="1911600" cy="601200"/>
+              <a:ext cx="1911240" cy="600840"/>
             </a:xfrm>
             <a:prstGeom prst="rect">
               <a:avLst/>
@@ -6524,7 +6569,7 @@
         <p:spPr>
           <a:xfrm>
             <a:off x="4038480" y="6356520"/>
-            <a:ext cx="4104360" cy="354600"/>
+            <a:ext cx="4104000" cy="354240"/>
           </a:xfrm>
           <a:prstGeom prst="rect">
             <a:avLst/>
@@ -6596,7 +6641,7 @@
         <p:spPr>
           <a:xfrm>
             <a:off x="8610480" y="6356520"/>
-            <a:ext cx="2732760" cy="354600"/>
+            <a:ext cx="2732400" cy="354240"/>
           </a:xfrm>
           <a:prstGeom prst="rect">
             <a:avLst/>
@@ -6639,7 +6684,7 @@
                 <a:tab algn="l" pos="0"/>
               </a:tabLst>
             </a:pPr>
-            <a:fld id="{EFACE049-92B6-4704-B8F7-31B590AA929D}" type="slidenum">
+            <a:fld id="{F39959D4-66C7-4726-9FD0-E89A7687E6D6}" type="slidenum">
               <a:rPr b="0" lang="en-US" sz="1200" spc="-1" strike="noStrike">
                 <a:solidFill>
                   <a:schemeClr val="dk1">
@@ -6672,7 +6717,7 @@
         <p:spPr>
           <a:xfrm>
             <a:off x="838080" y="6356520"/>
-            <a:ext cx="2732760" cy="354600"/>
+            <a:ext cx="2732400" cy="354240"/>
           </a:xfrm>
           <a:prstGeom prst="rect">
             <a:avLst/>
@@ -6761,9 +6806,9 @@
         <p:grpSpPr>
           <a:xfrm>
             <a:off x="6199200" y="6162840"/>
-            <a:ext cx="5982480" cy="684720"/>
+            <a:ext cx="5982120" cy="684360"/>
             <a:chOff x="6199200" y="6162840"/>
-            <a:chExt cx="5982480" cy="684720"/>
+            <a:chExt cx="5982120" cy="684360"/>
           </a:xfrm>
         </p:grpSpPr>
         <p:pic>
@@ -6779,7 +6824,7 @@
           <p:spPr>
             <a:xfrm>
               <a:off x="6199200" y="6162840"/>
-              <a:ext cx="4046040" cy="684720"/>
+              <a:ext cx="4045680" cy="684360"/>
             </a:xfrm>
             <a:prstGeom prst="rect">
               <a:avLst/>
@@ -6802,7 +6847,7 @@
           <p:spPr>
             <a:xfrm>
               <a:off x="10270080" y="6162840"/>
-              <a:ext cx="1911600" cy="601200"/>
+              <a:ext cx="1911240" cy="600840"/>
             </a:xfrm>
             <a:prstGeom prst="rect">
               <a:avLst/>
@@ -6851,25 +6896,7 @@
                 </a:solidFill>
                 <a:latin typeface="Arial"/>
               </a:rPr>
-              <a:t>Click to edit </a:t>
-            </a:r>
-            <a:r>
-              <a:rPr b="0" lang="en-US" sz="1800" spc="-1" strike="noStrike">
-                <a:solidFill>
-                  <a:srgbClr val="000000"/>
-                </a:solidFill>
-                <a:latin typeface="Arial"/>
-              </a:rPr>
-              <a:t>the title text </a:t>
-            </a:r>
-            <a:r>
-              <a:rPr b="0" lang="en-US" sz="1800" spc="-1" strike="noStrike">
-                <a:solidFill>
-                  <a:srgbClr val="000000"/>
-                </a:solidFill>
-                <a:latin typeface="Arial"/>
-              </a:rPr>
-              <a:t>format</a:t>
+              <a:t>Click to edit the title text format</a:t>
             </a:r>
             <a:endParaRPr b="0" lang="en-US" sz="1800" spc="-1" strike="noStrike">
               <a:solidFill>
@@ -7568,7 +7595,7 @@
         <p:spPr>
           <a:xfrm>
             <a:off x="4038480" y="6356520"/>
-            <a:ext cx="4104360" cy="354600"/>
+            <a:ext cx="4104000" cy="354240"/>
           </a:xfrm>
           <a:prstGeom prst="rect">
             <a:avLst/>
@@ -7640,7 +7667,7 @@
         <p:spPr>
           <a:xfrm>
             <a:off x="8610480" y="6356520"/>
-            <a:ext cx="2732760" cy="354600"/>
+            <a:ext cx="2732400" cy="354240"/>
           </a:xfrm>
           <a:prstGeom prst="rect">
             <a:avLst/>
@@ -7683,7 +7710,7 @@
                 <a:tab algn="l" pos="0"/>
               </a:tabLst>
             </a:pPr>
-            <a:fld id="{2A481526-6633-4F3B-B559-6A6CD566735C}" type="slidenum">
+            <a:fld id="{C432C8A1-72F8-4410-98D1-966124C882CC}" type="slidenum">
               <a:rPr b="0" lang="en-US" sz="1200" spc="-1" strike="noStrike">
                 <a:solidFill>
                   <a:schemeClr val="dk1">
@@ -7716,7 +7743,7 @@
         <p:spPr>
           <a:xfrm>
             <a:off x="838080" y="6356520"/>
-            <a:ext cx="2732760" cy="354600"/>
+            <a:ext cx="2732400" cy="354240"/>
           </a:xfrm>
           <a:prstGeom prst="rect">
             <a:avLst/>
@@ -7805,9 +7832,9 @@
         <p:grpSpPr>
           <a:xfrm>
             <a:off x="6199200" y="6162840"/>
-            <a:ext cx="5982480" cy="684720"/>
+            <a:ext cx="5982120" cy="684360"/>
             <a:chOff x="6199200" y="6162840"/>
-            <a:chExt cx="5982480" cy="684720"/>
+            <a:chExt cx="5982120" cy="684360"/>
           </a:xfrm>
         </p:grpSpPr>
         <p:pic>
@@ -7823,7 +7850,7 @@
           <p:spPr>
             <a:xfrm>
               <a:off x="6199200" y="6162840"/>
-              <a:ext cx="4046040" cy="684720"/>
+              <a:ext cx="4045680" cy="684360"/>
             </a:xfrm>
             <a:prstGeom prst="rect">
               <a:avLst/>
@@ -7846,7 +7873,7 @@
           <p:spPr>
             <a:xfrm>
               <a:off x="10270080" y="6162840"/>
-              <a:ext cx="1911600" cy="601200"/>
+              <a:ext cx="1911240" cy="600840"/>
             </a:xfrm>
             <a:prstGeom prst="rect">
               <a:avLst/>
@@ -7895,70 +7922,7 @@
                 </a:solidFill>
                 <a:latin typeface="Arial"/>
               </a:rPr>
-              <a:t>Click </a:t>
-            </a:r>
-            <a:r>
-              <a:rPr b="0" lang="en-US" sz="1800" spc="-1" strike="noStrike">
-                <a:solidFill>
-                  <a:srgbClr val="000000"/>
-                </a:solidFill>
-                <a:latin typeface="Arial"/>
-              </a:rPr>
-              <a:t>to </a:t>
-            </a:r>
-            <a:r>
-              <a:rPr b="0" lang="en-US" sz="1800" spc="-1" strike="noStrike">
-                <a:solidFill>
-                  <a:srgbClr val="000000"/>
-                </a:solidFill>
-                <a:latin typeface="Arial"/>
-              </a:rPr>
-              <a:t>edit </a:t>
-            </a:r>
-            <a:r>
-              <a:rPr b="0" lang="en-US" sz="1800" spc="-1" strike="noStrike">
-                <a:solidFill>
-                  <a:srgbClr val="000000"/>
-                </a:solidFill>
-                <a:latin typeface="Arial"/>
-              </a:rPr>
-              <a:t>the </a:t>
-            </a:r>
-            <a:r>
-              <a:rPr b="0" lang="en-US" sz="1800" spc="-1" strike="noStrike">
-                <a:solidFill>
-                  <a:srgbClr val="000000"/>
-                </a:solidFill>
-                <a:latin typeface="Arial"/>
-              </a:rPr>
-              <a:t>title </a:t>
-            </a:r>
-            <a:r>
-              <a:rPr b="0" lang="en-US" sz="1800" spc="-1" strike="noStrike">
-                <a:solidFill>
-                  <a:srgbClr val="000000"/>
-                </a:solidFill>
-                <a:latin typeface="Arial"/>
-              </a:rPr>
-              <a:t>text </a:t>
-            </a:r>
-            <a:r>
-              <a:rPr b="0" lang="en-US" sz="1800" spc="-1" strike="noStrike">
-                <a:solidFill>
-                  <a:srgbClr val="000000"/>
-                </a:solidFill>
-                <a:latin typeface="Arial"/>
-              </a:rPr>
-              <a:t>forma</a:t>
-            </a:r>
-            <a:r>
-              <a:rPr b="0" lang="en-US" sz="1800" spc="-1" strike="noStrike">
-                <a:solidFill>
-                  <a:srgbClr val="000000"/>
-                </a:solidFill>
-                <a:latin typeface="Arial"/>
-              </a:rPr>
-              <a:t>t</a:t>
+              <a:t>Click to edit the title text format</a:t>
             </a:r>
             <a:endParaRPr b="0" lang="en-US" sz="1800" spc="-1" strike="noStrike">
               <a:solidFill>
@@ -8432,7 +8396,7 @@
         <p:spPr>
           <a:xfrm>
             <a:off x="4038480" y="6356520"/>
-            <a:ext cx="4104360" cy="354600"/>
+            <a:ext cx="4104000" cy="354240"/>
           </a:xfrm>
           <a:prstGeom prst="rect">
             <a:avLst/>
@@ -8504,7 +8468,7 @@
         <p:spPr>
           <a:xfrm>
             <a:off x="8610480" y="6356520"/>
-            <a:ext cx="2732760" cy="354600"/>
+            <a:ext cx="2732400" cy="354240"/>
           </a:xfrm>
           <a:prstGeom prst="rect">
             <a:avLst/>
@@ -8547,7 +8511,7 @@
                 <a:tab algn="l" pos="0"/>
               </a:tabLst>
             </a:pPr>
-            <a:fld id="{A18E8BB9-2A1F-4BF2-9B81-94C86D62539D}" type="slidenum">
+            <a:fld id="{EE32D161-3955-4066-98C4-72C2A6D930CA}" type="slidenum">
               <a:rPr b="0" lang="en-US" sz="1200" spc="-1" strike="noStrike">
                 <a:solidFill>
                   <a:schemeClr val="dk1">
@@ -8580,7 +8544,7 @@
         <p:spPr>
           <a:xfrm>
             <a:off x="838080" y="6356520"/>
-            <a:ext cx="2732760" cy="354600"/>
+            <a:ext cx="2732400" cy="354240"/>
           </a:xfrm>
           <a:prstGeom prst="rect">
             <a:avLst/>
@@ -8669,9 +8633,9 @@
         <p:grpSpPr>
           <a:xfrm>
             <a:off x="6199200" y="6162840"/>
-            <a:ext cx="5982480" cy="684720"/>
+            <a:ext cx="5982120" cy="684360"/>
             <a:chOff x="6199200" y="6162840"/>
-            <a:chExt cx="5982480" cy="684720"/>
+            <a:chExt cx="5982120" cy="684360"/>
           </a:xfrm>
         </p:grpSpPr>
         <p:pic>
@@ -8687,7 +8651,7 @@
           <p:spPr>
             <a:xfrm>
               <a:off x="6199200" y="6162840"/>
-              <a:ext cx="4046040" cy="684720"/>
+              <a:ext cx="4045680" cy="684360"/>
             </a:xfrm>
             <a:prstGeom prst="rect">
               <a:avLst/>
@@ -8710,7 +8674,7 @@
           <p:spPr>
             <a:xfrm>
               <a:off x="10270080" y="6162840"/>
-              <a:ext cx="1911600" cy="601200"/>
+              <a:ext cx="1911240" cy="600840"/>
             </a:xfrm>
             <a:prstGeom prst="rect">
               <a:avLst/>
@@ -8759,25 +8723,7 @@
                 </a:solidFill>
                 <a:latin typeface="Arial"/>
               </a:rPr>
-              <a:t>Click to edit </a:t>
-            </a:r>
-            <a:r>
-              <a:rPr b="0" lang="en-US" sz="1800" spc="-1" strike="noStrike">
-                <a:solidFill>
-                  <a:srgbClr val="000000"/>
-                </a:solidFill>
-                <a:latin typeface="Arial"/>
-              </a:rPr>
-              <a:t>the title text </a:t>
-            </a:r>
-            <a:r>
-              <a:rPr b="0" lang="en-US" sz="1800" spc="-1" strike="noStrike">
-                <a:solidFill>
-                  <a:srgbClr val="000000"/>
-                </a:solidFill>
-                <a:latin typeface="Arial"/>
-              </a:rPr>
-              <a:t>format</a:t>
+              <a:t>Click to edit the title text format</a:t>
             </a:r>
             <a:endParaRPr b="0" lang="en-US" sz="1800" spc="-1" strike="noStrike">
               <a:solidFill>
@@ -9701,7 +9647,7 @@
         <p:spPr>
           <a:xfrm>
             <a:off x="4038480" y="6356520"/>
-            <a:ext cx="4104360" cy="354600"/>
+            <a:ext cx="4104000" cy="354240"/>
           </a:xfrm>
           <a:prstGeom prst="rect">
             <a:avLst/>
@@ -9773,7 +9719,7 @@
         <p:spPr>
           <a:xfrm>
             <a:off x="8610480" y="6356520"/>
-            <a:ext cx="2732760" cy="354600"/>
+            <a:ext cx="2732400" cy="354240"/>
           </a:xfrm>
           <a:prstGeom prst="rect">
             <a:avLst/>
@@ -9816,7 +9762,7 @@
                 <a:tab algn="l" pos="0"/>
               </a:tabLst>
             </a:pPr>
-            <a:fld id="{91676C44-868A-4564-A01E-E6B6B2A21E1D}" type="slidenum">
+            <a:fld id="{4E7F9B05-C382-4F1E-94D5-45ADDEADAC8B}" type="slidenum">
               <a:rPr b="0" lang="en-US" sz="1200" spc="-1" strike="noStrike">
                 <a:solidFill>
                   <a:schemeClr val="dk1">
@@ -9849,7 +9795,7 @@
         <p:spPr>
           <a:xfrm>
             <a:off x="838080" y="6356520"/>
-            <a:ext cx="2732760" cy="354600"/>
+            <a:ext cx="2732400" cy="354240"/>
           </a:xfrm>
           <a:prstGeom prst="rect">
             <a:avLst/>
@@ -9938,9 +9884,9 @@
         <p:grpSpPr>
           <a:xfrm>
             <a:off x="6199200" y="6162840"/>
-            <a:ext cx="5982480" cy="684720"/>
+            <a:ext cx="5982120" cy="684360"/>
             <a:chOff x="6199200" y="6162840"/>
-            <a:chExt cx="5982480" cy="684720"/>
+            <a:chExt cx="5982120" cy="684360"/>
           </a:xfrm>
         </p:grpSpPr>
         <p:pic>
@@ -9956,7 +9902,7 @@
           <p:spPr>
             <a:xfrm>
               <a:off x="6199200" y="6162840"/>
-              <a:ext cx="4046040" cy="684720"/>
+              <a:ext cx="4045680" cy="684360"/>
             </a:xfrm>
             <a:prstGeom prst="rect">
               <a:avLst/>
@@ -9979,7 +9925,7 @@
           <p:spPr>
             <a:xfrm>
               <a:off x="10270080" y="6162840"/>
-              <a:ext cx="1911600" cy="601200"/>
+              <a:ext cx="1911240" cy="600840"/>
             </a:xfrm>
             <a:prstGeom prst="rect">
               <a:avLst/>
@@ -10003,7 +9949,7 @@
         <p:spPr>
           <a:xfrm>
             <a:off x="4038480" y="6356520"/>
-            <a:ext cx="4104360" cy="354600"/>
+            <a:ext cx="4104000" cy="354240"/>
           </a:xfrm>
           <a:prstGeom prst="rect">
             <a:avLst/>
@@ -10075,7 +10021,7 @@
         <p:spPr>
           <a:xfrm>
             <a:off x="8610480" y="6356520"/>
-            <a:ext cx="2732760" cy="354600"/>
+            <a:ext cx="2732400" cy="354240"/>
           </a:xfrm>
           <a:prstGeom prst="rect">
             <a:avLst/>
@@ -10118,7 +10064,7 @@
                 <a:tab algn="l" pos="0"/>
               </a:tabLst>
             </a:pPr>
-            <a:fld id="{37D92A6F-F8EF-4BEE-A8A6-D7B5236074D6}" type="slidenum">
+            <a:fld id="{72149754-9730-4470-A2F6-41B7C2D6DC44}" type="slidenum">
               <a:rPr b="0" lang="en-US" sz="1200" spc="-1" strike="noStrike">
                 <a:solidFill>
                   <a:schemeClr val="dk1">
@@ -10151,7 +10097,7 @@
         <p:spPr>
           <a:xfrm>
             <a:off x="838080" y="6356520"/>
-            <a:ext cx="2732760" cy="354600"/>
+            <a:ext cx="2732400" cy="354240"/>
           </a:xfrm>
           <a:prstGeom prst="rect">
             <a:avLst/>
@@ -10240,9 +10186,9 @@
         <p:grpSpPr>
           <a:xfrm>
             <a:off x="6199200" y="6162840"/>
-            <a:ext cx="5982480" cy="684720"/>
+            <a:ext cx="5982120" cy="684360"/>
             <a:chOff x="6199200" y="6162840"/>
-            <a:chExt cx="5982480" cy="684720"/>
+            <a:chExt cx="5982120" cy="684360"/>
           </a:xfrm>
         </p:grpSpPr>
         <p:pic>
@@ -10258,7 +10204,7 @@
           <p:spPr>
             <a:xfrm>
               <a:off x="6199200" y="6162840"/>
-              <a:ext cx="4046040" cy="684720"/>
+              <a:ext cx="4045680" cy="684360"/>
             </a:xfrm>
             <a:prstGeom prst="rect">
               <a:avLst/>
@@ -10281,7 +10227,7 @@
           <p:spPr>
             <a:xfrm>
               <a:off x="10270080" y="6162840"/>
-              <a:ext cx="1911600" cy="601200"/>
+              <a:ext cx="1911240" cy="600840"/>
             </a:xfrm>
             <a:prstGeom prst="rect">
               <a:avLst/>
@@ -10305,7 +10251,7 @@
         <p:spPr>
           <a:xfrm>
             <a:off x="4038480" y="6356520"/>
-            <a:ext cx="4104360" cy="354600"/>
+            <a:ext cx="4104000" cy="354240"/>
           </a:xfrm>
           <a:prstGeom prst="rect">
             <a:avLst/>
@@ -10377,7 +10323,7 @@
         <p:spPr>
           <a:xfrm>
             <a:off x="8610480" y="6356520"/>
-            <a:ext cx="2732760" cy="354600"/>
+            <a:ext cx="2732400" cy="354240"/>
           </a:xfrm>
           <a:prstGeom prst="rect">
             <a:avLst/>
@@ -10420,7 +10366,7 @@
                 <a:tab algn="l" pos="0"/>
               </a:tabLst>
             </a:pPr>
-            <a:fld id="{752321F4-813C-4980-8EE6-29EB120DD85E}" type="slidenum">
+            <a:fld id="{15CBD080-8C1E-4D3B-A050-37E93F262F71}" type="slidenum">
               <a:rPr b="0" lang="en-US" sz="1200" spc="-1" strike="noStrike">
                 <a:solidFill>
                   <a:schemeClr val="dk1">
@@ -10453,7 +10399,7 @@
         <p:spPr>
           <a:xfrm>
             <a:off x="838080" y="6356520"/>
-            <a:ext cx="2732760" cy="354600"/>
+            <a:ext cx="2732400" cy="354240"/>
           </a:xfrm>
           <a:prstGeom prst="rect">
             <a:avLst/>
@@ -10816,9 +10762,9 @@
         <p:grpSpPr>
           <a:xfrm>
             <a:off x="6199200" y="6162840"/>
-            <a:ext cx="5982480" cy="684720"/>
+            <a:ext cx="5982120" cy="684360"/>
             <a:chOff x="6199200" y="6162840"/>
-            <a:chExt cx="5982480" cy="684720"/>
+            <a:chExt cx="5982120" cy="684360"/>
           </a:xfrm>
         </p:grpSpPr>
         <p:pic>
@@ -10834,7 +10780,7 @@
           <p:spPr>
             <a:xfrm>
               <a:off x="6199200" y="6162840"/>
-              <a:ext cx="4046040" cy="684720"/>
+              <a:ext cx="4045680" cy="684360"/>
             </a:xfrm>
             <a:prstGeom prst="rect">
               <a:avLst/>
@@ -10857,7 +10803,7 @@
           <p:spPr>
             <a:xfrm>
               <a:off x="10270080" y="6162840"/>
-              <a:ext cx="1911600" cy="601200"/>
+              <a:ext cx="1911240" cy="600840"/>
             </a:xfrm>
             <a:prstGeom prst="rect">
               <a:avLst/>
@@ -11155,7 +11101,7 @@
         <p:spPr>
           <a:xfrm>
             <a:off x="4038480" y="6356520"/>
-            <a:ext cx="4104360" cy="354600"/>
+            <a:ext cx="4104000" cy="354240"/>
           </a:xfrm>
           <a:prstGeom prst="rect">
             <a:avLst/>
@@ -11227,7 +11173,7 @@
         <p:spPr>
           <a:xfrm>
             <a:off x="8610480" y="6356520"/>
-            <a:ext cx="2732760" cy="354600"/>
+            <a:ext cx="2732400" cy="354240"/>
           </a:xfrm>
           <a:prstGeom prst="rect">
             <a:avLst/>
@@ -11270,7 +11216,7 @@
                 <a:tab algn="l" pos="0"/>
               </a:tabLst>
             </a:pPr>
-            <a:fld id="{50BBE600-8179-40B3-A6A5-CA7226099197}" type="slidenum">
+            <a:fld id="{6BAF3FF9-BB15-49BF-B72D-E481190E3391}" type="slidenum">
               <a:rPr b="0" lang="en-US" sz="1200" spc="-1" strike="noStrike">
                 <a:solidFill>
                   <a:schemeClr val="dk1">
@@ -11303,7 +11249,7 @@
         <p:spPr>
           <a:xfrm>
             <a:off x="838080" y="6356520"/>
-            <a:ext cx="2732760" cy="354600"/>
+            <a:ext cx="2732400" cy="354240"/>
           </a:xfrm>
           <a:prstGeom prst="rect">
             <a:avLst/>
@@ -11392,9 +11338,9 @@
         <p:grpSpPr>
           <a:xfrm>
             <a:off x="6199200" y="6162840"/>
-            <a:ext cx="5982480" cy="684720"/>
+            <a:ext cx="5982120" cy="684360"/>
             <a:chOff x="6199200" y="6162840"/>
-            <a:chExt cx="5982480" cy="684720"/>
+            <a:chExt cx="5982120" cy="684360"/>
           </a:xfrm>
         </p:grpSpPr>
         <p:pic>
@@ -11410,7 +11356,7 @@
           <p:spPr>
             <a:xfrm>
               <a:off x="6199200" y="6162840"/>
-              <a:ext cx="4046040" cy="684720"/>
+              <a:ext cx="4045680" cy="684360"/>
             </a:xfrm>
             <a:prstGeom prst="rect">
               <a:avLst/>
@@ -11433,7 +11379,7 @@
           <p:spPr>
             <a:xfrm>
               <a:off x="10270080" y="6162840"/>
-              <a:ext cx="1911600" cy="601200"/>
+              <a:ext cx="1911240" cy="600840"/>
             </a:xfrm>
             <a:prstGeom prst="rect">
               <a:avLst/>
@@ -11731,7 +11677,7 @@
         <p:spPr>
           <a:xfrm>
             <a:off x="4038480" y="6356520"/>
-            <a:ext cx="4104360" cy="354600"/>
+            <a:ext cx="4104000" cy="354240"/>
           </a:xfrm>
           <a:prstGeom prst="rect">
             <a:avLst/>
@@ -11803,7 +11749,7 @@
         <p:spPr>
           <a:xfrm>
             <a:off x="8610480" y="6356520"/>
-            <a:ext cx="2732760" cy="354600"/>
+            <a:ext cx="2732400" cy="354240"/>
           </a:xfrm>
           <a:prstGeom prst="rect">
             <a:avLst/>
@@ -11846,7 +11792,7 @@
                 <a:tab algn="l" pos="0"/>
               </a:tabLst>
             </a:pPr>
-            <a:fld id="{7E128A28-3EBC-4A5A-8817-CDF97C4FD4A8}" type="slidenum">
+            <a:fld id="{9E0740C5-406E-4E6E-9611-05D675A33AA0}" type="slidenum">
               <a:rPr b="0" lang="en-US" sz="1200" spc="-1" strike="noStrike">
                 <a:solidFill>
                   <a:schemeClr val="dk1">
@@ -11879,7 +11825,7 @@
         <p:spPr>
           <a:xfrm>
             <a:off x="838080" y="6356520"/>
-            <a:ext cx="2732760" cy="354600"/>
+            <a:ext cx="2732400" cy="354240"/>
           </a:xfrm>
           <a:prstGeom prst="rect">
             <a:avLst/>
@@ -11961,7 +11907,7 @@
         <p:spPr>
           <a:xfrm flipH="1">
             <a:off x="0" y="3073320"/>
-            <a:ext cx="1839240" cy="10440"/>
+            <a:ext cx="1839600" cy="10800"/>
           </a:xfrm>
           <a:prstGeom prst="straightConnector1">
             <a:avLst/>
@@ -11984,7 +11930,7 @@
         <p:spPr>
           <a:xfrm>
             <a:off x="0" y="2489400"/>
-            <a:ext cx="1839240" cy="10440"/>
+            <a:ext cx="1839600" cy="10800"/>
           </a:xfrm>
           <a:prstGeom prst="straightConnector1">
             <a:avLst/>
@@ -12007,7 +11953,7 @@
         <p:spPr>
           <a:xfrm>
             <a:off x="0" y="2781360"/>
-            <a:ext cx="1839240" cy="10440"/>
+            <a:ext cx="1839600" cy="10800"/>
           </a:xfrm>
           <a:prstGeom prst="straightConnector1">
             <a:avLst/>
@@ -12030,7 +11976,7 @@
         <p:spPr>
           <a:xfrm flipH="1">
             <a:off x="0" y="3657600"/>
-            <a:ext cx="1839240" cy="10440"/>
+            <a:ext cx="1839600" cy="10800"/>
           </a:xfrm>
           <a:prstGeom prst="straightConnector1">
             <a:avLst/>
@@ -12052,7 +11998,7 @@
         <p:spPr>
           <a:xfrm>
             <a:off x="128520" y="6134040"/>
-            <a:ext cx="1561320" cy="377280"/>
+            <a:ext cx="1560960" cy="376920"/>
           </a:xfrm>
           <a:prstGeom prst="diamond">
             <a:avLst/>
@@ -12117,7 +12063,7 @@
         <p:spPr>
           <a:xfrm>
             <a:off x="302760" y="5454000"/>
-            <a:ext cx="1212840" cy="377280"/>
+            <a:ext cx="1212480" cy="376920"/>
           </a:xfrm>
           <a:prstGeom prst="ellipse">
             <a:avLst/>
@@ -12180,7 +12126,7 @@
         <p:spPr>
           <a:xfrm>
             <a:off x="101160" y="336240"/>
-            <a:ext cx="1616040" cy="303120"/>
+            <a:ext cx="1615680" cy="303120"/>
           </a:xfrm>
           <a:prstGeom prst="rect">
             <a:avLst/>
@@ -12237,7 +12183,7 @@
         <p:spPr>
           <a:xfrm>
             <a:off x="101160" y="597600"/>
-            <a:ext cx="1616040" cy="516600"/>
+            <a:ext cx="1615680" cy="516600"/>
           </a:xfrm>
           <a:prstGeom prst="rect">
             <a:avLst/>
@@ -12327,7 +12273,7 @@
         <p:spPr>
           <a:xfrm>
             <a:off x="101160" y="336240"/>
-            <a:ext cx="1616040" cy="303120"/>
+            <a:ext cx="1615680" cy="303120"/>
           </a:xfrm>
           <a:prstGeom prst="rect">
             <a:avLst/>
@@ -12384,7 +12330,7 @@
         <p:spPr>
           <a:xfrm>
             <a:off x="101160" y="597600"/>
-            <a:ext cx="1616040" cy="516600"/>
+            <a:ext cx="1615680" cy="516600"/>
           </a:xfrm>
           <a:prstGeom prst="rect">
             <a:avLst/>
@@ -12474,7 +12420,7 @@
         <p:spPr>
           <a:xfrm>
             <a:off x="2541600" y="228600"/>
-            <a:ext cx="1616040" cy="303120"/>
+            <a:ext cx="1615680" cy="303120"/>
           </a:xfrm>
           <a:prstGeom prst="rect">
             <a:avLst/>
@@ -12531,7 +12477,7 @@
         <p:spPr>
           <a:xfrm>
             <a:off x="2541600" y="489960"/>
-            <a:ext cx="1616040" cy="1584000"/>
+            <a:ext cx="1615680" cy="1584000"/>
           </a:xfrm>
           <a:prstGeom prst="rect">
             <a:avLst/>
@@ -12756,7 +12702,7 @@
         <p:spPr>
           <a:xfrm>
             <a:off x="6656400" y="228600"/>
-            <a:ext cx="1616040" cy="303120"/>
+            <a:ext cx="1615680" cy="303120"/>
           </a:xfrm>
           <a:prstGeom prst="rect">
             <a:avLst/>
@@ -12813,7 +12759,7 @@
         <p:spPr>
           <a:xfrm>
             <a:off x="6656400" y="489960"/>
-            <a:ext cx="1616040" cy="516600"/>
+            <a:ext cx="1615680" cy="516600"/>
           </a:xfrm>
           <a:prstGeom prst="rect">
             <a:avLst/>
@@ -12903,7 +12849,7 @@
         <p:spPr>
           <a:xfrm>
             <a:off x="6656400" y="228600"/>
-            <a:ext cx="1616040" cy="303120"/>
+            <a:ext cx="1615680" cy="303120"/>
           </a:xfrm>
           <a:prstGeom prst="rect">
             <a:avLst/>
@@ -12960,7 +12906,7 @@
         <p:spPr>
           <a:xfrm>
             <a:off x="6656400" y="489960"/>
-            <a:ext cx="1616040" cy="730080"/>
+            <a:ext cx="1615680" cy="730080"/>
           </a:xfrm>
           <a:prstGeom prst="rect">
             <a:avLst/>
@@ -13077,7 +13023,7 @@
         <p:spPr>
           <a:xfrm>
             <a:off x="128520" y="4629600"/>
-            <a:ext cx="1561320" cy="522000"/>
+            <a:ext cx="1560960" cy="521640"/>
           </a:xfrm>
           <a:prstGeom prst="diamond">
             <a:avLst/>
@@ -13165,7 +13111,7 @@
         <p:spPr>
           <a:xfrm>
             <a:off x="0" y="3365640"/>
-            <a:ext cx="1839240" cy="10440"/>
+            <a:ext cx="1839600" cy="10800"/>
           </a:xfrm>
           <a:prstGeom prst="straightConnector1">
             <a:avLst/>
@@ -13187,7 +13133,7 @@
         <p:spPr>
           <a:xfrm>
             <a:off x="673200" y="3949920"/>
-            <a:ext cx="472320" cy="377280"/>
+            <a:ext cx="471960" cy="376920"/>
           </a:xfrm>
           <a:prstGeom prst="triangle">
             <a:avLst>
@@ -13254,9 +13200,9 @@
         <p:grpSpPr>
           <a:xfrm>
             <a:off x="101160" y="1413000"/>
-            <a:ext cx="1616040" cy="777960"/>
+            <a:ext cx="1615680" cy="777960"/>
             <a:chOff x="101160" y="1413000"/>
-            <a:chExt cx="1616040" cy="777960"/>
+            <a:chExt cx="1615680" cy="777960"/>
           </a:xfrm>
         </p:grpSpPr>
         <p:sp>
@@ -13268,7 +13214,7 @@
           <p:spPr>
             <a:xfrm>
               <a:off x="101160" y="1413000"/>
-              <a:ext cx="1616040" cy="303120"/>
+              <a:ext cx="1615680" cy="303120"/>
             </a:xfrm>
             <a:prstGeom prst="rect">
               <a:avLst/>
@@ -13326,7 +13272,7 @@
           <p:spPr>
             <a:xfrm>
               <a:off x="101160" y="1674360"/>
-              <a:ext cx="1616040" cy="516600"/>
+              <a:ext cx="1615680" cy="516600"/>
             </a:xfrm>
             <a:prstGeom prst="rect">
               <a:avLst/>
@@ -13418,7 +13364,7 @@
         <p:spPr>
           <a:xfrm>
             <a:off x="4426920" y="914400"/>
-            <a:ext cx="1561320" cy="377280"/>
+            <a:ext cx="1560960" cy="376920"/>
           </a:xfrm>
           <a:prstGeom prst="diamond">
             <a:avLst/>
@@ -13485,8 +13431,8 @@
         </p:nvCxnSpPr>
         <p:spPr>
           <a:xfrm flipH="1">
-            <a:off x="5988240" y="855000"/>
-            <a:ext cx="668520" cy="248400"/>
+            <a:off x="5987880" y="855000"/>
+            <a:ext cx="668880" cy="248400"/>
           </a:xfrm>
           <a:prstGeom prst="straightConnector1">
             <a:avLst/>
@@ -13509,7 +13455,7 @@
         <p:spPr>
           <a:xfrm>
             <a:off x="6255720" y="1828800"/>
-            <a:ext cx="1789920" cy="377280"/>
+            <a:ext cx="1789560" cy="376920"/>
           </a:xfrm>
           <a:prstGeom prst="diamond">
             <a:avLst/>
@@ -13600,8 +13546,8 @@
         </p:nvCxnSpPr>
         <p:spPr>
           <a:xfrm flipH="1" flipV="1">
-            <a:off x="7150680" y="2206080"/>
-            <a:ext cx="465840" cy="545400"/>
+            <a:off x="7150680" y="2205720"/>
+            <a:ext cx="466200" cy="546120"/>
           </a:xfrm>
           <a:prstGeom prst="straightConnector1">
             <a:avLst/>
@@ -13624,7 +13570,7 @@
         <p:spPr>
           <a:xfrm>
             <a:off x="128520" y="6134400"/>
-            <a:ext cx="1561320" cy="377280"/>
+            <a:ext cx="1560960" cy="376920"/>
           </a:xfrm>
           <a:prstGeom prst="diamond">
             <a:avLst/>
@@ -13689,9 +13635,9 @@
         <p:grpSpPr>
           <a:xfrm>
             <a:off x="6681960" y="2743200"/>
-            <a:ext cx="1844640" cy="1216440"/>
+            <a:ext cx="1844280" cy="1216440"/>
             <a:chOff x="6681960" y="2743200"/>
-            <a:chExt cx="1844640" cy="1216440"/>
+            <a:chExt cx="1844280" cy="1216440"/>
           </a:xfrm>
         </p:grpSpPr>
         <p:sp>
@@ -13703,7 +13649,7 @@
           <p:spPr>
             <a:xfrm>
               <a:off x="6681960" y="2743200"/>
-              <a:ext cx="1844640" cy="303120"/>
+              <a:ext cx="1844280" cy="303120"/>
             </a:xfrm>
             <a:prstGeom prst="rect">
               <a:avLst/>
@@ -13760,7 +13706,7 @@
           <p:spPr>
             <a:xfrm>
               <a:off x="6681960" y="3016080"/>
-              <a:ext cx="1844640" cy="943560"/>
+              <a:ext cx="1844280" cy="943560"/>
             </a:xfrm>
             <a:prstGeom prst="rect">
               <a:avLst/>
@@ -13907,7 +13853,7 @@
         <p:spPr>
           <a:xfrm>
             <a:off x="9173520" y="3501000"/>
-            <a:ext cx="472320" cy="377280"/>
+            <a:ext cx="471960" cy="376920"/>
           </a:xfrm>
           <a:prstGeom prst="triangle">
             <a:avLst>
@@ -13974,7 +13920,7 @@
         <p:spPr>
           <a:xfrm>
             <a:off x="10287000" y="3126240"/>
-            <a:ext cx="1898640" cy="303120"/>
+            <a:ext cx="1898280" cy="303120"/>
           </a:xfrm>
           <a:prstGeom prst="rect">
             <a:avLst/>
@@ -14031,7 +13977,7 @@
         <p:spPr>
           <a:xfrm>
             <a:off x="10287000" y="3429360"/>
-            <a:ext cx="1898640" cy="1584000"/>
+            <a:ext cx="1898280" cy="1584000"/>
           </a:xfrm>
           <a:prstGeom prst="rect">
             <a:avLst/>
@@ -14264,8 +14210,8 @@
         </p:nvCxnSpPr>
         <p:spPr>
           <a:xfrm flipH="1" flipV="1">
-            <a:off x="8526600" y="3351240"/>
-            <a:ext cx="765360" cy="338760"/>
+            <a:off x="8526240" y="3351240"/>
+            <a:ext cx="765720" cy="338760"/>
           </a:xfrm>
           <a:prstGeom prst="straightConnector1">
             <a:avLst/>
@@ -14287,7 +14233,7 @@
         <p:spPr>
           <a:xfrm>
             <a:off x="2086200" y="3336840"/>
-            <a:ext cx="1616040" cy="303120"/>
+            <a:ext cx="1615680" cy="303120"/>
           </a:xfrm>
           <a:prstGeom prst="rect">
             <a:avLst/>
@@ -14344,7 +14290,7 @@
         <p:spPr>
           <a:xfrm>
             <a:off x="2086200" y="3598200"/>
-            <a:ext cx="1616040" cy="516600"/>
+            <a:ext cx="1615680" cy="516600"/>
           </a:xfrm>
           <a:prstGeom prst="rect">
             <a:avLst/>
@@ -14434,7 +14380,7 @@
         <p:spPr>
           <a:xfrm>
             <a:off x="2086200" y="3336840"/>
-            <a:ext cx="1616040" cy="303120"/>
+            <a:ext cx="1615680" cy="303120"/>
           </a:xfrm>
           <a:prstGeom prst="rect">
             <a:avLst/>
@@ -14491,7 +14437,7 @@
         <p:spPr>
           <a:xfrm>
             <a:off x="2086200" y="3598200"/>
-            <a:ext cx="1616040" cy="516600"/>
+            <a:ext cx="1615680" cy="516600"/>
           </a:xfrm>
           <a:prstGeom prst="rect">
             <a:avLst/>
@@ -14581,7 +14527,7 @@
         <p:spPr>
           <a:xfrm>
             <a:off x="1883160" y="2514600"/>
-            <a:ext cx="1819080" cy="377280"/>
+            <a:ext cx="1818720" cy="376920"/>
           </a:xfrm>
           <a:prstGeom prst="diamond">
             <a:avLst/>
@@ -14646,7 +14592,7 @@
         <p:spPr>
           <a:xfrm>
             <a:off x="3481560" y="2899800"/>
-            <a:ext cx="1590480" cy="377280"/>
+            <a:ext cx="1590120" cy="376920"/>
           </a:xfrm>
           <a:prstGeom prst="ellipse">
             <a:avLst/>
@@ -14711,8 +14657,8 @@
         </p:nvCxnSpPr>
         <p:spPr>
           <a:xfrm>
-            <a:off x="3702240" y="2703240"/>
-            <a:ext cx="574920" cy="196920"/>
+            <a:off x="3701880" y="2703240"/>
+            <a:ext cx="575280" cy="196920"/>
           </a:xfrm>
           <a:prstGeom prst="straightConnector1">
             <a:avLst/>
@@ -14736,8 +14682,8 @@
         </p:nvCxnSpPr>
         <p:spPr>
           <a:xfrm flipH="1" flipV="1">
-            <a:off x="2792880" y="2891880"/>
-            <a:ext cx="101520" cy="445320"/>
+            <a:off x="2792520" y="2891520"/>
+            <a:ext cx="101880" cy="445680"/>
           </a:xfrm>
           <a:prstGeom prst="straightConnector1">
             <a:avLst/>
@@ -14761,8 +14707,8 @@
         </p:nvCxnSpPr>
         <p:spPr>
           <a:xfrm flipV="1">
-            <a:off x="2792880" y="2073960"/>
-            <a:ext cx="556920" cy="441000"/>
+            <a:off x="2792520" y="2073960"/>
+            <a:ext cx="557280" cy="441000"/>
           </a:xfrm>
           <a:prstGeom prst="straightConnector1">
             <a:avLst/>
@@ -14784,7 +14730,7 @@
         <p:spPr>
           <a:xfrm>
             <a:off x="10543680" y="457200"/>
-            <a:ext cx="1616040" cy="303120"/>
+            <a:ext cx="1615680" cy="303120"/>
           </a:xfrm>
           <a:prstGeom prst="rect">
             <a:avLst/>
@@ -14841,7 +14787,7 @@
         <p:spPr>
           <a:xfrm>
             <a:off x="10543680" y="718560"/>
-            <a:ext cx="1616040" cy="516600"/>
+            <a:ext cx="1615680" cy="516600"/>
           </a:xfrm>
           <a:prstGeom prst="rect">
             <a:avLst/>
@@ -14931,7 +14877,7 @@
         <p:spPr>
           <a:xfrm>
             <a:off x="10287000" y="457200"/>
-            <a:ext cx="1616040" cy="303120"/>
+            <a:ext cx="1615680" cy="303120"/>
           </a:xfrm>
           <a:prstGeom prst="rect">
             <a:avLst/>
@@ -14988,7 +14934,7 @@
         <p:spPr>
           <a:xfrm>
             <a:off x="10287000" y="718560"/>
-            <a:ext cx="1872720" cy="2651400"/>
+            <a:ext cx="1872360" cy="2651400"/>
           </a:xfrm>
           <a:prstGeom prst="rect">
             <a:avLst/>
@@ -15322,7 +15268,7 @@
         <p:spPr>
           <a:xfrm>
             <a:off x="8007120" y="1448280"/>
-            <a:ext cx="2048040" cy="377280"/>
+            <a:ext cx="2047680" cy="376920"/>
           </a:xfrm>
           <a:prstGeom prst="diamond">
             <a:avLst/>
@@ -15389,8 +15335,8 @@
         </p:nvCxnSpPr>
         <p:spPr>
           <a:xfrm>
-            <a:off x="9031320" y="1825560"/>
-            <a:ext cx="1256040" cy="2396160"/>
+            <a:off x="9030960" y="1825200"/>
+            <a:ext cx="1256400" cy="2396520"/>
           </a:xfrm>
           <a:prstGeom prst="straightConnector1">
             <a:avLst/>
@@ -15414,8 +15360,8 @@
         </p:nvCxnSpPr>
         <p:spPr>
           <a:xfrm flipH="1" flipV="1">
-            <a:off x="10055160" y="1636920"/>
-            <a:ext cx="232200" cy="407520"/>
+            <a:off x="10054800" y="1636920"/>
+            <a:ext cx="232560" cy="407520"/>
           </a:xfrm>
           <a:prstGeom prst="straightConnector1">
             <a:avLst/>
@@ -15440,7 +15386,7 @@
         <p:spPr>
           <a:xfrm flipH="1" flipV="1">
             <a:off x="7464240" y="1220040"/>
-            <a:ext cx="1567440" cy="228600"/>
+            <a:ext cx="1567080" cy="228600"/>
           </a:xfrm>
           <a:prstGeom prst="straightConnector1">
             <a:avLst/>
@@ -15462,7 +15408,7 @@
         <p:spPr>
           <a:xfrm>
             <a:off x="5412240" y="5029200"/>
-            <a:ext cx="1616040" cy="303120"/>
+            <a:ext cx="1615680" cy="303120"/>
           </a:xfrm>
           <a:prstGeom prst="rect">
             <a:avLst/>
@@ -15519,7 +15465,7 @@
         <p:spPr>
           <a:xfrm>
             <a:off x="3710160" y="4343400"/>
-            <a:ext cx="1819440" cy="377280"/>
+            <a:ext cx="1819080" cy="376920"/>
           </a:xfrm>
           <a:prstGeom prst="diamond">
             <a:avLst/>
@@ -15612,8 +15558,8 @@
         </p:nvCxnSpPr>
         <p:spPr>
           <a:xfrm>
-            <a:off x="4619880" y="4720680"/>
-            <a:ext cx="792720" cy="460440"/>
+            <a:off x="4619880" y="4720320"/>
+            <a:ext cx="792720" cy="460800"/>
           </a:xfrm>
           <a:prstGeom prst="straightConnector1">
             <a:avLst/>
@@ -15660,7 +15606,7 @@
         <p:spPr>
           <a:xfrm>
             <a:off x="4626720" y="3200400"/>
-            <a:ext cx="1818720" cy="676440"/>
+            <a:ext cx="1818360" cy="676080"/>
           </a:xfrm>
           <a:prstGeom prst="diamond">
             <a:avLst/>
@@ -15727,8 +15673,8 @@
         </p:nvCxnSpPr>
         <p:spPr>
           <a:xfrm flipH="1" flipV="1">
-            <a:off x="5536080" y="3876840"/>
-            <a:ext cx="684360" cy="1152720"/>
+            <a:off x="5536080" y="3876480"/>
+            <a:ext cx="684360" cy="1153080"/>
           </a:xfrm>
           <a:prstGeom prst="straightConnector1">
             <a:avLst/>
@@ -15750,7 +15696,7 @@
         <p:spPr>
           <a:xfrm>
             <a:off x="2693880" y="4415400"/>
-            <a:ext cx="472320" cy="377280"/>
+            <a:ext cx="471960" cy="376920"/>
           </a:xfrm>
           <a:prstGeom prst="triangle">
             <a:avLst>
@@ -15842,7 +15788,7 @@
         <p:spPr>
           <a:xfrm>
             <a:off x="2109960" y="5163480"/>
-            <a:ext cx="1616040" cy="303120"/>
+            <a:ext cx="1615680" cy="303120"/>
           </a:xfrm>
           <a:prstGeom prst="rect">
             <a:avLst/>
@@ -15899,7 +15845,7 @@
         <p:spPr>
           <a:xfrm>
             <a:off x="2109960" y="5163480"/>
-            <a:ext cx="1616040" cy="303120"/>
+            <a:ext cx="1615680" cy="303120"/>
           </a:xfrm>
           <a:prstGeom prst="rect">
             <a:avLst/>
@@ -15956,7 +15902,7 @@
         <p:spPr>
           <a:xfrm>
             <a:off x="2109960" y="5424840"/>
-            <a:ext cx="1616040" cy="363960"/>
+            <a:ext cx="1615680" cy="363960"/>
           </a:xfrm>
           <a:prstGeom prst="rect">
             <a:avLst/>
@@ -16024,8 +15970,8 @@
         </p:nvCxnSpPr>
         <p:spPr>
           <a:xfrm flipH="1">
-            <a:off x="2917800" y="4792680"/>
-            <a:ext cx="12600" cy="371160"/>
+            <a:off x="2917800" y="4792320"/>
+            <a:ext cx="12600" cy="371520"/>
           </a:xfrm>
           <a:prstGeom prst="straightConnector1">
             <a:avLst/>
@@ -16049,8 +15995,8 @@
         </p:nvCxnSpPr>
         <p:spPr>
           <a:xfrm flipH="1">
-            <a:off x="4157640" y="1103040"/>
-            <a:ext cx="269640" cy="179280"/>
+            <a:off x="4157280" y="1103040"/>
+            <a:ext cx="270000" cy="179280"/>
           </a:xfrm>
           <a:prstGeom prst="straightConnector1">
             <a:avLst/>
@@ -16072,7 +16018,7 @@
         <p:spPr>
           <a:xfrm flipH="1">
             <a:off x="0" y="3657600"/>
-            <a:ext cx="1839240" cy="10440"/>
+            <a:ext cx="1839600" cy="10800"/>
           </a:xfrm>
           <a:prstGeom prst="straightConnector1">
             <a:avLst/>
@@ -16094,7 +16040,7 @@
         <p:spPr>
           <a:xfrm>
             <a:off x="8686800" y="532800"/>
-            <a:ext cx="1367280" cy="377280"/>
+            <a:ext cx="1366920" cy="376920"/>
           </a:xfrm>
           <a:prstGeom prst="ellipse">
             <a:avLst/>
@@ -16159,8 +16105,8 @@
         </p:nvCxnSpPr>
         <p:spPr>
           <a:xfrm flipH="1">
-            <a:off x="9031320" y="910080"/>
-            <a:ext cx="339480" cy="538560"/>
+            <a:off x="9030960" y="909720"/>
+            <a:ext cx="339840" cy="538920"/>
           </a:xfrm>
           <a:prstGeom prst="straightConnector1">
             <a:avLst/>
@@ -16212,7 +16158,7 @@
         <p:spPr>
           <a:xfrm flipH="1">
             <a:off x="0" y="3073320"/>
-            <a:ext cx="1839240" cy="10440"/>
+            <a:ext cx="1839600" cy="10800"/>
           </a:xfrm>
           <a:prstGeom prst="straightConnector1">
             <a:avLst/>
@@ -16235,7 +16181,7 @@
         <p:spPr>
           <a:xfrm>
             <a:off x="0" y="2489400"/>
-            <a:ext cx="1839240" cy="10440"/>
+            <a:ext cx="1839600" cy="10800"/>
           </a:xfrm>
           <a:prstGeom prst="straightConnector1">
             <a:avLst/>
@@ -16258,7 +16204,7 @@
         <p:spPr>
           <a:xfrm>
             <a:off x="0" y="2781360"/>
-            <a:ext cx="1839240" cy="10440"/>
+            <a:ext cx="1839600" cy="10800"/>
           </a:xfrm>
           <a:prstGeom prst="straightConnector1">
             <a:avLst/>
@@ -16281,7 +16227,7 @@
         <p:spPr>
           <a:xfrm flipH="1">
             <a:off x="0" y="3657600"/>
-            <a:ext cx="1839240" cy="10440"/>
+            <a:ext cx="1839600" cy="10800"/>
           </a:xfrm>
           <a:prstGeom prst="straightConnector1">
             <a:avLst/>
@@ -16303,7 +16249,7 @@
         <p:spPr>
           <a:xfrm>
             <a:off x="128520" y="6134040"/>
-            <a:ext cx="1561320" cy="377280"/>
+            <a:ext cx="1560960" cy="376920"/>
           </a:xfrm>
           <a:prstGeom prst="diamond">
             <a:avLst/>
@@ -16368,7 +16314,7 @@
         <p:spPr>
           <a:xfrm>
             <a:off x="302760" y="5454000"/>
-            <a:ext cx="1212840" cy="377280"/>
+            <a:ext cx="1212480" cy="376920"/>
           </a:xfrm>
           <a:prstGeom prst="ellipse">
             <a:avLst/>
@@ -16431,9 +16377,9 @@
         <p:grpSpPr>
           <a:xfrm>
             <a:off x="101160" y="336240"/>
-            <a:ext cx="1616040" cy="777960"/>
+            <a:ext cx="1615680" cy="777960"/>
             <a:chOff x="101160" y="336240"/>
-            <a:chExt cx="1616040" cy="777960"/>
+            <a:chExt cx="1615680" cy="777960"/>
           </a:xfrm>
         </p:grpSpPr>
         <p:sp>
@@ -16445,7 +16391,7 @@
           <p:spPr>
             <a:xfrm>
               <a:off x="101160" y="336240"/>
-              <a:ext cx="1616040" cy="303120"/>
+              <a:ext cx="1615680" cy="303120"/>
             </a:xfrm>
             <a:prstGeom prst="rect">
               <a:avLst/>
@@ -16502,7 +16448,7 @@
           <p:spPr>
             <a:xfrm>
               <a:off x="101160" y="597600"/>
-              <a:ext cx="1616040" cy="516600"/>
+              <a:ext cx="1615680" cy="516600"/>
             </a:xfrm>
             <a:prstGeom prst="rect">
               <a:avLst/>
@@ -16593,7 +16539,7 @@
         <p:spPr>
           <a:xfrm>
             <a:off x="128520" y="4629600"/>
-            <a:ext cx="1561320" cy="522000"/>
+            <a:ext cx="1560960" cy="521640"/>
           </a:xfrm>
           <a:prstGeom prst="diamond">
             <a:avLst/>
@@ -16681,7 +16627,7 @@
         <p:spPr>
           <a:xfrm>
             <a:off x="0" y="3365640"/>
-            <a:ext cx="1839240" cy="10440"/>
+            <a:ext cx="1839600" cy="10800"/>
           </a:xfrm>
           <a:prstGeom prst="straightConnector1">
             <a:avLst/>
@@ -16703,7 +16649,7 @@
         <p:spPr>
           <a:xfrm>
             <a:off x="673200" y="3949920"/>
-            <a:ext cx="472320" cy="377280"/>
+            <a:ext cx="471960" cy="376920"/>
           </a:xfrm>
           <a:prstGeom prst="triangle">
             <a:avLst>
@@ -16770,9 +16716,9 @@
         <p:grpSpPr>
           <a:xfrm>
             <a:off x="101160" y="1413000"/>
-            <a:ext cx="1616040" cy="777960"/>
+            <a:ext cx="1615680" cy="777960"/>
             <a:chOff x="101160" y="1413000"/>
-            <a:chExt cx="1616040" cy="777960"/>
+            <a:chExt cx="1615680" cy="777960"/>
           </a:xfrm>
         </p:grpSpPr>
         <p:sp>
@@ -16784,7 +16730,7 @@
           <p:spPr>
             <a:xfrm>
               <a:off x="101160" y="1413000"/>
-              <a:ext cx="1616040" cy="303120"/>
+              <a:ext cx="1615680" cy="303120"/>
             </a:xfrm>
             <a:prstGeom prst="rect">
               <a:avLst/>
@@ -16842,7 +16788,7 @@
           <p:spPr>
             <a:xfrm>
               <a:off x="101160" y="1674360"/>
-              <a:ext cx="1616040" cy="516600"/>
+              <a:ext cx="1615680" cy="516600"/>
             </a:xfrm>
             <a:prstGeom prst="rect">
               <a:avLst/>
@@ -16934,7 +16880,7 @@
         <p:spPr>
           <a:xfrm>
             <a:off x="4775040" y="457200"/>
-            <a:ext cx="1616040" cy="303120"/>
+            <a:ext cx="1615680" cy="303120"/>
           </a:xfrm>
           <a:prstGeom prst="rect">
             <a:avLst/>
@@ -16991,7 +16937,7 @@
         <p:spPr>
           <a:xfrm>
             <a:off x="4775040" y="718560"/>
-            <a:ext cx="1616040" cy="730080"/>
+            <a:ext cx="1615680" cy="730080"/>
           </a:xfrm>
           <a:prstGeom prst="rect">
             <a:avLst/>
@@ -17108,9 +17054,9 @@
         <p:grpSpPr>
           <a:xfrm>
             <a:off x="4572000" y="4274280"/>
-            <a:ext cx="1616040" cy="991440"/>
+            <a:ext cx="1615680" cy="991440"/>
             <a:chOff x="4572000" y="4274280"/>
-            <a:chExt cx="1616040" cy="991440"/>
+            <a:chExt cx="1615680" cy="991440"/>
           </a:xfrm>
         </p:grpSpPr>
         <p:sp>
@@ -17122,7 +17068,7 @@
           <p:spPr>
             <a:xfrm>
               <a:off x="4572000" y="4274280"/>
-              <a:ext cx="1616040" cy="303120"/>
+              <a:ext cx="1615680" cy="303120"/>
             </a:xfrm>
             <a:prstGeom prst="rect">
               <a:avLst/>
@@ -17179,7 +17125,7 @@
           <p:spPr>
             <a:xfrm>
               <a:off x="4572000" y="4535640"/>
-              <a:ext cx="1616040" cy="730080"/>
+              <a:ext cx="1615680" cy="730080"/>
             </a:xfrm>
             <a:prstGeom prst="rect">
               <a:avLst/>
@@ -17297,7 +17243,7 @@
         <p:spPr>
           <a:xfrm>
             <a:off x="3231360" y="2899800"/>
-            <a:ext cx="1561320" cy="377280"/>
+            <a:ext cx="1560960" cy="376920"/>
           </a:xfrm>
           <a:prstGeom prst="diamond">
             <a:avLst/>
@@ -17362,7 +17308,7 @@
         <p:spPr>
           <a:xfrm>
             <a:off x="4602960" y="2585160"/>
-            <a:ext cx="1789920" cy="378720"/>
+            <a:ext cx="1789560" cy="378360"/>
           </a:xfrm>
           <a:prstGeom prst="diamond">
             <a:avLst/>
@@ -17429,8 +17375,8 @@
         </p:nvCxnSpPr>
         <p:spPr>
           <a:xfrm flipH="1" flipV="1">
-            <a:off x="4012200" y="3277080"/>
-            <a:ext cx="1368000" cy="997560"/>
+            <a:off x="4011840" y="3276720"/>
+            <a:ext cx="1368360" cy="997920"/>
           </a:xfrm>
           <a:prstGeom prst="straightConnector1">
             <a:avLst/>
@@ -17480,8 +17426,8 @@
         </p:nvCxnSpPr>
         <p:spPr>
           <a:xfrm flipV="1">
-            <a:off x="5379840" y="2963880"/>
-            <a:ext cx="118440" cy="1310760"/>
+            <a:off x="5379840" y="2963520"/>
+            <a:ext cx="118440" cy="1311120"/>
           </a:xfrm>
           <a:prstGeom prst="straightConnector1">
             <a:avLst/>
@@ -17505,8 +17451,8 @@
         </p:nvCxnSpPr>
         <p:spPr>
           <a:xfrm flipH="1">
-            <a:off x="4012200" y="1448640"/>
-            <a:ext cx="1571040" cy="1451520"/>
+            <a:off x="4011840" y="1448640"/>
+            <a:ext cx="1571400" cy="1451520"/>
           </a:xfrm>
           <a:prstGeom prst="straightConnector1">
             <a:avLst/>
@@ -17528,7 +17474,7 @@
         <p:spPr>
           <a:xfrm>
             <a:off x="2743200" y="457200"/>
-            <a:ext cx="1561320" cy="377280"/>
+            <a:ext cx="1560960" cy="376920"/>
           </a:xfrm>
           <a:prstGeom prst="diamond">
             <a:avLst/>
@@ -17595,8 +17541,8 @@
         </p:nvCxnSpPr>
         <p:spPr>
           <a:xfrm flipH="1" flipV="1">
-            <a:off x="4304520" y="645840"/>
-            <a:ext cx="470880" cy="438120"/>
+            <a:off x="4304160" y="645840"/>
+            <a:ext cx="471240" cy="438120"/>
           </a:xfrm>
           <a:prstGeom prst="straightConnector1">
             <a:avLst/>
@@ -17620,8 +17566,8 @@
         </p:nvCxnSpPr>
         <p:spPr>
           <a:xfrm flipH="1" flipV="1">
-            <a:off x="3524040" y="834480"/>
-            <a:ext cx="1251360" cy="249480"/>
+            <a:off x="3523680" y="834120"/>
+            <a:ext cx="1251720" cy="249840"/>
           </a:xfrm>
           <a:prstGeom prst="straightConnector1">
             <a:avLst/>
@@ -17643,9 +17589,9 @@
         <p:grpSpPr>
           <a:xfrm>
             <a:off x="8686800" y="837360"/>
-            <a:ext cx="1616040" cy="991440"/>
+            <a:ext cx="1615680" cy="991440"/>
             <a:chOff x="8686800" y="837360"/>
-            <a:chExt cx="1616040" cy="991440"/>
+            <a:chExt cx="1615680" cy="991440"/>
           </a:xfrm>
         </p:grpSpPr>
         <p:sp>
@@ -17657,7 +17603,7 @@
           <p:spPr>
             <a:xfrm>
               <a:off x="8686800" y="837360"/>
-              <a:ext cx="1616040" cy="303120"/>
+              <a:ext cx="1615680" cy="303120"/>
             </a:xfrm>
             <a:prstGeom prst="rect">
               <a:avLst/>
@@ -17714,7 +17660,7 @@
           <p:spPr>
             <a:xfrm>
               <a:off x="8686800" y="1098720"/>
-              <a:ext cx="1616040" cy="730080"/>
+              <a:ext cx="1615680" cy="730080"/>
             </a:xfrm>
             <a:prstGeom prst="rect">
               <a:avLst/>
@@ -17832,7 +17778,7 @@
         <p:spPr>
           <a:xfrm>
             <a:off x="128880" y="6134040"/>
-            <a:ext cx="1561320" cy="377280"/>
+            <a:ext cx="1560960" cy="376920"/>
           </a:xfrm>
           <a:prstGeom prst="diamond">
             <a:avLst/>
@@ -17897,7 +17843,7 @@
         <p:spPr>
           <a:xfrm>
             <a:off x="7315200" y="228600"/>
-            <a:ext cx="1561320" cy="377280"/>
+            <a:ext cx="1560960" cy="376920"/>
           </a:xfrm>
           <a:prstGeom prst="diamond">
             <a:avLst/>
@@ -17962,7 +17908,7 @@
         <p:spPr>
           <a:xfrm>
             <a:off x="360" y="3366000"/>
-            <a:ext cx="1839240" cy="10440"/>
+            <a:ext cx="1839600" cy="10800"/>
           </a:xfrm>
           <a:prstGeom prst="straightConnector1">
             <a:avLst/>
@@ -17986,8 +17932,8 @@
         </p:nvCxnSpPr>
         <p:spPr>
           <a:xfrm flipH="1">
-            <a:off x="6391080" y="417240"/>
-            <a:ext cx="924480" cy="666720"/>
+            <a:off x="6390720" y="417240"/>
+            <a:ext cx="924840" cy="666720"/>
           </a:xfrm>
           <a:prstGeom prst="straightConnector1">
             <a:avLst/>
@@ -18009,7 +17955,7 @@
         <p:spPr>
           <a:xfrm>
             <a:off x="6629400" y="1442160"/>
-            <a:ext cx="1820520" cy="606960"/>
+            <a:ext cx="1820160" cy="606600"/>
           </a:xfrm>
           <a:prstGeom prst="diamond">
             <a:avLst/>
@@ -18076,8 +18022,8 @@
         </p:nvCxnSpPr>
         <p:spPr>
           <a:xfrm flipH="1" flipV="1">
-            <a:off x="8876520" y="417240"/>
-            <a:ext cx="618480" cy="420480"/>
+            <a:off x="8876160" y="417240"/>
+            <a:ext cx="618840" cy="420480"/>
           </a:xfrm>
           <a:prstGeom prst="straightConnector1">
             <a:avLst/>
@@ -18100,7 +18046,7 @@
         <p:spPr>
           <a:xfrm>
             <a:off x="6629400" y="2514600"/>
-            <a:ext cx="1561320" cy="377280"/>
+            <a:ext cx="1560960" cy="376920"/>
           </a:xfrm>
           <a:prstGeom prst="diamond">
             <a:avLst/>
@@ -18167,8 +18113,8 @@
         </p:nvCxnSpPr>
         <p:spPr>
           <a:xfrm flipH="1">
-            <a:off x="8190720" y="1828800"/>
-            <a:ext cx="1304280" cy="874800"/>
+            <a:off x="8190360" y="1828800"/>
+            <a:ext cx="1304640" cy="874800"/>
           </a:xfrm>
           <a:prstGeom prst="straightConnector1">
             <a:avLst/>
@@ -18192,8 +18138,8 @@
         </p:nvCxnSpPr>
         <p:spPr>
           <a:xfrm flipH="1">
-            <a:off x="6188040" y="2703240"/>
-            <a:ext cx="441720" cy="2067120"/>
+            <a:off x="6187680" y="2703240"/>
+            <a:ext cx="442080" cy="2067120"/>
           </a:xfrm>
           <a:prstGeom prst="straightConnector1">
             <a:avLst/>
@@ -18217,8 +18163,8 @@
         </p:nvCxnSpPr>
         <p:spPr>
           <a:xfrm flipH="1">
-            <a:off x="8449920" y="1333080"/>
-            <a:ext cx="237240" cy="412920"/>
+            <a:off x="8449560" y="1333080"/>
+            <a:ext cx="237600" cy="412920"/>
           </a:xfrm>
           <a:prstGeom prst="straightConnector1">
             <a:avLst/>
@@ -18265,9 +18211,9 @@
         <p:grpSpPr>
           <a:xfrm>
             <a:off x="101160" y="336240"/>
-            <a:ext cx="1616040" cy="777960"/>
+            <a:ext cx="1615680" cy="777960"/>
             <a:chOff x="101160" y="336240"/>
-            <a:chExt cx="1616040" cy="777960"/>
+            <a:chExt cx="1615680" cy="777960"/>
           </a:xfrm>
         </p:grpSpPr>
         <p:sp>
@@ -18279,7 +18225,7 @@
           <p:spPr>
             <a:xfrm>
               <a:off x="101160" y="336240"/>
-              <a:ext cx="1616040" cy="303120"/>
+              <a:ext cx="1615680" cy="303120"/>
             </a:xfrm>
             <a:prstGeom prst="rect">
               <a:avLst/>
@@ -18336,7 +18282,7 @@
           <p:spPr>
             <a:xfrm>
               <a:off x="101160" y="597600"/>
-              <a:ext cx="1616040" cy="516600"/>
+              <a:ext cx="1615680" cy="516600"/>
             </a:xfrm>
             <a:prstGeom prst="rect">
               <a:avLst/>
@@ -18427,9 +18373,9 @@
         <p:grpSpPr>
           <a:xfrm>
             <a:off x="6760440" y="4359960"/>
-            <a:ext cx="1616040" cy="556200"/>
+            <a:ext cx="1615680" cy="555840"/>
             <a:chOff x="6760440" y="4359960"/>
-            <a:chExt cx="1616040" cy="556200"/>
+            <a:chExt cx="1615680" cy="555840"/>
           </a:xfrm>
         </p:grpSpPr>
         <p:sp>
@@ -18441,7 +18387,7 @@
           <p:spPr>
             <a:xfrm>
               <a:off x="6760440" y="4359960"/>
-              <a:ext cx="1616040" cy="303120"/>
+              <a:ext cx="1615680" cy="303120"/>
             </a:xfrm>
             <a:prstGeom prst="rect">
               <a:avLst/>
@@ -18498,7 +18444,7 @@
           <p:spPr>
             <a:xfrm>
               <a:off x="6760440" y="4621320"/>
-              <a:ext cx="1616040" cy="294840"/>
+              <a:ext cx="1615680" cy="294480"/>
             </a:xfrm>
             <a:prstGeom prst="rect">
               <a:avLst/>
@@ -18547,7 +18493,7 @@
         <p:spPr>
           <a:xfrm>
             <a:off x="9144000" y="2057400"/>
-            <a:ext cx="472320" cy="377280"/>
+            <a:ext cx="471960" cy="376920"/>
           </a:xfrm>
           <a:prstGeom prst="triangle">
             <a:avLst>
@@ -18615,8 +18561,8 @@
         </p:nvCxnSpPr>
         <p:spPr>
           <a:xfrm flipH="1">
-            <a:off x="8026200" y="4106520"/>
-            <a:ext cx="1431720" cy="261720"/>
+            <a:off x="8026200" y="4106160"/>
+            <a:ext cx="1431720" cy="262440"/>
           </a:xfrm>
           <a:prstGeom prst="straightConnector1">
             <a:avLst/>
@@ -18639,8 +18585,8 @@
         </p:nvCxnSpPr>
         <p:spPr>
           <a:xfrm flipH="1" flipV="1">
-            <a:off x="9457560" y="4106520"/>
-            <a:ext cx="482040" cy="243360"/>
+            <a:off x="9457560" y="4106160"/>
+            <a:ext cx="482400" cy="244080"/>
           </a:xfrm>
           <a:prstGeom prst="straightConnector1">
             <a:avLst/>
@@ -18663,8 +18609,8 @@
         </p:nvCxnSpPr>
         <p:spPr>
           <a:xfrm flipH="1">
-            <a:off x="9346320" y="2434680"/>
-            <a:ext cx="34200" cy="453240"/>
+            <a:off x="9346320" y="2434320"/>
+            <a:ext cx="34200" cy="453960"/>
           </a:xfrm>
           <a:prstGeom prst="straightConnector1">
             <a:avLst/>
@@ -18711,7 +18657,7 @@
         <p:spPr>
           <a:xfrm>
             <a:off x="7089840" y="5715000"/>
-            <a:ext cx="1616040" cy="303120"/>
+            <a:ext cx="1615680" cy="303120"/>
           </a:xfrm>
           <a:prstGeom prst="rect">
             <a:avLst/>
@@ -18768,7 +18714,7 @@
         <p:spPr>
           <a:xfrm>
             <a:off x="6760440" y="5183280"/>
-            <a:ext cx="1819440" cy="377280"/>
+            <a:ext cx="1819080" cy="376920"/>
           </a:xfrm>
           <a:prstGeom prst="diamond">
             <a:avLst/>
@@ -18833,7 +18779,7 @@
         <p:spPr>
           <a:xfrm flipH="1">
             <a:off x="0" y="3657600"/>
-            <a:ext cx="1839240" cy="10440"/>
+            <a:ext cx="1839600" cy="10800"/>
           </a:xfrm>
           <a:prstGeom prst="straightConnector1">
             <a:avLst/>
@@ -18855,9 +18801,9 @@
         <p:grpSpPr>
           <a:xfrm>
             <a:off x="8534520" y="2879640"/>
-            <a:ext cx="1616040" cy="556920"/>
+            <a:ext cx="1615680" cy="556560"/>
             <a:chOff x="8534520" y="2879640"/>
-            <a:chExt cx="1616040" cy="556920"/>
+            <a:chExt cx="1615680" cy="556560"/>
           </a:xfrm>
         </p:grpSpPr>
         <p:sp>
@@ -18869,7 +18815,7 @@
           <p:spPr>
             <a:xfrm>
               <a:off x="8534520" y="2879640"/>
-              <a:ext cx="1616040" cy="303120"/>
+              <a:ext cx="1615680" cy="303120"/>
             </a:xfrm>
             <a:prstGeom prst="rect">
               <a:avLst/>
@@ -18926,7 +18872,7 @@
           <p:spPr>
             <a:xfrm>
               <a:off x="8534520" y="3141000"/>
-              <a:ext cx="1616040" cy="295560"/>
+              <a:ext cx="1615680" cy="295200"/>
             </a:xfrm>
             <a:prstGeom prst="rect">
               <a:avLst/>
@@ -18975,9 +18921,9 @@
         <p:grpSpPr>
           <a:xfrm>
             <a:off x="8534520" y="2879640"/>
-            <a:ext cx="1616040" cy="564480"/>
+            <a:ext cx="1615680" cy="564480"/>
             <a:chOff x="8534520" y="2879640"/>
-            <a:chExt cx="1616040" cy="564480"/>
+            <a:chExt cx="1615680" cy="564480"/>
           </a:xfrm>
         </p:grpSpPr>
         <p:sp>
@@ -18989,7 +18935,7 @@
           <p:spPr>
             <a:xfrm>
               <a:off x="8534520" y="2879640"/>
-              <a:ext cx="1616040" cy="303120"/>
+              <a:ext cx="1615680" cy="303120"/>
             </a:xfrm>
             <a:prstGeom prst="rect">
               <a:avLst/>
@@ -19046,7 +18992,7 @@
           <p:spPr>
             <a:xfrm>
               <a:off x="8534520" y="3141000"/>
-              <a:ext cx="1616040" cy="303120"/>
+              <a:ext cx="1615680" cy="303120"/>
             </a:xfrm>
             <a:prstGeom prst="rect">
               <a:avLst/>
@@ -19109,7 +19055,7 @@
         <p:spPr>
           <a:xfrm>
             <a:off x="9221400" y="3729240"/>
-            <a:ext cx="472320" cy="377280"/>
+            <a:ext cx="471960" cy="376920"/>
           </a:xfrm>
           <a:prstGeom prst="triangle">
             <a:avLst>
@@ -19201,7 +19147,7 @@
         <p:spPr>
           <a:xfrm>
             <a:off x="8556840" y="3657600"/>
-            <a:ext cx="1839240" cy="10440"/>
+            <a:ext cx="1839600" cy="10800"/>
           </a:xfrm>
           <a:prstGeom prst="straightConnector1">
             <a:avLst/>
@@ -19224,7 +19170,7 @@
         <p:spPr>
           <a:xfrm>
             <a:off x="9601200" y="3382920"/>
-            <a:ext cx="906120" cy="338040"/>
+            <a:ext cx="905760" cy="337680"/>
           </a:xfrm>
           <a:prstGeom prst="rect">
             <a:avLst/>
@@ -19277,7 +19223,7 @@
         <p:spPr>
           <a:xfrm>
             <a:off x="2057400" y="2132280"/>
-            <a:ext cx="1616040" cy="303120"/>
+            <a:ext cx="1615680" cy="303120"/>
           </a:xfrm>
           <a:prstGeom prst="rect">
             <a:avLst/>
@@ -19334,7 +19280,7 @@
         <p:spPr>
           <a:xfrm>
             <a:off x="2057400" y="2393640"/>
-            <a:ext cx="1616040" cy="187560"/>
+            <a:ext cx="1615680" cy="187200"/>
           </a:xfrm>
           <a:prstGeom prst="rect">
             <a:avLst/>
@@ -19382,7 +19328,7 @@
         <p:spPr>
           <a:xfrm>
             <a:off x="2613960" y="1217880"/>
-            <a:ext cx="472320" cy="377280"/>
+            <a:ext cx="471960" cy="376920"/>
           </a:xfrm>
           <a:prstGeom prst="triangle">
             <a:avLst>
@@ -19451,8 +19397,8 @@
         </p:nvCxnSpPr>
         <p:spPr>
           <a:xfrm>
-            <a:off x="2850120" y="1595160"/>
-            <a:ext cx="15480" cy="537480"/>
+            <a:off x="2850120" y="1594800"/>
+            <a:ext cx="15480" cy="537840"/>
           </a:xfrm>
           <a:prstGeom prst="straightConnector1">
             <a:avLst/>
@@ -19501,8 +19447,8 @@
         </p:nvCxnSpPr>
         <p:spPr>
           <a:xfrm>
-            <a:off x="7568280" y="4916160"/>
-            <a:ext cx="102240" cy="267480"/>
+            <a:off x="7568280" y="4915800"/>
+            <a:ext cx="102240" cy="267840"/>
           </a:xfrm>
           <a:prstGeom prst="straightConnector1">
             <a:avLst/>
@@ -19527,8 +19473,8 @@
         </p:nvCxnSpPr>
         <p:spPr>
           <a:xfrm>
-            <a:off x="7670160" y="5560560"/>
-            <a:ext cx="227880" cy="154800"/>
+            <a:off x="7670160" y="5560200"/>
+            <a:ext cx="227880" cy="155160"/>
           </a:xfrm>
           <a:prstGeom prst="straightConnector1">
             <a:avLst/>
@@ -19550,9 +19496,9 @@
         <p:grpSpPr>
           <a:xfrm>
             <a:off x="10265040" y="5029200"/>
-            <a:ext cx="1616040" cy="556560"/>
+            <a:ext cx="1615680" cy="556200"/>
             <a:chOff x="10265040" y="5029200"/>
-            <a:chExt cx="1616040" cy="556560"/>
+            <a:chExt cx="1615680" cy="556200"/>
           </a:xfrm>
         </p:grpSpPr>
         <p:sp>
@@ -19564,7 +19510,7 @@
           <p:spPr>
             <a:xfrm>
               <a:off x="10265040" y="5029200"/>
-              <a:ext cx="1616040" cy="303120"/>
+              <a:ext cx="1615680" cy="303120"/>
             </a:xfrm>
             <a:prstGeom prst="rect">
               <a:avLst/>
@@ -19621,7 +19567,7 @@
           <p:spPr>
             <a:xfrm>
               <a:off x="10265040" y="5290560"/>
-              <a:ext cx="1616040" cy="295200"/>
+              <a:ext cx="1615680" cy="294840"/>
             </a:xfrm>
             <a:prstGeom prst="rect">
               <a:avLst/>
@@ -19672,8 +19618,8 @@
         </p:nvCxnSpPr>
         <p:spPr>
           <a:xfrm flipH="1" flipV="1">
-            <a:off x="9693720" y="4106520"/>
-            <a:ext cx="1379520" cy="923040"/>
+            <a:off x="9693360" y="4106160"/>
+            <a:ext cx="1379880" cy="923400"/>
           </a:xfrm>
           <a:prstGeom prst="straightConnector1">
             <a:avLst/>
@@ -19695,9 +19641,9 @@
         <p:grpSpPr>
           <a:xfrm>
             <a:off x="9122040" y="4343400"/>
-            <a:ext cx="1616040" cy="556560"/>
+            <a:ext cx="1615680" cy="556200"/>
             <a:chOff x="9122040" y="4343400"/>
-            <a:chExt cx="1616040" cy="556560"/>
+            <a:chExt cx="1615680" cy="556200"/>
           </a:xfrm>
         </p:grpSpPr>
         <p:sp>
@@ -19709,7 +19655,7 @@
           <p:spPr>
             <a:xfrm>
               <a:off x="9122040" y="4343400"/>
-              <a:ext cx="1616040" cy="303120"/>
+              <a:ext cx="1615680" cy="303120"/>
             </a:xfrm>
             <a:prstGeom prst="rect">
               <a:avLst/>
@@ -19766,7 +19712,7 @@
           <p:spPr>
             <a:xfrm>
               <a:off x="9122040" y="4604760"/>
-              <a:ext cx="1616040" cy="295200"/>
+              <a:ext cx="1615680" cy="294840"/>
             </a:xfrm>
             <a:prstGeom prst="rect">
               <a:avLst/>
@@ -19815,7 +19761,7 @@
         <p:spPr>
           <a:xfrm>
             <a:off x="10037520" y="2131560"/>
-            <a:ext cx="472320" cy="377280"/>
+            <a:ext cx="471960" cy="376920"/>
           </a:xfrm>
           <a:prstGeom prst="triangle">
             <a:avLst>
@@ -19907,9 +19853,9 @@
         <p:grpSpPr>
           <a:xfrm>
             <a:off x="10494000" y="2866680"/>
-            <a:ext cx="1616040" cy="556560"/>
+            <a:ext cx="1615680" cy="556200"/>
             <a:chOff x="10494000" y="2866680"/>
-            <a:chExt cx="1616040" cy="556560"/>
+            <a:chExt cx="1615680" cy="556200"/>
           </a:xfrm>
         </p:grpSpPr>
         <p:sp>
@@ -19921,7 +19867,7 @@
           <p:spPr>
             <a:xfrm>
               <a:off x="10494000" y="2866680"/>
-              <a:ext cx="1616040" cy="303120"/>
+              <a:ext cx="1615680" cy="303120"/>
             </a:xfrm>
             <a:prstGeom prst="rect">
               <a:avLst/>
@@ -19978,7 +19924,7 @@
           <p:spPr>
             <a:xfrm>
               <a:off x="10494000" y="3128040"/>
-              <a:ext cx="1616040" cy="295200"/>
+              <a:ext cx="1615680" cy="294840"/>
             </a:xfrm>
             <a:prstGeom prst="rect">
               <a:avLst/>
@@ -20029,8 +19975,8 @@
         </p:nvCxnSpPr>
         <p:spPr>
           <a:xfrm>
-            <a:off x="10273680" y="2508840"/>
-            <a:ext cx="1028520" cy="358200"/>
+            <a:off x="10273680" y="2508480"/>
+            <a:ext cx="1028520" cy="358560"/>
           </a:xfrm>
           <a:prstGeom prst="straightConnector1">
             <a:avLst/>
@@ -20082,7 +20028,7 @@
         <p:spPr>
           <a:xfrm flipH="1">
             <a:off x="0" y="3073320"/>
-            <a:ext cx="1839240" cy="10440"/>
+            <a:ext cx="1839600" cy="10800"/>
           </a:xfrm>
           <a:prstGeom prst="straightConnector1">
             <a:avLst/>
@@ -20105,7 +20051,7 @@
         <p:spPr>
           <a:xfrm>
             <a:off x="0" y="2489400"/>
-            <a:ext cx="1839240" cy="10440"/>
+            <a:ext cx="1839600" cy="10800"/>
           </a:xfrm>
           <a:prstGeom prst="straightConnector1">
             <a:avLst/>
@@ -20128,7 +20074,7 @@
         <p:spPr>
           <a:xfrm>
             <a:off x="0" y="2781360"/>
-            <a:ext cx="1839240" cy="10440"/>
+            <a:ext cx="1839600" cy="10800"/>
           </a:xfrm>
           <a:prstGeom prst="straightConnector1">
             <a:avLst/>
@@ -20151,7 +20097,7 @@
         <p:spPr>
           <a:xfrm flipH="1">
             <a:off x="0" y="3657600"/>
-            <a:ext cx="1839240" cy="10440"/>
+            <a:ext cx="1839600" cy="10800"/>
           </a:xfrm>
           <a:prstGeom prst="straightConnector1">
             <a:avLst/>
@@ -20173,7 +20119,7 @@
         <p:spPr>
           <a:xfrm>
             <a:off x="128520" y="6134040"/>
-            <a:ext cx="1561320" cy="377280"/>
+            <a:ext cx="1560960" cy="376920"/>
           </a:xfrm>
           <a:prstGeom prst="diamond">
             <a:avLst/>
@@ -20238,7 +20184,7 @@
         <p:spPr>
           <a:xfrm>
             <a:off x="302760" y="5454000"/>
-            <a:ext cx="1212840" cy="377280"/>
+            <a:ext cx="1212480" cy="376920"/>
           </a:xfrm>
           <a:prstGeom prst="ellipse">
             <a:avLst/>
@@ -20301,7 +20247,7 @@
         <p:spPr>
           <a:xfrm>
             <a:off x="101160" y="336240"/>
-            <a:ext cx="1616040" cy="303120"/>
+            <a:ext cx="1615680" cy="303120"/>
           </a:xfrm>
           <a:prstGeom prst="rect">
             <a:avLst/>
@@ -20358,7 +20304,7 @@
         <p:spPr>
           <a:xfrm>
             <a:off x="101160" y="597600"/>
-            <a:ext cx="1616040" cy="516600"/>
+            <a:ext cx="1615680" cy="516600"/>
           </a:xfrm>
           <a:prstGeom prst="rect">
             <a:avLst/>
@@ -20448,7 +20394,7 @@
         <p:spPr>
           <a:xfrm>
             <a:off x="8458200" y="5486400"/>
-            <a:ext cx="1616040" cy="303120"/>
+            <a:ext cx="1615680" cy="303120"/>
           </a:xfrm>
           <a:prstGeom prst="rect">
             <a:avLst/>
@@ -20505,7 +20451,7 @@
         <p:spPr>
           <a:xfrm>
             <a:off x="128520" y="4629600"/>
-            <a:ext cx="1561320" cy="522000"/>
+            <a:ext cx="1560960" cy="521640"/>
           </a:xfrm>
           <a:prstGeom prst="diamond">
             <a:avLst/>
@@ -20593,7 +20539,7 @@
         <p:spPr>
           <a:xfrm>
             <a:off x="0" y="3365640"/>
-            <a:ext cx="1839240" cy="10440"/>
+            <a:ext cx="1839600" cy="10800"/>
           </a:xfrm>
           <a:prstGeom prst="straightConnector1">
             <a:avLst/>
@@ -20615,7 +20561,7 @@
         <p:spPr>
           <a:xfrm>
             <a:off x="673200" y="3949920"/>
-            <a:ext cx="472320" cy="377280"/>
+            <a:ext cx="471960" cy="376920"/>
           </a:xfrm>
           <a:prstGeom prst="triangle">
             <a:avLst>
@@ -20682,9 +20628,9 @@
         <p:grpSpPr>
           <a:xfrm>
             <a:off x="101160" y="1413000"/>
-            <a:ext cx="1616040" cy="777960"/>
+            <a:ext cx="1615680" cy="777960"/>
             <a:chOff x="101160" y="1413000"/>
-            <a:chExt cx="1616040" cy="777960"/>
+            <a:chExt cx="1615680" cy="777960"/>
           </a:xfrm>
         </p:grpSpPr>
         <p:sp>
@@ -20696,7 +20642,7 @@
           <p:spPr>
             <a:xfrm>
               <a:off x="101160" y="1413000"/>
-              <a:ext cx="1616040" cy="303120"/>
+              <a:ext cx="1615680" cy="303120"/>
             </a:xfrm>
             <a:prstGeom prst="rect">
               <a:avLst/>
@@ -20754,7 +20700,7 @@
           <p:spPr>
             <a:xfrm>
               <a:off x="101160" y="1674360"/>
-              <a:ext cx="1616040" cy="516600"/>
+              <a:ext cx="1615680" cy="516600"/>
             </a:xfrm>
             <a:prstGeom prst="rect">
               <a:avLst/>
@@ -20846,9 +20792,9 @@
         <p:grpSpPr>
           <a:xfrm>
             <a:off x="4296600" y="4022640"/>
-            <a:ext cx="1616040" cy="1846440"/>
+            <a:ext cx="1615680" cy="1846440"/>
             <a:chOff x="4296600" y="4022640"/>
-            <a:chExt cx="1616040" cy="1846440"/>
+            <a:chExt cx="1615680" cy="1846440"/>
           </a:xfrm>
         </p:grpSpPr>
         <p:sp>
@@ -20860,7 +20806,7 @@
           <p:spPr>
             <a:xfrm>
               <a:off x="4296600" y="4022640"/>
-              <a:ext cx="1616040" cy="303120"/>
+              <a:ext cx="1615680" cy="303120"/>
             </a:xfrm>
             <a:prstGeom prst="rect">
               <a:avLst/>
@@ -20917,7 +20863,7 @@
           <p:spPr>
             <a:xfrm>
               <a:off x="4296600" y="4284000"/>
-              <a:ext cx="1616040" cy="1585080"/>
+              <a:ext cx="1615680" cy="1585080"/>
             </a:xfrm>
             <a:prstGeom prst="rect">
               <a:avLst/>
@@ -21143,9 +21089,9 @@
         <p:grpSpPr>
           <a:xfrm>
             <a:off x="9348840" y="2254320"/>
-            <a:ext cx="1616040" cy="1631880"/>
+            <a:ext cx="1615680" cy="1631880"/>
             <a:chOff x="9348840" y="2254320"/>
-            <a:chExt cx="1616040" cy="1631880"/>
+            <a:chExt cx="1615680" cy="1631880"/>
           </a:xfrm>
         </p:grpSpPr>
         <p:sp>
@@ -21157,7 +21103,7 @@
           <p:spPr>
             <a:xfrm>
               <a:off x="9348840" y="2254320"/>
-              <a:ext cx="1616040" cy="303120"/>
+              <a:ext cx="1615680" cy="303120"/>
             </a:xfrm>
             <a:prstGeom prst="rect">
               <a:avLst/>
@@ -21214,7 +21160,7 @@
           <p:spPr>
             <a:xfrm>
               <a:off x="9348840" y="2515680"/>
-              <a:ext cx="1616040" cy="1370520"/>
+              <a:ext cx="1615680" cy="1370520"/>
             </a:xfrm>
             <a:prstGeom prst="rect">
               <a:avLst/>
@@ -21413,7 +21359,7 @@
         <p:spPr>
           <a:xfrm>
             <a:off x="9402120" y="4572000"/>
-            <a:ext cx="1561320" cy="377280"/>
+            <a:ext cx="1560960" cy="376920"/>
           </a:xfrm>
           <a:prstGeom prst="diamond">
             <a:avLst/>
@@ -21478,7 +21424,7 @@
         <p:spPr>
           <a:xfrm>
             <a:off x="7007400" y="4572000"/>
-            <a:ext cx="1670040" cy="377280"/>
+            <a:ext cx="1669680" cy="376920"/>
           </a:xfrm>
           <a:prstGeom prst="ellipse">
             <a:avLst/>
@@ -21541,9 +21487,9 @@
         <p:grpSpPr>
           <a:xfrm>
             <a:off x="9348840" y="2254320"/>
-            <a:ext cx="1616040" cy="1631880"/>
+            <a:ext cx="1615680" cy="1631880"/>
             <a:chOff x="9348840" y="2254320"/>
-            <a:chExt cx="1616040" cy="1631880"/>
+            <a:chExt cx="1615680" cy="1631880"/>
           </a:xfrm>
         </p:grpSpPr>
         <p:sp>
@@ -21555,7 +21501,7 @@
           <p:spPr>
             <a:xfrm>
               <a:off x="9348840" y="2254320"/>
-              <a:ext cx="1616040" cy="303120"/>
+              <a:ext cx="1615680" cy="303120"/>
             </a:xfrm>
             <a:prstGeom prst="rect">
               <a:avLst/>
@@ -21612,7 +21558,7 @@
           <p:spPr>
             <a:xfrm>
               <a:off x="9348840" y="2515680"/>
-              <a:ext cx="1616040" cy="1370520"/>
+              <a:ext cx="1615680" cy="1370520"/>
             </a:xfrm>
             <a:prstGeom prst="rect">
               <a:avLst/>
@@ -21811,9 +21757,9 @@
         <p:grpSpPr>
           <a:xfrm>
             <a:off x="9348840" y="2254320"/>
-            <a:ext cx="1616040" cy="1845360"/>
+            <a:ext cx="1615680" cy="1845360"/>
             <a:chOff x="9348840" y="2254320"/>
-            <a:chExt cx="1616040" cy="1845360"/>
+            <a:chExt cx="1615680" cy="1845360"/>
           </a:xfrm>
         </p:grpSpPr>
         <p:sp>
@@ -21825,7 +21771,7 @@
           <p:spPr>
             <a:xfrm>
               <a:off x="9348840" y="2254320"/>
-              <a:ext cx="1616040" cy="303120"/>
+              <a:ext cx="1615680" cy="303120"/>
             </a:xfrm>
             <a:prstGeom prst="rect">
               <a:avLst/>
@@ -21882,7 +21828,7 @@
           <p:spPr>
             <a:xfrm>
               <a:off x="9348840" y="2515680"/>
-              <a:ext cx="1616040" cy="1584000"/>
+              <a:ext cx="1615680" cy="1584000"/>
             </a:xfrm>
             <a:prstGeom prst="rect">
               <a:avLst/>
@@ -22108,7 +22054,7 @@
         <p:spPr>
           <a:xfrm>
             <a:off x="7086600" y="3501720"/>
-            <a:ext cx="1819440" cy="377280"/>
+            <a:ext cx="1819080" cy="376920"/>
           </a:xfrm>
           <a:prstGeom prst="diamond">
             <a:avLst/>
@@ -22175,8 +22121,8 @@
         </p:nvCxnSpPr>
         <p:spPr>
           <a:xfrm flipH="1">
-            <a:off x="9266040" y="4949280"/>
-            <a:ext cx="917280" cy="537480"/>
+            <a:off x="9266040" y="4948920"/>
+            <a:ext cx="916920" cy="537840"/>
           </a:xfrm>
           <a:prstGeom prst="straightConnector1">
             <a:avLst/>
@@ -22201,7 +22147,7 @@
         <p:spPr>
           <a:xfrm>
             <a:off x="10156680" y="4099680"/>
-            <a:ext cx="26640" cy="472680"/>
+            <a:ext cx="26280" cy="472680"/>
           </a:xfrm>
           <a:prstGeom prst="straightConnector1">
             <a:avLst/>
@@ -22225,8 +22171,8 @@
         </p:nvCxnSpPr>
         <p:spPr>
           <a:xfrm flipH="1">
-            <a:off x="8677440" y="4760640"/>
-            <a:ext cx="725040" cy="360"/>
+            <a:off x="8677080" y="4760640"/>
+            <a:ext cx="725400" cy="360"/>
           </a:xfrm>
           <a:prstGeom prst="straightConnector1">
             <a:avLst/>
@@ -22248,7 +22194,7 @@
         <p:spPr>
           <a:xfrm>
             <a:off x="6629400" y="5099760"/>
-            <a:ext cx="1590840" cy="377280"/>
+            <a:ext cx="1590480" cy="376920"/>
           </a:xfrm>
           <a:prstGeom prst="ellipse">
             <a:avLst/>
@@ -22313,8 +22259,8 @@
         </p:nvCxnSpPr>
         <p:spPr>
           <a:xfrm flipH="1">
-            <a:off x="8220240" y="4760640"/>
-            <a:ext cx="1182240" cy="528120"/>
+            <a:off x="8219880" y="4760640"/>
+            <a:ext cx="1182600" cy="528120"/>
           </a:xfrm>
           <a:prstGeom prst="straightConnector1">
             <a:avLst/>
@@ -22338,8 +22284,8 @@
         </p:nvCxnSpPr>
         <p:spPr>
           <a:xfrm flipV="1">
-            <a:off x="5912640" y="3690360"/>
-            <a:ext cx="1174320" cy="1255680"/>
+            <a:off x="5912280" y="3690360"/>
+            <a:ext cx="1174680" cy="1255680"/>
           </a:xfrm>
           <a:prstGeom prst="straightConnector1">
             <a:avLst/>
@@ -22364,8 +22310,8 @@
         </p:nvCxnSpPr>
         <p:spPr>
           <a:xfrm flipH="1">
-            <a:off x="8906040" y="3177000"/>
-            <a:ext cx="443160" cy="513720"/>
+            <a:off x="8905680" y="3177000"/>
+            <a:ext cx="443520" cy="513720"/>
           </a:xfrm>
           <a:prstGeom prst="straightConnector1">
             <a:avLst/>
@@ -22387,7 +22333,7 @@
         <p:spPr>
           <a:xfrm>
             <a:off x="7315200" y="4114800"/>
-            <a:ext cx="1670040" cy="377280"/>
+            <a:ext cx="1669680" cy="376920"/>
           </a:xfrm>
           <a:prstGeom prst="ellipse">
             <a:avLst/>
@@ -22452,8 +22398,181 @@
         </p:nvCxnSpPr>
         <p:spPr>
           <a:xfrm flipH="1" flipV="1">
-            <a:off x="8985240" y="4303440"/>
-            <a:ext cx="417240" cy="457560"/>
+            <a:off x="8984880" y="4303440"/>
+            <a:ext cx="417600" cy="457560"/>
+          </a:xfrm>
+          <a:prstGeom prst="straightConnector1">
+            <a:avLst/>
+          </a:prstGeom>
+          <a:ln w="25400">
+            <a:solidFill>
+              <a:srgbClr val="000000"/>
+            </a:solidFill>
+            <a:round/>
+          </a:ln>
+        </p:spPr>
+      </p:cxnSp>
+      <p:sp>
+        <p:nvSpPr>
+          <p:cNvPr id="332" name="TextBox 62"/>
+          <p:cNvSpPr/>
+          <p:nvPr/>
+        </p:nvSpPr>
+        <p:spPr>
+          <a:xfrm>
+            <a:off x="2727720" y="1982880"/>
+            <a:ext cx="1615680" cy="303120"/>
+          </a:xfrm>
+          <a:prstGeom prst="rect">
+            <a:avLst/>
+          </a:prstGeom>
+          <a:solidFill>
+            <a:schemeClr val="bg1"/>
+          </a:solidFill>
+          <a:ln w="0">
+            <a:solidFill>
+              <a:srgbClr val="000000"/>
+            </a:solidFill>
+          </a:ln>
+        </p:spPr>
+        <p:style>
+          <a:lnRef idx="0"/>
+          <a:fillRef idx="0"/>
+          <a:effectRef idx="0"/>
+          <a:fontRef idx="minor"/>
+        </p:style>
+        <p:txBody>
+          <a:bodyPr lIns="90000" rIns="90000" tIns="45000" bIns="45000" anchor="t">
+            <a:spAutoFit/>
+          </a:bodyPr>
+          <a:p>
+            <a:pPr algn="ctr" defTabSz="914400">
+              <a:lnSpc>
+                <a:spcPct val="100000"/>
+              </a:lnSpc>
+            </a:pPr>
+            <a:r>
+              <a:rPr b="0" lang="en-US" sz="1400" spc="-1" strike="noStrike">
+                <a:solidFill>
+                  <a:schemeClr val="dk1"/>
+                </a:solidFill>
+                <a:latin typeface="Calibri"/>
+              </a:rPr>
+              <a:t>Player</a:t>
+            </a:r>
+            <a:endParaRPr b="0" lang="en-US" sz="1400" spc="-1" strike="noStrike">
+              <a:solidFill>
+                <a:srgbClr val="000000"/>
+              </a:solidFill>
+              <a:latin typeface="Arial"/>
+            </a:endParaRPr>
+          </a:p>
+        </p:txBody>
+      </p:sp>
+      <p:sp>
+        <p:nvSpPr>
+          <p:cNvPr id="333" name="Diamond 16"/>
+          <p:cNvSpPr/>
+          <p:nvPr/>
+        </p:nvSpPr>
+        <p:spPr>
+          <a:xfrm rot="21559200">
+            <a:off x="2295720" y="3255120"/>
+            <a:ext cx="2045520" cy="390240"/>
+          </a:xfrm>
+          <a:prstGeom prst="diamond">
+            <a:avLst/>
+          </a:prstGeom>
+          <a:solidFill>
+            <a:schemeClr val="bg1"/>
+          </a:solidFill>
+          <a:ln>
+            <a:solidFill>
+              <a:srgbClr val="000000"/>
+            </a:solidFill>
+          </a:ln>
+        </p:spPr>
+        <p:style>
+          <a:lnRef idx="2">
+            <a:schemeClr val="accent1">
+              <a:shade val="50000"/>
+            </a:schemeClr>
+          </a:lnRef>
+          <a:fillRef idx="1">
+            <a:schemeClr val="accent1"/>
+          </a:fillRef>
+          <a:effectRef idx="0">
+            <a:schemeClr val="accent1"/>
+          </a:effectRef>
+          <a:fontRef idx="minor"/>
+        </p:style>
+        <p:txBody>
+          <a:bodyPr lIns="90000" rIns="90000" tIns="45000" bIns="45000" anchor="ctr">
+            <a:noAutofit/>
+          </a:bodyPr>
+          <a:p>
+            <a:pPr algn="ctr" defTabSz="914400">
+              <a:lnSpc>
+                <a:spcPct val="100000"/>
+              </a:lnSpc>
+            </a:pPr>
+            <a:r>
+              <a:rPr b="0" lang="en-US" sz="1400" spc="-1" strike="noStrike">
+                <a:solidFill>
+                  <a:schemeClr val="dk1"/>
+                </a:solidFill>
+                <a:latin typeface="Calibri"/>
+              </a:rPr>
+              <a:t>Owned by</a:t>
+            </a:r>
+            <a:endParaRPr b="0" lang="en-US" sz="1400" spc="-1" strike="noStrike">
+              <a:solidFill>
+                <a:srgbClr val="000000"/>
+              </a:solidFill>
+              <a:latin typeface="Arial"/>
+            </a:endParaRPr>
+          </a:p>
+        </p:txBody>
+      </p:sp>
+      <p:cxnSp>
+        <p:nvCxnSpPr>
+          <p:cNvPr id="334" name="Straight Arrow Connector 39"/>
+          <p:cNvCxnSpPr>
+            <a:stCxn id="308" idx="1"/>
+            <a:endCxn id="333" idx="2"/>
+          </p:cNvCxnSpPr>
+          <p:nvPr/>
+        </p:nvCxnSpPr>
+        <p:spPr>
+          <a:xfrm flipH="1" flipV="1">
+            <a:off x="3320640" y="3646440"/>
+            <a:ext cx="976320" cy="1299600"/>
+          </a:xfrm>
+          <a:prstGeom prst="straightConnector1">
+            <a:avLst/>
+          </a:prstGeom>
+          <a:ln cap="sq" w="76200">
+            <a:solidFill>
+              <a:srgbClr val="000000"/>
+            </a:solidFill>
+            <a:round/>
+            <a:tailEnd len="sm" type="triangle" w="sm"/>
+          </a:ln>
+        </p:spPr>
+      </p:cxnSp>
+      <p:cxnSp>
+        <p:nvCxnSpPr>
+          <p:cNvPr id="335" name="Straight Arrow Connector 50"/>
+          <p:cNvCxnSpPr>
+            <a:stCxn id="332" idx="2"/>
+            <a:endCxn id="333" idx="0"/>
+          </p:cNvCxnSpPr>
+          <p:nvPr/>
+        </p:nvCxnSpPr>
+        <p:spPr>
+          <a:xfrm flipH="1">
+            <a:off x="3316320" y="2286000"/>
+            <a:ext cx="219600" cy="970200"/>
           </a:xfrm>
           <a:prstGeom prst="straightConnector1">
             <a:avLst/>
@@ -22498,14 +22617,14 @@
       </p:grpSpPr>
       <p:cxnSp>
         <p:nvCxnSpPr>
-          <p:cNvPr id="332" name="Straight Arrow Connector 6"/>
+          <p:cNvPr id="336" name="Straight Arrow Connector 6"/>
           <p:cNvCxnSpPr/>
           <p:nvPr/>
         </p:nvCxnSpPr>
         <p:spPr>
           <a:xfrm flipH="1">
             <a:off x="0" y="3073320"/>
-            <a:ext cx="1839240" cy="10440"/>
+            <a:ext cx="1839600" cy="10800"/>
           </a:xfrm>
           <a:prstGeom prst="straightConnector1">
             <a:avLst/>
@@ -22521,14 +22640,14 @@
       </p:cxnSp>
       <p:cxnSp>
         <p:nvCxnSpPr>
-          <p:cNvPr id="333" name="Straight Arrow Connector 7"/>
+          <p:cNvPr id="337" name="Straight Arrow Connector 7"/>
           <p:cNvCxnSpPr/>
           <p:nvPr/>
         </p:nvCxnSpPr>
         <p:spPr>
           <a:xfrm>
             <a:off x="0" y="2489400"/>
-            <a:ext cx="1839240" cy="10440"/>
+            <a:ext cx="1839600" cy="10800"/>
           </a:xfrm>
           <a:prstGeom prst="straightConnector1">
             <a:avLst/>
@@ -22544,14 +22663,14 @@
       </p:cxnSp>
       <p:cxnSp>
         <p:nvCxnSpPr>
-          <p:cNvPr id="334" name="Straight Arrow Connector 8"/>
+          <p:cNvPr id="338" name="Straight Arrow Connector 8"/>
           <p:cNvCxnSpPr/>
           <p:nvPr/>
         </p:nvCxnSpPr>
         <p:spPr>
           <a:xfrm>
             <a:off x="0" y="2781360"/>
-            <a:ext cx="1839240" cy="10440"/>
+            <a:ext cx="1839600" cy="10800"/>
           </a:xfrm>
           <a:prstGeom prst="straightConnector1">
             <a:avLst/>
@@ -22567,14 +22686,14 @@
       </p:cxnSp>
       <p:cxnSp>
         <p:nvCxnSpPr>
-          <p:cNvPr id="335" name="Straight Arrow Connector 9"/>
+          <p:cNvPr id="339" name="Straight Arrow Connector 9"/>
           <p:cNvCxnSpPr/>
           <p:nvPr/>
         </p:nvCxnSpPr>
         <p:spPr>
           <a:xfrm flipH="1">
             <a:off x="0" y="3657600"/>
-            <a:ext cx="1839240" cy="10440"/>
+            <a:ext cx="1839600" cy="10800"/>
           </a:xfrm>
           <a:prstGeom prst="straightConnector1">
             <a:avLst/>
@@ -22589,14 +22708,14 @@
       </p:cxnSp>
       <p:sp>
         <p:nvSpPr>
-          <p:cNvPr id="336" name="Diamond 3"/>
+          <p:cNvPr id="340" name="Diamond 3"/>
           <p:cNvSpPr/>
           <p:nvPr/>
         </p:nvSpPr>
         <p:spPr>
           <a:xfrm>
             <a:off x="128520" y="6134040"/>
-            <a:ext cx="1561320" cy="377280"/>
+            <a:ext cx="1560960" cy="376920"/>
           </a:xfrm>
           <a:prstGeom prst="diamond">
             <a:avLst/>
@@ -22654,14 +22773,14 @@
       </p:sp>
       <p:sp>
         <p:nvSpPr>
-          <p:cNvPr id="337" name="Oval 2"/>
+          <p:cNvPr id="341" name="Oval 2"/>
           <p:cNvSpPr/>
           <p:nvPr/>
         </p:nvSpPr>
         <p:spPr>
           <a:xfrm>
             <a:off x="302760" y="5454000"/>
-            <a:ext cx="1212840" cy="377280"/>
+            <a:ext cx="1212480" cy="376920"/>
           </a:xfrm>
           <a:prstGeom prst="ellipse">
             <a:avLst/>
@@ -22717,28 +22836,28 @@
       </p:sp>
       <p:grpSp>
         <p:nvGrpSpPr>
-          <p:cNvPr id="338" name="Group 3"/>
+          <p:cNvPr id="342" name="Group 3"/>
           <p:cNvGrpSpPr/>
           <p:nvPr/>
         </p:nvGrpSpPr>
         <p:grpSpPr>
           <a:xfrm>
             <a:off x="101160" y="336240"/>
-            <a:ext cx="1616040" cy="777960"/>
+            <a:ext cx="1615680" cy="777960"/>
             <a:chOff x="101160" y="336240"/>
-            <a:chExt cx="1616040" cy="777960"/>
+            <a:chExt cx="1615680" cy="777960"/>
           </a:xfrm>
         </p:grpSpPr>
         <p:sp>
           <p:nvSpPr>
-            <p:cNvPr id="339" name="TextBox 5"/>
+            <p:cNvPr id="343" name="TextBox 5"/>
             <p:cNvSpPr/>
             <p:nvPr/>
           </p:nvSpPr>
           <p:spPr>
             <a:xfrm>
               <a:off x="101160" y="336240"/>
-              <a:ext cx="1616040" cy="303120"/>
+              <a:ext cx="1615680" cy="303120"/>
             </a:xfrm>
             <a:prstGeom prst="rect">
               <a:avLst/>
@@ -22788,14 +22907,14 @@
         </p:sp>
         <p:sp>
           <p:nvSpPr>
-            <p:cNvPr id="340" name="TextBox 6"/>
+            <p:cNvPr id="344" name="TextBox 6"/>
             <p:cNvSpPr/>
             <p:nvPr/>
           </p:nvSpPr>
           <p:spPr>
             <a:xfrm>
               <a:off x="101160" y="597600"/>
-              <a:ext cx="1616040" cy="516600"/>
+              <a:ext cx="1615680" cy="516600"/>
             </a:xfrm>
             <a:prstGeom prst="rect">
               <a:avLst/>
@@ -22879,14 +22998,14 @@
       </p:grpSp>
       <p:sp>
         <p:nvSpPr>
-          <p:cNvPr id="341" name="Diamond 4"/>
+          <p:cNvPr id="345" name="Diamond 4"/>
           <p:cNvSpPr/>
           <p:nvPr/>
         </p:nvSpPr>
         <p:spPr>
           <a:xfrm>
             <a:off x="128520" y="4629600"/>
-            <a:ext cx="1561320" cy="522000"/>
+            <a:ext cx="1560960" cy="521640"/>
           </a:xfrm>
           <a:prstGeom prst="diamond">
             <a:avLst/>
@@ -22967,14 +23086,14 @@
       </p:sp>
       <p:cxnSp>
         <p:nvCxnSpPr>
-          <p:cNvPr id="342" name="Straight Arrow Connector 10"/>
+          <p:cNvPr id="346" name="Straight Arrow Connector 10"/>
           <p:cNvCxnSpPr/>
           <p:nvPr/>
         </p:nvCxnSpPr>
         <p:spPr>
           <a:xfrm>
             <a:off x="0" y="3365640"/>
-            <a:ext cx="1839240" cy="10440"/>
+            <a:ext cx="1839600" cy="10800"/>
           </a:xfrm>
           <a:prstGeom prst="straightConnector1">
             <a:avLst/>
@@ -22989,14 +23108,14 @@
       </p:cxnSp>
       <p:sp>
         <p:nvSpPr>
-          <p:cNvPr id="343" name="Isosceles Triangle 2"/>
+          <p:cNvPr id="347" name="Isosceles Triangle 2"/>
           <p:cNvSpPr/>
           <p:nvPr/>
         </p:nvSpPr>
         <p:spPr>
           <a:xfrm>
             <a:off x="673200" y="3949920"/>
-            <a:ext cx="472320" cy="377280"/>
+            <a:ext cx="471960" cy="376920"/>
           </a:xfrm>
           <a:prstGeom prst="triangle">
             <a:avLst>
@@ -23056,28 +23175,28 @@
       </p:sp>
       <p:grpSp>
         <p:nvGrpSpPr>
-          <p:cNvPr id="344" name="Group 4"/>
+          <p:cNvPr id="348" name="Group 4"/>
           <p:cNvGrpSpPr/>
           <p:nvPr/>
         </p:nvGrpSpPr>
         <p:grpSpPr>
           <a:xfrm>
             <a:off x="101160" y="1413000"/>
-            <a:ext cx="1616040" cy="777960"/>
+            <a:ext cx="1615680" cy="777960"/>
             <a:chOff x="101160" y="1413000"/>
-            <a:chExt cx="1616040" cy="777960"/>
+            <a:chExt cx="1615680" cy="777960"/>
           </a:xfrm>
         </p:grpSpPr>
         <p:sp>
           <p:nvSpPr>
-            <p:cNvPr id="345" name="TextBox 7"/>
+            <p:cNvPr id="349" name="TextBox 7"/>
             <p:cNvSpPr/>
             <p:nvPr/>
           </p:nvSpPr>
           <p:spPr>
             <a:xfrm>
               <a:off x="101160" y="1413000"/>
-              <a:ext cx="1616040" cy="303120"/>
+              <a:ext cx="1615680" cy="303120"/>
             </a:xfrm>
             <a:prstGeom prst="rect">
               <a:avLst/>
@@ -23128,14 +23247,14 @@
         </p:sp>
         <p:sp>
           <p:nvSpPr>
-            <p:cNvPr id="346" name="TextBox 8"/>
+            <p:cNvPr id="350" name="TextBox 8"/>
             <p:cNvSpPr/>
             <p:nvPr/>
           </p:nvSpPr>
           <p:spPr>
             <a:xfrm>
               <a:off x="101160" y="1674360"/>
-              <a:ext cx="1616040" cy="516600"/>
+              <a:ext cx="1615680" cy="516600"/>
             </a:xfrm>
             <a:prstGeom prst="rect">
               <a:avLst/>
@@ -23220,28 +23339,28 @@
       </p:grpSp>
       <p:grpSp>
         <p:nvGrpSpPr>
-          <p:cNvPr id="347" name="Group 21"/>
+          <p:cNvPr id="351" name="Group 21"/>
           <p:cNvGrpSpPr/>
           <p:nvPr/>
         </p:nvGrpSpPr>
         <p:grpSpPr>
           <a:xfrm>
             <a:off x="3886200" y="2286000"/>
-            <a:ext cx="1616040" cy="1845360"/>
+            <a:ext cx="1615680" cy="1845360"/>
             <a:chOff x="3886200" y="2286000"/>
-            <a:chExt cx="1616040" cy="1845360"/>
+            <a:chExt cx="1615680" cy="1845360"/>
           </a:xfrm>
         </p:grpSpPr>
         <p:sp>
           <p:nvSpPr>
-            <p:cNvPr id="348" name="TextBox 75"/>
+            <p:cNvPr id="352" name="TextBox 75"/>
             <p:cNvSpPr/>
             <p:nvPr/>
           </p:nvSpPr>
           <p:spPr>
             <a:xfrm>
               <a:off x="3886200" y="2286000"/>
-              <a:ext cx="1616040" cy="303120"/>
+              <a:ext cx="1615680" cy="303120"/>
             </a:xfrm>
             <a:prstGeom prst="rect">
               <a:avLst/>
@@ -23291,14 +23410,14 @@
         </p:sp>
         <p:sp>
           <p:nvSpPr>
-            <p:cNvPr id="349" name="TextBox 76"/>
+            <p:cNvPr id="353" name="TextBox 76"/>
             <p:cNvSpPr/>
             <p:nvPr/>
           </p:nvSpPr>
           <p:spPr>
             <a:xfrm>
               <a:off x="3886200" y="2547360"/>
-              <a:ext cx="1616040" cy="1584000"/>
+              <a:ext cx="1615680" cy="1584000"/>
             </a:xfrm>
             <a:prstGeom prst="rect">
               <a:avLst/>

</xml_diff>

<commit_message>
database cleanup & worked on preset script for server
</commit_message>
<xml_diff>
--- a/documentation/database/ER-Diagram.pptx
+++ b/documentation/database/ER-Diagram.pptx
@@ -353,7 +353,7 @@
             <a:pPr indent="0" algn="r">
               <a:buNone/>
             </a:pPr>
-            <a:fld id="{16E4B747-F86C-4F0D-83F2-02D73ED36081}" type="slidenum">
+            <a:fld id="{33EA32FD-6CEC-45AC-8573-475A1778CB21}" type="slidenum">
               <a:rPr b="0" lang="en-US" sz="1400" spc="-1" strike="noStrike">
                 <a:solidFill>
                   <a:srgbClr val="000000"/>
@@ -396,7 +396,7 @@
       </p:grpSpPr>
       <p:sp>
         <p:nvSpPr>
-          <p:cNvPr id="354" name="PlaceHolder 1"/>
+          <p:cNvPr id="349" name="PlaceHolder 1"/>
           <p:cNvSpPr>
             <a:spLocks noGrp="1"/>
           </p:cNvSpPr>
@@ -407,7 +407,7 @@
         <p:spPr>
           <a:xfrm>
             <a:off x="685800" y="1143000"/>
-            <a:ext cx="5475600" cy="3075480"/>
+            <a:ext cx="5475240" cy="3075120"/>
           </a:xfrm>
           <a:prstGeom prst="rect">
             <a:avLst/>
@@ -419,7 +419,7 @@
       </p:sp>
       <p:sp>
         <p:nvSpPr>
-          <p:cNvPr id="355" name="PlaceHolder 2"/>
+          <p:cNvPr id="350" name="PlaceHolder 2"/>
           <p:cNvSpPr>
             <a:spLocks noGrp="1"/>
           </p:cNvSpPr>
@@ -430,7 +430,7 @@
         <p:spPr>
           <a:xfrm>
             <a:off x="685800" y="4400640"/>
-            <a:ext cx="5475600" cy="3589560"/>
+            <a:ext cx="5475240" cy="3589200"/>
           </a:xfrm>
           <a:prstGeom prst="rect">
             <a:avLst/>
@@ -459,7 +459,7 @@
       </p:sp>
       <p:sp>
         <p:nvSpPr>
-          <p:cNvPr id="356" name="PlaceHolder 3"/>
+          <p:cNvPr id="351" name="PlaceHolder 3"/>
           <p:cNvSpPr>
             <a:spLocks noGrp="1"/>
           </p:cNvSpPr>
@@ -470,7 +470,7 @@
         <p:spPr>
           <a:xfrm>
             <a:off x="3884760" y="8685360"/>
-            <a:ext cx="2961000" cy="447840"/>
+            <a:ext cx="2960640" cy="447480"/>
           </a:xfrm>
           <a:prstGeom prst="rect">
             <a:avLst/>
@@ -512,7 +512,7 @@
                 <a:tab algn="l" pos="0"/>
               </a:tabLst>
             </a:pPr>
-            <a:fld id="{980B200D-208E-4626-BB25-C39398B6D96E}" type="slidenum">
+            <a:fld id="{A1A003F0-4DDE-435B-A2A3-754F098E09EA}" type="slidenum">
               <a:rPr b="0" lang="en-US" sz="1200" spc="-1" strike="noStrike">
                 <a:solidFill>
                   <a:schemeClr val="dk1"/>
@@ -555,7 +555,7 @@
       </p:grpSpPr>
       <p:sp>
         <p:nvSpPr>
-          <p:cNvPr id="357" name="PlaceHolder 1"/>
+          <p:cNvPr id="352" name="PlaceHolder 1"/>
           <p:cNvSpPr>
             <a:spLocks noGrp="1"/>
           </p:cNvSpPr>
@@ -566,7 +566,7 @@
         <p:spPr>
           <a:xfrm>
             <a:off x="685800" y="1143000"/>
-            <a:ext cx="5475600" cy="3075480"/>
+            <a:ext cx="5475240" cy="3075120"/>
           </a:xfrm>
           <a:prstGeom prst="rect">
             <a:avLst/>
@@ -578,7 +578,7 @@
       </p:sp>
       <p:sp>
         <p:nvSpPr>
-          <p:cNvPr id="358" name="PlaceHolder 2"/>
+          <p:cNvPr id="353" name="PlaceHolder 2"/>
           <p:cNvSpPr>
             <a:spLocks noGrp="1"/>
           </p:cNvSpPr>
@@ -589,7 +589,7 @@
         <p:spPr>
           <a:xfrm>
             <a:off x="685800" y="4400640"/>
-            <a:ext cx="5475600" cy="3589560"/>
+            <a:ext cx="5475240" cy="3589200"/>
           </a:xfrm>
           <a:prstGeom prst="rect">
             <a:avLst/>
@@ -618,7 +618,7 @@
       </p:sp>
       <p:sp>
         <p:nvSpPr>
-          <p:cNvPr id="359" name="PlaceHolder 3"/>
+          <p:cNvPr id="354" name="PlaceHolder 3"/>
           <p:cNvSpPr>
             <a:spLocks noGrp="1"/>
           </p:cNvSpPr>
@@ -629,7 +629,7 @@
         <p:spPr>
           <a:xfrm>
             <a:off x="3884760" y="8685360"/>
-            <a:ext cx="2961000" cy="447840"/>
+            <a:ext cx="2960640" cy="447480"/>
           </a:xfrm>
           <a:prstGeom prst="rect">
             <a:avLst/>
@@ -671,7 +671,7 @@
                 <a:tab algn="l" pos="0"/>
               </a:tabLst>
             </a:pPr>
-            <a:fld id="{8186ECBC-4976-4B74-8D09-29E7A27AA758}" type="slidenum">
+            <a:fld id="{978F5B79-E32F-4CE8-8FC9-44728BAB47F3}" type="slidenum">
               <a:rPr b="0" lang="en-US" sz="1200" spc="-1" strike="noStrike">
                 <a:solidFill>
                   <a:schemeClr val="dk1"/>
@@ -714,7 +714,7 @@
       </p:grpSpPr>
       <p:sp>
         <p:nvSpPr>
-          <p:cNvPr id="360" name="PlaceHolder 1"/>
+          <p:cNvPr id="355" name="PlaceHolder 1"/>
           <p:cNvSpPr>
             <a:spLocks noGrp="1"/>
           </p:cNvSpPr>
@@ -725,7 +725,7 @@
         <p:spPr>
           <a:xfrm>
             <a:off x="685800" y="1143000"/>
-            <a:ext cx="5475600" cy="3075480"/>
+            <a:ext cx="5475240" cy="3075120"/>
           </a:xfrm>
           <a:prstGeom prst="rect">
             <a:avLst/>
@@ -737,7 +737,7 @@
       </p:sp>
       <p:sp>
         <p:nvSpPr>
-          <p:cNvPr id="361" name="PlaceHolder 2"/>
+          <p:cNvPr id="356" name="PlaceHolder 2"/>
           <p:cNvSpPr>
             <a:spLocks noGrp="1"/>
           </p:cNvSpPr>
@@ -748,7 +748,7 @@
         <p:spPr>
           <a:xfrm>
             <a:off x="685800" y="4400640"/>
-            <a:ext cx="5475600" cy="3589560"/>
+            <a:ext cx="5475240" cy="3589200"/>
           </a:xfrm>
           <a:prstGeom prst="rect">
             <a:avLst/>
@@ -777,7 +777,7 @@
       </p:sp>
       <p:sp>
         <p:nvSpPr>
-          <p:cNvPr id="362" name="PlaceHolder 3"/>
+          <p:cNvPr id="357" name="PlaceHolder 3"/>
           <p:cNvSpPr>
             <a:spLocks noGrp="1"/>
           </p:cNvSpPr>
@@ -788,7 +788,7 @@
         <p:spPr>
           <a:xfrm>
             <a:off x="3884760" y="8685360"/>
-            <a:ext cx="2961000" cy="447840"/>
+            <a:ext cx="2960640" cy="447480"/>
           </a:xfrm>
           <a:prstGeom prst="rect">
             <a:avLst/>
@@ -830,7 +830,7 @@
                 <a:tab algn="l" pos="0"/>
               </a:tabLst>
             </a:pPr>
-            <a:fld id="{D600BE49-D69B-4FBE-8F99-74CEAB1C518B}" type="slidenum">
+            <a:fld id="{DB546DED-2820-4173-807C-34E963CA5385}" type="slidenum">
               <a:rPr b="0" lang="en-US" sz="1200" spc="-1" strike="noStrike">
                 <a:solidFill>
                   <a:schemeClr val="dk1"/>
@@ -873,7 +873,7 @@
       </p:grpSpPr>
       <p:sp>
         <p:nvSpPr>
-          <p:cNvPr id="363" name="PlaceHolder 1"/>
+          <p:cNvPr id="358" name="PlaceHolder 1"/>
           <p:cNvSpPr>
             <a:spLocks noGrp="1"/>
           </p:cNvSpPr>
@@ -884,7 +884,7 @@
         <p:spPr>
           <a:xfrm>
             <a:off x="685800" y="1143000"/>
-            <a:ext cx="5475600" cy="3075480"/>
+            <a:ext cx="5475240" cy="3075120"/>
           </a:xfrm>
           <a:prstGeom prst="rect">
             <a:avLst/>
@@ -896,7 +896,7 @@
       </p:sp>
       <p:sp>
         <p:nvSpPr>
-          <p:cNvPr id="364" name="PlaceHolder 2"/>
+          <p:cNvPr id="359" name="PlaceHolder 2"/>
           <p:cNvSpPr>
             <a:spLocks noGrp="1"/>
           </p:cNvSpPr>
@@ -907,7 +907,7 @@
         <p:spPr>
           <a:xfrm>
             <a:off x="685800" y="4400640"/>
-            <a:ext cx="5475600" cy="3589560"/>
+            <a:ext cx="5475240" cy="3589200"/>
           </a:xfrm>
           <a:prstGeom prst="rect">
             <a:avLst/>
@@ -936,7 +936,7 @@
       </p:sp>
       <p:sp>
         <p:nvSpPr>
-          <p:cNvPr id="365" name="PlaceHolder 3"/>
+          <p:cNvPr id="360" name="PlaceHolder 3"/>
           <p:cNvSpPr>
             <a:spLocks noGrp="1"/>
           </p:cNvSpPr>
@@ -947,7 +947,7 @@
         <p:spPr>
           <a:xfrm>
             <a:off x="3884760" y="8685360"/>
-            <a:ext cx="2961000" cy="447840"/>
+            <a:ext cx="2960640" cy="447480"/>
           </a:xfrm>
           <a:prstGeom prst="rect">
             <a:avLst/>
@@ -989,7 +989,7 @@
                 <a:tab algn="l" pos="0"/>
               </a:tabLst>
             </a:pPr>
-            <a:fld id="{2835B3DE-4551-46EE-B0B8-EC244C278139}" type="slidenum">
+            <a:fld id="{9196D7F0-643C-435F-9DAE-C32EBDFF6672}" type="slidenum">
               <a:rPr b="0" lang="en-US" sz="1200" spc="-1" strike="noStrike">
                 <a:solidFill>
                   <a:schemeClr val="dk1"/>
@@ -1233,7 +1233,7 @@
         <p:txBody>
           <a:bodyPr/>
           <a:p>
-            <a:fld id="{18A009CC-3B30-428C-BCAB-F33D04FB8526}" type="slidenum">
+            <a:fld id="{6234CFF5-A1D6-4A8D-8B92-4720FC3B4F66}" type="slidenum">
               <a:t>&lt;#&gt;</a:t>
             </a:fld>
           </a:p>
@@ -1442,7 +1442,7 @@
         <p:txBody>
           <a:bodyPr/>
           <a:p>
-            <a:fld id="{99B0EAB9-09E4-426E-87E1-78179D445DA3}" type="slidenum">
+            <a:fld id="{DF0980B0-2B0A-4116-9317-D38C089673A4}" type="slidenum">
               <a:t>&lt;#&gt;</a:t>
             </a:fld>
           </a:p>
@@ -1565,7 +1565,7 @@
         <p:txBody>
           <a:bodyPr/>
           <a:p>
-            <a:fld id="{FB5F5201-4675-4755-A892-757BB00DCB4B}" type="slidenum">
+            <a:fld id="{2D891278-4A5C-4853-9D15-8DAA9C567998}" type="slidenum">
               <a:t>&lt;#&gt;</a:t>
             </a:fld>
           </a:p>
@@ -1648,7 +1648,7 @@
         <p:txBody>
           <a:bodyPr/>
           <a:p>
-            <a:fld id="{6D1730F1-7CC8-4597-A81F-20DE23F89857}" type="slidenum">
+            <a:fld id="{7651753C-B9FB-440C-BEC6-5EFFAD0A18DC}" type="slidenum">
               <a:t>&lt;#&gt;</a:t>
             </a:fld>
           </a:p>
@@ -1900,7 +1900,7 @@
         <p:txBody>
           <a:bodyPr/>
           <a:p>
-            <a:fld id="{236BBEAF-752B-4C45-8599-5AFA39501A0A}" type="slidenum">
+            <a:fld id="{FB1900BB-0FC1-40A1-A7C6-5C9C4159DA01}" type="slidenum">
               <a:t>&lt;#&gt;</a:t>
             </a:fld>
           </a:p>
@@ -2152,7 +2152,7 @@
         <p:txBody>
           <a:bodyPr/>
           <a:p>
-            <a:fld id="{FC25DC71-E749-445E-87CA-98FAC38CBB49}" type="slidenum">
+            <a:fld id="{1858413D-65C6-4BCA-A28C-E9CBAE9CE167}" type="slidenum">
               <a:t>&lt;#&gt;</a:t>
             </a:fld>
           </a:p>
@@ -2361,7 +2361,7 @@
         <p:txBody>
           <a:bodyPr/>
           <a:p>
-            <a:fld id="{216AF266-BB64-47D0-B380-05BA66C3A318}" type="slidenum">
+            <a:fld id="{9A0DEAE8-6ED9-4A78-882C-D17CA6AA3D1C}" type="slidenum">
               <a:t>&lt;#&gt;</a:t>
             </a:fld>
           </a:p>
@@ -2656,7 +2656,7 @@
         <p:txBody>
           <a:bodyPr/>
           <a:p>
-            <a:fld id="{1AF4685A-ED2F-4FC7-9DA7-AE416D5F203C}" type="slidenum">
+            <a:fld id="{26562A05-7CDE-4998-98DC-40BB46476D59}" type="slidenum">
               <a:t>&lt;#&gt;</a:t>
             </a:fld>
           </a:p>
@@ -2739,7 +2739,7 @@
         <p:txBody>
           <a:bodyPr/>
           <a:p>
-            <a:fld id="{2A022F35-790F-4AD7-9AB9-C81E7E070A1A}" type="slidenum">
+            <a:fld id="{EB48A2D0-FD53-44AD-8BD2-651F1116E889}" type="slidenum">
               <a:t>&lt;#&gt;</a:t>
             </a:fld>
           </a:p>
@@ -2822,7 +2822,7 @@
         <p:txBody>
           <a:bodyPr/>
           <a:p>
-            <a:fld id="{05F1F192-47F0-4D7F-9D59-14E7A251C2BD}" type="slidenum">
+            <a:fld id="{D296D91A-8860-40DC-AFBD-7D78AB630203}" type="slidenum">
               <a:t>&lt;#&gt;</a:t>
             </a:fld>
           </a:p>
@@ -2988,7 +2988,7 @@
         <p:txBody>
           <a:bodyPr/>
           <a:p>
-            <a:fld id="{79211384-0DF0-4F4E-8397-908F90A0521F}" type="slidenum">
+            <a:fld id="{5C86ED24-CFF0-4A61-B920-EAE8CEB82BF4}" type="slidenum">
               <a:t>&lt;#&gt;</a:t>
             </a:fld>
           </a:p>
@@ -3154,7 +3154,7 @@
         <p:txBody>
           <a:bodyPr/>
           <a:p>
-            <a:fld id="{25A76693-7F3A-46F5-ACF9-4924F3A01E4F}" type="slidenum">
+            <a:fld id="{3D0F05D0-C95E-4130-A308-3ABD0FE20E72}" type="slidenum">
               <a:t>&lt;#&gt;</a:t>
             </a:fld>
           </a:p>
@@ -3219,9 +3219,9 @@
         <p:grpSpPr>
           <a:xfrm>
             <a:off x="6199200" y="6162840"/>
-            <a:ext cx="5982120" cy="684360"/>
+            <a:ext cx="5981760" cy="684000"/>
             <a:chOff x="6199200" y="6162840"/>
-            <a:chExt cx="5982120" cy="684360"/>
+            <a:chExt cx="5981760" cy="684000"/>
           </a:xfrm>
         </p:grpSpPr>
         <p:pic>
@@ -3237,7 +3237,7 @@
           <p:spPr>
             <a:xfrm>
               <a:off x="6199200" y="6162840"/>
-              <a:ext cx="4045680" cy="684360"/>
+              <a:ext cx="4045320" cy="684000"/>
             </a:xfrm>
             <a:prstGeom prst="rect">
               <a:avLst/>
@@ -3260,7 +3260,7 @@
           <p:spPr>
             <a:xfrm>
               <a:off x="10270080" y="6162840"/>
-              <a:ext cx="1911240" cy="600840"/>
+              <a:ext cx="1910880" cy="600480"/>
             </a:xfrm>
             <a:prstGeom prst="rect">
               <a:avLst/>
@@ -3309,70 +3309,7 @@
                 </a:solidFill>
                 <a:latin typeface="Arial"/>
               </a:rPr>
-              <a:t>Click </a:t>
-            </a:r>
-            <a:r>
-              <a:rPr b="0" lang="en-US" sz="1800" spc="-1" strike="noStrike">
-                <a:solidFill>
-                  <a:srgbClr val="000000"/>
-                </a:solidFill>
-                <a:latin typeface="Arial"/>
-              </a:rPr>
-              <a:t>to </a:t>
-            </a:r>
-            <a:r>
-              <a:rPr b="0" lang="en-US" sz="1800" spc="-1" strike="noStrike">
-                <a:solidFill>
-                  <a:srgbClr val="000000"/>
-                </a:solidFill>
-                <a:latin typeface="Arial"/>
-              </a:rPr>
-              <a:t>edit </a:t>
-            </a:r>
-            <a:r>
-              <a:rPr b="0" lang="en-US" sz="1800" spc="-1" strike="noStrike">
-                <a:solidFill>
-                  <a:srgbClr val="000000"/>
-                </a:solidFill>
-                <a:latin typeface="Arial"/>
-              </a:rPr>
-              <a:t>the </a:t>
-            </a:r>
-            <a:r>
-              <a:rPr b="0" lang="en-US" sz="1800" spc="-1" strike="noStrike">
-                <a:solidFill>
-                  <a:srgbClr val="000000"/>
-                </a:solidFill>
-                <a:latin typeface="Arial"/>
-              </a:rPr>
-              <a:t>title </a:t>
-            </a:r>
-            <a:r>
-              <a:rPr b="0" lang="en-US" sz="1800" spc="-1" strike="noStrike">
-                <a:solidFill>
-                  <a:srgbClr val="000000"/>
-                </a:solidFill>
-                <a:latin typeface="Arial"/>
-              </a:rPr>
-              <a:t>text </a:t>
-            </a:r>
-            <a:r>
-              <a:rPr b="0" lang="en-US" sz="1800" spc="-1" strike="noStrike">
-                <a:solidFill>
-                  <a:srgbClr val="000000"/>
-                </a:solidFill>
-                <a:latin typeface="Arial"/>
-              </a:rPr>
-              <a:t>forma</a:t>
-            </a:r>
-            <a:r>
-              <a:rPr b="0" lang="en-US" sz="1800" spc="-1" strike="noStrike">
-                <a:solidFill>
-                  <a:srgbClr val="000000"/>
-                </a:solidFill>
-                <a:latin typeface="Arial"/>
-              </a:rPr>
-              <a:t>t</a:t>
+              <a:t>Click to edit the title text format</a:t>
             </a:r>
             <a:endParaRPr b="0" lang="en-US" sz="1800" spc="-1" strike="noStrike">
               <a:solidFill>
@@ -4071,7 +4008,7 @@
         <p:spPr>
           <a:xfrm>
             <a:off x="4038480" y="6356520"/>
-            <a:ext cx="4104000" cy="354240"/>
+            <a:ext cx="4103640" cy="353880"/>
           </a:xfrm>
           <a:prstGeom prst="rect">
             <a:avLst/>
@@ -4143,7 +4080,7 @@
         <p:spPr>
           <a:xfrm>
             <a:off x="8610480" y="6356520"/>
-            <a:ext cx="2732400" cy="354240"/>
+            <a:ext cx="2732040" cy="353880"/>
           </a:xfrm>
           <a:prstGeom prst="rect">
             <a:avLst/>
@@ -4186,7 +4123,7 @@
                 <a:tab algn="l" pos="0"/>
               </a:tabLst>
             </a:pPr>
-            <a:fld id="{BA4AFB97-B380-4866-8213-1D6EE1E1C07B}" type="slidenum">
+            <a:fld id="{F636FF58-D22C-4501-B5AA-14F7D7E8AE73}" type="slidenum">
               <a:rPr b="0" lang="en-US" sz="1200" spc="-1" strike="noStrike">
                 <a:solidFill>
                   <a:schemeClr val="dk1">
@@ -4219,7 +4156,7 @@
         <p:spPr>
           <a:xfrm>
             <a:off x="838080" y="6356520"/>
-            <a:ext cx="2732400" cy="354240"/>
+            <a:ext cx="2732040" cy="353880"/>
           </a:xfrm>
           <a:prstGeom prst="rect">
             <a:avLst/>
@@ -4308,9 +4245,9 @@
         <p:grpSpPr>
           <a:xfrm>
             <a:off x="6199200" y="6162840"/>
-            <a:ext cx="5982120" cy="684360"/>
+            <a:ext cx="5981760" cy="684000"/>
             <a:chOff x="6199200" y="6162840"/>
-            <a:chExt cx="5982120" cy="684360"/>
+            <a:chExt cx="5981760" cy="684000"/>
           </a:xfrm>
         </p:grpSpPr>
         <p:pic>
@@ -4326,7 +4263,7 @@
           <p:spPr>
             <a:xfrm>
               <a:off x="6199200" y="6162840"/>
-              <a:ext cx="4045680" cy="684360"/>
+              <a:ext cx="4045320" cy="684000"/>
             </a:xfrm>
             <a:prstGeom prst="rect">
               <a:avLst/>
@@ -4349,7 +4286,7 @@
           <p:spPr>
             <a:xfrm>
               <a:off x="10270080" y="6162840"/>
-              <a:ext cx="1911240" cy="600840"/>
+              <a:ext cx="1910880" cy="600480"/>
             </a:xfrm>
             <a:prstGeom prst="rect">
               <a:avLst/>
@@ -4872,7 +4809,7 @@
         <p:spPr>
           <a:xfrm>
             <a:off x="4038480" y="6356520"/>
-            <a:ext cx="4104000" cy="354240"/>
+            <a:ext cx="4103640" cy="353880"/>
           </a:xfrm>
           <a:prstGeom prst="rect">
             <a:avLst/>
@@ -4944,7 +4881,7 @@
         <p:spPr>
           <a:xfrm>
             <a:off x="8610480" y="6356520"/>
-            <a:ext cx="2732400" cy="354240"/>
+            <a:ext cx="2732040" cy="353880"/>
           </a:xfrm>
           <a:prstGeom prst="rect">
             <a:avLst/>
@@ -4987,7 +4924,7 @@
                 <a:tab algn="l" pos="0"/>
               </a:tabLst>
             </a:pPr>
-            <a:fld id="{0F54D2A4-CEA1-42F6-800B-673F31FA7E33}" type="slidenum">
+            <a:fld id="{125C4B73-AAD5-4B3E-9F7C-37509DBDEFA7}" type="slidenum">
               <a:rPr b="0" lang="en-US" sz="1200" spc="-1" strike="noStrike">
                 <a:solidFill>
                   <a:schemeClr val="dk1">
@@ -5020,7 +4957,7 @@
         <p:spPr>
           <a:xfrm>
             <a:off x="838080" y="6356520"/>
-            <a:ext cx="2732400" cy="354240"/>
+            <a:ext cx="2732040" cy="353880"/>
           </a:xfrm>
           <a:prstGeom prst="rect">
             <a:avLst/>
@@ -5109,9 +5046,9 @@
         <p:grpSpPr>
           <a:xfrm>
             <a:off x="6199200" y="6162840"/>
-            <a:ext cx="5982120" cy="684360"/>
+            <a:ext cx="5981760" cy="684000"/>
             <a:chOff x="6199200" y="6162840"/>
-            <a:chExt cx="5982120" cy="684360"/>
+            <a:chExt cx="5981760" cy="684000"/>
           </a:xfrm>
         </p:grpSpPr>
         <p:pic>
@@ -5127,7 +5064,7 @@
           <p:spPr>
             <a:xfrm>
               <a:off x="6199200" y="6162840"/>
-              <a:ext cx="4045680" cy="684360"/>
+              <a:ext cx="4045320" cy="684000"/>
             </a:xfrm>
             <a:prstGeom prst="rect">
               <a:avLst/>
@@ -5150,7 +5087,7 @@
           <p:spPr>
             <a:xfrm>
               <a:off x="10270080" y="6162840"/>
-              <a:ext cx="1911240" cy="600840"/>
+              <a:ext cx="1910880" cy="600480"/>
             </a:xfrm>
             <a:prstGeom prst="rect">
               <a:avLst/>
@@ -5223,7 +5160,7 @@
         <p:spPr>
           <a:xfrm>
             <a:off x="4038480" y="6356520"/>
-            <a:ext cx="4104000" cy="354240"/>
+            <a:ext cx="4103640" cy="353880"/>
           </a:xfrm>
           <a:prstGeom prst="rect">
             <a:avLst/>
@@ -5295,7 +5232,7 @@
         <p:spPr>
           <a:xfrm>
             <a:off x="8610480" y="6356520"/>
-            <a:ext cx="2732400" cy="354240"/>
+            <a:ext cx="2732040" cy="353880"/>
           </a:xfrm>
           <a:prstGeom prst="rect">
             <a:avLst/>
@@ -5338,7 +5275,7 @@
                 <a:tab algn="l" pos="0"/>
               </a:tabLst>
             </a:pPr>
-            <a:fld id="{2158C1F1-77BA-4DD7-84D3-463F97C5C114}" type="slidenum">
+            <a:fld id="{0DDE41E3-FE6F-4E0D-AD65-45D58D4FD42C}" type="slidenum">
               <a:rPr b="0" lang="en-US" sz="1200" spc="-1" strike="noStrike">
                 <a:solidFill>
                   <a:schemeClr val="dk1">
@@ -5371,7 +5308,7 @@
         <p:spPr>
           <a:xfrm>
             <a:off x="838080" y="6356520"/>
-            <a:ext cx="2732400" cy="354240"/>
+            <a:ext cx="2732040" cy="353880"/>
           </a:xfrm>
           <a:prstGeom prst="rect">
             <a:avLst/>
@@ -5460,9 +5397,9 @@
         <p:grpSpPr>
           <a:xfrm>
             <a:off x="6199200" y="6162840"/>
-            <a:ext cx="5982120" cy="684360"/>
+            <a:ext cx="5981760" cy="684000"/>
             <a:chOff x="6199200" y="6162840"/>
-            <a:chExt cx="5982120" cy="684360"/>
+            <a:chExt cx="5981760" cy="684000"/>
           </a:xfrm>
         </p:grpSpPr>
         <p:pic>
@@ -5478,7 +5415,7 @@
           <p:spPr>
             <a:xfrm>
               <a:off x="6199200" y="6162840"/>
-              <a:ext cx="4045680" cy="684360"/>
+              <a:ext cx="4045320" cy="684000"/>
             </a:xfrm>
             <a:prstGeom prst="rect">
               <a:avLst/>
@@ -5501,7 +5438,7 @@
           <p:spPr>
             <a:xfrm>
               <a:off x="10270080" y="6162840"/>
-              <a:ext cx="1911240" cy="600840"/>
+              <a:ext cx="1910880" cy="600480"/>
             </a:xfrm>
             <a:prstGeom prst="rect">
               <a:avLst/>
@@ -5525,7 +5462,7 @@
         <p:spPr>
           <a:xfrm>
             <a:off x="4038480" y="6356520"/>
-            <a:ext cx="4104000" cy="354240"/>
+            <a:ext cx="4103640" cy="353880"/>
           </a:xfrm>
           <a:prstGeom prst="rect">
             <a:avLst/>
@@ -5597,7 +5534,7 @@
         <p:spPr>
           <a:xfrm>
             <a:off x="8610480" y="6356520"/>
-            <a:ext cx="2732400" cy="354240"/>
+            <a:ext cx="2732040" cy="353880"/>
           </a:xfrm>
           <a:prstGeom prst="rect">
             <a:avLst/>
@@ -5640,7 +5577,7 @@
                 <a:tab algn="l" pos="0"/>
               </a:tabLst>
             </a:pPr>
-            <a:fld id="{EECD90A9-1DFD-4435-8C19-8EBD382D7608}" type="slidenum">
+            <a:fld id="{05FC5835-7411-4F00-9B13-F870D60FCDED}" type="slidenum">
               <a:rPr b="0" lang="en-US" sz="1200" spc="-1" strike="noStrike">
                 <a:solidFill>
                   <a:schemeClr val="dk1">
@@ -5673,7 +5610,7 @@
         <p:spPr>
           <a:xfrm>
             <a:off x="838080" y="6356520"/>
-            <a:ext cx="2732400" cy="354240"/>
+            <a:ext cx="2732040" cy="353880"/>
           </a:xfrm>
           <a:prstGeom prst="rect">
             <a:avLst/>
@@ -5762,9 +5699,9 @@
         <p:grpSpPr>
           <a:xfrm>
             <a:off x="6199200" y="6162840"/>
-            <a:ext cx="5982120" cy="684360"/>
+            <a:ext cx="5981760" cy="684000"/>
             <a:chOff x="6199200" y="6162840"/>
-            <a:chExt cx="5982120" cy="684360"/>
+            <a:chExt cx="5981760" cy="684000"/>
           </a:xfrm>
         </p:grpSpPr>
         <p:pic>
@@ -5780,7 +5717,7 @@
           <p:spPr>
             <a:xfrm>
               <a:off x="6199200" y="6162840"/>
-              <a:ext cx="4045680" cy="684360"/>
+              <a:ext cx="4045320" cy="684000"/>
             </a:xfrm>
             <a:prstGeom prst="rect">
               <a:avLst/>
@@ -5803,7 +5740,7 @@
           <p:spPr>
             <a:xfrm>
               <a:off x="10270080" y="6162840"/>
-              <a:ext cx="1911240" cy="600840"/>
+              <a:ext cx="1910880" cy="600480"/>
             </a:xfrm>
             <a:prstGeom prst="rect">
               <a:avLst/>
@@ -5852,25 +5789,7 @@
                 </a:solidFill>
                 <a:latin typeface="Arial"/>
               </a:rPr>
-              <a:t>Click to edit </a:t>
-            </a:r>
-            <a:r>
-              <a:rPr b="0" lang="en-US" sz="1800" spc="-1" strike="noStrike">
-                <a:solidFill>
-                  <a:srgbClr val="000000"/>
-                </a:solidFill>
-                <a:latin typeface="Arial"/>
-              </a:rPr>
-              <a:t>the title text </a:t>
-            </a:r>
-            <a:r>
-              <a:rPr b="0" lang="en-US" sz="1800" spc="-1" strike="noStrike">
-                <a:solidFill>
-                  <a:srgbClr val="000000"/>
-                </a:solidFill>
-                <a:latin typeface="Arial"/>
-              </a:rPr>
-              <a:t>format</a:t>
+              <a:t>Click to edit the title text format</a:t>
             </a:r>
             <a:endParaRPr b="0" lang="en-US" sz="1800" spc="-1" strike="noStrike">
               <a:solidFill>
@@ -6569,7 +6488,7 @@
         <p:spPr>
           <a:xfrm>
             <a:off x="4038480" y="6356520"/>
-            <a:ext cx="4104000" cy="354240"/>
+            <a:ext cx="4103640" cy="353880"/>
           </a:xfrm>
           <a:prstGeom prst="rect">
             <a:avLst/>
@@ -6641,7 +6560,7 @@
         <p:spPr>
           <a:xfrm>
             <a:off x="8610480" y="6356520"/>
-            <a:ext cx="2732400" cy="354240"/>
+            <a:ext cx="2732040" cy="353880"/>
           </a:xfrm>
           <a:prstGeom prst="rect">
             <a:avLst/>
@@ -6684,7 +6603,7 @@
                 <a:tab algn="l" pos="0"/>
               </a:tabLst>
             </a:pPr>
-            <a:fld id="{F39959D4-66C7-4726-9FD0-E89A7687E6D6}" type="slidenum">
+            <a:fld id="{04EF5C7F-DDC7-418D-8E92-6581FD79236B}" type="slidenum">
               <a:rPr b="0" lang="en-US" sz="1200" spc="-1" strike="noStrike">
                 <a:solidFill>
                   <a:schemeClr val="dk1">
@@ -6717,7 +6636,7 @@
         <p:spPr>
           <a:xfrm>
             <a:off x="838080" y="6356520"/>
-            <a:ext cx="2732400" cy="354240"/>
+            <a:ext cx="2732040" cy="353880"/>
           </a:xfrm>
           <a:prstGeom prst="rect">
             <a:avLst/>
@@ -6806,9 +6725,9 @@
         <p:grpSpPr>
           <a:xfrm>
             <a:off x="6199200" y="6162840"/>
-            <a:ext cx="5982120" cy="684360"/>
+            <a:ext cx="5981760" cy="684000"/>
             <a:chOff x="6199200" y="6162840"/>
-            <a:chExt cx="5982120" cy="684360"/>
+            <a:chExt cx="5981760" cy="684000"/>
           </a:xfrm>
         </p:grpSpPr>
         <p:pic>
@@ -6824,7 +6743,7 @@
           <p:spPr>
             <a:xfrm>
               <a:off x="6199200" y="6162840"/>
-              <a:ext cx="4045680" cy="684360"/>
+              <a:ext cx="4045320" cy="684000"/>
             </a:xfrm>
             <a:prstGeom prst="rect">
               <a:avLst/>
@@ -6847,7 +6766,7 @@
           <p:spPr>
             <a:xfrm>
               <a:off x="10270080" y="6162840"/>
-              <a:ext cx="1911240" cy="600840"/>
+              <a:ext cx="1910880" cy="600480"/>
             </a:xfrm>
             <a:prstGeom prst="rect">
               <a:avLst/>
@@ -7595,7 +7514,7 @@
         <p:spPr>
           <a:xfrm>
             <a:off x="4038480" y="6356520"/>
-            <a:ext cx="4104000" cy="354240"/>
+            <a:ext cx="4103640" cy="353880"/>
           </a:xfrm>
           <a:prstGeom prst="rect">
             <a:avLst/>
@@ -7667,7 +7586,7 @@
         <p:spPr>
           <a:xfrm>
             <a:off x="8610480" y="6356520"/>
-            <a:ext cx="2732400" cy="354240"/>
+            <a:ext cx="2732040" cy="353880"/>
           </a:xfrm>
           <a:prstGeom prst="rect">
             <a:avLst/>
@@ -7710,7 +7629,7 @@
                 <a:tab algn="l" pos="0"/>
               </a:tabLst>
             </a:pPr>
-            <a:fld id="{C432C8A1-72F8-4410-98D1-966124C882CC}" type="slidenum">
+            <a:fld id="{4116FA36-D545-4CD7-A3D0-9074D5228D47}" type="slidenum">
               <a:rPr b="0" lang="en-US" sz="1200" spc="-1" strike="noStrike">
                 <a:solidFill>
                   <a:schemeClr val="dk1">
@@ -7743,7 +7662,7 @@
         <p:spPr>
           <a:xfrm>
             <a:off x="838080" y="6356520"/>
-            <a:ext cx="2732400" cy="354240"/>
+            <a:ext cx="2732040" cy="353880"/>
           </a:xfrm>
           <a:prstGeom prst="rect">
             <a:avLst/>
@@ -7832,9 +7751,9 @@
         <p:grpSpPr>
           <a:xfrm>
             <a:off x="6199200" y="6162840"/>
-            <a:ext cx="5982120" cy="684360"/>
+            <a:ext cx="5981760" cy="684000"/>
             <a:chOff x="6199200" y="6162840"/>
-            <a:chExt cx="5982120" cy="684360"/>
+            <a:chExt cx="5981760" cy="684000"/>
           </a:xfrm>
         </p:grpSpPr>
         <p:pic>
@@ -7850,7 +7769,7 @@
           <p:spPr>
             <a:xfrm>
               <a:off x="6199200" y="6162840"/>
-              <a:ext cx="4045680" cy="684360"/>
+              <a:ext cx="4045320" cy="684000"/>
             </a:xfrm>
             <a:prstGeom prst="rect">
               <a:avLst/>
@@ -7873,7 +7792,7 @@
           <p:spPr>
             <a:xfrm>
               <a:off x="10270080" y="6162840"/>
-              <a:ext cx="1911240" cy="600840"/>
+              <a:ext cx="1910880" cy="600480"/>
             </a:xfrm>
             <a:prstGeom prst="rect">
               <a:avLst/>
@@ -8396,7 +8315,7 @@
         <p:spPr>
           <a:xfrm>
             <a:off x="4038480" y="6356520"/>
-            <a:ext cx="4104000" cy="354240"/>
+            <a:ext cx="4103640" cy="353880"/>
           </a:xfrm>
           <a:prstGeom prst="rect">
             <a:avLst/>
@@ -8468,7 +8387,7 @@
         <p:spPr>
           <a:xfrm>
             <a:off x="8610480" y="6356520"/>
-            <a:ext cx="2732400" cy="354240"/>
+            <a:ext cx="2732040" cy="353880"/>
           </a:xfrm>
           <a:prstGeom prst="rect">
             <a:avLst/>
@@ -8511,7 +8430,7 @@
                 <a:tab algn="l" pos="0"/>
               </a:tabLst>
             </a:pPr>
-            <a:fld id="{EE32D161-3955-4066-98C4-72C2A6D930CA}" type="slidenum">
+            <a:fld id="{D41CDBA3-51EC-40F6-96AE-E0C5C0694E36}" type="slidenum">
               <a:rPr b="0" lang="en-US" sz="1200" spc="-1" strike="noStrike">
                 <a:solidFill>
                   <a:schemeClr val="dk1">
@@ -8544,7 +8463,7 @@
         <p:spPr>
           <a:xfrm>
             <a:off x="838080" y="6356520"/>
-            <a:ext cx="2732400" cy="354240"/>
+            <a:ext cx="2732040" cy="353880"/>
           </a:xfrm>
           <a:prstGeom prst="rect">
             <a:avLst/>
@@ -8633,9 +8552,9 @@
         <p:grpSpPr>
           <a:xfrm>
             <a:off x="6199200" y="6162840"/>
-            <a:ext cx="5982120" cy="684360"/>
+            <a:ext cx="5981760" cy="684000"/>
             <a:chOff x="6199200" y="6162840"/>
-            <a:chExt cx="5982120" cy="684360"/>
+            <a:chExt cx="5981760" cy="684000"/>
           </a:xfrm>
         </p:grpSpPr>
         <p:pic>
@@ -8651,7 +8570,7 @@
           <p:spPr>
             <a:xfrm>
               <a:off x="6199200" y="6162840"/>
-              <a:ext cx="4045680" cy="684360"/>
+              <a:ext cx="4045320" cy="684000"/>
             </a:xfrm>
             <a:prstGeom prst="rect">
               <a:avLst/>
@@ -8674,7 +8593,7 @@
           <p:spPr>
             <a:xfrm>
               <a:off x="10270080" y="6162840"/>
-              <a:ext cx="1911240" cy="600840"/>
+              <a:ext cx="1910880" cy="600480"/>
             </a:xfrm>
             <a:prstGeom prst="rect">
               <a:avLst/>
@@ -9647,7 +9566,7 @@
         <p:spPr>
           <a:xfrm>
             <a:off x="4038480" y="6356520"/>
-            <a:ext cx="4104000" cy="354240"/>
+            <a:ext cx="4103640" cy="353880"/>
           </a:xfrm>
           <a:prstGeom prst="rect">
             <a:avLst/>
@@ -9719,7 +9638,7 @@
         <p:spPr>
           <a:xfrm>
             <a:off x="8610480" y="6356520"/>
-            <a:ext cx="2732400" cy="354240"/>
+            <a:ext cx="2732040" cy="353880"/>
           </a:xfrm>
           <a:prstGeom prst="rect">
             <a:avLst/>
@@ -9762,7 +9681,7 @@
                 <a:tab algn="l" pos="0"/>
               </a:tabLst>
             </a:pPr>
-            <a:fld id="{4E7F9B05-C382-4F1E-94D5-45ADDEADAC8B}" type="slidenum">
+            <a:fld id="{7E782E8B-8BCA-4B10-A970-C3B91863A0A8}" type="slidenum">
               <a:rPr b="0" lang="en-US" sz="1200" spc="-1" strike="noStrike">
                 <a:solidFill>
                   <a:schemeClr val="dk1">
@@ -9795,7 +9714,7 @@
         <p:spPr>
           <a:xfrm>
             <a:off x="838080" y="6356520"/>
-            <a:ext cx="2732400" cy="354240"/>
+            <a:ext cx="2732040" cy="353880"/>
           </a:xfrm>
           <a:prstGeom prst="rect">
             <a:avLst/>
@@ -9884,9 +9803,9 @@
         <p:grpSpPr>
           <a:xfrm>
             <a:off x="6199200" y="6162840"/>
-            <a:ext cx="5982120" cy="684360"/>
+            <a:ext cx="5981760" cy="684000"/>
             <a:chOff x="6199200" y="6162840"/>
-            <a:chExt cx="5982120" cy="684360"/>
+            <a:chExt cx="5981760" cy="684000"/>
           </a:xfrm>
         </p:grpSpPr>
         <p:pic>
@@ -9902,7 +9821,7 @@
           <p:spPr>
             <a:xfrm>
               <a:off x="6199200" y="6162840"/>
-              <a:ext cx="4045680" cy="684360"/>
+              <a:ext cx="4045320" cy="684000"/>
             </a:xfrm>
             <a:prstGeom prst="rect">
               <a:avLst/>
@@ -9925,7 +9844,7 @@
           <p:spPr>
             <a:xfrm>
               <a:off x="10270080" y="6162840"/>
-              <a:ext cx="1911240" cy="600840"/>
+              <a:ext cx="1910880" cy="600480"/>
             </a:xfrm>
             <a:prstGeom prst="rect">
               <a:avLst/>
@@ -9949,7 +9868,7 @@
         <p:spPr>
           <a:xfrm>
             <a:off x="4038480" y="6356520"/>
-            <a:ext cx="4104000" cy="354240"/>
+            <a:ext cx="4103640" cy="353880"/>
           </a:xfrm>
           <a:prstGeom prst="rect">
             <a:avLst/>
@@ -10021,7 +9940,7 @@
         <p:spPr>
           <a:xfrm>
             <a:off x="8610480" y="6356520"/>
-            <a:ext cx="2732400" cy="354240"/>
+            <a:ext cx="2732040" cy="353880"/>
           </a:xfrm>
           <a:prstGeom prst="rect">
             <a:avLst/>
@@ -10064,7 +9983,7 @@
                 <a:tab algn="l" pos="0"/>
               </a:tabLst>
             </a:pPr>
-            <a:fld id="{72149754-9730-4470-A2F6-41B7C2D6DC44}" type="slidenum">
+            <a:fld id="{48946041-9916-433A-8F93-1B2FBB9D6146}" type="slidenum">
               <a:rPr b="0" lang="en-US" sz="1200" spc="-1" strike="noStrike">
                 <a:solidFill>
                   <a:schemeClr val="dk1">
@@ -10097,7 +10016,7 @@
         <p:spPr>
           <a:xfrm>
             <a:off x="838080" y="6356520"/>
-            <a:ext cx="2732400" cy="354240"/>
+            <a:ext cx="2732040" cy="353880"/>
           </a:xfrm>
           <a:prstGeom prst="rect">
             <a:avLst/>
@@ -10186,9 +10105,9 @@
         <p:grpSpPr>
           <a:xfrm>
             <a:off x="6199200" y="6162840"/>
-            <a:ext cx="5982120" cy="684360"/>
+            <a:ext cx="5981760" cy="684000"/>
             <a:chOff x="6199200" y="6162840"/>
-            <a:chExt cx="5982120" cy="684360"/>
+            <a:chExt cx="5981760" cy="684000"/>
           </a:xfrm>
         </p:grpSpPr>
         <p:pic>
@@ -10204,7 +10123,7 @@
           <p:spPr>
             <a:xfrm>
               <a:off x="6199200" y="6162840"/>
-              <a:ext cx="4045680" cy="684360"/>
+              <a:ext cx="4045320" cy="684000"/>
             </a:xfrm>
             <a:prstGeom prst="rect">
               <a:avLst/>
@@ -10227,7 +10146,7 @@
           <p:spPr>
             <a:xfrm>
               <a:off x="10270080" y="6162840"/>
-              <a:ext cx="1911240" cy="600840"/>
+              <a:ext cx="1910880" cy="600480"/>
             </a:xfrm>
             <a:prstGeom prst="rect">
               <a:avLst/>
@@ -10251,7 +10170,7 @@
         <p:spPr>
           <a:xfrm>
             <a:off x="4038480" y="6356520"/>
-            <a:ext cx="4104000" cy="354240"/>
+            <a:ext cx="4103640" cy="353880"/>
           </a:xfrm>
           <a:prstGeom prst="rect">
             <a:avLst/>
@@ -10323,7 +10242,7 @@
         <p:spPr>
           <a:xfrm>
             <a:off x="8610480" y="6356520"/>
-            <a:ext cx="2732400" cy="354240"/>
+            <a:ext cx="2732040" cy="353880"/>
           </a:xfrm>
           <a:prstGeom prst="rect">
             <a:avLst/>
@@ -10366,7 +10285,7 @@
                 <a:tab algn="l" pos="0"/>
               </a:tabLst>
             </a:pPr>
-            <a:fld id="{15CBD080-8C1E-4D3B-A050-37E93F262F71}" type="slidenum">
+            <a:fld id="{7A2E0CB1-3520-4BA0-B26E-D8144444F16D}" type="slidenum">
               <a:rPr b="0" lang="en-US" sz="1200" spc="-1" strike="noStrike">
                 <a:solidFill>
                   <a:schemeClr val="dk1">
@@ -10399,7 +10318,7 @@
         <p:spPr>
           <a:xfrm>
             <a:off x="838080" y="6356520"/>
-            <a:ext cx="2732400" cy="354240"/>
+            <a:ext cx="2732040" cy="353880"/>
           </a:xfrm>
           <a:prstGeom prst="rect">
             <a:avLst/>
@@ -10762,9 +10681,9 @@
         <p:grpSpPr>
           <a:xfrm>
             <a:off x="6199200" y="6162840"/>
-            <a:ext cx="5982120" cy="684360"/>
+            <a:ext cx="5981760" cy="684000"/>
             <a:chOff x="6199200" y="6162840"/>
-            <a:chExt cx="5982120" cy="684360"/>
+            <a:chExt cx="5981760" cy="684000"/>
           </a:xfrm>
         </p:grpSpPr>
         <p:pic>
@@ -10780,7 +10699,7 @@
           <p:spPr>
             <a:xfrm>
               <a:off x="6199200" y="6162840"/>
-              <a:ext cx="4045680" cy="684360"/>
+              <a:ext cx="4045320" cy="684000"/>
             </a:xfrm>
             <a:prstGeom prst="rect">
               <a:avLst/>
@@ -10803,7 +10722,7 @@
           <p:spPr>
             <a:xfrm>
               <a:off x="10270080" y="6162840"/>
-              <a:ext cx="1911240" cy="600840"/>
+              <a:ext cx="1910880" cy="600480"/>
             </a:xfrm>
             <a:prstGeom prst="rect">
               <a:avLst/>
@@ -11101,7 +11020,7 @@
         <p:spPr>
           <a:xfrm>
             <a:off x="4038480" y="6356520"/>
-            <a:ext cx="4104000" cy="354240"/>
+            <a:ext cx="4103640" cy="353880"/>
           </a:xfrm>
           <a:prstGeom prst="rect">
             <a:avLst/>
@@ -11173,7 +11092,7 @@
         <p:spPr>
           <a:xfrm>
             <a:off x="8610480" y="6356520"/>
-            <a:ext cx="2732400" cy="354240"/>
+            <a:ext cx="2732040" cy="353880"/>
           </a:xfrm>
           <a:prstGeom prst="rect">
             <a:avLst/>
@@ -11216,7 +11135,7 @@
                 <a:tab algn="l" pos="0"/>
               </a:tabLst>
             </a:pPr>
-            <a:fld id="{6BAF3FF9-BB15-49BF-B72D-E481190E3391}" type="slidenum">
+            <a:fld id="{DB580AC3-0719-4A8E-802F-7B806A348710}" type="slidenum">
               <a:rPr b="0" lang="en-US" sz="1200" spc="-1" strike="noStrike">
                 <a:solidFill>
                   <a:schemeClr val="dk1">
@@ -11249,7 +11168,7 @@
         <p:spPr>
           <a:xfrm>
             <a:off x="838080" y="6356520"/>
-            <a:ext cx="2732400" cy="354240"/>
+            <a:ext cx="2732040" cy="353880"/>
           </a:xfrm>
           <a:prstGeom prst="rect">
             <a:avLst/>
@@ -11338,9 +11257,9 @@
         <p:grpSpPr>
           <a:xfrm>
             <a:off x="6199200" y="6162840"/>
-            <a:ext cx="5982120" cy="684360"/>
+            <a:ext cx="5981760" cy="684000"/>
             <a:chOff x="6199200" y="6162840"/>
-            <a:chExt cx="5982120" cy="684360"/>
+            <a:chExt cx="5981760" cy="684000"/>
           </a:xfrm>
         </p:grpSpPr>
         <p:pic>
@@ -11356,7 +11275,7 @@
           <p:spPr>
             <a:xfrm>
               <a:off x="6199200" y="6162840"/>
-              <a:ext cx="4045680" cy="684360"/>
+              <a:ext cx="4045320" cy="684000"/>
             </a:xfrm>
             <a:prstGeom prst="rect">
               <a:avLst/>
@@ -11379,7 +11298,7 @@
           <p:spPr>
             <a:xfrm>
               <a:off x="10270080" y="6162840"/>
-              <a:ext cx="1911240" cy="600840"/>
+              <a:ext cx="1910880" cy="600480"/>
             </a:xfrm>
             <a:prstGeom prst="rect">
               <a:avLst/>
@@ -11677,7 +11596,7 @@
         <p:spPr>
           <a:xfrm>
             <a:off x="4038480" y="6356520"/>
-            <a:ext cx="4104000" cy="354240"/>
+            <a:ext cx="4103640" cy="353880"/>
           </a:xfrm>
           <a:prstGeom prst="rect">
             <a:avLst/>
@@ -11749,7 +11668,7 @@
         <p:spPr>
           <a:xfrm>
             <a:off x="8610480" y="6356520"/>
-            <a:ext cx="2732400" cy="354240"/>
+            <a:ext cx="2732040" cy="353880"/>
           </a:xfrm>
           <a:prstGeom prst="rect">
             <a:avLst/>
@@ -11792,7 +11711,7 @@
                 <a:tab algn="l" pos="0"/>
               </a:tabLst>
             </a:pPr>
-            <a:fld id="{9E0740C5-406E-4E6E-9611-05D675A33AA0}" type="slidenum">
+            <a:fld id="{BD183681-B016-4B22-8ADA-8C5B4C160262}" type="slidenum">
               <a:rPr b="0" lang="en-US" sz="1200" spc="-1" strike="noStrike">
                 <a:solidFill>
                   <a:schemeClr val="dk1">
@@ -11825,7 +11744,7 @@
         <p:spPr>
           <a:xfrm>
             <a:off x="838080" y="6356520"/>
-            <a:ext cx="2732400" cy="354240"/>
+            <a:ext cx="2732040" cy="353880"/>
           </a:xfrm>
           <a:prstGeom prst="rect">
             <a:avLst/>
@@ -11907,7 +11826,7 @@
         <p:spPr>
           <a:xfrm flipH="1">
             <a:off x="0" y="3073320"/>
-            <a:ext cx="1839600" cy="10800"/>
+            <a:ext cx="1839960" cy="11160"/>
           </a:xfrm>
           <a:prstGeom prst="straightConnector1">
             <a:avLst/>
@@ -11930,7 +11849,7 @@
         <p:spPr>
           <a:xfrm>
             <a:off x="0" y="2489400"/>
-            <a:ext cx="1839600" cy="10800"/>
+            <a:ext cx="1839960" cy="11160"/>
           </a:xfrm>
           <a:prstGeom prst="straightConnector1">
             <a:avLst/>
@@ -11953,7 +11872,7 @@
         <p:spPr>
           <a:xfrm>
             <a:off x="0" y="2781360"/>
-            <a:ext cx="1839600" cy="10800"/>
+            <a:ext cx="1839960" cy="11160"/>
           </a:xfrm>
           <a:prstGeom prst="straightConnector1">
             <a:avLst/>
@@ -11976,7 +11895,7 @@
         <p:spPr>
           <a:xfrm flipH="1">
             <a:off x="0" y="3657600"/>
-            <a:ext cx="1839600" cy="10800"/>
+            <a:ext cx="1839960" cy="11160"/>
           </a:xfrm>
           <a:prstGeom prst="straightConnector1">
             <a:avLst/>
@@ -11998,7 +11917,7 @@
         <p:spPr>
           <a:xfrm>
             <a:off x="128520" y="6134040"/>
-            <a:ext cx="1560960" cy="376920"/>
+            <a:ext cx="1560600" cy="376560"/>
           </a:xfrm>
           <a:prstGeom prst="diamond">
             <a:avLst/>
@@ -12063,7 +11982,7 @@
         <p:spPr>
           <a:xfrm>
             <a:off x="302760" y="5454000"/>
-            <a:ext cx="1212480" cy="376920"/>
+            <a:ext cx="1212120" cy="376560"/>
           </a:xfrm>
           <a:prstGeom prst="ellipse">
             <a:avLst/>
@@ -12126,7 +12045,7 @@
         <p:spPr>
           <a:xfrm>
             <a:off x="101160" y="336240"/>
-            <a:ext cx="1615680" cy="303120"/>
+            <a:ext cx="1615320" cy="303120"/>
           </a:xfrm>
           <a:prstGeom prst="rect">
             <a:avLst/>
@@ -12183,7 +12102,7 @@
         <p:spPr>
           <a:xfrm>
             <a:off x="101160" y="597600"/>
-            <a:ext cx="1615680" cy="516600"/>
+            <a:ext cx="1615320" cy="516600"/>
           </a:xfrm>
           <a:prstGeom prst="rect">
             <a:avLst/>
@@ -12273,7 +12192,7 @@
         <p:spPr>
           <a:xfrm>
             <a:off x="101160" y="336240"/>
-            <a:ext cx="1615680" cy="303120"/>
+            <a:ext cx="1615320" cy="303120"/>
           </a:xfrm>
           <a:prstGeom prst="rect">
             <a:avLst/>
@@ -12330,7 +12249,7 @@
         <p:spPr>
           <a:xfrm>
             <a:off x="101160" y="597600"/>
-            <a:ext cx="1615680" cy="516600"/>
+            <a:ext cx="1615320" cy="516600"/>
           </a:xfrm>
           <a:prstGeom prst="rect">
             <a:avLst/>
@@ -12420,7 +12339,7 @@
         <p:spPr>
           <a:xfrm>
             <a:off x="2541600" y="228600"/>
-            <a:ext cx="1615680" cy="303120"/>
+            <a:ext cx="1615320" cy="303120"/>
           </a:xfrm>
           <a:prstGeom prst="rect">
             <a:avLst/>
@@ -12477,7 +12396,7 @@
         <p:spPr>
           <a:xfrm>
             <a:off x="2541600" y="489960"/>
-            <a:ext cx="1615680" cy="1584000"/>
+            <a:ext cx="1615320" cy="1584000"/>
           </a:xfrm>
           <a:prstGeom prst="rect">
             <a:avLst/>
@@ -12702,7 +12621,7 @@
         <p:spPr>
           <a:xfrm>
             <a:off x="6656400" y="228600"/>
-            <a:ext cx="1615680" cy="303120"/>
+            <a:ext cx="1615320" cy="303120"/>
           </a:xfrm>
           <a:prstGeom prst="rect">
             <a:avLst/>
@@ -12759,7 +12678,7 @@
         <p:spPr>
           <a:xfrm>
             <a:off x="6656400" y="489960"/>
-            <a:ext cx="1615680" cy="516600"/>
+            <a:ext cx="1615320" cy="516600"/>
           </a:xfrm>
           <a:prstGeom prst="rect">
             <a:avLst/>
@@ -12849,7 +12768,7 @@
         <p:spPr>
           <a:xfrm>
             <a:off x="6656400" y="228600"/>
-            <a:ext cx="1615680" cy="303120"/>
+            <a:ext cx="1615320" cy="303120"/>
           </a:xfrm>
           <a:prstGeom prst="rect">
             <a:avLst/>
@@ -12906,7 +12825,7 @@
         <p:spPr>
           <a:xfrm>
             <a:off x="6656400" y="489960"/>
-            <a:ext cx="1615680" cy="730080"/>
+            <a:ext cx="1615320" cy="730080"/>
           </a:xfrm>
           <a:prstGeom prst="rect">
             <a:avLst/>
@@ -13023,7 +12942,7 @@
         <p:spPr>
           <a:xfrm>
             <a:off x="128520" y="4629600"/>
-            <a:ext cx="1560960" cy="521640"/>
+            <a:ext cx="1560600" cy="521280"/>
           </a:xfrm>
           <a:prstGeom prst="diamond">
             <a:avLst/>
@@ -13111,7 +13030,7 @@
         <p:spPr>
           <a:xfrm>
             <a:off x="0" y="3365640"/>
-            <a:ext cx="1839600" cy="10800"/>
+            <a:ext cx="1839960" cy="11160"/>
           </a:xfrm>
           <a:prstGeom prst="straightConnector1">
             <a:avLst/>
@@ -13133,7 +13052,7 @@
         <p:spPr>
           <a:xfrm>
             <a:off x="673200" y="3949920"/>
-            <a:ext cx="471960" cy="376920"/>
+            <a:ext cx="471600" cy="376560"/>
           </a:xfrm>
           <a:prstGeom prst="triangle">
             <a:avLst>
@@ -13200,9 +13119,9 @@
         <p:grpSpPr>
           <a:xfrm>
             <a:off x="101160" y="1413000"/>
-            <a:ext cx="1615680" cy="777960"/>
+            <a:ext cx="1615320" cy="777960"/>
             <a:chOff x="101160" y="1413000"/>
-            <a:chExt cx="1615680" cy="777960"/>
+            <a:chExt cx="1615320" cy="777960"/>
           </a:xfrm>
         </p:grpSpPr>
         <p:sp>
@@ -13214,7 +13133,7 @@
           <p:spPr>
             <a:xfrm>
               <a:off x="101160" y="1413000"/>
-              <a:ext cx="1615680" cy="303120"/>
+              <a:ext cx="1615320" cy="303120"/>
             </a:xfrm>
             <a:prstGeom prst="rect">
               <a:avLst/>
@@ -13272,7 +13191,7 @@
           <p:spPr>
             <a:xfrm>
               <a:off x="101160" y="1674360"/>
-              <a:ext cx="1615680" cy="516600"/>
+              <a:ext cx="1615320" cy="516600"/>
             </a:xfrm>
             <a:prstGeom prst="rect">
               <a:avLst/>
@@ -13364,7 +13283,7 @@
         <p:spPr>
           <a:xfrm>
             <a:off x="4426920" y="914400"/>
-            <a:ext cx="1560960" cy="376920"/>
+            <a:ext cx="1560600" cy="376560"/>
           </a:xfrm>
           <a:prstGeom prst="diamond">
             <a:avLst/>
@@ -13431,8 +13350,8 @@
         </p:nvCxnSpPr>
         <p:spPr>
           <a:xfrm flipH="1">
-            <a:off x="5987880" y="855000"/>
-            <a:ext cx="668880" cy="248400"/>
+            <a:off x="5987520" y="855000"/>
+            <a:ext cx="669240" cy="248040"/>
           </a:xfrm>
           <a:prstGeom prst="straightConnector1">
             <a:avLst/>
@@ -13455,7 +13374,7 @@
         <p:spPr>
           <a:xfrm>
             <a:off x="6255720" y="1828800"/>
-            <a:ext cx="1789560" cy="376920"/>
+            <a:ext cx="1789200" cy="376560"/>
           </a:xfrm>
           <a:prstGeom prst="diamond">
             <a:avLst/>
@@ -13522,7 +13441,7 @@
         </p:nvCxnSpPr>
         <p:spPr>
           <a:xfrm flipV="1">
-            <a:off x="7150680" y="1220040"/>
+            <a:off x="7150320" y="1220040"/>
             <a:ext cx="313920" cy="609120"/>
           </a:xfrm>
           <a:prstGeom prst="straightConnector1">
@@ -13546,8 +13465,8 @@
         </p:nvCxnSpPr>
         <p:spPr>
           <a:xfrm flipH="1" flipV="1">
-            <a:off x="7150680" y="2205720"/>
-            <a:ext cx="466200" cy="546120"/>
+            <a:off x="7150320" y="2205360"/>
+            <a:ext cx="466920" cy="546840"/>
           </a:xfrm>
           <a:prstGeom prst="straightConnector1">
             <a:avLst/>
@@ -13570,7 +13489,7 @@
         <p:spPr>
           <a:xfrm>
             <a:off x="128520" y="6134400"/>
-            <a:ext cx="1560960" cy="376920"/>
+            <a:ext cx="1560600" cy="376560"/>
           </a:xfrm>
           <a:prstGeom prst="diamond">
             <a:avLst/>
@@ -13635,9 +13554,9 @@
         <p:grpSpPr>
           <a:xfrm>
             <a:off x="6681960" y="2743200"/>
-            <a:ext cx="1844280" cy="1216440"/>
+            <a:ext cx="1843920" cy="1216440"/>
             <a:chOff x="6681960" y="2743200"/>
-            <a:chExt cx="1844280" cy="1216440"/>
+            <a:chExt cx="1843920" cy="1216440"/>
           </a:xfrm>
         </p:grpSpPr>
         <p:sp>
@@ -13649,7 +13568,7 @@
           <p:spPr>
             <a:xfrm>
               <a:off x="6681960" y="2743200"/>
-              <a:ext cx="1844280" cy="303120"/>
+              <a:ext cx="1843920" cy="303120"/>
             </a:xfrm>
             <a:prstGeom prst="rect">
               <a:avLst/>
@@ -13706,7 +13625,7 @@
           <p:spPr>
             <a:xfrm>
               <a:off x="6681960" y="3016080"/>
-              <a:ext cx="1844280" cy="943560"/>
+              <a:ext cx="1843920" cy="943560"/>
             </a:xfrm>
             <a:prstGeom prst="rect">
               <a:avLst/>
@@ -13853,7 +13772,7 @@
         <p:spPr>
           <a:xfrm>
             <a:off x="9173520" y="3501000"/>
-            <a:ext cx="471960" cy="376920"/>
+            <a:ext cx="471600" cy="376560"/>
           </a:xfrm>
           <a:prstGeom prst="triangle">
             <a:avLst>
@@ -13920,7 +13839,7 @@
         <p:spPr>
           <a:xfrm>
             <a:off x="10287000" y="3126240"/>
-            <a:ext cx="1898280" cy="303120"/>
+            <a:ext cx="1897920" cy="303120"/>
           </a:xfrm>
           <a:prstGeom prst="rect">
             <a:avLst/>
@@ -13977,7 +13896,7 @@
         <p:spPr>
           <a:xfrm>
             <a:off x="10287000" y="3429360"/>
-            <a:ext cx="1898280" cy="1584000"/>
+            <a:ext cx="1897920" cy="1584000"/>
           </a:xfrm>
           <a:prstGeom prst="rect">
             <a:avLst/>
@@ -14185,8 +14104,8 @@
         </p:nvCxnSpPr>
         <p:spPr>
           <a:xfrm>
-            <a:off x="9527760" y="3689640"/>
-            <a:ext cx="759600" cy="532080"/>
+            <a:off x="9527400" y="3689280"/>
+            <a:ext cx="759960" cy="532440"/>
           </a:xfrm>
           <a:prstGeom prst="straightConnector1">
             <a:avLst/>
@@ -14210,8 +14129,8 @@
         </p:nvCxnSpPr>
         <p:spPr>
           <a:xfrm flipH="1" flipV="1">
-            <a:off x="8526240" y="3351240"/>
-            <a:ext cx="765720" cy="338760"/>
+            <a:off x="8525880" y="3351240"/>
+            <a:ext cx="765720" cy="338400"/>
           </a:xfrm>
           <a:prstGeom prst="straightConnector1">
             <a:avLst/>
@@ -14233,7 +14152,7 @@
         <p:spPr>
           <a:xfrm>
             <a:off x="2086200" y="3336840"/>
-            <a:ext cx="1615680" cy="303120"/>
+            <a:ext cx="1615320" cy="303120"/>
           </a:xfrm>
           <a:prstGeom prst="rect">
             <a:avLst/>
@@ -14290,7 +14209,7 @@
         <p:spPr>
           <a:xfrm>
             <a:off x="2086200" y="3598200"/>
-            <a:ext cx="1615680" cy="516600"/>
+            <a:ext cx="1615320" cy="516600"/>
           </a:xfrm>
           <a:prstGeom prst="rect">
             <a:avLst/>
@@ -14380,7 +14299,7 @@
         <p:spPr>
           <a:xfrm>
             <a:off x="2086200" y="3336840"/>
-            <a:ext cx="1615680" cy="303120"/>
+            <a:ext cx="1615320" cy="303120"/>
           </a:xfrm>
           <a:prstGeom prst="rect">
             <a:avLst/>
@@ -14437,7 +14356,7 @@
         <p:spPr>
           <a:xfrm>
             <a:off x="2086200" y="3598200"/>
-            <a:ext cx="1615680" cy="516600"/>
+            <a:ext cx="1615320" cy="516600"/>
           </a:xfrm>
           <a:prstGeom prst="rect">
             <a:avLst/>
@@ -14527,7 +14446,7 @@
         <p:spPr>
           <a:xfrm>
             <a:off x="1883160" y="2514600"/>
-            <a:ext cx="1818720" cy="376920"/>
+            <a:ext cx="1818360" cy="376560"/>
           </a:xfrm>
           <a:prstGeom prst="diamond">
             <a:avLst/>
@@ -14592,7 +14511,7 @@
         <p:spPr>
           <a:xfrm>
             <a:off x="3481560" y="2899800"/>
-            <a:ext cx="1590120" cy="376920"/>
+            <a:ext cx="1589760" cy="376560"/>
           </a:xfrm>
           <a:prstGeom prst="ellipse">
             <a:avLst/>
@@ -14657,8 +14576,8 @@
         </p:nvCxnSpPr>
         <p:spPr>
           <a:xfrm>
-            <a:off x="3701880" y="2703240"/>
-            <a:ext cx="575280" cy="196920"/>
+            <a:off x="3701520" y="2702880"/>
+            <a:ext cx="575280" cy="197280"/>
           </a:xfrm>
           <a:prstGeom prst="straightConnector1">
             <a:avLst/>
@@ -14682,8 +14601,8 @@
         </p:nvCxnSpPr>
         <p:spPr>
           <a:xfrm flipH="1" flipV="1">
-            <a:off x="2792520" y="2891520"/>
-            <a:ext cx="101880" cy="445680"/>
+            <a:off x="2792520" y="2891160"/>
+            <a:ext cx="101520" cy="446040"/>
           </a:xfrm>
           <a:prstGeom prst="straightConnector1">
             <a:avLst/>
@@ -14708,7 +14627,7 @@
         <p:spPr>
           <a:xfrm flipV="1">
             <a:off x="2792520" y="2073960"/>
-            <a:ext cx="557280" cy="441000"/>
+            <a:ext cx="556920" cy="441000"/>
           </a:xfrm>
           <a:prstGeom prst="straightConnector1">
             <a:avLst/>
@@ -14730,7 +14649,7 @@
         <p:spPr>
           <a:xfrm>
             <a:off x="10543680" y="457200"/>
-            <a:ext cx="1615680" cy="303120"/>
+            <a:ext cx="1615320" cy="303120"/>
           </a:xfrm>
           <a:prstGeom prst="rect">
             <a:avLst/>
@@ -14787,7 +14706,7 @@
         <p:spPr>
           <a:xfrm>
             <a:off x="10543680" y="718560"/>
-            <a:ext cx="1615680" cy="516600"/>
+            <a:ext cx="1615320" cy="516600"/>
           </a:xfrm>
           <a:prstGeom prst="rect">
             <a:avLst/>
@@ -14877,7 +14796,7 @@
         <p:spPr>
           <a:xfrm>
             <a:off x="10287000" y="457200"/>
-            <a:ext cx="1615680" cy="303120"/>
+            <a:ext cx="1615320" cy="303120"/>
           </a:xfrm>
           <a:prstGeom prst="rect">
             <a:avLst/>
@@ -14934,7 +14853,7 @@
         <p:spPr>
           <a:xfrm>
             <a:off x="10287000" y="718560"/>
-            <a:ext cx="1872360" cy="2651400"/>
+            <a:ext cx="1872000" cy="2651400"/>
           </a:xfrm>
           <a:prstGeom prst="rect">
             <a:avLst/>
@@ -15268,7 +15187,7 @@
         <p:spPr>
           <a:xfrm>
             <a:off x="8007120" y="1448280"/>
-            <a:ext cx="2047680" cy="376920"/>
+            <a:ext cx="2047320" cy="376560"/>
           </a:xfrm>
           <a:prstGeom prst="diamond">
             <a:avLst/>
@@ -15335,8 +15254,8 @@
         </p:nvCxnSpPr>
         <p:spPr>
           <a:xfrm>
-            <a:off x="9030960" y="1825200"/>
-            <a:ext cx="1256400" cy="2396520"/>
+            <a:off x="9030960" y="1824840"/>
+            <a:ext cx="1256400" cy="2396880"/>
           </a:xfrm>
           <a:prstGeom prst="straightConnector1">
             <a:avLst/>
@@ -15360,8 +15279,8 @@
         </p:nvCxnSpPr>
         <p:spPr>
           <a:xfrm flipH="1" flipV="1">
-            <a:off x="10054800" y="1636920"/>
-            <a:ext cx="232560" cy="407520"/>
+            <a:off x="10054440" y="1636560"/>
+            <a:ext cx="232920" cy="407880"/>
           </a:xfrm>
           <a:prstGeom prst="straightConnector1">
             <a:avLst/>
@@ -15385,8 +15304,8 @@
         </p:nvCxnSpPr>
         <p:spPr>
           <a:xfrm flipH="1" flipV="1">
-            <a:off x="7464240" y="1220040"/>
-            <a:ext cx="1567080" cy="228600"/>
+            <a:off x="7463880" y="1220040"/>
+            <a:ext cx="1567440" cy="228600"/>
           </a:xfrm>
           <a:prstGeom prst="straightConnector1">
             <a:avLst/>
@@ -15408,7 +15327,7 @@
         <p:spPr>
           <a:xfrm>
             <a:off x="5412240" y="5029200"/>
-            <a:ext cx="1615680" cy="303120"/>
+            <a:ext cx="1615320" cy="303120"/>
           </a:xfrm>
           <a:prstGeom prst="rect">
             <a:avLst/>
@@ -15465,7 +15384,7 @@
         <p:spPr>
           <a:xfrm>
             <a:off x="3710160" y="4343400"/>
-            <a:ext cx="1819080" cy="376920"/>
+            <a:ext cx="1818720" cy="376560"/>
           </a:xfrm>
           <a:prstGeom prst="diamond">
             <a:avLst/>
@@ -15532,8 +15451,8 @@
         </p:nvCxnSpPr>
         <p:spPr>
           <a:xfrm>
-            <a:off x="2894040" y="4114800"/>
-            <a:ext cx="816480" cy="417600"/>
+            <a:off x="2893680" y="4114800"/>
+            <a:ext cx="816840" cy="417240"/>
           </a:xfrm>
           <a:prstGeom prst="straightConnector1">
             <a:avLst/>
@@ -15558,8 +15477,8 @@
         </p:nvCxnSpPr>
         <p:spPr>
           <a:xfrm>
-            <a:off x="4619880" y="4720320"/>
-            <a:ext cx="792720" cy="460800"/>
+            <a:off x="4619520" y="4719960"/>
+            <a:ext cx="793080" cy="461160"/>
           </a:xfrm>
           <a:prstGeom prst="straightConnector1">
             <a:avLst/>
@@ -15583,7 +15502,7 @@
         </p:nvCxnSpPr>
         <p:spPr>
           <a:xfrm flipH="1" flipV="1">
-            <a:off x="3349440" y="2073960"/>
+            <a:off x="3349080" y="2073960"/>
             <a:ext cx="2187000" cy="1126800"/>
           </a:xfrm>
           <a:prstGeom prst="straightConnector1">
@@ -15606,7 +15525,7 @@
         <p:spPr>
           <a:xfrm>
             <a:off x="4626720" y="3200400"/>
-            <a:ext cx="1818360" cy="676080"/>
+            <a:ext cx="1818000" cy="675720"/>
           </a:xfrm>
           <a:prstGeom prst="diamond">
             <a:avLst/>
@@ -15673,8 +15592,8 @@
         </p:nvCxnSpPr>
         <p:spPr>
           <a:xfrm flipH="1" flipV="1">
-            <a:off x="5536080" y="3876480"/>
-            <a:ext cx="684360" cy="1153080"/>
+            <a:off x="5535720" y="3876120"/>
+            <a:ext cx="684360" cy="1153440"/>
           </a:xfrm>
           <a:prstGeom prst="straightConnector1">
             <a:avLst/>
@@ -15696,7 +15615,7 @@
         <p:spPr>
           <a:xfrm>
             <a:off x="2693880" y="4415400"/>
-            <a:ext cx="471960" cy="376920"/>
+            <a:ext cx="471600" cy="376560"/>
           </a:xfrm>
           <a:prstGeom prst="triangle">
             <a:avLst>
@@ -15765,7 +15684,7 @@
         </p:nvCxnSpPr>
         <p:spPr>
           <a:xfrm flipH="1" flipV="1">
-            <a:off x="2894040" y="4114800"/>
+            <a:off x="2893680" y="4114800"/>
             <a:ext cx="36360" cy="300960"/>
           </a:xfrm>
           <a:prstGeom prst="straightConnector1">
@@ -15788,7 +15707,7 @@
         <p:spPr>
           <a:xfrm>
             <a:off x="2109960" y="5163480"/>
-            <a:ext cx="1615680" cy="303120"/>
+            <a:ext cx="1615320" cy="303120"/>
           </a:xfrm>
           <a:prstGeom prst="rect">
             <a:avLst/>
@@ -15845,7 +15764,7 @@
         <p:spPr>
           <a:xfrm>
             <a:off x="2109960" y="5163480"/>
-            <a:ext cx="1615680" cy="303120"/>
+            <a:ext cx="1615320" cy="303120"/>
           </a:xfrm>
           <a:prstGeom prst="rect">
             <a:avLst/>
@@ -15902,7 +15821,7 @@
         <p:spPr>
           <a:xfrm>
             <a:off x="2109960" y="5424840"/>
-            <a:ext cx="1615680" cy="363960"/>
+            <a:ext cx="1615320" cy="363960"/>
           </a:xfrm>
           <a:prstGeom prst="rect">
             <a:avLst/>
@@ -15970,8 +15889,8 @@
         </p:nvCxnSpPr>
         <p:spPr>
           <a:xfrm flipH="1">
-            <a:off x="2917800" y="4792320"/>
-            <a:ext cx="12600" cy="371520"/>
+            <a:off x="2917440" y="4791960"/>
+            <a:ext cx="12600" cy="371880"/>
           </a:xfrm>
           <a:prstGeom prst="straightConnector1">
             <a:avLst/>
@@ -15995,8 +15914,8 @@
         </p:nvCxnSpPr>
         <p:spPr>
           <a:xfrm flipH="1">
-            <a:off x="4157280" y="1103040"/>
-            <a:ext cx="270000" cy="179280"/>
+            <a:off x="4156920" y="1102680"/>
+            <a:ext cx="270360" cy="179640"/>
           </a:xfrm>
           <a:prstGeom prst="straightConnector1">
             <a:avLst/>
@@ -16018,7 +15937,7 @@
         <p:spPr>
           <a:xfrm flipH="1">
             <a:off x="0" y="3657600"/>
-            <a:ext cx="1839600" cy="10800"/>
+            <a:ext cx="1839960" cy="11160"/>
           </a:xfrm>
           <a:prstGeom prst="straightConnector1">
             <a:avLst/>
@@ -16040,7 +15959,7 @@
         <p:spPr>
           <a:xfrm>
             <a:off x="8686800" y="532800"/>
-            <a:ext cx="1366920" cy="376920"/>
+            <a:ext cx="1366560" cy="376560"/>
           </a:xfrm>
           <a:prstGeom prst="ellipse">
             <a:avLst/>
@@ -16105,8 +16024,8 @@
         </p:nvCxnSpPr>
         <p:spPr>
           <a:xfrm flipH="1">
-            <a:off x="9030960" y="909720"/>
-            <a:ext cx="339840" cy="538920"/>
+            <a:off x="9030960" y="909360"/>
+            <a:ext cx="339480" cy="539280"/>
           </a:xfrm>
           <a:prstGeom prst="straightConnector1">
             <a:avLst/>
@@ -16158,7 +16077,7 @@
         <p:spPr>
           <a:xfrm flipH="1">
             <a:off x="0" y="3073320"/>
-            <a:ext cx="1839600" cy="10800"/>
+            <a:ext cx="1839960" cy="11160"/>
           </a:xfrm>
           <a:prstGeom prst="straightConnector1">
             <a:avLst/>
@@ -16181,7 +16100,7 @@
         <p:spPr>
           <a:xfrm>
             <a:off x="0" y="2489400"/>
-            <a:ext cx="1839600" cy="10800"/>
+            <a:ext cx="1839960" cy="11160"/>
           </a:xfrm>
           <a:prstGeom prst="straightConnector1">
             <a:avLst/>
@@ -16204,7 +16123,7 @@
         <p:spPr>
           <a:xfrm>
             <a:off x="0" y="2781360"/>
-            <a:ext cx="1839600" cy="10800"/>
+            <a:ext cx="1839960" cy="11160"/>
           </a:xfrm>
           <a:prstGeom prst="straightConnector1">
             <a:avLst/>
@@ -16227,7 +16146,7 @@
         <p:spPr>
           <a:xfrm flipH="1">
             <a:off x="0" y="3657600"/>
-            <a:ext cx="1839600" cy="10800"/>
+            <a:ext cx="1839960" cy="11160"/>
           </a:xfrm>
           <a:prstGeom prst="straightConnector1">
             <a:avLst/>
@@ -16249,7 +16168,7 @@
         <p:spPr>
           <a:xfrm>
             <a:off x="128520" y="6134040"/>
-            <a:ext cx="1560960" cy="376920"/>
+            <a:ext cx="1560600" cy="376560"/>
           </a:xfrm>
           <a:prstGeom prst="diamond">
             <a:avLst/>
@@ -16314,7 +16233,7 @@
         <p:spPr>
           <a:xfrm>
             <a:off x="302760" y="5454000"/>
-            <a:ext cx="1212480" cy="376920"/>
+            <a:ext cx="1212120" cy="376560"/>
           </a:xfrm>
           <a:prstGeom prst="ellipse">
             <a:avLst/>
@@ -16377,9 +16296,9 @@
         <p:grpSpPr>
           <a:xfrm>
             <a:off x="101160" y="336240"/>
-            <a:ext cx="1615680" cy="777960"/>
+            <a:ext cx="1615320" cy="777960"/>
             <a:chOff x="101160" y="336240"/>
-            <a:chExt cx="1615680" cy="777960"/>
+            <a:chExt cx="1615320" cy="777960"/>
           </a:xfrm>
         </p:grpSpPr>
         <p:sp>
@@ -16391,7 +16310,7 @@
           <p:spPr>
             <a:xfrm>
               <a:off x="101160" y="336240"/>
-              <a:ext cx="1615680" cy="303120"/>
+              <a:ext cx="1615320" cy="303120"/>
             </a:xfrm>
             <a:prstGeom prst="rect">
               <a:avLst/>
@@ -16448,7 +16367,7 @@
           <p:spPr>
             <a:xfrm>
               <a:off x="101160" y="597600"/>
-              <a:ext cx="1615680" cy="516600"/>
+              <a:ext cx="1615320" cy="516600"/>
             </a:xfrm>
             <a:prstGeom prst="rect">
               <a:avLst/>
@@ -16539,7 +16458,7 @@
         <p:spPr>
           <a:xfrm>
             <a:off x="128520" y="4629600"/>
-            <a:ext cx="1560960" cy="521640"/>
+            <a:ext cx="1560600" cy="521280"/>
           </a:xfrm>
           <a:prstGeom prst="diamond">
             <a:avLst/>
@@ -16627,7 +16546,7 @@
         <p:spPr>
           <a:xfrm>
             <a:off x="0" y="3365640"/>
-            <a:ext cx="1839600" cy="10800"/>
+            <a:ext cx="1839960" cy="11160"/>
           </a:xfrm>
           <a:prstGeom prst="straightConnector1">
             <a:avLst/>
@@ -16649,7 +16568,7 @@
         <p:spPr>
           <a:xfrm>
             <a:off x="673200" y="3949920"/>
-            <a:ext cx="471960" cy="376920"/>
+            <a:ext cx="471600" cy="376560"/>
           </a:xfrm>
           <a:prstGeom prst="triangle">
             <a:avLst>
@@ -16716,9 +16635,9 @@
         <p:grpSpPr>
           <a:xfrm>
             <a:off x="101160" y="1413000"/>
-            <a:ext cx="1615680" cy="777960"/>
+            <a:ext cx="1615320" cy="777960"/>
             <a:chOff x="101160" y="1413000"/>
-            <a:chExt cx="1615680" cy="777960"/>
+            <a:chExt cx="1615320" cy="777960"/>
           </a:xfrm>
         </p:grpSpPr>
         <p:sp>
@@ -16730,7 +16649,7 @@
           <p:spPr>
             <a:xfrm>
               <a:off x="101160" y="1413000"/>
-              <a:ext cx="1615680" cy="303120"/>
+              <a:ext cx="1615320" cy="303120"/>
             </a:xfrm>
             <a:prstGeom prst="rect">
               <a:avLst/>
@@ -16788,7 +16707,7 @@
           <p:spPr>
             <a:xfrm>
               <a:off x="101160" y="1674360"/>
-              <a:ext cx="1615680" cy="516600"/>
+              <a:ext cx="1615320" cy="516600"/>
             </a:xfrm>
             <a:prstGeom prst="rect">
               <a:avLst/>
@@ -16880,7 +16799,7 @@
         <p:spPr>
           <a:xfrm>
             <a:off x="4775040" y="457200"/>
-            <a:ext cx="1615680" cy="303120"/>
+            <a:ext cx="1615320" cy="303120"/>
           </a:xfrm>
           <a:prstGeom prst="rect">
             <a:avLst/>
@@ -16937,7 +16856,7 @@
         <p:spPr>
           <a:xfrm>
             <a:off x="4775040" y="718560"/>
-            <a:ext cx="1615680" cy="730080"/>
+            <a:ext cx="1615320" cy="730080"/>
           </a:xfrm>
           <a:prstGeom prst="rect">
             <a:avLst/>
@@ -17054,9 +16973,9 @@
         <p:grpSpPr>
           <a:xfrm>
             <a:off x="4572000" y="4274280"/>
-            <a:ext cx="1615680" cy="991440"/>
+            <a:ext cx="1615320" cy="991440"/>
             <a:chOff x="4572000" y="4274280"/>
-            <a:chExt cx="1615680" cy="991440"/>
+            <a:chExt cx="1615320" cy="991440"/>
           </a:xfrm>
         </p:grpSpPr>
         <p:sp>
@@ -17068,7 +16987,7 @@
           <p:spPr>
             <a:xfrm>
               <a:off x="4572000" y="4274280"/>
-              <a:ext cx="1615680" cy="303120"/>
+              <a:ext cx="1615320" cy="303120"/>
             </a:xfrm>
             <a:prstGeom prst="rect">
               <a:avLst/>
@@ -17125,7 +17044,7 @@
           <p:spPr>
             <a:xfrm>
               <a:off x="4572000" y="4535640"/>
-              <a:ext cx="1615680" cy="730080"/>
+              <a:ext cx="1615320" cy="730080"/>
             </a:xfrm>
             <a:prstGeom prst="rect">
               <a:avLst/>
@@ -17243,7 +17162,7 @@
         <p:spPr>
           <a:xfrm>
             <a:off x="3231360" y="2899800"/>
-            <a:ext cx="1560960" cy="376920"/>
+            <a:ext cx="1560600" cy="376560"/>
           </a:xfrm>
           <a:prstGeom prst="diamond">
             <a:avLst/>
@@ -17308,7 +17227,7 @@
         <p:spPr>
           <a:xfrm>
             <a:off x="4602960" y="2585160"/>
-            <a:ext cx="1789560" cy="378360"/>
+            <a:ext cx="1789200" cy="378000"/>
           </a:xfrm>
           <a:prstGeom prst="diamond">
             <a:avLst/>
@@ -17375,8 +17294,8 @@
         </p:nvCxnSpPr>
         <p:spPr>
           <a:xfrm flipH="1" flipV="1">
-            <a:off x="4011840" y="3276720"/>
-            <a:ext cx="1368360" cy="997920"/>
+            <a:off x="4011840" y="3276360"/>
+            <a:ext cx="1368000" cy="998280"/>
           </a:xfrm>
           <a:prstGeom prst="straightConnector1">
             <a:avLst/>
@@ -17401,7 +17320,7 @@
         </p:nvCxnSpPr>
         <p:spPr>
           <a:xfrm flipV="1">
-            <a:off x="5497920" y="1448640"/>
+            <a:off x="5497560" y="1448640"/>
             <a:ext cx="85320" cy="1136880"/>
           </a:xfrm>
           <a:prstGeom prst="straightConnector1">
@@ -17426,8 +17345,8 @@
         </p:nvCxnSpPr>
         <p:spPr>
           <a:xfrm flipV="1">
-            <a:off x="5379840" y="2963520"/>
-            <a:ext cx="118440" cy="1311120"/>
+            <a:off x="5379480" y="2963160"/>
+            <a:ext cx="118440" cy="1311480"/>
           </a:xfrm>
           <a:prstGeom prst="straightConnector1">
             <a:avLst/>
@@ -17452,7 +17371,7 @@
         <p:spPr>
           <a:xfrm flipH="1">
             <a:off x="4011840" y="1448640"/>
-            <a:ext cx="1571400" cy="1451520"/>
+            <a:ext cx="1571040" cy="1451520"/>
           </a:xfrm>
           <a:prstGeom prst="straightConnector1">
             <a:avLst/>
@@ -17474,7 +17393,7 @@
         <p:spPr>
           <a:xfrm>
             <a:off x="2743200" y="457200"/>
-            <a:ext cx="1560960" cy="376920"/>
+            <a:ext cx="1560600" cy="376560"/>
           </a:xfrm>
           <a:prstGeom prst="diamond">
             <a:avLst/>
@@ -17541,8 +17460,8 @@
         </p:nvCxnSpPr>
         <p:spPr>
           <a:xfrm flipH="1" flipV="1">
-            <a:off x="4304160" y="645840"/>
-            <a:ext cx="471240" cy="438120"/>
+            <a:off x="4303800" y="645480"/>
+            <a:ext cx="471600" cy="438480"/>
           </a:xfrm>
           <a:prstGeom prst="straightConnector1">
             <a:avLst/>
@@ -17566,8 +17485,8 @@
         </p:nvCxnSpPr>
         <p:spPr>
           <a:xfrm flipH="1" flipV="1">
-            <a:off x="3523680" y="834120"/>
-            <a:ext cx="1251720" cy="249840"/>
+            <a:off x="3523680" y="833760"/>
+            <a:ext cx="1251720" cy="250200"/>
           </a:xfrm>
           <a:prstGeom prst="straightConnector1">
             <a:avLst/>
@@ -17589,9 +17508,9 @@
         <p:grpSpPr>
           <a:xfrm>
             <a:off x="8686800" y="837360"/>
-            <a:ext cx="1615680" cy="991440"/>
+            <a:ext cx="1615320" cy="991440"/>
             <a:chOff x="8686800" y="837360"/>
-            <a:chExt cx="1615680" cy="991440"/>
+            <a:chExt cx="1615320" cy="991440"/>
           </a:xfrm>
         </p:grpSpPr>
         <p:sp>
@@ -17603,7 +17522,7 @@
           <p:spPr>
             <a:xfrm>
               <a:off x="8686800" y="837360"/>
-              <a:ext cx="1615680" cy="303120"/>
+              <a:ext cx="1615320" cy="303120"/>
             </a:xfrm>
             <a:prstGeom prst="rect">
               <a:avLst/>
@@ -17660,7 +17579,7 @@
           <p:spPr>
             <a:xfrm>
               <a:off x="8686800" y="1098720"/>
-              <a:ext cx="1615680" cy="730080"/>
+              <a:ext cx="1615320" cy="730080"/>
             </a:xfrm>
             <a:prstGeom prst="rect">
               <a:avLst/>
@@ -17778,7 +17697,7 @@
         <p:spPr>
           <a:xfrm>
             <a:off x="128880" y="6134040"/>
-            <a:ext cx="1560960" cy="376920"/>
+            <a:ext cx="1560600" cy="376560"/>
           </a:xfrm>
           <a:prstGeom prst="diamond">
             <a:avLst/>
@@ -17843,7 +17762,7 @@
         <p:spPr>
           <a:xfrm>
             <a:off x="7315200" y="228600"/>
-            <a:ext cx="1560960" cy="376920"/>
+            <a:ext cx="1560600" cy="376560"/>
           </a:xfrm>
           <a:prstGeom prst="diamond">
             <a:avLst/>
@@ -17908,7 +17827,7 @@
         <p:spPr>
           <a:xfrm>
             <a:off x="360" y="3366000"/>
-            <a:ext cx="1839600" cy="10800"/>
+            <a:ext cx="1839960" cy="11160"/>
           </a:xfrm>
           <a:prstGeom prst="straightConnector1">
             <a:avLst/>
@@ -17932,8 +17851,8 @@
         </p:nvCxnSpPr>
         <p:spPr>
           <a:xfrm flipH="1">
-            <a:off x="6390720" y="417240"/>
-            <a:ext cx="924840" cy="666720"/>
+            <a:off x="6390360" y="416880"/>
+            <a:ext cx="925200" cy="667080"/>
           </a:xfrm>
           <a:prstGeom prst="straightConnector1">
             <a:avLst/>
@@ -17955,7 +17874,7 @@
         <p:spPr>
           <a:xfrm>
             <a:off x="6629400" y="1442160"/>
-            <a:ext cx="1820160" cy="606600"/>
+            <a:ext cx="1819800" cy="606240"/>
           </a:xfrm>
           <a:prstGeom prst="diamond">
             <a:avLst/>
@@ -18022,8 +17941,8 @@
         </p:nvCxnSpPr>
         <p:spPr>
           <a:xfrm flipH="1" flipV="1">
-            <a:off x="8876160" y="417240"/>
-            <a:ext cx="618840" cy="420480"/>
+            <a:off x="8875800" y="416880"/>
+            <a:ext cx="618840" cy="420840"/>
           </a:xfrm>
           <a:prstGeom prst="straightConnector1">
             <a:avLst/>
@@ -18046,7 +17965,7 @@
         <p:spPr>
           <a:xfrm>
             <a:off x="6629400" y="2514600"/>
-            <a:ext cx="1560960" cy="376920"/>
+            <a:ext cx="1560600" cy="376560"/>
           </a:xfrm>
           <a:prstGeom prst="diamond">
             <a:avLst/>
@@ -18113,8 +18032,8 @@
         </p:nvCxnSpPr>
         <p:spPr>
           <a:xfrm flipH="1">
-            <a:off x="8190360" y="1828800"/>
-            <a:ext cx="1304640" cy="874800"/>
+            <a:off x="8190000" y="1828800"/>
+            <a:ext cx="1304640" cy="874440"/>
           </a:xfrm>
           <a:prstGeom prst="straightConnector1">
             <a:avLst/>
@@ -18138,8 +18057,8 @@
         </p:nvCxnSpPr>
         <p:spPr>
           <a:xfrm flipH="1">
-            <a:off x="6187680" y="2703240"/>
-            <a:ext cx="442080" cy="2067120"/>
+            <a:off x="6187320" y="2702880"/>
+            <a:ext cx="442440" cy="2067480"/>
           </a:xfrm>
           <a:prstGeom prst="straightConnector1">
             <a:avLst/>
@@ -18163,8 +18082,8 @@
         </p:nvCxnSpPr>
         <p:spPr>
           <a:xfrm flipH="1">
-            <a:off x="8449560" y="1333080"/>
-            <a:ext cx="237600" cy="412920"/>
+            <a:off x="8449200" y="1333080"/>
+            <a:ext cx="237960" cy="412560"/>
           </a:xfrm>
           <a:prstGeom prst="straightConnector1">
             <a:avLst/>
@@ -18188,8 +18107,8 @@
         </p:nvCxnSpPr>
         <p:spPr>
           <a:xfrm flipH="1" flipV="1">
-            <a:off x="5582880" y="1448640"/>
-            <a:ext cx="1046880" cy="297360"/>
+            <a:off x="5582520" y="1448640"/>
+            <a:ext cx="1047240" cy="297000"/>
           </a:xfrm>
           <a:prstGeom prst="straightConnector1">
             <a:avLst/>
@@ -18211,9 +18130,9 @@
         <p:grpSpPr>
           <a:xfrm>
             <a:off x="101160" y="336240"/>
-            <a:ext cx="1615680" cy="777960"/>
+            <a:ext cx="1615320" cy="777960"/>
             <a:chOff x="101160" y="336240"/>
-            <a:chExt cx="1615680" cy="777960"/>
+            <a:chExt cx="1615320" cy="777960"/>
           </a:xfrm>
         </p:grpSpPr>
         <p:sp>
@@ -18225,7 +18144,7 @@
           <p:spPr>
             <a:xfrm>
               <a:off x="101160" y="336240"/>
-              <a:ext cx="1615680" cy="303120"/>
+              <a:ext cx="1615320" cy="303120"/>
             </a:xfrm>
             <a:prstGeom prst="rect">
               <a:avLst/>
@@ -18282,7 +18201,7 @@
           <p:spPr>
             <a:xfrm>
               <a:off x="101160" y="597600"/>
-              <a:ext cx="1615680" cy="516600"/>
+              <a:ext cx="1615320" cy="516600"/>
             </a:xfrm>
             <a:prstGeom prst="rect">
               <a:avLst/>
@@ -18373,9 +18292,9 @@
         <p:grpSpPr>
           <a:xfrm>
             <a:off x="6760440" y="4359960"/>
-            <a:ext cx="1615680" cy="555840"/>
+            <a:ext cx="1615320" cy="555480"/>
             <a:chOff x="6760440" y="4359960"/>
-            <a:chExt cx="1615680" cy="555840"/>
+            <a:chExt cx="1615320" cy="555480"/>
           </a:xfrm>
         </p:grpSpPr>
         <p:sp>
@@ -18387,7 +18306,7 @@
           <p:spPr>
             <a:xfrm>
               <a:off x="6760440" y="4359960"/>
-              <a:ext cx="1615680" cy="303120"/>
+              <a:ext cx="1615320" cy="303120"/>
             </a:xfrm>
             <a:prstGeom prst="rect">
               <a:avLst/>
@@ -18444,7 +18363,7 @@
           <p:spPr>
             <a:xfrm>
               <a:off x="6760440" y="4621320"/>
-              <a:ext cx="1615680" cy="294480"/>
+              <a:ext cx="1615320" cy="294120"/>
             </a:xfrm>
             <a:prstGeom prst="rect">
               <a:avLst/>
@@ -18493,7 +18412,7 @@
         <p:spPr>
           <a:xfrm>
             <a:off x="9144000" y="2057400"/>
-            <a:ext cx="471960" cy="376920"/>
+            <a:ext cx="471600" cy="376560"/>
           </a:xfrm>
           <a:prstGeom prst="triangle">
             <a:avLst>
@@ -18561,8 +18480,8 @@
         </p:nvCxnSpPr>
         <p:spPr>
           <a:xfrm flipH="1">
-            <a:off x="8026200" y="4106160"/>
-            <a:ext cx="1431720" cy="262440"/>
+            <a:off x="8026200" y="4105800"/>
+            <a:ext cx="1431360" cy="263160"/>
           </a:xfrm>
           <a:prstGeom prst="straightConnector1">
             <a:avLst/>
@@ -18585,8 +18504,8 @@
         </p:nvCxnSpPr>
         <p:spPr>
           <a:xfrm flipH="1" flipV="1">
-            <a:off x="9457560" y="4106160"/>
-            <a:ext cx="482400" cy="244080"/>
+            <a:off x="9457200" y="4105800"/>
+            <a:ext cx="483120" cy="244800"/>
           </a:xfrm>
           <a:prstGeom prst="straightConnector1">
             <a:avLst/>
@@ -18609,8 +18528,8 @@
         </p:nvCxnSpPr>
         <p:spPr>
           <a:xfrm flipH="1">
-            <a:off x="9346320" y="2434320"/>
-            <a:ext cx="34200" cy="453960"/>
+            <a:off x="9346320" y="2433960"/>
+            <a:ext cx="33840" cy="454680"/>
           </a:xfrm>
           <a:prstGeom prst="straightConnector1">
             <a:avLst/>
@@ -18634,7 +18553,7 @@
         </p:nvCxnSpPr>
         <p:spPr>
           <a:xfrm flipH="1">
-            <a:off x="9380160" y="1828800"/>
+            <a:off x="9379800" y="1828800"/>
             <a:ext cx="114840" cy="228960"/>
           </a:xfrm>
           <a:prstGeom prst="straightConnector1">
@@ -18657,7 +18576,7 @@
         <p:spPr>
           <a:xfrm>
             <a:off x="7089840" y="5715000"/>
-            <a:ext cx="1615680" cy="303120"/>
+            <a:ext cx="1615320" cy="303120"/>
           </a:xfrm>
           <a:prstGeom prst="rect">
             <a:avLst/>
@@ -18714,7 +18633,7 @@
         <p:spPr>
           <a:xfrm>
             <a:off x="6760440" y="5183280"/>
-            <a:ext cx="1819080" cy="376920"/>
+            <a:ext cx="1818720" cy="376560"/>
           </a:xfrm>
           <a:prstGeom prst="diamond">
             <a:avLst/>
@@ -18779,7 +18698,7 @@
         <p:spPr>
           <a:xfrm flipH="1">
             <a:off x="0" y="3657600"/>
-            <a:ext cx="1839600" cy="10800"/>
+            <a:ext cx="1839960" cy="11160"/>
           </a:xfrm>
           <a:prstGeom prst="straightConnector1">
             <a:avLst/>
@@ -18801,9 +18720,9 @@
         <p:grpSpPr>
           <a:xfrm>
             <a:off x="8534520" y="2879640"/>
-            <a:ext cx="1615680" cy="556560"/>
+            <a:ext cx="1615320" cy="556200"/>
             <a:chOff x="8534520" y="2879640"/>
-            <a:chExt cx="1615680" cy="556560"/>
+            <a:chExt cx="1615320" cy="556200"/>
           </a:xfrm>
         </p:grpSpPr>
         <p:sp>
@@ -18815,7 +18734,7 @@
           <p:spPr>
             <a:xfrm>
               <a:off x="8534520" y="2879640"/>
-              <a:ext cx="1615680" cy="303120"/>
+              <a:ext cx="1615320" cy="303120"/>
             </a:xfrm>
             <a:prstGeom prst="rect">
               <a:avLst/>
@@ -18872,7 +18791,7 @@
           <p:spPr>
             <a:xfrm>
               <a:off x="8534520" y="3141000"/>
-              <a:ext cx="1615680" cy="295200"/>
+              <a:ext cx="1615320" cy="294840"/>
             </a:xfrm>
             <a:prstGeom prst="rect">
               <a:avLst/>
@@ -18921,9 +18840,9 @@
         <p:grpSpPr>
           <a:xfrm>
             <a:off x="8534520" y="2879640"/>
-            <a:ext cx="1615680" cy="564480"/>
+            <a:ext cx="1615320" cy="564480"/>
             <a:chOff x="8534520" y="2879640"/>
-            <a:chExt cx="1615680" cy="564480"/>
+            <a:chExt cx="1615320" cy="564480"/>
           </a:xfrm>
         </p:grpSpPr>
         <p:sp>
@@ -18935,7 +18854,7 @@
           <p:spPr>
             <a:xfrm>
               <a:off x="8534520" y="2879640"/>
-              <a:ext cx="1615680" cy="303120"/>
+              <a:ext cx="1615320" cy="303120"/>
             </a:xfrm>
             <a:prstGeom prst="rect">
               <a:avLst/>
@@ -18992,7 +18911,7 @@
           <p:spPr>
             <a:xfrm>
               <a:off x="8534520" y="3141000"/>
-              <a:ext cx="1615680" cy="303120"/>
+              <a:ext cx="1615320" cy="303120"/>
             </a:xfrm>
             <a:prstGeom prst="rect">
               <a:avLst/>
@@ -19055,7 +18974,7 @@
         <p:spPr>
           <a:xfrm>
             <a:off x="9221400" y="3729240"/>
-            <a:ext cx="471960" cy="376920"/>
+            <a:ext cx="471600" cy="376560"/>
           </a:xfrm>
           <a:prstGeom prst="triangle">
             <a:avLst>
@@ -19124,7 +19043,7 @@
         </p:nvCxnSpPr>
         <p:spPr>
           <a:xfrm>
-            <a:off x="9342360" y="3444120"/>
+            <a:off x="9342000" y="3444120"/>
             <a:ext cx="115560" cy="285480"/>
           </a:xfrm>
           <a:prstGeom prst="straightConnector1">
@@ -19147,7 +19066,7 @@
         <p:spPr>
           <a:xfrm>
             <a:off x="8556840" y="3657600"/>
-            <a:ext cx="1839600" cy="10800"/>
+            <a:ext cx="1839960" cy="11160"/>
           </a:xfrm>
           <a:prstGeom prst="straightConnector1">
             <a:avLst/>
@@ -19170,7 +19089,7 @@
         <p:spPr>
           <a:xfrm>
             <a:off x="9601200" y="3382920"/>
-            <a:ext cx="905760" cy="337680"/>
+            <a:ext cx="905400" cy="337320"/>
           </a:xfrm>
           <a:prstGeom prst="rect">
             <a:avLst/>
@@ -19214,231 +19133,9 @@
           </a:p>
         </p:txBody>
       </p:sp>
-      <p:sp>
-        <p:nvSpPr>
-          <p:cNvPr id="273" name="TextBox 49"/>
-          <p:cNvSpPr/>
-          <p:nvPr/>
-        </p:nvSpPr>
-        <p:spPr>
-          <a:xfrm>
-            <a:off x="2057400" y="2132280"/>
-            <a:ext cx="1615680" cy="303120"/>
-          </a:xfrm>
-          <a:prstGeom prst="rect">
-            <a:avLst/>
-          </a:prstGeom>
-          <a:solidFill>
-            <a:schemeClr val="bg1"/>
-          </a:solidFill>
-          <a:ln w="0">
-            <a:solidFill>
-              <a:srgbClr val="000000"/>
-            </a:solidFill>
-          </a:ln>
-        </p:spPr>
-        <p:style>
-          <a:lnRef idx="0"/>
-          <a:fillRef idx="0"/>
-          <a:effectRef idx="0"/>
-          <a:fontRef idx="minor"/>
-        </p:style>
-        <p:txBody>
-          <a:bodyPr lIns="90000" rIns="90000" tIns="45000" bIns="45000" anchor="t">
-            <a:spAutoFit/>
-          </a:bodyPr>
-          <a:p>
-            <a:pPr algn="ctr" defTabSz="914400">
-              <a:lnSpc>
-                <a:spcPct val="100000"/>
-              </a:lnSpc>
-            </a:pPr>
-            <a:r>
-              <a:rPr b="0" lang="en-US" sz="1400" spc="-1" strike="noStrike">
-                <a:solidFill>
-                  <a:schemeClr val="dk1"/>
-                </a:solidFill>
-                <a:latin typeface="Calibri"/>
-              </a:rPr>
-              <a:t>Admin</a:t>
-            </a:r>
-            <a:endParaRPr b="0" lang="en-US" sz="1400" spc="-1" strike="noStrike">
-              <a:solidFill>
-                <a:srgbClr val="000000"/>
-              </a:solidFill>
-              <a:latin typeface="Arial"/>
-            </a:endParaRPr>
-          </a:p>
-        </p:txBody>
-      </p:sp>
-      <p:sp>
-        <p:nvSpPr>
-          <p:cNvPr id="274" name="TextBox 50"/>
-          <p:cNvSpPr/>
-          <p:nvPr/>
-        </p:nvSpPr>
-        <p:spPr>
-          <a:xfrm>
-            <a:off x="2057400" y="2393640"/>
-            <a:ext cx="1615680" cy="187200"/>
-          </a:xfrm>
-          <a:prstGeom prst="rect">
-            <a:avLst/>
-          </a:prstGeom>
-          <a:solidFill>
-            <a:schemeClr val="bg1"/>
-          </a:solidFill>
-          <a:ln w="0">
-            <a:solidFill>
-              <a:srgbClr val="000000"/>
-            </a:solidFill>
-          </a:ln>
-        </p:spPr>
-        <p:style>
-          <a:lnRef idx="0"/>
-          <a:fillRef idx="0"/>
-          <a:effectRef idx="0"/>
-          <a:fontRef idx="minor"/>
-        </p:style>
-        <p:txBody>
-          <a:bodyPr lIns="90000" rIns="90000" tIns="45000" bIns="45000" anchor="t">
-            <a:spAutoFit/>
-          </a:bodyPr>
-          <a:p>
-            <a:pPr defTabSz="914400">
-              <a:lnSpc>
-                <a:spcPct val="100000"/>
-              </a:lnSpc>
-            </a:pPr>
-            <a:endParaRPr b="0" lang="en-US" sz="1800" spc="-1" strike="noStrike">
-              <a:solidFill>
-                <a:srgbClr val="000000"/>
-              </a:solidFill>
-              <a:latin typeface="Arial"/>
-            </a:endParaRPr>
-          </a:p>
-        </p:txBody>
-      </p:sp>
-      <p:sp>
-        <p:nvSpPr>
-          <p:cNvPr id="275" name="Isosceles Triangle 8"/>
-          <p:cNvSpPr/>
-          <p:nvPr/>
-        </p:nvSpPr>
-        <p:spPr>
-          <a:xfrm>
-            <a:off x="2613960" y="1217880"/>
-            <a:ext cx="471960" cy="376920"/>
-          </a:xfrm>
-          <a:prstGeom prst="triangle">
-            <a:avLst>
-              <a:gd name="adj" fmla="val 50000"/>
-            </a:avLst>
-          </a:prstGeom>
-          <a:solidFill>
-            <a:schemeClr val="bg1"/>
-          </a:solidFill>
-          <a:ln>
-            <a:solidFill>
-              <a:srgbClr val="000000"/>
-            </a:solidFill>
-          </a:ln>
-        </p:spPr>
-        <p:style>
-          <a:lnRef idx="2">
-            <a:schemeClr val="accent1">
-              <a:shade val="50000"/>
-            </a:schemeClr>
-          </a:lnRef>
-          <a:fillRef idx="1">
-            <a:schemeClr val="accent1"/>
-          </a:fillRef>
-          <a:effectRef idx="0">
-            <a:schemeClr val="accent1"/>
-          </a:effectRef>
-          <a:fontRef idx="minor"/>
-        </p:style>
-        <p:txBody>
-          <a:bodyPr wrap="none" lIns="0" rIns="0" tIns="0" bIns="0" anchor="ctr">
-            <a:noAutofit/>
-          </a:bodyPr>
-          <a:p>
-            <a:pPr algn="ctr" defTabSz="914400">
-              <a:lnSpc>
-                <a:spcPct val="100000"/>
-              </a:lnSpc>
-            </a:pPr>
-            <a:r>
-              <a:rPr b="0" lang="en-US" sz="1400" spc="-1" strike="noStrike">
-                <a:solidFill>
-                  <a:schemeClr val="dk1"/>
-                </a:solidFill>
-                <a:latin typeface="Calibri"/>
-              </a:rPr>
-              <a:t>ISA</a:t>
-            </a:r>
-            <a:endParaRPr b="0" lang="en-US" sz="1400" spc="-1" strike="noStrike">
-              <a:solidFill>
-                <a:srgbClr val="000000"/>
-              </a:solidFill>
-              <a:latin typeface="Arial"/>
-            </a:endParaRPr>
-          </a:p>
-        </p:txBody>
-      </p:sp>
       <p:cxnSp>
         <p:nvCxnSpPr>
-          <p:cNvPr id="276" name="Straight Arrow Connector 81"/>
-          <p:cNvCxnSpPr>
-            <a:stCxn id="275" idx="3"/>
-            <a:endCxn id="273" idx="0"/>
-          </p:cNvCxnSpPr>
-          <p:nvPr/>
-        </p:nvCxnSpPr>
-        <p:spPr>
-          <a:xfrm>
-            <a:off x="2850120" y="1594800"/>
-            <a:ext cx="15480" cy="537840"/>
-          </a:xfrm>
-          <a:prstGeom prst="straightConnector1">
-            <a:avLst/>
-          </a:prstGeom>
-          <a:ln w="25400">
-            <a:solidFill>
-              <a:srgbClr val="000000"/>
-            </a:solidFill>
-            <a:round/>
-          </a:ln>
-        </p:spPr>
-      </p:cxnSp>
-      <p:cxnSp>
-        <p:nvCxnSpPr>
-          <p:cNvPr id="277" name="Straight Arrow Connector 82"/>
-          <p:cNvCxnSpPr>
-            <a:stCxn id="275" idx="0"/>
-            <a:endCxn id="222" idx="1"/>
-          </p:cNvCxnSpPr>
-          <p:nvPr/>
-        </p:nvCxnSpPr>
-        <p:spPr>
-          <a:xfrm flipV="1">
-            <a:off x="2850120" y="1083600"/>
-            <a:ext cx="1925280" cy="134640"/>
-          </a:xfrm>
-          <a:prstGeom prst="straightConnector1">
-            <a:avLst/>
-          </a:prstGeom>
-          <a:ln w="25400">
-            <a:solidFill>
-              <a:srgbClr val="000000"/>
-            </a:solidFill>
-            <a:round/>
-          </a:ln>
-        </p:spPr>
-      </p:cxnSp>
-      <p:cxnSp>
-        <p:nvCxnSpPr>
-          <p:cNvPr id="278" name="Straight Arrow Connector 83"/>
+          <p:cNvPr id="273" name="Straight Arrow Connector 83"/>
           <p:cNvCxnSpPr>
             <a:stCxn id="252" idx="2"/>
             <a:endCxn id="262" idx="0"/>
@@ -19447,8 +19144,8 @@
         </p:nvCxnSpPr>
         <p:spPr>
           <a:xfrm>
-            <a:off x="7568280" y="4915800"/>
-            <a:ext cx="102240" cy="267840"/>
+            <a:off x="7567920" y="4915440"/>
+            <a:ext cx="102240" cy="268200"/>
           </a:xfrm>
           <a:prstGeom prst="straightConnector1">
             <a:avLst/>
@@ -19464,7 +19161,7 @@
       </p:cxnSp>
       <p:cxnSp>
         <p:nvCxnSpPr>
-          <p:cNvPr id="279" name="Straight Arrow Connector 57"/>
+          <p:cNvPr id="274" name="Straight Arrow Connector 57"/>
           <p:cNvCxnSpPr>
             <a:stCxn id="262" idx="2"/>
             <a:endCxn id="261" idx="0"/>
@@ -19473,8 +19170,8 @@
         </p:nvCxnSpPr>
         <p:spPr>
           <a:xfrm>
-            <a:off x="7670160" y="5560200"/>
-            <a:ext cx="227880" cy="155160"/>
+            <a:off x="7669800" y="5559840"/>
+            <a:ext cx="227880" cy="155520"/>
           </a:xfrm>
           <a:prstGeom prst="straightConnector1">
             <a:avLst/>
@@ -19489,28 +19186,28 @@
       </p:cxnSp>
       <p:grpSp>
         <p:nvGrpSpPr>
-          <p:cNvPr id="280" name="Group 5"/>
+          <p:cNvPr id="275" name="Group 5"/>
           <p:cNvGrpSpPr/>
           <p:nvPr/>
         </p:nvGrpSpPr>
         <p:grpSpPr>
           <a:xfrm>
             <a:off x="10265040" y="5029200"/>
-            <a:ext cx="1615680" cy="556200"/>
+            <a:ext cx="1615320" cy="555840"/>
             <a:chOff x="10265040" y="5029200"/>
-            <a:chExt cx="1615680" cy="556200"/>
+            <a:chExt cx="1615320" cy="555840"/>
           </a:xfrm>
         </p:grpSpPr>
         <p:sp>
           <p:nvSpPr>
-            <p:cNvPr id="281" name="TextBox 22"/>
+            <p:cNvPr id="276" name="TextBox 22"/>
             <p:cNvSpPr/>
             <p:nvPr/>
           </p:nvSpPr>
           <p:spPr>
             <a:xfrm>
               <a:off x="10265040" y="5029200"/>
-              <a:ext cx="1615680" cy="303120"/>
+              <a:ext cx="1615320" cy="303120"/>
             </a:xfrm>
             <a:prstGeom prst="rect">
               <a:avLst/>
@@ -19560,14 +19257,14 @@
         </p:sp>
         <p:sp>
           <p:nvSpPr>
-            <p:cNvPr id="282" name="TextBox 29"/>
+            <p:cNvPr id="277" name="TextBox 29"/>
             <p:cNvSpPr/>
             <p:nvPr/>
           </p:nvSpPr>
           <p:spPr>
             <a:xfrm>
               <a:off x="10265040" y="5290560"/>
-              <a:ext cx="1615680" cy="294840"/>
+              <a:ext cx="1615320" cy="294480"/>
             </a:xfrm>
             <a:prstGeom prst="rect">
               <a:avLst/>
@@ -19609,17 +19306,17 @@
       </p:grpSp>
       <p:cxnSp>
         <p:nvCxnSpPr>
-          <p:cNvPr id="283" name="Straight Arrow Connector 84"/>
+          <p:cNvPr id="278" name="Straight Arrow Connector 84"/>
           <p:cNvCxnSpPr>
-            <a:stCxn id="280" idx="0"/>
+            <a:stCxn id="275" idx="0"/>
             <a:endCxn id="257" idx="4"/>
           </p:cNvCxnSpPr>
           <p:nvPr/>
         </p:nvCxnSpPr>
         <p:spPr>
           <a:xfrm flipH="1" flipV="1">
-            <a:off x="9693360" y="4106160"/>
-            <a:ext cx="1379880" cy="923400"/>
+            <a:off x="9693000" y="4105800"/>
+            <a:ext cx="1379880" cy="923760"/>
           </a:xfrm>
           <a:prstGeom prst="straightConnector1">
             <a:avLst/>
@@ -19634,28 +19331,28 @@
       </p:cxnSp>
       <p:grpSp>
         <p:nvGrpSpPr>
-          <p:cNvPr id="284" name="Group 9"/>
+          <p:cNvPr id="279" name="Group 9"/>
           <p:cNvGrpSpPr/>
           <p:nvPr/>
         </p:nvGrpSpPr>
         <p:grpSpPr>
           <a:xfrm>
             <a:off x="9122040" y="4343400"/>
-            <a:ext cx="1615680" cy="556200"/>
+            <a:ext cx="1615320" cy="555840"/>
             <a:chOff x="9122040" y="4343400"/>
-            <a:chExt cx="1615680" cy="556200"/>
+            <a:chExt cx="1615320" cy="555840"/>
           </a:xfrm>
         </p:grpSpPr>
         <p:sp>
           <p:nvSpPr>
-            <p:cNvPr id="285" name="TextBox 47"/>
+            <p:cNvPr id="280" name="TextBox 47"/>
             <p:cNvSpPr/>
             <p:nvPr/>
           </p:nvSpPr>
           <p:spPr>
             <a:xfrm>
               <a:off x="9122040" y="4343400"/>
-              <a:ext cx="1615680" cy="303120"/>
+              <a:ext cx="1615320" cy="303120"/>
             </a:xfrm>
             <a:prstGeom prst="rect">
               <a:avLst/>
@@ -19705,14 +19402,14 @@
         </p:sp>
         <p:sp>
           <p:nvSpPr>
-            <p:cNvPr id="286" name="TextBox 48"/>
+            <p:cNvPr id="281" name="TextBox 48"/>
             <p:cNvSpPr/>
             <p:nvPr/>
           </p:nvSpPr>
           <p:spPr>
             <a:xfrm>
               <a:off x="9122040" y="4604760"/>
-              <a:ext cx="1615680" cy="294840"/>
+              <a:ext cx="1615320" cy="294480"/>
             </a:xfrm>
             <a:prstGeom prst="rect">
               <a:avLst/>
@@ -19754,14 +19451,14 @@
       </p:grpSp>
       <p:sp>
         <p:nvSpPr>
-          <p:cNvPr id="287" name="Isosceles Triangle 9"/>
+          <p:cNvPr id="282" name="Isosceles Triangle 9"/>
           <p:cNvSpPr/>
           <p:nvPr/>
         </p:nvSpPr>
         <p:spPr>
           <a:xfrm>
             <a:off x="10037520" y="2131560"/>
-            <a:ext cx="471960" cy="376920"/>
+            <a:ext cx="471600" cy="376560"/>
           </a:xfrm>
           <a:prstGeom prst="triangle">
             <a:avLst>
@@ -19821,16 +19518,16 @@
       </p:sp>
       <p:cxnSp>
         <p:nvCxnSpPr>
-          <p:cNvPr id="288" name="Straight Arrow Connector 85"/>
+          <p:cNvPr id="283" name="Straight Arrow Connector 85"/>
           <p:cNvCxnSpPr>
             <a:stCxn id="235" idx="2"/>
-            <a:endCxn id="287" idx="0"/>
+            <a:endCxn id="282" idx="0"/>
           </p:cNvCxnSpPr>
           <p:nvPr/>
         </p:nvCxnSpPr>
         <p:spPr>
           <a:xfrm>
-            <a:off x="9494640" y="1828800"/>
+            <a:off x="9494280" y="1828800"/>
             <a:ext cx="779400" cy="303120"/>
           </a:xfrm>
           <a:prstGeom prst="straightConnector1">
@@ -19846,28 +19543,28 @@
       </p:cxnSp>
       <p:grpSp>
         <p:nvGrpSpPr>
-          <p:cNvPr id="289" name="Group 10"/>
+          <p:cNvPr id="284" name="Group 10"/>
           <p:cNvGrpSpPr/>
           <p:nvPr/>
         </p:nvGrpSpPr>
         <p:grpSpPr>
           <a:xfrm>
             <a:off x="10494000" y="2866680"/>
-            <a:ext cx="1615680" cy="556200"/>
+            <a:ext cx="1615320" cy="555840"/>
             <a:chOff x="10494000" y="2866680"/>
-            <a:chExt cx="1615680" cy="556200"/>
+            <a:chExt cx="1615320" cy="555840"/>
           </a:xfrm>
         </p:grpSpPr>
         <p:sp>
           <p:nvSpPr>
-            <p:cNvPr id="290" name="TextBox 60"/>
+            <p:cNvPr id="285" name="TextBox 60"/>
             <p:cNvSpPr/>
             <p:nvPr/>
           </p:nvSpPr>
           <p:spPr>
             <a:xfrm>
               <a:off x="10494000" y="2866680"/>
-              <a:ext cx="1615680" cy="303120"/>
+              <a:ext cx="1615320" cy="303120"/>
             </a:xfrm>
             <a:prstGeom prst="rect">
               <a:avLst/>
@@ -19917,14 +19614,14 @@
         </p:sp>
         <p:sp>
           <p:nvSpPr>
-            <p:cNvPr id="291" name="TextBox 71"/>
+            <p:cNvPr id="286" name="TextBox 71"/>
             <p:cNvSpPr/>
             <p:nvPr/>
           </p:nvSpPr>
           <p:spPr>
             <a:xfrm>
               <a:off x="10494000" y="3128040"/>
-              <a:ext cx="1615680" cy="294840"/>
+              <a:ext cx="1615320" cy="294480"/>
             </a:xfrm>
             <a:prstGeom prst="rect">
               <a:avLst/>
@@ -19966,17 +19663,17 @@
       </p:grpSp>
       <p:cxnSp>
         <p:nvCxnSpPr>
-          <p:cNvPr id="292" name="Straight Arrow Connector 86"/>
+          <p:cNvPr id="287" name="Straight Arrow Connector 86"/>
           <p:cNvCxnSpPr>
-            <a:stCxn id="287" idx="3"/>
-            <a:endCxn id="289" idx="0"/>
+            <a:stCxn id="282" idx="3"/>
+            <a:endCxn id="284" idx="0"/>
           </p:cNvCxnSpPr>
           <p:nvPr/>
         </p:nvCxnSpPr>
         <p:spPr>
           <a:xfrm>
-            <a:off x="10273680" y="2508480"/>
-            <a:ext cx="1028520" cy="358560"/>
+            <a:off x="10273320" y="2508120"/>
+            <a:ext cx="1028520" cy="358920"/>
           </a:xfrm>
           <a:prstGeom prst="straightConnector1">
             <a:avLst/>
@@ -20021,14 +19718,14 @@
       </p:grpSpPr>
       <p:cxnSp>
         <p:nvCxnSpPr>
-          <p:cNvPr id="293" name="Straight Arrow Connector 44"/>
+          <p:cNvPr id="288" name="Straight Arrow Connector 44"/>
           <p:cNvCxnSpPr/>
           <p:nvPr/>
         </p:nvCxnSpPr>
         <p:spPr>
           <a:xfrm flipH="1">
             <a:off x="0" y="3073320"/>
-            <a:ext cx="1839600" cy="10800"/>
+            <a:ext cx="1839960" cy="11160"/>
           </a:xfrm>
           <a:prstGeom prst="straightConnector1">
             <a:avLst/>
@@ -20044,14 +19741,14 @@
       </p:cxnSp>
       <p:cxnSp>
         <p:nvCxnSpPr>
-          <p:cNvPr id="294" name="Straight Arrow Connector 45"/>
+          <p:cNvPr id="289" name="Straight Arrow Connector 45"/>
           <p:cNvCxnSpPr/>
           <p:nvPr/>
         </p:nvCxnSpPr>
         <p:spPr>
           <a:xfrm>
             <a:off x="0" y="2489400"/>
-            <a:ext cx="1839600" cy="10800"/>
+            <a:ext cx="1839960" cy="11160"/>
           </a:xfrm>
           <a:prstGeom prst="straightConnector1">
             <a:avLst/>
@@ -20067,14 +19764,14 @@
       </p:cxnSp>
       <p:cxnSp>
         <p:nvCxnSpPr>
-          <p:cNvPr id="295" name="Straight Arrow Connector 46"/>
+          <p:cNvPr id="290" name="Straight Arrow Connector 46"/>
           <p:cNvCxnSpPr/>
           <p:nvPr/>
         </p:nvCxnSpPr>
         <p:spPr>
           <a:xfrm>
             <a:off x="0" y="2781360"/>
-            <a:ext cx="1839600" cy="10800"/>
+            <a:ext cx="1839960" cy="11160"/>
           </a:xfrm>
           <a:prstGeom prst="straightConnector1">
             <a:avLst/>
@@ -20090,14 +19787,14 @@
       </p:cxnSp>
       <p:cxnSp>
         <p:nvCxnSpPr>
-          <p:cNvPr id="296" name="Straight Arrow Connector 47"/>
+          <p:cNvPr id="291" name="Straight Arrow Connector 47"/>
           <p:cNvCxnSpPr/>
           <p:nvPr/>
         </p:nvCxnSpPr>
         <p:spPr>
           <a:xfrm flipH="1">
             <a:off x="0" y="3657600"/>
-            <a:ext cx="1839600" cy="10800"/>
+            <a:ext cx="1839960" cy="11160"/>
           </a:xfrm>
           <a:prstGeom prst="straightConnector1">
             <a:avLst/>
@@ -20112,14 +19809,14 @@
       </p:cxnSp>
       <p:sp>
         <p:nvSpPr>
-          <p:cNvPr id="297" name="Diamond 17"/>
+          <p:cNvPr id="292" name="Diamond 17"/>
           <p:cNvSpPr/>
           <p:nvPr/>
         </p:nvSpPr>
         <p:spPr>
           <a:xfrm>
             <a:off x="128520" y="6134040"/>
-            <a:ext cx="1560960" cy="376920"/>
+            <a:ext cx="1560600" cy="376560"/>
           </a:xfrm>
           <a:prstGeom prst="diamond">
             <a:avLst/>
@@ -20177,14 +19874,14 @@
       </p:sp>
       <p:sp>
         <p:nvSpPr>
-          <p:cNvPr id="298" name="Oval 4"/>
+          <p:cNvPr id="293" name="Oval 4"/>
           <p:cNvSpPr/>
           <p:nvPr/>
         </p:nvSpPr>
         <p:spPr>
           <a:xfrm>
             <a:off x="302760" y="5454000"/>
-            <a:ext cx="1212480" cy="376920"/>
+            <a:ext cx="1212120" cy="376560"/>
           </a:xfrm>
           <a:prstGeom prst="ellipse">
             <a:avLst/>
@@ -20240,14 +19937,14 @@
       </p:sp>
       <p:sp>
         <p:nvSpPr>
-          <p:cNvPr id="299" name="TextBox 53"/>
+          <p:cNvPr id="294" name="TextBox 53"/>
           <p:cNvSpPr/>
           <p:nvPr/>
         </p:nvSpPr>
         <p:spPr>
           <a:xfrm>
             <a:off x="101160" y="336240"/>
-            <a:ext cx="1615680" cy="303120"/>
+            <a:ext cx="1615320" cy="303120"/>
           </a:xfrm>
           <a:prstGeom prst="rect">
             <a:avLst/>
@@ -20297,14 +19994,14 @@
       </p:sp>
       <p:sp>
         <p:nvSpPr>
-          <p:cNvPr id="300" name="TextBox 54"/>
+          <p:cNvPr id="295" name="TextBox 54"/>
           <p:cNvSpPr/>
           <p:nvPr/>
         </p:nvSpPr>
         <p:spPr>
           <a:xfrm>
             <a:off x="101160" y="597600"/>
-            <a:ext cx="1615680" cy="516600"/>
+            <a:ext cx="1615320" cy="516600"/>
           </a:xfrm>
           <a:prstGeom prst="rect">
             <a:avLst/>
@@ -20387,14 +20084,14 @@
       </p:sp>
       <p:sp>
         <p:nvSpPr>
-          <p:cNvPr id="301" name="TextBox 72"/>
+          <p:cNvPr id="296" name="TextBox 72"/>
           <p:cNvSpPr/>
           <p:nvPr/>
         </p:nvSpPr>
         <p:spPr>
           <a:xfrm>
             <a:off x="8458200" y="5486400"/>
-            <a:ext cx="1615680" cy="303120"/>
+            <a:ext cx="1615320" cy="303120"/>
           </a:xfrm>
           <a:prstGeom prst="rect">
             <a:avLst/>
@@ -20444,14 +20141,14 @@
       </p:sp>
       <p:sp>
         <p:nvSpPr>
-          <p:cNvPr id="302" name="Diamond 18"/>
+          <p:cNvPr id="297" name="Diamond 18"/>
           <p:cNvSpPr/>
           <p:nvPr/>
         </p:nvSpPr>
         <p:spPr>
           <a:xfrm>
             <a:off x="128520" y="4629600"/>
-            <a:ext cx="1560960" cy="521640"/>
+            <a:ext cx="1560600" cy="521280"/>
           </a:xfrm>
           <a:prstGeom prst="diamond">
             <a:avLst/>
@@ -20532,14 +20229,14 @@
       </p:sp>
       <p:cxnSp>
         <p:nvCxnSpPr>
-          <p:cNvPr id="303" name="Straight Arrow Connector 48"/>
+          <p:cNvPr id="298" name="Straight Arrow Connector 48"/>
           <p:cNvCxnSpPr/>
           <p:nvPr/>
         </p:nvCxnSpPr>
         <p:spPr>
           <a:xfrm>
             <a:off x="0" y="3365640"/>
-            <a:ext cx="1839600" cy="10800"/>
+            <a:ext cx="1839960" cy="11160"/>
           </a:xfrm>
           <a:prstGeom prst="straightConnector1">
             <a:avLst/>
@@ -20554,14 +20251,14 @@
       </p:cxnSp>
       <p:sp>
         <p:nvSpPr>
-          <p:cNvPr id="304" name="Isosceles Triangle 5"/>
+          <p:cNvPr id="299" name="Isosceles Triangle 5"/>
           <p:cNvSpPr/>
           <p:nvPr/>
         </p:nvSpPr>
         <p:spPr>
           <a:xfrm>
             <a:off x="673200" y="3949920"/>
-            <a:ext cx="471960" cy="376920"/>
+            <a:ext cx="471600" cy="376560"/>
           </a:xfrm>
           <a:prstGeom prst="triangle">
             <a:avLst>
@@ -20621,28 +20318,28 @@
       </p:sp>
       <p:grpSp>
         <p:nvGrpSpPr>
-          <p:cNvPr id="305" name="Group 15"/>
+          <p:cNvPr id="300" name="Group 15"/>
           <p:cNvGrpSpPr/>
           <p:nvPr/>
         </p:nvGrpSpPr>
         <p:grpSpPr>
           <a:xfrm>
             <a:off x="101160" y="1413000"/>
-            <a:ext cx="1615680" cy="777960"/>
+            <a:ext cx="1615320" cy="777960"/>
             <a:chOff x="101160" y="1413000"/>
-            <a:chExt cx="1615680" cy="777960"/>
+            <a:chExt cx="1615320" cy="777960"/>
           </a:xfrm>
         </p:grpSpPr>
         <p:sp>
           <p:nvSpPr>
-            <p:cNvPr id="306" name="TextBox 57"/>
+            <p:cNvPr id="301" name="TextBox 57"/>
             <p:cNvSpPr/>
             <p:nvPr/>
           </p:nvSpPr>
           <p:spPr>
             <a:xfrm>
               <a:off x="101160" y="1413000"/>
-              <a:ext cx="1615680" cy="303120"/>
+              <a:ext cx="1615320" cy="303120"/>
             </a:xfrm>
             <a:prstGeom prst="rect">
               <a:avLst/>
@@ -20693,14 +20390,14 @@
         </p:sp>
         <p:sp>
           <p:nvSpPr>
-            <p:cNvPr id="307" name="TextBox 58"/>
+            <p:cNvPr id="302" name="TextBox 58"/>
             <p:cNvSpPr/>
             <p:nvPr/>
           </p:nvSpPr>
           <p:spPr>
             <a:xfrm>
               <a:off x="101160" y="1674360"/>
-              <a:ext cx="1615680" cy="516600"/>
+              <a:ext cx="1615320" cy="516600"/>
             </a:xfrm>
             <a:prstGeom prst="rect">
               <a:avLst/>
@@ -20785,28 +20482,28 @@
       </p:grpSp>
       <p:grpSp>
         <p:nvGrpSpPr>
-          <p:cNvPr id="308" name="Group 17"/>
+          <p:cNvPr id="303" name="Group 17"/>
           <p:cNvGrpSpPr/>
           <p:nvPr/>
         </p:nvGrpSpPr>
         <p:grpSpPr>
           <a:xfrm>
             <a:off x="4296600" y="4022640"/>
-            <a:ext cx="1615680" cy="1846440"/>
+            <a:ext cx="1615320" cy="1846440"/>
             <a:chOff x="4296600" y="4022640"/>
-            <a:chExt cx="1615680" cy="1846440"/>
+            <a:chExt cx="1615320" cy="1846440"/>
           </a:xfrm>
         </p:grpSpPr>
         <p:sp>
           <p:nvSpPr>
-            <p:cNvPr id="309" name="TextBox 61"/>
+            <p:cNvPr id="304" name="TextBox 61"/>
             <p:cNvSpPr/>
             <p:nvPr/>
           </p:nvSpPr>
           <p:spPr>
             <a:xfrm>
               <a:off x="4296600" y="4022640"/>
-              <a:ext cx="1615680" cy="303120"/>
+              <a:ext cx="1615320" cy="303120"/>
             </a:xfrm>
             <a:prstGeom prst="rect">
               <a:avLst/>
@@ -20856,14 +20553,14 @@
         </p:sp>
         <p:sp>
           <p:nvSpPr>
-            <p:cNvPr id="310" name="TextBox 63"/>
+            <p:cNvPr id="305" name="TextBox 63"/>
             <p:cNvSpPr/>
             <p:nvPr/>
           </p:nvSpPr>
           <p:spPr>
             <a:xfrm>
               <a:off x="4296600" y="4284000"/>
-              <a:ext cx="1615680" cy="1585080"/>
+              <a:ext cx="1615320" cy="1585080"/>
             </a:xfrm>
             <a:prstGeom prst="rect">
               <a:avLst/>
@@ -21082,28 +20779,28 @@
       </p:grpSp>
       <p:grpSp>
         <p:nvGrpSpPr>
-          <p:cNvPr id="311" name="Group 18"/>
+          <p:cNvPr id="306" name="Group 18"/>
           <p:cNvGrpSpPr/>
           <p:nvPr/>
         </p:nvGrpSpPr>
         <p:grpSpPr>
           <a:xfrm>
             <a:off x="9348840" y="2254320"/>
-            <a:ext cx="1615680" cy="1631880"/>
+            <a:ext cx="1615320" cy="1631880"/>
             <a:chOff x="9348840" y="2254320"/>
-            <a:chExt cx="1615680" cy="1631880"/>
+            <a:chExt cx="1615320" cy="1631880"/>
           </a:xfrm>
         </p:grpSpPr>
         <p:sp>
           <p:nvSpPr>
-            <p:cNvPr id="312" name="TextBox 64"/>
+            <p:cNvPr id="307" name="TextBox 64"/>
             <p:cNvSpPr/>
             <p:nvPr/>
           </p:nvSpPr>
           <p:spPr>
             <a:xfrm>
               <a:off x="9348840" y="2254320"/>
-              <a:ext cx="1615680" cy="303120"/>
+              <a:ext cx="1615320" cy="303120"/>
             </a:xfrm>
             <a:prstGeom prst="rect">
               <a:avLst/>
@@ -21153,14 +20850,14 @@
         </p:sp>
         <p:sp>
           <p:nvSpPr>
-            <p:cNvPr id="313" name="TextBox 66"/>
+            <p:cNvPr id="308" name="TextBox 66"/>
             <p:cNvSpPr/>
             <p:nvPr/>
           </p:nvSpPr>
           <p:spPr>
             <a:xfrm>
               <a:off x="9348840" y="2515680"/>
-              <a:ext cx="1615680" cy="1370520"/>
+              <a:ext cx="1615320" cy="1370520"/>
             </a:xfrm>
             <a:prstGeom prst="rect">
               <a:avLst/>
@@ -21352,14 +21049,14 @@
       </p:grpSp>
       <p:sp>
         <p:nvSpPr>
-          <p:cNvPr id="314" name="Diamond 19"/>
+          <p:cNvPr id="309" name="Diamond 19"/>
           <p:cNvSpPr/>
           <p:nvPr/>
         </p:nvSpPr>
         <p:spPr>
           <a:xfrm>
             <a:off x="9402120" y="4572000"/>
-            <a:ext cx="1560960" cy="376920"/>
+            <a:ext cx="1560600" cy="376560"/>
           </a:xfrm>
           <a:prstGeom prst="diamond">
             <a:avLst/>
@@ -21417,14 +21114,14 @@
       </p:sp>
       <p:sp>
         <p:nvSpPr>
-          <p:cNvPr id="315" name="Oval 5"/>
+          <p:cNvPr id="310" name="Oval 5"/>
           <p:cNvSpPr/>
           <p:nvPr/>
         </p:nvSpPr>
         <p:spPr>
           <a:xfrm>
             <a:off x="7007400" y="4572000"/>
-            <a:ext cx="1669680" cy="376920"/>
+            <a:ext cx="1669320" cy="376560"/>
           </a:xfrm>
           <a:prstGeom prst="ellipse">
             <a:avLst/>
@@ -21480,28 +21177,28 @@
       </p:sp>
       <p:grpSp>
         <p:nvGrpSpPr>
-          <p:cNvPr id="316" name="Group 19"/>
+          <p:cNvPr id="311" name="Group 19"/>
           <p:cNvGrpSpPr/>
           <p:nvPr/>
         </p:nvGrpSpPr>
         <p:grpSpPr>
           <a:xfrm>
             <a:off x="9348840" y="2254320"/>
-            <a:ext cx="1615680" cy="1631880"/>
+            <a:ext cx="1615320" cy="1631880"/>
             <a:chOff x="9348840" y="2254320"/>
-            <a:chExt cx="1615680" cy="1631880"/>
+            <a:chExt cx="1615320" cy="1631880"/>
           </a:xfrm>
         </p:grpSpPr>
         <p:sp>
           <p:nvSpPr>
-            <p:cNvPr id="317" name="TextBox 67"/>
+            <p:cNvPr id="312" name="TextBox 67"/>
             <p:cNvSpPr/>
             <p:nvPr/>
           </p:nvSpPr>
           <p:spPr>
             <a:xfrm>
               <a:off x="9348840" y="2254320"/>
-              <a:ext cx="1615680" cy="303120"/>
+              <a:ext cx="1615320" cy="303120"/>
             </a:xfrm>
             <a:prstGeom prst="rect">
               <a:avLst/>
@@ -21551,14 +21248,14 @@
         </p:sp>
         <p:sp>
           <p:nvSpPr>
-            <p:cNvPr id="318" name="TextBox 68"/>
+            <p:cNvPr id="313" name="TextBox 68"/>
             <p:cNvSpPr/>
             <p:nvPr/>
           </p:nvSpPr>
           <p:spPr>
             <a:xfrm>
               <a:off x="9348840" y="2515680"/>
-              <a:ext cx="1615680" cy="1370520"/>
+              <a:ext cx="1615320" cy="1370520"/>
             </a:xfrm>
             <a:prstGeom prst="rect">
               <a:avLst/>
@@ -21750,28 +21447,28 @@
       </p:grpSp>
       <p:grpSp>
         <p:nvGrpSpPr>
-          <p:cNvPr id="319" name="Group 20"/>
+          <p:cNvPr id="314" name="Group 20"/>
           <p:cNvGrpSpPr/>
           <p:nvPr/>
         </p:nvGrpSpPr>
         <p:grpSpPr>
           <a:xfrm>
             <a:off x="9348840" y="2254320"/>
-            <a:ext cx="1615680" cy="1845360"/>
+            <a:ext cx="1615320" cy="1845360"/>
             <a:chOff x="9348840" y="2254320"/>
-            <a:chExt cx="1615680" cy="1845360"/>
+            <a:chExt cx="1615320" cy="1845360"/>
           </a:xfrm>
         </p:grpSpPr>
         <p:sp>
           <p:nvSpPr>
-            <p:cNvPr id="320" name="TextBox 69"/>
+            <p:cNvPr id="315" name="TextBox 69"/>
             <p:cNvSpPr/>
             <p:nvPr/>
           </p:nvSpPr>
           <p:spPr>
             <a:xfrm>
               <a:off x="9348840" y="2254320"/>
-              <a:ext cx="1615680" cy="303120"/>
+              <a:ext cx="1615320" cy="303120"/>
             </a:xfrm>
             <a:prstGeom prst="rect">
               <a:avLst/>
@@ -21821,14 +21518,14 @@
         </p:sp>
         <p:sp>
           <p:nvSpPr>
-            <p:cNvPr id="321" name="TextBox 70"/>
+            <p:cNvPr id="316" name="TextBox 70"/>
             <p:cNvSpPr/>
             <p:nvPr/>
           </p:nvSpPr>
           <p:spPr>
             <a:xfrm>
               <a:off x="9348840" y="2515680"/>
-              <a:ext cx="1615680" cy="1584000"/>
+              <a:ext cx="1615320" cy="1584000"/>
             </a:xfrm>
             <a:prstGeom prst="rect">
               <a:avLst/>
@@ -22047,14 +21744,14 @@
       </p:grpSp>
       <p:sp>
         <p:nvSpPr>
-          <p:cNvPr id="322" name="Diamond 25"/>
+          <p:cNvPr id="317" name="Diamond 25"/>
           <p:cNvSpPr/>
           <p:nvPr/>
         </p:nvSpPr>
         <p:spPr>
           <a:xfrm>
             <a:off x="7086600" y="3501720"/>
-            <a:ext cx="1819080" cy="376920"/>
+            <a:ext cx="1818720" cy="376560"/>
           </a:xfrm>
           <a:prstGeom prst="diamond">
             <a:avLst/>
@@ -22112,17 +21809,17 @@
       </p:sp>
       <p:cxnSp>
         <p:nvCxnSpPr>
-          <p:cNvPr id="323" name="Straight Arrow Connector 40"/>
+          <p:cNvPr id="318" name="Straight Arrow Connector 40"/>
           <p:cNvCxnSpPr>
-            <a:stCxn id="314" idx="2"/>
-            <a:endCxn id="301" idx="0"/>
+            <a:stCxn id="309" idx="2"/>
+            <a:endCxn id="296" idx="0"/>
           </p:cNvCxnSpPr>
           <p:nvPr/>
         </p:nvCxnSpPr>
         <p:spPr>
           <a:xfrm flipH="1">
-            <a:off x="9266040" y="4948920"/>
-            <a:ext cx="916920" cy="537840"/>
+            <a:off x="9265680" y="4948560"/>
+            <a:ext cx="917280" cy="538200"/>
           </a:xfrm>
           <a:prstGeom prst="straightConnector1">
             <a:avLst/>
@@ -22137,17 +21834,17 @@
       </p:cxnSp>
       <p:cxnSp>
         <p:nvCxnSpPr>
-          <p:cNvPr id="324" name="Straight Arrow Connector 41"/>
+          <p:cNvPr id="319" name="Straight Arrow Connector 41"/>
           <p:cNvCxnSpPr>
-            <a:stCxn id="319" idx="2"/>
-            <a:endCxn id="314" idx="0"/>
+            <a:stCxn id="314" idx="2"/>
+            <a:endCxn id="309" idx="0"/>
           </p:cNvCxnSpPr>
           <p:nvPr/>
         </p:nvCxnSpPr>
         <p:spPr>
           <a:xfrm>
-            <a:off x="10156680" y="4099680"/>
-            <a:ext cx="26280" cy="472680"/>
+            <a:off x="10156320" y="4099680"/>
+            <a:ext cx="26640" cy="472680"/>
           </a:xfrm>
           <a:prstGeom prst="straightConnector1">
             <a:avLst/>
@@ -22162,17 +21859,17 @@
       </p:cxnSp>
       <p:cxnSp>
         <p:nvCxnSpPr>
-          <p:cNvPr id="325" name="Straight Arrow Connector 42"/>
+          <p:cNvPr id="320" name="Straight Arrow Connector 42"/>
           <p:cNvCxnSpPr>
-            <a:stCxn id="314" idx="1"/>
-            <a:endCxn id="315" idx="6"/>
+            <a:stCxn id="309" idx="1"/>
+            <a:endCxn id="310" idx="6"/>
           </p:cNvCxnSpPr>
           <p:nvPr/>
         </p:nvCxnSpPr>
         <p:spPr>
           <a:xfrm flipH="1">
-            <a:off x="8677080" y="4760640"/>
-            <a:ext cx="725400" cy="360"/>
+            <a:off x="8676720" y="4760280"/>
+            <a:ext cx="725760" cy="360"/>
           </a:xfrm>
           <a:prstGeom prst="straightConnector1">
             <a:avLst/>
@@ -22187,14 +21884,14 @@
       </p:cxnSp>
       <p:sp>
         <p:nvSpPr>
-          <p:cNvPr id="326" name="Oval 7"/>
+          <p:cNvPr id="321" name="Oval 7"/>
           <p:cNvSpPr/>
           <p:nvPr/>
         </p:nvSpPr>
         <p:spPr>
           <a:xfrm>
             <a:off x="6629400" y="5099760"/>
-            <a:ext cx="1590480" cy="376920"/>
+            <a:ext cx="1590120" cy="376560"/>
           </a:xfrm>
           <a:prstGeom prst="ellipse">
             <a:avLst/>
@@ -22250,17 +21947,17 @@
       </p:sp>
       <p:cxnSp>
         <p:nvCxnSpPr>
-          <p:cNvPr id="327" name="Straight Arrow Connector 66"/>
+          <p:cNvPr id="322" name="Straight Arrow Connector 66"/>
           <p:cNvCxnSpPr>
-            <a:stCxn id="314" idx="1"/>
-            <a:endCxn id="326" idx="6"/>
+            <a:stCxn id="309" idx="1"/>
+            <a:endCxn id="321" idx="6"/>
           </p:cNvCxnSpPr>
           <p:nvPr/>
         </p:nvCxnSpPr>
         <p:spPr>
           <a:xfrm flipH="1">
-            <a:off x="8219880" y="4760640"/>
-            <a:ext cx="1182600" cy="528120"/>
+            <a:off x="8219520" y="4760280"/>
+            <a:ext cx="1182960" cy="528120"/>
           </a:xfrm>
           <a:prstGeom prst="straightConnector1">
             <a:avLst/>
@@ -22275,17 +21972,17 @@
       </p:cxnSp>
       <p:cxnSp>
         <p:nvCxnSpPr>
-          <p:cNvPr id="328" name="Straight Arrow Connector 64"/>
+          <p:cNvPr id="323" name="Straight Arrow Connector 64"/>
           <p:cNvCxnSpPr>
-            <a:stCxn id="308" idx="3"/>
-            <a:endCxn id="322" idx="1"/>
+            <a:stCxn id="303" idx="3"/>
+            <a:endCxn id="317" idx="1"/>
           </p:cNvCxnSpPr>
           <p:nvPr/>
         </p:nvCxnSpPr>
         <p:spPr>
           <a:xfrm flipV="1">
-            <a:off x="5912280" y="3690360"/>
-            <a:ext cx="1174680" cy="1255680"/>
+            <a:off x="5911920" y="3690000"/>
+            <a:ext cx="1175040" cy="1256040"/>
           </a:xfrm>
           <a:prstGeom prst="straightConnector1">
             <a:avLst/>
@@ -22301,17 +21998,17 @@
       </p:cxnSp>
       <p:cxnSp>
         <p:nvCxnSpPr>
-          <p:cNvPr id="329" name="Straight Arrow Connector 63"/>
+          <p:cNvPr id="324" name="Straight Arrow Connector 63"/>
           <p:cNvCxnSpPr>
-            <a:stCxn id="319" idx="1"/>
-            <a:endCxn id="322" idx="3"/>
+            <a:stCxn id="314" idx="1"/>
+            <a:endCxn id="317" idx="3"/>
           </p:cNvCxnSpPr>
           <p:nvPr/>
         </p:nvCxnSpPr>
         <p:spPr>
           <a:xfrm flipH="1">
-            <a:off x="8905680" y="3177000"/>
-            <a:ext cx="443520" cy="513720"/>
+            <a:off x="8905320" y="3177000"/>
+            <a:ext cx="443880" cy="513360"/>
           </a:xfrm>
           <a:prstGeom prst="straightConnector1">
             <a:avLst/>
@@ -22326,14 +22023,14 @@
       </p:cxnSp>
       <p:sp>
         <p:nvSpPr>
-          <p:cNvPr id="330" name="Oval 9"/>
+          <p:cNvPr id="325" name="Oval 9"/>
           <p:cNvSpPr/>
           <p:nvPr/>
         </p:nvSpPr>
         <p:spPr>
           <a:xfrm>
             <a:off x="7315200" y="4114800"/>
-            <a:ext cx="1669680" cy="376920"/>
+            <a:ext cx="1669320" cy="376560"/>
           </a:xfrm>
           <a:prstGeom prst="ellipse">
             <a:avLst/>
@@ -22389,17 +22086,17 @@
       </p:sp>
       <p:cxnSp>
         <p:nvCxnSpPr>
-          <p:cNvPr id="331" name="Straight Arrow Connector 58"/>
+          <p:cNvPr id="326" name="Straight Arrow Connector 58"/>
           <p:cNvCxnSpPr>
-            <a:stCxn id="314" idx="1"/>
-            <a:endCxn id="330" idx="6"/>
+            <a:stCxn id="309" idx="1"/>
+            <a:endCxn id="325" idx="6"/>
           </p:cNvCxnSpPr>
           <p:nvPr/>
         </p:nvCxnSpPr>
         <p:spPr>
           <a:xfrm flipH="1" flipV="1">
-            <a:off x="8984880" y="4303440"/>
-            <a:ext cx="417600" cy="457560"/>
+            <a:off x="8984520" y="4303080"/>
+            <a:ext cx="417960" cy="457560"/>
           </a:xfrm>
           <a:prstGeom prst="straightConnector1">
             <a:avLst/>
@@ -22414,14 +22111,14 @@
       </p:cxnSp>
       <p:sp>
         <p:nvSpPr>
-          <p:cNvPr id="332" name="TextBox 62"/>
+          <p:cNvPr id="327" name="TextBox 62"/>
           <p:cNvSpPr/>
           <p:nvPr/>
         </p:nvSpPr>
         <p:spPr>
           <a:xfrm>
             <a:off x="2727720" y="1982880"/>
-            <a:ext cx="1615680" cy="303120"/>
+            <a:ext cx="1615320" cy="303120"/>
           </a:xfrm>
           <a:prstGeom prst="rect">
             <a:avLst/>
@@ -22471,14 +22168,14 @@
       </p:sp>
       <p:sp>
         <p:nvSpPr>
-          <p:cNvPr id="333" name="Diamond 16"/>
+          <p:cNvPr id="328" name="Diamond 16"/>
           <p:cNvSpPr/>
           <p:nvPr/>
         </p:nvSpPr>
         <p:spPr>
           <a:xfrm rot="21559200">
             <a:off x="2295720" y="3255120"/>
-            <a:ext cx="2045520" cy="390240"/>
+            <a:ext cx="2045160" cy="389880"/>
           </a:xfrm>
           <a:prstGeom prst="diamond">
             <a:avLst/>
@@ -22536,17 +22233,17 @@
       </p:sp>
       <p:cxnSp>
         <p:nvCxnSpPr>
-          <p:cNvPr id="334" name="Straight Arrow Connector 39"/>
+          <p:cNvPr id="329" name="Straight Arrow Connector 39"/>
           <p:cNvCxnSpPr>
-            <a:stCxn id="308" idx="1"/>
-            <a:endCxn id="333" idx="2"/>
+            <a:stCxn id="303" idx="1"/>
+            <a:endCxn id="328" idx="2"/>
           </p:cNvCxnSpPr>
           <p:nvPr/>
         </p:nvCxnSpPr>
         <p:spPr>
           <a:xfrm flipH="1" flipV="1">
-            <a:off x="3320640" y="3646440"/>
-            <a:ext cx="976320" cy="1299600"/>
+            <a:off x="3320640" y="3646080"/>
+            <a:ext cx="976320" cy="1299960"/>
           </a:xfrm>
           <a:prstGeom prst="straightConnector1">
             <a:avLst/>
@@ -22562,17 +22259,17 @@
       </p:cxnSp>
       <p:cxnSp>
         <p:nvCxnSpPr>
-          <p:cNvPr id="335" name="Straight Arrow Connector 50"/>
+          <p:cNvPr id="330" name="Straight Arrow Connector 50"/>
           <p:cNvCxnSpPr>
-            <a:stCxn id="332" idx="2"/>
-            <a:endCxn id="333" idx="0"/>
+            <a:stCxn id="327" idx="2"/>
+            <a:endCxn id="328" idx="0"/>
           </p:cNvCxnSpPr>
           <p:nvPr/>
         </p:nvCxnSpPr>
         <p:spPr>
           <a:xfrm flipH="1">
             <a:off x="3316320" y="2286000"/>
-            <a:ext cx="219600" cy="970200"/>
+            <a:ext cx="219240" cy="970200"/>
           </a:xfrm>
           <a:prstGeom prst="straightConnector1">
             <a:avLst/>
@@ -22617,14 +22314,14 @@
       </p:grpSpPr>
       <p:cxnSp>
         <p:nvCxnSpPr>
-          <p:cNvPr id="336" name="Straight Arrow Connector 6"/>
+          <p:cNvPr id="331" name="Straight Arrow Connector 6"/>
           <p:cNvCxnSpPr/>
           <p:nvPr/>
         </p:nvCxnSpPr>
         <p:spPr>
           <a:xfrm flipH="1">
             <a:off x="0" y="3073320"/>
-            <a:ext cx="1839600" cy="10800"/>
+            <a:ext cx="1839960" cy="11160"/>
           </a:xfrm>
           <a:prstGeom prst="straightConnector1">
             <a:avLst/>
@@ -22640,14 +22337,14 @@
       </p:cxnSp>
       <p:cxnSp>
         <p:nvCxnSpPr>
-          <p:cNvPr id="337" name="Straight Arrow Connector 7"/>
+          <p:cNvPr id="332" name="Straight Arrow Connector 7"/>
           <p:cNvCxnSpPr/>
           <p:nvPr/>
         </p:nvCxnSpPr>
         <p:spPr>
           <a:xfrm>
             <a:off x="0" y="2489400"/>
-            <a:ext cx="1839600" cy="10800"/>
+            <a:ext cx="1839960" cy="11160"/>
           </a:xfrm>
           <a:prstGeom prst="straightConnector1">
             <a:avLst/>
@@ -22663,14 +22360,14 @@
       </p:cxnSp>
       <p:cxnSp>
         <p:nvCxnSpPr>
-          <p:cNvPr id="338" name="Straight Arrow Connector 8"/>
+          <p:cNvPr id="333" name="Straight Arrow Connector 8"/>
           <p:cNvCxnSpPr/>
           <p:nvPr/>
         </p:nvCxnSpPr>
         <p:spPr>
           <a:xfrm>
             <a:off x="0" y="2781360"/>
-            <a:ext cx="1839600" cy="10800"/>
+            <a:ext cx="1839960" cy="11160"/>
           </a:xfrm>
           <a:prstGeom prst="straightConnector1">
             <a:avLst/>
@@ -22686,14 +22383,14 @@
       </p:cxnSp>
       <p:cxnSp>
         <p:nvCxnSpPr>
-          <p:cNvPr id="339" name="Straight Arrow Connector 9"/>
+          <p:cNvPr id="334" name="Straight Arrow Connector 9"/>
           <p:cNvCxnSpPr/>
           <p:nvPr/>
         </p:nvCxnSpPr>
         <p:spPr>
           <a:xfrm flipH="1">
             <a:off x="0" y="3657600"/>
-            <a:ext cx="1839600" cy="10800"/>
+            <a:ext cx="1839960" cy="11160"/>
           </a:xfrm>
           <a:prstGeom prst="straightConnector1">
             <a:avLst/>
@@ -22708,14 +22405,14 @@
       </p:cxnSp>
       <p:sp>
         <p:nvSpPr>
-          <p:cNvPr id="340" name="Diamond 3"/>
+          <p:cNvPr id="335" name="Diamond 3"/>
           <p:cNvSpPr/>
           <p:nvPr/>
         </p:nvSpPr>
         <p:spPr>
           <a:xfrm>
             <a:off x="128520" y="6134040"/>
-            <a:ext cx="1560960" cy="376920"/>
+            <a:ext cx="1560600" cy="376560"/>
           </a:xfrm>
           <a:prstGeom prst="diamond">
             <a:avLst/>
@@ -22773,14 +22470,14 @@
       </p:sp>
       <p:sp>
         <p:nvSpPr>
-          <p:cNvPr id="341" name="Oval 2"/>
+          <p:cNvPr id="336" name="Oval 2"/>
           <p:cNvSpPr/>
           <p:nvPr/>
         </p:nvSpPr>
         <p:spPr>
           <a:xfrm>
             <a:off x="302760" y="5454000"/>
-            <a:ext cx="1212480" cy="376920"/>
+            <a:ext cx="1212120" cy="376560"/>
           </a:xfrm>
           <a:prstGeom prst="ellipse">
             <a:avLst/>
@@ -22836,28 +22533,28 @@
       </p:sp>
       <p:grpSp>
         <p:nvGrpSpPr>
-          <p:cNvPr id="342" name="Group 3"/>
+          <p:cNvPr id="337" name="Group 3"/>
           <p:cNvGrpSpPr/>
           <p:nvPr/>
         </p:nvGrpSpPr>
         <p:grpSpPr>
           <a:xfrm>
             <a:off x="101160" y="336240"/>
-            <a:ext cx="1615680" cy="777960"/>
+            <a:ext cx="1615320" cy="777960"/>
             <a:chOff x="101160" y="336240"/>
-            <a:chExt cx="1615680" cy="777960"/>
+            <a:chExt cx="1615320" cy="777960"/>
           </a:xfrm>
         </p:grpSpPr>
         <p:sp>
           <p:nvSpPr>
-            <p:cNvPr id="343" name="TextBox 5"/>
+            <p:cNvPr id="338" name="TextBox 5"/>
             <p:cNvSpPr/>
             <p:nvPr/>
           </p:nvSpPr>
           <p:spPr>
             <a:xfrm>
               <a:off x="101160" y="336240"/>
-              <a:ext cx="1615680" cy="303120"/>
+              <a:ext cx="1615320" cy="303120"/>
             </a:xfrm>
             <a:prstGeom prst="rect">
               <a:avLst/>
@@ -22907,14 +22604,14 @@
         </p:sp>
         <p:sp>
           <p:nvSpPr>
-            <p:cNvPr id="344" name="TextBox 6"/>
+            <p:cNvPr id="339" name="TextBox 6"/>
             <p:cNvSpPr/>
             <p:nvPr/>
           </p:nvSpPr>
           <p:spPr>
             <a:xfrm>
               <a:off x="101160" y="597600"/>
-              <a:ext cx="1615680" cy="516600"/>
+              <a:ext cx="1615320" cy="516600"/>
             </a:xfrm>
             <a:prstGeom prst="rect">
               <a:avLst/>
@@ -22998,14 +22695,14 @@
       </p:grpSp>
       <p:sp>
         <p:nvSpPr>
-          <p:cNvPr id="345" name="Diamond 4"/>
+          <p:cNvPr id="340" name="Diamond 4"/>
           <p:cNvSpPr/>
           <p:nvPr/>
         </p:nvSpPr>
         <p:spPr>
           <a:xfrm>
             <a:off x="128520" y="4629600"/>
-            <a:ext cx="1560960" cy="521640"/>
+            <a:ext cx="1560600" cy="521280"/>
           </a:xfrm>
           <a:prstGeom prst="diamond">
             <a:avLst/>
@@ -23086,14 +22783,14 @@
       </p:sp>
       <p:cxnSp>
         <p:nvCxnSpPr>
-          <p:cNvPr id="346" name="Straight Arrow Connector 10"/>
+          <p:cNvPr id="341" name="Straight Arrow Connector 10"/>
           <p:cNvCxnSpPr/>
           <p:nvPr/>
         </p:nvCxnSpPr>
         <p:spPr>
           <a:xfrm>
             <a:off x="0" y="3365640"/>
-            <a:ext cx="1839600" cy="10800"/>
+            <a:ext cx="1839960" cy="11160"/>
           </a:xfrm>
           <a:prstGeom prst="straightConnector1">
             <a:avLst/>
@@ -23108,14 +22805,14 @@
       </p:cxnSp>
       <p:sp>
         <p:nvSpPr>
-          <p:cNvPr id="347" name="Isosceles Triangle 2"/>
+          <p:cNvPr id="342" name="Isosceles Triangle 2"/>
           <p:cNvSpPr/>
           <p:nvPr/>
         </p:nvSpPr>
         <p:spPr>
           <a:xfrm>
             <a:off x="673200" y="3949920"/>
-            <a:ext cx="471960" cy="376920"/>
+            <a:ext cx="471600" cy="376560"/>
           </a:xfrm>
           <a:prstGeom prst="triangle">
             <a:avLst>
@@ -23175,28 +22872,28 @@
       </p:sp>
       <p:grpSp>
         <p:nvGrpSpPr>
-          <p:cNvPr id="348" name="Group 4"/>
+          <p:cNvPr id="343" name="Group 4"/>
           <p:cNvGrpSpPr/>
           <p:nvPr/>
         </p:nvGrpSpPr>
         <p:grpSpPr>
           <a:xfrm>
             <a:off x="101160" y="1413000"/>
-            <a:ext cx="1615680" cy="777960"/>
+            <a:ext cx="1615320" cy="777960"/>
             <a:chOff x="101160" y="1413000"/>
-            <a:chExt cx="1615680" cy="777960"/>
+            <a:chExt cx="1615320" cy="777960"/>
           </a:xfrm>
         </p:grpSpPr>
         <p:sp>
           <p:nvSpPr>
-            <p:cNvPr id="349" name="TextBox 7"/>
+            <p:cNvPr id="344" name="TextBox 7"/>
             <p:cNvSpPr/>
             <p:nvPr/>
           </p:nvSpPr>
           <p:spPr>
             <a:xfrm>
               <a:off x="101160" y="1413000"/>
-              <a:ext cx="1615680" cy="303120"/>
+              <a:ext cx="1615320" cy="303120"/>
             </a:xfrm>
             <a:prstGeom prst="rect">
               <a:avLst/>
@@ -23247,14 +22944,14 @@
         </p:sp>
         <p:sp>
           <p:nvSpPr>
-            <p:cNvPr id="350" name="TextBox 8"/>
+            <p:cNvPr id="345" name="TextBox 8"/>
             <p:cNvSpPr/>
             <p:nvPr/>
           </p:nvSpPr>
           <p:spPr>
             <a:xfrm>
               <a:off x="101160" y="1674360"/>
-              <a:ext cx="1615680" cy="516600"/>
+              <a:ext cx="1615320" cy="516600"/>
             </a:xfrm>
             <a:prstGeom prst="rect">
               <a:avLst/>
@@ -23339,28 +23036,28 @@
       </p:grpSp>
       <p:grpSp>
         <p:nvGrpSpPr>
-          <p:cNvPr id="351" name="Group 21"/>
+          <p:cNvPr id="346" name="Group 21"/>
           <p:cNvGrpSpPr/>
           <p:nvPr/>
         </p:nvGrpSpPr>
         <p:grpSpPr>
           <a:xfrm>
             <a:off x="3886200" y="2286000"/>
-            <a:ext cx="1615680" cy="1845360"/>
+            <a:ext cx="1615320" cy="1845360"/>
             <a:chOff x="3886200" y="2286000"/>
-            <a:chExt cx="1615680" cy="1845360"/>
+            <a:chExt cx="1615320" cy="1845360"/>
           </a:xfrm>
         </p:grpSpPr>
         <p:sp>
           <p:nvSpPr>
-            <p:cNvPr id="352" name="TextBox 75"/>
+            <p:cNvPr id="347" name="TextBox 75"/>
             <p:cNvSpPr/>
             <p:nvPr/>
           </p:nvSpPr>
           <p:spPr>
             <a:xfrm>
               <a:off x="3886200" y="2286000"/>
-              <a:ext cx="1615680" cy="303120"/>
+              <a:ext cx="1615320" cy="303120"/>
             </a:xfrm>
             <a:prstGeom prst="rect">
               <a:avLst/>
@@ -23410,14 +23107,14 @@
         </p:sp>
         <p:sp>
           <p:nvSpPr>
-            <p:cNvPr id="353" name="TextBox 76"/>
+            <p:cNvPr id="348" name="TextBox 76"/>
             <p:cNvSpPr/>
             <p:nvPr/>
           </p:nvSpPr>
           <p:spPr>
             <a:xfrm>
               <a:off x="3886200" y="2547360"/>
-              <a:ext cx="1615680" cy="1584000"/>
+              <a:ext cx="1615320" cy="1584000"/>
             </a:xfrm>
             <a:prstGeom prst="rect">
               <a:avLst/>

</xml_diff>

<commit_message>
cleaned up + started writing out backend documentation
</commit_message>
<xml_diff>
--- a/documentation/database/ER-Diagram.pptx
+++ b/documentation/database/ER-Diagram.pptx
@@ -353,7 +353,7 @@
             <a:pPr indent="0" algn="r">
               <a:buNone/>
             </a:pPr>
-            <a:fld id="{33EA32FD-6CEC-45AC-8573-475A1778CB21}" type="slidenum">
+            <a:fld id="{569AA48D-B653-44D6-A220-011C2D6417BB}" type="slidenum">
               <a:rPr b="0" lang="en-US" sz="1400" spc="-1" strike="noStrike">
                 <a:solidFill>
                   <a:srgbClr val="000000"/>
@@ -396,7 +396,7 @@
       </p:grpSpPr>
       <p:sp>
         <p:nvSpPr>
-          <p:cNvPr id="349" name="PlaceHolder 1"/>
+          <p:cNvPr id="339" name="PlaceHolder 1"/>
           <p:cNvSpPr>
             <a:spLocks noGrp="1"/>
           </p:cNvSpPr>
@@ -407,7 +407,7 @@
         <p:spPr>
           <a:xfrm>
             <a:off x="685800" y="1143000"/>
-            <a:ext cx="5475240" cy="3075120"/>
+            <a:ext cx="5474520" cy="3074400"/>
           </a:xfrm>
           <a:prstGeom prst="rect">
             <a:avLst/>
@@ -419,7 +419,7 @@
       </p:sp>
       <p:sp>
         <p:nvSpPr>
-          <p:cNvPr id="350" name="PlaceHolder 2"/>
+          <p:cNvPr id="340" name="PlaceHolder 2"/>
           <p:cNvSpPr>
             <a:spLocks noGrp="1"/>
           </p:cNvSpPr>
@@ -430,7 +430,7 @@
         <p:spPr>
           <a:xfrm>
             <a:off x="685800" y="4400640"/>
-            <a:ext cx="5475240" cy="3589200"/>
+            <a:ext cx="5474520" cy="3588480"/>
           </a:xfrm>
           <a:prstGeom prst="rect">
             <a:avLst/>
@@ -459,7 +459,7 @@
       </p:sp>
       <p:sp>
         <p:nvSpPr>
-          <p:cNvPr id="351" name="PlaceHolder 3"/>
+          <p:cNvPr id="341" name="PlaceHolder 3"/>
           <p:cNvSpPr>
             <a:spLocks noGrp="1"/>
           </p:cNvSpPr>
@@ -470,7 +470,7 @@
         <p:spPr>
           <a:xfrm>
             <a:off x="3884760" y="8685360"/>
-            <a:ext cx="2960640" cy="447480"/>
+            <a:ext cx="2959920" cy="446760"/>
           </a:xfrm>
           <a:prstGeom prst="rect">
             <a:avLst/>
@@ -512,7 +512,7 @@
                 <a:tab algn="l" pos="0"/>
               </a:tabLst>
             </a:pPr>
-            <a:fld id="{A1A003F0-4DDE-435B-A2A3-754F098E09EA}" type="slidenum">
+            <a:fld id="{B9CD655D-A91A-44AF-A745-B33F4756080F}" type="slidenum">
               <a:rPr b="0" lang="en-US" sz="1200" spc="-1" strike="noStrike">
                 <a:solidFill>
                   <a:schemeClr val="dk1"/>
@@ -555,7 +555,7 @@
       </p:grpSpPr>
       <p:sp>
         <p:nvSpPr>
-          <p:cNvPr id="352" name="PlaceHolder 1"/>
+          <p:cNvPr id="342" name="PlaceHolder 1"/>
           <p:cNvSpPr>
             <a:spLocks noGrp="1"/>
           </p:cNvSpPr>
@@ -566,7 +566,7 @@
         <p:spPr>
           <a:xfrm>
             <a:off x="685800" y="1143000"/>
-            <a:ext cx="5475240" cy="3075120"/>
+            <a:ext cx="5474520" cy="3074400"/>
           </a:xfrm>
           <a:prstGeom prst="rect">
             <a:avLst/>
@@ -578,7 +578,7 @@
       </p:sp>
       <p:sp>
         <p:nvSpPr>
-          <p:cNvPr id="353" name="PlaceHolder 2"/>
+          <p:cNvPr id="343" name="PlaceHolder 2"/>
           <p:cNvSpPr>
             <a:spLocks noGrp="1"/>
           </p:cNvSpPr>
@@ -589,7 +589,7 @@
         <p:spPr>
           <a:xfrm>
             <a:off x="685800" y="4400640"/>
-            <a:ext cx="5475240" cy="3589200"/>
+            <a:ext cx="5474520" cy="3588480"/>
           </a:xfrm>
           <a:prstGeom prst="rect">
             <a:avLst/>
@@ -618,7 +618,7 @@
       </p:sp>
       <p:sp>
         <p:nvSpPr>
-          <p:cNvPr id="354" name="PlaceHolder 3"/>
+          <p:cNvPr id="344" name="PlaceHolder 3"/>
           <p:cNvSpPr>
             <a:spLocks noGrp="1"/>
           </p:cNvSpPr>
@@ -629,7 +629,7 @@
         <p:spPr>
           <a:xfrm>
             <a:off x="3884760" y="8685360"/>
-            <a:ext cx="2960640" cy="447480"/>
+            <a:ext cx="2959920" cy="446760"/>
           </a:xfrm>
           <a:prstGeom prst="rect">
             <a:avLst/>
@@ -671,7 +671,7 @@
                 <a:tab algn="l" pos="0"/>
               </a:tabLst>
             </a:pPr>
-            <a:fld id="{978F5B79-E32F-4CE8-8FC9-44728BAB47F3}" type="slidenum">
+            <a:fld id="{EE10C16E-472E-4332-9E98-F9E635338278}" type="slidenum">
               <a:rPr b="0" lang="en-US" sz="1200" spc="-1" strike="noStrike">
                 <a:solidFill>
                   <a:schemeClr val="dk1"/>
@@ -714,7 +714,7 @@
       </p:grpSpPr>
       <p:sp>
         <p:nvSpPr>
-          <p:cNvPr id="355" name="PlaceHolder 1"/>
+          <p:cNvPr id="345" name="PlaceHolder 1"/>
           <p:cNvSpPr>
             <a:spLocks noGrp="1"/>
           </p:cNvSpPr>
@@ -725,7 +725,7 @@
         <p:spPr>
           <a:xfrm>
             <a:off x="685800" y="1143000"/>
-            <a:ext cx="5475240" cy="3075120"/>
+            <a:ext cx="5474520" cy="3074400"/>
           </a:xfrm>
           <a:prstGeom prst="rect">
             <a:avLst/>
@@ -737,7 +737,7 @@
       </p:sp>
       <p:sp>
         <p:nvSpPr>
-          <p:cNvPr id="356" name="PlaceHolder 2"/>
+          <p:cNvPr id="346" name="PlaceHolder 2"/>
           <p:cNvSpPr>
             <a:spLocks noGrp="1"/>
           </p:cNvSpPr>
@@ -748,7 +748,7 @@
         <p:spPr>
           <a:xfrm>
             <a:off x="685800" y="4400640"/>
-            <a:ext cx="5475240" cy="3589200"/>
+            <a:ext cx="5474520" cy="3588480"/>
           </a:xfrm>
           <a:prstGeom prst="rect">
             <a:avLst/>
@@ -777,7 +777,7 @@
       </p:sp>
       <p:sp>
         <p:nvSpPr>
-          <p:cNvPr id="357" name="PlaceHolder 3"/>
+          <p:cNvPr id="347" name="PlaceHolder 3"/>
           <p:cNvSpPr>
             <a:spLocks noGrp="1"/>
           </p:cNvSpPr>
@@ -788,7 +788,7 @@
         <p:spPr>
           <a:xfrm>
             <a:off x="3884760" y="8685360"/>
-            <a:ext cx="2960640" cy="447480"/>
+            <a:ext cx="2959920" cy="446760"/>
           </a:xfrm>
           <a:prstGeom prst="rect">
             <a:avLst/>
@@ -830,7 +830,7 @@
                 <a:tab algn="l" pos="0"/>
               </a:tabLst>
             </a:pPr>
-            <a:fld id="{DB546DED-2820-4173-807C-34E963CA5385}" type="slidenum">
+            <a:fld id="{F2EA2DD2-00A1-45C4-B97B-0E3C115F0E07}" type="slidenum">
               <a:rPr b="0" lang="en-US" sz="1200" spc="-1" strike="noStrike">
                 <a:solidFill>
                   <a:schemeClr val="dk1"/>
@@ -873,7 +873,7 @@
       </p:grpSpPr>
       <p:sp>
         <p:nvSpPr>
-          <p:cNvPr id="358" name="PlaceHolder 1"/>
+          <p:cNvPr id="348" name="PlaceHolder 1"/>
           <p:cNvSpPr>
             <a:spLocks noGrp="1"/>
           </p:cNvSpPr>
@@ -884,7 +884,7 @@
         <p:spPr>
           <a:xfrm>
             <a:off x="685800" y="1143000"/>
-            <a:ext cx="5475240" cy="3075120"/>
+            <a:ext cx="5474520" cy="3074400"/>
           </a:xfrm>
           <a:prstGeom prst="rect">
             <a:avLst/>
@@ -896,7 +896,7 @@
       </p:sp>
       <p:sp>
         <p:nvSpPr>
-          <p:cNvPr id="359" name="PlaceHolder 2"/>
+          <p:cNvPr id="349" name="PlaceHolder 2"/>
           <p:cNvSpPr>
             <a:spLocks noGrp="1"/>
           </p:cNvSpPr>
@@ -907,7 +907,7 @@
         <p:spPr>
           <a:xfrm>
             <a:off x="685800" y="4400640"/>
-            <a:ext cx="5475240" cy="3589200"/>
+            <a:ext cx="5474520" cy="3588480"/>
           </a:xfrm>
           <a:prstGeom prst="rect">
             <a:avLst/>
@@ -936,7 +936,7 @@
       </p:sp>
       <p:sp>
         <p:nvSpPr>
-          <p:cNvPr id="360" name="PlaceHolder 3"/>
+          <p:cNvPr id="350" name="PlaceHolder 3"/>
           <p:cNvSpPr>
             <a:spLocks noGrp="1"/>
           </p:cNvSpPr>
@@ -947,7 +947,7 @@
         <p:spPr>
           <a:xfrm>
             <a:off x="3884760" y="8685360"/>
-            <a:ext cx="2960640" cy="447480"/>
+            <a:ext cx="2959920" cy="446760"/>
           </a:xfrm>
           <a:prstGeom prst="rect">
             <a:avLst/>
@@ -989,7 +989,7 @@
                 <a:tab algn="l" pos="0"/>
               </a:tabLst>
             </a:pPr>
-            <a:fld id="{9196D7F0-643C-435F-9DAE-C32EBDFF6672}" type="slidenum">
+            <a:fld id="{5D47BCC7-EB70-4B52-A721-F9C6DEACDC6B}" type="slidenum">
               <a:rPr b="0" lang="en-US" sz="1200" spc="-1" strike="noStrike">
                 <a:solidFill>
                   <a:schemeClr val="dk1"/>
@@ -1233,7 +1233,7 @@
         <p:txBody>
           <a:bodyPr/>
           <a:p>
-            <a:fld id="{6234CFF5-A1D6-4A8D-8B92-4720FC3B4F66}" type="slidenum">
+            <a:fld id="{52AB15C1-E60D-4093-9EEF-F845DA48523D}" type="slidenum">
               <a:t>&lt;#&gt;</a:t>
             </a:fld>
           </a:p>
@@ -1442,7 +1442,7 @@
         <p:txBody>
           <a:bodyPr/>
           <a:p>
-            <a:fld id="{DF0980B0-2B0A-4116-9317-D38C089673A4}" type="slidenum">
+            <a:fld id="{DC346117-360E-41BB-B5DC-4C878E6ED8F1}" type="slidenum">
               <a:t>&lt;#&gt;</a:t>
             </a:fld>
           </a:p>
@@ -1565,7 +1565,7 @@
         <p:txBody>
           <a:bodyPr/>
           <a:p>
-            <a:fld id="{2D891278-4A5C-4853-9D15-8DAA9C567998}" type="slidenum">
+            <a:fld id="{1D0B0FF3-0A79-4F04-A2A9-A425CA754401}" type="slidenum">
               <a:t>&lt;#&gt;</a:t>
             </a:fld>
           </a:p>
@@ -1648,7 +1648,7 @@
         <p:txBody>
           <a:bodyPr/>
           <a:p>
-            <a:fld id="{7651753C-B9FB-440C-BEC6-5EFFAD0A18DC}" type="slidenum">
+            <a:fld id="{068B7187-2F43-47D1-B595-447CED10A7C0}" type="slidenum">
               <a:t>&lt;#&gt;</a:t>
             </a:fld>
           </a:p>
@@ -1900,7 +1900,7 @@
         <p:txBody>
           <a:bodyPr/>
           <a:p>
-            <a:fld id="{FB1900BB-0FC1-40A1-A7C6-5C9C4159DA01}" type="slidenum">
+            <a:fld id="{2239E81E-E219-4652-8601-7D83FCEF20A9}" type="slidenum">
               <a:t>&lt;#&gt;</a:t>
             </a:fld>
           </a:p>
@@ -2152,7 +2152,7 @@
         <p:txBody>
           <a:bodyPr/>
           <a:p>
-            <a:fld id="{1858413D-65C6-4BCA-A28C-E9CBAE9CE167}" type="slidenum">
+            <a:fld id="{A6688C67-5C51-4EC7-A9A0-7982ACBC2DFD}" type="slidenum">
               <a:t>&lt;#&gt;</a:t>
             </a:fld>
           </a:p>
@@ -2361,7 +2361,7 @@
         <p:txBody>
           <a:bodyPr/>
           <a:p>
-            <a:fld id="{9A0DEAE8-6ED9-4A78-882C-D17CA6AA3D1C}" type="slidenum">
+            <a:fld id="{2564A709-202A-4200-83EF-36BC6D489C84}" type="slidenum">
               <a:t>&lt;#&gt;</a:t>
             </a:fld>
           </a:p>
@@ -2656,7 +2656,7 @@
         <p:txBody>
           <a:bodyPr/>
           <a:p>
-            <a:fld id="{26562A05-7CDE-4998-98DC-40BB46476D59}" type="slidenum">
+            <a:fld id="{AB10DA94-D4F2-4DFE-9B81-955D453491CA}" type="slidenum">
               <a:t>&lt;#&gt;</a:t>
             </a:fld>
           </a:p>
@@ -2739,7 +2739,7 @@
         <p:txBody>
           <a:bodyPr/>
           <a:p>
-            <a:fld id="{EB48A2D0-FD53-44AD-8BD2-651F1116E889}" type="slidenum">
+            <a:fld id="{EB8EE96E-09DE-449C-8124-B8EED3356420}" type="slidenum">
               <a:t>&lt;#&gt;</a:t>
             </a:fld>
           </a:p>
@@ -2822,7 +2822,7 @@
         <p:txBody>
           <a:bodyPr/>
           <a:p>
-            <a:fld id="{D296D91A-8860-40DC-AFBD-7D78AB630203}" type="slidenum">
+            <a:fld id="{B8C631E9-4912-4A1E-AFFF-5AC5CBD735F8}" type="slidenum">
               <a:t>&lt;#&gt;</a:t>
             </a:fld>
           </a:p>
@@ -2988,7 +2988,7 @@
         <p:txBody>
           <a:bodyPr/>
           <a:p>
-            <a:fld id="{5C86ED24-CFF0-4A61-B920-EAE8CEB82BF4}" type="slidenum">
+            <a:fld id="{25E91C15-473C-4836-A135-08146432ECB9}" type="slidenum">
               <a:t>&lt;#&gt;</a:t>
             </a:fld>
           </a:p>
@@ -3154,7 +3154,7 @@
         <p:txBody>
           <a:bodyPr/>
           <a:p>
-            <a:fld id="{3D0F05D0-C95E-4130-A308-3ABD0FE20E72}" type="slidenum">
+            <a:fld id="{30C9195D-0DDB-4C32-A744-2298292C0501}" type="slidenum">
               <a:t>&lt;#&gt;</a:t>
             </a:fld>
           </a:p>
@@ -3219,9 +3219,9 @@
         <p:grpSpPr>
           <a:xfrm>
             <a:off x="6199200" y="6162840"/>
-            <a:ext cx="5981760" cy="684000"/>
+            <a:ext cx="5981040" cy="683280"/>
             <a:chOff x="6199200" y="6162840"/>
-            <a:chExt cx="5981760" cy="684000"/>
+            <a:chExt cx="5981040" cy="683280"/>
           </a:xfrm>
         </p:grpSpPr>
         <p:pic>
@@ -3237,7 +3237,7 @@
           <p:spPr>
             <a:xfrm>
               <a:off x="6199200" y="6162840"/>
-              <a:ext cx="4045320" cy="684000"/>
+              <a:ext cx="4044600" cy="683280"/>
             </a:xfrm>
             <a:prstGeom prst="rect">
               <a:avLst/>
@@ -3260,7 +3260,7 @@
           <p:spPr>
             <a:xfrm>
               <a:off x="10270080" y="6162840"/>
-              <a:ext cx="1910880" cy="600480"/>
+              <a:ext cx="1910160" cy="599760"/>
             </a:xfrm>
             <a:prstGeom prst="rect">
               <a:avLst/>
@@ -3309,7 +3309,25 @@
                 </a:solidFill>
                 <a:latin typeface="Arial"/>
               </a:rPr>
-              <a:t>Click to edit the title text format</a:t>
+              <a:t>Click to edit </a:t>
+            </a:r>
+            <a:r>
+              <a:rPr b="0" lang="en-US" sz="1800" spc="-1" strike="noStrike">
+                <a:solidFill>
+                  <a:srgbClr val="000000"/>
+                </a:solidFill>
+                <a:latin typeface="Arial"/>
+              </a:rPr>
+              <a:t>the title text </a:t>
+            </a:r>
+            <a:r>
+              <a:rPr b="0" lang="en-US" sz="1800" spc="-1" strike="noStrike">
+                <a:solidFill>
+                  <a:srgbClr val="000000"/>
+                </a:solidFill>
+                <a:latin typeface="Arial"/>
+              </a:rPr>
+              <a:t>format</a:t>
             </a:r>
             <a:endParaRPr b="0" lang="en-US" sz="1800" spc="-1" strike="noStrike">
               <a:solidFill>
@@ -4008,7 +4026,7 @@
         <p:spPr>
           <a:xfrm>
             <a:off x="4038480" y="6356520"/>
-            <a:ext cx="4103640" cy="353880"/>
+            <a:ext cx="4102920" cy="353160"/>
           </a:xfrm>
           <a:prstGeom prst="rect">
             <a:avLst/>
@@ -4080,7 +4098,7 @@
         <p:spPr>
           <a:xfrm>
             <a:off x="8610480" y="6356520"/>
-            <a:ext cx="2732040" cy="353880"/>
+            <a:ext cx="2731320" cy="353160"/>
           </a:xfrm>
           <a:prstGeom prst="rect">
             <a:avLst/>
@@ -4123,7 +4141,7 @@
                 <a:tab algn="l" pos="0"/>
               </a:tabLst>
             </a:pPr>
-            <a:fld id="{F636FF58-D22C-4501-B5AA-14F7D7E8AE73}" type="slidenum">
+            <a:fld id="{5AD44B99-B0F0-42B7-86A2-C2905300C13B}" type="slidenum">
               <a:rPr b="0" lang="en-US" sz="1200" spc="-1" strike="noStrike">
                 <a:solidFill>
                   <a:schemeClr val="dk1">
@@ -4156,7 +4174,7 @@
         <p:spPr>
           <a:xfrm>
             <a:off x="838080" y="6356520"/>
-            <a:ext cx="2732040" cy="353880"/>
+            <a:ext cx="2731320" cy="353160"/>
           </a:xfrm>
           <a:prstGeom prst="rect">
             <a:avLst/>
@@ -4245,9 +4263,9 @@
         <p:grpSpPr>
           <a:xfrm>
             <a:off x="6199200" y="6162840"/>
-            <a:ext cx="5981760" cy="684000"/>
+            <a:ext cx="5981040" cy="683280"/>
             <a:chOff x="6199200" y="6162840"/>
-            <a:chExt cx="5981760" cy="684000"/>
+            <a:chExt cx="5981040" cy="683280"/>
           </a:xfrm>
         </p:grpSpPr>
         <p:pic>
@@ -4263,7 +4281,7 @@
           <p:spPr>
             <a:xfrm>
               <a:off x="6199200" y="6162840"/>
-              <a:ext cx="4045320" cy="684000"/>
+              <a:ext cx="4044600" cy="683280"/>
             </a:xfrm>
             <a:prstGeom prst="rect">
               <a:avLst/>
@@ -4286,7 +4304,7 @@
           <p:spPr>
             <a:xfrm>
               <a:off x="10270080" y="6162840"/>
-              <a:ext cx="1910880" cy="600480"/>
+              <a:ext cx="1910160" cy="599760"/>
             </a:xfrm>
             <a:prstGeom prst="rect">
               <a:avLst/>
@@ -4809,7 +4827,7 @@
         <p:spPr>
           <a:xfrm>
             <a:off x="4038480" y="6356520"/>
-            <a:ext cx="4103640" cy="353880"/>
+            <a:ext cx="4102920" cy="353160"/>
           </a:xfrm>
           <a:prstGeom prst="rect">
             <a:avLst/>
@@ -4881,7 +4899,7 @@
         <p:spPr>
           <a:xfrm>
             <a:off x="8610480" y="6356520"/>
-            <a:ext cx="2732040" cy="353880"/>
+            <a:ext cx="2731320" cy="353160"/>
           </a:xfrm>
           <a:prstGeom prst="rect">
             <a:avLst/>
@@ -4924,7 +4942,7 @@
                 <a:tab algn="l" pos="0"/>
               </a:tabLst>
             </a:pPr>
-            <a:fld id="{125C4B73-AAD5-4B3E-9F7C-37509DBDEFA7}" type="slidenum">
+            <a:fld id="{0B0CAB9A-BC9F-4B34-9B3A-DF1B2A0F3908}" type="slidenum">
               <a:rPr b="0" lang="en-US" sz="1200" spc="-1" strike="noStrike">
                 <a:solidFill>
                   <a:schemeClr val="dk1">
@@ -4957,7 +4975,7 @@
         <p:spPr>
           <a:xfrm>
             <a:off x="838080" y="6356520"/>
-            <a:ext cx="2732040" cy="353880"/>
+            <a:ext cx="2731320" cy="353160"/>
           </a:xfrm>
           <a:prstGeom prst="rect">
             <a:avLst/>
@@ -5046,9 +5064,9 @@
         <p:grpSpPr>
           <a:xfrm>
             <a:off x="6199200" y="6162840"/>
-            <a:ext cx="5981760" cy="684000"/>
+            <a:ext cx="5981040" cy="683280"/>
             <a:chOff x="6199200" y="6162840"/>
-            <a:chExt cx="5981760" cy="684000"/>
+            <a:chExt cx="5981040" cy="683280"/>
           </a:xfrm>
         </p:grpSpPr>
         <p:pic>
@@ -5064,7 +5082,7 @@
           <p:spPr>
             <a:xfrm>
               <a:off x="6199200" y="6162840"/>
-              <a:ext cx="4045320" cy="684000"/>
+              <a:ext cx="4044600" cy="683280"/>
             </a:xfrm>
             <a:prstGeom prst="rect">
               <a:avLst/>
@@ -5087,7 +5105,7 @@
           <p:spPr>
             <a:xfrm>
               <a:off x="10270080" y="6162840"/>
-              <a:ext cx="1910880" cy="600480"/>
+              <a:ext cx="1910160" cy="599760"/>
             </a:xfrm>
             <a:prstGeom prst="rect">
               <a:avLst/>
@@ -5160,7 +5178,7 @@
         <p:spPr>
           <a:xfrm>
             <a:off x="4038480" y="6356520"/>
-            <a:ext cx="4103640" cy="353880"/>
+            <a:ext cx="4102920" cy="353160"/>
           </a:xfrm>
           <a:prstGeom prst="rect">
             <a:avLst/>
@@ -5232,7 +5250,7 @@
         <p:spPr>
           <a:xfrm>
             <a:off x="8610480" y="6356520"/>
-            <a:ext cx="2732040" cy="353880"/>
+            <a:ext cx="2731320" cy="353160"/>
           </a:xfrm>
           <a:prstGeom prst="rect">
             <a:avLst/>
@@ -5275,7 +5293,7 @@
                 <a:tab algn="l" pos="0"/>
               </a:tabLst>
             </a:pPr>
-            <a:fld id="{0DDE41E3-FE6F-4E0D-AD65-45D58D4FD42C}" type="slidenum">
+            <a:fld id="{BD91DB47-4BEA-4518-A4B4-431262C06EE6}" type="slidenum">
               <a:rPr b="0" lang="en-US" sz="1200" spc="-1" strike="noStrike">
                 <a:solidFill>
                   <a:schemeClr val="dk1">
@@ -5308,7 +5326,7 @@
         <p:spPr>
           <a:xfrm>
             <a:off x="838080" y="6356520"/>
-            <a:ext cx="2732040" cy="353880"/>
+            <a:ext cx="2731320" cy="353160"/>
           </a:xfrm>
           <a:prstGeom prst="rect">
             <a:avLst/>
@@ -5397,9 +5415,9 @@
         <p:grpSpPr>
           <a:xfrm>
             <a:off x="6199200" y="6162840"/>
-            <a:ext cx="5981760" cy="684000"/>
+            <a:ext cx="5981040" cy="683280"/>
             <a:chOff x="6199200" y="6162840"/>
-            <a:chExt cx="5981760" cy="684000"/>
+            <a:chExt cx="5981040" cy="683280"/>
           </a:xfrm>
         </p:grpSpPr>
         <p:pic>
@@ -5415,7 +5433,7 @@
           <p:spPr>
             <a:xfrm>
               <a:off x="6199200" y="6162840"/>
-              <a:ext cx="4045320" cy="684000"/>
+              <a:ext cx="4044600" cy="683280"/>
             </a:xfrm>
             <a:prstGeom prst="rect">
               <a:avLst/>
@@ -5438,7 +5456,7 @@
           <p:spPr>
             <a:xfrm>
               <a:off x="10270080" y="6162840"/>
-              <a:ext cx="1910880" cy="600480"/>
+              <a:ext cx="1910160" cy="599760"/>
             </a:xfrm>
             <a:prstGeom prst="rect">
               <a:avLst/>
@@ -5462,7 +5480,7 @@
         <p:spPr>
           <a:xfrm>
             <a:off x="4038480" y="6356520"/>
-            <a:ext cx="4103640" cy="353880"/>
+            <a:ext cx="4102920" cy="353160"/>
           </a:xfrm>
           <a:prstGeom prst="rect">
             <a:avLst/>
@@ -5534,7 +5552,7 @@
         <p:spPr>
           <a:xfrm>
             <a:off x="8610480" y="6356520"/>
-            <a:ext cx="2732040" cy="353880"/>
+            <a:ext cx="2731320" cy="353160"/>
           </a:xfrm>
           <a:prstGeom prst="rect">
             <a:avLst/>
@@ -5577,7 +5595,7 @@
                 <a:tab algn="l" pos="0"/>
               </a:tabLst>
             </a:pPr>
-            <a:fld id="{05FC5835-7411-4F00-9B13-F870D60FCDED}" type="slidenum">
+            <a:fld id="{FFD1BAF6-B382-4083-8348-A964AC7B2850}" type="slidenum">
               <a:rPr b="0" lang="en-US" sz="1200" spc="-1" strike="noStrike">
                 <a:solidFill>
                   <a:schemeClr val="dk1">
@@ -5610,7 +5628,7 @@
         <p:spPr>
           <a:xfrm>
             <a:off x="838080" y="6356520"/>
-            <a:ext cx="2732040" cy="353880"/>
+            <a:ext cx="2731320" cy="353160"/>
           </a:xfrm>
           <a:prstGeom prst="rect">
             <a:avLst/>
@@ -5699,9 +5717,9 @@
         <p:grpSpPr>
           <a:xfrm>
             <a:off x="6199200" y="6162840"/>
-            <a:ext cx="5981760" cy="684000"/>
+            <a:ext cx="5981040" cy="683280"/>
             <a:chOff x="6199200" y="6162840"/>
-            <a:chExt cx="5981760" cy="684000"/>
+            <a:chExt cx="5981040" cy="683280"/>
           </a:xfrm>
         </p:grpSpPr>
         <p:pic>
@@ -5717,7 +5735,7 @@
           <p:spPr>
             <a:xfrm>
               <a:off x="6199200" y="6162840"/>
-              <a:ext cx="4045320" cy="684000"/>
+              <a:ext cx="4044600" cy="683280"/>
             </a:xfrm>
             <a:prstGeom prst="rect">
               <a:avLst/>
@@ -5740,7 +5758,7 @@
           <p:spPr>
             <a:xfrm>
               <a:off x="10270080" y="6162840"/>
-              <a:ext cx="1910880" cy="600480"/>
+              <a:ext cx="1910160" cy="599760"/>
             </a:xfrm>
             <a:prstGeom prst="rect">
               <a:avLst/>
@@ -5789,7 +5807,25 @@
                 </a:solidFill>
                 <a:latin typeface="Arial"/>
               </a:rPr>
-              <a:t>Click to edit the title text format</a:t>
+              <a:t>Click to edit </a:t>
+            </a:r>
+            <a:r>
+              <a:rPr b="0" lang="en-US" sz="1800" spc="-1" strike="noStrike">
+                <a:solidFill>
+                  <a:srgbClr val="000000"/>
+                </a:solidFill>
+                <a:latin typeface="Arial"/>
+              </a:rPr>
+              <a:t>the title text </a:t>
+            </a:r>
+            <a:r>
+              <a:rPr b="0" lang="en-US" sz="1800" spc="-1" strike="noStrike">
+                <a:solidFill>
+                  <a:srgbClr val="000000"/>
+                </a:solidFill>
+                <a:latin typeface="Arial"/>
+              </a:rPr>
+              <a:t>format</a:t>
             </a:r>
             <a:endParaRPr b="0" lang="en-US" sz="1800" spc="-1" strike="noStrike">
               <a:solidFill>
@@ -6488,7 +6524,7 @@
         <p:spPr>
           <a:xfrm>
             <a:off x="4038480" y="6356520"/>
-            <a:ext cx="4103640" cy="353880"/>
+            <a:ext cx="4102920" cy="353160"/>
           </a:xfrm>
           <a:prstGeom prst="rect">
             <a:avLst/>
@@ -6560,7 +6596,7 @@
         <p:spPr>
           <a:xfrm>
             <a:off x="8610480" y="6356520"/>
-            <a:ext cx="2732040" cy="353880"/>
+            <a:ext cx="2731320" cy="353160"/>
           </a:xfrm>
           <a:prstGeom prst="rect">
             <a:avLst/>
@@ -6603,7 +6639,7 @@
                 <a:tab algn="l" pos="0"/>
               </a:tabLst>
             </a:pPr>
-            <a:fld id="{04EF5C7F-DDC7-418D-8E92-6581FD79236B}" type="slidenum">
+            <a:fld id="{43F47872-5C32-487B-92C8-3E3E15E20384}" type="slidenum">
               <a:rPr b="0" lang="en-US" sz="1200" spc="-1" strike="noStrike">
                 <a:solidFill>
                   <a:schemeClr val="dk1">
@@ -6636,7 +6672,7 @@
         <p:spPr>
           <a:xfrm>
             <a:off x="838080" y="6356520"/>
-            <a:ext cx="2732040" cy="353880"/>
+            <a:ext cx="2731320" cy="353160"/>
           </a:xfrm>
           <a:prstGeom prst="rect">
             <a:avLst/>
@@ -6725,9 +6761,9 @@
         <p:grpSpPr>
           <a:xfrm>
             <a:off x="6199200" y="6162840"/>
-            <a:ext cx="5981760" cy="684000"/>
+            <a:ext cx="5981040" cy="683280"/>
             <a:chOff x="6199200" y="6162840"/>
-            <a:chExt cx="5981760" cy="684000"/>
+            <a:chExt cx="5981040" cy="683280"/>
           </a:xfrm>
         </p:grpSpPr>
         <p:pic>
@@ -6743,7 +6779,7 @@
           <p:spPr>
             <a:xfrm>
               <a:off x="6199200" y="6162840"/>
-              <a:ext cx="4045320" cy="684000"/>
+              <a:ext cx="4044600" cy="683280"/>
             </a:xfrm>
             <a:prstGeom prst="rect">
               <a:avLst/>
@@ -6766,7 +6802,7 @@
           <p:spPr>
             <a:xfrm>
               <a:off x="10270080" y="6162840"/>
-              <a:ext cx="1910880" cy="600480"/>
+              <a:ext cx="1910160" cy="599760"/>
             </a:xfrm>
             <a:prstGeom prst="rect">
               <a:avLst/>
@@ -7514,7 +7550,7 @@
         <p:spPr>
           <a:xfrm>
             <a:off x="4038480" y="6356520"/>
-            <a:ext cx="4103640" cy="353880"/>
+            <a:ext cx="4102920" cy="353160"/>
           </a:xfrm>
           <a:prstGeom prst="rect">
             <a:avLst/>
@@ -7586,7 +7622,7 @@
         <p:spPr>
           <a:xfrm>
             <a:off x="8610480" y="6356520"/>
-            <a:ext cx="2732040" cy="353880"/>
+            <a:ext cx="2731320" cy="353160"/>
           </a:xfrm>
           <a:prstGeom prst="rect">
             <a:avLst/>
@@ -7629,7 +7665,7 @@
                 <a:tab algn="l" pos="0"/>
               </a:tabLst>
             </a:pPr>
-            <a:fld id="{4116FA36-D545-4CD7-A3D0-9074D5228D47}" type="slidenum">
+            <a:fld id="{5B9AB0B3-E7E0-4BDC-88F7-DB07FD1B0D15}" type="slidenum">
               <a:rPr b="0" lang="en-US" sz="1200" spc="-1" strike="noStrike">
                 <a:solidFill>
                   <a:schemeClr val="dk1">
@@ -7662,7 +7698,7 @@
         <p:spPr>
           <a:xfrm>
             <a:off x="838080" y="6356520"/>
-            <a:ext cx="2732040" cy="353880"/>
+            <a:ext cx="2731320" cy="353160"/>
           </a:xfrm>
           <a:prstGeom prst="rect">
             <a:avLst/>
@@ -7751,9 +7787,9 @@
         <p:grpSpPr>
           <a:xfrm>
             <a:off x="6199200" y="6162840"/>
-            <a:ext cx="5981760" cy="684000"/>
+            <a:ext cx="5981040" cy="683280"/>
             <a:chOff x="6199200" y="6162840"/>
-            <a:chExt cx="5981760" cy="684000"/>
+            <a:chExt cx="5981040" cy="683280"/>
           </a:xfrm>
         </p:grpSpPr>
         <p:pic>
@@ -7769,7 +7805,7 @@
           <p:spPr>
             <a:xfrm>
               <a:off x="6199200" y="6162840"/>
-              <a:ext cx="4045320" cy="684000"/>
+              <a:ext cx="4044600" cy="683280"/>
             </a:xfrm>
             <a:prstGeom prst="rect">
               <a:avLst/>
@@ -7792,7 +7828,7 @@
           <p:spPr>
             <a:xfrm>
               <a:off x="10270080" y="6162840"/>
-              <a:ext cx="1910880" cy="600480"/>
+              <a:ext cx="1910160" cy="599760"/>
             </a:xfrm>
             <a:prstGeom prst="rect">
               <a:avLst/>
@@ -8315,7 +8351,7 @@
         <p:spPr>
           <a:xfrm>
             <a:off x="4038480" y="6356520"/>
-            <a:ext cx="4103640" cy="353880"/>
+            <a:ext cx="4102920" cy="353160"/>
           </a:xfrm>
           <a:prstGeom prst="rect">
             <a:avLst/>
@@ -8387,7 +8423,7 @@
         <p:spPr>
           <a:xfrm>
             <a:off x="8610480" y="6356520"/>
-            <a:ext cx="2732040" cy="353880"/>
+            <a:ext cx="2731320" cy="353160"/>
           </a:xfrm>
           <a:prstGeom prst="rect">
             <a:avLst/>
@@ -8430,7 +8466,7 @@
                 <a:tab algn="l" pos="0"/>
               </a:tabLst>
             </a:pPr>
-            <a:fld id="{D41CDBA3-51EC-40F6-96AE-E0C5C0694E36}" type="slidenum">
+            <a:fld id="{1E7FD523-C933-4454-8DF9-23065EA3E404}" type="slidenum">
               <a:rPr b="0" lang="en-US" sz="1200" spc="-1" strike="noStrike">
                 <a:solidFill>
                   <a:schemeClr val="dk1">
@@ -8463,7 +8499,7 @@
         <p:spPr>
           <a:xfrm>
             <a:off x="838080" y="6356520"/>
-            <a:ext cx="2732040" cy="353880"/>
+            <a:ext cx="2731320" cy="353160"/>
           </a:xfrm>
           <a:prstGeom prst="rect">
             <a:avLst/>
@@ -8552,9 +8588,9 @@
         <p:grpSpPr>
           <a:xfrm>
             <a:off x="6199200" y="6162840"/>
-            <a:ext cx="5981760" cy="684000"/>
+            <a:ext cx="5981040" cy="683280"/>
             <a:chOff x="6199200" y="6162840"/>
-            <a:chExt cx="5981760" cy="684000"/>
+            <a:chExt cx="5981040" cy="683280"/>
           </a:xfrm>
         </p:grpSpPr>
         <p:pic>
@@ -8570,7 +8606,7 @@
           <p:spPr>
             <a:xfrm>
               <a:off x="6199200" y="6162840"/>
-              <a:ext cx="4045320" cy="684000"/>
+              <a:ext cx="4044600" cy="683280"/>
             </a:xfrm>
             <a:prstGeom prst="rect">
               <a:avLst/>
@@ -8593,7 +8629,7 @@
           <p:spPr>
             <a:xfrm>
               <a:off x="10270080" y="6162840"/>
-              <a:ext cx="1910880" cy="600480"/>
+              <a:ext cx="1910160" cy="599760"/>
             </a:xfrm>
             <a:prstGeom prst="rect">
               <a:avLst/>
@@ -9566,7 +9602,7 @@
         <p:spPr>
           <a:xfrm>
             <a:off x="4038480" y="6356520"/>
-            <a:ext cx="4103640" cy="353880"/>
+            <a:ext cx="4102920" cy="353160"/>
           </a:xfrm>
           <a:prstGeom prst="rect">
             <a:avLst/>
@@ -9638,7 +9674,7 @@
         <p:spPr>
           <a:xfrm>
             <a:off x="8610480" y="6356520"/>
-            <a:ext cx="2732040" cy="353880"/>
+            <a:ext cx="2731320" cy="353160"/>
           </a:xfrm>
           <a:prstGeom prst="rect">
             <a:avLst/>
@@ -9681,7 +9717,7 @@
                 <a:tab algn="l" pos="0"/>
               </a:tabLst>
             </a:pPr>
-            <a:fld id="{7E782E8B-8BCA-4B10-A970-C3B91863A0A8}" type="slidenum">
+            <a:fld id="{3D3E4863-BC17-4BFB-BB79-C3F8CF423ECD}" type="slidenum">
               <a:rPr b="0" lang="en-US" sz="1200" spc="-1" strike="noStrike">
                 <a:solidFill>
                   <a:schemeClr val="dk1">
@@ -9714,7 +9750,7 @@
         <p:spPr>
           <a:xfrm>
             <a:off x="838080" y="6356520"/>
-            <a:ext cx="2732040" cy="353880"/>
+            <a:ext cx="2731320" cy="353160"/>
           </a:xfrm>
           <a:prstGeom prst="rect">
             <a:avLst/>
@@ -9803,9 +9839,9 @@
         <p:grpSpPr>
           <a:xfrm>
             <a:off x="6199200" y="6162840"/>
-            <a:ext cx="5981760" cy="684000"/>
+            <a:ext cx="5981040" cy="683280"/>
             <a:chOff x="6199200" y="6162840"/>
-            <a:chExt cx="5981760" cy="684000"/>
+            <a:chExt cx="5981040" cy="683280"/>
           </a:xfrm>
         </p:grpSpPr>
         <p:pic>
@@ -9821,7 +9857,7 @@
           <p:spPr>
             <a:xfrm>
               <a:off x="6199200" y="6162840"/>
-              <a:ext cx="4045320" cy="684000"/>
+              <a:ext cx="4044600" cy="683280"/>
             </a:xfrm>
             <a:prstGeom prst="rect">
               <a:avLst/>
@@ -9844,7 +9880,7 @@
           <p:spPr>
             <a:xfrm>
               <a:off x="10270080" y="6162840"/>
-              <a:ext cx="1910880" cy="600480"/>
+              <a:ext cx="1910160" cy="599760"/>
             </a:xfrm>
             <a:prstGeom prst="rect">
               <a:avLst/>
@@ -9868,7 +9904,7 @@
         <p:spPr>
           <a:xfrm>
             <a:off x="4038480" y="6356520"/>
-            <a:ext cx="4103640" cy="353880"/>
+            <a:ext cx="4102920" cy="353160"/>
           </a:xfrm>
           <a:prstGeom prst="rect">
             <a:avLst/>
@@ -9940,7 +9976,7 @@
         <p:spPr>
           <a:xfrm>
             <a:off x="8610480" y="6356520"/>
-            <a:ext cx="2732040" cy="353880"/>
+            <a:ext cx="2731320" cy="353160"/>
           </a:xfrm>
           <a:prstGeom prst="rect">
             <a:avLst/>
@@ -9983,7 +10019,7 @@
                 <a:tab algn="l" pos="0"/>
               </a:tabLst>
             </a:pPr>
-            <a:fld id="{48946041-9916-433A-8F93-1B2FBB9D6146}" type="slidenum">
+            <a:fld id="{4A712F45-E7EE-4322-844A-BE7A58D23A1B}" type="slidenum">
               <a:rPr b="0" lang="en-US" sz="1200" spc="-1" strike="noStrike">
                 <a:solidFill>
                   <a:schemeClr val="dk1">
@@ -10016,7 +10052,7 @@
         <p:spPr>
           <a:xfrm>
             <a:off x="838080" y="6356520"/>
-            <a:ext cx="2732040" cy="353880"/>
+            <a:ext cx="2731320" cy="353160"/>
           </a:xfrm>
           <a:prstGeom prst="rect">
             <a:avLst/>
@@ -10105,9 +10141,9 @@
         <p:grpSpPr>
           <a:xfrm>
             <a:off x="6199200" y="6162840"/>
-            <a:ext cx="5981760" cy="684000"/>
+            <a:ext cx="5981040" cy="683280"/>
             <a:chOff x="6199200" y="6162840"/>
-            <a:chExt cx="5981760" cy="684000"/>
+            <a:chExt cx="5981040" cy="683280"/>
           </a:xfrm>
         </p:grpSpPr>
         <p:pic>
@@ -10123,7 +10159,7 @@
           <p:spPr>
             <a:xfrm>
               <a:off x="6199200" y="6162840"/>
-              <a:ext cx="4045320" cy="684000"/>
+              <a:ext cx="4044600" cy="683280"/>
             </a:xfrm>
             <a:prstGeom prst="rect">
               <a:avLst/>
@@ -10146,7 +10182,7 @@
           <p:spPr>
             <a:xfrm>
               <a:off x="10270080" y="6162840"/>
-              <a:ext cx="1910880" cy="600480"/>
+              <a:ext cx="1910160" cy="599760"/>
             </a:xfrm>
             <a:prstGeom prst="rect">
               <a:avLst/>
@@ -10170,7 +10206,7 @@
         <p:spPr>
           <a:xfrm>
             <a:off x="4038480" y="6356520"/>
-            <a:ext cx="4103640" cy="353880"/>
+            <a:ext cx="4102920" cy="353160"/>
           </a:xfrm>
           <a:prstGeom prst="rect">
             <a:avLst/>
@@ -10242,7 +10278,7 @@
         <p:spPr>
           <a:xfrm>
             <a:off x="8610480" y="6356520"/>
-            <a:ext cx="2732040" cy="353880"/>
+            <a:ext cx="2731320" cy="353160"/>
           </a:xfrm>
           <a:prstGeom prst="rect">
             <a:avLst/>
@@ -10285,7 +10321,7 @@
                 <a:tab algn="l" pos="0"/>
               </a:tabLst>
             </a:pPr>
-            <a:fld id="{7A2E0CB1-3520-4BA0-B26E-D8144444F16D}" type="slidenum">
+            <a:fld id="{2139275F-463B-45D6-8C18-89BBE5AA4276}" type="slidenum">
               <a:rPr b="0" lang="en-US" sz="1200" spc="-1" strike="noStrike">
                 <a:solidFill>
                   <a:schemeClr val="dk1">
@@ -10318,7 +10354,7 @@
         <p:spPr>
           <a:xfrm>
             <a:off x="838080" y="6356520"/>
-            <a:ext cx="2732040" cy="353880"/>
+            <a:ext cx="2731320" cy="353160"/>
           </a:xfrm>
           <a:prstGeom prst="rect">
             <a:avLst/>
@@ -10681,9 +10717,9 @@
         <p:grpSpPr>
           <a:xfrm>
             <a:off x="6199200" y="6162840"/>
-            <a:ext cx="5981760" cy="684000"/>
+            <a:ext cx="5981040" cy="683280"/>
             <a:chOff x="6199200" y="6162840"/>
-            <a:chExt cx="5981760" cy="684000"/>
+            <a:chExt cx="5981040" cy="683280"/>
           </a:xfrm>
         </p:grpSpPr>
         <p:pic>
@@ -10699,7 +10735,7 @@
           <p:spPr>
             <a:xfrm>
               <a:off x="6199200" y="6162840"/>
-              <a:ext cx="4045320" cy="684000"/>
+              <a:ext cx="4044600" cy="683280"/>
             </a:xfrm>
             <a:prstGeom prst="rect">
               <a:avLst/>
@@ -10722,7 +10758,7 @@
           <p:spPr>
             <a:xfrm>
               <a:off x="10270080" y="6162840"/>
-              <a:ext cx="1910880" cy="600480"/>
+              <a:ext cx="1910160" cy="599760"/>
             </a:xfrm>
             <a:prstGeom prst="rect">
               <a:avLst/>
@@ -11020,7 +11056,7 @@
         <p:spPr>
           <a:xfrm>
             <a:off x="4038480" y="6356520"/>
-            <a:ext cx="4103640" cy="353880"/>
+            <a:ext cx="4102920" cy="353160"/>
           </a:xfrm>
           <a:prstGeom prst="rect">
             <a:avLst/>
@@ -11092,7 +11128,7 @@
         <p:spPr>
           <a:xfrm>
             <a:off x="8610480" y="6356520"/>
-            <a:ext cx="2732040" cy="353880"/>
+            <a:ext cx="2731320" cy="353160"/>
           </a:xfrm>
           <a:prstGeom prst="rect">
             <a:avLst/>
@@ -11135,7 +11171,7 @@
                 <a:tab algn="l" pos="0"/>
               </a:tabLst>
             </a:pPr>
-            <a:fld id="{DB580AC3-0719-4A8E-802F-7B806A348710}" type="slidenum">
+            <a:fld id="{F2B52AE9-5AF8-42C2-A26E-12EDC2D5D210}" type="slidenum">
               <a:rPr b="0" lang="en-US" sz="1200" spc="-1" strike="noStrike">
                 <a:solidFill>
                   <a:schemeClr val="dk1">
@@ -11168,7 +11204,7 @@
         <p:spPr>
           <a:xfrm>
             <a:off x="838080" y="6356520"/>
-            <a:ext cx="2732040" cy="353880"/>
+            <a:ext cx="2731320" cy="353160"/>
           </a:xfrm>
           <a:prstGeom prst="rect">
             <a:avLst/>
@@ -11257,9 +11293,9 @@
         <p:grpSpPr>
           <a:xfrm>
             <a:off x="6199200" y="6162840"/>
-            <a:ext cx="5981760" cy="684000"/>
+            <a:ext cx="5981040" cy="683280"/>
             <a:chOff x="6199200" y="6162840"/>
-            <a:chExt cx="5981760" cy="684000"/>
+            <a:chExt cx="5981040" cy="683280"/>
           </a:xfrm>
         </p:grpSpPr>
         <p:pic>
@@ -11275,7 +11311,7 @@
           <p:spPr>
             <a:xfrm>
               <a:off x="6199200" y="6162840"/>
-              <a:ext cx="4045320" cy="684000"/>
+              <a:ext cx="4044600" cy="683280"/>
             </a:xfrm>
             <a:prstGeom prst="rect">
               <a:avLst/>
@@ -11298,7 +11334,7 @@
           <p:spPr>
             <a:xfrm>
               <a:off x="10270080" y="6162840"/>
-              <a:ext cx="1910880" cy="600480"/>
+              <a:ext cx="1910160" cy="599760"/>
             </a:xfrm>
             <a:prstGeom prst="rect">
               <a:avLst/>
@@ -11596,7 +11632,7 @@
         <p:spPr>
           <a:xfrm>
             <a:off x="4038480" y="6356520"/>
-            <a:ext cx="4103640" cy="353880"/>
+            <a:ext cx="4102920" cy="353160"/>
           </a:xfrm>
           <a:prstGeom prst="rect">
             <a:avLst/>
@@ -11668,7 +11704,7 @@
         <p:spPr>
           <a:xfrm>
             <a:off x="8610480" y="6356520"/>
-            <a:ext cx="2732040" cy="353880"/>
+            <a:ext cx="2731320" cy="353160"/>
           </a:xfrm>
           <a:prstGeom prst="rect">
             <a:avLst/>
@@ -11711,7 +11747,7 @@
                 <a:tab algn="l" pos="0"/>
               </a:tabLst>
             </a:pPr>
-            <a:fld id="{BD183681-B016-4B22-8ADA-8C5B4C160262}" type="slidenum">
+            <a:fld id="{324E4AD2-2C9D-4A03-B230-1CCBD7F1E715}" type="slidenum">
               <a:rPr b="0" lang="en-US" sz="1200" spc="-1" strike="noStrike">
                 <a:solidFill>
                   <a:schemeClr val="dk1">
@@ -11744,7 +11780,7 @@
         <p:spPr>
           <a:xfrm>
             <a:off x="838080" y="6356520"/>
-            <a:ext cx="2732040" cy="353880"/>
+            <a:ext cx="2731320" cy="353160"/>
           </a:xfrm>
           <a:prstGeom prst="rect">
             <a:avLst/>
@@ -11826,7 +11862,7 @@
         <p:spPr>
           <a:xfrm flipH="1">
             <a:off x="0" y="3073320"/>
-            <a:ext cx="1839960" cy="11160"/>
+            <a:ext cx="1840680" cy="11880"/>
           </a:xfrm>
           <a:prstGeom prst="straightConnector1">
             <a:avLst/>
@@ -11849,7 +11885,7 @@
         <p:spPr>
           <a:xfrm>
             <a:off x="0" y="2489400"/>
-            <a:ext cx="1839960" cy="11160"/>
+            <a:ext cx="1840680" cy="11880"/>
           </a:xfrm>
           <a:prstGeom prst="straightConnector1">
             <a:avLst/>
@@ -11872,7 +11908,7 @@
         <p:spPr>
           <a:xfrm>
             <a:off x="0" y="2781360"/>
-            <a:ext cx="1839960" cy="11160"/>
+            <a:ext cx="1840680" cy="11880"/>
           </a:xfrm>
           <a:prstGeom prst="straightConnector1">
             <a:avLst/>
@@ -11895,7 +11931,7 @@
         <p:spPr>
           <a:xfrm flipH="1">
             <a:off x="0" y="3657600"/>
-            <a:ext cx="1839960" cy="11160"/>
+            <a:ext cx="1840680" cy="11880"/>
           </a:xfrm>
           <a:prstGeom prst="straightConnector1">
             <a:avLst/>
@@ -11917,7 +11953,7 @@
         <p:spPr>
           <a:xfrm>
             <a:off x="128520" y="6134040"/>
-            <a:ext cx="1560600" cy="376560"/>
+            <a:ext cx="1559880" cy="375840"/>
           </a:xfrm>
           <a:prstGeom prst="diamond">
             <a:avLst/>
@@ -11982,7 +12018,7 @@
         <p:spPr>
           <a:xfrm>
             <a:off x="302760" y="5454000"/>
-            <a:ext cx="1212120" cy="376560"/>
+            <a:ext cx="1211400" cy="375840"/>
           </a:xfrm>
           <a:prstGeom prst="ellipse">
             <a:avLst/>
@@ -12045,7 +12081,7 @@
         <p:spPr>
           <a:xfrm>
             <a:off x="101160" y="336240"/>
-            <a:ext cx="1615320" cy="303120"/>
+            <a:ext cx="1614600" cy="303120"/>
           </a:xfrm>
           <a:prstGeom prst="rect">
             <a:avLst/>
@@ -12102,7 +12138,7 @@
         <p:spPr>
           <a:xfrm>
             <a:off x="101160" y="597600"/>
-            <a:ext cx="1615320" cy="516600"/>
+            <a:ext cx="1614600" cy="516600"/>
           </a:xfrm>
           <a:prstGeom prst="rect">
             <a:avLst/>
@@ -12192,7 +12228,7 @@
         <p:spPr>
           <a:xfrm>
             <a:off x="101160" y="336240"/>
-            <a:ext cx="1615320" cy="303120"/>
+            <a:ext cx="1614600" cy="303120"/>
           </a:xfrm>
           <a:prstGeom prst="rect">
             <a:avLst/>
@@ -12249,7 +12285,7 @@
         <p:spPr>
           <a:xfrm>
             <a:off x="101160" y="597600"/>
-            <a:ext cx="1615320" cy="516600"/>
+            <a:ext cx="1614600" cy="516600"/>
           </a:xfrm>
           <a:prstGeom prst="rect">
             <a:avLst/>
@@ -12339,7 +12375,7 @@
         <p:spPr>
           <a:xfrm>
             <a:off x="2541600" y="228600"/>
-            <a:ext cx="1615320" cy="303120"/>
+            <a:ext cx="1614600" cy="303120"/>
           </a:xfrm>
           <a:prstGeom prst="rect">
             <a:avLst/>
@@ -12396,7 +12432,7 @@
         <p:spPr>
           <a:xfrm>
             <a:off x="2541600" y="489960"/>
-            <a:ext cx="1615320" cy="1584000"/>
+            <a:ext cx="1614600" cy="1584000"/>
           </a:xfrm>
           <a:prstGeom prst="rect">
             <a:avLst/>
@@ -12621,7 +12657,7 @@
         <p:spPr>
           <a:xfrm>
             <a:off x="6656400" y="228600"/>
-            <a:ext cx="1615320" cy="303120"/>
+            <a:ext cx="1614600" cy="303120"/>
           </a:xfrm>
           <a:prstGeom prst="rect">
             <a:avLst/>
@@ -12678,7 +12714,7 @@
         <p:spPr>
           <a:xfrm>
             <a:off x="6656400" y="489960"/>
-            <a:ext cx="1615320" cy="516600"/>
+            <a:ext cx="1614600" cy="516600"/>
           </a:xfrm>
           <a:prstGeom prst="rect">
             <a:avLst/>
@@ -12768,7 +12804,7 @@
         <p:spPr>
           <a:xfrm>
             <a:off x="6656400" y="228600"/>
-            <a:ext cx="1615320" cy="303120"/>
+            <a:ext cx="1614600" cy="303120"/>
           </a:xfrm>
           <a:prstGeom prst="rect">
             <a:avLst/>
@@ -12825,7 +12861,7 @@
         <p:spPr>
           <a:xfrm>
             <a:off x="6656400" y="489960"/>
-            <a:ext cx="1615320" cy="730080"/>
+            <a:ext cx="1614600" cy="730080"/>
           </a:xfrm>
           <a:prstGeom prst="rect">
             <a:avLst/>
@@ -12942,7 +12978,7 @@
         <p:spPr>
           <a:xfrm>
             <a:off x="128520" y="4629600"/>
-            <a:ext cx="1560600" cy="521280"/>
+            <a:ext cx="1559880" cy="520560"/>
           </a:xfrm>
           <a:prstGeom prst="diamond">
             <a:avLst/>
@@ -13030,7 +13066,7 @@
         <p:spPr>
           <a:xfrm>
             <a:off x="0" y="3365640"/>
-            <a:ext cx="1839960" cy="11160"/>
+            <a:ext cx="1840680" cy="11880"/>
           </a:xfrm>
           <a:prstGeom prst="straightConnector1">
             <a:avLst/>
@@ -13052,7 +13088,7 @@
         <p:spPr>
           <a:xfrm>
             <a:off x="673200" y="3949920"/>
-            <a:ext cx="471600" cy="376560"/>
+            <a:ext cx="470880" cy="375840"/>
           </a:xfrm>
           <a:prstGeom prst="triangle">
             <a:avLst>
@@ -13119,9 +13155,9 @@
         <p:grpSpPr>
           <a:xfrm>
             <a:off x="101160" y="1413000"/>
-            <a:ext cx="1615320" cy="777960"/>
+            <a:ext cx="1614600" cy="777960"/>
             <a:chOff x="101160" y="1413000"/>
-            <a:chExt cx="1615320" cy="777960"/>
+            <a:chExt cx="1614600" cy="777960"/>
           </a:xfrm>
         </p:grpSpPr>
         <p:sp>
@@ -13133,7 +13169,7 @@
           <p:spPr>
             <a:xfrm>
               <a:off x="101160" y="1413000"/>
-              <a:ext cx="1615320" cy="303120"/>
+              <a:ext cx="1614600" cy="303120"/>
             </a:xfrm>
             <a:prstGeom prst="rect">
               <a:avLst/>
@@ -13191,7 +13227,7 @@
           <p:spPr>
             <a:xfrm>
               <a:off x="101160" y="1674360"/>
-              <a:ext cx="1615320" cy="516600"/>
+              <a:ext cx="1614600" cy="516600"/>
             </a:xfrm>
             <a:prstGeom prst="rect">
               <a:avLst/>
@@ -13283,7 +13319,7 @@
         <p:spPr>
           <a:xfrm>
             <a:off x="4426920" y="914400"/>
-            <a:ext cx="1560600" cy="376560"/>
+            <a:ext cx="1559880" cy="375840"/>
           </a:xfrm>
           <a:prstGeom prst="diamond">
             <a:avLst/>
@@ -13350,8 +13386,8 @@
         </p:nvCxnSpPr>
         <p:spPr>
           <a:xfrm flipH="1">
-            <a:off x="5987520" y="855000"/>
-            <a:ext cx="669240" cy="248040"/>
+            <a:off x="5986800" y="855000"/>
+            <a:ext cx="669960" cy="247680"/>
           </a:xfrm>
           <a:prstGeom prst="straightConnector1">
             <a:avLst/>
@@ -13374,7 +13410,7 @@
         <p:spPr>
           <a:xfrm>
             <a:off x="6255720" y="1828800"/>
-            <a:ext cx="1789200" cy="376560"/>
+            <a:ext cx="1788480" cy="375840"/>
           </a:xfrm>
           <a:prstGeom prst="diamond">
             <a:avLst/>
@@ -13441,7 +13477,7 @@
         </p:nvCxnSpPr>
         <p:spPr>
           <a:xfrm flipV="1">
-            <a:off x="7150320" y="1220040"/>
+            <a:off x="7149960" y="1220040"/>
             <a:ext cx="313920" cy="609120"/>
           </a:xfrm>
           <a:prstGeom prst="straightConnector1">
@@ -13465,8 +13501,8 @@
         </p:nvCxnSpPr>
         <p:spPr>
           <a:xfrm flipH="1" flipV="1">
-            <a:off x="7150320" y="2205360"/>
-            <a:ext cx="466920" cy="546840"/>
+            <a:off x="7149960" y="2204640"/>
+            <a:ext cx="468000" cy="548280"/>
           </a:xfrm>
           <a:prstGeom prst="straightConnector1">
             <a:avLst/>
@@ -13489,7 +13525,7 @@
         <p:spPr>
           <a:xfrm>
             <a:off x="128520" y="6134400"/>
-            <a:ext cx="1560600" cy="376560"/>
+            <a:ext cx="1559880" cy="375840"/>
           </a:xfrm>
           <a:prstGeom prst="diamond">
             <a:avLst/>
@@ -13554,9 +13590,9 @@
         <p:grpSpPr>
           <a:xfrm>
             <a:off x="6681960" y="2743200"/>
-            <a:ext cx="1843920" cy="1216440"/>
+            <a:ext cx="1843200" cy="1216440"/>
             <a:chOff x="6681960" y="2743200"/>
-            <a:chExt cx="1843920" cy="1216440"/>
+            <a:chExt cx="1843200" cy="1216440"/>
           </a:xfrm>
         </p:grpSpPr>
         <p:sp>
@@ -13568,7 +13604,7 @@
           <p:spPr>
             <a:xfrm>
               <a:off x="6681960" y="2743200"/>
-              <a:ext cx="1843920" cy="303120"/>
+              <a:ext cx="1843200" cy="303120"/>
             </a:xfrm>
             <a:prstGeom prst="rect">
               <a:avLst/>
@@ -13625,7 +13661,7 @@
           <p:spPr>
             <a:xfrm>
               <a:off x="6681960" y="3016080"/>
-              <a:ext cx="1843920" cy="943560"/>
+              <a:ext cx="1843200" cy="943560"/>
             </a:xfrm>
             <a:prstGeom prst="rect">
               <a:avLst/>
@@ -13772,7 +13808,7 @@
         <p:spPr>
           <a:xfrm>
             <a:off x="9173520" y="3501000"/>
-            <a:ext cx="471600" cy="376560"/>
+            <a:ext cx="470880" cy="375840"/>
           </a:xfrm>
           <a:prstGeom prst="triangle">
             <a:avLst>
@@ -13839,7 +13875,7 @@
         <p:spPr>
           <a:xfrm>
             <a:off x="10287000" y="3126240"/>
-            <a:ext cx="1897920" cy="303120"/>
+            <a:ext cx="1897200" cy="303120"/>
           </a:xfrm>
           <a:prstGeom prst="rect">
             <a:avLst/>
@@ -13896,7 +13932,7 @@
         <p:spPr>
           <a:xfrm>
             <a:off x="10287000" y="3429360"/>
-            <a:ext cx="1897920" cy="1584000"/>
+            <a:ext cx="1897200" cy="1584000"/>
           </a:xfrm>
           <a:prstGeom prst="rect">
             <a:avLst/>
@@ -14104,8 +14140,8 @@
         </p:nvCxnSpPr>
         <p:spPr>
           <a:xfrm>
-            <a:off x="9527400" y="3689280"/>
-            <a:ext cx="759960" cy="532440"/>
+            <a:off x="9526680" y="3688920"/>
+            <a:ext cx="760680" cy="532800"/>
           </a:xfrm>
           <a:prstGeom prst="straightConnector1">
             <a:avLst/>
@@ -14129,8 +14165,8 @@
         </p:nvCxnSpPr>
         <p:spPr>
           <a:xfrm flipH="1" flipV="1">
-            <a:off x="8525880" y="3351240"/>
-            <a:ext cx="765720" cy="338400"/>
+            <a:off x="8525160" y="3351240"/>
+            <a:ext cx="766440" cy="338040"/>
           </a:xfrm>
           <a:prstGeom prst="straightConnector1">
             <a:avLst/>
@@ -14152,7 +14188,7 @@
         <p:spPr>
           <a:xfrm>
             <a:off x="2086200" y="3336840"/>
-            <a:ext cx="1615320" cy="303120"/>
+            <a:ext cx="1614600" cy="303120"/>
           </a:xfrm>
           <a:prstGeom prst="rect">
             <a:avLst/>
@@ -14209,7 +14245,7 @@
         <p:spPr>
           <a:xfrm>
             <a:off x="2086200" y="3598200"/>
-            <a:ext cx="1615320" cy="516600"/>
+            <a:ext cx="1614600" cy="516600"/>
           </a:xfrm>
           <a:prstGeom prst="rect">
             <a:avLst/>
@@ -14299,7 +14335,7 @@
         <p:spPr>
           <a:xfrm>
             <a:off x="2086200" y="3336840"/>
-            <a:ext cx="1615320" cy="303120"/>
+            <a:ext cx="1614600" cy="303120"/>
           </a:xfrm>
           <a:prstGeom prst="rect">
             <a:avLst/>
@@ -14356,7 +14392,7 @@
         <p:spPr>
           <a:xfrm>
             <a:off x="2086200" y="3598200"/>
-            <a:ext cx="1615320" cy="516600"/>
+            <a:ext cx="1614600" cy="516600"/>
           </a:xfrm>
           <a:prstGeom prst="rect">
             <a:avLst/>
@@ -14446,7 +14482,7 @@
         <p:spPr>
           <a:xfrm>
             <a:off x="1883160" y="2514600"/>
-            <a:ext cx="1818360" cy="376560"/>
+            <a:ext cx="1817640" cy="375840"/>
           </a:xfrm>
           <a:prstGeom prst="diamond">
             <a:avLst/>
@@ -14511,7 +14547,7 @@
         <p:spPr>
           <a:xfrm>
             <a:off x="3481560" y="2899800"/>
-            <a:ext cx="1589760" cy="376560"/>
+            <a:ext cx="1589040" cy="375840"/>
           </a:xfrm>
           <a:prstGeom prst="ellipse">
             <a:avLst/>
@@ -14576,8 +14612,8 @@
         </p:nvCxnSpPr>
         <p:spPr>
           <a:xfrm>
-            <a:off x="3701520" y="2702880"/>
-            <a:ext cx="575280" cy="197280"/>
+            <a:off x="3700800" y="2702520"/>
+            <a:ext cx="575640" cy="197640"/>
           </a:xfrm>
           <a:prstGeom prst="straightConnector1">
             <a:avLst/>
@@ -14601,8 +14637,8 @@
         </p:nvCxnSpPr>
         <p:spPr>
           <a:xfrm flipH="1" flipV="1">
-            <a:off x="2792520" y="2891160"/>
-            <a:ext cx="101520" cy="446040"/>
+            <a:off x="2792160" y="2890440"/>
+            <a:ext cx="101520" cy="446760"/>
           </a:xfrm>
           <a:prstGeom prst="straightConnector1">
             <a:avLst/>
@@ -14626,7 +14662,7 @@
         </p:nvCxnSpPr>
         <p:spPr>
           <a:xfrm flipV="1">
-            <a:off x="2792520" y="2073960"/>
+            <a:off x="2792160" y="2073960"/>
             <a:ext cx="556920" cy="441000"/>
           </a:xfrm>
           <a:prstGeom prst="straightConnector1">
@@ -14649,7 +14685,7 @@
         <p:spPr>
           <a:xfrm>
             <a:off x="10543680" y="457200"/>
-            <a:ext cx="1615320" cy="303120"/>
+            <a:ext cx="1614600" cy="303120"/>
           </a:xfrm>
           <a:prstGeom prst="rect">
             <a:avLst/>
@@ -14706,7 +14742,7 @@
         <p:spPr>
           <a:xfrm>
             <a:off x="10543680" y="718560"/>
-            <a:ext cx="1615320" cy="516600"/>
+            <a:ext cx="1614600" cy="516600"/>
           </a:xfrm>
           <a:prstGeom prst="rect">
             <a:avLst/>
@@ -14796,7 +14832,7 @@
         <p:spPr>
           <a:xfrm>
             <a:off x="10287000" y="457200"/>
-            <a:ext cx="1615320" cy="303120"/>
+            <a:ext cx="1614600" cy="303120"/>
           </a:xfrm>
           <a:prstGeom prst="rect">
             <a:avLst/>
@@ -14853,7 +14889,7 @@
         <p:spPr>
           <a:xfrm>
             <a:off x="10287000" y="718560"/>
-            <a:ext cx="1872000" cy="2651400"/>
+            <a:ext cx="1871280" cy="2651400"/>
           </a:xfrm>
           <a:prstGeom prst="rect">
             <a:avLst/>
@@ -15187,7 +15223,7 @@
         <p:spPr>
           <a:xfrm>
             <a:off x="8007120" y="1448280"/>
-            <a:ext cx="2047320" cy="376560"/>
+            <a:ext cx="2046600" cy="375840"/>
           </a:xfrm>
           <a:prstGeom prst="diamond">
             <a:avLst/>
@@ -15254,8 +15290,8 @@
         </p:nvCxnSpPr>
         <p:spPr>
           <a:xfrm>
-            <a:off x="9030960" y="1824840"/>
-            <a:ext cx="1256400" cy="2396880"/>
+            <a:off x="9030600" y="1824120"/>
+            <a:ext cx="1256760" cy="2397600"/>
           </a:xfrm>
           <a:prstGeom prst="straightConnector1">
             <a:avLst/>
@@ -15279,8 +15315,8 @@
         </p:nvCxnSpPr>
         <p:spPr>
           <a:xfrm flipH="1" flipV="1">
-            <a:off x="10054440" y="1636560"/>
-            <a:ext cx="232920" cy="407880"/>
+            <a:off x="10053720" y="1636200"/>
+            <a:ext cx="233640" cy="408240"/>
           </a:xfrm>
           <a:prstGeom prst="straightConnector1">
             <a:avLst/>
@@ -15304,7 +15340,7 @@
         </p:nvCxnSpPr>
         <p:spPr>
           <a:xfrm flipH="1" flipV="1">
-            <a:off x="7463880" y="1220040"/>
+            <a:off x="7463520" y="1220040"/>
             <a:ext cx="1567440" cy="228600"/>
           </a:xfrm>
           <a:prstGeom prst="straightConnector1">
@@ -15327,7 +15363,7 @@
         <p:spPr>
           <a:xfrm>
             <a:off x="5412240" y="5029200"/>
-            <a:ext cx="1615320" cy="303120"/>
+            <a:ext cx="1614600" cy="303120"/>
           </a:xfrm>
           <a:prstGeom prst="rect">
             <a:avLst/>
@@ -15384,7 +15420,7 @@
         <p:spPr>
           <a:xfrm>
             <a:off x="3710160" y="4343400"/>
-            <a:ext cx="1818720" cy="376560"/>
+            <a:ext cx="1818000" cy="375840"/>
           </a:xfrm>
           <a:prstGeom prst="diamond">
             <a:avLst/>
@@ -15451,8 +15487,8 @@
         </p:nvCxnSpPr>
         <p:spPr>
           <a:xfrm>
-            <a:off x="2893680" y="4114800"/>
-            <a:ext cx="816840" cy="417240"/>
+            <a:off x="2893320" y="4114800"/>
+            <a:ext cx="817200" cy="416880"/>
           </a:xfrm>
           <a:prstGeom prst="straightConnector1">
             <a:avLst/>
@@ -15477,8 +15513,8 @@
         </p:nvCxnSpPr>
         <p:spPr>
           <a:xfrm>
-            <a:off x="4619520" y="4719960"/>
-            <a:ext cx="793080" cy="461160"/>
+            <a:off x="4619160" y="4719240"/>
+            <a:ext cx="793440" cy="461880"/>
           </a:xfrm>
           <a:prstGeom prst="straightConnector1">
             <a:avLst/>
@@ -15502,7 +15538,7 @@
         </p:nvCxnSpPr>
         <p:spPr>
           <a:xfrm flipH="1" flipV="1">
-            <a:off x="3349080" y="2073960"/>
+            <a:off x="3348720" y="2073960"/>
             <a:ext cx="2187000" cy="1126800"/>
           </a:xfrm>
           <a:prstGeom prst="straightConnector1">
@@ -15525,7 +15561,7 @@
         <p:spPr>
           <a:xfrm>
             <a:off x="4626720" y="3200400"/>
-            <a:ext cx="1818000" cy="675720"/>
+            <a:ext cx="1817280" cy="675000"/>
           </a:xfrm>
           <a:prstGeom prst="diamond">
             <a:avLst/>
@@ -15592,8 +15628,8 @@
         </p:nvCxnSpPr>
         <p:spPr>
           <a:xfrm flipH="1" flipV="1">
-            <a:off x="5535720" y="3876120"/>
-            <a:ext cx="684360" cy="1153440"/>
+            <a:off x="5535360" y="3875400"/>
+            <a:ext cx="684360" cy="1154160"/>
           </a:xfrm>
           <a:prstGeom prst="straightConnector1">
             <a:avLst/>
@@ -15615,7 +15651,7 @@
         <p:spPr>
           <a:xfrm>
             <a:off x="2693880" y="4415400"/>
-            <a:ext cx="471600" cy="376560"/>
+            <a:ext cx="470880" cy="375840"/>
           </a:xfrm>
           <a:prstGeom prst="triangle">
             <a:avLst>
@@ -15684,7 +15720,7 @@
         </p:nvCxnSpPr>
         <p:spPr>
           <a:xfrm flipH="1" flipV="1">
-            <a:off x="2893680" y="4114800"/>
+            <a:off x="2893320" y="4114800"/>
             <a:ext cx="36360" cy="300960"/>
           </a:xfrm>
           <a:prstGeom prst="straightConnector1">
@@ -15707,7 +15743,7 @@
         <p:spPr>
           <a:xfrm>
             <a:off x="2109960" y="5163480"/>
-            <a:ext cx="1615320" cy="303120"/>
+            <a:ext cx="1614600" cy="303120"/>
           </a:xfrm>
           <a:prstGeom prst="rect">
             <a:avLst/>
@@ -15764,7 +15800,7 @@
         <p:spPr>
           <a:xfrm>
             <a:off x="2109960" y="5163480"/>
-            <a:ext cx="1615320" cy="303120"/>
+            <a:ext cx="1614600" cy="303120"/>
           </a:xfrm>
           <a:prstGeom prst="rect">
             <a:avLst/>
@@ -15821,7 +15857,7 @@
         <p:spPr>
           <a:xfrm>
             <a:off x="2109960" y="5424840"/>
-            <a:ext cx="1615320" cy="363960"/>
+            <a:ext cx="1614600" cy="363960"/>
           </a:xfrm>
           <a:prstGeom prst="rect">
             <a:avLst/>
@@ -15889,8 +15925,8 @@
         </p:nvCxnSpPr>
         <p:spPr>
           <a:xfrm flipH="1">
-            <a:off x="2917440" y="4791960"/>
-            <a:ext cx="12600" cy="371880"/>
+            <a:off x="2917080" y="4791240"/>
+            <a:ext cx="12600" cy="372600"/>
           </a:xfrm>
           <a:prstGeom prst="straightConnector1">
             <a:avLst/>
@@ -15914,8 +15950,8 @@
         </p:nvCxnSpPr>
         <p:spPr>
           <a:xfrm flipH="1">
-            <a:off x="4156920" y="1102680"/>
-            <a:ext cx="270360" cy="179640"/>
+            <a:off x="4156200" y="1102320"/>
+            <a:ext cx="271080" cy="180000"/>
           </a:xfrm>
           <a:prstGeom prst="straightConnector1">
             <a:avLst/>
@@ -15937,7 +15973,7 @@
         <p:spPr>
           <a:xfrm flipH="1">
             <a:off x="0" y="3657600"/>
-            <a:ext cx="1839960" cy="11160"/>
+            <a:ext cx="1840680" cy="11880"/>
           </a:xfrm>
           <a:prstGeom prst="straightConnector1">
             <a:avLst/>
@@ -15959,7 +15995,7 @@
         <p:spPr>
           <a:xfrm>
             <a:off x="8686800" y="532800"/>
-            <a:ext cx="1366560" cy="376560"/>
+            <a:ext cx="1365840" cy="375840"/>
           </a:xfrm>
           <a:prstGeom prst="ellipse">
             <a:avLst/>
@@ -16024,8 +16060,8 @@
         </p:nvCxnSpPr>
         <p:spPr>
           <a:xfrm flipH="1">
-            <a:off x="9030960" y="909360"/>
-            <a:ext cx="339480" cy="539280"/>
+            <a:off x="9030600" y="908640"/>
+            <a:ext cx="339480" cy="540000"/>
           </a:xfrm>
           <a:prstGeom prst="straightConnector1">
             <a:avLst/>
@@ -16077,7 +16113,7 @@
         <p:spPr>
           <a:xfrm flipH="1">
             <a:off x="0" y="3073320"/>
-            <a:ext cx="1839960" cy="11160"/>
+            <a:ext cx="1840680" cy="11880"/>
           </a:xfrm>
           <a:prstGeom prst="straightConnector1">
             <a:avLst/>
@@ -16100,7 +16136,7 @@
         <p:spPr>
           <a:xfrm>
             <a:off x="0" y="2489400"/>
-            <a:ext cx="1839960" cy="11160"/>
+            <a:ext cx="1840680" cy="11880"/>
           </a:xfrm>
           <a:prstGeom prst="straightConnector1">
             <a:avLst/>
@@ -16123,7 +16159,7 @@
         <p:spPr>
           <a:xfrm>
             <a:off x="0" y="2781360"/>
-            <a:ext cx="1839960" cy="11160"/>
+            <a:ext cx="1840680" cy="11880"/>
           </a:xfrm>
           <a:prstGeom prst="straightConnector1">
             <a:avLst/>
@@ -16146,7 +16182,7 @@
         <p:spPr>
           <a:xfrm flipH="1">
             <a:off x="0" y="3657600"/>
-            <a:ext cx="1839960" cy="11160"/>
+            <a:ext cx="1840680" cy="11880"/>
           </a:xfrm>
           <a:prstGeom prst="straightConnector1">
             <a:avLst/>
@@ -16168,7 +16204,7 @@
         <p:spPr>
           <a:xfrm>
             <a:off x="128520" y="6134040"/>
-            <a:ext cx="1560600" cy="376560"/>
+            <a:ext cx="1559880" cy="375840"/>
           </a:xfrm>
           <a:prstGeom prst="diamond">
             <a:avLst/>
@@ -16233,7 +16269,7 @@
         <p:spPr>
           <a:xfrm>
             <a:off x="302760" y="5454000"/>
-            <a:ext cx="1212120" cy="376560"/>
+            <a:ext cx="1211400" cy="375840"/>
           </a:xfrm>
           <a:prstGeom prst="ellipse">
             <a:avLst/>
@@ -16296,9 +16332,9 @@
         <p:grpSpPr>
           <a:xfrm>
             <a:off x="101160" y="336240"/>
-            <a:ext cx="1615320" cy="777960"/>
+            <a:ext cx="1614600" cy="777960"/>
             <a:chOff x="101160" y="336240"/>
-            <a:chExt cx="1615320" cy="777960"/>
+            <a:chExt cx="1614600" cy="777960"/>
           </a:xfrm>
         </p:grpSpPr>
         <p:sp>
@@ -16310,7 +16346,7 @@
           <p:spPr>
             <a:xfrm>
               <a:off x="101160" y="336240"/>
-              <a:ext cx="1615320" cy="303120"/>
+              <a:ext cx="1614600" cy="303120"/>
             </a:xfrm>
             <a:prstGeom prst="rect">
               <a:avLst/>
@@ -16367,7 +16403,7 @@
           <p:spPr>
             <a:xfrm>
               <a:off x="101160" y="597600"/>
-              <a:ext cx="1615320" cy="516600"/>
+              <a:ext cx="1614600" cy="516600"/>
             </a:xfrm>
             <a:prstGeom prst="rect">
               <a:avLst/>
@@ -16458,7 +16494,7 @@
         <p:spPr>
           <a:xfrm>
             <a:off x="128520" y="4629600"/>
-            <a:ext cx="1560600" cy="521280"/>
+            <a:ext cx="1559880" cy="520560"/>
           </a:xfrm>
           <a:prstGeom prst="diamond">
             <a:avLst/>
@@ -16546,7 +16582,7 @@
         <p:spPr>
           <a:xfrm>
             <a:off x="0" y="3365640"/>
-            <a:ext cx="1839960" cy="11160"/>
+            <a:ext cx="1840680" cy="11880"/>
           </a:xfrm>
           <a:prstGeom prst="straightConnector1">
             <a:avLst/>
@@ -16568,7 +16604,7 @@
         <p:spPr>
           <a:xfrm>
             <a:off x="673200" y="3949920"/>
-            <a:ext cx="471600" cy="376560"/>
+            <a:ext cx="470880" cy="375840"/>
           </a:xfrm>
           <a:prstGeom prst="triangle">
             <a:avLst>
@@ -16635,9 +16671,9 @@
         <p:grpSpPr>
           <a:xfrm>
             <a:off x="101160" y="1413000"/>
-            <a:ext cx="1615320" cy="777960"/>
+            <a:ext cx="1614600" cy="777960"/>
             <a:chOff x="101160" y="1413000"/>
-            <a:chExt cx="1615320" cy="777960"/>
+            <a:chExt cx="1614600" cy="777960"/>
           </a:xfrm>
         </p:grpSpPr>
         <p:sp>
@@ -16649,7 +16685,7 @@
           <p:spPr>
             <a:xfrm>
               <a:off x="101160" y="1413000"/>
-              <a:ext cx="1615320" cy="303120"/>
+              <a:ext cx="1614600" cy="303120"/>
             </a:xfrm>
             <a:prstGeom prst="rect">
               <a:avLst/>
@@ -16707,7 +16743,7 @@
           <p:spPr>
             <a:xfrm>
               <a:off x="101160" y="1674360"/>
-              <a:ext cx="1615320" cy="516600"/>
+              <a:ext cx="1614600" cy="516600"/>
             </a:xfrm>
             <a:prstGeom prst="rect">
               <a:avLst/>
@@ -16799,7 +16835,7 @@
         <p:spPr>
           <a:xfrm>
             <a:off x="4775040" y="457200"/>
-            <a:ext cx="1615320" cy="303120"/>
+            <a:ext cx="1614600" cy="303120"/>
           </a:xfrm>
           <a:prstGeom prst="rect">
             <a:avLst/>
@@ -16856,7 +16892,7 @@
         <p:spPr>
           <a:xfrm>
             <a:off x="4775040" y="718560"/>
-            <a:ext cx="1615320" cy="730080"/>
+            <a:ext cx="1614600" cy="730080"/>
           </a:xfrm>
           <a:prstGeom prst="rect">
             <a:avLst/>
@@ -16973,9 +17009,9 @@
         <p:grpSpPr>
           <a:xfrm>
             <a:off x="4572000" y="4274280"/>
-            <a:ext cx="1615320" cy="991440"/>
+            <a:ext cx="1614600" cy="991440"/>
             <a:chOff x="4572000" y="4274280"/>
-            <a:chExt cx="1615320" cy="991440"/>
+            <a:chExt cx="1614600" cy="991440"/>
           </a:xfrm>
         </p:grpSpPr>
         <p:sp>
@@ -16987,7 +17023,7 @@
           <p:spPr>
             <a:xfrm>
               <a:off x="4572000" y="4274280"/>
-              <a:ext cx="1615320" cy="303120"/>
+              <a:ext cx="1614600" cy="303120"/>
             </a:xfrm>
             <a:prstGeom prst="rect">
               <a:avLst/>
@@ -17044,7 +17080,7 @@
           <p:spPr>
             <a:xfrm>
               <a:off x="4572000" y="4535640"/>
-              <a:ext cx="1615320" cy="730080"/>
+              <a:ext cx="1614600" cy="730080"/>
             </a:xfrm>
             <a:prstGeom prst="rect">
               <a:avLst/>
@@ -17162,7 +17198,7 @@
         <p:spPr>
           <a:xfrm>
             <a:off x="3231360" y="2899800"/>
-            <a:ext cx="1560600" cy="376560"/>
+            <a:ext cx="1559880" cy="375840"/>
           </a:xfrm>
           <a:prstGeom prst="diamond">
             <a:avLst/>
@@ -17227,7 +17263,7 @@
         <p:spPr>
           <a:xfrm>
             <a:off x="4602960" y="2585160"/>
-            <a:ext cx="1789200" cy="378000"/>
+            <a:ext cx="1788480" cy="377280"/>
           </a:xfrm>
           <a:prstGeom prst="diamond">
             <a:avLst/>
@@ -17294,8 +17330,8 @@
         </p:nvCxnSpPr>
         <p:spPr>
           <a:xfrm flipH="1" flipV="1">
-            <a:off x="4011840" y="3276360"/>
-            <a:ext cx="1368000" cy="998280"/>
+            <a:off x="4011480" y="3275640"/>
+            <a:ext cx="1368000" cy="999000"/>
           </a:xfrm>
           <a:prstGeom prst="straightConnector1">
             <a:avLst/>
@@ -17320,7 +17356,7 @@
         </p:nvCxnSpPr>
         <p:spPr>
           <a:xfrm flipV="1">
-            <a:off x="5497560" y="1448640"/>
+            <a:off x="5497200" y="1448640"/>
             <a:ext cx="85320" cy="1136880"/>
           </a:xfrm>
           <a:prstGeom prst="straightConnector1">
@@ -17345,8 +17381,8 @@
         </p:nvCxnSpPr>
         <p:spPr>
           <a:xfrm flipV="1">
-            <a:off x="5379480" y="2963160"/>
-            <a:ext cx="118440" cy="1311480"/>
+            <a:off x="5379120" y="2962440"/>
+            <a:ext cx="118440" cy="1312200"/>
           </a:xfrm>
           <a:prstGeom prst="straightConnector1">
             <a:avLst/>
@@ -17370,7 +17406,7 @@
         </p:nvCxnSpPr>
         <p:spPr>
           <a:xfrm flipH="1">
-            <a:off x="4011840" y="1448640"/>
+            <a:off x="4011480" y="1448640"/>
             <a:ext cx="1571040" cy="1451520"/>
           </a:xfrm>
           <a:prstGeom prst="straightConnector1">
@@ -17393,7 +17429,7 @@
         <p:spPr>
           <a:xfrm>
             <a:off x="2743200" y="457200"/>
-            <a:ext cx="1560600" cy="376560"/>
+            <a:ext cx="1559880" cy="375840"/>
           </a:xfrm>
           <a:prstGeom prst="diamond">
             <a:avLst/>
@@ -17460,8 +17496,8 @@
         </p:nvCxnSpPr>
         <p:spPr>
           <a:xfrm flipH="1" flipV="1">
-            <a:off x="4303800" y="645480"/>
-            <a:ext cx="471600" cy="438480"/>
+            <a:off x="4303080" y="645120"/>
+            <a:ext cx="472320" cy="438840"/>
           </a:xfrm>
           <a:prstGeom prst="straightConnector1">
             <a:avLst/>
@@ -17485,8 +17521,8 @@
         </p:nvCxnSpPr>
         <p:spPr>
           <a:xfrm flipH="1" flipV="1">
-            <a:off x="3523680" y="833760"/>
-            <a:ext cx="1251720" cy="250200"/>
+            <a:off x="3523320" y="833040"/>
+            <a:ext cx="1252080" cy="250920"/>
           </a:xfrm>
           <a:prstGeom prst="straightConnector1">
             <a:avLst/>
@@ -17508,9 +17544,9 @@
         <p:grpSpPr>
           <a:xfrm>
             <a:off x="8686800" y="837360"/>
-            <a:ext cx="1615320" cy="991440"/>
+            <a:ext cx="1614600" cy="991440"/>
             <a:chOff x="8686800" y="837360"/>
-            <a:chExt cx="1615320" cy="991440"/>
+            <a:chExt cx="1614600" cy="991440"/>
           </a:xfrm>
         </p:grpSpPr>
         <p:sp>
@@ -17522,7 +17558,7 @@
           <p:spPr>
             <a:xfrm>
               <a:off x="8686800" y="837360"/>
-              <a:ext cx="1615320" cy="303120"/>
+              <a:ext cx="1614600" cy="303120"/>
             </a:xfrm>
             <a:prstGeom prst="rect">
               <a:avLst/>
@@ -17579,7 +17615,7 @@
           <p:spPr>
             <a:xfrm>
               <a:off x="8686800" y="1098720"/>
-              <a:ext cx="1615320" cy="730080"/>
+              <a:ext cx="1614600" cy="730080"/>
             </a:xfrm>
             <a:prstGeom prst="rect">
               <a:avLst/>
@@ -17697,7 +17733,7 @@
         <p:spPr>
           <a:xfrm>
             <a:off x="128880" y="6134040"/>
-            <a:ext cx="1560600" cy="376560"/>
+            <a:ext cx="1559880" cy="375840"/>
           </a:xfrm>
           <a:prstGeom prst="diamond">
             <a:avLst/>
@@ -17762,7 +17798,7 @@
         <p:spPr>
           <a:xfrm>
             <a:off x="7315200" y="228600"/>
-            <a:ext cx="1560600" cy="376560"/>
+            <a:ext cx="1559880" cy="375840"/>
           </a:xfrm>
           <a:prstGeom prst="diamond">
             <a:avLst/>
@@ -17827,7 +17863,7 @@
         <p:spPr>
           <a:xfrm>
             <a:off x="360" y="3366000"/>
-            <a:ext cx="1839960" cy="11160"/>
+            <a:ext cx="1840680" cy="11880"/>
           </a:xfrm>
           <a:prstGeom prst="straightConnector1">
             <a:avLst/>
@@ -17851,8 +17887,8 @@
         </p:nvCxnSpPr>
         <p:spPr>
           <a:xfrm flipH="1">
-            <a:off x="6390360" y="416880"/>
-            <a:ext cx="925200" cy="667080"/>
+            <a:off x="6389640" y="416520"/>
+            <a:ext cx="925920" cy="667440"/>
           </a:xfrm>
           <a:prstGeom prst="straightConnector1">
             <a:avLst/>
@@ -17874,7 +17910,7 @@
         <p:spPr>
           <a:xfrm>
             <a:off x="6629400" y="1442160"/>
-            <a:ext cx="1819800" cy="606240"/>
+            <a:ext cx="1819080" cy="605520"/>
           </a:xfrm>
           <a:prstGeom prst="diamond">
             <a:avLst/>
@@ -17941,8 +17977,8 @@
         </p:nvCxnSpPr>
         <p:spPr>
           <a:xfrm flipH="1" flipV="1">
-            <a:off x="8875800" y="416880"/>
-            <a:ext cx="618840" cy="420840"/>
+            <a:off x="8875080" y="416520"/>
+            <a:ext cx="619200" cy="421200"/>
           </a:xfrm>
           <a:prstGeom prst="straightConnector1">
             <a:avLst/>
@@ -17965,7 +18001,7 @@
         <p:spPr>
           <a:xfrm>
             <a:off x="6629400" y="2514600"/>
-            <a:ext cx="1560600" cy="376560"/>
+            <a:ext cx="1559880" cy="375840"/>
           </a:xfrm>
           <a:prstGeom prst="diamond">
             <a:avLst/>
@@ -18032,8 +18068,8 @@
         </p:nvCxnSpPr>
         <p:spPr>
           <a:xfrm flipH="1">
-            <a:off x="8190000" y="1828800"/>
-            <a:ext cx="1304640" cy="874440"/>
+            <a:off x="8189280" y="1828800"/>
+            <a:ext cx="1305000" cy="874080"/>
           </a:xfrm>
           <a:prstGeom prst="straightConnector1">
             <a:avLst/>
@@ -18057,8 +18093,8 @@
         </p:nvCxnSpPr>
         <p:spPr>
           <a:xfrm flipH="1">
-            <a:off x="6187320" y="2702880"/>
-            <a:ext cx="442440" cy="2067480"/>
+            <a:off x="6186600" y="2702520"/>
+            <a:ext cx="443160" cy="2067840"/>
           </a:xfrm>
           <a:prstGeom prst="straightConnector1">
             <a:avLst/>
@@ -18082,8 +18118,8 @@
         </p:nvCxnSpPr>
         <p:spPr>
           <a:xfrm flipH="1">
-            <a:off x="8449200" y="1333080"/>
-            <a:ext cx="237960" cy="412560"/>
+            <a:off x="8448480" y="1333080"/>
+            <a:ext cx="238680" cy="412200"/>
           </a:xfrm>
           <a:prstGeom prst="straightConnector1">
             <a:avLst/>
@@ -18107,8 +18143,8 @@
         </p:nvCxnSpPr>
         <p:spPr>
           <a:xfrm flipH="1" flipV="1">
-            <a:off x="5582520" y="1448640"/>
-            <a:ext cx="1047240" cy="297000"/>
+            <a:off x="5582160" y="1448640"/>
+            <a:ext cx="1047600" cy="296640"/>
           </a:xfrm>
           <a:prstGeom prst="straightConnector1">
             <a:avLst/>
@@ -18130,9 +18166,9 @@
         <p:grpSpPr>
           <a:xfrm>
             <a:off x="101160" y="336240"/>
-            <a:ext cx="1615320" cy="777960"/>
+            <a:ext cx="1614600" cy="777960"/>
             <a:chOff x="101160" y="336240"/>
-            <a:chExt cx="1615320" cy="777960"/>
+            <a:chExt cx="1614600" cy="777960"/>
           </a:xfrm>
         </p:grpSpPr>
         <p:sp>
@@ -18144,7 +18180,7 @@
           <p:spPr>
             <a:xfrm>
               <a:off x="101160" y="336240"/>
-              <a:ext cx="1615320" cy="303120"/>
+              <a:ext cx="1614600" cy="303120"/>
             </a:xfrm>
             <a:prstGeom prst="rect">
               <a:avLst/>
@@ -18201,7 +18237,7 @@
           <p:spPr>
             <a:xfrm>
               <a:off x="101160" y="597600"/>
-              <a:ext cx="1615320" cy="516600"/>
+              <a:ext cx="1614600" cy="516600"/>
             </a:xfrm>
             <a:prstGeom prst="rect">
               <a:avLst/>
@@ -18283,136 +18319,16 @@
           </p:txBody>
         </p:sp>
       </p:grpSp>
-      <p:grpSp>
-        <p:nvGrpSpPr>
-          <p:cNvPr id="252" name="Group 14"/>
-          <p:cNvGrpSpPr/>
-          <p:nvPr/>
-        </p:nvGrpSpPr>
-        <p:grpSpPr>
-          <a:xfrm>
-            <a:off x="6760440" y="4359960"/>
-            <a:ext cx="1615320" cy="555480"/>
-            <a:chOff x="6760440" y="4359960"/>
-            <a:chExt cx="1615320" cy="555480"/>
-          </a:xfrm>
-        </p:grpSpPr>
-        <p:sp>
-          <p:nvSpPr>
-            <p:cNvPr id="253" name="TextBox 55"/>
-            <p:cNvSpPr/>
-            <p:nvPr/>
-          </p:nvSpPr>
-          <p:spPr>
-            <a:xfrm>
-              <a:off x="6760440" y="4359960"/>
-              <a:ext cx="1615320" cy="303120"/>
-            </a:xfrm>
-            <a:prstGeom prst="rect">
-              <a:avLst/>
-            </a:prstGeom>
-            <a:solidFill>
-              <a:schemeClr val="bg1"/>
-            </a:solidFill>
-            <a:ln w="0">
-              <a:solidFill>
-                <a:srgbClr val="000000"/>
-              </a:solidFill>
-            </a:ln>
-          </p:spPr>
-          <p:style>
-            <a:lnRef idx="0"/>
-            <a:fillRef idx="0"/>
-            <a:effectRef idx="0"/>
-            <a:fontRef idx="minor"/>
-          </p:style>
-          <p:txBody>
-            <a:bodyPr lIns="90000" rIns="90000" tIns="45000" bIns="45000" anchor="t">
-              <a:spAutoFit/>
-            </a:bodyPr>
-            <a:p>
-              <a:pPr algn="ctr" defTabSz="914400">
-                <a:lnSpc>
-                  <a:spcPct val="100000"/>
-                </a:lnSpc>
-              </a:pPr>
-              <a:r>
-                <a:rPr b="0" lang="en-US" sz="1400" spc="-1" strike="noStrike">
-                  <a:solidFill>
-                    <a:schemeClr val="dk1"/>
-                  </a:solidFill>
-                  <a:latin typeface="Calibri"/>
-                </a:rPr>
-                <a:t>Transfer Request</a:t>
-              </a:r>
-              <a:endParaRPr b="0" lang="en-US" sz="1400" spc="-1" strike="noStrike">
-                <a:solidFill>
-                  <a:srgbClr val="000000"/>
-                </a:solidFill>
-                <a:latin typeface="Arial"/>
-              </a:endParaRPr>
-            </a:p>
-          </p:txBody>
-        </p:sp>
-        <p:sp>
-          <p:nvSpPr>
-            <p:cNvPr id="254" name="TextBox 56"/>
-            <p:cNvSpPr/>
-            <p:nvPr/>
-          </p:nvSpPr>
-          <p:spPr>
-            <a:xfrm>
-              <a:off x="6760440" y="4621320"/>
-              <a:ext cx="1615320" cy="294120"/>
-            </a:xfrm>
-            <a:prstGeom prst="rect">
-              <a:avLst/>
-            </a:prstGeom>
-            <a:solidFill>
-              <a:schemeClr val="bg1"/>
-            </a:solidFill>
-            <a:ln w="0">
-              <a:solidFill>
-                <a:srgbClr val="000000"/>
-              </a:solidFill>
-            </a:ln>
-          </p:spPr>
-          <p:style>
-            <a:lnRef idx="0"/>
-            <a:fillRef idx="0"/>
-            <a:effectRef idx="0"/>
-            <a:fontRef idx="minor"/>
-          </p:style>
-          <p:txBody>
-            <a:bodyPr lIns="90000" rIns="90000" tIns="45000" bIns="45000" anchor="t">
-              <a:spAutoFit/>
-            </a:bodyPr>
-            <a:p>
-              <a:pPr defTabSz="914400">
-                <a:lnSpc>
-                  <a:spcPct val="100000"/>
-                </a:lnSpc>
-              </a:pPr>
-              <a:endParaRPr b="0" lang="en-US" sz="1800" spc="-1" strike="noStrike">
-                <a:solidFill>
-                  <a:srgbClr val="000000"/>
-                </a:solidFill>
-                <a:latin typeface="Arial"/>
-              </a:endParaRPr>
-            </a:p>
-          </p:txBody>
-        </p:sp>
-      </p:grpSp>
       <p:sp>
         <p:nvSpPr>
-          <p:cNvPr id="255" name="Isosceles Triangle 6"/>
+          <p:cNvPr id="252" name="Isosceles Triangle 6"/>
           <p:cNvSpPr/>
           <p:nvPr/>
         </p:nvSpPr>
         <p:spPr>
           <a:xfrm>
             <a:off x="9144000" y="2057400"/>
-            <a:ext cx="471600" cy="376560"/>
+            <a:ext cx="470880" cy="375840"/>
           </a:xfrm>
           <a:prstGeom prst="triangle">
             <a:avLst>
@@ -18472,16 +18388,16 @@
       </p:sp>
       <p:cxnSp>
         <p:nvCxnSpPr>
-          <p:cNvPr id="256" name="Straight Arrow Connector 51"/>
+          <p:cNvPr id="253" name="Straight Arrow Connector 53"/>
           <p:cNvCxnSpPr>
-            <a:stCxn id="257" idx="3"/>
+            <a:endCxn id="254" idx="3"/>
           </p:cNvCxnSpPr>
           <p:nvPr/>
         </p:nvCxnSpPr>
         <p:spPr>
-          <a:xfrm flipH="1">
-            <a:off x="8026200" y="4105800"/>
-            <a:ext cx="1431360" cy="263160"/>
+          <a:xfrm flipH="1" flipV="1">
+            <a:off x="9456840" y="4105080"/>
+            <a:ext cx="484200" cy="246240"/>
           </a:xfrm>
           <a:prstGeom prst="straightConnector1">
             <a:avLst/>
@@ -18496,16 +18412,16 @@
       </p:cxnSp>
       <p:cxnSp>
         <p:nvCxnSpPr>
-          <p:cNvPr id="258" name="Straight Arrow Connector 53"/>
+          <p:cNvPr id="255" name="Straight Arrow Connector 54"/>
           <p:cNvCxnSpPr>
-            <a:endCxn id="257" idx="3"/>
+            <a:stCxn id="252" idx="3"/>
           </p:cNvCxnSpPr>
           <p:nvPr/>
         </p:nvCxnSpPr>
         <p:spPr>
-          <a:xfrm flipH="1" flipV="1">
-            <a:off x="9457200" y="4105800"/>
-            <a:ext cx="483120" cy="244800"/>
+          <a:xfrm flipH="1">
+            <a:off x="9346320" y="2433240"/>
+            <a:ext cx="33480" cy="456120"/>
           </a:xfrm>
           <a:prstGeom prst="straightConnector1">
             <a:avLst/>
@@ -18520,16 +18436,17 @@
       </p:cxnSp>
       <p:cxnSp>
         <p:nvCxnSpPr>
-          <p:cNvPr id="259" name="Straight Arrow Connector 54"/>
+          <p:cNvPr id="256" name="Straight Arrow Connector 55"/>
           <p:cNvCxnSpPr>
-            <a:stCxn id="255" idx="3"/>
+            <a:stCxn id="235" idx="2"/>
+            <a:endCxn id="252" idx="0"/>
           </p:cNvCxnSpPr>
           <p:nvPr/>
         </p:nvCxnSpPr>
         <p:spPr>
           <a:xfrm flipH="1">
-            <a:off x="9346320" y="2433960"/>
-            <a:ext cx="33840" cy="454680"/>
+            <a:off x="9379440" y="1828800"/>
+            <a:ext cx="114840" cy="228960"/>
           </a:xfrm>
           <a:prstGeom prst="straightConnector1">
             <a:avLst/>
@@ -18544,17 +18461,14 @@
       </p:cxnSp>
       <p:cxnSp>
         <p:nvCxnSpPr>
-          <p:cNvPr id="260" name="Straight Arrow Connector 55"/>
-          <p:cNvCxnSpPr>
-            <a:stCxn id="235" idx="2"/>
-            <a:endCxn id="255" idx="0"/>
-          </p:cNvCxnSpPr>
+          <p:cNvPr id="257" name="Straight Arrow Connector 56"/>
+          <p:cNvCxnSpPr/>
           <p:nvPr/>
         </p:nvCxnSpPr>
         <p:spPr>
           <a:xfrm flipH="1">
-            <a:off x="9379800" y="1828800"/>
-            <a:ext cx="114840" cy="228960"/>
+            <a:off x="0" y="3657600"/>
+            <a:ext cx="1840680" cy="11880"/>
           </a:xfrm>
           <a:prstGeom prst="straightConnector1">
             <a:avLst/>
@@ -18567,174 +18481,30 @@
           </a:ln>
         </p:spPr>
       </p:cxnSp>
-      <p:sp>
-        <p:nvSpPr>
-          <p:cNvPr id="261" name="TextBox 73"/>
-          <p:cNvSpPr/>
-          <p:nvPr/>
-        </p:nvSpPr>
-        <p:spPr>
-          <a:xfrm>
-            <a:off x="7089840" y="5715000"/>
-            <a:ext cx="1615320" cy="303120"/>
-          </a:xfrm>
-          <a:prstGeom prst="rect">
-            <a:avLst/>
-          </a:prstGeom>
-          <a:solidFill>
-            <a:schemeClr val="bg1"/>
-          </a:solidFill>
-          <a:ln w="0">
-            <a:solidFill>
-              <a:srgbClr val="000000"/>
-            </a:solidFill>
-          </a:ln>
-        </p:spPr>
-        <p:style>
-          <a:lnRef idx="0"/>
-          <a:fillRef idx="0"/>
-          <a:effectRef idx="0"/>
-          <a:fontRef idx="minor"/>
-        </p:style>
-        <p:txBody>
-          <a:bodyPr lIns="90000" rIns="90000" tIns="45000" bIns="45000" anchor="t">
-            <a:spAutoFit/>
-          </a:bodyPr>
-          <a:p>
-            <a:pPr algn="ctr" defTabSz="914400">
-              <a:lnSpc>
-                <a:spcPct val="100000"/>
-              </a:lnSpc>
-            </a:pPr>
-            <a:r>
-              <a:rPr b="0" lang="en-US" sz="1400" spc="-1" strike="noStrike">
-                <a:solidFill>
-                  <a:schemeClr val="dk1"/>
-                </a:solidFill>
-                <a:latin typeface="Calibri"/>
-              </a:rPr>
-              <a:t>Package</a:t>
-            </a:r>
-            <a:endParaRPr b="0" lang="en-US" sz="1400" spc="-1" strike="noStrike">
-              <a:solidFill>
-                <a:srgbClr val="000000"/>
-              </a:solidFill>
-              <a:latin typeface="Arial"/>
-            </a:endParaRPr>
-          </a:p>
-        </p:txBody>
-      </p:sp>
-      <p:sp>
-        <p:nvSpPr>
-          <p:cNvPr id="262" name="Diamond 21"/>
-          <p:cNvSpPr/>
-          <p:nvPr/>
-        </p:nvSpPr>
-        <p:spPr>
-          <a:xfrm>
-            <a:off x="6760440" y="5183280"/>
-            <a:ext cx="1818720" cy="376560"/>
-          </a:xfrm>
-          <a:prstGeom prst="diamond">
-            <a:avLst/>
-          </a:prstGeom>
-          <a:solidFill>
-            <a:schemeClr val="bg1"/>
-          </a:solidFill>
-          <a:ln>
-            <a:solidFill>
-              <a:srgbClr val="000000"/>
-            </a:solidFill>
-          </a:ln>
-        </p:spPr>
-        <p:style>
-          <a:lnRef idx="2">
-            <a:schemeClr val="accent1">
-              <a:shade val="50000"/>
-            </a:schemeClr>
-          </a:lnRef>
-          <a:fillRef idx="1">
-            <a:schemeClr val="accent1"/>
-          </a:fillRef>
-          <a:effectRef idx="0">
-            <a:schemeClr val="accent1"/>
-          </a:effectRef>
-          <a:fontRef idx="minor"/>
-        </p:style>
-        <p:txBody>
-          <a:bodyPr lIns="90000" rIns="90000" tIns="45000" bIns="45000" anchor="ctr">
-            <a:noAutofit/>
-          </a:bodyPr>
-          <a:p>
-            <a:pPr algn="ctr" defTabSz="914400">
-              <a:lnSpc>
-                <a:spcPct val="100000"/>
-              </a:lnSpc>
-            </a:pPr>
-            <a:r>
-              <a:rPr b="0" lang="en-US" sz="1400" spc="-1" strike="noStrike">
-                <a:solidFill>
-                  <a:schemeClr val="dk1"/>
-                </a:solidFill>
-                <a:latin typeface="Calibri"/>
-              </a:rPr>
-              <a:t>Contains</a:t>
-            </a:r>
-            <a:endParaRPr b="0" lang="en-US" sz="1400" spc="-1" strike="noStrike">
-              <a:solidFill>
-                <a:srgbClr val="000000"/>
-              </a:solidFill>
-              <a:latin typeface="Arial"/>
-            </a:endParaRPr>
-          </a:p>
-        </p:txBody>
-      </p:sp>
-      <p:cxnSp>
-        <p:nvCxnSpPr>
-          <p:cNvPr id="263" name="Straight Arrow Connector 56"/>
-          <p:cNvCxnSpPr/>
-          <p:nvPr/>
-        </p:nvCxnSpPr>
-        <p:spPr>
-          <a:xfrm flipH="1">
-            <a:off x="0" y="3657600"/>
-            <a:ext cx="1839960" cy="11160"/>
-          </a:xfrm>
-          <a:prstGeom prst="straightConnector1">
-            <a:avLst/>
-          </a:prstGeom>
-          <a:ln w="25400">
-            <a:solidFill>
-              <a:srgbClr val="000000"/>
-            </a:solidFill>
-            <a:round/>
-          </a:ln>
-        </p:spPr>
-      </p:cxnSp>
       <p:grpSp>
         <p:nvGrpSpPr>
-          <p:cNvPr id="264" name="Group 12"/>
+          <p:cNvPr id="258" name="Group 12"/>
           <p:cNvGrpSpPr/>
           <p:nvPr/>
         </p:nvGrpSpPr>
         <p:grpSpPr>
           <a:xfrm>
             <a:off x="8534520" y="2879640"/>
-            <a:ext cx="1615320" cy="556200"/>
+            <a:ext cx="1614600" cy="555480"/>
             <a:chOff x="8534520" y="2879640"/>
-            <a:chExt cx="1615320" cy="556200"/>
+            <a:chExt cx="1614600" cy="555480"/>
           </a:xfrm>
         </p:grpSpPr>
         <p:sp>
           <p:nvSpPr>
-            <p:cNvPr id="265" name="TextBox 23"/>
+            <p:cNvPr id="259" name="TextBox 23"/>
             <p:cNvSpPr/>
             <p:nvPr/>
           </p:nvSpPr>
           <p:spPr>
             <a:xfrm>
               <a:off x="8534520" y="2879640"/>
-              <a:ext cx="1615320" cy="303120"/>
+              <a:ext cx="1614600" cy="303120"/>
             </a:xfrm>
             <a:prstGeom prst="rect">
               <a:avLst/>
@@ -18784,14 +18554,14 @@
         </p:sp>
         <p:sp>
           <p:nvSpPr>
-            <p:cNvPr id="266" name="TextBox 24"/>
+            <p:cNvPr id="260" name="TextBox 24"/>
             <p:cNvSpPr/>
             <p:nvPr/>
           </p:nvSpPr>
           <p:spPr>
             <a:xfrm>
               <a:off x="8534520" y="3141000"/>
-              <a:ext cx="1615320" cy="294840"/>
+              <a:ext cx="1614600" cy="294120"/>
             </a:xfrm>
             <a:prstGeom prst="rect">
               <a:avLst/>
@@ -18833,28 +18603,28 @@
       </p:grpSp>
       <p:grpSp>
         <p:nvGrpSpPr>
-          <p:cNvPr id="267" name="Group 16"/>
+          <p:cNvPr id="261" name="Group 16"/>
           <p:cNvGrpSpPr/>
           <p:nvPr/>
         </p:nvGrpSpPr>
         <p:grpSpPr>
           <a:xfrm>
             <a:off x="8534520" y="2879640"/>
-            <a:ext cx="1615320" cy="564480"/>
+            <a:ext cx="1614600" cy="564480"/>
             <a:chOff x="8534520" y="2879640"/>
-            <a:chExt cx="1615320" cy="564480"/>
+            <a:chExt cx="1614600" cy="564480"/>
           </a:xfrm>
         </p:grpSpPr>
         <p:sp>
           <p:nvSpPr>
-            <p:cNvPr id="268" name="TextBox 40"/>
+            <p:cNvPr id="262" name="TextBox 40"/>
             <p:cNvSpPr/>
             <p:nvPr/>
           </p:nvSpPr>
           <p:spPr>
             <a:xfrm>
               <a:off x="8534520" y="2879640"/>
-              <a:ext cx="1615320" cy="303120"/>
+              <a:ext cx="1614600" cy="303120"/>
             </a:xfrm>
             <a:prstGeom prst="rect">
               <a:avLst/>
@@ -18904,14 +18674,14 @@
         </p:sp>
         <p:sp>
           <p:nvSpPr>
-            <p:cNvPr id="269" name="TextBox 59"/>
+            <p:cNvPr id="263" name="TextBox 59"/>
             <p:cNvSpPr/>
             <p:nvPr/>
           </p:nvSpPr>
           <p:spPr>
             <a:xfrm>
               <a:off x="8534520" y="3141000"/>
-              <a:ext cx="1615320" cy="303120"/>
+              <a:ext cx="1614600" cy="303120"/>
             </a:xfrm>
             <a:prstGeom prst="rect">
               <a:avLst/>
@@ -18967,14 +18737,14 @@
       </p:grpSp>
       <p:sp>
         <p:nvSpPr>
-          <p:cNvPr id="257" name="Isosceles Triangle 7"/>
+          <p:cNvPr id="254" name="Isosceles Triangle 7"/>
           <p:cNvSpPr/>
           <p:nvPr/>
         </p:nvSpPr>
         <p:spPr>
           <a:xfrm>
             <a:off x="9221400" y="3729240"/>
-            <a:ext cx="471600" cy="376560"/>
+            <a:ext cx="470880" cy="375840"/>
           </a:xfrm>
           <a:prstGeom prst="triangle">
             <a:avLst>
@@ -19034,16 +18804,16 @@
       </p:sp>
       <p:cxnSp>
         <p:nvCxnSpPr>
-          <p:cNvPr id="270" name="Straight Arrow Connector 80"/>
+          <p:cNvPr id="264" name="Straight Arrow Connector 80"/>
           <p:cNvCxnSpPr>
-            <a:stCxn id="267" idx="2"/>
-            <a:endCxn id="257" idx="0"/>
+            <a:stCxn id="261" idx="2"/>
+            <a:endCxn id="254" idx="0"/>
           </p:cNvCxnSpPr>
           <p:nvPr/>
         </p:nvCxnSpPr>
         <p:spPr>
           <a:xfrm>
-            <a:off x="9342000" y="3444120"/>
+            <a:off x="9341640" y="3444120"/>
             <a:ext cx="115560" cy="285480"/>
           </a:xfrm>
           <a:prstGeom prst="straightConnector1">
@@ -19059,14 +18829,14 @@
       </p:cxnSp>
       <p:cxnSp>
         <p:nvCxnSpPr>
-          <p:cNvPr id="271" name="Straight Arrow Connector 52"/>
+          <p:cNvPr id="265" name="Straight Arrow Connector 52"/>
           <p:cNvCxnSpPr/>
           <p:nvPr/>
         </p:nvCxnSpPr>
         <p:spPr>
           <a:xfrm>
             <a:off x="8556840" y="3657600"/>
-            <a:ext cx="1839960" cy="11160"/>
+            <a:ext cx="1840680" cy="11880"/>
           </a:xfrm>
           <a:prstGeom prst="straightConnector1">
             <a:avLst/>
@@ -19082,14 +18852,14 @@
       </p:cxnSp>
       <p:sp>
         <p:nvSpPr>
-          <p:cNvPr id="272" name=""/>
+          <p:cNvPr id="266" name=""/>
           <p:cNvSpPr/>
           <p:nvPr/>
         </p:nvSpPr>
         <p:spPr>
           <a:xfrm>
             <a:off x="9601200" y="3382920"/>
-            <a:ext cx="905400" cy="337320"/>
+            <a:ext cx="904680" cy="336600"/>
           </a:xfrm>
           <a:prstGeom prst="rect">
             <a:avLst/>
@@ -19133,81 +18903,30 @@
           </a:p>
         </p:txBody>
       </p:sp>
-      <p:cxnSp>
-        <p:nvCxnSpPr>
-          <p:cNvPr id="273" name="Straight Arrow Connector 83"/>
-          <p:cNvCxnSpPr>
-            <a:stCxn id="252" idx="2"/>
-            <a:endCxn id="262" idx="0"/>
-          </p:cNvCxnSpPr>
-          <p:nvPr/>
-        </p:nvCxnSpPr>
-        <p:spPr>
-          <a:xfrm>
-            <a:off x="7567920" y="4915440"/>
-            <a:ext cx="102240" cy="268200"/>
-          </a:xfrm>
-          <a:prstGeom prst="straightConnector1">
-            <a:avLst/>
-          </a:prstGeom>
-          <a:ln cap="sq" w="76200">
-            <a:solidFill>
-              <a:srgbClr val="000000"/>
-            </a:solidFill>
-            <a:round/>
-            <a:tailEnd len="sm" type="triangle" w="sm"/>
-          </a:ln>
-        </p:spPr>
-      </p:cxnSp>
-      <p:cxnSp>
-        <p:nvCxnSpPr>
-          <p:cNvPr id="274" name="Straight Arrow Connector 57"/>
-          <p:cNvCxnSpPr>
-            <a:stCxn id="262" idx="2"/>
-            <a:endCxn id="261" idx="0"/>
-          </p:cNvCxnSpPr>
-          <p:nvPr/>
-        </p:nvCxnSpPr>
-        <p:spPr>
-          <a:xfrm>
-            <a:off x="7669800" y="5559840"/>
-            <a:ext cx="227880" cy="155520"/>
-          </a:xfrm>
-          <a:prstGeom prst="straightConnector1">
-            <a:avLst/>
-          </a:prstGeom>
-          <a:ln w="25400">
-            <a:solidFill>
-              <a:srgbClr val="000000"/>
-            </a:solidFill>
-            <a:round/>
-          </a:ln>
-        </p:spPr>
-      </p:cxnSp>
       <p:grpSp>
         <p:nvGrpSpPr>
-          <p:cNvPr id="275" name="Group 5"/>
+          <p:cNvPr id="267" name="Group 5"/>
           <p:cNvGrpSpPr/>
           <p:nvPr/>
         </p:nvGrpSpPr>
         <p:grpSpPr>
           <a:xfrm>
             <a:off x="10265040" y="5029200"/>
-            <a:ext cx="1615320" cy="555840"/>
+            <a:ext cx="1614600" cy="555120"/>
             <a:chOff x="10265040" y="5029200"/>
-            <a:chExt cx="1615320" cy="555840"/>
+            <a:chExt cx="1614600" cy="555120"/>
           </a:xfrm>
         </p:grpSpPr>
         <p:sp>
           <p:nvSpPr>
-            <p:cNvPr id="276" name="TextBox 22"/>
+            <p:cNvPr id="268" name="TextBox 22"/>
             <p:cNvSpPr/>
             <p:nvPr/>
           </p:nvSpPr>
           <p:spPr>
             <a:xfrm>
               <a:off x="10265040" y="5029200"/>
-              <a:ext cx="1615320" cy="303120"/>
+              <a:ext cx="1614600" cy="303120"/>
             </a:xfrm>
             <a:prstGeom prst="rect">
               <a:avLst/>
@@ -19257,14 +18976,14 @@
         </p:sp>
         <p:sp>
           <p:nvSpPr>
-            <p:cNvPr id="277" name="TextBox 29"/>
+            <p:cNvPr id="269" name="TextBox 29"/>
             <p:cNvSpPr/>
             <p:nvPr/>
           </p:nvSpPr>
           <p:spPr>
             <a:xfrm>
               <a:off x="10265040" y="5290560"/>
-              <a:ext cx="1615320" cy="294480"/>
+              <a:ext cx="1614600" cy="293760"/>
             </a:xfrm>
             <a:prstGeom prst="rect">
               <a:avLst/>
@@ -19306,17 +19025,17 @@
       </p:grpSp>
       <p:cxnSp>
         <p:nvCxnSpPr>
-          <p:cNvPr id="278" name="Straight Arrow Connector 84"/>
+          <p:cNvPr id="270" name="Straight Arrow Connector 84"/>
           <p:cNvCxnSpPr>
-            <a:stCxn id="275" idx="0"/>
-            <a:endCxn id="257" idx="4"/>
+            <a:stCxn id="267" idx="0"/>
+            <a:endCxn id="254" idx="4"/>
           </p:cNvCxnSpPr>
           <p:nvPr/>
         </p:nvCxnSpPr>
         <p:spPr>
           <a:xfrm flipH="1" flipV="1">
-            <a:off x="9693000" y="4105800"/>
-            <a:ext cx="1379880" cy="923760"/>
+            <a:off x="9692280" y="4105080"/>
+            <a:ext cx="1380240" cy="924480"/>
           </a:xfrm>
           <a:prstGeom prst="straightConnector1">
             <a:avLst/>
@@ -19331,28 +19050,28 @@
       </p:cxnSp>
       <p:grpSp>
         <p:nvGrpSpPr>
-          <p:cNvPr id="279" name="Group 9"/>
+          <p:cNvPr id="271" name="Group 9"/>
           <p:cNvGrpSpPr/>
           <p:nvPr/>
         </p:nvGrpSpPr>
         <p:grpSpPr>
           <a:xfrm>
             <a:off x="9122040" y="4343400"/>
-            <a:ext cx="1615320" cy="555840"/>
+            <a:ext cx="1614600" cy="555120"/>
             <a:chOff x="9122040" y="4343400"/>
-            <a:chExt cx="1615320" cy="555840"/>
+            <a:chExt cx="1614600" cy="555120"/>
           </a:xfrm>
         </p:grpSpPr>
         <p:sp>
           <p:nvSpPr>
-            <p:cNvPr id="280" name="TextBox 47"/>
+            <p:cNvPr id="272" name="TextBox 47"/>
             <p:cNvSpPr/>
             <p:nvPr/>
           </p:nvSpPr>
           <p:spPr>
             <a:xfrm>
               <a:off x="9122040" y="4343400"/>
-              <a:ext cx="1615320" cy="303120"/>
+              <a:ext cx="1614600" cy="303120"/>
             </a:xfrm>
             <a:prstGeom prst="rect">
               <a:avLst/>
@@ -19402,14 +19121,14 @@
         </p:sp>
         <p:sp>
           <p:nvSpPr>
-            <p:cNvPr id="281" name="TextBox 48"/>
+            <p:cNvPr id="273" name="TextBox 48"/>
             <p:cNvSpPr/>
             <p:nvPr/>
           </p:nvSpPr>
           <p:spPr>
             <a:xfrm>
               <a:off x="9122040" y="4604760"/>
-              <a:ext cx="1615320" cy="294480"/>
+              <a:ext cx="1614600" cy="293760"/>
             </a:xfrm>
             <a:prstGeom prst="rect">
               <a:avLst/>
@@ -19451,14 +19170,14 @@
       </p:grpSp>
       <p:sp>
         <p:nvSpPr>
-          <p:cNvPr id="282" name="Isosceles Triangle 9"/>
+          <p:cNvPr id="274" name="Isosceles Triangle 9"/>
           <p:cNvSpPr/>
           <p:nvPr/>
         </p:nvSpPr>
         <p:spPr>
           <a:xfrm>
             <a:off x="10037520" y="2131560"/>
-            <a:ext cx="471600" cy="376560"/>
+            <a:ext cx="470880" cy="375840"/>
           </a:xfrm>
           <a:prstGeom prst="triangle">
             <a:avLst>
@@ -19518,16 +19237,16 @@
       </p:sp>
       <p:cxnSp>
         <p:nvCxnSpPr>
-          <p:cNvPr id="283" name="Straight Arrow Connector 85"/>
+          <p:cNvPr id="275" name="Straight Arrow Connector 85"/>
           <p:cNvCxnSpPr>
             <a:stCxn id="235" idx="2"/>
-            <a:endCxn id="282" idx="0"/>
+            <a:endCxn id="274" idx="0"/>
           </p:cNvCxnSpPr>
           <p:nvPr/>
         </p:nvCxnSpPr>
         <p:spPr>
           <a:xfrm>
-            <a:off x="9494280" y="1828800"/>
+            <a:off x="9493920" y="1828800"/>
             <a:ext cx="779400" cy="303120"/>
           </a:xfrm>
           <a:prstGeom prst="straightConnector1">
@@ -19543,28 +19262,28 @@
       </p:cxnSp>
       <p:grpSp>
         <p:nvGrpSpPr>
-          <p:cNvPr id="284" name="Group 10"/>
+          <p:cNvPr id="276" name="Group 10"/>
           <p:cNvGrpSpPr/>
           <p:nvPr/>
         </p:nvGrpSpPr>
         <p:grpSpPr>
           <a:xfrm>
             <a:off x="10494000" y="2866680"/>
-            <a:ext cx="1615320" cy="555840"/>
+            <a:ext cx="1614600" cy="555120"/>
             <a:chOff x="10494000" y="2866680"/>
-            <a:chExt cx="1615320" cy="555840"/>
+            <a:chExt cx="1614600" cy="555120"/>
           </a:xfrm>
         </p:grpSpPr>
         <p:sp>
           <p:nvSpPr>
-            <p:cNvPr id="285" name="TextBox 60"/>
+            <p:cNvPr id="277" name="TextBox 60"/>
             <p:cNvSpPr/>
             <p:nvPr/>
           </p:nvSpPr>
           <p:spPr>
             <a:xfrm>
               <a:off x="10494000" y="2866680"/>
-              <a:ext cx="1615320" cy="303120"/>
+              <a:ext cx="1614600" cy="303120"/>
             </a:xfrm>
             <a:prstGeom prst="rect">
               <a:avLst/>
@@ -19614,14 +19333,14 @@
         </p:sp>
         <p:sp>
           <p:nvSpPr>
-            <p:cNvPr id="286" name="TextBox 71"/>
+            <p:cNvPr id="278" name="TextBox 71"/>
             <p:cNvSpPr/>
             <p:nvPr/>
           </p:nvSpPr>
           <p:spPr>
             <a:xfrm>
               <a:off x="10494000" y="3128040"/>
-              <a:ext cx="1615320" cy="294480"/>
+              <a:ext cx="1614600" cy="293760"/>
             </a:xfrm>
             <a:prstGeom prst="rect">
               <a:avLst/>
@@ -19663,17 +19382,17 @@
       </p:grpSp>
       <p:cxnSp>
         <p:nvCxnSpPr>
-          <p:cNvPr id="287" name="Straight Arrow Connector 86"/>
+          <p:cNvPr id="279" name="Straight Arrow Connector 86"/>
           <p:cNvCxnSpPr>
-            <a:stCxn id="282" idx="3"/>
-            <a:endCxn id="284" idx="0"/>
+            <a:stCxn id="274" idx="3"/>
+            <a:endCxn id="276" idx="0"/>
           </p:cNvCxnSpPr>
           <p:nvPr/>
         </p:nvCxnSpPr>
         <p:spPr>
           <a:xfrm>
-            <a:off x="10273320" y="2508120"/>
-            <a:ext cx="1028520" cy="358920"/>
+            <a:off x="10272960" y="2507400"/>
+            <a:ext cx="1028520" cy="359640"/>
           </a:xfrm>
           <a:prstGeom prst="straightConnector1">
             <a:avLst/>
@@ -19718,14 +19437,14 @@
       </p:grpSpPr>
       <p:cxnSp>
         <p:nvCxnSpPr>
-          <p:cNvPr id="288" name="Straight Arrow Connector 44"/>
+          <p:cNvPr id="280" name="Straight Arrow Connector 44"/>
           <p:cNvCxnSpPr/>
           <p:nvPr/>
         </p:nvCxnSpPr>
         <p:spPr>
           <a:xfrm flipH="1">
             <a:off x="0" y="3073320"/>
-            <a:ext cx="1839960" cy="11160"/>
+            <a:ext cx="1840680" cy="11880"/>
           </a:xfrm>
           <a:prstGeom prst="straightConnector1">
             <a:avLst/>
@@ -19741,14 +19460,14 @@
       </p:cxnSp>
       <p:cxnSp>
         <p:nvCxnSpPr>
-          <p:cNvPr id="289" name="Straight Arrow Connector 45"/>
+          <p:cNvPr id="281" name="Straight Arrow Connector 45"/>
           <p:cNvCxnSpPr/>
           <p:nvPr/>
         </p:nvCxnSpPr>
         <p:spPr>
           <a:xfrm>
             <a:off x="0" y="2489400"/>
-            <a:ext cx="1839960" cy="11160"/>
+            <a:ext cx="1840680" cy="11880"/>
           </a:xfrm>
           <a:prstGeom prst="straightConnector1">
             <a:avLst/>
@@ -19764,14 +19483,14 @@
       </p:cxnSp>
       <p:cxnSp>
         <p:nvCxnSpPr>
-          <p:cNvPr id="290" name="Straight Arrow Connector 46"/>
+          <p:cNvPr id="282" name="Straight Arrow Connector 46"/>
           <p:cNvCxnSpPr/>
           <p:nvPr/>
         </p:nvCxnSpPr>
         <p:spPr>
           <a:xfrm>
             <a:off x="0" y="2781360"/>
-            <a:ext cx="1839960" cy="11160"/>
+            <a:ext cx="1840680" cy="11880"/>
           </a:xfrm>
           <a:prstGeom prst="straightConnector1">
             <a:avLst/>
@@ -19787,14 +19506,14 @@
       </p:cxnSp>
       <p:cxnSp>
         <p:nvCxnSpPr>
-          <p:cNvPr id="291" name="Straight Arrow Connector 47"/>
+          <p:cNvPr id="283" name="Straight Arrow Connector 47"/>
           <p:cNvCxnSpPr/>
           <p:nvPr/>
         </p:nvCxnSpPr>
         <p:spPr>
           <a:xfrm flipH="1">
             <a:off x="0" y="3657600"/>
-            <a:ext cx="1839960" cy="11160"/>
+            <a:ext cx="1840680" cy="11880"/>
           </a:xfrm>
           <a:prstGeom prst="straightConnector1">
             <a:avLst/>
@@ -19809,14 +19528,14 @@
       </p:cxnSp>
       <p:sp>
         <p:nvSpPr>
-          <p:cNvPr id="292" name="Diamond 17"/>
+          <p:cNvPr id="284" name="Diamond 17"/>
           <p:cNvSpPr/>
           <p:nvPr/>
         </p:nvSpPr>
         <p:spPr>
           <a:xfrm>
             <a:off x="128520" y="6134040"/>
-            <a:ext cx="1560600" cy="376560"/>
+            <a:ext cx="1559880" cy="375840"/>
           </a:xfrm>
           <a:prstGeom prst="diamond">
             <a:avLst/>
@@ -19874,14 +19593,14 @@
       </p:sp>
       <p:sp>
         <p:nvSpPr>
-          <p:cNvPr id="293" name="Oval 4"/>
+          <p:cNvPr id="285" name="Oval 4"/>
           <p:cNvSpPr/>
           <p:nvPr/>
         </p:nvSpPr>
         <p:spPr>
           <a:xfrm>
             <a:off x="302760" y="5454000"/>
-            <a:ext cx="1212120" cy="376560"/>
+            <a:ext cx="1211400" cy="375840"/>
           </a:xfrm>
           <a:prstGeom prst="ellipse">
             <a:avLst/>
@@ -19937,14 +19656,14 @@
       </p:sp>
       <p:sp>
         <p:nvSpPr>
-          <p:cNvPr id="294" name="TextBox 53"/>
+          <p:cNvPr id="286" name="TextBox 53"/>
           <p:cNvSpPr/>
           <p:nvPr/>
         </p:nvSpPr>
         <p:spPr>
           <a:xfrm>
             <a:off x="101160" y="336240"/>
-            <a:ext cx="1615320" cy="303120"/>
+            <a:ext cx="1614600" cy="303120"/>
           </a:xfrm>
           <a:prstGeom prst="rect">
             <a:avLst/>
@@ -19994,14 +19713,14 @@
       </p:sp>
       <p:sp>
         <p:nvSpPr>
-          <p:cNvPr id="295" name="TextBox 54"/>
+          <p:cNvPr id="287" name="TextBox 54"/>
           <p:cNvSpPr/>
           <p:nvPr/>
         </p:nvSpPr>
         <p:spPr>
           <a:xfrm>
             <a:off x="101160" y="597600"/>
-            <a:ext cx="1615320" cy="516600"/>
+            <a:ext cx="1614600" cy="516600"/>
           </a:xfrm>
           <a:prstGeom prst="rect">
             <a:avLst/>
@@ -20084,14 +19803,14 @@
       </p:sp>
       <p:sp>
         <p:nvSpPr>
-          <p:cNvPr id="296" name="TextBox 72"/>
+          <p:cNvPr id="288" name="TextBox 72"/>
           <p:cNvSpPr/>
           <p:nvPr/>
         </p:nvSpPr>
         <p:spPr>
           <a:xfrm>
             <a:off x="8458200" y="5486400"/>
-            <a:ext cx="1615320" cy="303120"/>
+            <a:ext cx="1614600" cy="303120"/>
           </a:xfrm>
           <a:prstGeom prst="rect">
             <a:avLst/>
@@ -20141,14 +19860,14 @@
       </p:sp>
       <p:sp>
         <p:nvSpPr>
-          <p:cNvPr id="297" name="Diamond 18"/>
+          <p:cNvPr id="289" name="Diamond 18"/>
           <p:cNvSpPr/>
           <p:nvPr/>
         </p:nvSpPr>
         <p:spPr>
           <a:xfrm>
             <a:off x="128520" y="4629600"/>
-            <a:ext cx="1560600" cy="521280"/>
+            <a:ext cx="1559880" cy="520560"/>
           </a:xfrm>
           <a:prstGeom prst="diamond">
             <a:avLst/>
@@ -20229,14 +19948,14 @@
       </p:sp>
       <p:cxnSp>
         <p:nvCxnSpPr>
-          <p:cNvPr id="298" name="Straight Arrow Connector 48"/>
+          <p:cNvPr id="290" name="Straight Arrow Connector 48"/>
           <p:cNvCxnSpPr/>
           <p:nvPr/>
         </p:nvCxnSpPr>
         <p:spPr>
           <a:xfrm>
             <a:off x="0" y="3365640"/>
-            <a:ext cx="1839960" cy="11160"/>
+            <a:ext cx="1840680" cy="11880"/>
           </a:xfrm>
           <a:prstGeom prst="straightConnector1">
             <a:avLst/>
@@ -20251,14 +19970,14 @@
       </p:cxnSp>
       <p:sp>
         <p:nvSpPr>
-          <p:cNvPr id="299" name="Isosceles Triangle 5"/>
+          <p:cNvPr id="291" name="Isosceles Triangle 5"/>
           <p:cNvSpPr/>
           <p:nvPr/>
         </p:nvSpPr>
         <p:spPr>
           <a:xfrm>
             <a:off x="673200" y="3949920"/>
-            <a:ext cx="471600" cy="376560"/>
+            <a:ext cx="470880" cy="375840"/>
           </a:xfrm>
           <a:prstGeom prst="triangle">
             <a:avLst>
@@ -20318,28 +20037,28 @@
       </p:sp>
       <p:grpSp>
         <p:nvGrpSpPr>
-          <p:cNvPr id="300" name="Group 15"/>
+          <p:cNvPr id="292" name="Group 15"/>
           <p:cNvGrpSpPr/>
           <p:nvPr/>
         </p:nvGrpSpPr>
         <p:grpSpPr>
           <a:xfrm>
             <a:off x="101160" y="1413000"/>
-            <a:ext cx="1615320" cy="777960"/>
+            <a:ext cx="1614600" cy="777960"/>
             <a:chOff x="101160" y="1413000"/>
-            <a:chExt cx="1615320" cy="777960"/>
+            <a:chExt cx="1614600" cy="777960"/>
           </a:xfrm>
         </p:grpSpPr>
         <p:sp>
           <p:nvSpPr>
-            <p:cNvPr id="301" name="TextBox 57"/>
+            <p:cNvPr id="293" name="TextBox 57"/>
             <p:cNvSpPr/>
             <p:nvPr/>
           </p:nvSpPr>
           <p:spPr>
             <a:xfrm>
               <a:off x="101160" y="1413000"/>
-              <a:ext cx="1615320" cy="303120"/>
+              <a:ext cx="1614600" cy="303120"/>
             </a:xfrm>
             <a:prstGeom prst="rect">
               <a:avLst/>
@@ -20390,14 +20109,14 @@
         </p:sp>
         <p:sp>
           <p:nvSpPr>
-            <p:cNvPr id="302" name="TextBox 58"/>
+            <p:cNvPr id="294" name="TextBox 58"/>
             <p:cNvSpPr/>
             <p:nvPr/>
           </p:nvSpPr>
           <p:spPr>
             <a:xfrm>
               <a:off x="101160" y="1674360"/>
-              <a:ext cx="1615320" cy="516600"/>
+              <a:ext cx="1614600" cy="516600"/>
             </a:xfrm>
             <a:prstGeom prst="rect">
               <a:avLst/>
@@ -20482,28 +20201,28 @@
       </p:grpSp>
       <p:grpSp>
         <p:nvGrpSpPr>
-          <p:cNvPr id="303" name="Group 17"/>
+          <p:cNvPr id="295" name="Group 17"/>
           <p:cNvGrpSpPr/>
           <p:nvPr/>
         </p:nvGrpSpPr>
         <p:grpSpPr>
           <a:xfrm>
             <a:off x="4296600" y="4022640"/>
-            <a:ext cx="1615320" cy="1846440"/>
+            <a:ext cx="1614600" cy="1846440"/>
             <a:chOff x="4296600" y="4022640"/>
-            <a:chExt cx="1615320" cy="1846440"/>
+            <a:chExt cx="1614600" cy="1846440"/>
           </a:xfrm>
         </p:grpSpPr>
         <p:sp>
           <p:nvSpPr>
-            <p:cNvPr id="304" name="TextBox 61"/>
+            <p:cNvPr id="296" name="TextBox 61"/>
             <p:cNvSpPr/>
             <p:nvPr/>
           </p:nvSpPr>
           <p:spPr>
             <a:xfrm>
               <a:off x="4296600" y="4022640"/>
-              <a:ext cx="1615320" cy="303120"/>
+              <a:ext cx="1614600" cy="303120"/>
             </a:xfrm>
             <a:prstGeom prst="rect">
               <a:avLst/>
@@ -20553,14 +20272,14 @@
         </p:sp>
         <p:sp>
           <p:nvSpPr>
-            <p:cNvPr id="305" name="TextBox 63"/>
+            <p:cNvPr id="297" name="TextBox 63"/>
             <p:cNvSpPr/>
             <p:nvPr/>
           </p:nvSpPr>
           <p:spPr>
             <a:xfrm>
               <a:off x="4296600" y="4284000"/>
-              <a:ext cx="1615320" cy="1585080"/>
+              <a:ext cx="1614600" cy="1585080"/>
             </a:xfrm>
             <a:prstGeom prst="rect">
               <a:avLst/>
@@ -20779,28 +20498,28 @@
       </p:grpSp>
       <p:grpSp>
         <p:nvGrpSpPr>
-          <p:cNvPr id="306" name="Group 18"/>
+          <p:cNvPr id="298" name="Group 18"/>
           <p:cNvGrpSpPr/>
           <p:nvPr/>
         </p:nvGrpSpPr>
         <p:grpSpPr>
           <a:xfrm>
             <a:off x="9348840" y="2254320"/>
-            <a:ext cx="1615320" cy="1631880"/>
+            <a:ext cx="1614600" cy="1631880"/>
             <a:chOff x="9348840" y="2254320"/>
-            <a:chExt cx="1615320" cy="1631880"/>
+            <a:chExt cx="1614600" cy="1631880"/>
           </a:xfrm>
         </p:grpSpPr>
         <p:sp>
           <p:nvSpPr>
-            <p:cNvPr id="307" name="TextBox 64"/>
+            <p:cNvPr id="299" name="TextBox 64"/>
             <p:cNvSpPr/>
             <p:nvPr/>
           </p:nvSpPr>
           <p:spPr>
             <a:xfrm>
               <a:off x="9348840" y="2254320"/>
-              <a:ext cx="1615320" cy="303120"/>
+              <a:ext cx="1614600" cy="303120"/>
             </a:xfrm>
             <a:prstGeom prst="rect">
               <a:avLst/>
@@ -20850,14 +20569,14 @@
         </p:sp>
         <p:sp>
           <p:nvSpPr>
-            <p:cNvPr id="308" name="TextBox 66"/>
+            <p:cNvPr id="300" name="TextBox 66"/>
             <p:cNvSpPr/>
             <p:nvPr/>
           </p:nvSpPr>
           <p:spPr>
             <a:xfrm>
               <a:off x="9348840" y="2515680"/>
-              <a:ext cx="1615320" cy="1370520"/>
+              <a:ext cx="1614600" cy="1370520"/>
             </a:xfrm>
             <a:prstGeom prst="rect">
               <a:avLst/>
@@ -21049,14 +20768,14 @@
       </p:grpSp>
       <p:sp>
         <p:nvSpPr>
-          <p:cNvPr id="309" name="Diamond 19"/>
+          <p:cNvPr id="301" name="Diamond 19"/>
           <p:cNvSpPr/>
           <p:nvPr/>
         </p:nvSpPr>
         <p:spPr>
           <a:xfrm>
             <a:off x="9402120" y="4572000"/>
-            <a:ext cx="1560600" cy="376560"/>
+            <a:ext cx="1559880" cy="375840"/>
           </a:xfrm>
           <a:prstGeom prst="diamond">
             <a:avLst/>
@@ -21112,93 +20831,30 @@
           </a:p>
         </p:txBody>
       </p:sp>
-      <p:sp>
-        <p:nvSpPr>
-          <p:cNvPr id="310" name="Oval 5"/>
-          <p:cNvSpPr/>
-          <p:nvPr/>
-        </p:nvSpPr>
-        <p:spPr>
-          <a:xfrm>
-            <a:off x="7007400" y="4572000"/>
-            <a:ext cx="1669320" cy="376560"/>
-          </a:xfrm>
-          <a:prstGeom prst="ellipse">
-            <a:avLst/>
-          </a:prstGeom>
-          <a:noFill/>
-          <a:ln>
-            <a:solidFill>
-              <a:srgbClr val="000000"/>
-            </a:solidFill>
-          </a:ln>
-        </p:spPr>
-        <p:style>
-          <a:lnRef idx="2">
-            <a:schemeClr val="accent1">
-              <a:shade val="50000"/>
-            </a:schemeClr>
-          </a:lnRef>
-          <a:fillRef idx="1">
-            <a:schemeClr val="accent1"/>
-          </a:fillRef>
-          <a:effectRef idx="0">
-            <a:schemeClr val="accent1"/>
-          </a:effectRef>
-          <a:fontRef idx="minor"/>
-        </p:style>
-        <p:txBody>
-          <a:bodyPr lIns="90000" rIns="90000" tIns="45000" bIns="45000" anchor="ctr">
-            <a:noAutofit/>
-          </a:bodyPr>
-          <a:p>
-            <a:pPr algn="ctr" defTabSz="914400">
-              <a:lnSpc>
-                <a:spcPct val="100000"/>
-              </a:lnSpc>
-            </a:pPr>
-            <a:r>
-              <a:rPr b="0" lang="en-US" sz="1410" spc="-1" strike="noStrike">
-                <a:solidFill>
-                  <a:schemeClr val="dk1"/>
-                </a:solidFill>
-                <a:latin typeface="Calibri"/>
-              </a:rPr>
-              <a:t>Transferable</a:t>
-            </a:r>
-            <a:endParaRPr b="0" lang="en-US" sz="1410" spc="-1" strike="noStrike">
-              <a:solidFill>
-                <a:srgbClr val="000000"/>
-              </a:solidFill>
-              <a:latin typeface="Arial"/>
-            </a:endParaRPr>
-          </a:p>
-        </p:txBody>
-      </p:sp>
       <p:grpSp>
         <p:nvGrpSpPr>
-          <p:cNvPr id="311" name="Group 19"/>
+          <p:cNvPr id="302" name="Group 19"/>
           <p:cNvGrpSpPr/>
           <p:nvPr/>
         </p:nvGrpSpPr>
         <p:grpSpPr>
           <a:xfrm>
             <a:off x="9348840" y="2254320"/>
-            <a:ext cx="1615320" cy="1631880"/>
+            <a:ext cx="1614600" cy="1631880"/>
             <a:chOff x="9348840" y="2254320"/>
-            <a:chExt cx="1615320" cy="1631880"/>
+            <a:chExt cx="1614600" cy="1631880"/>
           </a:xfrm>
         </p:grpSpPr>
         <p:sp>
           <p:nvSpPr>
-            <p:cNvPr id="312" name="TextBox 67"/>
+            <p:cNvPr id="303" name="TextBox 67"/>
             <p:cNvSpPr/>
             <p:nvPr/>
           </p:nvSpPr>
           <p:spPr>
             <a:xfrm>
               <a:off x="9348840" y="2254320"/>
-              <a:ext cx="1615320" cy="303120"/>
+              <a:ext cx="1614600" cy="303120"/>
             </a:xfrm>
             <a:prstGeom prst="rect">
               <a:avLst/>
@@ -21248,14 +20904,14 @@
         </p:sp>
         <p:sp>
           <p:nvSpPr>
-            <p:cNvPr id="313" name="TextBox 68"/>
+            <p:cNvPr id="304" name="TextBox 68"/>
             <p:cNvSpPr/>
             <p:nvPr/>
           </p:nvSpPr>
           <p:spPr>
             <a:xfrm>
               <a:off x="9348840" y="2515680"/>
-              <a:ext cx="1615320" cy="1370520"/>
+              <a:ext cx="1614600" cy="1370520"/>
             </a:xfrm>
             <a:prstGeom prst="rect">
               <a:avLst/>
@@ -21447,28 +21103,28 @@
       </p:grpSp>
       <p:grpSp>
         <p:nvGrpSpPr>
-          <p:cNvPr id="314" name="Group 20"/>
+          <p:cNvPr id="305" name="Group 20"/>
           <p:cNvGrpSpPr/>
           <p:nvPr/>
         </p:nvGrpSpPr>
         <p:grpSpPr>
           <a:xfrm>
             <a:off x="9348840" y="2254320"/>
-            <a:ext cx="1615320" cy="1845360"/>
+            <a:ext cx="1614600" cy="1845360"/>
             <a:chOff x="9348840" y="2254320"/>
-            <a:chExt cx="1615320" cy="1845360"/>
+            <a:chExt cx="1614600" cy="1845360"/>
           </a:xfrm>
         </p:grpSpPr>
         <p:sp>
           <p:nvSpPr>
-            <p:cNvPr id="315" name="TextBox 69"/>
+            <p:cNvPr id="306" name="TextBox 69"/>
             <p:cNvSpPr/>
             <p:nvPr/>
           </p:nvSpPr>
           <p:spPr>
             <a:xfrm>
               <a:off x="9348840" y="2254320"/>
-              <a:ext cx="1615320" cy="303120"/>
+              <a:ext cx="1614600" cy="303120"/>
             </a:xfrm>
             <a:prstGeom prst="rect">
               <a:avLst/>
@@ -21518,14 +21174,14 @@
         </p:sp>
         <p:sp>
           <p:nvSpPr>
-            <p:cNvPr id="316" name="TextBox 70"/>
+            <p:cNvPr id="307" name="TextBox 70"/>
             <p:cNvSpPr/>
             <p:nvPr/>
           </p:nvSpPr>
           <p:spPr>
             <a:xfrm>
               <a:off x="9348840" y="2515680"/>
-              <a:ext cx="1615320" cy="1584000"/>
+              <a:ext cx="1614600" cy="1584000"/>
             </a:xfrm>
             <a:prstGeom prst="rect">
               <a:avLst/>
@@ -21744,14 +21400,14 @@
       </p:grpSp>
       <p:sp>
         <p:nvSpPr>
-          <p:cNvPr id="317" name="Diamond 25"/>
+          <p:cNvPr id="308" name="Diamond 25"/>
           <p:cNvSpPr/>
           <p:nvPr/>
         </p:nvSpPr>
         <p:spPr>
           <a:xfrm>
             <a:off x="7086600" y="3501720"/>
-            <a:ext cx="1818720" cy="376560"/>
+            <a:ext cx="1818000" cy="375840"/>
           </a:xfrm>
           <a:prstGeom prst="diamond">
             <a:avLst/>
@@ -21809,17 +21465,17 @@
       </p:sp>
       <p:cxnSp>
         <p:nvCxnSpPr>
-          <p:cNvPr id="318" name="Straight Arrow Connector 40"/>
+          <p:cNvPr id="309" name="Straight Arrow Connector 40"/>
           <p:cNvCxnSpPr>
-            <a:stCxn id="309" idx="2"/>
-            <a:endCxn id="296" idx="0"/>
+            <a:stCxn id="301" idx="2"/>
+            <a:endCxn id="288" idx="0"/>
           </p:cNvCxnSpPr>
           <p:nvPr/>
         </p:nvCxnSpPr>
         <p:spPr>
           <a:xfrm flipH="1">
-            <a:off x="9265680" y="4948560"/>
-            <a:ext cx="917280" cy="538200"/>
+            <a:off x="9265320" y="4947840"/>
+            <a:ext cx="917280" cy="538920"/>
           </a:xfrm>
           <a:prstGeom prst="straightConnector1">
             <a:avLst/>
@@ -21834,16 +21490,16 @@
       </p:cxnSp>
       <p:cxnSp>
         <p:nvCxnSpPr>
-          <p:cNvPr id="319" name="Straight Arrow Connector 41"/>
+          <p:cNvPr id="310" name="Straight Arrow Connector 41"/>
           <p:cNvCxnSpPr>
-            <a:stCxn id="314" idx="2"/>
-            <a:endCxn id="309" idx="0"/>
+            <a:stCxn id="305" idx="2"/>
+            <a:endCxn id="301" idx="0"/>
           </p:cNvCxnSpPr>
           <p:nvPr/>
         </p:nvCxnSpPr>
         <p:spPr>
           <a:xfrm>
-            <a:off x="10156320" y="4099680"/>
+            <a:off x="10155960" y="4099680"/>
             <a:ext cx="26640" cy="472680"/>
           </a:xfrm>
           <a:prstGeom prst="straightConnector1">
@@ -21857,41 +21513,16 @@
           </a:ln>
         </p:spPr>
       </p:cxnSp>
-      <p:cxnSp>
-        <p:nvCxnSpPr>
-          <p:cNvPr id="320" name="Straight Arrow Connector 42"/>
-          <p:cNvCxnSpPr>
-            <a:stCxn id="309" idx="1"/>
-            <a:endCxn id="310" idx="6"/>
-          </p:cNvCxnSpPr>
-          <p:nvPr/>
-        </p:nvCxnSpPr>
-        <p:spPr>
-          <a:xfrm flipH="1">
-            <a:off x="8676720" y="4760280"/>
-            <a:ext cx="725760" cy="360"/>
-          </a:xfrm>
-          <a:prstGeom prst="straightConnector1">
-            <a:avLst/>
-          </a:prstGeom>
-          <a:ln w="25400">
-            <a:solidFill>
-              <a:srgbClr val="000000"/>
-            </a:solidFill>
-            <a:round/>
-          </a:ln>
-        </p:spPr>
-      </p:cxnSp>
       <p:sp>
         <p:nvSpPr>
-          <p:cNvPr id="321" name="Oval 7"/>
+          <p:cNvPr id="311" name="Oval 7"/>
           <p:cNvSpPr/>
           <p:nvPr/>
         </p:nvSpPr>
         <p:spPr>
           <a:xfrm>
             <a:off x="6629400" y="5099760"/>
-            <a:ext cx="1590120" cy="376560"/>
+            <a:ext cx="1589400" cy="375840"/>
           </a:xfrm>
           <a:prstGeom prst="ellipse">
             <a:avLst/>
@@ -21947,17 +21578,17 @@
       </p:sp>
       <p:cxnSp>
         <p:nvCxnSpPr>
-          <p:cNvPr id="322" name="Straight Arrow Connector 66"/>
+          <p:cNvPr id="312" name="Straight Arrow Connector 66"/>
           <p:cNvCxnSpPr>
-            <a:stCxn id="309" idx="1"/>
-            <a:endCxn id="321" idx="6"/>
+            <a:stCxn id="301" idx="1"/>
+            <a:endCxn id="311" idx="6"/>
           </p:cNvCxnSpPr>
           <p:nvPr/>
         </p:nvCxnSpPr>
         <p:spPr>
           <a:xfrm flipH="1">
-            <a:off x="8219520" y="4760280"/>
-            <a:ext cx="1182960" cy="528120"/>
+            <a:off x="8218800" y="4759920"/>
+            <a:ext cx="1183680" cy="528120"/>
           </a:xfrm>
           <a:prstGeom prst="straightConnector1">
             <a:avLst/>
@@ -21972,17 +21603,17 @@
       </p:cxnSp>
       <p:cxnSp>
         <p:nvCxnSpPr>
-          <p:cNvPr id="323" name="Straight Arrow Connector 64"/>
+          <p:cNvPr id="313" name="Straight Arrow Connector 64"/>
           <p:cNvCxnSpPr>
-            <a:stCxn id="303" idx="3"/>
-            <a:endCxn id="317" idx="1"/>
+            <a:stCxn id="295" idx="3"/>
+            <a:endCxn id="308" idx="1"/>
           </p:cNvCxnSpPr>
           <p:nvPr/>
         </p:nvCxnSpPr>
         <p:spPr>
           <a:xfrm flipV="1">
-            <a:off x="5911920" y="3690000"/>
-            <a:ext cx="1175040" cy="1256040"/>
+            <a:off x="5911200" y="3689640"/>
+            <a:ext cx="1175760" cy="1256400"/>
           </a:xfrm>
           <a:prstGeom prst="straightConnector1">
             <a:avLst/>
@@ -21998,17 +21629,17 @@
       </p:cxnSp>
       <p:cxnSp>
         <p:nvCxnSpPr>
-          <p:cNvPr id="324" name="Straight Arrow Connector 63"/>
+          <p:cNvPr id="314" name="Straight Arrow Connector 63"/>
           <p:cNvCxnSpPr>
-            <a:stCxn id="314" idx="1"/>
-            <a:endCxn id="317" idx="3"/>
+            <a:stCxn id="305" idx="1"/>
+            <a:endCxn id="308" idx="3"/>
           </p:cNvCxnSpPr>
           <p:nvPr/>
         </p:nvCxnSpPr>
         <p:spPr>
           <a:xfrm flipH="1">
-            <a:off x="8905320" y="3177000"/>
-            <a:ext cx="443880" cy="513360"/>
+            <a:off x="8904600" y="3177000"/>
+            <a:ext cx="444600" cy="513000"/>
           </a:xfrm>
           <a:prstGeom prst="straightConnector1">
             <a:avLst/>
@@ -22023,14 +21654,14 @@
       </p:cxnSp>
       <p:sp>
         <p:nvSpPr>
-          <p:cNvPr id="325" name="Oval 9"/>
+          <p:cNvPr id="315" name="Oval 9"/>
           <p:cNvSpPr/>
           <p:nvPr/>
         </p:nvSpPr>
         <p:spPr>
           <a:xfrm>
             <a:off x="7315200" y="4114800"/>
-            <a:ext cx="1669320" cy="376560"/>
+            <a:ext cx="1668600" cy="375840"/>
           </a:xfrm>
           <a:prstGeom prst="ellipse">
             <a:avLst/>
@@ -22086,17 +21717,17 @@
       </p:sp>
       <p:cxnSp>
         <p:nvCxnSpPr>
-          <p:cNvPr id="326" name="Straight Arrow Connector 58"/>
+          <p:cNvPr id="316" name="Straight Arrow Connector 58"/>
           <p:cNvCxnSpPr>
-            <a:stCxn id="309" idx="1"/>
-            <a:endCxn id="325" idx="6"/>
+            <a:stCxn id="301" idx="1"/>
+            <a:endCxn id="315" idx="6"/>
           </p:cNvCxnSpPr>
           <p:nvPr/>
         </p:nvCxnSpPr>
         <p:spPr>
           <a:xfrm flipH="1" flipV="1">
-            <a:off x="8984520" y="4303080"/>
-            <a:ext cx="417960" cy="457560"/>
+            <a:off x="8983800" y="4302720"/>
+            <a:ext cx="418680" cy="457560"/>
           </a:xfrm>
           <a:prstGeom prst="straightConnector1">
             <a:avLst/>
@@ -22111,14 +21742,14 @@
       </p:cxnSp>
       <p:sp>
         <p:nvSpPr>
-          <p:cNvPr id="327" name="TextBox 62"/>
+          <p:cNvPr id="317" name="TextBox 62"/>
           <p:cNvSpPr/>
           <p:nvPr/>
         </p:nvSpPr>
         <p:spPr>
           <a:xfrm>
             <a:off x="2727720" y="1982880"/>
-            <a:ext cx="1615320" cy="303120"/>
+            <a:ext cx="1614600" cy="303120"/>
           </a:xfrm>
           <a:prstGeom prst="rect">
             <a:avLst/>
@@ -22168,14 +21799,14 @@
       </p:sp>
       <p:sp>
         <p:nvSpPr>
-          <p:cNvPr id="328" name="Diamond 16"/>
+          <p:cNvPr id="318" name="Diamond 16"/>
           <p:cNvSpPr/>
           <p:nvPr/>
         </p:nvSpPr>
         <p:spPr>
           <a:xfrm rot="21559200">
             <a:off x="2295720" y="3255120"/>
-            <a:ext cx="2045160" cy="389880"/>
+            <a:ext cx="2044440" cy="389160"/>
           </a:xfrm>
           <a:prstGeom prst="diamond">
             <a:avLst/>
@@ -22233,17 +21864,17 @@
       </p:sp>
       <p:cxnSp>
         <p:nvCxnSpPr>
-          <p:cNvPr id="329" name="Straight Arrow Connector 39"/>
+          <p:cNvPr id="319" name="Straight Arrow Connector 39"/>
           <p:cNvCxnSpPr>
-            <a:stCxn id="303" idx="1"/>
-            <a:endCxn id="328" idx="2"/>
+            <a:stCxn id="295" idx="1"/>
+            <a:endCxn id="318" idx="2"/>
           </p:cNvCxnSpPr>
           <p:nvPr/>
         </p:nvCxnSpPr>
         <p:spPr>
           <a:xfrm flipH="1" flipV="1">
-            <a:off x="3320640" y="3646080"/>
-            <a:ext cx="976320" cy="1299960"/>
+            <a:off x="3320280" y="3645360"/>
+            <a:ext cx="976680" cy="1300680"/>
           </a:xfrm>
           <a:prstGeom prst="straightConnector1">
             <a:avLst/>
@@ -22259,16 +21890,16 @@
       </p:cxnSp>
       <p:cxnSp>
         <p:nvCxnSpPr>
-          <p:cNvPr id="330" name="Straight Arrow Connector 50"/>
+          <p:cNvPr id="320" name="Straight Arrow Connector 50"/>
           <p:cNvCxnSpPr>
-            <a:stCxn id="327" idx="2"/>
-            <a:endCxn id="328" idx="0"/>
+            <a:stCxn id="317" idx="2"/>
+            <a:endCxn id="318" idx="0"/>
           </p:cNvCxnSpPr>
           <p:nvPr/>
         </p:nvCxnSpPr>
         <p:spPr>
           <a:xfrm flipH="1">
-            <a:off x="3316320" y="2286000"/>
+            <a:off x="3315960" y="2286000"/>
             <a:ext cx="219240" cy="970200"/>
           </a:xfrm>
           <a:prstGeom prst="straightConnector1">
@@ -22314,14 +21945,14 @@
       </p:grpSpPr>
       <p:cxnSp>
         <p:nvCxnSpPr>
-          <p:cNvPr id="331" name="Straight Arrow Connector 6"/>
+          <p:cNvPr id="321" name="Straight Arrow Connector 6"/>
           <p:cNvCxnSpPr/>
           <p:nvPr/>
         </p:nvCxnSpPr>
         <p:spPr>
           <a:xfrm flipH="1">
             <a:off x="0" y="3073320"/>
-            <a:ext cx="1839960" cy="11160"/>
+            <a:ext cx="1840680" cy="11880"/>
           </a:xfrm>
           <a:prstGeom prst="straightConnector1">
             <a:avLst/>
@@ -22337,14 +21968,14 @@
       </p:cxnSp>
       <p:cxnSp>
         <p:nvCxnSpPr>
-          <p:cNvPr id="332" name="Straight Arrow Connector 7"/>
+          <p:cNvPr id="322" name="Straight Arrow Connector 7"/>
           <p:cNvCxnSpPr/>
           <p:nvPr/>
         </p:nvCxnSpPr>
         <p:spPr>
           <a:xfrm>
             <a:off x="0" y="2489400"/>
-            <a:ext cx="1839960" cy="11160"/>
+            <a:ext cx="1840680" cy="11880"/>
           </a:xfrm>
           <a:prstGeom prst="straightConnector1">
             <a:avLst/>
@@ -22360,14 +21991,14 @@
       </p:cxnSp>
       <p:cxnSp>
         <p:nvCxnSpPr>
-          <p:cNvPr id="333" name="Straight Arrow Connector 8"/>
+          <p:cNvPr id="323" name="Straight Arrow Connector 8"/>
           <p:cNvCxnSpPr/>
           <p:nvPr/>
         </p:nvCxnSpPr>
         <p:spPr>
           <a:xfrm>
             <a:off x="0" y="2781360"/>
-            <a:ext cx="1839960" cy="11160"/>
+            <a:ext cx="1840680" cy="11880"/>
           </a:xfrm>
           <a:prstGeom prst="straightConnector1">
             <a:avLst/>
@@ -22383,14 +22014,14 @@
       </p:cxnSp>
       <p:cxnSp>
         <p:nvCxnSpPr>
-          <p:cNvPr id="334" name="Straight Arrow Connector 9"/>
+          <p:cNvPr id="324" name="Straight Arrow Connector 9"/>
           <p:cNvCxnSpPr/>
           <p:nvPr/>
         </p:nvCxnSpPr>
         <p:spPr>
           <a:xfrm flipH="1">
             <a:off x="0" y="3657600"/>
-            <a:ext cx="1839960" cy="11160"/>
+            <a:ext cx="1840680" cy="11880"/>
           </a:xfrm>
           <a:prstGeom prst="straightConnector1">
             <a:avLst/>
@@ -22405,14 +22036,14 @@
       </p:cxnSp>
       <p:sp>
         <p:nvSpPr>
-          <p:cNvPr id="335" name="Diamond 3"/>
+          <p:cNvPr id="325" name="Diamond 3"/>
           <p:cNvSpPr/>
           <p:nvPr/>
         </p:nvSpPr>
         <p:spPr>
           <a:xfrm>
             <a:off x="128520" y="6134040"/>
-            <a:ext cx="1560600" cy="376560"/>
+            <a:ext cx="1559880" cy="375840"/>
           </a:xfrm>
           <a:prstGeom prst="diamond">
             <a:avLst/>
@@ -22470,14 +22101,14 @@
       </p:sp>
       <p:sp>
         <p:nvSpPr>
-          <p:cNvPr id="336" name="Oval 2"/>
+          <p:cNvPr id="326" name="Oval 2"/>
           <p:cNvSpPr/>
           <p:nvPr/>
         </p:nvSpPr>
         <p:spPr>
           <a:xfrm>
             <a:off x="302760" y="5454000"/>
-            <a:ext cx="1212120" cy="376560"/>
+            <a:ext cx="1211400" cy="375840"/>
           </a:xfrm>
           <a:prstGeom prst="ellipse">
             <a:avLst/>
@@ -22533,28 +22164,28 @@
       </p:sp>
       <p:grpSp>
         <p:nvGrpSpPr>
-          <p:cNvPr id="337" name="Group 3"/>
+          <p:cNvPr id="327" name="Group 3"/>
           <p:cNvGrpSpPr/>
           <p:nvPr/>
         </p:nvGrpSpPr>
         <p:grpSpPr>
           <a:xfrm>
             <a:off x="101160" y="336240"/>
-            <a:ext cx="1615320" cy="777960"/>
+            <a:ext cx="1614600" cy="777960"/>
             <a:chOff x="101160" y="336240"/>
-            <a:chExt cx="1615320" cy="777960"/>
+            <a:chExt cx="1614600" cy="777960"/>
           </a:xfrm>
         </p:grpSpPr>
         <p:sp>
           <p:nvSpPr>
-            <p:cNvPr id="338" name="TextBox 5"/>
+            <p:cNvPr id="328" name="TextBox 5"/>
             <p:cNvSpPr/>
             <p:nvPr/>
           </p:nvSpPr>
           <p:spPr>
             <a:xfrm>
               <a:off x="101160" y="336240"/>
-              <a:ext cx="1615320" cy="303120"/>
+              <a:ext cx="1614600" cy="303120"/>
             </a:xfrm>
             <a:prstGeom prst="rect">
               <a:avLst/>
@@ -22604,14 +22235,14 @@
         </p:sp>
         <p:sp>
           <p:nvSpPr>
-            <p:cNvPr id="339" name="TextBox 6"/>
+            <p:cNvPr id="329" name="TextBox 6"/>
             <p:cNvSpPr/>
             <p:nvPr/>
           </p:nvSpPr>
           <p:spPr>
             <a:xfrm>
               <a:off x="101160" y="597600"/>
-              <a:ext cx="1615320" cy="516600"/>
+              <a:ext cx="1614600" cy="516600"/>
             </a:xfrm>
             <a:prstGeom prst="rect">
               <a:avLst/>
@@ -22695,14 +22326,14 @@
       </p:grpSp>
       <p:sp>
         <p:nvSpPr>
-          <p:cNvPr id="340" name="Diamond 4"/>
+          <p:cNvPr id="330" name="Diamond 4"/>
           <p:cNvSpPr/>
           <p:nvPr/>
         </p:nvSpPr>
         <p:spPr>
           <a:xfrm>
             <a:off x="128520" y="4629600"/>
-            <a:ext cx="1560600" cy="521280"/>
+            <a:ext cx="1559880" cy="520560"/>
           </a:xfrm>
           <a:prstGeom prst="diamond">
             <a:avLst/>
@@ -22783,14 +22414,14 @@
       </p:sp>
       <p:cxnSp>
         <p:nvCxnSpPr>
-          <p:cNvPr id="341" name="Straight Arrow Connector 10"/>
+          <p:cNvPr id="331" name="Straight Arrow Connector 10"/>
           <p:cNvCxnSpPr/>
           <p:nvPr/>
         </p:nvCxnSpPr>
         <p:spPr>
           <a:xfrm>
             <a:off x="0" y="3365640"/>
-            <a:ext cx="1839960" cy="11160"/>
+            <a:ext cx="1840680" cy="11880"/>
           </a:xfrm>
           <a:prstGeom prst="straightConnector1">
             <a:avLst/>
@@ -22805,14 +22436,14 @@
       </p:cxnSp>
       <p:sp>
         <p:nvSpPr>
-          <p:cNvPr id="342" name="Isosceles Triangle 2"/>
+          <p:cNvPr id="332" name="Isosceles Triangle 2"/>
           <p:cNvSpPr/>
           <p:nvPr/>
         </p:nvSpPr>
         <p:spPr>
           <a:xfrm>
             <a:off x="673200" y="3949920"/>
-            <a:ext cx="471600" cy="376560"/>
+            <a:ext cx="470880" cy="375840"/>
           </a:xfrm>
           <a:prstGeom prst="triangle">
             <a:avLst>
@@ -22872,28 +22503,28 @@
       </p:sp>
       <p:grpSp>
         <p:nvGrpSpPr>
-          <p:cNvPr id="343" name="Group 4"/>
+          <p:cNvPr id="333" name="Group 4"/>
           <p:cNvGrpSpPr/>
           <p:nvPr/>
         </p:nvGrpSpPr>
         <p:grpSpPr>
           <a:xfrm>
             <a:off x="101160" y="1413000"/>
-            <a:ext cx="1615320" cy="777960"/>
+            <a:ext cx="1614600" cy="777960"/>
             <a:chOff x="101160" y="1413000"/>
-            <a:chExt cx="1615320" cy="777960"/>
+            <a:chExt cx="1614600" cy="777960"/>
           </a:xfrm>
         </p:grpSpPr>
         <p:sp>
           <p:nvSpPr>
-            <p:cNvPr id="344" name="TextBox 7"/>
+            <p:cNvPr id="334" name="TextBox 7"/>
             <p:cNvSpPr/>
             <p:nvPr/>
           </p:nvSpPr>
           <p:spPr>
             <a:xfrm>
               <a:off x="101160" y="1413000"/>
-              <a:ext cx="1615320" cy="303120"/>
+              <a:ext cx="1614600" cy="303120"/>
             </a:xfrm>
             <a:prstGeom prst="rect">
               <a:avLst/>
@@ -22944,14 +22575,14 @@
         </p:sp>
         <p:sp>
           <p:nvSpPr>
-            <p:cNvPr id="345" name="TextBox 8"/>
+            <p:cNvPr id="335" name="TextBox 8"/>
             <p:cNvSpPr/>
             <p:nvPr/>
           </p:nvSpPr>
           <p:spPr>
             <a:xfrm>
               <a:off x="101160" y="1674360"/>
-              <a:ext cx="1615320" cy="516600"/>
+              <a:ext cx="1614600" cy="516600"/>
             </a:xfrm>
             <a:prstGeom prst="rect">
               <a:avLst/>
@@ -23036,28 +22667,28 @@
       </p:grpSp>
       <p:grpSp>
         <p:nvGrpSpPr>
-          <p:cNvPr id="346" name="Group 21"/>
+          <p:cNvPr id="336" name="Group 21"/>
           <p:cNvGrpSpPr/>
           <p:nvPr/>
         </p:nvGrpSpPr>
         <p:grpSpPr>
           <a:xfrm>
             <a:off x="3886200" y="2286000"/>
-            <a:ext cx="1615320" cy="1845360"/>
+            <a:ext cx="1614600" cy="1845360"/>
             <a:chOff x="3886200" y="2286000"/>
-            <a:chExt cx="1615320" cy="1845360"/>
+            <a:chExt cx="1614600" cy="1845360"/>
           </a:xfrm>
         </p:grpSpPr>
         <p:sp>
           <p:nvSpPr>
-            <p:cNvPr id="347" name="TextBox 75"/>
+            <p:cNvPr id="337" name="TextBox 75"/>
             <p:cNvSpPr/>
             <p:nvPr/>
           </p:nvSpPr>
           <p:spPr>
             <a:xfrm>
               <a:off x="3886200" y="2286000"/>
-              <a:ext cx="1615320" cy="303120"/>
+              <a:ext cx="1614600" cy="303120"/>
             </a:xfrm>
             <a:prstGeom prst="rect">
               <a:avLst/>
@@ -23107,14 +22738,14 @@
         </p:sp>
         <p:sp>
           <p:nvSpPr>
-            <p:cNvPr id="348" name="TextBox 76"/>
+            <p:cNvPr id="338" name="TextBox 76"/>
             <p:cNvSpPr/>
             <p:nvPr/>
           </p:nvSpPr>
           <p:spPr>
             <a:xfrm>
               <a:off x="3886200" y="2547360"/>
-              <a:ext cx="1615320" cy="1584000"/>
+              <a:ext cx="1614600" cy="1584000"/>
             </a:xfrm>
             <a:prstGeom prst="rect">
               <a:avLst/>

</xml_diff>

<commit_message>
cleanup & gems are now properly linked to a package instead of player, xp is now properly linked to a player and not to a package
</commit_message>
<xml_diff>
--- a/documentation/database/ER-Diagram.pptx
+++ b/documentation/database/ER-Diagram.pptx
@@ -353,7 +353,7 @@
             <a:pPr indent="0" algn="r">
               <a:buNone/>
             </a:pPr>
-            <a:fld id="{9AF0B7E0-04EF-4B36-A316-A90B1574B95D}" type="slidenum">
+            <a:fld id="{CD0DE281-603F-4661-B663-0463AF4C8F38}" type="slidenum">
               <a:rPr b="0" lang="en-US" sz="1400" spc="-1" strike="noStrike">
                 <a:solidFill>
                   <a:srgbClr val="000000"/>
@@ -407,7 +407,7 @@
         <p:spPr>
           <a:xfrm>
             <a:off x="685800" y="1143000"/>
-            <a:ext cx="5473440" cy="3073320"/>
+            <a:ext cx="5473080" cy="3072960"/>
           </a:xfrm>
           <a:prstGeom prst="rect">
             <a:avLst/>
@@ -430,7 +430,7 @@
         <p:spPr>
           <a:xfrm>
             <a:off x="685800" y="4400640"/>
-            <a:ext cx="5473440" cy="3587400"/>
+            <a:ext cx="5473080" cy="3587040"/>
           </a:xfrm>
           <a:prstGeom prst="rect">
             <a:avLst/>
@@ -470,7 +470,7 @@
         <p:spPr>
           <a:xfrm>
             <a:off x="3884760" y="8685360"/>
-            <a:ext cx="2958840" cy="445680"/>
+            <a:ext cx="2958480" cy="445320"/>
           </a:xfrm>
           <a:prstGeom prst="rect">
             <a:avLst/>
@@ -512,7 +512,7 @@
                 <a:tab algn="l" pos="0"/>
               </a:tabLst>
             </a:pPr>
-            <a:fld id="{B49E8E0E-E752-4CB5-80C7-29879DB1D5B3}" type="slidenum">
+            <a:fld id="{49059D5A-9A8D-4729-9CE1-1F6D1DAD3EA4}" type="slidenum">
               <a:rPr b="0" lang="en-US" sz="1200" spc="-1" strike="noStrike">
                 <a:solidFill>
                   <a:schemeClr val="dk1"/>
@@ -566,7 +566,7 @@
         <p:spPr>
           <a:xfrm>
             <a:off x="685800" y="1143000"/>
-            <a:ext cx="5473440" cy="3073320"/>
+            <a:ext cx="5473080" cy="3072960"/>
           </a:xfrm>
           <a:prstGeom prst="rect">
             <a:avLst/>
@@ -589,7 +589,7 @@
         <p:spPr>
           <a:xfrm>
             <a:off x="685800" y="4400640"/>
-            <a:ext cx="5473440" cy="3587400"/>
+            <a:ext cx="5473080" cy="3587040"/>
           </a:xfrm>
           <a:prstGeom prst="rect">
             <a:avLst/>
@@ -629,7 +629,7 @@
         <p:spPr>
           <a:xfrm>
             <a:off x="3884760" y="8685360"/>
-            <a:ext cx="2958840" cy="445680"/>
+            <a:ext cx="2958480" cy="445320"/>
           </a:xfrm>
           <a:prstGeom prst="rect">
             <a:avLst/>
@@ -671,7 +671,7 @@
                 <a:tab algn="l" pos="0"/>
               </a:tabLst>
             </a:pPr>
-            <a:fld id="{0A1BA0A5-D552-4585-BB1F-85224407A3A2}" type="slidenum">
+            <a:fld id="{91442018-F4AF-451A-8B94-0903C5C042F4}" type="slidenum">
               <a:rPr b="0" lang="en-US" sz="1200" spc="-1" strike="noStrike">
                 <a:solidFill>
                   <a:schemeClr val="dk1"/>
@@ -725,7 +725,7 @@
         <p:spPr>
           <a:xfrm>
             <a:off x="685800" y="1143000"/>
-            <a:ext cx="5473440" cy="3073320"/>
+            <a:ext cx="5473080" cy="3072960"/>
           </a:xfrm>
           <a:prstGeom prst="rect">
             <a:avLst/>
@@ -748,7 +748,7 @@
         <p:spPr>
           <a:xfrm>
             <a:off x="685800" y="4400640"/>
-            <a:ext cx="5473440" cy="3587400"/>
+            <a:ext cx="5473080" cy="3587040"/>
           </a:xfrm>
           <a:prstGeom prst="rect">
             <a:avLst/>
@@ -788,7 +788,7 @@
         <p:spPr>
           <a:xfrm>
             <a:off x="3884760" y="8685360"/>
-            <a:ext cx="2958840" cy="445680"/>
+            <a:ext cx="2958480" cy="445320"/>
           </a:xfrm>
           <a:prstGeom prst="rect">
             <a:avLst/>
@@ -830,7 +830,7 @@
                 <a:tab algn="l" pos="0"/>
               </a:tabLst>
             </a:pPr>
-            <a:fld id="{ED637E15-339F-49FC-9F0A-109FFD844478}" type="slidenum">
+            <a:fld id="{7DCB9227-01E2-4F75-B48E-0D1F188F038A}" type="slidenum">
               <a:rPr b="0" lang="en-US" sz="1200" spc="-1" strike="noStrike">
                 <a:solidFill>
                   <a:schemeClr val="dk1"/>
@@ -884,7 +884,7 @@
         <p:spPr>
           <a:xfrm>
             <a:off x="685800" y="1143000"/>
-            <a:ext cx="5473440" cy="3073320"/>
+            <a:ext cx="5473080" cy="3072960"/>
           </a:xfrm>
           <a:prstGeom prst="rect">
             <a:avLst/>
@@ -907,7 +907,7 @@
         <p:spPr>
           <a:xfrm>
             <a:off x="685800" y="4400640"/>
-            <a:ext cx="5473440" cy="3587400"/>
+            <a:ext cx="5473080" cy="3587040"/>
           </a:xfrm>
           <a:prstGeom prst="rect">
             <a:avLst/>
@@ -947,7 +947,7 @@
         <p:spPr>
           <a:xfrm>
             <a:off x="3884760" y="8685360"/>
-            <a:ext cx="2958840" cy="445680"/>
+            <a:ext cx="2958480" cy="445320"/>
           </a:xfrm>
           <a:prstGeom prst="rect">
             <a:avLst/>
@@ -989,7 +989,7 @@
                 <a:tab algn="l" pos="0"/>
               </a:tabLst>
             </a:pPr>
-            <a:fld id="{29D46C33-0592-452E-9BEA-EFC0EA34F7D1}" type="slidenum">
+            <a:fld id="{3457379D-7179-4FB2-8940-AA8F838FAFDF}" type="slidenum">
               <a:rPr b="0" lang="en-US" sz="1200" spc="-1" strike="noStrike">
                 <a:solidFill>
                   <a:schemeClr val="dk1"/>
@@ -1233,7 +1233,7 @@
         <p:txBody>
           <a:bodyPr/>
           <a:p>
-            <a:fld id="{4BBFCE19-2231-40B3-B0BF-8B9F696A55CB}" type="slidenum">
+            <a:fld id="{FC17292F-E45B-40FA-A6A1-267F0CE6CBC0}" type="slidenum">
               <a:t>&lt;#&gt;</a:t>
             </a:fld>
           </a:p>
@@ -1442,7 +1442,7 @@
         <p:txBody>
           <a:bodyPr/>
           <a:p>
-            <a:fld id="{429F9030-2E24-41DD-936B-E2B1BF764ED7}" type="slidenum">
+            <a:fld id="{F53F952E-3DED-422D-91D8-67801DA993E9}" type="slidenum">
               <a:t>&lt;#&gt;</a:t>
             </a:fld>
           </a:p>
@@ -1565,7 +1565,7 @@
         <p:txBody>
           <a:bodyPr/>
           <a:p>
-            <a:fld id="{5D5BEAF8-A558-43F7-A121-A16708BEEFF4}" type="slidenum">
+            <a:fld id="{E8D73935-E2A6-46F7-B089-98D00468C90B}" type="slidenum">
               <a:t>&lt;#&gt;</a:t>
             </a:fld>
           </a:p>
@@ -1648,7 +1648,7 @@
         <p:txBody>
           <a:bodyPr/>
           <a:p>
-            <a:fld id="{CB87F4B5-A28E-449D-B0CC-CD2010C45B9D}" type="slidenum">
+            <a:fld id="{8D970566-E392-4539-85F6-1FDA90D3E150}" type="slidenum">
               <a:t>&lt;#&gt;</a:t>
             </a:fld>
           </a:p>
@@ -1900,7 +1900,7 @@
         <p:txBody>
           <a:bodyPr/>
           <a:p>
-            <a:fld id="{E2F05019-0F09-40B7-99D7-9D1A798CB259}" type="slidenum">
+            <a:fld id="{04CBA772-7C85-4447-B8E6-9364C5A644B9}" type="slidenum">
               <a:t>&lt;#&gt;</a:t>
             </a:fld>
           </a:p>
@@ -2152,7 +2152,7 @@
         <p:txBody>
           <a:bodyPr/>
           <a:p>
-            <a:fld id="{11EE9686-E41D-414E-898A-4C53219CA8C3}" type="slidenum">
+            <a:fld id="{68C7407B-B7B8-42E6-B62E-75D926208051}" type="slidenum">
               <a:t>&lt;#&gt;</a:t>
             </a:fld>
           </a:p>
@@ -2361,7 +2361,7 @@
         <p:txBody>
           <a:bodyPr/>
           <a:p>
-            <a:fld id="{238B0B13-4381-489A-B268-E507B7C19787}" type="slidenum">
+            <a:fld id="{C267B53A-5DA4-453A-ACFC-E5DAD33E97BE}" type="slidenum">
               <a:t>&lt;#&gt;</a:t>
             </a:fld>
           </a:p>
@@ -2656,7 +2656,7 @@
         <p:txBody>
           <a:bodyPr/>
           <a:p>
-            <a:fld id="{3E6ED864-1CD0-4477-8655-3D8F9FF8EFF6}" type="slidenum">
+            <a:fld id="{7817F069-2AA2-419E-B402-C47730621CF9}" type="slidenum">
               <a:t>&lt;#&gt;</a:t>
             </a:fld>
           </a:p>
@@ -2739,7 +2739,7 @@
         <p:txBody>
           <a:bodyPr/>
           <a:p>
-            <a:fld id="{79F341CD-6A2C-4E39-BA93-5AF636D88D37}" type="slidenum">
+            <a:fld id="{8795E423-D01A-4900-B625-81AD886DE0B5}" type="slidenum">
               <a:t>&lt;#&gt;</a:t>
             </a:fld>
           </a:p>
@@ -2822,7 +2822,7 @@
         <p:txBody>
           <a:bodyPr/>
           <a:p>
-            <a:fld id="{2FBD1303-054D-49A1-895F-F2D6556BDF6C}" type="slidenum">
+            <a:fld id="{02747A95-9277-4318-B8E9-6B2BBDF037D0}" type="slidenum">
               <a:t>&lt;#&gt;</a:t>
             </a:fld>
           </a:p>
@@ -2988,7 +2988,7 @@
         <p:txBody>
           <a:bodyPr/>
           <a:p>
-            <a:fld id="{FFF0C4DD-86B0-4ED3-BAE3-2C4D1B16F068}" type="slidenum">
+            <a:fld id="{7C4CD070-E49A-46AA-9176-EC1461395F32}" type="slidenum">
               <a:t>&lt;#&gt;</a:t>
             </a:fld>
           </a:p>
@@ -3154,7 +3154,7 @@
         <p:txBody>
           <a:bodyPr/>
           <a:p>
-            <a:fld id="{DC46ADB8-2C2D-4475-A9A2-9F563D237186}" type="slidenum">
+            <a:fld id="{7A7FA2ED-2773-4BCE-A92C-CB1D1DC89968}" type="slidenum">
               <a:t>&lt;#&gt;</a:t>
             </a:fld>
           </a:p>
@@ -3219,9 +3219,9 @@
         <p:grpSpPr>
           <a:xfrm>
             <a:off x="6199200" y="6162840"/>
-            <a:ext cx="5979960" cy="682200"/>
+            <a:ext cx="5979600" cy="681840"/>
             <a:chOff x="6199200" y="6162840"/>
-            <a:chExt cx="5979960" cy="682200"/>
+            <a:chExt cx="5979600" cy="681840"/>
           </a:xfrm>
         </p:grpSpPr>
         <p:pic>
@@ -3237,7 +3237,7 @@
           <p:spPr>
             <a:xfrm>
               <a:off x="6199200" y="6162840"/>
-              <a:ext cx="4043520" cy="682200"/>
+              <a:ext cx="4043160" cy="681840"/>
             </a:xfrm>
             <a:prstGeom prst="rect">
               <a:avLst/>
@@ -3260,7 +3260,7 @@
           <p:spPr>
             <a:xfrm>
               <a:off x="10270080" y="6162840"/>
-              <a:ext cx="1909080" cy="598680"/>
+              <a:ext cx="1908720" cy="598320"/>
             </a:xfrm>
             <a:prstGeom prst="rect">
               <a:avLst/>
@@ -4008,7 +4008,7 @@
         <p:spPr>
           <a:xfrm>
             <a:off x="4038480" y="6356520"/>
-            <a:ext cx="4101840" cy="352080"/>
+            <a:ext cx="4101480" cy="351720"/>
           </a:xfrm>
           <a:prstGeom prst="rect">
             <a:avLst/>
@@ -4080,7 +4080,7 @@
         <p:spPr>
           <a:xfrm>
             <a:off x="8610480" y="6356520"/>
-            <a:ext cx="2730240" cy="352080"/>
+            <a:ext cx="2729880" cy="351720"/>
           </a:xfrm>
           <a:prstGeom prst="rect">
             <a:avLst/>
@@ -4123,7 +4123,7 @@
                 <a:tab algn="l" pos="0"/>
               </a:tabLst>
             </a:pPr>
-            <a:fld id="{326C0028-4883-4735-8320-EB3E91468523}" type="slidenum">
+            <a:fld id="{7BE0104D-BBF7-4AEC-BF74-0151CD46EAA3}" type="slidenum">
               <a:rPr b="0" lang="en-US" sz="1200" spc="-1" strike="noStrike">
                 <a:solidFill>
                   <a:schemeClr val="dk1">
@@ -4156,7 +4156,7 @@
         <p:spPr>
           <a:xfrm>
             <a:off x="838080" y="6356520"/>
-            <a:ext cx="2730240" cy="352080"/>
+            <a:ext cx="2729880" cy="351720"/>
           </a:xfrm>
           <a:prstGeom prst="rect">
             <a:avLst/>
@@ -4245,9 +4245,9 @@
         <p:grpSpPr>
           <a:xfrm>
             <a:off x="6199200" y="6162840"/>
-            <a:ext cx="5979960" cy="682200"/>
+            <a:ext cx="5979600" cy="681840"/>
             <a:chOff x="6199200" y="6162840"/>
-            <a:chExt cx="5979960" cy="682200"/>
+            <a:chExt cx="5979600" cy="681840"/>
           </a:xfrm>
         </p:grpSpPr>
         <p:pic>
@@ -4263,7 +4263,7 @@
           <p:spPr>
             <a:xfrm>
               <a:off x="6199200" y="6162840"/>
-              <a:ext cx="4043520" cy="682200"/>
+              <a:ext cx="4043160" cy="681840"/>
             </a:xfrm>
             <a:prstGeom prst="rect">
               <a:avLst/>
@@ -4286,7 +4286,7 @@
           <p:spPr>
             <a:xfrm>
               <a:off x="10270080" y="6162840"/>
-              <a:ext cx="1909080" cy="598680"/>
+              <a:ext cx="1908720" cy="598320"/>
             </a:xfrm>
             <a:prstGeom prst="rect">
               <a:avLst/>
@@ -4809,7 +4809,7 @@
         <p:spPr>
           <a:xfrm>
             <a:off x="4038480" y="6356520"/>
-            <a:ext cx="4101840" cy="352080"/>
+            <a:ext cx="4101480" cy="351720"/>
           </a:xfrm>
           <a:prstGeom prst="rect">
             <a:avLst/>
@@ -4881,7 +4881,7 @@
         <p:spPr>
           <a:xfrm>
             <a:off x="8610480" y="6356520"/>
-            <a:ext cx="2730240" cy="352080"/>
+            <a:ext cx="2729880" cy="351720"/>
           </a:xfrm>
           <a:prstGeom prst="rect">
             <a:avLst/>
@@ -4924,7 +4924,7 @@
                 <a:tab algn="l" pos="0"/>
               </a:tabLst>
             </a:pPr>
-            <a:fld id="{A01EDD6D-B2C8-4826-80EB-2A777952C7F8}" type="slidenum">
+            <a:fld id="{04A85DB6-EE6F-4C57-A32B-C696997EB1EE}" type="slidenum">
               <a:rPr b="0" lang="en-US" sz="1200" spc="-1" strike="noStrike">
                 <a:solidFill>
                   <a:schemeClr val="dk1">
@@ -4957,7 +4957,7 @@
         <p:spPr>
           <a:xfrm>
             <a:off x="838080" y="6356520"/>
-            <a:ext cx="2730240" cy="352080"/>
+            <a:ext cx="2729880" cy="351720"/>
           </a:xfrm>
           <a:prstGeom prst="rect">
             <a:avLst/>
@@ -5046,9 +5046,9 @@
         <p:grpSpPr>
           <a:xfrm>
             <a:off x="6199200" y="6162840"/>
-            <a:ext cx="5979960" cy="682200"/>
+            <a:ext cx="5979600" cy="681840"/>
             <a:chOff x="6199200" y="6162840"/>
-            <a:chExt cx="5979960" cy="682200"/>
+            <a:chExt cx="5979600" cy="681840"/>
           </a:xfrm>
         </p:grpSpPr>
         <p:pic>
@@ -5064,7 +5064,7 @@
           <p:spPr>
             <a:xfrm>
               <a:off x="6199200" y="6162840"/>
-              <a:ext cx="4043520" cy="682200"/>
+              <a:ext cx="4043160" cy="681840"/>
             </a:xfrm>
             <a:prstGeom prst="rect">
               <a:avLst/>
@@ -5087,7 +5087,7 @@
           <p:spPr>
             <a:xfrm>
               <a:off x="10270080" y="6162840"/>
-              <a:ext cx="1909080" cy="598680"/>
+              <a:ext cx="1908720" cy="598320"/>
             </a:xfrm>
             <a:prstGeom prst="rect">
               <a:avLst/>
@@ -5160,7 +5160,7 @@
         <p:spPr>
           <a:xfrm>
             <a:off x="4038480" y="6356520"/>
-            <a:ext cx="4101840" cy="352080"/>
+            <a:ext cx="4101480" cy="351720"/>
           </a:xfrm>
           <a:prstGeom prst="rect">
             <a:avLst/>
@@ -5232,7 +5232,7 @@
         <p:spPr>
           <a:xfrm>
             <a:off x="8610480" y="6356520"/>
-            <a:ext cx="2730240" cy="352080"/>
+            <a:ext cx="2729880" cy="351720"/>
           </a:xfrm>
           <a:prstGeom prst="rect">
             <a:avLst/>
@@ -5275,7 +5275,7 @@
                 <a:tab algn="l" pos="0"/>
               </a:tabLst>
             </a:pPr>
-            <a:fld id="{85A980AE-6300-4132-A5A8-4788FB5D1782}" type="slidenum">
+            <a:fld id="{16F7868B-09DA-4A31-9A92-1E6B1BF1D27F}" type="slidenum">
               <a:rPr b="0" lang="en-US" sz="1200" spc="-1" strike="noStrike">
                 <a:solidFill>
                   <a:schemeClr val="dk1">
@@ -5308,7 +5308,7 @@
         <p:spPr>
           <a:xfrm>
             <a:off x="838080" y="6356520"/>
-            <a:ext cx="2730240" cy="352080"/>
+            <a:ext cx="2729880" cy="351720"/>
           </a:xfrm>
           <a:prstGeom prst="rect">
             <a:avLst/>
@@ -5397,9 +5397,9 @@
         <p:grpSpPr>
           <a:xfrm>
             <a:off x="6199200" y="6162840"/>
-            <a:ext cx="5979960" cy="682200"/>
+            <a:ext cx="5979600" cy="681840"/>
             <a:chOff x="6199200" y="6162840"/>
-            <a:chExt cx="5979960" cy="682200"/>
+            <a:chExt cx="5979600" cy="681840"/>
           </a:xfrm>
         </p:grpSpPr>
         <p:pic>
@@ -5415,7 +5415,7 @@
           <p:spPr>
             <a:xfrm>
               <a:off x="6199200" y="6162840"/>
-              <a:ext cx="4043520" cy="682200"/>
+              <a:ext cx="4043160" cy="681840"/>
             </a:xfrm>
             <a:prstGeom prst="rect">
               <a:avLst/>
@@ -5438,7 +5438,7 @@
           <p:spPr>
             <a:xfrm>
               <a:off x="10270080" y="6162840"/>
-              <a:ext cx="1909080" cy="598680"/>
+              <a:ext cx="1908720" cy="598320"/>
             </a:xfrm>
             <a:prstGeom prst="rect">
               <a:avLst/>
@@ -5462,7 +5462,7 @@
         <p:spPr>
           <a:xfrm>
             <a:off x="4038480" y="6356520"/>
-            <a:ext cx="4101840" cy="352080"/>
+            <a:ext cx="4101480" cy="351720"/>
           </a:xfrm>
           <a:prstGeom prst="rect">
             <a:avLst/>
@@ -5534,7 +5534,7 @@
         <p:spPr>
           <a:xfrm>
             <a:off x="8610480" y="6356520"/>
-            <a:ext cx="2730240" cy="352080"/>
+            <a:ext cx="2729880" cy="351720"/>
           </a:xfrm>
           <a:prstGeom prst="rect">
             <a:avLst/>
@@ -5577,7 +5577,7 @@
                 <a:tab algn="l" pos="0"/>
               </a:tabLst>
             </a:pPr>
-            <a:fld id="{C98C55C7-AAB4-45E3-87C0-D6AC758565AF}" type="slidenum">
+            <a:fld id="{D2897973-4C4B-4CB3-9078-E1E5D056F983}" type="slidenum">
               <a:rPr b="0" lang="en-US" sz="1200" spc="-1" strike="noStrike">
                 <a:solidFill>
                   <a:schemeClr val="dk1">
@@ -5610,7 +5610,7 @@
         <p:spPr>
           <a:xfrm>
             <a:off x="838080" y="6356520"/>
-            <a:ext cx="2730240" cy="352080"/>
+            <a:ext cx="2729880" cy="351720"/>
           </a:xfrm>
           <a:prstGeom prst="rect">
             <a:avLst/>
@@ -5699,9 +5699,9 @@
         <p:grpSpPr>
           <a:xfrm>
             <a:off x="6199200" y="6162840"/>
-            <a:ext cx="5979960" cy="682200"/>
+            <a:ext cx="5979600" cy="681840"/>
             <a:chOff x="6199200" y="6162840"/>
-            <a:chExt cx="5979960" cy="682200"/>
+            <a:chExt cx="5979600" cy="681840"/>
           </a:xfrm>
         </p:grpSpPr>
         <p:pic>
@@ -5717,7 +5717,7 @@
           <p:spPr>
             <a:xfrm>
               <a:off x="6199200" y="6162840"/>
-              <a:ext cx="4043520" cy="682200"/>
+              <a:ext cx="4043160" cy="681840"/>
             </a:xfrm>
             <a:prstGeom prst="rect">
               <a:avLst/>
@@ -5740,7 +5740,7 @@
           <p:spPr>
             <a:xfrm>
               <a:off x="10270080" y="6162840"/>
-              <a:ext cx="1909080" cy="598680"/>
+              <a:ext cx="1908720" cy="598320"/>
             </a:xfrm>
             <a:prstGeom prst="rect">
               <a:avLst/>
@@ -6488,7 +6488,7 @@
         <p:spPr>
           <a:xfrm>
             <a:off x="4038480" y="6356520"/>
-            <a:ext cx="4101840" cy="352080"/>
+            <a:ext cx="4101480" cy="351720"/>
           </a:xfrm>
           <a:prstGeom prst="rect">
             <a:avLst/>
@@ -6560,7 +6560,7 @@
         <p:spPr>
           <a:xfrm>
             <a:off x="8610480" y="6356520"/>
-            <a:ext cx="2730240" cy="352080"/>
+            <a:ext cx="2729880" cy="351720"/>
           </a:xfrm>
           <a:prstGeom prst="rect">
             <a:avLst/>
@@ -6603,7 +6603,7 @@
                 <a:tab algn="l" pos="0"/>
               </a:tabLst>
             </a:pPr>
-            <a:fld id="{92F29D7B-4C05-4969-99F7-0D8B943A5C08}" type="slidenum">
+            <a:fld id="{B0618E5E-7941-4F6A-BCBB-48270C847F06}" type="slidenum">
               <a:rPr b="0" lang="en-US" sz="1200" spc="-1" strike="noStrike">
                 <a:solidFill>
                   <a:schemeClr val="dk1">
@@ -6636,7 +6636,7 @@
         <p:spPr>
           <a:xfrm>
             <a:off x="838080" y="6356520"/>
-            <a:ext cx="2730240" cy="352080"/>
+            <a:ext cx="2729880" cy="351720"/>
           </a:xfrm>
           <a:prstGeom prst="rect">
             <a:avLst/>
@@ -6725,9 +6725,9 @@
         <p:grpSpPr>
           <a:xfrm>
             <a:off x="6199200" y="6162840"/>
-            <a:ext cx="5979960" cy="682200"/>
+            <a:ext cx="5979600" cy="681840"/>
             <a:chOff x="6199200" y="6162840"/>
-            <a:chExt cx="5979960" cy="682200"/>
+            <a:chExt cx="5979600" cy="681840"/>
           </a:xfrm>
         </p:grpSpPr>
         <p:pic>
@@ -6743,7 +6743,7 @@
           <p:spPr>
             <a:xfrm>
               <a:off x="6199200" y="6162840"/>
-              <a:ext cx="4043520" cy="682200"/>
+              <a:ext cx="4043160" cy="681840"/>
             </a:xfrm>
             <a:prstGeom prst="rect">
               <a:avLst/>
@@ -6766,7 +6766,7 @@
           <p:spPr>
             <a:xfrm>
               <a:off x="10270080" y="6162840"/>
-              <a:ext cx="1909080" cy="598680"/>
+              <a:ext cx="1908720" cy="598320"/>
             </a:xfrm>
             <a:prstGeom prst="rect">
               <a:avLst/>
@@ -6815,7 +6815,25 @@
                 </a:solidFill>
                 <a:latin typeface="Arial"/>
               </a:rPr>
-              <a:t>Click to edit the title text format</a:t>
+              <a:t>Click to edit </a:t>
+            </a:r>
+            <a:r>
+              <a:rPr b="0" lang="en-US" sz="1800" spc="-1" strike="noStrike">
+                <a:solidFill>
+                  <a:srgbClr val="000000"/>
+                </a:solidFill>
+                <a:latin typeface="Arial"/>
+              </a:rPr>
+              <a:t>the title text </a:t>
+            </a:r>
+            <a:r>
+              <a:rPr b="0" lang="en-US" sz="1800" spc="-1" strike="noStrike">
+                <a:solidFill>
+                  <a:srgbClr val="000000"/>
+                </a:solidFill>
+                <a:latin typeface="Arial"/>
+              </a:rPr>
+              <a:t>format</a:t>
             </a:r>
             <a:endParaRPr b="0" lang="en-US" sz="1800" spc="-1" strike="noStrike">
               <a:solidFill>
@@ -7514,7 +7532,7 @@
         <p:spPr>
           <a:xfrm>
             <a:off x="4038480" y="6356520"/>
-            <a:ext cx="4101840" cy="352080"/>
+            <a:ext cx="4101480" cy="351720"/>
           </a:xfrm>
           <a:prstGeom prst="rect">
             <a:avLst/>
@@ -7586,7 +7604,7 @@
         <p:spPr>
           <a:xfrm>
             <a:off x="8610480" y="6356520"/>
-            <a:ext cx="2730240" cy="352080"/>
+            <a:ext cx="2729880" cy="351720"/>
           </a:xfrm>
           <a:prstGeom prst="rect">
             <a:avLst/>
@@ -7629,7 +7647,7 @@
                 <a:tab algn="l" pos="0"/>
               </a:tabLst>
             </a:pPr>
-            <a:fld id="{4645F5A0-6D81-46C3-B9B8-546109551010}" type="slidenum">
+            <a:fld id="{14084F3F-0C56-493B-836B-06317B7BF79B}" type="slidenum">
               <a:rPr b="0" lang="en-US" sz="1200" spc="-1" strike="noStrike">
                 <a:solidFill>
                   <a:schemeClr val="dk1">
@@ -7662,7 +7680,7 @@
         <p:spPr>
           <a:xfrm>
             <a:off x="838080" y="6356520"/>
-            <a:ext cx="2730240" cy="352080"/>
+            <a:ext cx="2729880" cy="351720"/>
           </a:xfrm>
           <a:prstGeom prst="rect">
             <a:avLst/>
@@ -7751,9 +7769,9 @@
         <p:grpSpPr>
           <a:xfrm>
             <a:off x="6199200" y="6162840"/>
-            <a:ext cx="5979960" cy="682200"/>
+            <a:ext cx="5979600" cy="681840"/>
             <a:chOff x="6199200" y="6162840"/>
-            <a:chExt cx="5979960" cy="682200"/>
+            <a:chExt cx="5979600" cy="681840"/>
           </a:xfrm>
         </p:grpSpPr>
         <p:pic>
@@ -7769,7 +7787,7 @@
           <p:spPr>
             <a:xfrm>
               <a:off x="6199200" y="6162840"/>
-              <a:ext cx="4043520" cy="682200"/>
+              <a:ext cx="4043160" cy="681840"/>
             </a:xfrm>
             <a:prstGeom prst="rect">
               <a:avLst/>
@@ -7792,7 +7810,7 @@
           <p:spPr>
             <a:xfrm>
               <a:off x="10270080" y="6162840"/>
-              <a:ext cx="1909080" cy="598680"/>
+              <a:ext cx="1908720" cy="598320"/>
             </a:xfrm>
             <a:prstGeom prst="rect">
               <a:avLst/>
@@ -8315,7 +8333,7 @@
         <p:spPr>
           <a:xfrm>
             <a:off x="4038480" y="6356520"/>
-            <a:ext cx="4101840" cy="352080"/>
+            <a:ext cx="4101480" cy="351720"/>
           </a:xfrm>
           <a:prstGeom prst="rect">
             <a:avLst/>
@@ -8387,7 +8405,7 @@
         <p:spPr>
           <a:xfrm>
             <a:off x="8610480" y="6356520"/>
-            <a:ext cx="2730240" cy="352080"/>
+            <a:ext cx="2729880" cy="351720"/>
           </a:xfrm>
           <a:prstGeom prst="rect">
             <a:avLst/>
@@ -8430,7 +8448,7 @@
                 <a:tab algn="l" pos="0"/>
               </a:tabLst>
             </a:pPr>
-            <a:fld id="{5010ADCC-107D-42F6-BCD2-A318A0363A1E}" type="slidenum">
+            <a:fld id="{6611B5E9-6281-49CD-8BC8-9E1ECED006D1}" type="slidenum">
               <a:rPr b="0" lang="en-US" sz="1200" spc="-1" strike="noStrike">
                 <a:solidFill>
                   <a:schemeClr val="dk1">
@@ -8463,7 +8481,7 @@
         <p:spPr>
           <a:xfrm>
             <a:off x="838080" y="6356520"/>
-            <a:ext cx="2730240" cy="352080"/>
+            <a:ext cx="2729880" cy="351720"/>
           </a:xfrm>
           <a:prstGeom prst="rect">
             <a:avLst/>
@@ -8552,9 +8570,9 @@
         <p:grpSpPr>
           <a:xfrm>
             <a:off x="6199200" y="6162840"/>
-            <a:ext cx="5979960" cy="682200"/>
+            <a:ext cx="5979600" cy="681840"/>
             <a:chOff x="6199200" y="6162840"/>
-            <a:chExt cx="5979960" cy="682200"/>
+            <a:chExt cx="5979600" cy="681840"/>
           </a:xfrm>
         </p:grpSpPr>
         <p:pic>
@@ -8570,7 +8588,7 @@
           <p:spPr>
             <a:xfrm>
               <a:off x="6199200" y="6162840"/>
-              <a:ext cx="4043520" cy="682200"/>
+              <a:ext cx="4043160" cy="681840"/>
             </a:xfrm>
             <a:prstGeom prst="rect">
               <a:avLst/>
@@ -8593,7 +8611,7 @@
           <p:spPr>
             <a:xfrm>
               <a:off x="10270080" y="6162840"/>
-              <a:ext cx="1909080" cy="598680"/>
+              <a:ext cx="1908720" cy="598320"/>
             </a:xfrm>
             <a:prstGeom prst="rect">
               <a:avLst/>
@@ -8642,7 +8660,52 @@
                 </a:solidFill>
                 <a:latin typeface="Arial"/>
               </a:rPr>
-              <a:t>Click to edit the title text format</a:t>
+              <a:t>Click </a:t>
+            </a:r>
+            <a:r>
+              <a:rPr b="0" lang="en-US" sz="1800" spc="-1" strike="noStrike">
+                <a:solidFill>
+                  <a:srgbClr val="000000"/>
+                </a:solidFill>
+                <a:latin typeface="Arial"/>
+              </a:rPr>
+              <a:t>to edit </a:t>
+            </a:r>
+            <a:r>
+              <a:rPr b="0" lang="en-US" sz="1800" spc="-1" strike="noStrike">
+                <a:solidFill>
+                  <a:srgbClr val="000000"/>
+                </a:solidFill>
+                <a:latin typeface="Arial"/>
+              </a:rPr>
+              <a:t>the </a:t>
+            </a:r>
+            <a:r>
+              <a:rPr b="0" lang="en-US" sz="1800" spc="-1" strike="noStrike">
+                <a:solidFill>
+                  <a:srgbClr val="000000"/>
+                </a:solidFill>
+                <a:latin typeface="Arial"/>
+              </a:rPr>
+              <a:t>title </a:t>
+            </a:r>
+            <a:r>
+              <a:rPr b="0" lang="en-US" sz="1800" spc="-1" strike="noStrike">
+                <a:solidFill>
+                  <a:srgbClr val="000000"/>
+                </a:solidFill>
+                <a:latin typeface="Arial"/>
+              </a:rPr>
+              <a:t>text </a:t>
+            </a:r>
+            <a:r>
+              <a:rPr b="0" lang="en-US" sz="1800" spc="-1" strike="noStrike">
+                <a:solidFill>
+                  <a:srgbClr val="000000"/>
+                </a:solidFill>
+                <a:latin typeface="Arial"/>
+              </a:rPr>
+              <a:t>format</a:t>
             </a:r>
             <a:endParaRPr b="0" lang="en-US" sz="1800" spc="-1" strike="noStrike">
               <a:solidFill>
@@ -9566,7 +9629,7 @@
         <p:spPr>
           <a:xfrm>
             <a:off x="4038480" y="6356520"/>
-            <a:ext cx="4101840" cy="352080"/>
+            <a:ext cx="4101480" cy="351720"/>
           </a:xfrm>
           <a:prstGeom prst="rect">
             <a:avLst/>
@@ -9638,7 +9701,7 @@
         <p:spPr>
           <a:xfrm>
             <a:off x="8610480" y="6356520"/>
-            <a:ext cx="2730240" cy="352080"/>
+            <a:ext cx="2729880" cy="351720"/>
           </a:xfrm>
           <a:prstGeom prst="rect">
             <a:avLst/>
@@ -9681,7 +9744,7 @@
                 <a:tab algn="l" pos="0"/>
               </a:tabLst>
             </a:pPr>
-            <a:fld id="{D97B579E-850C-4357-9FD6-1E9438FBDE12}" type="slidenum">
+            <a:fld id="{8BE3903C-B1E8-4E8B-AEF5-7D51C8E4F7BB}" type="slidenum">
               <a:rPr b="0" lang="en-US" sz="1200" spc="-1" strike="noStrike">
                 <a:solidFill>
                   <a:schemeClr val="dk1">
@@ -9714,7 +9777,7 @@
         <p:spPr>
           <a:xfrm>
             <a:off x="838080" y="6356520"/>
-            <a:ext cx="2730240" cy="352080"/>
+            <a:ext cx="2729880" cy="351720"/>
           </a:xfrm>
           <a:prstGeom prst="rect">
             <a:avLst/>
@@ -9803,9 +9866,9 @@
         <p:grpSpPr>
           <a:xfrm>
             <a:off x="6199200" y="6162840"/>
-            <a:ext cx="5979960" cy="682200"/>
+            <a:ext cx="5979600" cy="681840"/>
             <a:chOff x="6199200" y="6162840"/>
-            <a:chExt cx="5979960" cy="682200"/>
+            <a:chExt cx="5979600" cy="681840"/>
           </a:xfrm>
         </p:grpSpPr>
         <p:pic>
@@ -9821,7 +9884,7 @@
           <p:spPr>
             <a:xfrm>
               <a:off x="6199200" y="6162840"/>
-              <a:ext cx="4043520" cy="682200"/>
+              <a:ext cx="4043160" cy="681840"/>
             </a:xfrm>
             <a:prstGeom prst="rect">
               <a:avLst/>
@@ -9844,7 +9907,7 @@
           <p:spPr>
             <a:xfrm>
               <a:off x="10270080" y="6162840"/>
-              <a:ext cx="1909080" cy="598680"/>
+              <a:ext cx="1908720" cy="598320"/>
             </a:xfrm>
             <a:prstGeom prst="rect">
               <a:avLst/>
@@ -9868,7 +9931,7 @@
         <p:spPr>
           <a:xfrm>
             <a:off x="4038480" y="6356520"/>
-            <a:ext cx="4101840" cy="352080"/>
+            <a:ext cx="4101480" cy="351720"/>
           </a:xfrm>
           <a:prstGeom prst="rect">
             <a:avLst/>
@@ -9940,7 +10003,7 @@
         <p:spPr>
           <a:xfrm>
             <a:off x="8610480" y="6356520"/>
-            <a:ext cx="2730240" cy="352080"/>
+            <a:ext cx="2729880" cy="351720"/>
           </a:xfrm>
           <a:prstGeom prst="rect">
             <a:avLst/>
@@ -9983,7 +10046,7 @@
                 <a:tab algn="l" pos="0"/>
               </a:tabLst>
             </a:pPr>
-            <a:fld id="{CDA078C2-E36B-4FBB-84BE-061E46EF1A74}" type="slidenum">
+            <a:fld id="{7DD49FCA-E980-496B-AF1F-2EA36F5AA84C}" type="slidenum">
               <a:rPr b="0" lang="en-US" sz="1200" spc="-1" strike="noStrike">
                 <a:solidFill>
                   <a:schemeClr val="dk1">
@@ -10016,7 +10079,7 @@
         <p:spPr>
           <a:xfrm>
             <a:off x="838080" y="6356520"/>
-            <a:ext cx="2730240" cy="352080"/>
+            <a:ext cx="2729880" cy="351720"/>
           </a:xfrm>
           <a:prstGeom prst="rect">
             <a:avLst/>
@@ -10105,9 +10168,9 @@
         <p:grpSpPr>
           <a:xfrm>
             <a:off x="6199200" y="6162840"/>
-            <a:ext cx="5979960" cy="682200"/>
+            <a:ext cx="5979600" cy="681840"/>
             <a:chOff x="6199200" y="6162840"/>
-            <a:chExt cx="5979960" cy="682200"/>
+            <a:chExt cx="5979600" cy="681840"/>
           </a:xfrm>
         </p:grpSpPr>
         <p:pic>
@@ -10123,7 +10186,7 @@
           <p:spPr>
             <a:xfrm>
               <a:off x="6199200" y="6162840"/>
-              <a:ext cx="4043520" cy="682200"/>
+              <a:ext cx="4043160" cy="681840"/>
             </a:xfrm>
             <a:prstGeom prst="rect">
               <a:avLst/>
@@ -10146,7 +10209,7 @@
           <p:spPr>
             <a:xfrm>
               <a:off x="10270080" y="6162840"/>
-              <a:ext cx="1909080" cy="598680"/>
+              <a:ext cx="1908720" cy="598320"/>
             </a:xfrm>
             <a:prstGeom prst="rect">
               <a:avLst/>
@@ -10170,7 +10233,7 @@
         <p:spPr>
           <a:xfrm>
             <a:off x="4038480" y="6356520"/>
-            <a:ext cx="4101840" cy="352080"/>
+            <a:ext cx="4101480" cy="351720"/>
           </a:xfrm>
           <a:prstGeom prst="rect">
             <a:avLst/>
@@ -10242,7 +10305,7 @@
         <p:spPr>
           <a:xfrm>
             <a:off x="8610480" y="6356520"/>
-            <a:ext cx="2730240" cy="352080"/>
+            <a:ext cx="2729880" cy="351720"/>
           </a:xfrm>
           <a:prstGeom prst="rect">
             <a:avLst/>
@@ -10285,7 +10348,7 @@
                 <a:tab algn="l" pos="0"/>
               </a:tabLst>
             </a:pPr>
-            <a:fld id="{FD81ACC3-6B22-466F-8EDE-1A7AE7F20B98}" type="slidenum">
+            <a:fld id="{F4AED1DD-1515-465D-81E2-4E821DB79C27}" type="slidenum">
               <a:rPr b="0" lang="en-US" sz="1200" spc="-1" strike="noStrike">
                 <a:solidFill>
                   <a:schemeClr val="dk1">
@@ -10318,7 +10381,7 @@
         <p:spPr>
           <a:xfrm>
             <a:off x="838080" y="6356520"/>
-            <a:ext cx="2730240" cy="352080"/>
+            <a:ext cx="2729880" cy="351720"/>
           </a:xfrm>
           <a:prstGeom prst="rect">
             <a:avLst/>
@@ -10681,9 +10744,9 @@
         <p:grpSpPr>
           <a:xfrm>
             <a:off x="6199200" y="6162840"/>
-            <a:ext cx="5979960" cy="682200"/>
+            <a:ext cx="5979600" cy="681840"/>
             <a:chOff x="6199200" y="6162840"/>
-            <a:chExt cx="5979960" cy="682200"/>
+            <a:chExt cx="5979600" cy="681840"/>
           </a:xfrm>
         </p:grpSpPr>
         <p:pic>
@@ -10699,7 +10762,7 @@
           <p:spPr>
             <a:xfrm>
               <a:off x="6199200" y="6162840"/>
-              <a:ext cx="4043520" cy="682200"/>
+              <a:ext cx="4043160" cy="681840"/>
             </a:xfrm>
             <a:prstGeom prst="rect">
               <a:avLst/>
@@ -10722,7 +10785,7 @@
           <p:spPr>
             <a:xfrm>
               <a:off x="10270080" y="6162840"/>
-              <a:ext cx="1909080" cy="598680"/>
+              <a:ext cx="1908720" cy="598320"/>
             </a:xfrm>
             <a:prstGeom prst="rect">
               <a:avLst/>
@@ -10771,7 +10834,25 @@
                 </a:solidFill>
                 <a:latin typeface="Arial"/>
               </a:rPr>
-              <a:t>Click to edit the title text format</a:t>
+              <a:t>Click to edit </a:t>
+            </a:r>
+            <a:r>
+              <a:rPr b="0" lang="en-US" sz="1800" spc="-1" strike="noStrike">
+                <a:solidFill>
+                  <a:srgbClr val="000000"/>
+                </a:solidFill>
+                <a:latin typeface="Arial"/>
+              </a:rPr>
+              <a:t>the title text </a:t>
+            </a:r>
+            <a:r>
+              <a:rPr b="0" lang="en-US" sz="1800" spc="-1" strike="noStrike">
+                <a:solidFill>
+                  <a:srgbClr val="000000"/>
+                </a:solidFill>
+                <a:latin typeface="Arial"/>
+              </a:rPr>
+              <a:t>format</a:t>
             </a:r>
             <a:endParaRPr b="0" lang="en-US" sz="1800" spc="-1" strike="noStrike">
               <a:solidFill>
@@ -11020,7 +11101,7 @@
         <p:spPr>
           <a:xfrm>
             <a:off x="4038480" y="6356520"/>
-            <a:ext cx="4101840" cy="352080"/>
+            <a:ext cx="4101480" cy="351720"/>
           </a:xfrm>
           <a:prstGeom prst="rect">
             <a:avLst/>
@@ -11092,7 +11173,7 @@
         <p:spPr>
           <a:xfrm>
             <a:off x="8610480" y="6356520"/>
-            <a:ext cx="2730240" cy="352080"/>
+            <a:ext cx="2729880" cy="351720"/>
           </a:xfrm>
           <a:prstGeom prst="rect">
             <a:avLst/>
@@ -11135,7 +11216,7 @@
                 <a:tab algn="l" pos="0"/>
               </a:tabLst>
             </a:pPr>
-            <a:fld id="{DBDE0BE1-0EE9-4102-8547-358F0CE40BD9}" type="slidenum">
+            <a:fld id="{CFB18C59-DD0E-4050-BEAE-87176CA6DD59}" type="slidenum">
               <a:rPr b="0" lang="en-US" sz="1200" spc="-1" strike="noStrike">
                 <a:solidFill>
                   <a:schemeClr val="dk1">
@@ -11168,7 +11249,7 @@
         <p:spPr>
           <a:xfrm>
             <a:off x="838080" y="6356520"/>
-            <a:ext cx="2730240" cy="352080"/>
+            <a:ext cx="2729880" cy="351720"/>
           </a:xfrm>
           <a:prstGeom prst="rect">
             <a:avLst/>
@@ -11257,9 +11338,9 @@
         <p:grpSpPr>
           <a:xfrm>
             <a:off x="6199200" y="6162840"/>
-            <a:ext cx="5979960" cy="682200"/>
+            <a:ext cx="5979600" cy="681840"/>
             <a:chOff x="6199200" y="6162840"/>
-            <a:chExt cx="5979960" cy="682200"/>
+            <a:chExt cx="5979600" cy="681840"/>
           </a:xfrm>
         </p:grpSpPr>
         <p:pic>
@@ -11275,7 +11356,7 @@
           <p:spPr>
             <a:xfrm>
               <a:off x="6199200" y="6162840"/>
-              <a:ext cx="4043520" cy="682200"/>
+              <a:ext cx="4043160" cy="681840"/>
             </a:xfrm>
             <a:prstGeom prst="rect">
               <a:avLst/>
@@ -11298,7 +11379,7 @@
           <p:spPr>
             <a:xfrm>
               <a:off x="10270080" y="6162840"/>
-              <a:ext cx="1909080" cy="598680"/>
+              <a:ext cx="1908720" cy="598320"/>
             </a:xfrm>
             <a:prstGeom prst="rect">
               <a:avLst/>
@@ -11596,7 +11677,7 @@
         <p:spPr>
           <a:xfrm>
             <a:off x="4038480" y="6356520"/>
-            <a:ext cx="4101840" cy="352080"/>
+            <a:ext cx="4101480" cy="351720"/>
           </a:xfrm>
           <a:prstGeom prst="rect">
             <a:avLst/>
@@ -11668,7 +11749,7 @@
         <p:spPr>
           <a:xfrm>
             <a:off x="8610480" y="6356520"/>
-            <a:ext cx="2730240" cy="352080"/>
+            <a:ext cx="2729880" cy="351720"/>
           </a:xfrm>
           <a:prstGeom prst="rect">
             <a:avLst/>
@@ -11711,7 +11792,7 @@
                 <a:tab algn="l" pos="0"/>
               </a:tabLst>
             </a:pPr>
-            <a:fld id="{13FB67CC-D984-43DE-BE2E-7D580BBF96C3}" type="slidenum">
+            <a:fld id="{69B33530-3FE3-4047-8172-FBBC919DD05D}" type="slidenum">
               <a:rPr b="0" lang="en-US" sz="1200" spc="-1" strike="noStrike">
                 <a:solidFill>
                   <a:schemeClr val="dk1">
@@ -11744,7 +11825,7 @@
         <p:spPr>
           <a:xfrm>
             <a:off x="838080" y="6356520"/>
-            <a:ext cx="2730240" cy="352080"/>
+            <a:ext cx="2729880" cy="351720"/>
           </a:xfrm>
           <a:prstGeom prst="rect">
             <a:avLst/>
@@ -11826,7 +11907,7 @@
         <p:spPr>
           <a:xfrm flipH="1">
             <a:off x="0" y="3073320"/>
-            <a:ext cx="1841760" cy="12960"/>
+            <a:ext cx="1842120" cy="13320"/>
           </a:xfrm>
           <a:prstGeom prst="straightConnector1">
             <a:avLst/>
@@ -11849,7 +11930,7 @@
         <p:spPr>
           <a:xfrm>
             <a:off x="0" y="2489400"/>
-            <a:ext cx="1841760" cy="12960"/>
+            <a:ext cx="1842120" cy="13320"/>
           </a:xfrm>
           <a:prstGeom prst="straightConnector1">
             <a:avLst/>
@@ -11872,7 +11953,7 @@
         <p:spPr>
           <a:xfrm>
             <a:off x="0" y="2781360"/>
-            <a:ext cx="1841760" cy="12960"/>
+            <a:ext cx="1842120" cy="13320"/>
           </a:xfrm>
           <a:prstGeom prst="straightConnector1">
             <a:avLst/>
@@ -11895,7 +11976,7 @@
         <p:spPr>
           <a:xfrm flipH="1">
             <a:off x="0" y="3657600"/>
-            <a:ext cx="1841760" cy="12960"/>
+            <a:ext cx="1842120" cy="13320"/>
           </a:xfrm>
           <a:prstGeom prst="straightConnector1">
             <a:avLst/>
@@ -11917,7 +11998,7 @@
         <p:spPr>
           <a:xfrm>
             <a:off x="128520" y="6134040"/>
-            <a:ext cx="1558800" cy="374760"/>
+            <a:ext cx="1558440" cy="374400"/>
           </a:xfrm>
           <a:prstGeom prst="diamond">
             <a:avLst/>
@@ -11982,7 +12063,7 @@
         <p:spPr>
           <a:xfrm>
             <a:off x="302760" y="5454000"/>
-            <a:ext cx="1210320" cy="374760"/>
+            <a:ext cx="1209960" cy="374400"/>
           </a:xfrm>
           <a:prstGeom prst="ellipse">
             <a:avLst/>
@@ -12045,7 +12126,7 @@
         <p:spPr>
           <a:xfrm>
             <a:off x="101160" y="336240"/>
-            <a:ext cx="1613520" cy="303120"/>
+            <a:ext cx="1613160" cy="303120"/>
           </a:xfrm>
           <a:prstGeom prst="rect">
             <a:avLst/>
@@ -12102,7 +12183,7 @@
         <p:spPr>
           <a:xfrm>
             <a:off x="101160" y="597600"/>
-            <a:ext cx="1613520" cy="516600"/>
+            <a:ext cx="1613160" cy="516600"/>
           </a:xfrm>
           <a:prstGeom prst="rect">
             <a:avLst/>
@@ -12192,7 +12273,7 @@
         <p:spPr>
           <a:xfrm>
             <a:off x="101160" y="336240"/>
-            <a:ext cx="1613520" cy="303120"/>
+            <a:ext cx="1613160" cy="303120"/>
           </a:xfrm>
           <a:prstGeom prst="rect">
             <a:avLst/>
@@ -12249,7 +12330,7 @@
         <p:spPr>
           <a:xfrm>
             <a:off x="101160" y="597600"/>
-            <a:ext cx="1613520" cy="516600"/>
+            <a:ext cx="1613160" cy="516600"/>
           </a:xfrm>
           <a:prstGeom prst="rect">
             <a:avLst/>
@@ -12339,7 +12420,7 @@
         <p:spPr>
           <a:xfrm>
             <a:off x="2541600" y="228600"/>
-            <a:ext cx="1613520" cy="303120"/>
+            <a:ext cx="1613160" cy="303120"/>
           </a:xfrm>
           <a:prstGeom prst="rect">
             <a:avLst/>
@@ -12396,7 +12477,7 @@
         <p:spPr>
           <a:xfrm>
             <a:off x="2541600" y="489960"/>
-            <a:ext cx="1613520" cy="1584000"/>
+            <a:ext cx="1613160" cy="1371240"/>
           </a:xfrm>
           <a:prstGeom prst="rect">
             <a:avLst/>
@@ -12520,33 +12601,6 @@
                 </a:solidFill>
                 <a:latin typeface="Calibri"/>
               </a:rPr>
-              <a:t>Gems</a:t>
-            </a:r>
-            <a:endParaRPr b="0" lang="en-US" sz="1400" spc="-1" strike="noStrike">
-              <a:solidFill>
-                <a:srgbClr val="000000"/>
-              </a:solidFill>
-              <a:latin typeface="Arial"/>
-            </a:endParaRPr>
-          </a:p>
-          <a:p>
-            <a:pPr marL="304920" indent="-304920" defTabSz="914400">
-              <a:lnSpc>
-                <a:spcPct val="100000"/>
-              </a:lnSpc>
-              <a:buClr>
-                <a:srgbClr val="000000"/>
-              </a:buClr>
-              <a:buFont typeface="OpenSymbol"/>
-              <a:buChar char="-"/>
-            </a:pPr>
-            <a:r>
-              <a:rPr b="0" lang="en-US" sz="1400" spc="-1" strike="noStrike">
-                <a:solidFill>
-                  <a:schemeClr val="dk1"/>
-                </a:solidFill>
-                <a:latin typeface="Calibri"/>
-              </a:rPr>
               <a:t>XP</a:t>
             </a:r>
             <a:endParaRPr b="0" lang="en-US" sz="1400" spc="-1" strike="noStrike">
@@ -12621,7 +12675,7 @@
         <p:spPr>
           <a:xfrm>
             <a:off x="6656400" y="228600"/>
-            <a:ext cx="1613520" cy="303120"/>
+            <a:ext cx="1613160" cy="303120"/>
           </a:xfrm>
           <a:prstGeom prst="rect">
             <a:avLst/>
@@ -12678,7 +12732,7 @@
         <p:spPr>
           <a:xfrm>
             <a:off x="6656400" y="489960"/>
-            <a:ext cx="1613520" cy="516600"/>
+            <a:ext cx="1613160" cy="516600"/>
           </a:xfrm>
           <a:prstGeom prst="rect">
             <a:avLst/>
@@ -12768,7 +12822,7 @@
         <p:spPr>
           <a:xfrm>
             <a:off x="6656400" y="228600"/>
-            <a:ext cx="1613520" cy="303120"/>
+            <a:ext cx="1613160" cy="303120"/>
           </a:xfrm>
           <a:prstGeom prst="rect">
             <a:avLst/>
@@ -12825,7 +12879,7 @@
         <p:spPr>
           <a:xfrm>
             <a:off x="6656400" y="489960"/>
-            <a:ext cx="1613520" cy="730080"/>
+            <a:ext cx="1613160" cy="730080"/>
           </a:xfrm>
           <a:prstGeom prst="rect">
             <a:avLst/>
@@ -12942,7 +12996,7 @@
         <p:spPr>
           <a:xfrm>
             <a:off x="128520" y="4629600"/>
-            <a:ext cx="1558800" cy="519480"/>
+            <a:ext cx="1558440" cy="519120"/>
           </a:xfrm>
           <a:prstGeom prst="diamond">
             <a:avLst/>
@@ -13030,7 +13084,7 @@
         <p:spPr>
           <a:xfrm>
             <a:off x="0" y="3365640"/>
-            <a:ext cx="1841760" cy="12960"/>
+            <a:ext cx="1842120" cy="13320"/>
           </a:xfrm>
           <a:prstGeom prst="straightConnector1">
             <a:avLst/>
@@ -13052,7 +13106,7 @@
         <p:spPr>
           <a:xfrm>
             <a:off x="673200" y="3949920"/>
-            <a:ext cx="469800" cy="374760"/>
+            <a:ext cx="469440" cy="374400"/>
           </a:xfrm>
           <a:prstGeom prst="triangle">
             <a:avLst>
@@ -13119,9 +13173,9 @@
         <p:grpSpPr>
           <a:xfrm>
             <a:off x="101160" y="1413000"/>
-            <a:ext cx="1613520" cy="777960"/>
+            <a:ext cx="1613160" cy="777960"/>
             <a:chOff x="101160" y="1413000"/>
-            <a:chExt cx="1613520" cy="777960"/>
+            <a:chExt cx="1613160" cy="777960"/>
           </a:xfrm>
         </p:grpSpPr>
         <p:sp>
@@ -13133,7 +13187,7 @@
           <p:spPr>
             <a:xfrm>
               <a:off x="101160" y="1413000"/>
-              <a:ext cx="1613520" cy="303120"/>
+              <a:ext cx="1613160" cy="303120"/>
             </a:xfrm>
             <a:prstGeom prst="rect">
               <a:avLst/>
@@ -13191,7 +13245,7 @@
           <p:spPr>
             <a:xfrm>
               <a:off x="101160" y="1674360"/>
-              <a:ext cx="1613520" cy="516600"/>
+              <a:ext cx="1613160" cy="516600"/>
             </a:xfrm>
             <a:prstGeom prst="rect">
               <a:avLst/>
@@ -13283,7 +13337,7 @@
         <p:spPr>
           <a:xfrm>
             <a:off x="4426920" y="914400"/>
-            <a:ext cx="1558800" cy="374760"/>
+            <a:ext cx="1558440" cy="374400"/>
           </a:xfrm>
           <a:prstGeom prst="diamond">
             <a:avLst/>
@@ -13350,8 +13404,8 @@
         </p:nvCxnSpPr>
         <p:spPr>
           <a:xfrm flipH="1">
-            <a:off x="5985720" y="855000"/>
-            <a:ext cx="671040" cy="247320"/>
+            <a:off x="5985360" y="855000"/>
+            <a:ext cx="671400" cy="246960"/>
           </a:xfrm>
           <a:prstGeom prst="straightConnector1">
             <a:avLst/>
@@ -13374,7 +13428,7 @@
         <p:spPr>
           <a:xfrm>
             <a:off x="6442200" y="1823040"/>
-            <a:ext cx="1787400" cy="374760"/>
+            <a:ext cx="1787040" cy="374400"/>
           </a:xfrm>
           <a:prstGeom prst="diamond">
             <a:avLst/>
@@ -13441,7 +13495,7 @@
         </p:nvCxnSpPr>
         <p:spPr>
           <a:xfrm flipV="1">
-            <a:off x="7336080" y="1220040"/>
+            <a:off x="7335720" y="1220040"/>
             <a:ext cx="127440" cy="603360"/>
           </a:xfrm>
           <a:prstGeom prst="straightConnector1">
@@ -13465,8 +13519,8 @@
         </p:nvCxnSpPr>
         <p:spPr>
           <a:xfrm flipH="1" flipV="1">
-            <a:off x="7336080" y="2197800"/>
-            <a:ext cx="282960" cy="556200"/>
+            <a:off x="7335720" y="2197440"/>
+            <a:ext cx="283680" cy="556920"/>
           </a:xfrm>
           <a:prstGeom prst="straightConnector1">
             <a:avLst/>
@@ -13489,7 +13543,7 @@
         <p:spPr>
           <a:xfrm>
             <a:off x="128520" y="6134400"/>
-            <a:ext cx="1558800" cy="374760"/>
+            <a:ext cx="1558440" cy="374400"/>
           </a:xfrm>
           <a:prstGeom prst="diamond">
             <a:avLst/>
@@ -13554,9 +13608,9 @@
         <p:grpSpPr>
           <a:xfrm>
             <a:off x="6681960" y="2743200"/>
-            <a:ext cx="1842120" cy="1216440"/>
+            <a:ext cx="1841760" cy="1216440"/>
             <a:chOff x="6681960" y="2743200"/>
-            <a:chExt cx="1842120" cy="1216440"/>
+            <a:chExt cx="1841760" cy="1216440"/>
           </a:xfrm>
         </p:grpSpPr>
         <p:sp>
@@ -13568,7 +13622,7 @@
           <p:spPr>
             <a:xfrm>
               <a:off x="6681960" y="2743200"/>
-              <a:ext cx="1842120" cy="303120"/>
+              <a:ext cx="1841760" cy="303120"/>
             </a:xfrm>
             <a:prstGeom prst="rect">
               <a:avLst/>
@@ -13625,7 +13679,7 @@
           <p:spPr>
             <a:xfrm>
               <a:off x="6681960" y="3016080"/>
-              <a:ext cx="1842120" cy="943560"/>
+              <a:ext cx="1841760" cy="943560"/>
             </a:xfrm>
             <a:prstGeom prst="rect">
               <a:avLst/>
@@ -13772,7 +13826,7 @@
         <p:spPr>
           <a:xfrm>
             <a:off x="9173520" y="3501000"/>
-            <a:ext cx="469800" cy="374760"/>
+            <a:ext cx="469440" cy="374400"/>
           </a:xfrm>
           <a:prstGeom prst="triangle">
             <a:avLst>
@@ -13839,7 +13893,7 @@
         <p:spPr>
           <a:xfrm>
             <a:off x="10218960" y="3599280"/>
-            <a:ext cx="1896120" cy="303120"/>
+            <a:ext cx="1895760" cy="303120"/>
           </a:xfrm>
           <a:prstGeom prst="rect">
             <a:avLst/>
@@ -13896,7 +13950,7 @@
         <p:spPr>
           <a:xfrm>
             <a:off x="10218960" y="3902400"/>
-            <a:ext cx="1896120" cy="1584000"/>
+            <a:ext cx="1895760" cy="1584000"/>
           </a:xfrm>
           <a:prstGeom prst="rect">
             <a:avLst/>
@@ -14104,8 +14158,8 @@
         </p:nvCxnSpPr>
         <p:spPr>
           <a:xfrm>
-            <a:off x="9525960" y="3688560"/>
-            <a:ext cx="693360" cy="1006200"/>
+            <a:off x="9525600" y="3688200"/>
+            <a:ext cx="693720" cy="1006560"/>
           </a:xfrm>
           <a:prstGeom prst="straightConnector1">
             <a:avLst/>
@@ -14129,8 +14183,8 @@
         </p:nvCxnSpPr>
         <p:spPr>
           <a:xfrm flipH="1" flipV="1">
-            <a:off x="8524080" y="3351240"/>
-            <a:ext cx="767160" cy="337680"/>
+            <a:off x="8523720" y="3351240"/>
+            <a:ext cx="767520" cy="337320"/>
           </a:xfrm>
           <a:prstGeom prst="straightConnector1">
             <a:avLst/>
@@ -14152,7 +14206,7 @@
         <p:spPr>
           <a:xfrm>
             <a:off x="2086200" y="3336840"/>
-            <a:ext cx="1613520" cy="303120"/>
+            <a:ext cx="1613160" cy="303120"/>
           </a:xfrm>
           <a:prstGeom prst="rect">
             <a:avLst/>
@@ -14209,7 +14263,7 @@
         <p:spPr>
           <a:xfrm>
             <a:off x="2086200" y="3598200"/>
-            <a:ext cx="1613520" cy="516600"/>
+            <a:ext cx="1613160" cy="516600"/>
           </a:xfrm>
           <a:prstGeom prst="rect">
             <a:avLst/>
@@ -14299,7 +14353,7 @@
         <p:spPr>
           <a:xfrm>
             <a:off x="2086200" y="3336840"/>
-            <a:ext cx="1613520" cy="303120"/>
+            <a:ext cx="1613160" cy="303120"/>
           </a:xfrm>
           <a:prstGeom prst="rect">
             <a:avLst/>
@@ -14356,7 +14410,7 @@
         <p:spPr>
           <a:xfrm>
             <a:off x="2086200" y="3598200"/>
-            <a:ext cx="1613520" cy="943560"/>
+            <a:ext cx="1613160" cy="943560"/>
           </a:xfrm>
           <a:prstGeom prst="rect">
             <a:avLst/>
@@ -14500,7 +14554,7 @@
         <p:spPr>
           <a:xfrm>
             <a:off x="1883160" y="2514600"/>
-            <a:ext cx="1816560" cy="374760"/>
+            <a:ext cx="1816200" cy="374400"/>
           </a:xfrm>
           <a:prstGeom prst="diamond">
             <a:avLst/>
@@ -14565,7 +14619,7 @@
         <p:spPr>
           <a:xfrm>
             <a:off x="3481560" y="2899800"/>
-            <a:ext cx="1587960" cy="374760"/>
+            <a:ext cx="1587600" cy="374400"/>
           </a:xfrm>
           <a:prstGeom prst="ellipse">
             <a:avLst/>
@@ -14652,8 +14706,8 @@
         </p:nvCxnSpPr>
         <p:spPr>
           <a:xfrm>
-            <a:off x="3699720" y="2702160"/>
-            <a:ext cx="576360" cy="198000"/>
+            <a:off x="3699360" y="2701800"/>
+            <a:ext cx="576360" cy="198360"/>
           </a:xfrm>
           <a:prstGeom prst="straightConnector1">
             <a:avLst/>
@@ -14677,8 +14731,8 @@
         </p:nvCxnSpPr>
         <p:spPr>
           <a:xfrm flipH="1" flipV="1">
-            <a:off x="2791440" y="2889360"/>
-            <a:ext cx="101880" cy="447840"/>
+            <a:off x="2791440" y="2889000"/>
+            <a:ext cx="101520" cy="448200"/>
           </a:xfrm>
           <a:prstGeom prst="straightConnector1">
             <a:avLst/>
@@ -14702,8 +14756,8 @@
         </p:nvCxnSpPr>
         <p:spPr>
           <a:xfrm flipV="1">
-            <a:off x="2791440" y="2073960"/>
-            <a:ext cx="557280" cy="441000"/>
+            <a:off x="2791440" y="1861200"/>
+            <a:ext cx="556920" cy="653760"/>
           </a:xfrm>
           <a:prstGeom prst="straightConnector1">
             <a:avLst/>
@@ -14725,7 +14779,7 @@
         <p:spPr>
           <a:xfrm>
             <a:off x="10543680" y="457200"/>
-            <a:ext cx="1613520" cy="303120"/>
+            <a:ext cx="1613160" cy="303120"/>
           </a:xfrm>
           <a:prstGeom prst="rect">
             <a:avLst/>
@@ -14782,7 +14836,7 @@
         <p:spPr>
           <a:xfrm>
             <a:off x="10543680" y="718560"/>
-            <a:ext cx="1613520" cy="516600"/>
+            <a:ext cx="1613160" cy="516600"/>
           </a:xfrm>
           <a:prstGeom prst="rect">
             <a:avLst/>
@@ -14872,7 +14926,7 @@
         <p:spPr>
           <a:xfrm>
             <a:off x="10287000" y="457200"/>
-            <a:ext cx="1613520" cy="303120"/>
+            <a:ext cx="1613160" cy="303120"/>
           </a:xfrm>
           <a:prstGeom prst="rect">
             <a:avLst/>
@@ -14929,7 +14983,7 @@
         <p:spPr>
           <a:xfrm>
             <a:off x="10287000" y="718560"/>
-            <a:ext cx="1870200" cy="2651400"/>
+            <a:ext cx="1869840" cy="2651400"/>
           </a:xfrm>
           <a:prstGeom prst="rect">
             <a:avLst/>
@@ -15263,7 +15317,7 @@
         <p:spPr>
           <a:xfrm>
             <a:off x="8007120" y="1448280"/>
-            <a:ext cx="2045520" cy="374760"/>
+            <a:ext cx="2045160" cy="374400"/>
           </a:xfrm>
           <a:prstGeom prst="diamond">
             <a:avLst/>
@@ -15330,8 +15384,8 @@
         </p:nvCxnSpPr>
         <p:spPr>
           <a:xfrm>
-            <a:off x="9029880" y="1823040"/>
-            <a:ext cx="1189440" cy="2871720"/>
+            <a:off x="9029880" y="1822680"/>
+            <a:ext cx="1189440" cy="2872080"/>
           </a:xfrm>
           <a:prstGeom prst="straightConnector1">
             <a:avLst/>
@@ -15355,8 +15409,8 @@
         </p:nvCxnSpPr>
         <p:spPr>
           <a:xfrm flipH="1" flipV="1">
-            <a:off x="10052640" y="1635840"/>
-            <a:ext cx="234720" cy="408600"/>
+            <a:off x="10052280" y="1635480"/>
+            <a:ext cx="235080" cy="408960"/>
           </a:xfrm>
           <a:prstGeom prst="straightConnector1">
             <a:avLst/>
@@ -15380,8 +15434,8 @@
         </p:nvCxnSpPr>
         <p:spPr>
           <a:xfrm flipH="1" flipV="1">
-            <a:off x="7463160" y="1220040"/>
-            <a:ext cx="1567080" cy="228600"/>
+            <a:off x="7462800" y="1220040"/>
+            <a:ext cx="1567440" cy="228600"/>
           </a:xfrm>
           <a:prstGeom prst="straightConnector1">
             <a:avLst/>
@@ -15405,8 +15459,8 @@
         </p:nvCxnSpPr>
         <p:spPr>
           <a:xfrm flipH="1" flipV="1">
-            <a:off x="3348360" y="2073960"/>
-            <a:ext cx="1008000" cy="212400"/>
+            <a:off x="3348000" y="1861200"/>
+            <a:ext cx="1008360" cy="425160"/>
           </a:xfrm>
           <a:prstGeom prst="straightConnector1">
             <a:avLst/>
@@ -15428,7 +15482,7 @@
         <p:spPr>
           <a:xfrm>
             <a:off x="4356000" y="1949040"/>
-            <a:ext cx="1816200" cy="673920"/>
+            <a:ext cx="1815840" cy="673560"/>
           </a:xfrm>
           <a:prstGeom prst="diamond">
             <a:avLst/>
@@ -15495,8 +15549,8 @@
         </p:nvCxnSpPr>
         <p:spPr>
           <a:xfrm flipH="1" flipV="1">
-            <a:off x="5264280" y="2622960"/>
-            <a:ext cx="17280" cy="1949400"/>
+            <a:off x="5263920" y="2622600"/>
+            <a:ext cx="17640" cy="1949760"/>
           </a:xfrm>
           <a:prstGeom prst="straightConnector1">
             <a:avLst/>
@@ -15520,8 +15574,8 @@
         </p:nvCxnSpPr>
         <p:spPr>
           <a:xfrm flipH="1">
-            <a:off x="4155120" y="1101960"/>
-            <a:ext cx="272160" cy="180360"/>
+            <a:off x="4154760" y="1101600"/>
+            <a:ext cx="272520" cy="74160"/>
           </a:xfrm>
           <a:prstGeom prst="straightConnector1">
             <a:avLst/>
@@ -15543,7 +15597,7 @@
         <p:spPr>
           <a:xfrm flipH="1">
             <a:off x="0" y="3657600"/>
-            <a:ext cx="1841760" cy="12960"/>
+            <a:ext cx="1842120" cy="13320"/>
           </a:xfrm>
           <a:prstGeom prst="straightConnector1">
             <a:avLst/>
@@ -15565,7 +15619,7 @@
         <p:spPr>
           <a:xfrm>
             <a:off x="8686800" y="532800"/>
-            <a:ext cx="1364760" cy="374760"/>
+            <a:ext cx="1364400" cy="374400"/>
           </a:xfrm>
           <a:prstGeom prst="ellipse">
             <a:avLst/>
@@ -15630,8 +15684,8 @@
         </p:nvCxnSpPr>
         <p:spPr>
           <a:xfrm flipH="1">
-            <a:off x="9029880" y="907560"/>
-            <a:ext cx="339840" cy="541080"/>
+            <a:off x="9029880" y="907200"/>
+            <a:ext cx="339480" cy="541440"/>
           </a:xfrm>
           <a:prstGeom prst="straightConnector1">
             <a:avLst/>
@@ -15653,7 +15707,7 @@
         <p:spPr>
           <a:xfrm>
             <a:off x="4343400" y="4572000"/>
-            <a:ext cx="1875600" cy="374760"/>
+            <a:ext cx="1875240" cy="374400"/>
           </a:xfrm>
           <a:prstGeom prst="ellipse">
             <a:avLst/>
@@ -15718,8 +15772,8 @@
         </p:nvCxnSpPr>
         <p:spPr>
           <a:xfrm flipV="1">
-            <a:off x="6172200" y="855000"/>
-            <a:ext cx="484560" cy="1431360"/>
+            <a:off x="6171840" y="855000"/>
+            <a:ext cx="484920" cy="1431360"/>
           </a:xfrm>
           <a:prstGeom prst="straightConnector1">
             <a:avLst/>
@@ -15771,7 +15825,7 @@
         <p:spPr>
           <a:xfrm flipH="1">
             <a:off x="0" y="3073320"/>
-            <a:ext cx="1841760" cy="12960"/>
+            <a:ext cx="1842120" cy="13320"/>
           </a:xfrm>
           <a:prstGeom prst="straightConnector1">
             <a:avLst/>
@@ -15794,7 +15848,7 @@
         <p:spPr>
           <a:xfrm>
             <a:off x="0" y="2489400"/>
-            <a:ext cx="1841760" cy="12960"/>
+            <a:ext cx="1842120" cy="13320"/>
           </a:xfrm>
           <a:prstGeom prst="straightConnector1">
             <a:avLst/>
@@ -15817,7 +15871,7 @@
         <p:spPr>
           <a:xfrm>
             <a:off x="0" y="2781360"/>
-            <a:ext cx="1841760" cy="12960"/>
+            <a:ext cx="1842120" cy="13320"/>
           </a:xfrm>
           <a:prstGeom prst="straightConnector1">
             <a:avLst/>
@@ -15840,7 +15894,7 @@
         <p:spPr>
           <a:xfrm flipH="1">
             <a:off x="0" y="3657600"/>
-            <a:ext cx="1841760" cy="12960"/>
+            <a:ext cx="1842120" cy="13320"/>
           </a:xfrm>
           <a:prstGeom prst="straightConnector1">
             <a:avLst/>
@@ -15862,7 +15916,7 @@
         <p:spPr>
           <a:xfrm>
             <a:off x="128520" y="6134040"/>
-            <a:ext cx="1558800" cy="374760"/>
+            <a:ext cx="1558440" cy="374400"/>
           </a:xfrm>
           <a:prstGeom prst="diamond">
             <a:avLst/>
@@ -15927,7 +15981,7 @@
         <p:spPr>
           <a:xfrm>
             <a:off x="302760" y="5454000"/>
-            <a:ext cx="1210320" cy="374760"/>
+            <a:ext cx="1209960" cy="374400"/>
           </a:xfrm>
           <a:prstGeom prst="ellipse">
             <a:avLst/>
@@ -15990,9 +16044,9 @@
         <p:grpSpPr>
           <a:xfrm>
             <a:off x="101160" y="336240"/>
-            <a:ext cx="1613520" cy="777960"/>
+            <a:ext cx="1613160" cy="777960"/>
             <a:chOff x="101160" y="336240"/>
-            <a:chExt cx="1613520" cy="777960"/>
+            <a:chExt cx="1613160" cy="777960"/>
           </a:xfrm>
         </p:grpSpPr>
         <p:sp>
@@ -16004,7 +16058,7 @@
           <p:spPr>
             <a:xfrm>
               <a:off x="101160" y="336240"/>
-              <a:ext cx="1613520" cy="303120"/>
+              <a:ext cx="1613160" cy="303120"/>
             </a:xfrm>
             <a:prstGeom prst="rect">
               <a:avLst/>
@@ -16061,7 +16115,7 @@
           <p:spPr>
             <a:xfrm>
               <a:off x="101160" y="597600"/>
-              <a:ext cx="1613520" cy="516600"/>
+              <a:ext cx="1613160" cy="516600"/>
             </a:xfrm>
             <a:prstGeom prst="rect">
               <a:avLst/>
@@ -16152,7 +16206,7 @@
         <p:spPr>
           <a:xfrm>
             <a:off x="128520" y="4629600"/>
-            <a:ext cx="1558800" cy="519480"/>
+            <a:ext cx="1558440" cy="519120"/>
           </a:xfrm>
           <a:prstGeom prst="diamond">
             <a:avLst/>
@@ -16240,7 +16294,7 @@
         <p:spPr>
           <a:xfrm>
             <a:off x="0" y="3365640"/>
-            <a:ext cx="1841760" cy="12960"/>
+            <a:ext cx="1842120" cy="13320"/>
           </a:xfrm>
           <a:prstGeom prst="straightConnector1">
             <a:avLst/>
@@ -16262,7 +16316,7 @@
         <p:spPr>
           <a:xfrm>
             <a:off x="673200" y="3949920"/>
-            <a:ext cx="469800" cy="374760"/>
+            <a:ext cx="469440" cy="374400"/>
           </a:xfrm>
           <a:prstGeom prst="triangle">
             <a:avLst>
@@ -16329,9 +16383,9 @@
         <p:grpSpPr>
           <a:xfrm>
             <a:off x="101160" y="1413000"/>
-            <a:ext cx="1613520" cy="777960"/>
+            <a:ext cx="1613160" cy="777960"/>
             <a:chOff x="101160" y="1413000"/>
-            <a:chExt cx="1613520" cy="777960"/>
+            <a:chExt cx="1613160" cy="777960"/>
           </a:xfrm>
         </p:grpSpPr>
         <p:sp>
@@ -16343,7 +16397,7 @@
           <p:spPr>
             <a:xfrm>
               <a:off x="101160" y="1413000"/>
-              <a:ext cx="1613520" cy="303120"/>
+              <a:ext cx="1613160" cy="303120"/>
             </a:xfrm>
             <a:prstGeom prst="rect">
               <a:avLst/>
@@ -16401,7 +16455,7 @@
           <p:spPr>
             <a:xfrm>
               <a:off x="101160" y="1674360"/>
-              <a:ext cx="1613520" cy="516600"/>
+              <a:ext cx="1613160" cy="516600"/>
             </a:xfrm>
             <a:prstGeom prst="rect">
               <a:avLst/>
@@ -16493,7 +16547,7 @@
         <p:spPr>
           <a:xfrm>
             <a:off x="4775040" y="457200"/>
-            <a:ext cx="1613520" cy="303120"/>
+            <a:ext cx="1613160" cy="303120"/>
           </a:xfrm>
           <a:prstGeom prst="rect">
             <a:avLst/>
@@ -16550,7 +16604,7 @@
         <p:spPr>
           <a:xfrm>
             <a:off x="4775040" y="718560"/>
-            <a:ext cx="1613520" cy="730080"/>
+            <a:ext cx="1613160" cy="730080"/>
           </a:xfrm>
           <a:prstGeom prst="rect">
             <a:avLst/>
@@ -16667,9 +16721,9 @@
         <p:grpSpPr>
           <a:xfrm>
             <a:off x="4572000" y="4274280"/>
-            <a:ext cx="1613520" cy="991440"/>
+            <a:ext cx="1613160" cy="991440"/>
             <a:chOff x="4572000" y="4274280"/>
-            <a:chExt cx="1613520" cy="991440"/>
+            <a:chExt cx="1613160" cy="991440"/>
           </a:xfrm>
         </p:grpSpPr>
         <p:sp>
@@ -16681,7 +16735,7 @@
           <p:spPr>
             <a:xfrm>
               <a:off x="4572000" y="4274280"/>
-              <a:ext cx="1613520" cy="303120"/>
+              <a:ext cx="1613160" cy="303120"/>
             </a:xfrm>
             <a:prstGeom prst="rect">
               <a:avLst/>
@@ -16738,7 +16792,7 @@
           <p:spPr>
             <a:xfrm>
               <a:off x="4572000" y="4535640"/>
-              <a:ext cx="1613520" cy="730080"/>
+              <a:ext cx="1613160" cy="730080"/>
             </a:xfrm>
             <a:prstGeom prst="rect">
               <a:avLst/>
@@ -16856,7 +16910,7 @@
         <p:spPr>
           <a:xfrm>
             <a:off x="3231360" y="2899800"/>
-            <a:ext cx="1558800" cy="374760"/>
+            <a:ext cx="1558440" cy="374400"/>
           </a:xfrm>
           <a:prstGeom prst="diamond">
             <a:avLst/>
@@ -16921,7 +16975,7 @@
         <p:spPr>
           <a:xfrm>
             <a:off x="4602960" y="2585160"/>
-            <a:ext cx="1787400" cy="376200"/>
+            <a:ext cx="1787040" cy="375840"/>
           </a:xfrm>
           <a:prstGeom prst="diamond">
             <a:avLst/>
@@ -16988,8 +17042,8 @@
         </p:nvCxnSpPr>
         <p:spPr>
           <a:xfrm flipH="1" flipV="1">
-            <a:off x="4010760" y="3274560"/>
-            <a:ext cx="1368360" cy="1000080"/>
+            <a:off x="4010760" y="3274200"/>
+            <a:ext cx="1368000" cy="1000440"/>
           </a:xfrm>
           <a:prstGeom prst="straightConnector1">
             <a:avLst/>
@@ -17014,7 +17068,7 @@
         </p:nvCxnSpPr>
         <p:spPr>
           <a:xfrm flipV="1">
-            <a:off x="5496840" y="1448640"/>
+            <a:off x="5496480" y="1448640"/>
             <a:ext cx="85320" cy="1136880"/>
           </a:xfrm>
           <a:prstGeom prst="straightConnector1">
@@ -17039,8 +17093,8 @@
         </p:nvCxnSpPr>
         <p:spPr>
           <a:xfrm flipV="1">
-            <a:off x="5378760" y="2961360"/>
-            <a:ext cx="118440" cy="1313280"/>
+            <a:off x="5378400" y="2961000"/>
+            <a:ext cx="118440" cy="1313640"/>
           </a:xfrm>
           <a:prstGeom prst="straightConnector1">
             <a:avLst/>
@@ -17065,7 +17119,7 @@
         <p:spPr>
           <a:xfrm flipH="1">
             <a:off x="4010760" y="1448640"/>
-            <a:ext cx="1571400" cy="1451520"/>
+            <a:ext cx="1571040" cy="1451520"/>
           </a:xfrm>
           <a:prstGeom prst="straightConnector1">
             <a:avLst/>
@@ -17087,7 +17141,7 @@
         <p:spPr>
           <a:xfrm>
             <a:off x="2743200" y="457200"/>
-            <a:ext cx="1558800" cy="374760"/>
+            <a:ext cx="1558440" cy="374400"/>
           </a:xfrm>
           <a:prstGeom prst="diamond">
             <a:avLst/>
@@ -17154,8 +17208,8 @@
         </p:nvCxnSpPr>
         <p:spPr>
           <a:xfrm flipH="1" flipV="1">
-            <a:off x="4302000" y="644760"/>
-            <a:ext cx="473400" cy="439200"/>
+            <a:off x="4301640" y="644400"/>
+            <a:ext cx="473760" cy="439560"/>
           </a:xfrm>
           <a:prstGeom prst="straightConnector1">
             <a:avLst/>
@@ -17179,8 +17233,8 @@
         </p:nvCxnSpPr>
         <p:spPr>
           <a:xfrm flipH="1" flipV="1">
-            <a:off x="3522600" y="831960"/>
-            <a:ext cx="1252800" cy="252000"/>
+            <a:off x="3522600" y="831600"/>
+            <a:ext cx="1252800" cy="252360"/>
           </a:xfrm>
           <a:prstGeom prst="straightConnector1">
             <a:avLst/>
@@ -17202,9 +17256,9 @@
         <p:grpSpPr>
           <a:xfrm>
             <a:off x="8686800" y="837360"/>
-            <a:ext cx="1613520" cy="991440"/>
+            <a:ext cx="1613160" cy="991440"/>
             <a:chOff x="8686800" y="837360"/>
-            <a:chExt cx="1613520" cy="991440"/>
+            <a:chExt cx="1613160" cy="991440"/>
           </a:xfrm>
         </p:grpSpPr>
         <p:sp>
@@ -17216,7 +17270,7 @@
           <p:spPr>
             <a:xfrm>
               <a:off x="8686800" y="837360"/>
-              <a:ext cx="1613520" cy="303120"/>
+              <a:ext cx="1613160" cy="303120"/>
             </a:xfrm>
             <a:prstGeom prst="rect">
               <a:avLst/>
@@ -17273,7 +17327,7 @@
           <p:spPr>
             <a:xfrm>
               <a:off x="8686800" y="1098720"/>
-              <a:ext cx="1613520" cy="730080"/>
+              <a:ext cx="1613160" cy="730080"/>
             </a:xfrm>
             <a:prstGeom prst="rect">
               <a:avLst/>
@@ -17391,7 +17445,7 @@
         <p:spPr>
           <a:xfrm>
             <a:off x="128880" y="6134040"/>
-            <a:ext cx="1558800" cy="374760"/>
+            <a:ext cx="1558440" cy="374400"/>
           </a:xfrm>
           <a:prstGeom prst="diamond">
             <a:avLst/>
@@ -17456,7 +17510,7 @@
         <p:spPr>
           <a:xfrm>
             <a:off x="7315200" y="228600"/>
-            <a:ext cx="1558800" cy="374760"/>
+            <a:ext cx="1558440" cy="374400"/>
           </a:xfrm>
           <a:prstGeom prst="diamond">
             <a:avLst/>
@@ -17521,7 +17575,7 @@
         <p:spPr>
           <a:xfrm>
             <a:off x="360" y="3366000"/>
-            <a:ext cx="1841760" cy="12960"/>
+            <a:ext cx="1842120" cy="13320"/>
           </a:xfrm>
           <a:prstGeom prst="straightConnector1">
             <a:avLst/>
@@ -17545,8 +17599,8 @@
         </p:nvCxnSpPr>
         <p:spPr>
           <a:xfrm flipH="1">
-            <a:off x="6388560" y="416160"/>
-            <a:ext cx="927000" cy="667800"/>
+            <a:off x="6388200" y="415800"/>
+            <a:ext cx="927360" cy="668160"/>
           </a:xfrm>
           <a:prstGeom prst="straightConnector1">
             <a:avLst/>
@@ -17568,7 +17622,7 @@
         <p:spPr>
           <a:xfrm>
             <a:off x="6629400" y="1442160"/>
-            <a:ext cx="1818000" cy="604440"/>
+            <a:ext cx="1817640" cy="604080"/>
           </a:xfrm>
           <a:prstGeom prst="diamond">
             <a:avLst/>
@@ -17635,8 +17689,8 @@
         </p:nvCxnSpPr>
         <p:spPr>
           <a:xfrm flipH="1" flipV="1">
-            <a:off x="8874000" y="416160"/>
-            <a:ext cx="619920" cy="421560"/>
+            <a:off x="8873640" y="415800"/>
+            <a:ext cx="619920" cy="421920"/>
           </a:xfrm>
           <a:prstGeom prst="straightConnector1">
             <a:avLst/>
@@ -17659,7 +17713,7 @@
         <p:spPr>
           <a:xfrm>
             <a:off x="6629400" y="2514600"/>
-            <a:ext cx="1558800" cy="374760"/>
+            <a:ext cx="1558440" cy="374400"/>
           </a:xfrm>
           <a:prstGeom prst="diamond">
             <a:avLst/>
@@ -17726,8 +17780,8 @@
         </p:nvCxnSpPr>
         <p:spPr>
           <a:xfrm flipH="1">
-            <a:off x="8188200" y="1828800"/>
-            <a:ext cx="1305720" cy="873720"/>
+            <a:off x="8187840" y="1828800"/>
+            <a:ext cx="1305720" cy="873360"/>
           </a:xfrm>
           <a:prstGeom prst="straightConnector1">
             <a:avLst/>
@@ -17751,8 +17805,8 @@
         </p:nvCxnSpPr>
         <p:spPr>
           <a:xfrm flipH="1">
-            <a:off x="6185520" y="2702160"/>
-            <a:ext cx="444240" cy="2068200"/>
+            <a:off x="6185160" y="2701800"/>
+            <a:ext cx="444600" cy="2068560"/>
           </a:xfrm>
           <a:prstGeom prst="straightConnector1">
             <a:avLst/>
@@ -17776,8 +17830,8 @@
         </p:nvCxnSpPr>
         <p:spPr>
           <a:xfrm flipH="1">
-            <a:off x="8447400" y="1333080"/>
-            <a:ext cx="239760" cy="411840"/>
+            <a:off x="8447040" y="1333080"/>
+            <a:ext cx="240120" cy="411480"/>
           </a:xfrm>
           <a:prstGeom prst="straightConnector1">
             <a:avLst/>
@@ -17801,8 +17855,8 @@
         </p:nvCxnSpPr>
         <p:spPr>
           <a:xfrm flipH="1" flipV="1">
-            <a:off x="5581800" y="1448640"/>
-            <a:ext cx="1047960" cy="296280"/>
+            <a:off x="5581440" y="1448640"/>
+            <a:ext cx="1048320" cy="295920"/>
           </a:xfrm>
           <a:prstGeom prst="straightConnector1">
             <a:avLst/>
@@ -17824,9 +17878,9 @@
         <p:grpSpPr>
           <a:xfrm>
             <a:off x="101160" y="336240"/>
-            <a:ext cx="1613520" cy="777960"/>
+            <a:ext cx="1613160" cy="777960"/>
             <a:chOff x="101160" y="336240"/>
-            <a:chExt cx="1613520" cy="777960"/>
+            <a:chExt cx="1613160" cy="777960"/>
           </a:xfrm>
         </p:grpSpPr>
         <p:sp>
@@ -17838,7 +17892,7 @@
           <p:spPr>
             <a:xfrm>
               <a:off x="101160" y="336240"/>
-              <a:ext cx="1613520" cy="303120"/>
+              <a:ext cx="1613160" cy="303120"/>
             </a:xfrm>
             <a:prstGeom prst="rect">
               <a:avLst/>
@@ -17895,7 +17949,7 @@
           <p:spPr>
             <a:xfrm>
               <a:off x="101160" y="597600"/>
-              <a:ext cx="1613520" cy="516600"/>
+              <a:ext cx="1613160" cy="516600"/>
             </a:xfrm>
             <a:prstGeom prst="rect">
               <a:avLst/>
@@ -17986,7 +18040,7 @@
         <p:spPr>
           <a:xfrm>
             <a:off x="9144000" y="2057400"/>
-            <a:ext cx="469800" cy="374760"/>
+            <a:ext cx="469440" cy="374400"/>
           </a:xfrm>
           <a:prstGeom prst="triangle">
             <a:avLst>
@@ -18054,8 +18108,8 @@
         </p:nvCxnSpPr>
         <p:spPr>
           <a:xfrm flipV="1">
-            <a:off x="9036720" y="4104000"/>
-            <a:ext cx="420120" cy="543600"/>
+            <a:off x="9036720" y="4103640"/>
+            <a:ext cx="419760" cy="544320"/>
           </a:xfrm>
           <a:prstGeom prst="straightConnector1">
             <a:avLst/>
@@ -18078,8 +18132,8 @@
         </p:nvCxnSpPr>
         <p:spPr>
           <a:xfrm flipH="1">
-            <a:off x="9346320" y="2432160"/>
-            <a:ext cx="33120" cy="458280"/>
+            <a:off x="9346320" y="2431800"/>
+            <a:ext cx="32760" cy="459000"/>
           </a:xfrm>
           <a:prstGeom prst="straightConnector1">
             <a:avLst/>
@@ -18103,7 +18157,7 @@
         </p:nvCxnSpPr>
         <p:spPr>
           <a:xfrm flipH="1">
-            <a:off x="9379080" y="1828800"/>
+            <a:off x="9378720" y="1828800"/>
             <a:ext cx="114840" cy="228960"/>
           </a:xfrm>
           <a:prstGeom prst="straightConnector1">
@@ -18126,7 +18180,7 @@
         <p:spPr>
           <a:xfrm flipH="1">
             <a:off x="0" y="3657600"/>
-            <a:ext cx="1841760" cy="12960"/>
+            <a:ext cx="1842120" cy="13320"/>
           </a:xfrm>
           <a:prstGeom prst="straightConnector1">
             <a:avLst/>
@@ -18148,9 +18202,9 @@
         <p:grpSpPr>
           <a:xfrm>
             <a:off x="8534520" y="2879640"/>
-            <a:ext cx="1613520" cy="554400"/>
+            <a:ext cx="1613160" cy="554040"/>
             <a:chOff x="8534520" y="2879640"/>
-            <a:chExt cx="1613520" cy="554400"/>
+            <a:chExt cx="1613160" cy="554040"/>
           </a:xfrm>
         </p:grpSpPr>
         <p:sp>
@@ -18162,7 +18216,7 @@
           <p:spPr>
             <a:xfrm>
               <a:off x="8534520" y="2879640"/>
-              <a:ext cx="1613520" cy="303120"/>
+              <a:ext cx="1613160" cy="303120"/>
             </a:xfrm>
             <a:prstGeom prst="rect">
               <a:avLst/>
@@ -18219,7 +18273,7 @@
           <p:spPr>
             <a:xfrm>
               <a:off x="8534520" y="3141000"/>
-              <a:ext cx="1613520" cy="293040"/>
+              <a:ext cx="1613160" cy="292680"/>
             </a:xfrm>
             <a:prstGeom prst="rect">
               <a:avLst/>
@@ -18268,9 +18322,9 @@
         <p:grpSpPr>
           <a:xfrm>
             <a:off x="8534520" y="2879640"/>
-            <a:ext cx="1613520" cy="564480"/>
+            <a:ext cx="1613160" cy="564480"/>
             <a:chOff x="8534520" y="2879640"/>
-            <a:chExt cx="1613520" cy="564480"/>
+            <a:chExt cx="1613160" cy="564480"/>
           </a:xfrm>
         </p:grpSpPr>
         <p:sp>
@@ -18282,7 +18336,7 @@
           <p:spPr>
             <a:xfrm>
               <a:off x="8534520" y="2879640"/>
-              <a:ext cx="1613520" cy="303120"/>
+              <a:ext cx="1613160" cy="303120"/>
             </a:xfrm>
             <a:prstGeom prst="rect">
               <a:avLst/>
@@ -18339,7 +18393,7 @@
           <p:spPr>
             <a:xfrm>
               <a:off x="8534520" y="3141000"/>
-              <a:ext cx="1613520" cy="303120"/>
+              <a:ext cx="1613160" cy="303120"/>
             </a:xfrm>
             <a:prstGeom prst="rect">
               <a:avLst/>
@@ -18402,7 +18456,7 @@
         <p:spPr>
           <a:xfrm>
             <a:off x="9221400" y="3729240"/>
-            <a:ext cx="469800" cy="374760"/>
+            <a:ext cx="469440" cy="374400"/>
           </a:xfrm>
           <a:prstGeom prst="triangle">
             <a:avLst>
@@ -18471,7 +18525,7 @@
         </p:nvCxnSpPr>
         <p:spPr>
           <a:xfrm>
-            <a:off x="9341280" y="3444120"/>
+            <a:off x="9340920" y="3444120"/>
             <a:ext cx="115560" cy="285480"/>
           </a:xfrm>
           <a:prstGeom prst="straightConnector1">
@@ -18494,7 +18548,7 @@
         <p:spPr>
           <a:xfrm>
             <a:off x="8556840" y="3657600"/>
-            <a:ext cx="1841760" cy="12960"/>
+            <a:ext cx="1842120" cy="13320"/>
           </a:xfrm>
           <a:prstGeom prst="straightConnector1">
             <a:avLst/>
@@ -18517,7 +18571,7 @@
         <p:spPr>
           <a:xfrm>
             <a:off x="9601200" y="3382920"/>
-            <a:ext cx="903600" cy="335520"/>
+            <a:ext cx="903240" cy="335160"/>
           </a:xfrm>
           <a:prstGeom prst="rect">
             <a:avLst/>
@@ -18570,9 +18624,9 @@
         <p:grpSpPr>
           <a:xfrm>
             <a:off x="10265040" y="5029200"/>
-            <a:ext cx="1613520" cy="554040"/>
+            <a:ext cx="1613160" cy="553680"/>
             <a:chOff x="10265040" y="5029200"/>
-            <a:chExt cx="1613520" cy="554040"/>
+            <a:chExt cx="1613160" cy="553680"/>
           </a:xfrm>
         </p:grpSpPr>
         <p:sp>
@@ -18584,7 +18638,7 @@
           <p:spPr>
             <a:xfrm>
               <a:off x="10265040" y="5029200"/>
-              <a:ext cx="1613520" cy="303120"/>
+              <a:ext cx="1613160" cy="303120"/>
             </a:xfrm>
             <a:prstGeom prst="rect">
               <a:avLst/>
@@ -18641,7 +18695,7 @@
           <p:spPr>
             <a:xfrm>
               <a:off x="10265040" y="5290560"/>
-              <a:ext cx="1613520" cy="292680"/>
+              <a:ext cx="1613160" cy="292320"/>
             </a:xfrm>
             <a:prstGeom prst="rect">
               <a:avLst/>
@@ -18692,8 +18746,8 @@
         </p:nvCxnSpPr>
         <p:spPr>
           <a:xfrm flipH="1" flipV="1">
-            <a:off x="9691200" y="4104000"/>
-            <a:ext cx="1380960" cy="925560"/>
+            <a:off x="9690840" y="4103640"/>
+            <a:ext cx="1380960" cy="925920"/>
           </a:xfrm>
           <a:prstGeom prst="straightConnector1">
             <a:avLst/>
@@ -18715,9 +18769,9 @@
         <p:grpSpPr>
           <a:xfrm>
             <a:off x="8229600" y="4646520"/>
-            <a:ext cx="1613520" cy="554040"/>
+            <a:ext cx="1613160" cy="553680"/>
             <a:chOff x="8229600" y="4646520"/>
-            <a:chExt cx="1613520" cy="554040"/>
+            <a:chExt cx="1613160" cy="553680"/>
           </a:xfrm>
         </p:grpSpPr>
         <p:sp>
@@ -18729,7 +18783,7 @@
           <p:spPr>
             <a:xfrm>
               <a:off x="8229600" y="4646520"/>
-              <a:ext cx="1613520" cy="303120"/>
+              <a:ext cx="1613160" cy="303120"/>
             </a:xfrm>
             <a:prstGeom prst="rect">
               <a:avLst/>
@@ -18786,7 +18840,7 @@
           <p:spPr>
             <a:xfrm>
               <a:off x="8229600" y="4907880"/>
-              <a:ext cx="1613520" cy="292680"/>
+              <a:ext cx="1613160" cy="292320"/>
             </a:xfrm>
             <a:prstGeom prst="rect">
               <a:avLst/>
@@ -18835,7 +18889,7 @@
         <p:spPr>
           <a:xfrm>
             <a:off x="10037520" y="2131560"/>
-            <a:ext cx="469800" cy="374760"/>
+            <a:ext cx="469440" cy="374400"/>
           </a:xfrm>
           <a:prstGeom prst="triangle">
             <a:avLst>
@@ -18904,7 +18958,7 @@
         </p:nvCxnSpPr>
         <p:spPr>
           <a:xfrm>
-            <a:off x="9493560" y="1828800"/>
+            <a:off x="9493200" y="1828800"/>
             <a:ext cx="779400" cy="303120"/>
           </a:xfrm>
           <a:prstGeom prst="straightConnector1">
@@ -18927,9 +18981,9 @@
         <p:grpSpPr>
           <a:xfrm>
             <a:off x="10494000" y="2866680"/>
-            <a:ext cx="1613520" cy="554040"/>
+            <a:ext cx="1613160" cy="553680"/>
             <a:chOff x="10494000" y="2866680"/>
-            <a:chExt cx="1613520" cy="554040"/>
+            <a:chExt cx="1613160" cy="553680"/>
           </a:xfrm>
         </p:grpSpPr>
         <p:sp>
@@ -18941,7 +18995,7 @@
           <p:spPr>
             <a:xfrm>
               <a:off x="10494000" y="2866680"/>
-              <a:ext cx="1613520" cy="303120"/>
+              <a:ext cx="1613160" cy="303120"/>
             </a:xfrm>
             <a:prstGeom prst="rect">
               <a:avLst/>
@@ -18998,7 +19052,7 @@
           <p:spPr>
             <a:xfrm>
               <a:off x="10494000" y="3128040"/>
-              <a:ext cx="1613520" cy="292680"/>
+              <a:ext cx="1613160" cy="292320"/>
             </a:xfrm>
             <a:prstGeom prst="rect">
               <a:avLst/>
@@ -19049,8 +19103,8 @@
         </p:nvCxnSpPr>
         <p:spPr>
           <a:xfrm>
-            <a:off x="10272600" y="2506320"/>
-            <a:ext cx="1028520" cy="360720"/>
+            <a:off x="10272240" y="2505960"/>
+            <a:ext cx="1028520" cy="361080"/>
           </a:xfrm>
           <a:prstGeom prst="straightConnector1">
             <a:avLst/>
@@ -19102,7 +19156,7 @@
         <p:spPr>
           <a:xfrm flipH="1">
             <a:off x="0" y="3073320"/>
-            <a:ext cx="1841760" cy="12960"/>
+            <a:ext cx="1842120" cy="13320"/>
           </a:xfrm>
           <a:prstGeom prst="straightConnector1">
             <a:avLst/>
@@ -19125,7 +19179,7 @@
         <p:spPr>
           <a:xfrm>
             <a:off x="0" y="2489400"/>
-            <a:ext cx="1841760" cy="12960"/>
+            <a:ext cx="1842120" cy="13320"/>
           </a:xfrm>
           <a:prstGeom prst="straightConnector1">
             <a:avLst/>
@@ -19148,7 +19202,7 @@
         <p:spPr>
           <a:xfrm>
             <a:off x="0" y="2781360"/>
-            <a:ext cx="1841760" cy="12960"/>
+            <a:ext cx="1842120" cy="13320"/>
           </a:xfrm>
           <a:prstGeom prst="straightConnector1">
             <a:avLst/>
@@ -19171,7 +19225,7 @@
         <p:spPr>
           <a:xfrm flipH="1">
             <a:off x="0" y="3657600"/>
-            <a:ext cx="1841760" cy="12960"/>
+            <a:ext cx="1842120" cy="13320"/>
           </a:xfrm>
           <a:prstGeom prst="straightConnector1">
             <a:avLst/>
@@ -19193,7 +19247,7 @@
         <p:spPr>
           <a:xfrm>
             <a:off x="128520" y="6134040"/>
-            <a:ext cx="1558800" cy="374760"/>
+            <a:ext cx="1558440" cy="374400"/>
           </a:xfrm>
           <a:prstGeom prst="diamond">
             <a:avLst/>
@@ -19258,7 +19312,7 @@
         <p:spPr>
           <a:xfrm>
             <a:off x="302760" y="5454000"/>
-            <a:ext cx="1210320" cy="374760"/>
+            <a:ext cx="1209960" cy="374400"/>
           </a:xfrm>
           <a:prstGeom prst="ellipse">
             <a:avLst/>
@@ -19321,7 +19375,7 @@
         <p:spPr>
           <a:xfrm>
             <a:off x="101160" y="336240"/>
-            <a:ext cx="1613520" cy="303120"/>
+            <a:ext cx="1613160" cy="303120"/>
           </a:xfrm>
           <a:prstGeom prst="rect">
             <a:avLst/>
@@ -19378,7 +19432,7 @@
         <p:spPr>
           <a:xfrm>
             <a:off x="101160" y="597600"/>
-            <a:ext cx="1613520" cy="516600"/>
+            <a:ext cx="1613160" cy="516600"/>
           </a:xfrm>
           <a:prstGeom prst="rect">
             <a:avLst/>
@@ -19468,7 +19522,7 @@
         <p:spPr>
           <a:xfrm>
             <a:off x="8458200" y="5486400"/>
-            <a:ext cx="1613520" cy="303120"/>
+            <a:ext cx="1613160" cy="303120"/>
           </a:xfrm>
           <a:prstGeom prst="rect">
             <a:avLst/>
@@ -19525,7 +19579,7 @@
         <p:spPr>
           <a:xfrm>
             <a:off x="128520" y="4629600"/>
-            <a:ext cx="1558800" cy="519480"/>
+            <a:ext cx="1558440" cy="519120"/>
           </a:xfrm>
           <a:prstGeom prst="diamond">
             <a:avLst/>
@@ -19613,7 +19667,7 @@
         <p:spPr>
           <a:xfrm>
             <a:off x="0" y="3365640"/>
-            <a:ext cx="1841760" cy="12960"/>
+            <a:ext cx="1842120" cy="13320"/>
           </a:xfrm>
           <a:prstGeom prst="straightConnector1">
             <a:avLst/>
@@ -19635,7 +19689,7 @@
         <p:spPr>
           <a:xfrm>
             <a:off x="673200" y="3949920"/>
-            <a:ext cx="469800" cy="374760"/>
+            <a:ext cx="469440" cy="374400"/>
           </a:xfrm>
           <a:prstGeom prst="triangle">
             <a:avLst>
@@ -19702,9 +19756,9 @@
         <p:grpSpPr>
           <a:xfrm>
             <a:off x="101160" y="1413000"/>
-            <a:ext cx="1613520" cy="777960"/>
+            <a:ext cx="1613160" cy="777960"/>
             <a:chOff x="101160" y="1413000"/>
-            <a:chExt cx="1613520" cy="777960"/>
+            <a:chExt cx="1613160" cy="777960"/>
           </a:xfrm>
         </p:grpSpPr>
         <p:sp>
@@ -19716,7 +19770,7 @@
           <p:spPr>
             <a:xfrm>
               <a:off x="101160" y="1413000"/>
-              <a:ext cx="1613520" cy="303120"/>
+              <a:ext cx="1613160" cy="303120"/>
             </a:xfrm>
             <a:prstGeom prst="rect">
               <a:avLst/>
@@ -19774,7 +19828,7 @@
           <p:spPr>
             <a:xfrm>
               <a:off x="101160" y="1674360"/>
-              <a:ext cx="1613520" cy="516600"/>
+              <a:ext cx="1613160" cy="516600"/>
             </a:xfrm>
             <a:prstGeom prst="rect">
               <a:avLst/>
@@ -19866,9 +19920,9 @@
         <p:grpSpPr>
           <a:xfrm>
             <a:off x="4296600" y="4022640"/>
-            <a:ext cx="1613520" cy="1632960"/>
+            <a:ext cx="1613160" cy="1632960"/>
             <a:chOff x="4296600" y="4022640"/>
-            <a:chExt cx="1613520" cy="1632960"/>
+            <a:chExt cx="1613160" cy="1632960"/>
           </a:xfrm>
         </p:grpSpPr>
         <p:sp>
@@ -19880,7 +19934,7 @@
           <p:spPr>
             <a:xfrm>
               <a:off x="4296600" y="4022640"/>
-              <a:ext cx="1613520" cy="303120"/>
+              <a:ext cx="1613160" cy="303120"/>
             </a:xfrm>
             <a:prstGeom prst="rect">
               <a:avLst/>
@@ -19937,7 +19991,7 @@
           <p:spPr>
             <a:xfrm>
               <a:off x="4296600" y="4284000"/>
-              <a:ext cx="1613520" cy="1371600"/>
+              <a:ext cx="1613160" cy="1371600"/>
             </a:xfrm>
             <a:prstGeom prst="rect">
               <a:avLst/>
@@ -20136,9 +20190,9 @@
         <p:grpSpPr>
           <a:xfrm>
             <a:off x="9348840" y="2254320"/>
-            <a:ext cx="1613520" cy="1631880"/>
+            <a:ext cx="1613160" cy="1631880"/>
             <a:chOff x="9348840" y="2254320"/>
-            <a:chExt cx="1613520" cy="1631880"/>
+            <a:chExt cx="1613160" cy="1631880"/>
           </a:xfrm>
         </p:grpSpPr>
         <p:sp>
@@ -20150,7 +20204,7 @@
           <p:spPr>
             <a:xfrm>
               <a:off x="9348840" y="2254320"/>
-              <a:ext cx="1613520" cy="303120"/>
+              <a:ext cx="1613160" cy="303120"/>
             </a:xfrm>
             <a:prstGeom prst="rect">
               <a:avLst/>
@@ -20207,7 +20261,7 @@
           <p:spPr>
             <a:xfrm>
               <a:off x="9348840" y="2515680"/>
-              <a:ext cx="1613520" cy="1370520"/>
+              <a:ext cx="1613160" cy="1370520"/>
             </a:xfrm>
             <a:prstGeom prst="rect">
               <a:avLst/>
@@ -20406,7 +20460,7 @@
         <p:spPr>
           <a:xfrm>
             <a:off x="9402120" y="4572000"/>
-            <a:ext cx="1558800" cy="374760"/>
+            <a:ext cx="1558440" cy="374400"/>
           </a:xfrm>
           <a:prstGeom prst="diamond">
             <a:avLst/>
@@ -20471,9 +20525,9 @@
         <p:grpSpPr>
           <a:xfrm>
             <a:off x="9348840" y="2254320"/>
-            <a:ext cx="1613520" cy="1631880"/>
+            <a:ext cx="1613160" cy="1631880"/>
             <a:chOff x="9348840" y="2254320"/>
-            <a:chExt cx="1613520" cy="1631880"/>
+            <a:chExt cx="1613160" cy="1631880"/>
           </a:xfrm>
         </p:grpSpPr>
         <p:sp>
@@ -20485,7 +20539,7 @@
           <p:spPr>
             <a:xfrm>
               <a:off x="9348840" y="2254320"/>
-              <a:ext cx="1613520" cy="303120"/>
+              <a:ext cx="1613160" cy="303120"/>
             </a:xfrm>
             <a:prstGeom prst="rect">
               <a:avLst/>
@@ -20542,7 +20596,7 @@
           <p:spPr>
             <a:xfrm>
               <a:off x="9348840" y="2515680"/>
-              <a:ext cx="1613520" cy="1370520"/>
+              <a:ext cx="1613160" cy="1370520"/>
             </a:xfrm>
             <a:prstGeom prst="rect">
               <a:avLst/>
@@ -20741,9 +20795,9 @@
         <p:grpSpPr>
           <a:xfrm>
             <a:off x="9348840" y="2254320"/>
-            <a:ext cx="1613520" cy="1845360"/>
+            <a:ext cx="1613160" cy="1632600"/>
             <a:chOff x="9348840" y="2254320"/>
-            <a:chExt cx="1613520" cy="1845360"/>
+            <a:chExt cx="1613160" cy="1632600"/>
           </a:xfrm>
         </p:grpSpPr>
         <p:sp>
@@ -20755,7 +20809,7 @@
           <p:spPr>
             <a:xfrm>
               <a:off x="9348840" y="2254320"/>
-              <a:ext cx="1613520" cy="303120"/>
+              <a:ext cx="1613160" cy="303120"/>
             </a:xfrm>
             <a:prstGeom prst="rect">
               <a:avLst/>
@@ -20812,7 +20866,7 @@
           <p:spPr>
             <a:xfrm>
               <a:off x="9348840" y="2515680"/>
-              <a:ext cx="1613520" cy="1584000"/>
+              <a:ext cx="1613160" cy="1371240"/>
             </a:xfrm>
             <a:prstGeom prst="rect">
               <a:avLst/>
@@ -20990,34 +21044,7 @@
                   </a:solidFill>
                   <a:latin typeface="Calibri"/>
                 </a:rPr>
-                <a:t>Gems=0</a:t>
-              </a:r>
-              <a:endParaRPr b="0" lang="en-US" sz="1400" spc="-1" strike="noStrike">
-                <a:solidFill>
-                  <a:srgbClr val="000000"/>
-                </a:solidFill>
-                <a:latin typeface="Arial"/>
-              </a:endParaRPr>
-            </a:p>
-            <a:p>
-              <a:pPr marL="304920" indent="-304920" defTabSz="914400">
-                <a:lnSpc>
-                  <a:spcPct val="100000"/>
-                </a:lnSpc>
-                <a:buClr>
-                  <a:srgbClr val="000000"/>
-                </a:buClr>
-                <a:buFont typeface="OpenSymbol"/>
-                <a:buChar char="-"/>
-              </a:pPr>
-              <a:r>
-                <a:rPr b="0" lang="en-US" sz="1400" spc="-1" strike="noStrike">
-                  <a:solidFill>
-                    <a:schemeClr val="dk1"/>
-                  </a:solidFill>
-                  <a:latin typeface="Calibri"/>
-                </a:rPr>
-                <a:t>XP=0</a:t>
+                <a:t>Gems</a:t>
               </a:r>
               <a:endParaRPr b="0" lang="en-US" sz="1400" spc="-1" strike="noStrike">
                 <a:solidFill>
@@ -21038,7 +21065,7 @@
         <p:spPr>
           <a:xfrm>
             <a:off x="7086600" y="3501720"/>
-            <a:ext cx="1816920" cy="374760"/>
+            <a:ext cx="1816560" cy="374400"/>
           </a:xfrm>
           <a:prstGeom prst="diamond">
             <a:avLst/>
@@ -21105,8 +21132,8 @@
         </p:nvCxnSpPr>
         <p:spPr>
           <a:xfrm flipH="1">
-            <a:off x="9264960" y="4946760"/>
-            <a:ext cx="916920" cy="540000"/>
+            <a:off x="9264600" y="4946400"/>
+            <a:ext cx="917280" cy="540360"/>
           </a:xfrm>
           <a:prstGeom prst="straightConnector1">
             <a:avLst/>
@@ -21130,8 +21157,8 @@
         </p:nvCxnSpPr>
         <p:spPr>
           <a:xfrm>
-            <a:off x="10155600" y="4099680"/>
-            <a:ext cx="26280" cy="472680"/>
+            <a:off x="10155240" y="3886920"/>
+            <a:ext cx="26640" cy="685440"/>
           </a:xfrm>
           <a:prstGeom prst="straightConnector1">
             <a:avLst/>
@@ -21153,7 +21180,7 @@
         <p:spPr>
           <a:xfrm>
             <a:off x="6629400" y="5099760"/>
-            <a:ext cx="1588320" cy="374760"/>
+            <a:ext cx="1587960" cy="374400"/>
           </a:xfrm>
           <a:prstGeom prst="ellipse">
             <a:avLst/>
@@ -21218,8 +21245,8 @@
         </p:nvCxnSpPr>
         <p:spPr>
           <a:xfrm flipH="1">
-            <a:off x="8217720" y="4759560"/>
-            <a:ext cx="1184760" cy="528120"/>
+            <a:off x="8217360" y="4759200"/>
+            <a:ext cx="1185120" cy="528120"/>
           </a:xfrm>
           <a:prstGeom prst="straightConnector1">
             <a:avLst/>
@@ -21243,8 +21270,8 @@
         </p:nvCxnSpPr>
         <p:spPr>
           <a:xfrm flipV="1">
-            <a:off x="5910120" y="3689280"/>
-            <a:ext cx="1176840" cy="1150200"/>
+            <a:off x="5909760" y="3688920"/>
+            <a:ext cx="1177200" cy="1150560"/>
           </a:xfrm>
           <a:prstGeom prst="straightConnector1">
             <a:avLst/>
@@ -21269,8 +21296,8 @@
         </p:nvCxnSpPr>
         <p:spPr>
           <a:xfrm flipH="1">
-            <a:off x="8903520" y="3177000"/>
-            <a:ext cx="445680" cy="512640"/>
+            <a:off x="8903160" y="3070440"/>
+            <a:ext cx="446040" cy="618840"/>
           </a:xfrm>
           <a:prstGeom prst="straightConnector1">
             <a:avLst/>
@@ -21292,7 +21319,7 @@
         <p:spPr>
           <a:xfrm>
             <a:off x="7315200" y="4114800"/>
-            <a:ext cx="1667520" cy="374760"/>
+            <a:ext cx="1667160" cy="374400"/>
           </a:xfrm>
           <a:prstGeom prst="ellipse">
             <a:avLst/>
@@ -21357,8 +21384,8 @@
         </p:nvCxnSpPr>
         <p:spPr>
           <a:xfrm flipH="1" flipV="1">
-            <a:off x="8982720" y="4302360"/>
-            <a:ext cx="419760" cy="457560"/>
+            <a:off x="8982360" y="4302000"/>
+            <a:ext cx="420120" cy="457560"/>
           </a:xfrm>
           <a:prstGeom prst="straightConnector1">
             <a:avLst/>
@@ -21380,7 +21407,7 @@
         <p:spPr>
           <a:xfrm>
             <a:off x="2727720" y="1982880"/>
-            <a:ext cx="1613520" cy="303120"/>
+            <a:ext cx="1613160" cy="303120"/>
           </a:xfrm>
           <a:prstGeom prst="rect">
             <a:avLst/>
@@ -21437,7 +21464,7 @@
         <p:spPr>
           <a:xfrm rot="21559200">
             <a:off x="2295720" y="3255120"/>
-            <a:ext cx="2043360" cy="388080"/>
+            <a:ext cx="2043000" cy="387720"/>
           </a:xfrm>
           <a:prstGeom prst="diamond">
             <a:avLst/>
@@ -21504,8 +21531,8 @@
         </p:nvCxnSpPr>
         <p:spPr>
           <a:xfrm flipH="1" flipV="1">
-            <a:off x="3319560" y="3644280"/>
-            <a:ext cx="977400" cy="1195200"/>
+            <a:off x="3319560" y="3643920"/>
+            <a:ext cx="977400" cy="1195560"/>
           </a:xfrm>
           <a:prstGeom prst="straightConnector1">
             <a:avLst/>
@@ -21531,7 +21558,7 @@
         <p:spPr>
           <a:xfrm flipH="1">
             <a:off x="3315240" y="2286000"/>
-            <a:ext cx="219600" cy="970200"/>
+            <a:ext cx="219240" cy="970200"/>
           </a:xfrm>
           <a:prstGeom prst="straightConnector1">
             <a:avLst/>
@@ -21583,7 +21610,7 @@
         <p:spPr>
           <a:xfrm flipH="1">
             <a:off x="0" y="3073320"/>
-            <a:ext cx="1841760" cy="12960"/>
+            <a:ext cx="1842120" cy="13320"/>
           </a:xfrm>
           <a:prstGeom prst="straightConnector1">
             <a:avLst/>
@@ -21606,7 +21633,7 @@
         <p:spPr>
           <a:xfrm>
             <a:off x="0" y="2489400"/>
-            <a:ext cx="1841760" cy="12960"/>
+            <a:ext cx="1842120" cy="13320"/>
           </a:xfrm>
           <a:prstGeom prst="straightConnector1">
             <a:avLst/>
@@ -21629,7 +21656,7 @@
         <p:spPr>
           <a:xfrm>
             <a:off x="0" y="2781360"/>
-            <a:ext cx="1841760" cy="12960"/>
+            <a:ext cx="1842120" cy="13320"/>
           </a:xfrm>
           <a:prstGeom prst="straightConnector1">
             <a:avLst/>
@@ -21652,7 +21679,7 @@
         <p:spPr>
           <a:xfrm flipH="1">
             <a:off x="0" y="3657600"/>
-            <a:ext cx="1841760" cy="12960"/>
+            <a:ext cx="1842120" cy="13320"/>
           </a:xfrm>
           <a:prstGeom prst="straightConnector1">
             <a:avLst/>
@@ -21674,7 +21701,7 @@
         <p:spPr>
           <a:xfrm>
             <a:off x="128520" y="6134040"/>
-            <a:ext cx="1558800" cy="374760"/>
+            <a:ext cx="1558440" cy="374400"/>
           </a:xfrm>
           <a:prstGeom prst="diamond">
             <a:avLst/>
@@ -21739,7 +21766,7 @@
         <p:spPr>
           <a:xfrm>
             <a:off x="302760" y="5454000"/>
-            <a:ext cx="1210320" cy="374760"/>
+            <a:ext cx="1209960" cy="374400"/>
           </a:xfrm>
           <a:prstGeom prst="ellipse">
             <a:avLst/>
@@ -21802,9 +21829,9 @@
         <p:grpSpPr>
           <a:xfrm>
             <a:off x="101160" y="336240"/>
-            <a:ext cx="1613520" cy="777960"/>
+            <a:ext cx="1613160" cy="777960"/>
             <a:chOff x="101160" y="336240"/>
-            <a:chExt cx="1613520" cy="777960"/>
+            <a:chExt cx="1613160" cy="777960"/>
           </a:xfrm>
         </p:grpSpPr>
         <p:sp>
@@ -21816,7 +21843,7 @@
           <p:spPr>
             <a:xfrm>
               <a:off x="101160" y="336240"/>
-              <a:ext cx="1613520" cy="303120"/>
+              <a:ext cx="1613160" cy="303120"/>
             </a:xfrm>
             <a:prstGeom prst="rect">
               <a:avLst/>
@@ -21873,7 +21900,7 @@
           <p:spPr>
             <a:xfrm>
               <a:off x="101160" y="597600"/>
-              <a:ext cx="1613520" cy="516600"/>
+              <a:ext cx="1613160" cy="516600"/>
             </a:xfrm>
             <a:prstGeom prst="rect">
               <a:avLst/>
@@ -21964,7 +21991,7 @@
         <p:spPr>
           <a:xfrm>
             <a:off x="128520" y="4629600"/>
-            <a:ext cx="1558800" cy="519480"/>
+            <a:ext cx="1558440" cy="519120"/>
           </a:xfrm>
           <a:prstGeom prst="diamond">
             <a:avLst/>
@@ -22052,7 +22079,7 @@
         <p:spPr>
           <a:xfrm>
             <a:off x="0" y="3365640"/>
-            <a:ext cx="1841760" cy="12960"/>
+            <a:ext cx="1842120" cy="13320"/>
           </a:xfrm>
           <a:prstGeom prst="straightConnector1">
             <a:avLst/>
@@ -22074,7 +22101,7 @@
         <p:spPr>
           <a:xfrm>
             <a:off x="673200" y="3949920"/>
-            <a:ext cx="469800" cy="374760"/>
+            <a:ext cx="469440" cy="374400"/>
           </a:xfrm>
           <a:prstGeom prst="triangle">
             <a:avLst>
@@ -22141,9 +22168,9 @@
         <p:grpSpPr>
           <a:xfrm>
             <a:off x="101160" y="1413000"/>
-            <a:ext cx="1613520" cy="777960"/>
+            <a:ext cx="1613160" cy="777960"/>
             <a:chOff x="101160" y="1413000"/>
-            <a:chExt cx="1613520" cy="777960"/>
+            <a:chExt cx="1613160" cy="777960"/>
           </a:xfrm>
         </p:grpSpPr>
         <p:sp>
@@ -22155,7 +22182,7 @@
           <p:spPr>
             <a:xfrm>
               <a:off x="101160" y="1413000"/>
-              <a:ext cx="1613520" cy="303120"/>
+              <a:ext cx="1613160" cy="303120"/>
             </a:xfrm>
             <a:prstGeom prst="rect">
               <a:avLst/>
@@ -22213,7 +22240,7 @@
           <p:spPr>
             <a:xfrm>
               <a:off x="101160" y="1674360"/>
-              <a:ext cx="1613520" cy="516600"/>
+              <a:ext cx="1613160" cy="516600"/>
             </a:xfrm>
             <a:prstGeom prst="rect">
               <a:avLst/>
@@ -22305,9 +22332,9 @@
         <p:grpSpPr>
           <a:xfrm>
             <a:off x="3886200" y="2286000"/>
-            <a:ext cx="1613520" cy="1845360"/>
+            <a:ext cx="1613160" cy="1845360"/>
             <a:chOff x="3886200" y="2286000"/>
-            <a:chExt cx="1613520" cy="1845360"/>
+            <a:chExt cx="1613160" cy="1845360"/>
           </a:xfrm>
         </p:grpSpPr>
         <p:sp>
@@ -22319,7 +22346,7 @@
           <p:spPr>
             <a:xfrm>
               <a:off x="3886200" y="2286000"/>
-              <a:ext cx="1613520" cy="303120"/>
+              <a:ext cx="1613160" cy="303120"/>
             </a:xfrm>
             <a:prstGeom prst="rect">
               <a:avLst/>
@@ -22376,7 +22403,7 @@
           <p:spPr>
             <a:xfrm>
               <a:off x="3886200" y="2547360"/>
-              <a:ext cx="1613520" cy="1584000"/>
+              <a:ext cx="1613160" cy="1584000"/>
             </a:xfrm>
             <a:prstGeom prst="rect">
               <a:avLst/>

</xml_diff>

<commit_message>
worked on docu & cleanup
</commit_message>
<xml_diff>
--- a/documentation/database/ER-Diagram.pptx
+++ b/documentation/database/ER-Diagram.pptx
@@ -353,7 +353,7 @@
             <a:pPr indent="0" algn="r">
               <a:buNone/>
             </a:pPr>
-            <a:fld id="{CD0DE281-603F-4661-B663-0463AF4C8F38}" type="slidenum">
+            <a:fld id="{B94239CF-4B91-45ED-A451-03FEC7D99AB2}" type="slidenum">
               <a:rPr b="0" lang="en-US" sz="1400" spc="-1" strike="noStrike">
                 <a:solidFill>
                   <a:srgbClr val="000000"/>
@@ -407,7 +407,7 @@
         <p:spPr>
           <a:xfrm>
             <a:off x="685800" y="1143000"/>
-            <a:ext cx="5473080" cy="3072960"/>
+            <a:ext cx="5472720" cy="3072600"/>
           </a:xfrm>
           <a:prstGeom prst="rect">
             <a:avLst/>
@@ -430,7 +430,7 @@
         <p:spPr>
           <a:xfrm>
             <a:off x="685800" y="4400640"/>
-            <a:ext cx="5473080" cy="3587040"/>
+            <a:ext cx="5472720" cy="3586680"/>
           </a:xfrm>
           <a:prstGeom prst="rect">
             <a:avLst/>
@@ -470,7 +470,7 @@
         <p:spPr>
           <a:xfrm>
             <a:off x="3884760" y="8685360"/>
-            <a:ext cx="2958480" cy="445320"/>
+            <a:ext cx="2958120" cy="444960"/>
           </a:xfrm>
           <a:prstGeom prst="rect">
             <a:avLst/>
@@ -512,7 +512,7 @@
                 <a:tab algn="l" pos="0"/>
               </a:tabLst>
             </a:pPr>
-            <a:fld id="{49059D5A-9A8D-4729-9CE1-1F6D1DAD3EA4}" type="slidenum">
+            <a:fld id="{D7497B8A-6CFA-4DCF-8B75-64E1F5E9D343}" type="slidenum">
               <a:rPr b="0" lang="en-US" sz="1200" spc="-1" strike="noStrike">
                 <a:solidFill>
                   <a:schemeClr val="dk1"/>
@@ -566,7 +566,7 @@
         <p:spPr>
           <a:xfrm>
             <a:off x="685800" y="1143000"/>
-            <a:ext cx="5473080" cy="3072960"/>
+            <a:ext cx="5472720" cy="3072600"/>
           </a:xfrm>
           <a:prstGeom prst="rect">
             <a:avLst/>
@@ -589,7 +589,7 @@
         <p:spPr>
           <a:xfrm>
             <a:off x="685800" y="4400640"/>
-            <a:ext cx="5473080" cy="3587040"/>
+            <a:ext cx="5472720" cy="3586680"/>
           </a:xfrm>
           <a:prstGeom prst="rect">
             <a:avLst/>
@@ -629,7 +629,7 @@
         <p:spPr>
           <a:xfrm>
             <a:off x="3884760" y="8685360"/>
-            <a:ext cx="2958480" cy="445320"/>
+            <a:ext cx="2958120" cy="444960"/>
           </a:xfrm>
           <a:prstGeom prst="rect">
             <a:avLst/>
@@ -671,7 +671,7 @@
                 <a:tab algn="l" pos="0"/>
               </a:tabLst>
             </a:pPr>
-            <a:fld id="{91442018-F4AF-451A-8B94-0903C5C042F4}" type="slidenum">
+            <a:fld id="{7A8ECD71-B38E-4BD6-9911-AEBAE1F25ED9}" type="slidenum">
               <a:rPr b="0" lang="en-US" sz="1200" spc="-1" strike="noStrike">
                 <a:solidFill>
                   <a:schemeClr val="dk1"/>
@@ -725,7 +725,7 @@
         <p:spPr>
           <a:xfrm>
             <a:off x="685800" y="1143000"/>
-            <a:ext cx="5473080" cy="3072960"/>
+            <a:ext cx="5472720" cy="3072600"/>
           </a:xfrm>
           <a:prstGeom prst="rect">
             <a:avLst/>
@@ -748,7 +748,7 @@
         <p:spPr>
           <a:xfrm>
             <a:off x="685800" y="4400640"/>
-            <a:ext cx="5473080" cy="3587040"/>
+            <a:ext cx="5472720" cy="3586680"/>
           </a:xfrm>
           <a:prstGeom prst="rect">
             <a:avLst/>
@@ -788,7 +788,7 @@
         <p:spPr>
           <a:xfrm>
             <a:off x="3884760" y="8685360"/>
-            <a:ext cx="2958480" cy="445320"/>
+            <a:ext cx="2958120" cy="444960"/>
           </a:xfrm>
           <a:prstGeom prst="rect">
             <a:avLst/>
@@ -830,7 +830,7 @@
                 <a:tab algn="l" pos="0"/>
               </a:tabLst>
             </a:pPr>
-            <a:fld id="{7DCB9227-01E2-4F75-B48E-0D1F188F038A}" type="slidenum">
+            <a:fld id="{1743173D-6676-4699-98D9-7981DAB1E805}" type="slidenum">
               <a:rPr b="0" lang="en-US" sz="1200" spc="-1" strike="noStrike">
                 <a:solidFill>
                   <a:schemeClr val="dk1"/>
@@ -884,7 +884,7 @@
         <p:spPr>
           <a:xfrm>
             <a:off x="685800" y="1143000"/>
-            <a:ext cx="5473080" cy="3072960"/>
+            <a:ext cx="5472720" cy="3072600"/>
           </a:xfrm>
           <a:prstGeom prst="rect">
             <a:avLst/>
@@ -907,7 +907,7 @@
         <p:spPr>
           <a:xfrm>
             <a:off x="685800" y="4400640"/>
-            <a:ext cx="5473080" cy="3587040"/>
+            <a:ext cx="5472720" cy="3586680"/>
           </a:xfrm>
           <a:prstGeom prst="rect">
             <a:avLst/>
@@ -947,7 +947,7 @@
         <p:spPr>
           <a:xfrm>
             <a:off x="3884760" y="8685360"/>
-            <a:ext cx="2958480" cy="445320"/>
+            <a:ext cx="2958120" cy="444960"/>
           </a:xfrm>
           <a:prstGeom prst="rect">
             <a:avLst/>
@@ -989,7 +989,7 @@
                 <a:tab algn="l" pos="0"/>
               </a:tabLst>
             </a:pPr>
-            <a:fld id="{3457379D-7179-4FB2-8940-AA8F838FAFDF}" type="slidenum">
+            <a:fld id="{FC6727F0-B03C-4B20-AB2A-82D0C9D2D9A7}" type="slidenum">
               <a:rPr b="0" lang="en-US" sz="1200" spc="-1" strike="noStrike">
                 <a:solidFill>
                   <a:schemeClr val="dk1"/>
@@ -1233,7 +1233,7 @@
         <p:txBody>
           <a:bodyPr/>
           <a:p>
-            <a:fld id="{FC17292F-E45B-40FA-A6A1-267F0CE6CBC0}" type="slidenum">
+            <a:fld id="{2A84E6FC-4A7F-4082-839C-00B56249E677}" type="slidenum">
               <a:t>&lt;#&gt;</a:t>
             </a:fld>
           </a:p>
@@ -1442,7 +1442,7 @@
         <p:txBody>
           <a:bodyPr/>
           <a:p>
-            <a:fld id="{F53F952E-3DED-422D-91D8-67801DA993E9}" type="slidenum">
+            <a:fld id="{857740C0-6DF7-4992-AA0F-C949542496EE}" type="slidenum">
               <a:t>&lt;#&gt;</a:t>
             </a:fld>
           </a:p>
@@ -1565,7 +1565,7 @@
         <p:txBody>
           <a:bodyPr/>
           <a:p>
-            <a:fld id="{E8D73935-E2A6-46F7-B089-98D00468C90B}" type="slidenum">
+            <a:fld id="{6989C579-618E-4459-B84E-D7D03672B711}" type="slidenum">
               <a:t>&lt;#&gt;</a:t>
             </a:fld>
           </a:p>
@@ -1648,7 +1648,7 @@
         <p:txBody>
           <a:bodyPr/>
           <a:p>
-            <a:fld id="{8D970566-E392-4539-85F6-1FDA90D3E150}" type="slidenum">
+            <a:fld id="{34817C35-458D-4EE9-9AC7-051E06226AB1}" type="slidenum">
               <a:t>&lt;#&gt;</a:t>
             </a:fld>
           </a:p>
@@ -1900,7 +1900,7 @@
         <p:txBody>
           <a:bodyPr/>
           <a:p>
-            <a:fld id="{04CBA772-7C85-4447-B8E6-9364C5A644B9}" type="slidenum">
+            <a:fld id="{9A432BC8-A683-4A0D-A47A-26C982908C74}" type="slidenum">
               <a:t>&lt;#&gt;</a:t>
             </a:fld>
           </a:p>
@@ -2152,7 +2152,7 @@
         <p:txBody>
           <a:bodyPr/>
           <a:p>
-            <a:fld id="{68C7407B-B7B8-42E6-B62E-75D926208051}" type="slidenum">
+            <a:fld id="{6471309D-B4DE-43F6-AA06-34F3B2183007}" type="slidenum">
               <a:t>&lt;#&gt;</a:t>
             </a:fld>
           </a:p>
@@ -2361,7 +2361,7 @@
         <p:txBody>
           <a:bodyPr/>
           <a:p>
-            <a:fld id="{C267B53A-5DA4-453A-ACFC-E5DAD33E97BE}" type="slidenum">
+            <a:fld id="{ACE4C55C-401E-4F0B-9C7E-B187F5B46BF0}" type="slidenum">
               <a:t>&lt;#&gt;</a:t>
             </a:fld>
           </a:p>
@@ -2656,7 +2656,7 @@
         <p:txBody>
           <a:bodyPr/>
           <a:p>
-            <a:fld id="{7817F069-2AA2-419E-B402-C47730621CF9}" type="slidenum">
+            <a:fld id="{06B7BDA8-767E-4658-804B-5C2693DFAA2F}" type="slidenum">
               <a:t>&lt;#&gt;</a:t>
             </a:fld>
           </a:p>
@@ -2739,7 +2739,7 @@
         <p:txBody>
           <a:bodyPr/>
           <a:p>
-            <a:fld id="{8795E423-D01A-4900-B625-81AD886DE0B5}" type="slidenum">
+            <a:fld id="{BEDC45A4-217E-4F63-A86D-F53468F1247B}" type="slidenum">
               <a:t>&lt;#&gt;</a:t>
             </a:fld>
           </a:p>
@@ -2822,7 +2822,7 @@
         <p:txBody>
           <a:bodyPr/>
           <a:p>
-            <a:fld id="{02747A95-9277-4318-B8E9-6B2BBDF037D0}" type="slidenum">
+            <a:fld id="{FA6623AF-BD57-4435-8AE8-605D69DA427F}" type="slidenum">
               <a:t>&lt;#&gt;</a:t>
             </a:fld>
           </a:p>
@@ -2988,7 +2988,7 @@
         <p:txBody>
           <a:bodyPr/>
           <a:p>
-            <a:fld id="{7C4CD070-E49A-46AA-9176-EC1461395F32}" type="slidenum">
+            <a:fld id="{2D35C2DA-784F-4EC3-8329-DDFF21129AE6}" type="slidenum">
               <a:t>&lt;#&gt;</a:t>
             </a:fld>
           </a:p>
@@ -3154,7 +3154,7 @@
         <p:txBody>
           <a:bodyPr/>
           <a:p>
-            <a:fld id="{7A7FA2ED-2773-4BCE-A92C-CB1D1DC89968}" type="slidenum">
+            <a:fld id="{DBD8902E-9EB5-45E2-B5B7-59C989D0D583}" type="slidenum">
               <a:t>&lt;#&gt;</a:t>
             </a:fld>
           </a:p>
@@ -3219,9 +3219,9 @@
         <p:grpSpPr>
           <a:xfrm>
             <a:off x="6199200" y="6162840"/>
-            <a:ext cx="5979600" cy="681840"/>
+            <a:ext cx="5979240" cy="681480"/>
             <a:chOff x="6199200" y="6162840"/>
-            <a:chExt cx="5979600" cy="681840"/>
+            <a:chExt cx="5979240" cy="681480"/>
           </a:xfrm>
         </p:grpSpPr>
         <p:pic>
@@ -3237,7 +3237,7 @@
           <p:spPr>
             <a:xfrm>
               <a:off x="6199200" y="6162840"/>
-              <a:ext cx="4043160" cy="681840"/>
+              <a:ext cx="4042800" cy="681480"/>
             </a:xfrm>
             <a:prstGeom prst="rect">
               <a:avLst/>
@@ -3260,7 +3260,7 @@
           <p:spPr>
             <a:xfrm>
               <a:off x="10270080" y="6162840"/>
-              <a:ext cx="1908720" cy="598320"/>
+              <a:ext cx="1908360" cy="597960"/>
             </a:xfrm>
             <a:prstGeom prst="rect">
               <a:avLst/>
@@ -4008,7 +4008,7 @@
         <p:spPr>
           <a:xfrm>
             <a:off x="4038480" y="6356520"/>
-            <a:ext cx="4101480" cy="351720"/>
+            <a:ext cx="4101120" cy="351360"/>
           </a:xfrm>
           <a:prstGeom prst="rect">
             <a:avLst/>
@@ -4080,7 +4080,7 @@
         <p:spPr>
           <a:xfrm>
             <a:off x="8610480" y="6356520"/>
-            <a:ext cx="2729880" cy="351720"/>
+            <a:ext cx="2729520" cy="351360"/>
           </a:xfrm>
           <a:prstGeom prst="rect">
             <a:avLst/>
@@ -4123,7 +4123,7 @@
                 <a:tab algn="l" pos="0"/>
               </a:tabLst>
             </a:pPr>
-            <a:fld id="{7BE0104D-BBF7-4AEC-BF74-0151CD46EAA3}" type="slidenum">
+            <a:fld id="{B2BA6C09-5B81-4CD3-98B7-09F12790453F}" type="slidenum">
               <a:rPr b="0" lang="en-US" sz="1200" spc="-1" strike="noStrike">
                 <a:solidFill>
                   <a:schemeClr val="dk1">
@@ -4156,7 +4156,7 @@
         <p:spPr>
           <a:xfrm>
             <a:off x="838080" y="6356520"/>
-            <a:ext cx="2729880" cy="351720"/>
+            <a:ext cx="2729520" cy="351360"/>
           </a:xfrm>
           <a:prstGeom prst="rect">
             <a:avLst/>
@@ -4245,9 +4245,9 @@
         <p:grpSpPr>
           <a:xfrm>
             <a:off x="6199200" y="6162840"/>
-            <a:ext cx="5979600" cy="681840"/>
+            <a:ext cx="5979240" cy="681480"/>
             <a:chOff x="6199200" y="6162840"/>
-            <a:chExt cx="5979600" cy="681840"/>
+            <a:chExt cx="5979240" cy="681480"/>
           </a:xfrm>
         </p:grpSpPr>
         <p:pic>
@@ -4263,7 +4263,7 @@
           <p:spPr>
             <a:xfrm>
               <a:off x="6199200" y="6162840"/>
-              <a:ext cx="4043160" cy="681840"/>
+              <a:ext cx="4042800" cy="681480"/>
             </a:xfrm>
             <a:prstGeom prst="rect">
               <a:avLst/>
@@ -4286,7 +4286,7 @@
           <p:spPr>
             <a:xfrm>
               <a:off x="10270080" y="6162840"/>
-              <a:ext cx="1908720" cy="598320"/>
+              <a:ext cx="1908360" cy="597960"/>
             </a:xfrm>
             <a:prstGeom prst="rect">
               <a:avLst/>
@@ -4809,7 +4809,7 @@
         <p:spPr>
           <a:xfrm>
             <a:off x="4038480" y="6356520"/>
-            <a:ext cx="4101480" cy="351720"/>
+            <a:ext cx="4101120" cy="351360"/>
           </a:xfrm>
           <a:prstGeom prst="rect">
             <a:avLst/>
@@ -4881,7 +4881,7 @@
         <p:spPr>
           <a:xfrm>
             <a:off x="8610480" y="6356520"/>
-            <a:ext cx="2729880" cy="351720"/>
+            <a:ext cx="2729520" cy="351360"/>
           </a:xfrm>
           <a:prstGeom prst="rect">
             <a:avLst/>
@@ -4924,7 +4924,7 @@
                 <a:tab algn="l" pos="0"/>
               </a:tabLst>
             </a:pPr>
-            <a:fld id="{04A85DB6-EE6F-4C57-A32B-C696997EB1EE}" type="slidenum">
+            <a:fld id="{8CCBD7B8-7E3B-4E2E-AAFE-9386E05338D9}" type="slidenum">
               <a:rPr b="0" lang="en-US" sz="1200" spc="-1" strike="noStrike">
                 <a:solidFill>
                   <a:schemeClr val="dk1">
@@ -4957,7 +4957,7 @@
         <p:spPr>
           <a:xfrm>
             <a:off x="838080" y="6356520"/>
-            <a:ext cx="2729880" cy="351720"/>
+            <a:ext cx="2729520" cy="351360"/>
           </a:xfrm>
           <a:prstGeom prst="rect">
             <a:avLst/>
@@ -5046,9 +5046,9 @@
         <p:grpSpPr>
           <a:xfrm>
             <a:off x="6199200" y="6162840"/>
-            <a:ext cx="5979600" cy="681840"/>
+            <a:ext cx="5979240" cy="681480"/>
             <a:chOff x="6199200" y="6162840"/>
-            <a:chExt cx="5979600" cy="681840"/>
+            <a:chExt cx="5979240" cy="681480"/>
           </a:xfrm>
         </p:grpSpPr>
         <p:pic>
@@ -5064,7 +5064,7 @@
           <p:spPr>
             <a:xfrm>
               <a:off x="6199200" y="6162840"/>
-              <a:ext cx="4043160" cy="681840"/>
+              <a:ext cx="4042800" cy="681480"/>
             </a:xfrm>
             <a:prstGeom prst="rect">
               <a:avLst/>
@@ -5087,7 +5087,7 @@
           <p:spPr>
             <a:xfrm>
               <a:off x="10270080" y="6162840"/>
-              <a:ext cx="1908720" cy="598320"/>
+              <a:ext cx="1908360" cy="597960"/>
             </a:xfrm>
             <a:prstGeom prst="rect">
               <a:avLst/>
@@ -5160,7 +5160,7 @@
         <p:spPr>
           <a:xfrm>
             <a:off x="4038480" y="6356520"/>
-            <a:ext cx="4101480" cy="351720"/>
+            <a:ext cx="4101120" cy="351360"/>
           </a:xfrm>
           <a:prstGeom prst="rect">
             <a:avLst/>
@@ -5232,7 +5232,7 @@
         <p:spPr>
           <a:xfrm>
             <a:off x="8610480" y="6356520"/>
-            <a:ext cx="2729880" cy="351720"/>
+            <a:ext cx="2729520" cy="351360"/>
           </a:xfrm>
           <a:prstGeom prst="rect">
             <a:avLst/>
@@ -5275,7 +5275,7 @@
                 <a:tab algn="l" pos="0"/>
               </a:tabLst>
             </a:pPr>
-            <a:fld id="{16F7868B-09DA-4A31-9A92-1E6B1BF1D27F}" type="slidenum">
+            <a:fld id="{2DB6ABF5-89CD-4FBA-9684-CAF05E4D5FC1}" type="slidenum">
               <a:rPr b="0" lang="en-US" sz="1200" spc="-1" strike="noStrike">
                 <a:solidFill>
                   <a:schemeClr val="dk1">
@@ -5308,7 +5308,7 @@
         <p:spPr>
           <a:xfrm>
             <a:off x="838080" y="6356520"/>
-            <a:ext cx="2729880" cy="351720"/>
+            <a:ext cx="2729520" cy="351360"/>
           </a:xfrm>
           <a:prstGeom prst="rect">
             <a:avLst/>
@@ -5397,9 +5397,9 @@
         <p:grpSpPr>
           <a:xfrm>
             <a:off x="6199200" y="6162840"/>
-            <a:ext cx="5979600" cy="681840"/>
+            <a:ext cx="5979240" cy="681480"/>
             <a:chOff x="6199200" y="6162840"/>
-            <a:chExt cx="5979600" cy="681840"/>
+            <a:chExt cx="5979240" cy="681480"/>
           </a:xfrm>
         </p:grpSpPr>
         <p:pic>
@@ -5415,7 +5415,7 @@
           <p:spPr>
             <a:xfrm>
               <a:off x="6199200" y="6162840"/>
-              <a:ext cx="4043160" cy="681840"/>
+              <a:ext cx="4042800" cy="681480"/>
             </a:xfrm>
             <a:prstGeom prst="rect">
               <a:avLst/>
@@ -5438,7 +5438,7 @@
           <p:spPr>
             <a:xfrm>
               <a:off x="10270080" y="6162840"/>
-              <a:ext cx="1908720" cy="598320"/>
+              <a:ext cx="1908360" cy="597960"/>
             </a:xfrm>
             <a:prstGeom prst="rect">
               <a:avLst/>
@@ -5462,7 +5462,7 @@
         <p:spPr>
           <a:xfrm>
             <a:off x="4038480" y="6356520"/>
-            <a:ext cx="4101480" cy="351720"/>
+            <a:ext cx="4101120" cy="351360"/>
           </a:xfrm>
           <a:prstGeom prst="rect">
             <a:avLst/>
@@ -5534,7 +5534,7 @@
         <p:spPr>
           <a:xfrm>
             <a:off x="8610480" y="6356520"/>
-            <a:ext cx="2729880" cy="351720"/>
+            <a:ext cx="2729520" cy="351360"/>
           </a:xfrm>
           <a:prstGeom prst="rect">
             <a:avLst/>
@@ -5577,7 +5577,7 @@
                 <a:tab algn="l" pos="0"/>
               </a:tabLst>
             </a:pPr>
-            <a:fld id="{D2897973-4C4B-4CB3-9078-E1E5D056F983}" type="slidenum">
+            <a:fld id="{1032DEBF-87B9-4F86-932E-61E9D68BDB08}" type="slidenum">
               <a:rPr b="0" lang="en-US" sz="1200" spc="-1" strike="noStrike">
                 <a:solidFill>
                   <a:schemeClr val="dk1">
@@ -5610,7 +5610,7 @@
         <p:spPr>
           <a:xfrm>
             <a:off x="838080" y="6356520"/>
-            <a:ext cx="2729880" cy="351720"/>
+            <a:ext cx="2729520" cy="351360"/>
           </a:xfrm>
           <a:prstGeom prst="rect">
             <a:avLst/>
@@ -5699,9 +5699,9 @@
         <p:grpSpPr>
           <a:xfrm>
             <a:off x="6199200" y="6162840"/>
-            <a:ext cx="5979600" cy="681840"/>
+            <a:ext cx="5979240" cy="681480"/>
             <a:chOff x="6199200" y="6162840"/>
-            <a:chExt cx="5979600" cy="681840"/>
+            <a:chExt cx="5979240" cy="681480"/>
           </a:xfrm>
         </p:grpSpPr>
         <p:pic>
@@ -5717,7 +5717,7 @@
           <p:spPr>
             <a:xfrm>
               <a:off x="6199200" y="6162840"/>
-              <a:ext cx="4043160" cy="681840"/>
+              <a:ext cx="4042800" cy="681480"/>
             </a:xfrm>
             <a:prstGeom prst="rect">
               <a:avLst/>
@@ -5740,7 +5740,7 @@
           <p:spPr>
             <a:xfrm>
               <a:off x="10270080" y="6162840"/>
-              <a:ext cx="1908720" cy="598320"/>
+              <a:ext cx="1908360" cy="597960"/>
             </a:xfrm>
             <a:prstGeom prst="rect">
               <a:avLst/>
@@ -6488,7 +6488,7 @@
         <p:spPr>
           <a:xfrm>
             <a:off x="4038480" y="6356520"/>
-            <a:ext cx="4101480" cy="351720"/>
+            <a:ext cx="4101120" cy="351360"/>
           </a:xfrm>
           <a:prstGeom prst="rect">
             <a:avLst/>
@@ -6560,7 +6560,7 @@
         <p:spPr>
           <a:xfrm>
             <a:off x="8610480" y="6356520"/>
-            <a:ext cx="2729880" cy="351720"/>
+            <a:ext cx="2729520" cy="351360"/>
           </a:xfrm>
           <a:prstGeom prst="rect">
             <a:avLst/>
@@ -6603,7 +6603,7 @@
                 <a:tab algn="l" pos="0"/>
               </a:tabLst>
             </a:pPr>
-            <a:fld id="{B0618E5E-7941-4F6A-BCBB-48270C847F06}" type="slidenum">
+            <a:fld id="{2ED87358-7FF5-458B-8615-5340DA64ABDD}" type="slidenum">
               <a:rPr b="0" lang="en-US" sz="1200" spc="-1" strike="noStrike">
                 <a:solidFill>
                   <a:schemeClr val="dk1">
@@ -6636,7 +6636,7 @@
         <p:spPr>
           <a:xfrm>
             <a:off x="838080" y="6356520"/>
-            <a:ext cx="2729880" cy="351720"/>
+            <a:ext cx="2729520" cy="351360"/>
           </a:xfrm>
           <a:prstGeom prst="rect">
             <a:avLst/>
@@ -6725,9 +6725,9 @@
         <p:grpSpPr>
           <a:xfrm>
             <a:off x="6199200" y="6162840"/>
-            <a:ext cx="5979600" cy="681840"/>
+            <a:ext cx="5979240" cy="681480"/>
             <a:chOff x="6199200" y="6162840"/>
-            <a:chExt cx="5979600" cy="681840"/>
+            <a:chExt cx="5979240" cy="681480"/>
           </a:xfrm>
         </p:grpSpPr>
         <p:pic>
@@ -6743,7 +6743,7 @@
           <p:spPr>
             <a:xfrm>
               <a:off x="6199200" y="6162840"/>
-              <a:ext cx="4043160" cy="681840"/>
+              <a:ext cx="4042800" cy="681480"/>
             </a:xfrm>
             <a:prstGeom prst="rect">
               <a:avLst/>
@@ -6766,7 +6766,7 @@
           <p:spPr>
             <a:xfrm>
               <a:off x="10270080" y="6162840"/>
-              <a:ext cx="1908720" cy="598320"/>
+              <a:ext cx="1908360" cy="597960"/>
             </a:xfrm>
             <a:prstGeom prst="rect">
               <a:avLst/>
@@ -6815,25 +6815,7 @@
                 </a:solidFill>
                 <a:latin typeface="Arial"/>
               </a:rPr>
-              <a:t>Click to edit </a:t>
-            </a:r>
-            <a:r>
-              <a:rPr b="0" lang="en-US" sz="1800" spc="-1" strike="noStrike">
-                <a:solidFill>
-                  <a:srgbClr val="000000"/>
-                </a:solidFill>
-                <a:latin typeface="Arial"/>
-              </a:rPr>
-              <a:t>the title text </a:t>
-            </a:r>
-            <a:r>
-              <a:rPr b="0" lang="en-US" sz="1800" spc="-1" strike="noStrike">
-                <a:solidFill>
-                  <a:srgbClr val="000000"/>
-                </a:solidFill>
-                <a:latin typeface="Arial"/>
-              </a:rPr>
-              <a:t>format</a:t>
+              <a:t>Click to edit the title text format</a:t>
             </a:r>
             <a:endParaRPr b="0" lang="en-US" sz="1800" spc="-1" strike="noStrike">
               <a:solidFill>
@@ -7532,7 +7514,7 @@
         <p:spPr>
           <a:xfrm>
             <a:off x="4038480" y="6356520"/>
-            <a:ext cx="4101480" cy="351720"/>
+            <a:ext cx="4101120" cy="351360"/>
           </a:xfrm>
           <a:prstGeom prst="rect">
             <a:avLst/>
@@ -7604,7 +7586,7 @@
         <p:spPr>
           <a:xfrm>
             <a:off x="8610480" y="6356520"/>
-            <a:ext cx="2729880" cy="351720"/>
+            <a:ext cx="2729520" cy="351360"/>
           </a:xfrm>
           <a:prstGeom prst="rect">
             <a:avLst/>
@@ -7647,7 +7629,7 @@
                 <a:tab algn="l" pos="0"/>
               </a:tabLst>
             </a:pPr>
-            <a:fld id="{14084F3F-0C56-493B-836B-06317B7BF79B}" type="slidenum">
+            <a:fld id="{0CD7A54E-F318-49D8-AD67-F805071D4B6D}" type="slidenum">
               <a:rPr b="0" lang="en-US" sz="1200" spc="-1" strike="noStrike">
                 <a:solidFill>
                   <a:schemeClr val="dk1">
@@ -7680,7 +7662,7 @@
         <p:spPr>
           <a:xfrm>
             <a:off x="838080" y="6356520"/>
-            <a:ext cx="2729880" cy="351720"/>
+            <a:ext cx="2729520" cy="351360"/>
           </a:xfrm>
           <a:prstGeom prst="rect">
             <a:avLst/>
@@ -7769,9 +7751,9 @@
         <p:grpSpPr>
           <a:xfrm>
             <a:off x="6199200" y="6162840"/>
-            <a:ext cx="5979600" cy="681840"/>
+            <a:ext cx="5979240" cy="681480"/>
             <a:chOff x="6199200" y="6162840"/>
-            <a:chExt cx="5979600" cy="681840"/>
+            <a:chExt cx="5979240" cy="681480"/>
           </a:xfrm>
         </p:grpSpPr>
         <p:pic>
@@ -7787,7 +7769,7 @@
           <p:spPr>
             <a:xfrm>
               <a:off x="6199200" y="6162840"/>
-              <a:ext cx="4043160" cy="681840"/>
+              <a:ext cx="4042800" cy="681480"/>
             </a:xfrm>
             <a:prstGeom prst="rect">
               <a:avLst/>
@@ -7810,7 +7792,7 @@
           <p:spPr>
             <a:xfrm>
               <a:off x="10270080" y="6162840"/>
-              <a:ext cx="1908720" cy="598320"/>
+              <a:ext cx="1908360" cy="597960"/>
             </a:xfrm>
             <a:prstGeom prst="rect">
               <a:avLst/>
@@ -8333,7 +8315,7 @@
         <p:spPr>
           <a:xfrm>
             <a:off x="4038480" y="6356520"/>
-            <a:ext cx="4101480" cy="351720"/>
+            <a:ext cx="4101120" cy="351360"/>
           </a:xfrm>
           <a:prstGeom prst="rect">
             <a:avLst/>
@@ -8405,7 +8387,7 @@
         <p:spPr>
           <a:xfrm>
             <a:off x="8610480" y="6356520"/>
-            <a:ext cx="2729880" cy="351720"/>
+            <a:ext cx="2729520" cy="351360"/>
           </a:xfrm>
           <a:prstGeom prst="rect">
             <a:avLst/>
@@ -8448,7 +8430,7 @@
                 <a:tab algn="l" pos="0"/>
               </a:tabLst>
             </a:pPr>
-            <a:fld id="{6611B5E9-6281-49CD-8BC8-9E1ECED006D1}" type="slidenum">
+            <a:fld id="{8CCFC577-3C9B-4822-B3A3-FD3C0D56AAE3}" type="slidenum">
               <a:rPr b="0" lang="en-US" sz="1200" spc="-1" strike="noStrike">
                 <a:solidFill>
                   <a:schemeClr val="dk1">
@@ -8481,7 +8463,7 @@
         <p:spPr>
           <a:xfrm>
             <a:off x="838080" y="6356520"/>
-            <a:ext cx="2729880" cy="351720"/>
+            <a:ext cx="2729520" cy="351360"/>
           </a:xfrm>
           <a:prstGeom prst="rect">
             <a:avLst/>
@@ -8570,9 +8552,9 @@
         <p:grpSpPr>
           <a:xfrm>
             <a:off x="6199200" y="6162840"/>
-            <a:ext cx="5979600" cy="681840"/>
+            <a:ext cx="5979240" cy="681480"/>
             <a:chOff x="6199200" y="6162840"/>
-            <a:chExt cx="5979600" cy="681840"/>
+            <a:chExt cx="5979240" cy="681480"/>
           </a:xfrm>
         </p:grpSpPr>
         <p:pic>
@@ -8588,7 +8570,7 @@
           <p:spPr>
             <a:xfrm>
               <a:off x="6199200" y="6162840"/>
-              <a:ext cx="4043160" cy="681840"/>
+              <a:ext cx="4042800" cy="681480"/>
             </a:xfrm>
             <a:prstGeom prst="rect">
               <a:avLst/>
@@ -8611,7 +8593,7 @@
           <p:spPr>
             <a:xfrm>
               <a:off x="10270080" y="6162840"/>
-              <a:ext cx="1908720" cy="598320"/>
+              <a:ext cx="1908360" cy="597960"/>
             </a:xfrm>
             <a:prstGeom prst="rect">
               <a:avLst/>
@@ -8660,52 +8642,7 @@
                 </a:solidFill>
                 <a:latin typeface="Arial"/>
               </a:rPr>
-              <a:t>Click </a:t>
-            </a:r>
-            <a:r>
-              <a:rPr b="0" lang="en-US" sz="1800" spc="-1" strike="noStrike">
-                <a:solidFill>
-                  <a:srgbClr val="000000"/>
-                </a:solidFill>
-                <a:latin typeface="Arial"/>
-              </a:rPr>
-              <a:t>to edit </a:t>
-            </a:r>
-            <a:r>
-              <a:rPr b="0" lang="en-US" sz="1800" spc="-1" strike="noStrike">
-                <a:solidFill>
-                  <a:srgbClr val="000000"/>
-                </a:solidFill>
-                <a:latin typeface="Arial"/>
-              </a:rPr>
-              <a:t>the </a:t>
-            </a:r>
-            <a:r>
-              <a:rPr b="0" lang="en-US" sz="1800" spc="-1" strike="noStrike">
-                <a:solidFill>
-                  <a:srgbClr val="000000"/>
-                </a:solidFill>
-                <a:latin typeface="Arial"/>
-              </a:rPr>
-              <a:t>title </a:t>
-            </a:r>
-            <a:r>
-              <a:rPr b="0" lang="en-US" sz="1800" spc="-1" strike="noStrike">
-                <a:solidFill>
-                  <a:srgbClr val="000000"/>
-                </a:solidFill>
-                <a:latin typeface="Arial"/>
-              </a:rPr>
-              <a:t>text </a:t>
-            </a:r>
-            <a:r>
-              <a:rPr b="0" lang="en-US" sz="1800" spc="-1" strike="noStrike">
-                <a:solidFill>
-                  <a:srgbClr val="000000"/>
-                </a:solidFill>
-                <a:latin typeface="Arial"/>
-              </a:rPr>
-              <a:t>format</a:t>
+              <a:t>Click to edit the title text format</a:t>
             </a:r>
             <a:endParaRPr b="0" lang="en-US" sz="1800" spc="-1" strike="noStrike">
               <a:solidFill>
@@ -9629,7 +9566,7 @@
         <p:spPr>
           <a:xfrm>
             <a:off x="4038480" y="6356520"/>
-            <a:ext cx="4101480" cy="351720"/>
+            <a:ext cx="4101120" cy="351360"/>
           </a:xfrm>
           <a:prstGeom prst="rect">
             <a:avLst/>
@@ -9701,7 +9638,7 @@
         <p:spPr>
           <a:xfrm>
             <a:off x="8610480" y="6356520"/>
-            <a:ext cx="2729880" cy="351720"/>
+            <a:ext cx="2729520" cy="351360"/>
           </a:xfrm>
           <a:prstGeom prst="rect">
             <a:avLst/>
@@ -9744,7 +9681,7 @@
                 <a:tab algn="l" pos="0"/>
               </a:tabLst>
             </a:pPr>
-            <a:fld id="{8BE3903C-B1E8-4E8B-AEF5-7D51C8E4F7BB}" type="slidenum">
+            <a:fld id="{84DD0516-15BE-4E89-B97A-E655ABBEC8F9}" type="slidenum">
               <a:rPr b="0" lang="en-US" sz="1200" spc="-1" strike="noStrike">
                 <a:solidFill>
                   <a:schemeClr val="dk1">
@@ -9777,7 +9714,7 @@
         <p:spPr>
           <a:xfrm>
             <a:off x="838080" y="6356520"/>
-            <a:ext cx="2729880" cy="351720"/>
+            <a:ext cx="2729520" cy="351360"/>
           </a:xfrm>
           <a:prstGeom prst="rect">
             <a:avLst/>
@@ -9866,9 +9803,9 @@
         <p:grpSpPr>
           <a:xfrm>
             <a:off x="6199200" y="6162840"/>
-            <a:ext cx="5979600" cy="681840"/>
+            <a:ext cx="5979240" cy="681480"/>
             <a:chOff x="6199200" y="6162840"/>
-            <a:chExt cx="5979600" cy="681840"/>
+            <a:chExt cx="5979240" cy="681480"/>
           </a:xfrm>
         </p:grpSpPr>
         <p:pic>
@@ -9884,7 +9821,7 @@
           <p:spPr>
             <a:xfrm>
               <a:off x="6199200" y="6162840"/>
-              <a:ext cx="4043160" cy="681840"/>
+              <a:ext cx="4042800" cy="681480"/>
             </a:xfrm>
             <a:prstGeom prst="rect">
               <a:avLst/>
@@ -9907,7 +9844,7 @@
           <p:spPr>
             <a:xfrm>
               <a:off x="10270080" y="6162840"/>
-              <a:ext cx="1908720" cy="598320"/>
+              <a:ext cx="1908360" cy="597960"/>
             </a:xfrm>
             <a:prstGeom prst="rect">
               <a:avLst/>
@@ -9931,7 +9868,7 @@
         <p:spPr>
           <a:xfrm>
             <a:off x="4038480" y="6356520"/>
-            <a:ext cx="4101480" cy="351720"/>
+            <a:ext cx="4101120" cy="351360"/>
           </a:xfrm>
           <a:prstGeom prst="rect">
             <a:avLst/>
@@ -10003,7 +9940,7 @@
         <p:spPr>
           <a:xfrm>
             <a:off x="8610480" y="6356520"/>
-            <a:ext cx="2729880" cy="351720"/>
+            <a:ext cx="2729520" cy="351360"/>
           </a:xfrm>
           <a:prstGeom prst="rect">
             <a:avLst/>
@@ -10046,7 +9983,7 @@
                 <a:tab algn="l" pos="0"/>
               </a:tabLst>
             </a:pPr>
-            <a:fld id="{7DD49FCA-E980-496B-AF1F-2EA36F5AA84C}" type="slidenum">
+            <a:fld id="{A92F6DEF-3483-4D18-835A-91BB9DCC38EB}" type="slidenum">
               <a:rPr b="0" lang="en-US" sz="1200" spc="-1" strike="noStrike">
                 <a:solidFill>
                   <a:schemeClr val="dk1">
@@ -10079,7 +10016,7 @@
         <p:spPr>
           <a:xfrm>
             <a:off x="838080" y="6356520"/>
-            <a:ext cx="2729880" cy="351720"/>
+            <a:ext cx="2729520" cy="351360"/>
           </a:xfrm>
           <a:prstGeom prst="rect">
             <a:avLst/>
@@ -10168,9 +10105,9 @@
         <p:grpSpPr>
           <a:xfrm>
             <a:off x="6199200" y="6162840"/>
-            <a:ext cx="5979600" cy="681840"/>
+            <a:ext cx="5979240" cy="681480"/>
             <a:chOff x="6199200" y="6162840"/>
-            <a:chExt cx="5979600" cy="681840"/>
+            <a:chExt cx="5979240" cy="681480"/>
           </a:xfrm>
         </p:grpSpPr>
         <p:pic>
@@ -10186,7 +10123,7 @@
           <p:spPr>
             <a:xfrm>
               <a:off x="6199200" y="6162840"/>
-              <a:ext cx="4043160" cy="681840"/>
+              <a:ext cx="4042800" cy="681480"/>
             </a:xfrm>
             <a:prstGeom prst="rect">
               <a:avLst/>
@@ -10209,7 +10146,7 @@
           <p:spPr>
             <a:xfrm>
               <a:off x="10270080" y="6162840"/>
-              <a:ext cx="1908720" cy="598320"/>
+              <a:ext cx="1908360" cy="597960"/>
             </a:xfrm>
             <a:prstGeom prst="rect">
               <a:avLst/>
@@ -10233,7 +10170,7 @@
         <p:spPr>
           <a:xfrm>
             <a:off x="4038480" y="6356520"/>
-            <a:ext cx="4101480" cy="351720"/>
+            <a:ext cx="4101120" cy="351360"/>
           </a:xfrm>
           <a:prstGeom prst="rect">
             <a:avLst/>
@@ -10305,7 +10242,7 @@
         <p:spPr>
           <a:xfrm>
             <a:off x="8610480" y="6356520"/>
-            <a:ext cx="2729880" cy="351720"/>
+            <a:ext cx="2729520" cy="351360"/>
           </a:xfrm>
           <a:prstGeom prst="rect">
             <a:avLst/>
@@ -10348,7 +10285,7 @@
                 <a:tab algn="l" pos="0"/>
               </a:tabLst>
             </a:pPr>
-            <a:fld id="{F4AED1DD-1515-465D-81E2-4E821DB79C27}" type="slidenum">
+            <a:fld id="{EBACF89F-DCD6-45BA-8150-BE78D34A97B3}" type="slidenum">
               <a:rPr b="0" lang="en-US" sz="1200" spc="-1" strike="noStrike">
                 <a:solidFill>
                   <a:schemeClr val="dk1">
@@ -10381,7 +10318,7 @@
         <p:spPr>
           <a:xfrm>
             <a:off x="838080" y="6356520"/>
-            <a:ext cx="2729880" cy="351720"/>
+            <a:ext cx="2729520" cy="351360"/>
           </a:xfrm>
           <a:prstGeom prst="rect">
             <a:avLst/>
@@ -10744,9 +10681,9 @@
         <p:grpSpPr>
           <a:xfrm>
             <a:off x="6199200" y="6162840"/>
-            <a:ext cx="5979600" cy="681840"/>
+            <a:ext cx="5979240" cy="681480"/>
             <a:chOff x="6199200" y="6162840"/>
-            <a:chExt cx="5979600" cy="681840"/>
+            <a:chExt cx="5979240" cy="681480"/>
           </a:xfrm>
         </p:grpSpPr>
         <p:pic>
@@ -10762,7 +10699,7 @@
           <p:spPr>
             <a:xfrm>
               <a:off x="6199200" y="6162840"/>
-              <a:ext cx="4043160" cy="681840"/>
+              <a:ext cx="4042800" cy="681480"/>
             </a:xfrm>
             <a:prstGeom prst="rect">
               <a:avLst/>
@@ -10785,7 +10722,7 @@
           <p:spPr>
             <a:xfrm>
               <a:off x="10270080" y="6162840"/>
-              <a:ext cx="1908720" cy="598320"/>
+              <a:ext cx="1908360" cy="597960"/>
             </a:xfrm>
             <a:prstGeom prst="rect">
               <a:avLst/>
@@ -10834,25 +10771,7 @@
                 </a:solidFill>
                 <a:latin typeface="Arial"/>
               </a:rPr>
-              <a:t>Click to edit </a:t>
-            </a:r>
-            <a:r>
-              <a:rPr b="0" lang="en-US" sz="1800" spc="-1" strike="noStrike">
-                <a:solidFill>
-                  <a:srgbClr val="000000"/>
-                </a:solidFill>
-                <a:latin typeface="Arial"/>
-              </a:rPr>
-              <a:t>the title text </a:t>
-            </a:r>
-            <a:r>
-              <a:rPr b="0" lang="en-US" sz="1800" spc="-1" strike="noStrike">
-                <a:solidFill>
-                  <a:srgbClr val="000000"/>
-                </a:solidFill>
-                <a:latin typeface="Arial"/>
-              </a:rPr>
-              <a:t>format</a:t>
+              <a:t>Click to edit the title text format</a:t>
             </a:r>
             <a:endParaRPr b="0" lang="en-US" sz="1800" spc="-1" strike="noStrike">
               <a:solidFill>
@@ -11101,7 +11020,7 @@
         <p:spPr>
           <a:xfrm>
             <a:off x="4038480" y="6356520"/>
-            <a:ext cx="4101480" cy="351720"/>
+            <a:ext cx="4101120" cy="351360"/>
           </a:xfrm>
           <a:prstGeom prst="rect">
             <a:avLst/>
@@ -11173,7 +11092,7 @@
         <p:spPr>
           <a:xfrm>
             <a:off x="8610480" y="6356520"/>
-            <a:ext cx="2729880" cy="351720"/>
+            <a:ext cx="2729520" cy="351360"/>
           </a:xfrm>
           <a:prstGeom prst="rect">
             <a:avLst/>
@@ -11216,7 +11135,7 @@
                 <a:tab algn="l" pos="0"/>
               </a:tabLst>
             </a:pPr>
-            <a:fld id="{CFB18C59-DD0E-4050-BEAE-87176CA6DD59}" type="slidenum">
+            <a:fld id="{C6D40D84-03A3-4200-B619-20142F3A192F}" type="slidenum">
               <a:rPr b="0" lang="en-US" sz="1200" spc="-1" strike="noStrike">
                 <a:solidFill>
                   <a:schemeClr val="dk1">
@@ -11249,7 +11168,7 @@
         <p:spPr>
           <a:xfrm>
             <a:off x="838080" y="6356520"/>
-            <a:ext cx="2729880" cy="351720"/>
+            <a:ext cx="2729520" cy="351360"/>
           </a:xfrm>
           <a:prstGeom prst="rect">
             <a:avLst/>
@@ -11338,9 +11257,9 @@
         <p:grpSpPr>
           <a:xfrm>
             <a:off x="6199200" y="6162840"/>
-            <a:ext cx="5979600" cy="681840"/>
+            <a:ext cx="5979240" cy="681480"/>
             <a:chOff x="6199200" y="6162840"/>
-            <a:chExt cx="5979600" cy="681840"/>
+            <a:chExt cx="5979240" cy="681480"/>
           </a:xfrm>
         </p:grpSpPr>
         <p:pic>
@@ -11356,7 +11275,7 @@
           <p:spPr>
             <a:xfrm>
               <a:off x="6199200" y="6162840"/>
-              <a:ext cx="4043160" cy="681840"/>
+              <a:ext cx="4042800" cy="681480"/>
             </a:xfrm>
             <a:prstGeom prst="rect">
               <a:avLst/>
@@ -11379,7 +11298,7 @@
           <p:spPr>
             <a:xfrm>
               <a:off x="10270080" y="6162840"/>
-              <a:ext cx="1908720" cy="598320"/>
+              <a:ext cx="1908360" cy="597960"/>
             </a:xfrm>
             <a:prstGeom prst="rect">
               <a:avLst/>
@@ -11677,7 +11596,7 @@
         <p:spPr>
           <a:xfrm>
             <a:off x="4038480" y="6356520"/>
-            <a:ext cx="4101480" cy="351720"/>
+            <a:ext cx="4101120" cy="351360"/>
           </a:xfrm>
           <a:prstGeom prst="rect">
             <a:avLst/>
@@ -11749,7 +11668,7 @@
         <p:spPr>
           <a:xfrm>
             <a:off x="8610480" y="6356520"/>
-            <a:ext cx="2729880" cy="351720"/>
+            <a:ext cx="2729520" cy="351360"/>
           </a:xfrm>
           <a:prstGeom prst="rect">
             <a:avLst/>
@@ -11792,7 +11711,7 @@
                 <a:tab algn="l" pos="0"/>
               </a:tabLst>
             </a:pPr>
-            <a:fld id="{69B33530-3FE3-4047-8172-FBBC919DD05D}" type="slidenum">
+            <a:fld id="{83A94B17-3526-411B-9409-FDDF966CCCD5}" type="slidenum">
               <a:rPr b="0" lang="en-US" sz="1200" spc="-1" strike="noStrike">
                 <a:solidFill>
                   <a:schemeClr val="dk1">
@@ -11825,7 +11744,7 @@
         <p:spPr>
           <a:xfrm>
             <a:off x="838080" y="6356520"/>
-            <a:ext cx="2729880" cy="351720"/>
+            <a:ext cx="2729520" cy="351360"/>
           </a:xfrm>
           <a:prstGeom prst="rect">
             <a:avLst/>
@@ -11907,7 +11826,7 @@
         <p:spPr>
           <a:xfrm flipH="1">
             <a:off x="0" y="3073320"/>
-            <a:ext cx="1842120" cy="13320"/>
+            <a:ext cx="1842480" cy="13680"/>
           </a:xfrm>
           <a:prstGeom prst="straightConnector1">
             <a:avLst/>
@@ -11930,7 +11849,7 @@
         <p:spPr>
           <a:xfrm>
             <a:off x="0" y="2489400"/>
-            <a:ext cx="1842120" cy="13320"/>
+            <a:ext cx="1842480" cy="13680"/>
           </a:xfrm>
           <a:prstGeom prst="straightConnector1">
             <a:avLst/>
@@ -11953,7 +11872,7 @@
         <p:spPr>
           <a:xfrm>
             <a:off x="0" y="2781360"/>
-            <a:ext cx="1842120" cy="13320"/>
+            <a:ext cx="1842480" cy="13680"/>
           </a:xfrm>
           <a:prstGeom prst="straightConnector1">
             <a:avLst/>
@@ -11976,7 +11895,7 @@
         <p:spPr>
           <a:xfrm flipH="1">
             <a:off x="0" y="3657600"/>
-            <a:ext cx="1842120" cy="13320"/>
+            <a:ext cx="1842480" cy="13680"/>
           </a:xfrm>
           <a:prstGeom prst="straightConnector1">
             <a:avLst/>
@@ -11998,7 +11917,7 @@
         <p:spPr>
           <a:xfrm>
             <a:off x="128520" y="6134040"/>
-            <a:ext cx="1558440" cy="374400"/>
+            <a:ext cx="1558080" cy="374040"/>
           </a:xfrm>
           <a:prstGeom prst="diamond">
             <a:avLst/>
@@ -12063,7 +11982,7 @@
         <p:spPr>
           <a:xfrm>
             <a:off x="302760" y="5454000"/>
-            <a:ext cx="1209960" cy="374400"/>
+            <a:ext cx="1209600" cy="374040"/>
           </a:xfrm>
           <a:prstGeom prst="ellipse">
             <a:avLst/>
@@ -12126,7 +12045,7 @@
         <p:spPr>
           <a:xfrm>
             <a:off x="101160" y="336240"/>
-            <a:ext cx="1613160" cy="303120"/>
+            <a:ext cx="1612800" cy="303120"/>
           </a:xfrm>
           <a:prstGeom prst="rect">
             <a:avLst/>
@@ -12183,7 +12102,7 @@
         <p:spPr>
           <a:xfrm>
             <a:off x="101160" y="597600"/>
-            <a:ext cx="1613160" cy="516600"/>
+            <a:ext cx="1612800" cy="516600"/>
           </a:xfrm>
           <a:prstGeom prst="rect">
             <a:avLst/>
@@ -12273,7 +12192,7 @@
         <p:spPr>
           <a:xfrm>
             <a:off x="101160" y="336240"/>
-            <a:ext cx="1613160" cy="303120"/>
+            <a:ext cx="1612800" cy="303120"/>
           </a:xfrm>
           <a:prstGeom prst="rect">
             <a:avLst/>
@@ -12330,7 +12249,7 @@
         <p:spPr>
           <a:xfrm>
             <a:off x="101160" y="597600"/>
-            <a:ext cx="1613160" cy="516600"/>
+            <a:ext cx="1612800" cy="516600"/>
           </a:xfrm>
           <a:prstGeom prst="rect">
             <a:avLst/>
@@ -12420,7 +12339,7 @@
         <p:spPr>
           <a:xfrm>
             <a:off x="2541600" y="228600"/>
-            <a:ext cx="1613160" cy="303120"/>
+            <a:ext cx="1612800" cy="303120"/>
           </a:xfrm>
           <a:prstGeom prst="rect">
             <a:avLst/>
@@ -12477,7 +12396,7 @@
         <p:spPr>
           <a:xfrm>
             <a:off x="2541600" y="489960"/>
-            <a:ext cx="1613160" cy="1371240"/>
+            <a:ext cx="1612800" cy="1157760"/>
           </a:xfrm>
           <a:prstGeom prst="rect">
             <a:avLst/>
@@ -12574,33 +12493,6 @@
                 </a:solidFill>
                 <a:latin typeface="Calibri"/>
               </a:rPr>
-              <a:t>Avatar path</a:t>
-            </a:r>
-            <a:endParaRPr b="0" lang="en-US" sz="1400" spc="-1" strike="noStrike">
-              <a:solidFill>
-                <a:srgbClr val="000000"/>
-              </a:solidFill>
-              <a:latin typeface="Arial"/>
-            </a:endParaRPr>
-          </a:p>
-          <a:p>
-            <a:pPr marL="304920" indent="-304920" defTabSz="914400">
-              <a:lnSpc>
-                <a:spcPct val="100000"/>
-              </a:lnSpc>
-              <a:buClr>
-                <a:srgbClr val="000000"/>
-              </a:buClr>
-              <a:buFont typeface="OpenSymbol"/>
-              <a:buChar char="-"/>
-            </a:pPr>
-            <a:r>
-              <a:rPr b="0" lang="en-US" sz="1400" spc="-1" strike="noStrike">
-                <a:solidFill>
-                  <a:schemeClr val="dk1"/>
-                </a:solidFill>
-                <a:latin typeface="Calibri"/>
-              </a:rPr>
               <a:t>XP</a:t>
             </a:r>
             <a:endParaRPr b="0" lang="en-US" sz="1400" spc="-1" strike="noStrike">
@@ -12675,7 +12567,7 @@
         <p:spPr>
           <a:xfrm>
             <a:off x="6656400" y="228600"/>
-            <a:ext cx="1613160" cy="303120"/>
+            <a:ext cx="1612800" cy="303120"/>
           </a:xfrm>
           <a:prstGeom prst="rect">
             <a:avLst/>
@@ -12732,7 +12624,7 @@
         <p:spPr>
           <a:xfrm>
             <a:off x="6656400" y="489960"/>
-            <a:ext cx="1613160" cy="516600"/>
+            <a:ext cx="1612800" cy="516600"/>
           </a:xfrm>
           <a:prstGeom prst="rect">
             <a:avLst/>
@@ -12822,7 +12714,7 @@
         <p:spPr>
           <a:xfrm>
             <a:off x="6656400" y="228600"/>
-            <a:ext cx="1613160" cy="303120"/>
+            <a:ext cx="1612800" cy="303120"/>
           </a:xfrm>
           <a:prstGeom prst="rect">
             <a:avLst/>
@@ -12879,7 +12771,7 @@
         <p:spPr>
           <a:xfrm>
             <a:off x="6656400" y="489960"/>
-            <a:ext cx="1613160" cy="730080"/>
+            <a:ext cx="1612800" cy="730080"/>
           </a:xfrm>
           <a:prstGeom prst="rect">
             <a:avLst/>
@@ -12996,7 +12888,7 @@
         <p:spPr>
           <a:xfrm>
             <a:off x="128520" y="4629600"/>
-            <a:ext cx="1558440" cy="519120"/>
+            <a:ext cx="1558080" cy="518760"/>
           </a:xfrm>
           <a:prstGeom prst="diamond">
             <a:avLst/>
@@ -13084,7 +12976,7 @@
         <p:spPr>
           <a:xfrm>
             <a:off x="0" y="3365640"/>
-            <a:ext cx="1842120" cy="13320"/>
+            <a:ext cx="1842480" cy="13680"/>
           </a:xfrm>
           <a:prstGeom prst="straightConnector1">
             <a:avLst/>
@@ -13106,7 +12998,7 @@
         <p:spPr>
           <a:xfrm>
             <a:off x="673200" y="3949920"/>
-            <a:ext cx="469440" cy="374400"/>
+            <a:ext cx="469080" cy="374040"/>
           </a:xfrm>
           <a:prstGeom prst="triangle">
             <a:avLst>
@@ -13173,9 +13065,9 @@
         <p:grpSpPr>
           <a:xfrm>
             <a:off x="101160" y="1413000"/>
-            <a:ext cx="1613160" cy="777960"/>
+            <a:ext cx="1612800" cy="777960"/>
             <a:chOff x="101160" y="1413000"/>
-            <a:chExt cx="1613160" cy="777960"/>
+            <a:chExt cx="1612800" cy="777960"/>
           </a:xfrm>
         </p:grpSpPr>
         <p:sp>
@@ -13187,7 +13079,7 @@
           <p:spPr>
             <a:xfrm>
               <a:off x="101160" y="1413000"/>
-              <a:ext cx="1613160" cy="303120"/>
+              <a:ext cx="1612800" cy="303120"/>
             </a:xfrm>
             <a:prstGeom prst="rect">
               <a:avLst/>
@@ -13245,7 +13137,7 @@
           <p:spPr>
             <a:xfrm>
               <a:off x="101160" y="1674360"/>
-              <a:ext cx="1613160" cy="516600"/>
+              <a:ext cx="1612800" cy="516600"/>
             </a:xfrm>
             <a:prstGeom prst="rect">
               <a:avLst/>
@@ -13337,7 +13229,7 @@
         <p:spPr>
           <a:xfrm>
             <a:off x="4426920" y="914400"/>
-            <a:ext cx="1558440" cy="374400"/>
+            <a:ext cx="1558080" cy="374040"/>
           </a:xfrm>
           <a:prstGeom prst="diamond">
             <a:avLst/>
@@ -13404,8 +13296,8 @@
         </p:nvCxnSpPr>
         <p:spPr>
           <a:xfrm flipH="1">
-            <a:off x="5985360" y="855000"/>
-            <a:ext cx="671400" cy="246960"/>
+            <a:off x="5985000" y="855000"/>
+            <a:ext cx="671760" cy="246960"/>
           </a:xfrm>
           <a:prstGeom prst="straightConnector1">
             <a:avLst/>
@@ -13428,7 +13320,7 @@
         <p:spPr>
           <a:xfrm>
             <a:off x="6442200" y="1823040"/>
-            <a:ext cx="1787040" cy="374400"/>
+            <a:ext cx="1786680" cy="374040"/>
           </a:xfrm>
           <a:prstGeom prst="diamond">
             <a:avLst/>
@@ -13519,8 +13411,8 @@
         </p:nvCxnSpPr>
         <p:spPr>
           <a:xfrm flipH="1" flipV="1">
-            <a:off x="7335720" y="2197440"/>
-            <a:ext cx="283680" cy="556920"/>
+            <a:off x="7335720" y="2197080"/>
+            <a:ext cx="284040" cy="557640"/>
           </a:xfrm>
           <a:prstGeom prst="straightConnector1">
             <a:avLst/>
@@ -13543,7 +13435,7 @@
         <p:spPr>
           <a:xfrm>
             <a:off x="128520" y="6134400"/>
-            <a:ext cx="1558440" cy="374400"/>
+            <a:ext cx="1558080" cy="374040"/>
           </a:xfrm>
           <a:prstGeom prst="diamond">
             <a:avLst/>
@@ -13608,9 +13500,9 @@
         <p:grpSpPr>
           <a:xfrm>
             <a:off x="6681960" y="2743200"/>
-            <a:ext cx="1841760" cy="1216440"/>
+            <a:ext cx="1841400" cy="1216440"/>
             <a:chOff x="6681960" y="2743200"/>
-            <a:chExt cx="1841760" cy="1216440"/>
+            <a:chExt cx="1841400" cy="1216440"/>
           </a:xfrm>
         </p:grpSpPr>
         <p:sp>
@@ -13622,7 +13514,7 @@
           <p:spPr>
             <a:xfrm>
               <a:off x="6681960" y="2743200"/>
-              <a:ext cx="1841760" cy="303120"/>
+              <a:ext cx="1841400" cy="303120"/>
             </a:xfrm>
             <a:prstGeom prst="rect">
               <a:avLst/>
@@ -13679,7 +13571,7 @@
           <p:spPr>
             <a:xfrm>
               <a:off x="6681960" y="3016080"/>
-              <a:ext cx="1841760" cy="943560"/>
+              <a:ext cx="1841400" cy="943560"/>
             </a:xfrm>
             <a:prstGeom prst="rect">
               <a:avLst/>
@@ -13826,7 +13718,7 @@
         <p:spPr>
           <a:xfrm>
             <a:off x="9173520" y="3501000"/>
-            <a:ext cx="469440" cy="374400"/>
+            <a:ext cx="469080" cy="374040"/>
           </a:xfrm>
           <a:prstGeom prst="triangle">
             <a:avLst>
@@ -13893,7 +13785,7 @@
         <p:spPr>
           <a:xfrm>
             <a:off x="10218960" y="3599280"/>
-            <a:ext cx="1895760" cy="303120"/>
+            <a:ext cx="1895400" cy="303120"/>
           </a:xfrm>
           <a:prstGeom prst="rect">
             <a:avLst/>
@@ -13950,7 +13842,7 @@
         <p:spPr>
           <a:xfrm>
             <a:off x="10218960" y="3902400"/>
-            <a:ext cx="1895760" cy="1584000"/>
+            <a:ext cx="1895400" cy="1584000"/>
           </a:xfrm>
           <a:prstGeom prst="rect">
             <a:avLst/>
@@ -14183,8 +14075,8 @@
         </p:nvCxnSpPr>
         <p:spPr>
           <a:xfrm flipH="1" flipV="1">
-            <a:off x="8523720" y="3351240"/>
-            <a:ext cx="767520" cy="337320"/>
+            <a:off x="8523360" y="3351240"/>
+            <a:ext cx="767880" cy="337320"/>
           </a:xfrm>
           <a:prstGeom prst="straightConnector1">
             <a:avLst/>
@@ -14206,7 +14098,7 @@
         <p:spPr>
           <a:xfrm>
             <a:off x="2086200" y="3336840"/>
-            <a:ext cx="1613160" cy="303120"/>
+            <a:ext cx="1612800" cy="303120"/>
           </a:xfrm>
           <a:prstGeom prst="rect">
             <a:avLst/>
@@ -14263,7 +14155,7 @@
         <p:spPr>
           <a:xfrm>
             <a:off x="2086200" y="3598200"/>
-            <a:ext cx="1613160" cy="516600"/>
+            <a:ext cx="1612800" cy="516600"/>
           </a:xfrm>
           <a:prstGeom prst="rect">
             <a:avLst/>
@@ -14353,7 +14245,7 @@
         <p:spPr>
           <a:xfrm>
             <a:off x="2086200" y="3336840"/>
-            <a:ext cx="1613160" cy="303120"/>
+            <a:ext cx="1612800" cy="303120"/>
           </a:xfrm>
           <a:prstGeom prst="rect">
             <a:avLst/>
@@ -14410,7 +14302,7 @@
         <p:spPr>
           <a:xfrm>
             <a:off x="2086200" y="3598200"/>
-            <a:ext cx="1613160" cy="943560"/>
+            <a:ext cx="1612800" cy="943560"/>
           </a:xfrm>
           <a:prstGeom prst="rect">
             <a:avLst/>
@@ -14554,7 +14446,7 @@
         <p:spPr>
           <a:xfrm>
             <a:off x="1883160" y="2514600"/>
-            <a:ext cx="1816200" cy="374400"/>
+            <a:ext cx="1815840" cy="374040"/>
           </a:xfrm>
           <a:prstGeom prst="diamond">
             <a:avLst/>
@@ -14619,7 +14511,7 @@
         <p:spPr>
           <a:xfrm>
             <a:off x="3481560" y="2899800"/>
-            <a:ext cx="1587600" cy="374400"/>
+            <a:ext cx="1587240" cy="374040"/>
           </a:xfrm>
           <a:prstGeom prst="ellipse">
             <a:avLst/>
@@ -14706,8 +14598,8 @@
         </p:nvCxnSpPr>
         <p:spPr>
           <a:xfrm>
-            <a:off x="3699360" y="2701800"/>
-            <a:ext cx="576360" cy="198360"/>
+            <a:off x="3699000" y="2701800"/>
+            <a:ext cx="576720" cy="198360"/>
           </a:xfrm>
           <a:prstGeom prst="straightConnector1">
             <a:avLst/>
@@ -14731,8 +14623,8 @@
         </p:nvCxnSpPr>
         <p:spPr>
           <a:xfrm flipH="1" flipV="1">
-            <a:off x="2791440" y="2889000"/>
-            <a:ext cx="101520" cy="448200"/>
+            <a:off x="2791080" y="2888640"/>
+            <a:ext cx="101880" cy="448560"/>
           </a:xfrm>
           <a:prstGeom prst="straightConnector1">
             <a:avLst/>
@@ -14756,8 +14648,8 @@
         </p:nvCxnSpPr>
         <p:spPr>
           <a:xfrm flipV="1">
-            <a:off x="2791440" y="1861200"/>
-            <a:ext cx="556920" cy="653760"/>
+            <a:off x="2791080" y="1647720"/>
+            <a:ext cx="557280" cy="867240"/>
           </a:xfrm>
           <a:prstGeom prst="straightConnector1">
             <a:avLst/>
@@ -14779,7 +14671,7 @@
         <p:spPr>
           <a:xfrm>
             <a:off x="10543680" y="457200"/>
-            <a:ext cx="1613160" cy="303120"/>
+            <a:ext cx="1612800" cy="303120"/>
           </a:xfrm>
           <a:prstGeom prst="rect">
             <a:avLst/>
@@ -14836,7 +14728,7 @@
         <p:spPr>
           <a:xfrm>
             <a:off x="10543680" y="718560"/>
-            <a:ext cx="1613160" cy="516600"/>
+            <a:ext cx="1612800" cy="516600"/>
           </a:xfrm>
           <a:prstGeom prst="rect">
             <a:avLst/>
@@ -14926,7 +14818,7 @@
         <p:spPr>
           <a:xfrm>
             <a:off x="10287000" y="457200"/>
-            <a:ext cx="1613160" cy="303120"/>
+            <a:ext cx="1612800" cy="303120"/>
           </a:xfrm>
           <a:prstGeom prst="rect">
             <a:avLst/>
@@ -14983,7 +14875,7 @@
         <p:spPr>
           <a:xfrm>
             <a:off x="10287000" y="718560"/>
-            <a:ext cx="1869840" cy="2651400"/>
+            <a:ext cx="1869480" cy="2651400"/>
           </a:xfrm>
           <a:prstGeom prst="rect">
             <a:avLst/>
@@ -15317,7 +15209,7 @@
         <p:spPr>
           <a:xfrm>
             <a:off x="8007120" y="1448280"/>
-            <a:ext cx="2045160" cy="374400"/>
+            <a:ext cx="2044800" cy="374040"/>
           </a:xfrm>
           <a:prstGeom prst="diamond">
             <a:avLst/>
@@ -15384,8 +15276,8 @@
         </p:nvCxnSpPr>
         <p:spPr>
           <a:xfrm>
-            <a:off x="9029880" y="1822680"/>
-            <a:ext cx="1189440" cy="2872080"/>
+            <a:off x="9029520" y="1822320"/>
+            <a:ext cx="1189800" cy="2872440"/>
           </a:xfrm>
           <a:prstGeom prst="straightConnector1">
             <a:avLst/>
@@ -15409,8 +15301,8 @@
         </p:nvCxnSpPr>
         <p:spPr>
           <a:xfrm flipH="1" flipV="1">
-            <a:off x="10052280" y="1635480"/>
-            <a:ext cx="235080" cy="408960"/>
+            <a:off x="10051920" y="1635480"/>
+            <a:ext cx="235440" cy="408960"/>
           </a:xfrm>
           <a:prstGeom prst="straightConnector1">
             <a:avLst/>
@@ -15435,7 +15327,7 @@
         <p:spPr>
           <a:xfrm flipH="1" flipV="1">
             <a:off x="7462800" y="1220040"/>
-            <a:ext cx="1567440" cy="228600"/>
+            <a:ext cx="1567080" cy="228600"/>
           </a:xfrm>
           <a:prstGeom prst="straightConnector1">
             <a:avLst/>
@@ -15459,8 +15351,8 @@
         </p:nvCxnSpPr>
         <p:spPr>
           <a:xfrm flipH="1" flipV="1">
-            <a:off x="3348000" y="1861200"/>
-            <a:ext cx="1008360" cy="425160"/>
+            <a:off x="3348000" y="1647720"/>
+            <a:ext cx="1008360" cy="638280"/>
           </a:xfrm>
           <a:prstGeom prst="straightConnector1">
             <a:avLst/>
@@ -15482,7 +15374,7 @@
         <p:spPr>
           <a:xfrm>
             <a:off x="4356000" y="1949040"/>
-            <a:ext cx="1815840" cy="673560"/>
+            <a:ext cx="1815480" cy="673200"/>
           </a:xfrm>
           <a:prstGeom prst="diamond">
             <a:avLst/>
@@ -15549,8 +15441,8 @@
         </p:nvCxnSpPr>
         <p:spPr>
           <a:xfrm flipH="1" flipV="1">
-            <a:off x="5263920" y="2622600"/>
-            <a:ext cx="17640" cy="1949760"/>
+            <a:off x="5263920" y="2622240"/>
+            <a:ext cx="17280" cy="1950120"/>
           </a:xfrm>
           <a:prstGeom prst="straightConnector1">
             <a:avLst/>
@@ -15573,9 +15465,9 @@
           <p:nvPr/>
         </p:nvCxnSpPr>
         <p:spPr>
-          <a:xfrm flipH="1">
-            <a:off x="4154760" y="1101600"/>
-            <a:ext cx="272520" cy="74160"/>
+          <a:xfrm flipH="1" flipV="1">
+            <a:off x="4154400" y="1068840"/>
+            <a:ext cx="272880" cy="33120"/>
           </a:xfrm>
           <a:prstGeom prst="straightConnector1">
             <a:avLst/>
@@ -15597,7 +15489,7 @@
         <p:spPr>
           <a:xfrm flipH="1">
             <a:off x="0" y="3657600"/>
-            <a:ext cx="1842120" cy="13320"/>
+            <a:ext cx="1842480" cy="13680"/>
           </a:xfrm>
           <a:prstGeom prst="straightConnector1">
             <a:avLst/>
@@ -15619,7 +15511,7 @@
         <p:spPr>
           <a:xfrm>
             <a:off x="8686800" y="532800"/>
-            <a:ext cx="1364400" cy="374400"/>
+            <a:ext cx="1364040" cy="374040"/>
           </a:xfrm>
           <a:prstGeom prst="ellipse">
             <a:avLst/>
@@ -15684,8 +15576,8 @@
         </p:nvCxnSpPr>
         <p:spPr>
           <a:xfrm flipH="1">
-            <a:off x="9029880" y="907200"/>
-            <a:ext cx="339480" cy="541440"/>
+            <a:off x="9029520" y="906840"/>
+            <a:ext cx="339840" cy="541800"/>
           </a:xfrm>
           <a:prstGeom prst="straightConnector1">
             <a:avLst/>
@@ -15707,7 +15599,7 @@
         <p:spPr>
           <a:xfrm>
             <a:off x="4343400" y="4572000"/>
-            <a:ext cx="1875240" cy="374400"/>
+            <a:ext cx="1874880" cy="374040"/>
           </a:xfrm>
           <a:prstGeom prst="ellipse">
             <a:avLst/>
@@ -15772,8 +15664,8 @@
         </p:nvCxnSpPr>
         <p:spPr>
           <a:xfrm flipV="1">
-            <a:off x="6171840" y="855000"/>
-            <a:ext cx="484920" cy="1431360"/>
+            <a:off x="6171480" y="855000"/>
+            <a:ext cx="485280" cy="1431000"/>
           </a:xfrm>
           <a:prstGeom prst="straightConnector1">
             <a:avLst/>
@@ -15825,7 +15717,7 @@
         <p:spPr>
           <a:xfrm flipH="1">
             <a:off x="0" y="3073320"/>
-            <a:ext cx="1842120" cy="13320"/>
+            <a:ext cx="1842480" cy="13680"/>
           </a:xfrm>
           <a:prstGeom prst="straightConnector1">
             <a:avLst/>
@@ -15848,7 +15740,7 @@
         <p:spPr>
           <a:xfrm>
             <a:off x="0" y="2489400"/>
-            <a:ext cx="1842120" cy="13320"/>
+            <a:ext cx="1842480" cy="13680"/>
           </a:xfrm>
           <a:prstGeom prst="straightConnector1">
             <a:avLst/>
@@ -15871,7 +15763,7 @@
         <p:spPr>
           <a:xfrm>
             <a:off x="0" y="2781360"/>
-            <a:ext cx="1842120" cy="13320"/>
+            <a:ext cx="1842480" cy="13680"/>
           </a:xfrm>
           <a:prstGeom prst="straightConnector1">
             <a:avLst/>
@@ -15894,7 +15786,7 @@
         <p:spPr>
           <a:xfrm flipH="1">
             <a:off x="0" y="3657600"/>
-            <a:ext cx="1842120" cy="13320"/>
+            <a:ext cx="1842480" cy="13680"/>
           </a:xfrm>
           <a:prstGeom prst="straightConnector1">
             <a:avLst/>
@@ -15916,7 +15808,7 @@
         <p:spPr>
           <a:xfrm>
             <a:off x="128520" y="6134040"/>
-            <a:ext cx="1558440" cy="374400"/>
+            <a:ext cx="1558080" cy="374040"/>
           </a:xfrm>
           <a:prstGeom prst="diamond">
             <a:avLst/>
@@ -15981,7 +15873,7 @@
         <p:spPr>
           <a:xfrm>
             <a:off x="302760" y="5454000"/>
-            <a:ext cx="1209960" cy="374400"/>
+            <a:ext cx="1209600" cy="374040"/>
           </a:xfrm>
           <a:prstGeom prst="ellipse">
             <a:avLst/>
@@ -16044,9 +15936,9 @@
         <p:grpSpPr>
           <a:xfrm>
             <a:off x="101160" y="336240"/>
-            <a:ext cx="1613160" cy="777960"/>
+            <a:ext cx="1612800" cy="777960"/>
             <a:chOff x="101160" y="336240"/>
-            <a:chExt cx="1613160" cy="777960"/>
+            <a:chExt cx="1612800" cy="777960"/>
           </a:xfrm>
         </p:grpSpPr>
         <p:sp>
@@ -16058,7 +15950,7 @@
           <p:spPr>
             <a:xfrm>
               <a:off x="101160" y="336240"/>
-              <a:ext cx="1613160" cy="303120"/>
+              <a:ext cx="1612800" cy="303120"/>
             </a:xfrm>
             <a:prstGeom prst="rect">
               <a:avLst/>
@@ -16115,7 +16007,7 @@
           <p:spPr>
             <a:xfrm>
               <a:off x="101160" y="597600"/>
-              <a:ext cx="1613160" cy="516600"/>
+              <a:ext cx="1612800" cy="516600"/>
             </a:xfrm>
             <a:prstGeom prst="rect">
               <a:avLst/>
@@ -16206,7 +16098,7 @@
         <p:spPr>
           <a:xfrm>
             <a:off x="128520" y="4629600"/>
-            <a:ext cx="1558440" cy="519120"/>
+            <a:ext cx="1558080" cy="518760"/>
           </a:xfrm>
           <a:prstGeom prst="diamond">
             <a:avLst/>
@@ -16294,7 +16186,7 @@
         <p:spPr>
           <a:xfrm>
             <a:off x="0" y="3365640"/>
-            <a:ext cx="1842120" cy="13320"/>
+            <a:ext cx="1842480" cy="13680"/>
           </a:xfrm>
           <a:prstGeom prst="straightConnector1">
             <a:avLst/>
@@ -16316,7 +16208,7 @@
         <p:spPr>
           <a:xfrm>
             <a:off x="673200" y="3949920"/>
-            <a:ext cx="469440" cy="374400"/>
+            <a:ext cx="469080" cy="374040"/>
           </a:xfrm>
           <a:prstGeom prst="triangle">
             <a:avLst>
@@ -16383,9 +16275,9 @@
         <p:grpSpPr>
           <a:xfrm>
             <a:off x="101160" y="1413000"/>
-            <a:ext cx="1613160" cy="777960"/>
+            <a:ext cx="1612800" cy="777960"/>
             <a:chOff x="101160" y="1413000"/>
-            <a:chExt cx="1613160" cy="777960"/>
+            <a:chExt cx="1612800" cy="777960"/>
           </a:xfrm>
         </p:grpSpPr>
         <p:sp>
@@ -16397,7 +16289,7 @@
           <p:spPr>
             <a:xfrm>
               <a:off x="101160" y="1413000"/>
-              <a:ext cx="1613160" cy="303120"/>
+              <a:ext cx="1612800" cy="303120"/>
             </a:xfrm>
             <a:prstGeom prst="rect">
               <a:avLst/>
@@ -16455,7 +16347,7 @@
           <p:spPr>
             <a:xfrm>
               <a:off x="101160" y="1674360"/>
-              <a:ext cx="1613160" cy="516600"/>
+              <a:ext cx="1612800" cy="516600"/>
             </a:xfrm>
             <a:prstGeom prst="rect">
               <a:avLst/>
@@ -16547,7 +16439,7 @@
         <p:spPr>
           <a:xfrm>
             <a:off x="4775040" y="457200"/>
-            <a:ext cx="1613160" cy="303120"/>
+            <a:ext cx="1612800" cy="303120"/>
           </a:xfrm>
           <a:prstGeom prst="rect">
             <a:avLst/>
@@ -16604,7 +16496,7 @@
         <p:spPr>
           <a:xfrm>
             <a:off x="4775040" y="718560"/>
-            <a:ext cx="1613160" cy="730080"/>
+            <a:ext cx="1612800" cy="730080"/>
           </a:xfrm>
           <a:prstGeom prst="rect">
             <a:avLst/>
@@ -16721,9 +16613,9 @@
         <p:grpSpPr>
           <a:xfrm>
             <a:off x="4572000" y="4274280"/>
-            <a:ext cx="1613160" cy="991440"/>
+            <a:ext cx="1612800" cy="991440"/>
             <a:chOff x="4572000" y="4274280"/>
-            <a:chExt cx="1613160" cy="991440"/>
+            <a:chExt cx="1612800" cy="991440"/>
           </a:xfrm>
         </p:grpSpPr>
         <p:sp>
@@ -16735,7 +16627,7 @@
           <p:spPr>
             <a:xfrm>
               <a:off x="4572000" y="4274280"/>
-              <a:ext cx="1613160" cy="303120"/>
+              <a:ext cx="1612800" cy="303120"/>
             </a:xfrm>
             <a:prstGeom prst="rect">
               <a:avLst/>
@@ -16792,7 +16684,7 @@
           <p:spPr>
             <a:xfrm>
               <a:off x="4572000" y="4535640"/>
-              <a:ext cx="1613160" cy="730080"/>
+              <a:ext cx="1612800" cy="730080"/>
             </a:xfrm>
             <a:prstGeom prst="rect">
               <a:avLst/>
@@ -16910,7 +16802,7 @@
         <p:spPr>
           <a:xfrm>
             <a:off x="3231360" y="2899800"/>
-            <a:ext cx="1558440" cy="374400"/>
+            <a:ext cx="1558080" cy="374040"/>
           </a:xfrm>
           <a:prstGeom prst="diamond">
             <a:avLst/>
@@ -16975,7 +16867,7 @@
         <p:spPr>
           <a:xfrm>
             <a:off x="4602960" y="2585160"/>
-            <a:ext cx="1787040" cy="375840"/>
+            <a:ext cx="1786680" cy="375480"/>
           </a:xfrm>
           <a:prstGeom prst="diamond">
             <a:avLst/>
@@ -17042,8 +16934,8 @@
         </p:nvCxnSpPr>
         <p:spPr>
           <a:xfrm flipH="1" flipV="1">
-            <a:off x="4010760" y="3274200"/>
-            <a:ext cx="1368000" cy="1000440"/>
+            <a:off x="4010400" y="3273840"/>
+            <a:ext cx="1368360" cy="1000800"/>
           </a:xfrm>
           <a:prstGeom prst="straightConnector1">
             <a:avLst/>
@@ -17093,8 +16985,8 @@
         </p:nvCxnSpPr>
         <p:spPr>
           <a:xfrm flipV="1">
-            <a:off x="5378400" y="2961000"/>
-            <a:ext cx="118440" cy="1313640"/>
+            <a:off x="5378400" y="2960640"/>
+            <a:ext cx="118440" cy="1314000"/>
           </a:xfrm>
           <a:prstGeom prst="straightConnector1">
             <a:avLst/>
@@ -17118,8 +17010,8 @@
         </p:nvCxnSpPr>
         <p:spPr>
           <a:xfrm flipH="1">
-            <a:off x="4010760" y="1448640"/>
-            <a:ext cx="1571040" cy="1451520"/>
+            <a:off x="4010400" y="1448640"/>
+            <a:ext cx="1571400" cy="1451520"/>
           </a:xfrm>
           <a:prstGeom prst="straightConnector1">
             <a:avLst/>
@@ -17141,7 +17033,7 @@
         <p:spPr>
           <a:xfrm>
             <a:off x="2743200" y="457200"/>
-            <a:ext cx="1558440" cy="374400"/>
+            <a:ext cx="1558080" cy="374040"/>
           </a:xfrm>
           <a:prstGeom prst="diamond">
             <a:avLst/>
@@ -17208,8 +17100,8 @@
         </p:nvCxnSpPr>
         <p:spPr>
           <a:xfrm flipH="1" flipV="1">
-            <a:off x="4301640" y="644400"/>
-            <a:ext cx="473760" cy="439560"/>
+            <a:off x="4301280" y="644400"/>
+            <a:ext cx="474120" cy="439560"/>
           </a:xfrm>
           <a:prstGeom prst="straightConnector1">
             <a:avLst/>
@@ -17233,8 +17125,8 @@
         </p:nvCxnSpPr>
         <p:spPr>
           <a:xfrm flipH="1" flipV="1">
-            <a:off x="3522600" y="831600"/>
-            <a:ext cx="1252800" cy="252360"/>
+            <a:off x="3522240" y="831240"/>
+            <a:ext cx="1253160" cy="252720"/>
           </a:xfrm>
           <a:prstGeom prst="straightConnector1">
             <a:avLst/>
@@ -17256,9 +17148,9 @@
         <p:grpSpPr>
           <a:xfrm>
             <a:off x="8686800" y="837360"/>
-            <a:ext cx="1613160" cy="991440"/>
+            <a:ext cx="1612800" cy="991440"/>
             <a:chOff x="8686800" y="837360"/>
-            <a:chExt cx="1613160" cy="991440"/>
+            <a:chExt cx="1612800" cy="991440"/>
           </a:xfrm>
         </p:grpSpPr>
         <p:sp>
@@ -17270,7 +17162,7 @@
           <p:spPr>
             <a:xfrm>
               <a:off x="8686800" y="837360"/>
-              <a:ext cx="1613160" cy="303120"/>
+              <a:ext cx="1612800" cy="303120"/>
             </a:xfrm>
             <a:prstGeom prst="rect">
               <a:avLst/>
@@ -17327,7 +17219,7 @@
           <p:spPr>
             <a:xfrm>
               <a:off x="8686800" y="1098720"/>
-              <a:ext cx="1613160" cy="730080"/>
+              <a:ext cx="1612800" cy="730080"/>
             </a:xfrm>
             <a:prstGeom prst="rect">
               <a:avLst/>
@@ -17445,7 +17337,7 @@
         <p:spPr>
           <a:xfrm>
             <a:off x="128880" y="6134040"/>
-            <a:ext cx="1558440" cy="374400"/>
+            <a:ext cx="1558080" cy="374040"/>
           </a:xfrm>
           <a:prstGeom prst="diamond">
             <a:avLst/>
@@ -17510,7 +17402,7 @@
         <p:spPr>
           <a:xfrm>
             <a:off x="7315200" y="228600"/>
-            <a:ext cx="1558440" cy="374400"/>
+            <a:ext cx="1558080" cy="374040"/>
           </a:xfrm>
           <a:prstGeom prst="diamond">
             <a:avLst/>
@@ -17575,7 +17467,7 @@
         <p:spPr>
           <a:xfrm>
             <a:off x="360" y="3366000"/>
-            <a:ext cx="1842120" cy="13320"/>
+            <a:ext cx="1842480" cy="13680"/>
           </a:xfrm>
           <a:prstGeom prst="straightConnector1">
             <a:avLst/>
@@ -17599,8 +17491,8 @@
         </p:nvCxnSpPr>
         <p:spPr>
           <a:xfrm flipH="1">
-            <a:off x="6388200" y="415800"/>
-            <a:ext cx="927360" cy="668160"/>
+            <a:off x="6387840" y="415800"/>
+            <a:ext cx="927720" cy="668160"/>
           </a:xfrm>
           <a:prstGeom prst="straightConnector1">
             <a:avLst/>
@@ -17622,7 +17514,7 @@
         <p:spPr>
           <a:xfrm>
             <a:off x="6629400" y="1442160"/>
-            <a:ext cx="1817640" cy="604080"/>
+            <a:ext cx="1817280" cy="603720"/>
           </a:xfrm>
           <a:prstGeom prst="diamond">
             <a:avLst/>
@@ -17689,8 +17581,8 @@
         </p:nvCxnSpPr>
         <p:spPr>
           <a:xfrm flipH="1" flipV="1">
-            <a:off x="8873640" y="415800"/>
-            <a:ext cx="619920" cy="421920"/>
+            <a:off x="8873280" y="415800"/>
+            <a:ext cx="620280" cy="421920"/>
           </a:xfrm>
           <a:prstGeom prst="straightConnector1">
             <a:avLst/>
@@ -17713,7 +17605,7 @@
         <p:spPr>
           <a:xfrm>
             <a:off x="6629400" y="2514600"/>
-            <a:ext cx="1558440" cy="374400"/>
+            <a:ext cx="1558080" cy="374040"/>
           </a:xfrm>
           <a:prstGeom prst="diamond">
             <a:avLst/>
@@ -17780,8 +17672,8 @@
         </p:nvCxnSpPr>
         <p:spPr>
           <a:xfrm flipH="1">
-            <a:off x="8187840" y="1828800"/>
-            <a:ext cx="1305720" cy="873360"/>
+            <a:off x="8187480" y="1828800"/>
+            <a:ext cx="1306080" cy="873360"/>
           </a:xfrm>
           <a:prstGeom prst="straightConnector1">
             <a:avLst/>
@@ -17805,8 +17697,8 @@
         </p:nvCxnSpPr>
         <p:spPr>
           <a:xfrm flipH="1">
-            <a:off x="6185160" y="2701800"/>
-            <a:ext cx="444600" cy="2068560"/>
+            <a:off x="6184800" y="2701800"/>
+            <a:ext cx="444960" cy="2068560"/>
           </a:xfrm>
           <a:prstGeom prst="straightConnector1">
             <a:avLst/>
@@ -17830,8 +17722,8 @@
         </p:nvCxnSpPr>
         <p:spPr>
           <a:xfrm flipH="1">
-            <a:off x="8447040" y="1333080"/>
-            <a:ext cx="240120" cy="411480"/>
+            <a:off x="8446680" y="1333080"/>
+            <a:ext cx="240480" cy="411480"/>
           </a:xfrm>
           <a:prstGeom prst="straightConnector1">
             <a:avLst/>
@@ -17878,9 +17770,9 @@
         <p:grpSpPr>
           <a:xfrm>
             <a:off x="101160" y="336240"/>
-            <a:ext cx="1613160" cy="777960"/>
+            <a:ext cx="1612800" cy="777960"/>
             <a:chOff x="101160" y="336240"/>
-            <a:chExt cx="1613160" cy="777960"/>
+            <a:chExt cx="1612800" cy="777960"/>
           </a:xfrm>
         </p:grpSpPr>
         <p:sp>
@@ -17892,7 +17784,7 @@
           <p:spPr>
             <a:xfrm>
               <a:off x="101160" y="336240"/>
-              <a:ext cx="1613160" cy="303120"/>
+              <a:ext cx="1612800" cy="303120"/>
             </a:xfrm>
             <a:prstGeom prst="rect">
               <a:avLst/>
@@ -17949,7 +17841,7 @@
           <p:spPr>
             <a:xfrm>
               <a:off x="101160" y="597600"/>
-              <a:ext cx="1613160" cy="516600"/>
+              <a:ext cx="1612800" cy="516600"/>
             </a:xfrm>
             <a:prstGeom prst="rect">
               <a:avLst/>
@@ -18040,7 +17932,7 @@
         <p:spPr>
           <a:xfrm>
             <a:off x="9144000" y="2057400"/>
-            <a:ext cx="469440" cy="374400"/>
+            <a:ext cx="469080" cy="374040"/>
           </a:xfrm>
           <a:prstGeom prst="triangle">
             <a:avLst>
@@ -18108,8 +18000,8 @@
         </p:nvCxnSpPr>
         <p:spPr>
           <a:xfrm flipV="1">
-            <a:off x="9036720" y="4103640"/>
-            <a:ext cx="419760" cy="544320"/>
+            <a:off x="9036720" y="4103280"/>
+            <a:ext cx="419760" cy="545040"/>
           </a:xfrm>
           <a:prstGeom prst="straightConnector1">
             <a:avLst/>
@@ -18132,8 +18024,8 @@
         </p:nvCxnSpPr>
         <p:spPr>
           <a:xfrm flipH="1">
-            <a:off x="9346320" y="2431800"/>
-            <a:ext cx="32760" cy="459000"/>
+            <a:off x="9346320" y="2431440"/>
+            <a:ext cx="32760" cy="459720"/>
           </a:xfrm>
           <a:prstGeom prst="straightConnector1">
             <a:avLst/>
@@ -18180,7 +18072,7 @@
         <p:spPr>
           <a:xfrm flipH="1">
             <a:off x="0" y="3657600"/>
-            <a:ext cx="1842120" cy="13320"/>
+            <a:ext cx="1842480" cy="13680"/>
           </a:xfrm>
           <a:prstGeom prst="straightConnector1">
             <a:avLst/>
@@ -18202,9 +18094,9 @@
         <p:grpSpPr>
           <a:xfrm>
             <a:off x="8534520" y="2879640"/>
-            <a:ext cx="1613160" cy="554040"/>
+            <a:ext cx="1612800" cy="553680"/>
             <a:chOff x="8534520" y="2879640"/>
-            <a:chExt cx="1613160" cy="554040"/>
+            <a:chExt cx="1612800" cy="553680"/>
           </a:xfrm>
         </p:grpSpPr>
         <p:sp>
@@ -18216,7 +18108,7 @@
           <p:spPr>
             <a:xfrm>
               <a:off x="8534520" y="2879640"/>
-              <a:ext cx="1613160" cy="303120"/>
+              <a:ext cx="1612800" cy="303120"/>
             </a:xfrm>
             <a:prstGeom prst="rect">
               <a:avLst/>
@@ -18273,7 +18165,7 @@
           <p:spPr>
             <a:xfrm>
               <a:off x="8534520" y="3141000"/>
-              <a:ext cx="1613160" cy="292680"/>
+              <a:ext cx="1612800" cy="292320"/>
             </a:xfrm>
             <a:prstGeom prst="rect">
               <a:avLst/>
@@ -18322,9 +18214,9 @@
         <p:grpSpPr>
           <a:xfrm>
             <a:off x="8534520" y="2879640"/>
-            <a:ext cx="1613160" cy="564480"/>
+            <a:ext cx="1612800" cy="564480"/>
             <a:chOff x="8534520" y="2879640"/>
-            <a:chExt cx="1613160" cy="564480"/>
+            <a:chExt cx="1612800" cy="564480"/>
           </a:xfrm>
         </p:grpSpPr>
         <p:sp>
@@ -18336,7 +18228,7 @@
           <p:spPr>
             <a:xfrm>
               <a:off x="8534520" y="2879640"/>
-              <a:ext cx="1613160" cy="303120"/>
+              <a:ext cx="1612800" cy="303120"/>
             </a:xfrm>
             <a:prstGeom prst="rect">
               <a:avLst/>
@@ -18393,7 +18285,7 @@
           <p:spPr>
             <a:xfrm>
               <a:off x="8534520" y="3141000"/>
-              <a:ext cx="1613160" cy="303120"/>
+              <a:ext cx="1612800" cy="303120"/>
             </a:xfrm>
             <a:prstGeom prst="rect">
               <a:avLst/>
@@ -18456,7 +18348,7 @@
         <p:spPr>
           <a:xfrm>
             <a:off x="9221400" y="3729240"/>
-            <a:ext cx="469440" cy="374400"/>
+            <a:ext cx="469080" cy="374040"/>
           </a:xfrm>
           <a:prstGeom prst="triangle">
             <a:avLst>
@@ -18548,7 +18440,7 @@
         <p:spPr>
           <a:xfrm>
             <a:off x="8556840" y="3657600"/>
-            <a:ext cx="1842120" cy="13320"/>
+            <a:ext cx="1842480" cy="13680"/>
           </a:xfrm>
           <a:prstGeom prst="straightConnector1">
             <a:avLst/>
@@ -18571,7 +18463,7 @@
         <p:spPr>
           <a:xfrm>
             <a:off x="9601200" y="3382920"/>
-            <a:ext cx="903240" cy="335160"/>
+            <a:ext cx="902880" cy="334800"/>
           </a:xfrm>
           <a:prstGeom prst="rect">
             <a:avLst/>
@@ -18624,9 +18516,9 @@
         <p:grpSpPr>
           <a:xfrm>
             <a:off x="10265040" y="5029200"/>
-            <a:ext cx="1613160" cy="553680"/>
+            <a:ext cx="1612800" cy="553320"/>
             <a:chOff x="10265040" y="5029200"/>
-            <a:chExt cx="1613160" cy="553680"/>
+            <a:chExt cx="1612800" cy="553320"/>
           </a:xfrm>
         </p:grpSpPr>
         <p:sp>
@@ -18638,7 +18530,7 @@
           <p:spPr>
             <a:xfrm>
               <a:off x="10265040" y="5029200"/>
-              <a:ext cx="1613160" cy="303120"/>
+              <a:ext cx="1612800" cy="303120"/>
             </a:xfrm>
             <a:prstGeom prst="rect">
               <a:avLst/>
@@ -18695,7 +18587,7 @@
           <p:spPr>
             <a:xfrm>
               <a:off x="10265040" y="5290560"/>
-              <a:ext cx="1613160" cy="292320"/>
+              <a:ext cx="1612800" cy="291960"/>
             </a:xfrm>
             <a:prstGeom prst="rect">
               <a:avLst/>
@@ -18746,8 +18638,8 @@
         </p:nvCxnSpPr>
         <p:spPr>
           <a:xfrm flipH="1" flipV="1">
-            <a:off x="9690840" y="4103640"/>
-            <a:ext cx="1380960" cy="925920"/>
+            <a:off x="9690480" y="4103280"/>
+            <a:ext cx="1381320" cy="926280"/>
           </a:xfrm>
           <a:prstGeom prst="straightConnector1">
             <a:avLst/>
@@ -18769,9 +18661,9 @@
         <p:grpSpPr>
           <a:xfrm>
             <a:off x="8229600" y="4646520"/>
-            <a:ext cx="1613160" cy="553680"/>
+            <a:ext cx="1612800" cy="553320"/>
             <a:chOff x="8229600" y="4646520"/>
-            <a:chExt cx="1613160" cy="553680"/>
+            <a:chExt cx="1612800" cy="553320"/>
           </a:xfrm>
         </p:grpSpPr>
         <p:sp>
@@ -18783,7 +18675,7 @@
           <p:spPr>
             <a:xfrm>
               <a:off x="8229600" y="4646520"/>
-              <a:ext cx="1613160" cy="303120"/>
+              <a:ext cx="1612800" cy="303120"/>
             </a:xfrm>
             <a:prstGeom prst="rect">
               <a:avLst/>
@@ -18840,7 +18732,7 @@
           <p:spPr>
             <a:xfrm>
               <a:off x="8229600" y="4907880"/>
-              <a:ext cx="1613160" cy="292320"/>
+              <a:ext cx="1612800" cy="291960"/>
             </a:xfrm>
             <a:prstGeom prst="rect">
               <a:avLst/>
@@ -18889,7 +18781,7 @@
         <p:spPr>
           <a:xfrm>
             <a:off x="10037520" y="2131560"/>
-            <a:ext cx="469440" cy="374400"/>
+            <a:ext cx="469080" cy="374040"/>
           </a:xfrm>
           <a:prstGeom prst="triangle">
             <a:avLst>
@@ -18981,9 +18873,9 @@
         <p:grpSpPr>
           <a:xfrm>
             <a:off x="10494000" y="2866680"/>
-            <a:ext cx="1613160" cy="553680"/>
+            <a:ext cx="1612800" cy="553320"/>
             <a:chOff x="10494000" y="2866680"/>
-            <a:chExt cx="1613160" cy="553680"/>
+            <a:chExt cx="1612800" cy="553320"/>
           </a:xfrm>
         </p:grpSpPr>
         <p:sp>
@@ -18995,7 +18887,7 @@
           <p:spPr>
             <a:xfrm>
               <a:off x="10494000" y="2866680"/>
-              <a:ext cx="1613160" cy="303120"/>
+              <a:ext cx="1612800" cy="303120"/>
             </a:xfrm>
             <a:prstGeom prst="rect">
               <a:avLst/>
@@ -19052,7 +18944,7 @@
           <p:spPr>
             <a:xfrm>
               <a:off x="10494000" y="3128040"/>
-              <a:ext cx="1613160" cy="292320"/>
+              <a:ext cx="1612800" cy="291960"/>
             </a:xfrm>
             <a:prstGeom prst="rect">
               <a:avLst/>
@@ -19103,8 +18995,8 @@
         </p:nvCxnSpPr>
         <p:spPr>
           <a:xfrm>
-            <a:off x="10272240" y="2505960"/>
-            <a:ext cx="1028520" cy="361080"/>
+            <a:off x="10272240" y="2505600"/>
+            <a:ext cx="1028520" cy="361440"/>
           </a:xfrm>
           <a:prstGeom prst="straightConnector1">
             <a:avLst/>
@@ -19156,7 +19048,7 @@
         <p:spPr>
           <a:xfrm flipH="1">
             <a:off x="0" y="3073320"/>
-            <a:ext cx="1842120" cy="13320"/>
+            <a:ext cx="1842480" cy="13680"/>
           </a:xfrm>
           <a:prstGeom prst="straightConnector1">
             <a:avLst/>
@@ -19179,7 +19071,7 @@
         <p:spPr>
           <a:xfrm>
             <a:off x="0" y="2489400"/>
-            <a:ext cx="1842120" cy="13320"/>
+            <a:ext cx="1842480" cy="13680"/>
           </a:xfrm>
           <a:prstGeom prst="straightConnector1">
             <a:avLst/>
@@ -19202,7 +19094,7 @@
         <p:spPr>
           <a:xfrm>
             <a:off x="0" y="2781360"/>
-            <a:ext cx="1842120" cy="13320"/>
+            <a:ext cx="1842480" cy="13680"/>
           </a:xfrm>
           <a:prstGeom prst="straightConnector1">
             <a:avLst/>
@@ -19225,7 +19117,7 @@
         <p:spPr>
           <a:xfrm flipH="1">
             <a:off x="0" y="3657600"/>
-            <a:ext cx="1842120" cy="13320"/>
+            <a:ext cx="1842480" cy="13680"/>
           </a:xfrm>
           <a:prstGeom prst="straightConnector1">
             <a:avLst/>
@@ -19247,7 +19139,7 @@
         <p:spPr>
           <a:xfrm>
             <a:off x="128520" y="6134040"/>
-            <a:ext cx="1558440" cy="374400"/>
+            <a:ext cx="1558080" cy="374040"/>
           </a:xfrm>
           <a:prstGeom prst="diamond">
             <a:avLst/>
@@ -19312,7 +19204,7 @@
         <p:spPr>
           <a:xfrm>
             <a:off x="302760" y="5454000"/>
-            <a:ext cx="1209960" cy="374400"/>
+            <a:ext cx="1209600" cy="374040"/>
           </a:xfrm>
           <a:prstGeom prst="ellipse">
             <a:avLst/>
@@ -19375,7 +19267,7 @@
         <p:spPr>
           <a:xfrm>
             <a:off x="101160" y="336240"/>
-            <a:ext cx="1613160" cy="303120"/>
+            <a:ext cx="1612800" cy="303120"/>
           </a:xfrm>
           <a:prstGeom prst="rect">
             <a:avLst/>
@@ -19432,7 +19324,7 @@
         <p:spPr>
           <a:xfrm>
             <a:off x="101160" y="597600"/>
-            <a:ext cx="1613160" cy="516600"/>
+            <a:ext cx="1612800" cy="516600"/>
           </a:xfrm>
           <a:prstGeom prst="rect">
             <a:avLst/>
@@ -19522,7 +19414,7 @@
         <p:spPr>
           <a:xfrm>
             <a:off x="8458200" y="5486400"/>
-            <a:ext cx="1613160" cy="303120"/>
+            <a:ext cx="1612800" cy="303120"/>
           </a:xfrm>
           <a:prstGeom prst="rect">
             <a:avLst/>
@@ -19579,7 +19471,7 @@
         <p:spPr>
           <a:xfrm>
             <a:off x="128520" y="4629600"/>
-            <a:ext cx="1558440" cy="519120"/>
+            <a:ext cx="1558080" cy="518760"/>
           </a:xfrm>
           <a:prstGeom prst="diamond">
             <a:avLst/>
@@ -19667,7 +19559,7 @@
         <p:spPr>
           <a:xfrm>
             <a:off x="0" y="3365640"/>
-            <a:ext cx="1842120" cy="13320"/>
+            <a:ext cx="1842480" cy="13680"/>
           </a:xfrm>
           <a:prstGeom prst="straightConnector1">
             <a:avLst/>
@@ -19689,7 +19581,7 @@
         <p:spPr>
           <a:xfrm>
             <a:off x="673200" y="3949920"/>
-            <a:ext cx="469440" cy="374400"/>
+            <a:ext cx="469080" cy="374040"/>
           </a:xfrm>
           <a:prstGeom prst="triangle">
             <a:avLst>
@@ -19756,9 +19648,9 @@
         <p:grpSpPr>
           <a:xfrm>
             <a:off x="101160" y="1413000"/>
-            <a:ext cx="1613160" cy="777960"/>
+            <a:ext cx="1612800" cy="777960"/>
             <a:chOff x="101160" y="1413000"/>
-            <a:chExt cx="1613160" cy="777960"/>
+            <a:chExt cx="1612800" cy="777960"/>
           </a:xfrm>
         </p:grpSpPr>
         <p:sp>
@@ -19770,7 +19662,7 @@
           <p:spPr>
             <a:xfrm>
               <a:off x="101160" y="1413000"/>
-              <a:ext cx="1613160" cy="303120"/>
+              <a:ext cx="1612800" cy="303120"/>
             </a:xfrm>
             <a:prstGeom prst="rect">
               <a:avLst/>
@@ -19828,7 +19720,7 @@
           <p:spPr>
             <a:xfrm>
               <a:off x="101160" y="1674360"/>
-              <a:ext cx="1613160" cy="516600"/>
+              <a:ext cx="1612800" cy="516600"/>
             </a:xfrm>
             <a:prstGeom prst="rect">
               <a:avLst/>
@@ -19920,9 +19812,9 @@
         <p:grpSpPr>
           <a:xfrm>
             <a:off x="4296600" y="4022640"/>
-            <a:ext cx="1613160" cy="1632960"/>
+            <a:ext cx="1612800" cy="1632960"/>
             <a:chOff x="4296600" y="4022640"/>
-            <a:chExt cx="1613160" cy="1632960"/>
+            <a:chExt cx="1612800" cy="1632960"/>
           </a:xfrm>
         </p:grpSpPr>
         <p:sp>
@@ -19934,7 +19826,7 @@
           <p:spPr>
             <a:xfrm>
               <a:off x="4296600" y="4022640"/>
-              <a:ext cx="1613160" cy="303120"/>
+              <a:ext cx="1612800" cy="303120"/>
             </a:xfrm>
             <a:prstGeom prst="rect">
               <a:avLst/>
@@ -19991,7 +19883,7 @@
           <p:spPr>
             <a:xfrm>
               <a:off x="4296600" y="4284000"/>
-              <a:ext cx="1613160" cy="1371600"/>
+              <a:ext cx="1612800" cy="1371600"/>
             </a:xfrm>
             <a:prstGeom prst="rect">
               <a:avLst/>
@@ -20190,9 +20082,9 @@
         <p:grpSpPr>
           <a:xfrm>
             <a:off x="9348840" y="2254320"/>
-            <a:ext cx="1613160" cy="1631880"/>
+            <a:ext cx="1612800" cy="1631880"/>
             <a:chOff x="9348840" y="2254320"/>
-            <a:chExt cx="1613160" cy="1631880"/>
+            <a:chExt cx="1612800" cy="1631880"/>
           </a:xfrm>
         </p:grpSpPr>
         <p:sp>
@@ -20204,7 +20096,7 @@
           <p:spPr>
             <a:xfrm>
               <a:off x="9348840" y="2254320"/>
-              <a:ext cx="1613160" cy="303120"/>
+              <a:ext cx="1612800" cy="303120"/>
             </a:xfrm>
             <a:prstGeom prst="rect">
               <a:avLst/>
@@ -20261,7 +20153,7 @@
           <p:spPr>
             <a:xfrm>
               <a:off x="9348840" y="2515680"/>
-              <a:ext cx="1613160" cy="1370520"/>
+              <a:ext cx="1612800" cy="1370520"/>
             </a:xfrm>
             <a:prstGeom prst="rect">
               <a:avLst/>
@@ -20460,7 +20352,7 @@
         <p:spPr>
           <a:xfrm>
             <a:off x="9402120" y="4572000"/>
-            <a:ext cx="1558440" cy="374400"/>
+            <a:ext cx="1558080" cy="374040"/>
           </a:xfrm>
           <a:prstGeom prst="diamond">
             <a:avLst/>
@@ -20525,9 +20417,9 @@
         <p:grpSpPr>
           <a:xfrm>
             <a:off x="9348840" y="2254320"/>
-            <a:ext cx="1613160" cy="1631880"/>
+            <a:ext cx="1612800" cy="1631880"/>
             <a:chOff x="9348840" y="2254320"/>
-            <a:chExt cx="1613160" cy="1631880"/>
+            <a:chExt cx="1612800" cy="1631880"/>
           </a:xfrm>
         </p:grpSpPr>
         <p:sp>
@@ -20539,7 +20431,7 @@
           <p:spPr>
             <a:xfrm>
               <a:off x="9348840" y="2254320"/>
-              <a:ext cx="1613160" cy="303120"/>
+              <a:ext cx="1612800" cy="303120"/>
             </a:xfrm>
             <a:prstGeom prst="rect">
               <a:avLst/>
@@ -20596,7 +20488,7 @@
           <p:spPr>
             <a:xfrm>
               <a:off x="9348840" y="2515680"/>
-              <a:ext cx="1613160" cy="1370520"/>
+              <a:ext cx="1612800" cy="1370520"/>
             </a:xfrm>
             <a:prstGeom prst="rect">
               <a:avLst/>
@@ -20795,9 +20687,9 @@
         <p:grpSpPr>
           <a:xfrm>
             <a:off x="9348840" y="2254320"/>
-            <a:ext cx="1613160" cy="1632600"/>
+            <a:ext cx="1612800" cy="1631880"/>
             <a:chOff x="9348840" y="2254320"/>
-            <a:chExt cx="1613160" cy="1632600"/>
+            <a:chExt cx="1612800" cy="1631880"/>
           </a:xfrm>
         </p:grpSpPr>
         <p:sp>
@@ -20809,7 +20701,7 @@
           <p:spPr>
             <a:xfrm>
               <a:off x="9348840" y="2254320"/>
-              <a:ext cx="1613160" cy="303120"/>
+              <a:ext cx="1612800" cy="303120"/>
             </a:xfrm>
             <a:prstGeom prst="rect">
               <a:avLst/>
@@ -20866,7 +20758,7 @@
           <p:spPr>
             <a:xfrm>
               <a:off x="9348840" y="2515680"/>
-              <a:ext cx="1613160" cy="1371240"/>
+              <a:ext cx="1612800" cy="1370520"/>
             </a:xfrm>
             <a:prstGeom prst="rect">
               <a:avLst/>
@@ -21065,7 +20957,7 @@
         <p:spPr>
           <a:xfrm>
             <a:off x="7086600" y="3501720"/>
-            <a:ext cx="1816560" cy="374400"/>
+            <a:ext cx="1816200" cy="374040"/>
           </a:xfrm>
           <a:prstGeom prst="diamond">
             <a:avLst/>
@@ -21132,8 +21024,8 @@
         </p:nvCxnSpPr>
         <p:spPr>
           <a:xfrm flipH="1">
-            <a:off x="9264600" y="4946400"/>
-            <a:ext cx="917280" cy="540360"/>
+            <a:off x="9264600" y="4946040"/>
+            <a:ext cx="916920" cy="540720"/>
           </a:xfrm>
           <a:prstGeom prst="straightConnector1">
             <a:avLst/>
@@ -21157,8 +21049,8 @@
         </p:nvCxnSpPr>
         <p:spPr>
           <a:xfrm>
-            <a:off x="10155240" y="3886920"/>
-            <a:ext cx="26640" cy="685440"/>
+            <a:off x="10155240" y="3886200"/>
+            <a:ext cx="26280" cy="686160"/>
           </a:xfrm>
           <a:prstGeom prst="straightConnector1">
             <a:avLst/>
@@ -21180,7 +21072,7 @@
         <p:spPr>
           <a:xfrm>
             <a:off x="6629400" y="5099760"/>
-            <a:ext cx="1587960" cy="374400"/>
+            <a:ext cx="1587600" cy="374040"/>
           </a:xfrm>
           <a:prstGeom prst="ellipse">
             <a:avLst/>
@@ -21245,8 +21137,8 @@
         </p:nvCxnSpPr>
         <p:spPr>
           <a:xfrm flipH="1">
-            <a:off x="8217360" y="4759200"/>
-            <a:ext cx="1185120" cy="528120"/>
+            <a:off x="8217000" y="4759200"/>
+            <a:ext cx="1185480" cy="528120"/>
           </a:xfrm>
           <a:prstGeom prst="straightConnector1">
             <a:avLst/>
@@ -21270,8 +21162,8 @@
         </p:nvCxnSpPr>
         <p:spPr>
           <a:xfrm flipV="1">
-            <a:off x="5909760" y="3688920"/>
-            <a:ext cx="1177200" cy="1150560"/>
+            <a:off x="5909400" y="3688920"/>
+            <a:ext cx="1177560" cy="1150560"/>
           </a:xfrm>
           <a:prstGeom prst="straightConnector1">
             <a:avLst/>
@@ -21296,8 +21188,8 @@
         </p:nvCxnSpPr>
         <p:spPr>
           <a:xfrm flipH="1">
-            <a:off x="8903160" y="3070440"/>
-            <a:ext cx="446040" cy="618840"/>
+            <a:off x="8902800" y="3070080"/>
+            <a:ext cx="446400" cy="619200"/>
           </a:xfrm>
           <a:prstGeom prst="straightConnector1">
             <a:avLst/>
@@ -21319,7 +21211,7 @@
         <p:spPr>
           <a:xfrm>
             <a:off x="7315200" y="4114800"/>
-            <a:ext cx="1667160" cy="374400"/>
+            <a:ext cx="1666800" cy="374040"/>
           </a:xfrm>
           <a:prstGeom prst="ellipse">
             <a:avLst/>
@@ -21384,8 +21276,8 @@
         </p:nvCxnSpPr>
         <p:spPr>
           <a:xfrm flipH="1" flipV="1">
-            <a:off x="8982360" y="4302000"/>
-            <a:ext cx="420120" cy="457560"/>
+            <a:off x="8982000" y="4302000"/>
+            <a:ext cx="420480" cy="457560"/>
           </a:xfrm>
           <a:prstGeom prst="straightConnector1">
             <a:avLst/>
@@ -21407,7 +21299,7 @@
         <p:spPr>
           <a:xfrm>
             <a:off x="2727720" y="1982880"/>
-            <a:ext cx="1613160" cy="303120"/>
+            <a:ext cx="1612800" cy="303120"/>
           </a:xfrm>
           <a:prstGeom prst="rect">
             <a:avLst/>
@@ -21464,7 +21356,7 @@
         <p:spPr>
           <a:xfrm rot="21559200">
             <a:off x="2295720" y="3255120"/>
-            <a:ext cx="2043000" cy="387720"/>
+            <a:ext cx="2042640" cy="387360"/>
           </a:xfrm>
           <a:prstGeom prst="diamond">
             <a:avLst/>
@@ -21531,8 +21423,8 @@
         </p:nvCxnSpPr>
         <p:spPr>
           <a:xfrm flipH="1" flipV="1">
-            <a:off x="3319560" y="3643920"/>
-            <a:ext cx="977400" cy="1195560"/>
+            <a:off x="3319200" y="3643560"/>
+            <a:ext cx="977760" cy="1195920"/>
           </a:xfrm>
           <a:prstGeom prst="straightConnector1">
             <a:avLst/>
@@ -21557,8 +21449,8 @@
         </p:nvCxnSpPr>
         <p:spPr>
           <a:xfrm flipH="1">
-            <a:off x="3315240" y="2286000"/>
-            <a:ext cx="219240" cy="970200"/>
+            <a:off x="3314880" y="2286000"/>
+            <a:ext cx="219600" cy="970200"/>
           </a:xfrm>
           <a:prstGeom prst="straightConnector1">
             <a:avLst/>
@@ -21610,7 +21502,7 @@
         <p:spPr>
           <a:xfrm flipH="1">
             <a:off x="0" y="3073320"/>
-            <a:ext cx="1842120" cy="13320"/>
+            <a:ext cx="1842480" cy="13680"/>
           </a:xfrm>
           <a:prstGeom prst="straightConnector1">
             <a:avLst/>
@@ -21633,7 +21525,7 @@
         <p:spPr>
           <a:xfrm>
             <a:off x="0" y="2489400"/>
-            <a:ext cx="1842120" cy="13320"/>
+            <a:ext cx="1842480" cy="13680"/>
           </a:xfrm>
           <a:prstGeom prst="straightConnector1">
             <a:avLst/>
@@ -21656,7 +21548,7 @@
         <p:spPr>
           <a:xfrm>
             <a:off x="0" y="2781360"/>
-            <a:ext cx="1842120" cy="13320"/>
+            <a:ext cx="1842480" cy="13680"/>
           </a:xfrm>
           <a:prstGeom prst="straightConnector1">
             <a:avLst/>
@@ -21679,7 +21571,7 @@
         <p:spPr>
           <a:xfrm flipH="1">
             <a:off x="0" y="3657600"/>
-            <a:ext cx="1842120" cy="13320"/>
+            <a:ext cx="1842480" cy="13680"/>
           </a:xfrm>
           <a:prstGeom prst="straightConnector1">
             <a:avLst/>
@@ -21701,7 +21593,7 @@
         <p:spPr>
           <a:xfrm>
             <a:off x="128520" y="6134040"/>
-            <a:ext cx="1558440" cy="374400"/>
+            <a:ext cx="1558080" cy="374040"/>
           </a:xfrm>
           <a:prstGeom prst="diamond">
             <a:avLst/>
@@ -21766,7 +21658,7 @@
         <p:spPr>
           <a:xfrm>
             <a:off x="302760" y="5454000"/>
-            <a:ext cx="1209960" cy="374400"/>
+            <a:ext cx="1209600" cy="374040"/>
           </a:xfrm>
           <a:prstGeom prst="ellipse">
             <a:avLst/>
@@ -21829,9 +21721,9 @@
         <p:grpSpPr>
           <a:xfrm>
             <a:off x="101160" y="336240"/>
-            <a:ext cx="1613160" cy="777960"/>
+            <a:ext cx="1612800" cy="777960"/>
             <a:chOff x="101160" y="336240"/>
-            <a:chExt cx="1613160" cy="777960"/>
+            <a:chExt cx="1612800" cy="777960"/>
           </a:xfrm>
         </p:grpSpPr>
         <p:sp>
@@ -21843,7 +21735,7 @@
           <p:spPr>
             <a:xfrm>
               <a:off x="101160" y="336240"/>
-              <a:ext cx="1613160" cy="303120"/>
+              <a:ext cx="1612800" cy="303120"/>
             </a:xfrm>
             <a:prstGeom prst="rect">
               <a:avLst/>
@@ -21900,7 +21792,7 @@
           <p:spPr>
             <a:xfrm>
               <a:off x="101160" y="597600"/>
-              <a:ext cx="1613160" cy="516600"/>
+              <a:ext cx="1612800" cy="516600"/>
             </a:xfrm>
             <a:prstGeom prst="rect">
               <a:avLst/>
@@ -21991,7 +21883,7 @@
         <p:spPr>
           <a:xfrm>
             <a:off x="128520" y="4629600"/>
-            <a:ext cx="1558440" cy="519120"/>
+            <a:ext cx="1558080" cy="518760"/>
           </a:xfrm>
           <a:prstGeom prst="diamond">
             <a:avLst/>
@@ -22079,7 +21971,7 @@
         <p:spPr>
           <a:xfrm>
             <a:off x="0" y="3365640"/>
-            <a:ext cx="1842120" cy="13320"/>
+            <a:ext cx="1842480" cy="13680"/>
           </a:xfrm>
           <a:prstGeom prst="straightConnector1">
             <a:avLst/>
@@ -22101,7 +21993,7 @@
         <p:spPr>
           <a:xfrm>
             <a:off x="673200" y="3949920"/>
-            <a:ext cx="469440" cy="374400"/>
+            <a:ext cx="469080" cy="374040"/>
           </a:xfrm>
           <a:prstGeom prst="triangle">
             <a:avLst>
@@ -22168,9 +22060,9 @@
         <p:grpSpPr>
           <a:xfrm>
             <a:off x="101160" y="1413000"/>
-            <a:ext cx="1613160" cy="777960"/>
+            <a:ext cx="1612800" cy="777960"/>
             <a:chOff x="101160" y="1413000"/>
-            <a:chExt cx="1613160" cy="777960"/>
+            <a:chExt cx="1612800" cy="777960"/>
           </a:xfrm>
         </p:grpSpPr>
         <p:sp>
@@ -22182,7 +22074,7 @@
           <p:spPr>
             <a:xfrm>
               <a:off x="101160" y="1413000"/>
-              <a:ext cx="1613160" cy="303120"/>
+              <a:ext cx="1612800" cy="303120"/>
             </a:xfrm>
             <a:prstGeom prst="rect">
               <a:avLst/>
@@ -22240,7 +22132,7 @@
           <p:spPr>
             <a:xfrm>
               <a:off x="101160" y="1674360"/>
-              <a:ext cx="1613160" cy="516600"/>
+              <a:ext cx="1612800" cy="516600"/>
             </a:xfrm>
             <a:prstGeom prst="rect">
               <a:avLst/>
@@ -22332,9 +22224,9 @@
         <p:grpSpPr>
           <a:xfrm>
             <a:off x="3886200" y="2286000"/>
-            <a:ext cx="1613160" cy="1845360"/>
+            <a:ext cx="1612800" cy="1845360"/>
             <a:chOff x="3886200" y="2286000"/>
-            <a:chExt cx="1613160" cy="1845360"/>
+            <a:chExt cx="1612800" cy="1845360"/>
           </a:xfrm>
         </p:grpSpPr>
         <p:sp>
@@ -22346,7 +22238,7 @@
           <p:spPr>
             <a:xfrm>
               <a:off x="3886200" y="2286000"/>
-              <a:ext cx="1613160" cy="303120"/>
+              <a:ext cx="1612800" cy="303120"/>
             </a:xfrm>
             <a:prstGeom prst="rect">
               <a:avLst/>
@@ -22403,7 +22295,7 @@
           <p:spPr>
             <a:xfrm>
               <a:off x="3886200" y="2547360"/>
-              <a:ext cx="1613160" cy="1584000"/>
+              <a:ext cx="1612800" cy="1584000"/>
             </a:xfrm>
             <a:prstGeom prst="rect">
               <a:avLst/>

</xml_diff>

<commit_message>
cleanup wheel of fortune
</commit_message>
<xml_diff>
--- a/documentation/database/ER-Diagram.pptx
+++ b/documentation/database/ER-Diagram.pptx
@@ -353,7 +353,7 @@
             <a:pPr indent="0" algn="r">
               <a:buNone/>
             </a:pPr>
-            <a:fld id="{B94239CF-4B91-45ED-A451-03FEC7D99AB2}" type="slidenum">
+            <a:fld id="{007D3296-F707-448D-9630-3DB112A295E8}" type="slidenum">
               <a:rPr b="0" lang="en-US" sz="1400" spc="-1" strike="noStrike">
                 <a:solidFill>
                   <a:srgbClr val="000000"/>
@@ -396,7 +396,7 @@
       </p:grpSpPr>
       <p:sp>
         <p:nvSpPr>
-          <p:cNvPr id="331" name="PlaceHolder 1"/>
+          <p:cNvPr id="326" name="PlaceHolder 1"/>
           <p:cNvSpPr>
             <a:spLocks noGrp="1"/>
           </p:cNvSpPr>
@@ -407,7 +407,7 @@
         <p:spPr>
           <a:xfrm>
             <a:off x="685800" y="1143000"/>
-            <a:ext cx="5472720" cy="3072600"/>
+            <a:ext cx="5472360" cy="3072240"/>
           </a:xfrm>
           <a:prstGeom prst="rect">
             <a:avLst/>
@@ -419,7 +419,7 @@
       </p:sp>
       <p:sp>
         <p:nvSpPr>
-          <p:cNvPr id="332" name="PlaceHolder 2"/>
+          <p:cNvPr id="327" name="PlaceHolder 2"/>
           <p:cNvSpPr>
             <a:spLocks noGrp="1"/>
           </p:cNvSpPr>
@@ -430,7 +430,7 @@
         <p:spPr>
           <a:xfrm>
             <a:off x="685800" y="4400640"/>
-            <a:ext cx="5472720" cy="3586680"/>
+            <a:ext cx="5472360" cy="3586320"/>
           </a:xfrm>
           <a:prstGeom prst="rect">
             <a:avLst/>
@@ -459,7 +459,7 @@
       </p:sp>
       <p:sp>
         <p:nvSpPr>
-          <p:cNvPr id="333" name="PlaceHolder 3"/>
+          <p:cNvPr id="328" name="PlaceHolder 3"/>
           <p:cNvSpPr>
             <a:spLocks noGrp="1"/>
           </p:cNvSpPr>
@@ -470,7 +470,7 @@
         <p:spPr>
           <a:xfrm>
             <a:off x="3884760" y="8685360"/>
-            <a:ext cx="2958120" cy="444960"/>
+            <a:ext cx="2957760" cy="444600"/>
           </a:xfrm>
           <a:prstGeom prst="rect">
             <a:avLst/>
@@ -512,7 +512,7 @@
                 <a:tab algn="l" pos="0"/>
               </a:tabLst>
             </a:pPr>
-            <a:fld id="{D7497B8A-6CFA-4DCF-8B75-64E1F5E9D343}" type="slidenum">
+            <a:fld id="{9F2458C3-F8DF-458E-B70B-51FB9D358E25}" type="slidenum">
               <a:rPr b="0" lang="en-US" sz="1200" spc="-1" strike="noStrike">
                 <a:solidFill>
                   <a:schemeClr val="dk1"/>
@@ -555,7 +555,7 @@
       </p:grpSpPr>
       <p:sp>
         <p:nvSpPr>
-          <p:cNvPr id="334" name="PlaceHolder 1"/>
+          <p:cNvPr id="329" name="PlaceHolder 1"/>
           <p:cNvSpPr>
             <a:spLocks noGrp="1"/>
           </p:cNvSpPr>
@@ -566,7 +566,7 @@
         <p:spPr>
           <a:xfrm>
             <a:off x="685800" y="1143000"/>
-            <a:ext cx="5472720" cy="3072600"/>
+            <a:ext cx="5472360" cy="3072240"/>
           </a:xfrm>
           <a:prstGeom prst="rect">
             <a:avLst/>
@@ -578,7 +578,7 @@
       </p:sp>
       <p:sp>
         <p:nvSpPr>
-          <p:cNvPr id="335" name="PlaceHolder 2"/>
+          <p:cNvPr id="330" name="PlaceHolder 2"/>
           <p:cNvSpPr>
             <a:spLocks noGrp="1"/>
           </p:cNvSpPr>
@@ -589,7 +589,7 @@
         <p:spPr>
           <a:xfrm>
             <a:off x="685800" y="4400640"/>
-            <a:ext cx="5472720" cy="3586680"/>
+            <a:ext cx="5472360" cy="3586320"/>
           </a:xfrm>
           <a:prstGeom prst="rect">
             <a:avLst/>
@@ -618,7 +618,7 @@
       </p:sp>
       <p:sp>
         <p:nvSpPr>
-          <p:cNvPr id="336" name="PlaceHolder 3"/>
+          <p:cNvPr id="331" name="PlaceHolder 3"/>
           <p:cNvSpPr>
             <a:spLocks noGrp="1"/>
           </p:cNvSpPr>
@@ -629,7 +629,7 @@
         <p:spPr>
           <a:xfrm>
             <a:off x="3884760" y="8685360"/>
-            <a:ext cx="2958120" cy="444960"/>
+            <a:ext cx="2957760" cy="444600"/>
           </a:xfrm>
           <a:prstGeom prst="rect">
             <a:avLst/>
@@ -671,7 +671,7 @@
                 <a:tab algn="l" pos="0"/>
               </a:tabLst>
             </a:pPr>
-            <a:fld id="{7A8ECD71-B38E-4BD6-9911-AEBAE1F25ED9}" type="slidenum">
+            <a:fld id="{9ED41049-AA93-4237-9AEF-33EAA61EEEDA}" type="slidenum">
               <a:rPr b="0" lang="en-US" sz="1200" spc="-1" strike="noStrike">
                 <a:solidFill>
                   <a:schemeClr val="dk1"/>
@@ -714,7 +714,7 @@
       </p:grpSpPr>
       <p:sp>
         <p:nvSpPr>
-          <p:cNvPr id="337" name="PlaceHolder 1"/>
+          <p:cNvPr id="332" name="PlaceHolder 1"/>
           <p:cNvSpPr>
             <a:spLocks noGrp="1"/>
           </p:cNvSpPr>
@@ -725,7 +725,7 @@
         <p:spPr>
           <a:xfrm>
             <a:off x="685800" y="1143000"/>
-            <a:ext cx="5472720" cy="3072600"/>
+            <a:ext cx="5472360" cy="3072240"/>
           </a:xfrm>
           <a:prstGeom prst="rect">
             <a:avLst/>
@@ -737,7 +737,7 @@
       </p:sp>
       <p:sp>
         <p:nvSpPr>
-          <p:cNvPr id="338" name="PlaceHolder 2"/>
+          <p:cNvPr id="333" name="PlaceHolder 2"/>
           <p:cNvSpPr>
             <a:spLocks noGrp="1"/>
           </p:cNvSpPr>
@@ -748,7 +748,7 @@
         <p:spPr>
           <a:xfrm>
             <a:off x="685800" y="4400640"/>
-            <a:ext cx="5472720" cy="3586680"/>
+            <a:ext cx="5472360" cy="3586320"/>
           </a:xfrm>
           <a:prstGeom prst="rect">
             <a:avLst/>
@@ -777,7 +777,7 @@
       </p:sp>
       <p:sp>
         <p:nvSpPr>
-          <p:cNvPr id="339" name="PlaceHolder 3"/>
+          <p:cNvPr id="334" name="PlaceHolder 3"/>
           <p:cNvSpPr>
             <a:spLocks noGrp="1"/>
           </p:cNvSpPr>
@@ -788,7 +788,7 @@
         <p:spPr>
           <a:xfrm>
             <a:off x="3884760" y="8685360"/>
-            <a:ext cx="2958120" cy="444960"/>
+            <a:ext cx="2957760" cy="444600"/>
           </a:xfrm>
           <a:prstGeom prst="rect">
             <a:avLst/>
@@ -830,7 +830,7 @@
                 <a:tab algn="l" pos="0"/>
               </a:tabLst>
             </a:pPr>
-            <a:fld id="{1743173D-6676-4699-98D9-7981DAB1E805}" type="slidenum">
+            <a:fld id="{49A1EF44-4ABF-4CB5-AC3C-8DAFC766E40C}" type="slidenum">
               <a:rPr b="0" lang="en-US" sz="1200" spc="-1" strike="noStrike">
                 <a:solidFill>
                   <a:schemeClr val="dk1"/>
@@ -873,7 +873,7 @@
       </p:grpSpPr>
       <p:sp>
         <p:nvSpPr>
-          <p:cNvPr id="340" name="PlaceHolder 1"/>
+          <p:cNvPr id="335" name="PlaceHolder 1"/>
           <p:cNvSpPr>
             <a:spLocks noGrp="1"/>
           </p:cNvSpPr>
@@ -884,7 +884,7 @@
         <p:spPr>
           <a:xfrm>
             <a:off x="685800" y="1143000"/>
-            <a:ext cx="5472720" cy="3072600"/>
+            <a:ext cx="5472360" cy="3072240"/>
           </a:xfrm>
           <a:prstGeom prst="rect">
             <a:avLst/>
@@ -896,7 +896,7 @@
       </p:sp>
       <p:sp>
         <p:nvSpPr>
-          <p:cNvPr id="341" name="PlaceHolder 2"/>
+          <p:cNvPr id="336" name="PlaceHolder 2"/>
           <p:cNvSpPr>
             <a:spLocks noGrp="1"/>
           </p:cNvSpPr>
@@ -907,7 +907,7 @@
         <p:spPr>
           <a:xfrm>
             <a:off x="685800" y="4400640"/>
-            <a:ext cx="5472720" cy="3586680"/>
+            <a:ext cx="5472360" cy="3586320"/>
           </a:xfrm>
           <a:prstGeom prst="rect">
             <a:avLst/>
@@ -936,7 +936,7 @@
       </p:sp>
       <p:sp>
         <p:nvSpPr>
-          <p:cNvPr id="342" name="PlaceHolder 3"/>
+          <p:cNvPr id="337" name="PlaceHolder 3"/>
           <p:cNvSpPr>
             <a:spLocks noGrp="1"/>
           </p:cNvSpPr>
@@ -947,7 +947,7 @@
         <p:spPr>
           <a:xfrm>
             <a:off x="3884760" y="8685360"/>
-            <a:ext cx="2958120" cy="444960"/>
+            <a:ext cx="2957760" cy="444600"/>
           </a:xfrm>
           <a:prstGeom prst="rect">
             <a:avLst/>
@@ -989,7 +989,7 @@
                 <a:tab algn="l" pos="0"/>
               </a:tabLst>
             </a:pPr>
-            <a:fld id="{FC6727F0-B03C-4B20-AB2A-82D0C9D2D9A7}" type="slidenum">
+            <a:fld id="{8ABE77BD-EB76-4F51-B6D0-6DB95C771633}" type="slidenum">
               <a:rPr b="0" lang="en-US" sz="1200" spc="-1" strike="noStrike">
                 <a:solidFill>
                   <a:schemeClr val="dk1"/>
@@ -1233,7 +1233,7 @@
         <p:txBody>
           <a:bodyPr/>
           <a:p>
-            <a:fld id="{2A84E6FC-4A7F-4082-839C-00B56249E677}" type="slidenum">
+            <a:fld id="{E74F5600-03F4-42A2-9606-BD4A8853FAB6}" type="slidenum">
               <a:t>&lt;#&gt;</a:t>
             </a:fld>
           </a:p>
@@ -1442,7 +1442,7 @@
         <p:txBody>
           <a:bodyPr/>
           <a:p>
-            <a:fld id="{857740C0-6DF7-4992-AA0F-C949542496EE}" type="slidenum">
+            <a:fld id="{A8C59D2F-9B9D-4D9E-86EB-5AE8B96D67E3}" type="slidenum">
               <a:t>&lt;#&gt;</a:t>
             </a:fld>
           </a:p>
@@ -1565,7 +1565,7 @@
         <p:txBody>
           <a:bodyPr/>
           <a:p>
-            <a:fld id="{6989C579-618E-4459-B84E-D7D03672B711}" type="slidenum">
+            <a:fld id="{F4562096-6A20-4651-AB01-43C399C2B134}" type="slidenum">
               <a:t>&lt;#&gt;</a:t>
             </a:fld>
           </a:p>
@@ -1648,7 +1648,7 @@
         <p:txBody>
           <a:bodyPr/>
           <a:p>
-            <a:fld id="{34817C35-458D-4EE9-9AC7-051E06226AB1}" type="slidenum">
+            <a:fld id="{B992D1C5-8773-457D-AF8B-2CD8F75F12E1}" type="slidenum">
               <a:t>&lt;#&gt;</a:t>
             </a:fld>
           </a:p>
@@ -1900,7 +1900,7 @@
         <p:txBody>
           <a:bodyPr/>
           <a:p>
-            <a:fld id="{9A432BC8-A683-4A0D-A47A-26C982908C74}" type="slidenum">
+            <a:fld id="{FDB32EB2-1D45-4177-BA2E-B8C96F02D0A3}" type="slidenum">
               <a:t>&lt;#&gt;</a:t>
             </a:fld>
           </a:p>
@@ -2152,7 +2152,7 @@
         <p:txBody>
           <a:bodyPr/>
           <a:p>
-            <a:fld id="{6471309D-B4DE-43F6-AA06-34F3B2183007}" type="slidenum">
+            <a:fld id="{C56CD3A7-AEEC-4895-8226-8C75DC571930}" type="slidenum">
               <a:t>&lt;#&gt;</a:t>
             </a:fld>
           </a:p>
@@ -2361,7 +2361,7 @@
         <p:txBody>
           <a:bodyPr/>
           <a:p>
-            <a:fld id="{ACE4C55C-401E-4F0B-9C7E-B187F5B46BF0}" type="slidenum">
+            <a:fld id="{70E53D07-B441-4F1F-BE57-C9B888DE44D5}" type="slidenum">
               <a:t>&lt;#&gt;</a:t>
             </a:fld>
           </a:p>
@@ -2656,7 +2656,7 @@
         <p:txBody>
           <a:bodyPr/>
           <a:p>
-            <a:fld id="{06B7BDA8-767E-4658-804B-5C2693DFAA2F}" type="slidenum">
+            <a:fld id="{8106DC77-F3DA-4C39-8549-3A613A1C1BA9}" type="slidenum">
               <a:t>&lt;#&gt;</a:t>
             </a:fld>
           </a:p>
@@ -2739,7 +2739,7 @@
         <p:txBody>
           <a:bodyPr/>
           <a:p>
-            <a:fld id="{BEDC45A4-217E-4F63-A86D-F53468F1247B}" type="slidenum">
+            <a:fld id="{5D881E02-AF1C-4591-B27B-DBBEB3494BB2}" type="slidenum">
               <a:t>&lt;#&gt;</a:t>
             </a:fld>
           </a:p>
@@ -2822,7 +2822,7 @@
         <p:txBody>
           <a:bodyPr/>
           <a:p>
-            <a:fld id="{FA6623AF-BD57-4435-8AE8-605D69DA427F}" type="slidenum">
+            <a:fld id="{9CEE2741-D9AE-4E96-AEAA-0051FDCF89EB}" type="slidenum">
               <a:t>&lt;#&gt;</a:t>
             </a:fld>
           </a:p>
@@ -2988,7 +2988,7 @@
         <p:txBody>
           <a:bodyPr/>
           <a:p>
-            <a:fld id="{2D35C2DA-784F-4EC3-8329-DDFF21129AE6}" type="slidenum">
+            <a:fld id="{06281D86-D715-4041-B675-205B1578991D}" type="slidenum">
               <a:t>&lt;#&gt;</a:t>
             </a:fld>
           </a:p>
@@ -3154,7 +3154,7 @@
         <p:txBody>
           <a:bodyPr/>
           <a:p>
-            <a:fld id="{DBD8902E-9EB5-45E2-B5B7-59C989D0D583}" type="slidenum">
+            <a:fld id="{AFF0B553-E2DA-4D61-82DA-B79534B74379}" type="slidenum">
               <a:t>&lt;#&gt;</a:t>
             </a:fld>
           </a:p>
@@ -3219,9 +3219,9 @@
         <p:grpSpPr>
           <a:xfrm>
             <a:off x="6199200" y="6162840"/>
-            <a:ext cx="5979240" cy="681480"/>
+            <a:ext cx="5978880" cy="681120"/>
             <a:chOff x="6199200" y="6162840"/>
-            <a:chExt cx="5979240" cy="681480"/>
+            <a:chExt cx="5978880" cy="681120"/>
           </a:xfrm>
         </p:grpSpPr>
         <p:pic>
@@ -3237,7 +3237,7 @@
           <p:spPr>
             <a:xfrm>
               <a:off x="6199200" y="6162840"/>
-              <a:ext cx="4042800" cy="681480"/>
+              <a:ext cx="4042440" cy="681120"/>
             </a:xfrm>
             <a:prstGeom prst="rect">
               <a:avLst/>
@@ -3260,7 +3260,7 @@
           <p:spPr>
             <a:xfrm>
               <a:off x="10270080" y="6162840"/>
-              <a:ext cx="1908360" cy="597960"/>
+              <a:ext cx="1908000" cy="597600"/>
             </a:xfrm>
             <a:prstGeom prst="rect">
               <a:avLst/>
@@ -4008,7 +4008,7 @@
         <p:spPr>
           <a:xfrm>
             <a:off x="4038480" y="6356520"/>
-            <a:ext cx="4101120" cy="351360"/>
+            <a:ext cx="4100760" cy="351000"/>
           </a:xfrm>
           <a:prstGeom prst="rect">
             <a:avLst/>
@@ -4080,7 +4080,7 @@
         <p:spPr>
           <a:xfrm>
             <a:off x="8610480" y="6356520"/>
-            <a:ext cx="2729520" cy="351360"/>
+            <a:ext cx="2729160" cy="351000"/>
           </a:xfrm>
           <a:prstGeom prst="rect">
             <a:avLst/>
@@ -4123,7 +4123,7 @@
                 <a:tab algn="l" pos="0"/>
               </a:tabLst>
             </a:pPr>
-            <a:fld id="{B2BA6C09-5B81-4CD3-98B7-09F12790453F}" type="slidenum">
+            <a:fld id="{36883080-D6C6-4442-BF38-19533A083444}" type="slidenum">
               <a:rPr b="0" lang="en-US" sz="1200" spc="-1" strike="noStrike">
                 <a:solidFill>
                   <a:schemeClr val="dk1">
@@ -4156,7 +4156,7 @@
         <p:spPr>
           <a:xfrm>
             <a:off x="838080" y="6356520"/>
-            <a:ext cx="2729520" cy="351360"/>
+            <a:ext cx="2729160" cy="351000"/>
           </a:xfrm>
           <a:prstGeom prst="rect">
             <a:avLst/>
@@ -4245,9 +4245,9 @@
         <p:grpSpPr>
           <a:xfrm>
             <a:off x="6199200" y="6162840"/>
-            <a:ext cx="5979240" cy="681480"/>
+            <a:ext cx="5978880" cy="681120"/>
             <a:chOff x="6199200" y="6162840"/>
-            <a:chExt cx="5979240" cy="681480"/>
+            <a:chExt cx="5978880" cy="681120"/>
           </a:xfrm>
         </p:grpSpPr>
         <p:pic>
@@ -4263,7 +4263,7 @@
           <p:spPr>
             <a:xfrm>
               <a:off x="6199200" y="6162840"/>
-              <a:ext cx="4042800" cy="681480"/>
+              <a:ext cx="4042440" cy="681120"/>
             </a:xfrm>
             <a:prstGeom prst="rect">
               <a:avLst/>
@@ -4286,7 +4286,7 @@
           <p:spPr>
             <a:xfrm>
               <a:off x="10270080" y="6162840"/>
-              <a:ext cx="1908360" cy="597960"/>
+              <a:ext cx="1908000" cy="597600"/>
             </a:xfrm>
             <a:prstGeom prst="rect">
               <a:avLst/>
@@ -4809,7 +4809,7 @@
         <p:spPr>
           <a:xfrm>
             <a:off x="4038480" y="6356520"/>
-            <a:ext cx="4101120" cy="351360"/>
+            <a:ext cx="4100760" cy="351000"/>
           </a:xfrm>
           <a:prstGeom prst="rect">
             <a:avLst/>
@@ -4881,7 +4881,7 @@
         <p:spPr>
           <a:xfrm>
             <a:off x="8610480" y="6356520"/>
-            <a:ext cx="2729520" cy="351360"/>
+            <a:ext cx="2729160" cy="351000"/>
           </a:xfrm>
           <a:prstGeom prst="rect">
             <a:avLst/>
@@ -4924,7 +4924,7 @@
                 <a:tab algn="l" pos="0"/>
               </a:tabLst>
             </a:pPr>
-            <a:fld id="{8CCBD7B8-7E3B-4E2E-AAFE-9386E05338D9}" type="slidenum">
+            <a:fld id="{6B0B7401-D712-453F-B062-95AC4F7032E8}" type="slidenum">
               <a:rPr b="0" lang="en-US" sz="1200" spc="-1" strike="noStrike">
                 <a:solidFill>
                   <a:schemeClr val="dk1">
@@ -4957,7 +4957,7 @@
         <p:spPr>
           <a:xfrm>
             <a:off x="838080" y="6356520"/>
-            <a:ext cx="2729520" cy="351360"/>
+            <a:ext cx="2729160" cy="351000"/>
           </a:xfrm>
           <a:prstGeom prst="rect">
             <a:avLst/>
@@ -5046,9 +5046,9 @@
         <p:grpSpPr>
           <a:xfrm>
             <a:off x="6199200" y="6162840"/>
-            <a:ext cx="5979240" cy="681480"/>
+            <a:ext cx="5978880" cy="681120"/>
             <a:chOff x="6199200" y="6162840"/>
-            <a:chExt cx="5979240" cy="681480"/>
+            <a:chExt cx="5978880" cy="681120"/>
           </a:xfrm>
         </p:grpSpPr>
         <p:pic>
@@ -5064,7 +5064,7 @@
           <p:spPr>
             <a:xfrm>
               <a:off x="6199200" y="6162840"/>
-              <a:ext cx="4042800" cy="681480"/>
+              <a:ext cx="4042440" cy="681120"/>
             </a:xfrm>
             <a:prstGeom prst="rect">
               <a:avLst/>
@@ -5087,7 +5087,7 @@
           <p:spPr>
             <a:xfrm>
               <a:off x="10270080" y="6162840"/>
-              <a:ext cx="1908360" cy="597960"/>
+              <a:ext cx="1908000" cy="597600"/>
             </a:xfrm>
             <a:prstGeom prst="rect">
               <a:avLst/>
@@ -5160,7 +5160,7 @@
         <p:spPr>
           <a:xfrm>
             <a:off x="4038480" y="6356520"/>
-            <a:ext cx="4101120" cy="351360"/>
+            <a:ext cx="4100760" cy="351000"/>
           </a:xfrm>
           <a:prstGeom prst="rect">
             <a:avLst/>
@@ -5232,7 +5232,7 @@
         <p:spPr>
           <a:xfrm>
             <a:off x="8610480" y="6356520"/>
-            <a:ext cx="2729520" cy="351360"/>
+            <a:ext cx="2729160" cy="351000"/>
           </a:xfrm>
           <a:prstGeom prst="rect">
             <a:avLst/>
@@ -5275,7 +5275,7 @@
                 <a:tab algn="l" pos="0"/>
               </a:tabLst>
             </a:pPr>
-            <a:fld id="{2DB6ABF5-89CD-4FBA-9684-CAF05E4D5FC1}" type="slidenum">
+            <a:fld id="{F0B7544C-8F5C-4BFD-9ED5-D4F5940BE40B}" type="slidenum">
               <a:rPr b="0" lang="en-US" sz="1200" spc="-1" strike="noStrike">
                 <a:solidFill>
                   <a:schemeClr val="dk1">
@@ -5308,7 +5308,7 @@
         <p:spPr>
           <a:xfrm>
             <a:off x="838080" y="6356520"/>
-            <a:ext cx="2729520" cy="351360"/>
+            <a:ext cx="2729160" cy="351000"/>
           </a:xfrm>
           <a:prstGeom prst="rect">
             <a:avLst/>
@@ -5397,9 +5397,9 @@
         <p:grpSpPr>
           <a:xfrm>
             <a:off x="6199200" y="6162840"/>
-            <a:ext cx="5979240" cy="681480"/>
+            <a:ext cx="5978880" cy="681120"/>
             <a:chOff x="6199200" y="6162840"/>
-            <a:chExt cx="5979240" cy="681480"/>
+            <a:chExt cx="5978880" cy="681120"/>
           </a:xfrm>
         </p:grpSpPr>
         <p:pic>
@@ -5415,7 +5415,7 @@
           <p:spPr>
             <a:xfrm>
               <a:off x="6199200" y="6162840"/>
-              <a:ext cx="4042800" cy="681480"/>
+              <a:ext cx="4042440" cy="681120"/>
             </a:xfrm>
             <a:prstGeom prst="rect">
               <a:avLst/>
@@ -5438,7 +5438,7 @@
           <p:spPr>
             <a:xfrm>
               <a:off x="10270080" y="6162840"/>
-              <a:ext cx="1908360" cy="597960"/>
+              <a:ext cx="1908000" cy="597600"/>
             </a:xfrm>
             <a:prstGeom prst="rect">
               <a:avLst/>
@@ -5462,7 +5462,7 @@
         <p:spPr>
           <a:xfrm>
             <a:off x="4038480" y="6356520"/>
-            <a:ext cx="4101120" cy="351360"/>
+            <a:ext cx="4100760" cy="351000"/>
           </a:xfrm>
           <a:prstGeom prst="rect">
             <a:avLst/>
@@ -5534,7 +5534,7 @@
         <p:spPr>
           <a:xfrm>
             <a:off x="8610480" y="6356520"/>
-            <a:ext cx="2729520" cy="351360"/>
+            <a:ext cx="2729160" cy="351000"/>
           </a:xfrm>
           <a:prstGeom prst="rect">
             <a:avLst/>
@@ -5577,7 +5577,7 @@
                 <a:tab algn="l" pos="0"/>
               </a:tabLst>
             </a:pPr>
-            <a:fld id="{1032DEBF-87B9-4F86-932E-61E9D68BDB08}" type="slidenum">
+            <a:fld id="{8AE26B16-8699-4D24-A2D0-4D880CB4A03B}" type="slidenum">
               <a:rPr b="0" lang="en-US" sz="1200" spc="-1" strike="noStrike">
                 <a:solidFill>
                   <a:schemeClr val="dk1">
@@ -5610,7 +5610,7 @@
         <p:spPr>
           <a:xfrm>
             <a:off x="838080" y="6356520"/>
-            <a:ext cx="2729520" cy="351360"/>
+            <a:ext cx="2729160" cy="351000"/>
           </a:xfrm>
           <a:prstGeom prst="rect">
             <a:avLst/>
@@ -5699,9 +5699,9 @@
         <p:grpSpPr>
           <a:xfrm>
             <a:off x="6199200" y="6162840"/>
-            <a:ext cx="5979240" cy="681480"/>
+            <a:ext cx="5978880" cy="681120"/>
             <a:chOff x="6199200" y="6162840"/>
-            <a:chExt cx="5979240" cy="681480"/>
+            <a:chExt cx="5978880" cy="681120"/>
           </a:xfrm>
         </p:grpSpPr>
         <p:pic>
@@ -5717,7 +5717,7 @@
           <p:spPr>
             <a:xfrm>
               <a:off x="6199200" y="6162840"/>
-              <a:ext cx="4042800" cy="681480"/>
+              <a:ext cx="4042440" cy="681120"/>
             </a:xfrm>
             <a:prstGeom prst="rect">
               <a:avLst/>
@@ -5740,7 +5740,7 @@
           <p:spPr>
             <a:xfrm>
               <a:off x="10270080" y="6162840"/>
-              <a:ext cx="1908360" cy="597960"/>
+              <a:ext cx="1908000" cy="597600"/>
             </a:xfrm>
             <a:prstGeom prst="rect">
               <a:avLst/>
@@ -6488,7 +6488,7 @@
         <p:spPr>
           <a:xfrm>
             <a:off x="4038480" y="6356520"/>
-            <a:ext cx="4101120" cy="351360"/>
+            <a:ext cx="4100760" cy="351000"/>
           </a:xfrm>
           <a:prstGeom prst="rect">
             <a:avLst/>
@@ -6560,7 +6560,7 @@
         <p:spPr>
           <a:xfrm>
             <a:off x="8610480" y="6356520"/>
-            <a:ext cx="2729520" cy="351360"/>
+            <a:ext cx="2729160" cy="351000"/>
           </a:xfrm>
           <a:prstGeom prst="rect">
             <a:avLst/>
@@ -6603,7 +6603,7 @@
                 <a:tab algn="l" pos="0"/>
               </a:tabLst>
             </a:pPr>
-            <a:fld id="{2ED87358-7FF5-458B-8615-5340DA64ABDD}" type="slidenum">
+            <a:fld id="{DD253385-247C-41FB-9991-CFFF51C7A731}" type="slidenum">
               <a:rPr b="0" lang="en-US" sz="1200" spc="-1" strike="noStrike">
                 <a:solidFill>
                   <a:schemeClr val="dk1">
@@ -6636,7 +6636,7 @@
         <p:spPr>
           <a:xfrm>
             <a:off x="838080" y="6356520"/>
-            <a:ext cx="2729520" cy="351360"/>
+            <a:ext cx="2729160" cy="351000"/>
           </a:xfrm>
           <a:prstGeom prst="rect">
             <a:avLst/>
@@ -6725,9 +6725,9 @@
         <p:grpSpPr>
           <a:xfrm>
             <a:off x="6199200" y="6162840"/>
-            <a:ext cx="5979240" cy="681480"/>
+            <a:ext cx="5978880" cy="681120"/>
             <a:chOff x="6199200" y="6162840"/>
-            <a:chExt cx="5979240" cy="681480"/>
+            <a:chExt cx="5978880" cy="681120"/>
           </a:xfrm>
         </p:grpSpPr>
         <p:pic>
@@ -6743,7 +6743,7 @@
           <p:spPr>
             <a:xfrm>
               <a:off x="6199200" y="6162840"/>
-              <a:ext cx="4042800" cy="681480"/>
+              <a:ext cx="4042440" cy="681120"/>
             </a:xfrm>
             <a:prstGeom prst="rect">
               <a:avLst/>
@@ -6766,7 +6766,7 @@
           <p:spPr>
             <a:xfrm>
               <a:off x="10270080" y="6162840"/>
-              <a:ext cx="1908360" cy="597960"/>
+              <a:ext cx="1908000" cy="597600"/>
             </a:xfrm>
             <a:prstGeom prst="rect">
               <a:avLst/>
@@ -7514,7 +7514,7 @@
         <p:spPr>
           <a:xfrm>
             <a:off x="4038480" y="6356520"/>
-            <a:ext cx="4101120" cy="351360"/>
+            <a:ext cx="4100760" cy="351000"/>
           </a:xfrm>
           <a:prstGeom prst="rect">
             <a:avLst/>
@@ -7586,7 +7586,7 @@
         <p:spPr>
           <a:xfrm>
             <a:off x="8610480" y="6356520"/>
-            <a:ext cx="2729520" cy="351360"/>
+            <a:ext cx="2729160" cy="351000"/>
           </a:xfrm>
           <a:prstGeom prst="rect">
             <a:avLst/>
@@ -7629,7 +7629,7 @@
                 <a:tab algn="l" pos="0"/>
               </a:tabLst>
             </a:pPr>
-            <a:fld id="{0CD7A54E-F318-49D8-AD67-F805071D4B6D}" type="slidenum">
+            <a:fld id="{075626C1-77B8-4A21-A9AC-CEC4F5A00FFE}" type="slidenum">
               <a:rPr b="0" lang="en-US" sz="1200" spc="-1" strike="noStrike">
                 <a:solidFill>
                   <a:schemeClr val="dk1">
@@ -7662,7 +7662,7 @@
         <p:spPr>
           <a:xfrm>
             <a:off x="838080" y="6356520"/>
-            <a:ext cx="2729520" cy="351360"/>
+            <a:ext cx="2729160" cy="351000"/>
           </a:xfrm>
           <a:prstGeom prst="rect">
             <a:avLst/>
@@ -7751,9 +7751,9 @@
         <p:grpSpPr>
           <a:xfrm>
             <a:off x="6199200" y="6162840"/>
-            <a:ext cx="5979240" cy="681480"/>
+            <a:ext cx="5978880" cy="681120"/>
             <a:chOff x="6199200" y="6162840"/>
-            <a:chExt cx="5979240" cy="681480"/>
+            <a:chExt cx="5978880" cy="681120"/>
           </a:xfrm>
         </p:grpSpPr>
         <p:pic>
@@ -7769,7 +7769,7 @@
           <p:spPr>
             <a:xfrm>
               <a:off x="6199200" y="6162840"/>
-              <a:ext cx="4042800" cy="681480"/>
+              <a:ext cx="4042440" cy="681120"/>
             </a:xfrm>
             <a:prstGeom prst="rect">
               <a:avLst/>
@@ -7792,7 +7792,7 @@
           <p:spPr>
             <a:xfrm>
               <a:off x="10270080" y="6162840"/>
-              <a:ext cx="1908360" cy="597960"/>
+              <a:ext cx="1908000" cy="597600"/>
             </a:xfrm>
             <a:prstGeom prst="rect">
               <a:avLst/>
@@ -8315,7 +8315,7 @@
         <p:spPr>
           <a:xfrm>
             <a:off x="4038480" y="6356520"/>
-            <a:ext cx="4101120" cy="351360"/>
+            <a:ext cx="4100760" cy="351000"/>
           </a:xfrm>
           <a:prstGeom prst="rect">
             <a:avLst/>
@@ -8387,7 +8387,7 @@
         <p:spPr>
           <a:xfrm>
             <a:off x="8610480" y="6356520"/>
-            <a:ext cx="2729520" cy="351360"/>
+            <a:ext cx="2729160" cy="351000"/>
           </a:xfrm>
           <a:prstGeom prst="rect">
             <a:avLst/>
@@ -8430,7 +8430,7 @@
                 <a:tab algn="l" pos="0"/>
               </a:tabLst>
             </a:pPr>
-            <a:fld id="{8CCFC577-3C9B-4822-B3A3-FD3C0D56AAE3}" type="slidenum">
+            <a:fld id="{A3AF5600-DEA9-40BD-8067-7E4506567D68}" type="slidenum">
               <a:rPr b="0" lang="en-US" sz="1200" spc="-1" strike="noStrike">
                 <a:solidFill>
                   <a:schemeClr val="dk1">
@@ -8463,7 +8463,7 @@
         <p:spPr>
           <a:xfrm>
             <a:off x="838080" y="6356520"/>
-            <a:ext cx="2729520" cy="351360"/>
+            <a:ext cx="2729160" cy="351000"/>
           </a:xfrm>
           <a:prstGeom prst="rect">
             <a:avLst/>
@@ -8552,9 +8552,9 @@
         <p:grpSpPr>
           <a:xfrm>
             <a:off x="6199200" y="6162840"/>
-            <a:ext cx="5979240" cy="681480"/>
+            <a:ext cx="5978880" cy="681120"/>
             <a:chOff x="6199200" y="6162840"/>
-            <a:chExt cx="5979240" cy="681480"/>
+            <a:chExt cx="5978880" cy="681120"/>
           </a:xfrm>
         </p:grpSpPr>
         <p:pic>
@@ -8570,7 +8570,7 @@
           <p:spPr>
             <a:xfrm>
               <a:off x="6199200" y="6162840"/>
-              <a:ext cx="4042800" cy="681480"/>
+              <a:ext cx="4042440" cy="681120"/>
             </a:xfrm>
             <a:prstGeom prst="rect">
               <a:avLst/>
@@ -8593,7 +8593,7 @@
           <p:spPr>
             <a:xfrm>
               <a:off x="10270080" y="6162840"/>
-              <a:ext cx="1908360" cy="597960"/>
+              <a:ext cx="1908000" cy="597600"/>
             </a:xfrm>
             <a:prstGeom prst="rect">
               <a:avLst/>
@@ -9566,7 +9566,7 @@
         <p:spPr>
           <a:xfrm>
             <a:off x="4038480" y="6356520"/>
-            <a:ext cx="4101120" cy="351360"/>
+            <a:ext cx="4100760" cy="351000"/>
           </a:xfrm>
           <a:prstGeom prst="rect">
             <a:avLst/>
@@ -9638,7 +9638,7 @@
         <p:spPr>
           <a:xfrm>
             <a:off x="8610480" y="6356520"/>
-            <a:ext cx="2729520" cy="351360"/>
+            <a:ext cx="2729160" cy="351000"/>
           </a:xfrm>
           <a:prstGeom prst="rect">
             <a:avLst/>
@@ -9681,7 +9681,7 @@
                 <a:tab algn="l" pos="0"/>
               </a:tabLst>
             </a:pPr>
-            <a:fld id="{84DD0516-15BE-4E89-B97A-E655ABBEC8F9}" type="slidenum">
+            <a:fld id="{B7F6D244-A6BF-4424-84A8-32AF574A0AC1}" type="slidenum">
               <a:rPr b="0" lang="en-US" sz="1200" spc="-1" strike="noStrike">
                 <a:solidFill>
                   <a:schemeClr val="dk1">
@@ -9714,7 +9714,7 @@
         <p:spPr>
           <a:xfrm>
             <a:off x="838080" y="6356520"/>
-            <a:ext cx="2729520" cy="351360"/>
+            <a:ext cx="2729160" cy="351000"/>
           </a:xfrm>
           <a:prstGeom prst="rect">
             <a:avLst/>
@@ -9803,9 +9803,9 @@
         <p:grpSpPr>
           <a:xfrm>
             <a:off x="6199200" y="6162840"/>
-            <a:ext cx="5979240" cy="681480"/>
+            <a:ext cx="5978880" cy="681120"/>
             <a:chOff x="6199200" y="6162840"/>
-            <a:chExt cx="5979240" cy="681480"/>
+            <a:chExt cx="5978880" cy="681120"/>
           </a:xfrm>
         </p:grpSpPr>
         <p:pic>
@@ -9821,7 +9821,7 @@
           <p:spPr>
             <a:xfrm>
               <a:off x="6199200" y="6162840"/>
-              <a:ext cx="4042800" cy="681480"/>
+              <a:ext cx="4042440" cy="681120"/>
             </a:xfrm>
             <a:prstGeom prst="rect">
               <a:avLst/>
@@ -9844,7 +9844,7 @@
           <p:spPr>
             <a:xfrm>
               <a:off x="10270080" y="6162840"/>
-              <a:ext cx="1908360" cy="597960"/>
+              <a:ext cx="1908000" cy="597600"/>
             </a:xfrm>
             <a:prstGeom prst="rect">
               <a:avLst/>
@@ -9868,7 +9868,7 @@
         <p:spPr>
           <a:xfrm>
             <a:off x="4038480" y="6356520"/>
-            <a:ext cx="4101120" cy="351360"/>
+            <a:ext cx="4100760" cy="351000"/>
           </a:xfrm>
           <a:prstGeom prst="rect">
             <a:avLst/>
@@ -9940,7 +9940,7 @@
         <p:spPr>
           <a:xfrm>
             <a:off x="8610480" y="6356520"/>
-            <a:ext cx="2729520" cy="351360"/>
+            <a:ext cx="2729160" cy="351000"/>
           </a:xfrm>
           <a:prstGeom prst="rect">
             <a:avLst/>
@@ -9983,7 +9983,7 @@
                 <a:tab algn="l" pos="0"/>
               </a:tabLst>
             </a:pPr>
-            <a:fld id="{A92F6DEF-3483-4D18-835A-91BB9DCC38EB}" type="slidenum">
+            <a:fld id="{AAD40842-38DA-4A49-9989-B688998A2CEA}" type="slidenum">
               <a:rPr b="0" lang="en-US" sz="1200" spc="-1" strike="noStrike">
                 <a:solidFill>
                   <a:schemeClr val="dk1">
@@ -10016,7 +10016,7 @@
         <p:spPr>
           <a:xfrm>
             <a:off x="838080" y="6356520"/>
-            <a:ext cx="2729520" cy="351360"/>
+            <a:ext cx="2729160" cy="351000"/>
           </a:xfrm>
           <a:prstGeom prst="rect">
             <a:avLst/>
@@ -10105,9 +10105,9 @@
         <p:grpSpPr>
           <a:xfrm>
             <a:off x="6199200" y="6162840"/>
-            <a:ext cx="5979240" cy="681480"/>
+            <a:ext cx="5978880" cy="681120"/>
             <a:chOff x="6199200" y="6162840"/>
-            <a:chExt cx="5979240" cy="681480"/>
+            <a:chExt cx="5978880" cy="681120"/>
           </a:xfrm>
         </p:grpSpPr>
         <p:pic>
@@ -10123,7 +10123,7 @@
           <p:spPr>
             <a:xfrm>
               <a:off x="6199200" y="6162840"/>
-              <a:ext cx="4042800" cy="681480"/>
+              <a:ext cx="4042440" cy="681120"/>
             </a:xfrm>
             <a:prstGeom prst="rect">
               <a:avLst/>
@@ -10146,7 +10146,7 @@
           <p:spPr>
             <a:xfrm>
               <a:off x="10270080" y="6162840"/>
-              <a:ext cx="1908360" cy="597960"/>
+              <a:ext cx="1908000" cy="597600"/>
             </a:xfrm>
             <a:prstGeom prst="rect">
               <a:avLst/>
@@ -10170,7 +10170,7 @@
         <p:spPr>
           <a:xfrm>
             <a:off x="4038480" y="6356520"/>
-            <a:ext cx="4101120" cy="351360"/>
+            <a:ext cx="4100760" cy="351000"/>
           </a:xfrm>
           <a:prstGeom prst="rect">
             <a:avLst/>
@@ -10242,7 +10242,7 @@
         <p:spPr>
           <a:xfrm>
             <a:off x="8610480" y="6356520"/>
-            <a:ext cx="2729520" cy="351360"/>
+            <a:ext cx="2729160" cy="351000"/>
           </a:xfrm>
           <a:prstGeom prst="rect">
             <a:avLst/>
@@ -10285,7 +10285,7 @@
                 <a:tab algn="l" pos="0"/>
               </a:tabLst>
             </a:pPr>
-            <a:fld id="{EBACF89F-DCD6-45BA-8150-BE78D34A97B3}" type="slidenum">
+            <a:fld id="{2EBC5FBE-10D1-4C17-8A3A-AB3521BED5E4}" type="slidenum">
               <a:rPr b="0" lang="en-US" sz="1200" spc="-1" strike="noStrike">
                 <a:solidFill>
                   <a:schemeClr val="dk1">
@@ -10318,7 +10318,7 @@
         <p:spPr>
           <a:xfrm>
             <a:off x="838080" y="6356520"/>
-            <a:ext cx="2729520" cy="351360"/>
+            <a:ext cx="2729160" cy="351000"/>
           </a:xfrm>
           <a:prstGeom prst="rect">
             <a:avLst/>
@@ -10681,9 +10681,9 @@
         <p:grpSpPr>
           <a:xfrm>
             <a:off x="6199200" y="6162840"/>
-            <a:ext cx="5979240" cy="681480"/>
+            <a:ext cx="5978880" cy="681120"/>
             <a:chOff x="6199200" y="6162840"/>
-            <a:chExt cx="5979240" cy="681480"/>
+            <a:chExt cx="5978880" cy="681120"/>
           </a:xfrm>
         </p:grpSpPr>
         <p:pic>
@@ -10699,7 +10699,7 @@
           <p:spPr>
             <a:xfrm>
               <a:off x="6199200" y="6162840"/>
-              <a:ext cx="4042800" cy="681480"/>
+              <a:ext cx="4042440" cy="681120"/>
             </a:xfrm>
             <a:prstGeom prst="rect">
               <a:avLst/>
@@ -10722,7 +10722,7 @@
           <p:spPr>
             <a:xfrm>
               <a:off x="10270080" y="6162840"/>
-              <a:ext cx="1908360" cy="597960"/>
+              <a:ext cx="1908000" cy="597600"/>
             </a:xfrm>
             <a:prstGeom prst="rect">
               <a:avLst/>
@@ -11020,7 +11020,7 @@
         <p:spPr>
           <a:xfrm>
             <a:off x="4038480" y="6356520"/>
-            <a:ext cx="4101120" cy="351360"/>
+            <a:ext cx="4100760" cy="351000"/>
           </a:xfrm>
           <a:prstGeom prst="rect">
             <a:avLst/>
@@ -11092,7 +11092,7 @@
         <p:spPr>
           <a:xfrm>
             <a:off x="8610480" y="6356520"/>
-            <a:ext cx="2729520" cy="351360"/>
+            <a:ext cx="2729160" cy="351000"/>
           </a:xfrm>
           <a:prstGeom prst="rect">
             <a:avLst/>
@@ -11135,7 +11135,7 @@
                 <a:tab algn="l" pos="0"/>
               </a:tabLst>
             </a:pPr>
-            <a:fld id="{C6D40D84-03A3-4200-B619-20142F3A192F}" type="slidenum">
+            <a:fld id="{646EF2E5-BC67-47B9-B80D-539462605E2E}" type="slidenum">
               <a:rPr b="0" lang="en-US" sz="1200" spc="-1" strike="noStrike">
                 <a:solidFill>
                   <a:schemeClr val="dk1">
@@ -11168,7 +11168,7 @@
         <p:spPr>
           <a:xfrm>
             <a:off x="838080" y="6356520"/>
-            <a:ext cx="2729520" cy="351360"/>
+            <a:ext cx="2729160" cy="351000"/>
           </a:xfrm>
           <a:prstGeom prst="rect">
             <a:avLst/>
@@ -11257,9 +11257,9 @@
         <p:grpSpPr>
           <a:xfrm>
             <a:off x="6199200" y="6162840"/>
-            <a:ext cx="5979240" cy="681480"/>
+            <a:ext cx="5978880" cy="681120"/>
             <a:chOff x="6199200" y="6162840"/>
-            <a:chExt cx="5979240" cy="681480"/>
+            <a:chExt cx="5978880" cy="681120"/>
           </a:xfrm>
         </p:grpSpPr>
         <p:pic>
@@ -11275,7 +11275,7 @@
           <p:spPr>
             <a:xfrm>
               <a:off x="6199200" y="6162840"/>
-              <a:ext cx="4042800" cy="681480"/>
+              <a:ext cx="4042440" cy="681120"/>
             </a:xfrm>
             <a:prstGeom prst="rect">
               <a:avLst/>
@@ -11298,7 +11298,7 @@
           <p:spPr>
             <a:xfrm>
               <a:off x="10270080" y="6162840"/>
-              <a:ext cx="1908360" cy="597960"/>
+              <a:ext cx="1908000" cy="597600"/>
             </a:xfrm>
             <a:prstGeom prst="rect">
               <a:avLst/>
@@ -11596,7 +11596,7 @@
         <p:spPr>
           <a:xfrm>
             <a:off x="4038480" y="6356520"/>
-            <a:ext cx="4101120" cy="351360"/>
+            <a:ext cx="4100760" cy="351000"/>
           </a:xfrm>
           <a:prstGeom prst="rect">
             <a:avLst/>
@@ -11668,7 +11668,7 @@
         <p:spPr>
           <a:xfrm>
             <a:off x="8610480" y="6356520"/>
-            <a:ext cx="2729520" cy="351360"/>
+            <a:ext cx="2729160" cy="351000"/>
           </a:xfrm>
           <a:prstGeom prst="rect">
             <a:avLst/>
@@ -11711,7 +11711,7 @@
                 <a:tab algn="l" pos="0"/>
               </a:tabLst>
             </a:pPr>
-            <a:fld id="{83A94B17-3526-411B-9409-FDDF966CCCD5}" type="slidenum">
+            <a:fld id="{61AE2B2E-E26A-49AA-BA8B-0EC1D21F6800}" type="slidenum">
               <a:rPr b="0" lang="en-US" sz="1200" spc="-1" strike="noStrike">
                 <a:solidFill>
                   <a:schemeClr val="dk1">
@@ -11744,7 +11744,7 @@
         <p:spPr>
           <a:xfrm>
             <a:off x="838080" y="6356520"/>
-            <a:ext cx="2729520" cy="351360"/>
+            <a:ext cx="2729160" cy="351000"/>
           </a:xfrm>
           <a:prstGeom prst="rect">
             <a:avLst/>
@@ -11826,7 +11826,7 @@
         <p:spPr>
           <a:xfrm flipH="1">
             <a:off x="0" y="3073320"/>
-            <a:ext cx="1842480" cy="13680"/>
+            <a:ext cx="1842840" cy="14040"/>
           </a:xfrm>
           <a:prstGeom prst="straightConnector1">
             <a:avLst/>
@@ -11849,7 +11849,7 @@
         <p:spPr>
           <a:xfrm>
             <a:off x="0" y="2489400"/>
-            <a:ext cx="1842480" cy="13680"/>
+            <a:ext cx="1842840" cy="14040"/>
           </a:xfrm>
           <a:prstGeom prst="straightConnector1">
             <a:avLst/>
@@ -11872,7 +11872,7 @@
         <p:spPr>
           <a:xfrm>
             <a:off x="0" y="2781360"/>
-            <a:ext cx="1842480" cy="13680"/>
+            <a:ext cx="1842840" cy="14040"/>
           </a:xfrm>
           <a:prstGeom prst="straightConnector1">
             <a:avLst/>
@@ -11895,7 +11895,7 @@
         <p:spPr>
           <a:xfrm flipH="1">
             <a:off x="0" y="3657600"/>
-            <a:ext cx="1842480" cy="13680"/>
+            <a:ext cx="1842840" cy="14040"/>
           </a:xfrm>
           <a:prstGeom prst="straightConnector1">
             <a:avLst/>
@@ -11917,7 +11917,7 @@
         <p:spPr>
           <a:xfrm>
             <a:off x="128520" y="6134040"/>
-            <a:ext cx="1558080" cy="374040"/>
+            <a:ext cx="1557720" cy="373680"/>
           </a:xfrm>
           <a:prstGeom prst="diamond">
             <a:avLst/>
@@ -11982,7 +11982,7 @@
         <p:spPr>
           <a:xfrm>
             <a:off x="302760" y="5454000"/>
-            <a:ext cx="1209600" cy="374040"/>
+            <a:ext cx="1209240" cy="373680"/>
           </a:xfrm>
           <a:prstGeom prst="ellipse">
             <a:avLst/>
@@ -12045,7 +12045,7 @@
         <p:spPr>
           <a:xfrm>
             <a:off x="101160" y="336240"/>
-            <a:ext cx="1612800" cy="303120"/>
+            <a:ext cx="1612440" cy="303120"/>
           </a:xfrm>
           <a:prstGeom prst="rect">
             <a:avLst/>
@@ -12102,7 +12102,7 @@
         <p:spPr>
           <a:xfrm>
             <a:off x="101160" y="597600"/>
-            <a:ext cx="1612800" cy="516600"/>
+            <a:ext cx="1612440" cy="516600"/>
           </a:xfrm>
           <a:prstGeom prst="rect">
             <a:avLst/>
@@ -12192,7 +12192,7 @@
         <p:spPr>
           <a:xfrm>
             <a:off x="101160" y="336240"/>
-            <a:ext cx="1612800" cy="303120"/>
+            <a:ext cx="1612440" cy="303120"/>
           </a:xfrm>
           <a:prstGeom prst="rect">
             <a:avLst/>
@@ -12249,7 +12249,7 @@
         <p:spPr>
           <a:xfrm>
             <a:off x="101160" y="597600"/>
-            <a:ext cx="1612800" cy="516600"/>
+            <a:ext cx="1612440" cy="516600"/>
           </a:xfrm>
           <a:prstGeom prst="rect">
             <a:avLst/>
@@ -12339,7 +12339,7 @@
         <p:spPr>
           <a:xfrm>
             <a:off x="2541600" y="228600"/>
-            <a:ext cx="1612800" cy="303120"/>
+            <a:ext cx="1612440" cy="303120"/>
           </a:xfrm>
           <a:prstGeom prst="rect">
             <a:avLst/>
@@ -12396,7 +12396,7 @@
         <p:spPr>
           <a:xfrm>
             <a:off x="2541600" y="489960"/>
-            <a:ext cx="1612800" cy="1157760"/>
+            <a:ext cx="1612440" cy="1370520"/>
           </a:xfrm>
           <a:prstGeom prst="rect">
             <a:avLst/>
@@ -12556,6 +12556,33 @@
               <a:latin typeface="Arial"/>
             </a:endParaRPr>
           </a:p>
+          <a:p>
+            <a:pPr marL="304920" indent="-304920" defTabSz="914400">
+              <a:lnSpc>
+                <a:spcPct val="100000"/>
+              </a:lnSpc>
+              <a:buClr>
+                <a:srgbClr val="000000"/>
+              </a:buClr>
+              <a:buFont typeface="OpenSymbol"/>
+              <a:buChar char="-"/>
+            </a:pPr>
+            <a:r>
+              <a:rPr b="0" lang="en-US" sz="1400" spc="-1" strike="noStrike">
+                <a:solidFill>
+                  <a:schemeClr val="dk1"/>
+                </a:solidFill>
+                <a:latin typeface="Calibri"/>
+              </a:rPr>
+              <a:t>last_timespin</a:t>
+            </a:r>
+            <a:endParaRPr b="0" lang="en-US" sz="1400" spc="-1" strike="noStrike">
+              <a:solidFill>
+                <a:srgbClr val="000000"/>
+              </a:solidFill>
+              <a:latin typeface="Arial"/>
+            </a:endParaRPr>
+          </a:p>
         </p:txBody>
       </p:sp>
       <p:sp>
@@ -12567,7 +12594,7 @@
         <p:spPr>
           <a:xfrm>
             <a:off x="6656400" y="228600"/>
-            <a:ext cx="1612800" cy="303120"/>
+            <a:ext cx="1612440" cy="303120"/>
           </a:xfrm>
           <a:prstGeom prst="rect">
             <a:avLst/>
@@ -12624,7 +12651,7 @@
         <p:spPr>
           <a:xfrm>
             <a:off x="6656400" y="489960"/>
-            <a:ext cx="1612800" cy="516600"/>
+            <a:ext cx="1612440" cy="516600"/>
           </a:xfrm>
           <a:prstGeom prst="rect">
             <a:avLst/>
@@ -12714,7 +12741,7 @@
         <p:spPr>
           <a:xfrm>
             <a:off x="6656400" y="228600"/>
-            <a:ext cx="1612800" cy="303120"/>
+            <a:ext cx="1612440" cy="303120"/>
           </a:xfrm>
           <a:prstGeom prst="rect">
             <a:avLst/>
@@ -12771,7 +12798,7 @@
         <p:spPr>
           <a:xfrm>
             <a:off x="6656400" y="489960"/>
-            <a:ext cx="1612800" cy="730080"/>
+            <a:ext cx="1612440" cy="730080"/>
           </a:xfrm>
           <a:prstGeom prst="rect">
             <a:avLst/>
@@ -12888,7 +12915,7 @@
         <p:spPr>
           <a:xfrm>
             <a:off x="128520" y="4629600"/>
-            <a:ext cx="1558080" cy="518760"/>
+            <a:ext cx="1557720" cy="518400"/>
           </a:xfrm>
           <a:prstGeom prst="diamond">
             <a:avLst/>
@@ -12976,7 +13003,7 @@
         <p:spPr>
           <a:xfrm>
             <a:off x="0" y="3365640"/>
-            <a:ext cx="1842480" cy="13680"/>
+            <a:ext cx="1842840" cy="14040"/>
           </a:xfrm>
           <a:prstGeom prst="straightConnector1">
             <a:avLst/>
@@ -12998,7 +13025,7 @@
         <p:spPr>
           <a:xfrm>
             <a:off x="673200" y="3949920"/>
-            <a:ext cx="469080" cy="374040"/>
+            <a:ext cx="468720" cy="373680"/>
           </a:xfrm>
           <a:prstGeom prst="triangle">
             <a:avLst>
@@ -13065,9 +13092,9 @@
         <p:grpSpPr>
           <a:xfrm>
             <a:off x="101160" y="1413000"/>
-            <a:ext cx="1612800" cy="777960"/>
+            <a:ext cx="1612440" cy="777960"/>
             <a:chOff x="101160" y="1413000"/>
-            <a:chExt cx="1612800" cy="777960"/>
+            <a:chExt cx="1612440" cy="777960"/>
           </a:xfrm>
         </p:grpSpPr>
         <p:sp>
@@ -13079,7 +13106,7 @@
           <p:spPr>
             <a:xfrm>
               <a:off x="101160" y="1413000"/>
-              <a:ext cx="1612800" cy="303120"/>
+              <a:ext cx="1612440" cy="303120"/>
             </a:xfrm>
             <a:prstGeom prst="rect">
               <a:avLst/>
@@ -13137,7 +13164,7 @@
           <p:spPr>
             <a:xfrm>
               <a:off x="101160" y="1674360"/>
-              <a:ext cx="1612800" cy="516600"/>
+              <a:ext cx="1612440" cy="516600"/>
             </a:xfrm>
             <a:prstGeom prst="rect">
               <a:avLst/>
@@ -13229,7 +13256,7 @@
         <p:spPr>
           <a:xfrm>
             <a:off x="4426920" y="914400"/>
-            <a:ext cx="1558080" cy="374040"/>
+            <a:ext cx="1557720" cy="373680"/>
           </a:xfrm>
           <a:prstGeom prst="diamond">
             <a:avLst/>
@@ -13296,8 +13323,8 @@
         </p:nvCxnSpPr>
         <p:spPr>
           <a:xfrm flipH="1">
-            <a:off x="5985000" y="855000"/>
-            <a:ext cx="671760" cy="246960"/>
+            <a:off x="5984640" y="855000"/>
+            <a:ext cx="672120" cy="246600"/>
           </a:xfrm>
           <a:prstGeom prst="straightConnector1">
             <a:avLst/>
@@ -13320,7 +13347,7 @@
         <p:spPr>
           <a:xfrm>
             <a:off x="6442200" y="1823040"/>
-            <a:ext cx="1786680" cy="374040"/>
+            <a:ext cx="1786320" cy="373680"/>
           </a:xfrm>
           <a:prstGeom prst="diamond">
             <a:avLst/>
@@ -13387,7 +13414,7 @@
         </p:nvCxnSpPr>
         <p:spPr>
           <a:xfrm flipV="1">
-            <a:off x="7335720" y="1220040"/>
+            <a:off x="7335360" y="1220040"/>
             <a:ext cx="127440" cy="603360"/>
           </a:xfrm>
           <a:prstGeom prst="straightConnector1">
@@ -13411,8 +13438,8 @@
         </p:nvCxnSpPr>
         <p:spPr>
           <a:xfrm flipH="1" flipV="1">
-            <a:off x="7335720" y="2197080"/>
-            <a:ext cx="284040" cy="557640"/>
+            <a:off x="7335360" y="2196720"/>
+            <a:ext cx="284760" cy="558360"/>
           </a:xfrm>
           <a:prstGeom prst="straightConnector1">
             <a:avLst/>
@@ -13435,7 +13462,7 @@
         <p:spPr>
           <a:xfrm>
             <a:off x="128520" y="6134400"/>
-            <a:ext cx="1558080" cy="374040"/>
+            <a:ext cx="1557720" cy="373680"/>
           </a:xfrm>
           <a:prstGeom prst="diamond">
             <a:avLst/>
@@ -13500,9 +13527,9 @@
         <p:grpSpPr>
           <a:xfrm>
             <a:off x="6681960" y="2743200"/>
-            <a:ext cx="1841400" cy="1216440"/>
+            <a:ext cx="1841040" cy="1216440"/>
             <a:chOff x="6681960" y="2743200"/>
-            <a:chExt cx="1841400" cy="1216440"/>
+            <a:chExt cx="1841040" cy="1216440"/>
           </a:xfrm>
         </p:grpSpPr>
         <p:sp>
@@ -13514,7 +13541,7 @@
           <p:spPr>
             <a:xfrm>
               <a:off x="6681960" y="2743200"/>
-              <a:ext cx="1841400" cy="303120"/>
+              <a:ext cx="1841040" cy="303120"/>
             </a:xfrm>
             <a:prstGeom prst="rect">
               <a:avLst/>
@@ -13571,7 +13598,7 @@
           <p:spPr>
             <a:xfrm>
               <a:off x="6681960" y="3016080"/>
-              <a:ext cx="1841400" cy="943560"/>
+              <a:ext cx="1841040" cy="943560"/>
             </a:xfrm>
             <a:prstGeom prst="rect">
               <a:avLst/>
@@ -13718,7 +13745,7 @@
         <p:spPr>
           <a:xfrm>
             <a:off x="9173520" y="3501000"/>
-            <a:ext cx="469080" cy="374040"/>
+            <a:ext cx="468720" cy="373680"/>
           </a:xfrm>
           <a:prstGeom prst="triangle">
             <a:avLst>
@@ -13785,7 +13812,7 @@
         <p:spPr>
           <a:xfrm>
             <a:off x="10218960" y="3599280"/>
-            <a:ext cx="1895400" cy="303120"/>
+            <a:ext cx="1895040" cy="303120"/>
           </a:xfrm>
           <a:prstGeom prst="rect">
             <a:avLst/>
@@ -13842,7 +13869,7 @@
         <p:spPr>
           <a:xfrm>
             <a:off x="10218960" y="3902400"/>
-            <a:ext cx="1895400" cy="1584000"/>
+            <a:ext cx="1895040" cy="1584000"/>
           </a:xfrm>
           <a:prstGeom prst="rect">
             <a:avLst/>
@@ -14050,8 +14077,8 @@
         </p:nvCxnSpPr>
         <p:spPr>
           <a:xfrm>
-            <a:off x="9525600" y="3688200"/>
-            <a:ext cx="693720" cy="1006560"/>
+            <a:off x="9525240" y="3687840"/>
+            <a:ext cx="694080" cy="1006920"/>
           </a:xfrm>
           <a:prstGeom prst="straightConnector1">
             <a:avLst/>
@@ -14075,8 +14102,8 @@
         </p:nvCxnSpPr>
         <p:spPr>
           <a:xfrm flipH="1" flipV="1">
-            <a:off x="8523360" y="3351240"/>
-            <a:ext cx="767880" cy="337320"/>
+            <a:off x="8523000" y="3351240"/>
+            <a:ext cx="767880" cy="336960"/>
           </a:xfrm>
           <a:prstGeom prst="straightConnector1">
             <a:avLst/>
@@ -14098,7 +14125,7 @@
         <p:spPr>
           <a:xfrm>
             <a:off x="2086200" y="3336840"/>
-            <a:ext cx="1612800" cy="303120"/>
+            <a:ext cx="1612440" cy="303120"/>
           </a:xfrm>
           <a:prstGeom prst="rect">
             <a:avLst/>
@@ -14155,7 +14182,7 @@
         <p:spPr>
           <a:xfrm>
             <a:off x="2086200" y="3598200"/>
-            <a:ext cx="1612800" cy="516600"/>
+            <a:ext cx="1612440" cy="516600"/>
           </a:xfrm>
           <a:prstGeom prst="rect">
             <a:avLst/>
@@ -14245,7 +14272,7 @@
         <p:spPr>
           <a:xfrm>
             <a:off x="2086200" y="3336840"/>
-            <a:ext cx="1612800" cy="303120"/>
+            <a:ext cx="1612440" cy="303120"/>
           </a:xfrm>
           <a:prstGeom prst="rect">
             <a:avLst/>
@@ -14302,7 +14329,7 @@
         <p:spPr>
           <a:xfrm>
             <a:off x="2086200" y="3598200"/>
-            <a:ext cx="1612800" cy="943560"/>
+            <a:ext cx="1612440" cy="943560"/>
           </a:xfrm>
           <a:prstGeom prst="rect">
             <a:avLst/>
@@ -14446,7 +14473,7 @@
         <p:spPr>
           <a:xfrm>
             <a:off x="1883160" y="2514600"/>
-            <a:ext cx="1815840" cy="374040"/>
+            <a:ext cx="1815480" cy="373680"/>
           </a:xfrm>
           <a:prstGeom prst="diamond">
             <a:avLst/>
@@ -14511,7 +14538,7 @@
         <p:spPr>
           <a:xfrm>
             <a:off x="3481560" y="2899800"/>
-            <a:ext cx="1587240" cy="374040"/>
+            <a:ext cx="1586880" cy="373680"/>
           </a:xfrm>
           <a:prstGeom prst="ellipse">
             <a:avLst/>
@@ -14598,8 +14625,8 @@
         </p:nvCxnSpPr>
         <p:spPr>
           <a:xfrm>
-            <a:off x="3699000" y="2701800"/>
-            <a:ext cx="576720" cy="198360"/>
+            <a:off x="3698640" y="2701440"/>
+            <a:ext cx="576720" cy="198720"/>
           </a:xfrm>
           <a:prstGeom prst="straightConnector1">
             <a:avLst/>
@@ -14623,8 +14650,8 @@
         </p:nvCxnSpPr>
         <p:spPr>
           <a:xfrm flipH="1" flipV="1">
-            <a:off x="2791080" y="2888640"/>
-            <a:ext cx="101880" cy="448560"/>
+            <a:off x="2791080" y="2888280"/>
+            <a:ext cx="101520" cy="448920"/>
           </a:xfrm>
           <a:prstGeom prst="straightConnector1">
             <a:avLst/>
@@ -14648,8 +14675,8 @@
         </p:nvCxnSpPr>
         <p:spPr>
           <a:xfrm flipV="1">
-            <a:off x="2791080" y="1647720"/>
-            <a:ext cx="557280" cy="867240"/>
+            <a:off x="2791080" y="1860480"/>
+            <a:ext cx="556920" cy="654480"/>
           </a:xfrm>
           <a:prstGeom prst="straightConnector1">
             <a:avLst/>
@@ -14671,7 +14698,7 @@
         <p:spPr>
           <a:xfrm>
             <a:off x="10543680" y="457200"/>
-            <a:ext cx="1612800" cy="303120"/>
+            <a:ext cx="1612440" cy="303120"/>
           </a:xfrm>
           <a:prstGeom prst="rect">
             <a:avLst/>
@@ -14728,7 +14755,7 @@
         <p:spPr>
           <a:xfrm>
             <a:off x="10543680" y="718560"/>
-            <a:ext cx="1612800" cy="516600"/>
+            <a:ext cx="1612440" cy="516600"/>
           </a:xfrm>
           <a:prstGeom prst="rect">
             <a:avLst/>
@@ -14818,7 +14845,7 @@
         <p:spPr>
           <a:xfrm>
             <a:off x="10287000" y="457200"/>
-            <a:ext cx="1612800" cy="303120"/>
+            <a:ext cx="1612440" cy="303120"/>
           </a:xfrm>
           <a:prstGeom prst="rect">
             <a:avLst/>
@@ -14875,7 +14902,7 @@
         <p:spPr>
           <a:xfrm>
             <a:off x="10287000" y="718560"/>
-            <a:ext cx="1869480" cy="2651400"/>
+            <a:ext cx="1869120" cy="2651400"/>
           </a:xfrm>
           <a:prstGeom prst="rect">
             <a:avLst/>
@@ -15209,7 +15236,7 @@
         <p:spPr>
           <a:xfrm>
             <a:off x="8007120" y="1448280"/>
-            <a:ext cx="2044800" cy="374040"/>
+            <a:ext cx="2044440" cy="373680"/>
           </a:xfrm>
           <a:prstGeom prst="diamond">
             <a:avLst/>
@@ -15276,8 +15303,8 @@
         </p:nvCxnSpPr>
         <p:spPr>
           <a:xfrm>
-            <a:off x="9029520" y="1822320"/>
-            <a:ext cx="1189800" cy="2872440"/>
+            <a:off x="9029520" y="1821960"/>
+            <a:ext cx="1189800" cy="2872800"/>
           </a:xfrm>
           <a:prstGeom prst="straightConnector1">
             <a:avLst/>
@@ -15301,8 +15328,8 @@
         </p:nvCxnSpPr>
         <p:spPr>
           <a:xfrm flipH="1" flipV="1">
-            <a:off x="10051920" y="1635480"/>
-            <a:ext cx="235440" cy="408960"/>
+            <a:off x="10051560" y="1635120"/>
+            <a:ext cx="235800" cy="409320"/>
           </a:xfrm>
           <a:prstGeom prst="straightConnector1">
             <a:avLst/>
@@ -15326,8 +15353,8 @@
         </p:nvCxnSpPr>
         <p:spPr>
           <a:xfrm flipH="1" flipV="1">
-            <a:off x="7462800" y="1220040"/>
-            <a:ext cx="1567080" cy="228600"/>
+            <a:off x="7462440" y="1220040"/>
+            <a:ext cx="1567440" cy="228600"/>
           </a:xfrm>
           <a:prstGeom prst="straightConnector1">
             <a:avLst/>
@@ -15342,17 +15369,39 @@
       </p:cxnSp>
       <p:cxnSp>
         <p:nvCxnSpPr>
-          <p:cNvPr id="189" name="Straight Arrow Connector 61"/>
+          <p:cNvPr id="189" name="Straight Arrow Connector 12"/>
           <p:cNvCxnSpPr>
-            <a:stCxn id="190" idx="1"/>
-            <a:endCxn id="147" idx="2"/>
+            <a:stCxn id="158" idx="1"/>
+            <a:endCxn id="147" idx="3"/>
           </p:cNvCxnSpPr>
           <p:nvPr/>
         </p:nvCxnSpPr>
         <p:spPr>
-          <a:xfrm flipH="1" flipV="1">
-            <a:off x="3348000" y="1647720"/>
-            <a:ext cx="1008360" cy="638280"/>
+          <a:xfrm flipH="1">
+            <a:off x="4154040" y="1101240"/>
+            <a:ext cx="273240" cy="74160"/>
+          </a:xfrm>
+          <a:prstGeom prst="straightConnector1">
+            <a:avLst/>
+          </a:prstGeom>
+          <a:ln w="25400">
+            <a:solidFill>
+              <a:srgbClr val="000000"/>
+            </a:solidFill>
+            <a:round/>
+          </a:ln>
+        </p:spPr>
+      </p:cxnSp>
+      <p:cxnSp>
+        <p:nvCxnSpPr>
+          <p:cNvPr id="190" name="Straight Arrow Connector 87"/>
+          <p:cNvCxnSpPr/>
+          <p:nvPr/>
+        </p:nvCxnSpPr>
+        <p:spPr>
+          <a:xfrm flipH="1">
+            <a:off x="0" y="3657600"/>
+            <a:ext cx="1842840" cy="14040"/>
           </a:xfrm>
           <a:prstGeom prst="straightConnector1">
             <a:avLst/>
@@ -15367,151 +15416,14 @@
       </p:cxnSp>
       <p:sp>
         <p:nvSpPr>
-          <p:cNvPr id="190" name="Diamond 24"/>
-          <p:cNvSpPr/>
-          <p:nvPr/>
-        </p:nvSpPr>
-        <p:spPr>
-          <a:xfrm>
-            <a:off x="4356000" y="1949040"/>
-            <a:ext cx="1815480" cy="673200"/>
-          </a:xfrm>
-          <a:prstGeom prst="diamond">
-            <a:avLst/>
-          </a:prstGeom>
-          <a:solidFill>
-            <a:schemeClr val="bg1"/>
-          </a:solidFill>
-          <a:ln>
-            <a:solidFill>
-              <a:srgbClr val="000000"/>
-            </a:solidFill>
-          </a:ln>
-        </p:spPr>
-        <p:style>
-          <a:lnRef idx="2">
-            <a:schemeClr val="accent1">
-              <a:shade val="50000"/>
-            </a:schemeClr>
-          </a:lnRef>
-          <a:fillRef idx="1">
-            <a:schemeClr val="accent1"/>
-          </a:fillRef>
-          <a:effectRef idx="0">
-            <a:schemeClr val="accent1"/>
-          </a:effectRef>
-          <a:fontRef idx="minor"/>
-        </p:style>
-        <p:txBody>
-          <a:bodyPr lIns="90000" rIns="90000" tIns="45000" bIns="45000" anchor="ctr">
-            <a:noAutofit/>
-          </a:bodyPr>
-          <a:p>
-            <a:pPr algn="ctr" defTabSz="914400">
-              <a:lnSpc>
-                <a:spcPct val="100000"/>
-              </a:lnSpc>
-            </a:pPr>
-            <a:r>
-              <a:rPr b="0" lang="en-US" sz="1400" spc="-1" strike="noStrike">
-                <a:solidFill>
-                  <a:schemeClr val="dk1"/>
-                </a:solidFill>
-                <a:latin typeface="Calibri"/>
-              </a:rPr>
-              <a:t>Wheel of Fortune</a:t>
-            </a:r>
-            <a:endParaRPr b="0" lang="en-US" sz="1400" spc="-1" strike="noStrike">
-              <a:solidFill>
-                <a:srgbClr val="000000"/>
-              </a:solidFill>
-              <a:latin typeface="Arial"/>
-            </a:endParaRPr>
-          </a:p>
-        </p:txBody>
-      </p:sp>
-      <p:cxnSp>
-        <p:nvCxnSpPr>
-          <p:cNvPr id="191" name="Straight Arrow Connector 62"/>
-          <p:cNvCxnSpPr>
-            <a:stCxn id="192" idx="0"/>
-            <a:endCxn id="190" idx="2"/>
-          </p:cNvCxnSpPr>
-          <p:nvPr/>
-        </p:nvCxnSpPr>
-        <p:spPr>
-          <a:xfrm flipH="1" flipV="1">
-            <a:off x="5263920" y="2622240"/>
-            <a:ext cx="17280" cy="1950120"/>
-          </a:xfrm>
-          <a:prstGeom prst="straightConnector1">
-            <a:avLst/>
-          </a:prstGeom>
-          <a:ln w="25400">
-            <a:solidFill>
-              <a:srgbClr val="000000"/>
-            </a:solidFill>
-            <a:round/>
-          </a:ln>
-        </p:spPr>
-      </p:cxnSp>
-      <p:cxnSp>
-        <p:nvCxnSpPr>
-          <p:cNvPr id="193" name="Straight Arrow Connector 12"/>
-          <p:cNvCxnSpPr>
-            <a:stCxn id="158" idx="1"/>
-            <a:endCxn id="147" idx="3"/>
-          </p:cNvCxnSpPr>
-          <p:nvPr/>
-        </p:nvCxnSpPr>
-        <p:spPr>
-          <a:xfrm flipH="1" flipV="1">
-            <a:off x="4154400" y="1068840"/>
-            <a:ext cx="272880" cy="33120"/>
-          </a:xfrm>
-          <a:prstGeom prst="straightConnector1">
-            <a:avLst/>
-          </a:prstGeom>
-          <a:ln w="25400">
-            <a:solidFill>
-              <a:srgbClr val="000000"/>
-            </a:solidFill>
-            <a:round/>
-          </a:ln>
-        </p:spPr>
-      </p:cxnSp>
-      <p:cxnSp>
-        <p:nvCxnSpPr>
-          <p:cNvPr id="194" name="Straight Arrow Connector 87"/>
-          <p:cNvCxnSpPr/>
-          <p:nvPr/>
-        </p:nvCxnSpPr>
-        <p:spPr>
-          <a:xfrm flipH="1">
-            <a:off x="0" y="3657600"/>
-            <a:ext cx="1842480" cy="13680"/>
-          </a:xfrm>
-          <a:prstGeom prst="straightConnector1">
-            <a:avLst/>
-          </a:prstGeom>
-          <a:ln w="25400">
-            <a:solidFill>
-              <a:srgbClr val="000000"/>
-            </a:solidFill>
-            <a:round/>
-          </a:ln>
-        </p:spPr>
-      </p:cxnSp>
-      <p:sp>
-        <p:nvSpPr>
-          <p:cNvPr id="195" name="Oval 10"/>
+          <p:cNvPr id="191" name="Oval 10"/>
           <p:cNvSpPr/>
           <p:nvPr/>
         </p:nvSpPr>
         <p:spPr>
           <a:xfrm>
             <a:off x="8686800" y="532800"/>
-            <a:ext cx="1364040" cy="374040"/>
+            <a:ext cx="1363680" cy="373680"/>
           </a:xfrm>
           <a:prstGeom prst="ellipse">
             <a:avLst/>
@@ -15567,105 +15479,17 @@
       </p:sp>
       <p:cxnSp>
         <p:nvCxnSpPr>
-          <p:cNvPr id="196" name="Straight Arrow Connector 88"/>
+          <p:cNvPr id="192" name="Straight Arrow Connector 88"/>
           <p:cNvCxnSpPr>
-            <a:stCxn id="195" idx="4"/>
+            <a:stCxn id="191" idx="4"/>
             <a:endCxn id="185" idx="0"/>
           </p:cNvCxnSpPr>
           <p:nvPr/>
         </p:nvCxnSpPr>
         <p:spPr>
           <a:xfrm flipH="1">
-            <a:off x="9029520" y="906840"/>
-            <a:ext cx="339840" cy="541800"/>
-          </a:xfrm>
-          <a:prstGeom prst="straightConnector1">
-            <a:avLst/>
-          </a:prstGeom>
-          <a:ln w="25400">
-            <a:solidFill>
-              <a:srgbClr val="000000"/>
-            </a:solidFill>
-            <a:round/>
-          </a:ln>
-        </p:spPr>
-      </p:cxnSp>
-      <p:sp>
-        <p:nvSpPr>
-          <p:cNvPr id="192" name="Oval 5"/>
-          <p:cNvSpPr/>
-          <p:nvPr/>
-        </p:nvSpPr>
-        <p:spPr>
-          <a:xfrm>
-            <a:off x="4343400" y="4572000"/>
-            <a:ext cx="1874880" cy="374040"/>
-          </a:xfrm>
-          <a:prstGeom prst="ellipse">
-            <a:avLst/>
-          </a:prstGeom>
-          <a:noFill/>
-          <a:ln>
-            <a:solidFill>
-              <a:srgbClr val="000000"/>
-            </a:solidFill>
-          </a:ln>
-        </p:spPr>
-        <p:style>
-          <a:lnRef idx="2">
-            <a:schemeClr val="accent1">
-              <a:shade val="50000"/>
-            </a:schemeClr>
-          </a:lnRef>
-          <a:fillRef idx="1">
-            <a:schemeClr val="accent1"/>
-          </a:fillRef>
-          <a:effectRef idx="0">
-            <a:schemeClr val="accent1"/>
-          </a:effectRef>
-          <a:fontRef idx="minor"/>
-        </p:style>
-        <p:txBody>
-          <a:bodyPr lIns="90000" rIns="90000" tIns="45000" bIns="45000" anchor="ctr">
-            <a:noAutofit/>
-          </a:bodyPr>
-          <a:p>
-            <a:pPr algn="ctr" defTabSz="914400">
-              <a:lnSpc>
-                <a:spcPct val="100000"/>
-              </a:lnSpc>
-            </a:pPr>
-            <a:r>
-              <a:rPr b="0" lang="en-US" sz="1410" spc="-1" strike="noStrike">
-                <a:solidFill>
-                  <a:schemeClr val="dk1"/>
-                </a:solidFill>
-                <a:latin typeface="Calibri"/>
-              </a:rPr>
-              <a:t>last_timespin</a:t>
-            </a:r>
-            <a:endParaRPr b="0" lang="en-US" sz="1410" spc="-1" strike="noStrike">
-              <a:solidFill>
-                <a:srgbClr val="000000"/>
-              </a:solidFill>
-              <a:latin typeface="Arial"/>
-            </a:endParaRPr>
-          </a:p>
-        </p:txBody>
-      </p:sp>
-      <p:cxnSp>
-        <p:nvCxnSpPr>
-          <p:cNvPr id="197" name="Straight Arrow Connector 42"/>
-          <p:cNvCxnSpPr>
-            <a:stCxn id="190" idx="3"/>
-            <a:endCxn id="151" idx="1"/>
-          </p:cNvCxnSpPr>
-          <p:nvPr/>
-        </p:nvCxnSpPr>
-        <p:spPr>
-          <a:xfrm flipV="1">
-            <a:off x="6171480" y="855000"/>
-            <a:ext cx="485280" cy="1431000"/>
+            <a:off x="9029520" y="906480"/>
+            <a:ext cx="339480" cy="542160"/>
           </a:xfrm>
           <a:prstGeom prst="straightConnector1">
             <a:avLst/>
@@ -15710,14 +15534,14 @@
       </p:grpSpPr>
       <p:cxnSp>
         <p:nvCxnSpPr>
-          <p:cNvPr id="198" name="Straight Arrow Connector 1"/>
+          <p:cNvPr id="193" name="Straight Arrow Connector 1"/>
           <p:cNvCxnSpPr/>
           <p:nvPr/>
         </p:nvCxnSpPr>
         <p:spPr>
           <a:xfrm flipH="1">
             <a:off x="0" y="3073320"/>
-            <a:ext cx="1842480" cy="13680"/>
+            <a:ext cx="1842840" cy="14040"/>
           </a:xfrm>
           <a:prstGeom prst="straightConnector1">
             <a:avLst/>
@@ -15733,14 +15557,14 @@
       </p:cxnSp>
       <p:cxnSp>
         <p:nvCxnSpPr>
-          <p:cNvPr id="199" name="Straight Arrow Connector 2"/>
+          <p:cNvPr id="194" name="Straight Arrow Connector 2"/>
           <p:cNvCxnSpPr/>
           <p:nvPr/>
         </p:nvCxnSpPr>
         <p:spPr>
           <a:xfrm>
             <a:off x="0" y="2489400"/>
-            <a:ext cx="1842480" cy="13680"/>
+            <a:ext cx="1842840" cy="14040"/>
           </a:xfrm>
           <a:prstGeom prst="straightConnector1">
             <a:avLst/>
@@ -15756,14 +15580,14 @@
       </p:cxnSp>
       <p:cxnSp>
         <p:nvCxnSpPr>
-          <p:cNvPr id="200" name="Straight Arrow Connector 3"/>
+          <p:cNvPr id="195" name="Straight Arrow Connector 3"/>
           <p:cNvCxnSpPr/>
           <p:nvPr/>
         </p:nvCxnSpPr>
         <p:spPr>
           <a:xfrm>
             <a:off x="0" y="2781360"/>
-            <a:ext cx="1842480" cy="13680"/>
+            <a:ext cx="1842840" cy="14040"/>
           </a:xfrm>
           <a:prstGeom prst="straightConnector1">
             <a:avLst/>
@@ -15779,14 +15603,14 @@
       </p:cxnSp>
       <p:cxnSp>
         <p:nvCxnSpPr>
-          <p:cNvPr id="201" name="Straight Arrow Connector 4"/>
+          <p:cNvPr id="196" name="Straight Arrow Connector 4"/>
           <p:cNvCxnSpPr/>
           <p:nvPr/>
         </p:nvCxnSpPr>
         <p:spPr>
           <a:xfrm flipH="1">
             <a:off x="0" y="3657600"/>
-            <a:ext cx="1842480" cy="13680"/>
+            <a:ext cx="1842840" cy="14040"/>
           </a:xfrm>
           <a:prstGeom prst="straightConnector1">
             <a:avLst/>
@@ -15801,14 +15625,14 @@
       </p:cxnSp>
       <p:sp>
         <p:nvSpPr>
-          <p:cNvPr id="202" name="Diamond 1"/>
+          <p:cNvPr id="197" name="Diamond 1"/>
           <p:cNvSpPr/>
           <p:nvPr/>
         </p:nvSpPr>
         <p:spPr>
           <a:xfrm>
             <a:off x="128520" y="6134040"/>
-            <a:ext cx="1558080" cy="374040"/>
+            <a:ext cx="1557720" cy="373680"/>
           </a:xfrm>
           <a:prstGeom prst="diamond">
             <a:avLst/>
@@ -15866,14 +15690,14 @@
       </p:sp>
       <p:sp>
         <p:nvSpPr>
-          <p:cNvPr id="203" name="Oval 1"/>
+          <p:cNvPr id="198" name="Oval 1"/>
           <p:cNvSpPr/>
           <p:nvPr/>
         </p:nvSpPr>
         <p:spPr>
           <a:xfrm>
             <a:off x="302760" y="5454000"/>
-            <a:ext cx="1209600" cy="374040"/>
+            <a:ext cx="1209240" cy="373680"/>
           </a:xfrm>
           <a:prstGeom prst="ellipse">
             <a:avLst/>
@@ -15929,28 +15753,28 @@
       </p:sp>
       <p:grpSp>
         <p:nvGrpSpPr>
-          <p:cNvPr id="204" name="Group 1"/>
+          <p:cNvPr id="199" name="Group 1"/>
           <p:cNvGrpSpPr/>
           <p:nvPr/>
         </p:nvGrpSpPr>
         <p:grpSpPr>
           <a:xfrm>
             <a:off x="101160" y="336240"/>
-            <a:ext cx="1612800" cy="777960"/>
+            <a:ext cx="1612440" cy="777960"/>
             <a:chOff x="101160" y="336240"/>
-            <a:chExt cx="1612800" cy="777960"/>
+            <a:chExt cx="1612440" cy="777960"/>
           </a:xfrm>
         </p:grpSpPr>
         <p:sp>
           <p:nvSpPr>
-            <p:cNvPr id="205" name="TextBox 1"/>
+            <p:cNvPr id="200" name="TextBox 1"/>
             <p:cNvSpPr/>
             <p:nvPr/>
           </p:nvSpPr>
           <p:spPr>
             <a:xfrm>
               <a:off x="101160" y="336240"/>
-              <a:ext cx="1612800" cy="303120"/>
+              <a:ext cx="1612440" cy="303120"/>
             </a:xfrm>
             <a:prstGeom prst="rect">
               <a:avLst/>
@@ -16000,14 +15824,14 @@
         </p:sp>
         <p:sp>
           <p:nvSpPr>
-            <p:cNvPr id="206" name="TextBox 2"/>
+            <p:cNvPr id="201" name="TextBox 2"/>
             <p:cNvSpPr/>
             <p:nvPr/>
           </p:nvSpPr>
           <p:spPr>
             <a:xfrm>
               <a:off x="101160" y="597600"/>
-              <a:ext cx="1612800" cy="516600"/>
+              <a:ext cx="1612440" cy="516600"/>
             </a:xfrm>
             <a:prstGeom prst="rect">
               <a:avLst/>
@@ -16091,14 +15915,14 @@
       </p:grpSp>
       <p:sp>
         <p:nvSpPr>
-          <p:cNvPr id="207" name="Diamond 2"/>
+          <p:cNvPr id="202" name="Diamond 2"/>
           <p:cNvSpPr/>
           <p:nvPr/>
         </p:nvSpPr>
         <p:spPr>
           <a:xfrm>
             <a:off x="128520" y="4629600"/>
-            <a:ext cx="1558080" cy="518760"/>
+            <a:ext cx="1557720" cy="518400"/>
           </a:xfrm>
           <a:prstGeom prst="diamond">
             <a:avLst/>
@@ -16179,14 +16003,14 @@
       </p:sp>
       <p:cxnSp>
         <p:nvCxnSpPr>
-          <p:cNvPr id="208" name="Straight Arrow Connector 5"/>
+          <p:cNvPr id="203" name="Straight Arrow Connector 5"/>
           <p:cNvCxnSpPr/>
           <p:nvPr/>
         </p:nvCxnSpPr>
         <p:spPr>
           <a:xfrm>
             <a:off x="0" y="3365640"/>
-            <a:ext cx="1842480" cy="13680"/>
+            <a:ext cx="1842840" cy="14040"/>
           </a:xfrm>
           <a:prstGeom prst="straightConnector1">
             <a:avLst/>
@@ -16201,14 +16025,14 @@
       </p:cxnSp>
       <p:sp>
         <p:nvSpPr>
-          <p:cNvPr id="209" name="Isosceles Triangle 1"/>
+          <p:cNvPr id="204" name="Isosceles Triangle 1"/>
           <p:cNvSpPr/>
           <p:nvPr/>
         </p:nvSpPr>
         <p:spPr>
           <a:xfrm>
             <a:off x="673200" y="3949920"/>
-            <a:ext cx="469080" cy="374040"/>
+            <a:ext cx="468720" cy="373680"/>
           </a:xfrm>
           <a:prstGeom prst="triangle">
             <a:avLst>
@@ -16268,28 +16092,28 @@
       </p:sp>
       <p:grpSp>
         <p:nvGrpSpPr>
-          <p:cNvPr id="210" name="Group 2"/>
+          <p:cNvPr id="205" name="Group 2"/>
           <p:cNvGrpSpPr/>
           <p:nvPr/>
         </p:nvGrpSpPr>
         <p:grpSpPr>
           <a:xfrm>
             <a:off x="101160" y="1413000"/>
-            <a:ext cx="1612800" cy="777960"/>
+            <a:ext cx="1612440" cy="777960"/>
             <a:chOff x="101160" y="1413000"/>
-            <a:chExt cx="1612800" cy="777960"/>
+            <a:chExt cx="1612440" cy="777960"/>
           </a:xfrm>
         </p:grpSpPr>
         <p:sp>
           <p:nvSpPr>
-            <p:cNvPr id="211" name="TextBox 3"/>
+            <p:cNvPr id="206" name="TextBox 3"/>
             <p:cNvSpPr/>
             <p:nvPr/>
           </p:nvSpPr>
           <p:spPr>
             <a:xfrm>
               <a:off x="101160" y="1413000"/>
-              <a:ext cx="1612800" cy="303120"/>
+              <a:ext cx="1612440" cy="303120"/>
             </a:xfrm>
             <a:prstGeom prst="rect">
               <a:avLst/>
@@ -16340,14 +16164,14 @@
         </p:sp>
         <p:sp>
           <p:nvSpPr>
-            <p:cNvPr id="212" name="TextBox 4"/>
+            <p:cNvPr id="207" name="TextBox 4"/>
             <p:cNvSpPr/>
             <p:nvPr/>
           </p:nvSpPr>
           <p:spPr>
             <a:xfrm>
               <a:off x="101160" y="1674360"/>
-              <a:ext cx="1612800" cy="516600"/>
+              <a:ext cx="1612440" cy="516600"/>
             </a:xfrm>
             <a:prstGeom prst="rect">
               <a:avLst/>
@@ -16432,14 +16256,14 @@
       </p:grpSp>
       <p:sp>
         <p:nvSpPr>
-          <p:cNvPr id="213" name="TextBox 19"/>
+          <p:cNvPr id="208" name="TextBox 19"/>
           <p:cNvSpPr/>
           <p:nvPr/>
         </p:nvSpPr>
         <p:spPr>
           <a:xfrm>
             <a:off x="4775040" y="457200"/>
-            <a:ext cx="1612800" cy="303120"/>
+            <a:ext cx="1612440" cy="303120"/>
           </a:xfrm>
           <a:prstGeom prst="rect">
             <a:avLst/>
@@ -16489,14 +16313,14 @@
       </p:sp>
       <p:sp>
         <p:nvSpPr>
-          <p:cNvPr id="214" name="TextBox 20"/>
+          <p:cNvPr id="209" name="TextBox 20"/>
           <p:cNvSpPr/>
           <p:nvPr/>
         </p:nvSpPr>
         <p:spPr>
           <a:xfrm>
             <a:off x="4775040" y="718560"/>
-            <a:ext cx="1612800" cy="730080"/>
+            <a:ext cx="1612440" cy="730080"/>
           </a:xfrm>
           <a:prstGeom prst="rect">
             <a:avLst/>
@@ -16606,28 +16430,28 @@
       </p:sp>
       <p:grpSp>
         <p:nvGrpSpPr>
-          <p:cNvPr id="215" name="Group 6"/>
+          <p:cNvPr id="210" name="Group 6"/>
           <p:cNvGrpSpPr/>
           <p:nvPr/>
         </p:nvGrpSpPr>
         <p:grpSpPr>
           <a:xfrm>
             <a:off x="4572000" y="4274280"/>
-            <a:ext cx="1612800" cy="991440"/>
+            <a:ext cx="1612440" cy="991440"/>
             <a:chOff x="4572000" y="4274280"/>
-            <a:chExt cx="1612800" cy="991440"/>
+            <a:chExt cx="1612440" cy="991440"/>
           </a:xfrm>
         </p:grpSpPr>
         <p:sp>
           <p:nvSpPr>
-            <p:cNvPr id="216" name="TextBox 21"/>
+            <p:cNvPr id="211" name="TextBox 21"/>
             <p:cNvSpPr/>
             <p:nvPr/>
           </p:nvSpPr>
           <p:spPr>
             <a:xfrm>
               <a:off x="4572000" y="4274280"/>
-              <a:ext cx="1612800" cy="303120"/>
+              <a:ext cx="1612440" cy="303120"/>
             </a:xfrm>
             <a:prstGeom prst="rect">
               <a:avLst/>
@@ -16677,14 +16501,14 @@
         </p:sp>
         <p:sp>
           <p:nvSpPr>
-            <p:cNvPr id="217" name="TextBox 30"/>
+            <p:cNvPr id="212" name="TextBox 30"/>
             <p:cNvSpPr/>
             <p:nvPr/>
           </p:nvSpPr>
           <p:spPr>
             <a:xfrm>
               <a:off x="4572000" y="4535640"/>
-              <a:ext cx="1612800" cy="730080"/>
+              <a:ext cx="1612440" cy="730080"/>
             </a:xfrm>
             <a:prstGeom prst="rect">
               <a:avLst/>
@@ -16795,14 +16619,14 @@
       </p:grpSp>
       <p:sp>
         <p:nvSpPr>
-          <p:cNvPr id="218" name="Diamond 9"/>
+          <p:cNvPr id="213" name="Diamond 9"/>
           <p:cNvSpPr/>
           <p:nvPr/>
         </p:nvSpPr>
         <p:spPr>
           <a:xfrm>
             <a:off x="3231360" y="2899800"/>
-            <a:ext cx="1558080" cy="374040"/>
+            <a:ext cx="1557720" cy="373680"/>
           </a:xfrm>
           <a:prstGeom prst="diamond">
             <a:avLst/>
@@ -16860,14 +16684,14 @@
       </p:sp>
       <p:sp>
         <p:nvSpPr>
-          <p:cNvPr id="219" name="Diamond 10"/>
+          <p:cNvPr id="214" name="Diamond 10"/>
           <p:cNvSpPr/>
           <p:nvPr/>
         </p:nvSpPr>
         <p:spPr>
           <a:xfrm>
             <a:off x="4602960" y="2585160"/>
-            <a:ext cx="1786680" cy="375480"/>
+            <a:ext cx="1786320" cy="375120"/>
           </a:xfrm>
           <a:prstGeom prst="diamond">
             <a:avLst/>
@@ -16925,17 +16749,17 @@
       </p:sp>
       <p:cxnSp>
         <p:nvCxnSpPr>
-          <p:cNvPr id="220" name="Straight Arrow Connector 24"/>
+          <p:cNvPr id="215" name="Straight Arrow Connector 24"/>
           <p:cNvCxnSpPr>
-            <a:stCxn id="215" idx="0"/>
-            <a:endCxn id="218" idx="2"/>
+            <a:stCxn id="210" idx="0"/>
+            <a:endCxn id="213" idx="2"/>
           </p:cNvCxnSpPr>
           <p:nvPr/>
         </p:nvCxnSpPr>
         <p:spPr>
           <a:xfrm flipH="1" flipV="1">
-            <a:off x="4010400" y="3273840"/>
-            <a:ext cx="1368360" cy="1000800"/>
+            <a:off x="4010400" y="3273480"/>
+            <a:ext cx="1368000" cy="1001160"/>
           </a:xfrm>
           <a:prstGeom prst="straightConnector1">
             <a:avLst/>
@@ -16951,16 +16775,16 @@
       </p:cxnSp>
       <p:cxnSp>
         <p:nvCxnSpPr>
-          <p:cNvPr id="221" name="Straight Arrow Connector 18"/>
+          <p:cNvPr id="216" name="Straight Arrow Connector 18"/>
           <p:cNvCxnSpPr>
-            <a:stCxn id="219" idx="0"/>
-            <a:endCxn id="214" idx="2"/>
+            <a:stCxn id="214" idx="0"/>
+            <a:endCxn id="209" idx="2"/>
           </p:cNvCxnSpPr>
           <p:nvPr/>
         </p:nvCxnSpPr>
         <p:spPr>
           <a:xfrm flipV="1">
-            <a:off x="5496480" y="1448640"/>
+            <a:off x="5496120" y="1448640"/>
             <a:ext cx="85320" cy="1136880"/>
           </a:xfrm>
           <a:prstGeom prst="straightConnector1">
@@ -16976,17 +16800,17 @@
       </p:cxnSp>
       <p:cxnSp>
         <p:nvCxnSpPr>
-          <p:cNvPr id="222" name="Straight Arrow Connector 17"/>
+          <p:cNvPr id="217" name="Straight Arrow Connector 17"/>
           <p:cNvCxnSpPr>
-            <a:stCxn id="215" idx="0"/>
-            <a:endCxn id="219" idx="2"/>
+            <a:stCxn id="210" idx="0"/>
+            <a:endCxn id="214" idx="2"/>
           </p:cNvCxnSpPr>
           <p:nvPr/>
         </p:nvCxnSpPr>
         <p:spPr>
           <a:xfrm flipV="1">
-            <a:off x="5378400" y="2960640"/>
-            <a:ext cx="118440" cy="1314000"/>
+            <a:off x="5378040" y="2960280"/>
+            <a:ext cx="118440" cy="1314360"/>
           </a:xfrm>
           <a:prstGeom prst="straightConnector1">
             <a:avLst/>
@@ -17001,17 +16825,17 @@
       </p:cxnSp>
       <p:cxnSp>
         <p:nvCxnSpPr>
-          <p:cNvPr id="223" name="Straight Arrow Connector 23"/>
+          <p:cNvPr id="218" name="Straight Arrow Connector 23"/>
           <p:cNvCxnSpPr>
-            <a:stCxn id="214" idx="2"/>
-            <a:endCxn id="218" idx="0"/>
+            <a:stCxn id="209" idx="2"/>
+            <a:endCxn id="213" idx="0"/>
           </p:cNvCxnSpPr>
           <p:nvPr/>
         </p:nvCxnSpPr>
         <p:spPr>
           <a:xfrm flipH="1">
             <a:off x="4010400" y="1448640"/>
-            <a:ext cx="1571400" cy="1451520"/>
+            <a:ext cx="1571040" cy="1451520"/>
           </a:xfrm>
           <a:prstGeom prst="straightConnector1">
             <a:avLst/>
@@ -17026,14 +16850,14 @@
       </p:cxnSp>
       <p:sp>
         <p:nvSpPr>
-          <p:cNvPr id="224" name="Diamond 11"/>
+          <p:cNvPr id="219" name="Diamond 11"/>
           <p:cNvSpPr/>
           <p:nvPr/>
         </p:nvSpPr>
         <p:spPr>
           <a:xfrm>
             <a:off x="2743200" y="457200"/>
-            <a:ext cx="1558080" cy="374040"/>
+            <a:ext cx="1557720" cy="373680"/>
           </a:xfrm>
           <a:prstGeom prst="diamond">
             <a:avLst/>
@@ -17091,17 +16915,17 @@
       </p:sp>
       <p:cxnSp>
         <p:nvCxnSpPr>
-          <p:cNvPr id="225" name="Straight Arrow Connector 25"/>
+          <p:cNvPr id="220" name="Straight Arrow Connector 25"/>
           <p:cNvCxnSpPr>
-            <a:stCxn id="214" idx="1"/>
-            <a:endCxn id="224" idx="3"/>
+            <a:stCxn id="209" idx="1"/>
+            <a:endCxn id="219" idx="3"/>
           </p:cNvCxnSpPr>
           <p:nvPr/>
         </p:nvCxnSpPr>
         <p:spPr>
           <a:xfrm flipH="1" flipV="1">
-            <a:off x="4301280" y="644400"/>
-            <a:ext cx="474120" cy="439560"/>
+            <a:off x="4300920" y="644040"/>
+            <a:ext cx="474480" cy="439920"/>
           </a:xfrm>
           <a:prstGeom prst="straightConnector1">
             <a:avLst/>
@@ -17116,17 +16940,17 @@
       </p:cxnSp>
       <p:cxnSp>
         <p:nvCxnSpPr>
-          <p:cNvPr id="226" name="Straight Arrow Connector 26"/>
+          <p:cNvPr id="221" name="Straight Arrow Connector 26"/>
           <p:cNvCxnSpPr>
-            <a:stCxn id="214" idx="1"/>
-            <a:endCxn id="224" idx="2"/>
+            <a:stCxn id="209" idx="1"/>
+            <a:endCxn id="219" idx="2"/>
           </p:cNvCxnSpPr>
           <p:nvPr/>
         </p:nvCxnSpPr>
         <p:spPr>
           <a:xfrm flipH="1" flipV="1">
-            <a:off x="3522240" y="831240"/>
-            <a:ext cx="1253160" cy="252720"/>
+            <a:off x="3522240" y="830880"/>
+            <a:ext cx="1253160" cy="253080"/>
           </a:xfrm>
           <a:prstGeom prst="straightConnector1">
             <a:avLst/>
@@ -17141,28 +16965,28 @@
       </p:cxnSp>
       <p:grpSp>
         <p:nvGrpSpPr>
-          <p:cNvPr id="227" name="Group 7"/>
+          <p:cNvPr id="222" name="Group 7"/>
           <p:cNvGrpSpPr/>
           <p:nvPr/>
         </p:nvGrpSpPr>
         <p:grpSpPr>
           <a:xfrm>
             <a:off x="8686800" y="837360"/>
-            <a:ext cx="1612800" cy="991440"/>
+            <a:ext cx="1612440" cy="991440"/>
             <a:chOff x="8686800" y="837360"/>
-            <a:chExt cx="1612800" cy="991440"/>
+            <a:chExt cx="1612440" cy="991440"/>
           </a:xfrm>
         </p:grpSpPr>
         <p:sp>
           <p:nvSpPr>
-            <p:cNvPr id="228" name="TextBox 31"/>
+            <p:cNvPr id="223" name="TextBox 31"/>
             <p:cNvSpPr/>
             <p:nvPr/>
           </p:nvSpPr>
           <p:spPr>
             <a:xfrm>
               <a:off x="8686800" y="837360"/>
-              <a:ext cx="1612800" cy="303120"/>
+              <a:ext cx="1612440" cy="303120"/>
             </a:xfrm>
             <a:prstGeom prst="rect">
               <a:avLst/>
@@ -17212,14 +17036,14 @@
         </p:sp>
         <p:sp>
           <p:nvSpPr>
-            <p:cNvPr id="229" name="TextBox 32"/>
+            <p:cNvPr id="224" name="TextBox 32"/>
             <p:cNvSpPr/>
             <p:nvPr/>
           </p:nvSpPr>
           <p:spPr>
             <a:xfrm>
               <a:off x="8686800" y="1098720"/>
-              <a:ext cx="1612800" cy="730080"/>
+              <a:ext cx="1612440" cy="730080"/>
             </a:xfrm>
             <a:prstGeom prst="rect">
               <a:avLst/>
@@ -17330,14 +17154,14 @@
       </p:grpSp>
       <p:sp>
         <p:nvSpPr>
-          <p:cNvPr id="230" name="Diamond 12"/>
+          <p:cNvPr id="225" name="Diamond 12"/>
           <p:cNvSpPr/>
           <p:nvPr/>
         </p:nvSpPr>
         <p:spPr>
           <a:xfrm>
             <a:off x="128880" y="6134040"/>
-            <a:ext cx="1558080" cy="374040"/>
+            <a:ext cx="1557720" cy="373680"/>
           </a:xfrm>
           <a:prstGeom prst="diamond">
             <a:avLst/>
@@ -17395,14 +17219,14 @@
       </p:sp>
       <p:sp>
         <p:nvSpPr>
-          <p:cNvPr id="231" name="Diamond 13"/>
+          <p:cNvPr id="226" name="Diamond 13"/>
           <p:cNvSpPr/>
           <p:nvPr/>
         </p:nvSpPr>
         <p:spPr>
           <a:xfrm>
             <a:off x="7315200" y="228600"/>
-            <a:ext cx="1558080" cy="374040"/>
+            <a:ext cx="1557720" cy="373680"/>
           </a:xfrm>
           <a:prstGeom prst="diamond">
             <a:avLst/>
@@ -17460,14 +17284,14 @@
       </p:sp>
       <p:cxnSp>
         <p:nvCxnSpPr>
-          <p:cNvPr id="232" name="Straight Arrow Connector 27"/>
+          <p:cNvPr id="227" name="Straight Arrow Connector 27"/>
           <p:cNvCxnSpPr/>
           <p:nvPr/>
         </p:nvCxnSpPr>
         <p:spPr>
           <a:xfrm>
             <a:off x="360" y="3366000"/>
-            <a:ext cx="1842480" cy="13680"/>
+            <a:ext cx="1842840" cy="14040"/>
           </a:xfrm>
           <a:prstGeom prst="straightConnector1">
             <a:avLst/>
@@ -17482,17 +17306,17 @@
       </p:cxnSp>
       <p:cxnSp>
         <p:nvCxnSpPr>
-          <p:cNvPr id="233" name="Straight Arrow Connector 28"/>
+          <p:cNvPr id="228" name="Straight Arrow Connector 28"/>
           <p:cNvCxnSpPr>
-            <a:stCxn id="231" idx="1"/>
-            <a:endCxn id="214" idx="3"/>
+            <a:stCxn id="226" idx="1"/>
+            <a:endCxn id="209" idx="3"/>
           </p:cNvCxnSpPr>
           <p:nvPr/>
         </p:nvCxnSpPr>
         <p:spPr>
           <a:xfrm flipH="1">
-            <a:off x="6387840" y="415800"/>
-            <a:ext cx="927720" cy="668160"/>
+            <a:off x="6387480" y="415440"/>
+            <a:ext cx="928080" cy="668520"/>
           </a:xfrm>
           <a:prstGeom prst="straightConnector1">
             <a:avLst/>
@@ -17507,14 +17331,14 @@
       </p:cxnSp>
       <p:sp>
         <p:nvSpPr>
-          <p:cNvPr id="234" name="Diamond 14"/>
+          <p:cNvPr id="229" name="Diamond 14"/>
           <p:cNvSpPr/>
           <p:nvPr/>
         </p:nvSpPr>
         <p:spPr>
           <a:xfrm>
             <a:off x="6629400" y="1442160"/>
-            <a:ext cx="1817280" cy="603720"/>
+            <a:ext cx="1816920" cy="603360"/>
           </a:xfrm>
           <a:prstGeom prst="diamond">
             <a:avLst/>
@@ -17572,17 +17396,17 @@
       </p:sp>
       <p:cxnSp>
         <p:nvCxnSpPr>
-          <p:cNvPr id="235" name="Straight Arrow Connector 30"/>
+          <p:cNvPr id="230" name="Straight Arrow Connector 30"/>
           <p:cNvCxnSpPr>
-            <a:stCxn id="227" idx="0"/>
-            <a:endCxn id="231" idx="3"/>
+            <a:stCxn id="222" idx="0"/>
+            <a:endCxn id="226" idx="3"/>
           </p:cNvCxnSpPr>
           <p:nvPr/>
         </p:nvCxnSpPr>
         <p:spPr>
           <a:xfrm flipH="1" flipV="1">
-            <a:off x="8873280" y="415800"/>
-            <a:ext cx="620280" cy="421920"/>
+            <a:off x="8872920" y="415440"/>
+            <a:ext cx="620280" cy="422280"/>
           </a:xfrm>
           <a:prstGeom prst="straightConnector1">
             <a:avLst/>
@@ -17598,14 +17422,14 @@
       </p:cxnSp>
       <p:sp>
         <p:nvSpPr>
-          <p:cNvPr id="236" name="Diamond 15"/>
+          <p:cNvPr id="231" name="Diamond 15"/>
           <p:cNvSpPr/>
           <p:nvPr/>
         </p:nvSpPr>
         <p:spPr>
           <a:xfrm>
             <a:off x="6629400" y="2514600"/>
-            <a:ext cx="1558080" cy="374040"/>
+            <a:ext cx="1557720" cy="373680"/>
           </a:xfrm>
           <a:prstGeom prst="diamond">
             <a:avLst/>
@@ -17663,17 +17487,17 @@
       </p:sp>
       <p:cxnSp>
         <p:nvCxnSpPr>
-          <p:cNvPr id="237" name="Straight Arrow Connector 32"/>
+          <p:cNvPr id="232" name="Straight Arrow Connector 32"/>
           <p:cNvCxnSpPr>
-            <a:stCxn id="227" idx="2"/>
-            <a:endCxn id="236" idx="3"/>
+            <a:stCxn id="222" idx="2"/>
+            <a:endCxn id="231" idx="3"/>
           </p:cNvCxnSpPr>
           <p:nvPr/>
         </p:nvCxnSpPr>
         <p:spPr>
           <a:xfrm flipH="1">
-            <a:off x="8187480" y="1828800"/>
-            <a:ext cx="1306080" cy="873360"/>
+            <a:off x="8187120" y="1828800"/>
+            <a:ext cx="1306080" cy="873000"/>
           </a:xfrm>
           <a:prstGeom prst="straightConnector1">
             <a:avLst/>
@@ -17688,17 +17512,17 @@
       </p:cxnSp>
       <p:cxnSp>
         <p:nvCxnSpPr>
-          <p:cNvPr id="238" name="Straight Arrow Connector 33"/>
+          <p:cNvPr id="233" name="Straight Arrow Connector 33"/>
           <p:cNvCxnSpPr>
-            <a:stCxn id="236" idx="1"/>
-            <a:endCxn id="215" idx="3"/>
+            <a:stCxn id="231" idx="1"/>
+            <a:endCxn id="210" idx="3"/>
           </p:cNvCxnSpPr>
           <p:nvPr/>
         </p:nvCxnSpPr>
         <p:spPr>
           <a:xfrm flipH="1">
-            <a:off x="6184800" y="2701800"/>
-            <a:ext cx="444960" cy="2068560"/>
+            <a:off x="6184440" y="2701440"/>
+            <a:ext cx="445320" cy="2068920"/>
           </a:xfrm>
           <a:prstGeom prst="straightConnector1">
             <a:avLst/>
@@ -17713,17 +17537,17 @@
       </p:cxnSp>
       <p:cxnSp>
         <p:nvCxnSpPr>
-          <p:cNvPr id="239" name="Straight Arrow Connector 34"/>
+          <p:cNvPr id="234" name="Straight Arrow Connector 34"/>
           <p:cNvCxnSpPr>
-            <a:stCxn id="227" idx="1"/>
-            <a:endCxn id="234" idx="3"/>
+            <a:stCxn id="222" idx="1"/>
+            <a:endCxn id="229" idx="3"/>
           </p:cNvCxnSpPr>
           <p:nvPr/>
         </p:nvCxnSpPr>
         <p:spPr>
           <a:xfrm flipH="1">
-            <a:off x="8446680" y="1333080"/>
-            <a:ext cx="240480" cy="411480"/>
+            <a:off x="8446320" y="1333080"/>
+            <a:ext cx="240840" cy="411120"/>
           </a:xfrm>
           <a:prstGeom prst="straightConnector1">
             <a:avLst/>
@@ -17738,17 +17562,17 @@
       </p:cxnSp>
       <p:cxnSp>
         <p:nvCxnSpPr>
-          <p:cNvPr id="240" name="Straight Arrow Connector 31"/>
+          <p:cNvPr id="235" name="Straight Arrow Connector 31"/>
           <p:cNvCxnSpPr>
-            <a:stCxn id="234" idx="1"/>
-            <a:endCxn id="214" idx="2"/>
+            <a:stCxn id="229" idx="1"/>
+            <a:endCxn id="209" idx="2"/>
           </p:cNvCxnSpPr>
           <p:nvPr/>
         </p:nvCxnSpPr>
         <p:spPr>
           <a:xfrm flipH="1" flipV="1">
-            <a:off x="5581440" y="1448640"/>
-            <a:ext cx="1048320" cy="295920"/>
+            <a:off x="5581080" y="1448640"/>
+            <a:ext cx="1048680" cy="295560"/>
           </a:xfrm>
           <a:prstGeom prst="straightConnector1">
             <a:avLst/>
@@ -17763,28 +17587,28 @@
       </p:cxnSp>
       <p:grpSp>
         <p:nvGrpSpPr>
-          <p:cNvPr id="241" name="Group 11"/>
+          <p:cNvPr id="236" name="Group 11"/>
           <p:cNvGrpSpPr/>
           <p:nvPr/>
         </p:nvGrpSpPr>
         <p:grpSpPr>
           <a:xfrm>
             <a:off x="101160" y="336240"/>
-            <a:ext cx="1612800" cy="777960"/>
+            <a:ext cx="1612440" cy="777960"/>
             <a:chOff x="101160" y="336240"/>
-            <a:chExt cx="1612800" cy="777960"/>
+            <a:chExt cx="1612440" cy="777960"/>
           </a:xfrm>
         </p:grpSpPr>
         <p:sp>
           <p:nvSpPr>
-            <p:cNvPr id="242" name="TextBox 51"/>
+            <p:cNvPr id="237" name="TextBox 51"/>
             <p:cNvSpPr/>
             <p:nvPr/>
           </p:nvSpPr>
           <p:spPr>
             <a:xfrm>
               <a:off x="101160" y="336240"/>
-              <a:ext cx="1612800" cy="303120"/>
+              <a:ext cx="1612440" cy="303120"/>
             </a:xfrm>
             <a:prstGeom prst="rect">
               <a:avLst/>
@@ -17834,14 +17658,14 @@
         </p:sp>
         <p:sp>
           <p:nvSpPr>
-            <p:cNvPr id="243" name="TextBox 52"/>
+            <p:cNvPr id="238" name="TextBox 52"/>
             <p:cNvSpPr/>
             <p:nvPr/>
           </p:nvSpPr>
           <p:spPr>
             <a:xfrm>
               <a:off x="101160" y="597600"/>
-              <a:ext cx="1612800" cy="516600"/>
+              <a:ext cx="1612440" cy="516600"/>
             </a:xfrm>
             <a:prstGeom prst="rect">
               <a:avLst/>
@@ -17925,14 +17749,14 @@
       </p:grpSp>
       <p:sp>
         <p:nvSpPr>
-          <p:cNvPr id="244" name="Isosceles Triangle 6"/>
+          <p:cNvPr id="239" name="Isosceles Triangle 6"/>
           <p:cNvSpPr/>
           <p:nvPr/>
         </p:nvSpPr>
         <p:spPr>
           <a:xfrm>
             <a:off x="9144000" y="2057400"/>
-            <a:ext cx="469080" cy="374040"/>
+            <a:ext cx="468720" cy="373680"/>
           </a:xfrm>
           <a:prstGeom prst="triangle">
             <a:avLst>
@@ -17992,16 +17816,16 @@
       </p:sp>
       <p:cxnSp>
         <p:nvCxnSpPr>
-          <p:cNvPr id="245" name="Straight Arrow Connector 53"/>
+          <p:cNvPr id="240" name="Straight Arrow Connector 53"/>
           <p:cNvCxnSpPr>
-            <a:endCxn id="246" idx="3"/>
+            <a:endCxn id="241" idx="3"/>
           </p:cNvCxnSpPr>
           <p:nvPr/>
         </p:nvCxnSpPr>
         <p:spPr>
           <a:xfrm flipV="1">
-            <a:off x="9036720" y="4103280"/>
-            <a:ext cx="419760" cy="545040"/>
+            <a:off x="9036720" y="4102920"/>
+            <a:ext cx="419400" cy="545760"/>
           </a:xfrm>
           <a:prstGeom prst="straightConnector1">
             <a:avLst/>
@@ -18016,16 +17840,16 @@
       </p:cxnSp>
       <p:cxnSp>
         <p:nvCxnSpPr>
-          <p:cNvPr id="247" name="Straight Arrow Connector 54"/>
+          <p:cNvPr id="242" name="Straight Arrow Connector 54"/>
           <p:cNvCxnSpPr>
-            <a:stCxn id="244" idx="3"/>
+            <a:stCxn id="239" idx="3"/>
           </p:cNvCxnSpPr>
           <p:nvPr/>
         </p:nvCxnSpPr>
         <p:spPr>
           <a:xfrm flipH="1">
-            <a:off x="9346320" y="2431440"/>
-            <a:ext cx="32760" cy="459720"/>
+            <a:off x="9346320" y="2431080"/>
+            <a:ext cx="32400" cy="460440"/>
           </a:xfrm>
           <a:prstGeom prst="straightConnector1">
             <a:avLst/>
@@ -18040,16 +17864,16 @@
       </p:cxnSp>
       <p:cxnSp>
         <p:nvCxnSpPr>
-          <p:cNvPr id="248" name="Straight Arrow Connector 55"/>
+          <p:cNvPr id="243" name="Straight Arrow Connector 55"/>
           <p:cNvCxnSpPr>
-            <a:stCxn id="227" idx="2"/>
-            <a:endCxn id="244" idx="0"/>
+            <a:stCxn id="222" idx="2"/>
+            <a:endCxn id="239" idx="0"/>
           </p:cNvCxnSpPr>
           <p:nvPr/>
         </p:nvCxnSpPr>
         <p:spPr>
           <a:xfrm flipH="1">
-            <a:off x="9378720" y="1828800"/>
+            <a:off x="9378360" y="1828800"/>
             <a:ext cx="114840" cy="228960"/>
           </a:xfrm>
           <a:prstGeom prst="straightConnector1">
@@ -18065,14 +17889,14 @@
       </p:cxnSp>
       <p:cxnSp>
         <p:nvCxnSpPr>
-          <p:cNvPr id="249" name="Straight Arrow Connector 56"/>
+          <p:cNvPr id="244" name="Straight Arrow Connector 56"/>
           <p:cNvCxnSpPr/>
           <p:nvPr/>
         </p:nvCxnSpPr>
         <p:spPr>
           <a:xfrm flipH="1">
             <a:off x="0" y="3657600"/>
-            <a:ext cx="1842480" cy="13680"/>
+            <a:ext cx="1842840" cy="14040"/>
           </a:xfrm>
           <a:prstGeom prst="straightConnector1">
             <a:avLst/>
@@ -18087,28 +17911,28 @@
       </p:cxnSp>
       <p:grpSp>
         <p:nvGrpSpPr>
-          <p:cNvPr id="250" name="Group 12"/>
+          <p:cNvPr id="245" name="Group 12"/>
           <p:cNvGrpSpPr/>
           <p:nvPr/>
         </p:nvGrpSpPr>
         <p:grpSpPr>
           <a:xfrm>
             <a:off x="8534520" y="2879640"/>
-            <a:ext cx="1612800" cy="553680"/>
+            <a:ext cx="1612440" cy="553320"/>
             <a:chOff x="8534520" y="2879640"/>
-            <a:chExt cx="1612800" cy="553680"/>
+            <a:chExt cx="1612440" cy="553320"/>
           </a:xfrm>
         </p:grpSpPr>
         <p:sp>
           <p:nvSpPr>
-            <p:cNvPr id="251" name="TextBox 23"/>
+            <p:cNvPr id="246" name="TextBox 23"/>
             <p:cNvSpPr/>
             <p:nvPr/>
           </p:nvSpPr>
           <p:spPr>
             <a:xfrm>
               <a:off x="8534520" y="2879640"/>
-              <a:ext cx="1612800" cy="303120"/>
+              <a:ext cx="1612440" cy="303120"/>
             </a:xfrm>
             <a:prstGeom prst="rect">
               <a:avLst/>
@@ -18158,14 +17982,14 @@
         </p:sp>
         <p:sp>
           <p:nvSpPr>
-            <p:cNvPr id="252" name="TextBox 24"/>
+            <p:cNvPr id="247" name="TextBox 24"/>
             <p:cNvSpPr/>
             <p:nvPr/>
           </p:nvSpPr>
           <p:spPr>
             <a:xfrm>
               <a:off x="8534520" y="3141000"/>
-              <a:ext cx="1612800" cy="292320"/>
+              <a:ext cx="1612440" cy="291960"/>
             </a:xfrm>
             <a:prstGeom prst="rect">
               <a:avLst/>
@@ -18207,28 +18031,28 @@
       </p:grpSp>
       <p:grpSp>
         <p:nvGrpSpPr>
-          <p:cNvPr id="253" name="Group 16"/>
+          <p:cNvPr id="248" name="Group 16"/>
           <p:cNvGrpSpPr/>
           <p:nvPr/>
         </p:nvGrpSpPr>
         <p:grpSpPr>
           <a:xfrm>
             <a:off x="8534520" y="2879640"/>
-            <a:ext cx="1612800" cy="564480"/>
+            <a:ext cx="1612440" cy="564480"/>
             <a:chOff x="8534520" y="2879640"/>
-            <a:chExt cx="1612800" cy="564480"/>
+            <a:chExt cx="1612440" cy="564480"/>
           </a:xfrm>
         </p:grpSpPr>
         <p:sp>
           <p:nvSpPr>
-            <p:cNvPr id="254" name="TextBox 40"/>
+            <p:cNvPr id="249" name="TextBox 40"/>
             <p:cNvSpPr/>
             <p:nvPr/>
           </p:nvSpPr>
           <p:spPr>
             <a:xfrm>
               <a:off x="8534520" y="2879640"/>
-              <a:ext cx="1612800" cy="303120"/>
+              <a:ext cx="1612440" cy="303120"/>
             </a:xfrm>
             <a:prstGeom prst="rect">
               <a:avLst/>
@@ -18278,14 +18102,14 @@
         </p:sp>
         <p:sp>
           <p:nvSpPr>
-            <p:cNvPr id="255" name="TextBox 59"/>
+            <p:cNvPr id="250" name="TextBox 59"/>
             <p:cNvSpPr/>
             <p:nvPr/>
           </p:nvSpPr>
           <p:spPr>
             <a:xfrm>
               <a:off x="8534520" y="3141000"/>
-              <a:ext cx="1612800" cy="303120"/>
+              <a:ext cx="1612440" cy="303120"/>
             </a:xfrm>
             <a:prstGeom prst="rect">
               <a:avLst/>
@@ -18341,14 +18165,14 @@
       </p:grpSp>
       <p:sp>
         <p:nvSpPr>
-          <p:cNvPr id="246" name="Isosceles Triangle 7"/>
+          <p:cNvPr id="241" name="Isosceles Triangle 7"/>
           <p:cNvSpPr/>
           <p:nvPr/>
         </p:nvSpPr>
         <p:spPr>
           <a:xfrm>
             <a:off x="9221400" y="3729240"/>
-            <a:ext cx="469080" cy="374040"/>
+            <a:ext cx="468720" cy="373680"/>
           </a:xfrm>
           <a:prstGeom prst="triangle">
             <a:avLst>
@@ -18408,16 +18232,16 @@
       </p:sp>
       <p:cxnSp>
         <p:nvCxnSpPr>
-          <p:cNvPr id="256" name="Straight Arrow Connector 80"/>
+          <p:cNvPr id="251" name="Straight Arrow Connector 80"/>
           <p:cNvCxnSpPr>
-            <a:stCxn id="253" idx="2"/>
-            <a:endCxn id="246" idx="0"/>
+            <a:stCxn id="248" idx="2"/>
+            <a:endCxn id="241" idx="0"/>
           </p:cNvCxnSpPr>
           <p:nvPr/>
         </p:nvCxnSpPr>
         <p:spPr>
           <a:xfrm>
-            <a:off x="9340920" y="3444120"/>
+            <a:off x="9340560" y="3444120"/>
             <a:ext cx="115560" cy="285480"/>
           </a:xfrm>
           <a:prstGeom prst="straightConnector1">
@@ -18433,14 +18257,14 @@
       </p:cxnSp>
       <p:cxnSp>
         <p:nvCxnSpPr>
-          <p:cNvPr id="257" name="Straight Arrow Connector 52"/>
+          <p:cNvPr id="252" name="Straight Arrow Connector 52"/>
           <p:cNvCxnSpPr/>
           <p:nvPr/>
         </p:nvCxnSpPr>
         <p:spPr>
           <a:xfrm>
             <a:off x="8556840" y="3657600"/>
-            <a:ext cx="1842480" cy="13680"/>
+            <a:ext cx="1842840" cy="14040"/>
           </a:xfrm>
           <a:prstGeom prst="straightConnector1">
             <a:avLst/>
@@ -18456,14 +18280,14 @@
       </p:cxnSp>
       <p:sp>
         <p:nvSpPr>
-          <p:cNvPr id="258" name=""/>
+          <p:cNvPr id="253" name=""/>
           <p:cNvSpPr/>
           <p:nvPr/>
         </p:nvSpPr>
         <p:spPr>
           <a:xfrm>
             <a:off x="9601200" y="3382920"/>
-            <a:ext cx="902880" cy="334800"/>
+            <a:ext cx="902520" cy="334440"/>
           </a:xfrm>
           <a:prstGeom prst="rect">
             <a:avLst/>
@@ -18509,28 +18333,28 @@
       </p:sp>
       <p:grpSp>
         <p:nvGrpSpPr>
-          <p:cNvPr id="259" name="Group 5"/>
+          <p:cNvPr id="254" name="Group 5"/>
           <p:cNvGrpSpPr/>
           <p:nvPr/>
         </p:nvGrpSpPr>
         <p:grpSpPr>
           <a:xfrm>
             <a:off x="10265040" y="5029200"/>
-            <a:ext cx="1612800" cy="553320"/>
+            <a:ext cx="1612440" cy="552960"/>
             <a:chOff x="10265040" y="5029200"/>
-            <a:chExt cx="1612800" cy="553320"/>
+            <a:chExt cx="1612440" cy="552960"/>
           </a:xfrm>
         </p:grpSpPr>
         <p:sp>
           <p:nvSpPr>
-            <p:cNvPr id="260" name="TextBox 22"/>
+            <p:cNvPr id="255" name="TextBox 22"/>
             <p:cNvSpPr/>
             <p:nvPr/>
           </p:nvSpPr>
           <p:spPr>
             <a:xfrm>
               <a:off x="10265040" y="5029200"/>
-              <a:ext cx="1612800" cy="303120"/>
+              <a:ext cx="1612440" cy="303120"/>
             </a:xfrm>
             <a:prstGeom prst="rect">
               <a:avLst/>
@@ -18580,14 +18404,14 @@
         </p:sp>
         <p:sp>
           <p:nvSpPr>
-            <p:cNvPr id="261" name="TextBox 29"/>
+            <p:cNvPr id="256" name="TextBox 29"/>
             <p:cNvSpPr/>
             <p:nvPr/>
           </p:nvSpPr>
           <p:spPr>
             <a:xfrm>
               <a:off x="10265040" y="5290560"/>
-              <a:ext cx="1612800" cy="291960"/>
+              <a:ext cx="1612440" cy="291600"/>
             </a:xfrm>
             <a:prstGeom prst="rect">
               <a:avLst/>
@@ -18629,17 +18453,17 @@
       </p:grpSp>
       <p:cxnSp>
         <p:nvCxnSpPr>
-          <p:cNvPr id="262" name="Straight Arrow Connector 84"/>
+          <p:cNvPr id="257" name="Straight Arrow Connector 84"/>
           <p:cNvCxnSpPr>
-            <a:stCxn id="259" idx="0"/>
-            <a:endCxn id="246" idx="4"/>
+            <a:stCxn id="254" idx="0"/>
+            <a:endCxn id="241" idx="4"/>
           </p:cNvCxnSpPr>
           <p:nvPr/>
         </p:nvCxnSpPr>
         <p:spPr>
           <a:xfrm flipH="1" flipV="1">
-            <a:off x="9690480" y="4103280"/>
-            <a:ext cx="1381320" cy="926280"/>
+            <a:off x="9690120" y="4102920"/>
+            <a:ext cx="1381320" cy="926640"/>
           </a:xfrm>
           <a:prstGeom prst="straightConnector1">
             <a:avLst/>
@@ -18654,28 +18478,28 @@
       </p:cxnSp>
       <p:grpSp>
         <p:nvGrpSpPr>
-          <p:cNvPr id="263" name="Group 9"/>
+          <p:cNvPr id="258" name="Group 9"/>
           <p:cNvGrpSpPr/>
           <p:nvPr/>
         </p:nvGrpSpPr>
         <p:grpSpPr>
           <a:xfrm>
             <a:off x="8229600" y="4646520"/>
-            <a:ext cx="1612800" cy="553320"/>
+            <a:ext cx="1612440" cy="552960"/>
             <a:chOff x="8229600" y="4646520"/>
-            <a:chExt cx="1612800" cy="553320"/>
+            <a:chExt cx="1612440" cy="552960"/>
           </a:xfrm>
         </p:grpSpPr>
         <p:sp>
           <p:nvSpPr>
-            <p:cNvPr id="264" name="TextBox 47"/>
+            <p:cNvPr id="259" name="TextBox 47"/>
             <p:cNvSpPr/>
             <p:nvPr/>
           </p:nvSpPr>
           <p:spPr>
             <a:xfrm>
               <a:off x="8229600" y="4646520"/>
-              <a:ext cx="1612800" cy="303120"/>
+              <a:ext cx="1612440" cy="303120"/>
             </a:xfrm>
             <a:prstGeom prst="rect">
               <a:avLst/>
@@ -18725,14 +18549,14 @@
         </p:sp>
         <p:sp>
           <p:nvSpPr>
-            <p:cNvPr id="265" name="TextBox 48"/>
+            <p:cNvPr id="260" name="TextBox 48"/>
             <p:cNvSpPr/>
             <p:nvPr/>
           </p:nvSpPr>
           <p:spPr>
             <a:xfrm>
               <a:off x="8229600" y="4907880"/>
-              <a:ext cx="1612800" cy="291960"/>
+              <a:ext cx="1612440" cy="291600"/>
             </a:xfrm>
             <a:prstGeom prst="rect">
               <a:avLst/>
@@ -18774,14 +18598,14 @@
       </p:grpSp>
       <p:sp>
         <p:nvSpPr>
-          <p:cNvPr id="266" name="Isosceles Triangle 9"/>
+          <p:cNvPr id="261" name="Isosceles Triangle 9"/>
           <p:cNvSpPr/>
           <p:nvPr/>
         </p:nvSpPr>
         <p:spPr>
           <a:xfrm>
             <a:off x="10037520" y="2131560"/>
-            <a:ext cx="469080" cy="374040"/>
+            <a:ext cx="468720" cy="373680"/>
           </a:xfrm>
           <a:prstGeom prst="triangle">
             <a:avLst>
@@ -18841,16 +18665,16 @@
       </p:sp>
       <p:cxnSp>
         <p:nvCxnSpPr>
-          <p:cNvPr id="267" name="Straight Arrow Connector 85"/>
+          <p:cNvPr id="262" name="Straight Arrow Connector 85"/>
           <p:cNvCxnSpPr>
-            <a:stCxn id="227" idx="2"/>
-            <a:endCxn id="266" idx="0"/>
+            <a:stCxn id="222" idx="2"/>
+            <a:endCxn id="261" idx="0"/>
           </p:cNvCxnSpPr>
           <p:nvPr/>
         </p:nvCxnSpPr>
         <p:spPr>
           <a:xfrm>
-            <a:off x="9493200" y="1828800"/>
+            <a:off x="9492840" y="1828800"/>
             <a:ext cx="779400" cy="303120"/>
           </a:xfrm>
           <a:prstGeom prst="straightConnector1">
@@ -18866,28 +18690,28 @@
       </p:cxnSp>
       <p:grpSp>
         <p:nvGrpSpPr>
-          <p:cNvPr id="268" name="Group 10"/>
+          <p:cNvPr id="263" name="Group 10"/>
           <p:cNvGrpSpPr/>
           <p:nvPr/>
         </p:nvGrpSpPr>
         <p:grpSpPr>
           <a:xfrm>
             <a:off x="10494000" y="2866680"/>
-            <a:ext cx="1612800" cy="553320"/>
+            <a:ext cx="1612440" cy="552960"/>
             <a:chOff x="10494000" y="2866680"/>
-            <a:chExt cx="1612800" cy="553320"/>
+            <a:chExt cx="1612440" cy="552960"/>
           </a:xfrm>
         </p:grpSpPr>
         <p:sp>
           <p:nvSpPr>
-            <p:cNvPr id="269" name="TextBox 60"/>
+            <p:cNvPr id="264" name="TextBox 60"/>
             <p:cNvSpPr/>
             <p:nvPr/>
           </p:nvSpPr>
           <p:spPr>
             <a:xfrm>
               <a:off x="10494000" y="2866680"/>
-              <a:ext cx="1612800" cy="303120"/>
+              <a:ext cx="1612440" cy="303120"/>
             </a:xfrm>
             <a:prstGeom prst="rect">
               <a:avLst/>
@@ -18937,14 +18761,14 @@
         </p:sp>
         <p:sp>
           <p:nvSpPr>
-            <p:cNvPr id="270" name="TextBox 71"/>
+            <p:cNvPr id="265" name="TextBox 71"/>
             <p:cNvSpPr/>
             <p:nvPr/>
           </p:nvSpPr>
           <p:spPr>
             <a:xfrm>
               <a:off x="10494000" y="3128040"/>
-              <a:ext cx="1612800" cy="291960"/>
+              <a:ext cx="1612440" cy="291600"/>
             </a:xfrm>
             <a:prstGeom prst="rect">
               <a:avLst/>
@@ -18986,17 +18810,17 @@
       </p:grpSp>
       <p:cxnSp>
         <p:nvCxnSpPr>
-          <p:cNvPr id="271" name="Straight Arrow Connector 86"/>
+          <p:cNvPr id="266" name="Straight Arrow Connector 86"/>
           <p:cNvCxnSpPr>
-            <a:stCxn id="266" idx="3"/>
-            <a:endCxn id="268" idx="0"/>
+            <a:stCxn id="261" idx="3"/>
+            <a:endCxn id="263" idx="0"/>
           </p:cNvCxnSpPr>
           <p:nvPr/>
         </p:nvCxnSpPr>
         <p:spPr>
           <a:xfrm>
-            <a:off x="10272240" y="2505600"/>
-            <a:ext cx="1028520" cy="361440"/>
+            <a:off x="10271880" y="2505240"/>
+            <a:ext cx="1028520" cy="361800"/>
           </a:xfrm>
           <a:prstGeom prst="straightConnector1">
             <a:avLst/>
@@ -19041,14 +18865,14 @@
       </p:grpSpPr>
       <p:cxnSp>
         <p:nvCxnSpPr>
-          <p:cNvPr id="272" name="Straight Arrow Connector 44"/>
+          <p:cNvPr id="267" name="Straight Arrow Connector 44"/>
           <p:cNvCxnSpPr/>
           <p:nvPr/>
         </p:nvCxnSpPr>
         <p:spPr>
           <a:xfrm flipH="1">
             <a:off x="0" y="3073320"/>
-            <a:ext cx="1842480" cy="13680"/>
+            <a:ext cx="1842840" cy="14040"/>
           </a:xfrm>
           <a:prstGeom prst="straightConnector1">
             <a:avLst/>
@@ -19064,14 +18888,14 @@
       </p:cxnSp>
       <p:cxnSp>
         <p:nvCxnSpPr>
-          <p:cNvPr id="273" name="Straight Arrow Connector 45"/>
+          <p:cNvPr id="268" name="Straight Arrow Connector 45"/>
           <p:cNvCxnSpPr/>
           <p:nvPr/>
         </p:nvCxnSpPr>
         <p:spPr>
           <a:xfrm>
             <a:off x="0" y="2489400"/>
-            <a:ext cx="1842480" cy="13680"/>
+            <a:ext cx="1842840" cy="14040"/>
           </a:xfrm>
           <a:prstGeom prst="straightConnector1">
             <a:avLst/>
@@ -19087,14 +18911,14 @@
       </p:cxnSp>
       <p:cxnSp>
         <p:nvCxnSpPr>
-          <p:cNvPr id="274" name="Straight Arrow Connector 46"/>
+          <p:cNvPr id="269" name="Straight Arrow Connector 46"/>
           <p:cNvCxnSpPr/>
           <p:nvPr/>
         </p:nvCxnSpPr>
         <p:spPr>
           <a:xfrm>
             <a:off x="0" y="2781360"/>
-            <a:ext cx="1842480" cy="13680"/>
+            <a:ext cx="1842840" cy="14040"/>
           </a:xfrm>
           <a:prstGeom prst="straightConnector1">
             <a:avLst/>
@@ -19110,14 +18934,14 @@
       </p:cxnSp>
       <p:cxnSp>
         <p:nvCxnSpPr>
-          <p:cNvPr id="275" name="Straight Arrow Connector 47"/>
+          <p:cNvPr id="270" name="Straight Arrow Connector 47"/>
           <p:cNvCxnSpPr/>
           <p:nvPr/>
         </p:nvCxnSpPr>
         <p:spPr>
           <a:xfrm flipH="1">
             <a:off x="0" y="3657600"/>
-            <a:ext cx="1842480" cy="13680"/>
+            <a:ext cx="1842840" cy="14040"/>
           </a:xfrm>
           <a:prstGeom prst="straightConnector1">
             <a:avLst/>
@@ -19132,14 +18956,14 @@
       </p:cxnSp>
       <p:sp>
         <p:nvSpPr>
-          <p:cNvPr id="276" name="Diamond 17"/>
+          <p:cNvPr id="271" name="Diamond 17"/>
           <p:cNvSpPr/>
           <p:nvPr/>
         </p:nvSpPr>
         <p:spPr>
           <a:xfrm>
             <a:off x="128520" y="6134040"/>
-            <a:ext cx="1558080" cy="374040"/>
+            <a:ext cx="1557720" cy="373680"/>
           </a:xfrm>
           <a:prstGeom prst="diamond">
             <a:avLst/>
@@ -19197,14 +19021,14 @@
       </p:sp>
       <p:sp>
         <p:nvSpPr>
-          <p:cNvPr id="277" name="Oval 4"/>
+          <p:cNvPr id="272" name="Oval 4"/>
           <p:cNvSpPr/>
           <p:nvPr/>
         </p:nvSpPr>
         <p:spPr>
           <a:xfrm>
             <a:off x="302760" y="5454000"/>
-            <a:ext cx="1209600" cy="374040"/>
+            <a:ext cx="1209240" cy="373680"/>
           </a:xfrm>
           <a:prstGeom prst="ellipse">
             <a:avLst/>
@@ -19260,14 +19084,14 @@
       </p:sp>
       <p:sp>
         <p:nvSpPr>
-          <p:cNvPr id="278" name="TextBox 53"/>
+          <p:cNvPr id="273" name="TextBox 53"/>
           <p:cNvSpPr/>
           <p:nvPr/>
         </p:nvSpPr>
         <p:spPr>
           <a:xfrm>
             <a:off x="101160" y="336240"/>
-            <a:ext cx="1612800" cy="303120"/>
+            <a:ext cx="1612440" cy="303120"/>
           </a:xfrm>
           <a:prstGeom prst="rect">
             <a:avLst/>
@@ -19317,14 +19141,14 @@
       </p:sp>
       <p:sp>
         <p:nvSpPr>
-          <p:cNvPr id="279" name="TextBox 54"/>
+          <p:cNvPr id="274" name="TextBox 54"/>
           <p:cNvSpPr/>
           <p:nvPr/>
         </p:nvSpPr>
         <p:spPr>
           <a:xfrm>
             <a:off x="101160" y="597600"/>
-            <a:ext cx="1612800" cy="516600"/>
+            <a:ext cx="1612440" cy="516600"/>
           </a:xfrm>
           <a:prstGeom prst="rect">
             <a:avLst/>
@@ -19407,14 +19231,14 @@
       </p:sp>
       <p:sp>
         <p:nvSpPr>
-          <p:cNvPr id="280" name="TextBox 72"/>
+          <p:cNvPr id="275" name="TextBox 72"/>
           <p:cNvSpPr/>
           <p:nvPr/>
         </p:nvSpPr>
         <p:spPr>
           <a:xfrm>
             <a:off x="8458200" y="5486400"/>
-            <a:ext cx="1612800" cy="303120"/>
+            <a:ext cx="1612440" cy="303120"/>
           </a:xfrm>
           <a:prstGeom prst="rect">
             <a:avLst/>
@@ -19464,14 +19288,14 @@
       </p:sp>
       <p:sp>
         <p:nvSpPr>
-          <p:cNvPr id="281" name="Diamond 18"/>
+          <p:cNvPr id="276" name="Diamond 18"/>
           <p:cNvSpPr/>
           <p:nvPr/>
         </p:nvSpPr>
         <p:spPr>
           <a:xfrm>
             <a:off x="128520" y="4629600"/>
-            <a:ext cx="1558080" cy="518760"/>
+            <a:ext cx="1557720" cy="518400"/>
           </a:xfrm>
           <a:prstGeom prst="diamond">
             <a:avLst/>
@@ -19552,14 +19376,14 @@
       </p:sp>
       <p:cxnSp>
         <p:nvCxnSpPr>
-          <p:cNvPr id="282" name="Straight Arrow Connector 48"/>
+          <p:cNvPr id="277" name="Straight Arrow Connector 48"/>
           <p:cNvCxnSpPr/>
           <p:nvPr/>
         </p:nvCxnSpPr>
         <p:spPr>
           <a:xfrm>
             <a:off x="0" y="3365640"/>
-            <a:ext cx="1842480" cy="13680"/>
+            <a:ext cx="1842840" cy="14040"/>
           </a:xfrm>
           <a:prstGeom prst="straightConnector1">
             <a:avLst/>
@@ -19574,14 +19398,14 @@
       </p:cxnSp>
       <p:sp>
         <p:nvSpPr>
-          <p:cNvPr id="283" name="Isosceles Triangle 5"/>
+          <p:cNvPr id="278" name="Isosceles Triangle 5"/>
           <p:cNvSpPr/>
           <p:nvPr/>
         </p:nvSpPr>
         <p:spPr>
           <a:xfrm>
             <a:off x="673200" y="3949920"/>
-            <a:ext cx="469080" cy="374040"/>
+            <a:ext cx="468720" cy="373680"/>
           </a:xfrm>
           <a:prstGeom prst="triangle">
             <a:avLst>
@@ -19641,28 +19465,28 @@
       </p:sp>
       <p:grpSp>
         <p:nvGrpSpPr>
-          <p:cNvPr id="284" name="Group 15"/>
+          <p:cNvPr id="279" name="Group 15"/>
           <p:cNvGrpSpPr/>
           <p:nvPr/>
         </p:nvGrpSpPr>
         <p:grpSpPr>
           <a:xfrm>
             <a:off x="101160" y="1413000"/>
-            <a:ext cx="1612800" cy="777960"/>
+            <a:ext cx="1612440" cy="777960"/>
             <a:chOff x="101160" y="1413000"/>
-            <a:chExt cx="1612800" cy="777960"/>
+            <a:chExt cx="1612440" cy="777960"/>
           </a:xfrm>
         </p:grpSpPr>
         <p:sp>
           <p:nvSpPr>
-            <p:cNvPr id="285" name="TextBox 57"/>
+            <p:cNvPr id="280" name="TextBox 57"/>
             <p:cNvSpPr/>
             <p:nvPr/>
           </p:nvSpPr>
           <p:spPr>
             <a:xfrm>
               <a:off x="101160" y="1413000"/>
-              <a:ext cx="1612800" cy="303120"/>
+              <a:ext cx="1612440" cy="303120"/>
             </a:xfrm>
             <a:prstGeom prst="rect">
               <a:avLst/>
@@ -19713,14 +19537,14 @@
         </p:sp>
         <p:sp>
           <p:nvSpPr>
-            <p:cNvPr id="286" name="TextBox 58"/>
+            <p:cNvPr id="281" name="TextBox 58"/>
             <p:cNvSpPr/>
             <p:nvPr/>
           </p:nvSpPr>
           <p:spPr>
             <a:xfrm>
               <a:off x="101160" y="1674360"/>
-              <a:ext cx="1612800" cy="516600"/>
+              <a:ext cx="1612440" cy="516600"/>
             </a:xfrm>
             <a:prstGeom prst="rect">
               <a:avLst/>
@@ -19805,28 +19629,28 @@
       </p:grpSp>
       <p:grpSp>
         <p:nvGrpSpPr>
-          <p:cNvPr id="287" name="Group 17"/>
+          <p:cNvPr id="282" name="Group 17"/>
           <p:cNvGrpSpPr/>
           <p:nvPr/>
         </p:nvGrpSpPr>
         <p:grpSpPr>
           <a:xfrm>
             <a:off x="4296600" y="4022640"/>
-            <a:ext cx="1612800" cy="1632960"/>
+            <a:ext cx="1612440" cy="1632960"/>
             <a:chOff x="4296600" y="4022640"/>
-            <a:chExt cx="1612800" cy="1632960"/>
+            <a:chExt cx="1612440" cy="1632960"/>
           </a:xfrm>
         </p:grpSpPr>
         <p:sp>
           <p:nvSpPr>
-            <p:cNvPr id="288" name="TextBox 61"/>
+            <p:cNvPr id="283" name="TextBox 61"/>
             <p:cNvSpPr/>
             <p:nvPr/>
           </p:nvSpPr>
           <p:spPr>
             <a:xfrm>
               <a:off x="4296600" y="4022640"/>
-              <a:ext cx="1612800" cy="303120"/>
+              <a:ext cx="1612440" cy="303120"/>
             </a:xfrm>
             <a:prstGeom prst="rect">
               <a:avLst/>
@@ -19876,14 +19700,14 @@
         </p:sp>
         <p:sp>
           <p:nvSpPr>
-            <p:cNvPr id="289" name="TextBox 63"/>
+            <p:cNvPr id="284" name="TextBox 63"/>
             <p:cNvSpPr/>
             <p:nvPr/>
           </p:nvSpPr>
           <p:spPr>
             <a:xfrm>
               <a:off x="4296600" y="4284000"/>
-              <a:ext cx="1612800" cy="1371600"/>
+              <a:ext cx="1612440" cy="1371600"/>
             </a:xfrm>
             <a:prstGeom prst="rect">
               <a:avLst/>
@@ -20075,28 +19899,28 @@
       </p:grpSp>
       <p:grpSp>
         <p:nvGrpSpPr>
-          <p:cNvPr id="290" name="Group 18"/>
+          <p:cNvPr id="285" name="Group 18"/>
           <p:cNvGrpSpPr/>
           <p:nvPr/>
         </p:nvGrpSpPr>
         <p:grpSpPr>
           <a:xfrm>
             <a:off x="9348840" y="2254320"/>
-            <a:ext cx="1612800" cy="1631880"/>
+            <a:ext cx="1612440" cy="1631880"/>
             <a:chOff x="9348840" y="2254320"/>
-            <a:chExt cx="1612800" cy="1631880"/>
+            <a:chExt cx="1612440" cy="1631880"/>
           </a:xfrm>
         </p:grpSpPr>
         <p:sp>
           <p:nvSpPr>
-            <p:cNvPr id="291" name="TextBox 64"/>
+            <p:cNvPr id="286" name="TextBox 64"/>
             <p:cNvSpPr/>
             <p:nvPr/>
           </p:nvSpPr>
           <p:spPr>
             <a:xfrm>
               <a:off x="9348840" y="2254320"/>
-              <a:ext cx="1612800" cy="303120"/>
+              <a:ext cx="1612440" cy="303120"/>
             </a:xfrm>
             <a:prstGeom prst="rect">
               <a:avLst/>
@@ -20146,14 +19970,14 @@
         </p:sp>
         <p:sp>
           <p:nvSpPr>
-            <p:cNvPr id="292" name="TextBox 66"/>
+            <p:cNvPr id="287" name="TextBox 66"/>
             <p:cNvSpPr/>
             <p:nvPr/>
           </p:nvSpPr>
           <p:spPr>
             <a:xfrm>
               <a:off x="9348840" y="2515680"/>
-              <a:ext cx="1612800" cy="1370520"/>
+              <a:ext cx="1612440" cy="1370520"/>
             </a:xfrm>
             <a:prstGeom prst="rect">
               <a:avLst/>
@@ -20345,14 +20169,14 @@
       </p:grpSp>
       <p:sp>
         <p:nvSpPr>
-          <p:cNvPr id="293" name="Diamond 19"/>
+          <p:cNvPr id="288" name="Diamond 19"/>
           <p:cNvSpPr/>
           <p:nvPr/>
         </p:nvSpPr>
         <p:spPr>
           <a:xfrm>
             <a:off x="9402120" y="4572000"/>
-            <a:ext cx="1558080" cy="374040"/>
+            <a:ext cx="1557720" cy="373680"/>
           </a:xfrm>
           <a:prstGeom prst="diamond">
             <a:avLst/>
@@ -20410,28 +20234,28 @@
       </p:sp>
       <p:grpSp>
         <p:nvGrpSpPr>
-          <p:cNvPr id="294" name="Group 19"/>
+          <p:cNvPr id="289" name="Group 19"/>
           <p:cNvGrpSpPr/>
           <p:nvPr/>
         </p:nvGrpSpPr>
         <p:grpSpPr>
           <a:xfrm>
             <a:off x="9348840" y="2254320"/>
-            <a:ext cx="1612800" cy="1631880"/>
+            <a:ext cx="1612440" cy="1631880"/>
             <a:chOff x="9348840" y="2254320"/>
-            <a:chExt cx="1612800" cy="1631880"/>
+            <a:chExt cx="1612440" cy="1631880"/>
           </a:xfrm>
         </p:grpSpPr>
         <p:sp>
           <p:nvSpPr>
-            <p:cNvPr id="295" name="TextBox 67"/>
+            <p:cNvPr id="290" name="TextBox 67"/>
             <p:cNvSpPr/>
             <p:nvPr/>
           </p:nvSpPr>
           <p:spPr>
             <a:xfrm>
               <a:off x="9348840" y="2254320"/>
-              <a:ext cx="1612800" cy="303120"/>
+              <a:ext cx="1612440" cy="303120"/>
             </a:xfrm>
             <a:prstGeom prst="rect">
               <a:avLst/>
@@ -20481,14 +20305,14 @@
         </p:sp>
         <p:sp>
           <p:nvSpPr>
-            <p:cNvPr id="296" name="TextBox 68"/>
+            <p:cNvPr id="291" name="TextBox 68"/>
             <p:cNvSpPr/>
             <p:nvPr/>
           </p:nvSpPr>
           <p:spPr>
             <a:xfrm>
               <a:off x="9348840" y="2515680"/>
-              <a:ext cx="1612800" cy="1370520"/>
+              <a:ext cx="1612440" cy="1370520"/>
             </a:xfrm>
             <a:prstGeom prst="rect">
               <a:avLst/>
@@ -20680,28 +20504,28 @@
       </p:grpSp>
       <p:grpSp>
         <p:nvGrpSpPr>
-          <p:cNvPr id="297" name="Group 20"/>
+          <p:cNvPr id="292" name="Group 20"/>
           <p:cNvGrpSpPr/>
           <p:nvPr/>
         </p:nvGrpSpPr>
         <p:grpSpPr>
           <a:xfrm>
             <a:off x="9348840" y="2254320"/>
-            <a:ext cx="1612800" cy="1631880"/>
+            <a:ext cx="1612440" cy="1631880"/>
             <a:chOff x="9348840" y="2254320"/>
-            <a:chExt cx="1612800" cy="1631880"/>
+            <a:chExt cx="1612440" cy="1631880"/>
           </a:xfrm>
         </p:grpSpPr>
         <p:sp>
           <p:nvSpPr>
-            <p:cNvPr id="298" name="TextBox 69"/>
+            <p:cNvPr id="293" name="TextBox 69"/>
             <p:cNvSpPr/>
             <p:nvPr/>
           </p:nvSpPr>
           <p:spPr>
             <a:xfrm>
               <a:off x="9348840" y="2254320"/>
-              <a:ext cx="1612800" cy="303120"/>
+              <a:ext cx="1612440" cy="303120"/>
             </a:xfrm>
             <a:prstGeom prst="rect">
               <a:avLst/>
@@ -20751,14 +20575,14 @@
         </p:sp>
         <p:sp>
           <p:nvSpPr>
-            <p:cNvPr id="299" name="TextBox 70"/>
+            <p:cNvPr id="294" name="TextBox 70"/>
             <p:cNvSpPr/>
             <p:nvPr/>
           </p:nvSpPr>
           <p:spPr>
             <a:xfrm>
               <a:off x="9348840" y="2515680"/>
-              <a:ext cx="1612800" cy="1370520"/>
+              <a:ext cx="1612440" cy="1370520"/>
             </a:xfrm>
             <a:prstGeom prst="rect">
               <a:avLst/>
@@ -20950,14 +20774,14 @@
       </p:grpSp>
       <p:sp>
         <p:nvSpPr>
-          <p:cNvPr id="300" name="Diamond 25"/>
+          <p:cNvPr id="295" name="Diamond 25"/>
           <p:cNvSpPr/>
           <p:nvPr/>
         </p:nvSpPr>
         <p:spPr>
           <a:xfrm>
             <a:off x="7086600" y="3501720"/>
-            <a:ext cx="1816200" cy="374040"/>
+            <a:ext cx="1815840" cy="373680"/>
           </a:xfrm>
           <a:prstGeom prst="diamond">
             <a:avLst/>
@@ -21015,17 +20839,17 @@
       </p:sp>
       <p:cxnSp>
         <p:nvCxnSpPr>
-          <p:cNvPr id="301" name="Straight Arrow Connector 40"/>
+          <p:cNvPr id="296" name="Straight Arrow Connector 40"/>
           <p:cNvCxnSpPr>
-            <a:stCxn id="293" idx="2"/>
-            <a:endCxn id="280" idx="0"/>
+            <a:stCxn id="288" idx="2"/>
+            <a:endCxn id="275" idx="0"/>
           </p:cNvCxnSpPr>
           <p:nvPr/>
         </p:nvCxnSpPr>
         <p:spPr>
           <a:xfrm flipH="1">
-            <a:off x="9264600" y="4946040"/>
-            <a:ext cx="916920" cy="540720"/>
+            <a:off x="9264240" y="4945680"/>
+            <a:ext cx="917280" cy="541080"/>
           </a:xfrm>
           <a:prstGeom prst="straightConnector1">
             <a:avLst/>
@@ -21040,17 +20864,17 @@
       </p:cxnSp>
       <p:cxnSp>
         <p:nvCxnSpPr>
-          <p:cNvPr id="302" name="Straight Arrow Connector 41"/>
+          <p:cNvPr id="297" name="Straight Arrow Connector 41"/>
           <p:cNvCxnSpPr>
-            <a:stCxn id="297" idx="2"/>
-            <a:endCxn id="293" idx="0"/>
+            <a:stCxn id="292" idx="2"/>
+            <a:endCxn id="288" idx="0"/>
           </p:cNvCxnSpPr>
           <p:nvPr/>
         </p:nvCxnSpPr>
         <p:spPr>
           <a:xfrm>
-            <a:off x="10155240" y="3886200"/>
-            <a:ext cx="26280" cy="686160"/>
+            <a:off x="10154880" y="3886200"/>
+            <a:ext cx="26640" cy="686160"/>
           </a:xfrm>
           <a:prstGeom prst="straightConnector1">
             <a:avLst/>
@@ -21065,14 +20889,14 @@
       </p:cxnSp>
       <p:sp>
         <p:nvSpPr>
-          <p:cNvPr id="303" name="Oval 7"/>
+          <p:cNvPr id="298" name="Oval 7"/>
           <p:cNvSpPr/>
           <p:nvPr/>
         </p:nvSpPr>
         <p:spPr>
           <a:xfrm>
             <a:off x="6629400" y="5099760"/>
-            <a:ext cx="1587600" cy="374040"/>
+            <a:ext cx="1587240" cy="373680"/>
           </a:xfrm>
           <a:prstGeom prst="ellipse">
             <a:avLst/>
@@ -21128,17 +20952,17 @@
       </p:sp>
       <p:cxnSp>
         <p:nvCxnSpPr>
-          <p:cNvPr id="304" name="Straight Arrow Connector 66"/>
+          <p:cNvPr id="299" name="Straight Arrow Connector 66"/>
           <p:cNvCxnSpPr>
-            <a:stCxn id="293" idx="1"/>
-            <a:endCxn id="303" idx="6"/>
+            <a:stCxn id="288" idx="1"/>
+            <a:endCxn id="298" idx="6"/>
           </p:cNvCxnSpPr>
           <p:nvPr/>
         </p:nvCxnSpPr>
         <p:spPr>
           <a:xfrm flipH="1">
-            <a:off x="8217000" y="4759200"/>
-            <a:ext cx="1185480" cy="528120"/>
+            <a:off x="8216640" y="4758840"/>
+            <a:ext cx="1185840" cy="528120"/>
           </a:xfrm>
           <a:prstGeom prst="straightConnector1">
             <a:avLst/>
@@ -21153,17 +20977,17 @@
       </p:cxnSp>
       <p:cxnSp>
         <p:nvCxnSpPr>
-          <p:cNvPr id="305" name="Straight Arrow Connector 64"/>
+          <p:cNvPr id="300" name="Straight Arrow Connector 64"/>
           <p:cNvCxnSpPr>
-            <a:stCxn id="287" idx="3"/>
-            <a:endCxn id="300" idx="1"/>
+            <a:stCxn id="282" idx="3"/>
+            <a:endCxn id="295" idx="1"/>
           </p:cNvCxnSpPr>
           <p:nvPr/>
         </p:nvCxnSpPr>
         <p:spPr>
           <a:xfrm flipV="1">
-            <a:off x="5909400" y="3688920"/>
-            <a:ext cx="1177560" cy="1150560"/>
+            <a:off x="5909040" y="3688560"/>
+            <a:ext cx="1177920" cy="1150920"/>
           </a:xfrm>
           <a:prstGeom prst="straightConnector1">
             <a:avLst/>
@@ -21179,17 +21003,17 @@
       </p:cxnSp>
       <p:cxnSp>
         <p:nvCxnSpPr>
-          <p:cNvPr id="306" name="Straight Arrow Connector 63"/>
+          <p:cNvPr id="301" name="Straight Arrow Connector 63"/>
           <p:cNvCxnSpPr>
-            <a:stCxn id="297" idx="1"/>
-            <a:endCxn id="300" idx="3"/>
+            <a:stCxn id="292" idx="1"/>
+            <a:endCxn id="295" idx="3"/>
           </p:cNvCxnSpPr>
           <p:nvPr/>
         </p:nvCxnSpPr>
         <p:spPr>
           <a:xfrm flipH="1">
-            <a:off x="8902800" y="3070080"/>
-            <a:ext cx="446400" cy="619200"/>
+            <a:off x="8902440" y="3070080"/>
+            <a:ext cx="446760" cy="618840"/>
           </a:xfrm>
           <a:prstGeom prst="straightConnector1">
             <a:avLst/>
@@ -21204,14 +21028,14 @@
       </p:cxnSp>
       <p:sp>
         <p:nvSpPr>
-          <p:cNvPr id="307" name="Oval 9"/>
+          <p:cNvPr id="302" name="Oval 9"/>
           <p:cNvSpPr/>
           <p:nvPr/>
         </p:nvSpPr>
         <p:spPr>
           <a:xfrm>
             <a:off x="7315200" y="4114800"/>
-            <a:ext cx="1666800" cy="374040"/>
+            <a:ext cx="1666440" cy="373680"/>
           </a:xfrm>
           <a:prstGeom prst="ellipse">
             <a:avLst/>
@@ -21267,17 +21091,17 @@
       </p:sp>
       <p:cxnSp>
         <p:nvCxnSpPr>
-          <p:cNvPr id="308" name="Straight Arrow Connector 58"/>
+          <p:cNvPr id="303" name="Straight Arrow Connector 58"/>
           <p:cNvCxnSpPr>
-            <a:stCxn id="293" idx="1"/>
-            <a:endCxn id="307" idx="6"/>
+            <a:stCxn id="288" idx="1"/>
+            <a:endCxn id="302" idx="6"/>
           </p:cNvCxnSpPr>
           <p:nvPr/>
         </p:nvCxnSpPr>
         <p:spPr>
           <a:xfrm flipH="1" flipV="1">
-            <a:off x="8982000" y="4302000"/>
-            <a:ext cx="420480" cy="457560"/>
+            <a:off x="8981640" y="4301640"/>
+            <a:ext cx="420840" cy="457560"/>
           </a:xfrm>
           <a:prstGeom prst="straightConnector1">
             <a:avLst/>
@@ -21292,14 +21116,14 @@
       </p:cxnSp>
       <p:sp>
         <p:nvSpPr>
-          <p:cNvPr id="309" name="TextBox 62"/>
+          <p:cNvPr id="304" name="TextBox 62"/>
           <p:cNvSpPr/>
           <p:nvPr/>
         </p:nvSpPr>
         <p:spPr>
           <a:xfrm>
             <a:off x="2727720" y="1982880"/>
-            <a:ext cx="1612800" cy="303120"/>
+            <a:ext cx="1612440" cy="303120"/>
           </a:xfrm>
           <a:prstGeom prst="rect">
             <a:avLst/>
@@ -21349,14 +21173,14 @@
       </p:sp>
       <p:sp>
         <p:nvSpPr>
-          <p:cNvPr id="310" name="Diamond 16"/>
+          <p:cNvPr id="305" name="Diamond 16"/>
           <p:cNvSpPr/>
           <p:nvPr/>
         </p:nvSpPr>
         <p:spPr>
           <a:xfrm rot="21559200">
             <a:off x="2295720" y="3255120"/>
-            <a:ext cx="2042640" cy="387360"/>
+            <a:ext cx="2042280" cy="387000"/>
           </a:xfrm>
           <a:prstGeom prst="diamond">
             <a:avLst/>
@@ -21414,17 +21238,17 @@
       </p:sp>
       <p:cxnSp>
         <p:nvCxnSpPr>
-          <p:cNvPr id="311" name="Straight Arrow Connector 39"/>
+          <p:cNvPr id="306" name="Straight Arrow Connector 39"/>
           <p:cNvCxnSpPr>
-            <a:stCxn id="287" idx="1"/>
-            <a:endCxn id="310" idx="2"/>
+            <a:stCxn id="282" idx="1"/>
+            <a:endCxn id="305" idx="2"/>
           </p:cNvCxnSpPr>
           <p:nvPr/>
         </p:nvCxnSpPr>
         <p:spPr>
           <a:xfrm flipH="1" flipV="1">
-            <a:off x="3319200" y="3643560"/>
-            <a:ext cx="977760" cy="1195920"/>
+            <a:off x="3319200" y="3643200"/>
+            <a:ext cx="977760" cy="1196280"/>
           </a:xfrm>
           <a:prstGeom prst="straightConnector1">
             <a:avLst/>
@@ -21440,17 +21264,17 @@
       </p:cxnSp>
       <p:cxnSp>
         <p:nvCxnSpPr>
-          <p:cNvPr id="312" name="Straight Arrow Connector 50"/>
+          <p:cNvPr id="307" name="Straight Arrow Connector 50"/>
           <p:cNvCxnSpPr>
-            <a:stCxn id="309" idx="2"/>
-            <a:endCxn id="310" idx="0"/>
+            <a:stCxn id="304" idx="2"/>
+            <a:endCxn id="305" idx="0"/>
           </p:cNvCxnSpPr>
           <p:nvPr/>
         </p:nvCxnSpPr>
         <p:spPr>
           <a:xfrm flipH="1">
             <a:off x="3314880" y="2286000"/>
-            <a:ext cx="219600" cy="970200"/>
+            <a:ext cx="219240" cy="970200"/>
           </a:xfrm>
           <a:prstGeom prst="straightConnector1">
             <a:avLst/>
@@ -21495,14 +21319,14 @@
       </p:grpSpPr>
       <p:cxnSp>
         <p:nvCxnSpPr>
-          <p:cNvPr id="313" name="Straight Arrow Connector 6"/>
+          <p:cNvPr id="308" name="Straight Arrow Connector 6"/>
           <p:cNvCxnSpPr/>
           <p:nvPr/>
         </p:nvCxnSpPr>
         <p:spPr>
           <a:xfrm flipH="1">
             <a:off x="0" y="3073320"/>
-            <a:ext cx="1842480" cy="13680"/>
+            <a:ext cx="1842840" cy="14040"/>
           </a:xfrm>
           <a:prstGeom prst="straightConnector1">
             <a:avLst/>
@@ -21518,14 +21342,14 @@
       </p:cxnSp>
       <p:cxnSp>
         <p:nvCxnSpPr>
-          <p:cNvPr id="314" name="Straight Arrow Connector 7"/>
+          <p:cNvPr id="309" name="Straight Arrow Connector 7"/>
           <p:cNvCxnSpPr/>
           <p:nvPr/>
         </p:nvCxnSpPr>
         <p:spPr>
           <a:xfrm>
             <a:off x="0" y="2489400"/>
-            <a:ext cx="1842480" cy="13680"/>
+            <a:ext cx="1842840" cy="14040"/>
           </a:xfrm>
           <a:prstGeom prst="straightConnector1">
             <a:avLst/>
@@ -21541,14 +21365,14 @@
       </p:cxnSp>
       <p:cxnSp>
         <p:nvCxnSpPr>
-          <p:cNvPr id="315" name="Straight Arrow Connector 8"/>
+          <p:cNvPr id="310" name="Straight Arrow Connector 8"/>
           <p:cNvCxnSpPr/>
           <p:nvPr/>
         </p:nvCxnSpPr>
         <p:spPr>
           <a:xfrm>
             <a:off x="0" y="2781360"/>
-            <a:ext cx="1842480" cy="13680"/>
+            <a:ext cx="1842840" cy="14040"/>
           </a:xfrm>
           <a:prstGeom prst="straightConnector1">
             <a:avLst/>
@@ -21564,14 +21388,14 @@
       </p:cxnSp>
       <p:cxnSp>
         <p:nvCxnSpPr>
-          <p:cNvPr id="316" name="Straight Arrow Connector 9"/>
+          <p:cNvPr id="311" name="Straight Arrow Connector 9"/>
           <p:cNvCxnSpPr/>
           <p:nvPr/>
         </p:nvCxnSpPr>
         <p:spPr>
           <a:xfrm flipH="1">
             <a:off x="0" y="3657600"/>
-            <a:ext cx="1842480" cy="13680"/>
+            <a:ext cx="1842840" cy="14040"/>
           </a:xfrm>
           <a:prstGeom prst="straightConnector1">
             <a:avLst/>
@@ -21586,14 +21410,14 @@
       </p:cxnSp>
       <p:sp>
         <p:nvSpPr>
-          <p:cNvPr id="317" name="Diamond 3"/>
+          <p:cNvPr id="312" name="Diamond 3"/>
           <p:cNvSpPr/>
           <p:nvPr/>
         </p:nvSpPr>
         <p:spPr>
           <a:xfrm>
             <a:off x="128520" y="6134040"/>
-            <a:ext cx="1558080" cy="374040"/>
+            <a:ext cx="1557720" cy="373680"/>
           </a:xfrm>
           <a:prstGeom prst="diamond">
             <a:avLst/>
@@ -21651,14 +21475,14 @@
       </p:sp>
       <p:sp>
         <p:nvSpPr>
-          <p:cNvPr id="318" name="Oval 2"/>
+          <p:cNvPr id="313" name="Oval 2"/>
           <p:cNvSpPr/>
           <p:nvPr/>
         </p:nvSpPr>
         <p:spPr>
           <a:xfrm>
             <a:off x="302760" y="5454000"/>
-            <a:ext cx="1209600" cy="374040"/>
+            <a:ext cx="1209240" cy="373680"/>
           </a:xfrm>
           <a:prstGeom prst="ellipse">
             <a:avLst/>
@@ -21714,28 +21538,28 @@
       </p:sp>
       <p:grpSp>
         <p:nvGrpSpPr>
-          <p:cNvPr id="319" name="Group 3"/>
+          <p:cNvPr id="314" name="Group 3"/>
           <p:cNvGrpSpPr/>
           <p:nvPr/>
         </p:nvGrpSpPr>
         <p:grpSpPr>
           <a:xfrm>
             <a:off x="101160" y="336240"/>
-            <a:ext cx="1612800" cy="777960"/>
+            <a:ext cx="1612440" cy="777960"/>
             <a:chOff x="101160" y="336240"/>
-            <a:chExt cx="1612800" cy="777960"/>
+            <a:chExt cx="1612440" cy="777960"/>
           </a:xfrm>
         </p:grpSpPr>
         <p:sp>
           <p:nvSpPr>
-            <p:cNvPr id="320" name="TextBox 5"/>
+            <p:cNvPr id="315" name="TextBox 5"/>
             <p:cNvSpPr/>
             <p:nvPr/>
           </p:nvSpPr>
           <p:spPr>
             <a:xfrm>
               <a:off x="101160" y="336240"/>
-              <a:ext cx="1612800" cy="303120"/>
+              <a:ext cx="1612440" cy="303120"/>
             </a:xfrm>
             <a:prstGeom prst="rect">
               <a:avLst/>
@@ -21785,14 +21609,14 @@
         </p:sp>
         <p:sp>
           <p:nvSpPr>
-            <p:cNvPr id="321" name="TextBox 6"/>
+            <p:cNvPr id="316" name="TextBox 6"/>
             <p:cNvSpPr/>
             <p:nvPr/>
           </p:nvSpPr>
           <p:spPr>
             <a:xfrm>
               <a:off x="101160" y="597600"/>
-              <a:ext cx="1612800" cy="516600"/>
+              <a:ext cx="1612440" cy="516600"/>
             </a:xfrm>
             <a:prstGeom prst="rect">
               <a:avLst/>
@@ -21876,14 +21700,14 @@
       </p:grpSp>
       <p:sp>
         <p:nvSpPr>
-          <p:cNvPr id="322" name="Diamond 4"/>
+          <p:cNvPr id="317" name="Diamond 4"/>
           <p:cNvSpPr/>
           <p:nvPr/>
         </p:nvSpPr>
         <p:spPr>
           <a:xfrm>
             <a:off x="128520" y="4629600"/>
-            <a:ext cx="1558080" cy="518760"/>
+            <a:ext cx="1557720" cy="518400"/>
           </a:xfrm>
           <a:prstGeom prst="diamond">
             <a:avLst/>
@@ -21964,14 +21788,14 @@
       </p:sp>
       <p:cxnSp>
         <p:nvCxnSpPr>
-          <p:cNvPr id="323" name="Straight Arrow Connector 10"/>
+          <p:cNvPr id="318" name="Straight Arrow Connector 10"/>
           <p:cNvCxnSpPr/>
           <p:nvPr/>
         </p:nvCxnSpPr>
         <p:spPr>
           <a:xfrm>
             <a:off x="0" y="3365640"/>
-            <a:ext cx="1842480" cy="13680"/>
+            <a:ext cx="1842840" cy="14040"/>
           </a:xfrm>
           <a:prstGeom prst="straightConnector1">
             <a:avLst/>
@@ -21986,14 +21810,14 @@
       </p:cxnSp>
       <p:sp>
         <p:nvSpPr>
-          <p:cNvPr id="324" name="Isosceles Triangle 2"/>
+          <p:cNvPr id="319" name="Isosceles Triangle 2"/>
           <p:cNvSpPr/>
           <p:nvPr/>
         </p:nvSpPr>
         <p:spPr>
           <a:xfrm>
             <a:off x="673200" y="3949920"/>
-            <a:ext cx="469080" cy="374040"/>
+            <a:ext cx="468720" cy="373680"/>
           </a:xfrm>
           <a:prstGeom prst="triangle">
             <a:avLst>
@@ -22053,28 +21877,28 @@
       </p:sp>
       <p:grpSp>
         <p:nvGrpSpPr>
-          <p:cNvPr id="325" name="Group 4"/>
+          <p:cNvPr id="320" name="Group 4"/>
           <p:cNvGrpSpPr/>
           <p:nvPr/>
         </p:nvGrpSpPr>
         <p:grpSpPr>
           <a:xfrm>
             <a:off x="101160" y="1413000"/>
-            <a:ext cx="1612800" cy="777960"/>
+            <a:ext cx="1612440" cy="777960"/>
             <a:chOff x="101160" y="1413000"/>
-            <a:chExt cx="1612800" cy="777960"/>
+            <a:chExt cx="1612440" cy="777960"/>
           </a:xfrm>
         </p:grpSpPr>
         <p:sp>
           <p:nvSpPr>
-            <p:cNvPr id="326" name="TextBox 7"/>
+            <p:cNvPr id="321" name="TextBox 7"/>
             <p:cNvSpPr/>
             <p:nvPr/>
           </p:nvSpPr>
           <p:spPr>
             <a:xfrm>
               <a:off x="101160" y="1413000"/>
-              <a:ext cx="1612800" cy="303120"/>
+              <a:ext cx="1612440" cy="303120"/>
             </a:xfrm>
             <a:prstGeom prst="rect">
               <a:avLst/>
@@ -22125,14 +21949,14 @@
         </p:sp>
         <p:sp>
           <p:nvSpPr>
-            <p:cNvPr id="327" name="TextBox 8"/>
+            <p:cNvPr id="322" name="TextBox 8"/>
             <p:cNvSpPr/>
             <p:nvPr/>
           </p:nvSpPr>
           <p:spPr>
             <a:xfrm>
               <a:off x="101160" y="1674360"/>
-              <a:ext cx="1612800" cy="516600"/>
+              <a:ext cx="1612440" cy="516600"/>
             </a:xfrm>
             <a:prstGeom prst="rect">
               <a:avLst/>
@@ -22217,28 +22041,28 @@
       </p:grpSp>
       <p:grpSp>
         <p:nvGrpSpPr>
-          <p:cNvPr id="328" name="Group 21"/>
+          <p:cNvPr id="323" name="Group 21"/>
           <p:cNvGrpSpPr/>
           <p:nvPr/>
         </p:nvGrpSpPr>
         <p:grpSpPr>
           <a:xfrm>
             <a:off x="3886200" y="2286000"/>
-            <a:ext cx="1612800" cy="1845360"/>
+            <a:ext cx="1612440" cy="1845360"/>
             <a:chOff x="3886200" y="2286000"/>
-            <a:chExt cx="1612800" cy="1845360"/>
+            <a:chExt cx="1612440" cy="1845360"/>
           </a:xfrm>
         </p:grpSpPr>
         <p:sp>
           <p:nvSpPr>
-            <p:cNvPr id="329" name="TextBox 75"/>
+            <p:cNvPr id="324" name="TextBox 75"/>
             <p:cNvSpPr/>
             <p:nvPr/>
           </p:nvSpPr>
           <p:spPr>
             <a:xfrm>
               <a:off x="3886200" y="2286000"/>
-              <a:ext cx="1612800" cy="303120"/>
+              <a:ext cx="1612440" cy="303120"/>
             </a:xfrm>
             <a:prstGeom prst="rect">
               <a:avLst/>
@@ -22288,14 +22112,14 @@
         </p:sp>
         <p:sp>
           <p:nvSpPr>
-            <p:cNvPr id="330" name="TextBox 76"/>
+            <p:cNvPr id="325" name="TextBox 76"/>
             <p:cNvSpPr/>
             <p:nvPr/>
           </p:nvSpPr>
           <p:spPr>
             <a:xfrm>
               <a:off x="3886200" y="2547360"/>
-              <a:ext cx="1612800" cy="1584000"/>
+              <a:ext cx="1612440" cy="1584000"/>
             </a:xfrm>
             <a:prstGeom prst="rect">
               <a:avLst/>

</xml_diff>